<commit_message>
Update plus a few tweaks to legends colours and bar plots
</commit_message>
<xml_diff>
--- a/Latest_West_Sussex_C19_slide_deck.pptx
+++ b/Latest_West_Sussex_C19_slide_deck.pptx
@@ -6643,7 +6643,7 @@
           <a:p>
             <a:r>
               <a:rPr/>
-              <a:t>Pack date: 30 July 2020</a:t>
+              <a:t>Pack date: 31 July 2020</a:t>
             </a:r>
           </a:p>
         </p:txBody>
@@ -6775,7 +6775,7 @@
           <a:p>
             <a:r>
               <a:rPr/>
-              <a:t>Pack date: 30 July 2020</a:t>
+              <a:t>Pack date: 31 July 2020</a:t>
             </a:r>
           </a:p>
         </p:txBody>
@@ -6933,7 +6933,7 @@
           <a:p>
             <a:r>
               <a:rPr/>
-              <a:t>Pack date: 30 July 2020</a:t>
+              <a:t>Pack date: 31 July 2020</a:t>
             </a:r>
           </a:p>
         </p:txBody>
@@ -7014,7 +7014,7 @@
           <a:p>
             <a:r>
               <a:rPr/>
-              <a:t>Upper Tier Local Authority cumulative cases as at 28 July</a:t>
+              <a:t>Upper Tier Local Authority cumulative cases as at 30 July</a:t>
             </a:r>
           </a:p>
         </p:txBody>
@@ -7529,7 +7529,7 @@
                           <a:latin typeface="Calibri"/>
                           <a:cs typeface="Calibri"/>
                         </a:rPr>
-                        <a:t>2,796</a:t>
+                        <a:t>2,801</a:t>
                       </a:r>
                     </a:p>
                   </a:txBody>
@@ -7592,7 +7592,7 @@
                           <a:latin typeface="Calibri"/>
                           <a:cs typeface="Calibri"/>
                         </a:rPr>
-                        <a:t>323.6</a:t>
+                        <a:t>324.2</a:t>
                       </a:r>
                     </a:p>
                   </a:txBody>
@@ -7846,7 +7846,7 @@
                           <a:latin typeface="Calibri"/>
                           <a:cs typeface="Calibri"/>
                         </a:rPr>
-                        <a:t>259,722</a:t>
+                        <a:t>261,348</a:t>
                       </a:r>
                     </a:p>
                   </a:txBody>
@@ -7909,7 +7909,7 @@
                           <a:latin typeface="Calibri"/>
                           <a:cs typeface="Calibri"/>
                         </a:rPr>
-                        <a:t>461.4</a:t>
+                        <a:t>464.3</a:t>
                       </a:r>
                     </a:p>
                   </a:txBody>
@@ -8163,7 +8163,7 @@
                           <a:latin typeface="Calibri"/>
                           <a:cs typeface="Calibri"/>
                         </a:rPr>
-                        <a:t>35,284</a:t>
+                        <a:t>35,410</a:t>
                       </a:r>
                     </a:p>
                   </a:txBody>
@@ -8226,7 +8226,7 @@
                           <a:latin typeface="Calibri"/>
                           <a:cs typeface="Calibri"/>
                         </a:rPr>
-                        <a:t>384.4</a:t>
+                        <a:t>385.7</a:t>
                       </a:r>
                     </a:p>
                   </a:txBody>
@@ -8469,7 +8469,7 @@
           <a:p>
             <a:r>
               <a:rPr/>
-              <a:t>Pack date: 30 July 2020</a:t>
+              <a:t>Pack date: 31 July 2020</a:t>
             </a:r>
           </a:p>
         </p:txBody>
@@ -8550,7 +8550,7 @@
           <a:p>
             <a:r>
               <a:rPr/>
-              <a:t>Lower Tier Local Authority cumulative cases as at 28 July</a:t>
+              <a:t>Lower Tier Local Authority cumulative cases as at 30 July</a:t>
             </a:r>
           </a:p>
         </p:txBody>
@@ -9164,7 +9164,7 @@
                           <a:latin typeface="Calibri"/>
                           <a:cs typeface="Calibri"/>
                         </a:rPr>
-                        <a:t>249th</a:t>
+                        <a:t>250th</a:t>
                       </a:r>
                     </a:p>
                   </a:txBody>
@@ -9799,7 +9799,7 @@
                           <a:latin typeface="Calibri"/>
                           <a:cs typeface="Calibri"/>
                         </a:rPr>
-                        <a:t>287th</a:t>
+                        <a:t>288th</a:t>
                       </a:r>
                     </a:p>
                   </a:txBody>
@@ -9991,7 +9991,7 @@
                           <a:latin typeface="Calibri"/>
                           <a:cs typeface="Calibri"/>
                         </a:rPr>
-                        <a:t>458</a:t>
+                        <a:t>459</a:t>
                       </a:r>
                     </a:p>
                   </a:txBody>
@@ -10054,7 +10054,7 @@
                           <a:latin typeface="Calibri"/>
                           <a:cs typeface="Calibri"/>
                         </a:rPr>
-                        <a:t>407.4</a:t>
+                        <a:t>408.3</a:t>
                       </a:r>
                     </a:p>
                   </a:txBody>
@@ -10117,7 +10117,7 @@
                           <a:latin typeface="Calibri"/>
                           <a:cs typeface="Calibri"/>
                         </a:rPr>
-                        <a:t>153rd</a:t>
+                        <a:t>156th</a:t>
                       </a:r>
                     </a:p>
                   </a:txBody>
@@ -10180,7 +10180,7 @@
                           <a:latin typeface="Calibri"/>
                           <a:cs typeface="Calibri"/>
                         </a:rPr>
-                        <a:t>Decile 5</a:t>
+                        <a:t>Decile 6</a:t>
                       </a:r>
                     </a:p>
                   </a:txBody>
@@ -10308,7 +10308,7 @@
                           <a:latin typeface="Calibri"/>
                           <a:cs typeface="Calibri"/>
                         </a:rPr>
-                        <a:t>518</a:t>
+                        <a:t>519</a:t>
                       </a:r>
                     </a:p>
                   </a:txBody>
@@ -10371,7 +10371,7 @@
                           <a:latin typeface="Calibri"/>
                           <a:cs typeface="Calibri"/>
                         </a:rPr>
-                        <a:t>360.2</a:t>
+                        <a:t>360.9</a:t>
                       </a:r>
                     </a:p>
                   </a:txBody>
@@ -10434,7 +10434,7 @@
                           <a:latin typeface="Calibri"/>
                           <a:cs typeface="Calibri"/>
                         </a:rPr>
-                        <a:t>198th</a:t>
+                        <a:t>199th</a:t>
                       </a:r>
                     </a:p>
                   </a:txBody>
@@ -10625,7 +10625,7 @@
                           <a:latin typeface="Calibri"/>
                           <a:cs typeface="Calibri"/>
                         </a:rPr>
-                        <a:t>607</a:t>
+                        <a:t>609</a:t>
                       </a:r>
                     </a:p>
                   </a:txBody>
@@ -10688,7 +10688,7 @@
                           <a:latin typeface="Calibri"/>
                           <a:cs typeface="Calibri"/>
                         </a:rPr>
-                        <a:t>401.9</a:t>
+                        <a:t>403.3</a:t>
                       </a:r>
                     </a:p>
                   </a:txBody>
@@ -10751,7 +10751,7 @@
                           <a:latin typeface="Calibri"/>
                           <a:cs typeface="Calibri"/>
                         </a:rPr>
-                        <a:t>158th</a:t>
+                        <a:t>159th</a:t>
                       </a:r>
                     </a:p>
                   </a:txBody>
@@ -10942,7 +10942,7 @@
                           <a:latin typeface="Calibri"/>
                           <a:cs typeface="Calibri"/>
                         </a:rPr>
-                        <a:t>411</a:t>
+                        <a:t>412</a:t>
                       </a:r>
                     </a:p>
                   </a:txBody>
@@ -11005,7 +11005,7 @@
                           <a:latin typeface="Calibri"/>
                           <a:cs typeface="Calibri"/>
                         </a:rPr>
-                        <a:t>371.7</a:t>
+                        <a:t>372.6</a:t>
                       </a:r>
                     </a:p>
                   </a:txBody>
@@ -11068,7 +11068,7 @@
                           <a:latin typeface="Calibri"/>
                           <a:cs typeface="Calibri"/>
                         </a:rPr>
-                        <a:t>186th</a:t>
+                        <a:t>187th</a:t>
                       </a:r>
                     </a:p>
                   </a:txBody>
@@ -11259,7 +11259,7 @@
                           <a:latin typeface="Calibri"/>
                           <a:cs typeface="Calibri"/>
                         </a:rPr>
-                        <a:t>2,796</a:t>
+                        <a:t>2,801</a:t>
                       </a:r>
                     </a:p>
                   </a:txBody>
@@ -11322,7 +11322,7 @@
                           <a:latin typeface="Calibri"/>
                           <a:cs typeface="Calibri"/>
                         </a:rPr>
-                        <a:t>323.6</a:t>
+                        <a:t>324.2</a:t>
                       </a:r>
                     </a:p>
                   </a:txBody>
@@ -11576,7 +11576,7 @@
                           <a:latin typeface="Calibri"/>
                           <a:cs typeface="Calibri"/>
                         </a:rPr>
-                        <a:t>35,284</a:t>
+                        <a:t>35,410</a:t>
                       </a:r>
                     </a:p>
                   </a:txBody>
@@ -11639,7 +11639,7 @@
                           <a:latin typeface="Calibri"/>
                           <a:cs typeface="Calibri"/>
                         </a:rPr>
-                        <a:t>384.4</a:t>
+                        <a:t>385.7</a:t>
                       </a:r>
                     </a:p>
                   </a:txBody>
@@ -11893,7 +11893,7 @@
                           <a:latin typeface="Calibri"/>
                           <a:cs typeface="Calibri"/>
                         </a:rPr>
-                        <a:t>259,722</a:t>
+                        <a:t>261,348</a:t>
                       </a:r>
                     </a:p>
                   </a:txBody>
@@ -11956,7 +11956,7 @@
                           <a:latin typeface="Calibri"/>
                           <a:cs typeface="Calibri"/>
                         </a:rPr>
-                        <a:t>461.4</a:t>
+                        <a:t>464.3</a:t>
                       </a:r>
                     </a:p>
                   </a:txBody>
@@ -12199,7 +12199,7 @@
           <a:p>
             <a:r>
               <a:rPr/>
-              <a:t>Pack date: 30 July 2020</a:t>
+              <a:t>Pack date: 31 July 2020</a:t>
             </a:r>
           </a:p>
         </p:txBody>
@@ -12310,7 +12310,7 @@
           <a:p>
             <a:r>
               <a:rPr/>
-              <a:t>In the last 24 hours there were 54 triages made. This is an decrease of 42 triages compared to the previous day (96 triages).</a:t>
+              <a:t>In the last 24 hours there were 55 triages made. This is an increase of 1 triages compared to the previous day (54 triages).</a:t>
             </a:r>
           </a:p>
         </p:txBody>
@@ -12337,7 +12337,7 @@
           <a:p>
             <a:r>
               <a:rPr/>
-              <a:t>In the seven days leading to 29 July there were 501 triages to NHS Pathways for COVID-19, this is an average of 72 each day.</a:t>
+              <a:t>In the seven days leading to 30 July there were 500 triages to NHS Pathways for COVID-19, this is an average of 71 each day.</a:t>
             </a:r>
           </a:p>
         </p:txBody>
@@ -12389,7 +12389,7 @@
           <a:p>
             <a:r>
               <a:rPr/>
-              <a:t>Pack date: 30 July 2020</a:t>
+              <a:t>Pack date: 31 July 2020</a:t>
             </a:r>
           </a:p>
         </p:txBody>
@@ -12547,7 +12547,7 @@
           <a:p>
             <a:r>
               <a:rPr/>
-              <a:t>Pack date: 30 July 2020</a:t>
+              <a:t>Pack date: 31 July 2020</a:t>
             </a:r>
           </a:p>
         </p:txBody>
@@ -12705,7 +12705,7 @@
           <a:p>
             <a:r>
               <a:rPr/>
-              <a:t>Pack date: 30 July 2020</a:t>
+              <a:t>Pack date: 31 July 2020</a:t>
             </a:r>
           </a:p>
         </p:txBody>
@@ -12863,7 +12863,7 @@
           <a:p>
             <a:r>
               <a:rPr/>
-              <a:t>Pack date: 30 July 2020</a:t>
+              <a:t>Pack date: 31 July 2020</a:t>
             </a:r>
           </a:p>
         </p:txBody>
@@ -13021,7 +13021,7 @@
           <a:p>
             <a:r>
               <a:rPr/>
-              <a:t>Pack date: 30 July 2020</a:t>
+              <a:t>Pack date: 31 July 2020</a:t>
             </a:r>
           </a:p>
         </p:txBody>
@@ -13179,7 +13179,7 @@
           <a:p>
             <a:r>
               <a:rPr/>
-              <a:t>Pack date: 30 July 2020</a:t>
+              <a:t>Pack date: 31 July 2020</a:t>
             </a:r>
           </a:p>
         </p:txBody>
@@ -13368,7 +13368,7 @@
           <a:p>
             <a:r>
               <a:rPr/>
-              <a:t>Pack date: 30 July 2020</a:t>
+              <a:t>Pack date: 31 July 2020</a:t>
             </a:r>
           </a:p>
         </p:txBody>
@@ -13526,7 +13526,7 @@
           <a:p>
             <a:r>
               <a:rPr/>
-              <a:t>Pack date: 30 July 2020</a:t>
+              <a:t>Pack date: 31 July 2020</a:t>
             </a:r>
           </a:p>
         </p:txBody>
@@ -13684,7 +13684,7 @@
           <a:p>
             <a:r>
               <a:rPr/>
-              <a:t>Pack date: 30 July 2020</a:t>
+              <a:t>Pack date: 31 July 2020</a:t>
             </a:r>
           </a:p>
         </p:txBody>
@@ -13842,7 +13842,7 @@
           <a:p>
             <a:r>
               <a:rPr/>
-              <a:t>Pack date: 30 July 2020</a:t>
+              <a:t>Pack date: 31 July 2020</a:t>
             </a:r>
           </a:p>
         </p:txBody>
@@ -13974,7 +13974,7 @@
           <a:p>
             <a:r>
               <a:rPr/>
-              <a:t>Pack date: 30 July 2020</a:t>
+              <a:t>Pack date: 31 July 2020</a:t>
             </a:r>
           </a:p>
         </p:txBody>
@@ -14106,7 +14106,7 @@
           <a:p>
             <a:r>
               <a:rPr/>
-              <a:t>Pack date: 30 July 2020</a:t>
+              <a:t>Pack date: 31 July 2020</a:t>
             </a:r>
           </a:p>
         </p:txBody>
@@ -14238,7 +14238,7 @@
           <a:p>
             <a:r>
               <a:rPr/>
-              <a:t>Pack date: 30 July 2020</a:t>
+              <a:t>Pack date: 31 July 2020</a:t>
             </a:r>
           </a:p>
         </p:txBody>
@@ -14370,7 +14370,7 @@
           <a:p>
             <a:r>
               <a:rPr/>
-              <a:t>Pack date: 30 July 2020</a:t>
+              <a:t>Pack date: 31 July 2020</a:t>
             </a:r>
           </a:p>
         </p:txBody>
@@ -14502,7 +14502,7 @@
           <a:p>
             <a:r>
               <a:rPr/>
-              <a:t>Pack date: 30 July 2020</a:t>
+              <a:t>Pack date: 31 July 2020</a:t>
             </a:r>
           </a:p>
         </p:txBody>
@@ -14634,7 +14634,7 @@
           <a:p>
             <a:r>
               <a:rPr/>
-              <a:t>Pack date: 30 July 2020</a:t>
+              <a:t>Pack date: 31 July 2020</a:t>
             </a:r>
           </a:p>
         </p:txBody>

</xml_diff>

<commit_message>
Update, tweaks, add rolling rates and percentage change
</commit_message>
<xml_diff>
--- a/Latest_West_Sussex_C19_slide_deck.pptx
+++ b/Latest_West_Sussex_C19_slide_deck.pptx
@@ -6643,7 +6643,7 @@
           <a:p>
             <a:r>
               <a:rPr/>
-              <a:t>Pack date: 31 July 2020</a:t>
+              <a:t>Pack date: 01 August 2020</a:t>
             </a:r>
           </a:p>
         </p:txBody>
@@ -6775,7 +6775,7 @@
           <a:p>
             <a:r>
               <a:rPr/>
-              <a:t>Pack date: 31 July 2020</a:t>
+              <a:t>Pack date: 01 August 2020</a:t>
             </a:r>
           </a:p>
         </p:txBody>
@@ -6933,7 +6933,7 @@
           <a:p>
             <a:r>
               <a:rPr/>
-              <a:t>Pack date: 31 July 2020</a:t>
+              <a:t>Pack date: 01 August 2020</a:t>
             </a:r>
           </a:p>
         </p:txBody>
@@ -7014,7 +7014,7 @@
           <a:p>
             <a:r>
               <a:rPr/>
-              <a:t>Upper Tier Local Authority cumulative cases as at 30 July</a:t>
+              <a:t>Upper Tier Local Authority cumulative cases as at 01 August</a:t>
             </a:r>
           </a:p>
         </p:txBody>
@@ -7529,7 +7529,7 @@
                           <a:latin typeface="Calibri"/>
                           <a:cs typeface="Calibri"/>
                         </a:rPr>
-                        <a:t>2,801</a:t>
+                        <a:t>2,803</a:t>
                       </a:r>
                     </a:p>
                   </a:txBody>
@@ -7592,7 +7592,7 @@
                           <a:latin typeface="Calibri"/>
                           <a:cs typeface="Calibri"/>
                         </a:rPr>
-                        <a:t>324.2</a:t>
+                        <a:t>324.4</a:t>
                       </a:r>
                     </a:p>
                   </a:txBody>
@@ -7846,7 +7846,7 @@
                           <a:latin typeface="Calibri"/>
                           <a:cs typeface="Calibri"/>
                         </a:rPr>
-                        <a:t>261,348</a:t>
+                        <a:t>262,070</a:t>
                       </a:r>
                     </a:p>
                   </a:txBody>
@@ -7909,7 +7909,7 @@
                           <a:latin typeface="Calibri"/>
                           <a:cs typeface="Calibri"/>
                         </a:rPr>
-                        <a:t>464.3</a:t>
+                        <a:t>465.6</a:t>
                       </a:r>
                     </a:p>
                   </a:txBody>
@@ -8163,7 +8163,7 @@
                           <a:latin typeface="Calibri"/>
                           <a:cs typeface="Calibri"/>
                         </a:rPr>
-                        <a:t>35,410</a:t>
+                        <a:t>35,482</a:t>
                       </a:r>
                     </a:p>
                   </a:txBody>
@@ -8226,7 +8226,7 @@
                           <a:latin typeface="Calibri"/>
                           <a:cs typeface="Calibri"/>
                         </a:rPr>
-                        <a:t>385.7</a:t>
+                        <a:t>386.5</a:t>
                       </a:r>
                     </a:p>
                   </a:txBody>
@@ -8469,7 +8469,7 @@
           <a:p>
             <a:r>
               <a:rPr/>
-              <a:t>Pack date: 31 July 2020</a:t>
+              <a:t>Pack date: 01 August 2020</a:t>
             </a:r>
           </a:p>
         </p:txBody>
@@ -8550,7 +8550,7 @@
           <a:p>
             <a:r>
               <a:rPr/>
-              <a:t>Lower Tier Local Authority cumulative cases as at 30 July</a:t>
+              <a:t>Lower Tier Local Authority cumulative cases as at 01 August</a:t>
             </a:r>
           </a:p>
         </p:txBody>
@@ -9164,7 +9164,7 @@
                           <a:latin typeface="Calibri"/>
                           <a:cs typeface="Calibri"/>
                         </a:rPr>
-                        <a:t>250th</a:t>
+                        <a:t>251st</a:t>
                       </a:r>
                     </a:p>
                   </a:txBody>
@@ -10117,7 +10117,7 @@
                           <a:latin typeface="Calibri"/>
                           <a:cs typeface="Calibri"/>
                         </a:rPr>
-                        <a:t>156th</a:t>
+                        <a:t>157th</a:t>
                       </a:r>
                     </a:p>
                   </a:txBody>
@@ -10308,7 +10308,7 @@
                           <a:latin typeface="Calibri"/>
                           <a:cs typeface="Calibri"/>
                         </a:rPr>
-                        <a:t>519</a:t>
+                        <a:t>520</a:t>
                       </a:r>
                     </a:p>
                   </a:txBody>
@@ -10371,7 +10371,7 @@
                           <a:latin typeface="Calibri"/>
                           <a:cs typeface="Calibri"/>
                         </a:rPr>
-                        <a:t>360.9</a:t>
+                        <a:t>361.6</a:t>
                       </a:r>
                     </a:p>
                   </a:txBody>
@@ -10434,7 +10434,7 @@
                           <a:latin typeface="Calibri"/>
                           <a:cs typeface="Calibri"/>
                         </a:rPr>
-                        <a:t>199th</a:t>
+                        <a:t>200th</a:t>
                       </a:r>
                     </a:p>
                   </a:txBody>
@@ -10751,7 +10751,7 @@
                           <a:latin typeface="Calibri"/>
                           <a:cs typeface="Calibri"/>
                         </a:rPr>
-                        <a:t>159th</a:t>
+                        <a:t>160th</a:t>
                       </a:r>
                     </a:p>
                   </a:txBody>
@@ -10942,7 +10942,7 @@
                           <a:latin typeface="Calibri"/>
                           <a:cs typeface="Calibri"/>
                         </a:rPr>
-                        <a:t>412</a:t>
+                        <a:t>413</a:t>
                       </a:r>
                     </a:p>
                   </a:txBody>
@@ -11005,7 +11005,7 @@
                           <a:latin typeface="Calibri"/>
                           <a:cs typeface="Calibri"/>
                         </a:rPr>
-                        <a:t>372.6</a:t>
+                        <a:t>373.5</a:t>
                       </a:r>
                     </a:p>
                   </a:txBody>
@@ -11068,7 +11068,7 @@
                           <a:latin typeface="Calibri"/>
                           <a:cs typeface="Calibri"/>
                         </a:rPr>
-                        <a:t>187th</a:t>
+                        <a:t>186th</a:t>
                       </a:r>
                     </a:p>
                   </a:txBody>
@@ -11259,7 +11259,7 @@
                           <a:latin typeface="Calibri"/>
                           <a:cs typeface="Calibri"/>
                         </a:rPr>
-                        <a:t>2,801</a:t>
+                        <a:t>2,803</a:t>
                       </a:r>
                     </a:p>
                   </a:txBody>
@@ -11322,7 +11322,7 @@
                           <a:latin typeface="Calibri"/>
                           <a:cs typeface="Calibri"/>
                         </a:rPr>
-                        <a:t>324.2</a:t>
+                        <a:t>324.4</a:t>
                       </a:r>
                     </a:p>
                   </a:txBody>
@@ -11576,7 +11576,7 @@
                           <a:latin typeface="Calibri"/>
                           <a:cs typeface="Calibri"/>
                         </a:rPr>
-                        <a:t>35,410</a:t>
+                        <a:t>35,482</a:t>
                       </a:r>
                     </a:p>
                   </a:txBody>
@@ -11639,7 +11639,7 @@
                           <a:latin typeface="Calibri"/>
                           <a:cs typeface="Calibri"/>
                         </a:rPr>
-                        <a:t>385.7</a:t>
+                        <a:t>386.5</a:t>
                       </a:r>
                     </a:p>
                   </a:txBody>
@@ -11893,7 +11893,7 @@
                           <a:latin typeface="Calibri"/>
                           <a:cs typeface="Calibri"/>
                         </a:rPr>
-                        <a:t>261,348</a:t>
+                        <a:t>262,070</a:t>
                       </a:r>
                     </a:p>
                   </a:txBody>
@@ -11956,7 +11956,7 @@
                           <a:latin typeface="Calibri"/>
                           <a:cs typeface="Calibri"/>
                         </a:rPr>
-                        <a:t>464.3</a:t>
+                        <a:t>465.6</a:t>
                       </a:r>
                     </a:p>
                   </a:txBody>
@@ -12199,7 +12199,7 @@
           <a:p>
             <a:r>
               <a:rPr/>
-              <a:t>Pack date: 31 July 2020</a:t>
+              <a:t>Pack date: 01 August 2020</a:t>
             </a:r>
           </a:p>
         </p:txBody>
@@ -12389,7 +12389,7 @@
           <a:p>
             <a:r>
               <a:rPr/>
-              <a:t>Pack date: 31 July 2020</a:t>
+              <a:t>Pack date: 01 August 2020</a:t>
             </a:r>
           </a:p>
         </p:txBody>
@@ -12547,7 +12547,7 @@
           <a:p>
             <a:r>
               <a:rPr/>
-              <a:t>Pack date: 31 July 2020</a:t>
+              <a:t>Pack date: 01 August 2020</a:t>
             </a:r>
           </a:p>
         </p:txBody>
@@ -12705,7 +12705,7 @@
           <a:p>
             <a:r>
               <a:rPr/>
-              <a:t>Pack date: 31 July 2020</a:t>
+              <a:t>Pack date: 01 August 2020</a:t>
             </a:r>
           </a:p>
         </p:txBody>
@@ -12863,7 +12863,7 @@
           <a:p>
             <a:r>
               <a:rPr/>
-              <a:t>Pack date: 31 July 2020</a:t>
+              <a:t>Pack date: 01 August 2020</a:t>
             </a:r>
           </a:p>
         </p:txBody>
@@ -13021,7 +13021,7 @@
           <a:p>
             <a:r>
               <a:rPr/>
-              <a:t>Pack date: 31 July 2020</a:t>
+              <a:t>Pack date: 01 August 2020</a:t>
             </a:r>
           </a:p>
         </p:txBody>
@@ -13179,7 +13179,7 @@
           <a:p>
             <a:r>
               <a:rPr/>
-              <a:t>Pack date: 31 July 2020</a:t>
+              <a:t>Pack date: 01 August 2020</a:t>
             </a:r>
           </a:p>
         </p:txBody>
@@ -13368,7 +13368,7 @@
           <a:p>
             <a:r>
               <a:rPr/>
-              <a:t>Pack date: 31 July 2020</a:t>
+              <a:t>Pack date: 01 August 2020</a:t>
             </a:r>
           </a:p>
         </p:txBody>
@@ -13526,7 +13526,7 @@
           <a:p>
             <a:r>
               <a:rPr/>
-              <a:t>Pack date: 31 July 2020</a:t>
+              <a:t>Pack date: 01 August 2020</a:t>
             </a:r>
           </a:p>
         </p:txBody>
@@ -13684,7 +13684,7 @@
           <a:p>
             <a:r>
               <a:rPr/>
-              <a:t>Pack date: 31 July 2020</a:t>
+              <a:t>Pack date: 01 August 2020</a:t>
             </a:r>
           </a:p>
         </p:txBody>
@@ -13842,7 +13842,7 @@
           <a:p>
             <a:r>
               <a:rPr/>
-              <a:t>Pack date: 31 July 2020</a:t>
+              <a:t>Pack date: 01 August 2020</a:t>
             </a:r>
           </a:p>
         </p:txBody>
@@ -13974,7 +13974,7 @@
           <a:p>
             <a:r>
               <a:rPr/>
-              <a:t>Pack date: 31 July 2020</a:t>
+              <a:t>Pack date: 01 August 2020</a:t>
             </a:r>
           </a:p>
         </p:txBody>
@@ -14106,7 +14106,7 @@
           <a:p>
             <a:r>
               <a:rPr/>
-              <a:t>Pack date: 31 July 2020</a:t>
+              <a:t>Pack date: 01 August 2020</a:t>
             </a:r>
           </a:p>
         </p:txBody>
@@ -14238,7 +14238,7 @@
           <a:p>
             <a:r>
               <a:rPr/>
-              <a:t>Pack date: 31 July 2020</a:t>
+              <a:t>Pack date: 01 August 2020</a:t>
             </a:r>
           </a:p>
         </p:txBody>
@@ -14370,7 +14370,7 @@
           <a:p>
             <a:r>
               <a:rPr/>
-              <a:t>Pack date: 31 July 2020</a:t>
+              <a:t>Pack date: 01 August 2020</a:t>
             </a:r>
           </a:p>
         </p:txBody>
@@ -14502,7 +14502,7 @@
           <a:p>
             <a:r>
               <a:rPr/>
-              <a:t>Pack date: 31 July 2020</a:t>
+              <a:t>Pack date: 01 August 2020</a:t>
             </a:r>
           </a:p>
         </p:txBody>
@@ -14634,7 +14634,7 @@
           <a:p>
             <a:r>
               <a:rPr/>
-              <a:t>Pack date: 31 July 2020</a:t>
+              <a:t>Pack date: 01 August 2020</a:t>
             </a:r>
           </a:p>
         </p:txBody>

</xml_diff>

<commit_message>
Almost finished rolling rate layer
</commit_message>
<xml_diff>
--- a/Latest_West_Sussex_C19_slide_deck.pptx
+++ b/Latest_West_Sussex_C19_slide_deck.pptx
@@ -6643,7 +6643,7 @@
           <a:p>
             <a:r>
               <a:rPr/>
-              <a:t>Pack date: 01 August 2020</a:t>
+              <a:t>Pack date: 03 August 2020</a:t>
             </a:r>
           </a:p>
         </p:txBody>
@@ -6775,7 +6775,7 @@
           <a:p>
             <a:r>
               <a:rPr/>
-              <a:t>Pack date: 01 August 2020</a:t>
+              <a:t>Pack date: 03 August 2020</a:t>
             </a:r>
           </a:p>
         </p:txBody>
@@ -6933,7 +6933,7 @@
           <a:p>
             <a:r>
               <a:rPr/>
-              <a:t>Pack date: 01 August 2020</a:t>
+              <a:t>Pack date: 03 August 2020</a:t>
             </a:r>
           </a:p>
         </p:txBody>
@@ -7211,7 +7211,7 @@
                           <a:latin typeface="Arial"/>
                           <a:cs typeface="Arial"/>
                         </a:rPr>
-                        <a:t>Cases</a:t>
+                        <a:t>Cumulative cases</a:t>
                       </a:r>
                     </a:p>
                   </a:txBody>
@@ -7274,7 +7274,7 @@
                           <a:latin typeface="Arial"/>
                           <a:cs typeface="Arial"/>
                         </a:rPr>
-                        <a:t>Rate per 100,000 residents</a:t>
+                        <a:t>Cumulative rate per 100,000 residents</a:t>
                       </a:r>
                     </a:p>
                   </a:txBody>
@@ -7337,8 +7337,7 @@
                           <a:latin typeface="Arial"/>
                           <a:cs typeface="Arial"/>
                         </a:rPr>
-                        <a:t>Local Authority Rank (out of 149) where 1 = Highest Rate per 100,000
-</a:t>
+                        <a:t>Local Authority Rank (out of 149) where 1 = Highest Rate per 100,000</a:t>
                       </a:r>
                     </a:p>
                   </a:txBody>
@@ -7401,7 +7400,7 @@
                           <a:latin typeface="Arial"/>
                           <a:cs typeface="Arial"/>
                         </a:rPr>
-                        <a:t>Decile of rate per 100,000</a:t>
+                        <a:t>Decile of cumulative rate per 100,000</a:t>
                       </a:r>
                     </a:p>
                   </a:txBody>
@@ -7529,7 +7528,7 @@
                           <a:latin typeface="Calibri"/>
                           <a:cs typeface="Calibri"/>
                         </a:rPr>
-                        <a:t>2,803</a:t>
+                        <a:t>2,806</a:t>
                       </a:r>
                     </a:p>
                   </a:txBody>
@@ -7592,7 +7591,7 @@
                           <a:latin typeface="Calibri"/>
                           <a:cs typeface="Calibri"/>
                         </a:rPr>
-                        <a:t>324.4</a:t>
+                        <a:t>324.8</a:t>
                       </a:r>
                     </a:p>
                   </a:txBody>
@@ -7846,7 +7845,7 @@
                           <a:latin typeface="Calibri"/>
                           <a:cs typeface="Calibri"/>
                         </a:rPr>
-                        <a:t>262,070</a:t>
+                        <a:t>262,746</a:t>
                       </a:r>
                     </a:p>
                   </a:txBody>
@@ -7909,7 +7908,7 @@
                           <a:latin typeface="Calibri"/>
                           <a:cs typeface="Calibri"/>
                         </a:rPr>
-                        <a:t>465.6</a:t>
+                        <a:t>466.8</a:t>
                       </a:r>
                     </a:p>
                   </a:txBody>
@@ -8163,7 +8162,7 @@
                           <a:latin typeface="Calibri"/>
                           <a:cs typeface="Calibri"/>
                         </a:rPr>
-                        <a:t>35,482</a:t>
+                        <a:t>35,539</a:t>
                       </a:r>
                     </a:p>
                   </a:txBody>
@@ -8226,7 +8225,7 @@
                           <a:latin typeface="Calibri"/>
                           <a:cs typeface="Calibri"/>
                         </a:rPr>
-                        <a:t>386.5</a:t>
+                        <a:t>387.1</a:t>
                       </a:r>
                     </a:p>
                   </a:txBody>
@@ -8469,7 +8468,7 @@
           <a:p>
             <a:r>
               <a:rPr/>
-              <a:t>Pack date: 01 August 2020</a:t>
+              <a:t>Pack date: 03 August 2020</a:t>
             </a:r>
           </a:p>
         </p:txBody>
@@ -9355,7 +9354,7 @@
                           <a:latin typeface="Calibri"/>
                           <a:cs typeface="Calibri"/>
                         </a:rPr>
-                        <a:t>329</a:t>
+                        <a:t>330</a:t>
                       </a:r>
                     </a:p>
                   </a:txBody>
@@ -9418,7 +9417,7 @@
                           <a:latin typeface="Calibri"/>
                           <a:cs typeface="Calibri"/>
                         </a:rPr>
-                        <a:t>204.7</a:t>
+                        <a:t>205.3</a:t>
                       </a:r>
                     </a:p>
                   </a:txBody>
@@ -10117,7 +10116,7 @@
                           <a:latin typeface="Calibri"/>
                           <a:cs typeface="Calibri"/>
                         </a:rPr>
-                        <a:t>157th</a:t>
+                        <a:t>158th</a:t>
                       </a:r>
                     </a:p>
                   </a:txBody>
@@ -10308,7 +10307,7 @@
                           <a:latin typeface="Calibri"/>
                           <a:cs typeface="Calibri"/>
                         </a:rPr>
-                        <a:t>520</a:t>
+                        <a:t>522</a:t>
                       </a:r>
                     </a:p>
                   </a:txBody>
@@ -10371,7 +10370,7 @@
                           <a:latin typeface="Calibri"/>
                           <a:cs typeface="Calibri"/>
                         </a:rPr>
-                        <a:t>361.6</a:t>
+                        <a:t>363.0</a:t>
                       </a:r>
                     </a:p>
                   </a:txBody>
@@ -11068,7 +11067,7 @@
                           <a:latin typeface="Calibri"/>
                           <a:cs typeface="Calibri"/>
                         </a:rPr>
-                        <a:t>186th</a:t>
+                        <a:t>187th</a:t>
                       </a:r>
                     </a:p>
                   </a:txBody>
@@ -11259,7 +11258,7 @@
                           <a:latin typeface="Calibri"/>
                           <a:cs typeface="Calibri"/>
                         </a:rPr>
-                        <a:t>2,803</a:t>
+                        <a:t>2,806</a:t>
                       </a:r>
                     </a:p>
                   </a:txBody>
@@ -11322,7 +11321,7 @@
                           <a:latin typeface="Calibri"/>
                           <a:cs typeface="Calibri"/>
                         </a:rPr>
-                        <a:t>324.4</a:t>
+                        <a:t>324.8</a:t>
                       </a:r>
                     </a:p>
                   </a:txBody>
@@ -11576,7 +11575,7 @@
                           <a:latin typeface="Calibri"/>
                           <a:cs typeface="Calibri"/>
                         </a:rPr>
-                        <a:t>35,482</a:t>
+                        <a:t>35,539</a:t>
                       </a:r>
                     </a:p>
                   </a:txBody>
@@ -11639,7 +11638,7 @@
                           <a:latin typeface="Calibri"/>
                           <a:cs typeface="Calibri"/>
                         </a:rPr>
-                        <a:t>386.5</a:t>
+                        <a:t>387.1</a:t>
                       </a:r>
                     </a:p>
                   </a:txBody>
@@ -11893,7 +11892,7 @@
                           <a:latin typeface="Calibri"/>
                           <a:cs typeface="Calibri"/>
                         </a:rPr>
-                        <a:t>262,070</a:t>
+                        <a:t>262,746</a:t>
                       </a:r>
                     </a:p>
                   </a:txBody>
@@ -11956,7 +11955,7 @@
                           <a:latin typeface="Calibri"/>
                           <a:cs typeface="Calibri"/>
                         </a:rPr>
-                        <a:t>465.6</a:t>
+                        <a:t>466.8</a:t>
                       </a:r>
                     </a:p>
                   </a:txBody>
@@ -12199,7 +12198,7 @@
           <a:p>
             <a:r>
               <a:rPr/>
-              <a:t>Pack date: 01 August 2020</a:t>
+              <a:t>Pack date: 03 August 2020</a:t>
             </a:r>
           </a:p>
         </p:txBody>
@@ -12389,7 +12388,7 @@
           <a:p>
             <a:r>
               <a:rPr/>
-              <a:t>Pack date: 01 August 2020</a:t>
+              <a:t>Pack date: 03 August 2020</a:t>
             </a:r>
           </a:p>
         </p:txBody>
@@ -12547,7 +12546,7 @@
           <a:p>
             <a:r>
               <a:rPr/>
-              <a:t>Pack date: 01 August 2020</a:t>
+              <a:t>Pack date: 03 August 2020</a:t>
             </a:r>
           </a:p>
         </p:txBody>
@@ -12705,7 +12704,7 @@
           <a:p>
             <a:r>
               <a:rPr/>
-              <a:t>Pack date: 01 August 2020</a:t>
+              <a:t>Pack date: 03 August 2020</a:t>
             </a:r>
           </a:p>
         </p:txBody>
@@ -12863,7 +12862,7 @@
           <a:p>
             <a:r>
               <a:rPr/>
-              <a:t>Pack date: 01 August 2020</a:t>
+              <a:t>Pack date: 03 August 2020</a:t>
             </a:r>
           </a:p>
         </p:txBody>
@@ -13021,7 +13020,7 @@
           <a:p>
             <a:r>
               <a:rPr/>
-              <a:t>Pack date: 01 August 2020</a:t>
+              <a:t>Pack date: 03 August 2020</a:t>
             </a:r>
           </a:p>
         </p:txBody>
@@ -13179,7 +13178,7 @@
           <a:p>
             <a:r>
               <a:rPr/>
-              <a:t>Pack date: 01 August 2020</a:t>
+              <a:t>Pack date: 03 August 2020</a:t>
             </a:r>
           </a:p>
         </p:txBody>
@@ -13368,7 +13367,7 @@
           <a:p>
             <a:r>
               <a:rPr/>
-              <a:t>Pack date: 01 August 2020</a:t>
+              <a:t>Pack date: 03 August 2020</a:t>
             </a:r>
           </a:p>
         </p:txBody>
@@ -13526,7 +13525,7 @@
           <a:p>
             <a:r>
               <a:rPr/>
-              <a:t>Pack date: 01 August 2020</a:t>
+              <a:t>Pack date: 03 August 2020</a:t>
             </a:r>
           </a:p>
         </p:txBody>
@@ -13684,7 +13683,7 @@
           <a:p>
             <a:r>
               <a:rPr/>
-              <a:t>Pack date: 01 August 2020</a:t>
+              <a:t>Pack date: 03 August 2020</a:t>
             </a:r>
           </a:p>
         </p:txBody>
@@ -13842,7 +13841,7 @@
           <a:p>
             <a:r>
               <a:rPr/>
-              <a:t>Pack date: 01 August 2020</a:t>
+              <a:t>Pack date: 03 August 2020</a:t>
             </a:r>
           </a:p>
         </p:txBody>
@@ -13974,7 +13973,7 @@
           <a:p>
             <a:r>
               <a:rPr/>
-              <a:t>Pack date: 01 August 2020</a:t>
+              <a:t>Pack date: 03 August 2020</a:t>
             </a:r>
           </a:p>
         </p:txBody>
@@ -14106,7 +14105,7 @@
           <a:p>
             <a:r>
               <a:rPr/>
-              <a:t>Pack date: 01 August 2020</a:t>
+              <a:t>Pack date: 03 August 2020</a:t>
             </a:r>
           </a:p>
         </p:txBody>
@@ -14238,7 +14237,7 @@
           <a:p>
             <a:r>
               <a:rPr/>
-              <a:t>Pack date: 01 August 2020</a:t>
+              <a:t>Pack date: 03 August 2020</a:t>
             </a:r>
           </a:p>
         </p:txBody>
@@ -14370,7 +14369,7 @@
           <a:p>
             <a:r>
               <a:rPr/>
-              <a:t>Pack date: 01 August 2020</a:t>
+              <a:t>Pack date: 03 August 2020</a:t>
             </a:r>
           </a:p>
         </p:txBody>
@@ -14502,7 +14501,7 @@
           <a:p>
             <a:r>
               <a:rPr/>
-              <a:t>Pack date: 01 August 2020</a:t>
+              <a:t>Pack date: 03 August 2020</a:t>
             </a:r>
           </a:p>
         </p:txBody>
@@ -14634,7 +14633,7 @@
           <a:p>
             <a:r>
               <a:rPr/>
-              <a:t>Pack date: 01 August 2020</a:t>
+              <a:t>Pack date: 03 August 2020</a:t>
             </a:r>
           </a:p>
         </p:txBody>

</xml_diff>

<commit_message>
Update - add toggle to map and rolling 7 days
</commit_message>
<xml_diff>
--- a/Latest_West_Sussex_C19_slide_deck.pptx
+++ b/Latest_West_Sussex_C19_slide_deck.pptx
@@ -7014,7 +7014,7 @@
           <a:p>
             <a:r>
               <a:rPr/>
-              <a:t>Upper Tier Local Authority cumulative cases as at 01 August</a:t>
+              <a:t>Upper Tier Local Authority cumulative cases as at 02 August</a:t>
             </a:r>
           </a:p>
         </p:txBody>
@@ -7845,7 +7845,7 @@
                           <a:latin typeface="Calibri"/>
                           <a:cs typeface="Calibri"/>
                         </a:rPr>
-                        <a:t>262,746</a:t>
+                        <a:t>263,602</a:t>
                       </a:r>
                     </a:p>
                   </a:txBody>
@@ -7908,7 +7908,7 @@
                           <a:latin typeface="Calibri"/>
                           <a:cs typeface="Calibri"/>
                         </a:rPr>
-                        <a:t>466.8</a:t>
+                        <a:t>468.3</a:t>
                       </a:r>
                     </a:p>
                   </a:txBody>
@@ -8162,7 +8162,7 @@
                           <a:latin typeface="Calibri"/>
                           <a:cs typeface="Calibri"/>
                         </a:rPr>
-                        <a:t>35,539</a:t>
+                        <a:t>35,593</a:t>
                       </a:r>
                     </a:p>
                   </a:txBody>
@@ -8225,7 +8225,7 @@
                           <a:latin typeface="Calibri"/>
                           <a:cs typeface="Calibri"/>
                         </a:rPr>
-                        <a:t>387.1</a:t>
+                        <a:t>387.7</a:t>
                       </a:r>
                     </a:p>
                   </a:txBody>
@@ -8549,7 +8549,7 @@
           <a:p>
             <a:r>
               <a:rPr/>
-              <a:t>Lower Tier Local Authority cumulative cases as at 01 August</a:t>
+              <a:t>Lower Tier Local Authority cumulative cases as at 02 August</a:t>
             </a:r>
           </a:p>
         </p:txBody>
@@ -10116,7 +10116,7 @@
                           <a:latin typeface="Calibri"/>
                           <a:cs typeface="Calibri"/>
                         </a:rPr>
-                        <a:t>158th</a:t>
+                        <a:t>159th</a:t>
                       </a:r>
                     </a:p>
                   </a:txBody>
@@ -11067,7 +11067,7 @@
                           <a:latin typeface="Calibri"/>
                           <a:cs typeface="Calibri"/>
                         </a:rPr>
-                        <a:t>187th</a:t>
+                        <a:t>189th</a:t>
                       </a:r>
                     </a:p>
                   </a:txBody>
@@ -11130,7 +11130,7 @@
                           <a:latin typeface="Calibri"/>
                           <a:cs typeface="Calibri"/>
                         </a:rPr>
-                        <a:t>Decile 6</a:t>
+                        <a:t>Decile 7</a:t>
                       </a:r>
                     </a:p>
                   </a:txBody>
@@ -11575,7 +11575,7 @@
                           <a:latin typeface="Calibri"/>
                           <a:cs typeface="Calibri"/>
                         </a:rPr>
-                        <a:t>35,539</a:t>
+                        <a:t>35,593</a:t>
                       </a:r>
                     </a:p>
                   </a:txBody>
@@ -11638,7 +11638,7 @@
                           <a:latin typeface="Calibri"/>
                           <a:cs typeface="Calibri"/>
                         </a:rPr>
-                        <a:t>387.1</a:t>
+                        <a:t>387.7</a:t>
                       </a:r>
                     </a:p>
                   </a:txBody>
@@ -11892,7 +11892,7 @@
                           <a:latin typeface="Calibri"/>
                           <a:cs typeface="Calibri"/>
                         </a:rPr>
-                        <a:t>262,746</a:t>
+                        <a:t>263,602</a:t>
                       </a:r>
                     </a:p>
                   </a:txBody>
@@ -11955,7 +11955,7 @@
                           <a:latin typeface="Calibri"/>
                           <a:cs typeface="Calibri"/>
                         </a:rPr>
-                        <a:t>466.8</a:t>
+                        <a:t>468.3</a:t>
                       </a:r>
                     </a:p>
                   </a:txBody>
@@ -12309,7 +12309,7 @@
           <a:p>
             <a:r>
               <a:rPr/>
-              <a:t>In the last 24 hours there were 55 triages made. This is an increase of 1 triages compared to the previous day (54 triages).</a:t>
+              <a:t>In the last 24 hours there were 77 triages made. This is an increase of 16 triages compared to the previous day (61 triages).</a:t>
             </a:r>
           </a:p>
         </p:txBody>
@@ -12336,7 +12336,7 @@
           <a:p>
             <a:r>
               <a:rPr/>
-              <a:t>In the seven days leading to 30 July there were 500 triages to NHS Pathways for COVID-19, this is an average of 71 each day.</a:t>
+              <a:t>In the seven days leading to 02 August there were 472 triages to NHS Pathways for COVID-19, this is an average of 67 each day.</a:t>
             </a:r>
           </a:p>
         </p:txBody>

</xml_diff>

<commit_message>
Update - cases not updated since 10 August
</commit_message>
<xml_diff>
--- a/Latest_West_Sussex_C19_slide_deck.pptx
+++ b/Latest_West_Sussex_C19_slide_deck.pptx
@@ -6643,7 +6643,7 @@
           <a:p>
             <a:r>
               <a:rPr/>
-              <a:t>Pack date: 11 August 2020</a:t>
+              <a:t>Pack date: 12 August 2020</a:t>
             </a:r>
           </a:p>
         </p:txBody>
@@ -6775,7 +6775,7 @@
           <a:p>
             <a:r>
               <a:rPr/>
-              <a:t>Pack date: 11 August 2020</a:t>
+              <a:t>Pack date: 12 August 2020</a:t>
             </a:r>
           </a:p>
         </p:txBody>
@@ -6933,7 +6933,7 @@
           <a:p>
             <a:r>
               <a:rPr/>
-              <a:t>Pack date: 11 August 2020</a:t>
+              <a:t>Pack date: 12 August 2020</a:t>
             </a:r>
           </a:p>
         </p:txBody>
@@ -8468,7 +8468,7 @@
           <a:p>
             <a:r>
               <a:rPr/>
-              <a:t>Pack date: 11 August 2020</a:t>
+              <a:t>Pack date: 12 August 2020</a:t>
             </a:r>
           </a:p>
         </p:txBody>
@@ -12198,7 +12198,7 @@
           <a:p>
             <a:r>
               <a:rPr/>
-              <a:t>Pack date: 11 August 2020</a:t>
+              <a:t>Pack date: 12 August 2020</a:t>
             </a:r>
           </a:p>
         </p:txBody>
@@ -12388,7 +12388,7 @@
           <a:p>
             <a:r>
               <a:rPr/>
-              <a:t>Pack date: 11 August 2020</a:t>
+              <a:t>Pack date: 12 August 2020</a:t>
             </a:r>
           </a:p>
         </p:txBody>
@@ -12546,7 +12546,7 @@
           <a:p>
             <a:r>
               <a:rPr/>
-              <a:t>Pack date: 11 August 2020</a:t>
+              <a:t>Pack date: 12 August 2020</a:t>
             </a:r>
           </a:p>
         </p:txBody>
@@ -12704,7 +12704,7 @@
           <a:p>
             <a:r>
               <a:rPr/>
-              <a:t>Pack date: 11 August 2020</a:t>
+              <a:t>Pack date: 12 August 2020</a:t>
             </a:r>
           </a:p>
         </p:txBody>
@@ -12862,7 +12862,7 @@
           <a:p>
             <a:r>
               <a:rPr/>
-              <a:t>Pack date: 11 August 2020</a:t>
+              <a:t>Pack date: 12 August 2020</a:t>
             </a:r>
           </a:p>
         </p:txBody>
@@ -13020,7 +13020,7 @@
           <a:p>
             <a:r>
               <a:rPr/>
-              <a:t>Pack date: 11 August 2020</a:t>
+              <a:t>Pack date: 12 August 2020</a:t>
             </a:r>
           </a:p>
         </p:txBody>
@@ -13178,7 +13178,7 @@
           <a:p>
             <a:r>
               <a:rPr/>
-              <a:t>Pack date: 11 August 2020</a:t>
+              <a:t>Pack date: 12 August 2020</a:t>
             </a:r>
           </a:p>
         </p:txBody>
@@ -13367,7 +13367,7 @@
           <a:p>
             <a:r>
               <a:rPr/>
-              <a:t>Pack date: 11 August 2020</a:t>
+              <a:t>Pack date: 12 August 2020</a:t>
             </a:r>
           </a:p>
         </p:txBody>
@@ -13525,7 +13525,7 @@
           <a:p>
             <a:r>
               <a:rPr/>
-              <a:t>Pack date: 11 August 2020</a:t>
+              <a:t>Pack date: 12 August 2020</a:t>
             </a:r>
           </a:p>
         </p:txBody>
@@ -13683,7 +13683,7 @@
           <a:p>
             <a:r>
               <a:rPr/>
-              <a:t>Pack date: 11 August 2020</a:t>
+              <a:t>Pack date: 12 August 2020</a:t>
             </a:r>
           </a:p>
         </p:txBody>
@@ -13841,7 +13841,7 @@
           <a:p>
             <a:r>
               <a:rPr/>
-              <a:t>Pack date: 11 August 2020</a:t>
+              <a:t>Pack date: 12 August 2020</a:t>
             </a:r>
           </a:p>
         </p:txBody>
@@ -13973,7 +13973,7 @@
           <a:p>
             <a:r>
               <a:rPr/>
-              <a:t>Pack date: 11 August 2020</a:t>
+              <a:t>Pack date: 12 August 2020</a:t>
             </a:r>
           </a:p>
         </p:txBody>
@@ -14105,7 +14105,7 @@
           <a:p>
             <a:r>
               <a:rPr/>
-              <a:t>Pack date: 11 August 2020</a:t>
+              <a:t>Pack date: 12 August 2020</a:t>
             </a:r>
           </a:p>
         </p:txBody>
@@ -14237,7 +14237,7 @@
           <a:p>
             <a:r>
               <a:rPr/>
-              <a:t>Pack date: 11 August 2020</a:t>
+              <a:t>Pack date: 12 August 2020</a:t>
             </a:r>
           </a:p>
         </p:txBody>
@@ -14369,7 +14369,7 @@
           <a:p>
             <a:r>
               <a:rPr/>
-              <a:t>Pack date: 11 August 2020</a:t>
+              <a:t>Pack date: 12 August 2020</a:t>
             </a:r>
           </a:p>
         </p:txBody>
@@ -14501,7 +14501,7 @@
           <a:p>
             <a:r>
               <a:rPr/>
-              <a:t>Pack date: 11 August 2020</a:t>
+              <a:t>Pack date: 12 August 2020</a:t>
             </a:r>
           </a:p>
         </p:txBody>
@@ -14633,7 +14633,7 @@
           <a:p>
             <a:r>
               <a:rPr/>
-              <a:t>Pack date: 11 August 2020</a:t>
+              <a:t>Pack date: 12 August 2020</a:t>
             </a:r>
           </a:p>
         </p:txBody>

</xml_diff>

<commit_message>
Update new definition of dates
</commit_message>
<xml_diff>
--- a/Latest_West_Sussex_C19_slide_deck.pptx
+++ b/Latest_West_Sussex_C19_slide_deck.pptx
@@ -7014,7 +7014,7 @@
           <a:p>
             <a:r>
               <a:rPr/>
-              <a:t>Upper Tier Local Authority cumulative cases as at 09 August</a:t>
+              <a:t>Upper Tier Local Authority cumulative cases as at 12 August</a:t>
             </a:r>
           </a:p>
         </p:txBody>
@@ -7528,7 +7528,7 @@
                           <a:latin typeface="Calibri"/>
                           <a:cs typeface="Calibri"/>
                         </a:rPr>
-                        <a:t>2,826</a:t>
+                        <a:t>2,835</a:t>
                       </a:r>
                     </a:p>
                   </a:txBody>
@@ -7591,7 +7591,7 @@
                           <a:latin typeface="Calibri"/>
                           <a:cs typeface="Calibri"/>
                         </a:rPr>
-                        <a:t>327.1</a:t>
+                        <a:t>328.1</a:t>
                       </a:r>
                     </a:p>
                   </a:txBody>
@@ -7845,7 +7845,7 @@
                           <a:latin typeface="Calibri"/>
                           <a:cs typeface="Calibri"/>
                         </a:rPr>
-                        <a:t>269,011</a:t>
+                        <a:t>270,971</a:t>
                       </a:r>
                     </a:p>
                   </a:txBody>
@@ -7908,7 +7908,7 @@
                           <a:latin typeface="Calibri"/>
                           <a:cs typeface="Calibri"/>
                         </a:rPr>
-                        <a:t>477.9</a:t>
+                        <a:t>481.4</a:t>
                       </a:r>
                     </a:p>
                   </a:txBody>
@@ -8162,7 +8162,7 @@
                           <a:latin typeface="Calibri"/>
                           <a:cs typeface="Calibri"/>
                         </a:rPr>
-                        <a:t>35,952</a:t>
+                        <a:t>36,083</a:t>
                       </a:r>
                     </a:p>
                   </a:txBody>
@@ -8225,7 +8225,7 @@
                           <a:latin typeface="Calibri"/>
                           <a:cs typeface="Calibri"/>
                         </a:rPr>
-                        <a:t>391.6</a:t>
+                        <a:t>393.1</a:t>
                       </a:r>
                     </a:p>
                   </a:txBody>
@@ -8549,7 +8549,7 @@
           <a:p>
             <a:r>
               <a:rPr/>
-              <a:t>Lower Tier Local Authority cumulative cases as at 09 August</a:t>
+              <a:t>Lower Tier Local Authority cumulative cases as at 12 August</a:t>
             </a:r>
           </a:p>
         </p:txBody>
@@ -9037,7 +9037,7 @@
                           <a:latin typeface="Calibri"/>
                           <a:cs typeface="Calibri"/>
                         </a:rPr>
-                        <a:t>191</a:t>
+                        <a:t>192</a:t>
                       </a:r>
                     </a:p>
                   </a:txBody>
@@ -9100,7 +9100,7 @@
                           <a:latin typeface="Calibri"/>
                           <a:cs typeface="Calibri"/>
                         </a:rPr>
-                        <a:t>297.0</a:t>
+                        <a:t>298.6</a:t>
                       </a:r>
                     </a:p>
                   </a:txBody>
@@ -9354,7 +9354,7 @@
                           <a:latin typeface="Calibri"/>
                           <a:cs typeface="Calibri"/>
                         </a:rPr>
-                        <a:t>334</a:t>
+                        <a:t>336</a:t>
                       </a:r>
                     </a:p>
                   </a:txBody>
@@ -9417,7 +9417,7 @@
                           <a:latin typeface="Calibri"/>
                           <a:cs typeface="Calibri"/>
                         </a:rPr>
-                        <a:t>207.8</a:t>
+                        <a:t>209.0</a:t>
                       </a:r>
                     </a:p>
                   </a:txBody>
@@ -9990,7 +9990,7 @@
                           <a:latin typeface="Calibri"/>
                           <a:cs typeface="Calibri"/>
                         </a:rPr>
-                        <a:t>462</a:t>
+                        <a:t>463</a:t>
                       </a:r>
                     </a:p>
                   </a:txBody>
@@ -10053,7 +10053,7 @@
                           <a:latin typeface="Calibri"/>
                           <a:cs typeface="Calibri"/>
                         </a:rPr>
-                        <a:t>411.0</a:t>
+                        <a:t>411.9</a:t>
                       </a:r>
                     </a:p>
                   </a:txBody>
@@ -10307,7 +10307,7 @@
                           <a:latin typeface="Calibri"/>
                           <a:cs typeface="Calibri"/>
                         </a:rPr>
-                        <a:t>526</a:t>
+                        <a:t>527</a:t>
                       </a:r>
                     </a:p>
                   </a:txBody>
@@ -10370,7 +10370,7 @@
                           <a:latin typeface="Calibri"/>
                           <a:cs typeface="Calibri"/>
                         </a:rPr>
-                        <a:t>365.8</a:t>
+                        <a:t>366.5</a:t>
                       </a:r>
                     </a:p>
                   </a:txBody>
@@ -10624,7 +10624,7 @@
                           <a:latin typeface="Calibri"/>
                           <a:cs typeface="Calibri"/>
                         </a:rPr>
-                        <a:t>613</a:t>
+                        <a:t>615</a:t>
                       </a:r>
                     </a:p>
                   </a:txBody>
@@ -10687,7 +10687,7 @@
                           <a:latin typeface="Calibri"/>
                           <a:cs typeface="Calibri"/>
                         </a:rPr>
-                        <a:t>405.9</a:t>
+                        <a:t>407.2</a:t>
                       </a:r>
                     </a:p>
                   </a:txBody>
@@ -10750,7 +10750,7 @@
                           <a:latin typeface="Calibri"/>
                           <a:cs typeface="Calibri"/>
                         </a:rPr>
-                        <a:t>160th</a:t>
+                        <a:t>161st</a:t>
                       </a:r>
                     </a:p>
                   </a:txBody>
@@ -10941,7 +10941,7 @@
                           <a:latin typeface="Calibri"/>
                           <a:cs typeface="Calibri"/>
                         </a:rPr>
-                        <a:t>415</a:t>
+                        <a:t>417</a:t>
                       </a:r>
                     </a:p>
                   </a:txBody>
@@ -11004,7 +11004,7 @@
                           <a:latin typeface="Calibri"/>
                           <a:cs typeface="Calibri"/>
                         </a:rPr>
-                        <a:t>375.3</a:t>
+                        <a:t>377.1</a:t>
                       </a:r>
                     </a:p>
                   </a:txBody>
@@ -11067,7 +11067,7 @@
                           <a:latin typeface="Calibri"/>
                           <a:cs typeface="Calibri"/>
                         </a:rPr>
-                        <a:t>191st</a:t>
+                        <a:t>193rd</a:t>
                       </a:r>
                     </a:p>
                   </a:txBody>
@@ -11258,7 +11258,7 @@
                           <a:latin typeface="Calibri"/>
                           <a:cs typeface="Calibri"/>
                         </a:rPr>
-                        <a:t>2,826</a:t>
+                        <a:t>2,835</a:t>
                       </a:r>
                     </a:p>
                   </a:txBody>
@@ -11321,7 +11321,7 @@
                           <a:latin typeface="Calibri"/>
                           <a:cs typeface="Calibri"/>
                         </a:rPr>
-                        <a:t>327.1</a:t>
+                        <a:t>328.1</a:t>
                       </a:r>
                     </a:p>
                   </a:txBody>
@@ -11575,7 +11575,7 @@
                           <a:latin typeface="Calibri"/>
                           <a:cs typeface="Calibri"/>
                         </a:rPr>
-                        <a:t>35,952</a:t>
+                        <a:t>36,083</a:t>
                       </a:r>
                     </a:p>
                   </a:txBody>
@@ -11638,7 +11638,7 @@
                           <a:latin typeface="Calibri"/>
                           <a:cs typeface="Calibri"/>
                         </a:rPr>
-                        <a:t>391.6</a:t>
+                        <a:t>393.1</a:t>
                       </a:r>
                     </a:p>
                   </a:txBody>
@@ -11892,7 +11892,7 @@
                           <a:latin typeface="Calibri"/>
                           <a:cs typeface="Calibri"/>
                         </a:rPr>
-                        <a:t>269,011</a:t>
+                        <a:t>270,971</a:t>
                       </a:r>
                     </a:p>
                   </a:txBody>
@@ -11955,7 +11955,7 @@
                           <a:latin typeface="Calibri"/>
                           <a:cs typeface="Calibri"/>
                         </a:rPr>
-                        <a:t>477.9</a:t>
+                        <a:t>481.4</a:t>
                       </a:r>
                     </a:p>
                   </a:txBody>
@@ -12309,7 +12309,7 @@
           <a:p>
             <a:r>
               <a:rPr/>
-              <a:t>In the last 24 hours there were 56 triages made. This is an decrease of 4 triages compared to the previous day (60 triages).</a:t>
+              <a:t>In the last 24 hours there were 56 triages made. This is an increase of 0 triages compared to the previous day (56 triages).</a:t>
             </a:r>
           </a:p>
         </p:txBody>
@@ -12336,7 +12336,7 @@
           <a:p>
             <a:r>
               <a:rPr/>
-              <a:t>In the seven days leading to 10 August there were 427 triages to NHS Pathways for COVID-19, this is an average of 61 each day.</a:t>
+              <a:t>In the seven days leading to 11 August there were 405 triages to NHS Pathways for COVID-19, this is an average of 58 each day.</a:t>
             </a:r>
           </a:p>
         </p:txBody>

</xml_diff>

<commit_message>
Sunday update Eng and SE cases added to first chart
</commit_message>
<xml_diff>
--- a/Latest_West_Sussex_C19_slide_deck.pptx
+++ b/Latest_West_Sussex_C19_slide_deck.pptx
@@ -6643,7 +6643,7 @@
           <a:p>
             <a:r>
               <a:rPr/>
-              <a:t>Pack date: 14 August 2020</a:t>
+              <a:t>Pack date: 16 August 2020</a:t>
             </a:r>
           </a:p>
         </p:txBody>
@@ -6775,7 +6775,7 @@
           <a:p>
             <a:r>
               <a:rPr/>
-              <a:t>Pack date: 14 August 2020</a:t>
+              <a:t>Pack date: 16 August 2020</a:t>
             </a:r>
           </a:p>
         </p:txBody>
@@ -6933,7 +6933,7 @@
           <a:p>
             <a:r>
               <a:rPr/>
-              <a:t>Pack date: 14 August 2020</a:t>
+              <a:t>Pack date: 16 August 2020</a:t>
             </a:r>
           </a:p>
         </p:txBody>
@@ -7014,7 +7014,7 @@
           <a:p>
             <a:r>
               <a:rPr/>
-              <a:t>Upper Tier Local Authority cumulative cases as at 14 August</a:t>
+              <a:t>Upper Tier Local Authority cumulative cases as at 16 August</a:t>
             </a:r>
           </a:p>
         </p:txBody>
@@ -7528,7 +7528,7 @@
                           <a:latin typeface="Calibri"/>
                           <a:cs typeface="Calibri"/>
                         </a:rPr>
-                        <a:t>2,843</a:t>
+                        <a:t>2,857</a:t>
                       </a:r>
                     </a:p>
                   </a:txBody>
@@ -7591,7 +7591,7 @@
                           <a:latin typeface="Calibri"/>
                           <a:cs typeface="Calibri"/>
                         </a:rPr>
-                        <a:t>329.1</a:t>
+                        <a:t>330.7</a:t>
                       </a:r>
                     </a:p>
                   </a:txBody>
@@ -7845,7 +7845,7 @@
                           <a:latin typeface="Calibri"/>
                           <a:cs typeface="Calibri"/>
                         </a:rPr>
-                        <a:t>273,314</a:t>
+                        <a:t>275,200</a:t>
                       </a:r>
                     </a:p>
                   </a:txBody>
@@ -7908,7 +7908,7 @@
                           <a:latin typeface="Calibri"/>
                           <a:cs typeface="Calibri"/>
                         </a:rPr>
-                        <a:t>485.6</a:t>
+                        <a:t>488.9</a:t>
                       </a:r>
                     </a:p>
                   </a:txBody>
@@ -8162,7 +8162,7 @@
                           <a:latin typeface="Calibri"/>
                           <a:cs typeface="Calibri"/>
                         </a:rPr>
-                        <a:t>36,230</a:t>
+                        <a:t>36,397</a:t>
                       </a:r>
                     </a:p>
                   </a:txBody>
@@ -8225,7 +8225,7 @@
                           <a:latin typeface="Calibri"/>
                           <a:cs typeface="Calibri"/>
                         </a:rPr>
-                        <a:t>394.7</a:t>
+                        <a:t>396.5</a:t>
                       </a:r>
                     </a:p>
                   </a:txBody>
@@ -8468,7 +8468,7 @@
           <a:p>
             <a:r>
               <a:rPr/>
-              <a:t>Pack date: 14 August 2020</a:t>
+              <a:t>Pack date: 16 August 2020</a:t>
             </a:r>
           </a:p>
         </p:txBody>
@@ -8549,7 +8549,7 @@
           <a:p>
             <a:r>
               <a:rPr/>
-              <a:t>Lower Tier Local Authority cumulative cases as at 14 August</a:t>
+              <a:t>Lower Tier Local Authority cumulative cases as at 16 August</a:t>
             </a:r>
           </a:p>
         </p:txBody>
@@ -9037,7 +9037,7 @@
                           <a:latin typeface="Calibri"/>
                           <a:cs typeface="Calibri"/>
                         </a:rPr>
-                        <a:t>192</a:t>
+                        <a:t>193</a:t>
                       </a:r>
                     </a:p>
                   </a:txBody>
@@ -9100,7 +9100,7 @@
                           <a:latin typeface="Calibri"/>
                           <a:cs typeface="Calibri"/>
                         </a:rPr>
-                        <a:t>298.6</a:t>
+                        <a:t>300.2</a:t>
                       </a:r>
                     </a:p>
                   </a:txBody>
@@ -9163,7 +9163,7 @@
                           <a:latin typeface="Calibri"/>
                           <a:cs typeface="Calibri"/>
                         </a:rPr>
-                        <a:t>255th</a:t>
+                        <a:t>254th</a:t>
                       </a:r>
                     </a:p>
                   </a:txBody>
@@ -9354,7 +9354,7 @@
                           <a:latin typeface="Calibri"/>
                           <a:cs typeface="Calibri"/>
                         </a:rPr>
-                        <a:t>338</a:t>
+                        <a:t>341</a:t>
                       </a:r>
                     </a:p>
                   </a:txBody>
@@ -9417,7 +9417,7 @@
                           <a:latin typeface="Calibri"/>
                           <a:cs typeface="Calibri"/>
                         </a:rPr>
-                        <a:t>210.3</a:t>
+                        <a:t>212.1</a:t>
                       </a:r>
                     </a:p>
                   </a:txBody>
@@ -9672,7 +9672,7 @@
                           <a:latin typeface="Calibri"/>
                           <a:cs typeface="Calibri"/>
                         </a:rPr>
-                        <a:t>285</a:t>
+                        <a:t>286</a:t>
                       </a:r>
                     </a:p>
                   </a:txBody>
@@ -9735,7 +9735,7 @@
                           <a:latin typeface="Calibri"/>
                           <a:cs typeface="Calibri"/>
                         </a:rPr>
-                        <a:t>235.3</a:t>
+                        <a:t>236.1</a:t>
                       </a:r>
                     </a:p>
                   </a:txBody>
@@ -9990,7 +9990,7 @@
                           <a:latin typeface="Calibri"/>
                           <a:cs typeface="Calibri"/>
                         </a:rPr>
-                        <a:t>466</a:t>
+                        <a:t>470</a:t>
                       </a:r>
                     </a:p>
                   </a:txBody>
@@ -10053,7 +10053,7 @@
                           <a:latin typeface="Calibri"/>
                           <a:cs typeface="Calibri"/>
                         </a:rPr>
-                        <a:t>414.6</a:t>
+                        <a:t>418.1</a:t>
                       </a:r>
                     </a:p>
                   </a:txBody>
@@ -10116,7 +10116,7 @@
                           <a:latin typeface="Calibri"/>
                           <a:cs typeface="Calibri"/>
                         </a:rPr>
-                        <a:t>157th</a:t>
+                        <a:t>156th</a:t>
                       </a:r>
                     </a:p>
                   </a:txBody>
@@ -10307,7 +10307,7 @@
                           <a:latin typeface="Calibri"/>
                           <a:cs typeface="Calibri"/>
                         </a:rPr>
-                        <a:t>529</a:t>
+                        <a:t>531</a:t>
                       </a:r>
                     </a:p>
                   </a:txBody>
@@ -10370,7 +10370,7 @@
                           <a:latin typeface="Calibri"/>
                           <a:cs typeface="Calibri"/>
                         </a:rPr>
-                        <a:t>367.9</a:t>
+                        <a:t>369.3</a:t>
                       </a:r>
                     </a:p>
                   </a:txBody>
@@ -10433,7 +10433,7 @@
                           <a:latin typeface="Calibri"/>
                           <a:cs typeface="Calibri"/>
                         </a:rPr>
-                        <a:t>206th</a:t>
+                        <a:t>205th</a:t>
                       </a:r>
                     </a:p>
                   </a:txBody>
@@ -10624,7 +10624,7 @@
                           <a:latin typeface="Calibri"/>
                           <a:cs typeface="Calibri"/>
                         </a:rPr>
-                        <a:t>616</a:t>
+                        <a:t>619</a:t>
                       </a:r>
                     </a:p>
                   </a:txBody>
@@ -10687,7 +10687,7 @@
                           <a:latin typeface="Calibri"/>
                           <a:cs typeface="Calibri"/>
                         </a:rPr>
-                        <a:t>407.9</a:t>
+                        <a:t>409.9</a:t>
                       </a:r>
                     </a:p>
                   </a:txBody>
@@ -10750,7 +10750,7 @@
                           <a:latin typeface="Calibri"/>
                           <a:cs typeface="Calibri"/>
                         </a:rPr>
-                        <a:t>161st</a:t>
+                        <a:t>162nd</a:t>
                       </a:r>
                     </a:p>
                   </a:txBody>
@@ -11067,7 +11067,7 @@
                           <a:latin typeface="Calibri"/>
                           <a:cs typeface="Calibri"/>
                         </a:rPr>
-                        <a:t>195th</a:t>
+                        <a:t>198th</a:t>
                       </a:r>
                     </a:p>
                   </a:txBody>
@@ -11258,7 +11258,7 @@
                           <a:latin typeface="Calibri"/>
                           <a:cs typeface="Calibri"/>
                         </a:rPr>
-                        <a:t>2,843</a:t>
+                        <a:t>2,857</a:t>
                       </a:r>
                     </a:p>
                   </a:txBody>
@@ -11321,7 +11321,7 @@
                           <a:latin typeface="Calibri"/>
                           <a:cs typeface="Calibri"/>
                         </a:rPr>
-                        <a:t>329.1</a:t>
+                        <a:t>330.7</a:t>
                       </a:r>
                     </a:p>
                   </a:txBody>
@@ -11575,7 +11575,7 @@
                           <a:latin typeface="Calibri"/>
                           <a:cs typeface="Calibri"/>
                         </a:rPr>
-                        <a:t>36,230</a:t>
+                        <a:t>36,397</a:t>
                       </a:r>
                     </a:p>
                   </a:txBody>
@@ -11638,7 +11638,7 @@
                           <a:latin typeface="Calibri"/>
                           <a:cs typeface="Calibri"/>
                         </a:rPr>
-                        <a:t>394.7</a:t>
+                        <a:t>396.5</a:t>
                       </a:r>
                     </a:p>
                   </a:txBody>
@@ -11892,7 +11892,7 @@
                           <a:latin typeface="Calibri"/>
                           <a:cs typeface="Calibri"/>
                         </a:rPr>
-                        <a:t>273,314</a:t>
+                        <a:t>275,200</a:t>
                       </a:r>
                     </a:p>
                   </a:txBody>
@@ -11955,7 +11955,7 @@
                           <a:latin typeface="Calibri"/>
                           <a:cs typeface="Calibri"/>
                         </a:rPr>
-                        <a:t>485.6</a:t>
+                        <a:t>488.9</a:t>
                       </a:r>
                     </a:p>
                   </a:txBody>
@@ -12198,7 +12198,7 @@
           <a:p>
             <a:r>
               <a:rPr/>
-              <a:t>Pack date: 14 August 2020</a:t>
+              <a:t>Pack date: 16 August 2020</a:t>
             </a:r>
           </a:p>
         </p:txBody>
@@ -12388,7 +12388,7 @@
           <a:p>
             <a:r>
               <a:rPr/>
-              <a:t>Pack date: 14 August 2020</a:t>
+              <a:t>Pack date: 16 August 2020</a:t>
             </a:r>
           </a:p>
         </p:txBody>
@@ -12546,7 +12546,7 @@
           <a:p>
             <a:r>
               <a:rPr/>
-              <a:t>Pack date: 14 August 2020</a:t>
+              <a:t>Pack date: 16 August 2020</a:t>
             </a:r>
           </a:p>
         </p:txBody>
@@ -12704,7 +12704,7 @@
           <a:p>
             <a:r>
               <a:rPr/>
-              <a:t>Pack date: 14 August 2020</a:t>
+              <a:t>Pack date: 16 August 2020</a:t>
             </a:r>
           </a:p>
         </p:txBody>
@@ -12862,7 +12862,7 @@
           <a:p>
             <a:r>
               <a:rPr/>
-              <a:t>Pack date: 14 August 2020</a:t>
+              <a:t>Pack date: 16 August 2020</a:t>
             </a:r>
           </a:p>
         </p:txBody>
@@ -13020,7 +13020,7 @@
           <a:p>
             <a:r>
               <a:rPr/>
-              <a:t>Pack date: 14 August 2020</a:t>
+              <a:t>Pack date: 16 August 2020</a:t>
             </a:r>
           </a:p>
         </p:txBody>
@@ -13178,7 +13178,7 @@
           <a:p>
             <a:r>
               <a:rPr/>
-              <a:t>Pack date: 14 August 2020</a:t>
+              <a:t>Pack date: 16 August 2020</a:t>
             </a:r>
           </a:p>
         </p:txBody>
@@ -13367,7 +13367,7 @@
           <a:p>
             <a:r>
               <a:rPr/>
-              <a:t>Pack date: 14 August 2020</a:t>
+              <a:t>Pack date: 16 August 2020</a:t>
             </a:r>
           </a:p>
         </p:txBody>
@@ -13525,7 +13525,7 @@
           <a:p>
             <a:r>
               <a:rPr/>
-              <a:t>Pack date: 14 August 2020</a:t>
+              <a:t>Pack date: 16 August 2020</a:t>
             </a:r>
           </a:p>
         </p:txBody>
@@ -13683,7 +13683,7 @@
           <a:p>
             <a:r>
               <a:rPr/>
-              <a:t>Pack date: 14 August 2020</a:t>
+              <a:t>Pack date: 16 August 2020</a:t>
             </a:r>
           </a:p>
         </p:txBody>
@@ -13841,7 +13841,7 @@
           <a:p>
             <a:r>
               <a:rPr/>
-              <a:t>Pack date: 14 August 2020</a:t>
+              <a:t>Pack date: 16 August 2020</a:t>
             </a:r>
           </a:p>
         </p:txBody>
@@ -13973,7 +13973,7 @@
           <a:p>
             <a:r>
               <a:rPr/>
-              <a:t>Pack date: 14 August 2020</a:t>
+              <a:t>Pack date: 16 August 2020</a:t>
             </a:r>
           </a:p>
         </p:txBody>
@@ -14105,7 +14105,7 @@
           <a:p>
             <a:r>
               <a:rPr/>
-              <a:t>Pack date: 14 August 2020</a:t>
+              <a:t>Pack date: 16 August 2020</a:t>
             </a:r>
           </a:p>
         </p:txBody>
@@ -14237,7 +14237,7 @@
           <a:p>
             <a:r>
               <a:rPr/>
-              <a:t>Pack date: 14 August 2020</a:t>
+              <a:t>Pack date: 16 August 2020</a:t>
             </a:r>
           </a:p>
         </p:txBody>
@@ -14369,7 +14369,7 @@
           <a:p>
             <a:r>
               <a:rPr/>
-              <a:t>Pack date: 14 August 2020</a:t>
+              <a:t>Pack date: 16 August 2020</a:t>
             </a:r>
           </a:p>
         </p:txBody>
@@ -14501,7 +14501,7 @@
           <a:p>
             <a:r>
               <a:rPr/>
-              <a:t>Pack date: 14 August 2020</a:t>
+              <a:t>Pack date: 16 August 2020</a:t>
             </a:r>
           </a:p>
         </p:txBody>
@@ -14633,7 +14633,7 @@
           <a:p>
             <a:r>
               <a:rPr/>
-              <a:t>Pack date: 14 August 2020</a:t>
+              <a:t>Pack date: 16 August 2020</a:t>
             </a:r>
           </a:p>
         </p:txBody>

</xml_diff>

<commit_message>
Update fixed nhs pathways
</commit_message>
<xml_diff>
--- a/Latest_West_Sussex_C19_slide_deck.pptx
+++ b/Latest_West_Sussex_C19_slide_deck.pptx
@@ -6643,7 +6643,7 @@
           <a:p>
             <a:r>
               <a:rPr/>
-              <a:t>Pack date: 20 August 2020</a:t>
+              <a:t>Pack date: 23 August 2020</a:t>
             </a:r>
           </a:p>
         </p:txBody>
@@ -6775,7 +6775,7 @@
           <a:p>
             <a:r>
               <a:rPr/>
-              <a:t>Pack date: 20 August 2020</a:t>
+              <a:t>Pack date: 23 August 2020</a:t>
             </a:r>
           </a:p>
         </p:txBody>
@@ -6933,7 +6933,7 @@
           <a:p>
             <a:r>
               <a:rPr/>
-              <a:t>Pack date: 20 August 2020</a:t>
+              <a:t>Pack date: 23 August 2020</a:t>
             </a:r>
           </a:p>
         </p:txBody>
@@ -7014,7 +7014,7 @@
           <a:p>
             <a:r>
               <a:rPr/>
-              <a:t>Upper Tier Local Authority cumulative cases as at 20 August</a:t>
+              <a:t>Upper Tier Local Authority cumulative cases as at 22 August</a:t>
             </a:r>
           </a:p>
         </p:txBody>
@@ -7528,7 +7528,7 @@
                           <a:latin typeface="Calibri"/>
                           <a:cs typeface="Calibri"/>
                         </a:rPr>
-                        <a:t>2,872</a:t>
+                        <a:t>2,894</a:t>
                       </a:r>
                     </a:p>
                   </a:txBody>
@@ -7591,7 +7591,7 @@
                           <a:latin typeface="Calibri"/>
                           <a:cs typeface="Calibri"/>
                         </a:rPr>
-                        <a:t>332.4</a:t>
+                        <a:t>335.0</a:t>
                       </a:r>
                     </a:p>
                   </a:txBody>
@@ -7845,7 +7845,7 @@
                           <a:latin typeface="Calibri"/>
                           <a:cs typeface="Calibri"/>
                         </a:rPr>
-                        <a:t>278,551</a:t>
+                        <a:t>280,519</a:t>
                       </a:r>
                     </a:p>
                   </a:txBody>
@@ -7908,7 +7908,7 @@
                           <a:latin typeface="Calibri"/>
                           <a:cs typeface="Calibri"/>
                         </a:rPr>
-                        <a:t>494.9</a:t>
+                        <a:t>498.4</a:t>
                       </a:r>
                     </a:p>
                   </a:txBody>
@@ -8162,7 +8162,7 @@
                           <a:latin typeface="Calibri"/>
                           <a:cs typeface="Calibri"/>
                         </a:rPr>
-                        <a:t>36,679</a:t>
+                        <a:t>36,874</a:t>
                       </a:r>
                     </a:p>
                   </a:txBody>
@@ -8225,7 +8225,7 @@
                           <a:latin typeface="Calibri"/>
                           <a:cs typeface="Calibri"/>
                         </a:rPr>
-                        <a:t>399.5</a:t>
+                        <a:t>401.7</a:t>
                       </a:r>
                     </a:p>
                   </a:txBody>
@@ -8468,7 +8468,7 @@
           <a:p>
             <a:r>
               <a:rPr/>
-              <a:t>Pack date: 20 August 2020</a:t>
+              <a:t>Pack date: 23 August 2020</a:t>
             </a:r>
           </a:p>
         </p:txBody>
@@ -8549,7 +8549,7 @@
           <a:p>
             <a:r>
               <a:rPr/>
-              <a:t>Lower Tier Local Authority cumulative cases as at 20 August</a:t>
+              <a:t>Lower Tier Local Authority cumulative cases as at 22 August</a:t>
             </a:r>
           </a:p>
         </p:txBody>
@@ -9037,7 +9037,7 @@
                           <a:latin typeface="Calibri"/>
                           <a:cs typeface="Calibri"/>
                         </a:rPr>
-                        <a:t>196</a:t>
+                        <a:t>198</a:t>
                       </a:r>
                     </a:p>
                   </a:txBody>
@@ -9100,7 +9100,7 @@
                           <a:latin typeface="Calibri"/>
                           <a:cs typeface="Calibri"/>
                         </a:rPr>
-                        <a:t>304.8</a:t>
+                        <a:t>307.9</a:t>
                       </a:r>
                     </a:p>
                   </a:txBody>
@@ -9354,7 +9354,7 @@
                           <a:latin typeface="Calibri"/>
                           <a:cs typeface="Calibri"/>
                         </a:rPr>
-                        <a:t>343</a:t>
+                        <a:t>345</a:t>
                       </a:r>
                     </a:p>
                   </a:txBody>
@@ -9417,7 +9417,7 @@
                           <a:latin typeface="Calibri"/>
                           <a:cs typeface="Calibri"/>
                         </a:rPr>
-                        <a:t>213.4</a:t>
+                        <a:t>214.6</a:t>
                       </a:r>
                     </a:p>
                   </a:txBody>
@@ -9672,7 +9672,7 @@
                           <a:latin typeface="Calibri"/>
                           <a:cs typeface="Calibri"/>
                         </a:rPr>
-                        <a:t>286</a:t>
+                        <a:t>291</a:t>
                       </a:r>
                     </a:p>
                   </a:txBody>
@@ -9735,7 +9735,7 @@
                           <a:latin typeface="Calibri"/>
                           <a:cs typeface="Calibri"/>
                         </a:rPr>
-                        <a:t>236.1</a:t>
+                        <a:t>240.2</a:t>
                       </a:r>
                     </a:p>
                   </a:txBody>
@@ -9798,7 +9798,7 @@
                           <a:latin typeface="Calibri"/>
                           <a:cs typeface="Calibri"/>
                         </a:rPr>
-                        <a:t>288th</a:t>
+                        <a:t>287th</a:t>
                       </a:r>
                     </a:p>
                   </a:txBody>
@@ -9990,7 +9990,7 @@
                           <a:latin typeface="Calibri"/>
                           <a:cs typeface="Calibri"/>
                         </a:rPr>
-                        <a:t>474</a:t>
+                        <a:t>477</a:t>
                       </a:r>
                     </a:p>
                   </a:txBody>
@@ -10053,7 +10053,7 @@
                           <a:latin typeface="Calibri"/>
                           <a:cs typeface="Calibri"/>
                         </a:rPr>
-                        <a:t>421.7</a:t>
+                        <a:t>424.3</a:t>
                       </a:r>
                     </a:p>
                   </a:txBody>
@@ -10116,7 +10116,7 @@
                           <a:latin typeface="Calibri"/>
                           <a:cs typeface="Calibri"/>
                         </a:rPr>
-                        <a:t>158th</a:t>
+                        <a:t>155th</a:t>
                       </a:r>
                     </a:p>
                   </a:txBody>
@@ -10179,7 +10179,7 @@
                           <a:latin typeface="Calibri"/>
                           <a:cs typeface="Calibri"/>
                         </a:rPr>
-                        <a:t>Decile 6</a:t>
+                        <a:t>Decile 5</a:t>
                       </a:r>
                     </a:p>
                   </a:txBody>
@@ -10307,7 +10307,7 @@
                           <a:latin typeface="Calibri"/>
                           <a:cs typeface="Calibri"/>
                         </a:rPr>
-                        <a:t>533</a:t>
+                        <a:t>536</a:t>
                       </a:r>
                     </a:p>
                   </a:txBody>
@@ -10370,7 +10370,7 @@
                           <a:latin typeface="Calibri"/>
                           <a:cs typeface="Calibri"/>
                         </a:rPr>
-                        <a:t>370.7</a:t>
+                        <a:t>372.8</a:t>
                       </a:r>
                     </a:p>
                   </a:txBody>
@@ -10624,7 +10624,7 @@
                           <a:latin typeface="Calibri"/>
                           <a:cs typeface="Calibri"/>
                         </a:rPr>
-                        <a:t>620</a:t>
+                        <a:t>626</a:t>
                       </a:r>
                     </a:p>
                   </a:txBody>
@@ -10687,7 +10687,7 @@
                           <a:latin typeface="Calibri"/>
                           <a:cs typeface="Calibri"/>
                         </a:rPr>
-                        <a:t>410.5</a:t>
+                        <a:t>414.5</a:t>
                       </a:r>
                     </a:p>
                   </a:txBody>
@@ -10941,7 +10941,7 @@
                           <a:latin typeface="Calibri"/>
                           <a:cs typeface="Calibri"/>
                         </a:rPr>
-                        <a:t>420</a:t>
+                        <a:t>421</a:t>
                       </a:r>
                     </a:p>
                   </a:txBody>
@@ -11004,7 +11004,7 @@
                           <a:latin typeface="Calibri"/>
                           <a:cs typeface="Calibri"/>
                         </a:rPr>
-                        <a:t>379.8</a:t>
+                        <a:t>380.8</a:t>
                       </a:r>
                     </a:p>
                   </a:txBody>
@@ -11258,7 +11258,7 @@
                           <a:latin typeface="Calibri"/>
                           <a:cs typeface="Calibri"/>
                         </a:rPr>
-                        <a:t>2,872</a:t>
+                        <a:t>2,894</a:t>
                       </a:r>
                     </a:p>
                   </a:txBody>
@@ -11321,7 +11321,7 @@
                           <a:latin typeface="Calibri"/>
                           <a:cs typeface="Calibri"/>
                         </a:rPr>
-                        <a:t>332.4</a:t>
+                        <a:t>335.0</a:t>
                       </a:r>
                     </a:p>
                   </a:txBody>
@@ -11575,7 +11575,7 @@
                           <a:latin typeface="Calibri"/>
                           <a:cs typeface="Calibri"/>
                         </a:rPr>
-                        <a:t>36,679</a:t>
+                        <a:t>36,874</a:t>
                       </a:r>
                     </a:p>
                   </a:txBody>
@@ -11638,7 +11638,7 @@
                           <a:latin typeface="Calibri"/>
                           <a:cs typeface="Calibri"/>
                         </a:rPr>
-                        <a:t>399.5</a:t>
+                        <a:t>401.7</a:t>
                       </a:r>
                     </a:p>
                   </a:txBody>
@@ -11892,7 +11892,7 @@
                           <a:latin typeface="Calibri"/>
                           <a:cs typeface="Calibri"/>
                         </a:rPr>
-                        <a:t>278,551</a:t>
+                        <a:t>280,519</a:t>
                       </a:r>
                     </a:p>
                   </a:txBody>
@@ -11955,7 +11955,7 @@
                           <a:latin typeface="Calibri"/>
                           <a:cs typeface="Calibri"/>
                         </a:rPr>
-                        <a:t>494.9</a:t>
+                        <a:t>498.4</a:t>
                       </a:r>
                     </a:p>
                   </a:txBody>
@@ -12198,7 +12198,7 @@
           <a:p>
             <a:r>
               <a:rPr/>
-              <a:t>Pack date: 20 August 2020</a:t>
+              <a:t>Pack date: 23 August 2020</a:t>
             </a:r>
           </a:p>
         </p:txBody>
@@ -12309,7 +12309,7 @@
           <a:p>
             <a:r>
               <a:rPr/>
-              <a:t>In the last 24 hours there were 62 triages made. This is an decrease of 16 triages compared to the previous day (78 triages).</a:t>
+              <a:t>In the last 24 hours there were 51 triages made. This is an decrease of 11 triages compared to the previous day (62 triages).</a:t>
             </a:r>
           </a:p>
         </p:txBody>
@@ -12336,7 +12336,7 @@
           <a:p>
             <a:r>
               <a:rPr/>
-              <a:t>In the seven days leading to 19 August there were 524 triages to NHS Pathways for COVID-19, this is an average of 75 each day.</a:t>
+              <a:t>In the seven days leading to 20 August there were 513 triages to NHS Pathways for COVID-19, this is an average of 73 each day.</a:t>
             </a:r>
           </a:p>
         </p:txBody>
@@ -12388,7 +12388,7 @@
           <a:p>
             <a:r>
               <a:rPr/>
-              <a:t>Pack date: 20 August 2020</a:t>
+              <a:t>Pack date: 23 August 2020</a:t>
             </a:r>
           </a:p>
         </p:txBody>
@@ -12546,7 +12546,7 @@
           <a:p>
             <a:r>
               <a:rPr/>
-              <a:t>Pack date: 20 August 2020</a:t>
+              <a:t>Pack date: 23 August 2020</a:t>
             </a:r>
           </a:p>
         </p:txBody>
@@ -12704,7 +12704,7 @@
           <a:p>
             <a:r>
               <a:rPr/>
-              <a:t>Pack date: 20 August 2020</a:t>
+              <a:t>Pack date: 23 August 2020</a:t>
             </a:r>
           </a:p>
         </p:txBody>
@@ -12862,7 +12862,7 @@
           <a:p>
             <a:r>
               <a:rPr/>
-              <a:t>Pack date: 20 August 2020</a:t>
+              <a:t>Pack date: 23 August 2020</a:t>
             </a:r>
           </a:p>
         </p:txBody>
@@ -13020,7 +13020,7 @@
           <a:p>
             <a:r>
               <a:rPr/>
-              <a:t>Pack date: 20 August 2020</a:t>
+              <a:t>Pack date: 23 August 2020</a:t>
             </a:r>
           </a:p>
         </p:txBody>
@@ -13178,7 +13178,7 @@
           <a:p>
             <a:r>
               <a:rPr/>
-              <a:t>Pack date: 20 August 2020</a:t>
+              <a:t>Pack date: 23 August 2020</a:t>
             </a:r>
           </a:p>
         </p:txBody>
@@ -13367,7 +13367,7 @@
           <a:p>
             <a:r>
               <a:rPr/>
-              <a:t>Pack date: 20 August 2020</a:t>
+              <a:t>Pack date: 23 August 2020</a:t>
             </a:r>
           </a:p>
         </p:txBody>
@@ -13525,7 +13525,7 @@
           <a:p>
             <a:r>
               <a:rPr/>
-              <a:t>Pack date: 20 August 2020</a:t>
+              <a:t>Pack date: 23 August 2020</a:t>
             </a:r>
           </a:p>
         </p:txBody>
@@ -13683,7 +13683,7 @@
           <a:p>
             <a:r>
               <a:rPr/>
-              <a:t>Pack date: 20 August 2020</a:t>
+              <a:t>Pack date: 23 August 2020</a:t>
             </a:r>
           </a:p>
         </p:txBody>
@@ -13841,7 +13841,7 @@
           <a:p>
             <a:r>
               <a:rPr/>
-              <a:t>Pack date: 20 August 2020</a:t>
+              <a:t>Pack date: 23 August 2020</a:t>
             </a:r>
           </a:p>
         </p:txBody>
@@ -13973,7 +13973,7 @@
           <a:p>
             <a:r>
               <a:rPr/>
-              <a:t>Pack date: 20 August 2020</a:t>
+              <a:t>Pack date: 23 August 2020</a:t>
             </a:r>
           </a:p>
         </p:txBody>
@@ -14105,7 +14105,7 @@
           <a:p>
             <a:r>
               <a:rPr/>
-              <a:t>Pack date: 20 August 2020</a:t>
+              <a:t>Pack date: 23 August 2020</a:t>
             </a:r>
           </a:p>
         </p:txBody>
@@ -14237,7 +14237,7 @@
           <a:p>
             <a:r>
               <a:rPr/>
-              <a:t>Pack date: 20 August 2020</a:t>
+              <a:t>Pack date: 23 August 2020</a:t>
             </a:r>
           </a:p>
         </p:txBody>
@@ -14369,7 +14369,7 @@
           <a:p>
             <a:r>
               <a:rPr/>
-              <a:t>Pack date: 20 August 2020</a:t>
+              <a:t>Pack date: 23 August 2020</a:t>
             </a:r>
           </a:p>
         </p:txBody>
@@ -14501,7 +14501,7 @@
           <a:p>
             <a:r>
               <a:rPr/>
-              <a:t>Pack date: 20 August 2020</a:t>
+              <a:t>Pack date: 23 August 2020</a:t>
             </a:r>
           </a:p>
         </p:txBody>
@@ -14633,7 +14633,7 @@
           <a:p>
             <a:r>
               <a:rPr/>
-              <a:t>Pack date: 20 August 2020</a:t>
+              <a:t>Pack date: 23 August 2020</a:t>
             </a:r>
           </a:p>
         </p:txBody>

</xml_diff>

<commit_message>
Update  - move right sidebar
</commit_message>
<xml_diff>
--- a/Latest_West_Sussex_C19_slide_deck.pptx
+++ b/Latest_West_Sussex_C19_slide_deck.pptx
@@ -7177,7 +7177,7 @@
           <a:p>
             <a:r>
               <a:rPr/>
-              <a:t>Pack date: 16 October 2020</a:t>
+              <a:t>Pack date: 17 October 2020</a:t>
             </a:r>
           </a:p>
         </p:txBody>
@@ -7309,7 +7309,7 @@
           <a:p>
             <a:r>
               <a:rPr/>
-              <a:t>Pack date: 16 October 2020</a:t>
+              <a:t>Pack date: 17 October 2020</a:t>
             </a:r>
           </a:p>
         </p:txBody>
@@ -7467,7 +7467,7 @@
           <a:p>
             <a:r>
               <a:rPr/>
-              <a:t>Pack date: 16 October 2020</a:t>
+              <a:t>Pack date: 17 October 2020</a:t>
             </a:r>
           </a:p>
         </p:txBody>
@@ -7548,7 +7548,7 @@
           <a:p>
             <a:r>
               <a:rPr/>
-              <a:t>Upper Tier Local Authority cumulative cases as at 16 October</a:t>
+              <a:t>Upper Tier Local Authority cumulative cases as at 17 October</a:t>
             </a:r>
           </a:p>
         </p:txBody>
@@ -8062,7 +8062,7 @@
                           <a:latin typeface="Calibri"/>
                           <a:cs typeface="Calibri"/>
                         </a:rPr>
-                        <a:t>4,287</a:t>
+                        <a:t>4,346</a:t>
                       </a:r>
                     </a:p>
                   </a:txBody>
@@ -8125,7 +8125,7 @@
                           <a:latin typeface="Calibri"/>
                           <a:cs typeface="Calibri"/>
                         </a:rPr>
-                        <a:t>496.2</a:t>
+                        <a:t>503.0</a:t>
                       </a:r>
                     </a:p>
                   </a:txBody>
@@ -8188,7 +8188,7 @@
                           <a:latin typeface="Calibri"/>
                           <a:cs typeface="Calibri"/>
                         </a:rPr>
-                        <a:t>138th</a:t>
+                        <a:t>140th</a:t>
                       </a:r>
                     </a:p>
                   </a:txBody>
@@ -8380,7 +8380,7 @@
                           <a:latin typeface="Calibri"/>
                           <a:cs typeface="Calibri"/>
                         </a:rPr>
-                        <a:t>584,843</a:t>
+                        <a:t>598,142</a:t>
                       </a:r>
                     </a:p>
                   </a:txBody>
@@ -8443,7 +8443,7 @@
                           <a:latin typeface="Calibri"/>
                           <a:cs typeface="Calibri"/>
                         </a:rPr>
-                        <a:t>1,039.0</a:t>
+                        <a:t>1,062.7</a:t>
                       </a:r>
                     </a:p>
                   </a:txBody>
@@ -8697,7 +8697,7 @@
                           <a:latin typeface="Calibri"/>
                           <a:cs typeface="Calibri"/>
                         </a:rPr>
-                        <a:t>55,353</a:t>
+                        <a:t>56,294</a:t>
                       </a:r>
                     </a:p>
                   </a:txBody>
@@ -8760,7 +8760,7 @@
                           <a:latin typeface="Calibri"/>
                           <a:cs typeface="Calibri"/>
                         </a:rPr>
-                        <a:t>603.0</a:t>
+                        <a:t>613.2</a:t>
                       </a:r>
                     </a:p>
                   </a:txBody>
@@ -9003,7 +9003,7 @@
           <a:p>
             <a:r>
               <a:rPr/>
-              <a:t>Pack date: 16 October 2020</a:t>
+              <a:t>Pack date: 17 October 2020</a:t>
             </a:r>
           </a:p>
         </p:txBody>
@@ -9084,7 +9084,7 @@
           <a:p>
             <a:r>
               <a:rPr/>
-              <a:t>Upper Tier Local Authority rolling 7 day cases as at 16 October</a:t>
+              <a:t>Upper Tier Local Authority rolling 7 day cases as at 17 October</a:t>
             </a:r>
           </a:p>
         </p:txBody>
@@ -9165,7 +9165,7 @@
           <a:p>
             <a:r>
               <a:rPr/>
-              <a:t>Note that the very recent days are excluded in the 7-day total as these are thought to be incomplete. As such, this data represents cases in the seven days to 12 October</a:t>
+              <a:t>Note that the very recent days are excluded in the 7-day total as these are thought to be incomplete. As such, this data represents cases in the seven days to 13 October</a:t>
             </a:r>
           </a:p>
         </p:txBody>
@@ -9598,7 +9598,7 @@
                           <a:latin typeface="Calibri"/>
                           <a:cs typeface="Calibri"/>
                         </a:rPr>
-                        <a:t>367</a:t>
+                        <a:t>377</a:t>
                       </a:r>
                     </a:p>
                   </a:txBody>
@@ -9661,7 +9661,7 @@
                           <a:latin typeface="Calibri"/>
                           <a:cs typeface="Calibri"/>
                         </a:rPr>
-                        <a:t>42.5</a:t>
+                        <a:t>43.6</a:t>
                       </a:r>
                     </a:p>
                   </a:txBody>
@@ -9724,7 +9724,7 @@
                           <a:latin typeface="Calibri"/>
                           <a:cs typeface="Calibri"/>
                         </a:rPr>
-                        <a:t>142nd</a:t>
+                        <a:t>144th</a:t>
                       </a:r>
                     </a:p>
                   </a:txBody>
@@ -9916,7 +9916,7 @@
                           <a:latin typeface="Calibri"/>
                           <a:cs typeface="Calibri"/>
                         </a:rPr>
-                        <a:t>92,386</a:t>
+                        <a:t>92,422</a:t>
                       </a:r>
                     </a:p>
                   </a:txBody>
@@ -9979,7 +9979,7 @@
                           <a:latin typeface="Calibri"/>
                           <a:cs typeface="Calibri"/>
                         </a:rPr>
-                        <a:t>164.1</a:t>
+                        <a:t>164.2</a:t>
                       </a:r>
                     </a:p>
                   </a:txBody>
@@ -10233,7 +10233,7 @@
                           <a:latin typeface="Calibri"/>
                           <a:cs typeface="Calibri"/>
                         </a:rPr>
-                        <a:t>5,801</a:t>
+                        <a:t>5,971</a:t>
                       </a:r>
                     </a:p>
                   </a:txBody>
@@ -10296,7 +10296,7 @@
                           <a:latin typeface="Calibri"/>
                           <a:cs typeface="Calibri"/>
                         </a:rPr>
-                        <a:t>63.2</a:t>
+                        <a:t>65.0</a:t>
                       </a:r>
                     </a:p>
                   </a:txBody>
@@ -10539,7 +10539,7 @@
           <a:p>
             <a:r>
               <a:rPr/>
-              <a:t>Pack date: 16 October 2020</a:t>
+              <a:t>Pack date: 17 October 2020</a:t>
             </a:r>
           </a:p>
         </p:txBody>
@@ -10620,7 +10620,7 @@
           <a:p>
             <a:r>
               <a:rPr/>
-              <a:t>Lower Tier Local Authority cumulative cases as at 16 October</a:t>
+              <a:t>Lower Tier Local Authority cumulative cases as at 17 October</a:t>
             </a:r>
           </a:p>
         </p:txBody>
@@ -11107,7 +11107,7 @@
                           <a:latin typeface="Calibri"/>
                           <a:cs typeface="Calibri"/>
                         </a:rPr>
-                        <a:t>295</a:t>
+                        <a:t>298</a:t>
                       </a:r>
                     </a:p>
                   </a:txBody>
@@ -11170,7 +11170,7 @@
                           <a:latin typeface="Calibri"/>
                           <a:cs typeface="Calibri"/>
                         </a:rPr>
-                        <a:t>458.8</a:t>
+                        <a:t>463.4</a:t>
                       </a:r>
                     </a:p>
                   </a:txBody>
@@ -11233,7 +11233,7 @@
                           <a:latin typeface="Calibri"/>
                           <a:cs typeface="Calibri"/>
                         </a:rPr>
-                        <a:t>277th</a:t>
+                        <a:t>278th</a:t>
                       </a:r>
                     </a:p>
                   </a:txBody>
@@ -11424,7 +11424,7 @@
                           <a:latin typeface="Calibri"/>
                           <a:cs typeface="Calibri"/>
                         </a:rPr>
-                        <a:t>539</a:t>
+                        <a:t>555</a:t>
                       </a:r>
                     </a:p>
                   </a:txBody>
@@ -11487,7 +11487,7 @@
                           <a:latin typeface="Calibri"/>
                           <a:cs typeface="Calibri"/>
                         </a:rPr>
-                        <a:t>335.3</a:t>
+                        <a:t>345.2</a:t>
                       </a:r>
                     </a:p>
                   </a:txBody>
@@ -11742,7 +11742,7 @@
                           <a:latin typeface="Calibri"/>
                           <a:cs typeface="Calibri"/>
                         </a:rPr>
-                        <a:t>475</a:t>
+                        <a:t>485</a:t>
                       </a:r>
                     </a:p>
                   </a:txBody>
@@ -11805,7 +11805,7 @@
                           <a:latin typeface="Calibri"/>
                           <a:cs typeface="Calibri"/>
                         </a:rPr>
-                        <a:t>392.1</a:t>
+                        <a:t>400.4</a:t>
                       </a:r>
                     </a:p>
                   </a:txBody>
@@ -12060,7 +12060,7 @@
                           <a:latin typeface="Calibri"/>
                           <a:cs typeface="Calibri"/>
                         </a:rPr>
-                        <a:t>652</a:t>
+                        <a:t>656</a:t>
                       </a:r>
                     </a:p>
                   </a:txBody>
@@ -12123,7 +12123,7 @@
                           <a:latin typeface="Calibri"/>
                           <a:cs typeface="Calibri"/>
                         </a:rPr>
-                        <a:t>580.0</a:t>
+                        <a:t>583.6</a:t>
                       </a:r>
                     </a:p>
                   </a:txBody>
@@ -12186,7 +12186,7 @@
                           <a:latin typeface="Calibri"/>
                           <a:cs typeface="Calibri"/>
                         </a:rPr>
-                        <a:t>237th</a:t>
+                        <a:t>238th</a:t>
                       </a:r>
                     </a:p>
                   </a:txBody>
@@ -12377,7 +12377,7 @@
                           <a:latin typeface="Calibri"/>
                           <a:cs typeface="Calibri"/>
                         </a:rPr>
-                        <a:t>819</a:t>
+                        <a:t>829</a:t>
                       </a:r>
                     </a:p>
                   </a:txBody>
@@ -12440,7 +12440,7 @@
                           <a:latin typeface="Calibri"/>
                           <a:cs typeface="Calibri"/>
                         </a:rPr>
-                        <a:t>569.6</a:t>
+                        <a:t>576.5</a:t>
                       </a:r>
                     </a:p>
                   </a:txBody>
@@ -12503,7 +12503,7 @@
                           <a:latin typeface="Calibri"/>
                           <a:cs typeface="Calibri"/>
                         </a:rPr>
-                        <a:t>242nd</a:t>
+                        <a:t>245th</a:t>
                       </a:r>
                     </a:p>
                   </a:txBody>
@@ -12694,7 +12694,7 @@
                           <a:latin typeface="Calibri"/>
                           <a:cs typeface="Calibri"/>
                         </a:rPr>
-                        <a:t>887</a:t>
+                        <a:t>895</a:t>
                       </a:r>
                     </a:p>
                   </a:txBody>
@@ -12757,7 +12757,7 @@
                           <a:latin typeface="Calibri"/>
                           <a:cs typeface="Calibri"/>
                         </a:rPr>
-                        <a:t>587.3</a:t>
+                        <a:t>592.6</a:t>
                       </a:r>
                     </a:p>
                   </a:txBody>
@@ -12820,7 +12820,7 @@
                           <a:latin typeface="Calibri"/>
                           <a:cs typeface="Calibri"/>
                         </a:rPr>
-                        <a:t>232nd</a:t>
+                        <a:t>235th</a:t>
                       </a:r>
                     </a:p>
                   </a:txBody>
@@ -13011,7 +13011,7 @@
                           <a:latin typeface="Calibri"/>
                           <a:cs typeface="Calibri"/>
                         </a:rPr>
-                        <a:t>620</a:t>
+                        <a:t>628</a:t>
                       </a:r>
                     </a:p>
                   </a:txBody>
@@ -13074,7 +13074,7 @@
                           <a:latin typeface="Calibri"/>
                           <a:cs typeface="Calibri"/>
                         </a:rPr>
-                        <a:t>560.7</a:t>
+                        <a:t>568.0</a:t>
                       </a:r>
                     </a:p>
                   </a:txBody>
@@ -13137,7 +13137,7 @@
                           <a:latin typeface="Calibri"/>
                           <a:cs typeface="Calibri"/>
                         </a:rPr>
-                        <a:t>248th</a:t>
+                        <a:t>249th</a:t>
                       </a:r>
                     </a:p>
                   </a:txBody>
@@ -13328,7 +13328,7 @@
                           <a:latin typeface="Calibri"/>
                           <a:cs typeface="Calibri"/>
                         </a:rPr>
-                        <a:t>4,287</a:t>
+                        <a:t>4,346</a:t>
                       </a:r>
                     </a:p>
                   </a:txBody>
@@ -13391,7 +13391,7 @@
                           <a:latin typeface="Calibri"/>
                           <a:cs typeface="Calibri"/>
                         </a:rPr>
-                        <a:t>496.2</a:t>
+                        <a:t>503.0</a:t>
                       </a:r>
                     </a:p>
                   </a:txBody>
@@ -13645,7 +13645,7 @@
                           <a:latin typeface="Calibri"/>
                           <a:cs typeface="Calibri"/>
                         </a:rPr>
-                        <a:t>55,353</a:t>
+                        <a:t>56,294</a:t>
                       </a:r>
                     </a:p>
                   </a:txBody>
@@ -13708,7 +13708,7 @@
                           <a:latin typeface="Calibri"/>
                           <a:cs typeface="Calibri"/>
                         </a:rPr>
-                        <a:t>603.0</a:t>
+                        <a:t>613.2</a:t>
                       </a:r>
                     </a:p>
                   </a:txBody>
@@ -13962,7 +13962,7 @@
                           <a:latin typeface="Calibri"/>
                           <a:cs typeface="Calibri"/>
                         </a:rPr>
-                        <a:t>584,843</a:t>
+                        <a:t>598,142</a:t>
                       </a:r>
                     </a:p>
                   </a:txBody>
@@ -14025,7 +14025,7 @@
                           <a:latin typeface="Calibri"/>
                           <a:cs typeface="Calibri"/>
                         </a:rPr>
-                        <a:t>1,039.0</a:t>
+                        <a:t>1,062.7</a:t>
                       </a:r>
                     </a:p>
                   </a:txBody>
@@ -14268,7 +14268,7 @@
           <a:p>
             <a:r>
               <a:rPr/>
-              <a:t>Pack date: 16 October 2020</a:t>
+              <a:t>Pack date: 17 October 2020</a:t>
             </a:r>
           </a:p>
         </p:txBody>
@@ -14349,7 +14349,7 @@
           <a:p>
             <a:r>
               <a:rPr/>
-              <a:t>Lower Tier Local Authority rolling cases as at 16 October</a:t>
+              <a:t>Lower Tier Local Authority rolling cases as at 17 October</a:t>
             </a:r>
           </a:p>
         </p:txBody>
@@ -14430,7 +14430,7 @@
           <a:p>
             <a:r>
               <a:rPr/>
-              <a:t>Note that the very recent days are excluded in the 7-day total as these are thought to be incomplete. As such, this data represents cases in the seven days to 12 October</a:t>
+              <a:t>Note that the very recent days are excluded in the 7-day total as these are thought to be incomplete. As such, this data represents cases in the seven days to 13 October</a:t>
             </a:r>
           </a:p>
         </p:txBody>
@@ -14863,7 +14863,7 @@
                           <a:latin typeface="Calibri"/>
                           <a:cs typeface="Calibri"/>
                         </a:rPr>
-                        <a:t>18</a:t>
+                        <a:t>20</a:t>
                       </a:r>
                     </a:p>
                   </a:txBody>
@@ -14926,7 +14926,7 @@
                           <a:latin typeface="Calibri"/>
                           <a:cs typeface="Calibri"/>
                         </a:rPr>
-                        <a:t>28.0</a:t>
+                        <a:t>31.1</a:t>
                       </a:r>
                     </a:p>
                   </a:txBody>
@@ -15181,7 +15181,7 @@
                           <a:latin typeface="Calibri"/>
                           <a:cs typeface="Calibri"/>
                         </a:rPr>
-                        <a:t>37</a:t>
+                        <a:t>42</a:t>
                       </a:r>
                     </a:p>
                   </a:txBody>
@@ -15244,7 +15244,7 @@
                           <a:latin typeface="Calibri"/>
                           <a:cs typeface="Calibri"/>
                         </a:rPr>
-                        <a:t>23.0</a:t>
+                        <a:t>26.1</a:t>
                       </a:r>
                     </a:p>
                   </a:txBody>
@@ -15307,7 +15307,7 @@
                           <a:latin typeface="Calibri"/>
                           <a:cs typeface="Calibri"/>
                         </a:rPr>
-                        <a:t>312th</a:t>
+                        <a:t>311th</a:t>
                       </a:r>
                     </a:p>
                   </a:txBody>
@@ -15499,7 +15499,641 @@
                           <a:latin typeface="Calibri"/>
                           <a:cs typeface="Calibri"/>
                         </a:rPr>
-                        <a:t>69</a:t>
+                        <a:t>65</a:t>
+                      </a:r>
+                    </a:p>
+                  </a:txBody>
+                  <a:tcPr anchor="t" marB="0" marT="0" marR="0" marL="0">
+                    <a:lnL w="0" cmpd="sng" algn="ctr" cap="flat">
+                      <a:solidFill>
+                        <a:srgbClr val="FFFFFF">
+                          <a:alpha val="0"/>
+                        </a:srgbClr>
+                      </a:solidFill>
+                      <a:prstDash val="solid"/>
+                    </a:lnL>
+                    <a:lnR w="0" cmpd="sng" algn="ctr" cap="flat">
+                      <a:solidFill>
+                        <a:srgbClr val="FFFFFF">
+                          <a:alpha val="0"/>
+                        </a:srgbClr>
+                      </a:solidFill>
+                      <a:prstDash val="solid"/>
+                    </a:lnR>
+                    <a:lnT w="0" cmpd="sng" algn="ctr" cap="flat">
+                      <a:solidFill>
+                        <a:srgbClr val="FFFFFF">
+                          <a:alpha val="0"/>
+                        </a:srgbClr>
+                      </a:solidFill>
+                      <a:prstDash val="solid"/>
+                    </a:lnT>
+                    <a:lnB w="0" cmpd="sng" algn="ctr" cap="flat">
+                      <a:solidFill>
+                        <a:srgbClr val="FFFFFF">
+                          <a:alpha val="0"/>
+                        </a:srgbClr>
+                      </a:solidFill>
+                      <a:prstDash val="solid"/>
+                    </a:lnB>
+                  </a:tcPr>
+                </a:tc>
+                <a:tc>
+                  <a:txBody>
+                    <a:bodyPr/>
+                    <a:lstStyle/>
+                    <a:p>
+                      <a:pPr algn="r" marL="63500" marR="63500">
+                        <a:spcBef>
+                          <a:spcPts val="200"/>
+                        </a:spcBef>
+                        <a:spcAft>
+                          <a:spcPts val="200"/>
+                        </a:spcAft>
+                        <a:buNone/>
+                      </a:pPr>
+                      <a:r>
+                        <a:rPr sz="1100">
+                          <a:solidFill>
+                            <a:srgbClr val="111111">
+                              <a:alpha val="100000"/>
+                            </a:srgbClr>
+                          </a:solidFill>
+                          <a:latin typeface="Calibri"/>
+                          <a:cs typeface="Calibri"/>
+                        </a:rPr>
+                        <a:t>53.7</a:t>
+                      </a:r>
+                    </a:p>
+                  </a:txBody>
+                  <a:tcPr anchor="t" marB="0" marT="0" marR="0" marL="0">
+                    <a:lnL w="0" cmpd="sng" algn="ctr" cap="flat">
+                      <a:solidFill>
+                        <a:srgbClr val="FFFFFF">
+                          <a:alpha val="0"/>
+                        </a:srgbClr>
+                      </a:solidFill>
+                      <a:prstDash val="solid"/>
+                    </a:lnL>
+                    <a:lnR w="0" cmpd="sng" algn="ctr" cap="flat">
+                      <a:solidFill>
+                        <a:srgbClr val="FFFFFF">
+                          <a:alpha val="0"/>
+                        </a:srgbClr>
+                      </a:solidFill>
+                      <a:prstDash val="solid"/>
+                    </a:lnR>
+                    <a:lnT w="0" cmpd="sng" algn="ctr" cap="flat">
+                      <a:solidFill>
+                        <a:srgbClr val="FFFFFF">
+                          <a:alpha val="0"/>
+                        </a:srgbClr>
+                      </a:solidFill>
+                      <a:prstDash val="solid"/>
+                    </a:lnT>
+                    <a:lnB w="0" cmpd="sng" algn="ctr" cap="flat">
+                      <a:solidFill>
+                        <a:srgbClr val="FFFFFF">
+                          <a:alpha val="0"/>
+                        </a:srgbClr>
+                      </a:solidFill>
+                      <a:prstDash val="solid"/>
+                    </a:lnB>
+                  </a:tcPr>
+                </a:tc>
+                <a:tc>
+                  <a:txBody>
+                    <a:bodyPr/>
+                    <a:lstStyle/>
+                    <a:p>
+                      <a:pPr algn="r" marL="63500" marR="63500">
+                        <a:spcBef>
+                          <a:spcPts val="200"/>
+                        </a:spcBef>
+                        <a:spcAft>
+                          <a:spcPts val="200"/>
+                        </a:spcAft>
+                        <a:buNone/>
+                      </a:pPr>
+                      <a:r>
+                        <a:rPr sz="1100">
+                          <a:solidFill>
+                            <a:srgbClr val="111111">
+                              <a:alpha val="100000"/>
+                            </a:srgbClr>
+                          </a:solidFill>
+                          <a:latin typeface="Calibri"/>
+                          <a:cs typeface="Calibri"/>
+                        </a:rPr>
+                        <a:t>259th</a:t>
+                      </a:r>
+                    </a:p>
+                  </a:txBody>
+                  <a:tcPr anchor="t" marB="0" marT="0" marR="0" marL="0">
+                    <a:lnL w="0" cmpd="sng" algn="ctr" cap="flat">
+                      <a:solidFill>
+                        <a:srgbClr val="FFFFFF">
+                          <a:alpha val="0"/>
+                        </a:srgbClr>
+                      </a:solidFill>
+                      <a:prstDash val="solid"/>
+                    </a:lnL>
+                    <a:lnR w="0" cmpd="sng" algn="ctr" cap="flat">
+                      <a:solidFill>
+                        <a:srgbClr val="FFFFFF">
+                          <a:alpha val="0"/>
+                        </a:srgbClr>
+                      </a:solidFill>
+                      <a:prstDash val="solid"/>
+                    </a:lnR>
+                    <a:lnT w="0" cmpd="sng" algn="ctr" cap="flat">
+                      <a:solidFill>
+                        <a:srgbClr val="FFFFFF">
+                          <a:alpha val="0"/>
+                        </a:srgbClr>
+                      </a:solidFill>
+                      <a:prstDash val="solid"/>
+                    </a:lnT>
+                    <a:lnB w="0" cmpd="sng" algn="ctr" cap="flat">
+                      <a:solidFill>
+                        <a:srgbClr val="FFFFFF">
+                          <a:alpha val="0"/>
+                        </a:srgbClr>
+                      </a:solidFill>
+                      <a:prstDash val="solid"/>
+                    </a:lnB>
+                  </a:tcPr>
+                </a:tc>
+                <a:tc>
+                  <a:txBody>
+                    <a:bodyPr/>
+                    <a:lstStyle/>
+                    <a:p>
+                      <a:pPr algn="r" marL="63500" marR="63500">
+                        <a:spcBef>
+                          <a:spcPts val="200"/>
+                        </a:spcBef>
+                        <a:spcAft>
+                          <a:spcPts val="200"/>
+                        </a:spcAft>
+                        <a:buNone/>
+                      </a:pPr>
+                      <a:r>
+                        <a:rPr sz="1100">
+                          <a:solidFill>
+                            <a:srgbClr val="111111">
+                              <a:alpha val="100000"/>
+                            </a:srgbClr>
+                          </a:solidFill>
+                          <a:latin typeface="Calibri"/>
+                          <a:cs typeface="Calibri"/>
+                        </a:rPr>
+                        <a:t>Decile 9</a:t>
+                      </a:r>
+                    </a:p>
+                  </a:txBody>
+                  <a:tcPr anchor="t" marB="0" marT="0" marR="0" marL="0">
+                    <a:lnL w="0" cmpd="sng" algn="ctr" cap="flat">
+                      <a:solidFill>
+                        <a:srgbClr val="FFFFFF">
+                          <a:alpha val="0"/>
+                        </a:srgbClr>
+                      </a:solidFill>
+                      <a:prstDash val="solid"/>
+                    </a:lnL>
+                    <a:lnR w="0" cmpd="sng" algn="ctr" cap="flat">
+                      <a:solidFill>
+                        <a:srgbClr val="FFFFFF">
+                          <a:alpha val="0"/>
+                        </a:srgbClr>
+                      </a:solidFill>
+                      <a:prstDash val="solid"/>
+                    </a:lnR>
+                    <a:lnT w="0" cmpd="sng" algn="ctr" cap="flat">
+                      <a:solidFill>
+                        <a:srgbClr val="FFFFFF">
+                          <a:alpha val="0"/>
+                        </a:srgbClr>
+                      </a:solidFill>
+                      <a:prstDash val="solid"/>
+                    </a:lnT>
+                    <a:lnB w="0" cmpd="sng" algn="ctr" cap="flat">
+                      <a:solidFill>
+                        <a:srgbClr val="FFFFFF">
+                          <a:alpha val="0"/>
+                        </a:srgbClr>
+                      </a:solidFill>
+                      <a:prstDash val="solid"/>
+                    </a:lnB>
+                  </a:tcPr>
+                </a:tc>
+              </a:tr>
+              <a:tr h="182880">
+                <a:tc>
+                  <a:txBody>
+                    <a:bodyPr/>
+                    <a:lstStyle/>
+                    <a:p>
+                      <a:pPr algn="l" marL="63500" marR="63500">
+                        <a:spcBef>
+                          <a:spcPts val="200"/>
+                        </a:spcBef>
+                        <a:spcAft>
+                          <a:spcPts val="200"/>
+                        </a:spcAft>
+                        <a:buNone/>
+                      </a:pPr>
+                      <a:r>
+                        <a:rPr sz="1100">
+                          <a:solidFill>
+                            <a:srgbClr val="111111">
+                              <a:alpha val="100000"/>
+                            </a:srgbClr>
+                          </a:solidFill>
+                          <a:latin typeface="Calibri"/>
+                          <a:cs typeface="Calibri"/>
+                        </a:rPr>
+                        <a:t>Crawley</a:t>
+                      </a:r>
+                    </a:p>
+                  </a:txBody>
+                  <a:tcPr anchor="t" marB="0" marT="0" marR="0" marL="0">
+                    <a:lnL w="0" cmpd="sng" algn="ctr" cap="flat">
+                      <a:solidFill>
+                        <a:srgbClr val="FFFFFF">
+                          <a:alpha val="0"/>
+                        </a:srgbClr>
+                      </a:solidFill>
+                      <a:prstDash val="solid"/>
+                    </a:lnL>
+                    <a:lnR w="0" cmpd="sng" algn="ctr" cap="flat">
+                      <a:solidFill>
+                        <a:srgbClr val="FFFFFF">
+                          <a:alpha val="0"/>
+                        </a:srgbClr>
+                      </a:solidFill>
+                      <a:prstDash val="solid"/>
+                    </a:lnR>
+                    <a:lnT w="0" cmpd="sng" algn="ctr" cap="flat">
+                      <a:solidFill>
+                        <a:srgbClr val="FFFFFF">
+                          <a:alpha val="0"/>
+                        </a:srgbClr>
+                      </a:solidFill>
+                      <a:prstDash val="solid"/>
+                    </a:lnT>
+                    <a:lnB w="0" cmpd="sng" algn="ctr" cap="flat">
+                      <a:solidFill>
+                        <a:srgbClr val="FFFFFF">
+                          <a:alpha val="0"/>
+                        </a:srgbClr>
+                      </a:solidFill>
+                      <a:prstDash val="solid"/>
+                    </a:lnB>
+                  </a:tcPr>
+                </a:tc>
+                <a:tc>
+                  <a:txBody>
+                    <a:bodyPr/>
+                    <a:lstStyle/>
+                    <a:p>
+                      <a:pPr algn="r" marL="63500" marR="63500">
+                        <a:spcBef>
+                          <a:spcPts val="200"/>
+                        </a:spcBef>
+                        <a:spcAft>
+                          <a:spcPts val="200"/>
+                        </a:spcAft>
+                        <a:buNone/>
+                      </a:pPr>
+                      <a:r>
+                        <a:rPr sz="1100">
+                          <a:solidFill>
+                            <a:srgbClr val="111111">
+                              <a:alpha val="100000"/>
+                            </a:srgbClr>
+                          </a:solidFill>
+                          <a:latin typeface="Calibri"/>
+                          <a:cs typeface="Calibri"/>
+                        </a:rPr>
+                        <a:t>55</a:t>
+                      </a:r>
+                    </a:p>
+                  </a:txBody>
+                  <a:tcPr anchor="t" marB="0" marT="0" marR="0" marL="0">
+                    <a:lnL w="0" cmpd="sng" algn="ctr" cap="flat">
+                      <a:solidFill>
+                        <a:srgbClr val="FFFFFF">
+                          <a:alpha val="0"/>
+                        </a:srgbClr>
+                      </a:solidFill>
+                      <a:prstDash val="solid"/>
+                    </a:lnL>
+                    <a:lnR w="0" cmpd="sng" algn="ctr" cap="flat">
+                      <a:solidFill>
+                        <a:srgbClr val="FFFFFF">
+                          <a:alpha val="0"/>
+                        </a:srgbClr>
+                      </a:solidFill>
+                      <a:prstDash val="solid"/>
+                    </a:lnR>
+                    <a:lnT w="0" cmpd="sng" algn="ctr" cap="flat">
+                      <a:solidFill>
+                        <a:srgbClr val="FFFFFF">
+                          <a:alpha val="0"/>
+                        </a:srgbClr>
+                      </a:solidFill>
+                      <a:prstDash val="solid"/>
+                    </a:lnT>
+                    <a:lnB w="0" cmpd="sng" algn="ctr" cap="flat">
+                      <a:solidFill>
+                        <a:srgbClr val="FFFFFF">
+                          <a:alpha val="0"/>
+                        </a:srgbClr>
+                      </a:solidFill>
+                      <a:prstDash val="solid"/>
+                    </a:lnB>
+                  </a:tcPr>
+                </a:tc>
+                <a:tc>
+                  <a:txBody>
+                    <a:bodyPr/>
+                    <a:lstStyle/>
+                    <a:p>
+                      <a:pPr algn="r" marL="63500" marR="63500">
+                        <a:spcBef>
+                          <a:spcPts val="200"/>
+                        </a:spcBef>
+                        <a:spcAft>
+                          <a:spcPts val="200"/>
+                        </a:spcAft>
+                        <a:buNone/>
+                      </a:pPr>
+                      <a:r>
+                        <a:rPr sz="1100">
+                          <a:solidFill>
+                            <a:srgbClr val="111111">
+                              <a:alpha val="100000"/>
+                            </a:srgbClr>
+                          </a:solidFill>
+                          <a:latin typeface="Calibri"/>
+                          <a:cs typeface="Calibri"/>
+                        </a:rPr>
+                        <a:t>48.9</a:t>
+                      </a:r>
+                    </a:p>
+                  </a:txBody>
+                  <a:tcPr anchor="t" marB="0" marT="0" marR="0" marL="0">
+                    <a:lnL w="0" cmpd="sng" algn="ctr" cap="flat">
+                      <a:solidFill>
+                        <a:srgbClr val="FFFFFF">
+                          <a:alpha val="0"/>
+                        </a:srgbClr>
+                      </a:solidFill>
+                      <a:prstDash val="solid"/>
+                    </a:lnL>
+                    <a:lnR w="0" cmpd="sng" algn="ctr" cap="flat">
+                      <a:solidFill>
+                        <a:srgbClr val="FFFFFF">
+                          <a:alpha val="0"/>
+                        </a:srgbClr>
+                      </a:solidFill>
+                      <a:prstDash val="solid"/>
+                    </a:lnR>
+                    <a:lnT w="0" cmpd="sng" algn="ctr" cap="flat">
+                      <a:solidFill>
+                        <a:srgbClr val="FFFFFF">
+                          <a:alpha val="0"/>
+                        </a:srgbClr>
+                      </a:solidFill>
+                      <a:prstDash val="solid"/>
+                    </a:lnT>
+                    <a:lnB w="0" cmpd="sng" algn="ctr" cap="flat">
+                      <a:solidFill>
+                        <a:srgbClr val="FFFFFF">
+                          <a:alpha val="0"/>
+                        </a:srgbClr>
+                      </a:solidFill>
+                      <a:prstDash val="solid"/>
+                    </a:lnB>
+                  </a:tcPr>
+                </a:tc>
+                <a:tc>
+                  <a:txBody>
+                    <a:bodyPr/>
+                    <a:lstStyle/>
+                    <a:p>
+                      <a:pPr algn="r" marL="63500" marR="63500">
+                        <a:spcBef>
+                          <a:spcPts val="200"/>
+                        </a:spcBef>
+                        <a:spcAft>
+                          <a:spcPts val="200"/>
+                        </a:spcAft>
+                        <a:buNone/>
+                      </a:pPr>
+                      <a:r>
+                        <a:rPr sz="1100">
+                          <a:solidFill>
+                            <a:srgbClr val="111111">
+                              <a:alpha val="100000"/>
+                            </a:srgbClr>
+                          </a:solidFill>
+                          <a:latin typeface="Calibri"/>
+                          <a:cs typeface="Calibri"/>
+                        </a:rPr>
+                        <a:t>272nd</a:t>
+                      </a:r>
+                    </a:p>
+                  </a:txBody>
+                  <a:tcPr anchor="t" marB="0" marT="0" marR="0" marL="0">
+                    <a:lnL w="0" cmpd="sng" algn="ctr" cap="flat">
+                      <a:solidFill>
+                        <a:srgbClr val="FFFFFF">
+                          <a:alpha val="0"/>
+                        </a:srgbClr>
+                      </a:solidFill>
+                      <a:prstDash val="solid"/>
+                    </a:lnL>
+                    <a:lnR w="0" cmpd="sng" algn="ctr" cap="flat">
+                      <a:solidFill>
+                        <a:srgbClr val="FFFFFF">
+                          <a:alpha val="0"/>
+                        </a:srgbClr>
+                      </a:solidFill>
+                      <a:prstDash val="solid"/>
+                    </a:lnR>
+                    <a:lnT w="0" cmpd="sng" algn="ctr" cap="flat">
+                      <a:solidFill>
+                        <a:srgbClr val="FFFFFF">
+                          <a:alpha val="0"/>
+                        </a:srgbClr>
+                      </a:solidFill>
+                      <a:prstDash val="solid"/>
+                    </a:lnT>
+                    <a:lnB w="0" cmpd="sng" algn="ctr" cap="flat">
+                      <a:solidFill>
+                        <a:srgbClr val="FFFFFF">
+                          <a:alpha val="0"/>
+                        </a:srgbClr>
+                      </a:solidFill>
+                      <a:prstDash val="solid"/>
+                    </a:lnB>
+                  </a:tcPr>
+                </a:tc>
+                <a:tc>
+                  <a:txBody>
+                    <a:bodyPr/>
+                    <a:lstStyle/>
+                    <a:p>
+                      <a:pPr algn="r" marL="63500" marR="63500">
+                        <a:spcBef>
+                          <a:spcPts val="200"/>
+                        </a:spcBef>
+                        <a:spcAft>
+                          <a:spcPts val="200"/>
+                        </a:spcAft>
+                        <a:buNone/>
+                      </a:pPr>
+                      <a:r>
+                        <a:rPr sz="1100">
+                          <a:solidFill>
+                            <a:srgbClr val="111111">
+                              <a:alpha val="100000"/>
+                            </a:srgbClr>
+                          </a:solidFill>
+                          <a:latin typeface="Calibri"/>
+                          <a:cs typeface="Calibri"/>
+                        </a:rPr>
+                        <a:t>Decile 9</a:t>
+                      </a:r>
+                    </a:p>
+                  </a:txBody>
+                  <a:tcPr anchor="t" marB="0" marT="0" marR="0" marL="0">
+                    <a:lnL w="0" cmpd="sng" algn="ctr" cap="flat">
+                      <a:solidFill>
+                        <a:srgbClr val="FFFFFF">
+                          <a:alpha val="0"/>
+                        </a:srgbClr>
+                      </a:solidFill>
+                      <a:prstDash val="solid"/>
+                    </a:lnL>
+                    <a:lnR w="0" cmpd="sng" algn="ctr" cap="flat">
+                      <a:solidFill>
+                        <a:srgbClr val="FFFFFF">
+                          <a:alpha val="0"/>
+                        </a:srgbClr>
+                      </a:solidFill>
+                      <a:prstDash val="solid"/>
+                    </a:lnR>
+                    <a:lnT w="0" cmpd="sng" algn="ctr" cap="flat">
+                      <a:solidFill>
+                        <a:srgbClr val="FFFFFF">
+                          <a:alpha val="0"/>
+                        </a:srgbClr>
+                      </a:solidFill>
+                      <a:prstDash val="solid"/>
+                    </a:lnT>
+                    <a:lnB w="0" cmpd="sng" algn="ctr" cap="flat">
+                      <a:solidFill>
+                        <a:srgbClr val="FFFFFF">
+                          <a:alpha val="0"/>
+                        </a:srgbClr>
+                      </a:solidFill>
+                      <a:prstDash val="solid"/>
+                    </a:lnB>
+                  </a:tcPr>
+                </a:tc>
+              </a:tr>
+              <a:tr h="182880">
+                <a:tc>
+                  <a:txBody>
+                    <a:bodyPr/>
+                    <a:lstStyle/>
+                    <a:p>
+                      <a:pPr algn="l" marL="63500" marR="63500">
+                        <a:spcBef>
+                          <a:spcPts val="200"/>
+                        </a:spcBef>
+                        <a:spcAft>
+                          <a:spcPts val="200"/>
+                        </a:spcAft>
+                        <a:buNone/>
+                      </a:pPr>
+                      <a:r>
+                        <a:rPr sz="1100">
+                          <a:solidFill>
+                            <a:srgbClr val="111111">
+                              <a:alpha val="100000"/>
+                            </a:srgbClr>
+                          </a:solidFill>
+                          <a:latin typeface="Calibri"/>
+                          <a:cs typeface="Calibri"/>
+                        </a:rPr>
+                        <a:t>Horsham</a:t>
+                      </a:r>
+                    </a:p>
+                  </a:txBody>
+                  <a:tcPr anchor="t" marB="0" marT="0" marR="0" marL="0">
+                    <a:lnL w="0" cmpd="sng" algn="ctr" cap="flat">
+                      <a:solidFill>
+                        <a:srgbClr val="FFFFFF">
+                          <a:alpha val="0"/>
+                        </a:srgbClr>
+                      </a:solidFill>
+                      <a:prstDash val="solid"/>
+                    </a:lnL>
+                    <a:lnR w="0" cmpd="sng" algn="ctr" cap="flat">
+                      <a:solidFill>
+                        <a:srgbClr val="FFFFFF">
+                          <a:alpha val="0"/>
+                        </a:srgbClr>
+                      </a:solidFill>
+                      <a:prstDash val="solid"/>
+                    </a:lnR>
+                    <a:lnT w="0" cmpd="sng" algn="ctr" cap="flat">
+                      <a:solidFill>
+                        <a:srgbClr val="FFFFFF">
+                          <a:alpha val="0"/>
+                        </a:srgbClr>
+                      </a:solidFill>
+                      <a:prstDash val="solid"/>
+                    </a:lnT>
+                    <a:lnB w="0" cmpd="sng" algn="ctr" cap="flat">
+                      <a:solidFill>
+                        <a:srgbClr val="FFFFFF">
+                          <a:alpha val="0"/>
+                        </a:srgbClr>
+                      </a:solidFill>
+                      <a:prstDash val="solid"/>
+                    </a:lnB>
+                  </a:tcPr>
+                </a:tc>
+                <a:tc>
+                  <a:txBody>
+                    <a:bodyPr/>
+                    <a:lstStyle/>
+                    <a:p>
+                      <a:pPr algn="r" marL="63500" marR="63500">
+                        <a:spcBef>
+                          <a:spcPts val="200"/>
+                        </a:spcBef>
+                        <a:spcAft>
+                          <a:spcPts val="200"/>
+                        </a:spcAft>
+                        <a:buNone/>
+                      </a:pPr>
+                      <a:r>
+                        <a:rPr sz="1100">
+                          <a:solidFill>
+                            <a:srgbClr val="111111">
+                              <a:alpha val="100000"/>
+                            </a:srgbClr>
+                          </a:solidFill>
+                          <a:latin typeface="Calibri"/>
+                          <a:cs typeface="Calibri"/>
+                        </a:rPr>
+                        <a:t>82</a:t>
                       </a:r>
                     </a:p>
                   </a:txBody>
@@ -15625,324 +16259,7 @@
                           <a:latin typeface="Calibri"/>
                           <a:cs typeface="Calibri"/>
                         </a:rPr>
-                        <a:t>250th</a:t>
-                      </a:r>
-                    </a:p>
-                  </a:txBody>
-                  <a:tcPr anchor="t" marB="0" marT="0" marR="0" marL="0">
-                    <a:lnL w="0" cmpd="sng" algn="ctr" cap="flat">
-                      <a:solidFill>
-                        <a:srgbClr val="FFFFFF">
-                          <a:alpha val="0"/>
-                        </a:srgbClr>
-                      </a:solidFill>
-                      <a:prstDash val="solid"/>
-                    </a:lnL>
-                    <a:lnR w="0" cmpd="sng" algn="ctr" cap="flat">
-                      <a:solidFill>
-                        <a:srgbClr val="FFFFFF">
-                          <a:alpha val="0"/>
-                        </a:srgbClr>
-                      </a:solidFill>
-                      <a:prstDash val="solid"/>
-                    </a:lnR>
-                    <a:lnT w="0" cmpd="sng" algn="ctr" cap="flat">
-                      <a:solidFill>
-                        <a:srgbClr val="FFFFFF">
-                          <a:alpha val="0"/>
-                        </a:srgbClr>
-                      </a:solidFill>
-                      <a:prstDash val="solid"/>
-                    </a:lnT>
-                    <a:lnB w="0" cmpd="sng" algn="ctr" cap="flat">
-                      <a:solidFill>
-                        <a:srgbClr val="FFFFFF">
-                          <a:alpha val="0"/>
-                        </a:srgbClr>
-                      </a:solidFill>
-                      <a:prstDash val="solid"/>
-                    </a:lnB>
-                  </a:tcPr>
-                </a:tc>
-                <a:tc>
-                  <a:txBody>
-                    <a:bodyPr/>
-                    <a:lstStyle/>
-                    <a:p>
-                      <a:pPr algn="r" marL="63500" marR="63500">
-                        <a:spcBef>
-                          <a:spcPts val="200"/>
-                        </a:spcBef>
-                        <a:spcAft>
-                          <a:spcPts val="200"/>
-                        </a:spcAft>
-                        <a:buNone/>
-                      </a:pPr>
-                      <a:r>
-                        <a:rPr sz="1100">
-                          <a:solidFill>
-                            <a:srgbClr val="111111">
-                              <a:alpha val="100000"/>
-                            </a:srgbClr>
-                          </a:solidFill>
-                          <a:latin typeface="Calibri"/>
-                          <a:cs typeface="Calibri"/>
-                        </a:rPr>
-                        <a:t>Decile 8</a:t>
-                      </a:r>
-                    </a:p>
-                  </a:txBody>
-                  <a:tcPr anchor="t" marB="0" marT="0" marR="0" marL="0">
-                    <a:lnL w="0" cmpd="sng" algn="ctr" cap="flat">
-                      <a:solidFill>
-                        <a:srgbClr val="FFFFFF">
-                          <a:alpha val="0"/>
-                        </a:srgbClr>
-                      </a:solidFill>
-                      <a:prstDash val="solid"/>
-                    </a:lnL>
-                    <a:lnR w="0" cmpd="sng" algn="ctr" cap="flat">
-                      <a:solidFill>
-                        <a:srgbClr val="FFFFFF">
-                          <a:alpha val="0"/>
-                        </a:srgbClr>
-                      </a:solidFill>
-                      <a:prstDash val="solid"/>
-                    </a:lnR>
-                    <a:lnT w="0" cmpd="sng" algn="ctr" cap="flat">
-                      <a:solidFill>
-                        <a:srgbClr val="FFFFFF">
-                          <a:alpha val="0"/>
-                        </a:srgbClr>
-                      </a:solidFill>
-                      <a:prstDash val="solid"/>
-                    </a:lnT>
-                    <a:lnB w="0" cmpd="sng" algn="ctr" cap="flat">
-                      <a:solidFill>
-                        <a:srgbClr val="FFFFFF">
-                          <a:alpha val="0"/>
-                        </a:srgbClr>
-                      </a:solidFill>
-                      <a:prstDash val="solid"/>
-                    </a:lnB>
-                  </a:tcPr>
-                </a:tc>
-              </a:tr>
-              <a:tr h="182880">
-                <a:tc>
-                  <a:txBody>
-                    <a:bodyPr/>
-                    <a:lstStyle/>
-                    <a:p>
-                      <a:pPr algn="l" marL="63500" marR="63500">
-                        <a:spcBef>
-                          <a:spcPts val="200"/>
-                        </a:spcBef>
-                        <a:spcAft>
-                          <a:spcPts val="200"/>
-                        </a:spcAft>
-                        <a:buNone/>
-                      </a:pPr>
-                      <a:r>
-                        <a:rPr sz="1100">
-                          <a:solidFill>
-                            <a:srgbClr val="111111">
-                              <a:alpha val="100000"/>
-                            </a:srgbClr>
-                          </a:solidFill>
-                          <a:latin typeface="Calibri"/>
-                          <a:cs typeface="Calibri"/>
-                        </a:rPr>
-                        <a:t>Crawley</a:t>
-                      </a:r>
-                    </a:p>
-                  </a:txBody>
-                  <a:tcPr anchor="t" marB="0" marT="0" marR="0" marL="0">
-                    <a:lnL w="0" cmpd="sng" algn="ctr" cap="flat">
-                      <a:solidFill>
-                        <a:srgbClr val="FFFFFF">
-                          <a:alpha val="0"/>
-                        </a:srgbClr>
-                      </a:solidFill>
-                      <a:prstDash val="solid"/>
-                    </a:lnL>
-                    <a:lnR w="0" cmpd="sng" algn="ctr" cap="flat">
-                      <a:solidFill>
-                        <a:srgbClr val="FFFFFF">
-                          <a:alpha val="0"/>
-                        </a:srgbClr>
-                      </a:solidFill>
-                      <a:prstDash val="solid"/>
-                    </a:lnR>
-                    <a:lnT w="0" cmpd="sng" algn="ctr" cap="flat">
-                      <a:solidFill>
-                        <a:srgbClr val="FFFFFF">
-                          <a:alpha val="0"/>
-                        </a:srgbClr>
-                      </a:solidFill>
-                      <a:prstDash val="solid"/>
-                    </a:lnT>
-                    <a:lnB w="0" cmpd="sng" algn="ctr" cap="flat">
-                      <a:solidFill>
-                        <a:srgbClr val="FFFFFF">
-                          <a:alpha val="0"/>
-                        </a:srgbClr>
-                      </a:solidFill>
-                      <a:prstDash val="solid"/>
-                    </a:lnB>
-                  </a:tcPr>
-                </a:tc>
-                <a:tc>
-                  <a:txBody>
-                    <a:bodyPr/>
-                    <a:lstStyle/>
-                    <a:p>
-                      <a:pPr algn="r" marL="63500" marR="63500">
-                        <a:spcBef>
-                          <a:spcPts val="200"/>
-                        </a:spcBef>
-                        <a:spcAft>
-                          <a:spcPts val="200"/>
-                        </a:spcAft>
-                        <a:buNone/>
-                      </a:pPr>
-                      <a:r>
-                        <a:rPr sz="1100">
-                          <a:solidFill>
-                            <a:srgbClr val="111111">
-                              <a:alpha val="100000"/>
-                            </a:srgbClr>
-                          </a:solidFill>
-                          <a:latin typeface="Calibri"/>
-                          <a:cs typeface="Calibri"/>
-                        </a:rPr>
-                        <a:t>54</a:t>
-                      </a:r>
-                    </a:p>
-                  </a:txBody>
-                  <a:tcPr anchor="t" marB="0" marT="0" marR="0" marL="0">
-                    <a:lnL w="0" cmpd="sng" algn="ctr" cap="flat">
-                      <a:solidFill>
-                        <a:srgbClr val="FFFFFF">
-                          <a:alpha val="0"/>
-                        </a:srgbClr>
-                      </a:solidFill>
-                      <a:prstDash val="solid"/>
-                    </a:lnL>
-                    <a:lnR w="0" cmpd="sng" algn="ctr" cap="flat">
-                      <a:solidFill>
-                        <a:srgbClr val="FFFFFF">
-                          <a:alpha val="0"/>
-                        </a:srgbClr>
-                      </a:solidFill>
-                      <a:prstDash val="solid"/>
-                    </a:lnR>
-                    <a:lnT w="0" cmpd="sng" algn="ctr" cap="flat">
-                      <a:solidFill>
-                        <a:srgbClr val="FFFFFF">
-                          <a:alpha val="0"/>
-                        </a:srgbClr>
-                      </a:solidFill>
-                      <a:prstDash val="solid"/>
-                    </a:lnT>
-                    <a:lnB w="0" cmpd="sng" algn="ctr" cap="flat">
-                      <a:solidFill>
-                        <a:srgbClr val="FFFFFF">
-                          <a:alpha val="0"/>
-                        </a:srgbClr>
-                      </a:solidFill>
-                      <a:prstDash val="solid"/>
-                    </a:lnB>
-                  </a:tcPr>
-                </a:tc>
-                <a:tc>
-                  <a:txBody>
-                    <a:bodyPr/>
-                    <a:lstStyle/>
-                    <a:p>
-                      <a:pPr algn="r" marL="63500" marR="63500">
-                        <a:spcBef>
-                          <a:spcPts val="200"/>
-                        </a:spcBef>
-                        <a:spcAft>
-                          <a:spcPts val="200"/>
-                        </a:spcAft>
-                        <a:buNone/>
-                      </a:pPr>
-                      <a:r>
-                        <a:rPr sz="1100">
-                          <a:solidFill>
-                            <a:srgbClr val="111111">
-                              <a:alpha val="100000"/>
-                            </a:srgbClr>
-                          </a:solidFill>
-                          <a:latin typeface="Calibri"/>
-                          <a:cs typeface="Calibri"/>
-                        </a:rPr>
-                        <a:t>48.0</a:t>
-                      </a:r>
-                    </a:p>
-                  </a:txBody>
-                  <a:tcPr anchor="t" marB="0" marT="0" marR="0" marL="0">
-                    <a:lnL w="0" cmpd="sng" algn="ctr" cap="flat">
-                      <a:solidFill>
-                        <a:srgbClr val="FFFFFF">
-                          <a:alpha val="0"/>
-                        </a:srgbClr>
-                      </a:solidFill>
-                      <a:prstDash val="solid"/>
-                    </a:lnL>
-                    <a:lnR w="0" cmpd="sng" algn="ctr" cap="flat">
-                      <a:solidFill>
-                        <a:srgbClr val="FFFFFF">
-                          <a:alpha val="0"/>
-                        </a:srgbClr>
-                      </a:solidFill>
-                      <a:prstDash val="solid"/>
-                    </a:lnR>
-                    <a:lnT w="0" cmpd="sng" algn="ctr" cap="flat">
-                      <a:solidFill>
-                        <a:srgbClr val="FFFFFF">
-                          <a:alpha val="0"/>
-                        </a:srgbClr>
-                      </a:solidFill>
-                      <a:prstDash val="solid"/>
-                    </a:lnT>
-                    <a:lnB w="0" cmpd="sng" algn="ctr" cap="flat">
-                      <a:solidFill>
-                        <a:srgbClr val="FFFFFF">
-                          <a:alpha val="0"/>
-                        </a:srgbClr>
-                      </a:solidFill>
-                      <a:prstDash val="solid"/>
-                    </a:lnB>
-                  </a:tcPr>
-                </a:tc>
-                <a:tc>
-                  <a:txBody>
-                    <a:bodyPr/>
-                    <a:lstStyle/>
-                    <a:p>
-                      <a:pPr algn="r" marL="63500" marR="63500">
-                        <a:spcBef>
-                          <a:spcPts val="200"/>
-                        </a:spcBef>
-                        <a:spcAft>
-                          <a:spcPts val="200"/>
-                        </a:spcAft>
-                        <a:buNone/>
-                      </a:pPr>
-                      <a:r>
-                        <a:rPr sz="1100">
-                          <a:solidFill>
-                            <a:srgbClr val="111111">
-                              <a:alpha val="100000"/>
-                            </a:srgbClr>
-                          </a:solidFill>
-                          <a:latin typeface="Calibri"/>
-                          <a:cs typeface="Calibri"/>
-                        </a:rPr>
-                        <a:t>269th</a:t>
+                        <a:t>253rd</a:t>
                       </a:r>
                     </a:p>
                   </a:txBody>
@@ -16070,7 +16387,7 @@
                           <a:latin typeface="Calibri"/>
                           <a:cs typeface="Calibri"/>
                         </a:rPr>
-                        <a:t>Horsham</a:t>
+                        <a:t>Mid Sussex</a:t>
                       </a:r>
                     </a:p>
                   </a:txBody>
@@ -16133,7 +16450,7 @@
                           <a:latin typeface="Calibri"/>
                           <a:cs typeface="Calibri"/>
                         </a:rPr>
-                        <a:t>80</a:t>
+                        <a:t>78</a:t>
                       </a:r>
                     </a:p>
                   </a:txBody>
@@ -16196,7 +16513,7 @@
                           <a:latin typeface="Calibri"/>
                           <a:cs typeface="Calibri"/>
                         </a:rPr>
-                        <a:t>55.6</a:t>
+                        <a:t>51.6</a:t>
                       </a:r>
                     </a:p>
                   </a:txBody>
@@ -16259,7 +16576,7 @@
                           <a:latin typeface="Calibri"/>
                           <a:cs typeface="Calibri"/>
                         </a:rPr>
-                        <a:t>253rd</a:t>
+                        <a:t>261st</a:t>
                       </a:r>
                     </a:p>
                   </a:txBody>
@@ -16387,7 +16704,7 @@
                           <a:latin typeface="Calibri"/>
                           <a:cs typeface="Calibri"/>
                         </a:rPr>
-                        <a:t>Mid Sussex</a:t>
+                        <a:t>Worthing</a:t>
                       </a:r>
                     </a:p>
                   </a:txBody>
@@ -16450,7 +16767,7 @@
                           <a:latin typeface="Calibri"/>
                           <a:cs typeface="Calibri"/>
                         </a:rPr>
-                        <a:t>80</a:t>
+                        <a:t>35</a:t>
                       </a:r>
                     </a:p>
                   </a:txBody>
@@ -16513,7 +16830,7 @@
                           <a:latin typeface="Calibri"/>
                           <a:cs typeface="Calibri"/>
                         </a:rPr>
-                        <a:t>53.0</a:t>
+                        <a:t>31.7</a:t>
                       </a:r>
                     </a:p>
                   </a:txBody>
@@ -16576,324 +16893,7 @@
                           <a:latin typeface="Calibri"/>
                           <a:cs typeface="Calibri"/>
                         </a:rPr>
-                        <a:t>259th</a:t>
-                      </a:r>
-                    </a:p>
-                  </a:txBody>
-                  <a:tcPr anchor="t" marB="0" marT="0" marR="0" marL="0">
-                    <a:lnL w="0" cmpd="sng" algn="ctr" cap="flat">
-                      <a:solidFill>
-                        <a:srgbClr val="FFFFFF">
-                          <a:alpha val="0"/>
-                        </a:srgbClr>
-                      </a:solidFill>
-                      <a:prstDash val="solid"/>
-                    </a:lnL>
-                    <a:lnR w="0" cmpd="sng" algn="ctr" cap="flat">
-                      <a:solidFill>
-                        <a:srgbClr val="FFFFFF">
-                          <a:alpha val="0"/>
-                        </a:srgbClr>
-                      </a:solidFill>
-                      <a:prstDash val="solid"/>
-                    </a:lnR>
-                    <a:lnT w="0" cmpd="sng" algn="ctr" cap="flat">
-                      <a:solidFill>
-                        <a:srgbClr val="FFFFFF">
-                          <a:alpha val="0"/>
-                        </a:srgbClr>
-                      </a:solidFill>
-                      <a:prstDash val="solid"/>
-                    </a:lnT>
-                    <a:lnB w="0" cmpd="sng" algn="ctr" cap="flat">
-                      <a:solidFill>
-                        <a:srgbClr val="FFFFFF">
-                          <a:alpha val="0"/>
-                        </a:srgbClr>
-                      </a:solidFill>
-                      <a:prstDash val="solid"/>
-                    </a:lnB>
-                  </a:tcPr>
-                </a:tc>
-                <a:tc>
-                  <a:txBody>
-                    <a:bodyPr/>
-                    <a:lstStyle/>
-                    <a:p>
-                      <a:pPr algn="r" marL="63500" marR="63500">
-                        <a:spcBef>
-                          <a:spcPts val="200"/>
-                        </a:spcBef>
-                        <a:spcAft>
-                          <a:spcPts val="200"/>
-                        </a:spcAft>
-                        <a:buNone/>
-                      </a:pPr>
-                      <a:r>
-                        <a:rPr sz="1100">
-                          <a:solidFill>
-                            <a:srgbClr val="111111">
-                              <a:alpha val="100000"/>
-                            </a:srgbClr>
-                          </a:solidFill>
-                          <a:latin typeface="Calibri"/>
-                          <a:cs typeface="Calibri"/>
-                        </a:rPr>
-                        <a:t>Decile 9</a:t>
-                      </a:r>
-                    </a:p>
-                  </a:txBody>
-                  <a:tcPr anchor="t" marB="0" marT="0" marR="0" marL="0">
-                    <a:lnL w="0" cmpd="sng" algn="ctr" cap="flat">
-                      <a:solidFill>
-                        <a:srgbClr val="FFFFFF">
-                          <a:alpha val="0"/>
-                        </a:srgbClr>
-                      </a:solidFill>
-                      <a:prstDash val="solid"/>
-                    </a:lnL>
-                    <a:lnR w="0" cmpd="sng" algn="ctr" cap="flat">
-                      <a:solidFill>
-                        <a:srgbClr val="FFFFFF">
-                          <a:alpha val="0"/>
-                        </a:srgbClr>
-                      </a:solidFill>
-                      <a:prstDash val="solid"/>
-                    </a:lnR>
-                    <a:lnT w="0" cmpd="sng" algn="ctr" cap="flat">
-                      <a:solidFill>
-                        <a:srgbClr val="FFFFFF">
-                          <a:alpha val="0"/>
-                        </a:srgbClr>
-                      </a:solidFill>
-                      <a:prstDash val="solid"/>
-                    </a:lnT>
-                    <a:lnB w="0" cmpd="sng" algn="ctr" cap="flat">
-                      <a:solidFill>
-                        <a:srgbClr val="FFFFFF">
-                          <a:alpha val="0"/>
-                        </a:srgbClr>
-                      </a:solidFill>
-                      <a:prstDash val="solid"/>
-                    </a:lnB>
-                  </a:tcPr>
-                </a:tc>
-              </a:tr>
-              <a:tr h="182880">
-                <a:tc>
-                  <a:txBody>
-                    <a:bodyPr/>
-                    <a:lstStyle/>
-                    <a:p>
-                      <a:pPr algn="l" marL="63500" marR="63500">
-                        <a:spcBef>
-                          <a:spcPts val="200"/>
-                        </a:spcBef>
-                        <a:spcAft>
-                          <a:spcPts val="200"/>
-                        </a:spcAft>
-                        <a:buNone/>
-                      </a:pPr>
-                      <a:r>
-                        <a:rPr sz="1100">
-                          <a:solidFill>
-                            <a:srgbClr val="111111">
-                              <a:alpha val="100000"/>
-                            </a:srgbClr>
-                          </a:solidFill>
-                          <a:latin typeface="Calibri"/>
-                          <a:cs typeface="Calibri"/>
-                        </a:rPr>
-                        <a:t>Worthing</a:t>
-                      </a:r>
-                    </a:p>
-                  </a:txBody>
-                  <a:tcPr anchor="t" marB="0" marT="0" marR="0" marL="0">
-                    <a:lnL w="0" cmpd="sng" algn="ctr" cap="flat">
-                      <a:solidFill>
-                        <a:srgbClr val="FFFFFF">
-                          <a:alpha val="0"/>
-                        </a:srgbClr>
-                      </a:solidFill>
-                      <a:prstDash val="solid"/>
-                    </a:lnL>
-                    <a:lnR w="0" cmpd="sng" algn="ctr" cap="flat">
-                      <a:solidFill>
-                        <a:srgbClr val="FFFFFF">
-                          <a:alpha val="0"/>
-                        </a:srgbClr>
-                      </a:solidFill>
-                      <a:prstDash val="solid"/>
-                    </a:lnR>
-                    <a:lnT w="0" cmpd="sng" algn="ctr" cap="flat">
-                      <a:solidFill>
-                        <a:srgbClr val="FFFFFF">
-                          <a:alpha val="0"/>
-                        </a:srgbClr>
-                      </a:solidFill>
-                      <a:prstDash val="solid"/>
-                    </a:lnT>
-                    <a:lnB w="0" cmpd="sng" algn="ctr" cap="flat">
-                      <a:solidFill>
-                        <a:srgbClr val="FFFFFF">
-                          <a:alpha val="0"/>
-                        </a:srgbClr>
-                      </a:solidFill>
-                      <a:prstDash val="solid"/>
-                    </a:lnB>
-                  </a:tcPr>
-                </a:tc>
-                <a:tc>
-                  <a:txBody>
-                    <a:bodyPr/>
-                    <a:lstStyle/>
-                    <a:p>
-                      <a:pPr algn="r" marL="63500" marR="63500">
-                        <a:spcBef>
-                          <a:spcPts val="200"/>
-                        </a:spcBef>
-                        <a:spcAft>
-                          <a:spcPts val="200"/>
-                        </a:spcAft>
-                        <a:buNone/>
-                      </a:pPr>
-                      <a:r>
-                        <a:rPr sz="1100">
-                          <a:solidFill>
-                            <a:srgbClr val="111111">
-                              <a:alpha val="100000"/>
-                            </a:srgbClr>
-                          </a:solidFill>
-                          <a:latin typeface="Calibri"/>
-                          <a:cs typeface="Calibri"/>
-                        </a:rPr>
-                        <a:t>29</a:t>
-                      </a:r>
-                    </a:p>
-                  </a:txBody>
-                  <a:tcPr anchor="t" marB="0" marT="0" marR="0" marL="0">
-                    <a:lnL w="0" cmpd="sng" algn="ctr" cap="flat">
-                      <a:solidFill>
-                        <a:srgbClr val="FFFFFF">
-                          <a:alpha val="0"/>
-                        </a:srgbClr>
-                      </a:solidFill>
-                      <a:prstDash val="solid"/>
-                    </a:lnL>
-                    <a:lnR w="0" cmpd="sng" algn="ctr" cap="flat">
-                      <a:solidFill>
-                        <a:srgbClr val="FFFFFF">
-                          <a:alpha val="0"/>
-                        </a:srgbClr>
-                      </a:solidFill>
-                      <a:prstDash val="solid"/>
-                    </a:lnR>
-                    <a:lnT w="0" cmpd="sng" algn="ctr" cap="flat">
-                      <a:solidFill>
-                        <a:srgbClr val="FFFFFF">
-                          <a:alpha val="0"/>
-                        </a:srgbClr>
-                      </a:solidFill>
-                      <a:prstDash val="solid"/>
-                    </a:lnT>
-                    <a:lnB w="0" cmpd="sng" algn="ctr" cap="flat">
-                      <a:solidFill>
-                        <a:srgbClr val="FFFFFF">
-                          <a:alpha val="0"/>
-                        </a:srgbClr>
-                      </a:solidFill>
-                      <a:prstDash val="solid"/>
-                    </a:lnB>
-                  </a:tcPr>
-                </a:tc>
-                <a:tc>
-                  <a:txBody>
-                    <a:bodyPr/>
-                    <a:lstStyle/>
-                    <a:p>
-                      <a:pPr algn="r" marL="63500" marR="63500">
-                        <a:spcBef>
-                          <a:spcPts val="200"/>
-                        </a:spcBef>
-                        <a:spcAft>
-                          <a:spcPts val="200"/>
-                        </a:spcAft>
-                        <a:buNone/>
-                      </a:pPr>
-                      <a:r>
-                        <a:rPr sz="1100">
-                          <a:solidFill>
-                            <a:srgbClr val="111111">
-                              <a:alpha val="100000"/>
-                            </a:srgbClr>
-                          </a:solidFill>
-                          <a:latin typeface="Calibri"/>
-                          <a:cs typeface="Calibri"/>
-                        </a:rPr>
-                        <a:t>26.2</a:t>
-                      </a:r>
-                    </a:p>
-                  </a:txBody>
-                  <a:tcPr anchor="t" marB="0" marT="0" marR="0" marL="0">
-                    <a:lnL w="0" cmpd="sng" algn="ctr" cap="flat">
-                      <a:solidFill>
-                        <a:srgbClr val="FFFFFF">
-                          <a:alpha val="0"/>
-                        </a:srgbClr>
-                      </a:solidFill>
-                      <a:prstDash val="solid"/>
-                    </a:lnL>
-                    <a:lnR w="0" cmpd="sng" algn="ctr" cap="flat">
-                      <a:solidFill>
-                        <a:srgbClr val="FFFFFF">
-                          <a:alpha val="0"/>
-                        </a:srgbClr>
-                      </a:solidFill>
-                      <a:prstDash val="solid"/>
-                    </a:lnR>
-                    <a:lnT w="0" cmpd="sng" algn="ctr" cap="flat">
-                      <a:solidFill>
-                        <a:srgbClr val="FFFFFF">
-                          <a:alpha val="0"/>
-                        </a:srgbClr>
-                      </a:solidFill>
-                      <a:prstDash val="solid"/>
-                    </a:lnT>
-                    <a:lnB w="0" cmpd="sng" algn="ctr" cap="flat">
-                      <a:solidFill>
-                        <a:srgbClr val="FFFFFF">
-                          <a:alpha val="0"/>
-                        </a:srgbClr>
-                      </a:solidFill>
-                      <a:prstDash val="solid"/>
-                    </a:lnB>
-                  </a:tcPr>
-                </a:tc>
-                <a:tc>
-                  <a:txBody>
-                    <a:bodyPr/>
-                    <a:lstStyle/>
-                    <a:p>
-                      <a:pPr algn="r" marL="63500" marR="63500">
-                        <a:spcBef>
-                          <a:spcPts val="200"/>
-                        </a:spcBef>
-                        <a:spcAft>
-                          <a:spcPts val="200"/>
-                        </a:spcAft>
-                        <a:buNone/>
-                      </a:pPr>
-                      <a:r>
-                        <a:rPr sz="1100">
-                          <a:solidFill>
-                            <a:srgbClr val="111111">
-                              <a:alpha val="100000"/>
-                            </a:srgbClr>
-                          </a:solidFill>
-                          <a:latin typeface="Calibri"/>
-                          <a:cs typeface="Calibri"/>
-                        </a:rPr>
-                        <a:t>311th</a:t>
+                        <a:t>308th</a:t>
                       </a:r>
                     </a:p>
                   </a:txBody>
@@ -17085,7 +17085,7 @@
                           <a:latin typeface="Calibri"/>
                           <a:cs typeface="Calibri"/>
                         </a:rPr>
-                        <a:t>367</a:t>
+                        <a:t>377</a:t>
                       </a:r>
                     </a:p>
                   </a:txBody>
@@ -17148,7 +17148,7 @@
                           <a:latin typeface="Calibri"/>
                           <a:cs typeface="Calibri"/>
                         </a:rPr>
-                        <a:t>42.5</a:t>
+                        <a:t>43.6</a:t>
                       </a:r>
                     </a:p>
                   </a:txBody>
@@ -17402,7 +17402,7 @@
                           <a:latin typeface="Calibri"/>
                           <a:cs typeface="Calibri"/>
                         </a:rPr>
-                        <a:t>92,386</a:t>
+                        <a:t>92,422</a:t>
                       </a:r>
                     </a:p>
                   </a:txBody>
@@ -17465,7 +17465,7 @@
                           <a:latin typeface="Calibri"/>
                           <a:cs typeface="Calibri"/>
                         </a:rPr>
-                        <a:t>164.1</a:t>
+                        <a:t>164.2</a:t>
                       </a:r>
                     </a:p>
                   </a:txBody>
@@ -17719,7 +17719,7 @@
                           <a:latin typeface="Calibri"/>
                           <a:cs typeface="Calibri"/>
                         </a:rPr>
-                        <a:t>5,801</a:t>
+                        <a:t>5,971</a:t>
                       </a:r>
                     </a:p>
                   </a:txBody>
@@ -17782,7 +17782,7 @@
                           <a:latin typeface="Calibri"/>
                           <a:cs typeface="Calibri"/>
                         </a:rPr>
-                        <a:t>63.2</a:t>
+                        <a:t>65.0</a:t>
                       </a:r>
                     </a:p>
                   </a:txBody>
@@ -18025,7 +18025,7 @@
           <a:p>
             <a:r>
               <a:rPr/>
-              <a:t>Pack date: 16 October 2020</a:t>
+              <a:t>Pack date: 17 October 2020</a:t>
             </a:r>
           </a:p>
         </p:txBody>
@@ -18215,7 +18215,7 @@
           <a:p>
             <a:r>
               <a:rPr/>
-              <a:t>Pack date: 16 October 2020</a:t>
+              <a:t>Pack date: 17 October 2020</a:t>
             </a:r>
           </a:p>
         </p:txBody>
@@ -18373,7 +18373,7 @@
           <a:p>
             <a:r>
               <a:rPr/>
-              <a:t>Pack date: 16 October 2020</a:t>
+              <a:t>Pack date: 17 October 2020</a:t>
             </a:r>
           </a:p>
         </p:txBody>
@@ -18531,7 +18531,7 @@
           <a:p>
             <a:r>
               <a:rPr/>
-              <a:t>Pack date: 16 October 2020</a:t>
+              <a:t>Pack date: 17 October 2020</a:t>
             </a:r>
           </a:p>
         </p:txBody>
@@ -18689,7 +18689,7 @@
           <a:p>
             <a:r>
               <a:rPr/>
-              <a:t>Pack date: 16 October 2020</a:t>
+              <a:t>Pack date: 17 October 2020</a:t>
             </a:r>
           </a:p>
         </p:txBody>
@@ -18878,7 +18878,7 @@
           <a:p>
             <a:r>
               <a:rPr/>
-              <a:t>Pack date: 16 October 2020</a:t>
+              <a:t>Pack date: 17 October 2020</a:t>
             </a:r>
           </a:p>
         </p:txBody>
@@ -19036,7 +19036,7 @@
           <a:p>
             <a:r>
               <a:rPr/>
-              <a:t>Pack date: 16 October 2020</a:t>
+              <a:t>Pack date: 17 October 2020</a:t>
             </a:r>
           </a:p>
         </p:txBody>
@@ -19194,7 +19194,7 @@
           <a:p>
             <a:r>
               <a:rPr/>
-              <a:t>Pack date: 16 October 2020</a:t>
+              <a:t>Pack date: 17 October 2020</a:t>
             </a:r>
           </a:p>
         </p:txBody>
@@ -19352,7 +19352,7 @@
           <a:p>
             <a:r>
               <a:rPr/>
-              <a:t>Pack date: 16 October 2020</a:t>
+              <a:t>Pack date: 17 October 2020</a:t>
             </a:r>
           </a:p>
         </p:txBody>
@@ -19510,7 +19510,7 @@
           <a:p>
             <a:r>
               <a:rPr/>
-              <a:t>Pack date: 16 October 2020</a:t>
+              <a:t>Pack date: 17 October 2020</a:t>
             </a:r>
           </a:p>
         </p:txBody>
@@ -19668,7 +19668,7 @@
           <a:p>
             <a:r>
               <a:rPr/>
-              <a:t>Pack date: 16 October 2020</a:t>
+              <a:t>Pack date: 17 October 2020</a:t>
             </a:r>
           </a:p>
         </p:txBody>
@@ -19800,7 +19800,7 @@
           <a:p>
             <a:r>
               <a:rPr/>
-              <a:t>Pack date: 16 October 2020</a:t>
+              <a:t>Pack date: 17 October 2020</a:t>
             </a:r>
           </a:p>
         </p:txBody>
@@ -19932,7 +19932,7 @@
           <a:p>
             <a:r>
               <a:rPr/>
-              <a:t>Pack date: 16 October 2020</a:t>
+              <a:t>Pack date: 17 October 2020</a:t>
             </a:r>
           </a:p>
         </p:txBody>
@@ -20064,7 +20064,7 @@
           <a:p>
             <a:r>
               <a:rPr/>
-              <a:t>Pack date: 16 October 2020</a:t>
+              <a:t>Pack date: 17 October 2020</a:t>
             </a:r>
           </a:p>
         </p:txBody>
@@ -20196,7 +20196,7 @@
           <a:p>
             <a:r>
               <a:rPr/>
-              <a:t>Pack date: 16 October 2020</a:t>
+              <a:t>Pack date: 17 October 2020</a:t>
             </a:r>
           </a:p>
         </p:txBody>
@@ -20328,7 +20328,7 @@
           <a:p>
             <a:r>
               <a:rPr/>
-              <a:t>Pack date: 16 October 2020</a:t>
+              <a:t>Pack date: 17 October 2020</a:t>
             </a:r>
           </a:p>
         </p:txBody>
@@ -20460,7 +20460,7 @@
           <a:p>
             <a:r>
               <a:rPr/>
-              <a:t>Pack date: 16 October 2020</a:t>
+              <a:t>Pack date: 17 October 2020</a:t>
             </a:r>
           </a:p>
         </p:txBody>

</xml_diff>

<commit_message>
Rearrange and add ltla scatter
</commit_message>
<xml_diff>
--- a/Latest_West_Sussex_C19_slide_deck.pptx
+++ b/Latest_West_Sussex_C19_slide_deck.pptx
@@ -7177,7 +7177,7 @@
           <a:p>
             <a:r>
               <a:rPr/>
-              <a:t>Pack date: 26 October 2020</a:t>
+              <a:t>Pack date: 27 October 2020</a:t>
             </a:r>
           </a:p>
         </p:txBody>
@@ -7309,7 +7309,7 @@
           <a:p>
             <a:r>
               <a:rPr/>
-              <a:t>Pack date: 26 October 2020</a:t>
+              <a:t>Pack date: 27 October 2020</a:t>
             </a:r>
           </a:p>
         </p:txBody>
@@ -7467,7 +7467,7 @@
           <a:p>
             <a:r>
               <a:rPr/>
-              <a:t>Pack date: 26 October 2020</a:t>
+              <a:t>Pack date: 27 October 2020</a:t>
             </a:r>
           </a:p>
         </p:txBody>
@@ -9003,7 +9003,7 @@
           <a:p>
             <a:r>
               <a:rPr/>
-              <a:t>Pack date: 26 October 2020</a:t>
+              <a:t>Pack date: 27 October 2020</a:t>
             </a:r>
           </a:p>
         </p:txBody>
@@ -10539,7 +10539,7 @@
           <a:p>
             <a:r>
               <a:rPr/>
-              <a:t>Pack date: 26 October 2020</a:t>
+              <a:t>Pack date: 27 October 2020</a:t>
             </a:r>
           </a:p>
         </p:txBody>
@@ -14269,7 +14269,7 @@
           <a:p>
             <a:r>
               <a:rPr/>
-              <a:t>Pack date: 26 October 2020</a:t>
+              <a:t>Pack date: 27 October 2020</a:t>
             </a:r>
           </a:p>
         </p:txBody>
@@ -18027,7 +18027,7 @@
           <a:p>
             <a:r>
               <a:rPr/>
-              <a:t>Pack date: 26 October 2020</a:t>
+              <a:t>Pack date: 27 October 2020</a:t>
             </a:r>
           </a:p>
         </p:txBody>
@@ -18217,7 +18217,7 @@
           <a:p>
             <a:r>
               <a:rPr/>
-              <a:t>Pack date: 26 October 2020</a:t>
+              <a:t>Pack date: 27 October 2020</a:t>
             </a:r>
           </a:p>
         </p:txBody>
@@ -18375,7 +18375,7 @@
           <a:p>
             <a:r>
               <a:rPr/>
-              <a:t>Pack date: 26 October 2020</a:t>
+              <a:t>Pack date: 27 October 2020</a:t>
             </a:r>
           </a:p>
         </p:txBody>
@@ -18533,7 +18533,7 @@
           <a:p>
             <a:r>
               <a:rPr/>
-              <a:t>Pack date: 26 October 2020</a:t>
+              <a:t>Pack date: 27 October 2020</a:t>
             </a:r>
           </a:p>
         </p:txBody>
@@ -18691,7 +18691,7 @@
           <a:p>
             <a:r>
               <a:rPr/>
-              <a:t>Pack date: 26 October 2020</a:t>
+              <a:t>Pack date: 27 October 2020</a:t>
             </a:r>
           </a:p>
         </p:txBody>
@@ -18880,7 +18880,7 @@
           <a:p>
             <a:r>
               <a:rPr/>
-              <a:t>Pack date: 26 October 2020</a:t>
+              <a:t>Pack date: 27 October 2020</a:t>
             </a:r>
           </a:p>
         </p:txBody>
@@ -19038,7 +19038,7 @@
           <a:p>
             <a:r>
               <a:rPr/>
-              <a:t>Pack date: 26 October 2020</a:t>
+              <a:t>Pack date: 27 October 2020</a:t>
             </a:r>
           </a:p>
         </p:txBody>
@@ -19196,7 +19196,7 @@
           <a:p>
             <a:r>
               <a:rPr/>
-              <a:t>Pack date: 26 October 2020</a:t>
+              <a:t>Pack date: 27 October 2020</a:t>
             </a:r>
           </a:p>
         </p:txBody>
@@ -19354,7 +19354,7 @@
           <a:p>
             <a:r>
               <a:rPr/>
-              <a:t>Pack date: 26 October 2020</a:t>
+              <a:t>Pack date: 27 October 2020</a:t>
             </a:r>
           </a:p>
         </p:txBody>
@@ -19512,7 +19512,7 @@
           <a:p>
             <a:r>
               <a:rPr/>
-              <a:t>Pack date: 26 October 2020</a:t>
+              <a:t>Pack date: 27 October 2020</a:t>
             </a:r>
           </a:p>
         </p:txBody>
@@ -19670,7 +19670,7 @@
           <a:p>
             <a:r>
               <a:rPr/>
-              <a:t>Pack date: 26 October 2020</a:t>
+              <a:t>Pack date: 27 October 2020</a:t>
             </a:r>
           </a:p>
         </p:txBody>
@@ -19802,7 +19802,7 @@
           <a:p>
             <a:r>
               <a:rPr/>
-              <a:t>Pack date: 26 October 2020</a:t>
+              <a:t>Pack date: 27 October 2020</a:t>
             </a:r>
           </a:p>
         </p:txBody>
@@ -19934,7 +19934,7 @@
           <a:p>
             <a:r>
               <a:rPr/>
-              <a:t>Pack date: 26 October 2020</a:t>
+              <a:t>Pack date: 27 October 2020</a:t>
             </a:r>
           </a:p>
         </p:txBody>
@@ -20066,7 +20066,7 @@
           <a:p>
             <a:r>
               <a:rPr/>
-              <a:t>Pack date: 26 October 2020</a:t>
+              <a:t>Pack date: 27 October 2020</a:t>
             </a:r>
           </a:p>
         </p:txBody>
@@ -20198,7 +20198,7 @@
           <a:p>
             <a:r>
               <a:rPr/>
-              <a:t>Pack date: 26 October 2020</a:t>
+              <a:t>Pack date: 27 October 2020</a:t>
             </a:r>
           </a:p>
         </p:txBody>
@@ -20330,7 +20330,7 @@
           <a:p>
             <a:r>
               <a:rPr/>
-              <a:t>Pack date: 26 October 2020</a:t>
+              <a:t>Pack date: 27 October 2020</a:t>
             </a:r>
           </a:p>
         </p:txBody>
@@ -20462,7 +20462,7 @@
           <a:p>
             <a:r>
               <a:rPr/>
-              <a:t>Pack date: 26 October 2020</a:t>
+              <a:t>Pack date: 27 October 2020</a:t>
             </a:r>
           </a:p>
         </p:txBody>

</xml_diff>

<commit_message>
Update + legend msoa
</commit_message>
<xml_diff>
--- a/Latest_West_Sussex_C19_slide_deck.pptx
+++ b/Latest_West_Sussex_C19_slide_deck.pptx
@@ -7177,7 +7177,7 @@
           <a:p>
             <a:r>
               <a:rPr/>
-              <a:t>Pack date: 20 November 2020</a:t>
+              <a:t>Pack date: 22 November 2020</a:t>
             </a:r>
           </a:p>
         </p:txBody>
@@ -7309,7 +7309,7 @@
           <a:p>
             <a:r>
               <a:rPr/>
-              <a:t>Pack date: 20 November 2020</a:t>
+              <a:t>Pack date: 22 November 2020</a:t>
             </a:r>
           </a:p>
         </p:txBody>
@@ -7467,7 +7467,7 @@
           <a:p>
             <a:r>
               <a:rPr/>
-              <a:t>Pack date: 20 November 2020</a:t>
+              <a:t>Pack date: 22 November 2020</a:t>
             </a:r>
           </a:p>
         </p:txBody>
@@ -7548,7 +7548,7 @@
           <a:p>
             <a:r>
               <a:rPr/>
-              <a:t>Upper Tier Local Authority cumulative cases as at 20 November</a:t>
+              <a:t>Upper Tier Local Authority cumulative cases as at 21 November</a:t>
             </a:r>
           </a:p>
         </p:txBody>
@@ -8083,7 +8083,7 @@
                           <a:latin typeface="Calibri"/>
                           <a:cs typeface="Calibri"/>
                         </a:rPr>
-                        <a:t>8,265</a:t>
+                        <a:t>8,353</a:t>
                       </a:r>
                     </a:p>
                   </a:txBody>
@@ -8149,7 +8149,7 @@
                           <a:latin typeface="Calibri"/>
                           <a:cs typeface="Calibri"/>
                         </a:rPr>
-                        <a:t>956.6</a:t>
+                        <a:t>966.8</a:t>
                       </a:r>
                     </a:p>
                   </a:txBody>
@@ -8416,7 +8416,7 @@
                           <a:latin typeface="Calibri"/>
                           <a:cs typeface="Calibri"/>
                         </a:rPr>
-                        <a:t>1,267,276</a:t>
+                        <a:t>1,284,891</a:t>
                       </a:r>
                     </a:p>
                   </a:txBody>
@@ -8482,7 +8482,7 @@
                           <a:latin typeface="Calibri"/>
                           <a:cs typeface="Calibri"/>
                         </a:rPr>
-                        <a:t>2,251.5</a:t>
+                        <a:t>2,282.8</a:t>
                       </a:r>
                     </a:p>
                   </a:txBody>
@@ -8748,7 +8748,7 @@
                           <a:latin typeface="Calibri"/>
                           <a:cs typeface="Calibri"/>
                         </a:rPr>
-                        <a:t>115,208</a:t>
+                        <a:t>117,481</a:t>
                       </a:r>
                     </a:p>
                   </a:txBody>
@@ -8814,7 +8814,7 @@
                           <a:latin typeface="Calibri"/>
                           <a:cs typeface="Calibri"/>
                         </a:rPr>
-                        <a:t>1,255.0</a:t>
+                        <a:t>1,279.7</a:t>
                       </a:r>
                     </a:p>
                   </a:txBody>
@@ -9063,7 +9063,7 @@
           <a:p>
             <a:r>
               <a:rPr/>
-              <a:t>Pack date: 20 November 2020</a:t>
+              <a:t>Pack date: 22 November 2020</a:t>
             </a:r>
           </a:p>
         </p:txBody>
@@ -9144,7 +9144,7 @@
           <a:p>
             <a:r>
               <a:rPr/>
-              <a:t>Upper Tier Local Authority rolling 7 day cases as at 20 November</a:t>
+              <a:t>Upper Tier Local Authority rolling 7 day cases as at 21 November</a:t>
             </a:r>
           </a:p>
         </p:txBody>
@@ -9225,7 +9225,7 @@
           <a:p>
             <a:r>
               <a:rPr/>
-              <a:t>Note that the very recent days are excluded in the 7-day total as these are thought to be incomplete. As such, this data represents cases in the seven days to 15 November</a:t>
+              <a:t>Note that the very recent days are excluded in the 7-day total as these are thought to be incomplete. As such, this data represents cases in the seven days to 16 November</a:t>
             </a:r>
           </a:p>
         </p:txBody>
@@ -9679,7 +9679,7 @@
                           <a:latin typeface="Calibri"/>
                           <a:cs typeface="Calibri"/>
                         </a:rPr>
-                        <a:t>1,053</a:t>
+                        <a:t>1,114</a:t>
                       </a:r>
                     </a:p>
                   </a:txBody>
@@ -9745,7 +9745,7 @@
                           <a:latin typeface="Calibri"/>
                           <a:cs typeface="Calibri"/>
                         </a:rPr>
-                        <a:t>121.9</a:t>
+                        <a:t>128.9</a:t>
                       </a:r>
                     </a:p>
                   </a:txBody>
@@ -9811,7 +9811,7 @@
                           <a:latin typeface="Calibri"/>
                           <a:cs typeface="Calibri"/>
                         </a:rPr>
-                        <a:t>142nd</a:t>
+                        <a:t>136th</a:t>
                       </a:r>
                     </a:p>
                   </a:txBody>
@@ -10012,7 +10012,7 @@
                           <a:latin typeface="Calibri"/>
                           <a:cs typeface="Calibri"/>
                         </a:rPr>
-                        <a:t>149,898</a:t>
+                        <a:t>145,796</a:t>
                       </a:r>
                     </a:p>
                   </a:txBody>
@@ -10078,7 +10078,7 @@
                           <a:latin typeface="Calibri"/>
                           <a:cs typeface="Calibri"/>
                         </a:rPr>
-                        <a:t>266.3</a:t>
+                        <a:t>259.0</a:t>
                       </a:r>
                     </a:p>
                   </a:txBody>
@@ -10344,7 +10344,7 @@
                           <a:latin typeface="Calibri"/>
                           <a:cs typeface="Calibri"/>
                         </a:rPr>
-                        <a:t>16,929</a:t>
+                        <a:t>16,961</a:t>
                       </a:r>
                     </a:p>
                   </a:txBody>
@@ -10410,7 +10410,7 @@
                           <a:latin typeface="Calibri"/>
                           <a:cs typeface="Calibri"/>
                         </a:rPr>
-                        <a:t>184.4</a:t>
+                        <a:t>184.8</a:t>
                       </a:r>
                     </a:p>
                   </a:txBody>
@@ -10659,7 +10659,7 @@
           <a:p>
             <a:r>
               <a:rPr/>
-              <a:t>Pack date: 20 November 2020</a:t>
+              <a:t>Pack date: 22 November 2020</a:t>
             </a:r>
           </a:p>
         </p:txBody>
@@ -10740,7 +10740,7 @@
           <a:p>
             <a:r>
               <a:rPr/>
-              <a:t>Lower Tier Local Authority cumulative cases as at 20 November</a:t>
+              <a:t>Lower Tier Local Authority cumulative cases as at 21 November</a:t>
             </a:r>
           </a:p>
         </p:txBody>
@@ -11248,7 +11248,7 @@
                           <a:latin typeface="Calibri"/>
                           <a:cs typeface="Calibri"/>
                         </a:rPr>
-                        <a:t>523</a:t>
+                        <a:t>529</a:t>
                       </a:r>
                     </a:p>
                   </a:txBody>
@@ -11314,7 +11314,7 @@
                           <a:latin typeface="Calibri"/>
                           <a:cs typeface="Calibri"/>
                         </a:rPr>
-                        <a:t>813.4</a:t>
+                        <a:t>822.7</a:t>
                       </a:r>
                     </a:p>
                   </a:txBody>
@@ -11380,7 +11380,7 @@
                           <a:latin typeface="Calibri"/>
                           <a:cs typeface="Calibri"/>
                         </a:rPr>
-                        <a:t>293rd</a:t>
+                        <a:t>294th</a:t>
                       </a:r>
                     </a:p>
                   </a:txBody>
@@ -11581,7 +11581,7 @@
                           <a:latin typeface="Calibri"/>
                           <a:cs typeface="Calibri"/>
                         </a:rPr>
-                        <a:t>1,225</a:t>
+                        <a:t>1,235</a:t>
                       </a:r>
                     </a:p>
                   </a:txBody>
@@ -11647,7 +11647,7 @@
                           <a:latin typeface="Calibri"/>
                           <a:cs typeface="Calibri"/>
                         </a:rPr>
-                        <a:t>762.0</a:t>
+                        <a:t>768.2</a:t>
                       </a:r>
                     </a:p>
                   </a:txBody>
@@ -11914,7 +11914,7 @@
                           <a:latin typeface="Calibri"/>
                           <a:cs typeface="Calibri"/>
                         </a:rPr>
-                        <a:t>1,121</a:t>
+                        <a:t>1,132</a:t>
                       </a:r>
                     </a:p>
                   </a:txBody>
@@ -11980,7 +11980,7 @@
                           <a:latin typeface="Calibri"/>
                           <a:cs typeface="Calibri"/>
                         </a:rPr>
-                        <a:t>925.5</a:t>
+                        <a:t>934.5</a:t>
                       </a:r>
                     </a:p>
                   </a:txBody>
@@ -12246,7 +12246,7 @@
                           <a:latin typeface="Calibri"/>
                           <a:cs typeface="Calibri"/>
                         </a:rPr>
-                        <a:t>1,346</a:t>
+                        <a:t>1,364</a:t>
                       </a:r>
                     </a:p>
                   </a:txBody>
@@ -12312,7 +12312,7 @@
                           <a:latin typeface="Calibri"/>
                           <a:cs typeface="Calibri"/>
                         </a:rPr>
-                        <a:t>1,197.4</a:t>
+                        <a:t>1,213.4</a:t>
                       </a:r>
                     </a:p>
                   </a:txBody>
@@ -12378,7 +12378,7 @@
                           <a:latin typeface="Calibri"/>
                           <a:cs typeface="Calibri"/>
                         </a:rPr>
-                        <a:t>228th</a:t>
+                        <a:t>232nd</a:t>
                       </a:r>
                     </a:p>
                   </a:txBody>
@@ -12578,7 +12578,7 @@
                           <a:latin typeface="Calibri"/>
                           <a:cs typeface="Calibri"/>
                         </a:rPr>
-                        <a:t>1,399</a:t>
+                        <a:t>1,415</a:t>
                       </a:r>
                     </a:p>
                   </a:txBody>
@@ -12644,7 +12644,7 @@
                           <a:latin typeface="Calibri"/>
                           <a:cs typeface="Calibri"/>
                         </a:rPr>
-                        <a:t>972.9</a:t>
+                        <a:t>984.1</a:t>
                       </a:r>
                     </a:p>
                   </a:txBody>
@@ -12910,7 +12910,7 @@
                           <a:latin typeface="Calibri"/>
                           <a:cs typeface="Calibri"/>
                         </a:rPr>
-                        <a:t>1,633</a:t>
+                        <a:t>1,651</a:t>
                       </a:r>
                     </a:p>
                   </a:txBody>
@@ -12976,7 +12976,7 @@
                           <a:latin typeface="Calibri"/>
                           <a:cs typeface="Calibri"/>
                         </a:rPr>
-                        <a:t>1,081.3</a:t>
+                        <a:t>1,093.2</a:t>
                       </a:r>
                     </a:p>
                   </a:txBody>
@@ -13042,7 +13042,7 @@
                           <a:latin typeface="Calibri"/>
                           <a:cs typeface="Calibri"/>
                         </a:rPr>
-                        <a:t>255th</a:t>
+                        <a:t>257th</a:t>
                       </a:r>
                     </a:p>
                   </a:txBody>
@@ -13242,7 +13242,7 @@
                           <a:latin typeface="Calibri"/>
                           <a:cs typeface="Calibri"/>
                         </a:rPr>
-                        <a:t>1,018</a:t>
+                        <a:t>1,027</a:t>
                       </a:r>
                     </a:p>
                   </a:txBody>
@@ -13308,7 +13308,7 @@
                           <a:latin typeface="Calibri"/>
                           <a:cs typeface="Calibri"/>
                         </a:rPr>
-                        <a:t>920.7</a:t>
+                        <a:t>928.8</a:t>
                       </a:r>
                     </a:p>
                   </a:txBody>
@@ -13574,7 +13574,7 @@
                           <a:latin typeface="Calibri"/>
                           <a:cs typeface="Calibri"/>
                         </a:rPr>
-                        <a:t>8,265</a:t>
+                        <a:t>8,353</a:t>
                       </a:r>
                     </a:p>
                   </a:txBody>
@@ -13640,7 +13640,7 @@
                           <a:latin typeface="Calibri"/>
                           <a:cs typeface="Calibri"/>
                         </a:rPr>
-                        <a:t>956.6</a:t>
+                        <a:t>966.8</a:t>
                       </a:r>
                     </a:p>
                   </a:txBody>
@@ -13906,7 +13906,7 @@
                           <a:latin typeface="Calibri"/>
                           <a:cs typeface="Calibri"/>
                         </a:rPr>
-                        <a:t>115,208</a:t>
+                        <a:t>117,481</a:t>
                       </a:r>
                     </a:p>
                   </a:txBody>
@@ -13972,7 +13972,7 @@
                           <a:latin typeface="Calibri"/>
                           <a:cs typeface="Calibri"/>
                         </a:rPr>
-                        <a:t>1,255.0</a:t>
+                        <a:t>1,279.7</a:t>
                       </a:r>
                     </a:p>
                   </a:txBody>
@@ -14238,7 +14238,7 @@
                           <a:latin typeface="Calibri"/>
                           <a:cs typeface="Calibri"/>
                         </a:rPr>
-                        <a:t>1,267,276</a:t>
+                        <a:t>1,284,891</a:t>
                       </a:r>
                     </a:p>
                   </a:txBody>
@@ -14304,7 +14304,7 @@
                           <a:latin typeface="Calibri"/>
                           <a:cs typeface="Calibri"/>
                         </a:rPr>
-                        <a:t>2,251.5</a:t>
+                        <a:t>2,282.8</a:t>
                       </a:r>
                     </a:p>
                   </a:txBody>
@@ -14553,7 +14553,7 @@
           <a:p>
             <a:r>
               <a:rPr/>
-              <a:t>Pack date: 20 November 2020</a:t>
+              <a:t>Pack date: 22 November 2020</a:t>
             </a:r>
           </a:p>
         </p:txBody>
@@ -14634,7 +14634,7 @@
           <a:p>
             <a:r>
               <a:rPr/>
-              <a:t>Lower Tier Local Authority rolling cases as at 20 November</a:t>
+              <a:t>Lower Tier Local Authority rolling cases as at 21 November</a:t>
             </a:r>
           </a:p>
         </p:txBody>
@@ -14715,7 +14715,7 @@
           <a:p>
             <a:r>
               <a:rPr/>
-              <a:t>Note that the very recent days are excluded in the 7-day total as these are thought to be incomplete. As such, this data represents cases in the seven days to 15 November</a:t>
+              <a:t>Note that the very recent days are excluded in the 7-day total as these are thought to be incomplete. As such, this data represents cases in the seven days to 16 November</a:t>
             </a:r>
           </a:p>
         </p:txBody>
@@ -15169,7 +15169,7 @@
                           <a:latin typeface="Calibri"/>
                           <a:cs typeface="Calibri"/>
                         </a:rPr>
-                        <a:t>61</a:t>
+                        <a:t>72</a:t>
                       </a:r>
                     </a:p>
                   </a:txBody>
@@ -15235,7 +15235,7 @@
                           <a:latin typeface="Calibri"/>
                           <a:cs typeface="Calibri"/>
                         </a:rPr>
-                        <a:t>94.9</a:t>
+                        <a:t>112.0</a:t>
                       </a:r>
                     </a:p>
                   </a:txBody>
@@ -15301,7 +15301,7 @@
                           <a:latin typeface="Calibri"/>
                           <a:cs typeface="Calibri"/>
                         </a:rPr>
-                        <a:t>299th</a:t>
+                        <a:t>285th</a:t>
                       </a:r>
                     </a:p>
                   </a:txBody>
@@ -15502,7 +15502,7 @@
                           <a:latin typeface="Calibri"/>
                           <a:cs typeface="Calibri"/>
                         </a:rPr>
-                        <a:t>180</a:t>
+                        <a:t>220</a:t>
                       </a:r>
                     </a:p>
                   </a:txBody>
@@ -15568,7 +15568,7 @@
                           <a:latin typeface="Calibri"/>
                           <a:cs typeface="Calibri"/>
                         </a:rPr>
-                        <a:t>112.0</a:t>
+                        <a:t>136.9</a:t>
                       </a:r>
                     </a:p>
                   </a:txBody>
@@ -15634,7 +15634,1003 @@
                           <a:latin typeface="Calibri"/>
                           <a:cs typeface="Calibri"/>
                         </a:rPr>
-                        <a:t>287th</a:t>
+                        <a:t>254th</a:t>
+                      </a:r>
+                    </a:p>
+                  </a:txBody>
+                  <a:tcPr anchor="t" marB="0" marT="0" marR="0" marL="0">
+                    <a:lnL w="0" cmpd="sng" algn="ctr" cap="flat">
+                      <a:solidFill>
+                        <a:srgbClr val="FFFFFF">
+                          <a:alpha val="0"/>
+                        </a:srgbClr>
+                      </a:solidFill>
+                      <a:prstDash val="solid"/>
+                    </a:lnL>
+                    <a:lnR w="0" cmpd="sng" algn="ctr" cap="flat">
+                      <a:solidFill>
+                        <a:srgbClr val="FFFFFF">
+                          <a:alpha val="0"/>
+                        </a:srgbClr>
+                      </a:solidFill>
+                      <a:prstDash val="solid"/>
+                    </a:lnR>
+                    <a:lnT w="0" cmpd="sng" algn="ctr" cap="flat">
+                      <a:solidFill>
+                        <a:srgbClr val="FFFFFF">
+                          <a:alpha val="0"/>
+                        </a:srgbClr>
+                      </a:solidFill>
+                      <a:prstDash val="solid"/>
+                    </a:lnT>
+                    <a:lnB w="0" cmpd="sng" algn="ctr" cap="flat">
+                      <a:solidFill>
+                        <a:srgbClr val="FFFFFF">
+                          <a:alpha val="0"/>
+                        </a:srgbClr>
+                      </a:solidFill>
+                      <a:prstDash val="solid"/>
+                    </a:lnB>
+                  </a:tcPr>
+                </a:tc>
+                <a:tc>
+                  <a:txBody>
+                    <a:bodyPr/>
+                    <a:lstStyle/>
+                    <a:p>
+                      <a:pPr algn="l" marL="63500" marR="63500">
+                        <a:lnSpc>
+                          <a:spcPct val="100000"/>
+                        </a:lnSpc>
+                        <a:spcBef>
+                          <a:spcPts val="200"/>
+                        </a:spcBef>
+                        <a:spcAft>
+                          <a:spcPts val="200"/>
+                        </a:spcAft>
+                        <a:buNone/>
+                      </a:pPr>
+                      <a:r>
+                        <a:rPr sz="1100">
+                          <a:solidFill>
+                            <a:srgbClr val="111111">
+                              <a:alpha val="100000"/>
+                            </a:srgbClr>
+                          </a:solidFill>
+                          <a:latin typeface="Calibri"/>
+                          <a:cs typeface="Calibri"/>
+                        </a:rPr>
+                        <a:t>Decile 9</a:t>
+                      </a:r>
+                    </a:p>
+                  </a:txBody>
+                  <a:tcPr anchor="t" marB="0" marT="0" marR="0" marL="0">
+                    <a:lnL w="0" cmpd="sng" algn="ctr" cap="flat">
+                      <a:solidFill>
+                        <a:srgbClr val="FFFFFF">
+                          <a:alpha val="0"/>
+                        </a:srgbClr>
+                      </a:solidFill>
+                      <a:prstDash val="solid"/>
+                    </a:lnL>
+                    <a:lnR w="0" cmpd="sng" algn="ctr" cap="flat">
+                      <a:solidFill>
+                        <a:srgbClr val="FFFFFF">
+                          <a:alpha val="0"/>
+                        </a:srgbClr>
+                      </a:solidFill>
+                      <a:prstDash val="solid"/>
+                    </a:lnR>
+                    <a:lnT w="0" cmpd="sng" algn="ctr" cap="flat">
+                      <a:solidFill>
+                        <a:srgbClr val="FFFFFF">
+                          <a:alpha val="0"/>
+                        </a:srgbClr>
+                      </a:solidFill>
+                      <a:prstDash val="solid"/>
+                    </a:lnT>
+                    <a:lnB w="0" cmpd="sng" algn="ctr" cap="flat">
+                      <a:solidFill>
+                        <a:srgbClr val="FFFFFF">
+                          <a:alpha val="0"/>
+                        </a:srgbClr>
+                      </a:solidFill>
+                      <a:prstDash val="solid"/>
+                    </a:lnB>
+                  </a:tcPr>
+                </a:tc>
+              </a:tr>
+              <a:tr h="182880">
+                <a:tc>
+                  <a:txBody>
+                    <a:bodyPr/>
+                    <a:lstStyle/>
+                    <a:p>
+                      <a:pPr algn="l" marL="63500" marR="63500">
+                        <a:lnSpc>
+                          <a:spcPct val="100000"/>
+                        </a:lnSpc>
+                        <a:spcBef>
+                          <a:spcPts val="200"/>
+                        </a:spcBef>
+                        <a:spcAft>
+                          <a:spcPts val="200"/>
+                        </a:spcAft>
+                        <a:buNone/>
+                      </a:pPr>
+                      <a:r>
+                        <a:rPr sz="1100">
+                          <a:solidFill>
+                            <a:srgbClr val="111111">
+                              <a:alpha val="100000"/>
+                            </a:srgbClr>
+                          </a:solidFill>
+                          <a:latin typeface="Calibri"/>
+                          <a:cs typeface="Calibri"/>
+                        </a:rPr>
+                        <a:t>Chichester</a:t>
+                      </a:r>
+                    </a:p>
+                  </a:txBody>
+                  <a:tcPr anchor="t" marB="0" marT="0" marR="0" marL="0">
+                    <a:lnL w="0" cmpd="sng" algn="ctr" cap="flat">
+                      <a:solidFill>
+                        <a:srgbClr val="FFFFFF">
+                          <a:alpha val="0"/>
+                        </a:srgbClr>
+                      </a:solidFill>
+                      <a:prstDash val="solid"/>
+                    </a:lnL>
+                    <a:lnR w="0" cmpd="sng" algn="ctr" cap="flat">
+                      <a:solidFill>
+                        <a:srgbClr val="FFFFFF">
+                          <a:alpha val="0"/>
+                        </a:srgbClr>
+                      </a:solidFill>
+                      <a:prstDash val="solid"/>
+                    </a:lnR>
+                    <a:lnT w="0" cmpd="sng" algn="ctr" cap="flat">
+                      <a:solidFill>
+                        <a:srgbClr val="FFFFFF">
+                          <a:alpha val="0"/>
+                        </a:srgbClr>
+                      </a:solidFill>
+                      <a:prstDash val="solid"/>
+                    </a:lnT>
+                    <a:lnB w="0" cmpd="sng" algn="ctr" cap="flat">
+                      <a:solidFill>
+                        <a:srgbClr val="FFFFFF">
+                          <a:alpha val="0"/>
+                        </a:srgbClr>
+                      </a:solidFill>
+                      <a:prstDash val="solid"/>
+                    </a:lnB>
+                  </a:tcPr>
+                </a:tc>
+                <a:tc>
+                  <a:txBody>
+                    <a:bodyPr/>
+                    <a:lstStyle/>
+                    <a:p>
+                      <a:pPr algn="l" marL="63500" marR="63500">
+                        <a:lnSpc>
+                          <a:spcPct val="100000"/>
+                        </a:lnSpc>
+                        <a:spcBef>
+                          <a:spcPts val="200"/>
+                        </a:spcBef>
+                        <a:spcAft>
+                          <a:spcPts val="200"/>
+                        </a:spcAft>
+                        <a:buNone/>
+                      </a:pPr>
+                      <a:r>
+                        <a:rPr sz="1100">
+                          <a:solidFill>
+                            <a:srgbClr val="111111">
+                              <a:alpha val="100000"/>
+                            </a:srgbClr>
+                          </a:solidFill>
+                          <a:latin typeface="Calibri"/>
+                          <a:cs typeface="Calibri"/>
+                        </a:rPr>
+                        <a:t>166</a:t>
+                      </a:r>
+                    </a:p>
+                  </a:txBody>
+                  <a:tcPr anchor="t" marB="0" marT="0" marR="0" marL="0">
+                    <a:lnL w="0" cmpd="sng" algn="ctr" cap="flat">
+                      <a:solidFill>
+                        <a:srgbClr val="FFFFFF">
+                          <a:alpha val="0"/>
+                        </a:srgbClr>
+                      </a:solidFill>
+                      <a:prstDash val="solid"/>
+                    </a:lnL>
+                    <a:lnR w="0" cmpd="sng" algn="ctr" cap="flat">
+                      <a:solidFill>
+                        <a:srgbClr val="FFFFFF">
+                          <a:alpha val="0"/>
+                        </a:srgbClr>
+                      </a:solidFill>
+                      <a:prstDash val="solid"/>
+                    </a:lnR>
+                    <a:lnT w="0" cmpd="sng" algn="ctr" cap="flat">
+                      <a:solidFill>
+                        <a:srgbClr val="FFFFFF">
+                          <a:alpha val="0"/>
+                        </a:srgbClr>
+                      </a:solidFill>
+                      <a:prstDash val="solid"/>
+                    </a:lnT>
+                    <a:lnB w="0" cmpd="sng" algn="ctr" cap="flat">
+                      <a:solidFill>
+                        <a:srgbClr val="FFFFFF">
+                          <a:alpha val="0"/>
+                        </a:srgbClr>
+                      </a:solidFill>
+                      <a:prstDash val="solid"/>
+                    </a:lnB>
+                  </a:tcPr>
+                </a:tc>
+                <a:tc>
+                  <a:txBody>
+                    <a:bodyPr/>
+                    <a:lstStyle/>
+                    <a:p>
+                      <a:pPr algn="l" marL="63500" marR="63500">
+                        <a:lnSpc>
+                          <a:spcPct val="100000"/>
+                        </a:lnSpc>
+                        <a:spcBef>
+                          <a:spcPts val="200"/>
+                        </a:spcBef>
+                        <a:spcAft>
+                          <a:spcPts val="200"/>
+                        </a:spcAft>
+                        <a:buNone/>
+                      </a:pPr>
+                      <a:r>
+                        <a:rPr sz="1100">
+                          <a:solidFill>
+                            <a:srgbClr val="111111">
+                              <a:alpha val="100000"/>
+                            </a:srgbClr>
+                          </a:solidFill>
+                          <a:latin typeface="Calibri"/>
+                          <a:cs typeface="Calibri"/>
+                        </a:rPr>
+                        <a:t>137.0</a:t>
+                      </a:r>
+                    </a:p>
+                  </a:txBody>
+                  <a:tcPr anchor="t" marB="0" marT="0" marR="0" marL="0">
+                    <a:lnL w="0" cmpd="sng" algn="ctr" cap="flat">
+                      <a:solidFill>
+                        <a:srgbClr val="FFFFFF">
+                          <a:alpha val="0"/>
+                        </a:srgbClr>
+                      </a:solidFill>
+                      <a:prstDash val="solid"/>
+                    </a:lnL>
+                    <a:lnR w="0" cmpd="sng" algn="ctr" cap="flat">
+                      <a:solidFill>
+                        <a:srgbClr val="FFFFFF">
+                          <a:alpha val="0"/>
+                        </a:srgbClr>
+                      </a:solidFill>
+                      <a:prstDash val="solid"/>
+                    </a:lnR>
+                    <a:lnT w="0" cmpd="sng" algn="ctr" cap="flat">
+                      <a:solidFill>
+                        <a:srgbClr val="FFFFFF">
+                          <a:alpha val="0"/>
+                        </a:srgbClr>
+                      </a:solidFill>
+                      <a:prstDash val="solid"/>
+                    </a:lnT>
+                    <a:lnB w="0" cmpd="sng" algn="ctr" cap="flat">
+                      <a:solidFill>
+                        <a:srgbClr val="FFFFFF">
+                          <a:alpha val="0"/>
+                        </a:srgbClr>
+                      </a:solidFill>
+                      <a:prstDash val="solid"/>
+                    </a:lnB>
+                  </a:tcPr>
+                </a:tc>
+                <a:tc>
+                  <a:txBody>
+                    <a:bodyPr/>
+                    <a:lstStyle/>
+                    <a:p>
+                      <a:pPr algn="l" marL="63500" marR="63500">
+                        <a:lnSpc>
+                          <a:spcPct val="100000"/>
+                        </a:lnSpc>
+                        <a:spcBef>
+                          <a:spcPts val="200"/>
+                        </a:spcBef>
+                        <a:spcAft>
+                          <a:spcPts val="200"/>
+                        </a:spcAft>
+                        <a:buNone/>
+                      </a:pPr>
+                      <a:r>
+                        <a:rPr sz="1100">
+                          <a:solidFill>
+                            <a:srgbClr val="111111">
+                              <a:alpha val="100000"/>
+                            </a:srgbClr>
+                          </a:solidFill>
+                          <a:latin typeface="Calibri"/>
+                          <a:cs typeface="Calibri"/>
+                        </a:rPr>
+                        <a:t>251st</a:t>
+                      </a:r>
+                    </a:p>
+                  </a:txBody>
+                  <a:tcPr anchor="t" marB="0" marT="0" marR="0" marL="0">
+                    <a:lnL w="0" cmpd="sng" algn="ctr" cap="flat">
+                      <a:solidFill>
+                        <a:srgbClr val="FFFFFF">
+                          <a:alpha val="0"/>
+                        </a:srgbClr>
+                      </a:solidFill>
+                      <a:prstDash val="solid"/>
+                    </a:lnL>
+                    <a:lnR w="0" cmpd="sng" algn="ctr" cap="flat">
+                      <a:solidFill>
+                        <a:srgbClr val="FFFFFF">
+                          <a:alpha val="0"/>
+                        </a:srgbClr>
+                      </a:solidFill>
+                      <a:prstDash val="solid"/>
+                    </a:lnR>
+                    <a:lnT w="0" cmpd="sng" algn="ctr" cap="flat">
+                      <a:solidFill>
+                        <a:srgbClr val="FFFFFF">
+                          <a:alpha val="0"/>
+                        </a:srgbClr>
+                      </a:solidFill>
+                      <a:prstDash val="solid"/>
+                    </a:lnT>
+                    <a:lnB w="0" cmpd="sng" algn="ctr" cap="flat">
+                      <a:solidFill>
+                        <a:srgbClr val="FFFFFF">
+                          <a:alpha val="0"/>
+                        </a:srgbClr>
+                      </a:solidFill>
+                      <a:prstDash val="solid"/>
+                    </a:lnB>
+                  </a:tcPr>
+                </a:tc>
+                <a:tc>
+                  <a:txBody>
+                    <a:bodyPr/>
+                    <a:lstStyle/>
+                    <a:p>
+                      <a:pPr algn="l" marL="63500" marR="63500">
+                        <a:lnSpc>
+                          <a:spcPct val="100000"/>
+                        </a:lnSpc>
+                        <a:spcBef>
+                          <a:spcPts val="200"/>
+                        </a:spcBef>
+                        <a:spcAft>
+                          <a:spcPts val="200"/>
+                        </a:spcAft>
+                        <a:buNone/>
+                      </a:pPr>
+                      <a:r>
+                        <a:rPr sz="1100">
+                          <a:solidFill>
+                            <a:srgbClr val="111111">
+                              <a:alpha val="100000"/>
+                            </a:srgbClr>
+                          </a:solidFill>
+                          <a:latin typeface="Calibri"/>
+                          <a:cs typeface="Calibri"/>
+                        </a:rPr>
+                        <a:t>Decile 8</a:t>
+                      </a:r>
+                    </a:p>
+                  </a:txBody>
+                  <a:tcPr anchor="t" marB="0" marT="0" marR="0" marL="0">
+                    <a:lnL w="0" cmpd="sng" algn="ctr" cap="flat">
+                      <a:solidFill>
+                        <a:srgbClr val="FFFFFF">
+                          <a:alpha val="0"/>
+                        </a:srgbClr>
+                      </a:solidFill>
+                      <a:prstDash val="solid"/>
+                    </a:lnL>
+                    <a:lnR w="0" cmpd="sng" algn="ctr" cap="flat">
+                      <a:solidFill>
+                        <a:srgbClr val="FFFFFF">
+                          <a:alpha val="0"/>
+                        </a:srgbClr>
+                      </a:solidFill>
+                      <a:prstDash val="solid"/>
+                    </a:lnR>
+                    <a:lnT w="0" cmpd="sng" algn="ctr" cap="flat">
+                      <a:solidFill>
+                        <a:srgbClr val="FFFFFF">
+                          <a:alpha val="0"/>
+                        </a:srgbClr>
+                      </a:solidFill>
+                      <a:prstDash val="solid"/>
+                    </a:lnT>
+                    <a:lnB w="0" cmpd="sng" algn="ctr" cap="flat">
+                      <a:solidFill>
+                        <a:srgbClr val="FFFFFF">
+                          <a:alpha val="0"/>
+                        </a:srgbClr>
+                      </a:solidFill>
+                      <a:prstDash val="solid"/>
+                    </a:lnB>
+                  </a:tcPr>
+                </a:tc>
+              </a:tr>
+              <a:tr h="182880">
+                <a:tc>
+                  <a:txBody>
+                    <a:bodyPr/>
+                    <a:lstStyle/>
+                    <a:p>
+                      <a:pPr algn="l" marL="63500" marR="63500">
+                        <a:lnSpc>
+                          <a:spcPct val="100000"/>
+                        </a:lnSpc>
+                        <a:spcBef>
+                          <a:spcPts val="200"/>
+                        </a:spcBef>
+                        <a:spcAft>
+                          <a:spcPts val="200"/>
+                        </a:spcAft>
+                        <a:buNone/>
+                      </a:pPr>
+                      <a:r>
+                        <a:rPr sz="1100">
+                          <a:solidFill>
+                            <a:srgbClr val="111111">
+                              <a:alpha val="100000"/>
+                            </a:srgbClr>
+                          </a:solidFill>
+                          <a:latin typeface="Calibri"/>
+                          <a:cs typeface="Calibri"/>
+                        </a:rPr>
+                        <a:t>Crawley</a:t>
+                      </a:r>
+                    </a:p>
+                  </a:txBody>
+                  <a:tcPr anchor="t" marB="0" marT="0" marR="0" marL="0">
+                    <a:lnL w="0" cmpd="sng" algn="ctr" cap="flat">
+                      <a:solidFill>
+                        <a:srgbClr val="FFFFFF">
+                          <a:alpha val="0"/>
+                        </a:srgbClr>
+                      </a:solidFill>
+                      <a:prstDash val="solid"/>
+                    </a:lnL>
+                    <a:lnR w="0" cmpd="sng" algn="ctr" cap="flat">
+                      <a:solidFill>
+                        <a:srgbClr val="FFFFFF">
+                          <a:alpha val="0"/>
+                        </a:srgbClr>
+                      </a:solidFill>
+                      <a:prstDash val="solid"/>
+                    </a:lnR>
+                    <a:lnT w="0" cmpd="sng" algn="ctr" cap="flat">
+                      <a:solidFill>
+                        <a:srgbClr val="FFFFFF">
+                          <a:alpha val="0"/>
+                        </a:srgbClr>
+                      </a:solidFill>
+                      <a:prstDash val="solid"/>
+                    </a:lnT>
+                    <a:lnB w="0" cmpd="sng" algn="ctr" cap="flat">
+                      <a:solidFill>
+                        <a:srgbClr val="FFFFFF">
+                          <a:alpha val="0"/>
+                        </a:srgbClr>
+                      </a:solidFill>
+                      <a:prstDash val="solid"/>
+                    </a:lnB>
+                  </a:tcPr>
+                </a:tc>
+                <a:tc>
+                  <a:txBody>
+                    <a:bodyPr/>
+                    <a:lstStyle/>
+                    <a:p>
+                      <a:pPr algn="l" marL="63500" marR="63500">
+                        <a:lnSpc>
+                          <a:spcPct val="100000"/>
+                        </a:lnSpc>
+                        <a:spcBef>
+                          <a:spcPts val="200"/>
+                        </a:spcBef>
+                        <a:spcAft>
+                          <a:spcPts val="200"/>
+                        </a:spcAft>
+                        <a:buNone/>
+                      </a:pPr>
+                      <a:r>
+                        <a:rPr sz="1100">
+                          <a:solidFill>
+                            <a:srgbClr val="111111">
+                              <a:alpha val="100000"/>
+                            </a:srgbClr>
+                          </a:solidFill>
+                          <a:latin typeface="Calibri"/>
+                          <a:cs typeface="Calibri"/>
+                        </a:rPr>
+                        <a:t>147</a:t>
+                      </a:r>
+                    </a:p>
+                  </a:txBody>
+                  <a:tcPr anchor="t" marB="0" marT="0" marR="0" marL="0">
+                    <a:lnL w="0" cmpd="sng" algn="ctr" cap="flat">
+                      <a:solidFill>
+                        <a:srgbClr val="FFFFFF">
+                          <a:alpha val="0"/>
+                        </a:srgbClr>
+                      </a:solidFill>
+                      <a:prstDash val="solid"/>
+                    </a:lnL>
+                    <a:lnR w="0" cmpd="sng" algn="ctr" cap="flat">
+                      <a:solidFill>
+                        <a:srgbClr val="FFFFFF">
+                          <a:alpha val="0"/>
+                        </a:srgbClr>
+                      </a:solidFill>
+                      <a:prstDash val="solid"/>
+                    </a:lnR>
+                    <a:lnT w="0" cmpd="sng" algn="ctr" cap="flat">
+                      <a:solidFill>
+                        <a:srgbClr val="FFFFFF">
+                          <a:alpha val="0"/>
+                        </a:srgbClr>
+                      </a:solidFill>
+                      <a:prstDash val="solid"/>
+                    </a:lnT>
+                    <a:lnB w="0" cmpd="sng" algn="ctr" cap="flat">
+                      <a:solidFill>
+                        <a:srgbClr val="FFFFFF">
+                          <a:alpha val="0"/>
+                        </a:srgbClr>
+                      </a:solidFill>
+                      <a:prstDash val="solid"/>
+                    </a:lnB>
+                  </a:tcPr>
+                </a:tc>
+                <a:tc>
+                  <a:txBody>
+                    <a:bodyPr/>
+                    <a:lstStyle/>
+                    <a:p>
+                      <a:pPr algn="l" marL="63500" marR="63500">
+                        <a:lnSpc>
+                          <a:spcPct val="100000"/>
+                        </a:lnSpc>
+                        <a:spcBef>
+                          <a:spcPts val="200"/>
+                        </a:spcBef>
+                        <a:spcAft>
+                          <a:spcPts val="200"/>
+                        </a:spcAft>
+                        <a:buNone/>
+                      </a:pPr>
+                      <a:r>
+                        <a:rPr sz="1100">
+                          <a:solidFill>
+                            <a:srgbClr val="111111">
+                              <a:alpha val="100000"/>
+                            </a:srgbClr>
+                          </a:solidFill>
+                          <a:latin typeface="Calibri"/>
+                          <a:cs typeface="Calibri"/>
+                        </a:rPr>
+                        <a:t>130.8</a:t>
+                      </a:r>
+                    </a:p>
+                  </a:txBody>
+                  <a:tcPr anchor="t" marB="0" marT="0" marR="0" marL="0">
+                    <a:lnL w="0" cmpd="sng" algn="ctr" cap="flat">
+                      <a:solidFill>
+                        <a:srgbClr val="FFFFFF">
+                          <a:alpha val="0"/>
+                        </a:srgbClr>
+                      </a:solidFill>
+                      <a:prstDash val="solid"/>
+                    </a:lnL>
+                    <a:lnR w="0" cmpd="sng" algn="ctr" cap="flat">
+                      <a:solidFill>
+                        <a:srgbClr val="FFFFFF">
+                          <a:alpha val="0"/>
+                        </a:srgbClr>
+                      </a:solidFill>
+                      <a:prstDash val="solid"/>
+                    </a:lnR>
+                    <a:lnT w="0" cmpd="sng" algn="ctr" cap="flat">
+                      <a:solidFill>
+                        <a:srgbClr val="FFFFFF">
+                          <a:alpha val="0"/>
+                        </a:srgbClr>
+                      </a:solidFill>
+                      <a:prstDash val="solid"/>
+                    </a:lnT>
+                    <a:lnB w="0" cmpd="sng" algn="ctr" cap="flat">
+                      <a:solidFill>
+                        <a:srgbClr val="FFFFFF">
+                          <a:alpha val="0"/>
+                        </a:srgbClr>
+                      </a:solidFill>
+                      <a:prstDash val="solid"/>
+                    </a:lnB>
+                  </a:tcPr>
+                </a:tc>
+                <a:tc>
+                  <a:txBody>
+                    <a:bodyPr/>
+                    <a:lstStyle/>
+                    <a:p>
+                      <a:pPr algn="l" marL="63500" marR="63500">
+                        <a:lnSpc>
+                          <a:spcPct val="100000"/>
+                        </a:lnSpc>
+                        <a:spcBef>
+                          <a:spcPts val="200"/>
+                        </a:spcBef>
+                        <a:spcAft>
+                          <a:spcPts val="200"/>
+                        </a:spcAft>
+                        <a:buNone/>
+                      </a:pPr>
+                      <a:r>
+                        <a:rPr sz="1100">
+                          <a:solidFill>
+                            <a:srgbClr val="111111">
+                              <a:alpha val="100000"/>
+                            </a:srgbClr>
+                          </a:solidFill>
+                          <a:latin typeface="Calibri"/>
+                          <a:cs typeface="Calibri"/>
+                        </a:rPr>
+                        <a:t>265th</a:t>
+                      </a:r>
+                    </a:p>
+                  </a:txBody>
+                  <a:tcPr anchor="t" marB="0" marT="0" marR="0" marL="0">
+                    <a:lnL w="0" cmpd="sng" algn="ctr" cap="flat">
+                      <a:solidFill>
+                        <a:srgbClr val="FFFFFF">
+                          <a:alpha val="0"/>
+                        </a:srgbClr>
+                      </a:solidFill>
+                      <a:prstDash val="solid"/>
+                    </a:lnL>
+                    <a:lnR w="0" cmpd="sng" algn="ctr" cap="flat">
+                      <a:solidFill>
+                        <a:srgbClr val="FFFFFF">
+                          <a:alpha val="0"/>
+                        </a:srgbClr>
+                      </a:solidFill>
+                      <a:prstDash val="solid"/>
+                    </a:lnR>
+                    <a:lnT w="0" cmpd="sng" algn="ctr" cap="flat">
+                      <a:solidFill>
+                        <a:srgbClr val="FFFFFF">
+                          <a:alpha val="0"/>
+                        </a:srgbClr>
+                      </a:solidFill>
+                      <a:prstDash val="solid"/>
+                    </a:lnT>
+                    <a:lnB w="0" cmpd="sng" algn="ctr" cap="flat">
+                      <a:solidFill>
+                        <a:srgbClr val="FFFFFF">
+                          <a:alpha val="0"/>
+                        </a:srgbClr>
+                      </a:solidFill>
+                      <a:prstDash val="solid"/>
+                    </a:lnB>
+                  </a:tcPr>
+                </a:tc>
+                <a:tc>
+                  <a:txBody>
+                    <a:bodyPr/>
+                    <a:lstStyle/>
+                    <a:p>
+                      <a:pPr algn="l" marL="63500" marR="63500">
+                        <a:lnSpc>
+                          <a:spcPct val="100000"/>
+                        </a:lnSpc>
+                        <a:spcBef>
+                          <a:spcPts val="200"/>
+                        </a:spcBef>
+                        <a:spcAft>
+                          <a:spcPts val="200"/>
+                        </a:spcAft>
+                        <a:buNone/>
+                      </a:pPr>
+                      <a:r>
+                        <a:rPr sz="1100">
+                          <a:solidFill>
+                            <a:srgbClr val="111111">
+                              <a:alpha val="100000"/>
+                            </a:srgbClr>
+                          </a:solidFill>
+                          <a:latin typeface="Calibri"/>
+                          <a:cs typeface="Calibri"/>
+                        </a:rPr>
+                        <a:t>Decile 9</a:t>
+                      </a:r>
+                    </a:p>
+                  </a:txBody>
+                  <a:tcPr anchor="t" marB="0" marT="0" marR="0" marL="0">
+                    <a:lnL w="0" cmpd="sng" algn="ctr" cap="flat">
+                      <a:solidFill>
+                        <a:srgbClr val="FFFFFF">
+                          <a:alpha val="0"/>
+                        </a:srgbClr>
+                      </a:solidFill>
+                      <a:prstDash val="solid"/>
+                    </a:lnL>
+                    <a:lnR w="0" cmpd="sng" algn="ctr" cap="flat">
+                      <a:solidFill>
+                        <a:srgbClr val="FFFFFF">
+                          <a:alpha val="0"/>
+                        </a:srgbClr>
+                      </a:solidFill>
+                      <a:prstDash val="solid"/>
+                    </a:lnR>
+                    <a:lnT w="0" cmpd="sng" algn="ctr" cap="flat">
+                      <a:solidFill>
+                        <a:srgbClr val="FFFFFF">
+                          <a:alpha val="0"/>
+                        </a:srgbClr>
+                      </a:solidFill>
+                      <a:prstDash val="solid"/>
+                    </a:lnT>
+                    <a:lnB w="0" cmpd="sng" algn="ctr" cap="flat">
+                      <a:solidFill>
+                        <a:srgbClr val="FFFFFF">
+                          <a:alpha val="0"/>
+                        </a:srgbClr>
+                      </a:solidFill>
+                      <a:prstDash val="solid"/>
+                    </a:lnB>
+                  </a:tcPr>
+                </a:tc>
+              </a:tr>
+              <a:tr h="182880">
+                <a:tc>
+                  <a:txBody>
+                    <a:bodyPr/>
+                    <a:lstStyle/>
+                    <a:p>
+                      <a:pPr algn="l" marL="63500" marR="63500">
+                        <a:lnSpc>
+                          <a:spcPct val="100000"/>
+                        </a:lnSpc>
+                        <a:spcBef>
+                          <a:spcPts val="200"/>
+                        </a:spcBef>
+                        <a:spcAft>
+                          <a:spcPts val="200"/>
+                        </a:spcAft>
+                        <a:buNone/>
+                      </a:pPr>
+                      <a:r>
+                        <a:rPr sz="1100">
+                          <a:solidFill>
+                            <a:srgbClr val="111111">
+                              <a:alpha val="100000"/>
+                            </a:srgbClr>
+                          </a:solidFill>
+                          <a:latin typeface="Calibri"/>
+                          <a:cs typeface="Calibri"/>
+                        </a:rPr>
+                        <a:t>Horsham</a:t>
+                      </a:r>
+                    </a:p>
+                  </a:txBody>
+                  <a:tcPr anchor="t" marB="0" marT="0" marR="0" marL="0">
+                    <a:lnL w="0" cmpd="sng" algn="ctr" cap="flat">
+                      <a:solidFill>
+                        <a:srgbClr val="FFFFFF">
+                          <a:alpha val="0"/>
+                        </a:srgbClr>
+                      </a:solidFill>
+                      <a:prstDash val="solid"/>
+                    </a:lnL>
+                    <a:lnR w="0" cmpd="sng" algn="ctr" cap="flat">
+                      <a:solidFill>
+                        <a:srgbClr val="FFFFFF">
+                          <a:alpha val="0"/>
+                        </a:srgbClr>
+                      </a:solidFill>
+                      <a:prstDash val="solid"/>
+                    </a:lnR>
+                    <a:lnT w="0" cmpd="sng" algn="ctr" cap="flat">
+                      <a:solidFill>
+                        <a:srgbClr val="FFFFFF">
+                          <a:alpha val="0"/>
+                        </a:srgbClr>
+                      </a:solidFill>
+                      <a:prstDash val="solid"/>
+                    </a:lnT>
+                    <a:lnB w="0" cmpd="sng" algn="ctr" cap="flat">
+                      <a:solidFill>
+                        <a:srgbClr val="FFFFFF">
+                          <a:alpha val="0"/>
+                        </a:srgbClr>
+                      </a:solidFill>
+                      <a:prstDash val="solid"/>
+                    </a:lnB>
+                  </a:tcPr>
+                </a:tc>
+                <a:tc>
+                  <a:txBody>
+                    <a:bodyPr/>
+                    <a:lstStyle/>
+                    <a:p>
+                      <a:pPr algn="l" marL="63500" marR="63500">
+                        <a:lnSpc>
+                          <a:spcPct val="100000"/>
+                        </a:lnSpc>
+                        <a:spcBef>
+                          <a:spcPts val="200"/>
+                        </a:spcBef>
+                        <a:spcAft>
+                          <a:spcPts val="200"/>
+                        </a:spcAft>
+                        <a:buNone/>
+                      </a:pPr>
+                      <a:r>
+                        <a:rPr sz="1100">
+                          <a:solidFill>
+                            <a:srgbClr val="111111">
+                              <a:alpha val="100000"/>
+                            </a:srgbClr>
+                          </a:solidFill>
+                          <a:latin typeface="Calibri"/>
+                          <a:cs typeface="Calibri"/>
+                        </a:rPr>
+                        <a:t>162</a:t>
+                      </a:r>
+                    </a:p>
+                  </a:txBody>
+                  <a:tcPr anchor="t" marB="0" marT="0" marR="0" marL="0">
+                    <a:lnL w="0" cmpd="sng" algn="ctr" cap="flat">
+                      <a:solidFill>
+                        <a:srgbClr val="FFFFFF">
+                          <a:alpha val="0"/>
+                        </a:srgbClr>
+                      </a:solidFill>
+                      <a:prstDash val="solid"/>
+                    </a:lnL>
+                    <a:lnR w="0" cmpd="sng" algn="ctr" cap="flat">
+                      <a:solidFill>
+                        <a:srgbClr val="FFFFFF">
+                          <a:alpha val="0"/>
+                        </a:srgbClr>
+                      </a:solidFill>
+                      <a:prstDash val="solid"/>
+                    </a:lnR>
+                    <a:lnT w="0" cmpd="sng" algn="ctr" cap="flat">
+                      <a:solidFill>
+                        <a:srgbClr val="FFFFFF">
+                          <a:alpha val="0"/>
+                        </a:srgbClr>
+                      </a:solidFill>
+                      <a:prstDash val="solid"/>
+                    </a:lnT>
+                    <a:lnB w="0" cmpd="sng" algn="ctr" cap="flat">
+                      <a:solidFill>
+                        <a:srgbClr val="FFFFFF">
+                          <a:alpha val="0"/>
+                        </a:srgbClr>
+                      </a:solidFill>
+                      <a:prstDash val="solid"/>
+                    </a:lnB>
+                  </a:tcPr>
+                </a:tc>
+                <a:tc>
+                  <a:txBody>
+                    <a:bodyPr/>
+                    <a:lstStyle/>
+                    <a:p>
+                      <a:pPr algn="l" marL="63500" marR="63500">
+                        <a:lnSpc>
+                          <a:spcPct val="100000"/>
+                        </a:lnSpc>
+                        <a:spcBef>
+                          <a:spcPts val="200"/>
+                        </a:spcBef>
+                        <a:spcAft>
+                          <a:spcPts val="200"/>
+                        </a:spcAft>
+                        <a:buNone/>
+                      </a:pPr>
+                      <a:r>
+                        <a:rPr sz="1100">
+                          <a:solidFill>
+                            <a:srgbClr val="111111">
+                              <a:alpha val="100000"/>
+                            </a:srgbClr>
+                          </a:solidFill>
+                          <a:latin typeface="Calibri"/>
+                          <a:cs typeface="Calibri"/>
+                        </a:rPr>
+                        <a:t>112.7</a:t>
+                      </a:r>
+                    </a:p>
+                  </a:txBody>
+                  <a:tcPr anchor="t" marB="0" marT="0" marR="0" marL="0">
+                    <a:lnL w="0" cmpd="sng" algn="ctr" cap="flat">
+                      <a:solidFill>
+                        <a:srgbClr val="FFFFFF">
+                          <a:alpha val="0"/>
+                        </a:srgbClr>
+                      </a:solidFill>
+                      <a:prstDash val="solid"/>
+                    </a:lnL>
+                    <a:lnR w="0" cmpd="sng" algn="ctr" cap="flat">
+                      <a:solidFill>
+                        <a:srgbClr val="FFFFFF">
+                          <a:alpha val="0"/>
+                        </a:srgbClr>
+                      </a:solidFill>
+                      <a:prstDash val="solid"/>
+                    </a:lnR>
+                    <a:lnT w="0" cmpd="sng" algn="ctr" cap="flat">
+                      <a:solidFill>
+                        <a:srgbClr val="FFFFFF">
+                          <a:alpha val="0"/>
+                        </a:srgbClr>
+                      </a:solidFill>
+                      <a:prstDash val="solid"/>
+                    </a:lnT>
+                    <a:lnB w="0" cmpd="sng" algn="ctr" cap="flat">
+                      <a:solidFill>
+                        <a:srgbClr val="FFFFFF">
+                          <a:alpha val="0"/>
+                        </a:srgbClr>
+                      </a:solidFill>
+                      <a:prstDash val="solid"/>
+                    </a:lnB>
+                  </a:tcPr>
+                </a:tc>
+                <a:tc>
+                  <a:txBody>
+                    <a:bodyPr/>
+                    <a:lstStyle/>
+                    <a:p>
+                      <a:pPr algn="l" marL="63500" marR="63500">
+                        <a:lnSpc>
+                          <a:spcPct val="100000"/>
+                        </a:lnSpc>
+                        <a:spcBef>
+                          <a:spcPts val="200"/>
+                        </a:spcBef>
+                        <a:spcAft>
+                          <a:spcPts val="200"/>
+                        </a:spcAft>
+                        <a:buNone/>
+                      </a:pPr>
+                      <a:r>
+                        <a:rPr sz="1100">
+                          <a:solidFill>
+                            <a:srgbClr val="111111">
+                              <a:alpha val="100000"/>
+                            </a:srgbClr>
+                          </a:solidFill>
+                          <a:latin typeface="Calibri"/>
+                          <a:cs typeface="Calibri"/>
+                        </a:rPr>
+                        <a:t>284th</a:t>
                       </a:r>
                     </a:p>
                   </a:txBody>
@@ -15769,7 +16765,7 @@
                           <a:latin typeface="Calibri"/>
                           <a:cs typeface="Calibri"/>
                         </a:rPr>
-                        <a:t>Chichester</a:t>
+                        <a:t>Mid Sussex</a:t>
                       </a:r>
                     </a:p>
                   </a:txBody>
@@ -15835,7 +16831,7 @@
                           <a:latin typeface="Calibri"/>
                           <a:cs typeface="Calibri"/>
                         </a:rPr>
-                        <a:t>172</a:t>
+                        <a:t>249</a:t>
                       </a:r>
                     </a:p>
                   </a:txBody>
@@ -15901,7 +16897,7 @@
                           <a:latin typeface="Calibri"/>
                           <a:cs typeface="Calibri"/>
                         </a:rPr>
-                        <a:t>142.0</a:t>
+                        <a:t>164.9</a:t>
                       </a:r>
                     </a:p>
                   </a:txBody>
@@ -15967,7 +16963,7 @@
                           <a:latin typeface="Calibri"/>
                           <a:cs typeface="Calibri"/>
                         </a:rPr>
-                        <a:t>251st</a:t>
+                        <a:t>216th</a:t>
                       </a:r>
                     </a:p>
                   </a:txBody>
@@ -16033,7 +17029,7 @@
                           <a:latin typeface="Calibri"/>
                           <a:cs typeface="Calibri"/>
                         </a:rPr>
-                        <a:t>Decile 8</a:t>
+                        <a:t>Decile 7</a:t>
                       </a:r>
                     </a:p>
                   </a:txBody>
@@ -16101,7 +17097,7 @@
                           <a:latin typeface="Calibri"/>
                           <a:cs typeface="Calibri"/>
                         </a:rPr>
-                        <a:t>Crawley</a:t>
+                        <a:t>Worthing</a:t>
                       </a:r>
                     </a:p>
                   </a:txBody>
@@ -16167,7 +17163,7 @@
                           <a:latin typeface="Calibri"/>
                           <a:cs typeface="Calibri"/>
                         </a:rPr>
-                        <a:t>164</a:t>
+                        <a:t>98</a:t>
                       </a:r>
                     </a:p>
                   </a:txBody>
@@ -16233,7 +17229,7 @@
                           <a:latin typeface="Calibri"/>
                           <a:cs typeface="Calibri"/>
                         </a:rPr>
-                        <a:t>145.9</a:t>
+                        <a:t>88.6</a:t>
                       </a:r>
                     </a:p>
                   </a:txBody>
@@ -16299,339 +17295,7 @@
                           <a:latin typeface="Calibri"/>
                           <a:cs typeface="Calibri"/>
                         </a:rPr>
-                        <a:t>247th</a:t>
-                      </a:r>
-                    </a:p>
-                  </a:txBody>
-                  <a:tcPr anchor="t" marB="0" marT="0" marR="0" marL="0">
-                    <a:lnL w="0" cmpd="sng" algn="ctr" cap="flat">
-                      <a:solidFill>
-                        <a:srgbClr val="FFFFFF">
-                          <a:alpha val="0"/>
-                        </a:srgbClr>
-                      </a:solidFill>
-                      <a:prstDash val="solid"/>
-                    </a:lnL>
-                    <a:lnR w="0" cmpd="sng" algn="ctr" cap="flat">
-                      <a:solidFill>
-                        <a:srgbClr val="FFFFFF">
-                          <a:alpha val="0"/>
-                        </a:srgbClr>
-                      </a:solidFill>
-                      <a:prstDash val="solid"/>
-                    </a:lnR>
-                    <a:lnT w="0" cmpd="sng" algn="ctr" cap="flat">
-                      <a:solidFill>
-                        <a:srgbClr val="FFFFFF">
-                          <a:alpha val="0"/>
-                        </a:srgbClr>
-                      </a:solidFill>
-                      <a:prstDash val="solid"/>
-                    </a:lnT>
-                    <a:lnB w="0" cmpd="sng" algn="ctr" cap="flat">
-                      <a:solidFill>
-                        <a:srgbClr val="FFFFFF">
-                          <a:alpha val="0"/>
-                        </a:srgbClr>
-                      </a:solidFill>
-                      <a:prstDash val="solid"/>
-                    </a:lnB>
-                  </a:tcPr>
-                </a:tc>
-                <a:tc>
-                  <a:txBody>
-                    <a:bodyPr/>
-                    <a:lstStyle/>
-                    <a:p>
-                      <a:pPr algn="l" marL="63500" marR="63500">
-                        <a:lnSpc>
-                          <a:spcPct val="100000"/>
-                        </a:lnSpc>
-                        <a:spcBef>
-                          <a:spcPts val="200"/>
-                        </a:spcBef>
-                        <a:spcAft>
-                          <a:spcPts val="200"/>
-                        </a:spcAft>
-                        <a:buNone/>
-                      </a:pPr>
-                      <a:r>
-                        <a:rPr sz="1100">
-                          <a:solidFill>
-                            <a:srgbClr val="111111">
-                              <a:alpha val="100000"/>
-                            </a:srgbClr>
-                          </a:solidFill>
-                          <a:latin typeface="Calibri"/>
-                          <a:cs typeface="Calibri"/>
-                        </a:rPr>
-                        <a:t>Decile 8</a:t>
-                      </a:r>
-                    </a:p>
-                  </a:txBody>
-                  <a:tcPr anchor="t" marB="0" marT="0" marR="0" marL="0">
-                    <a:lnL w="0" cmpd="sng" algn="ctr" cap="flat">
-                      <a:solidFill>
-                        <a:srgbClr val="FFFFFF">
-                          <a:alpha val="0"/>
-                        </a:srgbClr>
-                      </a:solidFill>
-                      <a:prstDash val="solid"/>
-                    </a:lnL>
-                    <a:lnR w="0" cmpd="sng" algn="ctr" cap="flat">
-                      <a:solidFill>
-                        <a:srgbClr val="FFFFFF">
-                          <a:alpha val="0"/>
-                        </a:srgbClr>
-                      </a:solidFill>
-                      <a:prstDash val="solid"/>
-                    </a:lnR>
-                    <a:lnT w="0" cmpd="sng" algn="ctr" cap="flat">
-                      <a:solidFill>
-                        <a:srgbClr val="FFFFFF">
-                          <a:alpha val="0"/>
-                        </a:srgbClr>
-                      </a:solidFill>
-                      <a:prstDash val="solid"/>
-                    </a:lnT>
-                    <a:lnB w="0" cmpd="sng" algn="ctr" cap="flat">
-                      <a:solidFill>
-                        <a:srgbClr val="FFFFFF">
-                          <a:alpha val="0"/>
-                        </a:srgbClr>
-                      </a:solidFill>
-                      <a:prstDash val="solid"/>
-                    </a:lnB>
-                  </a:tcPr>
-                </a:tc>
-              </a:tr>
-              <a:tr h="182880">
-                <a:tc>
-                  <a:txBody>
-                    <a:bodyPr/>
-                    <a:lstStyle/>
-                    <a:p>
-                      <a:pPr algn="l" marL="63500" marR="63500">
-                        <a:lnSpc>
-                          <a:spcPct val="100000"/>
-                        </a:lnSpc>
-                        <a:spcBef>
-                          <a:spcPts val="200"/>
-                        </a:spcBef>
-                        <a:spcAft>
-                          <a:spcPts val="200"/>
-                        </a:spcAft>
-                        <a:buNone/>
-                      </a:pPr>
-                      <a:r>
-                        <a:rPr sz="1100">
-                          <a:solidFill>
-                            <a:srgbClr val="111111">
-                              <a:alpha val="100000"/>
-                            </a:srgbClr>
-                          </a:solidFill>
-                          <a:latin typeface="Calibri"/>
-                          <a:cs typeface="Calibri"/>
-                        </a:rPr>
-                        <a:t>Horsham</a:t>
-                      </a:r>
-                    </a:p>
-                  </a:txBody>
-                  <a:tcPr anchor="t" marB="0" marT="0" marR="0" marL="0">
-                    <a:lnL w="0" cmpd="sng" algn="ctr" cap="flat">
-                      <a:solidFill>
-                        <a:srgbClr val="FFFFFF">
-                          <a:alpha val="0"/>
-                        </a:srgbClr>
-                      </a:solidFill>
-                      <a:prstDash val="solid"/>
-                    </a:lnL>
-                    <a:lnR w="0" cmpd="sng" algn="ctr" cap="flat">
-                      <a:solidFill>
-                        <a:srgbClr val="FFFFFF">
-                          <a:alpha val="0"/>
-                        </a:srgbClr>
-                      </a:solidFill>
-                      <a:prstDash val="solid"/>
-                    </a:lnR>
-                    <a:lnT w="0" cmpd="sng" algn="ctr" cap="flat">
-                      <a:solidFill>
-                        <a:srgbClr val="FFFFFF">
-                          <a:alpha val="0"/>
-                        </a:srgbClr>
-                      </a:solidFill>
-                      <a:prstDash val="solid"/>
-                    </a:lnT>
-                    <a:lnB w="0" cmpd="sng" algn="ctr" cap="flat">
-                      <a:solidFill>
-                        <a:srgbClr val="FFFFFF">
-                          <a:alpha val="0"/>
-                        </a:srgbClr>
-                      </a:solidFill>
-                      <a:prstDash val="solid"/>
-                    </a:lnB>
-                  </a:tcPr>
-                </a:tc>
-                <a:tc>
-                  <a:txBody>
-                    <a:bodyPr/>
-                    <a:lstStyle/>
-                    <a:p>
-                      <a:pPr algn="l" marL="63500" marR="63500">
-                        <a:lnSpc>
-                          <a:spcPct val="100000"/>
-                        </a:lnSpc>
-                        <a:spcBef>
-                          <a:spcPts val="200"/>
-                        </a:spcBef>
-                        <a:spcAft>
-                          <a:spcPts val="200"/>
-                        </a:spcAft>
-                        <a:buNone/>
-                      </a:pPr>
-                      <a:r>
-                        <a:rPr sz="1100">
-                          <a:solidFill>
-                            <a:srgbClr val="111111">
-                              <a:alpha val="100000"/>
-                            </a:srgbClr>
-                          </a:solidFill>
-                          <a:latin typeface="Calibri"/>
-                          <a:cs typeface="Calibri"/>
-                        </a:rPr>
-                        <a:t>165</a:t>
-                      </a:r>
-                    </a:p>
-                  </a:txBody>
-                  <a:tcPr anchor="t" marB="0" marT="0" marR="0" marL="0">
-                    <a:lnL w="0" cmpd="sng" algn="ctr" cap="flat">
-                      <a:solidFill>
-                        <a:srgbClr val="FFFFFF">
-                          <a:alpha val="0"/>
-                        </a:srgbClr>
-                      </a:solidFill>
-                      <a:prstDash val="solid"/>
-                    </a:lnL>
-                    <a:lnR w="0" cmpd="sng" algn="ctr" cap="flat">
-                      <a:solidFill>
-                        <a:srgbClr val="FFFFFF">
-                          <a:alpha val="0"/>
-                        </a:srgbClr>
-                      </a:solidFill>
-                      <a:prstDash val="solid"/>
-                    </a:lnR>
-                    <a:lnT w="0" cmpd="sng" algn="ctr" cap="flat">
-                      <a:solidFill>
-                        <a:srgbClr val="FFFFFF">
-                          <a:alpha val="0"/>
-                        </a:srgbClr>
-                      </a:solidFill>
-                      <a:prstDash val="solid"/>
-                    </a:lnT>
-                    <a:lnB w="0" cmpd="sng" algn="ctr" cap="flat">
-                      <a:solidFill>
-                        <a:srgbClr val="FFFFFF">
-                          <a:alpha val="0"/>
-                        </a:srgbClr>
-                      </a:solidFill>
-                      <a:prstDash val="solid"/>
-                    </a:lnB>
-                  </a:tcPr>
-                </a:tc>
-                <a:tc>
-                  <a:txBody>
-                    <a:bodyPr/>
-                    <a:lstStyle/>
-                    <a:p>
-                      <a:pPr algn="l" marL="63500" marR="63500">
-                        <a:lnSpc>
-                          <a:spcPct val="100000"/>
-                        </a:lnSpc>
-                        <a:spcBef>
-                          <a:spcPts val="200"/>
-                        </a:spcBef>
-                        <a:spcAft>
-                          <a:spcPts val="200"/>
-                        </a:spcAft>
-                        <a:buNone/>
-                      </a:pPr>
-                      <a:r>
-                        <a:rPr sz="1100">
-                          <a:solidFill>
-                            <a:srgbClr val="111111">
-                              <a:alpha val="100000"/>
-                            </a:srgbClr>
-                          </a:solidFill>
-                          <a:latin typeface="Calibri"/>
-                          <a:cs typeface="Calibri"/>
-                        </a:rPr>
-                        <a:t>114.7</a:t>
-                      </a:r>
-                    </a:p>
-                  </a:txBody>
-                  <a:tcPr anchor="t" marB="0" marT="0" marR="0" marL="0">
-                    <a:lnL w="0" cmpd="sng" algn="ctr" cap="flat">
-                      <a:solidFill>
-                        <a:srgbClr val="FFFFFF">
-                          <a:alpha val="0"/>
-                        </a:srgbClr>
-                      </a:solidFill>
-                      <a:prstDash val="solid"/>
-                    </a:lnL>
-                    <a:lnR w="0" cmpd="sng" algn="ctr" cap="flat">
-                      <a:solidFill>
-                        <a:srgbClr val="FFFFFF">
-                          <a:alpha val="0"/>
-                        </a:srgbClr>
-                      </a:solidFill>
-                      <a:prstDash val="solid"/>
-                    </a:lnR>
-                    <a:lnT w="0" cmpd="sng" algn="ctr" cap="flat">
-                      <a:solidFill>
-                        <a:srgbClr val="FFFFFF">
-                          <a:alpha val="0"/>
-                        </a:srgbClr>
-                      </a:solidFill>
-                      <a:prstDash val="solid"/>
-                    </a:lnT>
-                    <a:lnB w="0" cmpd="sng" algn="ctr" cap="flat">
-                      <a:solidFill>
-                        <a:srgbClr val="FFFFFF">
-                          <a:alpha val="0"/>
-                        </a:srgbClr>
-                      </a:solidFill>
-                      <a:prstDash val="solid"/>
-                    </a:lnB>
-                  </a:tcPr>
-                </a:tc>
-                <a:tc>
-                  <a:txBody>
-                    <a:bodyPr/>
-                    <a:lstStyle/>
-                    <a:p>
-                      <a:pPr algn="l" marL="63500" marR="63500">
-                        <a:lnSpc>
-                          <a:spcPct val="100000"/>
-                        </a:lnSpc>
-                        <a:spcBef>
-                          <a:spcPts val="200"/>
-                        </a:spcBef>
-                        <a:spcAft>
-                          <a:spcPts val="200"/>
-                        </a:spcAft>
-                        <a:buNone/>
-                      </a:pPr>
-                      <a:r>
-                        <a:rPr sz="1100">
-                          <a:solidFill>
-                            <a:srgbClr val="111111">
-                              <a:alpha val="100000"/>
-                            </a:srgbClr>
-                          </a:solidFill>
-                          <a:latin typeface="Calibri"/>
-                          <a:cs typeface="Calibri"/>
-                        </a:rPr>
-                        <a:t>284th</a:t>
+                        <a:t>303rd</a:t>
                       </a:r>
                     </a:p>
                   </a:txBody>
@@ -16766,7 +17430,7 @@
                           <a:latin typeface="Calibri"/>
                           <a:cs typeface="Calibri"/>
                         </a:rPr>
-                        <a:t>Mid Sussex</a:t>
+                        <a:t>West Sussex</a:t>
                       </a:r>
                     </a:p>
                   </a:txBody>
@@ -16832,7 +17496,7 @@
                           <a:latin typeface="Calibri"/>
                           <a:cs typeface="Calibri"/>
                         </a:rPr>
-                        <a:t>225</a:t>
+                        <a:t>1,114</a:t>
                       </a:r>
                     </a:p>
                   </a:txBody>
@@ -16898,672 +17562,7 @@
                           <a:latin typeface="Calibri"/>
                           <a:cs typeface="Calibri"/>
                         </a:rPr>
-                        <a:t>149.0</a:t>
-                      </a:r>
-                    </a:p>
-                  </a:txBody>
-                  <a:tcPr anchor="t" marB="0" marT="0" marR="0" marL="0">
-                    <a:lnL w="0" cmpd="sng" algn="ctr" cap="flat">
-                      <a:solidFill>
-                        <a:srgbClr val="FFFFFF">
-                          <a:alpha val="0"/>
-                        </a:srgbClr>
-                      </a:solidFill>
-                      <a:prstDash val="solid"/>
-                    </a:lnL>
-                    <a:lnR w="0" cmpd="sng" algn="ctr" cap="flat">
-                      <a:solidFill>
-                        <a:srgbClr val="FFFFFF">
-                          <a:alpha val="0"/>
-                        </a:srgbClr>
-                      </a:solidFill>
-                      <a:prstDash val="solid"/>
-                    </a:lnR>
-                    <a:lnT w="0" cmpd="sng" algn="ctr" cap="flat">
-                      <a:solidFill>
-                        <a:srgbClr val="FFFFFF">
-                          <a:alpha val="0"/>
-                        </a:srgbClr>
-                      </a:solidFill>
-                      <a:prstDash val="solid"/>
-                    </a:lnT>
-                    <a:lnB w="0" cmpd="sng" algn="ctr" cap="flat">
-                      <a:solidFill>
-                        <a:srgbClr val="FFFFFF">
-                          <a:alpha val="0"/>
-                        </a:srgbClr>
-                      </a:solidFill>
-                      <a:prstDash val="solid"/>
-                    </a:lnB>
-                  </a:tcPr>
-                </a:tc>
-                <a:tc>
-                  <a:txBody>
-                    <a:bodyPr/>
-                    <a:lstStyle/>
-                    <a:p>
-                      <a:pPr algn="l" marL="63500" marR="63500">
-                        <a:lnSpc>
-                          <a:spcPct val="100000"/>
-                        </a:lnSpc>
-                        <a:spcBef>
-                          <a:spcPts val="200"/>
-                        </a:spcBef>
-                        <a:spcAft>
-                          <a:spcPts val="200"/>
-                        </a:spcAft>
-                        <a:buNone/>
-                      </a:pPr>
-                      <a:r>
-                        <a:rPr sz="1100">
-                          <a:solidFill>
-                            <a:srgbClr val="111111">
-                              <a:alpha val="100000"/>
-                            </a:srgbClr>
-                          </a:solidFill>
-                          <a:latin typeface="Calibri"/>
-                          <a:cs typeface="Calibri"/>
-                        </a:rPr>
-                        <a:t>242nd</a:t>
-                      </a:r>
-                    </a:p>
-                  </a:txBody>
-                  <a:tcPr anchor="t" marB="0" marT="0" marR="0" marL="0">
-                    <a:lnL w="0" cmpd="sng" algn="ctr" cap="flat">
-                      <a:solidFill>
-                        <a:srgbClr val="FFFFFF">
-                          <a:alpha val="0"/>
-                        </a:srgbClr>
-                      </a:solidFill>
-                      <a:prstDash val="solid"/>
-                    </a:lnL>
-                    <a:lnR w="0" cmpd="sng" algn="ctr" cap="flat">
-                      <a:solidFill>
-                        <a:srgbClr val="FFFFFF">
-                          <a:alpha val="0"/>
-                        </a:srgbClr>
-                      </a:solidFill>
-                      <a:prstDash val="solid"/>
-                    </a:lnR>
-                    <a:lnT w="0" cmpd="sng" algn="ctr" cap="flat">
-                      <a:solidFill>
-                        <a:srgbClr val="FFFFFF">
-                          <a:alpha val="0"/>
-                        </a:srgbClr>
-                      </a:solidFill>
-                      <a:prstDash val="solid"/>
-                    </a:lnT>
-                    <a:lnB w="0" cmpd="sng" algn="ctr" cap="flat">
-                      <a:solidFill>
-                        <a:srgbClr val="FFFFFF">
-                          <a:alpha val="0"/>
-                        </a:srgbClr>
-                      </a:solidFill>
-                      <a:prstDash val="solid"/>
-                    </a:lnB>
-                  </a:tcPr>
-                </a:tc>
-                <a:tc>
-                  <a:txBody>
-                    <a:bodyPr/>
-                    <a:lstStyle/>
-                    <a:p>
-                      <a:pPr algn="l" marL="63500" marR="63500">
-                        <a:lnSpc>
-                          <a:spcPct val="100000"/>
-                        </a:lnSpc>
-                        <a:spcBef>
-                          <a:spcPts val="200"/>
-                        </a:spcBef>
-                        <a:spcAft>
-                          <a:spcPts val="200"/>
-                        </a:spcAft>
-                        <a:buNone/>
-                      </a:pPr>
-                      <a:r>
-                        <a:rPr sz="1100">
-                          <a:solidFill>
-                            <a:srgbClr val="111111">
-                              <a:alpha val="100000"/>
-                            </a:srgbClr>
-                          </a:solidFill>
-                          <a:latin typeface="Calibri"/>
-                          <a:cs typeface="Calibri"/>
-                        </a:rPr>
-                        <a:t>Decile 8</a:t>
-                      </a:r>
-                    </a:p>
-                  </a:txBody>
-                  <a:tcPr anchor="t" marB="0" marT="0" marR="0" marL="0">
-                    <a:lnL w="0" cmpd="sng" algn="ctr" cap="flat">
-                      <a:solidFill>
-                        <a:srgbClr val="FFFFFF">
-                          <a:alpha val="0"/>
-                        </a:srgbClr>
-                      </a:solidFill>
-                      <a:prstDash val="solid"/>
-                    </a:lnL>
-                    <a:lnR w="0" cmpd="sng" algn="ctr" cap="flat">
-                      <a:solidFill>
-                        <a:srgbClr val="FFFFFF">
-                          <a:alpha val="0"/>
-                        </a:srgbClr>
-                      </a:solidFill>
-                      <a:prstDash val="solid"/>
-                    </a:lnR>
-                    <a:lnT w="0" cmpd="sng" algn="ctr" cap="flat">
-                      <a:solidFill>
-                        <a:srgbClr val="FFFFFF">
-                          <a:alpha val="0"/>
-                        </a:srgbClr>
-                      </a:solidFill>
-                      <a:prstDash val="solid"/>
-                    </a:lnT>
-                    <a:lnB w="0" cmpd="sng" algn="ctr" cap="flat">
-                      <a:solidFill>
-                        <a:srgbClr val="FFFFFF">
-                          <a:alpha val="0"/>
-                        </a:srgbClr>
-                      </a:solidFill>
-                      <a:prstDash val="solid"/>
-                    </a:lnB>
-                  </a:tcPr>
-                </a:tc>
-              </a:tr>
-              <a:tr h="182880">
-                <a:tc>
-                  <a:txBody>
-                    <a:bodyPr/>
-                    <a:lstStyle/>
-                    <a:p>
-                      <a:pPr algn="l" marL="63500" marR="63500">
-                        <a:lnSpc>
-                          <a:spcPct val="100000"/>
-                        </a:lnSpc>
-                        <a:spcBef>
-                          <a:spcPts val="200"/>
-                        </a:spcBef>
-                        <a:spcAft>
-                          <a:spcPts val="200"/>
-                        </a:spcAft>
-                        <a:buNone/>
-                      </a:pPr>
-                      <a:r>
-                        <a:rPr sz="1100">
-                          <a:solidFill>
-                            <a:srgbClr val="111111">
-                              <a:alpha val="100000"/>
-                            </a:srgbClr>
-                          </a:solidFill>
-                          <a:latin typeface="Calibri"/>
-                          <a:cs typeface="Calibri"/>
-                        </a:rPr>
-                        <a:t>Worthing</a:t>
-                      </a:r>
-                    </a:p>
-                  </a:txBody>
-                  <a:tcPr anchor="t" marB="0" marT="0" marR="0" marL="0">
-                    <a:lnL w="0" cmpd="sng" algn="ctr" cap="flat">
-                      <a:solidFill>
-                        <a:srgbClr val="FFFFFF">
-                          <a:alpha val="0"/>
-                        </a:srgbClr>
-                      </a:solidFill>
-                      <a:prstDash val="solid"/>
-                    </a:lnL>
-                    <a:lnR w="0" cmpd="sng" algn="ctr" cap="flat">
-                      <a:solidFill>
-                        <a:srgbClr val="FFFFFF">
-                          <a:alpha val="0"/>
-                        </a:srgbClr>
-                      </a:solidFill>
-                      <a:prstDash val="solid"/>
-                    </a:lnR>
-                    <a:lnT w="0" cmpd="sng" algn="ctr" cap="flat">
-                      <a:solidFill>
-                        <a:srgbClr val="FFFFFF">
-                          <a:alpha val="0"/>
-                        </a:srgbClr>
-                      </a:solidFill>
-                      <a:prstDash val="solid"/>
-                    </a:lnT>
-                    <a:lnB w="0" cmpd="sng" algn="ctr" cap="flat">
-                      <a:solidFill>
-                        <a:srgbClr val="FFFFFF">
-                          <a:alpha val="0"/>
-                        </a:srgbClr>
-                      </a:solidFill>
-                      <a:prstDash val="solid"/>
-                    </a:lnB>
-                  </a:tcPr>
-                </a:tc>
-                <a:tc>
-                  <a:txBody>
-                    <a:bodyPr/>
-                    <a:lstStyle/>
-                    <a:p>
-                      <a:pPr algn="l" marL="63500" marR="63500">
-                        <a:lnSpc>
-                          <a:spcPct val="100000"/>
-                        </a:lnSpc>
-                        <a:spcBef>
-                          <a:spcPts val="200"/>
-                        </a:spcBef>
-                        <a:spcAft>
-                          <a:spcPts val="200"/>
-                        </a:spcAft>
-                        <a:buNone/>
-                      </a:pPr>
-                      <a:r>
-                        <a:rPr sz="1100">
-                          <a:solidFill>
-                            <a:srgbClr val="111111">
-                              <a:alpha val="100000"/>
-                            </a:srgbClr>
-                          </a:solidFill>
-                          <a:latin typeface="Calibri"/>
-                          <a:cs typeface="Calibri"/>
-                        </a:rPr>
-                        <a:t>86</a:t>
-                      </a:r>
-                    </a:p>
-                  </a:txBody>
-                  <a:tcPr anchor="t" marB="0" marT="0" marR="0" marL="0">
-                    <a:lnL w="0" cmpd="sng" algn="ctr" cap="flat">
-                      <a:solidFill>
-                        <a:srgbClr val="FFFFFF">
-                          <a:alpha val="0"/>
-                        </a:srgbClr>
-                      </a:solidFill>
-                      <a:prstDash val="solid"/>
-                    </a:lnL>
-                    <a:lnR w="0" cmpd="sng" algn="ctr" cap="flat">
-                      <a:solidFill>
-                        <a:srgbClr val="FFFFFF">
-                          <a:alpha val="0"/>
-                        </a:srgbClr>
-                      </a:solidFill>
-                      <a:prstDash val="solid"/>
-                    </a:lnR>
-                    <a:lnT w="0" cmpd="sng" algn="ctr" cap="flat">
-                      <a:solidFill>
-                        <a:srgbClr val="FFFFFF">
-                          <a:alpha val="0"/>
-                        </a:srgbClr>
-                      </a:solidFill>
-                      <a:prstDash val="solid"/>
-                    </a:lnT>
-                    <a:lnB w="0" cmpd="sng" algn="ctr" cap="flat">
-                      <a:solidFill>
-                        <a:srgbClr val="FFFFFF">
-                          <a:alpha val="0"/>
-                        </a:srgbClr>
-                      </a:solidFill>
-                      <a:prstDash val="solid"/>
-                    </a:lnB>
-                  </a:tcPr>
-                </a:tc>
-                <a:tc>
-                  <a:txBody>
-                    <a:bodyPr/>
-                    <a:lstStyle/>
-                    <a:p>
-                      <a:pPr algn="l" marL="63500" marR="63500">
-                        <a:lnSpc>
-                          <a:spcPct val="100000"/>
-                        </a:lnSpc>
-                        <a:spcBef>
-                          <a:spcPts val="200"/>
-                        </a:spcBef>
-                        <a:spcAft>
-                          <a:spcPts val="200"/>
-                        </a:spcAft>
-                        <a:buNone/>
-                      </a:pPr>
-                      <a:r>
-                        <a:rPr sz="1100">
-                          <a:solidFill>
-                            <a:srgbClr val="111111">
-                              <a:alpha val="100000"/>
-                            </a:srgbClr>
-                          </a:solidFill>
-                          <a:latin typeface="Calibri"/>
-                          <a:cs typeface="Calibri"/>
-                        </a:rPr>
-                        <a:t>77.8</a:t>
-                      </a:r>
-                    </a:p>
-                  </a:txBody>
-                  <a:tcPr anchor="t" marB="0" marT="0" marR="0" marL="0">
-                    <a:lnL w="0" cmpd="sng" algn="ctr" cap="flat">
-                      <a:solidFill>
-                        <a:srgbClr val="FFFFFF">
-                          <a:alpha val="0"/>
-                        </a:srgbClr>
-                      </a:solidFill>
-                      <a:prstDash val="solid"/>
-                    </a:lnL>
-                    <a:lnR w="0" cmpd="sng" algn="ctr" cap="flat">
-                      <a:solidFill>
-                        <a:srgbClr val="FFFFFF">
-                          <a:alpha val="0"/>
-                        </a:srgbClr>
-                      </a:solidFill>
-                      <a:prstDash val="solid"/>
-                    </a:lnR>
-                    <a:lnT w="0" cmpd="sng" algn="ctr" cap="flat">
-                      <a:solidFill>
-                        <a:srgbClr val="FFFFFF">
-                          <a:alpha val="0"/>
-                        </a:srgbClr>
-                      </a:solidFill>
-                      <a:prstDash val="solid"/>
-                    </a:lnT>
-                    <a:lnB w="0" cmpd="sng" algn="ctr" cap="flat">
-                      <a:solidFill>
-                        <a:srgbClr val="FFFFFF">
-                          <a:alpha val="0"/>
-                        </a:srgbClr>
-                      </a:solidFill>
-                      <a:prstDash val="solid"/>
-                    </a:lnB>
-                  </a:tcPr>
-                </a:tc>
-                <a:tc>
-                  <a:txBody>
-                    <a:bodyPr/>
-                    <a:lstStyle/>
-                    <a:p>
-                      <a:pPr algn="l" marL="63500" marR="63500">
-                        <a:lnSpc>
-                          <a:spcPct val="100000"/>
-                        </a:lnSpc>
-                        <a:spcBef>
-                          <a:spcPts val="200"/>
-                        </a:spcBef>
-                        <a:spcAft>
-                          <a:spcPts val="200"/>
-                        </a:spcAft>
-                        <a:buNone/>
-                      </a:pPr>
-                      <a:r>
-                        <a:rPr sz="1100">
-                          <a:solidFill>
-                            <a:srgbClr val="111111">
-                              <a:alpha val="100000"/>
-                            </a:srgbClr>
-                          </a:solidFill>
-                          <a:latin typeface="Calibri"/>
-                          <a:cs typeface="Calibri"/>
-                        </a:rPr>
-                        <a:t>308th</a:t>
-                      </a:r>
-                    </a:p>
-                  </a:txBody>
-                  <a:tcPr anchor="t" marB="0" marT="0" marR="0" marL="0">
-                    <a:lnL w="0" cmpd="sng" algn="ctr" cap="flat">
-                      <a:solidFill>
-                        <a:srgbClr val="FFFFFF">
-                          <a:alpha val="0"/>
-                        </a:srgbClr>
-                      </a:solidFill>
-                      <a:prstDash val="solid"/>
-                    </a:lnL>
-                    <a:lnR w="0" cmpd="sng" algn="ctr" cap="flat">
-                      <a:solidFill>
-                        <a:srgbClr val="FFFFFF">
-                          <a:alpha val="0"/>
-                        </a:srgbClr>
-                      </a:solidFill>
-                      <a:prstDash val="solid"/>
-                    </a:lnR>
-                    <a:lnT w="0" cmpd="sng" algn="ctr" cap="flat">
-                      <a:solidFill>
-                        <a:srgbClr val="FFFFFF">
-                          <a:alpha val="0"/>
-                        </a:srgbClr>
-                      </a:solidFill>
-                      <a:prstDash val="solid"/>
-                    </a:lnT>
-                    <a:lnB w="0" cmpd="sng" algn="ctr" cap="flat">
-                      <a:solidFill>
-                        <a:srgbClr val="FFFFFF">
-                          <a:alpha val="0"/>
-                        </a:srgbClr>
-                      </a:solidFill>
-                      <a:prstDash val="solid"/>
-                    </a:lnB>
-                  </a:tcPr>
-                </a:tc>
-                <a:tc>
-                  <a:txBody>
-                    <a:bodyPr/>
-                    <a:lstStyle/>
-                    <a:p>
-                      <a:pPr algn="l" marL="63500" marR="63500">
-                        <a:lnSpc>
-                          <a:spcPct val="100000"/>
-                        </a:lnSpc>
-                        <a:spcBef>
-                          <a:spcPts val="200"/>
-                        </a:spcBef>
-                        <a:spcAft>
-                          <a:spcPts val="200"/>
-                        </a:spcAft>
-                        <a:buNone/>
-                      </a:pPr>
-                      <a:r>
-                        <a:rPr sz="1100">
-                          <a:solidFill>
-                            <a:srgbClr val="111111">
-                              <a:alpha val="100000"/>
-                            </a:srgbClr>
-                          </a:solidFill>
-                          <a:latin typeface="Calibri"/>
-                          <a:cs typeface="Calibri"/>
-                        </a:rPr>
-                        <a:t>10% of authorities
-with lowest rate</a:t>
-                      </a:r>
-                    </a:p>
-                  </a:txBody>
-                  <a:tcPr anchor="t" marB="0" marT="0" marR="0" marL="0">
-                    <a:lnL w="0" cmpd="sng" algn="ctr" cap="flat">
-                      <a:solidFill>
-                        <a:srgbClr val="FFFFFF">
-                          <a:alpha val="0"/>
-                        </a:srgbClr>
-                      </a:solidFill>
-                      <a:prstDash val="solid"/>
-                    </a:lnL>
-                    <a:lnR w="0" cmpd="sng" algn="ctr" cap="flat">
-                      <a:solidFill>
-                        <a:srgbClr val="FFFFFF">
-                          <a:alpha val="0"/>
-                        </a:srgbClr>
-                      </a:solidFill>
-                      <a:prstDash val="solid"/>
-                    </a:lnR>
-                    <a:lnT w="0" cmpd="sng" algn="ctr" cap="flat">
-                      <a:solidFill>
-                        <a:srgbClr val="FFFFFF">
-                          <a:alpha val="0"/>
-                        </a:srgbClr>
-                      </a:solidFill>
-                      <a:prstDash val="solid"/>
-                    </a:lnT>
-                    <a:lnB w="0" cmpd="sng" algn="ctr" cap="flat">
-                      <a:solidFill>
-                        <a:srgbClr val="FFFFFF">
-                          <a:alpha val="0"/>
-                        </a:srgbClr>
-                      </a:solidFill>
-                      <a:prstDash val="solid"/>
-                    </a:lnB>
-                  </a:tcPr>
-                </a:tc>
-              </a:tr>
-              <a:tr h="182880">
-                <a:tc>
-                  <a:txBody>
-                    <a:bodyPr/>
-                    <a:lstStyle/>
-                    <a:p>
-                      <a:pPr algn="l" marL="63500" marR="63500">
-                        <a:lnSpc>
-                          <a:spcPct val="100000"/>
-                        </a:lnSpc>
-                        <a:spcBef>
-                          <a:spcPts val="200"/>
-                        </a:spcBef>
-                        <a:spcAft>
-                          <a:spcPts val="200"/>
-                        </a:spcAft>
-                        <a:buNone/>
-                      </a:pPr>
-                      <a:r>
-                        <a:rPr sz="1100">
-                          <a:solidFill>
-                            <a:srgbClr val="111111">
-                              <a:alpha val="100000"/>
-                            </a:srgbClr>
-                          </a:solidFill>
-                          <a:latin typeface="Calibri"/>
-                          <a:cs typeface="Calibri"/>
-                        </a:rPr>
-                        <a:t>West Sussex</a:t>
-                      </a:r>
-                    </a:p>
-                  </a:txBody>
-                  <a:tcPr anchor="t" marB="0" marT="0" marR="0" marL="0">
-                    <a:lnL w="0" cmpd="sng" algn="ctr" cap="flat">
-                      <a:solidFill>
-                        <a:srgbClr val="FFFFFF">
-                          <a:alpha val="0"/>
-                        </a:srgbClr>
-                      </a:solidFill>
-                      <a:prstDash val="solid"/>
-                    </a:lnL>
-                    <a:lnR w="0" cmpd="sng" algn="ctr" cap="flat">
-                      <a:solidFill>
-                        <a:srgbClr val="FFFFFF">
-                          <a:alpha val="0"/>
-                        </a:srgbClr>
-                      </a:solidFill>
-                      <a:prstDash val="solid"/>
-                    </a:lnR>
-                    <a:lnT w="0" cmpd="sng" algn="ctr" cap="flat">
-                      <a:solidFill>
-                        <a:srgbClr val="FFFFFF">
-                          <a:alpha val="0"/>
-                        </a:srgbClr>
-                      </a:solidFill>
-                      <a:prstDash val="solid"/>
-                    </a:lnT>
-                    <a:lnB w="0" cmpd="sng" algn="ctr" cap="flat">
-                      <a:solidFill>
-                        <a:srgbClr val="FFFFFF">
-                          <a:alpha val="0"/>
-                        </a:srgbClr>
-                      </a:solidFill>
-                      <a:prstDash val="solid"/>
-                    </a:lnB>
-                  </a:tcPr>
-                </a:tc>
-                <a:tc>
-                  <a:txBody>
-                    <a:bodyPr/>
-                    <a:lstStyle/>
-                    <a:p>
-                      <a:pPr algn="l" marL="63500" marR="63500">
-                        <a:lnSpc>
-                          <a:spcPct val="100000"/>
-                        </a:lnSpc>
-                        <a:spcBef>
-                          <a:spcPts val="200"/>
-                        </a:spcBef>
-                        <a:spcAft>
-                          <a:spcPts val="200"/>
-                        </a:spcAft>
-                        <a:buNone/>
-                      </a:pPr>
-                      <a:r>
-                        <a:rPr sz="1100">
-                          <a:solidFill>
-                            <a:srgbClr val="111111">
-                              <a:alpha val="100000"/>
-                            </a:srgbClr>
-                          </a:solidFill>
-                          <a:latin typeface="Calibri"/>
-                          <a:cs typeface="Calibri"/>
-                        </a:rPr>
-                        <a:t>1,053</a:t>
-                      </a:r>
-                    </a:p>
-                  </a:txBody>
-                  <a:tcPr anchor="t" marB="0" marT="0" marR="0" marL="0">
-                    <a:lnL w="0" cmpd="sng" algn="ctr" cap="flat">
-                      <a:solidFill>
-                        <a:srgbClr val="FFFFFF">
-                          <a:alpha val="0"/>
-                        </a:srgbClr>
-                      </a:solidFill>
-                      <a:prstDash val="solid"/>
-                    </a:lnL>
-                    <a:lnR w="0" cmpd="sng" algn="ctr" cap="flat">
-                      <a:solidFill>
-                        <a:srgbClr val="FFFFFF">
-                          <a:alpha val="0"/>
-                        </a:srgbClr>
-                      </a:solidFill>
-                      <a:prstDash val="solid"/>
-                    </a:lnR>
-                    <a:lnT w="0" cmpd="sng" algn="ctr" cap="flat">
-                      <a:solidFill>
-                        <a:srgbClr val="FFFFFF">
-                          <a:alpha val="0"/>
-                        </a:srgbClr>
-                      </a:solidFill>
-                      <a:prstDash val="solid"/>
-                    </a:lnT>
-                    <a:lnB w="0" cmpd="sng" algn="ctr" cap="flat">
-                      <a:solidFill>
-                        <a:srgbClr val="FFFFFF">
-                          <a:alpha val="0"/>
-                        </a:srgbClr>
-                      </a:solidFill>
-                      <a:prstDash val="solid"/>
-                    </a:lnB>
-                  </a:tcPr>
-                </a:tc>
-                <a:tc>
-                  <a:txBody>
-                    <a:bodyPr/>
-                    <a:lstStyle/>
-                    <a:p>
-                      <a:pPr algn="l" marL="63500" marR="63500">
-                        <a:lnSpc>
-                          <a:spcPct val="100000"/>
-                        </a:lnSpc>
-                        <a:spcBef>
-                          <a:spcPts val="200"/>
-                        </a:spcBef>
-                        <a:spcAft>
-                          <a:spcPts val="200"/>
-                        </a:spcAft>
-                        <a:buNone/>
-                      </a:pPr>
-                      <a:r>
-                        <a:rPr sz="1100">
-                          <a:solidFill>
-                            <a:srgbClr val="111111">
-                              <a:alpha val="100000"/>
-                            </a:srgbClr>
-                          </a:solidFill>
-                          <a:latin typeface="Calibri"/>
-                          <a:cs typeface="Calibri"/>
-                        </a:rPr>
-                        <a:t>121.9</a:t>
+                        <a:t>128.9</a:t>
                       </a:r>
                     </a:p>
                   </a:txBody>
@@ -17829,7 +17828,7 @@
                           <a:latin typeface="Calibri"/>
                           <a:cs typeface="Calibri"/>
                         </a:rPr>
-                        <a:t>149,898</a:t>
+                        <a:t>145,796</a:t>
                       </a:r>
                     </a:p>
                   </a:txBody>
@@ -17895,7 +17894,7 @@
                           <a:latin typeface="Calibri"/>
                           <a:cs typeface="Calibri"/>
                         </a:rPr>
-                        <a:t>266.3</a:t>
+                        <a:t>259.0</a:t>
                       </a:r>
                     </a:p>
                   </a:txBody>
@@ -18161,7 +18160,7 @@
                           <a:latin typeface="Calibri"/>
                           <a:cs typeface="Calibri"/>
                         </a:rPr>
-                        <a:t>16,929</a:t>
+                        <a:t>16,961</a:t>
                       </a:r>
                     </a:p>
                   </a:txBody>
@@ -18227,7 +18226,7 @@
                           <a:latin typeface="Calibri"/>
                           <a:cs typeface="Calibri"/>
                         </a:rPr>
-                        <a:t>184.4</a:t>
+                        <a:t>184.8</a:t>
                       </a:r>
                     </a:p>
                   </a:txBody>
@@ -18476,7 +18475,7 @@
           <a:p>
             <a:r>
               <a:rPr/>
-              <a:t>Pack date: 20 November 2020</a:t>
+              <a:t>Pack date: 22 November 2020</a:t>
             </a:r>
           </a:p>
         </p:txBody>
@@ -18666,7 +18665,7 @@
           <a:p>
             <a:r>
               <a:rPr/>
-              <a:t>Pack date: 20 November 2020</a:t>
+              <a:t>Pack date: 22 November 2020</a:t>
             </a:r>
           </a:p>
         </p:txBody>
@@ -18824,7 +18823,7 @@
           <a:p>
             <a:r>
               <a:rPr/>
-              <a:t>Pack date: 20 November 2020</a:t>
+              <a:t>Pack date: 22 November 2020</a:t>
             </a:r>
           </a:p>
         </p:txBody>
@@ -18982,7 +18981,7 @@
           <a:p>
             <a:r>
               <a:rPr/>
-              <a:t>Pack date: 20 November 2020</a:t>
+              <a:t>Pack date: 22 November 2020</a:t>
             </a:r>
           </a:p>
         </p:txBody>
@@ -19140,7 +19139,7 @@
           <a:p>
             <a:r>
               <a:rPr/>
-              <a:t>Pack date: 20 November 2020</a:t>
+              <a:t>Pack date: 22 November 2020</a:t>
             </a:r>
           </a:p>
         </p:txBody>
@@ -19329,7 +19328,7 @@
           <a:p>
             <a:r>
               <a:rPr/>
-              <a:t>Pack date: 20 November 2020</a:t>
+              <a:t>Pack date: 22 November 2020</a:t>
             </a:r>
           </a:p>
         </p:txBody>
@@ -19487,7 +19486,7 @@
           <a:p>
             <a:r>
               <a:rPr/>
-              <a:t>Pack date: 20 November 2020</a:t>
+              <a:t>Pack date: 22 November 2020</a:t>
             </a:r>
           </a:p>
         </p:txBody>
@@ -19645,7 +19644,7 @@
           <a:p>
             <a:r>
               <a:rPr/>
-              <a:t>Pack date: 20 November 2020</a:t>
+              <a:t>Pack date: 22 November 2020</a:t>
             </a:r>
           </a:p>
         </p:txBody>
@@ -19803,7 +19802,7 @@
           <a:p>
             <a:r>
               <a:rPr/>
-              <a:t>Pack date: 20 November 2020</a:t>
+              <a:t>Pack date: 22 November 2020</a:t>
             </a:r>
           </a:p>
         </p:txBody>
@@ -19961,7 +19960,7 @@
           <a:p>
             <a:r>
               <a:rPr/>
-              <a:t>Pack date: 20 November 2020</a:t>
+              <a:t>Pack date: 22 November 2020</a:t>
             </a:r>
           </a:p>
         </p:txBody>
@@ -20119,7 +20118,7 @@
           <a:p>
             <a:r>
               <a:rPr/>
-              <a:t>Pack date: 20 November 2020</a:t>
+              <a:t>Pack date: 22 November 2020</a:t>
             </a:r>
           </a:p>
         </p:txBody>
@@ -20251,7 +20250,7 @@
           <a:p>
             <a:r>
               <a:rPr/>
-              <a:t>Pack date: 20 November 2020</a:t>
+              <a:t>Pack date: 22 November 2020</a:t>
             </a:r>
           </a:p>
         </p:txBody>
@@ -20383,7 +20382,7 @@
           <a:p>
             <a:r>
               <a:rPr/>
-              <a:t>Pack date: 20 November 2020</a:t>
+              <a:t>Pack date: 22 November 2020</a:t>
             </a:r>
           </a:p>
         </p:txBody>
@@ -20515,7 +20514,7 @@
           <a:p>
             <a:r>
               <a:rPr/>
-              <a:t>Pack date: 20 November 2020</a:t>
+              <a:t>Pack date: 22 November 2020</a:t>
             </a:r>
           </a:p>
         </p:txBody>
@@ -20647,7 +20646,7 @@
           <a:p>
             <a:r>
               <a:rPr/>
-              <a:t>Pack date: 20 November 2020</a:t>
+              <a:t>Pack date: 22 November 2020</a:t>
             </a:r>
           </a:p>
         </p:txBody>
@@ -20779,7 +20778,7 @@
           <a:p>
             <a:r>
               <a:rPr/>
-              <a:t>Pack date: 20 November 2020</a:t>
+              <a:t>Pack date: 22 November 2020</a:t>
             </a:r>
           </a:p>
         </p:txBody>
@@ -20911,7 +20910,7 @@
           <a:p>
             <a:r>
               <a:rPr/>
-              <a:t>Pack date: 20 November 2020</a:t>
+              <a:t>Pack date: 22 November 2020</a:t>
             </a:r>
           </a:p>
         </p:txBody>

</xml_diff>

<commit_message>
Update + Small screen redirect message
</commit_message>
<xml_diff>
--- a/Latest_West_Sussex_C19_slide_deck.pptx
+++ b/Latest_West_Sussex_C19_slide_deck.pptx
@@ -7177,7 +7177,7 @@
           <a:p>
             <a:r>
               <a:rPr/>
-              <a:t>Pack date: 24 November 2020</a:t>
+              <a:t>Pack date: 25 November 2020</a:t>
             </a:r>
           </a:p>
         </p:txBody>
@@ -7309,7 +7309,7 @@
           <a:p>
             <a:r>
               <a:rPr/>
-              <a:t>Pack date: 24 November 2020</a:t>
+              <a:t>Pack date: 25 November 2020</a:t>
             </a:r>
           </a:p>
         </p:txBody>
@@ -7467,7 +7467,7 @@
           <a:p>
             <a:r>
               <a:rPr/>
-              <a:t>Pack date: 24 November 2020</a:t>
+              <a:t>Pack date: 25 November 2020</a:t>
             </a:r>
           </a:p>
         </p:txBody>
@@ -7548,7 +7548,7 @@
           <a:p>
             <a:r>
               <a:rPr/>
-              <a:t>Upper Tier Local Authority cumulative cases as at 24 November</a:t>
+              <a:t>Upper Tier Local Authority cumulative cases as at 25 November</a:t>
             </a:r>
           </a:p>
         </p:txBody>
@@ -8083,7 +8083,7 @@
                           <a:latin typeface="Calibri"/>
                           <a:cs typeface="Calibri"/>
                         </a:rPr>
-                        <a:t>8,665</a:t>
+                        <a:t>8,774</a:t>
                       </a:r>
                     </a:p>
                   </a:txBody>
@@ -8149,7 +8149,7 @@
                           <a:latin typeface="Calibri"/>
                           <a:cs typeface="Calibri"/>
                         </a:rPr>
-                        <a:t>1,002.9</a:t>
+                        <a:t>1,015.5</a:t>
                       </a:r>
                     </a:p>
                   </a:txBody>
@@ -8215,7 +8215,7 @@
                           <a:latin typeface="Calibri"/>
                           <a:cs typeface="Calibri"/>
                         </a:rPr>
-                        <a:t>141st</a:t>
+                        <a:t>140th</a:t>
                       </a:r>
                     </a:p>
                   </a:txBody>
@@ -8416,7 +8416,7 @@
                           <a:latin typeface="Calibri"/>
                           <a:cs typeface="Calibri"/>
                         </a:rPr>
-                        <a:t>1,324,742</a:t>
+                        <a:t>1,340,635</a:t>
                       </a:r>
                     </a:p>
                   </a:txBody>
@@ -8482,7 +8482,7 @@
                           <a:latin typeface="Calibri"/>
                           <a:cs typeface="Calibri"/>
                         </a:rPr>
-                        <a:t>2,353.6</a:t>
+                        <a:t>2,381.8</a:t>
                       </a:r>
                     </a:p>
                   </a:txBody>
@@ -8748,7 +8748,7 @@
                           <a:latin typeface="Calibri"/>
                           <a:cs typeface="Calibri"/>
                         </a:rPr>
-                        <a:t>123,144</a:t>
+                        <a:t>125,508</a:t>
                       </a:r>
                     </a:p>
                   </a:txBody>
@@ -8814,7 +8814,7 @@
                           <a:latin typeface="Calibri"/>
                           <a:cs typeface="Calibri"/>
                         </a:rPr>
-                        <a:t>1,341.4</a:t>
+                        <a:t>1,367.2</a:t>
                       </a:r>
                     </a:p>
                   </a:txBody>
@@ -9063,7 +9063,7 @@
           <a:p>
             <a:r>
               <a:rPr/>
-              <a:t>Pack date: 24 November 2020</a:t>
+              <a:t>Pack date: 25 November 2020</a:t>
             </a:r>
           </a:p>
         </p:txBody>
@@ -9144,7 +9144,7 @@
           <a:p>
             <a:r>
               <a:rPr/>
-              <a:t>Upper Tier Local Authority rolling 7 day cases as at 24 November</a:t>
+              <a:t>Upper Tier Local Authority rolling 7 day cases as at 25 November</a:t>
             </a:r>
           </a:p>
         </p:txBody>
@@ -9225,7 +9225,7 @@
           <a:p>
             <a:r>
               <a:rPr/>
-              <a:t>Note that the very recent days are excluded in the 7-day total as these are thought to be incomplete. As such, this data represents cases in the seven days to 19 November</a:t>
+              <a:t>Note that the very recent days are excluded in the 7-day total as these are thought to be incomplete. As such, this data represents cases in the seven days to 20 November</a:t>
             </a:r>
           </a:p>
         </p:txBody>
@@ -9679,7 +9679,7 @@
                           <a:latin typeface="Calibri"/>
                           <a:cs typeface="Calibri"/>
                         </a:rPr>
-                        <a:t>963</a:t>
+                        <a:t>914</a:t>
                       </a:r>
                     </a:p>
                   </a:txBody>
@@ -9745,7 +9745,7 @@
                           <a:latin typeface="Calibri"/>
                           <a:cs typeface="Calibri"/>
                         </a:rPr>
-                        <a:t>111.5</a:t>
+                        <a:t>105.8</a:t>
                       </a:r>
                     </a:p>
                   </a:txBody>
@@ -9811,7 +9811,7 @@
                           <a:latin typeface="Calibri"/>
                           <a:cs typeface="Calibri"/>
                         </a:rPr>
-                        <a:t>134th</a:t>
+                        <a:t>135th</a:t>
                       </a:r>
                     </a:p>
                   </a:txBody>
@@ -9877,7 +9877,8 @@
                           <a:latin typeface="Calibri"/>
                           <a:cs typeface="Calibri"/>
                         </a:rPr>
-                        <a:t>Decile 9</a:t>
+                        <a:t>10% of authorities
+with lowest rate</a:t>
                       </a:r>
                     </a:p>
                   </a:txBody>
@@ -10011,7 +10012,7 @@
                           <a:latin typeface="Calibri"/>
                           <a:cs typeface="Calibri"/>
                         </a:rPr>
-                        <a:t>129,610</a:t>
+                        <a:t>122,929</a:t>
                       </a:r>
                     </a:p>
                   </a:txBody>
@@ -10077,7 +10078,7 @@
                           <a:latin typeface="Calibri"/>
                           <a:cs typeface="Calibri"/>
                         </a:rPr>
-                        <a:t>230.3</a:t>
+                        <a:t>218.4</a:t>
                       </a:r>
                     </a:p>
                   </a:txBody>
@@ -10343,7 +10344,7 @@
                           <a:latin typeface="Calibri"/>
                           <a:cs typeface="Calibri"/>
                         </a:rPr>
-                        <a:t>15,671</a:t>
+                        <a:t>14,899</a:t>
                       </a:r>
                     </a:p>
                   </a:txBody>
@@ -10409,7 +10410,7 @@
                           <a:latin typeface="Calibri"/>
                           <a:cs typeface="Calibri"/>
                         </a:rPr>
-                        <a:t>170.7</a:t>
+                        <a:t>162.3</a:t>
                       </a:r>
                     </a:p>
                   </a:txBody>
@@ -10658,7 +10659,7 @@
           <a:p>
             <a:r>
               <a:rPr/>
-              <a:t>Pack date: 24 November 2020</a:t>
+              <a:t>Pack date: 25 November 2020</a:t>
             </a:r>
           </a:p>
         </p:txBody>
@@ -10739,7 +10740,7 @@
           <a:p>
             <a:r>
               <a:rPr/>
-              <a:t>Lower Tier Local Authority cumulative cases as at 24 November</a:t>
+              <a:t>Lower Tier Local Authority cumulative cases as at 25 November</a:t>
             </a:r>
           </a:p>
         </p:txBody>
@@ -11247,7 +11248,7 @@
                           <a:latin typeface="Calibri"/>
                           <a:cs typeface="Calibri"/>
                         </a:rPr>
-                        <a:t>547</a:t>
+                        <a:t>550</a:t>
                       </a:r>
                     </a:p>
                   </a:txBody>
@@ -11313,7 +11314,7 @@
                           <a:latin typeface="Calibri"/>
                           <a:cs typeface="Calibri"/>
                         </a:rPr>
-                        <a:t>850.7</a:t>
+                        <a:t>855.4</a:t>
                       </a:r>
                     </a:p>
                   </a:txBody>
@@ -11580,7 +11581,7 @@
                           <a:latin typeface="Calibri"/>
                           <a:cs typeface="Calibri"/>
                         </a:rPr>
-                        <a:t>1,273</a:t>
+                        <a:t>1,292</a:t>
                       </a:r>
                     </a:p>
                   </a:txBody>
@@ -11646,7 +11647,7 @@
                           <a:latin typeface="Calibri"/>
                           <a:cs typeface="Calibri"/>
                         </a:rPr>
-                        <a:t>791.9</a:t>
+                        <a:t>803.7</a:t>
                       </a:r>
                     </a:p>
                   </a:txBody>
@@ -11913,7 +11914,7 @@
                           <a:latin typeface="Calibri"/>
                           <a:cs typeface="Calibri"/>
                         </a:rPr>
-                        <a:t>1,171</a:t>
+                        <a:t>1,190</a:t>
                       </a:r>
                     </a:p>
                   </a:txBody>
@@ -11979,7 +11980,7 @@
                           <a:latin typeface="Calibri"/>
                           <a:cs typeface="Calibri"/>
                         </a:rPr>
-                        <a:t>966.7</a:t>
+                        <a:t>982.4</a:t>
                       </a:r>
                     </a:p>
                   </a:txBody>
@@ -12245,7 +12246,7 @@
                           <a:latin typeface="Calibri"/>
                           <a:cs typeface="Calibri"/>
                         </a:rPr>
-                        <a:t>1,405</a:t>
+                        <a:t>1,421</a:t>
                       </a:r>
                     </a:p>
                   </a:txBody>
@@ -12311,7 +12312,7 @@
                           <a:latin typeface="Calibri"/>
                           <a:cs typeface="Calibri"/>
                         </a:rPr>
-                        <a:t>1,249.9</a:t>
+                        <a:t>1,264.1</a:t>
                       </a:r>
                     </a:p>
                   </a:txBody>
@@ -12377,7 +12378,7 @@
                           <a:latin typeface="Calibri"/>
                           <a:cs typeface="Calibri"/>
                         </a:rPr>
-                        <a:t>234th</a:t>
+                        <a:t>233rd</a:t>
                       </a:r>
                     </a:p>
                   </a:txBody>
@@ -12577,7 +12578,7 @@
                           <a:latin typeface="Calibri"/>
                           <a:cs typeface="Calibri"/>
                         </a:rPr>
-                        <a:t>1,470</a:t>
+                        <a:t>1,490</a:t>
                       </a:r>
                     </a:p>
                   </a:txBody>
@@ -12643,7 +12644,7 @@
                           <a:latin typeface="Calibri"/>
                           <a:cs typeface="Calibri"/>
                         </a:rPr>
-                        <a:t>1,022.3</a:t>
+                        <a:t>1,036.2</a:t>
                       </a:r>
                     </a:p>
                   </a:txBody>
@@ -12709,7 +12710,7 @@
                           <a:latin typeface="Calibri"/>
                           <a:cs typeface="Calibri"/>
                         </a:rPr>
-                        <a:t>276th</a:t>
+                        <a:t>277th</a:t>
                       </a:r>
                     </a:p>
                   </a:txBody>
@@ -12909,7 +12910,7 @@
                           <a:latin typeface="Calibri"/>
                           <a:cs typeface="Calibri"/>
                         </a:rPr>
-                        <a:t>1,747</a:t>
+                        <a:t>1,773</a:t>
                       </a:r>
                     </a:p>
                   </a:txBody>
@@ -12975,7 +12976,7 @@
                           <a:latin typeface="Calibri"/>
                           <a:cs typeface="Calibri"/>
                         </a:rPr>
-                        <a:t>1,156.8</a:t>
+                        <a:t>1,174.0</a:t>
                       </a:r>
                     </a:p>
                   </a:txBody>
@@ -13241,7 +13242,7 @@
                           <a:latin typeface="Calibri"/>
                           <a:cs typeface="Calibri"/>
                         </a:rPr>
-                        <a:t>1,052</a:t>
+                        <a:t>1,058</a:t>
                       </a:r>
                     </a:p>
                   </a:txBody>
@@ -13307,7 +13308,7 @@
                           <a:latin typeface="Calibri"/>
                           <a:cs typeface="Calibri"/>
                         </a:rPr>
-                        <a:t>951.4</a:t>
+                        <a:t>956.9</a:t>
                       </a:r>
                     </a:p>
                   </a:txBody>
@@ -13373,7 +13374,7 @@
                           <a:latin typeface="Calibri"/>
                           <a:cs typeface="Calibri"/>
                         </a:rPr>
-                        <a:t>284th</a:t>
+                        <a:t>287th</a:t>
                       </a:r>
                     </a:p>
                   </a:txBody>
@@ -13574,7 +13575,7 @@
                           <a:latin typeface="Calibri"/>
                           <a:cs typeface="Calibri"/>
                         </a:rPr>
-                        <a:t>8,665</a:t>
+                        <a:t>8,774</a:t>
                       </a:r>
                     </a:p>
                   </a:txBody>
@@ -13640,7 +13641,7 @@
                           <a:latin typeface="Calibri"/>
                           <a:cs typeface="Calibri"/>
                         </a:rPr>
-                        <a:t>1,002.9</a:t>
+                        <a:t>1,015.5</a:t>
                       </a:r>
                     </a:p>
                   </a:txBody>
@@ -13906,7 +13907,7 @@
                           <a:latin typeface="Calibri"/>
                           <a:cs typeface="Calibri"/>
                         </a:rPr>
-                        <a:t>123,144</a:t>
+                        <a:t>125,508</a:t>
                       </a:r>
                     </a:p>
                   </a:txBody>
@@ -13972,7 +13973,7 @@
                           <a:latin typeface="Calibri"/>
                           <a:cs typeface="Calibri"/>
                         </a:rPr>
-                        <a:t>1,341.4</a:t>
+                        <a:t>1,367.2</a:t>
                       </a:r>
                     </a:p>
                   </a:txBody>
@@ -14238,7 +14239,7 @@
                           <a:latin typeface="Calibri"/>
                           <a:cs typeface="Calibri"/>
                         </a:rPr>
-                        <a:t>1,324,742</a:t>
+                        <a:t>1,340,635</a:t>
                       </a:r>
                     </a:p>
                   </a:txBody>
@@ -14304,7 +14305,7 @@
                           <a:latin typeface="Calibri"/>
                           <a:cs typeface="Calibri"/>
                         </a:rPr>
-                        <a:t>2,353.6</a:t>
+                        <a:t>2,381.8</a:t>
                       </a:r>
                     </a:p>
                   </a:txBody>
@@ -14553,7 +14554,7 @@
           <a:p>
             <a:r>
               <a:rPr/>
-              <a:t>Pack date: 24 November 2020</a:t>
+              <a:t>Pack date: 25 November 2020</a:t>
             </a:r>
           </a:p>
         </p:txBody>
@@ -14634,7 +14635,7 @@
           <a:p>
             <a:r>
               <a:rPr/>
-              <a:t>Lower Tier Local Authority rolling cases as at 24 November</a:t>
+              <a:t>Lower Tier Local Authority rolling cases as at 25 November</a:t>
             </a:r>
           </a:p>
         </p:txBody>
@@ -14715,7 +14716,7 @@
           <a:p>
             <a:r>
               <a:rPr/>
-              <a:t>Note that the very recent days are excluded in the 7-day total as these are thought to be incomplete. As such, this data represents cases in the seven days to 19 November</a:t>
+              <a:t>Note that the very recent days are excluded in the 7-day total as these are thought to be incomplete. As such, this data represents cases in the seven days to 20 November</a:t>
             </a:r>
           </a:p>
         </p:txBody>
@@ -15169,7 +15170,7 @@
                           <a:latin typeface="Calibri"/>
                           <a:cs typeface="Calibri"/>
                         </a:rPr>
-                        <a:t>53</a:t>
+                        <a:t>51</a:t>
                       </a:r>
                     </a:p>
                   </a:txBody>
@@ -15235,7 +15236,7 @@
                           <a:latin typeface="Calibri"/>
                           <a:cs typeface="Calibri"/>
                         </a:rPr>
-                        <a:t>82.4</a:t>
+                        <a:t>79.3</a:t>
                       </a:r>
                     </a:p>
                   </a:txBody>
@@ -15301,7 +15302,7 @@
                           <a:latin typeface="Calibri"/>
                           <a:cs typeface="Calibri"/>
                         </a:rPr>
-                        <a:t>301st</a:t>
+                        <a:t>294th</a:t>
                       </a:r>
                     </a:p>
                   </a:txBody>
@@ -15502,7 +15503,7 @@
                           <a:latin typeface="Calibri"/>
                           <a:cs typeface="Calibri"/>
                         </a:rPr>
-                        <a:t>184</a:t>
+                        <a:t>172</a:t>
                       </a:r>
                     </a:p>
                   </a:txBody>
@@ -15568,7 +15569,7 @@
                           <a:latin typeface="Calibri"/>
                           <a:cs typeface="Calibri"/>
                         </a:rPr>
-                        <a:t>114.5</a:t>
+                        <a:t>107.0</a:t>
                       </a:r>
                     </a:p>
                   </a:txBody>
@@ -15634,7 +15635,7 @@
                           <a:latin typeface="Calibri"/>
                           <a:cs typeface="Calibri"/>
                         </a:rPr>
-                        <a:t>261st</a:t>
+                        <a:t>263rd</a:t>
                       </a:r>
                     </a:p>
                   </a:txBody>
@@ -15834,7 +15835,7 @@
                           <a:latin typeface="Calibri"/>
                           <a:cs typeface="Calibri"/>
                         </a:rPr>
-                        <a:t>139</a:t>
+                        <a:t>127</a:t>
                       </a:r>
                     </a:p>
                   </a:txBody>
@@ -15900,7 +15901,7 @@
                           <a:latin typeface="Calibri"/>
                           <a:cs typeface="Calibri"/>
                         </a:rPr>
-                        <a:t>114.8</a:t>
+                        <a:t>104.8</a:t>
                       </a:r>
                     </a:p>
                   </a:txBody>
@@ -15966,7 +15967,7 @@
                           <a:latin typeface="Calibri"/>
                           <a:cs typeface="Calibri"/>
                         </a:rPr>
-                        <a:t>260th</a:t>
+                        <a:t>265th</a:t>
                       </a:r>
                     </a:p>
                   </a:txBody>
@@ -16166,7 +16167,7 @@
                           <a:latin typeface="Calibri"/>
                           <a:cs typeface="Calibri"/>
                         </a:rPr>
-                        <a:t>112</a:t>
+                        <a:t>107</a:t>
                       </a:r>
                     </a:p>
                   </a:txBody>
@@ -16232,7 +16233,7 @@
                           <a:latin typeface="Calibri"/>
                           <a:cs typeface="Calibri"/>
                         </a:rPr>
-                        <a:t>99.6</a:t>
+                        <a:t>95.2</a:t>
                       </a:r>
                     </a:p>
                   </a:txBody>
@@ -16298,7 +16299,7 @@
                           <a:latin typeface="Calibri"/>
                           <a:cs typeface="Calibri"/>
                         </a:rPr>
-                        <a:t>283rd</a:t>
+                        <a:t>280th</a:t>
                       </a:r>
                     </a:p>
                   </a:txBody>
@@ -16630,7 +16631,7 @@
                           <a:latin typeface="Calibri"/>
                           <a:cs typeface="Calibri"/>
                         </a:rPr>
-                        <a:t>274th</a:t>
+                        <a:t>267th</a:t>
                       </a:r>
                     </a:p>
                   </a:txBody>
@@ -16830,7 +16831,7 @@
                           <a:latin typeface="Calibri"/>
                           <a:cs typeface="Calibri"/>
                         </a:rPr>
-                        <a:t>234</a:t>
+                        <a:t>226</a:t>
                       </a:r>
                     </a:p>
                   </a:txBody>
@@ -16896,7 +16897,7 @@
                           <a:latin typeface="Calibri"/>
                           <a:cs typeface="Calibri"/>
                         </a:rPr>
-                        <a:t>154.9</a:t>
+                        <a:t>149.6</a:t>
                       </a:r>
                     </a:p>
                   </a:txBody>
@@ -16962,7 +16963,7 @@
                           <a:latin typeface="Calibri"/>
                           <a:cs typeface="Calibri"/>
                         </a:rPr>
-                        <a:t>204th</a:t>
+                        <a:t>191st</a:t>
                       </a:r>
                     </a:p>
                   </a:txBody>
@@ -17162,7 +17163,7 @@
                           <a:latin typeface="Calibri"/>
                           <a:cs typeface="Calibri"/>
                         </a:rPr>
-                        <a:t>91</a:t>
+                        <a:t>81</a:t>
                       </a:r>
                     </a:p>
                   </a:txBody>
@@ -17228,7 +17229,7 @@
                           <a:latin typeface="Calibri"/>
                           <a:cs typeface="Calibri"/>
                         </a:rPr>
-                        <a:t>82.3</a:t>
+                        <a:t>73.3</a:t>
                       </a:r>
                     </a:p>
                   </a:txBody>
@@ -17495,7 +17496,7 @@
                           <a:latin typeface="Calibri"/>
                           <a:cs typeface="Calibri"/>
                         </a:rPr>
-                        <a:t>963</a:t>
+                        <a:t>914</a:t>
                       </a:r>
                     </a:p>
                   </a:txBody>
@@ -17561,7 +17562,7 @@
                           <a:latin typeface="Calibri"/>
                           <a:cs typeface="Calibri"/>
                         </a:rPr>
-                        <a:t>111.5</a:t>
+                        <a:t>105.8</a:t>
                       </a:r>
                     </a:p>
                   </a:txBody>
@@ -17827,7 +17828,7 @@
                           <a:latin typeface="Calibri"/>
                           <a:cs typeface="Calibri"/>
                         </a:rPr>
-                        <a:t>129,610</a:t>
+                        <a:t>122,929</a:t>
                       </a:r>
                     </a:p>
                   </a:txBody>
@@ -17893,7 +17894,7 @@
                           <a:latin typeface="Calibri"/>
                           <a:cs typeface="Calibri"/>
                         </a:rPr>
-                        <a:t>230.3</a:t>
+                        <a:t>218.4</a:t>
                       </a:r>
                     </a:p>
                   </a:txBody>
@@ -18159,7 +18160,7 @@
                           <a:latin typeface="Calibri"/>
                           <a:cs typeface="Calibri"/>
                         </a:rPr>
-                        <a:t>15,671</a:t>
+                        <a:t>14,899</a:t>
                       </a:r>
                     </a:p>
                   </a:txBody>
@@ -18225,7 +18226,7 @@
                           <a:latin typeface="Calibri"/>
                           <a:cs typeface="Calibri"/>
                         </a:rPr>
-                        <a:t>170.7</a:t>
+                        <a:t>162.3</a:t>
                       </a:r>
                     </a:p>
                   </a:txBody>
@@ -18474,7 +18475,7 @@
           <a:p>
             <a:r>
               <a:rPr/>
-              <a:t>Pack date: 24 November 2020</a:t>
+              <a:t>Pack date: 25 November 2020</a:t>
             </a:r>
           </a:p>
         </p:txBody>
@@ -18585,7 +18586,7 @@
           <a:p>
             <a:r>
               <a:rPr/>
-              <a:t>In the last 24 hours there were 105 triages made. This is an increase of 13 triages compared to the previous day (92 triages).</a:t>
+              <a:t>In the last 24 hours there were 67 triages made. This is an decrease of 39 triages compared to the previous day (106 triages).</a:t>
             </a:r>
           </a:p>
         </p:txBody>
@@ -18612,7 +18613,7 @@
           <a:p>
             <a:r>
               <a:rPr/>
-              <a:t>In the seven days leading to 23 November there were 604 triages to NHS Pathways for COVID-19, this is an average of 86 each day.</a:t>
+              <a:t>In the seven days leading to 24 November there were 579 triages to NHS Pathways for COVID-19, this is an average of 83 each day.</a:t>
             </a:r>
           </a:p>
         </p:txBody>
@@ -18664,7 +18665,7 @@
           <a:p>
             <a:r>
               <a:rPr/>
-              <a:t>Pack date: 24 November 2020</a:t>
+              <a:t>Pack date: 25 November 2020</a:t>
             </a:r>
           </a:p>
         </p:txBody>
@@ -18822,7 +18823,7 @@
           <a:p>
             <a:r>
               <a:rPr/>
-              <a:t>Pack date: 24 November 2020</a:t>
+              <a:t>Pack date: 25 November 2020</a:t>
             </a:r>
           </a:p>
         </p:txBody>
@@ -18980,7 +18981,7 @@
           <a:p>
             <a:r>
               <a:rPr/>
-              <a:t>Pack date: 24 November 2020</a:t>
+              <a:t>Pack date: 25 November 2020</a:t>
             </a:r>
           </a:p>
         </p:txBody>
@@ -19138,7 +19139,7 @@
           <a:p>
             <a:r>
               <a:rPr/>
-              <a:t>Pack date: 24 November 2020</a:t>
+              <a:t>Pack date: 25 November 2020</a:t>
             </a:r>
           </a:p>
         </p:txBody>
@@ -19327,7 +19328,7 @@
           <a:p>
             <a:r>
               <a:rPr/>
-              <a:t>Pack date: 24 November 2020</a:t>
+              <a:t>Pack date: 25 November 2020</a:t>
             </a:r>
           </a:p>
         </p:txBody>
@@ -19485,7 +19486,7 @@
           <a:p>
             <a:r>
               <a:rPr/>
-              <a:t>Pack date: 24 November 2020</a:t>
+              <a:t>Pack date: 25 November 2020</a:t>
             </a:r>
           </a:p>
         </p:txBody>
@@ -19643,7 +19644,7 @@
           <a:p>
             <a:r>
               <a:rPr/>
-              <a:t>Pack date: 24 November 2020</a:t>
+              <a:t>Pack date: 25 November 2020</a:t>
             </a:r>
           </a:p>
         </p:txBody>
@@ -19801,7 +19802,7 @@
           <a:p>
             <a:r>
               <a:rPr/>
-              <a:t>Pack date: 24 November 2020</a:t>
+              <a:t>Pack date: 25 November 2020</a:t>
             </a:r>
           </a:p>
         </p:txBody>
@@ -19959,7 +19960,7 @@
           <a:p>
             <a:r>
               <a:rPr/>
-              <a:t>Pack date: 24 November 2020</a:t>
+              <a:t>Pack date: 25 November 2020</a:t>
             </a:r>
           </a:p>
         </p:txBody>
@@ -20117,7 +20118,7 @@
           <a:p>
             <a:r>
               <a:rPr/>
-              <a:t>Pack date: 24 November 2020</a:t>
+              <a:t>Pack date: 25 November 2020</a:t>
             </a:r>
           </a:p>
         </p:txBody>
@@ -20249,7 +20250,7 @@
           <a:p>
             <a:r>
               <a:rPr/>
-              <a:t>Pack date: 24 November 2020</a:t>
+              <a:t>Pack date: 25 November 2020</a:t>
             </a:r>
           </a:p>
         </p:txBody>
@@ -20381,7 +20382,7 @@
           <a:p>
             <a:r>
               <a:rPr/>
-              <a:t>Pack date: 24 November 2020</a:t>
+              <a:t>Pack date: 25 November 2020</a:t>
             </a:r>
           </a:p>
         </p:txBody>
@@ -20513,7 +20514,7 @@
           <a:p>
             <a:r>
               <a:rPr/>
-              <a:t>Pack date: 24 November 2020</a:t>
+              <a:t>Pack date: 25 November 2020</a:t>
             </a:r>
           </a:p>
         </p:txBody>
@@ -20645,7 +20646,7 @@
           <a:p>
             <a:r>
               <a:rPr/>
-              <a:t>Pack date: 24 November 2020</a:t>
+              <a:t>Pack date: 25 November 2020</a:t>
             </a:r>
           </a:p>
         </p:txBody>
@@ -20777,7 +20778,7 @@
           <a:p>
             <a:r>
               <a:rPr/>
-              <a:t>Pack date: 24 November 2020</a:t>
+              <a:t>Pack date: 25 November 2020</a:t>
             </a:r>
           </a:p>
         </p:txBody>
@@ -20909,7 +20910,7 @@
           <a:p>
             <a:r>
               <a:rPr/>
-              <a:t>Pack date: 24 November 2020</a:t>
+              <a:t>Pack date: 25 November 2020</a:t>
             </a:r>
           </a:p>
         </p:txBody>

</xml_diff>

<commit_message>
Update - not worth fight of switching machines
</commit_message>
<xml_diff>
--- a/Latest_West_Sussex_C19_slide_deck.pptx
+++ b/Latest_West_Sussex_C19_slide_deck.pptx
@@ -7177,7 +7177,7 @@
           <a:p>
             <a:r>
               <a:rPr/>
-              <a:t>Pack date: 06 December 2020</a:t>
+              <a:t>Pack date: 07 December 2020</a:t>
             </a:r>
           </a:p>
         </p:txBody>
@@ -7309,7 +7309,7 @@
           <a:p>
             <a:r>
               <a:rPr/>
-              <a:t>Pack date: 06 December 2020</a:t>
+              <a:t>Pack date: 07 December 2020</a:t>
             </a:r>
           </a:p>
         </p:txBody>
@@ -7467,7 +7467,7 @@
           <a:p>
             <a:r>
               <a:rPr/>
-              <a:t>Pack date: 06 December 2020</a:t>
+              <a:t>Pack date: 07 December 2020</a:t>
             </a:r>
           </a:p>
         </p:txBody>
@@ -9063,7 +9063,7 @@
           <a:p>
             <a:r>
               <a:rPr/>
-              <a:t>Pack date: 06 December 2020</a:t>
+              <a:t>Pack date: 07 December 2020</a:t>
             </a:r>
           </a:p>
         </p:txBody>
@@ -10659,7 +10659,7 @@
           <a:p>
             <a:r>
               <a:rPr/>
-              <a:t>Pack date: 06 December 2020</a:t>
+              <a:t>Pack date: 07 December 2020</a:t>
             </a:r>
           </a:p>
         </p:txBody>
@@ -14555,7 +14555,7 @@
           <a:p>
             <a:r>
               <a:rPr/>
-              <a:t>Pack date: 06 December 2020</a:t>
+              <a:t>Pack date: 07 December 2020</a:t>
             </a:r>
           </a:p>
         </p:txBody>
@@ -18479,7 +18479,7 @@
           <a:p>
             <a:r>
               <a:rPr/>
-              <a:t>Pack date: 06 December 2020</a:t>
+              <a:t>Pack date: 07 December 2020</a:t>
             </a:r>
           </a:p>
         </p:txBody>
@@ -18669,7 +18669,7 @@
           <a:p>
             <a:r>
               <a:rPr/>
-              <a:t>Pack date: 06 December 2020</a:t>
+              <a:t>Pack date: 07 December 2020</a:t>
             </a:r>
           </a:p>
         </p:txBody>
@@ -18827,7 +18827,7 @@
           <a:p>
             <a:r>
               <a:rPr/>
-              <a:t>Pack date: 06 December 2020</a:t>
+              <a:t>Pack date: 07 December 2020</a:t>
             </a:r>
           </a:p>
         </p:txBody>
@@ -18985,7 +18985,7 @@
           <a:p>
             <a:r>
               <a:rPr/>
-              <a:t>Pack date: 06 December 2020</a:t>
+              <a:t>Pack date: 07 December 2020</a:t>
             </a:r>
           </a:p>
         </p:txBody>
@@ -19143,7 +19143,7 @@
           <a:p>
             <a:r>
               <a:rPr/>
-              <a:t>Pack date: 06 December 2020</a:t>
+              <a:t>Pack date: 07 December 2020</a:t>
             </a:r>
           </a:p>
         </p:txBody>
@@ -19332,7 +19332,7 @@
           <a:p>
             <a:r>
               <a:rPr/>
-              <a:t>Pack date: 06 December 2020</a:t>
+              <a:t>Pack date: 07 December 2020</a:t>
             </a:r>
           </a:p>
         </p:txBody>
@@ -19490,7 +19490,7 @@
           <a:p>
             <a:r>
               <a:rPr/>
-              <a:t>Pack date: 06 December 2020</a:t>
+              <a:t>Pack date: 07 December 2020</a:t>
             </a:r>
           </a:p>
         </p:txBody>
@@ -19648,7 +19648,7 @@
           <a:p>
             <a:r>
               <a:rPr/>
-              <a:t>Pack date: 06 December 2020</a:t>
+              <a:t>Pack date: 07 December 2020</a:t>
             </a:r>
           </a:p>
         </p:txBody>
@@ -19806,7 +19806,7 @@
           <a:p>
             <a:r>
               <a:rPr/>
-              <a:t>Pack date: 06 December 2020</a:t>
+              <a:t>Pack date: 07 December 2020</a:t>
             </a:r>
           </a:p>
         </p:txBody>
@@ -19964,7 +19964,7 @@
           <a:p>
             <a:r>
               <a:rPr/>
-              <a:t>Pack date: 06 December 2020</a:t>
+              <a:t>Pack date: 07 December 2020</a:t>
             </a:r>
           </a:p>
         </p:txBody>
@@ -20122,7 +20122,7 @@
           <a:p>
             <a:r>
               <a:rPr/>
-              <a:t>Pack date: 06 December 2020</a:t>
+              <a:t>Pack date: 07 December 2020</a:t>
             </a:r>
           </a:p>
         </p:txBody>
@@ -20254,7 +20254,7 @@
           <a:p>
             <a:r>
               <a:rPr/>
-              <a:t>Pack date: 06 December 2020</a:t>
+              <a:t>Pack date: 07 December 2020</a:t>
             </a:r>
           </a:p>
         </p:txBody>
@@ -20386,7 +20386,7 @@
           <a:p>
             <a:r>
               <a:rPr/>
-              <a:t>Pack date: 06 December 2020</a:t>
+              <a:t>Pack date: 07 December 2020</a:t>
             </a:r>
           </a:p>
         </p:txBody>
@@ -20518,7 +20518,7 @@
           <a:p>
             <a:r>
               <a:rPr/>
-              <a:t>Pack date: 06 December 2020</a:t>
+              <a:t>Pack date: 07 December 2020</a:t>
             </a:r>
           </a:p>
         </p:txBody>
@@ -20650,7 +20650,7 @@
           <a:p>
             <a:r>
               <a:rPr/>
-              <a:t>Pack date: 06 December 2020</a:t>
+              <a:t>Pack date: 07 December 2020</a:t>
             </a:r>
           </a:p>
         </p:txBody>
@@ -20782,7 +20782,7 @@
           <a:p>
             <a:r>
               <a:rPr/>
-              <a:t>Pack date: 06 December 2020</a:t>
+              <a:t>Pack date: 07 December 2020</a:t>
             </a:r>
           </a:p>
         </p:txBody>
@@ -20914,7 +20914,7 @@
           <a:p>
             <a:r>
               <a:rPr/>
-              <a:t>Pack date: 06 December 2020</a:t>
+              <a:t>Pack date: 07 December 2020</a:t>
             </a:r>
           </a:p>
         </p:txBody>

</xml_diff>

<commit_message>
tier update primary schools
</commit_message>
<xml_diff>
--- a/Latest_West_Sussex_C19_slide_deck.pptx
+++ b/Latest_West_Sussex_C19_slide_deck.pptx
@@ -7177,7 +7177,7 @@
           <a:p>
             <a:r>
               <a:rPr/>
-              <a:t>Pack date: 30 December 2020</a:t>
+              <a:t>Pack date: 31 December 2020</a:t>
             </a:r>
           </a:p>
         </p:txBody>
@@ -7309,7 +7309,7 @@
           <a:p>
             <a:r>
               <a:rPr/>
-              <a:t>Pack date: 30 December 2020</a:t>
+              <a:t>Pack date: 31 December 2020</a:t>
             </a:r>
           </a:p>
         </p:txBody>
@@ -7467,7 +7467,7 @@
           <a:p>
             <a:r>
               <a:rPr/>
-              <a:t>Pack date: 30 December 2020</a:t>
+              <a:t>Pack date: 31 December 2020</a:t>
             </a:r>
           </a:p>
         </p:txBody>
@@ -9063,7 +9063,7 @@
           <a:p>
             <a:r>
               <a:rPr/>
-              <a:t>Pack date: 30 December 2020</a:t>
+              <a:t>Pack date: 31 December 2020</a:t>
             </a:r>
           </a:p>
         </p:txBody>
@@ -10658,7 +10658,7 @@
           <a:p>
             <a:r>
               <a:rPr/>
-              <a:t>Pack date: 30 December 2020</a:t>
+              <a:t>Pack date: 31 December 2020</a:t>
             </a:r>
           </a:p>
         </p:txBody>
@@ -14554,7 +14554,7 @@
           <a:p>
             <a:r>
               <a:rPr/>
-              <a:t>Pack date: 30 December 2020</a:t>
+              <a:t>Pack date: 31 December 2020</a:t>
             </a:r>
           </a:p>
         </p:txBody>
@@ -18473,7 +18473,7 @@
           <a:p>
             <a:r>
               <a:rPr/>
-              <a:t>Pack date: 30 December 2020</a:t>
+              <a:t>Pack date: 31 December 2020</a:t>
             </a:r>
           </a:p>
         </p:txBody>
@@ -18663,7 +18663,7 @@
           <a:p>
             <a:r>
               <a:rPr/>
-              <a:t>Pack date: 30 December 2020</a:t>
+              <a:t>Pack date: 31 December 2020</a:t>
             </a:r>
           </a:p>
         </p:txBody>
@@ -18821,7 +18821,7 @@
           <a:p>
             <a:r>
               <a:rPr/>
-              <a:t>Pack date: 30 December 2020</a:t>
+              <a:t>Pack date: 31 December 2020</a:t>
             </a:r>
           </a:p>
         </p:txBody>
@@ -18979,7 +18979,7 @@
           <a:p>
             <a:r>
               <a:rPr/>
-              <a:t>Pack date: 30 December 2020</a:t>
+              <a:t>Pack date: 31 December 2020</a:t>
             </a:r>
           </a:p>
         </p:txBody>
@@ -19137,7 +19137,7 @@
           <a:p>
             <a:r>
               <a:rPr/>
-              <a:t>Pack date: 30 December 2020</a:t>
+              <a:t>Pack date: 31 December 2020</a:t>
             </a:r>
           </a:p>
         </p:txBody>
@@ -19326,7 +19326,7 @@
           <a:p>
             <a:r>
               <a:rPr/>
-              <a:t>Pack date: 30 December 2020</a:t>
+              <a:t>Pack date: 31 December 2020</a:t>
             </a:r>
           </a:p>
         </p:txBody>
@@ -19484,7 +19484,7 @@
           <a:p>
             <a:r>
               <a:rPr/>
-              <a:t>Pack date: 30 December 2020</a:t>
+              <a:t>Pack date: 31 December 2020</a:t>
             </a:r>
           </a:p>
         </p:txBody>
@@ -19642,7 +19642,7 @@
           <a:p>
             <a:r>
               <a:rPr/>
-              <a:t>Pack date: 30 December 2020</a:t>
+              <a:t>Pack date: 31 December 2020</a:t>
             </a:r>
           </a:p>
         </p:txBody>
@@ -19800,7 +19800,7 @@
           <a:p>
             <a:r>
               <a:rPr/>
-              <a:t>Pack date: 30 December 2020</a:t>
+              <a:t>Pack date: 31 December 2020</a:t>
             </a:r>
           </a:p>
         </p:txBody>
@@ -19958,7 +19958,7 @@
           <a:p>
             <a:r>
               <a:rPr/>
-              <a:t>Pack date: 30 December 2020</a:t>
+              <a:t>Pack date: 31 December 2020</a:t>
             </a:r>
           </a:p>
         </p:txBody>
@@ -20116,7 +20116,7 @@
           <a:p>
             <a:r>
               <a:rPr/>
-              <a:t>Pack date: 30 December 2020</a:t>
+              <a:t>Pack date: 31 December 2020</a:t>
             </a:r>
           </a:p>
         </p:txBody>
@@ -20248,7 +20248,7 @@
           <a:p>
             <a:r>
               <a:rPr/>
-              <a:t>Pack date: 30 December 2020</a:t>
+              <a:t>Pack date: 31 December 2020</a:t>
             </a:r>
           </a:p>
         </p:txBody>
@@ -20380,7 +20380,7 @@
           <a:p>
             <a:r>
               <a:rPr/>
-              <a:t>Pack date: 30 December 2020</a:t>
+              <a:t>Pack date: 31 December 2020</a:t>
             </a:r>
           </a:p>
         </p:txBody>
@@ -20512,7 +20512,7 @@
           <a:p>
             <a:r>
               <a:rPr/>
-              <a:t>Pack date: 30 December 2020</a:t>
+              <a:t>Pack date: 31 December 2020</a:t>
             </a:r>
           </a:p>
         </p:txBody>
@@ -20644,7 +20644,7 @@
           <a:p>
             <a:r>
               <a:rPr/>
-              <a:t>Pack date: 30 December 2020</a:t>
+              <a:t>Pack date: 31 December 2020</a:t>
             </a:r>
           </a:p>
         </p:txBody>
@@ -20776,7 +20776,7 @@
           <a:p>
             <a:r>
               <a:rPr/>
-              <a:t>Pack date: 30 December 2020</a:t>
+              <a:t>Pack date: 31 December 2020</a:t>
             </a:r>
           </a:p>
         </p:txBody>
@@ -20908,7 +20908,7 @@
           <a:p>
             <a:r>
               <a:rPr/>
-              <a:t>Pack date: 30 December 2020</a:t>
+              <a:t>Pack date: 31 December 2020</a:t>
             </a:r>
           </a:p>
         </p:txBody>

</xml_diff>

<commit_message>
Tidy code - cut down growth file size
</commit_message>
<xml_diff>
--- a/Latest_West_Sussex_C19_slide_deck.pptx
+++ b/Latest_West_Sussex_C19_slide_deck.pptx
@@ -7176,7 +7176,7 @@
           <a:p>
             <a:r>
               <a:rPr/>
-              <a:t>Pack date: 15 February 2021</a:t>
+              <a:t>Pack date: 18 February 2021</a:t>
             </a:r>
           </a:p>
         </p:txBody>
@@ -7308,7 +7308,7 @@
           <a:p>
             <a:r>
               <a:rPr/>
-              <a:t>Pack date: 15 February 2021</a:t>
+              <a:t>Pack date: 18 February 2021</a:t>
             </a:r>
           </a:p>
         </p:txBody>
@@ -7466,7 +7466,7 @@
           <a:p>
             <a:r>
               <a:rPr/>
-              <a:t>Pack date: 15 February 2021</a:t>
+              <a:t>Pack date: 18 February 2021</a:t>
             </a:r>
           </a:p>
         </p:txBody>
@@ -7547,7 +7547,7 @@
           <a:p>
             <a:r>
               <a:rPr/>
-              <a:t>Upper Tier Local Authority cumulative cases as at 15 February</a:t>
+              <a:t>Upper Tier Local Authority cumulative cases as at 17 February</a:t>
             </a:r>
           </a:p>
         </p:txBody>
@@ -8082,7 +8082,7 @@
                           <a:latin typeface="Calibri"/>
                           <a:cs typeface="Calibri"/>
                         </a:rPr>
-                        <a:t>38,854</a:t>
+                        <a:t>39,052</a:t>
                       </a:r>
                     </a:p>
                   </a:txBody>
@@ -8148,7 +8148,7 @@
                           <a:latin typeface="Calibri"/>
                           <a:cs typeface="Calibri"/>
                         </a:rPr>
-                        <a:t>4,497.1</a:t>
+                        <a:t>4,520.0</a:t>
                       </a:r>
                     </a:p>
                   </a:txBody>
@@ -8414,7 +8414,7 @@
                           <a:latin typeface="Calibri"/>
                           <a:cs typeface="Calibri"/>
                         </a:rPr>
-                        <a:t>3,546,803</a:t>
+                        <a:t>3,566,965</a:t>
                       </a:r>
                     </a:p>
                   </a:txBody>
@@ -8480,7 +8480,7 @@
                           <a:latin typeface="Calibri"/>
                           <a:cs typeface="Calibri"/>
                         </a:rPr>
-                        <a:t>6,301.3</a:t>
+                        <a:t>6,337.1</a:t>
                       </a:r>
                     </a:p>
                   </a:txBody>
@@ -8746,7 +8746,7 @@
                           <a:latin typeface="Calibri"/>
                           <a:cs typeface="Calibri"/>
                         </a:rPr>
-                        <a:t>506,557</a:t>
+                        <a:t>508,806</a:t>
                       </a:r>
                     </a:p>
                   </a:txBody>
@@ -8812,7 +8812,7 @@
                           <a:latin typeface="Calibri"/>
                           <a:cs typeface="Calibri"/>
                         </a:rPr>
-                        <a:t>5,518.0</a:t>
+                        <a:t>5,542.5</a:t>
                       </a:r>
                     </a:p>
                   </a:txBody>
@@ -9061,7 +9061,7 @@
           <a:p>
             <a:r>
               <a:rPr/>
-              <a:t>Pack date: 15 February 2021</a:t>
+              <a:t>Pack date: 18 February 2021</a:t>
             </a:r>
           </a:p>
         </p:txBody>
@@ -9142,7 +9142,7 @@
           <a:p>
             <a:r>
               <a:rPr/>
-              <a:t>Upper Tier Local Authority rolling 7 day cases as at 15 February</a:t>
+              <a:t>Upper Tier Local Authority rolling 7 day cases as at 17 February</a:t>
             </a:r>
           </a:p>
         </p:txBody>
@@ -9223,7 +9223,7 @@
           <a:p>
             <a:r>
               <a:rPr/>
-              <a:t>Note that the very recent days are excluded in the 7-day total as these are thought to be incomplete. As such, this data represents cases in the seven days to 10 February</a:t>
+              <a:t>Note that the very recent days are excluded in the 7-day total as these are thought to be incomplete. As such, this data represents cases in the seven days to 12 February</a:t>
             </a:r>
           </a:p>
         </p:txBody>
@@ -9677,7 +9677,7 @@
                           <a:latin typeface="Calibri"/>
                           <a:cs typeface="Calibri"/>
                         </a:rPr>
-                        <a:t>1,117</a:t>
+                        <a:t>968</a:t>
                       </a:r>
                     </a:p>
                   </a:txBody>
@@ -9743,7 +9743,7 @@
                           <a:latin typeface="Calibri"/>
                           <a:cs typeface="Calibri"/>
                         </a:rPr>
-                        <a:t>129.3</a:t>
+                        <a:t>112.0</a:t>
                       </a:r>
                     </a:p>
                   </a:txBody>
@@ -9809,7 +9809,7 @@
                           <a:latin typeface="Calibri"/>
                           <a:cs typeface="Calibri"/>
                         </a:rPr>
-                        <a:t>101st</a:t>
+                        <a:t>104th</a:t>
                       </a:r>
                     </a:p>
                   </a:txBody>
@@ -10009,7 +10009,7 @@
                           <a:latin typeface="Calibri"/>
                           <a:cs typeface="Calibri"/>
                         </a:rPr>
-                        <a:t>88,647</a:t>
+                        <a:t>80,364</a:t>
                       </a:r>
                     </a:p>
                   </a:txBody>
@@ -10075,7 +10075,7 @@
                           <a:latin typeface="Calibri"/>
                           <a:cs typeface="Calibri"/>
                         </a:rPr>
-                        <a:t>157.5</a:t>
+                        <a:t>142.8</a:t>
                       </a:r>
                     </a:p>
                   </a:txBody>
@@ -10341,7 +10341,7 @@
                           <a:latin typeface="Calibri"/>
                           <a:cs typeface="Calibri"/>
                         </a:rPr>
-                        <a:t>10,771</a:t>
+                        <a:t>9,390</a:t>
                       </a:r>
                     </a:p>
                   </a:txBody>
@@ -10407,7 +10407,7 @@
                           <a:latin typeface="Calibri"/>
                           <a:cs typeface="Calibri"/>
                         </a:rPr>
-                        <a:t>117.3</a:t>
+                        <a:t>102.3</a:t>
                       </a:r>
                     </a:p>
                   </a:txBody>
@@ -10656,7 +10656,7 @@
           <a:p>
             <a:r>
               <a:rPr/>
-              <a:t>Pack date: 15 February 2021</a:t>
+              <a:t>Pack date: 18 February 2021</a:t>
             </a:r>
           </a:p>
         </p:txBody>
@@ -10737,7 +10737,7 @@
           <a:p>
             <a:r>
               <a:rPr/>
-              <a:t>Lower Tier Local Authority cumulative cases as at 15 February</a:t>
+              <a:t>Lower Tier Local Authority cumulative cases as at 17 February</a:t>
             </a:r>
           </a:p>
         </p:txBody>
@@ -11245,7 +11245,7 @@
                           <a:latin typeface="Calibri"/>
                           <a:cs typeface="Calibri"/>
                         </a:rPr>
-                        <a:t>2,755</a:t>
+                        <a:t>2,769</a:t>
                       </a:r>
                     </a:p>
                   </a:txBody>
@@ -11311,7 +11311,7 @@
                           <a:latin typeface="Calibri"/>
                           <a:cs typeface="Calibri"/>
                         </a:rPr>
-                        <a:t>4,284.5</a:t>
+                        <a:t>4,306.3</a:t>
                       </a:r>
                     </a:p>
                   </a:txBody>
@@ -11377,7 +11377,7 @@
                           <a:latin typeface="Calibri"/>
                           <a:cs typeface="Calibri"/>
                         </a:rPr>
-                        <a:t>253rd</a:t>
+                        <a:t>254th</a:t>
                       </a:r>
                     </a:p>
                   </a:txBody>
@@ -11577,7 +11577,7 @@
                           <a:latin typeface="Calibri"/>
                           <a:cs typeface="Calibri"/>
                         </a:rPr>
-                        <a:t>7,494</a:t>
+                        <a:t>7,556</a:t>
                       </a:r>
                     </a:p>
                   </a:txBody>
@@ -11643,7 +11643,7 @@
                           <a:latin typeface="Calibri"/>
                           <a:cs typeface="Calibri"/>
                         </a:rPr>
-                        <a:t>4,661.7</a:t>
+                        <a:t>4,700.2</a:t>
                       </a:r>
                     </a:p>
                   </a:txBody>
@@ -11709,7 +11709,7 @@
                           <a:latin typeface="Calibri"/>
                           <a:cs typeface="Calibri"/>
                         </a:rPr>
-                        <a:t>226th</a:t>
+                        <a:t>225th</a:t>
                       </a:r>
                     </a:p>
                   </a:txBody>
@@ -11909,7 +11909,7 @@
                           <a:latin typeface="Calibri"/>
                           <a:cs typeface="Calibri"/>
                         </a:rPr>
-                        <a:t>4,576</a:t>
+                        <a:t>4,602</a:t>
                       </a:r>
                     </a:p>
                   </a:txBody>
@@ -11975,7 +11975,7 @@
                           <a:latin typeface="Calibri"/>
                           <a:cs typeface="Calibri"/>
                         </a:rPr>
-                        <a:t>3,777.8</a:t>
+                        <a:t>3,799.3</a:t>
                       </a:r>
                     </a:p>
                   </a:txBody>
@@ -12241,7 +12241,7 @@
                           <a:latin typeface="Calibri"/>
                           <a:cs typeface="Calibri"/>
                         </a:rPr>
-                        <a:t>7,338</a:t>
+                        <a:t>7,379</a:t>
                       </a:r>
                     </a:p>
                   </a:txBody>
@@ -12307,7 +12307,7 @@
                           <a:latin typeface="Calibri"/>
                           <a:cs typeface="Calibri"/>
                         </a:rPr>
-                        <a:t>6,527.9</a:t>
+                        <a:t>6,564.4</a:t>
                       </a:r>
                     </a:p>
                   </a:txBody>
@@ -12373,7 +12373,7 @@
                           <a:latin typeface="Calibri"/>
                           <a:cs typeface="Calibri"/>
                         </a:rPr>
-                        <a:t>107th</a:t>
+                        <a:t>109th</a:t>
                       </a:r>
                     </a:p>
                   </a:txBody>
@@ -12573,7 +12573,7 @@
                           <a:latin typeface="Calibri"/>
                           <a:cs typeface="Calibri"/>
                         </a:rPr>
-                        <a:t>5,377</a:t>
+                        <a:t>5,393</a:t>
                       </a:r>
                     </a:p>
                   </a:txBody>
@@ -12639,7 +12639,7 @@
                           <a:latin typeface="Calibri"/>
                           <a:cs typeface="Calibri"/>
                         </a:rPr>
-                        <a:t>3,739.5</a:t>
+                        <a:t>3,750.6</a:t>
                       </a:r>
                     </a:p>
                   </a:txBody>
@@ -12905,7 +12905,7 @@
                           <a:latin typeface="Calibri"/>
                           <a:cs typeface="Calibri"/>
                         </a:rPr>
-                        <a:t>6,433</a:t>
+                        <a:t>6,450</a:t>
                       </a:r>
                     </a:p>
                   </a:txBody>
@@ -12971,7 +12971,7 @@
                           <a:latin typeface="Calibri"/>
                           <a:cs typeface="Calibri"/>
                         </a:rPr>
-                        <a:t>4,259.6</a:t>
+                        <a:t>4,270.9</a:t>
                       </a:r>
                     </a:p>
                   </a:txBody>
@@ -13037,7 +13037,7 @@
                           <a:latin typeface="Calibri"/>
                           <a:cs typeface="Calibri"/>
                         </a:rPr>
-                        <a:t>256th</a:t>
+                        <a:t>257th</a:t>
                       </a:r>
                     </a:p>
                   </a:txBody>
@@ -13237,7 +13237,7 @@
                           <a:latin typeface="Calibri"/>
                           <a:cs typeface="Calibri"/>
                         </a:rPr>
-                        <a:t>4,881</a:t>
+                        <a:t>4,903</a:t>
                       </a:r>
                     </a:p>
                   </a:txBody>
@@ -13303,7 +13303,7 @@
                           <a:latin typeface="Calibri"/>
                           <a:cs typeface="Calibri"/>
                         </a:rPr>
-                        <a:t>4,414.4</a:t>
+                        <a:t>4,434.3</a:t>
                       </a:r>
                     </a:p>
                   </a:txBody>
@@ -13369,7 +13369,7 @@
                           <a:latin typeface="Calibri"/>
                           <a:cs typeface="Calibri"/>
                         </a:rPr>
-                        <a:t>246th</a:t>
+                        <a:t>245th</a:t>
                       </a:r>
                     </a:p>
                   </a:txBody>
@@ -13569,7 +13569,7 @@
                           <a:latin typeface="Calibri"/>
                           <a:cs typeface="Calibri"/>
                         </a:rPr>
-                        <a:t>38,854</a:t>
+                        <a:t>39,052</a:t>
                       </a:r>
                     </a:p>
                   </a:txBody>
@@ -13635,7 +13635,7 @@
                           <a:latin typeface="Calibri"/>
                           <a:cs typeface="Calibri"/>
                         </a:rPr>
-                        <a:t>4,497.1</a:t>
+                        <a:t>4,520.0</a:t>
                       </a:r>
                     </a:p>
                   </a:txBody>
@@ -13901,7 +13901,7 @@
                           <a:latin typeface="Calibri"/>
                           <a:cs typeface="Calibri"/>
                         </a:rPr>
-                        <a:t>506,557</a:t>
+                        <a:t>508,806</a:t>
                       </a:r>
                     </a:p>
                   </a:txBody>
@@ -13967,7 +13967,7 @@
                           <a:latin typeface="Calibri"/>
                           <a:cs typeface="Calibri"/>
                         </a:rPr>
-                        <a:t>5,518.0</a:t>
+                        <a:t>5,542.5</a:t>
                       </a:r>
                     </a:p>
                   </a:txBody>
@@ -14233,7 +14233,7 @@
                           <a:latin typeface="Calibri"/>
                           <a:cs typeface="Calibri"/>
                         </a:rPr>
-                        <a:t>3,546,803</a:t>
+                        <a:t>3,566,965</a:t>
                       </a:r>
                     </a:p>
                   </a:txBody>
@@ -14299,7 +14299,7 @@
                           <a:latin typeface="Calibri"/>
                           <a:cs typeface="Calibri"/>
                         </a:rPr>
-                        <a:t>6,301.3</a:t>
+                        <a:t>6,337.1</a:t>
                       </a:r>
                     </a:p>
                   </a:txBody>
@@ -14548,7 +14548,7 @@
           <a:p>
             <a:r>
               <a:rPr/>
-              <a:t>Pack date: 15 February 2021</a:t>
+              <a:t>Pack date: 18 February 2021</a:t>
             </a:r>
           </a:p>
         </p:txBody>
@@ -14629,7 +14629,7 @@
           <a:p>
             <a:r>
               <a:rPr/>
-              <a:t>Lower Tier Local Authority rolling cases as at 15 February</a:t>
+              <a:t>Lower Tier Local Authority rolling cases as at 17 February</a:t>
             </a:r>
           </a:p>
         </p:txBody>
@@ -14710,7 +14710,7 @@
           <a:p>
             <a:r>
               <a:rPr/>
-              <a:t>Note that the very recent days are excluded in the 7-day total as these are thought to be incomplete. As such, this data represents cases in the seven days to 10 February</a:t>
+              <a:t>Note that the very recent days are excluded in the 7-day total as these are thought to be incomplete. As such, this data represents cases in the seven days to 12 February</a:t>
             </a:r>
           </a:p>
         </p:txBody>
@@ -15164,7 +15164,7 @@
                           <a:latin typeface="Calibri"/>
                           <a:cs typeface="Calibri"/>
                         </a:rPr>
-                        <a:t>58</a:t>
+                        <a:t>47</a:t>
                       </a:r>
                     </a:p>
                   </a:txBody>
@@ -15230,7 +15230,7 @@
                           <a:latin typeface="Calibri"/>
                           <a:cs typeface="Calibri"/>
                         </a:rPr>
-                        <a:t>90.2</a:t>
+                        <a:t>73.1</a:t>
                       </a:r>
                     </a:p>
                   </a:txBody>
@@ -15296,7 +15296,7 @@
                           <a:latin typeface="Calibri"/>
                           <a:cs typeface="Calibri"/>
                         </a:rPr>
-                        <a:t>266th</a:t>
+                        <a:t>284th</a:t>
                       </a:r>
                     </a:p>
                   </a:txBody>
@@ -15321,6 +15321,1335 @@
                       <a:solidFill>
                         <a:srgbClr val="000000">
                           <a:alpha val="100000"/>
+                        </a:srgbClr>
+                      </a:solidFill>
+                      <a:prstDash val="solid"/>
+                    </a:lnT>
+                    <a:lnB w="0" cmpd="sng" algn="ctr" cap="flat">
+                      <a:solidFill>
+                        <a:srgbClr val="FFFFFF">
+                          <a:alpha val="0"/>
+                        </a:srgbClr>
+                      </a:solidFill>
+                      <a:prstDash val="solid"/>
+                    </a:lnB>
+                  </a:tcPr>
+                </a:tc>
+                <a:tc>
+                  <a:txBody>
+                    <a:bodyPr/>
+                    <a:lstStyle/>
+                    <a:p>
+                      <a:pPr algn="l" marL="63500" marR="63500">
+                        <a:lnSpc>
+                          <a:spcPct val="100000"/>
+                        </a:lnSpc>
+                        <a:spcBef>
+                          <a:spcPts val="200"/>
+                        </a:spcBef>
+                        <a:spcAft>
+                          <a:spcPts val="200"/>
+                        </a:spcAft>
+                        <a:buNone/>
+                      </a:pPr>
+                      <a:r>
+                        <a:rPr sz="1100">
+                          <a:solidFill>
+                            <a:srgbClr val="111111">
+                              <a:alpha val="100000"/>
+                            </a:srgbClr>
+                          </a:solidFill>
+                          <a:latin typeface="Calibri"/>
+                          <a:cs typeface="Calibri"/>
+                        </a:rPr>
+                        <a:t>10% of authorities
+with lowest rate</a:t>
+                      </a:r>
+                    </a:p>
+                  </a:txBody>
+                  <a:tcPr anchor="t" marB="0" marT="0" marR="0" marL="0">
+                    <a:lnL w="0" cmpd="sng" algn="ctr" cap="flat">
+                      <a:solidFill>
+                        <a:srgbClr val="FFFFFF">
+                          <a:alpha val="0"/>
+                        </a:srgbClr>
+                      </a:solidFill>
+                      <a:prstDash val="solid"/>
+                    </a:lnL>
+                    <a:lnR w="0" cmpd="sng" algn="ctr" cap="flat">
+                      <a:solidFill>
+                        <a:srgbClr val="FFFFFF">
+                          <a:alpha val="0"/>
+                        </a:srgbClr>
+                      </a:solidFill>
+                      <a:prstDash val="solid"/>
+                    </a:lnR>
+                    <a:lnT w="6350" cmpd="sng" algn="ctr" cap="flat">
+                      <a:solidFill>
+                        <a:srgbClr val="000000">
+                          <a:alpha val="100000"/>
+                        </a:srgbClr>
+                      </a:solidFill>
+                      <a:prstDash val="solid"/>
+                    </a:lnT>
+                    <a:lnB w="0" cmpd="sng" algn="ctr" cap="flat">
+                      <a:solidFill>
+                        <a:srgbClr val="FFFFFF">
+                          <a:alpha val="0"/>
+                        </a:srgbClr>
+                      </a:solidFill>
+                      <a:prstDash val="solid"/>
+                    </a:lnB>
+                  </a:tcPr>
+                </a:tc>
+              </a:tr>
+              <a:tr h="182880">
+                <a:tc>
+                  <a:txBody>
+                    <a:bodyPr/>
+                    <a:lstStyle/>
+                    <a:p>
+                      <a:pPr algn="l" marL="63500" marR="63500">
+                        <a:lnSpc>
+                          <a:spcPct val="100000"/>
+                        </a:lnSpc>
+                        <a:spcBef>
+                          <a:spcPts val="200"/>
+                        </a:spcBef>
+                        <a:spcAft>
+                          <a:spcPts val="200"/>
+                        </a:spcAft>
+                        <a:buNone/>
+                      </a:pPr>
+                      <a:r>
+                        <a:rPr sz="1100">
+                          <a:solidFill>
+                            <a:srgbClr val="111111">
+                              <a:alpha val="100000"/>
+                            </a:srgbClr>
+                          </a:solidFill>
+                          <a:latin typeface="Calibri"/>
+                          <a:cs typeface="Calibri"/>
+                        </a:rPr>
+                        <a:t>Arun</a:t>
+                      </a:r>
+                    </a:p>
+                  </a:txBody>
+                  <a:tcPr anchor="t" marB="0" marT="0" marR="0" marL="0">
+                    <a:lnL w="0" cmpd="sng" algn="ctr" cap="flat">
+                      <a:solidFill>
+                        <a:srgbClr val="FFFFFF">
+                          <a:alpha val="0"/>
+                        </a:srgbClr>
+                      </a:solidFill>
+                      <a:prstDash val="solid"/>
+                    </a:lnL>
+                    <a:lnR w="0" cmpd="sng" algn="ctr" cap="flat">
+                      <a:solidFill>
+                        <a:srgbClr val="FFFFFF">
+                          <a:alpha val="0"/>
+                        </a:srgbClr>
+                      </a:solidFill>
+                      <a:prstDash val="solid"/>
+                    </a:lnR>
+                    <a:lnT w="0" cmpd="sng" algn="ctr" cap="flat">
+                      <a:solidFill>
+                        <a:srgbClr val="FFFFFF">
+                          <a:alpha val="0"/>
+                        </a:srgbClr>
+                      </a:solidFill>
+                      <a:prstDash val="solid"/>
+                    </a:lnT>
+                    <a:lnB w="0" cmpd="sng" algn="ctr" cap="flat">
+                      <a:solidFill>
+                        <a:srgbClr val="FFFFFF">
+                          <a:alpha val="0"/>
+                        </a:srgbClr>
+                      </a:solidFill>
+                      <a:prstDash val="solid"/>
+                    </a:lnB>
+                  </a:tcPr>
+                </a:tc>
+                <a:tc>
+                  <a:txBody>
+                    <a:bodyPr/>
+                    <a:lstStyle/>
+                    <a:p>
+                      <a:pPr algn="l" marL="63500" marR="63500">
+                        <a:lnSpc>
+                          <a:spcPct val="100000"/>
+                        </a:lnSpc>
+                        <a:spcBef>
+                          <a:spcPts val="200"/>
+                        </a:spcBef>
+                        <a:spcAft>
+                          <a:spcPts val="200"/>
+                        </a:spcAft>
+                        <a:buNone/>
+                      </a:pPr>
+                      <a:r>
+                        <a:rPr sz="1100">
+                          <a:solidFill>
+                            <a:srgbClr val="111111">
+                              <a:alpha val="100000"/>
+                            </a:srgbClr>
+                          </a:solidFill>
+                          <a:latin typeface="Calibri"/>
+                          <a:cs typeface="Calibri"/>
+                        </a:rPr>
+                        <a:t>244</a:t>
+                      </a:r>
+                    </a:p>
+                  </a:txBody>
+                  <a:tcPr anchor="t" marB="0" marT="0" marR="0" marL="0">
+                    <a:lnL w="0" cmpd="sng" algn="ctr" cap="flat">
+                      <a:solidFill>
+                        <a:srgbClr val="FFFFFF">
+                          <a:alpha val="0"/>
+                        </a:srgbClr>
+                      </a:solidFill>
+                      <a:prstDash val="solid"/>
+                    </a:lnL>
+                    <a:lnR w="0" cmpd="sng" algn="ctr" cap="flat">
+                      <a:solidFill>
+                        <a:srgbClr val="FFFFFF">
+                          <a:alpha val="0"/>
+                        </a:srgbClr>
+                      </a:solidFill>
+                      <a:prstDash val="solid"/>
+                    </a:lnR>
+                    <a:lnT w="0" cmpd="sng" algn="ctr" cap="flat">
+                      <a:solidFill>
+                        <a:srgbClr val="FFFFFF">
+                          <a:alpha val="0"/>
+                        </a:srgbClr>
+                      </a:solidFill>
+                      <a:prstDash val="solid"/>
+                    </a:lnT>
+                    <a:lnB w="0" cmpd="sng" algn="ctr" cap="flat">
+                      <a:solidFill>
+                        <a:srgbClr val="FFFFFF">
+                          <a:alpha val="0"/>
+                        </a:srgbClr>
+                      </a:solidFill>
+                      <a:prstDash val="solid"/>
+                    </a:lnB>
+                  </a:tcPr>
+                </a:tc>
+                <a:tc>
+                  <a:txBody>
+                    <a:bodyPr/>
+                    <a:lstStyle/>
+                    <a:p>
+                      <a:pPr algn="l" marL="63500" marR="63500">
+                        <a:lnSpc>
+                          <a:spcPct val="100000"/>
+                        </a:lnSpc>
+                        <a:spcBef>
+                          <a:spcPts val="200"/>
+                        </a:spcBef>
+                        <a:spcAft>
+                          <a:spcPts val="200"/>
+                        </a:spcAft>
+                        <a:buNone/>
+                      </a:pPr>
+                      <a:r>
+                        <a:rPr sz="1100">
+                          <a:solidFill>
+                            <a:srgbClr val="111111">
+                              <a:alpha val="100000"/>
+                            </a:srgbClr>
+                          </a:solidFill>
+                          <a:latin typeface="Calibri"/>
+                          <a:cs typeface="Calibri"/>
+                        </a:rPr>
+                        <a:t>151.8</a:t>
+                      </a:r>
+                    </a:p>
+                  </a:txBody>
+                  <a:tcPr anchor="t" marB="0" marT="0" marR="0" marL="0">
+                    <a:lnL w="0" cmpd="sng" algn="ctr" cap="flat">
+                      <a:solidFill>
+                        <a:srgbClr val="FFFFFF">
+                          <a:alpha val="0"/>
+                        </a:srgbClr>
+                      </a:solidFill>
+                      <a:prstDash val="solid"/>
+                    </a:lnL>
+                    <a:lnR w="0" cmpd="sng" algn="ctr" cap="flat">
+                      <a:solidFill>
+                        <a:srgbClr val="FFFFFF">
+                          <a:alpha val="0"/>
+                        </a:srgbClr>
+                      </a:solidFill>
+                      <a:prstDash val="solid"/>
+                    </a:lnR>
+                    <a:lnT w="0" cmpd="sng" algn="ctr" cap="flat">
+                      <a:solidFill>
+                        <a:srgbClr val="FFFFFF">
+                          <a:alpha val="0"/>
+                        </a:srgbClr>
+                      </a:solidFill>
+                      <a:prstDash val="solid"/>
+                    </a:lnT>
+                    <a:lnB w="0" cmpd="sng" algn="ctr" cap="flat">
+                      <a:solidFill>
+                        <a:srgbClr val="FFFFFF">
+                          <a:alpha val="0"/>
+                        </a:srgbClr>
+                      </a:solidFill>
+                      <a:prstDash val="solid"/>
+                    </a:lnB>
+                  </a:tcPr>
+                </a:tc>
+                <a:tc>
+                  <a:txBody>
+                    <a:bodyPr/>
+                    <a:lstStyle/>
+                    <a:p>
+                      <a:pPr algn="l" marL="63500" marR="63500">
+                        <a:lnSpc>
+                          <a:spcPct val="100000"/>
+                        </a:lnSpc>
+                        <a:spcBef>
+                          <a:spcPts val="200"/>
+                        </a:spcBef>
+                        <a:spcAft>
+                          <a:spcPts val="200"/>
+                        </a:spcAft>
+                        <a:buNone/>
+                      </a:pPr>
+                      <a:r>
+                        <a:rPr sz="1100">
+                          <a:solidFill>
+                            <a:srgbClr val="111111">
+                              <a:alpha val="100000"/>
+                            </a:srgbClr>
+                          </a:solidFill>
+                          <a:latin typeface="Calibri"/>
+                          <a:cs typeface="Calibri"/>
+                        </a:rPr>
+                        <a:t>114th</a:t>
+                      </a:r>
+                    </a:p>
+                  </a:txBody>
+                  <a:tcPr anchor="t" marB="0" marT="0" marR="0" marL="0">
+                    <a:lnL w="0" cmpd="sng" algn="ctr" cap="flat">
+                      <a:solidFill>
+                        <a:srgbClr val="FFFFFF">
+                          <a:alpha val="0"/>
+                        </a:srgbClr>
+                      </a:solidFill>
+                      <a:prstDash val="solid"/>
+                    </a:lnL>
+                    <a:lnR w="0" cmpd="sng" algn="ctr" cap="flat">
+                      <a:solidFill>
+                        <a:srgbClr val="FFFFFF">
+                          <a:alpha val="0"/>
+                        </a:srgbClr>
+                      </a:solidFill>
+                      <a:prstDash val="solid"/>
+                    </a:lnR>
+                    <a:lnT w="0" cmpd="sng" algn="ctr" cap="flat">
+                      <a:solidFill>
+                        <a:srgbClr val="FFFFFF">
+                          <a:alpha val="0"/>
+                        </a:srgbClr>
+                      </a:solidFill>
+                      <a:prstDash val="solid"/>
+                    </a:lnT>
+                    <a:lnB w="0" cmpd="sng" algn="ctr" cap="flat">
+                      <a:solidFill>
+                        <a:srgbClr val="FFFFFF">
+                          <a:alpha val="0"/>
+                        </a:srgbClr>
+                      </a:solidFill>
+                      <a:prstDash val="solid"/>
+                    </a:lnB>
+                  </a:tcPr>
+                </a:tc>
+                <a:tc>
+                  <a:txBody>
+                    <a:bodyPr/>
+                    <a:lstStyle/>
+                    <a:p>
+                      <a:pPr algn="l" marL="63500" marR="63500">
+                        <a:lnSpc>
+                          <a:spcPct val="100000"/>
+                        </a:lnSpc>
+                        <a:spcBef>
+                          <a:spcPts val="200"/>
+                        </a:spcBef>
+                        <a:spcAft>
+                          <a:spcPts val="200"/>
+                        </a:spcAft>
+                        <a:buNone/>
+                      </a:pPr>
+                      <a:r>
+                        <a:rPr sz="1100">
+                          <a:solidFill>
+                            <a:srgbClr val="111111">
+                              <a:alpha val="100000"/>
+                            </a:srgbClr>
+                          </a:solidFill>
+                          <a:latin typeface="Calibri"/>
+                          <a:cs typeface="Calibri"/>
+                        </a:rPr>
+                        <a:t>Decile 4</a:t>
+                      </a:r>
+                    </a:p>
+                  </a:txBody>
+                  <a:tcPr anchor="t" marB="0" marT="0" marR="0" marL="0">
+                    <a:lnL w="0" cmpd="sng" algn="ctr" cap="flat">
+                      <a:solidFill>
+                        <a:srgbClr val="FFFFFF">
+                          <a:alpha val="0"/>
+                        </a:srgbClr>
+                      </a:solidFill>
+                      <a:prstDash val="solid"/>
+                    </a:lnL>
+                    <a:lnR w="0" cmpd="sng" algn="ctr" cap="flat">
+                      <a:solidFill>
+                        <a:srgbClr val="FFFFFF">
+                          <a:alpha val="0"/>
+                        </a:srgbClr>
+                      </a:solidFill>
+                      <a:prstDash val="solid"/>
+                    </a:lnR>
+                    <a:lnT w="0" cmpd="sng" algn="ctr" cap="flat">
+                      <a:solidFill>
+                        <a:srgbClr val="FFFFFF">
+                          <a:alpha val="0"/>
+                        </a:srgbClr>
+                      </a:solidFill>
+                      <a:prstDash val="solid"/>
+                    </a:lnT>
+                    <a:lnB w="0" cmpd="sng" algn="ctr" cap="flat">
+                      <a:solidFill>
+                        <a:srgbClr val="FFFFFF">
+                          <a:alpha val="0"/>
+                        </a:srgbClr>
+                      </a:solidFill>
+                      <a:prstDash val="solid"/>
+                    </a:lnB>
+                  </a:tcPr>
+                </a:tc>
+              </a:tr>
+              <a:tr h="182880">
+                <a:tc>
+                  <a:txBody>
+                    <a:bodyPr/>
+                    <a:lstStyle/>
+                    <a:p>
+                      <a:pPr algn="l" marL="63500" marR="63500">
+                        <a:lnSpc>
+                          <a:spcPct val="100000"/>
+                        </a:lnSpc>
+                        <a:spcBef>
+                          <a:spcPts val="200"/>
+                        </a:spcBef>
+                        <a:spcAft>
+                          <a:spcPts val="200"/>
+                        </a:spcAft>
+                        <a:buNone/>
+                      </a:pPr>
+                      <a:r>
+                        <a:rPr sz="1100">
+                          <a:solidFill>
+                            <a:srgbClr val="111111">
+                              <a:alpha val="100000"/>
+                            </a:srgbClr>
+                          </a:solidFill>
+                          <a:latin typeface="Calibri"/>
+                          <a:cs typeface="Calibri"/>
+                        </a:rPr>
+                        <a:t>Chichester</a:t>
+                      </a:r>
+                    </a:p>
+                  </a:txBody>
+                  <a:tcPr anchor="t" marB="0" marT="0" marR="0" marL="0">
+                    <a:lnL w="0" cmpd="sng" algn="ctr" cap="flat">
+                      <a:solidFill>
+                        <a:srgbClr val="FFFFFF">
+                          <a:alpha val="0"/>
+                        </a:srgbClr>
+                      </a:solidFill>
+                      <a:prstDash val="solid"/>
+                    </a:lnL>
+                    <a:lnR w="0" cmpd="sng" algn="ctr" cap="flat">
+                      <a:solidFill>
+                        <a:srgbClr val="FFFFFF">
+                          <a:alpha val="0"/>
+                        </a:srgbClr>
+                      </a:solidFill>
+                      <a:prstDash val="solid"/>
+                    </a:lnR>
+                    <a:lnT w="0" cmpd="sng" algn="ctr" cap="flat">
+                      <a:solidFill>
+                        <a:srgbClr val="FFFFFF">
+                          <a:alpha val="0"/>
+                        </a:srgbClr>
+                      </a:solidFill>
+                      <a:prstDash val="solid"/>
+                    </a:lnT>
+                    <a:lnB w="0" cmpd="sng" algn="ctr" cap="flat">
+                      <a:solidFill>
+                        <a:srgbClr val="FFFFFF">
+                          <a:alpha val="0"/>
+                        </a:srgbClr>
+                      </a:solidFill>
+                      <a:prstDash val="solid"/>
+                    </a:lnB>
+                  </a:tcPr>
+                </a:tc>
+                <a:tc>
+                  <a:txBody>
+                    <a:bodyPr/>
+                    <a:lstStyle/>
+                    <a:p>
+                      <a:pPr algn="l" marL="63500" marR="63500">
+                        <a:lnSpc>
+                          <a:spcPct val="100000"/>
+                        </a:lnSpc>
+                        <a:spcBef>
+                          <a:spcPts val="200"/>
+                        </a:spcBef>
+                        <a:spcAft>
+                          <a:spcPts val="200"/>
+                        </a:spcAft>
+                        <a:buNone/>
+                      </a:pPr>
+                      <a:r>
+                        <a:rPr sz="1100">
+                          <a:solidFill>
+                            <a:srgbClr val="111111">
+                              <a:alpha val="100000"/>
+                            </a:srgbClr>
+                          </a:solidFill>
+                          <a:latin typeface="Calibri"/>
+                          <a:cs typeface="Calibri"/>
+                        </a:rPr>
+                        <a:t>136</a:t>
+                      </a:r>
+                    </a:p>
+                  </a:txBody>
+                  <a:tcPr anchor="t" marB="0" marT="0" marR="0" marL="0">
+                    <a:lnL w="0" cmpd="sng" algn="ctr" cap="flat">
+                      <a:solidFill>
+                        <a:srgbClr val="FFFFFF">
+                          <a:alpha val="0"/>
+                        </a:srgbClr>
+                      </a:solidFill>
+                      <a:prstDash val="solid"/>
+                    </a:lnL>
+                    <a:lnR w="0" cmpd="sng" algn="ctr" cap="flat">
+                      <a:solidFill>
+                        <a:srgbClr val="FFFFFF">
+                          <a:alpha val="0"/>
+                        </a:srgbClr>
+                      </a:solidFill>
+                      <a:prstDash val="solid"/>
+                    </a:lnR>
+                    <a:lnT w="0" cmpd="sng" algn="ctr" cap="flat">
+                      <a:solidFill>
+                        <a:srgbClr val="FFFFFF">
+                          <a:alpha val="0"/>
+                        </a:srgbClr>
+                      </a:solidFill>
+                      <a:prstDash val="solid"/>
+                    </a:lnT>
+                    <a:lnB w="0" cmpd="sng" algn="ctr" cap="flat">
+                      <a:solidFill>
+                        <a:srgbClr val="FFFFFF">
+                          <a:alpha val="0"/>
+                        </a:srgbClr>
+                      </a:solidFill>
+                      <a:prstDash val="solid"/>
+                    </a:lnB>
+                  </a:tcPr>
+                </a:tc>
+                <a:tc>
+                  <a:txBody>
+                    <a:bodyPr/>
+                    <a:lstStyle/>
+                    <a:p>
+                      <a:pPr algn="l" marL="63500" marR="63500">
+                        <a:lnSpc>
+                          <a:spcPct val="100000"/>
+                        </a:lnSpc>
+                        <a:spcBef>
+                          <a:spcPts val="200"/>
+                        </a:spcBef>
+                        <a:spcAft>
+                          <a:spcPts val="200"/>
+                        </a:spcAft>
+                        <a:buNone/>
+                      </a:pPr>
+                      <a:r>
+                        <a:rPr sz="1100">
+                          <a:solidFill>
+                            <a:srgbClr val="111111">
+                              <a:alpha val="100000"/>
+                            </a:srgbClr>
+                          </a:solidFill>
+                          <a:latin typeface="Calibri"/>
+                          <a:cs typeface="Calibri"/>
+                        </a:rPr>
+                        <a:t>112.3</a:t>
+                      </a:r>
+                    </a:p>
+                  </a:txBody>
+                  <a:tcPr anchor="t" marB="0" marT="0" marR="0" marL="0">
+                    <a:lnL w="0" cmpd="sng" algn="ctr" cap="flat">
+                      <a:solidFill>
+                        <a:srgbClr val="FFFFFF">
+                          <a:alpha val="0"/>
+                        </a:srgbClr>
+                      </a:solidFill>
+                      <a:prstDash val="solid"/>
+                    </a:lnL>
+                    <a:lnR w="0" cmpd="sng" algn="ctr" cap="flat">
+                      <a:solidFill>
+                        <a:srgbClr val="FFFFFF">
+                          <a:alpha val="0"/>
+                        </a:srgbClr>
+                      </a:solidFill>
+                      <a:prstDash val="solid"/>
+                    </a:lnR>
+                    <a:lnT w="0" cmpd="sng" algn="ctr" cap="flat">
+                      <a:solidFill>
+                        <a:srgbClr val="FFFFFF">
+                          <a:alpha val="0"/>
+                        </a:srgbClr>
+                      </a:solidFill>
+                      <a:prstDash val="solid"/>
+                    </a:lnT>
+                    <a:lnB w="0" cmpd="sng" algn="ctr" cap="flat">
+                      <a:solidFill>
+                        <a:srgbClr val="FFFFFF">
+                          <a:alpha val="0"/>
+                        </a:srgbClr>
+                      </a:solidFill>
+                      <a:prstDash val="solid"/>
+                    </a:lnB>
+                  </a:tcPr>
+                </a:tc>
+                <a:tc>
+                  <a:txBody>
+                    <a:bodyPr/>
+                    <a:lstStyle/>
+                    <a:p>
+                      <a:pPr algn="l" marL="63500" marR="63500">
+                        <a:lnSpc>
+                          <a:spcPct val="100000"/>
+                        </a:lnSpc>
+                        <a:spcBef>
+                          <a:spcPts val="200"/>
+                        </a:spcBef>
+                        <a:spcAft>
+                          <a:spcPts val="200"/>
+                        </a:spcAft>
+                        <a:buNone/>
+                      </a:pPr>
+                      <a:r>
+                        <a:rPr sz="1100">
+                          <a:solidFill>
+                            <a:srgbClr val="111111">
+                              <a:alpha val="100000"/>
+                            </a:srgbClr>
+                          </a:solidFill>
+                          <a:latin typeface="Calibri"/>
+                          <a:cs typeface="Calibri"/>
+                        </a:rPr>
+                        <a:t>188th</a:t>
+                      </a:r>
+                    </a:p>
+                  </a:txBody>
+                  <a:tcPr anchor="t" marB="0" marT="0" marR="0" marL="0">
+                    <a:lnL w="0" cmpd="sng" algn="ctr" cap="flat">
+                      <a:solidFill>
+                        <a:srgbClr val="FFFFFF">
+                          <a:alpha val="0"/>
+                        </a:srgbClr>
+                      </a:solidFill>
+                      <a:prstDash val="solid"/>
+                    </a:lnL>
+                    <a:lnR w="0" cmpd="sng" algn="ctr" cap="flat">
+                      <a:solidFill>
+                        <a:srgbClr val="FFFFFF">
+                          <a:alpha val="0"/>
+                        </a:srgbClr>
+                      </a:solidFill>
+                      <a:prstDash val="solid"/>
+                    </a:lnR>
+                    <a:lnT w="0" cmpd="sng" algn="ctr" cap="flat">
+                      <a:solidFill>
+                        <a:srgbClr val="FFFFFF">
+                          <a:alpha val="0"/>
+                        </a:srgbClr>
+                      </a:solidFill>
+                      <a:prstDash val="solid"/>
+                    </a:lnT>
+                    <a:lnB w="0" cmpd="sng" algn="ctr" cap="flat">
+                      <a:solidFill>
+                        <a:srgbClr val="FFFFFF">
+                          <a:alpha val="0"/>
+                        </a:srgbClr>
+                      </a:solidFill>
+                      <a:prstDash val="solid"/>
+                    </a:lnB>
+                  </a:tcPr>
+                </a:tc>
+                <a:tc>
+                  <a:txBody>
+                    <a:bodyPr/>
+                    <a:lstStyle/>
+                    <a:p>
+                      <a:pPr algn="l" marL="63500" marR="63500">
+                        <a:lnSpc>
+                          <a:spcPct val="100000"/>
+                        </a:lnSpc>
+                        <a:spcBef>
+                          <a:spcPts val="200"/>
+                        </a:spcBef>
+                        <a:spcAft>
+                          <a:spcPts val="200"/>
+                        </a:spcAft>
+                        <a:buNone/>
+                      </a:pPr>
+                      <a:r>
+                        <a:rPr sz="1100">
+                          <a:solidFill>
+                            <a:srgbClr val="111111">
+                              <a:alpha val="100000"/>
+                            </a:srgbClr>
+                          </a:solidFill>
+                          <a:latin typeface="Calibri"/>
+                          <a:cs typeface="Calibri"/>
+                        </a:rPr>
+                        <a:t>Decile 7</a:t>
+                      </a:r>
+                    </a:p>
+                  </a:txBody>
+                  <a:tcPr anchor="t" marB="0" marT="0" marR="0" marL="0">
+                    <a:lnL w="0" cmpd="sng" algn="ctr" cap="flat">
+                      <a:solidFill>
+                        <a:srgbClr val="FFFFFF">
+                          <a:alpha val="0"/>
+                        </a:srgbClr>
+                      </a:solidFill>
+                      <a:prstDash val="solid"/>
+                    </a:lnL>
+                    <a:lnR w="0" cmpd="sng" algn="ctr" cap="flat">
+                      <a:solidFill>
+                        <a:srgbClr val="FFFFFF">
+                          <a:alpha val="0"/>
+                        </a:srgbClr>
+                      </a:solidFill>
+                      <a:prstDash val="solid"/>
+                    </a:lnR>
+                    <a:lnT w="0" cmpd="sng" algn="ctr" cap="flat">
+                      <a:solidFill>
+                        <a:srgbClr val="FFFFFF">
+                          <a:alpha val="0"/>
+                        </a:srgbClr>
+                      </a:solidFill>
+                      <a:prstDash val="solid"/>
+                    </a:lnT>
+                    <a:lnB w="0" cmpd="sng" algn="ctr" cap="flat">
+                      <a:solidFill>
+                        <a:srgbClr val="FFFFFF">
+                          <a:alpha val="0"/>
+                        </a:srgbClr>
+                      </a:solidFill>
+                      <a:prstDash val="solid"/>
+                    </a:lnB>
+                  </a:tcPr>
+                </a:tc>
+              </a:tr>
+              <a:tr h="182880">
+                <a:tc>
+                  <a:txBody>
+                    <a:bodyPr/>
+                    <a:lstStyle/>
+                    <a:p>
+                      <a:pPr algn="l" marL="63500" marR="63500">
+                        <a:lnSpc>
+                          <a:spcPct val="100000"/>
+                        </a:lnSpc>
+                        <a:spcBef>
+                          <a:spcPts val="200"/>
+                        </a:spcBef>
+                        <a:spcAft>
+                          <a:spcPts val="200"/>
+                        </a:spcAft>
+                        <a:buNone/>
+                      </a:pPr>
+                      <a:r>
+                        <a:rPr sz="1100">
+                          <a:solidFill>
+                            <a:srgbClr val="111111">
+                              <a:alpha val="100000"/>
+                            </a:srgbClr>
+                          </a:solidFill>
+                          <a:latin typeface="Calibri"/>
+                          <a:cs typeface="Calibri"/>
+                        </a:rPr>
+                        <a:t>Crawley</a:t>
+                      </a:r>
+                    </a:p>
+                  </a:txBody>
+                  <a:tcPr anchor="t" marB="0" marT="0" marR="0" marL="0">
+                    <a:lnL w="0" cmpd="sng" algn="ctr" cap="flat">
+                      <a:solidFill>
+                        <a:srgbClr val="FFFFFF">
+                          <a:alpha val="0"/>
+                        </a:srgbClr>
+                      </a:solidFill>
+                      <a:prstDash val="solid"/>
+                    </a:lnL>
+                    <a:lnR w="0" cmpd="sng" algn="ctr" cap="flat">
+                      <a:solidFill>
+                        <a:srgbClr val="FFFFFF">
+                          <a:alpha val="0"/>
+                        </a:srgbClr>
+                      </a:solidFill>
+                      <a:prstDash val="solid"/>
+                    </a:lnR>
+                    <a:lnT w="0" cmpd="sng" algn="ctr" cap="flat">
+                      <a:solidFill>
+                        <a:srgbClr val="FFFFFF">
+                          <a:alpha val="0"/>
+                        </a:srgbClr>
+                      </a:solidFill>
+                      <a:prstDash val="solid"/>
+                    </a:lnT>
+                    <a:lnB w="0" cmpd="sng" algn="ctr" cap="flat">
+                      <a:solidFill>
+                        <a:srgbClr val="FFFFFF">
+                          <a:alpha val="0"/>
+                        </a:srgbClr>
+                      </a:solidFill>
+                      <a:prstDash val="solid"/>
+                    </a:lnB>
+                  </a:tcPr>
+                </a:tc>
+                <a:tc>
+                  <a:txBody>
+                    <a:bodyPr/>
+                    <a:lstStyle/>
+                    <a:p>
+                      <a:pPr algn="l" marL="63500" marR="63500">
+                        <a:lnSpc>
+                          <a:spcPct val="100000"/>
+                        </a:lnSpc>
+                        <a:spcBef>
+                          <a:spcPts val="200"/>
+                        </a:spcBef>
+                        <a:spcAft>
+                          <a:spcPts val="200"/>
+                        </a:spcAft>
+                        <a:buNone/>
+                      </a:pPr>
+                      <a:r>
+                        <a:rPr sz="1100">
+                          <a:solidFill>
+                            <a:srgbClr val="111111">
+                              <a:alpha val="100000"/>
+                            </a:srgbClr>
+                          </a:solidFill>
+                          <a:latin typeface="Calibri"/>
+                          <a:cs typeface="Calibri"/>
+                        </a:rPr>
+                        <a:t>206</a:t>
+                      </a:r>
+                    </a:p>
+                  </a:txBody>
+                  <a:tcPr anchor="t" marB="0" marT="0" marR="0" marL="0">
+                    <a:lnL w="0" cmpd="sng" algn="ctr" cap="flat">
+                      <a:solidFill>
+                        <a:srgbClr val="FFFFFF">
+                          <a:alpha val="0"/>
+                        </a:srgbClr>
+                      </a:solidFill>
+                      <a:prstDash val="solid"/>
+                    </a:lnL>
+                    <a:lnR w="0" cmpd="sng" algn="ctr" cap="flat">
+                      <a:solidFill>
+                        <a:srgbClr val="FFFFFF">
+                          <a:alpha val="0"/>
+                        </a:srgbClr>
+                      </a:solidFill>
+                      <a:prstDash val="solid"/>
+                    </a:lnR>
+                    <a:lnT w="0" cmpd="sng" algn="ctr" cap="flat">
+                      <a:solidFill>
+                        <a:srgbClr val="FFFFFF">
+                          <a:alpha val="0"/>
+                        </a:srgbClr>
+                      </a:solidFill>
+                      <a:prstDash val="solid"/>
+                    </a:lnT>
+                    <a:lnB w="0" cmpd="sng" algn="ctr" cap="flat">
+                      <a:solidFill>
+                        <a:srgbClr val="FFFFFF">
+                          <a:alpha val="0"/>
+                        </a:srgbClr>
+                      </a:solidFill>
+                      <a:prstDash val="solid"/>
+                    </a:lnB>
+                  </a:tcPr>
+                </a:tc>
+                <a:tc>
+                  <a:txBody>
+                    <a:bodyPr/>
+                    <a:lstStyle/>
+                    <a:p>
+                      <a:pPr algn="l" marL="63500" marR="63500">
+                        <a:lnSpc>
+                          <a:spcPct val="100000"/>
+                        </a:lnSpc>
+                        <a:spcBef>
+                          <a:spcPts val="200"/>
+                        </a:spcBef>
+                        <a:spcAft>
+                          <a:spcPts val="200"/>
+                        </a:spcAft>
+                        <a:buNone/>
+                      </a:pPr>
+                      <a:r>
+                        <a:rPr sz="1100">
+                          <a:solidFill>
+                            <a:srgbClr val="111111">
+                              <a:alpha val="100000"/>
+                            </a:srgbClr>
+                          </a:solidFill>
+                          <a:latin typeface="Calibri"/>
+                          <a:cs typeface="Calibri"/>
+                        </a:rPr>
+                        <a:t>183.3</a:t>
+                      </a:r>
+                    </a:p>
+                  </a:txBody>
+                  <a:tcPr anchor="t" marB="0" marT="0" marR="0" marL="0">
+                    <a:lnL w="0" cmpd="sng" algn="ctr" cap="flat">
+                      <a:solidFill>
+                        <a:srgbClr val="FFFFFF">
+                          <a:alpha val="0"/>
+                        </a:srgbClr>
+                      </a:solidFill>
+                      <a:prstDash val="solid"/>
+                    </a:lnL>
+                    <a:lnR w="0" cmpd="sng" algn="ctr" cap="flat">
+                      <a:solidFill>
+                        <a:srgbClr val="FFFFFF">
+                          <a:alpha val="0"/>
+                        </a:srgbClr>
+                      </a:solidFill>
+                      <a:prstDash val="solid"/>
+                    </a:lnR>
+                    <a:lnT w="0" cmpd="sng" algn="ctr" cap="flat">
+                      <a:solidFill>
+                        <a:srgbClr val="FFFFFF">
+                          <a:alpha val="0"/>
+                        </a:srgbClr>
+                      </a:solidFill>
+                      <a:prstDash val="solid"/>
+                    </a:lnT>
+                    <a:lnB w="0" cmpd="sng" algn="ctr" cap="flat">
+                      <a:solidFill>
+                        <a:srgbClr val="FFFFFF">
+                          <a:alpha val="0"/>
+                        </a:srgbClr>
+                      </a:solidFill>
+                      <a:prstDash val="solid"/>
+                    </a:lnB>
+                  </a:tcPr>
+                </a:tc>
+                <a:tc>
+                  <a:txBody>
+                    <a:bodyPr/>
+                    <a:lstStyle/>
+                    <a:p>
+                      <a:pPr algn="l" marL="63500" marR="63500">
+                        <a:lnSpc>
+                          <a:spcPct val="100000"/>
+                        </a:lnSpc>
+                        <a:spcBef>
+                          <a:spcPts val="200"/>
+                        </a:spcBef>
+                        <a:spcAft>
+                          <a:spcPts val="200"/>
+                        </a:spcAft>
+                        <a:buNone/>
+                      </a:pPr>
+                      <a:r>
+                        <a:rPr sz="1100">
+                          <a:solidFill>
+                            <a:srgbClr val="111111">
+                              <a:alpha val="100000"/>
+                            </a:srgbClr>
+                          </a:solidFill>
+                          <a:latin typeface="Calibri"/>
+                          <a:cs typeface="Calibri"/>
+                        </a:rPr>
+                        <a:t>66th</a:t>
+                      </a:r>
+                    </a:p>
+                  </a:txBody>
+                  <a:tcPr anchor="t" marB="0" marT="0" marR="0" marL="0">
+                    <a:lnL w="0" cmpd="sng" algn="ctr" cap="flat">
+                      <a:solidFill>
+                        <a:srgbClr val="FFFFFF">
+                          <a:alpha val="0"/>
+                        </a:srgbClr>
+                      </a:solidFill>
+                      <a:prstDash val="solid"/>
+                    </a:lnL>
+                    <a:lnR w="0" cmpd="sng" algn="ctr" cap="flat">
+                      <a:solidFill>
+                        <a:srgbClr val="FFFFFF">
+                          <a:alpha val="0"/>
+                        </a:srgbClr>
+                      </a:solidFill>
+                      <a:prstDash val="solid"/>
+                    </a:lnR>
+                    <a:lnT w="0" cmpd="sng" algn="ctr" cap="flat">
+                      <a:solidFill>
+                        <a:srgbClr val="FFFFFF">
+                          <a:alpha val="0"/>
+                        </a:srgbClr>
+                      </a:solidFill>
+                      <a:prstDash val="solid"/>
+                    </a:lnT>
+                    <a:lnB w="0" cmpd="sng" algn="ctr" cap="flat">
+                      <a:solidFill>
+                        <a:srgbClr val="FFFFFF">
+                          <a:alpha val="0"/>
+                        </a:srgbClr>
+                      </a:solidFill>
+                      <a:prstDash val="solid"/>
+                    </a:lnB>
+                  </a:tcPr>
+                </a:tc>
+                <a:tc>
+                  <a:txBody>
+                    <a:bodyPr/>
+                    <a:lstStyle/>
+                    <a:p>
+                      <a:pPr algn="l" marL="63500" marR="63500">
+                        <a:lnSpc>
+                          <a:spcPct val="100000"/>
+                        </a:lnSpc>
+                        <a:spcBef>
+                          <a:spcPts val="200"/>
+                        </a:spcBef>
+                        <a:spcAft>
+                          <a:spcPts val="200"/>
+                        </a:spcAft>
+                        <a:buNone/>
+                      </a:pPr>
+                      <a:r>
+                        <a:rPr sz="1100">
+                          <a:solidFill>
+                            <a:srgbClr val="111111">
+                              <a:alpha val="100000"/>
+                            </a:srgbClr>
+                          </a:solidFill>
+                          <a:latin typeface="Calibri"/>
+                          <a:cs typeface="Calibri"/>
+                        </a:rPr>
+                        <a:t>Decile 3</a:t>
+                      </a:r>
+                    </a:p>
+                  </a:txBody>
+                  <a:tcPr anchor="t" marB="0" marT="0" marR="0" marL="0">
+                    <a:lnL w="0" cmpd="sng" algn="ctr" cap="flat">
+                      <a:solidFill>
+                        <a:srgbClr val="FFFFFF">
+                          <a:alpha val="0"/>
+                        </a:srgbClr>
+                      </a:solidFill>
+                      <a:prstDash val="solid"/>
+                    </a:lnL>
+                    <a:lnR w="0" cmpd="sng" algn="ctr" cap="flat">
+                      <a:solidFill>
+                        <a:srgbClr val="FFFFFF">
+                          <a:alpha val="0"/>
+                        </a:srgbClr>
+                      </a:solidFill>
+                      <a:prstDash val="solid"/>
+                    </a:lnR>
+                    <a:lnT w="0" cmpd="sng" algn="ctr" cap="flat">
+                      <a:solidFill>
+                        <a:srgbClr val="FFFFFF">
+                          <a:alpha val="0"/>
+                        </a:srgbClr>
+                      </a:solidFill>
+                      <a:prstDash val="solid"/>
+                    </a:lnT>
+                    <a:lnB w="0" cmpd="sng" algn="ctr" cap="flat">
+                      <a:solidFill>
+                        <a:srgbClr val="FFFFFF">
+                          <a:alpha val="0"/>
+                        </a:srgbClr>
+                      </a:solidFill>
+                      <a:prstDash val="solid"/>
+                    </a:lnB>
+                  </a:tcPr>
+                </a:tc>
+              </a:tr>
+              <a:tr h="182880">
+                <a:tc>
+                  <a:txBody>
+                    <a:bodyPr/>
+                    <a:lstStyle/>
+                    <a:p>
+                      <a:pPr algn="l" marL="63500" marR="63500">
+                        <a:lnSpc>
+                          <a:spcPct val="100000"/>
+                        </a:lnSpc>
+                        <a:spcBef>
+                          <a:spcPts val="200"/>
+                        </a:spcBef>
+                        <a:spcAft>
+                          <a:spcPts val="200"/>
+                        </a:spcAft>
+                        <a:buNone/>
+                      </a:pPr>
+                      <a:r>
+                        <a:rPr sz="1100">
+                          <a:solidFill>
+                            <a:srgbClr val="111111">
+                              <a:alpha val="100000"/>
+                            </a:srgbClr>
+                          </a:solidFill>
+                          <a:latin typeface="Calibri"/>
+                          <a:cs typeface="Calibri"/>
+                        </a:rPr>
+                        <a:t>Horsham</a:t>
+                      </a:r>
+                    </a:p>
+                  </a:txBody>
+                  <a:tcPr anchor="t" marB="0" marT="0" marR="0" marL="0">
+                    <a:lnL w="0" cmpd="sng" algn="ctr" cap="flat">
+                      <a:solidFill>
+                        <a:srgbClr val="FFFFFF">
+                          <a:alpha val="0"/>
+                        </a:srgbClr>
+                      </a:solidFill>
+                      <a:prstDash val="solid"/>
+                    </a:lnL>
+                    <a:lnR w="0" cmpd="sng" algn="ctr" cap="flat">
+                      <a:solidFill>
+                        <a:srgbClr val="FFFFFF">
+                          <a:alpha val="0"/>
+                        </a:srgbClr>
+                      </a:solidFill>
+                      <a:prstDash val="solid"/>
+                    </a:lnR>
+                    <a:lnT w="0" cmpd="sng" algn="ctr" cap="flat">
+                      <a:solidFill>
+                        <a:srgbClr val="FFFFFF">
+                          <a:alpha val="0"/>
+                        </a:srgbClr>
+                      </a:solidFill>
+                      <a:prstDash val="solid"/>
+                    </a:lnT>
+                    <a:lnB w="0" cmpd="sng" algn="ctr" cap="flat">
+                      <a:solidFill>
+                        <a:srgbClr val="FFFFFF">
+                          <a:alpha val="0"/>
+                        </a:srgbClr>
+                      </a:solidFill>
+                      <a:prstDash val="solid"/>
+                    </a:lnB>
+                  </a:tcPr>
+                </a:tc>
+                <a:tc>
+                  <a:txBody>
+                    <a:bodyPr/>
+                    <a:lstStyle/>
+                    <a:p>
+                      <a:pPr algn="l" marL="63500" marR="63500">
+                        <a:lnSpc>
+                          <a:spcPct val="100000"/>
+                        </a:lnSpc>
+                        <a:spcBef>
+                          <a:spcPts val="200"/>
+                        </a:spcBef>
+                        <a:spcAft>
+                          <a:spcPts val="200"/>
+                        </a:spcAft>
+                        <a:buNone/>
+                      </a:pPr>
+                      <a:r>
+                        <a:rPr sz="1100">
+                          <a:solidFill>
+                            <a:srgbClr val="111111">
+                              <a:alpha val="100000"/>
+                            </a:srgbClr>
+                          </a:solidFill>
+                          <a:latin typeface="Calibri"/>
+                          <a:cs typeface="Calibri"/>
+                        </a:rPr>
+                        <a:t>119</a:t>
+                      </a:r>
+                    </a:p>
+                  </a:txBody>
+                  <a:tcPr anchor="t" marB="0" marT="0" marR="0" marL="0">
+                    <a:lnL w="0" cmpd="sng" algn="ctr" cap="flat">
+                      <a:solidFill>
+                        <a:srgbClr val="FFFFFF">
+                          <a:alpha val="0"/>
+                        </a:srgbClr>
+                      </a:solidFill>
+                      <a:prstDash val="solid"/>
+                    </a:lnL>
+                    <a:lnR w="0" cmpd="sng" algn="ctr" cap="flat">
+                      <a:solidFill>
+                        <a:srgbClr val="FFFFFF">
+                          <a:alpha val="0"/>
+                        </a:srgbClr>
+                      </a:solidFill>
+                      <a:prstDash val="solid"/>
+                    </a:lnR>
+                    <a:lnT w="0" cmpd="sng" algn="ctr" cap="flat">
+                      <a:solidFill>
+                        <a:srgbClr val="FFFFFF">
+                          <a:alpha val="0"/>
+                        </a:srgbClr>
+                      </a:solidFill>
+                      <a:prstDash val="solid"/>
+                    </a:lnT>
+                    <a:lnB w="0" cmpd="sng" algn="ctr" cap="flat">
+                      <a:solidFill>
+                        <a:srgbClr val="FFFFFF">
+                          <a:alpha val="0"/>
+                        </a:srgbClr>
+                      </a:solidFill>
+                      <a:prstDash val="solid"/>
+                    </a:lnB>
+                  </a:tcPr>
+                </a:tc>
+                <a:tc>
+                  <a:txBody>
+                    <a:bodyPr/>
+                    <a:lstStyle/>
+                    <a:p>
+                      <a:pPr algn="l" marL="63500" marR="63500">
+                        <a:lnSpc>
+                          <a:spcPct val="100000"/>
+                        </a:lnSpc>
+                        <a:spcBef>
+                          <a:spcPts val="200"/>
+                        </a:spcBef>
+                        <a:spcAft>
+                          <a:spcPts val="200"/>
+                        </a:spcAft>
+                        <a:buNone/>
+                      </a:pPr>
+                      <a:r>
+                        <a:rPr sz="1100">
+                          <a:solidFill>
+                            <a:srgbClr val="111111">
+                              <a:alpha val="100000"/>
+                            </a:srgbClr>
+                          </a:solidFill>
+                          <a:latin typeface="Calibri"/>
+                          <a:cs typeface="Calibri"/>
+                        </a:rPr>
+                        <a:t>82.8</a:t>
+                      </a:r>
+                    </a:p>
+                  </a:txBody>
+                  <a:tcPr anchor="t" marB="0" marT="0" marR="0" marL="0">
+                    <a:lnL w="0" cmpd="sng" algn="ctr" cap="flat">
+                      <a:solidFill>
+                        <a:srgbClr val="FFFFFF">
+                          <a:alpha val="0"/>
+                        </a:srgbClr>
+                      </a:solidFill>
+                      <a:prstDash val="solid"/>
+                    </a:lnL>
+                    <a:lnR w="0" cmpd="sng" algn="ctr" cap="flat">
+                      <a:solidFill>
+                        <a:srgbClr val="FFFFFF">
+                          <a:alpha val="0"/>
+                        </a:srgbClr>
+                      </a:solidFill>
+                      <a:prstDash val="solid"/>
+                    </a:lnR>
+                    <a:lnT w="0" cmpd="sng" algn="ctr" cap="flat">
+                      <a:solidFill>
+                        <a:srgbClr val="FFFFFF">
+                          <a:alpha val="0"/>
+                        </a:srgbClr>
+                      </a:solidFill>
+                      <a:prstDash val="solid"/>
+                    </a:lnT>
+                    <a:lnB w="0" cmpd="sng" algn="ctr" cap="flat">
+                      <a:solidFill>
+                        <a:srgbClr val="FFFFFF">
+                          <a:alpha val="0"/>
+                        </a:srgbClr>
+                      </a:solidFill>
+                      <a:prstDash val="solid"/>
+                    </a:lnB>
+                  </a:tcPr>
+                </a:tc>
+                <a:tc>
+                  <a:txBody>
+                    <a:bodyPr/>
+                    <a:lstStyle/>
+                    <a:p>
+                      <a:pPr algn="l" marL="63500" marR="63500">
+                        <a:lnSpc>
+                          <a:spcPct val="100000"/>
+                        </a:lnSpc>
+                        <a:spcBef>
+                          <a:spcPts val="200"/>
+                        </a:spcBef>
+                        <a:spcAft>
+                          <a:spcPts val="200"/>
+                        </a:spcAft>
+                        <a:buNone/>
+                      </a:pPr>
+                      <a:r>
+                        <a:rPr sz="1100">
+                          <a:solidFill>
+                            <a:srgbClr val="111111">
+                              <a:alpha val="100000"/>
+                            </a:srgbClr>
+                          </a:solidFill>
+                          <a:latin typeface="Calibri"/>
+                          <a:cs typeface="Calibri"/>
+                        </a:rPr>
+                        <a:t>258th</a:t>
+                      </a:r>
+                    </a:p>
+                  </a:txBody>
+                  <a:tcPr anchor="t" marB="0" marT="0" marR="0" marL="0">
+                    <a:lnL w="0" cmpd="sng" algn="ctr" cap="flat">
+                      <a:solidFill>
+                        <a:srgbClr val="FFFFFF">
+                          <a:alpha val="0"/>
+                        </a:srgbClr>
+                      </a:solidFill>
+                      <a:prstDash val="solid"/>
+                    </a:lnL>
+                    <a:lnR w="0" cmpd="sng" algn="ctr" cap="flat">
+                      <a:solidFill>
+                        <a:srgbClr val="FFFFFF">
+                          <a:alpha val="0"/>
+                        </a:srgbClr>
+                      </a:solidFill>
+                      <a:prstDash val="solid"/>
+                    </a:lnR>
+                    <a:lnT w="0" cmpd="sng" algn="ctr" cap="flat">
+                      <a:solidFill>
+                        <a:srgbClr val="FFFFFF">
+                          <a:alpha val="0"/>
                         </a:srgbClr>
                       </a:solidFill>
                       <a:prstDash val="solid"/>
@@ -15383,10 +16712,10 @@
                       </a:solidFill>
                       <a:prstDash val="solid"/>
                     </a:lnR>
-                    <a:lnT w="6350" cmpd="sng" algn="ctr" cap="flat">
-                      <a:solidFill>
-                        <a:srgbClr val="000000">
-                          <a:alpha val="100000"/>
+                    <a:lnT w="0" cmpd="sng" algn="ctr" cap="flat">
+                      <a:solidFill>
+                        <a:srgbClr val="FFFFFF">
+                          <a:alpha val="0"/>
                         </a:srgbClr>
                       </a:solidFill>
                       <a:prstDash val="solid"/>
@@ -15430,7 +16759,7 @@
                           <a:latin typeface="Calibri"/>
                           <a:cs typeface="Calibri"/>
                         </a:rPr>
-                        <a:t>Arun</a:t>
+                        <a:t>Mid Sussex</a:t>
                       </a:r>
                     </a:p>
                   </a:txBody>
@@ -15496,7 +16825,7 @@
                           <a:latin typeface="Calibri"/>
                           <a:cs typeface="Calibri"/>
                         </a:rPr>
-                        <a:t>263</a:t>
+                        <a:t>114</a:t>
                       </a:r>
                     </a:p>
                   </a:txBody>
@@ -15562,7 +16891,7 @@
                           <a:latin typeface="Calibri"/>
                           <a:cs typeface="Calibri"/>
                         </a:rPr>
-                        <a:t>163.6</a:t>
+                        <a:t>75.5</a:t>
                       </a:r>
                     </a:p>
                   </a:txBody>
@@ -15628,1003 +16957,7 @@
                           <a:latin typeface="Calibri"/>
                           <a:cs typeface="Calibri"/>
                         </a:rPr>
-                        <a:t>121st</a:t>
-                      </a:r>
-                    </a:p>
-                  </a:txBody>
-                  <a:tcPr anchor="t" marB="0" marT="0" marR="0" marL="0">
-                    <a:lnL w="0" cmpd="sng" algn="ctr" cap="flat">
-                      <a:solidFill>
-                        <a:srgbClr val="FFFFFF">
-                          <a:alpha val="0"/>
-                        </a:srgbClr>
-                      </a:solidFill>
-                      <a:prstDash val="solid"/>
-                    </a:lnL>
-                    <a:lnR w="0" cmpd="sng" algn="ctr" cap="flat">
-                      <a:solidFill>
-                        <a:srgbClr val="FFFFFF">
-                          <a:alpha val="0"/>
-                        </a:srgbClr>
-                      </a:solidFill>
-                      <a:prstDash val="solid"/>
-                    </a:lnR>
-                    <a:lnT w="0" cmpd="sng" algn="ctr" cap="flat">
-                      <a:solidFill>
-                        <a:srgbClr val="FFFFFF">
-                          <a:alpha val="0"/>
-                        </a:srgbClr>
-                      </a:solidFill>
-                      <a:prstDash val="solid"/>
-                    </a:lnT>
-                    <a:lnB w="0" cmpd="sng" algn="ctr" cap="flat">
-                      <a:solidFill>
-                        <a:srgbClr val="FFFFFF">
-                          <a:alpha val="0"/>
-                        </a:srgbClr>
-                      </a:solidFill>
-                      <a:prstDash val="solid"/>
-                    </a:lnB>
-                  </a:tcPr>
-                </a:tc>
-                <a:tc>
-                  <a:txBody>
-                    <a:bodyPr/>
-                    <a:lstStyle/>
-                    <a:p>
-                      <a:pPr algn="l" marL="63500" marR="63500">
-                        <a:lnSpc>
-                          <a:spcPct val="100000"/>
-                        </a:lnSpc>
-                        <a:spcBef>
-                          <a:spcPts val="200"/>
-                        </a:spcBef>
-                        <a:spcAft>
-                          <a:spcPts val="200"/>
-                        </a:spcAft>
-                        <a:buNone/>
-                      </a:pPr>
-                      <a:r>
-                        <a:rPr sz="1100">
-                          <a:solidFill>
-                            <a:srgbClr val="111111">
-                              <a:alpha val="100000"/>
-                            </a:srgbClr>
-                          </a:solidFill>
-                          <a:latin typeface="Calibri"/>
-                          <a:cs typeface="Calibri"/>
-                        </a:rPr>
-                        <a:t>Decile 4</a:t>
-                      </a:r>
-                    </a:p>
-                  </a:txBody>
-                  <a:tcPr anchor="t" marB="0" marT="0" marR="0" marL="0">
-                    <a:lnL w="0" cmpd="sng" algn="ctr" cap="flat">
-                      <a:solidFill>
-                        <a:srgbClr val="FFFFFF">
-                          <a:alpha val="0"/>
-                        </a:srgbClr>
-                      </a:solidFill>
-                      <a:prstDash val="solid"/>
-                    </a:lnL>
-                    <a:lnR w="0" cmpd="sng" algn="ctr" cap="flat">
-                      <a:solidFill>
-                        <a:srgbClr val="FFFFFF">
-                          <a:alpha val="0"/>
-                        </a:srgbClr>
-                      </a:solidFill>
-                      <a:prstDash val="solid"/>
-                    </a:lnR>
-                    <a:lnT w="0" cmpd="sng" algn="ctr" cap="flat">
-                      <a:solidFill>
-                        <a:srgbClr val="FFFFFF">
-                          <a:alpha val="0"/>
-                        </a:srgbClr>
-                      </a:solidFill>
-                      <a:prstDash val="solid"/>
-                    </a:lnT>
-                    <a:lnB w="0" cmpd="sng" algn="ctr" cap="flat">
-                      <a:solidFill>
-                        <a:srgbClr val="FFFFFF">
-                          <a:alpha val="0"/>
-                        </a:srgbClr>
-                      </a:solidFill>
-                      <a:prstDash val="solid"/>
-                    </a:lnB>
-                  </a:tcPr>
-                </a:tc>
-              </a:tr>
-              <a:tr h="182880">
-                <a:tc>
-                  <a:txBody>
-                    <a:bodyPr/>
-                    <a:lstStyle/>
-                    <a:p>
-                      <a:pPr algn="l" marL="63500" marR="63500">
-                        <a:lnSpc>
-                          <a:spcPct val="100000"/>
-                        </a:lnSpc>
-                        <a:spcBef>
-                          <a:spcPts val="200"/>
-                        </a:spcBef>
-                        <a:spcAft>
-                          <a:spcPts val="200"/>
-                        </a:spcAft>
-                        <a:buNone/>
-                      </a:pPr>
-                      <a:r>
-                        <a:rPr sz="1100">
-                          <a:solidFill>
-                            <a:srgbClr val="111111">
-                              <a:alpha val="100000"/>
-                            </a:srgbClr>
-                          </a:solidFill>
-                          <a:latin typeface="Calibri"/>
-                          <a:cs typeface="Calibri"/>
-                        </a:rPr>
-                        <a:t>Chichester</a:t>
-                      </a:r>
-                    </a:p>
-                  </a:txBody>
-                  <a:tcPr anchor="t" marB="0" marT="0" marR="0" marL="0">
-                    <a:lnL w="0" cmpd="sng" algn="ctr" cap="flat">
-                      <a:solidFill>
-                        <a:srgbClr val="FFFFFF">
-                          <a:alpha val="0"/>
-                        </a:srgbClr>
-                      </a:solidFill>
-                      <a:prstDash val="solid"/>
-                    </a:lnL>
-                    <a:lnR w="0" cmpd="sng" algn="ctr" cap="flat">
-                      <a:solidFill>
-                        <a:srgbClr val="FFFFFF">
-                          <a:alpha val="0"/>
-                        </a:srgbClr>
-                      </a:solidFill>
-                      <a:prstDash val="solid"/>
-                    </a:lnR>
-                    <a:lnT w="0" cmpd="sng" algn="ctr" cap="flat">
-                      <a:solidFill>
-                        <a:srgbClr val="FFFFFF">
-                          <a:alpha val="0"/>
-                        </a:srgbClr>
-                      </a:solidFill>
-                      <a:prstDash val="solid"/>
-                    </a:lnT>
-                    <a:lnB w="0" cmpd="sng" algn="ctr" cap="flat">
-                      <a:solidFill>
-                        <a:srgbClr val="FFFFFF">
-                          <a:alpha val="0"/>
-                        </a:srgbClr>
-                      </a:solidFill>
-                      <a:prstDash val="solid"/>
-                    </a:lnB>
-                  </a:tcPr>
-                </a:tc>
-                <a:tc>
-                  <a:txBody>
-                    <a:bodyPr/>
-                    <a:lstStyle/>
-                    <a:p>
-                      <a:pPr algn="l" marL="63500" marR="63500">
-                        <a:lnSpc>
-                          <a:spcPct val="100000"/>
-                        </a:lnSpc>
-                        <a:spcBef>
-                          <a:spcPts val="200"/>
-                        </a:spcBef>
-                        <a:spcAft>
-                          <a:spcPts val="200"/>
-                        </a:spcAft>
-                        <a:buNone/>
-                      </a:pPr>
-                      <a:r>
-                        <a:rPr sz="1100">
-                          <a:solidFill>
-                            <a:srgbClr val="111111">
-                              <a:alpha val="100000"/>
-                            </a:srgbClr>
-                          </a:solidFill>
-                          <a:latin typeface="Calibri"/>
-                          <a:cs typeface="Calibri"/>
-                        </a:rPr>
-                        <a:t>167</a:t>
-                      </a:r>
-                    </a:p>
-                  </a:txBody>
-                  <a:tcPr anchor="t" marB="0" marT="0" marR="0" marL="0">
-                    <a:lnL w="0" cmpd="sng" algn="ctr" cap="flat">
-                      <a:solidFill>
-                        <a:srgbClr val="FFFFFF">
-                          <a:alpha val="0"/>
-                        </a:srgbClr>
-                      </a:solidFill>
-                      <a:prstDash val="solid"/>
-                    </a:lnL>
-                    <a:lnR w="0" cmpd="sng" algn="ctr" cap="flat">
-                      <a:solidFill>
-                        <a:srgbClr val="FFFFFF">
-                          <a:alpha val="0"/>
-                        </a:srgbClr>
-                      </a:solidFill>
-                      <a:prstDash val="solid"/>
-                    </a:lnR>
-                    <a:lnT w="0" cmpd="sng" algn="ctr" cap="flat">
-                      <a:solidFill>
-                        <a:srgbClr val="FFFFFF">
-                          <a:alpha val="0"/>
-                        </a:srgbClr>
-                      </a:solidFill>
-                      <a:prstDash val="solid"/>
-                    </a:lnT>
-                    <a:lnB w="0" cmpd="sng" algn="ctr" cap="flat">
-                      <a:solidFill>
-                        <a:srgbClr val="FFFFFF">
-                          <a:alpha val="0"/>
-                        </a:srgbClr>
-                      </a:solidFill>
-                      <a:prstDash val="solid"/>
-                    </a:lnB>
-                  </a:tcPr>
-                </a:tc>
-                <a:tc>
-                  <a:txBody>
-                    <a:bodyPr/>
-                    <a:lstStyle/>
-                    <a:p>
-                      <a:pPr algn="l" marL="63500" marR="63500">
-                        <a:lnSpc>
-                          <a:spcPct val="100000"/>
-                        </a:lnSpc>
-                        <a:spcBef>
-                          <a:spcPts val="200"/>
-                        </a:spcBef>
-                        <a:spcAft>
-                          <a:spcPts val="200"/>
-                        </a:spcAft>
-                        <a:buNone/>
-                      </a:pPr>
-                      <a:r>
-                        <a:rPr sz="1100">
-                          <a:solidFill>
-                            <a:srgbClr val="111111">
-                              <a:alpha val="100000"/>
-                            </a:srgbClr>
-                          </a:solidFill>
-                          <a:latin typeface="Calibri"/>
-                          <a:cs typeface="Calibri"/>
-                        </a:rPr>
-                        <a:t>137.9</a:t>
-                      </a:r>
-                    </a:p>
-                  </a:txBody>
-                  <a:tcPr anchor="t" marB="0" marT="0" marR="0" marL="0">
-                    <a:lnL w="0" cmpd="sng" algn="ctr" cap="flat">
-                      <a:solidFill>
-                        <a:srgbClr val="FFFFFF">
-                          <a:alpha val="0"/>
-                        </a:srgbClr>
-                      </a:solidFill>
-                      <a:prstDash val="solid"/>
-                    </a:lnL>
-                    <a:lnR w="0" cmpd="sng" algn="ctr" cap="flat">
-                      <a:solidFill>
-                        <a:srgbClr val="FFFFFF">
-                          <a:alpha val="0"/>
-                        </a:srgbClr>
-                      </a:solidFill>
-                      <a:prstDash val="solid"/>
-                    </a:lnR>
-                    <a:lnT w="0" cmpd="sng" algn="ctr" cap="flat">
-                      <a:solidFill>
-                        <a:srgbClr val="FFFFFF">
-                          <a:alpha val="0"/>
-                        </a:srgbClr>
-                      </a:solidFill>
-                      <a:prstDash val="solid"/>
-                    </a:lnT>
-                    <a:lnB w="0" cmpd="sng" algn="ctr" cap="flat">
-                      <a:solidFill>
-                        <a:srgbClr val="FFFFFF">
-                          <a:alpha val="0"/>
-                        </a:srgbClr>
-                      </a:solidFill>
-                      <a:prstDash val="solid"/>
-                    </a:lnB>
-                  </a:tcPr>
-                </a:tc>
-                <a:tc>
-                  <a:txBody>
-                    <a:bodyPr/>
-                    <a:lstStyle/>
-                    <a:p>
-                      <a:pPr algn="l" marL="63500" marR="63500">
-                        <a:lnSpc>
-                          <a:spcPct val="100000"/>
-                        </a:lnSpc>
-                        <a:spcBef>
-                          <a:spcPts val="200"/>
-                        </a:spcBef>
-                        <a:spcAft>
-                          <a:spcPts val="200"/>
-                        </a:spcAft>
-                        <a:buNone/>
-                      </a:pPr>
-                      <a:r>
-                        <a:rPr sz="1100">
-                          <a:solidFill>
-                            <a:srgbClr val="111111">
-                              <a:alpha val="100000"/>
-                            </a:srgbClr>
-                          </a:solidFill>
-                          <a:latin typeface="Calibri"/>
-                          <a:cs typeface="Calibri"/>
-                        </a:rPr>
-                        <a:t>167th</a:t>
-                      </a:r>
-                    </a:p>
-                  </a:txBody>
-                  <a:tcPr anchor="t" marB="0" marT="0" marR="0" marL="0">
-                    <a:lnL w="0" cmpd="sng" algn="ctr" cap="flat">
-                      <a:solidFill>
-                        <a:srgbClr val="FFFFFF">
-                          <a:alpha val="0"/>
-                        </a:srgbClr>
-                      </a:solidFill>
-                      <a:prstDash val="solid"/>
-                    </a:lnL>
-                    <a:lnR w="0" cmpd="sng" algn="ctr" cap="flat">
-                      <a:solidFill>
-                        <a:srgbClr val="FFFFFF">
-                          <a:alpha val="0"/>
-                        </a:srgbClr>
-                      </a:solidFill>
-                      <a:prstDash val="solid"/>
-                    </a:lnR>
-                    <a:lnT w="0" cmpd="sng" algn="ctr" cap="flat">
-                      <a:solidFill>
-                        <a:srgbClr val="FFFFFF">
-                          <a:alpha val="0"/>
-                        </a:srgbClr>
-                      </a:solidFill>
-                      <a:prstDash val="solid"/>
-                    </a:lnT>
-                    <a:lnB w="0" cmpd="sng" algn="ctr" cap="flat">
-                      <a:solidFill>
-                        <a:srgbClr val="FFFFFF">
-                          <a:alpha val="0"/>
-                        </a:srgbClr>
-                      </a:solidFill>
-                      <a:prstDash val="solid"/>
-                    </a:lnB>
-                  </a:tcPr>
-                </a:tc>
-                <a:tc>
-                  <a:txBody>
-                    <a:bodyPr/>
-                    <a:lstStyle/>
-                    <a:p>
-                      <a:pPr algn="l" marL="63500" marR="63500">
-                        <a:lnSpc>
-                          <a:spcPct val="100000"/>
-                        </a:lnSpc>
-                        <a:spcBef>
-                          <a:spcPts val="200"/>
-                        </a:spcBef>
-                        <a:spcAft>
-                          <a:spcPts val="200"/>
-                        </a:spcAft>
-                        <a:buNone/>
-                      </a:pPr>
-                      <a:r>
-                        <a:rPr sz="1100">
-                          <a:solidFill>
-                            <a:srgbClr val="111111">
-                              <a:alpha val="100000"/>
-                            </a:srgbClr>
-                          </a:solidFill>
-                          <a:latin typeface="Calibri"/>
-                          <a:cs typeface="Calibri"/>
-                        </a:rPr>
-                        <a:t>Decile 6</a:t>
-                      </a:r>
-                    </a:p>
-                  </a:txBody>
-                  <a:tcPr anchor="t" marB="0" marT="0" marR="0" marL="0">
-                    <a:lnL w="0" cmpd="sng" algn="ctr" cap="flat">
-                      <a:solidFill>
-                        <a:srgbClr val="FFFFFF">
-                          <a:alpha val="0"/>
-                        </a:srgbClr>
-                      </a:solidFill>
-                      <a:prstDash val="solid"/>
-                    </a:lnL>
-                    <a:lnR w="0" cmpd="sng" algn="ctr" cap="flat">
-                      <a:solidFill>
-                        <a:srgbClr val="FFFFFF">
-                          <a:alpha val="0"/>
-                        </a:srgbClr>
-                      </a:solidFill>
-                      <a:prstDash val="solid"/>
-                    </a:lnR>
-                    <a:lnT w="0" cmpd="sng" algn="ctr" cap="flat">
-                      <a:solidFill>
-                        <a:srgbClr val="FFFFFF">
-                          <a:alpha val="0"/>
-                        </a:srgbClr>
-                      </a:solidFill>
-                      <a:prstDash val="solid"/>
-                    </a:lnT>
-                    <a:lnB w="0" cmpd="sng" algn="ctr" cap="flat">
-                      <a:solidFill>
-                        <a:srgbClr val="FFFFFF">
-                          <a:alpha val="0"/>
-                        </a:srgbClr>
-                      </a:solidFill>
-                      <a:prstDash val="solid"/>
-                    </a:lnB>
-                  </a:tcPr>
-                </a:tc>
-              </a:tr>
-              <a:tr h="182880">
-                <a:tc>
-                  <a:txBody>
-                    <a:bodyPr/>
-                    <a:lstStyle/>
-                    <a:p>
-                      <a:pPr algn="l" marL="63500" marR="63500">
-                        <a:lnSpc>
-                          <a:spcPct val="100000"/>
-                        </a:lnSpc>
-                        <a:spcBef>
-                          <a:spcPts val="200"/>
-                        </a:spcBef>
-                        <a:spcAft>
-                          <a:spcPts val="200"/>
-                        </a:spcAft>
-                        <a:buNone/>
-                      </a:pPr>
-                      <a:r>
-                        <a:rPr sz="1100">
-                          <a:solidFill>
-                            <a:srgbClr val="111111">
-                              <a:alpha val="100000"/>
-                            </a:srgbClr>
-                          </a:solidFill>
-                          <a:latin typeface="Calibri"/>
-                          <a:cs typeface="Calibri"/>
-                        </a:rPr>
-                        <a:t>Crawley</a:t>
-                      </a:r>
-                    </a:p>
-                  </a:txBody>
-                  <a:tcPr anchor="t" marB="0" marT="0" marR="0" marL="0">
-                    <a:lnL w="0" cmpd="sng" algn="ctr" cap="flat">
-                      <a:solidFill>
-                        <a:srgbClr val="FFFFFF">
-                          <a:alpha val="0"/>
-                        </a:srgbClr>
-                      </a:solidFill>
-                      <a:prstDash val="solid"/>
-                    </a:lnL>
-                    <a:lnR w="0" cmpd="sng" algn="ctr" cap="flat">
-                      <a:solidFill>
-                        <a:srgbClr val="FFFFFF">
-                          <a:alpha val="0"/>
-                        </a:srgbClr>
-                      </a:solidFill>
-                      <a:prstDash val="solid"/>
-                    </a:lnR>
-                    <a:lnT w="0" cmpd="sng" algn="ctr" cap="flat">
-                      <a:solidFill>
-                        <a:srgbClr val="FFFFFF">
-                          <a:alpha val="0"/>
-                        </a:srgbClr>
-                      </a:solidFill>
-                      <a:prstDash val="solid"/>
-                    </a:lnT>
-                    <a:lnB w="0" cmpd="sng" algn="ctr" cap="flat">
-                      <a:solidFill>
-                        <a:srgbClr val="FFFFFF">
-                          <a:alpha val="0"/>
-                        </a:srgbClr>
-                      </a:solidFill>
-                      <a:prstDash val="solid"/>
-                    </a:lnB>
-                  </a:tcPr>
-                </a:tc>
-                <a:tc>
-                  <a:txBody>
-                    <a:bodyPr/>
-                    <a:lstStyle/>
-                    <a:p>
-                      <a:pPr algn="l" marL="63500" marR="63500">
-                        <a:lnSpc>
-                          <a:spcPct val="100000"/>
-                        </a:lnSpc>
-                        <a:spcBef>
-                          <a:spcPts val="200"/>
-                        </a:spcBef>
-                        <a:spcAft>
-                          <a:spcPts val="200"/>
-                        </a:spcAft>
-                        <a:buNone/>
-                      </a:pPr>
-                      <a:r>
-                        <a:rPr sz="1100">
-                          <a:solidFill>
-                            <a:srgbClr val="111111">
-                              <a:alpha val="100000"/>
-                            </a:srgbClr>
-                          </a:solidFill>
-                          <a:latin typeface="Calibri"/>
-                          <a:cs typeface="Calibri"/>
-                        </a:rPr>
-                        <a:t>244</a:t>
-                      </a:r>
-                    </a:p>
-                  </a:txBody>
-                  <a:tcPr anchor="t" marB="0" marT="0" marR="0" marL="0">
-                    <a:lnL w="0" cmpd="sng" algn="ctr" cap="flat">
-                      <a:solidFill>
-                        <a:srgbClr val="FFFFFF">
-                          <a:alpha val="0"/>
-                        </a:srgbClr>
-                      </a:solidFill>
-                      <a:prstDash val="solid"/>
-                    </a:lnL>
-                    <a:lnR w="0" cmpd="sng" algn="ctr" cap="flat">
-                      <a:solidFill>
-                        <a:srgbClr val="FFFFFF">
-                          <a:alpha val="0"/>
-                        </a:srgbClr>
-                      </a:solidFill>
-                      <a:prstDash val="solid"/>
-                    </a:lnR>
-                    <a:lnT w="0" cmpd="sng" algn="ctr" cap="flat">
-                      <a:solidFill>
-                        <a:srgbClr val="FFFFFF">
-                          <a:alpha val="0"/>
-                        </a:srgbClr>
-                      </a:solidFill>
-                      <a:prstDash val="solid"/>
-                    </a:lnT>
-                    <a:lnB w="0" cmpd="sng" algn="ctr" cap="flat">
-                      <a:solidFill>
-                        <a:srgbClr val="FFFFFF">
-                          <a:alpha val="0"/>
-                        </a:srgbClr>
-                      </a:solidFill>
-                      <a:prstDash val="solid"/>
-                    </a:lnB>
-                  </a:tcPr>
-                </a:tc>
-                <a:tc>
-                  <a:txBody>
-                    <a:bodyPr/>
-                    <a:lstStyle/>
-                    <a:p>
-                      <a:pPr algn="l" marL="63500" marR="63500">
-                        <a:lnSpc>
-                          <a:spcPct val="100000"/>
-                        </a:lnSpc>
-                        <a:spcBef>
-                          <a:spcPts val="200"/>
-                        </a:spcBef>
-                        <a:spcAft>
-                          <a:spcPts val="200"/>
-                        </a:spcAft>
-                        <a:buNone/>
-                      </a:pPr>
-                      <a:r>
-                        <a:rPr sz="1100">
-                          <a:solidFill>
-                            <a:srgbClr val="111111">
-                              <a:alpha val="100000"/>
-                            </a:srgbClr>
-                          </a:solidFill>
-                          <a:latin typeface="Calibri"/>
-                          <a:cs typeface="Calibri"/>
-                        </a:rPr>
-                        <a:t>217.1</a:t>
-                      </a:r>
-                    </a:p>
-                  </a:txBody>
-                  <a:tcPr anchor="t" marB="0" marT="0" marR="0" marL="0">
-                    <a:lnL w="0" cmpd="sng" algn="ctr" cap="flat">
-                      <a:solidFill>
-                        <a:srgbClr val="FFFFFF">
-                          <a:alpha val="0"/>
-                        </a:srgbClr>
-                      </a:solidFill>
-                      <a:prstDash val="solid"/>
-                    </a:lnL>
-                    <a:lnR w="0" cmpd="sng" algn="ctr" cap="flat">
-                      <a:solidFill>
-                        <a:srgbClr val="FFFFFF">
-                          <a:alpha val="0"/>
-                        </a:srgbClr>
-                      </a:solidFill>
-                      <a:prstDash val="solid"/>
-                    </a:lnR>
-                    <a:lnT w="0" cmpd="sng" algn="ctr" cap="flat">
-                      <a:solidFill>
-                        <a:srgbClr val="FFFFFF">
-                          <a:alpha val="0"/>
-                        </a:srgbClr>
-                      </a:solidFill>
-                      <a:prstDash val="solid"/>
-                    </a:lnT>
-                    <a:lnB w="0" cmpd="sng" algn="ctr" cap="flat">
-                      <a:solidFill>
-                        <a:srgbClr val="FFFFFF">
-                          <a:alpha val="0"/>
-                        </a:srgbClr>
-                      </a:solidFill>
-                      <a:prstDash val="solid"/>
-                    </a:lnB>
-                  </a:tcPr>
-                </a:tc>
-                <a:tc>
-                  <a:txBody>
-                    <a:bodyPr/>
-                    <a:lstStyle/>
-                    <a:p>
-                      <a:pPr algn="l" marL="63500" marR="63500">
-                        <a:lnSpc>
-                          <a:spcPct val="100000"/>
-                        </a:lnSpc>
-                        <a:spcBef>
-                          <a:spcPts val="200"/>
-                        </a:spcBef>
-                        <a:spcAft>
-                          <a:spcPts val="200"/>
-                        </a:spcAft>
-                        <a:buNone/>
-                      </a:pPr>
-                      <a:r>
-                        <a:rPr sz="1100">
-                          <a:solidFill>
-                            <a:srgbClr val="111111">
-                              <a:alpha val="100000"/>
-                            </a:srgbClr>
-                          </a:solidFill>
-                          <a:latin typeface="Calibri"/>
-                          <a:cs typeface="Calibri"/>
-                        </a:rPr>
-                        <a:t>43rd</a:t>
-                      </a:r>
-                    </a:p>
-                  </a:txBody>
-                  <a:tcPr anchor="t" marB="0" marT="0" marR="0" marL="0">
-                    <a:lnL w="0" cmpd="sng" algn="ctr" cap="flat">
-                      <a:solidFill>
-                        <a:srgbClr val="FFFFFF">
-                          <a:alpha val="0"/>
-                        </a:srgbClr>
-                      </a:solidFill>
-                      <a:prstDash val="solid"/>
-                    </a:lnL>
-                    <a:lnR w="0" cmpd="sng" algn="ctr" cap="flat">
-                      <a:solidFill>
-                        <a:srgbClr val="FFFFFF">
-                          <a:alpha val="0"/>
-                        </a:srgbClr>
-                      </a:solidFill>
-                      <a:prstDash val="solid"/>
-                    </a:lnR>
-                    <a:lnT w="0" cmpd="sng" algn="ctr" cap="flat">
-                      <a:solidFill>
-                        <a:srgbClr val="FFFFFF">
-                          <a:alpha val="0"/>
-                        </a:srgbClr>
-                      </a:solidFill>
-                      <a:prstDash val="solid"/>
-                    </a:lnT>
-                    <a:lnB w="0" cmpd="sng" algn="ctr" cap="flat">
-                      <a:solidFill>
-                        <a:srgbClr val="FFFFFF">
-                          <a:alpha val="0"/>
-                        </a:srgbClr>
-                      </a:solidFill>
-                      <a:prstDash val="solid"/>
-                    </a:lnB>
-                  </a:tcPr>
-                </a:tc>
-                <a:tc>
-                  <a:txBody>
-                    <a:bodyPr/>
-                    <a:lstStyle/>
-                    <a:p>
-                      <a:pPr algn="l" marL="63500" marR="63500">
-                        <a:lnSpc>
-                          <a:spcPct val="100000"/>
-                        </a:lnSpc>
-                        <a:spcBef>
-                          <a:spcPts val="200"/>
-                        </a:spcBef>
-                        <a:spcAft>
-                          <a:spcPts val="200"/>
-                        </a:spcAft>
-                        <a:buNone/>
-                      </a:pPr>
-                      <a:r>
-                        <a:rPr sz="1100">
-                          <a:solidFill>
-                            <a:srgbClr val="111111">
-                              <a:alpha val="100000"/>
-                            </a:srgbClr>
-                          </a:solidFill>
-                          <a:latin typeface="Calibri"/>
-                          <a:cs typeface="Calibri"/>
-                        </a:rPr>
-                        <a:t>Decile 2</a:t>
-                      </a:r>
-                    </a:p>
-                  </a:txBody>
-                  <a:tcPr anchor="t" marB="0" marT="0" marR="0" marL="0">
-                    <a:lnL w="0" cmpd="sng" algn="ctr" cap="flat">
-                      <a:solidFill>
-                        <a:srgbClr val="FFFFFF">
-                          <a:alpha val="0"/>
-                        </a:srgbClr>
-                      </a:solidFill>
-                      <a:prstDash val="solid"/>
-                    </a:lnL>
-                    <a:lnR w="0" cmpd="sng" algn="ctr" cap="flat">
-                      <a:solidFill>
-                        <a:srgbClr val="FFFFFF">
-                          <a:alpha val="0"/>
-                        </a:srgbClr>
-                      </a:solidFill>
-                      <a:prstDash val="solid"/>
-                    </a:lnR>
-                    <a:lnT w="0" cmpd="sng" algn="ctr" cap="flat">
-                      <a:solidFill>
-                        <a:srgbClr val="FFFFFF">
-                          <a:alpha val="0"/>
-                        </a:srgbClr>
-                      </a:solidFill>
-                      <a:prstDash val="solid"/>
-                    </a:lnT>
-                    <a:lnB w="0" cmpd="sng" algn="ctr" cap="flat">
-                      <a:solidFill>
-                        <a:srgbClr val="FFFFFF">
-                          <a:alpha val="0"/>
-                        </a:srgbClr>
-                      </a:solidFill>
-                      <a:prstDash val="solid"/>
-                    </a:lnB>
-                  </a:tcPr>
-                </a:tc>
-              </a:tr>
-              <a:tr h="182880">
-                <a:tc>
-                  <a:txBody>
-                    <a:bodyPr/>
-                    <a:lstStyle/>
-                    <a:p>
-                      <a:pPr algn="l" marL="63500" marR="63500">
-                        <a:lnSpc>
-                          <a:spcPct val="100000"/>
-                        </a:lnSpc>
-                        <a:spcBef>
-                          <a:spcPts val="200"/>
-                        </a:spcBef>
-                        <a:spcAft>
-                          <a:spcPts val="200"/>
-                        </a:spcAft>
-                        <a:buNone/>
-                      </a:pPr>
-                      <a:r>
-                        <a:rPr sz="1100">
-                          <a:solidFill>
-                            <a:srgbClr val="111111">
-                              <a:alpha val="100000"/>
-                            </a:srgbClr>
-                          </a:solidFill>
-                          <a:latin typeface="Calibri"/>
-                          <a:cs typeface="Calibri"/>
-                        </a:rPr>
-                        <a:t>Horsham</a:t>
-                      </a:r>
-                    </a:p>
-                  </a:txBody>
-                  <a:tcPr anchor="t" marB="0" marT="0" marR="0" marL="0">
-                    <a:lnL w="0" cmpd="sng" algn="ctr" cap="flat">
-                      <a:solidFill>
-                        <a:srgbClr val="FFFFFF">
-                          <a:alpha val="0"/>
-                        </a:srgbClr>
-                      </a:solidFill>
-                      <a:prstDash val="solid"/>
-                    </a:lnL>
-                    <a:lnR w="0" cmpd="sng" algn="ctr" cap="flat">
-                      <a:solidFill>
-                        <a:srgbClr val="FFFFFF">
-                          <a:alpha val="0"/>
-                        </a:srgbClr>
-                      </a:solidFill>
-                      <a:prstDash val="solid"/>
-                    </a:lnR>
-                    <a:lnT w="0" cmpd="sng" algn="ctr" cap="flat">
-                      <a:solidFill>
-                        <a:srgbClr val="FFFFFF">
-                          <a:alpha val="0"/>
-                        </a:srgbClr>
-                      </a:solidFill>
-                      <a:prstDash val="solid"/>
-                    </a:lnT>
-                    <a:lnB w="0" cmpd="sng" algn="ctr" cap="flat">
-                      <a:solidFill>
-                        <a:srgbClr val="FFFFFF">
-                          <a:alpha val="0"/>
-                        </a:srgbClr>
-                      </a:solidFill>
-                      <a:prstDash val="solid"/>
-                    </a:lnB>
-                  </a:tcPr>
-                </a:tc>
-                <a:tc>
-                  <a:txBody>
-                    <a:bodyPr/>
-                    <a:lstStyle/>
-                    <a:p>
-                      <a:pPr algn="l" marL="63500" marR="63500">
-                        <a:lnSpc>
-                          <a:spcPct val="100000"/>
-                        </a:lnSpc>
-                        <a:spcBef>
-                          <a:spcPts val="200"/>
-                        </a:spcBef>
-                        <a:spcAft>
-                          <a:spcPts val="200"/>
-                        </a:spcAft>
-                        <a:buNone/>
-                      </a:pPr>
-                      <a:r>
-                        <a:rPr sz="1100">
-                          <a:solidFill>
-                            <a:srgbClr val="111111">
-                              <a:alpha val="100000"/>
-                            </a:srgbClr>
-                          </a:solidFill>
-                          <a:latin typeface="Calibri"/>
-                          <a:cs typeface="Calibri"/>
-                        </a:rPr>
-                        <a:t>137</a:t>
-                      </a:r>
-                    </a:p>
-                  </a:txBody>
-                  <a:tcPr anchor="t" marB="0" marT="0" marR="0" marL="0">
-                    <a:lnL w="0" cmpd="sng" algn="ctr" cap="flat">
-                      <a:solidFill>
-                        <a:srgbClr val="FFFFFF">
-                          <a:alpha val="0"/>
-                        </a:srgbClr>
-                      </a:solidFill>
-                      <a:prstDash val="solid"/>
-                    </a:lnL>
-                    <a:lnR w="0" cmpd="sng" algn="ctr" cap="flat">
-                      <a:solidFill>
-                        <a:srgbClr val="FFFFFF">
-                          <a:alpha val="0"/>
-                        </a:srgbClr>
-                      </a:solidFill>
-                      <a:prstDash val="solid"/>
-                    </a:lnR>
-                    <a:lnT w="0" cmpd="sng" algn="ctr" cap="flat">
-                      <a:solidFill>
-                        <a:srgbClr val="FFFFFF">
-                          <a:alpha val="0"/>
-                        </a:srgbClr>
-                      </a:solidFill>
-                      <a:prstDash val="solid"/>
-                    </a:lnT>
-                    <a:lnB w="0" cmpd="sng" algn="ctr" cap="flat">
-                      <a:solidFill>
-                        <a:srgbClr val="FFFFFF">
-                          <a:alpha val="0"/>
-                        </a:srgbClr>
-                      </a:solidFill>
-                      <a:prstDash val="solid"/>
-                    </a:lnB>
-                  </a:tcPr>
-                </a:tc>
-                <a:tc>
-                  <a:txBody>
-                    <a:bodyPr/>
-                    <a:lstStyle/>
-                    <a:p>
-                      <a:pPr algn="l" marL="63500" marR="63500">
-                        <a:lnSpc>
-                          <a:spcPct val="100000"/>
-                        </a:lnSpc>
-                        <a:spcBef>
-                          <a:spcPts val="200"/>
-                        </a:spcBef>
-                        <a:spcAft>
-                          <a:spcPts val="200"/>
-                        </a:spcAft>
-                        <a:buNone/>
-                      </a:pPr>
-                      <a:r>
-                        <a:rPr sz="1100">
-                          <a:solidFill>
-                            <a:srgbClr val="111111">
-                              <a:alpha val="100000"/>
-                            </a:srgbClr>
-                          </a:solidFill>
-                          <a:latin typeface="Calibri"/>
-                          <a:cs typeface="Calibri"/>
-                        </a:rPr>
-                        <a:t>95.3</a:t>
-                      </a:r>
-                    </a:p>
-                  </a:txBody>
-                  <a:tcPr anchor="t" marB="0" marT="0" marR="0" marL="0">
-                    <a:lnL w="0" cmpd="sng" algn="ctr" cap="flat">
-                      <a:solidFill>
-                        <a:srgbClr val="FFFFFF">
-                          <a:alpha val="0"/>
-                        </a:srgbClr>
-                      </a:solidFill>
-                      <a:prstDash val="solid"/>
-                    </a:lnL>
-                    <a:lnR w="0" cmpd="sng" algn="ctr" cap="flat">
-                      <a:solidFill>
-                        <a:srgbClr val="FFFFFF">
-                          <a:alpha val="0"/>
-                        </a:srgbClr>
-                      </a:solidFill>
-                      <a:prstDash val="solid"/>
-                    </a:lnR>
-                    <a:lnT w="0" cmpd="sng" algn="ctr" cap="flat">
-                      <a:solidFill>
-                        <a:srgbClr val="FFFFFF">
-                          <a:alpha val="0"/>
-                        </a:srgbClr>
-                      </a:solidFill>
-                      <a:prstDash val="solid"/>
-                    </a:lnT>
-                    <a:lnB w="0" cmpd="sng" algn="ctr" cap="flat">
-                      <a:solidFill>
-                        <a:srgbClr val="FFFFFF">
-                          <a:alpha val="0"/>
-                        </a:srgbClr>
-                      </a:solidFill>
-                      <a:prstDash val="solid"/>
-                    </a:lnB>
-                  </a:tcPr>
-                </a:tc>
-                <a:tc>
-                  <a:txBody>
-                    <a:bodyPr/>
-                    <a:lstStyle/>
-                    <a:p>
-                      <a:pPr algn="l" marL="63500" marR="63500">
-                        <a:lnSpc>
-                          <a:spcPct val="100000"/>
-                        </a:lnSpc>
-                        <a:spcBef>
-                          <a:spcPts val="200"/>
-                        </a:spcBef>
-                        <a:spcAft>
-                          <a:spcPts val="200"/>
-                        </a:spcAft>
-                        <a:buNone/>
-                      </a:pPr>
-                      <a:r>
-                        <a:rPr sz="1100">
-                          <a:solidFill>
-                            <a:srgbClr val="111111">
-                              <a:alpha val="100000"/>
-                            </a:srgbClr>
-                          </a:solidFill>
-                          <a:latin typeface="Calibri"/>
-                          <a:cs typeface="Calibri"/>
-                        </a:rPr>
-                        <a:t>258th</a:t>
+                        <a:t>282nd</a:t>
                       </a:r>
                     </a:p>
                   </a:txBody>
@@ -16758,7 +17091,7 @@
                           <a:latin typeface="Calibri"/>
                           <a:cs typeface="Calibri"/>
                         </a:rPr>
-                        <a:t>Mid Sussex</a:t>
+                        <a:t>Worthing</a:t>
                       </a:r>
                     </a:p>
                   </a:txBody>
@@ -16824,7 +17157,7 @@
                           <a:latin typeface="Calibri"/>
                           <a:cs typeface="Calibri"/>
                         </a:rPr>
-                        <a:t>125</a:t>
+                        <a:t>102</a:t>
                       </a:r>
                     </a:p>
                   </a:txBody>
@@ -16890,7 +17223,7 @@
                           <a:latin typeface="Calibri"/>
                           <a:cs typeface="Calibri"/>
                         </a:rPr>
-                        <a:t>82.8</a:t>
+                        <a:t>92.2</a:t>
                       </a:r>
                     </a:p>
                   </a:txBody>
@@ -16956,339 +17289,7 @@
                           <a:latin typeface="Calibri"/>
                           <a:cs typeface="Calibri"/>
                         </a:rPr>
-                        <a:t>279th</a:t>
-                      </a:r>
-                    </a:p>
-                  </a:txBody>
-                  <a:tcPr anchor="t" marB="0" marT="0" marR="0" marL="0">
-                    <a:lnL w="0" cmpd="sng" algn="ctr" cap="flat">
-                      <a:solidFill>
-                        <a:srgbClr val="FFFFFF">
-                          <a:alpha val="0"/>
-                        </a:srgbClr>
-                      </a:solidFill>
-                      <a:prstDash val="solid"/>
-                    </a:lnL>
-                    <a:lnR w="0" cmpd="sng" algn="ctr" cap="flat">
-                      <a:solidFill>
-                        <a:srgbClr val="FFFFFF">
-                          <a:alpha val="0"/>
-                        </a:srgbClr>
-                      </a:solidFill>
-                      <a:prstDash val="solid"/>
-                    </a:lnR>
-                    <a:lnT w="0" cmpd="sng" algn="ctr" cap="flat">
-                      <a:solidFill>
-                        <a:srgbClr val="FFFFFF">
-                          <a:alpha val="0"/>
-                        </a:srgbClr>
-                      </a:solidFill>
-                      <a:prstDash val="solid"/>
-                    </a:lnT>
-                    <a:lnB w="0" cmpd="sng" algn="ctr" cap="flat">
-                      <a:solidFill>
-                        <a:srgbClr val="FFFFFF">
-                          <a:alpha val="0"/>
-                        </a:srgbClr>
-                      </a:solidFill>
-                      <a:prstDash val="solid"/>
-                    </a:lnB>
-                  </a:tcPr>
-                </a:tc>
-                <a:tc>
-                  <a:txBody>
-                    <a:bodyPr/>
-                    <a:lstStyle/>
-                    <a:p>
-                      <a:pPr algn="l" marL="63500" marR="63500">
-                        <a:lnSpc>
-                          <a:spcPct val="100000"/>
-                        </a:lnSpc>
-                        <a:spcBef>
-                          <a:spcPts val="200"/>
-                        </a:spcBef>
-                        <a:spcAft>
-                          <a:spcPts val="200"/>
-                        </a:spcAft>
-                        <a:buNone/>
-                      </a:pPr>
-                      <a:r>
-                        <a:rPr sz="1100">
-                          <a:solidFill>
-                            <a:srgbClr val="111111">
-                              <a:alpha val="100000"/>
-                            </a:srgbClr>
-                          </a:solidFill>
-                          <a:latin typeface="Calibri"/>
-                          <a:cs typeface="Calibri"/>
-                        </a:rPr>
-                        <a:t>Decile 9</a:t>
-                      </a:r>
-                    </a:p>
-                  </a:txBody>
-                  <a:tcPr anchor="t" marB="0" marT="0" marR="0" marL="0">
-                    <a:lnL w="0" cmpd="sng" algn="ctr" cap="flat">
-                      <a:solidFill>
-                        <a:srgbClr val="FFFFFF">
-                          <a:alpha val="0"/>
-                        </a:srgbClr>
-                      </a:solidFill>
-                      <a:prstDash val="solid"/>
-                    </a:lnL>
-                    <a:lnR w="0" cmpd="sng" algn="ctr" cap="flat">
-                      <a:solidFill>
-                        <a:srgbClr val="FFFFFF">
-                          <a:alpha val="0"/>
-                        </a:srgbClr>
-                      </a:solidFill>
-                      <a:prstDash val="solid"/>
-                    </a:lnR>
-                    <a:lnT w="0" cmpd="sng" algn="ctr" cap="flat">
-                      <a:solidFill>
-                        <a:srgbClr val="FFFFFF">
-                          <a:alpha val="0"/>
-                        </a:srgbClr>
-                      </a:solidFill>
-                      <a:prstDash val="solid"/>
-                    </a:lnT>
-                    <a:lnB w="0" cmpd="sng" algn="ctr" cap="flat">
-                      <a:solidFill>
-                        <a:srgbClr val="FFFFFF">
-                          <a:alpha val="0"/>
-                        </a:srgbClr>
-                      </a:solidFill>
-                      <a:prstDash val="solid"/>
-                    </a:lnB>
-                  </a:tcPr>
-                </a:tc>
-              </a:tr>
-              <a:tr h="182880">
-                <a:tc>
-                  <a:txBody>
-                    <a:bodyPr/>
-                    <a:lstStyle/>
-                    <a:p>
-                      <a:pPr algn="l" marL="63500" marR="63500">
-                        <a:lnSpc>
-                          <a:spcPct val="100000"/>
-                        </a:lnSpc>
-                        <a:spcBef>
-                          <a:spcPts val="200"/>
-                        </a:spcBef>
-                        <a:spcAft>
-                          <a:spcPts val="200"/>
-                        </a:spcAft>
-                        <a:buNone/>
-                      </a:pPr>
-                      <a:r>
-                        <a:rPr sz="1100">
-                          <a:solidFill>
-                            <a:srgbClr val="111111">
-                              <a:alpha val="100000"/>
-                            </a:srgbClr>
-                          </a:solidFill>
-                          <a:latin typeface="Calibri"/>
-                          <a:cs typeface="Calibri"/>
-                        </a:rPr>
-                        <a:t>Worthing</a:t>
-                      </a:r>
-                    </a:p>
-                  </a:txBody>
-                  <a:tcPr anchor="t" marB="0" marT="0" marR="0" marL="0">
-                    <a:lnL w="0" cmpd="sng" algn="ctr" cap="flat">
-                      <a:solidFill>
-                        <a:srgbClr val="FFFFFF">
-                          <a:alpha val="0"/>
-                        </a:srgbClr>
-                      </a:solidFill>
-                      <a:prstDash val="solid"/>
-                    </a:lnL>
-                    <a:lnR w="0" cmpd="sng" algn="ctr" cap="flat">
-                      <a:solidFill>
-                        <a:srgbClr val="FFFFFF">
-                          <a:alpha val="0"/>
-                        </a:srgbClr>
-                      </a:solidFill>
-                      <a:prstDash val="solid"/>
-                    </a:lnR>
-                    <a:lnT w="0" cmpd="sng" algn="ctr" cap="flat">
-                      <a:solidFill>
-                        <a:srgbClr val="FFFFFF">
-                          <a:alpha val="0"/>
-                        </a:srgbClr>
-                      </a:solidFill>
-                      <a:prstDash val="solid"/>
-                    </a:lnT>
-                    <a:lnB w="0" cmpd="sng" algn="ctr" cap="flat">
-                      <a:solidFill>
-                        <a:srgbClr val="FFFFFF">
-                          <a:alpha val="0"/>
-                        </a:srgbClr>
-                      </a:solidFill>
-                      <a:prstDash val="solid"/>
-                    </a:lnB>
-                  </a:tcPr>
-                </a:tc>
-                <a:tc>
-                  <a:txBody>
-                    <a:bodyPr/>
-                    <a:lstStyle/>
-                    <a:p>
-                      <a:pPr algn="l" marL="63500" marR="63500">
-                        <a:lnSpc>
-                          <a:spcPct val="100000"/>
-                        </a:lnSpc>
-                        <a:spcBef>
-                          <a:spcPts val="200"/>
-                        </a:spcBef>
-                        <a:spcAft>
-                          <a:spcPts val="200"/>
-                        </a:spcAft>
-                        <a:buNone/>
-                      </a:pPr>
-                      <a:r>
-                        <a:rPr sz="1100">
-                          <a:solidFill>
-                            <a:srgbClr val="111111">
-                              <a:alpha val="100000"/>
-                            </a:srgbClr>
-                          </a:solidFill>
-                          <a:latin typeface="Calibri"/>
-                          <a:cs typeface="Calibri"/>
-                        </a:rPr>
-                        <a:t>123</a:t>
-                      </a:r>
-                    </a:p>
-                  </a:txBody>
-                  <a:tcPr anchor="t" marB="0" marT="0" marR="0" marL="0">
-                    <a:lnL w="0" cmpd="sng" algn="ctr" cap="flat">
-                      <a:solidFill>
-                        <a:srgbClr val="FFFFFF">
-                          <a:alpha val="0"/>
-                        </a:srgbClr>
-                      </a:solidFill>
-                      <a:prstDash val="solid"/>
-                    </a:lnL>
-                    <a:lnR w="0" cmpd="sng" algn="ctr" cap="flat">
-                      <a:solidFill>
-                        <a:srgbClr val="FFFFFF">
-                          <a:alpha val="0"/>
-                        </a:srgbClr>
-                      </a:solidFill>
-                      <a:prstDash val="solid"/>
-                    </a:lnR>
-                    <a:lnT w="0" cmpd="sng" algn="ctr" cap="flat">
-                      <a:solidFill>
-                        <a:srgbClr val="FFFFFF">
-                          <a:alpha val="0"/>
-                        </a:srgbClr>
-                      </a:solidFill>
-                      <a:prstDash val="solid"/>
-                    </a:lnT>
-                    <a:lnB w="0" cmpd="sng" algn="ctr" cap="flat">
-                      <a:solidFill>
-                        <a:srgbClr val="FFFFFF">
-                          <a:alpha val="0"/>
-                        </a:srgbClr>
-                      </a:solidFill>
-                      <a:prstDash val="solid"/>
-                    </a:lnB>
-                  </a:tcPr>
-                </a:tc>
-                <a:tc>
-                  <a:txBody>
-                    <a:bodyPr/>
-                    <a:lstStyle/>
-                    <a:p>
-                      <a:pPr algn="l" marL="63500" marR="63500">
-                        <a:lnSpc>
-                          <a:spcPct val="100000"/>
-                        </a:lnSpc>
-                        <a:spcBef>
-                          <a:spcPts val="200"/>
-                        </a:spcBef>
-                        <a:spcAft>
-                          <a:spcPts val="200"/>
-                        </a:spcAft>
-                        <a:buNone/>
-                      </a:pPr>
-                      <a:r>
-                        <a:rPr sz="1100">
-                          <a:solidFill>
-                            <a:srgbClr val="111111">
-                              <a:alpha val="100000"/>
-                            </a:srgbClr>
-                          </a:solidFill>
-                          <a:latin typeface="Calibri"/>
-                          <a:cs typeface="Calibri"/>
-                        </a:rPr>
-                        <a:t>111.2</a:t>
-                      </a:r>
-                    </a:p>
-                  </a:txBody>
-                  <a:tcPr anchor="t" marB="0" marT="0" marR="0" marL="0">
-                    <a:lnL w="0" cmpd="sng" algn="ctr" cap="flat">
-                      <a:solidFill>
-                        <a:srgbClr val="FFFFFF">
-                          <a:alpha val="0"/>
-                        </a:srgbClr>
-                      </a:solidFill>
-                      <a:prstDash val="solid"/>
-                    </a:lnL>
-                    <a:lnR w="0" cmpd="sng" algn="ctr" cap="flat">
-                      <a:solidFill>
-                        <a:srgbClr val="FFFFFF">
-                          <a:alpha val="0"/>
-                        </a:srgbClr>
-                      </a:solidFill>
-                      <a:prstDash val="solid"/>
-                    </a:lnR>
-                    <a:lnT w="0" cmpd="sng" algn="ctr" cap="flat">
-                      <a:solidFill>
-                        <a:srgbClr val="FFFFFF">
-                          <a:alpha val="0"/>
-                        </a:srgbClr>
-                      </a:solidFill>
-                      <a:prstDash val="solid"/>
-                    </a:lnT>
-                    <a:lnB w="0" cmpd="sng" algn="ctr" cap="flat">
-                      <a:solidFill>
-                        <a:srgbClr val="FFFFFF">
-                          <a:alpha val="0"/>
-                        </a:srgbClr>
-                      </a:solidFill>
-                      <a:prstDash val="solid"/>
-                    </a:lnB>
-                  </a:tcPr>
-                </a:tc>
-                <a:tc>
-                  <a:txBody>
-                    <a:bodyPr/>
-                    <a:lstStyle/>
-                    <a:p>
-                      <a:pPr algn="l" marL="63500" marR="63500">
-                        <a:lnSpc>
-                          <a:spcPct val="100000"/>
-                        </a:lnSpc>
-                        <a:spcBef>
-                          <a:spcPts val="200"/>
-                        </a:spcBef>
-                        <a:spcAft>
-                          <a:spcPts val="200"/>
-                        </a:spcAft>
-                        <a:buNone/>
-                      </a:pPr>
-                      <a:r>
-                        <a:rPr sz="1100">
-                          <a:solidFill>
-                            <a:srgbClr val="111111">
-                              <a:alpha val="100000"/>
-                            </a:srgbClr>
-                          </a:solidFill>
-                          <a:latin typeface="Calibri"/>
-                          <a:cs typeface="Calibri"/>
-                        </a:rPr>
-                        <a:t>225th</a:t>
+                        <a:t>237th</a:t>
                       </a:r>
                     </a:p>
                   </a:txBody>
@@ -17488,7 +17489,7 @@
                           <a:latin typeface="Calibri"/>
                           <a:cs typeface="Calibri"/>
                         </a:rPr>
-                        <a:t>1,117</a:t>
+                        <a:t>968</a:t>
                       </a:r>
                     </a:p>
                   </a:txBody>
@@ -17554,7 +17555,7 @@
                           <a:latin typeface="Calibri"/>
                           <a:cs typeface="Calibri"/>
                         </a:rPr>
-                        <a:t>129.3</a:t>
+                        <a:t>112.0</a:t>
                       </a:r>
                     </a:p>
                   </a:txBody>
@@ -17820,7 +17821,7 @@
                           <a:latin typeface="Calibri"/>
                           <a:cs typeface="Calibri"/>
                         </a:rPr>
-                        <a:t>88,647</a:t>
+                        <a:t>80,364</a:t>
                       </a:r>
                     </a:p>
                   </a:txBody>
@@ -17886,7 +17887,7 @@
                           <a:latin typeface="Calibri"/>
                           <a:cs typeface="Calibri"/>
                         </a:rPr>
-                        <a:t>157.5</a:t>
+                        <a:t>142.8</a:t>
                       </a:r>
                     </a:p>
                   </a:txBody>
@@ -18152,7 +18153,7 @@
                           <a:latin typeface="Calibri"/>
                           <a:cs typeface="Calibri"/>
                         </a:rPr>
-                        <a:t>10,771</a:t>
+                        <a:t>9,390</a:t>
                       </a:r>
                     </a:p>
                   </a:txBody>
@@ -18218,7 +18219,7 @@
                           <a:latin typeface="Calibri"/>
                           <a:cs typeface="Calibri"/>
                         </a:rPr>
-                        <a:t>117.3</a:t>
+                        <a:t>102.3</a:t>
                       </a:r>
                     </a:p>
                   </a:txBody>
@@ -18441,7 +18442,7 @@
           <a:p>
             <a:r>
               <a:rPr/>
-              <a:t>Pack date: 15 February 2021</a:t>
+              <a:t>Pack date: 18 February 2021</a:t>
             </a:r>
           </a:p>
         </p:txBody>
@@ -18599,7 +18600,7 @@
           <a:p>
             <a:r>
               <a:rPr/>
-              <a:t>Pack date: 15 February 2021</a:t>
+              <a:t>Pack date: 18 February 2021</a:t>
             </a:r>
           </a:p>
         </p:txBody>
@@ -18757,7 +18758,7 @@
           <a:p>
             <a:r>
               <a:rPr/>
-              <a:t>Pack date: 15 February 2021</a:t>
+              <a:t>Pack date: 18 February 2021</a:t>
             </a:r>
           </a:p>
         </p:txBody>
@@ -18915,7 +18916,7 @@
           <a:p>
             <a:r>
               <a:rPr/>
-              <a:t>Pack date: 15 February 2021</a:t>
+              <a:t>Pack date: 18 February 2021</a:t>
             </a:r>
           </a:p>
         </p:txBody>
@@ -19073,7 +19074,7 @@
           <a:p>
             <a:r>
               <a:rPr/>
-              <a:t>Pack date: 15 February 2021</a:t>
+              <a:t>Pack date: 18 February 2021</a:t>
             </a:r>
           </a:p>
         </p:txBody>
@@ -19262,7 +19263,7 @@
           <a:p>
             <a:r>
               <a:rPr/>
-              <a:t>Pack date: 15 February 2021</a:t>
+              <a:t>Pack date: 18 February 2021</a:t>
             </a:r>
           </a:p>
         </p:txBody>
@@ -19420,7 +19421,7 @@
           <a:p>
             <a:r>
               <a:rPr/>
-              <a:t>Pack date: 15 February 2021</a:t>
+              <a:t>Pack date: 18 February 2021</a:t>
             </a:r>
           </a:p>
         </p:txBody>
@@ -19578,7 +19579,7 @@
           <a:p>
             <a:r>
               <a:rPr/>
-              <a:t>Pack date: 15 February 2021</a:t>
+              <a:t>Pack date: 18 February 2021</a:t>
             </a:r>
           </a:p>
         </p:txBody>
@@ -19736,7 +19737,7 @@
           <a:p>
             <a:r>
               <a:rPr/>
-              <a:t>Pack date: 15 February 2021</a:t>
+              <a:t>Pack date: 18 February 2021</a:t>
             </a:r>
           </a:p>
         </p:txBody>
@@ -19894,7 +19895,7 @@
           <a:p>
             <a:r>
               <a:rPr/>
-              <a:t>Pack date: 15 February 2021</a:t>
+              <a:t>Pack date: 18 February 2021</a:t>
             </a:r>
           </a:p>
         </p:txBody>
@@ -20026,7 +20027,7 @@
           <a:p>
             <a:r>
               <a:rPr/>
-              <a:t>Pack date: 15 February 2021</a:t>
+              <a:t>Pack date: 18 February 2021</a:t>
             </a:r>
           </a:p>
         </p:txBody>
@@ -20158,7 +20159,7 @@
           <a:p>
             <a:r>
               <a:rPr/>
-              <a:t>Pack date: 15 February 2021</a:t>
+              <a:t>Pack date: 18 February 2021</a:t>
             </a:r>
           </a:p>
         </p:txBody>
@@ -20290,7 +20291,7 @@
           <a:p>
             <a:r>
               <a:rPr/>
-              <a:t>Pack date: 15 February 2021</a:t>
+              <a:t>Pack date: 18 February 2021</a:t>
             </a:r>
           </a:p>
         </p:txBody>
@@ -20422,7 +20423,7 @@
           <a:p>
             <a:r>
               <a:rPr/>
-              <a:t>Pack date: 15 February 2021</a:t>
+              <a:t>Pack date: 18 February 2021</a:t>
             </a:r>
           </a:p>
         </p:txBody>
@@ -20554,7 +20555,7 @@
           <a:p>
             <a:r>
               <a:rPr/>
-              <a:t>Pack date: 15 February 2021</a:t>
+              <a:t>Pack date: 18 February 2021</a:t>
             </a:r>
           </a:p>
         </p:txBody>
@@ -20686,7 +20687,7 @@
           <a:p>
             <a:r>
               <a:rPr/>
-              <a:t>Pack date: 15 February 2021</a:t>
+              <a:t>Pack date: 18 February 2021</a:t>
             </a:r>
           </a:p>
         </p:txBody>

</xml_diff>

<commit_message>
Updated growth file size - reduce load
</commit_message>
<xml_diff>
--- a/Latest_West_Sussex_C19_slide_deck.pptx
+++ b/Latest_West_Sussex_C19_slide_deck.pptx
@@ -7176,14 +7176,14 @@
           <a:p>
             <a:r>
               <a:rPr/>
-              <a:t>Pack date: 17 February 2021</a:t>
+              <a:t>Pack date: 18 February 2021</a:t>
             </a:r>
           </a:p>
         </p:txBody>
       </p:sp>
       <p:pic xmlns:a="http://schemas.openxmlformats.org/drawingml/2006/main" xmlns:r="http://schemas.openxmlformats.org/officeDocument/2006/relationships" xmlns:p="http://schemas.openxmlformats.org/presentationml/2006/main">
         <p:nvPicPr>
-          <p:cNvPr id="3" name="Picture Placeholder 8" descr=""/>
+          <p:cNvPr id="3" name="Picture Placeholder 8"/>
           <p:cNvPicPr>
             <a:picLocks noGrp="1"/>
           </p:cNvPicPr>
@@ -7308,14 +7308,14 @@
           <a:p>
             <a:r>
               <a:rPr/>
-              <a:t>Pack date: 17 February 2021</a:t>
+              <a:t>Pack date: 18 February 2021</a:t>
             </a:r>
           </a:p>
         </p:txBody>
       </p:sp>
       <p:pic xmlns:a="http://schemas.openxmlformats.org/drawingml/2006/main" xmlns:r="http://schemas.openxmlformats.org/officeDocument/2006/relationships" xmlns:p="http://schemas.openxmlformats.org/presentationml/2006/main">
         <p:nvPicPr>
-          <p:cNvPr id="3" name="Picture Placeholder 8" descr=""/>
+          <p:cNvPr id="3" name="Picture Placeholder 8"/>
           <p:cNvPicPr>
             <a:picLocks noGrp="1"/>
           </p:cNvPicPr>
@@ -7420,7 +7420,7 @@
       </p:grpSpPr>
       <p:pic xmlns:a="http://schemas.openxmlformats.org/drawingml/2006/main" xmlns:r="http://schemas.openxmlformats.org/officeDocument/2006/relationships" xmlns:p="http://schemas.openxmlformats.org/presentationml/2006/main">
         <p:nvPicPr>
-          <p:cNvPr id="2" name="Picture Placeholder 8" descr=""/>
+          <p:cNvPr id="2" name="Picture Placeholder 8"/>
           <p:cNvPicPr>
             <a:picLocks noGrp="1"/>
           </p:cNvPicPr>
@@ -7466,7 +7466,7 @@
           <a:p>
             <a:r>
               <a:rPr/>
-              <a:t>Pack date: 17 February 2021</a:t>
+              <a:t>Pack date: 18 February 2021</a:t>
             </a:r>
           </a:p>
         </p:txBody>
@@ -7662,27 +7662,27 @@
                     <a:bodyPr/>
                     <a:lstStyle/>
                     <a:p>
-                      <a:pPr algn="l" marL="38100" marR="38100">
+                      <a:pPr algn="l" marL="63500" marR="63500">
                         <a:lnSpc>
                           <a:spcPct val="100000"/>
                         </a:lnSpc>
                         <a:spcBef>
-                          <a:spcPts val="300"/>
+                          <a:spcPts val="200"/>
                         </a:spcBef>
                         <a:spcAft>
-                          <a:spcPts val="300"/>
+                          <a:spcPts val="200"/>
                         </a:spcAft>
                         <a:buNone/>
                       </a:pPr>
                       <a:r>
                         <a:rPr sz="1000" b="1">
                           <a:solidFill>
-                            <a:srgbClr val="000000">
+                            <a:srgbClr val="111111">
                               <a:alpha val="100000"/>
                             </a:srgbClr>
                           </a:solidFill>
-                          <a:latin typeface="Helvetica"/>
-                          <a:cs typeface="Helvetica"/>
+                          <a:latin typeface="Roboto"/>
+                          <a:cs typeface="Roboto"/>
                         </a:rPr>
                         <a:t>Name</a:t>
                       </a:r>
@@ -7728,27 +7728,27 @@
                     <a:bodyPr/>
                     <a:lstStyle/>
                     <a:p>
-                      <a:pPr algn="l" marL="38100" marR="38100">
+                      <a:pPr algn="l" marL="63500" marR="63500">
                         <a:lnSpc>
                           <a:spcPct val="100000"/>
                         </a:lnSpc>
                         <a:spcBef>
-                          <a:spcPts val="300"/>
+                          <a:spcPts val="200"/>
                         </a:spcBef>
                         <a:spcAft>
-                          <a:spcPts val="300"/>
+                          <a:spcPts val="200"/>
                         </a:spcAft>
                         <a:buNone/>
                       </a:pPr>
                       <a:r>
                         <a:rPr sz="1000" b="1">
                           <a:solidFill>
-                            <a:srgbClr val="000000">
+                            <a:srgbClr val="111111">
                               <a:alpha val="100000"/>
                             </a:srgbClr>
                           </a:solidFill>
-                          <a:latin typeface="Helvetica"/>
-                          <a:cs typeface="Helvetica"/>
+                          <a:latin typeface="Roboto"/>
+                          <a:cs typeface="Roboto"/>
                         </a:rPr>
                         <a:t>Cumulative cases</a:t>
                       </a:r>
@@ -7794,27 +7794,27 @@
                     <a:bodyPr/>
                     <a:lstStyle/>
                     <a:p>
-                      <a:pPr algn="l" marL="38100" marR="38100">
+                      <a:pPr algn="l" marL="63500" marR="63500">
                         <a:lnSpc>
                           <a:spcPct val="100000"/>
                         </a:lnSpc>
                         <a:spcBef>
-                          <a:spcPts val="300"/>
+                          <a:spcPts val="200"/>
                         </a:spcBef>
                         <a:spcAft>
-                          <a:spcPts val="300"/>
+                          <a:spcPts val="200"/>
                         </a:spcAft>
                         <a:buNone/>
                       </a:pPr>
                       <a:r>
                         <a:rPr sz="1000" b="1">
                           <a:solidFill>
-                            <a:srgbClr val="000000">
+                            <a:srgbClr val="111111">
                               <a:alpha val="100000"/>
                             </a:srgbClr>
                           </a:solidFill>
-                          <a:latin typeface="Helvetica"/>
-                          <a:cs typeface="Helvetica"/>
+                          <a:latin typeface="Roboto"/>
+                          <a:cs typeface="Roboto"/>
                         </a:rPr>
                         <a:t>Cumulative rate per 100,000 residents</a:t>
                       </a:r>
@@ -7860,27 +7860,27 @@
                     <a:bodyPr/>
                     <a:lstStyle/>
                     <a:p>
-                      <a:pPr algn="l" marL="38100" marR="38100">
+                      <a:pPr algn="l" marL="63500" marR="63500">
                         <a:lnSpc>
                           <a:spcPct val="100000"/>
                         </a:lnSpc>
                         <a:spcBef>
-                          <a:spcPts val="300"/>
+                          <a:spcPts val="200"/>
                         </a:spcBef>
                         <a:spcAft>
-                          <a:spcPts val="300"/>
+                          <a:spcPts val="200"/>
                         </a:spcAft>
                         <a:buNone/>
                       </a:pPr>
                       <a:r>
                         <a:rPr sz="1000" b="1">
                           <a:solidFill>
-                            <a:srgbClr val="000000">
+                            <a:srgbClr val="111111">
                               <a:alpha val="100000"/>
                             </a:srgbClr>
                           </a:solidFill>
-                          <a:latin typeface="Helvetica"/>
-                          <a:cs typeface="Helvetica"/>
+                          <a:latin typeface="Roboto"/>
+                          <a:cs typeface="Roboto"/>
                         </a:rPr>
                         <a:t>Local Authority Rank (out of 149) where 1 = Highest Rate per 100,000</a:t>
                       </a:r>
@@ -7926,27 +7926,27 @@
                     <a:bodyPr/>
                     <a:lstStyle/>
                     <a:p>
-                      <a:pPr algn="l" marL="38100" marR="38100">
+                      <a:pPr algn="l" marL="63500" marR="63500">
                         <a:lnSpc>
                           <a:spcPct val="100000"/>
                         </a:lnSpc>
                         <a:spcBef>
-                          <a:spcPts val="300"/>
+                          <a:spcPts val="200"/>
                         </a:spcBef>
                         <a:spcAft>
-                          <a:spcPts val="300"/>
+                          <a:spcPts val="200"/>
                         </a:spcAft>
                         <a:buNone/>
                       </a:pPr>
                       <a:r>
                         <a:rPr sz="1000" b="1">
                           <a:solidFill>
-                            <a:srgbClr val="000000">
+                            <a:srgbClr val="111111">
                               <a:alpha val="100000"/>
                             </a:srgbClr>
                           </a:solidFill>
-                          <a:latin typeface="Helvetica"/>
-                          <a:cs typeface="Helvetica"/>
+                          <a:latin typeface="Roboto"/>
+                          <a:cs typeface="Roboto"/>
                         </a:rPr>
                         <a:t>Decile of cumulative rate per 100,000</a:t>
                       </a:r>
@@ -7994,22 +7994,22 @@
                     <a:bodyPr/>
                     <a:lstStyle/>
                     <a:p>
-                      <a:pPr algn="l" marL="38100" marR="38100">
+                      <a:pPr algn="l" marL="63500" marR="63500">
                         <a:lnSpc>
                           <a:spcPct val="100000"/>
                         </a:lnSpc>
                         <a:spcBef>
-                          <a:spcPts val="300"/>
+                          <a:spcPts val="200"/>
                         </a:spcBef>
                         <a:spcAft>
-                          <a:spcPts val="300"/>
+                          <a:spcPts val="200"/>
                         </a:spcAft>
                         <a:buNone/>
                       </a:pPr>
                       <a:r>
                         <a:rPr sz="1100">
                           <a:solidFill>
-                            <a:srgbClr val="000000">
+                            <a:srgbClr val="111111">
                               <a:alpha val="100000"/>
                             </a:srgbClr>
                           </a:solidFill>
@@ -8060,22 +8060,22 @@
                     <a:bodyPr/>
                     <a:lstStyle/>
                     <a:p>
-                      <a:pPr algn="l" marL="38100" marR="38100">
+                      <a:pPr algn="l" marL="63500" marR="63500">
                         <a:lnSpc>
                           <a:spcPct val="100000"/>
                         </a:lnSpc>
                         <a:spcBef>
-                          <a:spcPts val="300"/>
+                          <a:spcPts val="200"/>
                         </a:spcBef>
                         <a:spcAft>
-                          <a:spcPts val="300"/>
+                          <a:spcPts val="200"/>
                         </a:spcAft>
                         <a:buNone/>
                       </a:pPr>
                       <a:r>
                         <a:rPr sz="1100">
                           <a:solidFill>
-                            <a:srgbClr val="000000">
+                            <a:srgbClr val="111111">
                               <a:alpha val="100000"/>
                             </a:srgbClr>
                           </a:solidFill>
@@ -8126,22 +8126,22 @@
                     <a:bodyPr/>
                     <a:lstStyle/>
                     <a:p>
-                      <a:pPr algn="l" marL="38100" marR="38100">
+                      <a:pPr algn="l" marL="63500" marR="63500">
                         <a:lnSpc>
                           <a:spcPct val="100000"/>
                         </a:lnSpc>
                         <a:spcBef>
-                          <a:spcPts val="300"/>
+                          <a:spcPts val="200"/>
                         </a:spcBef>
                         <a:spcAft>
-                          <a:spcPts val="300"/>
+                          <a:spcPts val="200"/>
                         </a:spcAft>
                         <a:buNone/>
                       </a:pPr>
                       <a:r>
                         <a:rPr sz="1100">
                           <a:solidFill>
-                            <a:srgbClr val="000000">
+                            <a:srgbClr val="111111">
                               <a:alpha val="100000"/>
                             </a:srgbClr>
                           </a:solidFill>
@@ -8192,22 +8192,22 @@
                     <a:bodyPr/>
                     <a:lstStyle/>
                     <a:p>
-                      <a:pPr algn="l" marL="38100" marR="38100">
+                      <a:pPr algn="l" marL="63500" marR="63500">
                         <a:lnSpc>
                           <a:spcPct val="100000"/>
                         </a:lnSpc>
                         <a:spcBef>
-                          <a:spcPts val="300"/>
+                          <a:spcPts val="200"/>
                         </a:spcBef>
                         <a:spcAft>
-                          <a:spcPts val="300"/>
+                          <a:spcPts val="200"/>
                         </a:spcAft>
                         <a:buNone/>
                       </a:pPr>
                       <a:r>
                         <a:rPr sz="1100">
                           <a:solidFill>
-                            <a:srgbClr val="000000">
+                            <a:srgbClr val="111111">
                               <a:alpha val="100000"/>
                             </a:srgbClr>
                           </a:solidFill>
@@ -8258,22 +8258,22 @@
                     <a:bodyPr/>
                     <a:lstStyle/>
                     <a:p>
-                      <a:pPr algn="l" marL="38100" marR="38100">
+                      <a:pPr algn="l" marL="63500" marR="63500">
                         <a:lnSpc>
                           <a:spcPct val="100000"/>
                         </a:lnSpc>
                         <a:spcBef>
-                          <a:spcPts val="300"/>
+                          <a:spcPts val="200"/>
                         </a:spcBef>
                         <a:spcAft>
-                          <a:spcPts val="300"/>
+                          <a:spcPts val="200"/>
                         </a:spcAft>
                         <a:buNone/>
                       </a:pPr>
                       <a:r>
                         <a:rPr sz="1100">
                           <a:solidFill>
-                            <a:srgbClr val="000000">
+                            <a:srgbClr val="111111">
                               <a:alpha val="100000"/>
                             </a:srgbClr>
                           </a:solidFill>
@@ -8326,22 +8326,22 @@
                     <a:bodyPr/>
                     <a:lstStyle/>
                     <a:p>
-                      <a:pPr algn="l" marL="38100" marR="38100">
+                      <a:pPr algn="l" marL="63500" marR="63500">
                         <a:lnSpc>
                           <a:spcPct val="100000"/>
                         </a:lnSpc>
                         <a:spcBef>
-                          <a:spcPts val="300"/>
+                          <a:spcPts val="200"/>
                         </a:spcBef>
                         <a:spcAft>
-                          <a:spcPts val="300"/>
+                          <a:spcPts val="200"/>
                         </a:spcAft>
                         <a:buNone/>
                       </a:pPr>
                       <a:r>
                         <a:rPr sz="1100">
                           <a:solidFill>
-                            <a:srgbClr val="000000">
+                            <a:srgbClr val="111111">
                               <a:alpha val="100000"/>
                             </a:srgbClr>
                           </a:solidFill>
@@ -8392,22 +8392,22 @@
                     <a:bodyPr/>
                     <a:lstStyle/>
                     <a:p>
-                      <a:pPr algn="l" marL="38100" marR="38100">
+                      <a:pPr algn="l" marL="63500" marR="63500">
                         <a:lnSpc>
                           <a:spcPct val="100000"/>
                         </a:lnSpc>
                         <a:spcBef>
-                          <a:spcPts val="300"/>
+                          <a:spcPts val="200"/>
                         </a:spcBef>
                         <a:spcAft>
-                          <a:spcPts val="300"/>
+                          <a:spcPts val="200"/>
                         </a:spcAft>
                         <a:buNone/>
                       </a:pPr>
                       <a:r>
                         <a:rPr sz="1100">
                           <a:solidFill>
-                            <a:srgbClr val="000000">
+                            <a:srgbClr val="111111">
                               <a:alpha val="100000"/>
                             </a:srgbClr>
                           </a:solidFill>
@@ -8458,22 +8458,22 @@
                     <a:bodyPr/>
                     <a:lstStyle/>
                     <a:p>
-                      <a:pPr algn="l" marL="38100" marR="38100">
+                      <a:pPr algn="l" marL="63500" marR="63500">
                         <a:lnSpc>
                           <a:spcPct val="100000"/>
                         </a:lnSpc>
                         <a:spcBef>
-                          <a:spcPts val="300"/>
+                          <a:spcPts val="200"/>
                         </a:spcBef>
                         <a:spcAft>
-                          <a:spcPts val="300"/>
+                          <a:spcPts val="200"/>
                         </a:spcAft>
                         <a:buNone/>
                       </a:pPr>
                       <a:r>
                         <a:rPr sz="1100">
                           <a:solidFill>
-                            <a:srgbClr val="000000">
+                            <a:srgbClr val="111111">
                               <a:alpha val="100000"/>
                             </a:srgbClr>
                           </a:solidFill>
@@ -8524,22 +8524,22 @@
                     <a:bodyPr/>
                     <a:lstStyle/>
                     <a:p>
-                      <a:pPr algn="l" marL="38100" marR="38100">
+                      <a:pPr algn="l" marL="63500" marR="63500">
                         <a:lnSpc>
                           <a:spcPct val="100000"/>
                         </a:lnSpc>
                         <a:spcBef>
-                          <a:spcPts val="300"/>
+                          <a:spcPts val="200"/>
                         </a:spcBef>
                         <a:spcAft>
-                          <a:spcPts val="300"/>
+                          <a:spcPts val="200"/>
                         </a:spcAft>
                         <a:buNone/>
                       </a:pPr>
                       <a:r>
                         <a:rPr sz="1100">
                           <a:solidFill>
-                            <a:srgbClr val="000000">
+                            <a:srgbClr val="111111">
                               <a:alpha val="100000"/>
                             </a:srgbClr>
                           </a:solidFill>
@@ -8590,22 +8590,22 @@
                     <a:bodyPr/>
                     <a:lstStyle/>
                     <a:p>
-                      <a:pPr algn="l" marL="38100" marR="38100">
+                      <a:pPr algn="l" marL="63500" marR="63500">
                         <a:lnSpc>
                           <a:spcPct val="100000"/>
                         </a:lnSpc>
                         <a:spcBef>
-                          <a:spcPts val="300"/>
+                          <a:spcPts val="200"/>
                         </a:spcBef>
                         <a:spcAft>
-                          <a:spcPts val="300"/>
+                          <a:spcPts val="200"/>
                         </a:spcAft>
                         <a:buNone/>
                       </a:pPr>
                       <a:r>
                         <a:rPr sz="1100">
                           <a:solidFill>
-                            <a:srgbClr val="000000">
+                            <a:srgbClr val="111111">
                               <a:alpha val="100000"/>
                             </a:srgbClr>
                           </a:solidFill>
@@ -8658,22 +8658,22 @@
                     <a:bodyPr/>
                     <a:lstStyle/>
                     <a:p>
-                      <a:pPr algn="l" marL="38100" marR="38100">
+                      <a:pPr algn="l" marL="63500" marR="63500">
                         <a:lnSpc>
                           <a:spcPct val="100000"/>
                         </a:lnSpc>
                         <a:spcBef>
-                          <a:spcPts val="300"/>
+                          <a:spcPts val="200"/>
                         </a:spcBef>
                         <a:spcAft>
-                          <a:spcPts val="300"/>
+                          <a:spcPts val="200"/>
                         </a:spcAft>
                         <a:buNone/>
                       </a:pPr>
                       <a:r>
                         <a:rPr sz="1100">
                           <a:solidFill>
-                            <a:srgbClr val="000000">
+                            <a:srgbClr val="111111">
                               <a:alpha val="100000"/>
                             </a:srgbClr>
                           </a:solidFill>
@@ -8724,22 +8724,22 @@
                     <a:bodyPr/>
                     <a:lstStyle/>
                     <a:p>
-                      <a:pPr algn="l" marL="38100" marR="38100">
+                      <a:pPr algn="l" marL="63500" marR="63500">
                         <a:lnSpc>
                           <a:spcPct val="100000"/>
                         </a:lnSpc>
                         <a:spcBef>
-                          <a:spcPts val="300"/>
+                          <a:spcPts val="200"/>
                         </a:spcBef>
                         <a:spcAft>
-                          <a:spcPts val="300"/>
+                          <a:spcPts val="200"/>
                         </a:spcAft>
                         <a:buNone/>
                       </a:pPr>
                       <a:r>
                         <a:rPr sz="1100">
                           <a:solidFill>
-                            <a:srgbClr val="000000">
+                            <a:srgbClr val="111111">
                               <a:alpha val="100000"/>
                             </a:srgbClr>
                           </a:solidFill>
@@ -8790,22 +8790,22 @@
                     <a:bodyPr/>
                     <a:lstStyle/>
                     <a:p>
-                      <a:pPr algn="l" marL="38100" marR="38100">
+                      <a:pPr algn="l" marL="63500" marR="63500">
                         <a:lnSpc>
                           <a:spcPct val="100000"/>
                         </a:lnSpc>
                         <a:spcBef>
-                          <a:spcPts val="300"/>
+                          <a:spcPts val="200"/>
                         </a:spcBef>
                         <a:spcAft>
-                          <a:spcPts val="300"/>
+                          <a:spcPts val="200"/>
                         </a:spcAft>
                         <a:buNone/>
                       </a:pPr>
                       <a:r>
                         <a:rPr sz="1100">
                           <a:solidFill>
-                            <a:srgbClr val="000000">
+                            <a:srgbClr val="111111">
                               <a:alpha val="100000"/>
                             </a:srgbClr>
                           </a:solidFill>
@@ -8856,22 +8856,22 @@
                     <a:bodyPr/>
                     <a:lstStyle/>
                     <a:p>
-                      <a:pPr algn="l" marL="38100" marR="38100">
+                      <a:pPr algn="l" marL="63500" marR="63500">
                         <a:lnSpc>
                           <a:spcPct val="100000"/>
                         </a:lnSpc>
                         <a:spcBef>
-                          <a:spcPts val="300"/>
+                          <a:spcPts val="200"/>
                         </a:spcBef>
                         <a:spcAft>
-                          <a:spcPts val="300"/>
+                          <a:spcPts val="200"/>
                         </a:spcAft>
                         <a:buNone/>
                       </a:pPr>
                       <a:r>
                         <a:rPr sz="1100">
                           <a:solidFill>
-                            <a:srgbClr val="000000">
+                            <a:srgbClr val="111111">
                               <a:alpha val="100000"/>
                             </a:srgbClr>
                           </a:solidFill>
@@ -8922,22 +8922,22 @@
                     <a:bodyPr/>
                     <a:lstStyle/>
                     <a:p>
-                      <a:pPr algn="l" marL="38100" marR="38100">
+                      <a:pPr algn="l" marL="63500" marR="63500">
                         <a:lnSpc>
                           <a:spcPct val="100000"/>
                         </a:lnSpc>
                         <a:spcBef>
-                          <a:spcPts val="300"/>
+                          <a:spcPts val="200"/>
                         </a:spcBef>
                         <a:spcAft>
-                          <a:spcPts val="300"/>
+                          <a:spcPts val="200"/>
                         </a:spcAft>
                         <a:buNone/>
                       </a:pPr>
                       <a:r>
                         <a:rPr sz="1100">
                           <a:solidFill>
-                            <a:srgbClr val="000000">
+                            <a:srgbClr val="111111">
                               <a:alpha val="100000"/>
                             </a:srgbClr>
                           </a:solidFill>
@@ -9015,7 +9015,7 @@
       </p:grpSpPr>
       <p:pic xmlns:a="http://schemas.openxmlformats.org/drawingml/2006/main" xmlns:r="http://schemas.openxmlformats.org/officeDocument/2006/relationships" xmlns:p="http://schemas.openxmlformats.org/presentationml/2006/main">
         <p:nvPicPr>
-          <p:cNvPr id="2" name="Picture Placeholder 8" descr=""/>
+          <p:cNvPr id="2" name="Picture Placeholder 8"/>
           <p:cNvPicPr>
             <a:picLocks noGrp="1"/>
           </p:cNvPicPr>
@@ -9061,7 +9061,7 @@
           <a:p>
             <a:r>
               <a:rPr/>
-              <a:t>Pack date: 17 February 2021</a:t>
+              <a:t>Pack date: 18 February 2021</a:t>
             </a:r>
           </a:p>
         </p:txBody>
@@ -9257,27 +9257,27 @@
                     <a:bodyPr/>
                     <a:lstStyle/>
                     <a:p>
-                      <a:pPr algn="l" marL="38100" marR="38100">
+                      <a:pPr algn="l" marL="63500" marR="63500">
                         <a:lnSpc>
                           <a:spcPct val="100000"/>
                         </a:lnSpc>
                         <a:spcBef>
-                          <a:spcPts val="300"/>
+                          <a:spcPts val="200"/>
                         </a:spcBef>
                         <a:spcAft>
-                          <a:spcPts val="300"/>
+                          <a:spcPts val="200"/>
                         </a:spcAft>
                         <a:buNone/>
                       </a:pPr>
                       <a:r>
                         <a:rPr sz="1000" b="1">
                           <a:solidFill>
-                            <a:srgbClr val="000000">
+                            <a:srgbClr val="111111">
                               <a:alpha val="100000"/>
                             </a:srgbClr>
                           </a:solidFill>
-                          <a:latin typeface="Helvetica"/>
-                          <a:cs typeface="Helvetica"/>
+                          <a:latin typeface="Roboto"/>
+                          <a:cs typeface="Roboto"/>
                         </a:rPr>
                         <a:t>Name</a:t>
                       </a:r>
@@ -9323,27 +9323,27 @@
                     <a:bodyPr/>
                     <a:lstStyle/>
                     <a:p>
-                      <a:pPr algn="l" marL="38100" marR="38100">
+                      <a:pPr algn="l" marL="63500" marR="63500">
                         <a:lnSpc>
                           <a:spcPct val="100000"/>
                         </a:lnSpc>
                         <a:spcBef>
-                          <a:spcPts val="300"/>
+                          <a:spcPts val="200"/>
                         </a:spcBef>
                         <a:spcAft>
-                          <a:spcPts val="300"/>
+                          <a:spcPts val="200"/>
                         </a:spcAft>
                         <a:buNone/>
                       </a:pPr>
                       <a:r>
                         <a:rPr sz="1000" b="1">
                           <a:solidFill>
-                            <a:srgbClr val="000000">
+                            <a:srgbClr val="111111">
                               <a:alpha val="100000"/>
                             </a:srgbClr>
                           </a:solidFill>
-                          <a:latin typeface="Helvetica"/>
-                          <a:cs typeface="Helvetica"/>
+                          <a:latin typeface="Roboto"/>
+                          <a:cs typeface="Roboto"/>
                         </a:rPr>
                         <a:t>Rolling 7-day new cases</a:t>
                       </a:r>
@@ -9389,27 +9389,27 @@
                     <a:bodyPr/>
                     <a:lstStyle/>
                     <a:p>
-                      <a:pPr algn="l" marL="38100" marR="38100">
+                      <a:pPr algn="l" marL="63500" marR="63500">
                         <a:lnSpc>
                           <a:spcPct val="100000"/>
                         </a:lnSpc>
                         <a:spcBef>
-                          <a:spcPts val="300"/>
+                          <a:spcPts val="200"/>
                         </a:spcBef>
                         <a:spcAft>
-                          <a:spcPts val="300"/>
+                          <a:spcPts val="200"/>
                         </a:spcAft>
                         <a:buNone/>
                       </a:pPr>
                       <a:r>
                         <a:rPr sz="1000" b="1">
                           <a:solidFill>
-                            <a:srgbClr val="000000">
+                            <a:srgbClr val="111111">
                               <a:alpha val="100000"/>
                             </a:srgbClr>
                           </a:solidFill>
-                          <a:latin typeface="Helvetica"/>
-                          <a:cs typeface="Helvetica"/>
+                          <a:latin typeface="Roboto"/>
+                          <a:cs typeface="Roboto"/>
                         </a:rPr>
                         <a:t>Rolling 7-day case rate per 100,000</a:t>
                       </a:r>
@@ -9455,27 +9455,27 @@
                     <a:bodyPr/>
                     <a:lstStyle/>
                     <a:p>
-                      <a:pPr algn="l" marL="38100" marR="38100">
+                      <a:pPr algn="l" marL="63500" marR="63500">
                         <a:lnSpc>
                           <a:spcPct val="100000"/>
                         </a:lnSpc>
                         <a:spcBef>
-                          <a:spcPts val="300"/>
+                          <a:spcPts val="200"/>
                         </a:spcBef>
                         <a:spcAft>
-                          <a:spcPts val="300"/>
+                          <a:spcPts val="200"/>
                         </a:spcAft>
                         <a:buNone/>
                       </a:pPr>
                       <a:r>
                         <a:rPr sz="1000" b="1">
                           <a:solidFill>
-                            <a:srgbClr val="000000">
+                            <a:srgbClr val="111111">
                               <a:alpha val="100000"/>
                             </a:srgbClr>
                           </a:solidFill>
-                          <a:latin typeface="Helvetica"/>
-                          <a:cs typeface="Helvetica"/>
+                          <a:latin typeface="Roboto"/>
+                          <a:cs typeface="Roboto"/>
                         </a:rPr>
                         <a:t>Local Authority Rank (out of 149) where 1 = Highest Rolling 7-day rate per 100,000</a:t>
                       </a:r>
@@ -9521,27 +9521,27 @@
                     <a:bodyPr/>
                     <a:lstStyle/>
                     <a:p>
-                      <a:pPr algn="l" marL="38100" marR="38100">
+                      <a:pPr algn="l" marL="63500" marR="63500">
                         <a:lnSpc>
                           <a:spcPct val="100000"/>
                         </a:lnSpc>
                         <a:spcBef>
-                          <a:spcPts val="300"/>
+                          <a:spcPts val="200"/>
                         </a:spcBef>
                         <a:spcAft>
-                          <a:spcPts val="300"/>
+                          <a:spcPts val="200"/>
                         </a:spcAft>
                         <a:buNone/>
                       </a:pPr>
                       <a:r>
                         <a:rPr sz="1000" b="1">
                           <a:solidFill>
-                            <a:srgbClr val="000000">
+                            <a:srgbClr val="111111">
                               <a:alpha val="100000"/>
                             </a:srgbClr>
                           </a:solidFill>
-                          <a:latin typeface="Helvetica"/>
-                          <a:cs typeface="Helvetica"/>
+                          <a:latin typeface="Roboto"/>
+                          <a:cs typeface="Roboto"/>
                         </a:rPr>
                         <a:t>Decile of rolling rate per 100,000</a:t>
                       </a:r>
@@ -9589,22 +9589,22 @@
                     <a:bodyPr/>
                     <a:lstStyle/>
                     <a:p>
-                      <a:pPr algn="l" marL="38100" marR="38100">
+                      <a:pPr algn="l" marL="63500" marR="63500">
                         <a:lnSpc>
                           <a:spcPct val="100000"/>
                         </a:lnSpc>
                         <a:spcBef>
-                          <a:spcPts val="300"/>
+                          <a:spcPts val="200"/>
                         </a:spcBef>
                         <a:spcAft>
-                          <a:spcPts val="300"/>
+                          <a:spcPts val="200"/>
                         </a:spcAft>
                         <a:buNone/>
                       </a:pPr>
                       <a:r>
                         <a:rPr sz="1100">
                           <a:solidFill>
-                            <a:srgbClr val="000000">
+                            <a:srgbClr val="111111">
                               <a:alpha val="100000"/>
                             </a:srgbClr>
                           </a:solidFill>
@@ -9655,22 +9655,22 @@
                     <a:bodyPr/>
                     <a:lstStyle/>
                     <a:p>
-                      <a:pPr algn="l" marL="38100" marR="38100">
+                      <a:pPr algn="l" marL="63500" marR="63500">
                         <a:lnSpc>
                           <a:spcPct val="100000"/>
                         </a:lnSpc>
                         <a:spcBef>
-                          <a:spcPts val="300"/>
+                          <a:spcPts val="200"/>
                         </a:spcBef>
                         <a:spcAft>
-                          <a:spcPts val="300"/>
+                          <a:spcPts val="200"/>
                         </a:spcAft>
                         <a:buNone/>
                       </a:pPr>
                       <a:r>
                         <a:rPr sz="1100">
                           <a:solidFill>
-                            <a:srgbClr val="000000">
+                            <a:srgbClr val="111111">
                               <a:alpha val="100000"/>
                             </a:srgbClr>
                           </a:solidFill>
@@ -9721,22 +9721,22 @@
                     <a:bodyPr/>
                     <a:lstStyle/>
                     <a:p>
-                      <a:pPr algn="l" marL="38100" marR="38100">
+                      <a:pPr algn="l" marL="63500" marR="63500">
                         <a:lnSpc>
                           <a:spcPct val="100000"/>
                         </a:lnSpc>
                         <a:spcBef>
-                          <a:spcPts val="300"/>
+                          <a:spcPts val="200"/>
                         </a:spcBef>
                         <a:spcAft>
-                          <a:spcPts val="300"/>
+                          <a:spcPts val="200"/>
                         </a:spcAft>
                         <a:buNone/>
                       </a:pPr>
                       <a:r>
                         <a:rPr sz="1100">
                           <a:solidFill>
-                            <a:srgbClr val="000000">
+                            <a:srgbClr val="111111">
                               <a:alpha val="100000"/>
                             </a:srgbClr>
                           </a:solidFill>
@@ -9787,22 +9787,22 @@
                     <a:bodyPr/>
                     <a:lstStyle/>
                     <a:p>
-                      <a:pPr algn="l" marL="38100" marR="38100">
+                      <a:pPr algn="l" marL="63500" marR="63500">
                         <a:lnSpc>
                           <a:spcPct val="100000"/>
                         </a:lnSpc>
                         <a:spcBef>
-                          <a:spcPts val="300"/>
+                          <a:spcPts val="200"/>
                         </a:spcBef>
                         <a:spcAft>
-                          <a:spcPts val="300"/>
+                          <a:spcPts val="200"/>
                         </a:spcAft>
                         <a:buNone/>
                       </a:pPr>
                       <a:r>
                         <a:rPr sz="1100">
                           <a:solidFill>
-                            <a:srgbClr val="000000">
+                            <a:srgbClr val="111111">
                               <a:alpha val="100000"/>
                             </a:srgbClr>
                           </a:solidFill>
@@ -9853,22 +9853,22 @@
                     <a:bodyPr/>
                     <a:lstStyle/>
                     <a:p>
-                      <a:pPr algn="l" marL="38100" marR="38100">
+                      <a:pPr algn="l" marL="63500" marR="63500">
                         <a:lnSpc>
                           <a:spcPct val="100000"/>
                         </a:lnSpc>
                         <a:spcBef>
-                          <a:spcPts val="300"/>
+                          <a:spcPts val="200"/>
                         </a:spcBef>
                         <a:spcAft>
-                          <a:spcPts val="300"/>
+                          <a:spcPts val="200"/>
                         </a:spcAft>
                         <a:buNone/>
                       </a:pPr>
                       <a:r>
                         <a:rPr sz="1100">
                           <a:solidFill>
-                            <a:srgbClr val="000000">
+                            <a:srgbClr val="111111">
                               <a:alpha val="100000"/>
                             </a:srgbClr>
                           </a:solidFill>
@@ -9921,22 +9921,22 @@
                     <a:bodyPr/>
                     <a:lstStyle/>
                     <a:p>
-                      <a:pPr algn="l" marL="38100" marR="38100">
+                      <a:pPr algn="l" marL="63500" marR="63500">
                         <a:lnSpc>
                           <a:spcPct val="100000"/>
                         </a:lnSpc>
                         <a:spcBef>
-                          <a:spcPts val="300"/>
+                          <a:spcPts val="200"/>
                         </a:spcBef>
                         <a:spcAft>
-                          <a:spcPts val="300"/>
+                          <a:spcPts val="200"/>
                         </a:spcAft>
                         <a:buNone/>
                       </a:pPr>
                       <a:r>
                         <a:rPr sz="1100">
                           <a:solidFill>
-                            <a:srgbClr val="000000">
+                            <a:srgbClr val="111111">
                               <a:alpha val="100000"/>
                             </a:srgbClr>
                           </a:solidFill>
@@ -9987,22 +9987,22 @@
                     <a:bodyPr/>
                     <a:lstStyle/>
                     <a:p>
-                      <a:pPr algn="l" marL="38100" marR="38100">
+                      <a:pPr algn="l" marL="63500" marR="63500">
                         <a:lnSpc>
                           <a:spcPct val="100000"/>
                         </a:lnSpc>
                         <a:spcBef>
-                          <a:spcPts val="300"/>
+                          <a:spcPts val="200"/>
                         </a:spcBef>
                         <a:spcAft>
-                          <a:spcPts val="300"/>
+                          <a:spcPts val="200"/>
                         </a:spcAft>
                         <a:buNone/>
                       </a:pPr>
                       <a:r>
                         <a:rPr sz="1100">
                           <a:solidFill>
-                            <a:srgbClr val="000000">
+                            <a:srgbClr val="111111">
                               <a:alpha val="100000"/>
                             </a:srgbClr>
                           </a:solidFill>
@@ -10053,22 +10053,22 @@
                     <a:bodyPr/>
                     <a:lstStyle/>
                     <a:p>
-                      <a:pPr algn="l" marL="38100" marR="38100">
+                      <a:pPr algn="l" marL="63500" marR="63500">
                         <a:lnSpc>
                           <a:spcPct val="100000"/>
                         </a:lnSpc>
                         <a:spcBef>
-                          <a:spcPts val="300"/>
+                          <a:spcPts val="200"/>
                         </a:spcBef>
                         <a:spcAft>
-                          <a:spcPts val="300"/>
+                          <a:spcPts val="200"/>
                         </a:spcAft>
                         <a:buNone/>
                       </a:pPr>
                       <a:r>
                         <a:rPr sz="1100">
                           <a:solidFill>
-                            <a:srgbClr val="000000">
+                            <a:srgbClr val="111111">
                               <a:alpha val="100000"/>
                             </a:srgbClr>
                           </a:solidFill>
@@ -10119,22 +10119,22 @@
                     <a:bodyPr/>
                     <a:lstStyle/>
                     <a:p>
-                      <a:pPr algn="l" marL="38100" marR="38100">
+                      <a:pPr algn="l" marL="63500" marR="63500">
                         <a:lnSpc>
                           <a:spcPct val="100000"/>
                         </a:lnSpc>
                         <a:spcBef>
-                          <a:spcPts val="300"/>
+                          <a:spcPts val="200"/>
                         </a:spcBef>
                         <a:spcAft>
-                          <a:spcPts val="300"/>
+                          <a:spcPts val="200"/>
                         </a:spcAft>
                         <a:buNone/>
                       </a:pPr>
                       <a:r>
                         <a:rPr sz="1100">
                           <a:solidFill>
-                            <a:srgbClr val="000000">
+                            <a:srgbClr val="111111">
                               <a:alpha val="100000"/>
                             </a:srgbClr>
                           </a:solidFill>
@@ -10185,22 +10185,22 @@
                     <a:bodyPr/>
                     <a:lstStyle/>
                     <a:p>
-                      <a:pPr algn="l" marL="38100" marR="38100">
+                      <a:pPr algn="l" marL="63500" marR="63500">
                         <a:lnSpc>
                           <a:spcPct val="100000"/>
                         </a:lnSpc>
                         <a:spcBef>
-                          <a:spcPts val="300"/>
+                          <a:spcPts val="200"/>
                         </a:spcBef>
                         <a:spcAft>
-                          <a:spcPts val="300"/>
+                          <a:spcPts val="200"/>
                         </a:spcAft>
                         <a:buNone/>
                       </a:pPr>
                       <a:r>
                         <a:rPr sz="1100">
                           <a:solidFill>
-                            <a:srgbClr val="000000">
+                            <a:srgbClr val="111111">
                               <a:alpha val="100000"/>
                             </a:srgbClr>
                           </a:solidFill>
@@ -10253,22 +10253,22 @@
                     <a:bodyPr/>
                     <a:lstStyle/>
                     <a:p>
-                      <a:pPr algn="l" marL="38100" marR="38100">
+                      <a:pPr algn="l" marL="63500" marR="63500">
                         <a:lnSpc>
                           <a:spcPct val="100000"/>
                         </a:lnSpc>
                         <a:spcBef>
-                          <a:spcPts val="300"/>
+                          <a:spcPts val="200"/>
                         </a:spcBef>
                         <a:spcAft>
-                          <a:spcPts val="300"/>
+                          <a:spcPts val="200"/>
                         </a:spcAft>
                         <a:buNone/>
                       </a:pPr>
                       <a:r>
                         <a:rPr sz="1100">
                           <a:solidFill>
-                            <a:srgbClr val="000000">
+                            <a:srgbClr val="111111">
                               <a:alpha val="100000"/>
                             </a:srgbClr>
                           </a:solidFill>
@@ -10319,22 +10319,22 @@
                     <a:bodyPr/>
                     <a:lstStyle/>
                     <a:p>
-                      <a:pPr algn="l" marL="38100" marR="38100">
+                      <a:pPr algn="l" marL="63500" marR="63500">
                         <a:lnSpc>
                           <a:spcPct val="100000"/>
                         </a:lnSpc>
                         <a:spcBef>
-                          <a:spcPts val="300"/>
+                          <a:spcPts val="200"/>
                         </a:spcBef>
                         <a:spcAft>
-                          <a:spcPts val="300"/>
+                          <a:spcPts val="200"/>
                         </a:spcAft>
                         <a:buNone/>
                       </a:pPr>
                       <a:r>
                         <a:rPr sz="1100">
                           <a:solidFill>
-                            <a:srgbClr val="000000">
+                            <a:srgbClr val="111111">
                               <a:alpha val="100000"/>
                             </a:srgbClr>
                           </a:solidFill>
@@ -10385,22 +10385,22 @@
                     <a:bodyPr/>
                     <a:lstStyle/>
                     <a:p>
-                      <a:pPr algn="l" marL="38100" marR="38100">
+                      <a:pPr algn="l" marL="63500" marR="63500">
                         <a:lnSpc>
                           <a:spcPct val="100000"/>
                         </a:lnSpc>
                         <a:spcBef>
-                          <a:spcPts val="300"/>
+                          <a:spcPts val="200"/>
                         </a:spcBef>
                         <a:spcAft>
-                          <a:spcPts val="300"/>
+                          <a:spcPts val="200"/>
                         </a:spcAft>
                         <a:buNone/>
                       </a:pPr>
                       <a:r>
                         <a:rPr sz="1100">
                           <a:solidFill>
-                            <a:srgbClr val="000000">
+                            <a:srgbClr val="111111">
                               <a:alpha val="100000"/>
                             </a:srgbClr>
                           </a:solidFill>
@@ -10451,22 +10451,22 @@
                     <a:bodyPr/>
                     <a:lstStyle/>
                     <a:p>
-                      <a:pPr algn="l" marL="38100" marR="38100">
+                      <a:pPr algn="l" marL="63500" marR="63500">
                         <a:lnSpc>
                           <a:spcPct val="100000"/>
                         </a:lnSpc>
                         <a:spcBef>
-                          <a:spcPts val="300"/>
+                          <a:spcPts val="200"/>
                         </a:spcBef>
                         <a:spcAft>
-                          <a:spcPts val="300"/>
+                          <a:spcPts val="200"/>
                         </a:spcAft>
                         <a:buNone/>
                       </a:pPr>
                       <a:r>
                         <a:rPr sz="1100">
                           <a:solidFill>
-                            <a:srgbClr val="000000">
+                            <a:srgbClr val="111111">
                               <a:alpha val="100000"/>
                             </a:srgbClr>
                           </a:solidFill>
@@ -10517,22 +10517,22 @@
                     <a:bodyPr/>
                     <a:lstStyle/>
                     <a:p>
-                      <a:pPr algn="l" marL="38100" marR="38100">
+                      <a:pPr algn="l" marL="63500" marR="63500">
                         <a:lnSpc>
                           <a:spcPct val="100000"/>
                         </a:lnSpc>
                         <a:spcBef>
-                          <a:spcPts val="300"/>
+                          <a:spcPts val="200"/>
                         </a:spcBef>
                         <a:spcAft>
-                          <a:spcPts val="300"/>
+                          <a:spcPts val="200"/>
                         </a:spcAft>
                         <a:buNone/>
                       </a:pPr>
                       <a:r>
                         <a:rPr sz="1100">
                           <a:solidFill>
-                            <a:srgbClr val="000000">
+                            <a:srgbClr val="111111">
                               <a:alpha val="100000"/>
                             </a:srgbClr>
                           </a:solidFill>
@@ -10610,7 +10610,7 @@
       </p:grpSpPr>
       <p:pic xmlns:a="http://schemas.openxmlformats.org/drawingml/2006/main" xmlns:r="http://schemas.openxmlformats.org/officeDocument/2006/relationships" xmlns:p="http://schemas.openxmlformats.org/presentationml/2006/main">
         <p:nvPicPr>
-          <p:cNvPr id="2" name="Picture Placeholder 8" descr=""/>
+          <p:cNvPr id="2" name="Picture Placeholder 8"/>
           <p:cNvPicPr>
             <a:picLocks noGrp="1"/>
           </p:cNvPicPr>
@@ -10656,7 +10656,7 @@
           <a:p>
             <a:r>
               <a:rPr/>
-              <a:t>Pack date: 17 February 2021</a:t>
+              <a:t>Pack date: 18 February 2021</a:t>
             </a:r>
           </a:p>
         </p:txBody>
@@ -10825,27 +10825,27 @@
                     <a:bodyPr/>
                     <a:lstStyle/>
                     <a:p>
-                      <a:pPr algn="l" marL="38100" marR="38100">
+                      <a:pPr algn="l" marL="63500" marR="63500">
                         <a:lnSpc>
                           <a:spcPct val="100000"/>
                         </a:lnSpc>
                         <a:spcBef>
-                          <a:spcPts val="300"/>
+                          <a:spcPts val="200"/>
                         </a:spcBef>
                         <a:spcAft>
-                          <a:spcPts val="300"/>
+                          <a:spcPts val="200"/>
                         </a:spcAft>
                         <a:buNone/>
                       </a:pPr>
                       <a:r>
                         <a:rPr sz="1000" b="1">
                           <a:solidFill>
-                            <a:srgbClr val="000000">
+                            <a:srgbClr val="111111">
                               <a:alpha val="100000"/>
                             </a:srgbClr>
                           </a:solidFill>
-                          <a:latin typeface="Helvetica"/>
-                          <a:cs typeface="Helvetica"/>
+                          <a:latin typeface="Roboto"/>
+                          <a:cs typeface="Roboto"/>
                         </a:rPr>
                         <a:t>Name</a:t>
                       </a:r>
@@ -10891,27 +10891,27 @@
                     <a:bodyPr/>
                     <a:lstStyle/>
                     <a:p>
-                      <a:pPr algn="l" marL="38100" marR="38100">
+                      <a:pPr algn="l" marL="63500" marR="63500">
                         <a:lnSpc>
                           <a:spcPct val="100000"/>
                         </a:lnSpc>
                         <a:spcBef>
-                          <a:spcPts val="300"/>
+                          <a:spcPts val="200"/>
                         </a:spcBef>
                         <a:spcAft>
-                          <a:spcPts val="300"/>
+                          <a:spcPts val="200"/>
                         </a:spcAft>
                         <a:buNone/>
                       </a:pPr>
                       <a:r>
                         <a:rPr sz="1000" b="1">
                           <a:solidFill>
-                            <a:srgbClr val="000000">
+                            <a:srgbClr val="111111">
                               <a:alpha val="100000"/>
                             </a:srgbClr>
                           </a:solidFill>
-                          <a:latin typeface="Helvetica"/>
-                          <a:cs typeface="Helvetica"/>
+                          <a:latin typeface="Roboto"/>
+                          <a:cs typeface="Roboto"/>
                         </a:rPr>
                         <a:t>Cumulative cases</a:t>
                       </a:r>
@@ -10957,27 +10957,27 @@
                     <a:bodyPr/>
                     <a:lstStyle/>
                     <a:p>
-                      <a:pPr algn="l" marL="38100" marR="38100">
+                      <a:pPr algn="l" marL="63500" marR="63500">
                         <a:lnSpc>
                           <a:spcPct val="100000"/>
                         </a:lnSpc>
                         <a:spcBef>
-                          <a:spcPts val="300"/>
+                          <a:spcPts val="200"/>
                         </a:spcBef>
                         <a:spcAft>
-                          <a:spcPts val="300"/>
+                          <a:spcPts val="200"/>
                         </a:spcAft>
                         <a:buNone/>
                       </a:pPr>
                       <a:r>
                         <a:rPr sz="1000" b="1">
                           <a:solidFill>
-                            <a:srgbClr val="000000">
+                            <a:srgbClr val="111111">
                               <a:alpha val="100000"/>
                             </a:srgbClr>
                           </a:solidFill>
-                          <a:latin typeface="Helvetica"/>
-                          <a:cs typeface="Helvetica"/>
+                          <a:latin typeface="Roboto"/>
+                          <a:cs typeface="Roboto"/>
                         </a:rPr>
                         <a:t>Cumulative rate per 100,000 residents</a:t>
                       </a:r>
@@ -11023,27 +11023,27 @@
                     <a:bodyPr/>
                     <a:lstStyle/>
                     <a:p>
-                      <a:pPr algn="l" marL="38100" marR="38100">
+                      <a:pPr algn="l" marL="63500" marR="63500">
                         <a:lnSpc>
                           <a:spcPct val="100000"/>
                         </a:lnSpc>
                         <a:spcBef>
-                          <a:spcPts val="300"/>
+                          <a:spcPts val="200"/>
                         </a:spcBef>
                         <a:spcAft>
-                          <a:spcPts val="300"/>
+                          <a:spcPts val="200"/>
                         </a:spcAft>
                         <a:buNone/>
                       </a:pPr>
                       <a:r>
                         <a:rPr sz="1000" b="1">
                           <a:solidFill>
-                            <a:srgbClr val="000000">
+                            <a:srgbClr val="111111">
                               <a:alpha val="100000"/>
                             </a:srgbClr>
                           </a:solidFill>
-                          <a:latin typeface="Helvetica"/>
-                          <a:cs typeface="Helvetica"/>
+                          <a:latin typeface="Roboto"/>
+                          <a:cs typeface="Roboto"/>
                         </a:rPr>
                         <a:t>Local Authority Rank (out of 315) where 1 = Highest Rate per 100,000</a:t>
                       </a:r>
@@ -11089,27 +11089,27 @@
                     <a:bodyPr/>
                     <a:lstStyle/>
                     <a:p>
-                      <a:pPr algn="l" marL="38100" marR="38100">
+                      <a:pPr algn="l" marL="63500" marR="63500">
                         <a:lnSpc>
                           <a:spcPct val="100000"/>
                         </a:lnSpc>
                         <a:spcBef>
-                          <a:spcPts val="300"/>
+                          <a:spcPts val="200"/>
                         </a:spcBef>
                         <a:spcAft>
-                          <a:spcPts val="300"/>
+                          <a:spcPts val="200"/>
                         </a:spcAft>
                         <a:buNone/>
                       </a:pPr>
                       <a:r>
                         <a:rPr sz="1000" b="1">
                           <a:solidFill>
-                            <a:srgbClr val="000000">
+                            <a:srgbClr val="111111">
                               <a:alpha val="100000"/>
                             </a:srgbClr>
                           </a:solidFill>
-                          <a:latin typeface="Helvetica"/>
-                          <a:cs typeface="Helvetica"/>
+                          <a:latin typeface="Roboto"/>
+                          <a:cs typeface="Roboto"/>
                         </a:rPr>
                         <a:t>Decile of cumulative rate per 100,000</a:t>
                       </a:r>
@@ -11157,22 +11157,22 @@
                     <a:bodyPr/>
                     <a:lstStyle/>
                     <a:p>
-                      <a:pPr algn="l" marL="38100" marR="38100">
+                      <a:pPr algn="l" marL="63500" marR="63500">
                         <a:lnSpc>
                           <a:spcPct val="100000"/>
                         </a:lnSpc>
                         <a:spcBef>
-                          <a:spcPts val="300"/>
+                          <a:spcPts val="200"/>
                         </a:spcBef>
                         <a:spcAft>
-                          <a:spcPts val="300"/>
+                          <a:spcPts val="200"/>
                         </a:spcAft>
                         <a:buNone/>
                       </a:pPr>
                       <a:r>
                         <a:rPr sz="1100">
                           <a:solidFill>
-                            <a:srgbClr val="000000">
+                            <a:srgbClr val="111111">
                               <a:alpha val="100000"/>
                             </a:srgbClr>
                           </a:solidFill>
@@ -11223,22 +11223,22 @@
                     <a:bodyPr/>
                     <a:lstStyle/>
                     <a:p>
-                      <a:pPr algn="l" marL="38100" marR="38100">
+                      <a:pPr algn="l" marL="63500" marR="63500">
                         <a:lnSpc>
                           <a:spcPct val="100000"/>
                         </a:lnSpc>
                         <a:spcBef>
-                          <a:spcPts val="300"/>
+                          <a:spcPts val="200"/>
                         </a:spcBef>
                         <a:spcAft>
-                          <a:spcPts val="300"/>
+                          <a:spcPts val="200"/>
                         </a:spcAft>
                         <a:buNone/>
                       </a:pPr>
                       <a:r>
                         <a:rPr sz="1100">
                           <a:solidFill>
-                            <a:srgbClr val="000000">
+                            <a:srgbClr val="111111">
                               <a:alpha val="100000"/>
                             </a:srgbClr>
                           </a:solidFill>
@@ -11289,22 +11289,22 @@
                     <a:bodyPr/>
                     <a:lstStyle/>
                     <a:p>
-                      <a:pPr algn="l" marL="38100" marR="38100">
+                      <a:pPr algn="l" marL="63500" marR="63500">
                         <a:lnSpc>
                           <a:spcPct val="100000"/>
                         </a:lnSpc>
                         <a:spcBef>
-                          <a:spcPts val="300"/>
+                          <a:spcPts val="200"/>
                         </a:spcBef>
                         <a:spcAft>
-                          <a:spcPts val="300"/>
+                          <a:spcPts val="200"/>
                         </a:spcAft>
                         <a:buNone/>
                       </a:pPr>
                       <a:r>
                         <a:rPr sz="1100">
                           <a:solidFill>
-                            <a:srgbClr val="000000">
+                            <a:srgbClr val="111111">
                               <a:alpha val="100000"/>
                             </a:srgbClr>
                           </a:solidFill>
@@ -11355,22 +11355,22 @@
                     <a:bodyPr/>
                     <a:lstStyle/>
                     <a:p>
-                      <a:pPr algn="l" marL="38100" marR="38100">
+                      <a:pPr algn="l" marL="63500" marR="63500">
                         <a:lnSpc>
                           <a:spcPct val="100000"/>
                         </a:lnSpc>
                         <a:spcBef>
-                          <a:spcPts val="300"/>
+                          <a:spcPts val="200"/>
                         </a:spcBef>
                         <a:spcAft>
-                          <a:spcPts val="300"/>
+                          <a:spcPts val="200"/>
                         </a:spcAft>
                         <a:buNone/>
                       </a:pPr>
                       <a:r>
                         <a:rPr sz="1100">
                           <a:solidFill>
-                            <a:srgbClr val="000000">
+                            <a:srgbClr val="111111">
                               <a:alpha val="100000"/>
                             </a:srgbClr>
                           </a:solidFill>
@@ -11421,22 +11421,22 @@
                     <a:bodyPr/>
                     <a:lstStyle/>
                     <a:p>
-                      <a:pPr algn="l" marL="38100" marR="38100">
+                      <a:pPr algn="l" marL="63500" marR="63500">
                         <a:lnSpc>
                           <a:spcPct val="100000"/>
                         </a:lnSpc>
                         <a:spcBef>
-                          <a:spcPts val="300"/>
+                          <a:spcPts val="200"/>
                         </a:spcBef>
                         <a:spcAft>
-                          <a:spcPts val="300"/>
+                          <a:spcPts val="200"/>
                         </a:spcAft>
                         <a:buNone/>
                       </a:pPr>
                       <a:r>
                         <a:rPr sz="1100">
                           <a:solidFill>
-                            <a:srgbClr val="000000">
+                            <a:srgbClr val="111111">
                               <a:alpha val="100000"/>
                             </a:srgbClr>
                           </a:solidFill>
@@ -11489,22 +11489,22 @@
                     <a:bodyPr/>
                     <a:lstStyle/>
                     <a:p>
-                      <a:pPr algn="l" marL="38100" marR="38100">
+                      <a:pPr algn="l" marL="63500" marR="63500">
                         <a:lnSpc>
                           <a:spcPct val="100000"/>
                         </a:lnSpc>
                         <a:spcBef>
-                          <a:spcPts val="300"/>
+                          <a:spcPts val="200"/>
                         </a:spcBef>
                         <a:spcAft>
-                          <a:spcPts val="300"/>
+                          <a:spcPts val="200"/>
                         </a:spcAft>
                         <a:buNone/>
                       </a:pPr>
                       <a:r>
                         <a:rPr sz="1100">
                           <a:solidFill>
-                            <a:srgbClr val="000000">
+                            <a:srgbClr val="111111">
                               <a:alpha val="100000"/>
                             </a:srgbClr>
                           </a:solidFill>
@@ -11555,22 +11555,22 @@
                     <a:bodyPr/>
                     <a:lstStyle/>
                     <a:p>
-                      <a:pPr algn="l" marL="38100" marR="38100">
+                      <a:pPr algn="l" marL="63500" marR="63500">
                         <a:lnSpc>
                           <a:spcPct val="100000"/>
                         </a:lnSpc>
                         <a:spcBef>
-                          <a:spcPts val="300"/>
+                          <a:spcPts val="200"/>
                         </a:spcBef>
                         <a:spcAft>
-                          <a:spcPts val="300"/>
+                          <a:spcPts val="200"/>
                         </a:spcAft>
                         <a:buNone/>
                       </a:pPr>
                       <a:r>
                         <a:rPr sz="1100">
                           <a:solidFill>
-                            <a:srgbClr val="000000">
+                            <a:srgbClr val="111111">
                               <a:alpha val="100000"/>
                             </a:srgbClr>
                           </a:solidFill>
@@ -11621,22 +11621,22 @@
                     <a:bodyPr/>
                     <a:lstStyle/>
                     <a:p>
-                      <a:pPr algn="l" marL="38100" marR="38100">
+                      <a:pPr algn="l" marL="63500" marR="63500">
                         <a:lnSpc>
                           <a:spcPct val="100000"/>
                         </a:lnSpc>
                         <a:spcBef>
-                          <a:spcPts val="300"/>
+                          <a:spcPts val="200"/>
                         </a:spcBef>
                         <a:spcAft>
-                          <a:spcPts val="300"/>
+                          <a:spcPts val="200"/>
                         </a:spcAft>
                         <a:buNone/>
                       </a:pPr>
                       <a:r>
                         <a:rPr sz="1100">
                           <a:solidFill>
-                            <a:srgbClr val="000000">
+                            <a:srgbClr val="111111">
                               <a:alpha val="100000"/>
                             </a:srgbClr>
                           </a:solidFill>
@@ -11687,22 +11687,22 @@
                     <a:bodyPr/>
                     <a:lstStyle/>
                     <a:p>
-                      <a:pPr algn="l" marL="38100" marR="38100">
+                      <a:pPr algn="l" marL="63500" marR="63500">
                         <a:lnSpc>
                           <a:spcPct val="100000"/>
                         </a:lnSpc>
                         <a:spcBef>
-                          <a:spcPts val="300"/>
+                          <a:spcPts val="200"/>
                         </a:spcBef>
                         <a:spcAft>
-                          <a:spcPts val="300"/>
+                          <a:spcPts val="200"/>
                         </a:spcAft>
                         <a:buNone/>
                       </a:pPr>
                       <a:r>
                         <a:rPr sz="1100">
                           <a:solidFill>
-                            <a:srgbClr val="000000">
+                            <a:srgbClr val="111111">
                               <a:alpha val="100000"/>
                             </a:srgbClr>
                           </a:solidFill>
@@ -11753,22 +11753,22 @@
                     <a:bodyPr/>
                     <a:lstStyle/>
                     <a:p>
-                      <a:pPr algn="l" marL="38100" marR="38100">
+                      <a:pPr algn="l" marL="63500" marR="63500">
                         <a:lnSpc>
                           <a:spcPct val="100000"/>
                         </a:lnSpc>
                         <a:spcBef>
-                          <a:spcPts val="300"/>
+                          <a:spcPts val="200"/>
                         </a:spcBef>
                         <a:spcAft>
-                          <a:spcPts val="300"/>
+                          <a:spcPts val="200"/>
                         </a:spcAft>
                         <a:buNone/>
                       </a:pPr>
                       <a:r>
                         <a:rPr sz="1100">
                           <a:solidFill>
-                            <a:srgbClr val="000000">
+                            <a:srgbClr val="111111">
                               <a:alpha val="100000"/>
                             </a:srgbClr>
                           </a:solidFill>
@@ -11821,22 +11821,22 @@
                     <a:bodyPr/>
                     <a:lstStyle/>
                     <a:p>
-                      <a:pPr algn="l" marL="38100" marR="38100">
+                      <a:pPr algn="l" marL="63500" marR="63500">
                         <a:lnSpc>
                           <a:spcPct val="100000"/>
                         </a:lnSpc>
                         <a:spcBef>
-                          <a:spcPts val="300"/>
+                          <a:spcPts val="200"/>
                         </a:spcBef>
                         <a:spcAft>
-                          <a:spcPts val="300"/>
+                          <a:spcPts val="200"/>
                         </a:spcAft>
                         <a:buNone/>
                       </a:pPr>
                       <a:r>
                         <a:rPr sz="1100">
                           <a:solidFill>
-                            <a:srgbClr val="000000">
+                            <a:srgbClr val="111111">
                               <a:alpha val="100000"/>
                             </a:srgbClr>
                           </a:solidFill>
@@ -11887,22 +11887,22 @@
                     <a:bodyPr/>
                     <a:lstStyle/>
                     <a:p>
-                      <a:pPr algn="l" marL="38100" marR="38100">
+                      <a:pPr algn="l" marL="63500" marR="63500">
                         <a:lnSpc>
                           <a:spcPct val="100000"/>
                         </a:lnSpc>
                         <a:spcBef>
-                          <a:spcPts val="300"/>
+                          <a:spcPts val="200"/>
                         </a:spcBef>
                         <a:spcAft>
-                          <a:spcPts val="300"/>
+                          <a:spcPts val="200"/>
                         </a:spcAft>
                         <a:buNone/>
                       </a:pPr>
                       <a:r>
                         <a:rPr sz="1100">
                           <a:solidFill>
-                            <a:srgbClr val="000000">
+                            <a:srgbClr val="111111">
                               <a:alpha val="100000"/>
                             </a:srgbClr>
                           </a:solidFill>
@@ -11953,22 +11953,22 @@
                     <a:bodyPr/>
                     <a:lstStyle/>
                     <a:p>
-                      <a:pPr algn="l" marL="38100" marR="38100">
+                      <a:pPr algn="l" marL="63500" marR="63500">
                         <a:lnSpc>
                           <a:spcPct val="100000"/>
                         </a:lnSpc>
                         <a:spcBef>
-                          <a:spcPts val="300"/>
+                          <a:spcPts val="200"/>
                         </a:spcBef>
                         <a:spcAft>
-                          <a:spcPts val="300"/>
+                          <a:spcPts val="200"/>
                         </a:spcAft>
                         <a:buNone/>
                       </a:pPr>
                       <a:r>
                         <a:rPr sz="1100">
                           <a:solidFill>
-                            <a:srgbClr val="000000">
+                            <a:srgbClr val="111111">
                               <a:alpha val="100000"/>
                             </a:srgbClr>
                           </a:solidFill>
@@ -12019,22 +12019,22 @@
                     <a:bodyPr/>
                     <a:lstStyle/>
                     <a:p>
-                      <a:pPr algn="l" marL="38100" marR="38100">
+                      <a:pPr algn="l" marL="63500" marR="63500">
                         <a:lnSpc>
                           <a:spcPct val="100000"/>
                         </a:lnSpc>
                         <a:spcBef>
-                          <a:spcPts val="300"/>
+                          <a:spcPts val="200"/>
                         </a:spcBef>
                         <a:spcAft>
-                          <a:spcPts val="300"/>
+                          <a:spcPts val="200"/>
                         </a:spcAft>
                         <a:buNone/>
                       </a:pPr>
                       <a:r>
                         <a:rPr sz="1100">
                           <a:solidFill>
-                            <a:srgbClr val="000000">
+                            <a:srgbClr val="111111">
                               <a:alpha val="100000"/>
                             </a:srgbClr>
                           </a:solidFill>
@@ -12085,22 +12085,22 @@
                     <a:bodyPr/>
                     <a:lstStyle/>
                     <a:p>
-                      <a:pPr algn="l" marL="38100" marR="38100">
+                      <a:pPr algn="l" marL="63500" marR="63500">
                         <a:lnSpc>
                           <a:spcPct val="100000"/>
                         </a:lnSpc>
                         <a:spcBef>
-                          <a:spcPts val="300"/>
+                          <a:spcPts val="200"/>
                         </a:spcBef>
                         <a:spcAft>
-                          <a:spcPts val="300"/>
+                          <a:spcPts val="200"/>
                         </a:spcAft>
                         <a:buNone/>
                       </a:pPr>
                       <a:r>
                         <a:rPr sz="1100">
                           <a:solidFill>
-                            <a:srgbClr val="000000">
+                            <a:srgbClr val="111111">
                               <a:alpha val="100000"/>
                             </a:srgbClr>
                           </a:solidFill>
@@ -12153,22 +12153,22 @@
                     <a:bodyPr/>
                     <a:lstStyle/>
                     <a:p>
-                      <a:pPr algn="l" marL="38100" marR="38100">
+                      <a:pPr algn="l" marL="63500" marR="63500">
                         <a:lnSpc>
                           <a:spcPct val="100000"/>
                         </a:lnSpc>
                         <a:spcBef>
-                          <a:spcPts val="300"/>
+                          <a:spcPts val="200"/>
                         </a:spcBef>
                         <a:spcAft>
-                          <a:spcPts val="300"/>
+                          <a:spcPts val="200"/>
                         </a:spcAft>
                         <a:buNone/>
                       </a:pPr>
                       <a:r>
                         <a:rPr sz="1100">
                           <a:solidFill>
-                            <a:srgbClr val="000000">
+                            <a:srgbClr val="111111">
                               <a:alpha val="100000"/>
                             </a:srgbClr>
                           </a:solidFill>
@@ -12219,22 +12219,22 @@
                     <a:bodyPr/>
                     <a:lstStyle/>
                     <a:p>
-                      <a:pPr algn="l" marL="38100" marR="38100">
+                      <a:pPr algn="l" marL="63500" marR="63500">
                         <a:lnSpc>
                           <a:spcPct val="100000"/>
                         </a:lnSpc>
                         <a:spcBef>
-                          <a:spcPts val="300"/>
+                          <a:spcPts val="200"/>
                         </a:spcBef>
                         <a:spcAft>
-                          <a:spcPts val="300"/>
+                          <a:spcPts val="200"/>
                         </a:spcAft>
                         <a:buNone/>
                       </a:pPr>
                       <a:r>
                         <a:rPr sz="1100">
                           <a:solidFill>
-                            <a:srgbClr val="000000">
+                            <a:srgbClr val="111111">
                               <a:alpha val="100000"/>
                             </a:srgbClr>
                           </a:solidFill>
@@ -12285,22 +12285,22 @@
                     <a:bodyPr/>
                     <a:lstStyle/>
                     <a:p>
-                      <a:pPr algn="l" marL="38100" marR="38100">
+                      <a:pPr algn="l" marL="63500" marR="63500">
                         <a:lnSpc>
                           <a:spcPct val="100000"/>
                         </a:lnSpc>
                         <a:spcBef>
-                          <a:spcPts val="300"/>
+                          <a:spcPts val="200"/>
                         </a:spcBef>
                         <a:spcAft>
-                          <a:spcPts val="300"/>
+                          <a:spcPts val="200"/>
                         </a:spcAft>
                         <a:buNone/>
                       </a:pPr>
                       <a:r>
                         <a:rPr sz="1100">
                           <a:solidFill>
-                            <a:srgbClr val="000000">
+                            <a:srgbClr val="111111">
                               <a:alpha val="100000"/>
                             </a:srgbClr>
                           </a:solidFill>
@@ -12351,22 +12351,22 @@
                     <a:bodyPr/>
                     <a:lstStyle/>
                     <a:p>
-                      <a:pPr algn="l" marL="38100" marR="38100">
+                      <a:pPr algn="l" marL="63500" marR="63500">
                         <a:lnSpc>
                           <a:spcPct val="100000"/>
                         </a:lnSpc>
                         <a:spcBef>
-                          <a:spcPts val="300"/>
+                          <a:spcPts val="200"/>
                         </a:spcBef>
                         <a:spcAft>
-                          <a:spcPts val="300"/>
+                          <a:spcPts val="200"/>
                         </a:spcAft>
                         <a:buNone/>
                       </a:pPr>
                       <a:r>
                         <a:rPr sz="1100">
                           <a:solidFill>
-                            <a:srgbClr val="000000">
+                            <a:srgbClr val="111111">
                               <a:alpha val="100000"/>
                             </a:srgbClr>
                           </a:solidFill>
@@ -12417,22 +12417,22 @@
                     <a:bodyPr/>
                     <a:lstStyle/>
                     <a:p>
-                      <a:pPr algn="l" marL="38100" marR="38100">
+                      <a:pPr algn="l" marL="63500" marR="63500">
                         <a:lnSpc>
                           <a:spcPct val="100000"/>
                         </a:lnSpc>
                         <a:spcBef>
-                          <a:spcPts val="300"/>
+                          <a:spcPts val="200"/>
                         </a:spcBef>
                         <a:spcAft>
-                          <a:spcPts val="300"/>
+                          <a:spcPts val="200"/>
                         </a:spcAft>
                         <a:buNone/>
                       </a:pPr>
                       <a:r>
                         <a:rPr sz="1100">
                           <a:solidFill>
-                            <a:srgbClr val="000000">
+                            <a:srgbClr val="111111">
                               <a:alpha val="100000"/>
                             </a:srgbClr>
                           </a:solidFill>
@@ -12485,22 +12485,22 @@
                     <a:bodyPr/>
                     <a:lstStyle/>
                     <a:p>
-                      <a:pPr algn="l" marL="38100" marR="38100">
+                      <a:pPr algn="l" marL="63500" marR="63500">
                         <a:lnSpc>
                           <a:spcPct val="100000"/>
                         </a:lnSpc>
                         <a:spcBef>
-                          <a:spcPts val="300"/>
+                          <a:spcPts val="200"/>
                         </a:spcBef>
                         <a:spcAft>
-                          <a:spcPts val="300"/>
+                          <a:spcPts val="200"/>
                         </a:spcAft>
                         <a:buNone/>
                       </a:pPr>
                       <a:r>
                         <a:rPr sz="1100">
                           <a:solidFill>
-                            <a:srgbClr val="000000">
+                            <a:srgbClr val="111111">
                               <a:alpha val="100000"/>
                             </a:srgbClr>
                           </a:solidFill>
@@ -12551,22 +12551,22 @@
                     <a:bodyPr/>
                     <a:lstStyle/>
                     <a:p>
-                      <a:pPr algn="l" marL="38100" marR="38100">
+                      <a:pPr algn="l" marL="63500" marR="63500">
                         <a:lnSpc>
                           <a:spcPct val="100000"/>
                         </a:lnSpc>
                         <a:spcBef>
-                          <a:spcPts val="300"/>
+                          <a:spcPts val="200"/>
                         </a:spcBef>
                         <a:spcAft>
-                          <a:spcPts val="300"/>
+                          <a:spcPts val="200"/>
                         </a:spcAft>
                         <a:buNone/>
                       </a:pPr>
                       <a:r>
                         <a:rPr sz="1100">
                           <a:solidFill>
-                            <a:srgbClr val="000000">
+                            <a:srgbClr val="111111">
                               <a:alpha val="100000"/>
                             </a:srgbClr>
                           </a:solidFill>
@@ -12617,22 +12617,22 @@
                     <a:bodyPr/>
                     <a:lstStyle/>
                     <a:p>
-                      <a:pPr algn="l" marL="38100" marR="38100">
+                      <a:pPr algn="l" marL="63500" marR="63500">
                         <a:lnSpc>
                           <a:spcPct val="100000"/>
                         </a:lnSpc>
                         <a:spcBef>
-                          <a:spcPts val="300"/>
+                          <a:spcPts val="200"/>
                         </a:spcBef>
                         <a:spcAft>
-                          <a:spcPts val="300"/>
+                          <a:spcPts val="200"/>
                         </a:spcAft>
                         <a:buNone/>
                       </a:pPr>
                       <a:r>
                         <a:rPr sz="1100">
                           <a:solidFill>
-                            <a:srgbClr val="000000">
+                            <a:srgbClr val="111111">
                               <a:alpha val="100000"/>
                             </a:srgbClr>
                           </a:solidFill>
@@ -12683,22 +12683,22 @@
                     <a:bodyPr/>
                     <a:lstStyle/>
                     <a:p>
-                      <a:pPr algn="l" marL="38100" marR="38100">
+                      <a:pPr algn="l" marL="63500" marR="63500">
                         <a:lnSpc>
                           <a:spcPct val="100000"/>
                         </a:lnSpc>
                         <a:spcBef>
-                          <a:spcPts val="300"/>
+                          <a:spcPts val="200"/>
                         </a:spcBef>
                         <a:spcAft>
-                          <a:spcPts val="300"/>
+                          <a:spcPts val="200"/>
                         </a:spcAft>
                         <a:buNone/>
                       </a:pPr>
                       <a:r>
                         <a:rPr sz="1100">
                           <a:solidFill>
-                            <a:srgbClr val="000000">
+                            <a:srgbClr val="111111">
                               <a:alpha val="100000"/>
                             </a:srgbClr>
                           </a:solidFill>
@@ -12749,22 +12749,22 @@
                     <a:bodyPr/>
                     <a:lstStyle/>
                     <a:p>
-                      <a:pPr algn="l" marL="38100" marR="38100">
+                      <a:pPr algn="l" marL="63500" marR="63500">
                         <a:lnSpc>
                           <a:spcPct val="100000"/>
                         </a:lnSpc>
                         <a:spcBef>
-                          <a:spcPts val="300"/>
+                          <a:spcPts val="200"/>
                         </a:spcBef>
                         <a:spcAft>
-                          <a:spcPts val="300"/>
+                          <a:spcPts val="200"/>
                         </a:spcAft>
                         <a:buNone/>
                       </a:pPr>
                       <a:r>
                         <a:rPr sz="1100">
                           <a:solidFill>
-                            <a:srgbClr val="000000">
+                            <a:srgbClr val="111111">
                               <a:alpha val="100000"/>
                             </a:srgbClr>
                           </a:solidFill>
@@ -12817,22 +12817,22 @@
                     <a:bodyPr/>
                     <a:lstStyle/>
                     <a:p>
-                      <a:pPr algn="l" marL="38100" marR="38100">
+                      <a:pPr algn="l" marL="63500" marR="63500">
                         <a:lnSpc>
                           <a:spcPct val="100000"/>
                         </a:lnSpc>
                         <a:spcBef>
-                          <a:spcPts val="300"/>
+                          <a:spcPts val="200"/>
                         </a:spcBef>
                         <a:spcAft>
-                          <a:spcPts val="300"/>
+                          <a:spcPts val="200"/>
                         </a:spcAft>
                         <a:buNone/>
                       </a:pPr>
                       <a:r>
                         <a:rPr sz="1100">
                           <a:solidFill>
-                            <a:srgbClr val="000000">
+                            <a:srgbClr val="111111">
                               <a:alpha val="100000"/>
                             </a:srgbClr>
                           </a:solidFill>
@@ -12883,22 +12883,22 @@
                     <a:bodyPr/>
                     <a:lstStyle/>
                     <a:p>
-                      <a:pPr algn="l" marL="38100" marR="38100">
+                      <a:pPr algn="l" marL="63500" marR="63500">
                         <a:lnSpc>
                           <a:spcPct val="100000"/>
                         </a:lnSpc>
                         <a:spcBef>
-                          <a:spcPts val="300"/>
+                          <a:spcPts val="200"/>
                         </a:spcBef>
                         <a:spcAft>
-                          <a:spcPts val="300"/>
+                          <a:spcPts val="200"/>
                         </a:spcAft>
                         <a:buNone/>
                       </a:pPr>
                       <a:r>
                         <a:rPr sz="1100">
                           <a:solidFill>
-                            <a:srgbClr val="000000">
+                            <a:srgbClr val="111111">
                               <a:alpha val="100000"/>
                             </a:srgbClr>
                           </a:solidFill>
@@ -12949,22 +12949,22 @@
                     <a:bodyPr/>
                     <a:lstStyle/>
                     <a:p>
-                      <a:pPr algn="l" marL="38100" marR="38100">
+                      <a:pPr algn="l" marL="63500" marR="63500">
                         <a:lnSpc>
                           <a:spcPct val="100000"/>
                         </a:lnSpc>
                         <a:spcBef>
-                          <a:spcPts val="300"/>
+                          <a:spcPts val="200"/>
                         </a:spcBef>
                         <a:spcAft>
-                          <a:spcPts val="300"/>
+                          <a:spcPts val="200"/>
                         </a:spcAft>
                         <a:buNone/>
                       </a:pPr>
                       <a:r>
                         <a:rPr sz="1100">
                           <a:solidFill>
-                            <a:srgbClr val="000000">
+                            <a:srgbClr val="111111">
                               <a:alpha val="100000"/>
                             </a:srgbClr>
                           </a:solidFill>
@@ -13015,22 +13015,22 @@
                     <a:bodyPr/>
                     <a:lstStyle/>
                     <a:p>
-                      <a:pPr algn="l" marL="38100" marR="38100">
+                      <a:pPr algn="l" marL="63500" marR="63500">
                         <a:lnSpc>
                           <a:spcPct val="100000"/>
                         </a:lnSpc>
                         <a:spcBef>
-                          <a:spcPts val="300"/>
+                          <a:spcPts val="200"/>
                         </a:spcBef>
                         <a:spcAft>
-                          <a:spcPts val="300"/>
+                          <a:spcPts val="200"/>
                         </a:spcAft>
                         <a:buNone/>
                       </a:pPr>
                       <a:r>
                         <a:rPr sz="1100">
                           <a:solidFill>
-                            <a:srgbClr val="000000">
+                            <a:srgbClr val="111111">
                               <a:alpha val="100000"/>
                             </a:srgbClr>
                           </a:solidFill>
@@ -13081,22 +13081,22 @@
                     <a:bodyPr/>
                     <a:lstStyle/>
                     <a:p>
-                      <a:pPr algn="l" marL="38100" marR="38100">
+                      <a:pPr algn="l" marL="63500" marR="63500">
                         <a:lnSpc>
                           <a:spcPct val="100000"/>
                         </a:lnSpc>
                         <a:spcBef>
-                          <a:spcPts val="300"/>
+                          <a:spcPts val="200"/>
                         </a:spcBef>
                         <a:spcAft>
-                          <a:spcPts val="300"/>
+                          <a:spcPts val="200"/>
                         </a:spcAft>
                         <a:buNone/>
                       </a:pPr>
                       <a:r>
                         <a:rPr sz="1100">
                           <a:solidFill>
-                            <a:srgbClr val="000000">
+                            <a:srgbClr val="111111">
                               <a:alpha val="100000"/>
                             </a:srgbClr>
                           </a:solidFill>
@@ -13149,22 +13149,22 @@
                     <a:bodyPr/>
                     <a:lstStyle/>
                     <a:p>
-                      <a:pPr algn="l" marL="38100" marR="38100">
+                      <a:pPr algn="l" marL="63500" marR="63500">
                         <a:lnSpc>
                           <a:spcPct val="100000"/>
                         </a:lnSpc>
                         <a:spcBef>
-                          <a:spcPts val="300"/>
+                          <a:spcPts val="200"/>
                         </a:spcBef>
                         <a:spcAft>
-                          <a:spcPts val="300"/>
+                          <a:spcPts val="200"/>
                         </a:spcAft>
                         <a:buNone/>
                       </a:pPr>
                       <a:r>
                         <a:rPr sz="1100">
                           <a:solidFill>
-                            <a:srgbClr val="000000">
+                            <a:srgbClr val="111111">
                               <a:alpha val="100000"/>
                             </a:srgbClr>
                           </a:solidFill>
@@ -13215,22 +13215,22 @@
                     <a:bodyPr/>
                     <a:lstStyle/>
                     <a:p>
-                      <a:pPr algn="l" marL="38100" marR="38100">
+                      <a:pPr algn="l" marL="63500" marR="63500">
                         <a:lnSpc>
                           <a:spcPct val="100000"/>
                         </a:lnSpc>
                         <a:spcBef>
-                          <a:spcPts val="300"/>
+                          <a:spcPts val="200"/>
                         </a:spcBef>
                         <a:spcAft>
-                          <a:spcPts val="300"/>
+                          <a:spcPts val="200"/>
                         </a:spcAft>
                         <a:buNone/>
                       </a:pPr>
                       <a:r>
                         <a:rPr sz="1100">
                           <a:solidFill>
-                            <a:srgbClr val="000000">
+                            <a:srgbClr val="111111">
                               <a:alpha val="100000"/>
                             </a:srgbClr>
                           </a:solidFill>
@@ -13281,22 +13281,22 @@
                     <a:bodyPr/>
                     <a:lstStyle/>
                     <a:p>
-                      <a:pPr algn="l" marL="38100" marR="38100">
+                      <a:pPr algn="l" marL="63500" marR="63500">
                         <a:lnSpc>
                           <a:spcPct val="100000"/>
                         </a:lnSpc>
                         <a:spcBef>
-                          <a:spcPts val="300"/>
+                          <a:spcPts val="200"/>
                         </a:spcBef>
                         <a:spcAft>
-                          <a:spcPts val="300"/>
+                          <a:spcPts val="200"/>
                         </a:spcAft>
                         <a:buNone/>
                       </a:pPr>
                       <a:r>
                         <a:rPr sz="1100">
                           <a:solidFill>
-                            <a:srgbClr val="000000">
+                            <a:srgbClr val="111111">
                               <a:alpha val="100000"/>
                             </a:srgbClr>
                           </a:solidFill>
@@ -13347,22 +13347,22 @@
                     <a:bodyPr/>
                     <a:lstStyle/>
                     <a:p>
-                      <a:pPr algn="l" marL="38100" marR="38100">
+                      <a:pPr algn="l" marL="63500" marR="63500">
                         <a:lnSpc>
                           <a:spcPct val="100000"/>
                         </a:lnSpc>
                         <a:spcBef>
-                          <a:spcPts val="300"/>
+                          <a:spcPts val="200"/>
                         </a:spcBef>
                         <a:spcAft>
-                          <a:spcPts val="300"/>
+                          <a:spcPts val="200"/>
                         </a:spcAft>
                         <a:buNone/>
                       </a:pPr>
                       <a:r>
                         <a:rPr sz="1100">
                           <a:solidFill>
-                            <a:srgbClr val="000000">
+                            <a:srgbClr val="111111">
                               <a:alpha val="100000"/>
                             </a:srgbClr>
                           </a:solidFill>
@@ -13413,22 +13413,22 @@
                     <a:bodyPr/>
                     <a:lstStyle/>
                     <a:p>
-                      <a:pPr algn="l" marL="38100" marR="38100">
+                      <a:pPr algn="l" marL="63500" marR="63500">
                         <a:lnSpc>
                           <a:spcPct val="100000"/>
                         </a:lnSpc>
                         <a:spcBef>
-                          <a:spcPts val="300"/>
+                          <a:spcPts val="200"/>
                         </a:spcBef>
                         <a:spcAft>
-                          <a:spcPts val="300"/>
+                          <a:spcPts val="200"/>
                         </a:spcAft>
                         <a:buNone/>
                       </a:pPr>
                       <a:r>
                         <a:rPr sz="1100">
                           <a:solidFill>
-                            <a:srgbClr val="000000">
+                            <a:srgbClr val="111111">
                               <a:alpha val="100000"/>
                             </a:srgbClr>
                           </a:solidFill>
@@ -13481,22 +13481,22 @@
                     <a:bodyPr/>
                     <a:lstStyle/>
                     <a:p>
-                      <a:pPr algn="l" marL="38100" marR="38100">
+                      <a:pPr algn="l" marL="63500" marR="63500">
                         <a:lnSpc>
                           <a:spcPct val="100000"/>
                         </a:lnSpc>
                         <a:spcBef>
-                          <a:spcPts val="300"/>
+                          <a:spcPts val="200"/>
                         </a:spcBef>
                         <a:spcAft>
-                          <a:spcPts val="300"/>
+                          <a:spcPts val="200"/>
                         </a:spcAft>
                         <a:buNone/>
                       </a:pPr>
                       <a:r>
                         <a:rPr sz="1100">
                           <a:solidFill>
-                            <a:srgbClr val="000000">
+                            <a:srgbClr val="111111">
                               <a:alpha val="100000"/>
                             </a:srgbClr>
                           </a:solidFill>
@@ -13547,22 +13547,22 @@
                     <a:bodyPr/>
                     <a:lstStyle/>
                     <a:p>
-                      <a:pPr algn="l" marL="38100" marR="38100">
+                      <a:pPr algn="l" marL="63500" marR="63500">
                         <a:lnSpc>
                           <a:spcPct val="100000"/>
                         </a:lnSpc>
                         <a:spcBef>
-                          <a:spcPts val="300"/>
+                          <a:spcPts val="200"/>
                         </a:spcBef>
                         <a:spcAft>
-                          <a:spcPts val="300"/>
+                          <a:spcPts val="200"/>
                         </a:spcAft>
                         <a:buNone/>
                       </a:pPr>
                       <a:r>
                         <a:rPr sz="1100">
                           <a:solidFill>
-                            <a:srgbClr val="000000">
+                            <a:srgbClr val="111111">
                               <a:alpha val="100000"/>
                             </a:srgbClr>
                           </a:solidFill>
@@ -13613,22 +13613,22 @@
                     <a:bodyPr/>
                     <a:lstStyle/>
                     <a:p>
-                      <a:pPr algn="l" marL="38100" marR="38100">
+                      <a:pPr algn="l" marL="63500" marR="63500">
                         <a:lnSpc>
                           <a:spcPct val="100000"/>
                         </a:lnSpc>
                         <a:spcBef>
-                          <a:spcPts val="300"/>
+                          <a:spcPts val="200"/>
                         </a:spcBef>
                         <a:spcAft>
-                          <a:spcPts val="300"/>
+                          <a:spcPts val="200"/>
                         </a:spcAft>
                         <a:buNone/>
                       </a:pPr>
                       <a:r>
                         <a:rPr sz="1100">
                           <a:solidFill>
-                            <a:srgbClr val="000000">
+                            <a:srgbClr val="111111">
                               <a:alpha val="100000"/>
                             </a:srgbClr>
                           </a:solidFill>
@@ -13679,22 +13679,22 @@
                     <a:bodyPr/>
                     <a:lstStyle/>
                     <a:p>
-                      <a:pPr algn="l" marL="38100" marR="38100">
+                      <a:pPr algn="l" marL="63500" marR="63500">
                         <a:lnSpc>
                           <a:spcPct val="100000"/>
                         </a:lnSpc>
                         <a:spcBef>
-                          <a:spcPts val="300"/>
+                          <a:spcPts val="200"/>
                         </a:spcBef>
                         <a:spcAft>
-                          <a:spcPts val="300"/>
+                          <a:spcPts val="200"/>
                         </a:spcAft>
                         <a:buNone/>
                       </a:pPr>
                       <a:r>
                         <a:rPr sz="1100">
                           <a:solidFill>
-                            <a:srgbClr val="000000">
+                            <a:srgbClr val="111111">
                               <a:alpha val="100000"/>
                             </a:srgbClr>
                           </a:solidFill>
@@ -13745,22 +13745,22 @@
                     <a:bodyPr/>
                     <a:lstStyle/>
                     <a:p>
-                      <a:pPr algn="l" marL="38100" marR="38100">
+                      <a:pPr algn="l" marL="63500" marR="63500">
                         <a:lnSpc>
                           <a:spcPct val="100000"/>
                         </a:lnSpc>
                         <a:spcBef>
-                          <a:spcPts val="300"/>
+                          <a:spcPts val="200"/>
                         </a:spcBef>
                         <a:spcAft>
-                          <a:spcPts val="300"/>
+                          <a:spcPts val="200"/>
                         </a:spcAft>
                         <a:buNone/>
                       </a:pPr>
                       <a:r>
                         <a:rPr sz="1100">
                           <a:solidFill>
-                            <a:srgbClr val="000000">
+                            <a:srgbClr val="111111">
                               <a:alpha val="100000"/>
                             </a:srgbClr>
                           </a:solidFill>
@@ -13813,22 +13813,22 @@
                     <a:bodyPr/>
                     <a:lstStyle/>
                     <a:p>
-                      <a:pPr algn="l" marL="38100" marR="38100">
+                      <a:pPr algn="l" marL="63500" marR="63500">
                         <a:lnSpc>
                           <a:spcPct val="100000"/>
                         </a:lnSpc>
                         <a:spcBef>
-                          <a:spcPts val="300"/>
+                          <a:spcPts val="200"/>
                         </a:spcBef>
                         <a:spcAft>
-                          <a:spcPts val="300"/>
+                          <a:spcPts val="200"/>
                         </a:spcAft>
                         <a:buNone/>
                       </a:pPr>
                       <a:r>
                         <a:rPr sz="1100">
                           <a:solidFill>
-                            <a:srgbClr val="000000">
+                            <a:srgbClr val="111111">
                               <a:alpha val="100000"/>
                             </a:srgbClr>
                           </a:solidFill>
@@ -13879,22 +13879,22 @@
                     <a:bodyPr/>
                     <a:lstStyle/>
                     <a:p>
-                      <a:pPr algn="l" marL="38100" marR="38100">
+                      <a:pPr algn="l" marL="63500" marR="63500">
                         <a:lnSpc>
                           <a:spcPct val="100000"/>
                         </a:lnSpc>
                         <a:spcBef>
-                          <a:spcPts val="300"/>
+                          <a:spcPts val="200"/>
                         </a:spcBef>
                         <a:spcAft>
-                          <a:spcPts val="300"/>
+                          <a:spcPts val="200"/>
                         </a:spcAft>
                         <a:buNone/>
                       </a:pPr>
                       <a:r>
                         <a:rPr sz="1100">
                           <a:solidFill>
-                            <a:srgbClr val="000000">
+                            <a:srgbClr val="111111">
                               <a:alpha val="100000"/>
                             </a:srgbClr>
                           </a:solidFill>
@@ -13945,22 +13945,22 @@
                     <a:bodyPr/>
                     <a:lstStyle/>
                     <a:p>
-                      <a:pPr algn="l" marL="38100" marR="38100">
+                      <a:pPr algn="l" marL="63500" marR="63500">
                         <a:lnSpc>
                           <a:spcPct val="100000"/>
                         </a:lnSpc>
                         <a:spcBef>
-                          <a:spcPts val="300"/>
+                          <a:spcPts val="200"/>
                         </a:spcBef>
                         <a:spcAft>
-                          <a:spcPts val="300"/>
+                          <a:spcPts val="200"/>
                         </a:spcAft>
                         <a:buNone/>
                       </a:pPr>
                       <a:r>
                         <a:rPr sz="1100">
                           <a:solidFill>
-                            <a:srgbClr val="000000">
+                            <a:srgbClr val="111111">
                               <a:alpha val="100000"/>
                             </a:srgbClr>
                           </a:solidFill>
@@ -14011,22 +14011,22 @@
                     <a:bodyPr/>
                     <a:lstStyle/>
                     <a:p>
-                      <a:pPr algn="l" marL="38100" marR="38100">
+                      <a:pPr algn="l" marL="63500" marR="63500">
                         <a:lnSpc>
                           <a:spcPct val="100000"/>
                         </a:lnSpc>
                         <a:spcBef>
-                          <a:spcPts val="300"/>
+                          <a:spcPts val="200"/>
                         </a:spcBef>
                         <a:spcAft>
-                          <a:spcPts val="300"/>
+                          <a:spcPts val="200"/>
                         </a:spcAft>
                         <a:buNone/>
                       </a:pPr>
                       <a:r>
                         <a:rPr sz="1100">
                           <a:solidFill>
-                            <a:srgbClr val="000000">
+                            <a:srgbClr val="111111">
                               <a:alpha val="100000"/>
                             </a:srgbClr>
                           </a:solidFill>
@@ -14077,22 +14077,22 @@
                     <a:bodyPr/>
                     <a:lstStyle/>
                     <a:p>
-                      <a:pPr algn="l" marL="38100" marR="38100">
+                      <a:pPr algn="l" marL="63500" marR="63500">
                         <a:lnSpc>
                           <a:spcPct val="100000"/>
                         </a:lnSpc>
                         <a:spcBef>
-                          <a:spcPts val="300"/>
+                          <a:spcPts val="200"/>
                         </a:spcBef>
                         <a:spcAft>
-                          <a:spcPts val="300"/>
+                          <a:spcPts val="200"/>
                         </a:spcAft>
                         <a:buNone/>
                       </a:pPr>
                       <a:r>
                         <a:rPr sz="1100">
                           <a:solidFill>
-                            <a:srgbClr val="000000">
+                            <a:srgbClr val="111111">
                               <a:alpha val="100000"/>
                             </a:srgbClr>
                           </a:solidFill>
@@ -14145,22 +14145,22 @@
                     <a:bodyPr/>
                     <a:lstStyle/>
                     <a:p>
-                      <a:pPr algn="l" marL="38100" marR="38100">
+                      <a:pPr algn="l" marL="63500" marR="63500">
                         <a:lnSpc>
                           <a:spcPct val="100000"/>
                         </a:lnSpc>
                         <a:spcBef>
-                          <a:spcPts val="300"/>
+                          <a:spcPts val="200"/>
                         </a:spcBef>
                         <a:spcAft>
-                          <a:spcPts val="300"/>
+                          <a:spcPts val="200"/>
                         </a:spcAft>
                         <a:buNone/>
                       </a:pPr>
                       <a:r>
                         <a:rPr sz="1100">
                           <a:solidFill>
-                            <a:srgbClr val="000000">
+                            <a:srgbClr val="111111">
                               <a:alpha val="100000"/>
                             </a:srgbClr>
                           </a:solidFill>
@@ -14211,22 +14211,22 @@
                     <a:bodyPr/>
                     <a:lstStyle/>
                     <a:p>
-                      <a:pPr algn="l" marL="38100" marR="38100">
+                      <a:pPr algn="l" marL="63500" marR="63500">
                         <a:lnSpc>
                           <a:spcPct val="100000"/>
                         </a:lnSpc>
                         <a:spcBef>
-                          <a:spcPts val="300"/>
+                          <a:spcPts val="200"/>
                         </a:spcBef>
                         <a:spcAft>
-                          <a:spcPts val="300"/>
+                          <a:spcPts val="200"/>
                         </a:spcAft>
                         <a:buNone/>
                       </a:pPr>
                       <a:r>
                         <a:rPr sz="1100">
                           <a:solidFill>
-                            <a:srgbClr val="000000">
+                            <a:srgbClr val="111111">
                               <a:alpha val="100000"/>
                             </a:srgbClr>
                           </a:solidFill>
@@ -14277,22 +14277,22 @@
                     <a:bodyPr/>
                     <a:lstStyle/>
                     <a:p>
-                      <a:pPr algn="l" marL="38100" marR="38100">
+                      <a:pPr algn="l" marL="63500" marR="63500">
                         <a:lnSpc>
                           <a:spcPct val="100000"/>
                         </a:lnSpc>
                         <a:spcBef>
-                          <a:spcPts val="300"/>
+                          <a:spcPts val="200"/>
                         </a:spcBef>
                         <a:spcAft>
-                          <a:spcPts val="300"/>
+                          <a:spcPts val="200"/>
                         </a:spcAft>
                         <a:buNone/>
                       </a:pPr>
                       <a:r>
                         <a:rPr sz="1100">
                           <a:solidFill>
-                            <a:srgbClr val="000000">
+                            <a:srgbClr val="111111">
                               <a:alpha val="100000"/>
                             </a:srgbClr>
                           </a:solidFill>
@@ -14343,22 +14343,22 @@
                     <a:bodyPr/>
                     <a:lstStyle/>
                     <a:p>
-                      <a:pPr algn="l" marL="38100" marR="38100">
+                      <a:pPr algn="l" marL="63500" marR="63500">
                         <a:lnSpc>
                           <a:spcPct val="100000"/>
                         </a:lnSpc>
                         <a:spcBef>
-                          <a:spcPts val="300"/>
+                          <a:spcPts val="200"/>
                         </a:spcBef>
                         <a:spcAft>
-                          <a:spcPts val="300"/>
+                          <a:spcPts val="200"/>
                         </a:spcAft>
                         <a:buNone/>
                       </a:pPr>
                       <a:r>
                         <a:rPr sz="1100">
                           <a:solidFill>
-                            <a:srgbClr val="000000">
+                            <a:srgbClr val="111111">
                               <a:alpha val="100000"/>
                             </a:srgbClr>
                           </a:solidFill>
@@ -14409,22 +14409,22 @@
                     <a:bodyPr/>
                     <a:lstStyle/>
                     <a:p>
-                      <a:pPr algn="l" marL="38100" marR="38100">
+                      <a:pPr algn="l" marL="63500" marR="63500">
                         <a:lnSpc>
                           <a:spcPct val="100000"/>
                         </a:lnSpc>
                         <a:spcBef>
-                          <a:spcPts val="300"/>
+                          <a:spcPts val="200"/>
                         </a:spcBef>
                         <a:spcAft>
-                          <a:spcPts val="300"/>
+                          <a:spcPts val="200"/>
                         </a:spcAft>
                         <a:buNone/>
                       </a:pPr>
                       <a:r>
                         <a:rPr sz="1100">
                           <a:solidFill>
-                            <a:srgbClr val="000000">
+                            <a:srgbClr val="111111">
                               <a:alpha val="100000"/>
                             </a:srgbClr>
                           </a:solidFill>
@@ -14502,7 +14502,7 @@
       </p:grpSpPr>
       <p:pic xmlns:a="http://schemas.openxmlformats.org/drawingml/2006/main" xmlns:r="http://schemas.openxmlformats.org/officeDocument/2006/relationships" xmlns:p="http://schemas.openxmlformats.org/presentationml/2006/main">
         <p:nvPicPr>
-          <p:cNvPr id="2" name="Picture Placeholder 8" descr=""/>
+          <p:cNvPr id="2" name="Picture Placeholder 8"/>
           <p:cNvPicPr>
             <a:picLocks noGrp="1"/>
           </p:cNvPicPr>
@@ -14548,7 +14548,7 @@
           <a:p>
             <a:r>
               <a:rPr/>
-              <a:t>Pack date: 17 February 2021</a:t>
+              <a:t>Pack date: 18 February 2021</a:t>
             </a:r>
           </a:p>
         </p:txBody>
@@ -14744,27 +14744,27 @@
                     <a:bodyPr/>
                     <a:lstStyle/>
                     <a:p>
-                      <a:pPr algn="l" marL="38100" marR="38100">
+                      <a:pPr algn="l" marL="63500" marR="63500">
                         <a:lnSpc>
                           <a:spcPct val="100000"/>
                         </a:lnSpc>
                         <a:spcBef>
-                          <a:spcPts val="300"/>
+                          <a:spcPts val="200"/>
                         </a:spcBef>
                         <a:spcAft>
-                          <a:spcPts val="300"/>
+                          <a:spcPts val="200"/>
                         </a:spcAft>
                         <a:buNone/>
                       </a:pPr>
                       <a:r>
                         <a:rPr sz="1000" b="1">
                           <a:solidFill>
-                            <a:srgbClr val="000000">
+                            <a:srgbClr val="111111">
                               <a:alpha val="100000"/>
                             </a:srgbClr>
                           </a:solidFill>
-                          <a:latin typeface="Helvetica"/>
-                          <a:cs typeface="Helvetica"/>
+                          <a:latin typeface="Roboto"/>
+                          <a:cs typeface="Roboto"/>
                         </a:rPr>
                         <a:t>Name</a:t>
                       </a:r>
@@ -14810,27 +14810,27 @@
                     <a:bodyPr/>
                     <a:lstStyle/>
                     <a:p>
-                      <a:pPr algn="l" marL="38100" marR="38100">
+                      <a:pPr algn="l" marL="63500" marR="63500">
                         <a:lnSpc>
                           <a:spcPct val="100000"/>
                         </a:lnSpc>
                         <a:spcBef>
-                          <a:spcPts val="300"/>
+                          <a:spcPts val="200"/>
                         </a:spcBef>
                         <a:spcAft>
-                          <a:spcPts val="300"/>
+                          <a:spcPts val="200"/>
                         </a:spcAft>
                         <a:buNone/>
                       </a:pPr>
                       <a:r>
                         <a:rPr sz="1000" b="1">
                           <a:solidFill>
-                            <a:srgbClr val="000000">
+                            <a:srgbClr val="111111">
                               <a:alpha val="100000"/>
                             </a:srgbClr>
                           </a:solidFill>
-                          <a:latin typeface="Helvetica"/>
-                          <a:cs typeface="Helvetica"/>
+                          <a:latin typeface="Roboto"/>
+                          <a:cs typeface="Roboto"/>
                         </a:rPr>
                         <a:t>Rolling 7-day new cases</a:t>
                       </a:r>
@@ -14876,27 +14876,27 @@
                     <a:bodyPr/>
                     <a:lstStyle/>
                     <a:p>
-                      <a:pPr algn="l" marL="38100" marR="38100">
+                      <a:pPr algn="l" marL="63500" marR="63500">
                         <a:lnSpc>
                           <a:spcPct val="100000"/>
                         </a:lnSpc>
                         <a:spcBef>
-                          <a:spcPts val="300"/>
+                          <a:spcPts val="200"/>
                         </a:spcBef>
                         <a:spcAft>
-                          <a:spcPts val="300"/>
+                          <a:spcPts val="200"/>
                         </a:spcAft>
                         <a:buNone/>
                       </a:pPr>
                       <a:r>
                         <a:rPr sz="1000" b="1">
                           <a:solidFill>
-                            <a:srgbClr val="000000">
+                            <a:srgbClr val="111111">
                               <a:alpha val="100000"/>
                             </a:srgbClr>
                           </a:solidFill>
-                          <a:latin typeface="Helvetica"/>
-                          <a:cs typeface="Helvetica"/>
+                          <a:latin typeface="Roboto"/>
+                          <a:cs typeface="Roboto"/>
                         </a:rPr>
                         <a:t>Rolling 7-day case rate per 100,000</a:t>
                       </a:r>
@@ -14942,27 +14942,27 @@
                     <a:bodyPr/>
                     <a:lstStyle/>
                     <a:p>
-                      <a:pPr algn="l" marL="38100" marR="38100">
+                      <a:pPr algn="l" marL="63500" marR="63500">
                         <a:lnSpc>
                           <a:spcPct val="100000"/>
                         </a:lnSpc>
                         <a:spcBef>
-                          <a:spcPts val="300"/>
+                          <a:spcPts val="200"/>
                         </a:spcBef>
                         <a:spcAft>
-                          <a:spcPts val="300"/>
+                          <a:spcPts val="200"/>
                         </a:spcAft>
                         <a:buNone/>
                       </a:pPr>
                       <a:r>
                         <a:rPr sz="1000" b="1">
                           <a:solidFill>
-                            <a:srgbClr val="000000">
+                            <a:srgbClr val="111111">
                               <a:alpha val="100000"/>
                             </a:srgbClr>
                           </a:solidFill>
-                          <a:latin typeface="Helvetica"/>
-                          <a:cs typeface="Helvetica"/>
+                          <a:latin typeface="Roboto"/>
+                          <a:cs typeface="Roboto"/>
                         </a:rPr>
                         <a:t>Local Authority Rank (out of 315) where 1 = Highest Rolling 7-day rate per 100,000</a:t>
                       </a:r>
@@ -15008,27 +15008,27 @@
                     <a:bodyPr/>
                     <a:lstStyle/>
                     <a:p>
-                      <a:pPr algn="l" marL="38100" marR="38100">
+                      <a:pPr algn="l" marL="63500" marR="63500">
                         <a:lnSpc>
                           <a:spcPct val="100000"/>
                         </a:lnSpc>
                         <a:spcBef>
-                          <a:spcPts val="300"/>
+                          <a:spcPts val="200"/>
                         </a:spcBef>
                         <a:spcAft>
-                          <a:spcPts val="300"/>
+                          <a:spcPts val="200"/>
                         </a:spcAft>
                         <a:buNone/>
                       </a:pPr>
                       <a:r>
                         <a:rPr sz="1000" b="1">
                           <a:solidFill>
-                            <a:srgbClr val="000000">
+                            <a:srgbClr val="111111">
                               <a:alpha val="100000"/>
                             </a:srgbClr>
                           </a:solidFill>
-                          <a:latin typeface="Helvetica"/>
-                          <a:cs typeface="Helvetica"/>
+                          <a:latin typeface="Roboto"/>
+                          <a:cs typeface="Roboto"/>
                         </a:rPr>
                         <a:t>Decile of rolling rate per 100,000</a:t>
                       </a:r>
@@ -15076,22 +15076,22 @@
                     <a:bodyPr/>
                     <a:lstStyle/>
                     <a:p>
-                      <a:pPr algn="l" marL="38100" marR="38100">
+                      <a:pPr algn="l" marL="63500" marR="63500">
                         <a:lnSpc>
                           <a:spcPct val="100000"/>
                         </a:lnSpc>
                         <a:spcBef>
-                          <a:spcPts val="300"/>
+                          <a:spcPts val="200"/>
                         </a:spcBef>
                         <a:spcAft>
-                          <a:spcPts val="300"/>
+                          <a:spcPts val="200"/>
                         </a:spcAft>
                         <a:buNone/>
                       </a:pPr>
                       <a:r>
                         <a:rPr sz="1100">
                           <a:solidFill>
-                            <a:srgbClr val="000000">
+                            <a:srgbClr val="111111">
                               <a:alpha val="100000"/>
                             </a:srgbClr>
                           </a:solidFill>
@@ -15142,22 +15142,22 @@
                     <a:bodyPr/>
                     <a:lstStyle/>
                     <a:p>
-                      <a:pPr algn="l" marL="38100" marR="38100">
+                      <a:pPr algn="l" marL="63500" marR="63500">
                         <a:lnSpc>
                           <a:spcPct val="100000"/>
                         </a:lnSpc>
                         <a:spcBef>
-                          <a:spcPts val="300"/>
+                          <a:spcPts val="200"/>
                         </a:spcBef>
                         <a:spcAft>
-                          <a:spcPts val="300"/>
+                          <a:spcPts val="200"/>
                         </a:spcAft>
                         <a:buNone/>
                       </a:pPr>
                       <a:r>
                         <a:rPr sz="1100">
                           <a:solidFill>
-                            <a:srgbClr val="000000">
+                            <a:srgbClr val="111111">
                               <a:alpha val="100000"/>
                             </a:srgbClr>
                           </a:solidFill>
@@ -15208,22 +15208,22 @@
                     <a:bodyPr/>
                     <a:lstStyle/>
                     <a:p>
-                      <a:pPr algn="l" marL="38100" marR="38100">
+                      <a:pPr algn="l" marL="63500" marR="63500">
                         <a:lnSpc>
                           <a:spcPct val="100000"/>
                         </a:lnSpc>
                         <a:spcBef>
-                          <a:spcPts val="300"/>
+                          <a:spcPts val="200"/>
                         </a:spcBef>
                         <a:spcAft>
-                          <a:spcPts val="300"/>
+                          <a:spcPts val="200"/>
                         </a:spcAft>
                         <a:buNone/>
                       </a:pPr>
                       <a:r>
                         <a:rPr sz="1100">
                           <a:solidFill>
-                            <a:srgbClr val="000000">
+                            <a:srgbClr val="111111">
                               <a:alpha val="100000"/>
                             </a:srgbClr>
                           </a:solidFill>
@@ -15274,22 +15274,22 @@
                     <a:bodyPr/>
                     <a:lstStyle/>
                     <a:p>
-                      <a:pPr algn="l" marL="38100" marR="38100">
+                      <a:pPr algn="l" marL="63500" marR="63500">
                         <a:lnSpc>
                           <a:spcPct val="100000"/>
                         </a:lnSpc>
                         <a:spcBef>
-                          <a:spcPts val="300"/>
+                          <a:spcPts val="200"/>
                         </a:spcBef>
                         <a:spcAft>
-                          <a:spcPts val="300"/>
+                          <a:spcPts val="200"/>
                         </a:spcAft>
                         <a:buNone/>
                       </a:pPr>
                       <a:r>
                         <a:rPr sz="1100">
                           <a:solidFill>
-                            <a:srgbClr val="000000">
+                            <a:srgbClr val="111111">
                               <a:alpha val="100000"/>
                             </a:srgbClr>
                           </a:solidFill>
@@ -15340,22 +15340,22 @@
                     <a:bodyPr/>
                     <a:lstStyle/>
                     <a:p>
-                      <a:pPr algn="l" marL="38100" marR="38100">
+                      <a:pPr algn="l" marL="63500" marR="63500">
                         <a:lnSpc>
                           <a:spcPct val="100000"/>
                         </a:lnSpc>
                         <a:spcBef>
-                          <a:spcPts val="300"/>
+                          <a:spcPts val="200"/>
                         </a:spcBef>
                         <a:spcAft>
-                          <a:spcPts val="300"/>
+                          <a:spcPts val="200"/>
                         </a:spcAft>
                         <a:buNone/>
                       </a:pPr>
                       <a:r>
                         <a:rPr sz="1100">
                           <a:solidFill>
-                            <a:srgbClr val="000000">
+                            <a:srgbClr val="111111">
                               <a:alpha val="100000"/>
                             </a:srgbClr>
                           </a:solidFill>
@@ -15409,22 +15409,22 @@
                     <a:bodyPr/>
                     <a:lstStyle/>
                     <a:p>
-                      <a:pPr algn="l" marL="38100" marR="38100">
+                      <a:pPr algn="l" marL="63500" marR="63500">
                         <a:lnSpc>
                           <a:spcPct val="100000"/>
                         </a:lnSpc>
                         <a:spcBef>
-                          <a:spcPts val="300"/>
+                          <a:spcPts val="200"/>
                         </a:spcBef>
                         <a:spcAft>
-                          <a:spcPts val="300"/>
+                          <a:spcPts val="200"/>
                         </a:spcAft>
                         <a:buNone/>
                       </a:pPr>
                       <a:r>
                         <a:rPr sz="1100">
                           <a:solidFill>
-                            <a:srgbClr val="000000">
+                            <a:srgbClr val="111111">
                               <a:alpha val="100000"/>
                             </a:srgbClr>
                           </a:solidFill>
@@ -15475,22 +15475,22 @@
                     <a:bodyPr/>
                     <a:lstStyle/>
                     <a:p>
-                      <a:pPr algn="l" marL="38100" marR="38100">
+                      <a:pPr algn="l" marL="63500" marR="63500">
                         <a:lnSpc>
                           <a:spcPct val="100000"/>
                         </a:lnSpc>
                         <a:spcBef>
-                          <a:spcPts val="300"/>
+                          <a:spcPts val="200"/>
                         </a:spcBef>
                         <a:spcAft>
-                          <a:spcPts val="300"/>
+                          <a:spcPts val="200"/>
                         </a:spcAft>
                         <a:buNone/>
                       </a:pPr>
                       <a:r>
                         <a:rPr sz="1100">
                           <a:solidFill>
-                            <a:srgbClr val="000000">
+                            <a:srgbClr val="111111">
                               <a:alpha val="100000"/>
                             </a:srgbClr>
                           </a:solidFill>
@@ -15541,22 +15541,22 @@
                     <a:bodyPr/>
                     <a:lstStyle/>
                     <a:p>
-                      <a:pPr algn="l" marL="38100" marR="38100">
+                      <a:pPr algn="l" marL="63500" marR="63500">
                         <a:lnSpc>
                           <a:spcPct val="100000"/>
                         </a:lnSpc>
                         <a:spcBef>
-                          <a:spcPts val="300"/>
+                          <a:spcPts val="200"/>
                         </a:spcBef>
                         <a:spcAft>
-                          <a:spcPts val="300"/>
+                          <a:spcPts val="200"/>
                         </a:spcAft>
                         <a:buNone/>
                       </a:pPr>
                       <a:r>
                         <a:rPr sz="1100">
                           <a:solidFill>
-                            <a:srgbClr val="000000">
+                            <a:srgbClr val="111111">
                               <a:alpha val="100000"/>
                             </a:srgbClr>
                           </a:solidFill>
@@ -15607,22 +15607,22 @@
                     <a:bodyPr/>
                     <a:lstStyle/>
                     <a:p>
-                      <a:pPr algn="l" marL="38100" marR="38100">
+                      <a:pPr algn="l" marL="63500" marR="63500">
                         <a:lnSpc>
                           <a:spcPct val="100000"/>
                         </a:lnSpc>
                         <a:spcBef>
-                          <a:spcPts val="300"/>
+                          <a:spcPts val="200"/>
                         </a:spcBef>
                         <a:spcAft>
-                          <a:spcPts val="300"/>
+                          <a:spcPts val="200"/>
                         </a:spcAft>
                         <a:buNone/>
                       </a:pPr>
                       <a:r>
                         <a:rPr sz="1100">
                           <a:solidFill>
-                            <a:srgbClr val="000000">
+                            <a:srgbClr val="111111">
                               <a:alpha val="100000"/>
                             </a:srgbClr>
                           </a:solidFill>
@@ -15673,22 +15673,22 @@
                     <a:bodyPr/>
                     <a:lstStyle/>
                     <a:p>
-                      <a:pPr algn="l" marL="38100" marR="38100">
+                      <a:pPr algn="l" marL="63500" marR="63500">
                         <a:lnSpc>
                           <a:spcPct val="100000"/>
                         </a:lnSpc>
                         <a:spcBef>
-                          <a:spcPts val="300"/>
+                          <a:spcPts val="200"/>
                         </a:spcBef>
                         <a:spcAft>
-                          <a:spcPts val="300"/>
+                          <a:spcPts val="200"/>
                         </a:spcAft>
                         <a:buNone/>
                       </a:pPr>
                       <a:r>
                         <a:rPr sz="1100">
                           <a:solidFill>
-                            <a:srgbClr val="000000">
+                            <a:srgbClr val="111111">
                               <a:alpha val="100000"/>
                             </a:srgbClr>
                           </a:solidFill>
@@ -15741,22 +15741,22 @@
                     <a:bodyPr/>
                     <a:lstStyle/>
                     <a:p>
-                      <a:pPr algn="l" marL="38100" marR="38100">
+                      <a:pPr algn="l" marL="63500" marR="63500">
                         <a:lnSpc>
                           <a:spcPct val="100000"/>
                         </a:lnSpc>
                         <a:spcBef>
-                          <a:spcPts val="300"/>
+                          <a:spcPts val="200"/>
                         </a:spcBef>
                         <a:spcAft>
-                          <a:spcPts val="300"/>
+                          <a:spcPts val="200"/>
                         </a:spcAft>
                         <a:buNone/>
                       </a:pPr>
                       <a:r>
                         <a:rPr sz="1100">
                           <a:solidFill>
-                            <a:srgbClr val="000000">
+                            <a:srgbClr val="111111">
                               <a:alpha val="100000"/>
                             </a:srgbClr>
                           </a:solidFill>
@@ -15807,22 +15807,22 @@
                     <a:bodyPr/>
                     <a:lstStyle/>
                     <a:p>
-                      <a:pPr algn="l" marL="38100" marR="38100">
+                      <a:pPr algn="l" marL="63500" marR="63500">
                         <a:lnSpc>
                           <a:spcPct val="100000"/>
                         </a:lnSpc>
                         <a:spcBef>
-                          <a:spcPts val="300"/>
+                          <a:spcPts val="200"/>
                         </a:spcBef>
                         <a:spcAft>
-                          <a:spcPts val="300"/>
+                          <a:spcPts val="200"/>
                         </a:spcAft>
                         <a:buNone/>
                       </a:pPr>
                       <a:r>
                         <a:rPr sz="1100">
                           <a:solidFill>
-                            <a:srgbClr val="000000">
+                            <a:srgbClr val="111111">
                               <a:alpha val="100000"/>
                             </a:srgbClr>
                           </a:solidFill>
@@ -15873,22 +15873,22 @@
                     <a:bodyPr/>
                     <a:lstStyle/>
                     <a:p>
-                      <a:pPr algn="l" marL="38100" marR="38100">
+                      <a:pPr algn="l" marL="63500" marR="63500">
                         <a:lnSpc>
                           <a:spcPct val="100000"/>
                         </a:lnSpc>
                         <a:spcBef>
-                          <a:spcPts val="300"/>
+                          <a:spcPts val="200"/>
                         </a:spcBef>
                         <a:spcAft>
-                          <a:spcPts val="300"/>
+                          <a:spcPts val="200"/>
                         </a:spcAft>
                         <a:buNone/>
                       </a:pPr>
                       <a:r>
                         <a:rPr sz="1100">
                           <a:solidFill>
-                            <a:srgbClr val="000000">
+                            <a:srgbClr val="111111">
                               <a:alpha val="100000"/>
                             </a:srgbClr>
                           </a:solidFill>
@@ -15939,22 +15939,22 @@
                     <a:bodyPr/>
                     <a:lstStyle/>
                     <a:p>
-                      <a:pPr algn="l" marL="38100" marR="38100">
+                      <a:pPr algn="l" marL="63500" marR="63500">
                         <a:lnSpc>
                           <a:spcPct val="100000"/>
                         </a:lnSpc>
                         <a:spcBef>
-                          <a:spcPts val="300"/>
+                          <a:spcPts val="200"/>
                         </a:spcBef>
                         <a:spcAft>
-                          <a:spcPts val="300"/>
+                          <a:spcPts val="200"/>
                         </a:spcAft>
                         <a:buNone/>
                       </a:pPr>
                       <a:r>
                         <a:rPr sz="1100">
                           <a:solidFill>
-                            <a:srgbClr val="000000">
+                            <a:srgbClr val="111111">
                               <a:alpha val="100000"/>
                             </a:srgbClr>
                           </a:solidFill>
@@ -16005,22 +16005,22 @@
                     <a:bodyPr/>
                     <a:lstStyle/>
                     <a:p>
-                      <a:pPr algn="l" marL="38100" marR="38100">
+                      <a:pPr algn="l" marL="63500" marR="63500">
                         <a:lnSpc>
                           <a:spcPct val="100000"/>
                         </a:lnSpc>
                         <a:spcBef>
-                          <a:spcPts val="300"/>
+                          <a:spcPts val="200"/>
                         </a:spcBef>
                         <a:spcAft>
-                          <a:spcPts val="300"/>
+                          <a:spcPts val="200"/>
                         </a:spcAft>
                         <a:buNone/>
                       </a:pPr>
                       <a:r>
                         <a:rPr sz="1100">
                           <a:solidFill>
-                            <a:srgbClr val="000000">
+                            <a:srgbClr val="111111">
                               <a:alpha val="100000"/>
                             </a:srgbClr>
                           </a:solidFill>
@@ -16073,22 +16073,22 @@
                     <a:bodyPr/>
                     <a:lstStyle/>
                     <a:p>
-                      <a:pPr algn="l" marL="38100" marR="38100">
+                      <a:pPr algn="l" marL="63500" marR="63500">
                         <a:lnSpc>
                           <a:spcPct val="100000"/>
                         </a:lnSpc>
                         <a:spcBef>
-                          <a:spcPts val="300"/>
+                          <a:spcPts val="200"/>
                         </a:spcBef>
                         <a:spcAft>
-                          <a:spcPts val="300"/>
+                          <a:spcPts val="200"/>
                         </a:spcAft>
                         <a:buNone/>
                       </a:pPr>
                       <a:r>
                         <a:rPr sz="1100">
                           <a:solidFill>
-                            <a:srgbClr val="000000">
+                            <a:srgbClr val="111111">
                               <a:alpha val="100000"/>
                             </a:srgbClr>
                           </a:solidFill>
@@ -16139,22 +16139,22 @@
                     <a:bodyPr/>
                     <a:lstStyle/>
                     <a:p>
-                      <a:pPr algn="l" marL="38100" marR="38100">
+                      <a:pPr algn="l" marL="63500" marR="63500">
                         <a:lnSpc>
                           <a:spcPct val="100000"/>
                         </a:lnSpc>
                         <a:spcBef>
-                          <a:spcPts val="300"/>
+                          <a:spcPts val="200"/>
                         </a:spcBef>
                         <a:spcAft>
-                          <a:spcPts val="300"/>
+                          <a:spcPts val="200"/>
                         </a:spcAft>
                         <a:buNone/>
                       </a:pPr>
                       <a:r>
                         <a:rPr sz="1100">
                           <a:solidFill>
-                            <a:srgbClr val="000000">
+                            <a:srgbClr val="111111">
                               <a:alpha val="100000"/>
                             </a:srgbClr>
                           </a:solidFill>
@@ -16205,22 +16205,22 @@
                     <a:bodyPr/>
                     <a:lstStyle/>
                     <a:p>
-                      <a:pPr algn="l" marL="38100" marR="38100">
+                      <a:pPr algn="l" marL="63500" marR="63500">
                         <a:lnSpc>
                           <a:spcPct val="100000"/>
                         </a:lnSpc>
                         <a:spcBef>
-                          <a:spcPts val="300"/>
+                          <a:spcPts val="200"/>
                         </a:spcBef>
                         <a:spcAft>
-                          <a:spcPts val="300"/>
+                          <a:spcPts val="200"/>
                         </a:spcAft>
                         <a:buNone/>
                       </a:pPr>
                       <a:r>
                         <a:rPr sz="1100">
                           <a:solidFill>
-                            <a:srgbClr val="000000">
+                            <a:srgbClr val="111111">
                               <a:alpha val="100000"/>
                             </a:srgbClr>
                           </a:solidFill>
@@ -16271,22 +16271,22 @@
                     <a:bodyPr/>
                     <a:lstStyle/>
                     <a:p>
-                      <a:pPr algn="l" marL="38100" marR="38100">
+                      <a:pPr algn="l" marL="63500" marR="63500">
                         <a:lnSpc>
                           <a:spcPct val="100000"/>
                         </a:lnSpc>
                         <a:spcBef>
-                          <a:spcPts val="300"/>
+                          <a:spcPts val="200"/>
                         </a:spcBef>
                         <a:spcAft>
-                          <a:spcPts val="300"/>
+                          <a:spcPts val="200"/>
                         </a:spcAft>
                         <a:buNone/>
                       </a:pPr>
                       <a:r>
                         <a:rPr sz="1100">
                           <a:solidFill>
-                            <a:srgbClr val="000000">
+                            <a:srgbClr val="111111">
                               <a:alpha val="100000"/>
                             </a:srgbClr>
                           </a:solidFill>
@@ -16337,22 +16337,22 @@
                     <a:bodyPr/>
                     <a:lstStyle/>
                     <a:p>
-                      <a:pPr algn="l" marL="38100" marR="38100">
+                      <a:pPr algn="l" marL="63500" marR="63500">
                         <a:lnSpc>
                           <a:spcPct val="100000"/>
                         </a:lnSpc>
                         <a:spcBef>
-                          <a:spcPts val="300"/>
+                          <a:spcPts val="200"/>
                         </a:spcBef>
                         <a:spcAft>
-                          <a:spcPts val="300"/>
+                          <a:spcPts val="200"/>
                         </a:spcAft>
                         <a:buNone/>
                       </a:pPr>
                       <a:r>
                         <a:rPr sz="1100">
                           <a:solidFill>
-                            <a:srgbClr val="000000">
+                            <a:srgbClr val="111111">
                               <a:alpha val="100000"/>
                             </a:srgbClr>
                           </a:solidFill>
@@ -16405,22 +16405,22 @@
                     <a:bodyPr/>
                     <a:lstStyle/>
                     <a:p>
-                      <a:pPr algn="l" marL="38100" marR="38100">
+                      <a:pPr algn="l" marL="63500" marR="63500">
                         <a:lnSpc>
                           <a:spcPct val="100000"/>
                         </a:lnSpc>
                         <a:spcBef>
-                          <a:spcPts val="300"/>
+                          <a:spcPts val="200"/>
                         </a:spcBef>
                         <a:spcAft>
-                          <a:spcPts val="300"/>
+                          <a:spcPts val="200"/>
                         </a:spcAft>
                         <a:buNone/>
                       </a:pPr>
                       <a:r>
                         <a:rPr sz="1100">
                           <a:solidFill>
-                            <a:srgbClr val="000000">
+                            <a:srgbClr val="111111">
                               <a:alpha val="100000"/>
                             </a:srgbClr>
                           </a:solidFill>
@@ -16471,22 +16471,22 @@
                     <a:bodyPr/>
                     <a:lstStyle/>
                     <a:p>
-                      <a:pPr algn="l" marL="38100" marR="38100">
+                      <a:pPr algn="l" marL="63500" marR="63500">
                         <a:lnSpc>
                           <a:spcPct val="100000"/>
                         </a:lnSpc>
                         <a:spcBef>
-                          <a:spcPts val="300"/>
+                          <a:spcPts val="200"/>
                         </a:spcBef>
                         <a:spcAft>
-                          <a:spcPts val="300"/>
+                          <a:spcPts val="200"/>
                         </a:spcAft>
                         <a:buNone/>
                       </a:pPr>
                       <a:r>
                         <a:rPr sz="1100">
                           <a:solidFill>
-                            <a:srgbClr val="000000">
+                            <a:srgbClr val="111111">
                               <a:alpha val="100000"/>
                             </a:srgbClr>
                           </a:solidFill>
@@ -16537,22 +16537,22 @@
                     <a:bodyPr/>
                     <a:lstStyle/>
                     <a:p>
-                      <a:pPr algn="l" marL="38100" marR="38100">
+                      <a:pPr algn="l" marL="63500" marR="63500">
                         <a:lnSpc>
                           <a:spcPct val="100000"/>
                         </a:lnSpc>
                         <a:spcBef>
-                          <a:spcPts val="300"/>
+                          <a:spcPts val="200"/>
                         </a:spcBef>
                         <a:spcAft>
-                          <a:spcPts val="300"/>
+                          <a:spcPts val="200"/>
                         </a:spcAft>
                         <a:buNone/>
                       </a:pPr>
                       <a:r>
                         <a:rPr sz="1100">
                           <a:solidFill>
-                            <a:srgbClr val="000000">
+                            <a:srgbClr val="111111">
                               <a:alpha val="100000"/>
                             </a:srgbClr>
                           </a:solidFill>
@@ -16603,22 +16603,22 @@
                     <a:bodyPr/>
                     <a:lstStyle/>
                     <a:p>
-                      <a:pPr algn="l" marL="38100" marR="38100">
+                      <a:pPr algn="l" marL="63500" marR="63500">
                         <a:lnSpc>
                           <a:spcPct val="100000"/>
                         </a:lnSpc>
                         <a:spcBef>
-                          <a:spcPts val="300"/>
+                          <a:spcPts val="200"/>
                         </a:spcBef>
                         <a:spcAft>
-                          <a:spcPts val="300"/>
+                          <a:spcPts val="200"/>
                         </a:spcAft>
                         <a:buNone/>
                       </a:pPr>
                       <a:r>
                         <a:rPr sz="1100">
                           <a:solidFill>
-                            <a:srgbClr val="000000">
+                            <a:srgbClr val="111111">
                               <a:alpha val="100000"/>
                             </a:srgbClr>
                           </a:solidFill>
@@ -16669,22 +16669,22 @@
                     <a:bodyPr/>
                     <a:lstStyle/>
                     <a:p>
-                      <a:pPr algn="l" marL="38100" marR="38100">
+                      <a:pPr algn="l" marL="63500" marR="63500">
                         <a:lnSpc>
                           <a:spcPct val="100000"/>
                         </a:lnSpc>
                         <a:spcBef>
-                          <a:spcPts val="300"/>
+                          <a:spcPts val="200"/>
                         </a:spcBef>
                         <a:spcAft>
-                          <a:spcPts val="300"/>
+                          <a:spcPts val="200"/>
                         </a:spcAft>
                         <a:buNone/>
                       </a:pPr>
                       <a:r>
                         <a:rPr sz="1100">
                           <a:solidFill>
-                            <a:srgbClr val="000000">
+                            <a:srgbClr val="111111">
                               <a:alpha val="100000"/>
                             </a:srgbClr>
                           </a:solidFill>
@@ -16737,22 +16737,22 @@
                     <a:bodyPr/>
                     <a:lstStyle/>
                     <a:p>
-                      <a:pPr algn="l" marL="38100" marR="38100">
+                      <a:pPr algn="l" marL="63500" marR="63500">
                         <a:lnSpc>
                           <a:spcPct val="100000"/>
                         </a:lnSpc>
                         <a:spcBef>
-                          <a:spcPts val="300"/>
+                          <a:spcPts val="200"/>
                         </a:spcBef>
                         <a:spcAft>
-                          <a:spcPts val="300"/>
+                          <a:spcPts val="200"/>
                         </a:spcAft>
                         <a:buNone/>
                       </a:pPr>
                       <a:r>
                         <a:rPr sz="1100">
                           <a:solidFill>
-                            <a:srgbClr val="000000">
+                            <a:srgbClr val="111111">
                               <a:alpha val="100000"/>
                             </a:srgbClr>
                           </a:solidFill>
@@ -16803,22 +16803,22 @@
                     <a:bodyPr/>
                     <a:lstStyle/>
                     <a:p>
-                      <a:pPr algn="l" marL="38100" marR="38100">
+                      <a:pPr algn="l" marL="63500" marR="63500">
                         <a:lnSpc>
                           <a:spcPct val="100000"/>
                         </a:lnSpc>
                         <a:spcBef>
-                          <a:spcPts val="300"/>
+                          <a:spcPts val="200"/>
                         </a:spcBef>
                         <a:spcAft>
-                          <a:spcPts val="300"/>
+                          <a:spcPts val="200"/>
                         </a:spcAft>
                         <a:buNone/>
                       </a:pPr>
                       <a:r>
                         <a:rPr sz="1100">
                           <a:solidFill>
-                            <a:srgbClr val="000000">
+                            <a:srgbClr val="111111">
                               <a:alpha val="100000"/>
                             </a:srgbClr>
                           </a:solidFill>
@@ -16869,22 +16869,22 @@
                     <a:bodyPr/>
                     <a:lstStyle/>
                     <a:p>
-                      <a:pPr algn="l" marL="38100" marR="38100">
+                      <a:pPr algn="l" marL="63500" marR="63500">
                         <a:lnSpc>
                           <a:spcPct val="100000"/>
                         </a:lnSpc>
                         <a:spcBef>
-                          <a:spcPts val="300"/>
+                          <a:spcPts val="200"/>
                         </a:spcBef>
                         <a:spcAft>
-                          <a:spcPts val="300"/>
+                          <a:spcPts val="200"/>
                         </a:spcAft>
                         <a:buNone/>
                       </a:pPr>
                       <a:r>
                         <a:rPr sz="1100">
                           <a:solidFill>
-                            <a:srgbClr val="000000">
+                            <a:srgbClr val="111111">
                               <a:alpha val="100000"/>
                             </a:srgbClr>
                           </a:solidFill>
@@ -16935,22 +16935,22 @@
                     <a:bodyPr/>
                     <a:lstStyle/>
                     <a:p>
-                      <a:pPr algn="l" marL="38100" marR="38100">
+                      <a:pPr algn="l" marL="63500" marR="63500">
                         <a:lnSpc>
                           <a:spcPct val="100000"/>
                         </a:lnSpc>
                         <a:spcBef>
-                          <a:spcPts val="300"/>
+                          <a:spcPts val="200"/>
                         </a:spcBef>
                         <a:spcAft>
-                          <a:spcPts val="300"/>
+                          <a:spcPts val="200"/>
                         </a:spcAft>
                         <a:buNone/>
                       </a:pPr>
                       <a:r>
                         <a:rPr sz="1100">
                           <a:solidFill>
-                            <a:srgbClr val="000000">
+                            <a:srgbClr val="111111">
                               <a:alpha val="100000"/>
                             </a:srgbClr>
                           </a:solidFill>
@@ -17001,22 +17001,22 @@
                     <a:bodyPr/>
                     <a:lstStyle/>
                     <a:p>
-                      <a:pPr algn="l" marL="38100" marR="38100">
+                      <a:pPr algn="l" marL="63500" marR="63500">
                         <a:lnSpc>
                           <a:spcPct val="100000"/>
                         </a:lnSpc>
                         <a:spcBef>
-                          <a:spcPts val="300"/>
+                          <a:spcPts val="200"/>
                         </a:spcBef>
                         <a:spcAft>
-                          <a:spcPts val="300"/>
+                          <a:spcPts val="200"/>
                         </a:spcAft>
                         <a:buNone/>
                       </a:pPr>
                       <a:r>
                         <a:rPr sz="1100">
                           <a:solidFill>
-                            <a:srgbClr val="000000">
+                            <a:srgbClr val="111111">
                               <a:alpha val="100000"/>
                             </a:srgbClr>
                           </a:solidFill>
@@ -17069,22 +17069,22 @@
                     <a:bodyPr/>
                     <a:lstStyle/>
                     <a:p>
-                      <a:pPr algn="l" marL="38100" marR="38100">
+                      <a:pPr algn="l" marL="63500" marR="63500">
                         <a:lnSpc>
                           <a:spcPct val="100000"/>
                         </a:lnSpc>
                         <a:spcBef>
-                          <a:spcPts val="300"/>
+                          <a:spcPts val="200"/>
                         </a:spcBef>
                         <a:spcAft>
-                          <a:spcPts val="300"/>
+                          <a:spcPts val="200"/>
                         </a:spcAft>
                         <a:buNone/>
                       </a:pPr>
                       <a:r>
                         <a:rPr sz="1100">
                           <a:solidFill>
-                            <a:srgbClr val="000000">
+                            <a:srgbClr val="111111">
                               <a:alpha val="100000"/>
                             </a:srgbClr>
                           </a:solidFill>
@@ -17135,22 +17135,22 @@
                     <a:bodyPr/>
                     <a:lstStyle/>
                     <a:p>
-                      <a:pPr algn="l" marL="38100" marR="38100">
+                      <a:pPr algn="l" marL="63500" marR="63500">
                         <a:lnSpc>
                           <a:spcPct val="100000"/>
                         </a:lnSpc>
                         <a:spcBef>
-                          <a:spcPts val="300"/>
+                          <a:spcPts val="200"/>
                         </a:spcBef>
                         <a:spcAft>
-                          <a:spcPts val="300"/>
+                          <a:spcPts val="200"/>
                         </a:spcAft>
                         <a:buNone/>
                       </a:pPr>
                       <a:r>
                         <a:rPr sz="1100">
                           <a:solidFill>
-                            <a:srgbClr val="000000">
+                            <a:srgbClr val="111111">
                               <a:alpha val="100000"/>
                             </a:srgbClr>
                           </a:solidFill>
@@ -17201,22 +17201,22 @@
                     <a:bodyPr/>
                     <a:lstStyle/>
                     <a:p>
-                      <a:pPr algn="l" marL="38100" marR="38100">
+                      <a:pPr algn="l" marL="63500" marR="63500">
                         <a:lnSpc>
                           <a:spcPct val="100000"/>
                         </a:lnSpc>
                         <a:spcBef>
-                          <a:spcPts val="300"/>
+                          <a:spcPts val="200"/>
                         </a:spcBef>
                         <a:spcAft>
-                          <a:spcPts val="300"/>
+                          <a:spcPts val="200"/>
                         </a:spcAft>
                         <a:buNone/>
                       </a:pPr>
                       <a:r>
                         <a:rPr sz="1100">
                           <a:solidFill>
-                            <a:srgbClr val="000000">
+                            <a:srgbClr val="111111">
                               <a:alpha val="100000"/>
                             </a:srgbClr>
                           </a:solidFill>
@@ -17267,22 +17267,22 @@
                     <a:bodyPr/>
                     <a:lstStyle/>
                     <a:p>
-                      <a:pPr algn="l" marL="38100" marR="38100">
+                      <a:pPr algn="l" marL="63500" marR="63500">
                         <a:lnSpc>
                           <a:spcPct val="100000"/>
                         </a:lnSpc>
                         <a:spcBef>
-                          <a:spcPts val="300"/>
+                          <a:spcPts val="200"/>
                         </a:spcBef>
                         <a:spcAft>
-                          <a:spcPts val="300"/>
+                          <a:spcPts val="200"/>
                         </a:spcAft>
                         <a:buNone/>
                       </a:pPr>
                       <a:r>
                         <a:rPr sz="1100">
                           <a:solidFill>
-                            <a:srgbClr val="000000">
+                            <a:srgbClr val="111111">
                               <a:alpha val="100000"/>
                             </a:srgbClr>
                           </a:solidFill>
@@ -17333,22 +17333,22 @@
                     <a:bodyPr/>
                     <a:lstStyle/>
                     <a:p>
-                      <a:pPr algn="l" marL="38100" marR="38100">
+                      <a:pPr algn="l" marL="63500" marR="63500">
                         <a:lnSpc>
                           <a:spcPct val="100000"/>
                         </a:lnSpc>
                         <a:spcBef>
-                          <a:spcPts val="300"/>
+                          <a:spcPts val="200"/>
                         </a:spcBef>
                         <a:spcAft>
-                          <a:spcPts val="300"/>
+                          <a:spcPts val="200"/>
                         </a:spcAft>
                         <a:buNone/>
                       </a:pPr>
                       <a:r>
                         <a:rPr sz="1100">
                           <a:solidFill>
-                            <a:srgbClr val="000000">
+                            <a:srgbClr val="111111">
                               <a:alpha val="100000"/>
                             </a:srgbClr>
                           </a:solidFill>
@@ -17401,22 +17401,22 @@
                     <a:bodyPr/>
                     <a:lstStyle/>
                     <a:p>
-                      <a:pPr algn="l" marL="38100" marR="38100">
+                      <a:pPr algn="l" marL="63500" marR="63500">
                         <a:lnSpc>
                           <a:spcPct val="100000"/>
                         </a:lnSpc>
                         <a:spcBef>
-                          <a:spcPts val="300"/>
+                          <a:spcPts val="200"/>
                         </a:spcBef>
                         <a:spcAft>
-                          <a:spcPts val="300"/>
+                          <a:spcPts val="200"/>
                         </a:spcAft>
                         <a:buNone/>
                       </a:pPr>
                       <a:r>
                         <a:rPr sz="1100">
                           <a:solidFill>
-                            <a:srgbClr val="000000">
+                            <a:srgbClr val="111111">
                               <a:alpha val="100000"/>
                             </a:srgbClr>
                           </a:solidFill>
@@ -17467,22 +17467,22 @@
                     <a:bodyPr/>
                     <a:lstStyle/>
                     <a:p>
-                      <a:pPr algn="l" marL="38100" marR="38100">
+                      <a:pPr algn="l" marL="63500" marR="63500">
                         <a:lnSpc>
                           <a:spcPct val="100000"/>
                         </a:lnSpc>
                         <a:spcBef>
-                          <a:spcPts val="300"/>
+                          <a:spcPts val="200"/>
                         </a:spcBef>
                         <a:spcAft>
-                          <a:spcPts val="300"/>
+                          <a:spcPts val="200"/>
                         </a:spcAft>
                         <a:buNone/>
                       </a:pPr>
                       <a:r>
                         <a:rPr sz="1100">
                           <a:solidFill>
-                            <a:srgbClr val="000000">
+                            <a:srgbClr val="111111">
                               <a:alpha val="100000"/>
                             </a:srgbClr>
                           </a:solidFill>
@@ -17533,22 +17533,22 @@
                     <a:bodyPr/>
                     <a:lstStyle/>
                     <a:p>
-                      <a:pPr algn="l" marL="38100" marR="38100">
+                      <a:pPr algn="l" marL="63500" marR="63500">
                         <a:lnSpc>
                           <a:spcPct val="100000"/>
                         </a:lnSpc>
                         <a:spcBef>
-                          <a:spcPts val="300"/>
+                          <a:spcPts val="200"/>
                         </a:spcBef>
                         <a:spcAft>
-                          <a:spcPts val="300"/>
+                          <a:spcPts val="200"/>
                         </a:spcAft>
                         <a:buNone/>
                       </a:pPr>
                       <a:r>
                         <a:rPr sz="1100">
                           <a:solidFill>
-                            <a:srgbClr val="000000">
+                            <a:srgbClr val="111111">
                               <a:alpha val="100000"/>
                             </a:srgbClr>
                           </a:solidFill>
@@ -17599,22 +17599,22 @@
                     <a:bodyPr/>
                     <a:lstStyle/>
                     <a:p>
-                      <a:pPr algn="l" marL="38100" marR="38100">
+                      <a:pPr algn="l" marL="63500" marR="63500">
                         <a:lnSpc>
                           <a:spcPct val="100000"/>
                         </a:lnSpc>
                         <a:spcBef>
-                          <a:spcPts val="300"/>
+                          <a:spcPts val="200"/>
                         </a:spcBef>
                         <a:spcAft>
-                          <a:spcPts val="300"/>
+                          <a:spcPts val="200"/>
                         </a:spcAft>
                         <a:buNone/>
                       </a:pPr>
                       <a:r>
                         <a:rPr sz="1100">
                           <a:solidFill>
-                            <a:srgbClr val="000000">
+                            <a:srgbClr val="111111">
                               <a:alpha val="100000"/>
                             </a:srgbClr>
                           </a:solidFill>
@@ -17665,22 +17665,22 @@
                     <a:bodyPr/>
                     <a:lstStyle/>
                     <a:p>
-                      <a:pPr algn="l" marL="38100" marR="38100">
+                      <a:pPr algn="l" marL="63500" marR="63500">
                         <a:lnSpc>
                           <a:spcPct val="100000"/>
                         </a:lnSpc>
                         <a:spcBef>
-                          <a:spcPts val="300"/>
+                          <a:spcPts val="200"/>
                         </a:spcBef>
                         <a:spcAft>
-                          <a:spcPts val="300"/>
+                          <a:spcPts val="200"/>
                         </a:spcAft>
                         <a:buNone/>
                       </a:pPr>
                       <a:r>
                         <a:rPr sz="1100">
                           <a:solidFill>
-                            <a:srgbClr val="000000">
+                            <a:srgbClr val="111111">
                               <a:alpha val="100000"/>
                             </a:srgbClr>
                           </a:solidFill>
@@ -17733,22 +17733,22 @@
                     <a:bodyPr/>
                     <a:lstStyle/>
                     <a:p>
-                      <a:pPr algn="l" marL="38100" marR="38100">
+                      <a:pPr algn="l" marL="63500" marR="63500">
                         <a:lnSpc>
                           <a:spcPct val="100000"/>
                         </a:lnSpc>
                         <a:spcBef>
-                          <a:spcPts val="300"/>
+                          <a:spcPts val="200"/>
                         </a:spcBef>
                         <a:spcAft>
-                          <a:spcPts val="300"/>
+                          <a:spcPts val="200"/>
                         </a:spcAft>
                         <a:buNone/>
                       </a:pPr>
                       <a:r>
                         <a:rPr sz="1100">
                           <a:solidFill>
-                            <a:srgbClr val="000000">
+                            <a:srgbClr val="111111">
                               <a:alpha val="100000"/>
                             </a:srgbClr>
                           </a:solidFill>
@@ -17799,22 +17799,22 @@
                     <a:bodyPr/>
                     <a:lstStyle/>
                     <a:p>
-                      <a:pPr algn="l" marL="38100" marR="38100">
+                      <a:pPr algn="l" marL="63500" marR="63500">
                         <a:lnSpc>
                           <a:spcPct val="100000"/>
                         </a:lnSpc>
                         <a:spcBef>
-                          <a:spcPts val="300"/>
+                          <a:spcPts val="200"/>
                         </a:spcBef>
                         <a:spcAft>
-                          <a:spcPts val="300"/>
+                          <a:spcPts val="200"/>
                         </a:spcAft>
                         <a:buNone/>
                       </a:pPr>
                       <a:r>
                         <a:rPr sz="1100">
                           <a:solidFill>
-                            <a:srgbClr val="000000">
+                            <a:srgbClr val="111111">
                               <a:alpha val="100000"/>
                             </a:srgbClr>
                           </a:solidFill>
@@ -17865,22 +17865,22 @@
                     <a:bodyPr/>
                     <a:lstStyle/>
                     <a:p>
-                      <a:pPr algn="l" marL="38100" marR="38100">
+                      <a:pPr algn="l" marL="63500" marR="63500">
                         <a:lnSpc>
                           <a:spcPct val="100000"/>
                         </a:lnSpc>
                         <a:spcBef>
-                          <a:spcPts val="300"/>
+                          <a:spcPts val="200"/>
                         </a:spcBef>
                         <a:spcAft>
-                          <a:spcPts val="300"/>
+                          <a:spcPts val="200"/>
                         </a:spcAft>
                         <a:buNone/>
                       </a:pPr>
                       <a:r>
                         <a:rPr sz="1100">
                           <a:solidFill>
-                            <a:srgbClr val="000000">
+                            <a:srgbClr val="111111">
                               <a:alpha val="100000"/>
                             </a:srgbClr>
                           </a:solidFill>
@@ -17931,22 +17931,22 @@
                     <a:bodyPr/>
                     <a:lstStyle/>
                     <a:p>
-                      <a:pPr algn="l" marL="38100" marR="38100">
+                      <a:pPr algn="l" marL="63500" marR="63500">
                         <a:lnSpc>
                           <a:spcPct val="100000"/>
                         </a:lnSpc>
                         <a:spcBef>
-                          <a:spcPts val="300"/>
+                          <a:spcPts val="200"/>
                         </a:spcBef>
                         <a:spcAft>
-                          <a:spcPts val="300"/>
+                          <a:spcPts val="200"/>
                         </a:spcAft>
                         <a:buNone/>
                       </a:pPr>
                       <a:r>
                         <a:rPr sz="1100">
                           <a:solidFill>
-                            <a:srgbClr val="000000">
+                            <a:srgbClr val="111111">
                               <a:alpha val="100000"/>
                             </a:srgbClr>
                           </a:solidFill>
@@ -17997,22 +17997,22 @@
                     <a:bodyPr/>
                     <a:lstStyle/>
                     <a:p>
-                      <a:pPr algn="l" marL="38100" marR="38100">
+                      <a:pPr algn="l" marL="63500" marR="63500">
                         <a:lnSpc>
                           <a:spcPct val="100000"/>
                         </a:lnSpc>
                         <a:spcBef>
-                          <a:spcPts val="300"/>
+                          <a:spcPts val="200"/>
                         </a:spcBef>
                         <a:spcAft>
-                          <a:spcPts val="300"/>
+                          <a:spcPts val="200"/>
                         </a:spcAft>
                         <a:buNone/>
                       </a:pPr>
                       <a:r>
                         <a:rPr sz="1100">
                           <a:solidFill>
-                            <a:srgbClr val="000000">
+                            <a:srgbClr val="111111">
                               <a:alpha val="100000"/>
                             </a:srgbClr>
                           </a:solidFill>
@@ -18065,22 +18065,22 @@
                     <a:bodyPr/>
                     <a:lstStyle/>
                     <a:p>
-                      <a:pPr algn="l" marL="38100" marR="38100">
+                      <a:pPr algn="l" marL="63500" marR="63500">
                         <a:lnSpc>
                           <a:spcPct val="100000"/>
                         </a:lnSpc>
                         <a:spcBef>
-                          <a:spcPts val="300"/>
+                          <a:spcPts val="200"/>
                         </a:spcBef>
                         <a:spcAft>
-                          <a:spcPts val="300"/>
+                          <a:spcPts val="200"/>
                         </a:spcAft>
                         <a:buNone/>
                       </a:pPr>
                       <a:r>
                         <a:rPr sz="1100">
                           <a:solidFill>
-                            <a:srgbClr val="000000">
+                            <a:srgbClr val="111111">
                               <a:alpha val="100000"/>
                             </a:srgbClr>
                           </a:solidFill>
@@ -18131,22 +18131,22 @@
                     <a:bodyPr/>
                     <a:lstStyle/>
                     <a:p>
-                      <a:pPr algn="l" marL="38100" marR="38100">
+                      <a:pPr algn="l" marL="63500" marR="63500">
                         <a:lnSpc>
                           <a:spcPct val="100000"/>
                         </a:lnSpc>
                         <a:spcBef>
-                          <a:spcPts val="300"/>
+                          <a:spcPts val="200"/>
                         </a:spcBef>
                         <a:spcAft>
-                          <a:spcPts val="300"/>
+                          <a:spcPts val="200"/>
                         </a:spcAft>
                         <a:buNone/>
                       </a:pPr>
                       <a:r>
                         <a:rPr sz="1100">
                           <a:solidFill>
-                            <a:srgbClr val="000000">
+                            <a:srgbClr val="111111">
                               <a:alpha val="100000"/>
                             </a:srgbClr>
                           </a:solidFill>
@@ -18197,22 +18197,22 @@
                     <a:bodyPr/>
                     <a:lstStyle/>
                     <a:p>
-                      <a:pPr algn="l" marL="38100" marR="38100">
+                      <a:pPr algn="l" marL="63500" marR="63500">
                         <a:lnSpc>
                           <a:spcPct val="100000"/>
                         </a:lnSpc>
                         <a:spcBef>
-                          <a:spcPts val="300"/>
+                          <a:spcPts val="200"/>
                         </a:spcBef>
                         <a:spcAft>
-                          <a:spcPts val="300"/>
+                          <a:spcPts val="200"/>
                         </a:spcAft>
                         <a:buNone/>
                       </a:pPr>
                       <a:r>
                         <a:rPr sz="1100">
                           <a:solidFill>
-                            <a:srgbClr val="000000">
+                            <a:srgbClr val="111111">
                               <a:alpha val="100000"/>
                             </a:srgbClr>
                           </a:solidFill>
@@ -18263,22 +18263,22 @@
                     <a:bodyPr/>
                     <a:lstStyle/>
                     <a:p>
-                      <a:pPr algn="l" marL="38100" marR="38100">
+                      <a:pPr algn="l" marL="63500" marR="63500">
                         <a:lnSpc>
                           <a:spcPct val="100000"/>
                         </a:lnSpc>
                         <a:spcBef>
-                          <a:spcPts val="300"/>
+                          <a:spcPts val="200"/>
                         </a:spcBef>
                         <a:spcAft>
-                          <a:spcPts val="300"/>
+                          <a:spcPts val="200"/>
                         </a:spcAft>
                         <a:buNone/>
                       </a:pPr>
                       <a:r>
                         <a:rPr sz="1100">
                           <a:solidFill>
-                            <a:srgbClr val="000000">
+                            <a:srgbClr val="111111">
                               <a:alpha val="100000"/>
                             </a:srgbClr>
                           </a:solidFill>
@@ -18329,22 +18329,22 @@
                     <a:bodyPr/>
                     <a:lstStyle/>
                     <a:p>
-                      <a:pPr algn="l" marL="38100" marR="38100">
+                      <a:pPr algn="l" marL="63500" marR="63500">
                         <a:lnSpc>
                           <a:spcPct val="100000"/>
                         </a:lnSpc>
                         <a:spcBef>
-                          <a:spcPts val="300"/>
+                          <a:spcPts val="200"/>
                         </a:spcBef>
                         <a:spcAft>
-                          <a:spcPts val="300"/>
+                          <a:spcPts val="200"/>
                         </a:spcAft>
                         <a:buNone/>
                       </a:pPr>
                       <a:r>
                         <a:rPr sz="1100">
                           <a:solidFill>
-                            <a:srgbClr val="000000">
+                            <a:srgbClr val="111111">
                               <a:alpha val="100000"/>
                             </a:srgbClr>
                           </a:solidFill>
@@ -18442,14 +18442,14 @@
           <a:p>
             <a:r>
               <a:rPr/>
-              <a:t>Pack date: 17 February 2021</a:t>
+              <a:t>Pack date: 18 February 2021</a:t>
             </a:r>
           </a:p>
         </p:txBody>
       </p:sp>
       <p:pic xmlns:a="http://schemas.openxmlformats.org/drawingml/2006/main" xmlns:r="http://schemas.openxmlformats.org/officeDocument/2006/relationships" xmlns:p="http://schemas.openxmlformats.org/presentationml/2006/main">
         <p:nvPicPr>
-          <p:cNvPr id="3" name="Picture Placeholder 7" descr=""/>
+          <p:cNvPr id="3" name="Picture Placeholder 7"/>
           <p:cNvPicPr>
             <a:picLocks noGrp="1"/>
           </p:cNvPicPr>
@@ -18475,7 +18475,7 @@
       </p:pic>
       <p:pic xmlns:a="http://schemas.openxmlformats.org/drawingml/2006/main" xmlns:r="http://schemas.openxmlformats.org/officeDocument/2006/relationships" xmlns:p="http://schemas.openxmlformats.org/presentationml/2006/main">
         <p:nvPicPr>
-          <p:cNvPr id="4" name="Picture Placeholder 3" descr=""/>
+          <p:cNvPr id="4" name="Picture Placeholder 3"/>
           <p:cNvPicPr>
             <a:picLocks noGrp="1"/>
           </p:cNvPicPr>
@@ -18600,14 +18600,14 @@
           <a:p>
             <a:r>
               <a:rPr/>
-              <a:t>Pack date: 17 February 2021</a:t>
+              <a:t>Pack date: 18 February 2021</a:t>
             </a:r>
           </a:p>
         </p:txBody>
       </p:sp>
       <p:pic xmlns:a="http://schemas.openxmlformats.org/drawingml/2006/main" xmlns:r="http://schemas.openxmlformats.org/officeDocument/2006/relationships" xmlns:p="http://schemas.openxmlformats.org/presentationml/2006/main">
         <p:nvPicPr>
-          <p:cNvPr id="3" name="Picture Placeholder 7" descr=""/>
+          <p:cNvPr id="3" name="Picture Placeholder 7"/>
           <p:cNvPicPr>
             <a:picLocks noGrp="1"/>
           </p:cNvPicPr>
@@ -18633,7 +18633,7 @@
       </p:pic>
       <p:pic xmlns:a="http://schemas.openxmlformats.org/drawingml/2006/main" xmlns:r="http://schemas.openxmlformats.org/officeDocument/2006/relationships" xmlns:p="http://schemas.openxmlformats.org/presentationml/2006/main">
         <p:nvPicPr>
-          <p:cNvPr id="4" name="Picture Placeholder 3" descr=""/>
+          <p:cNvPr id="4" name="Picture Placeholder 3"/>
           <p:cNvPicPr>
             <a:picLocks noGrp="1"/>
           </p:cNvPicPr>
@@ -18758,14 +18758,14 @@
           <a:p>
             <a:r>
               <a:rPr/>
-              <a:t>Pack date: 17 February 2021</a:t>
+              <a:t>Pack date: 18 February 2021</a:t>
             </a:r>
           </a:p>
         </p:txBody>
       </p:sp>
       <p:pic xmlns:a="http://schemas.openxmlformats.org/drawingml/2006/main" xmlns:r="http://schemas.openxmlformats.org/officeDocument/2006/relationships" xmlns:p="http://schemas.openxmlformats.org/presentationml/2006/main">
         <p:nvPicPr>
-          <p:cNvPr id="3" name="Picture Placeholder 7" descr=""/>
+          <p:cNvPr id="3" name="Picture Placeholder 7"/>
           <p:cNvPicPr>
             <a:picLocks noGrp="1"/>
           </p:cNvPicPr>
@@ -18791,7 +18791,7 @@
       </p:pic>
       <p:pic xmlns:a="http://schemas.openxmlformats.org/drawingml/2006/main" xmlns:r="http://schemas.openxmlformats.org/officeDocument/2006/relationships" xmlns:p="http://schemas.openxmlformats.org/presentationml/2006/main">
         <p:nvPicPr>
-          <p:cNvPr id="4" name="Picture Placeholder 3" descr=""/>
+          <p:cNvPr id="4" name="Picture Placeholder 3"/>
           <p:cNvPicPr>
             <a:picLocks noGrp="1"/>
           </p:cNvPicPr>
@@ -18916,14 +18916,14 @@
           <a:p>
             <a:r>
               <a:rPr/>
-              <a:t>Pack date: 17 February 2021</a:t>
+              <a:t>Pack date: 18 February 2021</a:t>
             </a:r>
           </a:p>
         </p:txBody>
       </p:sp>
       <p:pic xmlns:a="http://schemas.openxmlformats.org/drawingml/2006/main" xmlns:r="http://schemas.openxmlformats.org/officeDocument/2006/relationships" xmlns:p="http://schemas.openxmlformats.org/presentationml/2006/main">
         <p:nvPicPr>
-          <p:cNvPr id="3" name="Picture Placeholder 7" descr=""/>
+          <p:cNvPr id="3" name="Picture Placeholder 7"/>
           <p:cNvPicPr>
             <a:picLocks noGrp="1"/>
           </p:cNvPicPr>
@@ -18949,7 +18949,7 @@
       </p:pic>
       <p:pic xmlns:a="http://schemas.openxmlformats.org/drawingml/2006/main" xmlns:r="http://schemas.openxmlformats.org/officeDocument/2006/relationships" xmlns:p="http://schemas.openxmlformats.org/presentationml/2006/main">
         <p:nvPicPr>
-          <p:cNvPr id="4" name="Picture Placeholder 3" descr=""/>
+          <p:cNvPr id="4" name="Picture Placeholder 3"/>
           <p:cNvPicPr>
             <a:picLocks noGrp="1"/>
           </p:cNvPicPr>
@@ -19074,7 +19074,7 @@
           <a:p>
             <a:r>
               <a:rPr/>
-              <a:t>Pack date: 17 February 2021</a:t>
+              <a:t>Pack date: 18 February 2021</a:t>
             </a:r>
           </a:p>
         </p:txBody>
@@ -19263,14 +19263,14 @@
           <a:p>
             <a:r>
               <a:rPr/>
-              <a:t>Pack date: 17 February 2021</a:t>
+              <a:t>Pack date: 18 February 2021</a:t>
             </a:r>
           </a:p>
         </p:txBody>
       </p:sp>
       <p:pic xmlns:a="http://schemas.openxmlformats.org/drawingml/2006/main" xmlns:r="http://schemas.openxmlformats.org/officeDocument/2006/relationships" xmlns:p="http://schemas.openxmlformats.org/presentationml/2006/main">
         <p:nvPicPr>
-          <p:cNvPr id="3" name="Picture Placeholder 7" descr=""/>
+          <p:cNvPr id="3" name="Picture Placeholder 7"/>
           <p:cNvPicPr>
             <a:picLocks noGrp="1"/>
           </p:cNvPicPr>
@@ -19296,7 +19296,7 @@
       </p:pic>
       <p:pic xmlns:a="http://schemas.openxmlformats.org/drawingml/2006/main" xmlns:r="http://schemas.openxmlformats.org/officeDocument/2006/relationships" xmlns:p="http://schemas.openxmlformats.org/presentationml/2006/main">
         <p:nvPicPr>
-          <p:cNvPr id="4" name="Picture Placeholder 3" descr=""/>
+          <p:cNvPr id="4" name="Picture Placeholder 3"/>
           <p:cNvPicPr>
             <a:picLocks noGrp="1"/>
           </p:cNvPicPr>
@@ -19421,14 +19421,14 @@
           <a:p>
             <a:r>
               <a:rPr/>
-              <a:t>Pack date: 17 February 2021</a:t>
+              <a:t>Pack date: 18 February 2021</a:t>
             </a:r>
           </a:p>
         </p:txBody>
       </p:sp>
       <p:pic xmlns:a="http://schemas.openxmlformats.org/drawingml/2006/main" xmlns:r="http://schemas.openxmlformats.org/officeDocument/2006/relationships" xmlns:p="http://schemas.openxmlformats.org/presentationml/2006/main">
         <p:nvPicPr>
-          <p:cNvPr id="3" name="Picture Placeholder 7" descr=""/>
+          <p:cNvPr id="3" name="Picture Placeholder 7"/>
           <p:cNvPicPr>
             <a:picLocks noGrp="1"/>
           </p:cNvPicPr>
@@ -19454,7 +19454,7 @@
       </p:pic>
       <p:pic xmlns:a="http://schemas.openxmlformats.org/drawingml/2006/main" xmlns:r="http://schemas.openxmlformats.org/officeDocument/2006/relationships" xmlns:p="http://schemas.openxmlformats.org/presentationml/2006/main">
         <p:nvPicPr>
-          <p:cNvPr id="4" name="Picture Placeholder 3" descr=""/>
+          <p:cNvPr id="4" name="Picture Placeholder 3"/>
           <p:cNvPicPr>
             <a:picLocks noGrp="1"/>
           </p:cNvPicPr>
@@ -19579,14 +19579,14 @@
           <a:p>
             <a:r>
               <a:rPr/>
-              <a:t>Pack date: 17 February 2021</a:t>
+              <a:t>Pack date: 18 February 2021</a:t>
             </a:r>
           </a:p>
         </p:txBody>
       </p:sp>
       <p:pic xmlns:a="http://schemas.openxmlformats.org/drawingml/2006/main" xmlns:r="http://schemas.openxmlformats.org/officeDocument/2006/relationships" xmlns:p="http://schemas.openxmlformats.org/presentationml/2006/main">
         <p:nvPicPr>
-          <p:cNvPr id="3" name="Picture Placeholder 7" descr=""/>
+          <p:cNvPr id="3" name="Picture Placeholder 7"/>
           <p:cNvPicPr>
             <a:picLocks noGrp="1"/>
           </p:cNvPicPr>
@@ -19612,7 +19612,7 @@
       </p:pic>
       <p:pic xmlns:a="http://schemas.openxmlformats.org/drawingml/2006/main" xmlns:r="http://schemas.openxmlformats.org/officeDocument/2006/relationships" xmlns:p="http://schemas.openxmlformats.org/presentationml/2006/main">
         <p:nvPicPr>
-          <p:cNvPr id="4" name="Picture Placeholder 3" descr=""/>
+          <p:cNvPr id="4" name="Picture Placeholder 3"/>
           <p:cNvPicPr>
             <a:picLocks noGrp="1"/>
           </p:cNvPicPr>
@@ -19737,14 +19737,14 @@
           <a:p>
             <a:r>
               <a:rPr/>
-              <a:t>Pack date: 17 February 2021</a:t>
+              <a:t>Pack date: 18 February 2021</a:t>
             </a:r>
           </a:p>
         </p:txBody>
       </p:sp>
       <p:pic xmlns:a="http://schemas.openxmlformats.org/drawingml/2006/main" xmlns:r="http://schemas.openxmlformats.org/officeDocument/2006/relationships" xmlns:p="http://schemas.openxmlformats.org/presentationml/2006/main">
         <p:nvPicPr>
-          <p:cNvPr id="3" name="Picture Placeholder 7" descr=""/>
+          <p:cNvPr id="3" name="Picture Placeholder 7"/>
           <p:cNvPicPr>
             <a:picLocks noGrp="1"/>
           </p:cNvPicPr>
@@ -19770,7 +19770,7 @@
       </p:pic>
       <p:pic xmlns:a="http://schemas.openxmlformats.org/drawingml/2006/main" xmlns:r="http://schemas.openxmlformats.org/officeDocument/2006/relationships" xmlns:p="http://schemas.openxmlformats.org/presentationml/2006/main">
         <p:nvPicPr>
-          <p:cNvPr id="4" name="Picture Placeholder 3" descr=""/>
+          <p:cNvPr id="4" name="Picture Placeholder 3"/>
           <p:cNvPicPr>
             <a:picLocks noGrp="1"/>
           </p:cNvPicPr>
@@ -19895,14 +19895,14 @@
           <a:p>
             <a:r>
               <a:rPr/>
-              <a:t>Pack date: 17 February 2021</a:t>
+              <a:t>Pack date: 18 February 2021</a:t>
             </a:r>
           </a:p>
         </p:txBody>
       </p:sp>
       <p:pic xmlns:a="http://schemas.openxmlformats.org/drawingml/2006/main" xmlns:r="http://schemas.openxmlformats.org/officeDocument/2006/relationships" xmlns:p="http://schemas.openxmlformats.org/presentationml/2006/main">
         <p:nvPicPr>
-          <p:cNvPr id="3" name="Picture Placeholder 8" descr=""/>
+          <p:cNvPr id="3" name="Picture Placeholder 8"/>
           <p:cNvPicPr>
             <a:picLocks noGrp="1"/>
           </p:cNvPicPr>
@@ -20027,14 +20027,14 @@
           <a:p>
             <a:r>
               <a:rPr/>
-              <a:t>Pack date: 17 February 2021</a:t>
+              <a:t>Pack date: 18 February 2021</a:t>
             </a:r>
           </a:p>
         </p:txBody>
       </p:sp>
       <p:pic xmlns:a="http://schemas.openxmlformats.org/drawingml/2006/main" xmlns:r="http://schemas.openxmlformats.org/officeDocument/2006/relationships" xmlns:p="http://schemas.openxmlformats.org/presentationml/2006/main">
         <p:nvPicPr>
-          <p:cNvPr id="3" name="Picture Placeholder 8" descr=""/>
+          <p:cNvPr id="3" name="Picture Placeholder 8"/>
           <p:cNvPicPr>
             <a:picLocks noGrp="1"/>
           </p:cNvPicPr>
@@ -20159,14 +20159,14 @@
           <a:p>
             <a:r>
               <a:rPr/>
-              <a:t>Pack date: 17 February 2021</a:t>
+              <a:t>Pack date: 18 February 2021</a:t>
             </a:r>
           </a:p>
         </p:txBody>
       </p:sp>
       <p:pic xmlns:a="http://schemas.openxmlformats.org/drawingml/2006/main" xmlns:r="http://schemas.openxmlformats.org/officeDocument/2006/relationships" xmlns:p="http://schemas.openxmlformats.org/presentationml/2006/main">
         <p:nvPicPr>
-          <p:cNvPr id="3" name="Picture Placeholder 8" descr=""/>
+          <p:cNvPr id="3" name="Picture Placeholder 8"/>
           <p:cNvPicPr>
             <a:picLocks noGrp="1"/>
           </p:cNvPicPr>
@@ -20291,14 +20291,14 @@
           <a:p>
             <a:r>
               <a:rPr/>
-              <a:t>Pack date: 17 February 2021</a:t>
+              <a:t>Pack date: 18 February 2021</a:t>
             </a:r>
           </a:p>
         </p:txBody>
       </p:sp>
       <p:pic xmlns:a="http://schemas.openxmlformats.org/drawingml/2006/main" xmlns:r="http://schemas.openxmlformats.org/officeDocument/2006/relationships" xmlns:p="http://schemas.openxmlformats.org/presentationml/2006/main">
         <p:nvPicPr>
-          <p:cNvPr id="3" name="Picture Placeholder 8" descr=""/>
+          <p:cNvPr id="3" name="Picture Placeholder 8"/>
           <p:cNvPicPr>
             <a:picLocks noGrp="1"/>
           </p:cNvPicPr>
@@ -20423,14 +20423,14 @@
           <a:p>
             <a:r>
               <a:rPr/>
-              <a:t>Pack date: 17 February 2021</a:t>
+              <a:t>Pack date: 18 February 2021</a:t>
             </a:r>
           </a:p>
         </p:txBody>
       </p:sp>
       <p:pic xmlns:a="http://schemas.openxmlformats.org/drawingml/2006/main" xmlns:r="http://schemas.openxmlformats.org/officeDocument/2006/relationships" xmlns:p="http://schemas.openxmlformats.org/presentationml/2006/main">
         <p:nvPicPr>
-          <p:cNvPr id="3" name="Picture Placeholder 8" descr=""/>
+          <p:cNvPr id="3" name="Picture Placeholder 8"/>
           <p:cNvPicPr>
             <a:picLocks noGrp="1"/>
           </p:cNvPicPr>
@@ -20555,14 +20555,14 @@
           <a:p>
             <a:r>
               <a:rPr/>
-              <a:t>Pack date: 17 February 2021</a:t>
+              <a:t>Pack date: 18 February 2021</a:t>
             </a:r>
           </a:p>
         </p:txBody>
       </p:sp>
       <p:pic xmlns:a="http://schemas.openxmlformats.org/drawingml/2006/main" xmlns:r="http://schemas.openxmlformats.org/officeDocument/2006/relationships" xmlns:p="http://schemas.openxmlformats.org/presentationml/2006/main">
         <p:nvPicPr>
-          <p:cNvPr id="3" name="Picture Placeholder 8" descr=""/>
+          <p:cNvPr id="3" name="Picture Placeholder 8"/>
           <p:cNvPicPr>
             <a:picLocks noGrp="1"/>
           </p:cNvPicPr>
@@ -20687,14 +20687,14 @@
           <a:p>
             <a:r>
               <a:rPr/>
-              <a:t>Pack date: 17 February 2021</a:t>
+              <a:t>Pack date: 18 February 2021</a:t>
             </a:r>
           </a:p>
         </p:txBody>
       </p:sp>
       <p:pic xmlns:a="http://schemas.openxmlformats.org/drawingml/2006/main" xmlns:r="http://schemas.openxmlformats.org/officeDocument/2006/relationships" xmlns:p="http://schemas.openxmlformats.org/presentationml/2006/main">
         <p:nvPicPr>
-          <p:cNvPr id="3" name="Picture Placeholder 8" descr=""/>
+          <p:cNvPr id="3" name="Picture Placeholder 8"/>
           <p:cNvPicPr>
             <a:picLocks noGrp="1"/>
           </p:cNvPicPr>

</xml_diff>

<commit_message>
Updated navbar for rate page - trial prelim js
</commit_message>
<xml_diff>
--- a/Latest_West_Sussex_C19_slide_deck.pptx
+++ b/Latest_West_Sussex_C19_slide_deck.pptx
@@ -7176,7 +7176,7 @@
           <a:p>
             <a:r>
               <a:rPr/>
-              <a:t>Pack date: 23 February 2021</a:t>
+              <a:t>Pack date: 24 February 2021</a:t>
             </a:r>
           </a:p>
         </p:txBody>
@@ -7308,7 +7308,7 @@
           <a:p>
             <a:r>
               <a:rPr/>
-              <a:t>Pack date: 23 February 2021</a:t>
+              <a:t>Pack date: 24 February 2021</a:t>
             </a:r>
           </a:p>
         </p:txBody>
@@ -7466,7 +7466,7 @@
           <a:p>
             <a:r>
               <a:rPr/>
-              <a:t>Pack date: 23 February 2021</a:t>
+              <a:t>Pack date: 24 February 2021</a:t>
             </a:r>
           </a:p>
         </p:txBody>
@@ -9061,7 +9061,7 @@
           <a:p>
             <a:r>
               <a:rPr/>
-              <a:t>Pack date: 23 February 2021</a:t>
+              <a:t>Pack date: 24 February 2021</a:t>
             </a:r>
           </a:p>
         </p:txBody>
@@ -10656,7 +10656,7 @@
           <a:p>
             <a:r>
               <a:rPr/>
-              <a:t>Pack date: 23 February 2021</a:t>
+              <a:t>Pack date: 24 February 2021</a:t>
             </a:r>
           </a:p>
         </p:txBody>
@@ -14548,7 +14548,7 @@
           <a:p>
             <a:r>
               <a:rPr/>
-              <a:t>Pack date: 23 February 2021</a:t>
+              <a:t>Pack date: 24 February 2021</a:t>
             </a:r>
           </a:p>
         </p:txBody>
@@ -18443,7 +18443,7 @@
           <a:p>
             <a:r>
               <a:rPr/>
-              <a:t>Pack date: 23 February 2021</a:t>
+              <a:t>Pack date: 24 February 2021</a:t>
             </a:r>
           </a:p>
         </p:txBody>
@@ -18601,7 +18601,7 @@
           <a:p>
             <a:r>
               <a:rPr/>
-              <a:t>Pack date: 23 February 2021</a:t>
+              <a:t>Pack date: 24 February 2021</a:t>
             </a:r>
           </a:p>
         </p:txBody>
@@ -18759,7 +18759,7 @@
           <a:p>
             <a:r>
               <a:rPr/>
-              <a:t>Pack date: 23 February 2021</a:t>
+              <a:t>Pack date: 24 February 2021</a:t>
             </a:r>
           </a:p>
         </p:txBody>
@@ -18917,7 +18917,7 @@
           <a:p>
             <a:r>
               <a:rPr/>
-              <a:t>Pack date: 23 February 2021</a:t>
+              <a:t>Pack date: 24 February 2021</a:t>
             </a:r>
           </a:p>
         </p:txBody>
@@ -19075,7 +19075,7 @@
           <a:p>
             <a:r>
               <a:rPr/>
-              <a:t>Pack date: 23 February 2021</a:t>
+              <a:t>Pack date: 24 February 2021</a:t>
             </a:r>
           </a:p>
         </p:txBody>
@@ -19264,7 +19264,7 @@
           <a:p>
             <a:r>
               <a:rPr/>
-              <a:t>Pack date: 23 February 2021</a:t>
+              <a:t>Pack date: 24 February 2021</a:t>
             </a:r>
           </a:p>
         </p:txBody>
@@ -19422,7 +19422,7 @@
           <a:p>
             <a:r>
               <a:rPr/>
-              <a:t>Pack date: 23 February 2021</a:t>
+              <a:t>Pack date: 24 February 2021</a:t>
             </a:r>
           </a:p>
         </p:txBody>
@@ -19580,7 +19580,7 @@
           <a:p>
             <a:r>
               <a:rPr/>
-              <a:t>Pack date: 23 February 2021</a:t>
+              <a:t>Pack date: 24 February 2021</a:t>
             </a:r>
           </a:p>
         </p:txBody>
@@ -19738,7 +19738,7 @@
           <a:p>
             <a:r>
               <a:rPr/>
-              <a:t>Pack date: 23 February 2021</a:t>
+              <a:t>Pack date: 24 February 2021</a:t>
             </a:r>
           </a:p>
         </p:txBody>
@@ -19896,7 +19896,7 @@
           <a:p>
             <a:r>
               <a:rPr/>
-              <a:t>Pack date: 23 February 2021</a:t>
+              <a:t>Pack date: 24 February 2021</a:t>
             </a:r>
           </a:p>
         </p:txBody>
@@ -20028,7 +20028,7 @@
           <a:p>
             <a:r>
               <a:rPr/>
-              <a:t>Pack date: 23 February 2021</a:t>
+              <a:t>Pack date: 24 February 2021</a:t>
             </a:r>
           </a:p>
         </p:txBody>
@@ -20160,7 +20160,7 @@
           <a:p>
             <a:r>
               <a:rPr/>
-              <a:t>Pack date: 23 February 2021</a:t>
+              <a:t>Pack date: 24 February 2021</a:t>
             </a:r>
           </a:p>
         </p:txBody>
@@ -20292,7 +20292,7 @@
           <a:p>
             <a:r>
               <a:rPr/>
-              <a:t>Pack date: 23 February 2021</a:t>
+              <a:t>Pack date: 24 February 2021</a:t>
             </a:r>
           </a:p>
         </p:txBody>
@@ -20424,7 +20424,7 @@
           <a:p>
             <a:r>
               <a:rPr/>
-              <a:t>Pack date: 23 February 2021</a:t>
+              <a:t>Pack date: 24 February 2021</a:t>
             </a:r>
           </a:p>
         </p:txBody>
@@ -20556,7 +20556,7 @@
           <a:p>
             <a:r>
               <a:rPr/>
-              <a:t>Pack date: 23 February 2021</a:t>
+              <a:t>Pack date: 24 February 2021</a:t>
             </a:r>
           </a:p>
         </p:txBody>
@@ -20688,7 +20688,7 @@
           <a:p>
             <a:r>
               <a:rPr/>
-              <a:t>Pack date: 23 February 2021</a:t>
+              <a:t>Pack date: 24 February 2021</a:t>
             </a:r>
           </a:p>
         </p:txBody>

</xml_diff>

<commit_message>
Update March 03 - added lfd tests
</commit_message>
<xml_diff>
--- a/Latest_West_Sussex_C19_slide_deck.pptx
+++ b/Latest_West_Sussex_C19_slide_deck.pptx
@@ -7176,7 +7176,7 @@
           <a:p>
             <a:r>
               <a:rPr/>
-              <a:t>Pack date: 02 March 2021</a:t>
+              <a:t>Pack date: 03 March 2021</a:t>
             </a:r>
           </a:p>
         </p:txBody>
@@ -7308,7 +7308,7 @@
           <a:p>
             <a:r>
               <a:rPr/>
-              <a:t>Pack date: 02 March 2021</a:t>
+              <a:t>Pack date: 03 March 2021</a:t>
             </a:r>
           </a:p>
         </p:txBody>
@@ -7466,7 +7466,7 @@
           <a:p>
             <a:r>
               <a:rPr/>
-              <a:t>Pack date: 02 March 2021</a:t>
+              <a:t>Pack date: 03 March 2021</a:t>
             </a:r>
           </a:p>
         </p:txBody>
@@ -7547,7 +7547,7 @@
           <a:p>
             <a:r>
               <a:rPr/>
-              <a:t>Upper Tier Local Authority cumulative cases as at 02 March</a:t>
+              <a:t>Upper Tier Local Authority cumulative cases as at 03 March</a:t>
             </a:r>
           </a:p>
         </p:txBody>
@@ -8082,7 +8082,7 @@
                           <a:latin typeface="Calibri"/>
                           <a:cs typeface="Calibri"/>
                         </a:rPr>
-                        <a:t>40,313</a:t>
+                        <a:t>40,360</a:t>
                       </a:r>
                     </a:p>
                   </a:txBody>
@@ -8148,7 +8148,7 @@
                           <a:latin typeface="Calibri"/>
                           <a:cs typeface="Calibri"/>
                         </a:rPr>
-                        <a:t>4,666.0</a:t>
+                        <a:t>4,671.4</a:t>
                       </a:r>
                     </a:p>
                   </a:txBody>
@@ -8414,7 +8414,7 @@
                           <a:latin typeface="Calibri"/>
                           <a:cs typeface="Calibri"/>
                         </a:rPr>
-                        <a:t>3,668,620</a:t>
+                        <a:t>3,674,028</a:t>
                       </a:r>
                     </a:p>
                   </a:txBody>
@@ -8480,7 +8480,7 @@
                           <a:latin typeface="Calibri"/>
                           <a:cs typeface="Calibri"/>
                         </a:rPr>
-                        <a:t>6,517.7</a:t>
+                        <a:t>6,527.3</a:t>
                       </a:r>
                     </a:p>
                   </a:txBody>
@@ -8746,7 +8746,7 @@
                           <a:latin typeface="Calibri"/>
                           <a:cs typeface="Calibri"/>
                         </a:rPr>
-                        <a:t>520,253</a:t>
+                        <a:t>520,743</a:t>
                       </a:r>
                     </a:p>
                   </a:txBody>
@@ -8812,7 +8812,7 @@
                           <a:latin typeface="Calibri"/>
                           <a:cs typeface="Calibri"/>
                         </a:rPr>
-                        <a:t>5,667.2</a:t>
+                        <a:t>5,672.5</a:t>
                       </a:r>
                     </a:p>
                   </a:txBody>
@@ -9061,7 +9061,7 @@
           <a:p>
             <a:r>
               <a:rPr/>
-              <a:t>Pack date: 02 March 2021</a:t>
+              <a:t>Pack date: 03 March 2021</a:t>
             </a:r>
           </a:p>
         </p:txBody>
@@ -9142,7 +9142,7 @@
           <a:p>
             <a:r>
               <a:rPr/>
-              <a:t>Upper Tier Local Authority rolling 7 day cases as at 02 March</a:t>
+              <a:t>Upper Tier Local Authority rolling 7 day cases as at 03 March</a:t>
             </a:r>
           </a:p>
         </p:txBody>
@@ -9223,7 +9223,7 @@
           <a:p>
             <a:r>
               <a:rPr/>
-              <a:t>Note that the very recent days are excluded in the 7-day total as these are thought to be incomplete. As such, this data represents cases in the seven days to 25 February</a:t>
+              <a:t>Note that the very recent days are excluded in the 7-day total as these are thought to be incomplete. As such, this data represents cases in the seven days to 26 February</a:t>
             </a:r>
           </a:p>
         </p:txBody>
@@ -9677,7 +9677,7 @@
                           <a:latin typeface="Calibri"/>
                           <a:cs typeface="Calibri"/>
                         </a:rPr>
-                        <a:t>623</a:t>
+                        <a:t>566</a:t>
                       </a:r>
                     </a:p>
                   </a:txBody>
@@ -9743,7 +9743,7 @@
                           <a:latin typeface="Calibri"/>
                           <a:cs typeface="Calibri"/>
                         </a:rPr>
-                        <a:t>72.1</a:t>
+                        <a:t>65.5</a:t>
                       </a:r>
                     </a:p>
                   </a:txBody>
@@ -9809,7 +9809,7 @@
                           <a:latin typeface="Calibri"/>
                           <a:cs typeface="Calibri"/>
                         </a:rPr>
-                        <a:t>100th</a:t>
+                        <a:t>99th</a:t>
                       </a:r>
                     </a:p>
                   </a:txBody>
@@ -10009,7 +10009,7 @@
                           <a:latin typeface="Calibri"/>
                           <a:cs typeface="Calibri"/>
                         </a:rPr>
-                        <a:t>54,676</a:t>
+                        <a:t>51,447</a:t>
                       </a:r>
                     </a:p>
                   </a:txBody>
@@ -10075,7 +10075,7 @@
                           <a:latin typeface="Calibri"/>
                           <a:cs typeface="Calibri"/>
                         </a:rPr>
-                        <a:t>97.1</a:t>
+                        <a:t>91.4</a:t>
                       </a:r>
                     </a:p>
                   </a:txBody>
@@ -10341,7 +10341,7 @@
                           <a:latin typeface="Calibri"/>
                           <a:cs typeface="Calibri"/>
                         </a:rPr>
-                        <a:t>5,982</a:t>
+                        <a:t>5,563</a:t>
                       </a:r>
                     </a:p>
                   </a:txBody>
@@ -10407,7 +10407,7 @@
                           <a:latin typeface="Calibri"/>
                           <a:cs typeface="Calibri"/>
                         </a:rPr>
-                        <a:t>65.2</a:t>
+                        <a:t>60.6</a:t>
                       </a:r>
                     </a:p>
                   </a:txBody>
@@ -10656,7 +10656,7 @@
           <a:p>
             <a:r>
               <a:rPr/>
-              <a:t>Pack date: 02 March 2021</a:t>
+              <a:t>Pack date: 03 March 2021</a:t>
             </a:r>
           </a:p>
         </p:txBody>
@@ -10737,7 +10737,7 @@
           <a:p>
             <a:r>
               <a:rPr/>
-              <a:t>Lower Tier Local Authority cumulative cases as at 02 March</a:t>
+              <a:t>Lower Tier Local Authority cumulative cases as at 03 March</a:t>
             </a:r>
           </a:p>
         </p:txBody>
@@ -11245,7 +11245,7 @@
                           <a:latin typeface="Calibri"/>
                           <a:cs typeface="Calibri"/>
                         </a:rPr>
-                        <a:t>2,820</a:t>
+                        <a:t>2,822</a:t>
                       </a:r>
                     </a:p>
                   </a:txBody>
@@ -11311,7 +11311,7 @@
                           <a:latin typeface="Calibri"/>
                           <a:cs typeface="Calibri"/>
                         </a:rPr>
-                        <a:t>4,385.6</a:t>
+                        <a:t>4,388.7</a:t>
                       </a:r>
                     </a:p>
                   </a:txBody>
@@ -11577,7 +11577,7 @@
                           <a:latin typeface="Calibri"/>
                           <a:cs typeface="Calibri"/>
                         </a:rPr>
-                        <a:t>7,858</a:t>
+                        <a:t>7,873</a:t>
                       </a:r>
                     </a:p>
                   </a:txBody>
@@ -11643,7 +11643,7 @@
                           <a:latin typeface="Calibri"/>
                           <a:cs typeface="Calibri"/>
                         </a:rPr>
-                        <a:t>4,888.1</a:t>
+                        <a:t>4,897.4</a:t>
                       </a:r>
                     </a:p>
                   </a:txBody>
@@ -11709,7 +11709,7 @@
                           <a:latin typeface="Calibri"/>
                           <a:cs typeface="Calibri"/>
                         </a:rPr>
-                        <a:t>220th</a:t>
+                        <a:t>221st</a:t>
                       </a:r>
                     </a:p>
                   </a:txBody>
@@ -11909,7 +11909,7 @@
                           <a:latin typeface="Calibri"/>
                           <a:cs typeface="Calibri"/>
                         </a:rPr>
-                        <a:t>4,705</a:t>
+                        <a:t>4,709</a:t>
                       </a:r>
                     </a:p>
                   </a:txBody>
@@ -11975,7 +11975,7 @@
                           <a:latin typeface="Calibri"/>
                           <a:cs typeface="Calibri"/>
                         </a:rPr>
-                        <a:t>3,884.3</a:t>
+                        <a:t>3,887.6</a:t>
                       </a:r>
                     </a:p>
                   </a:txBody>
@@ -12241,7 +12241,7 @@
                           <a:latin typeface="Calibri"/>
                           <a:cs typeface="Calibri"/>
                         </a:rPr>
-                        <a:t>7,660</a:t>
+                        <a:t>7,672</a:t>
                       </a:r>
                     </a:p>
                   </a:txBody>
@@ -12307,7 +12307,7 @@
                           <a:latin typeface="Calibri"/>
                           <a:cs typeface="Calibri"/>
                         </a:rPr>
-                        <a:t>6,814.4</a:t>
+                        <a:t>6,825.1</a:t>
                       </a:r>
                     </a:p>
                   </a:txBody>
@@ -12573,7 +12573,7 @@
                           <a:latin typeface="Calibri"/>
                           <a:cs typeface="Calibri"/>
                         </a:rPr>
-                        <a:t>5,523</a:t>
+                        <a:t>5,524</a:t>
                       </a:r>
                     </a:p>
                   </a:txBody>
@@ -12639,7 +12639,7 @@
                           <a:latin typeface="Calibri"/>
                           <a:cs typeface="Calibri"/>
                         </a:rPr>
-                        <a:t>3,841.0</a:t>
+                        <a:t>3,841.7</a:t>
                       </a:r>
                     </a:p>
                   </a:txBody>
@@ -12905,7 +12905,7 @@
                           <a:latin typeface="Calibri"/>
                           <a:cs typeface="Calibri"/>
                         </a:rPr>
-                        <a:t>6,651</a:t>
+                        <a:t>6,654</a:t>
                       </a:r>
                     </a:p>
                   </a:txBody>
@@ -12971,7 +12971,7 @@
                           <a:latin typeface="Calibri"/>
                           <a:cs typeface="Calibri"/>
                         </a:rPr>
-                        <a:t>4,404.0</a:t>
+                        <a:t>4,406.0</a:t>
                       </a:r>
                     </a:p>
                   </a:txBody>
@@ -13237,7 +13237,7 @@
                           <a:latin typeface="Calibri"/>
                           <a:cs typeface="Calibri"/>
                         </a:rPr>
-                        <a:t>5,096</a:t>
+                        <a:t>5,106</a:t>
                       </a:r>
                     </a:p>
                   </a:txBody>
@@ -13303,7 +13303,7 @@
                           <a:latin typeface="Calibri"/>
                           <a:cs typeface="Calibri"/>
                         </a:rPr>
-                        <a:t>4,608.8</a:t>
+                        <a:t>4,617.9</a:t>
                       </a:r>
                     </a:p>
                   </a:txBody>
@@ -13569,7 +13569,7 @@
                           <a:latin typeface="Calibri"/>
                           <a:cs typeface="Calibri"/>
                         </a:rPr>
-                        <a:t>40,313</a:t>
+                        <a:t>40,360</a:t>
                       </a:r>
                     </a:p>
                   </a:txBody>
@@ -13635,7 +13635,7 @@
                           <a:latin typeface="Calibri"/>
                           <a:cs typeface="Calibri"/>
                         </a:rPr>
-                        <a:t>4,666.0</a:t>
+                        <a:t>4,671.4</a:t>
                       </a:r>
                     </a:p>
                   </a:txBody>
@@ -13901,7 +13901,7 @@
                           <a:latin typeface="Calibri"/>
                           <a:cs typeface="Calibri"/>
                         </a:rPr>
-                        <a:t>520,253</a:t>
+                        <a:t>520,743</a:t>
                       </a:r>
                     </a:p>
                   </a:txBody>
@@ -13967,7 +13967,7 @@
                           <a:latin typeface="Calibri"/>
                           <a:cs typeface="Calibri"/>
                         </a:rPr>
-                        <a:t>5,667.2</a:t>
+                        <a:t>5,672.5</a:t>
                       </a:r>
                     </a:p>
                   </a:txBody>
@@ -14233,7 +14233,7 @@
                           <a:latin typeface="Calibri"/>
                           <a:cs typeface="Calibri"/>
                         </a:rPr>
-                        <a:t>3,668,620</a:t>
+                        <a:t>3,674,028</a:t>
                       </a:r>
                     </a:p>
                   </a:txBody>
@@ -14299,7 +14299,7 @@
                           <a:latin typeface="Calibri"/>
                           <a:cs typeface="Calibri"/>
                         </a:rPr>
-                        <a:t>6,517.7</a:t>
+                        <a:t>6,527.3</a:t>
                       </a:r>
                     </a:p>
                   </a:txBody>
@@ -14548,7 +14548,7 @@
           <a:p>
             <a:r>
               <a:rPr/>
-              <a:t>Pack date: 02 March 2021</a:t>
+              <a:t>Pack date: 03 March 2021</a:t>
             </a:r>
           </a:p>
         </p:txBody>
@@ -14629,7 +14629,7 @@
           <a:p>
             <a:r>
               <a:rPr/>
-              <a:t>Lower Tier Local Authority rolling cases as at 02 March</a:t>
+              <a:t>Lower Tier Local Authority rolling cases as at 03 March</a:t>
             </a:r>
           </a:p>
         </p:txBody>
@@ -14710,7 +14710,7 @@
           <a:p>
             <a:r>
               <a:rPr/>
-              <a:t>Note that the very recent days are excluded in the 7-day total as these are thought to be incomplete. As such, this data represents cases in the seven days to 25 February</a:t>
+              <a:t>Note that the very recent days are excluded in the 7-day total as these are thought to be incomplete. As such, this data represents cases in the seven days to 26 February</a:t>
             </a:r>
           </a:p>
         </p:txBody>
@@ -15164,7 +15164,7 @@
                           <a:latin typeface="Calibri"/>
                           <a:cs typeface="Calibri"/>
                         </a:rPr>
-                        <a:t>28</a:t>
+                        <a:t>27</a:t>
                       </a:r>
                     </a:p>
                   </a:txBody>
@@ -15230,7 +15230,7 @@
                           <a:latin typeface="Calibri"/>
                           <a:cs typeface="Calibri"/>
                         </a:rPr>
-                        <a:t>43.5</a:t>
+                        <a:t>42.0</a:t>
                       </a:r>
                     </a:p>
                   </a:txBody>
@@ -15296,7 +15296,7 @@
                           <a:latin typeface="Calibri"/>
                           <a:cs typeface="Calibri"/>
                         </a:rPr>
-                        <a:t>276th</a:t>
+                        <a:t>274th</a:t>
                       </a:r>
                     </a:p>
                   </a:txBody>
@@ -15496,7 +15496,7 @@
                           <a:latin typeface="Calibri"/>
                           <a:cs typeface="Calibri"/>
                         </a:rPr>
-                        <a:t>158</a:t>
+                        <a:t>140</a:t>
                       </a:r>
                     </a:p>
                   </a:txBody>
@@ -15562,7 +15562,7 @@
                           <a:latin typeface="Calibri"/>
                           <a:cs typeface="Calibri"/>
                         </a:rPr>
-                        <a:t>98.3</a:t>
+                        <a:t>87.1</a:t>
                       </a:r>
                     </a:p>
                   </a:txBody>
@@ -15628,7 +15628,7 @@
                           <a:latin typeface="Calibri"/>
                           <a:cs typeface="Calibri"/>
                         </a:rPr>
-                        <a:t>125th</a:t>
+                        <a:t>138th</a:t>
                       </a:r>
                     </a:p>
                   </a:txBody>
@@ -15828,7 +15828,7 @@
                           <a:latin typeface="Calibri"/>
                           <a:cs typeface="Calibri"/>
                         </a:rPr>
-                        <a:t>62</a:t>
+                        <a:t>53</a:t>
                       </a:r>
                     </a:p>
                   </a:txBody>
@@ -15894,7 +15894,7 @@
                           <a:latin typeface="Calibri"/>
                           <a:cs typeface="Calibri"/>
                         </a:rPr>
-                        <a:t>51.2</a:t>
+                        <a:t>43.8</a:t>
                       </a:r>
                     </a:p>
                   </a:txBody>
@@ -15960,7 +15960,7 @@
                           <a:latin typeface="Calibri"/>
                           <a:cs typeface="Calibri"/>
                         </a:rPr>
-                        <a:t>250th</a:t>
+                        <a:t>267th</a:t>
                       </a:r>
                     </a:p>
                   </a:txBody>
@@ -16026,7 +16026,7 @@
                           <a:latin typeface="Calibri"/>
                           <a:cs typeface="Calibri"/>
                         </a:rPr>
-                        <a:t>Decile 8</a:t>
+                        <a:t>Decile 9</a:t>
                       </a:r>
                     </a:p>
                   </a:txBody>
@@ -16160,7 +16160,7 @@
                           <a:latin typeface="Calibri"/>
                           <a:cs typeface="Calibri"/>
                         </a:rPr>
-                        <a:t>116</a:t>
+                        <a:t>108</a:t>
                       </a:r>
                     </a:p>
                   </a:txBody>
@@ -16226,7 +16226,7 @@
                           <a:latin typeface="Calibri"/>
                           <a:cs typeface="Calibri"/>
                         </a:rPr>
-                        <a:t>103.2</a:t>
+                        <a:t>96.1</a:t>
                       </a:r>
                     </a:p>
                   </a:txBody>
@@ -16292,7 +16292,7 @@
                           <a:latin typeface="Calibri"/>
                           <a:cs typeface="Calibri"/>
                         </a:rPr>
-                        <a:t>114th</a:t>
+                        <a:t>113th</a:t>
                       </a:r>
                     </a:p>
                   </a:txBody>
@@ -16492,7 +16492,7 @@
                           <a:latin typeface="Calibri"/>
                           <a:cs typeface="Calibri"/>
                         </a:rPr>
-                        <a:t>42</a:t>
+                        <a:t>40</a:t>
                       </a:r>
                     </a:p>
                   </a:txBody>
@@ -16558,7 +16558,7 @@
                           <a:latin typeface="Calibri"/>
                           <a:cs typeface="Calibri"/>
                         </a:rPr>
-                        <a:t>29.2</a:t>
+                        <a:t>27.8</a:t>
                       </a:r>
                     </a:p>
                   </a:txBody>
@@ -16624,7 +16624,7 @@
                           <a:latin typeface="Calibri"/>
                           <a:cs typeface="Calibri"/>
                         </a:rPr>
-                        <a:t>305th</a:t>
+                        <a:t>303rd</a:t>
                       </a:r>
                     </a:p>
                   </a:txBody>
@@ -16825,7 +16825,7 @@
                           <a:latin typeface="Calibri"/>
                           <a:cs typeface="Calibri"/>
                         </a:rPr>
-                        <a:t>95</a:t>
+                        <a:t>78</a:t>
                       </a:r>
                     </a:p>
                   </a:txBody>
@@ -16891,7 +16891,7 @@
                           <a:latin typeface="Calibri"/>
                           <a:cs typeface="Calibri"/>
                         </a:rPr>
-                        <a:t>62.9</a:t>
+                        <a:t>51.6</a:t>
                       </a:r>
                     </a:p>
                   </a:txBody>
@@ -16957,7 +16957,7 @@
                           <a:latin typeface="Calibri"/>
                           <a:cs typeface="Calibri"/>
                         </a:rPr>
-                        <a:t>213th</a:t>
+                        <a:t>231st</a:t>
                       </a:r>
                     </a:p>
                   </a:txBody>
@@ -17023,7 +17023,7 @@
                           <a:latin typeface="Calibri"/>
                           <a:cs typeface="Calibri"/>
                         </a:rPr>
-                        <a:t>Decile 7</a:t>
+                        <a:t>Decile 8</a:t>
                       </a:r>
                     </a:p>
                   </a:txBody>
@@ -17157,7 +17157,7 @@
                           <a:latin typeface="Calibri"/>
                           <a:cs typeface="Calibri"/>
                         </a:rPr>
-                        <a:t>122</a:t>
+                        <a:t>120</a:t>
                       </a:r>
                     </a:p>
                   </a:txBody>
@@ -17223,7 +17223,7 @@
                           <a:latin typeface="Calibri"/>
                           <a:cs typeface="Calibri"/>
                         </a:rPr>
-                        <a:t>110.3</a:t>
+                        <a:t>108.5</a:t>
                       </a:r>
                     </a:p>
                   </a:txBody>
@@ -17289,7 +17289,7 @@
                           <a:latin typeface="Calibri"/>
                           <a:cs typeface="Calibri"/>
                         </a:rPr>
-                        <a:t>100th</a:t>
+                        <a:t>88th</a:t>
                       </a:r>
                     </a:p>
                   </a:txBody>
@@ -17355,7 +17355,7 @@
                           <a:latin typeface="Calibri"/>
                           <a:cs typeface="Calibri"/>
                         </a:rPr>
-                        <a:t>Decile 4</a:t>
+                        <a:t>Decile 3</a:t>
                       </a:r>
                     </a:p>
                   </a:txBody>
@@ -17489,7 +17489,7 @@
                           <a:latin typeface="Calibri"/>
                           <a:cs typeface="Calibri"/>
                         </a:rPr>
-                        <a:t>623</a:t>
+                        <a:t>566</a:t>
                       </a:r>
                     </a:p>
                   </a:txBody>
@@ -17555,7 +17555,7 @@
                           <a:latin typeface="Calibri"/>
                           <a:cs typeface="Calibri"/>
                         </a:rPr>
-                        <a:t>72.1</a:t>
+                        <a:t>65.5</a:t>
                       </a:r>
                     </a:p>
                   </a:txBody>
@@ -17821,7 +17821,7 @@
                           <a:latin typeface="Calibri"/>
                           <a:cs typeface="Calibri"/>
                         </a:rPr>
-                        <a:t>54,676</a:t>
+                        <a:t>51,447</a:t>
                       </a:r>
                     </a:p>
                   </a:txBody>
@@ -17887,7 +17887,7 @@
                           <a:latin typeface="Calibri"/>
                           <a:cs typeface="Calibri"/>
                         </a:rPr>
-                        <a:t>97.1</a:t>
+                        <a:t>91.4</a:t>
                       </a:r>
                     </a:p>
                   </a:txBody>
@@ -18153,7 +18153,7 @@
                           <a:latin typeface="Calibri"/>
                           <a:cs typeface="Calibri"/>
                         </a:rPr>
-                        <a:t>5,982</a:t>
+                        <a:t>5,563</a:t>
                       </a:r>
                     </a:p>
                   </a:txBody>
@@ -18219,7 +18219,7 @@
                           <a:latin typeface="Calibri"/>
                           <a:cs typeface="Calibri"/>
                         </a:rPr>
-                        <a:t>65.2</a:t>
+                        <a:t>60.6</a:t>
                       </a:r>
                     </a:p>
                   </a:txBody>
@@ -18442,7 +18442,7 @@
           <a:p>
             <a:r>
               <a:rPr/>
-              <a:t>Pack date: 02 March 2021</a:t>
+              <a:t>Pack date: 03 March 2021</a:t>
             </a:r>
           </a:p>
         </p:txBody>
@@ -18600,7 +18600,7 @@
           <a:p>
             <a:r>
               <a:rPr/>
-              <a:t>Pack date: 02 March 2021</a:t>
+              <a:t>Pack date: 03 March 2021</a:t>
             </a:r>
           </a:p>
         </p:txBody>
@@ -18758,7 +18758,7 @@
           <a:p>
             <a:r>
               <a:rPr/>
-              <a:t>Pack date: 02 March 2021</a:t>
+              <a:t>Pack date: 03 March 2021</a:t>
             </a:r>
           </a:p>
         </p:txBody>
@@ -18916,7 +18916,7 @@
           <a:p>
             <a:r>
               <a:rPr/>
-              <a:t>Pack date: 02 March 2021</a:t>
+              <a:t>Pack date: 03 March 2021</a:t>
             </a:r>
           </a:p>
         </p:txBody>
@@ -19074,7 +19074,7 @@
           <a:p>
             <a:r>
               <a:rPr/>
-              <a:t>Pack date: 02 March 2021</a:t>
+              <a:t>Pack date: 03 March 2021</a:t>
             </a:r>
           </a:p>
         </p:txBody>
@@ -19263,7 +19263,7 @@
           <a:p>
             <a:r>
               <a:rPr/>
-              <a:t>Pack date: 02 March 2021</a:t>
+              <a:t>Pack date: 03 March 2021</a:t>
             </a:r>
           </a:p>
         </p:txBody>
@@ -19421,7 +19421,7 @@
           <a:p>
             <a:r>
               <a:rPr/>
-              <a:t>Pack date: 02 March 2021</a:t>
+              <a:t>Pack date: 03 March 2021</a:t>
             </a:r>
           </a:p>
         </p:txBody>
@@ -19579,7 +19579,7 @@
           <a:p>
             <a:r>
               <a:rPr/>
-              <a:t>Pack date: 02 March 2021</a:t>
+              <a:t>Pack date: 03 March 2021</a:t>
             </a:r>
           </a:p>
         </p:txBody>
@@ -19737,7 +19737,7 @@
           <a:p>
             <a:r>
               <a:rPr/>
-              <a:t>Pack date: 02 March 2021</a:t>
+              <a:t>Pack date: 03 March 2021</a:t>
             </a:r>
           </a:p>
         </p:txBody>
@@ -19895,7 +19895,7 @@
           <a:p>
             <a:r>
               <a:rPr/>
-              <a:t>Pack date: 02 March 2021</a:t>
+              <a:t>Pack date: 03 March 2021</a:t>
             </a:r>
           </a:p>
         </p:txBody>
@@ -20027,7 +20027,7 @@
           <a:p>
             <a:r>
               <a:rPr/>
-              <a:t>Pack date: 02 March 2021</a:t>
+              <a:t>Pack date: 03 March 2021</a:t>
             </a:r>
           </a:p>
         </p:txBody>
@@ -20159,7 +20159,7 @@
           <a:p>
             <a:r>
               <a:rPr/>
-              <a:t>Pack date: 02 March 2021</a:t>
+              <a:t>Pack date: 03 March 2021</a:t>
             </a:r>
           </a:p>
         </p:txBody>
@@ -20291,7 +20291,7 @@
           <a:p>
             <a:r>
               <a:rPr/>
-              <a:t>Pack date: 02 March 2021</a:t>
+              <a:t>Pack date: 03 March 2021</a:t>
             </a:r>
           </a:p>
         </p:txBody>
@@ -20423,7 +20423,7 @@
           <a:p>
             <a:r>
               <a:rPr/>
-              <a:t>Pack date: 02 March 2021</a:t>
+              <a:t>Pack date: 03 March 2021</a:t>
             </a:r>
           </a:p>
         </p:txBody>
@@ -20555,7 +20555,7 @@
           <a:p>
             <a:r>
               <a:rPr/>
-              <a:t>Pack date: 02 March 2021</a:t>
+              <a:t>Pack date: 03 March 2021</a:t>
             </a:r>
           </a:p>
         </p:txBody>
@@ -20687,7 +20687,7 @@
           <a:p>
             <a:r>
               <a:rPr/>
-              <a:t>Pack date: 02 March 2021</a:t>
+              <a:t>Pack date: 03 March 2021</a:t>
             </a:r>
           </a:p>
         </p:txBody>

</xml_diff>

<commit_message>
March 04 update - plus x axis label fix
</commit_message>
<xml_diff>
--- a/Latest_West_Sussex_C19_slide_deck.pptx
+++ b/Latest_West_Sussex_C19_slide_deck.pptx
@@ -7176,7 +7176,7 @@
           <a:p>
             <a:r>
               <a:rPr/>
-              <a:t>Pack date: 03 March 2021</a:t>
+              <a:t>Pack date: 04 March 2021</a:t>
             </a:r>
           </a:p>
         </p:txBody>
@@ -7308,7 +7308,7 @@
           <a:p>
             <a:r>
               <a:rPr/>
-              <a:t>Pack date: 03 March 2021</a:t>
+              <a:t>Pack date: 04 March 2021</a:t>
             </a:r>
           </a:p>
         </p:txBody>
@@ -7466,7 +7466,7 @@
           <a:p>
             <a:r>
               <a:rPr/>
-              <a:t>Pack date: 03 March 2021</a:t>
+              <a:t>Pack date: 04 March 2021</a:t>
             </a:r>
           </a:p>
         </p:txBody>
@@ -7547,7 +7547,7 @@
           <a:p>
             <a:r>
               <a:rPr/>
-              <a:t>Upper Tier Local Authority cumulative cases as at 03 March</a:t>
+              <a:t>Upper Tier Local Authority cumulative cases as at 04 March</a:t>
             </a:r>
           </a:p>
         </p:txBody>
@@ -8082,7 +8082,7 @@
                           <a:latin typeface="Calibri"/>
                           <a:cs typeface="Calibri"/>
                         </a:rPr>
-                        <a:t>40,360</a:t>
+                        <a:t>40,415</a:t>
                       </a:r>
                     </a:p>
                   </a:txBody>
@@ -8148,7 +8148,7 @@
                           <a:latin typeface="Calibri"/>
                           <a:cs typeface="Calibri"/>
                         </a:rPr>
-                        <a:t>4,671.4</a:t>
+                        <a:t>4,677.8</a:t>
                       </a:r>
                     </a:p>
                   </a:txBody>
@@ -8414,7 +8414,7 @@
                           <a:latin typeface="Calibri"/>
                           <a:cs typeface="Calibri"/>
                         </a:rPr>
-                        <a:t>3,674,028</a:t>
+                        <a:t>3,679,671</a:t>
                       </a:r>
                     </a:p>
                   </a:txBody>
@@ -8480,7 +8480,7 @@
                           <a:latin typeface="Calibri"/>
                           <a:cs typeface="Calibri"/>
                         </a:rPr>
-                        <a:t>6,527.3</a:t>
+                        <a:t>6,537.3</a:t>
                       </a:r>
                     </a:p>
                   </a:txBody>
@@ -8746,7 +8746,7 @@
                           <a:latin typeface="Calibri"/>
                           <a:cs typeface="Calibri"/>
                         </a:rPr>
-                        <a:t>520,743</a:t>
+                        <a:t>521,299</a:t>
                       </a:r>
                     </a:p>
                   </a:txBody>
@@ -8812,7 +8812,7 @@
                           <a:latin typeface="Calibri"/>
                           <a:cs typeface="Calibri"/>
                         </a:rPr>
-                        <a:t>5,672.5</a:t>
+                        <a:t>5,678.6</a:t>
                       </a:r>
                     </a:p>
                   </a:txBody>
@@ -9061,7 +9061,7 @@
           <a:p>
             <a:r>
               <a:rPr/>
-              <a:t>Pack date: 03 March 2021</a:t>
+              <a:t>Pack date: 04 March 2021</a:t>
             </a:r>
           </a:p>
         </p:txBody>
@@ -9142,7 +9142,7 @@
           <a:p>
             <a:r>
               <a:rPr/>
-              <a:t>Upper Tier Local Authority rolling 7 day cases as at 03 March</a:t>
+              <a:t>Upper Tier Local Authority rolling 7 day cases as at 04 March</a:t>
             </a:r>
           </a:p>
         </p:txBody>
@@ -9223,7 +9223,7 @@
           <a:p>
             <a:r>
               <a:rPr/>
-              <a:t>Note that the very recent days are excluded in the 7-day total as these are thought to be incomplete. As such, this data represents cases in the seven days to 26 February</a:t>
+              <a:t>Note that the very recent days are excluded in the 7-day total as these are thought to be incomplete. As such, this data represents cases in the seven days to 27 February</a:t>
             </a:r>
           </a:p>
         </p:txBody>
@@ -9677,7 +9677,7 @@
                           <a:latin typeface="Calibri"/>
                           <a:cs typeface="Calibri"/>
                         </a:rPr>
-                        <a:t>566</a:t>
+                        <a:t>518</a:t>
                       </a:r>
                     </a:p>
                   </a:txBody>
@@ -9743,7 +9743,7 @@
                           <a:latin typeface="Calibri"/>
                           <a:cs typeface="Calibri"/>
                         </a:rPr>
-                        <a:t>65.5</a:t>
+                        <a:t>60.0</a:t>
                       </a:r>
                     </a:p>
                   </a:txBody>
@@ -9809,7 +9809,7 @@
                           <a:latin typeface="Calibri"/>
                           <a:cs typeface="Calibri"/>
                         </a:rPr>
-                        <a:t>99th</a:t>
+                        <a:t>101st</a:t>
                       </a:r>
                     </a:p>
                   </a:txBody>
@@ -10009,7 +10009,7 @@
                           <a:latin typeface="Calibri"/>
                           <a:cs typeface="Calibri"/>
                         </a:rPr>
-                        <a:t>51,447</a:t>
+                        <a:t>48,656</a:t>
                       </a:r>
                     </a:p>
                   </a:txBody>
@@ -10075,7 +10075,7 @@
                           <a:latin typeface="Calibri"/>
                           <a:cs typeface="Calibri"/>
                         </a:rPr>
-                        <a:t>91.4</a:t>
+                        <a:t>86.4</a:t>
                       </a:r>
                     </a:p>
                   </a:txBody>
@@ -10341,7 +10341,7 @@
                           <a:latin typeface="Calibri"/>
                           <a:cs typeface="Calibri"/>
                         </a:rPr>
-                        <a:t>5,563</a:t>
+                        <a:t>5,202</a:t>
                       </a:r>
                     </a:p>
                   </a:txBody>
@@ -10407,7 +10407,7 @@
                           <a:latin typeface="Calibri"/>
                           <a:cs typeface="Calibri"/>
                         </a:rPr>
-                        <a:t>60.6</a:t>
+                        <a:t>56.7</a:t>
                       </a:r>
                     </a:p>
                   </a:txBody>
@@ -10656,7 +10656,7 @@
           <a:p>
             <a:r>
               <a:rPr/>
-              <a:t>Pack date: 03 March 2021</a:t>
+              <a:t>Pack date: 04 March 2021</a:t>
             </a:r>
           </a:p>
         </p:txBody>
@@ -10737,7 +10737,7 @@
           <a:p>
             <a:r>
               <a:rPr/>
-              <a:t>Lower Tier Local Authority cumulative cases as at 03 March</a:t>
+              <a:t>Lower Tier Local Authority cumulative cases as at 04 March</a:t>
             </a:r>
           </a:p>
         </p:txBody>
@@ -11245,7 +11245,7 @@
                           <a:latin typeface="Calibri"/>
                           <a:cs typeface="Calibri"/>
                         </a:rPr>
-                        <a:t>2,822</a:t>
+                        <a:t>2,823</a:t>
                       </a:r>
                     </a:p>
                   </a:txBody>
@@ -11311,7 +11311,7 @@
                           <a:latin typeface="Calibri"/>
                           <a:cs typeface="Calibri"/>
                         </a:rPr>
-                        <a:t>4,388.7</a:t>
+                        <a:t>4,390.3</a:t>
                       </a:r>
                     </a:p>
                   </a:txBody>
@@ -11577,7 +11577,7 @@
                           <a:latin typeface="Calibri"/>
                           <a:cs typeface="Calibri"/>
                         </a:rPr>
-                        <a:t>7,873</a:t>
+                        <a:t>7,899</a:t>
                       </a:r>
                     </a:p>
                   </a:txBody>
@@ -11643,7 +11643,7 @@
                           <a:latin typeface="Calibri"/>
                           <a:cs typeface="Calibri"/>
                         </a:rPr>
-                        <a:t>4,897.4</a:t>
+                        <a:t>4,913.6</a:t>
                       </a:r>
                     </a:p>
                   </a:txBody>
@@ -11909,7 +11909,7 @@
                           <a:latin typeface="Calibri"/>
                           <a:cs typeface="Calibri"/>
                         </a:rPr>
-                        <a:t>4,709</a:t>
+                        <a:t>4,714</a:t>
                       </a:r>
                     </a:p>
                   </a:txBody>
@@ -11975,7 +11975,7 @@
                           <a:latin typeface="Calibri"/>
                           <a:cs typeface="Calibri"/>
                         </a:rPr>
-                        <a:t>3,887.6</a:t>
+                        <a:t>3,891.7</a:t>
                       </a:r>
                     </a:p>
                   </a:txBody>
@@ -12241,7 +12241,7 @@
                           <a:latin typeface="Calibri"/>
                           <a:cs typeface="Calibri"/>
                         </a:rPr>
-                        <a:t>7,672</a:t>
+                        <a:t>7,678</a:t>
                       </a:r>
                     </a:p>
                   </a:txBody>
@@ -12307,7 +12307,7 @@
                           <a:latin typeface="Calibri"/>
                           <a:cs typeface="Calibri"/>
                         </a:rPr>
-                        <a:t>6,825.1</a:t>
+                        <a:t>6,830.4</a:t>
                       </a:r>
                     </a:p>
                   </a:txBody>
@@ -12373,7 +12373,7 @@
                           <a:latin typeface="Calibri"/>
                           <a:cs typeface="Calibri"/>
                         </a:rPr>
-                        <a:t>106th</a:t>
+                        <a:t>107th</a:t>
                       </a:r>
                     </a:p>
                   </a:txBody>
@@ -12573,7 +12573,7 @@
                           <a:latin typeface="Calibri"/>
                           <a:cs typeface="Calibri"/>
                         </a:rPr>
-                        <a:t>5,524</a:t>
+                        <a:t>5,527</a:t>
                       </a:r>
                     </a:p>
                   </a:txBody>
@@ -12639,7 +12639,7 @@
                           <a:latin typeface="Calibri"/>
                           <a:cs typeface="Calibri"/>
                         </a:rPr>
-                        <a:t>3,841.7</a:t>
+                        <a:t>3,843.8</a:t>
                       </a:r>
                     </a:p>
                   </a:txBody>
@@ -12905,7 +12905,7 @@
                           <a:latin typeface="Calibri"/>
                           <a:cs typeface="Calibri"/>
                         </a:rPr>
-                        <a:t>6,654</a:t>
+                        <a:t>6,660</a:t>
                       </a:r>
                     </a:p>
                   </a:txBody>
@@ -12971,7 +12971,7 @@
                           <a:latin typeface="Calibri"/>
                           <a:cs typeface="Calibri"/>
                         </a:rPr>
-                        <a:t>4,406.0</a:t>
+                        <a:t>4,410.0</a:t>
                       </a:r>
                     </a:p>
                   </a:txBody>
@@ -13237,7 +13237,7 @@
                           <a:latin typeface="Calibri"/>
                           <a:cs typeface="Calibri"/>
                         </a:rPr>
-                        <a:t>5,106</a:t>
+                        <a:t>5,114</a:t>
                       </a:r>
                     </a:p>
                   </a:txBody>
@@ -13303,7 +13303,7 @@
                           <a:latin typeface="Calibri"/>
                           <a:cs typeface="Calibri"/>
                         </a:rPr>
-                        <a:t>4,617.9</a:t>
+                        <a:t>4,625.1</a:t>
                       </a:r>
                     </a:p>
                   </a:txBody>
@@ -13369,7 +13369,7 @@
                           <a:latin typeface="Calibri"/>
                           <a:cs typeface="Calibri"/>
                         </a:rPr>
-                        <a:t>243rd</a:t>
+                        <a:t>244th</a:t>
                       </a:r>
                     </a:p>
                   </a:txBody>
@@ -13569,7 +13569,7 @@
                           <a:latin typeface="Calibri"/>
                           <a:cs typeface="Calibri"/>
                         </a:rPr>
-                        <a:t>40,360</a:t>
+                        <a:t>40,415</a:t>
                       </a:r>
                     </a:p>
                   </a:txBody>
@@ -13635,7 +13635,7 @@
                           <a:latin typeface="Calibri"/>
                           <a:cs typeface="Calibri"/>
                         </a:rPr>
-                        <a:t>4,671.4</a:t>
+                        <a:t>4,677.8</a:t>
                       </a:r>
                     </a:p>
                   </a:txBody>
@@ -13901,7 +13901,7 @@
                           <a:latin typeface="Calibri"/>
                           <a:cs typeface="Calibri"/>
                         </a:rPr>
-                        <a:t>520,743</a:t>
+                        <a:t>521,299</a:t>
                       </a:r>
                     </a:p>
                   </a:txBody>
@@ -13967,7 +13967,7 @@
                           <a:latin typeface="Calibri"/>
                           <a:cs typeface="Calibri"/>
                         </a:rPr>
-                        <a:t>5,672.5</a:t>
+                        <a:t>5,678.6</a:t>
                       </a:r>
                     </a:p>
                   </a:txBody>
@@ -14233,7 +14233,7 @@
                           <a:latin typeface="Calibri"/>
                           <a:cs typeface="Calibri"/>
                         </a:rPr>
-                        <a:t>3,674,028</a:t>
+                        <a:t>3,679,671</a:t>
                       </a:r>
                     </a:p>
                   </a:txBody>
@@ -14299,7 +14299,7 @@
                           <a:latin typeface="Calibri"/>
                           <a:cs typeface="Calibri"/>
                         </a:rPr>
-                        <a:t>6,527.3</a:t>
+                        <a:t>6,537.3</a:t>
                       </a:r>
                     </a:p>
                   </a:txBody>
@@ -14548,7 +14548,7 @@
           <a:p>
             <a:r>
               <a:rPr/>
-              <a:t>Pack date: 03 March 2021</a:t>
+              <a:t>Pack date: 04 March 2021</a:t>
             </a:r>
           </a:p>
         </p:txBody>
@@ -14629,7 +14629,7 @@
           <a:p>
             <a:r>
               <a:rPr/>
-              <a:t>Lower Tier Local Authority rolling cases as at 03 March</a:t>
+              <a:t>Lower Tier Local Authority rolling cases as at 04 March</a:t>
             </a:r>
           </a:p>
         </p:txBody>
@@ -14710,7 +14710,7 @@
           <a:p>
             <a:r>
               <a:rPr/>
-              <a:t>Note that the very recent days are excluded in the 7-day total as these are thought to be incomplete. As such, this data represents cases in the seven days to 26 February</a:t>
+              <a:t>Note that the very recent days are excluded in the 7-day total as these are thought to be incomplete. As such, this data represents cases in the seven days to 27 February</a:t>
             </a:r>
           </a:p>
         </p:txBody>
@@ -15164,7 +15164,7 @@
                           <a:latin typeface="Calibri"/>
                           <a:cs typeface="Calibri"/>
                         </a:rPr>
-                        <a:t>27</a:t>
+                        <a:t>28</a:t>
                       </a:r>
                     </a:p>
                   </a:txBody>
@@ -15230,7 +15230,7 @@
                           <a:latin typeface="Calibri"/>
                           <a:cs typeface="Calibri"/>
                         </a:rPr>
-                        <a:t>42.0</a:t>
+                        <a:t>43.5</a:t>
                       </a:r>
                     </a:p>
                   </a:txBody>
@@ -15296,7 +15296,7 @@
                           <a:latin typeface="Calibri"/>
                           <a:cs typeface="Calibri"/>
                         </a:rPr>
-                        <a:t>274th</a:t>
+                        <a:t>253rd</a:t>
                       </a:r>
                     </a:p>
                   </a:txBody>
@@ -15496,7 +15496,7 @@
                           <a:latin typeface="Calibri"/>
                           <a:cs typeface="Calibri"/>
                         </a:rPr>
-                        <a:t>140</a:t>
+                        <a:t>130</a:t>
                       </a:r>
                     </a:p>
                   </a:txBody>
@@ -15562,7 +15562,7 @@
                           <a:latin typeface="Calibri"/>
                           <a:cs typeface="Calibri"/>
                         </a:rPr>
-                        <a:t>87.1</a:t>
+                        <a:t>80.9</a:t>
                       </a:r>
                     </a:p>
                   </a:txBody>
@@ -15628,7 +15628,7 @@
                           <a:latin typeface="Calibri"/>
                           <a:cs typeface="Calibri"/>
                         </a:rPr>
-                        <a:t>138th</a:t>
+                        <a:t>140th</a:t>
                       </a:r>
                     </a:p>
                   </a:txBody>
@@ -15828,7 +15828,7 @@
                           <a:latin typeface="Calibri"/>
                           <a:cs typeface="Calibri"/>
                         </a:rPr>
-                        <a:t>53</a:t>
+                        <a:t>44</a:t>
                       </a:r>
                     </a:p>
                   </a:txBody>
@@ -15894,7 +15894,7 @@
                           <a:latin typeface="Calibri"/>
                           <a:cs typeface="Calibri"/>
                         </a:rPr>
-                        <a:t>43.8</a:t>
+                        <a:t>36.3</a:t>
                       </a:r>
                     </a:p>
                   </a:txBody>
@@ -15960,7 +15960,7 @@
                           <a:latin typeface="Calibri"/>
                           <a:cs typeface="Calibri"/>
                         </a:rPr>
-                        <a:t>267th</a:t>
+                        <a:t>281st</a:t>
                       </a:r>
                     </a:p>
                   </a:txBody>
@@ -16160,7 +16160,7 @@
                           <a:latin typeface="Calibri"/>
                           <a:cs typeface="Calibri"/>
                         </a:rPr>
-                        <a:t>108</a:t>
+                        <a:t>101</a:t>
                       </a:r>
                     </a:p>
                   </a:txBody>
@@ -16226,7 +16226,7 @@
                           <a:latin typeface="Calibri"/>
                           <a:cs typeface="Calibri"/>
                         </a:rPr>
-                        <a:t>96.1</a:t>
+                        <a:t>89.9</a:t>
                       </a:r>
                     </a:p>
                   </a:txBody>
@@ -16292,7 +16292,7 @@
                           <a:latin typeface="Calibri"/>
                           <a:cs typeface="Calibri"/>
                         </a:rPr>
-                        <a:t>113th</a:t>
+                        <a:t>120th</a:t>
                       </a:r>
                     </a:p>
                   </a:txBody>
@@ -16492,7 +16492,7 @@
                           <a:latin typeface="Calibri"/>
                           <a:cs typeface="Calibri"/>
                         </a:rPr>
-                        <a:t>40</a:t>
+                        <a:t>36</a:t>
                       </a:r>
                     </a:p>
                   </a:txBody>
@@ -16558,7 +16558,7 @@
                           <a:latin typeface="Calibri"/>
                           <a:cs typeface="Calibri"/>
                         </a:rPr>
-                        <a:t>27.8</a:t>
+                        <a:t>25.0</a:t>
                       </a:r>
                     </a:p>
                   </a:txBody>
@@ -16624,7 +16624,7 @@
                           <a:latin typeface="Calibri"/>
                           <a:cs typeface="Calibri"/>
                         </a:rPr>
-                        <a:t>303rd</a:t>
+                        <a:t>304th</a:t>
                       </a:r>
                     </a:p>
                   </a:txBody>
@@ -16825,7 +16825,7 @@
                           <a:latin typeface="Calibri"/>
                           <a:cs typeface="Calibri"/>
                         </a:rPr>
-                        <a:t>78</a:t>
+                        <a:t>65</a:t>
                       </a:r>
                     </a:p>
                   </a:txBody>
@@ -16891,7 +16891,7 @@
                           <a:latin typeface="Calibri"/>
                           <a:cs typeface="Calibri"/>
                         </a:rPr>
-                        <a:t>51.6</a:t>
+                        <a:t>43.0</a:t>
                       </a:r>
                     </a:p>
                   </a:txBody>
@@ -16957,7 +16957,7 @@
                           <a:latin typeface="Calibri"/>
                           <a:cs typeface="Calibri"/>
                         </a:rPr>
-                        <a:t>231st</a:t>
+                        <a:t>256th</a:t>
                       </a:r>
                     </a:p>
                   </a:txBody>
@@ -17023,7 +17023,7 @@
                           <a:latin typeface="Calibri"/>
                           <a:cs typeface="Calibri"/>
                         </a:rPr>
-                        <a:t>Decile 8</a:t>
+                        <a:t>Decile 9</a:t>
                       </a:r>
                     </a:p>
                   </a:txBody>
@@ -17157,7 +17157,7 @@
                           <a:latin typeface="Calibri"/>
                           <a:cs typeface="Calibri"/>
                         </a:rPr>
-                        <a:t>120</a:t>
+                        <a:t>114</a:t>
                       </a:r>
                     </a:p>
                   </a:txBody>
@@ -17223,7 +17223,7 @@
                           <a:latin typeface="Calibri"/>
                           <a:cs typeface="Calibri"/>
                         </a:rPr>
-                        <a:t>108.5</a:t>
+                        <a:t>103.1</a:t>
                       </a:r>
                     </a:p>
                   </a:txBody>
@@ -17289,7 +17289,7 @@
                           <a:latin typeface="Calibri"/>
                           <a:cs typeface="Calibri"/>
                         </a:rPr>
-                        <a:t>88th</a:t>
+                        <a:t>92nd</a:t>
                       </a:r>
                     </a:p>
                   </a:txBody>
@@ -17489,7 +17489,7 @@
                           <a:latin typeface="Calibri"/>
                           <a:cs typeface="Calibri"/>
                         </a:rPr>
-                        <a:t>566</a:t>
+                        <a:t>518</a:t>
                       </a:r>
                     </a:p>
                   </a:txBody>
@@ -17555,7 +17555,7 @@
                           <a:latin typeface="Calibri"/>
                           <a:cs typeface="Calibri"/>
                         </a:rPr>
-                        <a:t>65.5</a:t>
+                        <a:t>60.0</a:t>
                       </a:r>
                     </a:p>
                   </a:txBody>
@@ -17821,7 +17821,7 @@
                           <a:latin typeface="Calibri"/>
                           <a:cs typeface="Calibri"/>
                         </a:rPr>
-                        <a:t>51,447</a:t>
+                        <a:t>48,656</a:t>
                       </a:r>
                     </a:p>
                   </a:txBody>
@@ -17887,7 +17887,7 @@
                           <a:latin typeface="Calibri"/>
                           <a:cs typeface="Calibri"/>
                         </a:rPr>
-                        <a:t>91.4</a:t>
+                        <a:t>86.4</a:t>
                       </a:r>
                     </a:p>
                   </a:txBody>
@@ -18153,7 +18153,7 @@
                           <a:latin typeface="Calibri"/>
                           <a:cs typeface="Calibri"/>
                         </a:rPr>
-                        <a:t>5,563</a:t>
+                        <a:t>5,202</a:t>
                       </a:r>
                     </a:p>
                   </a:txBody>
@@ -18219,7 +18219,7 @@
                           <a:latin typeface="Calibri"/>
                           <a:cs typeface="Calibri"/>
                         </a:rPr>
-                        <a:t>60.6</a:t>
+                        <a:t>56.7</a:t>
                       </a:r>
                     </a:p>
                   </a:txBody>
@@ -18442,7 +18442,7 @@
           <a:p>
             <a:r>
               <a:rPr/>
-              <a:t>Pack date: 03 March 2021</a:t>
+              <a:t>Pack date: 04 March 2021</a:t>
             </a:r>
           </a:p>
         </p:txBody>
@@ -18600,7 +18600,7 @@
           <a:p>
             <a:r>
               <a:rPr/>
-              <a:t>Pack date: 03 March 2021</a:t>
+              <a:t>Pack date: 04 March 2021</a:t>
             </a:r>
           </a:p>
         </p:txBody>
@@ -18758,7 +18758,7 @@
           <a:p>
             <a:r>
               <a:rPr/>
-              <a:t>Pack date: 03 March 2021</a:t>
+              <a:t>Pack date: 04 March 2021</a:t>
             </a:r>
           </a:p>
         </p:txBody>
@@ -18916,7 +18916,7 @@
           <a:p>
             <a:r>
               <a:rPr/>
-              <a:t>Pack date: 03 March 2021</a:t>
+              <a:t>Pack date: 04 March 2021</a:t>
             </a:r>
           </a:p>
         </p:txBody>
@@ -19074,7 +19074,7 @@
           <a:p>
             <a:r>
               <a:rPr/>
-              <a:t>Pack date: 03 March 2021</a:t>
+              <a:t>Pack date: 04 March 2021</a:t>
             </a:r>
           </a:p>
         </p:txBody>
@@ -19263,7 +19263,7 @@
           <a:p>
             <a:r>
               <a:rPr/>
-              <a:t>Pack date: 03 March 2021</a:t>
+              <a:t>Pack date: 04 March 2021</a:t>
             </a:r>
           </a:p>
         </p:txBody>
@@ -19421,7 +19421,7 @@
           <a:p>
             <a:r>
               <a:rPr/>
-              <a:t>Pack date: 03 March 2021</a:t>
+              <a:t>Pack date: 04 March 2021</a:t>
             </a:r>
           </a:p>
         </p:txBody>
@@ -19579,7 +19579,7 @@
           <a:p>
             <a:r>
               <a:rPr/>
-              <a:t>Pack date: 03 March 2021</a:t>
+              <a:t>Pack date: 04 March 2021</a:t>
             </a:r>
           </a:p>
         </p:txBody>
@@ -19737,7 +19737,7 @@
           <a:p>
             <a:r>
               <a:rPr/>
-              <a:t>Pack date: 03 March 2021</a:t>
+              <a:t>Pack date: 04 March 2021</a:t>
             </a:r>
           </a:p>
         </p:txBody>
@@ -19895,7 +19895,7 @@
           <a:p>
             <a:r>
               <a:rPr/>
-              <a:t>Pack date: 03 March 2021</a:t>
+              <a:t>Pack date: 04 March 2021</a:t>
             </a:r>
           </a:p>
         </p:txBody>
@@ -20027,7 +20027,7 @@
           <a:p>
             <a:r>
               <a:rPr/>
-              <a:t>Pack date: 03 March 2021</a:t>
+              <a:t>Pack date: 04 March 2021</a:t>
             </a:r>
           </a:p>
         </p:txBody>
@@ -20159,7 +20159,7 @@
           <a:p>
             <a:r>
               <a:rPr/>
-              <a:t>Pack date: 03 March 2021</a:t>
+              <a:t>Pack date: 04 March 2021</a:t>
             </a:r>
           </a:p>
         </p:txBody>
@@ -20291,7 +20291,7 @@
           <a:p>
             <a:r>
               <a:rPr/>
-              <a:t>Pack date: 03 March 2021</a:t>
+              <a:t>Pack date: 04 March 2021</a:t>
             </a:r>
           </a:p>
         </p:txBody>
@@ -20423,7 +20423,7 @@
           <a:p>
             <a:r>
               <a:rPr/>
-              <a:t>Pack date: 03 March 2021</a:t>
+              <a:t>Pack date: 04 March 2021</a:t>
             </a:r>
           </a:p>
         </p:txBody>
@@ -20555,7 +20555,7 @@
           <a:p>
             <a:r>
               <a:rPr/>
-              <a:t>Pack date: 03 March 2021</a:t>
+              <a:t>Pack date: 04 March 2021</a:t>
             </a:r>
           </a:p>
         </p:txBody>
@@ -20687,7 +20687,7 @@
           <a:p>
             <a:r>
               <a:rPr/>
-              <a:t>Pack date: 03 March 2021</a:t>
+              <a:t>Pack date: 04 March 2021</a:t>
             </a:r>
           </a:p>
         </p:txBody>

</xml_diff>

<commit_message>
Fix bugs around extra LAs
</commit_message>
<xml_diff>
--- a/Latest_West_Sussex_C19_slide_deck.pptx
+++ b/Latest_West_Sussex_C19_slide_deck.pptx
@@ -7628,7 +7628,7 @@
           <a:p>
             <a:r>
               <a:rPr/>
-              <a:t>West Sussex is in the 8th decile.</a:t>
+              <a:t>West Sussex is in the 9th decile.</a:t>
             </a:r>
           </a:p>
         </p:txBody>
@@ -8214,7 +8214,7 @@
                           <a:latin typeface="Calibri"/>
                           <a:cs typeface="Calibri"/>
                         </a:rPr>
-                        <a:t>161st</a:t>
+                        <a:t>128th</a:t>
                       </a:r>
                     </a:p>
                   </a:txBody>
@@ -8280,7 +8280,7 @@
                           <a:latin typeface="Calibri"/>
                           <a:cs typeface="Calibri"/>
                         </a:rPr>
-                        <a:t>Decile 8</a:t>
+                        <a:t>Decile 9</a:t>
                       </a:r>
                     </a:p>
                   </a:txBody>
@@ -9809,7 +9809,7 @@
                           <a:latin typeface="Calibri"/>
                           <a:cs typeface="Calibri"/>
                         </a:rPr>
-                        <a:t>163rd</a:t>
+                        <a:t>115th</a:t>
                       </a:r>
                     </a:p>
                   </a:txBody>

</xml_diff>

<commit_message>
April 13 update scatter closer to publish
</commit_message>
<xml_diff>
--- a/Latest_West_Sussex_C19_slide_deck.pptx
+++ b/Latest_West_Sussex_C19_slide_deck.pptx
@@ -7547,7 +7547,7 @@
           <a:p>
             <a:r>
               <a:rPr/>
-              <a:t>Upper Tier Local Authority cumulative cases as at 12 April</a:t>
+              <a:t>Upper Tier Local Authority cumulative cases as at 13 April</a:t>
             </a:r>
           </a:p>
         </p:txBody>
@@ -8082,7 +8082,7 @@
                           <a:latin typeface="Calibri"/>
                           <a:cs typeface="Calibri"/>
                         </a:rPr>
-                        <a:t>41,549</a:t>
+                        <a:t>41,565</a:t>
                       </a:r>
                     </a:p>
                   </a:txBody>
@@ -8148,7 +8148,7 @@
                           <a:latin typeface="Calibri"/>
                           <a:cs typeface="Calibri"/>
                         </a:rPr>
-                        <a:t>4,809.0</a:t>
+                        <a:t>4,810.9</a:t>
                       </a:r>
                     </a:p>
                   </a:txBody>
@@ -8414,7 +8414,7 @@
                           <a:latin typeface="Calibri"/>
                           <a:cs typeface="Calibri"/>
                         </a:rPr>
-                        <a:t>3,822,371</a:t>
+                        <a:t>3,824,441</a:t>
                       </a:r>
                     </a:p>
                   </a:txBody>
@@ -8480,7 +8480,7 @@
                           <a:latin typeface="Calibri"/>
                           <a:cs typeface="Calibri"/>
                         </a:rPr>
-                        <a:t>6,790.9</a:t>
+                        <a:t>6,794.5</a:t>
                       </a:r>
                     </a:p>
                   </a:txBody>
@@ -9142,7 +9142,7 @@
           <a:p>
             <a:r>
               <a:rPr/>
-              <a:t>Upper Tier Local Authority rolling 7 day cases as at 12 April</a:t>
+              <a:t>Upper Tier Local Authority rolling 7 day cases as at 13 April</a:t>
             </a:r>
           </a:p>
         </p:txBody>
@@ -9223,7 +9223,7 @@
           <a:p>
             <a:r>
               <a:rPr/>
-              <a:t>Note that the very recent days are excluded in the 7-day total as these are thought to be incomplete. As such, this data represents cases in the seven days to 07 April</a:t>
+              <a:t>Note that the very recent days are excluded in the 7-day total as these are thought to be incomplete. As such, this data represents cases in the seven days to 08 April</a:t>
             </a:r>
           </a:p>
         </p:txBody>
@@ -9677,7 +9677,7 @@
                           <a:latin typeface="Calibri"/>
                           <a:cs typeface="Calibri"/>
                         </a:rPr>
-                        <a:t>129</a:t>
+                        <a:t>128</a:t>
                       </a:r>
                     </a:p>
                   </a:txBody>
@@ -9743,7 +9743,7 @@
                           <a:latin typeface="Calibri"/>
                           <a:cs typeface="Calibri"/>
                         </a:rPr>
-                        <a:t>14.9</a:t>
+                        <a:t>14.8</a:t>
                       </a:r>
                     </a:p>
                   </a:txBody>
@@ -9809,7 +9809,7 @@
                           <a:latin typeface="Calibri"/>
                           <a:cs typeface="Calibri"/>
                         </a:rPr>
-                        <a:t>115th</a:t>
+                        <a:t>116th</a:t>
                       </a:r>
                     </a:p>
                   </a:txBody>
@@ -10009,7 +10009,7 @@
                           <a:latin typeface="Calibri"/>
                           <a:cs typeface="Calibri"/>
                         </a:rPr>
-                        <a:t>15,799</a:t>
+                        <a:t>15,403</a:t>
                       </a:r>
                     </a:p>
                   </a:txBody>
@@ -10075,7 +10075,7 @@
                           <a:latin typeface="Calibri"/>
                           <a:cs typeface="Calibri"/>
                         </a:rPr>
-                        <a:t>28.1</a:t>
+                        <a:t>27.4</a:t>
                       </a:r>
                     </a:p>
                   </a:txBody>
@@ -10341,7 +10341,7 @@
                           <a:latin typeface="Calibri"/>
                           <a:cs typeface="Calibri"/>
                         </a:rPr>
-                        <a:t>1,617</a:t>
+                        <a:t>1,598</a:t>
                       </a:r>
                     </a:p>
                   </a:txBody>
@@ -10407,7 +10407,7 @@
                           <a:latin typeface="Calibri"/>
                           <a:cs typeface="Calibri"/>
                         </a:rPr>
-                        <a:t>17.6</a:t>
+                        <a:t>17.4</a:t>
                       </a:r>
                     </a:p>
                   </a:txBody>
@@ -10737,7 +10737,7 @@
           <a:p>
             <a:r>
               <a:rPr/>
-              <a:t>Lower Tier Local Authority cumulative cases as at 12 April</a:t>
+              <a:t>Lower Tier Local Authority cumulative cases as at 13 April</a:t>
             </a:r>
           </a:p>
         </p:txBody>
@@ -13569,7 +13569,7 @@
                           <a:latin typeface="Calibri"/>
                           <a:cs typeface="Calibri"/>
                         </a:rPr>
-                        <a:t>41,549</a:t>
+                        <a:t>41,565</a:t>
                       </a:r>
                     </a:p>
                   </a:txBody>
@@ -13635,7 +13635,7 @@
                           <a:latin typeface="Calibri"/>
                           <a:cs typeface="Calibri"/>
                         </a:rPr>
-                        <a:t>4,809.0</a:t>
+                        <a:t>4,810.9</a:t>
                       </a:r>
                     </a:p>
                   </a:txBody>
@@ -14233,7 +14233,7 @@
                           <a:latin typeface="Calibri"/>
                           <a:cs typeface="Calibri"/>
                         </a:rPr>
-                        <a:t>3,822,371</a:t>
+                        <a:t>3,824,441</a:t>
                       </a:r>
                     </a:p>
                   </a:txBody>
@@ -14299,7 +14299,7 @@
                           <a:latin typeface="Calibri"/>
                           <a:cs typeface="Calibri"/>
                         </a:rPr>
-                        <a:t>6,790.9</a:t>
+                        <a:t>6,794.5</a:t>
                       </a:r>
                     </a:p>
                   </a:txBody>
@@ -14629,7 +14629,7 @@
           <a:p>
             <a:r>
               <a:rPr/>
-              <a:t>Lower Tier Local Authority rolling cases as at 12 April</a:t>
+              <a:t>Lower Tier Local Authority rolling cases as at 13 April</a:t>
             </a:r>
           </a:p>
         </p:txBody>
@@ -14710,7 +14710,7 @@
           <a:p>
             <a:r>
               <a:rPr/>
-              <a:t>Note that the very recent days are excluded in the 7-day total as these are thought to be incomplete. As such, this data represents cases in the seven days to 07 April</a:t>
+              <a:t>Note that the very recent days are excluded in the 7-day total as these are thought to be incomplete. As such, this data represents cases in the seven days to 08 April</a:t>
             </a:r>
           </a:p>
         </p:txBody>
@@ -15296,7 +15296,7 @@
                           <a:latin typeface="Calibri"/>
                           <a:cs typeface="Calibri"/>
                         </a:rPr>
-                        <a:t>196th</a:t>
+                        <a:t>193rd</a:t>
                       </a:r>
                     </a:p>
                   </a:txBody>
@@ -15496,7 +15496,7 @@
                           <a:latin typeface="Calibri"/>
                           <a:cs typeface="Calibri"/>
                         </a:rPr>
-                        <a:t>40</a:t>
+                        <a:t>39</a:t>
                       </a:r>
                     </a:p>
                   </a:txBody>
@@ -15562,7 +15562,7 @@
                           <a:latin typeface="Calibri"/>
                           <a:cs typeface="Calibri"/>
                         </a:rPr>
-                        <a:t>24.9</a:t>
+                        <a:t>24.3</a:t>
                       </a:r>
                     </a:p>
                   </a:txBody>
@@ -15628,7 +15628,7 @@
                           <a:latin typeface="Calibri"/>
                           <a:cs typeface="Calibri"/>
                         </a:rPr>
-                        <a:t>122nd</a:t>
+                        <a:t>115th</a:t>
                       </a:r>
                     </a:p>
                   </a:txBody>
@@ -15828,7 +15828,7 @@
                           <a:latin typeface="Calibri"/>
                           <a:cs typeface="Calibri"/>
                         </a:rPr>
-                        <a:t>20</a:t>
+                        <a:t>17</a:t>
                       </a:r>
                     </a:p>
                   </a:txBody>
@@ -15894,7 +15894,7 @@
                           <a:latin typeface="Calibri"/>
                           <a:cs typeface="Calibri"/>
                         </a:rPr>
-                        <a:t>16.5</a:t>
+                        <a:t>14.0</a:t>
                       </a:r>
                     </a:p>
                   </a:txBody>
@@ -15960,7 +15960,7 @@
                           <a:latin typeface="Calibri"/>
                           <a:cs typeface="Calibri"/>
                         </a:rPr>
-                        <a:t>184th</a:t>
+                        <a:t>215th</a:t>
                       </a:r>
                     </a:p>
                   </a:txBody>
@@ -16026,7 +16026,7 @@
                           <a:latin typeface="Calibri"/>
                           <a:cs typeface="Calibri"/>
                         </a:rPr>
-                        <a:t>Decile 6</a:t>
+                        <a:t>Decile 7</a:t>
                       </a:r>
                     </a:p>
                   </a:txBody>
@@ -16292,7 +16292,7 @@
                           <a:latin typeface="Calibri"/>
                           <a:cs typeface="Calibri"/>
                         </a:rPr>
-                        <a:t>216th</a:t>
+                        <a:t>213th</a:t>
                       </a:r>
                     </a:p>
                   </a:txBody>
@@ -16492,7 +16492,7 @@
                           <a:latin typeface="Calibri"/>
                           <a:cs typeface="Calibri"/>
                         </a:rPr>
-                        <a:t>16</a:t>
+                        <a:t>15</a:t>
                       </a:r>
                     </a:p>
                   </a:txBody>
@@ -16558,7 +16558,7 @@
                           <a:latin typeface="Calibri"/>
                           <a:cs typeface="Calibri"/>
                         </a:rPr>
-                        <a:t>11.1</a:t>
+                        <a:t>10.4</a:t>
                       </a:r>
                     </a:p>
                   </a:txBody>
@@ -16624,7 +16624,7 @@
                           <a:latin typeface="Calibri"/>
                           <a:cs typeface="Calibri"/>
                         </a:rPr>
-                        <a:t>253rd</a:t>
+                        <a:t>263rd</a:t>
                       </a:r>
                     </a:p>
                   </a:txBody>
@@ -16824,7 +16824,7 @@
                           <a:latin typeface="Calibri"/>
                           <a:cs typeface="Calibri"/>
                         </a:rPr>
-                        <a:t>12</a:t>
+                        <a:t>14</a:t>
                       </a:r>
                     </a:p>
                   </a:txBody>
@@ -16890,7 +16890,7 @@
                           <a:latin typeface="Calibri"/>
                           <a:cs typeface="Calibri"/>
                         </a:rPr>
-                        <a:t>7.9</a:t>
+                        <a:t>9.3</a:t>
                       </a:r>
                     </a:p>
                   </a:txBody>
@@ -16956,7 +16956,7 @@
                           <a:latin typeface="Calibri"/>
                           <a:cs typeface="Calibri"/>
                         </a:rPr>
-                        <a:t>294th</a:t>
+                        <a:t>276th</a:t>
                       </a:r>
                     </a:p>
                   </a:txBody>
@@ -17022,8 +17022,7 @@
                           <a:latin typeface="Calibri"/>
                           <a:cs typeface="Calibri"/>
                         </a:rPr>
-                        <a:t>10% of authorities
-with lowest rate</a:t>
+                        <a:t>Decile 9</a:t>
                       </a:r>
                     </a:p>
                   </a:txBody>
@@ -17289,7 +17288,7 @@
                           <a:latin typeface="Calibri"/>
                           <a:cs typeface="Calibri"/>
                         </a:rPr>
-                        <a:t>221st</a:t>
+                        <a:t>220th</a:t>
                       </a:r>
                     </a:p>
                   </a:txBody>
@@ -17489,7 +17488,7 @@
                           <a:latin typeface="Calibri"/>
                           <a:cs typeface="Calibri"/>
                         </a:rPr>
-                        <a:t>129</a:t>
+                        <a:t>128</a:t>
                       </a:r>
                     </a:p>
                   </a:txBody>
@@ -17555,7 +17554,7 @@
                           <a:latin typeface="Calibri"/>
                           <a:cs typeface="Calibri"/>
                         </a:rPr>
-                        <a:t>14.9</a:t>
+                        <a:t>14.8</a:t>
                       </a:r>
                     </a:p>
                   </a:txBody>
@@ -17821,7 +17820,7 @@
                           <a:latin typeface="Calibri"/>
                           <a:cs typeface="Calibri"/>
                         </a:rPr>
-                        <a:t>15,799</a:t>
+                        <a:t>15,403</a:t>
                       </a:r>
                     </a:p>
                   </a:txBody>
@@ -17887,7 +17886,7 @@
                           <a:latin typeface="Calibri"/>
                           <a:cs typeface="Calibri"/>
                         </a:rPr>
-                        <a:t>28.1</a:t>
+                        <a:t>27.4</a:t>
                       </a:r>
                     </a:p>
                   </a:txBody>
@@ -18153,7 +18152,7 @@
                           <a:latin typeface="Calibri"/>
                           <a:cs typeface="Calibri"/>
                         </a:rPr>
-                        <a:t>1,617</a:t>
+                        <a:t>1,598</a:t>
                       </a:r>
                     </a:p>
                   </a:txBody>
@@ -18219,7 +18218,7 @@
                           <a:latin typeface="Calibri"/>
                           <a:cs typeface="Calibri"/>
                         </a:rPr>
-                        <a:t>17.6</a:t>
+                        <a:t>17.4</a:t>
                       </a:r>
                     </a:p>
                   </a:txBody>

</xml_diff>

<commit_message>
Update mortality 20 April
</commit_message>
<xml_diff>
--- a/Latest_West_Sussex_C19_slide_deck.pptx
+++ b/Latest_West_Sussex_C19_slide_deck.pptx
@@ -7176,7 +7176,7 @@
           <a:p>
             <a:r>
               <a:rPr/>
-              <a:t>Pack date: 19 April 2021</a:t>
+              <a:t>Pack date: 20 April 2021</a:t>
             </a:r>
           </a:p>
         </p:txBody>
@@ -7308,7 +7308,7 @@
           <a:p>
             <a:r>
               <a:rPr/>
-              <a:t>Pack date: 19 April 2021</a:t>
+              <a:t>Pack date: 20 April 2021</a:t>
             </a:r>
           </a:p>
         </p:txBody>
@@ -7466,7 +7466,7 @@
           <a:p>
             <a:r>
               <a:rPr/>
-              <a:t>Pack date: 19 April 2021</a:t>
+              <a:t>Pack date: 20 April 2021</a:t>
             </a:r>
           </a:p>
         </p:txBody>
@@ -9061,7 +9061,7 @@
           <a:p>
             <a:r>
               <a:rPr/>
-              <a:t>Pack date: 19 April 2021</a:t>
+              <a:t>Pack date: 20 April 2021</a:t>
             </a:r>
           </a:p>
         </p:txBody>
@@ -10656,7 +10656,7 @@
           <a:p>
             <a:r>
               <a:rPr/>
-              <a:t>Pack date: 19 April 2021</a:t>
+              <a:t>Pack date: 20 April 2021</a:t>
             </a:r>
           </a:p>
         </p:txBody>
@@ -14548,7 +14548,7 @@
           <a:p>
             <a:r>
               <a:rPr/>
-              <a:t>Pack date: 19 April 2021</a:t>
+              <a:t>Pack date: 20 April 2021</a:t>
             </a:r>
           </a:p>
         </p:txBody>
@@ -18442,7 +18442,7 @@
           <a:p>
             <a:r>
               <a:rPr/>
-              <a:t>Pack date: 19 April 2021</a:t>
+              <a:t>Pack date: 20 April 2021</a:t>
             </a:r>
           </a:p>
         </p:txBody>
@@ -18600,7 +18600,7 @@
           <a:p>
             <a:r>
               <a:rPr/>
-              <a:t>Pack date: 19 April 2021</a:t>
+              <a:t>Pack date: 20 April 2021</a:t>
             </a:r>
           </a:p>
         </p:txBody>
@@ -18758,7 +18758,7 @@
           <a:p>
             <a:r>
               <a:rPr/>
-              <a:t>Pack date: 19 April 2021</a:t>
+              <a:t>Pack date: 20 April 2021</a:t>
             </a:r>
           </a:p>
         </p:txBody>
@@ -18916,7 +18916,7 @@
           <a:p>
             <a:r>
               <a:rPr/>
-              <a:t>Pack date: 19 April 2021</a:t>
+              <a:t>Pack date: 20 April 2021</a:t>
             </a:r>
           </a:p>
         </p:txBody>
@@ -19074,7 +19074,7 @@
           <a:p>
             <a:r>
               <a:rPr/>
-              <a:t>Pack date: 19 April 2021</a:t>
+              <a:t>Pack date: 20 April 2021</a:t>
             </a:r>
           </a:p>
         </p:txBody>
@@ -19263,7 +19263,7 @@
           <a:p>
             <a:r>
               <a:rPr/>
-              <a:t>Pack date: 19 April 2021</a:t>
+              <a:t>Pack date: 20 April 2021</a:t>
             </a:r>
           </a:p>
         </p:txBody>
@@ -19421,7 +19421,7 @@
           <a:p>
             <a:r>
               <a:rPr/>
-              <a:t>Pack date: 19 April 2021</a:t>
+              <a:t>Pack date: 20 April 2021</a:t>
             </a:r>
           </a:p>
         </p:txBody>
@@ -19579,7 +19579,7 @@
           <a:p>
             <a:r>
               <a:rPr/>
-              <a:t>Pack date: 19 April 2021</a:t>
+              <a:t>Pack date: 20 April 2021</a:t>
             </a:r>
           </a:p>
         </p:txBody>
@@ -19737,7 +19737,7 @@
           <a:p>
             <a:r>
               <a:rPr/>
-              <a:t>Pack date: 19 April 2021</a:t>
+              <a:t>Pack date: 20 April 2021</a:t>
             </a:r>
           </a:p>
         </p:txBody>
@@ -19895,7 +19895,7 @@
           <a:p>
             <a:r>
               <a:rPr/>
-              <a:t>Pack date: 19 April 2021</a:t>
+              <a:t>Pack date: 20 April 2021</a:t>
             </a:r>
           </a:p>
         </p:txBody>
@@ -20027,7 +20027,7 @@
           <a:p>
             <a:r>
               <a:rPr/>
-              <a:t>Pack date: 19 April 2021</a:t>
+              <a:t>Pack date: 20 April 2021</a:t>
             </a:r>
           </a:p>
         </p:txBody>
@@ -20159,7 +20159,7 @@
           <a:p>
             <a:r>
               <a:rPr/>
-              <a:t>Pack date: 19 April 2021</a:t>
+              <a:t>Pack date: 20 April 2021</a:t>
             </a:r>
           </a:p>
         </p:txBody>
@@ -20291,7 +20291,7 @@
           <a:p>
             <a:r>
               <a:rPr/>
-              <a:t>Pack date: 19 April 2021</a:t>
+              <a:t>Pack date: 20 April 2021</a:t>
             </a:r>
           </a:p>
         </p:txBody>
@@ -20423,7 +20423,7 @@
           <a:p>
             <a:r>
               <a:rPr/>
-              <a:t>Pack date: 19 April 2021</a:t>
+              <a:t>Pack date: 20 April 2021</a:t>
             </a:r>
           </a:p>
         </p:txBody>
@@ -20555,7 +20555,7 @@
           <a:p>
             <a:r>
               <a:rPr/>
-              <a:t>Pack date: 19 April 2021</a:t>
+              <a:t>Pack date: 20 April 2021</a:t>
             </a:r>
           </a:p>
         </p:txBody>
@@ -20687,7 +20687,7 @@
           <a:p>
             <a:r>
               <a:rPr/>
-              <a:t>Pack date: 19 April 2021</a:t>
+              <a:t>Pack date: 20 April 2021</a:t>
             </a:r>
           </a:p>
         </p:txBody>

</xml_diff>

<commit_message>
April 22 update and vaccine
</commit_message>
<xml_diff>
--- a/Latest_West_Sussex_C19_slide_deck.pptx
+++ b/Latest_West_Sussex_C19_slide_deck.pptx
@@ -7176,7 +7176,7 @@
           <a:p>
             <a:r>
               <a:rPr/>
-              <a:t>Pack date: 21 April 2021</a:t>
+              <a:t>Pack date: 22 April 2021</a:t>
             </a:r>
           </a:p>
         </p:txBody>
@@ -7308,7 +7308,7 @@
           <a:p>
             <a:r>
               <a:rPr/>
-              <a:t>Pack date: 21 April 2021</a:t>
+              <a:t>Pack date: 22 April 2021</a:t>
             </a:r>
           </a:p>
         </p:txBody>
@@ -7466,7 +7466,7 @@
           <a:p>
             <a:r>
               <a:rPr/>
-              <a:t>Pack date: 21 April 2021</a:t>
+              <a:t>Pack date: 22 April 2021</a:t>
             </a:r>
           </a:p>
         </p:txBody>
@@ -7547,7 +7547,7 @@
           <a:p>
             <a:r>
               <a:rPr/>
-              <a:t>Upper Tier Local Authority cumulative cases as at 21 April</a:t>
+              <a:t>Upper Tier Local Authority cumulative cases as at 22 April</a:t>
             </a:r>
           </a:p>
         </p:txBody>
@@ -8082,7 +8082,7 @@
                           <a:latin typeface="Calibri"/>
                           <a:cs typeface="Calibri"/>
                         </a:rPr>
-                        <a:t>41,730</a:t>
+                        <a:t>41,753</a:t>
                       </a:r>
                     </a:p>
                   </a:txBody>
@@ -8148,7 +8148,7 @@
                           <a:latin typeface="Calibri"/>
                           <a:cs typeface="Calibri"/>
                         </a:rPr>
-                        <a:t>4,830.0</a:t>
+                        <a:t>4,832.6</a:t>
                       </a:r>
                     </a:p>
                   </a:txBody>
@@ -8414,7 +8414,7 @@
                           <a:latin typeface="Calibri"/>
                           <a:cs typeface="Calibri"/>
                         </a:rPr>
-                        <a:t>3,840,945</a:t>
+                        <a:t>3,843,260</a:t>
                       </a:r>
                     </a:p>
                   </a:txBody>
@@ -8480,7 +8480,7 @@
                           <a:latin typeface="Calibri"/>
                           <a:cs typeface="Calibri"/>
                         </a:rPr>
-                        <a:t>6,823.9</a:t>
+                        <a:t>6,828.0</a:t>
                       </a:r>
                     </a:p>
                   </a:txBody>
@@ -8746,7 +8746,7 @@
                           <a:latin typeface="Calibri"/>
                           <a:cs typeface="Calibri"/>
                         </a:rPr>
-                        <a:t>537,870</a:t>
+                        <a:t>538,127</a:t>
                       </a:r>
                     </a:p>
                   </a:txBody>
@@ -8812,7 +8812,7 @@
                           <a:latin typeface="Calibri"/>
                           <a:cs typeface="Calibri"/>
                         </a:rPr>
-                        <a:t>5,859.1</a:t>
+                        <a:t>5,861.9</a:t>
                       </a:r>
                     </a:p>
                   </a:txBody>
@@ -9061,7 +9061,7 @@
           <a:p>
             <a:r>
               <a:rPr/>
-              <a:t>Pack date: 21 April 2021</a:t>
+              <a:t>Pack date: 22 April 2021</a:t>
             </a:r>
           </a:p>
         </p:txBody>
@@ -9142,7 +9142,7 @@
           <a:p>
             <a:r>
               <a:rPr/>
-              <a:t>Upper Tier Local Authority rolling 7 day cases as at 21 April</a:t>
+              <a:t>Upper Tier Local Authority rolling 7 day cases as at 22 April</a:t>
             </a:r>
           </a:p>
         </p:txBody>
@@ -9223,7 +9223,7 @@
           <a:p>
             <a:r>
               <a:rPr/>
-              <a:t>Note that the very recent days are excluded in the 7-day total as these are thought to be incomplete. As such, this data represents cases in the seven days to 16 April</a:t>
+              <a:t>Note that the very recent days are excluded in the 7-day total as these are thought to be incomplete. As such, this data represents cases in the seven days to 17 April</a:t>
             </a:r>
           </a:p>
         </p:txBody>
@@ -9677,7 +9677,7 @@
                           <a:latin typeface="Calibri"/>
                           <a:cs typeface="Calibri"/>
                         </a:rPr>
-                        <a:t>140</a:t>
+                        <a:t>135</a:t>
                       </a:r>
                     </a:p>
                   </a:txBody>
@@ -9743,7 +9743,7 @@
                           <a:latin typeface="Calibri"/>
                           <a:cs typeface="Calibri"/>
                         </a:rPr>
-                        <a:t>16.2</a:t>
+                        <a:t>15.6</a:t>
                       </a:r>
                     </a:p>
                   </a:txBody>
@@ -10009,7 +10009,7 @@
                           <a:latin typeface="Calibri"/>
                           <a:cs typeface="Calibri"/>
                         </a:rPr>
-                        <a:t>13,979</a:t>
+                        <a:t>13,423</a:t>
                       </a:r>
                     </a:p>
                   </a:txBody>
@@ -10075,7 +10075,7 @@
                           <a:latin typeface="Calibri"/>
                           <a:cs typeface="Calibri"/>
                         </a:rPr>
-                        <a:t>24.8</a:t>
+                        <a:t>23.8</a:t>
                       </a:r>
                     </a:p>
                   </a:txBody>
@@ -10341,7 +10341,7 @@
                           <a:latin typeface="Calibri"/>
                           <a:cs typeface="Calibri"/>
                         </a:rPr>
-                        <a:t>1,570</a:t>
+                        <a:t>1,523</a:t>
                       </a:r>
                     </a:p>
                   </a:txBody>
@@ -10407,7 +10407,7 @@
                           <a:latin typeface="Calibri"/>
                           <a:cs typeface="Calibri"/>
                         </a:rPr>
-                        <a:t>17.1</a:t>
+                        <a:t>16.6</a:t>
                       </a:r>
                     </a:p>
                   </a:txBody>
@@ -10656,7 +10656,7 @@
           <a:p>
             <a:r>
               <a:rPr/>
-              <a:t>Pack date: 21 April 2021</a:t>
+              <a:t>Pack date: 22 April 2021</a:t>
             </a:r>
           </a:p>
         </p:txBody>
@@ -10737,7 +10737,7 @@
           <a:p>
             <a:r>
               <a:rPr/>
-              <a:t>Lower Tier Local Authority cumulative cases as at 21 April</a:t>
+              <a:t>Lower Tier Local Authority cumulative cases as at 22 April</a:t>
             </a:r>
           </a:p>
         </p:txBody>
@@ -11245,7 +11245,7 @@
                           <a:latin typeface="Calibri"/>
                           <a:cs typeface="Calibri"/>
                         </a:rPr>
-                        <a:t>2,885</a:t>
+                        <a:t>2,889</a:t>
                       </a:r>
                     </a:p>
                   </a:txBody>
@@ -11311,7 +11311,7 @@
                           <a:latin typeface="Calibri"/>
                           <a:cs typeface="Calibri"/>
                         </a:rPr>
-                        <a:t>4,486.7</a:t>
+                        <a:t>4,492.9</a:t>
                       </a:r>
                     </a:p>
                   </a:txBody>
@@ -11577,7 +11577,7 @@
                           <a:latin typeface="Calibri"/>
                           <a:cs typeface="Calibri"/>
                         </a:rPr>
-                        <a:t>8,231</a:t>
+                        <a:t>8,235</a:t>
                       </a:r>
                     </a:p>
                   </a:txBody>
@@ -11643,7 +11643,7 @@
                           <a:latin typeface="Calibri"/>
                           <a:cs typeface="Calibri"/>
                         </a:rPr>
-                        <a:t>5,120.1</a:t>
+                        <a:t>5,122.6</a:t>
                       </a:r>
                     </a:p>
                   </a:txBody>
@@ -11909,7 +11909,7 @@
                           <a:latin typeface="Calibri"/>
                           <a:cs typeface="Calibri"/>
                         </a:rPr>
-                        <a:t>4,879</a:t>
+                        <a:t>4,881</a:t>
                       </a:r>
                     </a:p>
                   </a:txBody>
@@ -11975,7 +11975,7 @@
                           <a:latin typeface="Calibri"/>
                           <a:cs typeface="Calibri"/>
                         </a:rPr>
-                        <a:t>4,027.9</a:t>
+                        <a:t>4,029.6</a:t>
                       </a:r>
                     </a:p>
                   </a:txBody>
@@ -12241,7 +12241,7 @@
                           <a:latin typeface="Calibri"/>
                           <a:cs typeface="Calibri"/>
                         </a:rPr>
-                        <a:t>7,934</a:t>
+                        <a:t>7,937</a:t>
                       </a:r>
                     </a:p>
                   </a:txBody>
@@ -12307,7 +12307,7 @@
                           <a:latin typeface="Calibri"/>
                           <a:cs typeface="Calibri"/>
                         </a:rPr>
-                        <a:t>7,058.2</a:t>
+                        <a:t>7,060.8</a:t>
                       </a:r>
                     </a:p>
                   </a:txBody>
@@ -12573,7 +12573,7 @@
                           <a:latin typeface="Calibri"/>
                           <a:cs typeface="Calibri"/>
                         </a:rPr>
-                        <a:t>5,678</a:t>
+                        <a:t>5,682</a:t>
                       </a:r>
                     </a:p>
                   </a:txBody>
@@ -12639,7 +12639,7 @@
                           <a:latin typeface="Calibri"/>
                           <a:cs typeface="Calibri"/>
                         </a:rPr>
-                        <a:t>3,948.8</a:t>
+                        <a:t>3,951.6</a:t>
                       </a:r>
                     </a:p>
                   </a:txBody>
@@ -12905,7 +12905,7 @@
                           <a:latin typeface="Calibri"/>
                           <a:cs typeface="Calibri"/>
                         </a:rPr>
-                        <a:t>6,814</a:t>
+                        <a:t>6,817</a:t>
                       </a:r>
                     </a:p>
                   </a:txBody>
@@ -12971,7 +12971,7 @@
                           <a:latin typeface="Calibri"/>
                           <a:cs typeface="Calibri"/>
                         </a:rPr>
-                        <a:t>4,511.9</a:t>
+                        <a:t>4,513.9</a:t>
                       </a:r>
                     </a:p>
                   </a:txBody>
@@ -13237,7 +13237,7 @@
                           <a:latin typeface="Calibri"/>
                           <a:cs typeface="Calibri"/>
                         </a:rPr>
-                        <a:t>5,309</a:t>
+                        <a:t>5,312</a:t>
                       </a:r>
                     </a:p>
                   </a:txBody>
@@ -13303,7 +13303,7 @@
                           <a:latin typeface="Calibri"/>
                           <a:cs typeface="Calibri"/>
                         </a:rPr>
-                        <a:t>4,801.5</a:t>
+                        <a:t>4,804.2</a:t>
                       </a:r>
                     </a:p>
                   </a:txBody>
@@ -13569,7 +13569,7 @@
                           <a:latin typeface="Calibri"/>
                           <a:cs typeface="Calibri"/>
                         </a:rPr>
-                        <a:t>41,730</a:t>
+                        <a:t>41,753</a:t>
                       </a:r>
                     </a:p>
                   </a:txBody>
@@ -13635,7 +13635,7 @@
                           <a:latin typeface="Calibri"/>
                           <a:cs typeface="Calibri"/>
                         </a:rPr>
-                        <a:t>4,830.0</a:t>
+                        <a:t>4,832.6</a:t>
                       </a:r>
                     </a:p>
                   </a:txBody>
@@ -13901,7 +13901,7 @@
                           <a:latin typeface="Calibri"/>
                           <a:cs typeface="Calibri"/>
                         </a:rPr>
-                        <a:t>537,870</a:t>
+                        <a:t>538,127</a:t>
                       </a:r>
                     </a:p>
                   </a:txBody>
@@ -13967,7 +13967,7 @@
                           <a:latin typeface="Calibri"/>
                           <a:cs typeface="Calibri"/>
                         </a:rPr>
-                        <a:t>5,859.1</a:t>
+                        <a:t>5,861.9</a:t>
                       </a:r>
                     </a:p>
                   </a:txBody>
@@ -14233,7 +14233,7 @@
                           <a:latin typeface="Calibri"/>
                           <a:cs typeface="Calibri"/>
                         </a:rPr>
-                        <a:t>3,840,945</a:t>
+                        <a:t>3,843,260</a:t>
                       </a:r>
                     </a:p>
                   </a:txBody>
@@ -14299,7 +14299,7 @@
                           <a:latin typeface="Calibri"/>
                           <a:cs typeface="Calibri"/>
                         </a:rPr>
-                        <a:t>6,823.9</a:t>
+                        <a:t>6,828.0</a:t>
                       </a:r>
                     </a:p>
                   </a:txBody>
@@ -14548,7 +14548,7 @@
           <a:p>
             <a:r>
               <a:rPr/>
-              <a:t>Pack date: 21 April 2021</a:t>
+              <a:t>Pack date: 22 April 2021</a:t>
             </a:r>
           </a:p>
         </p:txBody>
@@ -14629,7 +14629,7 @@
           <a:p>
             <a:r>
               <a:rPr/>
-              <a:t>Lower Tier Local Authority rolling cases as at 21 April</a:t>
+              <a:t>Lower Tier Local Authority rolling cases as at 22 April</a:t>
             </a:r>
           </a:p>
         </p:txBody>
@@ -14710,7 +14710,7 @@
           <a:p>
             <a:r>
               <a:rPr/>
-              <a:t>Note that the very recent days are excluded in the 7-day total as these are thought to be incomplete. As such, this data represents cases in the seven days to 16 April</a:t>
+              <a:t>Note that the very recent days are excluded in the 7-day total as these are thought to be incomplete. As such, this data represents cases in the seven days to 17 April</a:t>
             </a:r>
           </a:p>
         </p:txBody>
@@ -15164,7 +15164,7 @@
                           <a:latin typeface="Calibri"/>
                           <a:cs typeface="Calibri"/>
                         </a:rPr>
-                        <a:t>7</a:t>
+                        <a:t>6</a:t>
                       </a:r>
                     </a:p>
                   </a:txBody>
@@ -15230,7 +15230,7 @@
                           <a:latin typeface="Calibri"/>
                           <a:cs typeface="Calibri"/>
                         </a:rPr>
-                        <a:t>10.9</a:t>
+                        <a:t>9.3</a:t>
                       </a:r>
                     </a:p>
                   </a:txBody>
@@ -15296,7 +15296,7 @@
                           <a:latin typeface="Calibri"/>
                           <a:cs typeface="Calibri"/>
                         </a:rPr>
-                        <a:t>255th</a:t>
+                        <a:t>276th</a:t>
                       </a:r>
                     </a:p>
                   </a:txBody>
@@ -15628,7 +15628,7 @@
                           <a:latin typeface="Calibri"/>
                           <a:cs typeface="Calibri"/>
                         </a:rPr>
-                        <a:t>165th</a:t>
+                        <a:t>163rd</a:t>
                       </a:r>
                     </a:p>
                   </a:txBody>
@@ -15828,7 +15828,7 @@
                           <a:latin typeface="Calibri"/>
                           <a:cs typeface="Calibri"/>
                         </a:rPr>
-                        <a:t>19</a:t>
+                        <a:t>18</a:t>
                       </a:r>
                     </a:p>
                   </a:txBody>
@@ -15894,7 +15894,7 @@
                           <a:latin typeface="Calibri"/>
                           <a:cs typeface="Calibri"/>
                         </a:rPr>
-                        <a:t>15.7</a:t>
+                        <a:t>14.9</a:t>
                       </a:r>
                     </a:p>
                   </a:txBody>
@@ -15960,7 +15960,7 @@
                           <a:latin typeface="Calibri"/>
                           <a:cs typeface="Calibri"/>
                         </a:rPr>
-                        <a:t>184th</a:t>
+                        <a:t>187th</a:t>
                       </a:r>
                     </a:p>
                   </a:txBody>
@@ -16160,7 +16160,7 @@
                           <a:latin typeface="Calibri"/>
                           <a:cs typeface="Calibri"/>
                         </a:rPr>
-                        <a:t>29</a:t>
+                        <a:t>26</a:t>
                       </a:r>
                     </a:p>
                   </a:txBody>
@@ -16226,7 +16226,7 @@
                           <a:latin typeface="Calibri"/>
                           <a:cs typeface="Calibri"/>
                         </a:rPr>
-                        <a:t>25.8</a:t>
+                        <a:t>23.1</a:t>
                       </a:r>
                     </a:p>
                   </a:txBody>
@@ -16292,7 +16292,7 @@
                           <a:latin typeface="Calibri"/>
                           <a:cs typeface="Calibri"/>
                         </a:rPr>
-                        <a:t>96th</a:t>
+                        <a:t>106th</a:t>
                       </a:r>
                     </a:p>
                   </a:txBody>
@@ -16492,7 +16492,7 @@
                           <a:latin typeface="Calibri"/>
                           <a:cs typeface="Calibri"/>
                         </a:rPr>
-                        <a:t>19</a:t>
+                        <a:t>21</a:t>
                       </a:r>
                     </a:p>
                   </a:txBody>
@@ -16558,7 +16558,7 @@
                           <a:latin typeface="Calibri"/>
                           <a:cs typeface="Calibri"/>
                         </a:rPr>
-                        <a:t>13.2</a:t>
+                        <a:t>14.6</a:t>
                       </a:r>
                     </a:p>
                   </a:txBody>
@@ -16624,7 +16624,671 @@
                           <a:latin typeface="Calibri"/>
                           <a:cs typeface="Calibri"/>
                         </a:rPr>
-                        <a:t>227th</a:t>
+                        <a:t>192nd</a:t>
+                      </a:r>
+                    </a:p>
+                  </a:txBody>
+                  <a:tcPr anchor="t" marB="0" marT="0" marR="0" marL="0">
+                    <a:lnL w="0" cmpd="sng" algn="ctr" cap="flat">
+                      <a:solidFill>
+                        <a:srgbClr val="FFFFFF">
+                          <a:alpha val="0"/>
+                        </a:srgbClr>
+                      </a:solidFill>
+                      <a:prstDash val="solid"/>
+                    </a:lnL>
+                    <a:lnR w="0" cmpd="sng" algn="ctr" cap="flat">
+                      <a:solidFill>
+                        <a:srgbClr val="FFFFFF">
+                          <a:alpha val="0"/>
+                        </a:srgbClr>
+                      </a:solidFill>
+                      <a:prstDash val="solid"/>
+                    </a:lnR>
+                    <a:lnT w="0" cmpd="sng" algn="ctr" cap="flat">
+                      <a:solidFill>
+                        <a:srgbClr val="FFFFFF">
+                          <a:alpha val="0"/>
+                        </a:srgbClr>
+                      </a:solidFill>
+                      <a:prstDash val="solid"/>
+                    </a:lnT>
+                    <a:lnB w="0" cmpd="sng" algn="ctr" cap="flat">
+                      <a:solidFill>
+                        <a:srgbClr val="FFFFFF">
+                          <a:alpha val="0"/>
+                        </a:srgbClr>
+                      </a:solidFill>
+                      <a:prstDash val="solid"/>
+                    </a:lnB>
+                  </a:tcPr>
+                </a:tc>
+                <a:tc>
+                  <a:txBody>
+                    <a:bodyPr/>
+                    <a:lstStyle/>
+                    <a:p>
+                      <a:pPr algn="l" marL="63500" marR="63500">
+                        <a:lnSpc>
+                          <a:spcPct val="100000"/>
+                        </a:lnSpc>
+                        <a:spcBef>
+                          <a:spcPts val="200"/>
+                        </a:spcBef>
+                        <a:spcAft>
+                          <a:spcPts val="200"/>
+                        </a:spcAft>
+                        <a:buNone/>
+                      </a:pPr>
+                      <a:r>
+                        <a:rPr sz="1100">
+                          <a:solidFill>
+                            <a:srgbClr val="111111">
+                              <a:alpha val="100000"/>
+                            </a:srgbClr>
+                          </a:solidFill>
+                          <a:latin typeface="Calibri"/>
+                          <a:cs typeface="Calibri"/>
+                        </a:rPr>
+                        <a:t>Decile 7</a:t>
+                      </a:r>
+                    </a:p>
+                  </a:txBody>
+                  <a:tcPr anchor="t" marB="0" marT="0" marR="0" marL="0">
+                    <a:lnL w="0" cmpd="sng" algn="ctr" cap="flat">
+                      <a:solidFill>
+                        <a:srgbClr val="FFFFFF">
+                          <a:alpha val="0"/>
+                        </a:srgbClr>
+                      </a:solidFill>
+                      <a:prstDash val="solid"/>
+                    </a:lnL>
+                    <a:lnR w="0" cmpd="sng" algn="ctr" cap="flat">
+                      <a:solidFill>
+                        <a:srgbClr val="FFFFFF">
+                          <a:alpha val="0"/>
+                        </a:srgbClr>
+                      </a:solidFill>
+                      <a:prstDash val="solid"/>
+                    </a:lnR>
+                    <a:lnT w="0" cmpd="sng" algn="ctr" cap="flat">
+                      <a:solidFill>
+                        <a:srgbClr val="FFFFFF">
+                          <a:alpha val="0"/>
+                        </a:srgbClr>
+                      </a:solidFill>
+                      <a:prstDash val="solid"/>
+                    </a:lnT>
+                    <a:lnB w="0" cmpd="sng" algn="ctr" cap="flat">
+                      <a:solidFill>
+                        <a:srgbClr val="FFFFFF">
+                          <a:alpha val="0"/>
+                        </a:srgbClr>
+                      </a:solidFill>
+                      <a:prstDash val="solid"/>
+                    </a:lnB>
+                  </a:tcPr>
+                </a:tc>
+              </a:tr>
+              <a:tr h="182880">
+                <a:tc>
+                  <a:txBody>
+                    <a:bodyPr/>
+                    <a:lstStyle/>
+                    <a:p>
+                      <a:pPr algn="l" marL="63500" marR="63500">
+                        <a:lnSpc>
+                          <a:spcPct val="100000"/>
+                        </a:lnSpc>
+                        <a:spcBef>
+                          <a:spcPts val="200"/>
+                        </a:spcBef>
+                        <a:spcAft>
+                          <a:spcPts val="200"/>
+                        </a:spcAft>
+                        <a:buNone/>
+                      </a:pPr>
+                      <a:r>
+                        <a:rPr sz="1100">
+                          <a:solidFill>
+                            <a:srgbClr val="111111">
+                              <a:alpha val="100000"/>
+                            </a:srgbClr>
+                          </a:solidFill>
+                          <a:latin typeface="Calibri"/>
+                          <a:cs typeface="Calibri"/>
+                        </a:rPr>
+                        <a:t>Mid Sussex</a:t>
+                      </a:r>
+                    </a:p>
+                  </a:txBody>
+                  <a:tcPr anchor="t" marB="0" marT="0" marR="0" marL="0">
+                    <a:lnL w="0" cmpd="sng" algn="ctr" cap="flat">
+                      <a:solidFill>
+                        <a:srgbClr val="FFFFFF">
+                          <a:alpha val="0"/>
+                        </a:srgbClr>
+                      </a:solidFill>
+                      <a:prstDash val="solid"/>
+                    </a:lnL>
+                    <a:lnR w="0" cmpd="sng" algn="ctr" cap="flat">
+                      <a:solidFill>
+                        <a:srgbClr val="FFFFFF">
+                          <a:alpha val="0"/>
+                        </a:srgbClr>
+                      </a:solidFill>
+                      <a:prstDash val="solid"/>
+                    </a:lnR>
+                    <a:lnT w="0" cmpd="sng" algn="ctr" cap="flat">
+                      <a:solidFill>
+                        <a:srgbClr val="FFFFFF">
+                          <a:alpha val="0"/>
+                        </a:srgbClr>
+                      </a:solidFill>
+                      <a:prstDash val="solid"/>
+                    </a:lnT>
+                    <a:lnB w="0" cmpd="sng" algn="ctr" cap="flat">
+                      <a:solidFill>
+                        <a:srgbClr val="FFFFFF">
+                          <a:alpha val="0"/>
+                        </a:srgbClr>
+                      </a:solidFill>
+                      <a:prstDash val="solid"/>
+                    </a:lnB>
+                  </a:tcPr>
+                </a:tc>
+                <a:tc>
+                  <a:txBody>
+                    <a:bodyPr/>
+                    <a:lstStyle/>
+                    <a:p>
+                      <a:pPr algn="l" marL="63500" marR="63500">
+                        <a:lnSpc>
+                          <a:spcPct val="100000"/>
+                        </a:lnSpc>
+                        <a:spcBef>
+                          <a:spcPts val="200"/>
+                        </a:spcBef>
+                        <a:spcAft>
+                          <a:spcPts val="200"/>
+                        </a:spcAft>
+                        <a:buNone/>
+                      </a:pPr>
+                      <a:r>
+                        <a:rPr sz="1100">
+                          <a:solidFill>
+                            <a:srgbClr val="111111">
+                              <a:alpha val="100000"/>
+                            </a:srgbClr>
+                          </a:solidFill>
+                          <a:latin typeface="Calibri"/>
+                          <a:cs typeface="Calibri"/>
+                        </a:rPr>
+                        <a:t>24</a:t>
+                      </a:r>
+                    </a:p>
+                  </a:txBody>
+                  <a:tcPr anchor="t" marB="0" marT="0" marR="0" marL="0">
+                    <a:lnL w="0" cmpd="sng" algn="ctr" cap="flat">
+                      <a:solidFill>
+                        <a:srgbClr val="FFFFFF">
+                          <a:alpha val="0"/>
+                        </a:srgbClr>
+                      </a:solidFill>
+                      <a:prstDash val="solid"/>
+                    </a:lnL>
+                    <a:lnR w="0" cmpd="sng" algn="ctr" cap="flat">
+                      <a:solidFill>
+                        <a:srgbClr val="FFFFFF">
+                          <a:alpha val="0"/>
+                        </a:srgbClr>
+                      </a:solidFill>
+                      <a:prstDash val="solid"/>
+                    </a:lnR>
+                    <a:lnT w="0" cmpd="sng" algn="ctr" cap="flat">
+                      <a:solidFill>
+                        <a:srgbClr val="FFFFFF">
+                          <a:alpha val="0"/>
+                        </a:srgbClr>
+                      </a:solidFill>
+                      <a:prstDash val="solid"/>
+                    </a:lnT>
+                    <a:lnB w="0" cmpd="sng" algn="ctr" cap="flat">
+                      <a:solidFill>
+                        <a:srgbClr val="FFFFFF">
+                          <a:alpha val="0"/>
+                        </a:srgbClr>
+                      </a:solidFill>
+                      <a:prstDash val="solid"/>
+                    </a:lnB>
+                  </a:tcPr>
+                </a:tc>
+                <a:tc>
+                  <a:txBody>
+                    <a:bodyPr/>
+                    <a:lstStyle/>
+                    <a:p>
+                      <a:pPr algn="l" marL="63500" marR="63500">
+                        <a:lnSpc>
+                          <a:spcPct val="100000"/>
+                        </a:lnSpc>
+                        <a:spcBef>
+                          <a:spcPts val="200"/>
+                        </a:spcBef>
+                        <a:spcAft>
+                          <a:spcPts val="200"/>
+                        </a:spcAft>
+                        <a:buNone/>
+                      </a:pPr>
+                      <a:r>
+                        <a:rPr sz="1100">
+                          <a:solidFill>
+                            <a:srgbClr val="111111">
+                              <a:alpha val="100000"/>
+                            </a:srgbClr>
+                          </a:solidFill>
+                          <a:latin typeface="Calibri"/>
+                          <a:cs typeface="Calibri"/>
+                        </a:rPr>
+                        <a:t>15.9</a:t>
+                      </a:r>
+                    </a:p>
+                  </a:txBody>
+                  <a:tcPr anchor="t" marB="0" marT="0" marR="0" marL="0">
+                    <a:lnL w="0" cmpd="sng" algn="ctr" cap="flat">
+                      <a:solidFill>
+                        <a:srgbClr val="FFFFFF">
+                          <a:alpha val="0"/>
+                        </a:srgbClr>
+                      </a:solidFill>
+                      <a:prstDash val="solid"/>
+                    </a:lnL>
+                    <a:lnR w="0" cmpd="sng" algn="ctr" cap="flat">
+                      <a:solidFill>
+                        <a:srgbClr val="FFFFFF">
+                          <a:alpha val="0"/>
+                        </a:srgbClr>
+                      </a:solidFill>
+                      <a:prstDash val="solid"/>
+                    </a:lnR>
+                    <a:lnT w="0" cmpd="sng" algn="ctr" cap="flat">
+                      <a:solidFill>
+                        <a:srgbClr val="FFFFFF">
+                          <a:alpha val="0"/>
+                        </a:srgbClr>
+                      </a:solidFill>
+                      <a:prstDash val="solid"/>
+                    </a:lnT>
+                    <a:lnB w="0" cmpd="sng" algn="ctr" cap="flat">
+                      <a:solidFill>
+                        <a:srgbClr val="FFFFFF">
+                          <a:alpha val="0"/>
+                        </a:srgbClr>
+                      </a:solidFill>
+                      <a:prstDash val="solid"/>
+                    </a:lnB>
+                  </a:tcPr>
+                </a:tc>
+                <a:tc>
+                  <a:txBody>
+                    <a:bodyPr/>
+                    <a:lstStyle/>
+                    <a:p>
+                      <a:pPr algn="l" marL="63500" marR="63500">
+                        <a:lnSpc>
+                          <a:spcPct val="100000"/>
+                        </a:lnSpc>
+                        <a:spcBef>
+                          <a:spcPts val="200"/>
+                        </a:spcBef>
+                        <a:spcAft>
+                          <a:spcPts val="200"/>
+                        </a:spcAft>
+                        <a:buNone/>
+                      </a:pPr>
+                      <a:r>
+                        <a:rPr sz="1100">
+                          <a:solidFill>
+                            <a:srgbClr val="111111">
+                              <a:alpha val="100000"/>
+                            </a:srgbClr>
+                          </a:solidFill>
+                          <a:latin typeface="Calibri"/>
+                          <a:cs typeface="Calibri"/>
+                        </a:rPr>
+                        <a:t>175th</a:t>
+                      </a:r>
+                    </a:p>
+                  </a:txBody>
+                  <a:tcPr anchor="t" marB="0" marT="0" marR="0" marL="0">
+                    <a:lnL w="0" cmpd="sng" algn="ctr" cap="flat">
+                      <a:solidFill>
+                        <a:srgbClr val="FFFFFF">
+                          <a:alpha val="0"/>
+                        </a:srgbClr>
+                      </a:solidFill>
+                      <a:prstDash val="solid"/>
+                    </a:lnL>
+                    <a:lnR w="0" cmpd="sng" algn="ctr" cap="flat">
+                      <a:solidFill>
+                        <a:srgbClr val="FFFFFF">
+                          <a:alpha val="0"/>
+                        </a:srgbClr>
+                      </a:solidFill>
+                      <a:prstDash val="solid"/>
+                    </a:lnR>
+                    <a:lnT w="0" cmpd="sng" algn="ctr" cap="flat">
+                      <a:solidFill>
+                        <a:srgbClr val="FFFFFF">
+                          <a:alpha val="0"/>
+                        </a:srgbClr>
+                      </a:solidFill>
+                      <a:prstDash val="solid"/>
+                    </a:lnT>
+                    <a:lnB w="0" cmpd="sng" algn="ctr" cap="flat">
+                      <a:solidFill>
+                        <a:srgbClr val="FFFFFF">
+                          <a:alpha val="0"/>
+                        </a:srgbClr>
+                      </a:solidFill>
+                      <a:prstDash val="solid"/>
+                    </a:lnB>
+                  </a:tcPr>
+                </a:tc>
+                <a:tc>
+                  <a:txBody>
+                    <a:bodyPr/>
+                    <a:lstStyle/>
+                    <a:p>
+                      <a:pPr algn="l" marL="63500" marR="63500">
+                        <a:lnSpc>
+                          <a:spcPct val="100000"/>
+                        </a:lnSpc>
+                        <a:spcBef>
+                          <a:spcPts val="200"/>
+                        </a:spcBef>
+                        <a:spcAft>
+                          <a:spcPts val="200"/>
+                        </a:spcAft>
+                        <a:buNone/>
+                      </a:pPr>
+                      <a:r>
+                        <a:rPr sz="1100">
+                          <a:solidFill>
+                            <a:srgbClr val="111111">
+                              <a:alpha val="100000"/>
+                            </a:srgbClr>
+                          </a:solidFill>
+                          <a:latin typeface="Calibri"/>
+                          <a:cs typeface="Calibri"/>
+                        </a:rPr>
+                        <a:t>Decile 6</a:t>
+                      </a:r>
+                    </a:p>
+                  </a:txBody>
+                  <a:tcPr anchor="t" marB="0" marT="0" marR="0" marL="0">
+                    <a:lnL w="0" cmpd="sng" algn="ctr" cap="flat">
+                      <a:solidFill>
+                        <a:srgbClr val="FFFFFF">
+                          <a:alpha val="0"/>
+                        </a:srgbClr>
+                      </a:solidFill>
+                      <a:prstDash val="solid"/>
+                    </a:lnL>
+                    <a:lnR w="0" cmpd="sng" algn="ctr" cap="flat">
+                      <a:solidFill>
+                        <a:srgbClr val="FFFFFF">
+                          <a:alpha val="0"/>
+                        </a:srgbClr>
+                      </a:solidFill>
+                      <a:prstDash val="solid"/>
+                    </a:lnR>
+                    <a:lnT w="0" cmpd="sng" algn="ctr" cap="flat">
+                      <a:solidFill>
+                        <a:srgbClr val="FFFFFF">
+                          <a:alpha val="0"/>
+                        </a:srgbClr>
+                      </a:solidFill>
+                      <a:prstDash val="solid"/>
+                    </a:lnT>
+                    <a:lnB w="0" cmpd="sng" algn="ctr" cap="flat">
+                      <a:solidFill>
+                        <a:srgbClr val="FFFFFF">
+                          <a:alpha val="0"/>
+                        </a:srgbClr>
+                      </a:solidFill>
+                      <a:prstDash val="solid"/>
+                    </a:lnB>
+                  </a:tcPr>
+                </a:tc>
+              </a:tr>
+              <a:tr h="182880">
+                <a:tc>
+                  <a:txBody>
+                    <a:bodyPr/>
+                    <a:lstStyle/>
+                    <a:p>
+                      <a:pPr algn="l" marL="63500" marR="63500">
+                        <a:lnSpc>
+                          <a:spcPct val="100000"/>
+                        </a:lnSpc>
+                        <a:spcBef>
+                          <a:spcPts val="200"/>
+                        </a:spcBef>
+                        <a:spcAft>
+                          <a:spcPts val="200"/>
+                        </a:spcAft>
+                        <a:buNone/>
+                      </a:pPr>
+                      <a:r>
+                        <a:rPr sz="1100">
+                          <a:solidFill>
+                            <a:srgbClr val="111111">
+                              <a:alpha val="100000"/>
+                            </a:srgbClr>
+                          </a:solidFill>
+                          <a:latin typeface="Calibri"/>
+                          <a:cs typeface="Calibri"/>
+                        </a:rPr>
+                        <a:t>Worthing</a:t>
+                      </a:r>
+                    </a:p>
+                  </a:txBody>
+                  <a:tcPr anchor="t" marB="0" marT="0" marR="0" marL="0">
+                    <a:lnL w="0" cmpd="sng" algn="ctr" cap="flat">
+                      <a:solidFill>
+                        <a:srgbClr val="FFFFFF">
+                          <a:alpha val="0"/>
+                        </a:srgbClr>
+                      </a:solidFill>
+                      <a:prstDash val="solid"/>
+                    </a:lnL>
+                    <a:lnR w="0" cmpd="sng" algn="ctr" cap="flat">
+                      <a:solidFill>
+                        <a:srgbClr val="FFFFFF">
+                          <a:alpha val="0"/>
+                        </a:srgbClr>
+                      </a:solidFill>
+                      <a:prstDash val="solid"/>
+                    </a:lnR>
+                    <a:lnT w="0" cmpd="sng" algn="ctr" cap="flat">
+                      <a:solidFill>
+                        <a:srgbClr val="FFFFFF">
+                          <a:alpha val="0"/>
+                        </a:srgbClr>
+                      </a:solidFill>
+                      <a:prstDash val="solid"/>
+                    </a:lnT>
+                    <a:lnB w="0" cmpd="sng" algn="ctr" cap="flat">
+                      <a:solidFill>
+                        <a:srgbClr val="FFFFFF">
+                          <a:alpha val="0"/>
+                        </a:srgbClr>
+                      </a:solidFill>
+                      <a:prstDash val="solid"/>
+                    </a:lnB>
+                  </a:tcPr>
+                </a:tc>
+                <a:tc>
+                  <a:txBody>
+                    <a:bodyPr/>
+                    <a:lstStyle/>
+                    <a:p>
+                      <a:pPr algn="l" marL="63500" marR="63500">
+                        <a:lnSpc>
+                          <a:spcPct val="100000"/>
+                        </a:lnSpc>
+                        <a:spcBef>
+                          <a:spcPts val="200"/>
+                        </a:spcBef>
+                        <a:spcAft>
+                          <a:spcPts val="200"/>
+                        </a:spcAft>
+                        <a:buNone/>
+                      </a:pPr>
+                      <a:r>
+                        <a:rPr sz="1100">
+                          <a:solidFill>
+                            <a:srgbClr val="111111">
+                              <a:alpha val="100000"/>
+                            </a:srgbClr>
+                          </a:solidFill>
+                          <a:latin typeface="Calibri"/>
+                          <a:cs typeface="Calibri"/>
+                        </a:rPr>
+                        <a:t>13</a:t>
+                      </a:r>
+                    </a:p>
+                  </a:txBody>
+                  <a:tcPr anchor="t" marB="0" marT="0" marR="0" marL="0">
+                    <a:lnL w="0" cmpd="sng" algn="ctr" cap="flat">
+                      <a:solidFill>
+                        <a:srgbClr val="FFFFFF">
+                          <a:alpha val="0"/>
+                        </a:srgbClr>
+                      </a:solidFill>
+                      <a:prstDash val="solid"/>
+                    </a:lnL>
+                    <a:lnR w="0" cmpd="sng" algn="ctr" cap="flat">
+                      <a:solidFill>
+                        <a:srgbClr val="FFFFFF">
+                          <a:alpha val="0"/>
+                        </a:srgbClr>
+                      </a:solidFill>
+                      <a:prstDash val="solid"/>
+                    </a:lnR>
+                    <a:lnT w="0" cmpd="sng" algn="ctr" cap="flat">
+                      <a:solidFill>
+                        <a:srgbClr val="FFFFFF">
+                          <a:alpha val="0"/>
+                        </a:srgbClr>
+                      </a:solidFill>
+                      <a:prstDash val="solid"/>
+                    </a:lnT>
+                    <a:lnB w="0" cmpd="sng" algn="ctr" cap="flat">
+                      <a:solidFill>
+                        <a:srgbClr val="FFFFFF">
+                          <a:alpha val="0"/>
+                        </a:srgbClr>
+                      </a:solidFill>
+                      <a:prstDash val="solid"/>
+                    </a:lnB>
+                  </a:tcPr>
+                </a:tc>
+                <a:tc>
+                  <a:txBody>
+                    <a:bodyPr/>
+                    <a:lstStyle/>
+                    <a:p>
+                      <a:pPr algn="l" marL="63500" marR="63500">
+                        <a:lnSpc>
+                          <a:spcPct val="100000"/>
+                        </a:lnSpc>
+                        <a:spcBef>
+                          <a:spcPts val="200"/>
+                        </a:spcBef>
+                        <a:spcAft>
+                          <a:spcPts val="200"/>
+                        </a:spcAft>
+                        <a:buNone/>
+                      </a:pPr>
+                      <a:r>
+                        <a:rPr sz="1100">
+                          <a:solidFill>
+                            <a:srgbClr val="111111">
+                              <a:alpha val="100000"/>
+                            </a:srgbClr>
+                          </a:solidFill>
+                          <a:latin typeface="Calibri"/>
+                          <a:cs typeface="Calibri"/>
+                        </a:rPr>
+                        <a:t>11.8</a:t>
+                      </a:r>
+                    </a:p>
+                  </a:txBody>
+                  <a:tcPr anchor="t" marB="0" marT="0" marR="0" marL="0">
+                    <a:lnL w="0" cmpd="sng" algn="ctr" cap="flat">
+                      <a:solidFill>
+                        <a:srgbClr val="FFFFFF">
+                          <a:alpha val="0"/>
+                        </a:srgbClr>
+                      </a:solidFill>
+                      <a:prstDash val="solid"/>
+                    </a:lnL>
+                    <a:lnR w="0" cmpd="sng" algn="ctr" cap="flat">
+                      <a:solidFill>
+                        <a:srgbClr val="FFFFFF">
+                          <a:alpha val="0"/>
+                        </a:srgbClr>
+                      </a:solidFill>
+                      <a:prstDash val="solid"/>
+                    </a:lnR>
+                    <a:lnT w="0" cmpd="sng" algn="ctr" cap="flat">
+                      <a:solidFill>
+                        <a:srgbClr val="FFFFFF">
+                          <a:alpha val="0"/>
+                        </a:srgbClr>
+                      </a:solidFill>
+                      <a:prstDash val="solid"/>
+                    </a:lnT>
+                    <a:lnB w="0" cmpd="sng" algn="ctr" cap="flat">
+                      <a:solidFill>
+                        <a:srgbClr val="FFFFFF">
+                          <a:alpha val="0"/>
+                        </a:srgbClr>
+                      </a:solidFill>
+                      <a:prstDash val="solid"/>
+                    </a:lnB>
+                  </a:tcPr>
+                </a:tc>
+                <a:tc>
+                  <a:txBody>
+                    <a:bodyPr/>
+                    <a:lstStyle/>
+                    <a:p>
+                      <a:pPr algn="l" marL="63500" marR="63500">
+                        <a:lnSpc>
+                          <a:spcPct val="100000"/>
+                        </a:lnSpc>
+                        <a:spcBef>
+                          <a:spcPts val="200"/>
+                        </a:spcBef>
+                        <a:spcAft>
+                          <a:spcPts val="200"/>
+                        </a:spcAft>
+                        <a:buNone/>
+                      </a:pPr>
+                      <a:r>
+                        <a:rPr sz="1100">
+                          <a:solidFill>
+                            <a:srgbClr val="111111">
+                              <a:alpha val="100000"/>
+                            </a:srgbClr>
+                          </a:solidFill>
+                          <a:latin typeface="Calibri"/>
+                          <a:cs typeface="Calibri"/>
+                        </a:rPr>
+                        <a:t>241st</a:t>
                       </a:r>
                     </a:p>
                   </a:txBody>
@@ -16758,7 +17422,7 @@
                           <a:latin typeface="Calibri"/>
                           <a:cs typeface="Calibri"/>
                         </a:rPr>
-                        <a:t>Mid Sussex</a:t>
+                        <a:t>West Sussex</a:t>
                       </a:r>
                     </a:p>
                   </a:txBody>
@@ -16824,7 +17488,7 @@
                           <a:latin typeface="Calibri"/>
                           <a:cs typeface="Calibri"/>
                         </a:rPr>
-                        <a:t>24</a:t>
+                        <a:t>135</a:t>
                       </a:r>
                     </a:p>
                   </a:txBody>
@@ -16890,671 +17554,7 @@
                           <a:latin typeface="Calibri"/>
                           <a:cs typeface="Calibri"/>
                         </a:rPr>
-                        <a:t>15.9</a:t>
-                      </a:r>
-                    </a:p>
-                  </a:txBody>
-                  <a:tcPr anchor="t" marB="0" marT="0" marR="0" marL="0">
-                    <a:lnL w="0" cmpd="sng" algn="ctr" cap="flat">
-                      <a:solidFill>
-                        <a:srgbClr val="FFFFFF">
-                          <a:alpha val="0"/>
-                        </a:srgbClr>
-                      </a:solidFill>
-                      <a:prstDash val="solid"/>
-                    </a:lnL>
-                    <a:lnR w="0" cmpd="sng" algn="ctr" cap="flat">
-                      <a:solidFill>
-                        <a:srgbClr val="FFFFFF">
-                          <a:alpha val="0"/>
-                        </a:srgbClr>
-                      </a:solidFill>
-                      <a:prstDash val="solid"/>
-                    </a:lnR>
-                    <a:lnT w="0" cmpd="sng" algn="ctr" cap="flat">
-                      <a:solidFill>
-                        <a:srgbClr val="FFFFFF">
-                          <a:alpha val="0"/>
-                        </a:srgbClr>
-                      </a:solidFill>
-                      <a:prstDash val="solid"/>
-                    </a:lnT>
-                    <a:lnB w="0" cmpd="sng" algn="ctr" cap="flat">
-                      <a:solidFill>
-                        <a:srgbClr val="FFFFFF">
-                          <a:alpha val="0"/>
-                        </a:srgbClr>
-                      </a:solidFill>
-                      <a:prstDash val="solid"/>
-                    </a:lnB>
-                  </a:tcPr>
-                </a:tc>
-                <a:tc>
-                  <a:txBody>
-                    <a:bodyPr/>
-                    <a:lstStyle/>
-                    <a:p>
-                      <a:pPr algn="l" marL="63500" marR="63500">
-                        <a:lnSpc>
-                          <a:spcPct val="100000"/>
-                        </a:lnSpc>
-                        <a:spcBef>
-                          <a:spcPts val="200"/>
-                        </a:spcBef>
-                        <a:spcAft>
-                          <a:spcPts val="200"/>
-                        </a:spcAft>
-                        <a:buNone/>
-                      </a:pPr>
-                      <a:r>
-                        <a:rPr sz="1100">
-                          <a:solidFill>
-                            <a:srgbClr val="111111">
-                              <a:alpha val="100000"/>
-                            </a:srgbClr>
-                          </a:solidFill>
-                          <a:latin typeface="Calibri"/>
-                          <a:cs typeface="Calibri"/>
-                        </a:rPr>
-                        <a:t>182nd</a:t>
-                      </a:r>
-                    </a:p>
-                  </a:txBody>
-                  <a:tcPr anchor="t" marB="0" marT="0" marR="0" marL="0">
-                    <a:lnL w="0" cmpd="sng" algn="ctr" cap="flat">
-                      <a:solidFill>
-                        <a:srgbClr val="FFFFFF">
-                          <a:alpha val="0"/>
-                        </a:srgbClr>
-                      </a:solidFill>
-                      <a:prstDash val="solid"/>
-                    </a:lnL>
-                    <a:lnR w="0" cmpd="sng" algn="ctr" cap="flat">
-                      <a:solidFill>
-                        <a:srgbClr val="FFFFFF">
-                          <a:alpha val="0"/>
-                        </a:srgbClr>
-                      </a:solidFill>
-                      <a:prstDash val="solid"/>
-                    </a:lnR>
-                    <a:lnT w="0" cmpd="sng" algn="ctr" cap="flat">
-                      <a:solidFill>
-                        <a:srgbClr val="FFFFFF">
-                          <a:alpha val="0"/>
-                        </a:srgbClr>
-                      </a:solidFill>
-                      <a:prstDash val="solid"/>
-                    </a:lnT>
-                    <a:lnB w="0" cmpd="sng" algn="ctr" cap="flat">
-                      <a:solidFill>
-                        <a:srgbClr val="FFFFFF">
-                          <a:alpha val="0"/>
-                        </a:srgbClr>
-                      </a:solidFill>
-                      <a:prstDash val="solid"/>
-                    </a:lnB>
-                  </a:tcPr>
-                </a:tc>
-                <a:tc>
-                  <a:txBody>
-                    <a:bodyPr/>
-                    <a:lstStyle/>
-                    <a:p>
-                      <a:pPr algn="l" marL="63500" marR="63500">
-                        <a:lnSpc>
-                          <a:spcPct val="100000"/>
-                        </a:lnSpc>
-                        <a:spcBef>
-                          <a:spcPts val="200"/>
-                        </a:spcBef>
-                        <a:spcAft>
-                          <a:spcPts val="200"/>
-                        </a:spcAft>
-                        <a:buNone/>
-                      </a:pPr>
-                      <a:r>
-                        <a:rPr sz="1100">
-                          <a:solidFill>
-                            <a:srgbClr val="111111">
-                              <a:alpha val="100000"/>
-                            </a:srgbClr>
-                          </a:solidFill>
-                          <a:latin typeface="Calibri"/>
-                          <a:cs typeface="Calibri"/>
-                        </a:rPr>
-                        <a:t>Decile 6</a:t>
-                      </a:r>
-                    </a:p>
-                  </a:txBody>
-                  <a:tcPr anchor="t" marB="0" marT="0" marR="0" marL="0">
-                    <a:lnL w="0" cmpd="sng" algn="ctr" cap="flat">
-                      <a:solidFill>
-                        <a:srgbClr val="FFFFFF">
-                          <a:alpha val="0"/>
-                        </a:srgbClr>
-                      </a:solidFill>
-                      <a:prstDash val="solid"/>
-                    </a:lnL>
-                    <a:lnR w="0" cmpd="sng" algn="ctr" cap="flat">
-                      <a:solidFill>
-                        <a:srgbClr val="FFFFFF">
-                          <a:alpha val="0"/>
-                        </a:srgbClr>
-                      </a:solidFill>
-                      <a:prstDash val="solid"/>
-                    </a:lnR>
-                    <a:lnT w="0" cmpd="sng" algn="ctr" cap="flat">
-                      <a:solidFill>
-                        <a:srgbClr val="FFFFFF">
-                          <a:alpha val="0"/>
-                        </a:srgbClr>
-                      </a:solidFill>
-                      <a:prstDash val="solid"/>
-                    </a:lnT>
-                    <a:lnB w="0" cmpd="sng" algn="ctr" cap="flat">
-                      <a:solidFill>
-                        <a:srgbClr val="FFFFFF">
-                          <a:alpha val="0"/>
-                        </a:srgbClr>
-                      </a:solidFill>
-                      <a:prstDash val="solid"/>
-                    </a:lnB>
-                  </a:tcPr>
-                </a:tc>
-              </a:tr>
-              <a:tr h="182880">
-                <a:tc>
-                  <a:txBody>
-                    <a:bodyPr/>
-                    <a:lstStyle/>
-                    <a:p>
-                      <a:pPr algn="l" marL="63500" marR="63500">
-                        <a:lnSpc>
-                          <a:spcPct val="100000"/>
-                        </a:lnSpc>
-                        <a:spcBef>
-                          <a:spcPts val="200"/>
-                        </a:spcBef>
-                        <a:spcAft>
-                          <a:spcPts val="200"/>
-                        </a:spcAft>
-                        <a:buNone/>
-                      </a:pPr>
-                      <a:r>
-                        <a:rPr sz="1100">
-                          <a:solidFill>
-                            <a:srgbClr val="111111">
-                              <a:alpha val="100000"/>
-                            </a:srgbClr>
-                          </a:solidFill>
-                          <a:latin typeface="Calibri"/>
-                          <a:cs typeface="Calibri"/>
-                        </a:rPr>
-                        <a:t>Worthing</a:t>
-                      </a:r>
-                    </a:p>
-                  </a:txBody>
-                  <a:tcPr anchor="t" marB="0" marT="0" marR="0" marL="0">
-                    <a:lnL w="0" cmpd="sng" algn="ctr" cap="flat">
-                      <a:solidFill>
-                        <a:srgbClr val="FFFFFF">
-                          <a:alpha val="0"/>
-                        </a:srgbClr>
-                      </a:solidFill>
-                      <a:prstDash val="solid"/>
-                    </a:lnL>
-                    <a:lnR w="0" cmpd="sng" algn="ctr" cap="flat">
-                      <a:solidFill>
-                        <a:srgbClr val="FFFFFF">
-                          <a:alpha val="0"/>
-                        </a:srgbClr>
-                      </a:solidFill>
-                      <a:prstDash val="solid"/>
-                    </a:lnR>
-                    <a:lnT w="0" cmpd="sng" algn="ctr" cap="flat">
-                      <a:solidFill>
-                        <a:srgbClr val="FFFFFF">
-                          <a:alpha val="0"/>
-                        </a:srgbClr>
-                      </a:solidFill>
-                      <a:prstDash val="solid"/>
-                    </a:lnT>
-                    <a:lnB w="0" cmpd="sng" algn="ctr" cap="flat">
-                      <a:solidFill>
-                        <a:srgbClr val="FFFFFF">
-                          <a:alpha val="0"/>
-                        </a:srgbClr>
-                      </a:solidFill>
-                      <a:prstDash val="solid"/>
-                    </a:lnB>
-                  </a:tcPr>
-                </a:tc>
-                <a:tc>
-                  <a:txBody>
-                    <a:bodyPr/>
-                    <a:lstStyle/>
-                    <a:p>
-                      <a:pPr algn="l" marL="63500" marR="63500">
-                        <a:lnSpc>
-                          <a:spcPct val="100000"/>
-                        </a:lnSpc>
-                        <a:spcBef>
-                          <a:spcPts val="200"/>
-                        </a:spcBef>
-                        <a:spcAft>
-                          <a:spcPts val="200"/>
-                        </a:spcAft>
-                        <a:buNone/>
-                      </a:pPr>
-                      <a:r>
-                        <a:rPr sz="1100">
-                          <a:solidFill>
-                            <a:srgbClr val="111111">
-                              <a:alpha val="100000"/>
-                            </a:srgbClr>
-                          </a:solidFill>
-                          <a:latin typeface="Calibri"/>
-                          <a:cs typeface="Calibri"/>
-                        </a:rPr>
-                        <a:t>15</a:t>
-                      </a:r>
-                    </a:p>
-                  </a:txBody>
-                  <a:tcPr anchor="t" marB="0" marT="0" marR="0" marL="0">
-                    <a:lnL w="0" cmpd="sng" algn="ctr" cap="flat">
-                      <a:solidFill>
-                        <a:srgbClr val="FFFFFF">
-                          <a:alpha val="0"/>
-                        </a:srgbClr>
-                      </a:solidFill>
-                      <a:prstDash val="solid"/>
-                    </a:lnL>
-                    <a:lnR w="0" cmpd="sng" algn="ctr" cap="flat">
-                      <a:solidFill>
-                        <a:srgbClr val="FFFFFF">
-                          <a:alpha val="0"/>
-                        </a:srgbClr>
-                      </a:solidFill>
-                      <a:prstDash val="solid"/>
-                    </a:lnR>
-                    <a:lnT w="0" cmpd="sng" algn="ctr" cap="flat">
-                      <a:solidFill>
-                        <a:srgbClr val="FFFFFF">
-                          <a:alpha val="0"/>
-                        </a:srgbClr>
-                      </a:solidFill>
-                      <a:prstDash val="solid"/>
-                    </a:lnT>
-                    <a:lnB w="0" cmpd="sng" algn="ctr" cap="flat">
-                      <a:solidFill>
-                        <a:srgbClr val="FFFFFF">
-                          <a:alpha val="0"/>
-                        </a:srgbClr>
-                      </a:solidFill>
-                      <a:prstDash val="solid"/>
-                    </a:lnB>
-                  </a:tcPr>
-                </a:tc>
-                <a:tc>
-                  <a:txBody>
-                    <a:bodyPr/>
-                    <a:lstStyle/>
-                    <a:p>
-                      <a:pPr algn="l" marL="63500" marR="63500">
-                        <a:lnSpc>
-                          <a:spcPct val="100000"/>
-                        </a:lnSpc>
-                        <a:spcBef>
-                          <a:spcPts val="200"/>
-                        </a:spcBef>
-                        <a:spcAft>
-                          <a:spcPts val="200"/>
-                        </a:spcAft>
-                        <a:buNone/>
-                      </a:pPr>
-                      <a:r>
-                        <a:rPr sz="1100">
-                          <a:solidFill>
-                            <a:srgbClr val="111111">
-                              <a:alpha val="100000"/>
-                            </a:srgbClr>
-                          </a:solidFill>
-                          <a:latin typeface="Calibri"/>
-                          <a:cs typeface="Calibri"/>
-                        </a:rPr>
-                        <a:t>13.6</a:t>
-                      </a:r>
-                    </a:p>
-                  </a:txBody>
-                  <a:tcPr anchor="t" marB="0" marT="0" marR="0" marL="0">
-                    <a:lnL w="0" cmpd="sng" algn="ctr" cap="flat">
-                      <a:solidFill>
-                        <a:srgbClr val="FFFFFF">
-                          <a:alpha val="0"/>
-                        </a:srgbClr>
-                      </a:solidFill>
-                      <a:prstDash val="solid"/>
-                    </a:lnL>
-                    <a:lnR w="0" cmpd="sng" algn="ctr" cap="flat">
-                      <a:solidFill>
-                        <a:srgbClr val="FFFFFF">
-                          <a:alpha val="0"/>
-                        </a:srgbClr>
-                      </a:solidFill>
-                      <a:prstDash val="solid"/>
-                    </a:lnR>
-                    <a:lnT w="0" cmpd="sng" algn="ctr" cap="flat">
-                      <a:solidFill>
-                        <a:srgbClr val="FFFFFF">
-                          <a:alpha val="0"/>
-                        </a:srgbClr>
-                      </a:solidFill>
-                      <a:prstDash val="solid"/>
-                    </a:lnT>
-                    <a:lnB w="0" cmpd="sng" algn="ctr" cap="flat">
-                      <a:solidFill>
-                        <a:srgbClr val="FFFFFF">
-                          <a:alpha val="0"/>
-                        </a:srgbClr>
-                      </a:solidFill>
-                      <a:prstDash val="solid"/>
-                    </a:lnB>
-                  </a:tcPr>
-                </a:tc>
-                <a:tc>
-                  <a:txBody>
-                    <a:bodyPr/>
-                    <a:lstStyle/>
-                    <a:p>
-                      <a:pPr algn="l" marL="63500" marR="63500">
-                        <a:lnSpc>
-                          <a:spcPct val="100000"/>
-                        </a:lnSpc>
-                        <a:spcBef>
-                          <a:spcPts val="200"/>
-                        </a:spcBef>
-                        <a:spcAft>
-                          <a:spcPts val="200"/>
-                        </a:spcAft>
-                        <a:buNone/>
-                      </a:pPr>
-                      <a:r>
-                        <a:rPr sz="1100">
-                          <a:solidFill>
-                            <a:srgbClr val="111111">
-                              <a:alpha val="100000"/>
-                            </a:srgbClr>
-                          </a:solidFill>
-                          <a:latin typeface="Calibri"/>
-                          <a:cs typeface="Calibri"/>
-                        </a:rPr>
-                        <a:t>222nd</a:t>
-                      </a:r>
-                    </a:p>
-                  </a:txBody>
-                  <a:tcPr anchor="t" marB="0" marT="0" marR="0" marL="0">
-                    <a:lnL w="0" cmpd="sng" algn="ctr" cap="flat">
-                      <a:solidFill>
-                        <a:srgbClr val="FFFFFF">
-                          <a:alpha val="0"/>
-                        </a:srgbClr>
-                      </a:solidFill>
-                      <a:prstDash val="solid"/>
-                    </a:lnL>
-                    <a:lnR w="0" cmpd="sng" algn="ctr" cap="flat">
-                      <a:solidFill>
-                        <a:srgbClr val="FFFFFF">
-                          <a:alpha val="0"/>
-                        </a:srgbClr>
-                      </a:solidFill>
-                      <a:prstDash val="solid"/>
-                    </a:lnR>
-                    <a:lnT w="0" cmpd="sng" algn="ctr" cap="flat">
-                      <a:solidFill>
-                        <a:srgbClr val="FFFFFF">
-                          <a:alpha val="0"/>
-                        </a:srgbClr>
-                      </a:solidFill>
-                      <a:prstDash val="solid"/>
-                    </a:lnT>
-                    <a:lnB w="0" cmpd="sng" algn="ctr" cap="flat">
-                      <a:solidFill>
-                        <a:srgbClr val="FFFFFF">
-                          <a:alpha val="0"/>
-                        </a:srgbClr>
-                      </a:solidFill>
-                      <a:prstDash val="solid"/>
-                    </a:lnB>
-                  </a:tcPr>
-                </a:tc>
-                <a:tc>
-                  <a:txBody>
-                    <a:bodyPr/>
-                    <a:lstStyle/>
-                    <a:p>
-                      <a:pPr algn="l" marL="63500" marR="63500">
-                        <a:lnSpc>
-                          <a:spcPct val="100000"/>
-                        </a:lnSpc>
-                        <a:spcBef>
-                          <a:spcPts val="200"/>
-                        </a:spcBef>
-                        <a:spcAft>
-                          <a:spcPts val="200"/>
-                        </a:spcAft>
-                        <a:buNone/>
-                      </a:pPr>
-                      <a:r>
-                        <a:rPr sz="1100">
-                          <a:solidFill>
-                            <a:srgbClr val="111111">
-                              <a:alpha val="100000"/>
-                            </a:srgbClr>
-                          </a:solidFill>
-                          <a:latin typeface="Calibri"/>
-                          <a:cs typeface="Calibri"/>
-                        </a:rPr>
-                        <a:t>Decile 8</a:t>
-                      </a:r>
-                    </a:p>
-                  </a:txBody>
-                  <a:tcPr anchor="t" marB="0" marT="0" marR="0" marL="0">
-                    <a:lnL w="0" cmpd="sng" algn="ctr" cap="flat">
-                      <a:solidFill>
-                        <a:srgbClr val="FFFFFF">
-                          <a:alpha val="0"/>
-                        </a:srgbClr>
-                      </a:solidFill>
-                      <a:prstDash val="solid"/>
-                    </a:lnL>
-                    <a:lnR w="0" cmpd="sng" algn="ctr" cap="flat">
-                      <a:solidFill>
-                        <a:srgbClr val="FFFFFF">
-                          <a:alpha val="0"/>
-                        </a:srgbClr>
-                      </a:solidFill>
-                      <a:prstDash val="solid"/>
-                    </a:lnR>
-                    <a:lnT w="0" cmpd="sng" algn="ctr" cap="flat">
-                      <a:solidFill>
-                        <a:srgbClr val="FFFFFF">
-                          <a:alpha val="0"/>
-                        </a:srgbClr>
-                      </a:solidFill>
-                      <a:prstDash val="solid"/>
-                    </a:lnT>
-                    <a:lnB w="0" cmpd="sng" algn="ctr" cap="flat">
-                      <a:solidFill>
-                        <a:srgbClr val="FFFFFF">
-                          <a:alpha val="0"/>
-                        </a:srgbClr>
-                      </a:solidFill>
-                      <a:prstDash val="solid"/>
-                    </a:lnB>
-                  </a:tcPr>
-                </a:tc>
-              </a:tr>
-              <a:tr h="182880">
-                <a:tc>
-                  <a:txBody>
-                    <a:bodyPr/>
-                    <a:lstStyle/>
-                    <a:p>
-                      <a:pPr algn="l" marL="63500" marR="63500">
-                        <a:lnSpc>
-                          <a:spcPct val="100000"/>
-                        </a:lnSpc>
-                        <a:spcBef>
-                          <a:spcPts val="200"/>
-                        </a:spcBef>
-                        <a:spcAft>
-                          <a:spcPts val="200"/>
-                        </a:spcAft>
-                        <a:buNone/>
-                      </a:pPr>
-                      <a:r>
-                        <a:rPr sz="1100">
-                          <a:solidFill>
-                            <a:srgbClr val="111111">
-                              <a:alpha val="100000"/>
-                            </a:srgbClr>
-                          </a:solidFill>
-                          <a:latin typeface="Calibri"/>
-                          <a:cs typeface="Calibri"/>
-                        </a:rPr>
-                        <a:t>West Sussex</a:t>
-                      </a:r>
-                    </a:p>
-                  </a:txBody>
-                  <a:tcPr anchor="t" marB="0" marT="0" marR="0" marL="0">
-                    <a:lnL w="0" cmpd="sng" algn="ctr" cap="flat">
-                      <a:solidFill>
-                        <a:srgbClr val="FFFFFF">
-                          <a:alpha val="0"/>
-                        </a:srgbClr>
-                      </a:solidFill>
-                      <a:prstDash val="solid"/>
-                    </a:lnL>
-                    <a:lnR w="0" cmpd="sng" algn="ctr" cap="flat">
-                      <a:solidFill>
-                        <a:srgbClr val="FFFFFF">
-                          <a:alpha val="0"/>
-                        </a:srgbClr>
-                      </a:solidFill>
-                      <a:prstDash val="solid"/>
-                    </a:lnR>
-                    <a:lnT w="0" cmpd="sng" algn="ctr" cap="flat">
-                      <a:solidFill>
-                        <a:srgbClr val="FFFFFF">
-                          <a:alpha val="0"/>
-                        </a:srgbClr>
-                      </a:solidFill>
-                      <a:prstDash val="solid"/>
-                    </a:lnT>
-                    <a:lnB w="0" cmpd="sng" algn="ctr" cap="flat">
-                      <a:solidFill>
-                        <a:srgbClr val="FFFFFF">
-                          <a:alpha val="0"/>
-                        </a:srgbClr>
-                      </a:solidFill>
-                      <a:prstDash val="solid"/>
-                    </a:lnB>
-                  </a:tcPr>
-                </a:tc>
-                <a:tc>
-                  <a:txBody>
-                    <a:bodyPr/>
-                    <a:lstStyle/>
-                    <a:p>
-                      <a:pPr algn="l" marL="63500" marR="63500">
-                        <a:lnSpc>
-                          <a:spcPct val="100000"/>
-                        </a:lnSpc>
-                        <a:spcBef>
-                          <a:spcPts val="200"/>
-                        </a:spcBef>
-                        <a:spcAft>
-                          <a:spcPts val="200"/>
-                        </a:spcAft>
-                        <a:buNone/>
-                      </a:pPr>
-                      <a:r>
-                        <a:rPr sz="1100">
-                          <a:solidFill>
-                            <a:srgbClr val="111111">
-                              <a:alpha val="100000"/>
-                            </a:srgbClr>
-                          </a:solidFill>
-                          <a:latin typeface="Calibri"/>
-                          <a:cs typeface="Calibri"/>
-                        </a:rPr>
-                        <a:t>140</a:t>
-                      </a:r>
-                    </a:p>
-                  </a:txBody>
-                  <a:tcPr anchor="t" marB="0" marT="0" marR="0" marL="0">
-                    <a:lnL w="0" cmpd="sng" algn="ctr" cap="flat">
-                      <a:solidFill>
-                        <a:srgbClr val="FFFFFF">
-                          <a:alpha val="0"/>
-                        </a:srgbClr>
-                      </a:solidFill>
-                      <a:prstDash val="solid"/>
-                    </a:lnL>
-                    <a:lnR w="0" cmpd="sng" algn="ctr" cap="flat">
-                      <a:solidFill>
-                        <a:srgbClr val="FFFFFF">
-                          <a:alpha val="0"/>
-                        </a:srgbClr>
-                      </a:solidFill>
-                      <a:prstDash val="solid"/>
-                    </a:lnR>
-                    <a:lnT w="0" cmpd="sng" algn="ctr" cap="flat">
-                      <a:solidFill>
-                        <a:srgbClr val="FFFFFF">
-                          <a:alpha val="0"/>
-                        </a:srgbClr>
-                      </a:solidFill>
-                      <a:prstDash val="solid"/>
-                    </a:lnT>
-                    <a:lnB w="0" cmpd="sng" algn="ctr" cap="flat">
-                      <a:solidFill>
-                        <a:srgbClr val="FFFFFF">
-                          <a:alpha val="0"/>
-                        </a:srgbClr>
-                      </a:solidFill>
-                      <a:prstDash val="solid"/>
-                    </a:lnB>
-                  </a:tcPr>
-                </a:tc>
-                <a:tc>
-                  <a:txBody>
-                    <a:bodyPr/>
-                    <a:lstStyle/>
-                    <a:p>
-                      <a:pPr algn="l" marL="63500" marR="63500">
-                        <a:lnSpc>
-                          <a:spcPct val="100000"/>
-                        </a:lnSpc>
-                        <a:spcBef>
-                          <a:spcPts val="200"/>
-                        </a:spcBef>
-                        <a:spcAft>
-                          <a:spcPts val="200"/>
-                        </a:spcAft>
-                        <a:buNone/>
-                      </a:pPr>
-                      <a:r>
-                        <a:rPr sz="1100">
-                          <a:solidFill>
-                            <a:srgbClr val="111111">
-                              <a:alpha val="100000"/>
-                            </a:srgbClr>
-                          </a:solidFill>
-                          <a:latin typeface="Calibri"/>
-                          <a:cs typeface="Calibri"/>
-                        </a:rPr>
-                        <a:t>16.2</a:t>
+                        <a:t>15.6</a:t>
                       </a:r>
                     </a:p>
                   </a:txBody>
@@ -17820,7 +17820,7 @@
                           <a:latin typeface="Calibri"/>
                           <a:cs typeface="Calibri"/>
                         </a:rPr>
-                        <a:t>13,979</a:t>
+                        <a:t>13,423</a:t>
                       </a:r>
                     </a:p>
                   </a:txBody>
@@ -17886,7 +17886,7 @@
                           <a:latin typeface="Calibri"/>
                           <a:cs typeface="Calibri"/>
                         </a:rPr>
-                        <a:t>24.8</a:t>
+                        <a:t>23.8</a:t>
                       </a:r>
                     </a:p>
                   </a:txBody>
@@ -18152,7 +18152,7 @@
                           <a:latin typeface="Calibri"/>
                           <a:cs typeface="Calibri"/>
                         </a:rPr>
-                        <a:t>1,570</a:t>
+                        <a:t>1,523</a:t>
                       </a:r>
                     </a:p>
                   </a:txBody>
@@ -18218,7 +18218,7 @@
                           <a:latin typeface="Calibri"/>
                           <a:cs typeface="Calibri"/>
                         </a:rPr>
-                        <a:t>17.1</a:t>
+                        <a:t>16.6</a:t>
                       </a:r>
                     </a:p>
                   </a:txBody>
@@ -18441,7 +18441,7 @@
           <a:p>
             <a:r>
               <a:rPr/>
-              <a:t>Pack date: 21 April 2021</a:t>
+              <a:t>Pack date: 22 April 2021</a:t>
             </a:r>
           </a:p>
         </p:txBody>
@@ -18599,7 +18599,7 @@
           <a:p>
             <a:r>
               <a:rPr/>
-              <a:t>Pack date: 21 April 2021</a:t>
+              <a:t>Pack date: 22 April 2021</a:t>
             </a:r>
           </a:p>
         </p:txBody>
@@ -18757,7 +18757,7 @@
           <a:p>
             <a:r>
               <a:rPr/>
-              <a:t>Pack date: 21 April 2021</a:t>
+              <a:t>Pack date: 22 April 2021</a:t>
             </a:r>
           </a:p>
         </p:txBody>
@@ -18915,7 +18915,7 @@
           <a:p>
             <a:r>
               <a:rPr/>
-              <a:t>Pack date: 21 April 2021</a:t>
+              <a:t>Pack date: 22 April 2021</a:t>
             </a:r>
           </a:p>
         </p:txBody>
@@ -19073,7 +19073,7 @@
           <a:p>
             <a:r>
               <a:rPr/>
-              <a:t>Pack date: 21 April 2021</a:t>
+              <a:t>Pack date: 22 April 2021</a:t>
             </a:r>
           </a:p>
         </p:txBody>
@@ -19262,7 +19262,7 @@
           <a:p>
             <a:r>
               <a:rPr/>
-              <a:t>Pack date: 21 April 2021</a:t>
+              <a:t>Pack date: 22 April 2021</a:t>
             </a:r>
           </a:p>
         </p:txBody>
@@ -19420,7 +19420,7 @@
           <a:p>
             <a:r>
               <a:rPr/>
-              <a:t>Pack date: 21 April 2021</a:t>
+              <a:t>Pack date: 22 April 2021</a:t>
             </a:r>
           </a:p>
         </p:txBody>
@@ -19578,7 +19578,7 @@
           <a:p>
             <a:r>
               <a:rPr/>
-              <a:t>Pack date: 21 April 2021</a:t>
+              <a:t>Pack date: 22 April 2021</a:t>
             </a:r>
           </a:p>
         </p:txBody>
@@ -19736,7 +19736,7 @@
           <a:p>
             <a:r>
               <a:rPr/>
-              <a:t>Pack date: 21 April 2021</a:t>
+              <a:t>Pack date: 22 April 2021</a:t>
             </a:r>
           </a:p>
         </p:txBody>
@@ -19894,7 +19894,7 @@
           <a:p>
             <a:r>
               <a:rPr/>
-              <a:t>Pack date: 21 April 2021</a:t>
+              <a:t>Pack date: 22 April 2021</a:t>
             </a:r>
           </a:p>
         </p:txBody>
@@ -20026,7 +20026,7 @@
           <a:p>
             <a:r>
               <a:rPr/>
-              <a:t>Pack date: 21 April 2021</a:t>
+              <a:t>Pack date: 22 April 2021</a:t>
             </a:r>
           </a:p>
         </p:txBody>
@@ -20158,7 +20158,7 @@
           <a:p>
             <a:r>
               <a:rPr/>
-              <a:t>Pack date: 21 April 2021</a:t>
+              <a:t>Pack date: 22 April 2021</a:t>
             </a:r>
           </a:p>
         </p:txBody>
@@ -20290,7 +20290,7 @@
           <a:p>
             <a:r>
               <a:rPr/>
-              <a:t>Pack date: 21 April 2021</a:t>
+              <a:t>Pack date: 22 April 2021</a:t>
             </a:r>
           </a:p>
         </p:txBody>
@@ -20422,7 +20422,7 @@
           <a:p>
             <a:r>
               <a:rPr/>
-              <a:t>Pack date: 21 April 2021</a:t>
+              <a:t>Pack date: 22 April 2021</a:t>
             </a:r>
           </a:p>
         </p:txBody>
@@ -20554,7 +20554,7 @@
           <a:p>
             <a:r>
               <a:rPr/>
-              <a:t>Pack date: 21 April 2021</a:t>
+              <a:t>Pack date: 22 April 2021</a:t>
             </a:r>
           </a:p>
         </p:txBody>
@@ -20686,7 +20686,7 @@
           <a:p>
             <a:r>
               <a:rPr/>
-              <a:t>Pack date: 21 April 2021</a:t>
+              <a:t>Pack date: 22 April 2021</a:t>
             </a:r>
           </a:p>
         </p:txBody>

</xml_diff>

<commit_message>
Update 10 May - restrictions update
</commit_message>
<xml_diff>
--- a/Latest_West_Sussex_C19_slide_deck.pptx
+++ b/Latest_West_Sussex_C19_slide_deck.pptx
@@ -7176,7 +7176,7 @@
           <a:p>
             <a:r>
               <a:rPr/>
-              <a:t>Pack date: 09 May 2021</a:t>
+              <a:t>Pack date: 10 May 2021</a:t>
             </a:r>
           </a:p>
         </p:txBody>
@@ -7308,7 +7308,7 @@
           <a:p>
             <a:r>
               <a:rPr/>
-              <a:t>Pack date: 09 May 2021</a:t>
+              <a:t>Pack date: 10 May 2021</a:t>
             </a:r>
           </a:p>
         </p:txBody>
@@ -7466,7 +7466,7 @@
           <a:p>
             <a:r>
               <a:rPr/>
-              <a:t>Pack date: 09 May 2021</a:t>
+              <a:t>Pack date: 10 May 2021</a:t>
             </a:r>
           </a:p>
         </p:txBody>
@@ -7547,7 +7547,7 @@
           <a:p>
             <a:r>
               <a:rPr/>
-              <a:t>Upper Tier Local Authority cumulative cases as at 09 May</a:t>
+              <a:t>Upper Tier Local Authority cumulative cases as at 10 May</a:t>
             </a:r>
           </a:p>
         </p:txBody>
@@ -8082,7 +8082,7 @@
                           <a:latin typeface="Calibri"/>
                           <a:cs typeface="Calibri"/>
                         </a:rPr>
-                        <a:t>42,042</a:t>
+                        <a:t>42,066</a:t>
                       </a:r>
                     </a:p>
                   </a:txBody>
@@ -8148,7 +8148,7 @@
                           <a:latin typeface="Calibri"/>
                           <a:cs typeface="Calibri"/>
                         </a:rPr>
-                        <a:t>4,866.1</a:t>
+                        <a:t>4,868.9</a:t>
                       </a:r>
                     </a:p>
                   </a:txBody>
@@ -8414,7 +8414,7 @@
                           <a:latin typeface="Calibri"/>
                           <a:cs typeface="Calibri"/>
                         </a:rPr>
-                        <a:t>3,874,415</a:t>
+                        <a:t>3,876,424</a:t>
                       </a:r>
                     </a:p>
                   </a:txBody>
@@ -8480,7 +8480,7 @@
                           <a:latin typeface="Calibri"/>
                           <a:cs typeface="Calibri"/>
                         </a:rPr>
-                        <a:t>6,883.3</a:t>
+                        <a:t>6,886.9</a:t>
                       </a:r>
                     </a:p>
                   </a:txBody>
@@ -8746,7 +8746,7 @@
                           <a:latin typeface="Calibri"/>
                           <a:cs typeface="Calibri"/>
                         </a:rPr>
-                        <a:t>541,730</a:t>
+                        <a:t>541,958</a:t>
                       </a:r>
                     </a:p>
                   </a:txBody>
@@ -8812,7 +8812,7 @@
                           <a:latin typeface="Calibri"/>
                           <a:cs typeface="Calibri"/>
                         </a:rPr>
-                        <a:t>5,901.1</a:t>
+                        <a:t>5,903.6</a:t>
                       </a:r>
                     </a:p>
                   </a:txBody>
@@ -9061,7 +9061,7 @@
           <a:p>
             <a:r>
               <a:rPr/>
-              <a:t>Pack date: 09 May 2021</a:t>
+              <a:t>Pack date: 10 May 2021</a:t>
             </a:r>
           </a:p>
         </p:txBody>
@@ -9142,7 +9142,7 @@
           <a:p>
             <a:r>
               <a:rPr/>
-              <a:t>Upper Tier Local Authority rolling 7 day cases as at 09 May</a:t>
+              <a:t>Upper Tier Local Authority rolling 7 day cases as at 10 May</a:t>
             </a:r>
           </a:p>
         </p:txBody>
@@ -9223,7 +9223,7 @@
           <a:p>
             <a:r>
               <a:rPr/>
-              <a:t>Note that the very recent days are excluded in the 7-day total as these are thought to be incomplete. As such, this data represents cases in the seven days to 04 May</a:t>
+              <a:t>Note that the very recent days are excluded in the 7-day total as these are thought to be incomplete. As such, this data represents cases in the seven days to 05 May</a:t>
             </a:r>
           </a:p>
         </p:txBody>
@@ -9677,7 +9677,7 @@
                           <a:latin typeface="Calibri"/>
                           <a:cs typeface="Calibri"/>
                         </a:rPr>
-                        <a:t>106</a:t>
+                        <a:t>104</a:t>
                       </a:r>
                     </a:p>
                   </a:txBody>
@@ -9743,7 +9743,7 @@
                           <a:latin typeface="Calibri"/>
                           <a:cs typeface="Calibri"/>
                         </a:rPr>
-                        <a:t>12.3</a:t>
+                        <a:t>12.0</a:t>
                       </a:r>
                     </a:p>
                   </a:txBody>
@@ -9809,7 +9809,7 @@
                           <a:latin typeface="Calibri"/>
                           <a:cs typeface="Calibri"/>
                         </a:rPr>
-                        <a:t>120th</a:t>
+                        <a:t>121st</a:t>
                       </a:r>
                     </a:p>
                   </a:txBody>
@@ -10009,7 +10009,7 @@
                           <a:latin typeface="Calibri"/>
                           <a:cs typeface="Calibri"/>
                         </a:rPr>
-                        <a:t>12,055</a:t>
+                        <a:t>12,050</a:t>
                       </a:r>
                     </a:p>
                   </a:txBody>
@@ -10341,7 +10341,7 @@
                           <a:latin typeface="Calibri"/>
                           <a:cs typeface="Calibri"/>
                         </a:rPr>
-                        <a:t>1,341</a:t>
+                        <a:t>1,288</a:t>
                       </a:r>
                     </a:p>
                   </a:txBody>
@@ -10407,7 +10407,7 @@
                           <a:latin typeface="Calibri"/>
                           <a:cs typeface="Calibri"/>
                         </a:rPr>
-                        <a:t>14.6</a:t>
+                        <a:t>14.0</a:t>
                       </a:r>
                     </a:p>
                   </a:txBody>
@@ -10656,7 +10656,7 @@
           <a:p>
             <a:r>
               <a:rPr/>
-              <a:t>Pack date: 09 May 2021</a:t>
+              <a:t>Pack date: 10 May 2021</a:t>
             </a:r>
           </a:p>
         </p:txBody>
@@ -10737,7 +10737,7 @@
           <a:p>
             <a:r>
               <a:rPr/>
-              <a:t>Lower Tier Local Authority cumulative cases as at 09 May</a:t>
+              <a:t>Lower Tier Local Authority cumulative cases as at 10 May</a:t>
             </a:r>
           </a:p>
         </p:txBody>
@@ -11245,7 +11245,7 @@
                           <a:latin typeface="Calibri"/>
                           <a:cs typeface="Calibri"/>
                         </a:rPr>
-                        <a:t>2,915</a:t>
+                        <a:t>2,916</a:t>
                       </a:r>
                     </a:p>
                   </a:txBody>
@@ -11311,7 +11311,7 @@
                           <a:latin typeface="Calibri"/>
                           <a:cs typeface="Calibri"/>
                         </a:rPr>
-                        <a:t>4,533.4</a:t>
+                        <a:t>4,534.9</a:t>
                       </a:r>
                     </a:p>
                   </a:txBody>
@@ -11577,7 +11577,7 @@
                           <a:latin typeface="Calibri"/>
                           <a:cs typeface="Calibri"/>
                         </a:rPr>
-                        <a:t>8,309</a:t>
+                        <a:t>8,311</a:t>
                       </a:r>
                     </a:p>
                   </a:txBody>
@@ -11643,7 +11643,7 @@
                           <a:latin typeface="Calibri"/>
                           <a:cs typeface="Calibri"/>
                         </a:rPr>
-                        <a:t>5,168.6</a:t>
+                        <a:t>5,169.9</a:t>
                       </a:r>
                     </a:p>
                   </a:txBody>
@@ -11909,7 +11909,7 @@
                           <a:latin typeface="Calibri"/>
                           <a:cs typeface="Calibri"/>
                         </a:rPr>
-                        <a:t>4,934</a:t>
+                        <a:t>4,939</a:t>
                       </a:r>
                     </a:p>
                   </a:txBody>
@@ -11975,7 +11975,7 @@
                           <a:latin typeface="Calibri"/>
                           <a:cs typeface="Calibri"/>
                         </a:rPr>
-                        <a:t>4,073.3</a:t>
+                        <a:t>4,077.5</a:t>
                       </a:r>
                     </a:p>
                   </a:txBody>
@@ -12241,7 +12241,7 @@
                           <a:latin typeface="Calibri"/>
                           <a:cs typeface="Calibri"/>
                         </a:rPr>
-                        <a:t>7,980</a:t>
+                        <a:t>7,988</a:t>
                       </a:r>
                     </a:p>
                   </a:txBody>
@@ -12307,7 +12307,7 @@
                           <a:latin typeface="Calibri"/>
                           <a:cs typeface="Calibri"/>
                         </a:rPr>
-                        <a:t>7,099.1</a:t>
+                        <a:t>7,106.2</a:t>
                       </a:r>
                     </a:p>
                   </a:txBody>
@@ -12373,7 +12373,7 @@
                           <a:latin typeface="Calibri"/>
                           <a:cs typeface="Calibri"/>
                         </a:rPr>
-                        <a:t>113th</a:t>
+                        <a:t>112th</a:t>
                       </a:r>
                     </a:p>
                   </a:txBody>
@@ -12573,7 +12573,7 @@
                           <a:latin typeface="Calibri"/>
                           <a:cs typeface="Calibri"/>
                         </a:rPr>
-                        <a:t>5,713</a:t>
+                        <a:t>5,715</a:t>
                       </a:r>
                     </a:p>
                   </a:txBody>
@@ -12639,7 +12639,7 @@
                           <a:latin typeface="Calibri"/>
                           <a:cs typeface="Calibri"/>
                         </a:rPr>
-                        <a:t>3,973.1</a:t>
+                        <a:t>3,974.5</a:t>
                       </a:r>
                     </a:p>
                   </a:txBody>
@@ -12905,7 +12905,7 @@
                           <a:latin typeface="Calibri"/>
                           <a:cs typeface="Calibri"/>
                         </a:rPr>
-                        <a:t>6,852</a:t>
+                        <a:t>6,856</a:t>
                       </a:r>
                     </a:p>
                   </a:txBody>
@@ -12971,7 +12971,7 @@
                           <a:latin typeface="Calibri"/>
                           <a:cs typeface="Calibri"/>
                         </a:rPr>
-                        <a:t>4,537.1</a:t>
+                        <a:t>4,539.7</a:t>
                       </a:r>
                     </a:p>
                   </a:txBody>
@@ -13237,7 +13237,7 @@
                           <a:latin typeface="Calibri"/>
                           <a:cs typeface="Calibri"/>
                         </a:rPr>
-                        <a:t>5,339</a:t>
+                        <a:t>5,341</a:t>
                       </a:r>
                     </a:p>
                   </a:txBody>
@@ -13303,7 +13303,7 @@
                           <a:latin typeface="Calibri"/>
                           <a:cs typeface="Calibri"/>
                         </a:rPr>
-                        <a:t>4,828.6</a:t>
+                        <a:t>4,830.4</a:t>
                       </a:r>
                     </a:p>
                   </a:txBody>
@@ -13569,7 +13569,7 @@
                           <a:latin typeface="Calibri"/>
                           <a:cs typeface="Calibri"/>
                         </a:rPr>
-                        <a:t>42,042</a:t>
+                        <a:t>42,066</a:t>
                       </a:r>
                     </a:p>
                   </a:txBody>
@@ -13635,7 +13635,7 @@
                           <a:latin typeface="Calibri"/>
                           <a:cs typeface="Calibri"/>
                         </a:rPr>
-                        <a:t>4,866.1</a:t>
+                        <a:t>4,868.9</a:t>
                       </a:r>
                     </a:p>
                   </a:txBody>
@@ -13901,7 +13901,7 @@
                           <a:latin typeface="Calibri"/>
                           <a:cs typeface="Calibri"/>
                         </a:rPr>
-                        <a:t>541,730</a:t>
+                        <a:t>541,958</a:t>
                       </a:r>
                     </a:p>
                   </a:txBody>
@@ -13967,7 +13967,7 @@
                           <a:latin typeface="Calibri"/>
                           <a:cs typeface="Calibri"/>
                         </a:rPr>
-                        <a:t>5,901.1</a:t>
+                        <a:t>5,903.6</a:t>
                       </a:r>
                     </a:p>
                   </a:txBody>
@@ -14233,7 +14233,7 @@
                           <a:latin typeface="Calibri"/>
                           <a:cs typeface="Calibri"/>
                         </a:rPr>
-                        <a:t>3,874,415</a:t>
+                        <a:t>3,876,424</a:t>
                       </a:r>
                     </a:p>
                   </a:txBody>
@@ -14299,7 +14299,7 @@
                           <a:latin typeface="Calibri"/>
                           <a:cs typeface="Calibri"/>
                         </a:rPr>
-                        <a:t>6,883.3</a:t>
+                        <a:t>6,886.9</a:t>
                       </a:r>
                     </a:p>
                   </a:txBody>
@@ -14548,7 +14548,7 @@
           <a:p>
             <a:r>
               <a:rPr/>
-              <a:t>Pack date: 09 May 2021</a:t>
+              <a:t>Pack date: 10 May 2021</a:t>
             </a:r>
           </a:p>
         </p:txBody>
@@ -14629,7 +14629,7 @@
           <a:p>
             <a:r>
               <a:rPr/>
-              <a:t>Lower Tier Local Authority rolling cases as at 09 May</a:t>
+              <a:t>Lower Tier Local Authority rolling cases as at 10 May</a:t>
             </a:r>
           </a:p>
         </p:txBody>
@@ -14710,7 +14710,7 @@
           <a:p>
             <a:r>
               <a:rPr/>
-              <a:t>Note that the very recent days are excluded in the 7-day total as these are thought to be incomplete. As such, this data represents cases in the seven days to 04 May</a:t>
+              <a:t>Note that the very recent days are excluded in the 7-day total as these are thought to be incomplete. As such, this data represents cases in the seven days to 05 May</a:t>
             </a:r>
           </a:p>
         </p:txBody>
@@ -15296,7 +15296,7 @@
                           <a:latin typeface="Calibri"/>
                           <a:cs typeface="Calibri"/>
                         </a:rPr>
-                        <a:t>163rd</a:t>
+                        <a:t>157th</a:t>
                       </a:r>
                     </a:p>
                   </a:txBody>
@@ -15496,7 +15496,7 @@
                           <a:latin typeface="Calibri"/>
                           <a:cs typeface="Calibri"/>
                         </a:rPr>
-                        <a:t>23</a:t>
+                        <a:t>26</a:t>
                       </a:r>
                     </a:p>
                   </a:txBody>
@@ -15562,7 +15562,7 @@
                           <a:latin typeface="Calibri"/>
                           <a:cs typeface="Calibri"/>
                         </a:rPr>
-                        <a:t>14.3</a:t>
+                        <a:t>16.2</a:t>
                       </a:r>
                     </a:p>
                   </a:txBody>
@@ -15628,7 +15628,339 @@
                           <a:latin typeface="Calibri"/>
                           <a:cs typeface="Calibri"/>
                         </a:rPr>
-                        <a:t>187th</a:t>
+                        <a:t>145th</a:t>
+                      </a:r>
+                    </a:p>
+                  </a:txBody>
+                  <a:tcPr anchor="t" marB="0" marT="0" marR="0" marL="0">
+                    <a:lnL w="0" cmpd="sng" algn="ctr" cap="flat">
+                      <a:solidFill>
+                        <a:srgbClr val="FFFFFF">
+                          <a:alpha val="0"/>
+                        </a:srgbClr>
+                      </a:solidFill>
+                      <a:prstDash val="solid"/>
+                    </a:lnL>
+                    <a:lnR w="0" cmpd="sng" algn="ctr" cap="flat">
+                      <a:solidFill>
+                        <a:srgbClr val="FFFFFF">
+                          <a:alpha val="0"/>
+                        </a:srgbClr>
+                      </a:solidFill>
+                      <a:prstDash val="solid"/>
+                    </a:lnR>
+                    <a:lnT w="0" cmpd="sng" algn="ctr" cap="flat">
+                      <a:solidFill>
+                        <a:srgbClr val="FFFFFF">
+                          <a:alpha val="0"/>
+                        </a:srgbClr>
+                      </a:solidFill>
+                      <a:prstDash val="solid"/>
+                    </a:lnT>
+                    <a:lnB w="0" cmpd="sng" algn="ctr" cap="flat">
+                      <a:solidFill>
+                        <a:srgbClr val="FFFFFF">
+                          <a:alpha val="0"/>
+                        </a:srgbClr>
+                      </a:solidFill>
+                      <a:prstDash val="solid"/>
+                    </a:lnB>
+                  </a:tcPr>
+                </a:tc>
+                <a:tc>
+                  <a:txBody>
+                    <a:bodyPr/>
+                    <a:lstStyle/>
+                    <a:p>
+                      <a:pPr algn="l" marL="63500" marR="63500">
+                        <a:lnSpc>
+                          <a:spcPct val="100000"/>
+                        </a:lnSpc>
+                        <a:spcBef>
+                          <a:spcPts val="200"/>
+                        </a:spcBef>
+                        <a:spcAft>
+                          <a:spcPts val="200"/>
+                        </a:spcAft>
+                        <a:buNone/>
+                      </a:pPr>
+                      <a:r>
+                        <a:rPr sz="1100">
+                          <a:solidFill>
+                            <a:srgbClr val="111111">
+                              <a:alpha val="100000"/>
+                            </a:srgbClr>
+                          </a:solidFill>
+                          <a:latin typeface="Calibri"/>
+                          <a:cs typeface="Calibri"/>
+                        </a:rPr>
+                        <a:t>Decile 5</a:t>
+                      </a:r>
+                    </a:p>
+                  </a:txBody>
+                  <a:tcPr anchor="t" marB="0" marT="0" marR="0" marL="0">
+                    <a:lnL w="0" cmpd="sng" algn="ctr" cap="flat">
+                      <a:solidFill>
+                        <a:srgbClr val="FFFFFF">
+                          <a:alpha val="0"/>
+                        </a:srgbClr>
+                      </a:solidFill>
+                      <a:prstDash val="solid"/>
+                    </a:lnL>
+                    <a:lnR w="0" cmpd="sng" algn="ctr" cap="flat">
+                      <a:solidFill>
+                        <a:srgbClr val="FFFFFF">
+                          <a:alpha val="0"/>
+                        </a:srgbClr>
+                      </a:solidFill>
+                      <a:prstDash val="solid"/>
+                    </a:lnR>
+                    <a:lnT w="0" cmpd="sng" algn="ctr" cap="flat">
+                      <a:solidFill>
+                        <a:srgbClr val="FFFFFF">
+                          <a:alpha val="0"/>
+                        </a:srgbClr>
+                      </a:solidFill>
+                      <a:prstDash val="solid"/>
+                    </a:lnT>
+                    <a:lnB w="0" cmpd="sng" algn="ctr" cap="flat">
+                      <a:solidFill>
+                        <a:srgbClr val="FFFFFF">
+                          <a:alpha val="0"/>
+                        </a:srgbClr>
+                      </a:solidFill>
+                      <a:prstDash val="solid"/>
+                    </a:lnB>
+                  </a:tcPr>
+                </a:tc>
+              </a:tr>
+              <a:tr h="182880">
+                <a:tc>
+                  <a:txBody>
+                    <a:bodyPr/>
+                    <a:lstStyle/>
+                    <a:p>
+                      <a:pPr algn="l" marL="63500" marR="63500">
+                        <a:lnSpc>
+                          <a:spcPct val="100000"/>
+                        </a:lnSpc>
+                        <a:spcBef>
+                          <a:spcPts val="200"/>
+                        </a:spcBef>
+                        <a:spcAft>
+                          <a:spcPts val="200"/>
+                        </a:spcAft>
+                        <a:buNone/>
+                      </a:pPr>
+                      <a:r>
+                        <a:rPr sz="1100">
+                          <a:solidFill>
+                            <a:srgbClr val="111111">
+                              <a:alpha val="100000"/>
+                            </a:srgbClr>
+                          </a:solidFill>
+                          <a:latin typeface="Calibri"/>
+                          <a:cs typeface="Calibri"/>
+                        </a:rPr>
+                        <a:t>Chichester</a:t>
+                      </a:r>
+                    </a:p>
+                  </a:txBody>
+                  <a:tcPr anchor="t" marB="0" marT="0" marR="0" marL="0">
+                    <a:lnL w="0" cmpd="sng" algn="ctr" cap="flat">
+                      <a:solidFill>
+                        <a:srgbClr val="FFFFFF">
+                          <a:alpha val="0"/>
+                        </a:srgbClr>
+                      </a:solidFill>
+                      <a:prstDash val="solid"/>
+                    </a:lnL>
+                    <a:lnR w="0" cmpd="sng" algn="ctr" cap="flat">
+                      <a:solidFill>
+                        <a:srgbClr val="FFFFFF">
+                          <a:alpha val="0"/>
+                        </a:srgbClr>
+                      </a:solidFill>
+                      <a:prstDash val="solid"/>
+                    </a:lnR>
+                    <a:lnT w="0" cmpd="sng" algn="ctr" cap="flat">
+                      <a:solidFill>
+                        <a:srgbClr val="FFFFFF">
+                          <a:alpha val="0"/>
+                        </a:srgbClr>
+                      </a:solidFill>
+                      <a:prstDash val="solid"/>
+                    </a:lnT>
+                    <a:lnB w="0" cmpd="sng" algn="ctr" cap="flat">
+                      <a:solidFill>
+                        <a:srgbClr val="FFFFFF">
+                          <a:alpha val="0"/>
+                        </a:srgbClr>
+                      </a:solidFill>
+                      <a:prstDash val="solid"/>
+                    </a:lnB>
+                  </a:tcPr>
+                </a:tc>
+                <a:tc>
+                  <a:txBody>
+                    <a:bodyPr/>
+                    <a:lstStyle/>
+                    <a:p>
+                      <a:pPr algn="l" marL="63500" marR="63500">
+                        <a:lnSpc>
+                          <a:spcPct val="100000"/>
+                        </a:lnSpc>
+                        <a:spcBef>
+                          <a:spcPts val="200"/>
+                        </a:spcBef>
+                        <a:spcAft>
+                          <a:spcPts val="200"/>
+                        </a:spcAft>
+                        <a:buNone/>
+                      </a:pPr>
+                      <a:r>
+                        <a:rPr sz="1100">
+                          <a:solidFill>
+                            <a:srgbClr val="111111">
+                              <a:alpha val="100000"/>
+                            </a:srgbClr>
+                          </a:solidFill>
+                          <a:latin typeface="Calibri"/>
+                          <a:cs typeface="Calibri"/>
+                        </a:rPr>
+                        <a:t>18</a:t>
+                      </a:r>
+                    </a:p>
+                  </a:txBody>
+                  <a:tcPr anchor="t" marB="0" marT="0" marR="0" marL="0">
+                    <a:lnL w="0" cmpd="sng" algn="ctr" cap="flat">
+                      <a:solidFill>
+                        <a:srgbClr val="FFFFFF">
+                          <a:alpha val="0"/>
+                        </a:srgbClr>
+                      </a:solidFill>
+                      <a:prstDash val="solid"/>
+                    </a:lnL>
+                    <a:lnR w="0" cmpd="sng" algn="ctr" cap="flat">
+                      <a:solidFill>
+                        <a:srgbClr val="FFFFFF">
+                          <a:alpha val="0"/>
+                        </a:srgbClr>
+                      </a:solidFill>
+                      <a:prstDash val="solid"/>
+                    </a:lnR>
+                    <a:lnT w="0" cmpd="sng" algn="ctr" cap="flat">
+                      <a:solidFill>
+                        <a:srgbClr val="FFFFFF">
+                          <a:alpha val="0"/>
+                        </a:srgbClr>
+                      </a:solidFill>
+                      <a:prstDash val="solid"/>
+                    </a:lnT>
+                    <a:lnB w="0" cmpd="sng" algn="ctr" cap="flat">
+                      <a:solidFill>
+                        <a:srgbClr val="FFFFFF">
+                          <a:alpha val="0"/>
+                        </a:srgbClr>
+                      </a:solidFill>
+                      <a:prstDash val="solid"/>
+                    </a:lnB>
+                  </a:tcPr>
+                </a:tc>
+                <a:tc>
+                  <a:txBody>
+                    <a:bodyPr/>
+                    <a:lstStyle/>
+                    <a:p>
+                      <a:pPr algn="l" marL="63500" marR="63500">
+                        <a:lnSpc>
+                          <a:spcPct val="100000"/>
+                        </a:lnSpc>
+                        <a:spcBef>
+                          <a:spcPts val="200"/>
+                        </a:spcBef>
+                        <a:spcAft>
+                          <a:spcPts val="200"/>
+                        </a:spcAft>
+                        <a:buNone/>
+                      </a:pPr>
+                      <a:r>
+                        <a:rPr sz="1100">
+                          <a:solidFill>
+                            <a:srgbClr val="111111">
+                              <a:alpha val="100000"/>
+                            </a:srgbClr>
+                          </a:solidFill>
+                          <a:latin typeface="Calibri"/>
+                          <a:cs typeface="Calibri"/>
+                        </a:rPr>
+                        <a:t>14.9</a:t>
+                      </a:r>
+                    </a:p>
+                  </a:txBody>
+                  <a:tcPr anchor="t" marB="0" marT="0" marR="0" marL="0">
+                    <a:lnL w="0" cmpd="sng" algn="ctr" cap="flat">
+                      <a:solidFill>
+                        <a:srgbClr val="FFFFFF">
+                          <a:alpha val="0"/>
+                        </a:srgbClr>
+                      </a:solidFill>
+                      <a:prstDash val="solid"/>
+                    </a:lnL>
+                    <a:lnR w="0" cmpd="sng" algn="ctr" cap="flat">
+                      <a:solidFill>
+                        <a:srgbClr val="FFFFFF">
+                          <a:alpha val="0"/>
+                        </a:srgbClr>
+                      </a:solidFill>
+                      <a:prstDash val="solid"/>
+                    </a:lnR>
+                    <a:lnT w="0" cmpd="sng" algn="ctr" cap="flat">
+                      <a:solidFill>
+                        <a:srgbClr val="FFFFFF">
+                          <a:alpha val="0"/>
+                        </a:srgbClr>
+                      </a:solidFill>
+                      <a:prstDash val="solid"/>
+                    </a:lnT>
+                    <a:lnB w="0" cmpd="sng" algn="ctr" cap="flat">
+                      <a:solidFill>
+                        <a:srgbClr val="FFFFFF">
+                          <a:alpha val="0"/>
+                        </a:srgbClr>
+                      </a:solidFill>
+                      <a:prstDash val="solid"/>
+                    </a:lnB>
+                  </a:tcPr>
+                </a:tc>
+                <a:tc>
+                  <a:txBody>
+                    <a:bodyPr/>
+                    <a:lstStyle/>
+                    <a:p>
+                      <a:pPr algn="l" marL="63500" marR="63500">
+                        <a:lnSpc>
+                          <a:spcPct val="100000"/>
+                        </a:lnSpc>
+                        <a:spcBef>
+                          <a:spcPts val="200"/>
+                        </a:spcBef>
+                        <a:spcAft>
+                          <a:spcPts val="200"/>
+                        </a:spcAft>
+                        <a:buNone/>
+                      </a:pPr>
+                      <a:r>
+                        <a:rPr sz="1100">
+                          <a:solidFill>
+                            <a:srgbClr val="111111">
+                              <a:alpha val="100000"/>
+                            </a:srgbClr>
+                          </a:solidFill>
+                          <a:latin typeface="Calibri"/>
+                          <a:cs typeface="Calibri"/>
+                        </a:rPr>
+                        <a:t>169th</a:t>
                       </a:r>
                     </a:p>
                   </a:txBody>
@@ -15762,7 +16094,7 @@
                           <a:latin typeface="Calibri"/>
                           <a:cs typeface="Calibri"/>
                         </a:rPr>
-                        <a:t>Chichester</a:t>
+                        <a:t>Crawley</a:t>
                       </a:r>
                     </a:p>
                   </a:txBody>
@@ -15828,7 +16160,7 @@
                           <a:latin typeface="Calibri"/>
                           <a:cs typeface="Calibri"/>
                         </a:rPr>
-                        <a:t>21</a:t>
+                        <a:t>18</a:t>
                       </a:r>
                     </a:p>
                   </a:txBody>
@@ -15894,7 +16226,7 @@
                           <a:latin typeface="Calibri"/>
                           <a:cs typeface="Calibri"/>
                         </a:rPr>
-                        <a:t>17.3</a:t>
+                        <a:t>16.0</a:t>
                       </a:r>
                     </a:p>
                   </a:txBody>
@@ -15960,7 +16292,7 @@
                           <a:latin typeface="Calibri"/>
                           <a:cs typeface="Calibri"/>
                         </a:rPr>
-                        <a:t>134th</a:t>
+                        <a:t>147th</a:t>
                       </a:r>
                     </a:p>
                   </a:txBody>
@@ -16094,7 +16426,7 @@
                           <a:latin typeface="Calibri"/>
                           <a:cs typeface="Calibri"/>
                         </a:rPr>
-                        <a:t>Crawley</a:t>
+                        <a:t>Horsham</a:t>
                       </a:r>
                     </a:p>
                   </a:txBody>
@@ -16160,7 +16492,7 @@
                           <a:latin typeface="Calibri"/>
                           <a:cs typeface="Calibri"/>
                         </a:rPr>
-                        <a:t>17</a:t>
+                        <a:t>12</a:t>
                       </a:r>
                     </a:p>
                   </a:txBody>
@@ -16226,7 +16558,7 @@
                           <a:latin typeface="Calibri"/>
                           <a:cs typeface="Calibri"/>
                         </a:rPr>
-                        <a:t>15.1</a:t>
+                        <a:t>8.3</a:t>
                       </a:r>
                     </a:p>
                   </a:txBody>
@@ -16292,7 +16624,7 @@
                           <a:latin typeface="Calibri"/>
                           <a:cs typeface="Calibri"/>
                         </a:rPr>
-                        <a:t>173rd</a:t>
+                        <a:t>271st</a:t>
                       </a:r>
                     </a:p>
                   </a:txBody>
@@ -16358,7 +16690,7 @@
                           <a:latin typeface="Calibri"/>
                           <a:cs typeface="Calibri"/>
                         </a:rPr>
-                        <a:t>Decile 6</a:t>
+                        <a:t>Decile 9</a:t>
                       </a:r>
                     </a:p>
                   </a:txBody>
@@ -16426,7 +16758,7 @@
                           <a:latin typeface="Calibri"/>
                           <a:cs typeface="Calibri"/>
                         </a:rPr>
-                        <a:t>Horsham</a:t>
+                        <a:t>Mid Sussex</a:t>
                       </a:r>
                     </a:p>
                   </a:txBody>
@@ -16492,7 +16824,7 @@
                           <a:latin typeface="Calibri"/>
                           <a:cs typeface="Calibri"/>
                         </a:rPr>
-                        <a:t>11</a:t>
+                        <a:t>12</a:t>
                       </a:r>
                     </a:p>
                   </a:txBody>
@@ -16558,7 +16890,7 @@
                           <a:latin typeface="Calibri"/>
                           <a:cs typeface="Calibri"/>
                         </a:rPr>
-                        <a:t>7.6</a:t>
+                        <a:t>7.9</a:t>
                       </a:r>
                     </a:p>
                   </a:txBody>
@@ -16624,7 +16956,339 @@
                           <a:latin typeface="Calibri"/>
                           <a:cs typeface="Calibri"/>
                         </a:rPr>
-                        <a:t>285th</a:t>
+                        <a:t>274th</a:t>
+                      </a:r>
+                    </a:p>
+                  </a:txBody>
+                  <a:tcPr anchor="t" marB="0" marT="0" marR="0" marL="0">
+                    <a:lnL w="0" cmpd="sng" algn="ctr" cap="flat">
+                      <a:solidFill>
+                        <a:srgbClr val="FFFFFF">
+                          <a:alpha val="0"/>
+                        </a:srgbClr>
+                      </a:solidFill>
+                      <a:prstDash val="solid"/>
+                    </a:lnL>
+                    <a:lnR w="0" cmpd="sng" algn="ctr" cap="flat">
+                      <a:solidFill>
+                        <a:srgbClr val="FFFFFF">
+                          <a:alpha val="0"/>
+                        </a:srgbClr>
+                      </a:solidFill>
+                      <a:prstDash val="solid"/>
+                    </a:lnR>
+                    <a:lnT w="0" cmpd="sng" algn="ctr" cap="flat">
+                      <a:solidFill>
+                        <a:srgbClr val="FFFFFF">
+                          <a:alpha val="0"/>
+                        </a:srgbClr>
+                      </a:solidFill>
+                      <a:prstDash val="solid"/>
+                    </a:lnT>
+                    <a:lnB w="0" cmpd="sng" algn="ctr" cap="flat">
+                      <a:solidFill>
+                        <a:srgbClr val="FFFFFF">
+                          <a:alpha val="0"/>
+                        </a:srgbClr>
+                      </a:solidFill>
+                      <a:prstDash val="solid"/>
+                    </a:lnB>
+                  </a:tcPr>
+                </a:tc>
+                <a:tc>
+                  <a:txBody>
+                    <a:bodyPr/>
+                    <a:lstStyle/>
+                    <a:p>
+                      <a:pPr algn="l" marL="63500" marR="63500">
+                        <a:lnSpc>
+                          <a:spcPct val="100000"/>
+                        </a:lnSpc>
+                        <a:spcBef>
+                          <a:spcPts val="200"/>
+                        </a:spcBef>
+                        <a:spcAft>
+                          <a:spcPts val="200"/>
+                        </a:spcAft>
+                        <a:buNone/>
+                      </a:pPr>
+                      <a:r>
+                        <a:rPr sz="1100">
+                          <a:solidFill>
+                            <a:srgbClr val="111111">
+                              <a:alpha val="100000"/>
+                            </a:srgbClr>
+                          </a:solidFill>
+                          <a:latin typeface="Calibri"/>
+                          <a:cs typeface="Calibri"/>
+                        </a:rPr>
+                        <a:t>Decile 9</a:t>
+                      </a:r>
+                    </a:p>
+                  </a:txBody>
+                  <a:tcPr anchor="t" marB="0" marT="0" marR="0" marL="0">
+                    <a:lnL w="0" cmpd="sng" algn="ctr" cap="flat">
+                      <a:solidFill>
+                        <a:srgbClr val="FFFFFF">
+                          <a:alpha val="0"/>
+                        </a:srgbClr>
+                      </a:solidFill>
+                      <a:prstDash val="solid"/>
+                    </a:lnL>
+                    <a:lnR w="0" cmpd="sng" algn="ctr" cap="flat">
+                      <a:solidFill>
+                        <a:srgbClr val="FFFFFF">
+                          <a:alpha val="0"/>
+                        </a:srgbClr>
+                      </a:solidFill>
+                      <a:prstDash val="solid"/>
+                    </a:lnR>
+                    <a:lnT w="0" cmpd="sng" algn="ctr" cap="flat">
+                      <a:solidFill>
+                        <a:srgbClr val="FFFFFF">
+                          <a:alpha val="0"/>
+                        </a:srgbClr>
+                      </a:solidFill>
+                      <a:prstDash val="solid"/>
+                    </a:lnT>
+                    <a:lnB w="0" cmpd="sng" algn="ctr" cap="flat">
+                      <a:solidFill>
+                        <a:srgbClr val="FFFFFF">
+                          <a:alpha val="0"/>
+                        </a:srgbClr>
+                      </a:solidFill>
+                      <a:prstDash val="solid"/>
+                    </a:lnB>
+                  </a:tcPr>
+                </a:tc>
+              </a:tr>
+              <a:tr h="182880">
+                <a:tc>
+                  <a:txBody>
+                    <a:bodyPr/>
+                    <a:lstStyle/>
+                    <a:p>
+                      <a:pPr algn="l" marL="63500" marR="63500">
+                        <a:lnSpc>
+                          <a:spcPct val="100000"/>
+                        </a:lnSpc>
+                        <a:spcBef>
+                          <a:spcPts val="200"/>
+                        </a:spcBef>
+                        <a:spcAft>
+                          <a:spcPts val="200"/>
+                        </a:spcAft>
+                        <a:buNone/>
+                      </a:pPr>
+                      <a:r>
+                        <a:rPr sz="1100">
+                          <a:solidFill>
+                            <a:srgbClr val="111111">
+                              <a:alpha val="100000"/>
+                            </a:srgbClr>
+                          </a:solidFill>
+                          <a:latin typeface="Calibri"/>
+                          <a:cs typeface="Calibri"/>
+                        </a:rPr>
+                        <a:t>Worthing</a:t>
+                      </a:r>
+                    </a:p>
+                  </a:txBody>
+                  <a:tcPr anchor="t" marB="0" marT="0" marR="0" marL="0">
+                    <a:lnL w="0" cmpd="sng" algn="ctr" cap="flat">
+                      <a:solidFill>
+                        <a:srgbClr val="FFFFFF">
+                          <a:alpha val="0"/>
+                        </a:srgbClr>
+                      </a:solidFill>
+                      <a:prstDash val="solid"/>
+                    </a:lnL>
+                    <a:lnR w="0" cmpd="sng" algn="ctr" cap="flat">
+                      <a:solidFill>
+                        <a:srgbClr val="FFFFFF">
+                          <a:alpha val="0"/>
+                        </a:srgbClr>
+                      </a:solidFill>
+                      <a:prstDash val="solid"/>
+                    </a:lnR>
+                    <a:lnT w="0" cmpd="sng" algn="ctr" cap="flat">
+                      <a:solidFill>
+                        <a:srgbClr val="FFFFFF">
+                          <a:alpha val="0"/>
+                        </a:srgbClr>
+                      </a:solidFill>
+                      <a:prstDash val="solid"/>
+                    </a:lnT>
+                    <a:lnB w="0" cmpd="sng" algn="ctr" cap="flat">
+                      <a:solidFill>
+                        <a:srgbClr val="FFFFFF">
+                          <a:alpha val="0"/>
+                        </a:srgbClr>
+                      </a:solidFill>
+                      <a:prstDash val="solid"/>
+                    </a:lnB>
+                  </a:tcPr>
+                </a:tc>
+                <a:tc>
+                  <a:txBody>
+                    <a:bodyPr/>
+                    <a:lstStyle/>
+                    <a:p>
+                      <a:pPr algn="l" marL="63500" marR="63500">
+                        <a:lnSpc>
+                          <a:spcPct val="100000"/>
+                        </a:lnSpc>
+                        <a:spcBef>
+                          <a:spcPts val="200"/>
+                        </a:spcBef>
+                        <a:spcAft>
+                          <a:spcPts val="200"/>
+                        </a:spcAft>
+                        <a:buNone/>
+                      </a:pPr>
+                      <a:r>
+                        <a:rPr sz="1100">
+                          <a:solidFill>
+                            <a:srgbClr val="111111">
+                              <a:alpha val="100000"/>
+                            </a:srgbClr>
+                          </a:solidFill>
+                          <a:latin typeface="Calibri"/>
+                          <a:cs typeface="Calibri"/>
+                        </a:rPr>
+                        <a:t>8</a:t>
+                      </a:r>
+                    </a:p>
+                  </a:txBody>
+                  <a:tcPr anchor="t" marB="0" marT="0" marR="0" marL="0">
+                    <a:lnL w="0" cmpd="sng" algn="ctr" cap="flat">
+                      <a:solidFill>
+                        <a:srgbClr val="FFFFFF">
+                          <a:alpha val="0"/>
+                        </a:srgbClr>
+                      </a:solidFill>
+                      <a:prstDash val="solid"/>
+                    </a:lnL>
+                    <a:lnR w="0" cmpd="sng" algn="ctr" cap="flat">
+                      <a:solidFill>
+                        <a:srgbClr val="FFFFFF">
+                          <a:alpha val="0"/>
+                        </a:srgbClr>
+                      </a:solidFill>
+                      <a:prstDash val="solid"/>
+                    </a:lnR>
+                    <a:lnT w="0" cmpd="sng" algn="ctr" cap="flat">
+                      <a:solidFill>
+                        <a:srgbClr val="FFFFFF">
+                          <a:alpha val="0"/>
+                        </a:srgbClr>
+                      </a:solidFill>
+                      <a:prstDash val="solid"/>
+                    </a:lnT>
+                    <a:lnB w="0" cmpd="sng" algn="ctr" cap="flat">
+                      <a:solidFill>
+                        <a:srgbClr val="FFFFFF">
+                          <a:alpha val="0"/>
+                        </a:srgbClr>
+                      </a:solidFill>
+                      <a:prstDash val="solid"/>
+                    </a:lnB>
+                  </a:tcPr>
+                </a:tc>
+                <a:tc>
+                  <a:txBody>
+                    <a:bodyPr/>
+                    <a:lstStyle/>
+                    <a:p>
+                      <a:pPr algn="l" marL="63500" marR="63500">
+                        <a:lnSpc>
+                          <a:spcPct val="100000"/>
+                        </a:lnSpc>
+                        <a:spcBef>
+                          <a:spcPts val="200"/>
+                        </a:spcBef>
+                        <a:spcAft>
+                          <a:spcPts val="200"/>
+                        </a:spcAft>
+                        <a:buNone/>
+                      </a:pPr>
+                      <a:r>
+                        <a:rPr sz="1100">
+                          <a:solidFill>
+                            <a:srgbClr val="111111">
+                              <a:alpha val="100000"/>
+                            </a:srgbClr>
+                          </a:solidFill>
+                          <a:latin typeface="Calibri"/>
+                          <a:cs typeface="Calibri"/>
+                        </a:rPr>
+                        <a:t>7.2</a:t>
+                      </a:r>
+                    </a:p>
+                  </a:txBody>
+                  <a:tcPr anchor="t" marB="0" marT="0" marR="0" marL="0">
+                    <a:lnL w="0" cmpd="sng" algn="ctr" cap="flat">
+                      <a:solidFill>
+                        <a:srgbClr val="FFFFFF">
+                          <a:alpha val="0"/>
+                        </a:srgbClr>
+                      </a:solidFill>
+                      <a:prstDash val="solid"/>
+                    </a:lnL>
+                    <a:lnR w="0" cmpd="sng" algn="ctr" cap="flat">
+                      <a:solidFill>
+                        <a:srgbClr val="FFFFFF">
+                          <a:alpha val="0"/>
+                        </a:srgbClr>
+                      </a:solidFill>
+                      <a:prstDash val="solid"/>
+                    </a:lnR>
+                    <a:lnT w="0" cmpd="sng" algn="ctr" cap="flat">
+                      <a:solidFill>
+                        <a:srgbClr val="FFFFFF">
+                          <a:alpha val="0"/>
+                        </a:srgbClr>
+                      </a:solidFill>
+                      <a:prstDash val="solid"/>
+                    </a:lnT>
+                    <a:lnB w="0" cmpd="sng" algn="ctr" cap="flat">
+                      <a:solidFill>
+                        <a:srgbClr val="FFFFFF">
+                          <a:alpha val="0"/>
+                        </a:srgbClr>
+                      </a:solidFill>
+                      <a:prstDash val="solid"/>
+                    </a:lnB>
+                  </a:tcPr>
+                </a:tc>
+                <a:tc>
+                  <a:txBody>
+                    <a:bodyPr/>
+                    <a:lstStyle/>
+                    <a:p>
+                      <a:pPr algn="l" marL="63500" marR="63500">
+                        <a:lnSpc>
+                          <a:spcPct val="100000"/>
+                        </a:lnSpc>
+                        <a:spcBef>
+                          <a:spcPts val="200"/>
+                        </a:spcBef>
+                        <a:spcAft>
+                          <a:spcPts val="200"/>
+                        </a:spcAft>
+                        <a:buNone/>
+                      </a:pPr>
+                      <a:r>
+                        <a:rPr sz="1100">
+                          <a:solidFill>
+                            <a:srgbClr val="111111">
+                              <a:alpha val="100000"/>
+                            </a:srgbClr>
+                          </a:solidFill>
+                          <a:latin typeface="Calibri"/>
+                          <a:cs typeface="Calibri"/>
+                        </a:rPr>
+                        <a:t>288th</a:t>
                       </a:r>
                     </a:p>
                   </a:txBody>
@@ -16759,7 +17423,7 @@
                           <a:latin typeface="Calibri"/>
                           <a:cs typeface="Calibri"/>
                         </a:rPr>
-                        <a:t>Mid Sussex</a:t>
+                        <a:t>West Sussex</a:t>
                       </a:r>
                     </a:p>
                   </a:txBody>
@@ -16825,7 +17489,7 @@
                           <a:latin typeface="Calibri"/>
                           <a:cs typeface="Calibri"/>
                         </a:rPr>
-                        <a:t>16</a:t>
+                        <a:t>104</a:t>
                       </a:r>
                     </a:p>
                   </a:txBody>
@@ -16891,672 +17555,7 @@
                           <a:latin typeface="Calibri"/>
                           <a:cs typeface="Calibri"/>
                         </a:rPr>
-                        <a:t>10.6</a:t>
-                      </a:r>
-                    </a:p>
-                  </a:txBody>
-                  <a:tcPr anchor="t" marB="0" marT="0" marR="0" marL="0">
-                    <a:lnL w="0" cmpd="sng" algn="ctr" cap="flat">
-                      <a:solidFill>
-                        <a:srgbClr val="FFFFFF">
-                          <a:alpha val="0"/>
-                        </a:srgbClr>
-                      </a:solidFill>
-                      <a:prstDash val="solid"/>
-                    </a:lnL>
-                    <a:lnR w="0" cmpd="sng" algn="ctr" cap="flat">
-                      <a:solidFill>
-                        <a:srgbClr val="FFFFFF">
-                          <a:alpha val="0"/>
-                        </a:srgbClr>
-                      </a:solidFill>
-                      <a:prstDash val="solid"/>
-                    </a:lnR>
-                    <a:lnT w="0" cmpd="sng" algn="ctr" cap="flat">
-                      <a:solidFill>
-                        <a:srgbClr val="FFFFFF">
-                          <a:alpha val="0"/>
-                        </a:srgbClr>
-                      </a:solidFill>
-                      <a:prstDash val="solid"/>
-                    </a:lnT>
-                    <a:lnB w="0" cmpd="sng" algn="ctr" cap="flat">
-                      <a:solidFill>
-                        <a:srgbClr val="FFFFFF">
-                          <a:alpha val="0"/>
-                        </a:srgbClr>
-                      </a:solidFill>
-                      <a:prstDash val="solid"/>
-                    </a:lnB>
-                  </a:tcPr>
-                </a:tc>
-                <a:tc>
-                  <a:txBody>
-                    <a:bodyPr/>
-                    <a:lstStyle/>
-                    <a:p>
-                      <a:pPr algn="l" marL="63500" marR="63500">
-                        <a:lnSpc>
-                          <a:spcPct val="100000"/>
-                        </a:lnSpc>
-                        <a:spcBef>
-                          <a:spcPts val="200"/>
-                        </a:spcBef>
-                        <a:spcAft>
-                          <a:spcPts val="200"/>
-                        </a:spcAft>
-                        <a:buNone/>
-                      </a:pPr>
-                      <a:r>
-                        <a:rPr sz="1100">
-                          <a:solidFill>
-                            <a:srgbClr val="111111">
-                              <a:alpha val="100000"/>
-                            </a:srgbClr>
-                          </a:solidFill>
-                          <a:latin typeface="Calibri"/>
-                          <a:cs typeface="Calibri"/>
-                        </a:rPr>
-                        <a:t>247th</a:t>
-                      </a:r>
-                    </a:p>
-                  </a:txBody>
-                  <a:tcPr anchor="t" marB="0" marT="0" marR="0" marL="0">
-                    <a:lnL w="0" cmpd="sng" algn="ctr" cap="flat">
-                      <a:solidFill>
-                        <a:srgbClr val="FFFFFF">
-                          <a:alpha val="0"/>
-                        </a:srgbClr>
-                      </a:solidFill>
-                      <a:prstDash val="solid"/>
-                    </a:lnL>
-                    <a:lnR w="0" cmpd="sng" algn="ctr" cap="flat">
-                      <a:solidFill>
-                        <a:srgbClr val="FFFFFF">
-                          <a:alpha val="0"/>
-                        </a:srgbClr>
-                      </a:solidFill>
-                      <a:prstDash val="solid"/>
-                    </a:lnR>
-                    <a:lnT w="0" cmpd="sng" algn="ctr" cap="flat">
-                      <a:solidFill>
-                        <a:srgbClr val="FFFFFF">
-                          <a:alpha val="0"/>
-                        </a:srgbClr>
-                      </a:solidFill>
-                      <a:prstDash val="solid"/>
-                    </a:lnT>
-                    <a:lnB w="0" cmpd="sng" algn="ctr" cap="flat">
-                      <a:solidFill>
-                        <a:srgbClr val="FFFFFF">
-                          <a:alpha val="0"/>
-                        </a:srgbClr>
-                      </a:solidFill>
-                      <a:prstDash val="solid"/>
-                    </a:lnB>
-                  </a:tcPr>
-                </a:tc>
-                <a:tc>
-                  <a:txBody>
-                    <a:bodyPr/>
-                    <a:lstStyle/>
-                    <a:p>
-                      <a:pPr algn="l" marL="63500" marR="63500">
-                        <a:lnSpc>
-                          <a:spcPct val="100000"/>
-                        </a:lnSpc>
-                        <a:spcBef>
-                          <a:spcPts val="200"/>
-                        </a:spcBef>
-                        <a:spcAft>
-                          <a:spcPts val="200"/>
-                        </a:spcAft>
-                        <a:buNone/>
-                      </a:pPr>
-                      <a:r>
-                        <a:rPr sz="1100">
-                          <a:solidFill>
-                            <a:srgbClr val="111111">
-                              <a:alpha val="100000"/>
-                            </a:srgbClr>
-                          </a:solidFill>
-                          <a:latin typeface="Calibri"/>
-                          <a:cs typeface="Calibri"/>
-                        </a:rPr>
-                        <a:t>Decile 8</a:t>
-                      </a:r>
-                    </a:p>
-                  </a:txBody>
-                  <a:tcPr anchor="t" marB="0" marT="0" marR="0" marL="0">
-                    <a:lnL w="0" cmpd="sng" algn="ctr" cap="flat">
-                      <a:solidFill>
-                        <a:srgbClr val="FFFFFF">
-                          <a:alpha val="0"/>
-                        </a:srgbClr>
-                      </a:solidFill>
-                      <a:prstDash val="solid"/>
-                    </a:lnL>
-                    <a:lnR w="0" cmpd="sng" algn="ctr" cap="flat">
-                      <a:solidFill>
-                        <a:srgbClr val="FFFFFF">
-                          <a:alpha val="0"/>
-                        </a:srgbClr>
-                      </a:solidFill>
-                      <a:prstDash val="solid"/>
-                    </a:lnR>
-                    <a:lnT w="0" cmpd="sng" algn="ctr" cap="flat">
-                      <a:solidFill>
-                        <a:srgbClr val="FFFFFF">
-                          <a:alpha val="0"/>
-                        </a:srgbClr>
-                      </a:solidFill>
-                      <a:prstDash val="solid"/>
-                    </a:lnT>
-                    <a:lnB w="0" cmpd="sng" algn="ctr" cap="flat">
-                      <a:solidFill>
-                        <a:srgbClr val="FFFFFF">
-                          <a:alpha val="0"/>
-                        </a:srgbClr>
-                      </a:solidFill>
-                      <a:prstDash val="solid"/>
-                    </a:lnB>
-                  </a:tcPr>
-                </a:tc>
-              </a:tr>
-              <a:tr h="182880">
-                <a:tc>
-                  <a:txBody>
-                    <a:bodyPr/>
-                    <a:lstStyle/>
-                    <a:p>
-                      <a:pPr algn="l" marL="63500" marR="63500">
-                        <a:lnSpc>
-                          <a:spcPct val="100000"/>
-                        </a:lnSpc>
-                        <a:spcBef>
-                          <a:spcPts val="200"/>
-                        </a:spcBef>
-                        <a:spcAft>
-                          <a:spcPts val="200"/>
-                        </a:spcAft>
-                        <a:buNone/>
-                      </a:pPr>
-                      <a:r>
-                        <a:rPr sz="1100">
-                          <a:solidFill>
-                            <a:srgbClr val="111111">
-                              <a:alpha val="100000"/>
-                            </a:srgbClr>
-                          </a:solidFill>
-                          <a:latin typeface="Calibri"/>
-                          <a:cs typeface="Calibri"/>
-                        </a:rPr>
-                        <a:t>Worthing</a:t>
-                      </a:r>
-                    </a:p>
-                  </a:txBody>
-                  <a:tcPr anchor="t" marB="0" marT="0" marR="0" marL="0">
-                    <a:lnL w="0" cmpd="sng" algn="ctr" cap="flat">
-                      <a:solidFill>
-                        <a:srgbClr val="FFFFFF">
-                          <a:alpha val="0"/>
-                        </a:srgbClr>
-                      </a:solidFill>
-                      <a:prstDash val="solid"/>
-                    </a:lnL>
-                    <a:lnR w="0" cmpd="sng" algn="ctr" cap="flat">
-                      <a:solidFill>
-                        <a:srgbClr val="FFFFFF">
-                          <a:alpha val="0"/>
-                        </a:srgbClr>
-                      </a:solidFill>
-                      <a:prstDash val="solid"/>
-                    </a:lnR>
-                    <a:lnT w="0" cmpd="sng" algn="ctr" cap="flat">
-                      <a:solidFill>
-                        <a:srgbClr val="FFFFFF">
-                          <a:alpha val="0"/>
-                        </a:srgbClr>
-                      </a:solidFill>
-                      <a:prstDash val="solid"/>
-                    </a:lnT>
-                    <a:lnB w="0" cmpd="sng" algn="ctr" cap="flat">
-                      <a:solidFill>
-                        <a:srgbClr val="FFFFFF">
-                          <a:alpha val="0"/>
-                        </a:srgbClr>
-                      </a:solidFill>
-                      <a:prstDash val="solid"/>
-                    </a:lnB>
-                  </a:tcPr>
-                </a:tc>
-                <a:tc>
-                  <a:txBody>
-                    <a:bodyPr/>
-                    <a:lstStyle/>
-                    <a:p>
-                      <a:pPr algn="l" marL="63500" marR="63500">
-                        <a:lnSpc>
-                          <a:spcPct val="100000"/>
-                        </a:lnSpc>
-                        <a:spcBef>
-                          <a:spcPts val="200"/>
-                        </a:spcBef>
-                        <a:spcAft>
-                          <a:spcPts val="200"/>
-                        </a:spcAft>
-                        <a:buNone/>
-                      </a:pPr>
-                      <a:r>
-                        <a:rPr sz="1100">
-                          <a:solidFill>
-                            <a:srgbClr val="111111">
-                              <a:alpha val="100000"/>
-                            </a:srgbClr>
-                          </a:solidFill>
-                          <a:latin typeface="Calibri"/>
-                          <a:cs typeface="Calibri"/>
-                        </a:rPr>
-                        <a:t>8</a:t>
-                      </a:r>
-                    </a:p>
-                  </a:txBody>
-                  <a:tcPr anchor="t" marB="0" marT="0" marR="0" marL="0">
-                    <a:lnL w="0" cmpd="sng" algn="ctr" cap="flat">
-                      <a:solidFill>
-                        <a:srgbClr val="FFFFFF">
-                          <a:alpha val="0"/>
-                        </a:srgbClr>
-                      </a:solidFill>
-                      <a:prstDash val="solid"/>
-                    </a:lnL>
-                    <a:lnR w="0" cmpd="sng" algn="ctr" cap="flat">
-                      <a:solidFill>
-                        <a:srgbClr val="FFFFFF">
-                          <a:alpha val="0"/>
-                        </a:srgbClr>
-                      </a:solidFill>
-                      <a:prstDash val="solid"/>
-                    </a:lnR>
-                    <a:lnT w="0" cmpd="sng" algn="ctr" cap="flat">
-                      <a:solidFill>
-                        <a:srgbClr val="FFFFFF">
-                          <a:alpha val="0"/>
-                        </a:srgbClr>
-                      </a:solidFill>
-                      <a:prstDash val="solid"/>
-                    </a:lnT>
-                    <a:lnB w="0" cmpd="sng" algn="ctr" cap="flat">
-                      <a:solidFill>
-                        <a:srgbClr val="FFFFFF">
-                          <a:alpha val="0"/>
-                        </a:srgbClr>
-                      </a:solidFill>
-                      <a:prstDash val="solid"/>
-                    </a:lnB>
-                  </a:tcPr>
-                </a:tc>
-                <a:tc>
-                  <a:txBody>
-                    <a:bodyPr/>
-                    <a:lstStyle/>
-                    <a:p>
-                      <a:pPr algn="l" marL="63500" marR="63500">
-                        <a:lnSpc>
-                          <a:spcPct val="100000"/>
-                        </a:lnSpc>
-                        <a:spcBef>
-                          <a:spcPts val="200"/>
-                        </a:spcBef>
-                        <a:spcAft>
-                          <a:spcPts val="200"/>
-                        </a:spcAft>
-                        <a:buNone/>
-                      </a:pPr>
-                      <a:r>
-                        <a:rPr sz="1100">
-                          <a:solidFill>
-                            <a:srgbClr val="111111">
-                              <a:alpha val="100000"/>
-                            </a:srgbClr>
-                          </a:solidFill>
-                          <a:latin typeface="Calibri"/>
-                          <a:cs typeface="Calibri"/>
-                        </a:rPr>
-                        <a:t>7.2</a:t>
-                      </a:r>
-                    </a:p>
-                  </a:txBody>
-                  <a:tcPr anchor="t" marB="0" marT="0" marR="0" marL="0">
-                    <a:lnL w="0" cmpd="sng" algn="ctr" cap="flat">
-                      <a:solidFill>
-                        <a:srgbClr val="FFFFFF">
-                          <a:alpha val="0"/>
-                        </a:srgbClr>
-                      </a:solidFill>
-                      <a:prstDash val="solid"/>
-                    </a:lnL>
-                    <a:lnR w="0" cmpd="sng" algn="ctr" cap="flat">
-                      <a:solidFill>
-                        <a:srgbClr val="FFFFFF">
-                          <a:alpha val="0"/>
-                        </a:srgbClr>
-                      </a:solidFill>
-                      <a:prstDash val="solid"/>
-                    </a:lnR>
-                    <a:lnT w="0" cmpd="sng" algn="ctr" cap="flat">
-                      <a:solidFill>
-                        <a:srgbClr val="FFFFFF">
-                          <a:alpha val="0"/>
-                        </a:srgbClr>
-                      </a:solidFill>
-                      <a:prstDash val="solid"/>
-                    </a:lnT>
-                    <a:lnB w="0" cmpd="sng" algn="ctr" cap="flat">
-                      <a:solidFill>
-                        <a:srgbClr val="FFFFFF">
-                          <a:alpha val="0"/>
-                        </a:srgbClr>
-                      </a:solidFill>
-                      <a:prstDash val="solid"/>
-                    </a:lnB>
-                  </a:tcPr>
-                </a:tc>
-                <a:tc>
-                  <a:txBody>
-                    <a:bodyPr/>
-                    <a:lstStyle/>
-                    <a:p>
-                      <a:pPr algn="l" marL="63500" marR="63500">
-                        <a:lnSpc>
-                          <a:spcPct val="100000"/>
-                        </a:lnSpc>
-                        <a:spcBef>
-                          <a:spcPts val="200"/>
-                        </a:spcBef>
-                        <a:spcAft>
-                          <a:spcPts val="200"/>
-                        </a:spcAft>
-                        <a:buNone/>
-                      </a:pPr>
-                      <a:r>
-                        <a:rPr sz="1100">
-                          <a:solidFill>
-                            <a:srgbClr val="111111">
-                              <a:alpha val="100000"/>
-                            </a:srgbClr>
-                          </a:solidFill>
-                          <a:latin typeface="Calibri"/>
-                          <a:cs typeface="Calibri"/>
-                        </a:rPr>
-                        <a:t>292nd</a:t>
-                      </a:r>
-                    </a:p>
-                  </a:txBody>
-                  <a:tcPr anchor="t" marB="0" marT="0" marR="0" marL="0">
-                    <a:lnL w="0" cmpd="sng" algn="ctr" cap="flat">
-                      <a:solidFill>
-                        <a:srgbClr val="FFFFFF">
-                          <a:alpha val="0"/>
-                        </a:srgbClr>
-                      </a:solidFill>
-                      <a:prstDash val="solid"/>
-                    </a:lnL>
-                    <a:lnR w="0" cmpd="sng" algn="ctr" cap="flat">
-                      <a:solidFill>
-                        <a:srgbClr val="FFFFFF">
-                          <a:alpha val="0"/>
-                        </a:srgbClr>
-                      </a:solidFill>
-                      <a:prstDash val="solid"/>
-                    </a:lnR>
-                    <a:lnT w="0" cmpd="sng" algn="ctr" cap="flat">
-                      <a:solidFill>
-                        <a:srgbClr val="FFFFFF">
-                          <a:alpha val="0"/>
-                        </a:srgbClr>
-                      </a:solidFill>
-                      <a:prstDash val="solid"/>
-                    </a:lnT>
-                    <a:lnB w="0" cmpd="sng" algn="ctr" cap="flat">
-                      <a:solidFill>
-                        <a:srgbClr val="FFFFFF">
-                          <a:alpha val="0"/>
-                        </a:srgbClr>
-                      </a:solidFill>
-                      <a:prstDash val="solid"/>
-                    </a:lnB>
-                  </a:tcPr>
-                </a:tc>
-                <a:tc>
-                  <a:txBody>
-                    <a:bodyPr/>
-                    <a:lstStyle/>
-                    <a:p>
-                      <a:pPr algn="l" marL="63500" marR="63500">
-                        <a:lnSpc>
-                          <a:spcPct val="100000"/>
-                        </a:lnSpc>
-                        <a:spcBef>
-                          <a:spcPts val="200"/>
-                        </a:spcBef>
-                        <a:spcAft>
-                          <a:spcPts val="200"/>
-                        </a:spcAft>
-                        <a:buNone/>
-                      </a:pPr>
-                      <a:r>
-                        <a:rPr sz="1100">
-                          <a:solidFill>
-                            <a:srgbClr val="111111">
-                              <a:alpha val="100000"/>
-                            </a:srgbClr>
-                          </a:solidFill>
-                          <a:latin typeface="Calibri"/>
-                          <a:cs typeface="Calibri"/>
-                        </a:rPr>
-                        <a:t>10% of authorities
-with lowest rate</a:t>
-                      </a:r>
-                    </a:p>
-                  </a:txBody>
-                  <a:tcPr anchor="t" marB="0" marT="0" marR="0" marL="0">
-                    <a:lnL w="0" cmpd="sng" algn="ctr" cap="flat">
-                      <a:solidFill>
-                        <a:srgbClr val="FFFFFF">
-                          <a:alpha val="0"/>
-                        </a:srgbClr>
-                      </a:solidFill>
-                      <a:prstDash val="solid"/>
-                    </a:lnL>
-                    <a:lnR w="0" cmpd="sng" algn="ctr" cap="flat">
-                      <a:solidFill>
-                        <a:srgbClr val="FFFFFF">
-                          <a:alpha val="0"/>
-                        </a:srgbClr>
-                      </a:solidFill>
-                      <a:prstDash val="solid"/>
-                    </a:lnR>
-                    <a:lnT w="0" cmpd="sng" algn="ctr" cap="flat">
-                      <a:solidFill>
-                        <a:srgbClr val="FFFFFF">
-                          <a:alpha val="0"/>
-                        </a:srgbClr>
-                      </a:solidFill>
-                      <a:prstDash val="solid"/>
-                    </a:lnT>
-                    <a:lnB w="0" cmpd="sng" algn="ctr" cap="flat">
-                      <a:solidFill>
-                        <a:srgbClr val="FFFFFF">
-                          <a:alpha val="0"/>
-                        </a:srgbClr>
-                      </a:solidFill>
-                      <a:prstDash val="solid"/>
-                    </a:lnB>
-                  </a:tcPr>
-                </a:tc>
-              </a:tr>
-              <a:tr h="182880">
-                <a:tc>
-                  <a:txBody>
-                    <a:bodyPr/>
-                    <a:lstStyle/>
-                    <a:p>
-                      <a:pPr algn="l" marL="63500" marR="63500">
-                        <a:lnSpc>
-                          <a:spcPct val="100000"/>
-                        </a:lnSpc>
-                        <a:spcBef>
-                          <a:spcPts val="200"/>
-                        </a:spcBef>
-                        <a:spcAft>
-                          <a:spcPts val="200"/>
-                        </a:spcAft>
-                        <a:buNone/>
-                      </a:pPr>
-                      <a:r>
-                        <a:rPr sz="1100">
-                          <a:solidFill>
-                            <a:srgbClr val="111111">
-                              <a:alpha val="100000"/>
-                            </a:srgbClr>
-                          </a:solidFill>
-                          <a:latin typeface="Calibri"/>
-                          <a:cs typeface="Calibri"/>
-                        </a:rPr>
-                        <a:t>West Sussex</a:t>
-                      </a:r>
-                    </a:p>
-                  </a:txBody>
-                  <a:tcPr anchor="t" marB="0" marT="0" marR="0" marL="0">
-                    <a:lnL w="0" cmpd="sng" algn="ctr" cap="flat">
-                      <a:solidFill>
-                        <a:srgbClr val="FFFFFF">
-                          <a:alpha val="0"/>
-                        </a:srgbClr>
-                      </a:solidFill>
-                      <a:prstDash val="solid"/>
-                    </a:lnL>
-                    <a:lnR w="0" cmpd="sng" algn="ctr" cap="flat">
-                      <a:solidFill>
-                        <a:srgbClr val="FFFFFF">
-                          <a:alpha val="0"/>
-                        </a:srgbClr>
-                      </a:solidFill>
-                      <a:prstDash val="solid"/>
-                    </a:lnR>
-                    <a:lnT w="0" cmpd="sng" algn="ctr" cap="flat">
-                      <a:solidFill>
-                        <a:srgbClr val="FFFFFF">
-                          <a:alpha val="0"/>
-                        </a:srgbClr>
-                      </a:solidFill>
-                      <a:prstDash val="solid"/>
-                    </a:lnT>
-                    <a:lnB w="0" cmpd="sng" algn="ctr" cap="flat">
-                      <a:solidFill>
-                        <a:srgbClr val="FFFFFF">
-                          <a:alpha val="0"/>
-                        </a:srgbClr>
-                      </a:solidFill>
-                      <a:prstDash val="solid"/>
-                    </a:lnB>
-                  </a:tcPr>
-                </a:tc>
-                <a:tc>
-                  <a:txBody>
-                    <a:bodyPr/>
-                    <a:lstStyle/>
-                    <a:p>
-                      <a:pPr algn="l" marL="63500" marR="63500">
-                        <a:lnSpc>
-                          <a:spcPct val="100000"/>
-                        </a:lnSpc>
-                        <a:spcBef>
-                          <a:spcPts val="200"/>
-                        </a:spcBef>
-                        <a:spcAft>
-                          <a:spcPts val="200"/>
-                        </a:spcAft>
-                        <a:buNone/>
-                      </a:pPr>
-                      <a:r>
-                        <a:rPr sz="1100">
-                          <a:solidFill>
-                            <a:srgbClr val="111111">
-                              <a:alpha val="100000"/>
-                            </a:srgbClr>
-                          </a:solidFill>
-                          <a:latin typeface="Calibri"/>
-                          <a:cs typeface="Calibri"/>
-                        </a:rPr>
-                        <a:t>106</a:t>
-                      </a:r>
-                    </a:p>
-                  </a:txBody>
-                  <a:tcPr anchor="t" marB="0" marT="0" marR="0" marL="0">
-                    <a:lnL w="0" cmpd="sng" algn="ctr" cap="flat">
-                      <a:solidFill>
-                        <a:srgbClr val="FFFFFF">
-                          <a:alpha val="0"/>
-                        </a:srgbClr>
-                      </a:solidFill>
-                      <a:prstDash val="solid"/>
-                    </a:lnL>
-                    <a:lnR w="0" cmpd="sng" algn="ctr" cap="flat">
-                      <a:solidFill>
-                        <a:srgbClr val="FFFFFF">
-                          <a:alpha val="0"/>
-                        </a:srgbClr>
-                      </a:solidFill>
-                      <a:prstDash val="solid"/>
-                    </a:lnR>
-                    <a:lnT w="0" cmpd="sng" algn="ctr" cap="flat">
-                      <a:solidFill>
-                        <a:srgbClr val="FFFFFF">
-                          <a:alpha val="0"/>
-                        </a:srgbClr>
-                      </a:solidFill>
-                      <a:prstDash val="solid"/>
-                    </a:lnT>
-                    <a:lnB w="0" cmpd="sng" algn="ctr" cap="flat">
-                      <a:solidFill>
-                        <a:srgbClr val="FFFFFF">
-                          <a:alpha val="0"/>
-                        </a:srgbClr>
-                      </a:solidFill>
-                      <a:prstDash val="solid"/>
-                    </a:lnB>
-                  </a:tcPr>
-                </a:tc>
-                <a:tc>
-                  <a:txBody>
-                    <a:bodyPr/>
-                    <a:lstStyle/>
-                    <a:p>
-                      <a:pPr algn="l" marL="63500" marR="63500">
-                        <a:lnSpc>
-                          <a:spcPct val="100000"/>
-                        </a:lnSpc>
-                        <a:spcBef>
-                          <a:spcPts val="200"/>
-                        </a:spcBef>
-                        <a:spcAft>
-                          <a:spcPts val="200"/>
-                        </a:spcAft>
-                        <a:buNone/>
-                      </a:pPr>
-                      <a:r>
-                        <a:rPr sz="1100">
-                          <a:solidFill>
-                            <a:srgbClr val="111111">
-                              <a:alpha val="100000"/>
-                            </a:srgbClr>
-                          </a:solidFill>
-                          <a:latin typeface="Calibri"/>
-                          <a:cs typeface="Calibri"/>
-                        </a:rPr>
-                        <a:t>12.3</a:t>
+                        <a:t>12.0</a:t>
                       </a:r>
                     </a:p>
                   </a:txBody>
@@ -17822,7 +17821,7 @@
                           <a:latin typeface="Calibri"/>
                           <a:cs typeface="Calibri"/>
                         </a:rPr>
-                        <a:t>12,055</a:t>
+                        <a:t>12,050</a:t>
                       </a:r>
                     </a:p>
                   </a:txBody>
@@ -18154,7 +18153,7 @@
                           <a:latin typeface="Calibri"/>
                           <a:cs typeface="Calibri"/>
                         </a:rPr>
-                        <a:t>1,341</a:t>
+                        <a:t>1,288</a:t>
                       </a:r>
                     </a:p>
                   </a:txBody>
@@ -18220,7 +18219,7 @@
                           <a:latin typeface="Calibri"/>
                           <a:cs typeface="Calibri"/>
                         </a:rPr>
-                        <a:t>14.6</a:t>
+                        <a:t>14.0</a:t>
                       </a:r>
                     </a:p>
                   </a:txBody>
@@ -18443,7 +18442,7 @@
           <a:p>
             <a:r>
               <a:rPr/>
-              <a:t>Pack date: 09 May 2021</a:t>
+              <a:t>Pack date: 10 May 2021</a:t>
             </a:r>
           </a:p>
         </p:txBody>
@@ -18601,7 +18600,7 @@
           <a:p>
             <a:r>
               <a:rPr/>
-              <a:t>Pack date: 09 May 2021</a:t>
+              <a:t>Pack date: 10 May 2021</a:t>
             </a:r>
           </a:p>
         </p:txBody>
@@ -18759,7 +18758,7 @@
           <a:p>
             <a:r>
               <a:rPr/>
-              <a:t>Pack date: 09 May 2021</a:t>
+              <a:t>Pack date: 10 May 2021</a:t>
             </a:r>
           </a:p>
         </p:txBody>
@@ -18917,7 +18916,7 @@
           <a:p>
             <a:r>
               <a:rPr/>
-              <a:t>Pack date: 09 May 2021</a:t>
+              <a:t>Pack date: 10 May 2021</a:t>
             </a:r>
           </a:p>
         </p:txBody>
@@ -19075,7 +19074,7 @@
           <a:p>
             <a:r>
               <a:rPr/>
-              <a:t>Pack date: 09 May 2021</a:t>
+              <a:t>Pack date: 10 May 2021</a:t>
             </a:r>
           </a:p>
         </p:txBody>
@@ -19264,7 +19263,7 @@
           <a:p>
             <a:r>
               <a:rPr/>
-              <a:t>Pack date: 09 May 2021</a:t>
+              <a:t>Pack date: 10 May 2021</a:t>
             </a:r>
           </a:p>
         </p:txBody>
@@ -19422,7 +19421,7 @@
           <a:p>
             <a:r>
               <a:rPr/>
-              <a:t>Pack date: 09 May 2021</a:t>
+              <a:t>Pack date: 10 May 2021</a:t>
             </a:r>
           </a:p>
         </p:txBody>
@@ -19580,7 +19579,7 @@
           <a:p>
             <a:r>
               <a:rPr/>
-              <a:t>Pack date: 09 May 2021</a:t>
+              <a:t>Pack date: 10 May 2021</a:t>
             </a:r>
           </a:p>
         </p:txBody>
@@ -19738,7 +19737,7 @@
           <a:p>
             <a:r>
               <a:rPr/>
-              <a:t>Pack date: 09 May 2021</a:t>
+              <a:t>Pack date: 10 May 2021</a:t>
             </a:r>
           </a:p>
         </p:txBody>
@@ -19896,7 +19895,7 @@
           <a:p>
             <a:r>
               <a:rPr/>
-              <a:t>Pack date: 09 May 2021</a:t>
+              <a:t>Pack date: 10 May 2021</a:t>
             </a:r>
           </a:p>
         </p:txBody>
@@ -20028,7 +20027,7 @@
           <a:p>
             <a:r>
               <a:rPr/>
-              <a:t>Pack date: 09 May 2021</a:t>
+              <a:t>Pack date: 10 May 2021</a:t>
             </a:r>
           </a:p>
         </p:txBody>
@@ -20160,7 +20159,7 @@
           <a:p>
             <a:r>
               <a:rPr/>
-              <a:t>Pack date: 09 May 2021</a:t>
+              <a:t>Pack date: 10 May 2021</a:t>
             </a:r>
           </a:p>
         </p:txBody>
@@ -20292,7 +20291,7 @@
           <a:p>
             <a:r>
               <a:rPr/>
-              <a:t>Pack date: 09 May 2021</a:t>
+              <a:t>Pack date: 10 May 2021</a:t>
             </a:r>
           </a:p>
         </p:txBody>
@@ -20424,7 +20423,7 @@
           <a:p>
             <a:r>
               <a:rPr/>
-              <a:t>Pack date: 09 May 2021</a:t>
+              <a:t>Pack date: 10 May 2021</a:t>
             </a:r>
           </a:p>
         </p:txBody>
@@ -20556,7 +20555,7 @@
           <a:p>
             <a:r>
               <a:rPr/>
-              <a:t>Pack date: 09 May 2021</a:t>
+              <a:t>Pack date: 10 May 2021</a:t>
             </a:r>
           </a:p>
         </p:txBody>
@@ -20688,7 +20687,7 @@
           <a:p>
             <a:r>
               <a:rPr/>
-              <a:t>Pack date: 09 May 2021</a:t>
+              <a:t>Pack date: 10 May 2021</a:t>
             </a:r>
           </a:p>
         </p:txBody>

</xml_diff>

<commit_message>
Main site update May 13
</commit_message>
<xml_diff>
--- a/Latest_West_Sussex_C19_slide_deck.pptx
+++ b/Latest_West_Sussex_C19_slide_deck.pptx
@@ -7176,7 +7176,7 @@
           <a:p>
             <a:r>
               <a:rPr/>
-              <a:t>Pack date: 12 May 2021</a:t>
+              <a:t>Pack date: 13 May 2021</a:t>
             </a:r>
           </a:p>
         </p:txBody>
@@ -7308,7 +7308,7 @@
           <a:p>
             <a:r>
               <a:rPr/>
-              <a:t>Pack date: 12 May 2021</a:t>
+              <a:t>Pack date: 13 May 2021</a:t>
             </a:r>
           </a:p>
         </p:txBody>
@@ -7466,7 +7466,7 @@
           <a:p>
             <a:r>
               <a:rPr/>
-              <a:t>Pack date: 12 May 2021</a:t>
+              <a:t>Pack date: 13 May 2021</a:t>
             </a:r>
           </a:p>
         </p:txBody>
@@ -7547,7 +7547,7 @@
           <a:p>
             <a:r>
               <a:rPr/>
-              <a:t>Upper Tier Local Authority cumulative cases as at 12 May</a:t>
+              <a:t>Upper Tier Local Authority cumulative cases as at 13 May</a:t>
             </a:r>
           </a:p>
         </p:txBody>
@@ -8082,7 +8082,7 @@
                           <a:latin typeface="Calibri"/>
                           <a:cs typeface="Calibri"/>
                         </a:rPr>
-                        <a:t>42,091</a:t>
+                        <a:t>42,113</a:t>
                       </a:r>
                     </a:p>
                   </a:txBody>
@@ -8148,7 +8148,7 @@
                           <a:latin typeface="Calibri"/>
                           <a:cs typeface="Calibri"/>
                         </a:rPr>
-                        <a:t>4,871.8</a:t>
+                        <a:t>4,874.3</a:t>
                       </a:r>
                     </a:p>
                   </a:txBody>
@@ -8214,7 +8214,7 @@
                           <a:latin typeface="Calibri"/>
                           <a:cs typeface="Calibri"/>
                         </a:rPr>
-                        <a:t>128th</a:t>
+                        <a:t>129th</a:t>
                       </a:r>
                     </a:p>
                   </a:txBody>
@@ -8414,7 +8414,7 @@
                           <a:latin typeface="Calibri"/>
                           <a:cs typeface="Calibri"/>
                         </a:rPr>
-                        <a:t>3,880,345</a:t>
+                        <a:t>3,882,574</a:t>
                       </a:r>
                     </a:p>
                   </a:txBody>
@@ -8480,7 +8480,7 @@
                           <a:latin typeface="Calibri"/>
                           <a:cs typeface="Calibri"/>
                         </a:rPr>
-                        <a:t>6,893.9</a:t>
+                        <a:t>6,897.8</a:t>
                       </a:r>
                     </a:p>
                   </a:txBody>
@@ -8746,7 +8746,7 @@
                           <a:latin typeface="Calibri"/>
                           <a:cs typeface="Calibri"/>
                         </a:rPr>
-                        <a:t>542,315</a:t>
+                        <a:t>542,545</a:t>
                       </a:r>
                     </a:p>
                   </a:txBody>
@@ -8812,7 +8812,7 @@
                           <a:latin typeface="Calibri"/>
                           <a:cs typeface="Calibri"/>
                         </a:rPr>
-                        <a:t>5,907.5</a:t>
+                        <a:t>5,910.0</a:t>
                       </a:r>
                     </a:p>
                   </a:txBody>
@@ -9061,7 +9061,7 @@
           <a:p>
             <a:r>
               <a:rPr/>
-              <a:t>Pack date: 12 May 2021</a:t>
+              <a:t>Pack date: 13 May 2021</a:t>
             </a:r>
           </a:p>
         </p:txBody>
@@ -9142,7 +9142,7 @@
           <a:p>
             <a:r>
               <a:rPr/>
-              <a:t>Upper Tier Local Authority rolling 7 day cases as at 12 May</a:t>
+              <a:t>Upper Tier Local Authority rolling 7 day cases as at 13 May</a:t>
             </a:r>
           </a:p>
         </p:txBody>
@@ -9223,7 +9223,7 @@
           <a:p>
             <a:r>
               <a:rPr/>
-              <a:t>Note that the very recent days are excluded in the 7-day total as these are thought to be incomplete. As such, this data represents cases in the seven days to 07 May</a:t>
+              <a:t>Note that the very recent days are excluded in the 7-day total as these are thought to be incomplete. As such, this data represents cases in the seven days to 08 May</a:t>
             </a:r>
           </a:p>
         </p:txBody>
@@ -9677,7 +9677,7 @@
                           <a:latin typeface="Calibri"/>
                           <a:cs typeface="Calibri"/>
                         </a:rPr>
-                        <a:t>112</a:t>
+                        <a:t>115</a:t>
                       </a:r>
                     </a:p>
                   </a:txBody>
@@ -9743,7 +9743,7 @@
                           <a:latin typeface="Calibri"/>
                           <a:cs typeface="Calibri"/>
                         </a:rPr>
-                        <a:t>13.0</a:t>
+                        <a:t>13.3</a:t>
                       </a:r>
                     </a:p>
                   </a:txBody>
@@ -10009,7 +10009,7 @@
                           <a:latin typeface="Calibri"/>
                           <a:cs typeface="Calibri"/>
                         </a:rPr>
-                        <a:t>12,281</a:t>
+                        <a:t>12,421</a:t>
                       </a:r>
                     </a:p>
                   </a:txBody>
@@ -10075,7 +10075,7 @@
                           <a:latin typeface="Calibri"/>
                           <a:cs typeface="Calibri"/>
                         </a:rPr>
-                        <a:t>21.8</a:t>
+                        <a:t>22.1</a:t>
                       </a:r>
                     </a:p>
                   </a:txBody>
@@ -10656,7 +10656,7 @@
           <a:p>
             <a:r>
               <a:rPr/>
-              <a:t>Pack date: 12 May 2021</a:t>
+              <a:t>Pack date: 13 May 2021</a:t>
             </a:r>
           </a:p>
         </p:txBody>
@@ -10737,7 +10737,7 @@
           <a:p>
             <a:r>
               <a:rPr/>
-              <a:t>Lower Tier Local Authority cumulative cases as at 12 May</a:t>
+              <a:t>Lower Tier Local Authority cumulative cases as at 13 May</a:t>
             </a:r>
           </a:p>
         </p:txBody>
@@ -11377,7 +11377,7 @@
                           <a:latin typeface="Calibri"/>
                           <a:cs typeface="Calibri"/>
                         </a:rPr>
-                        <a:t>262nd</a:t>
+                        <a:t>263rd</a:t>
                       </a:r>
                     </a:p>
                   </a:txBody>
@@ -11577,7 +11577,7 @@
                           <a:latin typeface="Calibri"/>
                           <a:cs typeface="Calibri"/>
                         </a:rPr>
-                        <a:t>8,320</a:t>
+                        <a:t>8,325</a:t>
                       </a:r>
                     </a:p>
                   </a:txBody>
@@ -11643,7 +11643,7 @@
                           <a:latin typeface="Calibri"/>
                           <a:cs typeface="Calibri"/>
                         </a:rPr>
-                        <a:t>5,175.5</a:t>
+                        <a:t>5,178.6</a:t>
                       </a:r>
                     </a:p>
                   </a:txBody>
@@ -11909,7 +11909,7 @@
                           <a:latin typeface="Calibri"/>
                           <a:cs typeface="Calibri"/>
                         </a:rPr>
-                        <a:t>4,941</a:t>
+                        <a:t>4,945</a:t>
                       </a:r>
                     </a:p>
                   </a:txBody>
@@ -11975,7 +11975,7 @@
                           <a:latin typeface="Calibri"/>
                           <a:cs typeface="Calibri"/>
                         </a:rPr>
-                        <a:t>4,079.1</a:t>
+                        <a:t>4,082.4</a:t>
                       </a:r>
                     </a:p>
                   </a:txBody>
@@ -12241,7 +12241,7 @@
                           <a:latin typeface="Calibri"/>
                           <a:cs typeface="Calibri"/>
                         </a:rPr>
-                        <a:t>7,993</a:t>
+                        <a:t>7,996</a:t>
                       </a:r>
                     </a:p>
                   </a:txBody>
@@ -12307,7 +12307,7 @@
                           <a:latin typeface="Calibri"/>
                           <a:cs typeface="Calibri"/>
                         </a:rPr>
-                        <a:t>7,110.6</a:t>
+                        <a:t>7,113.3</a:t>
                       </a:r>
                     </a:p>
                   </a:txBody>
@@ -12573,7 +12573,7 @@
                           <a:latin typeface="Calibri"/>
                           <a:cs typeface="Calibri"/>
                         </a:rPr>
-                        <a:t>5,716</a:t>
+                        <a:t>5,721</a:t>
                       </a:r>
                     </a:p>
                   </a:txBody>
@@ -12639,7 +12639,7 @@
                           <a:latin typeface="Calibri"/>
                           <a:cs typeface="Calibri"/>
                         </a:rPr>
-                        <a:t>3,975.2</a:t>
+                        <a:t>3,978.7</a:t>
                       </a:r>
                     </a:p>
                   </a:txBody>
@@ -12905,7 +12905,7 @@
                           <a:latin typeface="Calibri"/>
                           <a:cs typeface="Calibri"/>
                         </a:rPr>
-                        <a:t>6,860</a:t>
+                        <a:t>6,861</a:t>
                       </a:r>
                     </a:p>
                   </a:txBody>
@@ -12971,7 +12971,7 @@
                           <a:latin typeface="Calibri"/>
                           <a:cs typeface="Calibri"/>
                         </a:rPr>
-                        <a:t>4,542.4</a:t>
+                        <a:t>4,543.0</a:t>
                       </a:r>
                     </a:p>
                   </a:txBody>
@@ -13237,7 +13237,7 @@
                           <a:latin typeface="Calibri"/>
                           <a:cs typeface="Calibri"/>
                         </a:rPr>
-                        <a:t>5,342</a:t>
+                        <a:t>5,346</a:t>
                       </a:r>
                     </a:p>
                   </a:txBody>
@@ -13303,7 +13303,7 @@
                           <a:latin typeface="Calibri"/>
                           <a:cs typeface="Calibri"/>
                         </a:rPr>
-                        <a:t>4,831.3</a:t>
+                        <a:t>4,834.9</a:t>
                       </a:r>
                     </a:p>
                   </a:txBody>
@@ -13569,7 +13569,7 @@
                           <a:latin typeface="Calibri"/>
                           <a:cs typeface="Calibri"/>
                         </a:rPr>
-                        <a:t>42,091</a:t>
+                        <a:t>42,113</a:t>
                       </a:r>
                     </a:p>
                   </a:txBody>
@@ -13635,7 +13635,7 @@
                           <a:latin typeface="Calibri"/>
                           <a:cs typeface="Calibri"/>
                         </a:rPr>
-                        <a:t>4,871.8</a:t>
+                        <a:t>4,874.3</a:t>
                       </a:r>
                     </a:p>
                   </a:txBody>
@@ -13901,7 +13901,7 @@
                           <a:latin typeface="Calibri"/>
                           <a:cs typeface="Calibri"/>
                         </a:rPr>
-                        <a:t>542,315</a:t>
+                        <a:t>542,545</a:t>
                       </a:r>
                     </a:p>
                   </a:txBody>
@@ -13967,7 +13967,7 @@
                           <a:latin typeface="Calibri"/>
                           <a:cs typeface="Calibri"/>
                         </a:rPr>
-                        <a:t>5,907.5</a:t>
+                        <a:t>5,910.0</a:t>
                       </a:r>
                     </a:p>
                   </a:txBody>
@@ -14233,7 +14233,7 @@
                           <a:latin typeface="Calibri"/>
                           <a:cs typeface="Calibri"/>
                         </a:rPr>
-                        <a:t>3,880,345</a:t>
+                        <a:t>3,882,574</a:t>
                       </a:r>
                     </a:p>
                   </a:txBody>
@@ -14299,7 +14299,7 @@
                           <a:latin typeface="Calibri"/>
                           <a:cs typeface="Calibri"/>
                         </a:rPr>
-                        <a:t>6,893.9</a:t>
+                        <a:t>6,897.8</a:t>
                       </a:r>
                     </a:p>
                   </a:txBody>
@@ -14548,7 +14548,7 @@
           <a:p>
             <a:r>
               <a:rPr/>
-              <a:t>Pack date: 12 May 2021</a:t>
+              <a:t>Pack date: 13 May 2021</a:t>
             </a:r>
           </a:p>
         </p:txBody>
@@ -14629,7 +14629,7 @@
           <a:p>
             <a:r>
               <a:rPr/>
-              <a:t>Lower Tier Local Authority rolling cases as at 12 May</a:t>
+              <a:t>Lower Tier Local Authority rolling cases as at 13 May</a:t>
             </a:r>
           </a:p>
         </p:txBody>
@@ -14710,7 +14710,7 @@
           <a:p>
             <a:r>
               <a:rPr/>
-              <a:t>Note that the very recent days are excluded in the 7-day total as these are thought to be incomplete. As such, this data represents cases in the seven days to 07 May</a:t>
+              <a:t>Note that the very recent days are excluded in the 7-day total as these are thought to be incomplete. As such, this data represents cases in the seven days to 08 May</a:t>
             </a:r>
           </a:p>
         </p:txBody>
@@ -15164,7 +15164,7 @@
                           <a:latin typeface="Calibri"/>
                           <a:cs typeface="Calibri"/>
                         </a:rPr>
-                        <a:t>13</a:t>
+                        <a:t>10</a:t>
                       </a:r>
                     </a:p>
                   </a:txBody>
@@ -15230,7 +15230,7 @@
                           <a:latin typeface="Calibri"/>
                           <a:cs typeface="Calibri"/>
                         </a:rPr>
-                        <a:t>20.2</a:t>
+                        <a:t>15.6</a:t>
                       </a:r>
                     </a:p>
                   </a:txBody>
@@ -15296,7 +15296,7 @@
                           <a:latin typeface="Calibri"/>
                           <a:cs typeface="Calibri"/>
                         </a:rPr>
-                        <a:t>102nd</a:t>
+                        <a:t>162nd</a:t>
                       </a:r>
                     </a:p>
                   </a:txBody>
@@ -15362,7 +15362,7 @@
                           <a:latin typeface="Calibri"/>
                           <a:cs typeface="Calibri"/>
                         </a:rPr>
-                        <a:t>Decile 4</a:t>
+                        <a:t>Decile 6</a:t>
                       </a:r>
                     </a:p>
                   </a:txBody>
@@ -15496,7 +15496,7 @@
                           <a:latin typeface="Calibri"/>
                           <a:cs typeface="Calibri"/>
                         </a:rPr>
-                        <a:t>28</a:t>
+                        <a:t>29</a:t>
                       </a:r>
                     </a:p>
                   </a:txBody>
@@ -15562,7 +15562,7 @@
                           <a:latin typeface="Calibri"/>
                           <a:cs typeface="Calibri"/>
                         </a:rPr>
-                        <a:t>17.4</a:t>
+                        <a:t>18.0</a:t>
                       </a:r>
                     </a:p>
                   </a:txBody>
@@ -15628,7 +15628,7 @@
                           <a:latin typeface="Calibri"/>
                           <a:cs typeface="Calibri"/>
                         </a:rPr>
-                        <a:t>131st</a:t>
+                        <a:t>126th</a:t>
                       </a:r>
                     </a:p>
                   </a:txBody>
@@ -15828,7 +15828,7 @@
                           <a:latin typeface="Calibri"/>
                           <a:cs typeface="Calibri"/>
                         </a:rPr>
-                        <a:t>16</a:t>
+                        <a:t>17</a:t>
                       </a:r>
                     </a:p>
                   </a:txBody>
@@ -15894,7 +15894,7 @@
                           <a:latin typeface="Calibri"/>
                           <a:cs typeface="Calibri"/>
                         </a:rPr>
-                        <a:t>13.2</a:t>
+                        <a:t>14.0</a:t>
                       </a:r>
                     </a:p>
                   </a:txBody>
@@ -15960,7 +15960,7 @@
                           <a:latin typeface="Calibri"/>
                           <a:cs typeface="Calibri"/>
                         </a:rPr>
-                        <a:t>194th</a:t>
+                        <a:t>182nd</a:t>
                       </a:r>
                     </a:p>
                   </a:txBody>
@@ -16026,7 +16026,7 @@
                           <a:latin typeface="Calibri"/>
                           <a:cs typeface="Calibri"/>
                         </a:rPr>
-                        <a:t>Decile 7</a:t>
+                        <a:t>Decile 6</a:t>
                       </a:r>
                     </a:p>
                   </a:txBody>
@@ -16160,7 +16160,7 @@
                           <a:latin typeface="Calibri"/>
                           <a:cs typeface="Calibri"/>
                         </a:rPr>
-                        <a:t>22</a:t>
+                        <a:t>26</a:t>
                       </a:r>
                     </a:p>
                   </a:txBody>
@@ -16226,7 +16226,7 @@
                           <a:latin typeface="Calibri"/>
                           <a:cs typeface="Calibri"/>
                         </a:rPr>
-                        <a:t>19.6</a:t>
+                        <a:t>23.1</a:t>
                       </a:r>
                     </a:p>
                   </a:txBody>
@@ -16292,7 +16292,7 @@
                           <a:latin typeface="Calibri"/>
                           <a:cs typeface="Calibri"/>
                         </a:rPr>
-                        <a:t>109th</a:t>
+                        <a:t>84th</a:t>
                       </a:r>
                     </a:p>
                   </a:txBody>
@@ -16358,7 +16358,7 @@
                           <a:latin typeface="Calibri"/>
                           <a:cs typeface="Calibri"/>
                         </a:rPr>
-                        <a:t>Decile 4</a:t>
+                        <a:t>Decile 3</a:t>
                       </a:r>
                     </a:p>
                   </a:txBody>
@@ -16492,7 +16492,7 @@
                           <a:latin typeface="Calibri"/>
                           <a:cs typeface="Calibri"/>
                         </a:rPr>
-                        <a:t>13</a:t>
+                        <a:t>15</a:t>
                       </a:r>
                     </a:p>
                   </a:txBody>
@@ -16558,7 +16558,7 @@
                           <a:latin typeface="Calibri"/>
                           <a:cs typeface="Calibri"/>
                         </a:rPr>
-                        <a:t>9.0</a:t>
+                        <a:t>10.4</a:t>
                       </a:r>
                     </a:p>
                   </a:txBody>
@@ -16624,7 +16624,7 @@
                           <a:latin typeface="Calibri"/>
                           <a:cs typeface="Calibri"/>
                         </a:rPr>
-                        <a:t>262nd</a:t>
+                        <a:t>246th</a:t>
                       </a:r>
                     </a:p>
                   </a:txBody>
@@ -16690,7 +16690,7 @@
                           <a:latin typeface="Calibri"/>
                           <a:cs typeface="Calibri"/>
                         </a:rPr>
-                        <a:t>Decile 9</a:t>
+                        <a:t>Decile 8</a:t>
                       </a:r>
                     </a:p>
                   </a:txBody>
@@ -16824,7 +16824,7 @@
                           <a:latin typeface="Calibri"/>
                           <a:cs typeface="Calibri"/>
                         </a:rPr>
-                        <a:t>12</a:t>
+                        <a:t>11</a:t>
                       </a:r>
                     </a:p>
                   </a:txBody>
@@ -16890,7 +16890,7 @@
                           <a:latin typeface="Calibri"/>
                           <a:cs typeface="Calibri"/>
                         </a:rPr>
-                        <a:t>7.9</a:t>
+                        <a:t>7.3</a:t>
                       </a:r>
                     </a:p>
                   </a:txBody>
@@ -16956,339 +16956,7 @@
                           <a:latin typeface="Calibri"/>
                           <a:cs typeface="Calibri"/>
                         </a:rPr>
-                        <a:t>275th</a:t>
-                      </a:r>
-                    </a:p>
-                  </a:txBody>
-                  <a:tcPr anchor="t" marB="0" marT="0" marR="0" marL="0">
-                    <a:lnL w="0" cmpd="sng" algn="ctr" cap="flat">
-                      <a:solidFill>
-                        <a:srgbClr val="FFFFFF">
-                          <a:alpha val="0"/>
-                        </a:srgbClr>
-                      </a:solidFill>
-                      <a:prstDash val="solid"/>
-                    </a:lnL>
-                    <a:lnR w="0" cmpd="sng" algn="ctr" cap="flat">
-                      <a:solidFill>
-                        <a:srgbClr val="FFFFFF">
-                          <a:alpha val="0"/>
-                        </a:srgbClr>
-                      </a:solidFill>
-                      <a:prstDash val="solid"/>
-                    </a:lnR>
-                    <a:lnT w="0" cmpd="sng" algn="ctr" cap="flat">
-                      <a:solidFill>
-                        <a:srgbClr val="FFFFFF">
-                          <a:alpha val="0"/>
-                        </a:srgbClr>
-                      </a:solidFill>
-                      <a:prstDash val="solid"/>
-                    </a:lnT>
-                    <a:lnB w="0" cmpd="sng" algn="ctr" cap="flat">
-                      <a:solidFill>
-                        <a:srgbClr val="FFFFFF">
-                          <a:alpha val="0"/>
-                        </a:srgbClr>
-                      </a:solidFill>
-                      <a:prstDash val="solid"/>
-                    </a:lnB>
-                  </a:tcPr>
-                </a:tc>
-                <a:tc>
-                  <a:txBody>
-                    <a:bodyPr/>
-                    <a:lstStyle/>
-                    <a:p>
-                      <a:pPr algn="l" marL="63500" marR="63500">
-                        <a:lnSpc>
-                          <a:spcPct val="100000"/>
-                        </a:lnSpc>
-                        <a:spcBef>
-                          <a:spcPts val="200"/>
-                        </a:spcBef>
-                        <a:spcAft>
-                          <a:spcPts val="200"/>
-                        </a:spcAft>
-                        <a:buNone/>
-                      </a:pPr>
-                      <a:r>
-                        <a:rPr sz="1100">
-                          <a:solidFill>
-                            <a:srgbClr val="111111">
-                              <a:alpha val="100000"/>
-                            </a:srgbClr>
-                          </a:solidFill>
-                          <a:latin typeface="Calibri"/>
-                          <a:cs typeface="Calibri"/>
-                        </a:rPr>
-                        <a:t>Decile 9</a:t>
-                      </a:r>
-                    </a:p>
-                  </a:txBody>
-                  <a:tcPr anchor="t" marB="0" marT="0" marR="0" marL="0">
-                    <a:lnL w="0" cmpd="sng" algn="ctr" cap="flat">
-                      <a:solidFill>
-                        <a:srgbClr val="FFFFFF">
-                          <a:alpha val="0"/>
-                        </a:srgbClr>
-                      </a:solidFill>
-                      <a:prstDash val="solid"/>
-                    </a:lnL>
-                    <a:lnR w="0" cmpd="sng" algn="ctr" cap="flat">
-                      <a:solidFill>
-                        <a:srgbClr val="FFFFFF">
-                          <a:alpha val="0"/>
-                        </a:srgbClr>
-                      </a:solidFill>
-                      <a:prstDash val="solid"/>
-                    </a:lnR>
-                    <a:lnT w="0" cmpd="sng" algn="ctr" cap="flat">
-                      <a:solidFill>
-                        <a:srgbClr val="FFFFFF">
-                          <a:alpha val="0"/>
-                        </a:srgbClr>
-                      </a:solidFill>
-                      <a:prstDash val="solid"/>
-                    </a:lnT>
-                    <a:lnB w="0" cmpd="sng" algn="ctr" cap="flat">
-                      <a:solidFill>
-                        <a:srgbClr val="FFFFFF">
-                          <a:alpha val="0"/>
-                        </a:srgbClr>
-                      </a:solidFill>
-                      <a:prstDash val="solid"/>
-                    </a:lnB>
-                  </a:tcPr>
-                </a:tc>
-              </a:tr>
-              <a:tr h="182880">
-                <a:tc>
-                  <a:txBody>
-                    <a:bodyPr/>
-                    <a:lstStyle/>
-                    <a:p>
-                      <a:pPr algn="l" marL="63500" marR="63500">
-                        <a:lnSpc>
-                          <a:spcPct val="100000"/>
-                        </a:lnSpc>
-                        <a:spcBef>
-                          <a:spcPts val="200"/>
-                        </a:spcBef>
-                        <a:spcAft>
-                          <a:spcPts val="200"/>
-                        </a:spcAft>
-                        <a:buNone/>
-                      </a:pPr>
-                      <a:r>
-                        <a:rPr sz="1100">
-                          <a:solidFill>
-                            <a:srgbClr val="111111">
-                              <a:alpha val="100000"/>
-                            </a:srgbClr>
-                          </a:solidFill>
-                          <a:latin typeface="Calibri"/>
-                          <a:cs typeface="Calibri"/>
-                        </a:rPr>
-                        <a:t>Worthing</a:t>
-                      </a:r>
-                    </a:p>
-                  </a:txBody>
-                  <a:tcPr anchor="t" marB="0" marT="0" marR="0" marL="0">
-                    <a:lnL w="0" cmpd="sng" algn="ctr" cap="flat">
-                      <a:solidFill>
-                        <a:srgbClr val="FFFFFF">
-                          <a:alpha val="0"/>
-                        </a:srgbClr>
-                      </a:solidFill>
-                      <a:prstDash val="solid"/>
-                    </a:lnL>
-                    <a:lnR w="0" cmpd="sng" algn="ctr" cap="flat">
-                      <a:solidFill>
-                        <a:srgbClr val="FFFFFF">
-                          <a:alpha val="0"/>
-                        </a:srgbClr>
-                      </a:solidFill>
-                      <a:prstDash val="solid"/>
-                    </a:lnR>
-                    <a:lnT w="0" cmpd="sng" algn="ctr" cap="flat">
-                      <a:solidFill>
-                        <a:srgbClr val="FFFFFF">
-                          <a:alpha val="0"/>
-                        </a:srgbClr>
-                      </a:solidFill>
-                      <a:prstDash val="solid"/>
-                    </a:lnT>
-                    <a:lnB w="0" cmpd="sng" algn="ctr" cap="flat">
-                      <a:solidFill>
-                        <a:srgbClr val="FFFFFF">
-                          <a:alpha val="0"/>
-                        </a:srgbClr>
-                      </a:solidFill>
-                      <a:prstDash val="solid"/>
-                    </a:lnB>
-                  </a:tcPr>
-                </a:tc>
-                <a:tc>
-                  <a:txBody>
-                    <a:bodyPr/>
-                    <a:lstStyle/>
-                    <a:p>
-                      <a:pPr algn="l" marL="63500" marR="63500">
-                        <a:lnSpc>
-                          <a:spcPct val="100000"/>
-                        </a:lnSpc>
-                        <a:spcBef>
-                          <a:spcPts val="200"/>
-                        </a:spcBef>
-                        <a:spcAft>
-                          <a:spcPts val="200"/>
-                        </a:spcAft>
-                        <a:buNone/>
-                      </a:pPr>
-                      <a:r>
-                        <a:rPr sz="1100">
-                          <a:solidFill>
-                            <a:srgbClr val="111111">
-                              <a:alpha val="100000"/>
-                            </a:srgbClr>
-                          </a:solidFill>
-                          <a:latin typeface="Calibri"/>
-                          <a:cs typeface="Calibri"/>
-                        </a:rPr>
-                        <a:t>8</a:t>
-                      </a:r>
-                    </a:p>
-                  </a:txBody>
-                  <a:tcPr anchor="t" marB="0" marT="0" marR="0" marL="0">
-                    <a:lnL w="0" cmpd="sng" algn="ctr" cap="flat">
-                      <a:solidFill>
-                        <a:srgbClr val="FFFFFF">
-                          <a:alpha val="0"/>
-                        </a:srgbClr>
-                      </a:solidFill>
-                      <a:prstDash val="solid"/>
-                    </a:lnL>
-                    <a:lnR w="0" cmpd="sng" algn="ctr" cap="flat">
-                      <a:solidFill>
-                        <a:srgbClr val="FFFFFF">
-                          <a:alpha val="0"/>
-                        </a:srgbClr>
-                      </a:solidFill>
-                      <a:prstDash val="solid"/>
-                    </a:lnR>
-                    <a:lnT w="0" cmpd="sng" algn="ctr" cap="flat">
-                      <a:solidFill>
-                        <a:srgbClr val="FFFFFF">
-                          <a:alpha val="0"/>
-                        </a:srgbClr>
-                      </a:solidFill>
-                      <a:prstDash val="solid"/>
-                    </a:lnT>
-                    <a:lnB w="0" cmpd="sng" algn="ctr" cap="flat">
-                      <a:solidFill>
-                        <a:srgbClr val="FFFFFF">
-                          <a:alpha val="0"/>
-                        </a:srgbClr>
-                      </a:solidFill>
-                      <a:prstDash val="solid"/>
-                    </a:lnB>
-                  </a:tcPr>
-                </a:tc>
-                <a:tc>
-                  <a:txBody>
-                    <a:bodyPr/>
-                    <a:lstStyle/>
-                    <a:p>
-                      <a:pPr algn="l" marL="63500" marR="63500">
-                        <a:lnSpc>
-                          <a:spcPct val="100000"/>
-                        </a:lnSpc>
-                        <a:spcBef>
-                          <a:spcPts val="200"/>
-                        </a:spcBef>
-                        <a:spcAft>
-                          <a:spcPts val="200"/>
-                        </a:spcAft>
-                        <a:buNone/>
-                      </a:pPr>
-                      <a:r>
-                        <a:rPr sz="1100">
-                          <a:solidFill>
-                            <a:srgbClr val="111111">
-                              <a:alpha val="100000"/>
-                            </a:srgbClr>
-                          </a:solidFill>
-                          <a:latin typeface="Calibri"/>
-                          <a:cs typeface="Calibri"/>
-                        </a:rPr>
-                        <a:t>7.2</a:t>
-                      </a:r>
-                    </a:p>
-                  </a:txBody>
-                  <a:tcPr anchor="t" marB="0" marT="0" marR="0" marL="0">
-                    <a:lnL w="0" cmpd="sng" algn="ctr" cap="flat">
-                      <a:solidFill>
-                        <a:srgbClr val="FFFFFF">
-                          <a:alpha val="0"/>
-                        </a:srgbClr>
-                      </a:solidFill>
-                      <a:prstDash val="solid"/>
-                    </a:lnL>
-                    <a:lnR w="0" cmpd="sng" algn="ctr" cap="flat">
-                      <a:solidFill>
-                        <a:srgbClr val="FFFFFF">
-                          <a:alpha val="0"/>
-                        </a:srgbClr>
-                      </a:solidFill>
-                      <a:prstDash val="solid"/>
-                    </a:lnR>
-                    <a:lnT w="0" cmpd="sng" algn="ctr" cap="flat">
-                      <a:solidFill>
-                        <a:srgbClr val="FFFFFF">
-                          <a:alpha val="0"/>
-                        </a:srgbClr>
-                      </a:solidFill>
-                      <a:prstDash val="solid"/>
-                    </a:lnT>
-                    <a:lnB w="0" cmpd="sng" algn="ctr" cap="flat">
-                      <a:solidFill>
-                        <a:srgbClr val="FFFFFF">
-                          <a:alpha val="0"/>
-                        </a:srgbClr>
-                      </a:solidFill>
-                      <a:prstDash val="solid"/>
-                    </a:lnB>
-                  </a:tcPr>
-                </a:tc>
-                <a:tc>
-                  <a:txBody>
-                    <a:bodyPr/>
-                    <a:lstStyle/>
-                    <a:p>
-                      <a:pPr algn="l" marL="63500" marR="63500">
-                        <a:lnSpc>
-                          <a:spcPct val="100000"/>
-                        </a:lnSpc>
-                        <a:spcBef>
-                          <a:spcPts val="200"/>
-                        </a:spcBef>
-                        <a:spcAft>
-                          <a:spcPts val="200"/>
-                        </a:spcAft>
-                        <a:buNone/>
-                      </a:pPr>
-                      <a:r>
-                        <a:rPr sz="1100">
-                          <a:solidFill>
-                            <a:srgbClr val="111111">
-                              <a:alpha val="100000"/>
-                            </a:srgbClr>
-                          </a:solidFill>
-                          <a:latin typeface="Calibri"/>
-                          <a:cs typeface="Calibri"/>
-                        </a:rPr>
-                        <a:t>285th</a:t>
+                        <a:t>287th</a:t>
                       </a:r>
                     </a:p>
                   </a:txBody>
@@ -17423,7 +17091,7 @@
                           <a:latin typeface="Calibri"/>
                           <a:cs typeface="Calibri"/>
                         </a:rPr>
-                        <a:t>West Sussex</a:t>
+                        <a:t>Worthing</a:t>
                       </a:r>
                     </a:p>
                   </a:txBody>
@@ -17489,7 +17157,7 @@
                           <a:latin typeface="Calibri"/>
                           <a:cs typeface="Calibri"/>
                         </a:rPr>
-                        <a:t>112</a:t>
+                        <a:t>7</a:t>
                       </a:r>
                     </a:p>
                   </a:txBody>
@@ -17555,7 +17223,340 @@
                           <a:latin typeface="Calibri"/>
                           <a:cs typeface="Calibri"/>
                         </a:rPr>
-                        <a:t>13.0</a:t>
+                        <a:t>6.3</a:t>
+                      </a:r>
+                    </a:p>
+                  </a:txBody>
+                  <a:tcPr anchor="t" marB="0" marT="0" marR="0" marL="0">
+                    <a:lnL w="0" cmpd="sng" algn="ctr" cap="flat">
+                      <a:solidFill>
+                        <a:srgbClr val="FFFFFF">
+                          <a:alpha val="0"/>
+                        </a:srgbClr>
+                      </a:solidFill>
+                      <a:prstDash val="solid"/>
+                    </a:lnL>
+                    <a:lnR w="0" cmpd="sng" algn="ctr" cap="flat">
+                      <a:solidFill>
+                        <a:srgbClr val="FFFFFF">
+                          <a:alpha val="0"/>
+                        </a:srgbClr>
+                      </a:solidFill>
+                      <a:prstDash val="solid"/>
+                    </a:lnR>
+                    <a:lnT w="0" cmpd="sng" algn="ctr" cap="flat">
+                      <a:solidFill>
+                        <a:srgbClr val="FFFFFF">
+                          <a:alpha val="0"/>
+                        </a:srgbClr>
+                      </a:solidFill>
+                      <a:prstDash val="solid"/>
+                    </a:lnT>
+                    <a:lnB w="0" cmpd="sng" algn="ctr" cap="flat">
+                      <a:solidFill>
+                        <a:srgbClr val="FFFFFF">
+                          <a:alpha val="0"/>
+                        </a:srgbClr>
+                      </a:solidFill>
+                      <a:prstDash val="solid"/>
+                    </a:lnB>
+                  </a:tcPr>
+                </a:tc>
+                <a:tc>
+                  <a:txBody>
+                    <a:bodyPr/>
+                    <a:lstStyle/>
+                    <a:p>
+                      <a:pPr algn="l" marL="63500" marR="63500">
+                        <a:lnSpc>
+                          <a:spcPct val="100000"/>
+                        </a:lnSpc>
+                        <a:spcBef>
+                          <a:spcPts val="200"/>
+                        </a:spcBef>
+                        <a:spcAft>
+                          <a:spcPts val="200"/>
+                        </a:spcAft>
+                        <a:buNone/>
+                      </a:pPr>
+                      <a:r>
+                        <a:rPr sz="1100">
+                          <a:solidFill>
+                            <a:srgbClr val="111111">
+                              <a:alpha val="100000"/>
+                            </a:srgbClr>
+                          </a:solidFill>
+                          <a:latin typeface="Calibri"/>
+                          <a:cs typeface="Calibri"/>
+                        </a:rPr>
+                        <a:t>295th</a:t>
+                      </a:r>
+                    </a:p>
+                  </a:txBody>
+                  <a:tcPr anchor="t" marB="0" marT="0" marR="0" marL="0">
+                    <a:lnL w="0" cmpd="sng" algn="ctr" cap="flat">
+                      <a:solidFill>
+                        <a:srgbClr val="FFFFFF">
+                          <a:alpha val="0"/>
+                        </a:srgbClr>
+                      </a:solidFill>
+                      <a:prstDash val="solid"/>
+                    </a:lnL>
+                    <a:lnR w="0" cmpd="sng" algn="ctr" cap="flat">
+                      <a:solidFill>
+                        <a:srgbClr val="FFFFFF">
+                          <a:alpha val="0"/>
+                        </a:srgbClr>
+                      </a:solidFill>
+                      <a:prstDash val="solid"/>
+                    </a:lnR>
+                    <a:lnT w="0" cmpd="sng" algn="ctr" cap="flat">
+                      <a:solidFill>
+                        <a:srgbClr val="FFFFFF">
+                          <a:alpha val="0"/>
+                        </a:srgbClr>
+                      </a:solidFill>
+                      <a:prstDash val="solid"/>
+                    </a:lnT>
+                    <a:lnB w="0" cmpd="sng" algn="ctr" cap="flat">
+                      <a:solidFill>
+                        <a:srgbClr val="FFFFFF">
+                          <a:alpha val="0"/>
+                        </a:srgbClr>
+                      </a:solidFill>
+                      <a:prstDash val="solid"/>
+                    </a:lnB>
+                  </a:tcPr>
+                </a:tc>
+                <a:tc>
+                  <a:txBody>
+                    <a:bodyPr/>
+                    <a:lstStyle/>
+                    <a:p>
+                      <a:pPr algn="l" marL="63500" marR="63500">
+                        <a:lnSpc>
+                          <a:spcPct val="100000"/>
+                        </a:lnSpc>
+                        <a:spcBef>
+                          <a:spcPts val="200"/>
+                        </a:spcBef>
+                        <a:spcAft>
+                          <a:spcPts val="200"/>
+                        </a:spcAft>
+                        <a:buNone/>
+                      </a:pPr>
+                      <a:r>
+                        <a:rPr sz="1100">
+                          <a:solidFill>
+                            <a:srgbClr val="111111">
+                              <a:alpha val="100000"/>
+                            </a:srgbClr>
+                          </a:solidFill>
+                          <a:latin typeface="Calibri"/>
+                          <a:cs typeface="Calibri"/>
+                        </a:rPr>
+                        <a:t>10% of authorities
+with lowest rate</a:t>
+                      </a:r>
+                    </a:p>
+                  </a:txBody>
+                  <a:tcPr anchor="t" marB="0" marT="0" marR="0" marL="0">
+                    <a:lnL w="0" cmpd="sng" algn="ctr" cap="flat">
+                      <a:solidFill>
+                        <a:srgbClr val="FFFFFF">
+                          <a:alpha val="0"/>
+                        </a:srgbClr>
+                      </a:solidFill>
+                      <a:prstDash val="solid"/>
+                    </a:lnL>
+                    <a:lnR w="0" cmpd="sng" algn="ctr" cap="flat">
+                      <a:solidFill>
+                        <a:srgbClr val="FFFFFF">
+                          <a:alpha val="0"/>
+                        </a:srgbClr>
+                      </a:solidFill>
+                      <a:prstDash val="solid"/>
+                    </a:lnR>
+                    <a:lnT w="0" cmpd="sng" algn="ctr" cap="flat">
+                      <a:solidFill>
+                        <a:srgbClr val="FFFFFF">
+                          <a:alpha val="0"/>
+                        </a:srgbClr>
+                      </a:solidFill>
+                      <a:prstDash val="solid"/>
+                    </a:lnT>
+                    <a:lnB w="0" cmpd="sng" algn="ctr" cap="flat">
+                      <a:solidFill>
+                        <a:srgbClr val="FFFFFF">
+                          <a:alpha val="0"/>
+                        </a:srgbClr>
+                      </a:solidFill>
+                      <a:prstDash val="solid"/>
+                    </a:lnB>
+                  </a:tcPr>
+                </a:tc>
+              </a:tr>
+              <a:tr h="182880">
+                <a:tc>
+                  <a:txBody>
+                    <a:bodyPr/>
+                    <a:lstStyle/>
+                    <a:p>
+                      <a:pPr algn="l" marL="63500" marR="63500">
+                        <a:lnSpc>
+                          <a:spcPct val="100000"/>
+                        </a:lnSpc>
+                        <a:spcBef>
+                          <a:spcPts val="200"/>
+                        </a:spcBef>
+                        <a:spcAft>
+                          <a:spcPts val="200"/>
+                        </a:spcAft>
+                        <a:buNone/>
+                      </a:pPr>
+                      <a:r>
+                        <a:rPr sz="1100">
+                          <a:solidFill>
+                            <a:srgbClr val="111111">
+                              <a:alpha val="100000"/>
+                            </a:srgbClr>
+                          </a:solidFill>
+                          <a:latin typeface="Calibri"/>
+                          <a:cs typeface="Calibri"/>
+                        </a:rPr>
+                        <a:t>West Sussex</a:t>
+                      </a:r>
+                    </a:p>
+                  </a:txBody>
+                  <a:tcPr anchor="t" marB="0" marT="0" marR="0" marL="0">
+                    <a:lnL w="0" cmpd="sng" algn="ctr" cap="flat">
+                      <a:solidFill>
+                        <a:srgbClr val="FFFFFF">
+                          <a:alpha val="0"/>
+                        </a:srgbClr>
+                      </a:solidFill>
+                      <a:prstDash val="solid"/>
+                    </a:lnL>
+                    <a:lnR w="0" cmpd="sng" algn="ctr" cap="flat">
+                      <a:solidFill>
+                        <a:srgbClr val="FFFFFF">
+                          <a:alpha val="0"/>
+                        </a:srgbClr>
+                      </a:solidFill>
+                      <a:prstDash val="solid"/>
+                    </a:lnR>
+                    <a:lnT w="0" cmpd="sng" algn="ctr" cap="flat">
+                      <a:solidFill>
+                        <a:srgbClr val="FFFFFF">
+                          <a:alpha val="0"/>
+                        </a:srgbClr>
+                      </a:solidFill>
+                      <a:prstDash val="solid"/>
+                    </a:lnT>
+                    <a:lnB w="0" cmpd="sng" algn="ctr" cap="flat">
+                      <a:solidFill>
+                        <a:srgbClr val="FFFFFF">
+                          <a:alpha val="0"/>
+                        </a:srgbClr>
+                      </a:solidFill>
+                      <a:prstDash val="solid"/>
+                    </a:lnB>
+                  </a:tcPr>
+                </a:tc>
+                <a:tc>
+                  <a:txBody>
+                    <a:bodyPr/>
+                    <a:lstStyle/>
+                    <a:p>
+                      <a:pPr algn="l" marL="63500" marR="63500">
+                        <a:lnSpc>
+                          <a:spcPct val="100000"/>
+                        </a:lnSpc>
+                        <a:spcBef>
+                          <a:spcPts val="200"/>
+                        </a:spcBef>
+                        <a:spcAft>
+                          <a:spcPts val="200"/>
+                        </a:spcAft>
+                        <a:buNone/>
+                      </a:pPr>
+                      <a:r>
+                        <a:rPr sz="1100">
+                          <a:solidFill>
+                            <a:srgbClr val="111111">
+                              <a:alpha val="100000"/>
+                            </a:srgbClr>
+                          </a:solidFill>
+                          <a:latin typeface="Calibri"/>
+                          <a:cs typeface="Calibri"/>
+                        </a:rPr>
+                        <a:t>115</a:t>
+                      </a:r>
+                    </a:p>
+                  </a:txBody>
+                  <a:tcPr anchor="t" marB="0" marT="0" marR="0" marL="0">
+                    <a:lnL w="0" cmpd="sng" algn="ctr" cap="flat">
+                      <a:solidFill>
+                        <a:srgbClr val="FFFFFF">
+                          <a:alpha val="0"/>
+                        </a:srgbClr>
+                      </a:solidFill>
+                      <a:prstDash val="solid"/>
+                    </a:lnL>
+                    <a:lnR w="0" cmpd="sng" algn="ctr" cap="flat">
+                      <a:solidFill>
+                        <a:srgbClr val="FFFFFF">
+                          <a:alpha val="0"/>
+                        </a:srgbClr>
+                      </a:solidFill>
+                      <a:prstDash val="solid"/>
+                    </a:lnR>
+                    <a:lnT w="0" cmpd="sng" algn="ctr" cap="flat">
+                      <a:solidFill>
+                        <a:srgbClr val="FFFFFF">
+                          <a:alpha val="0"/>
+                        </a:srgbClr>
+                      </a:solidFill>
+                      <a:prstDash val="solid"/>
+                    </a:lnT>
+                    <a:lnB w="0" cmpd="sng" algn="ctr" cap="flat">
+                      <a:solidFill>
+                        <a:srgbClr val="FFFFFF">
+                          <a:alpha val="0"/>
+                        </a:srgbClr>
+                      </a:solidFill>
+                      <a:prstDash val="solid"/>
+                    </a:lnB>
+                  </a:tcPr>
+                </a:tc>
+                <a:tc>
+                  <a:txBody>
+                    <a:bodyPr/>
+                    <a:lstStyle/>
+                    <a:p>
+                      <a:pPr algn="l" marL="63500" marR="63500">
+                        <a:lnSpc>
+                          <a:spcPct val="100000"/>
+                        </a:lnSpc>
+                        <a:spcBef>
+                          <a:spcPts val="200"/>
+                        </a:spcBef>
+                        <a:spcAft>
+                          <a:spcPts val="200"/>
+                        </a:spcAft>
+                        <a:buNone/>
+                      </a:pPr>
+                      <a:r>
+                        <a:rPr sz="1100">
+                          <a:solidFill>
+                            <a:srgbClr val="111111">
+                              <a:alpha val="100000"/>
+                            </a:srgbClr>
+                          </a:solidFill>
+                          <a:latin typeface="Calibri"/>
+                          <a:cs typeface="Calibri"/>
+                        </a:rPr>
+                        <a:t>13.3</a:t>
                       </a:r>
                     </a:p>
                   </a:txBody>
@@ -17821,7 +17822,7 @@
                           <a:latin typeface="Calibri"/>
                           <a:cs typeface="Calibri"/>
                         </a:rPr>
-                        <a:t>12,281</a:t>
+                        <a:t>12,421</a:t>
                       </a:r>
                     </a:p>
                   </a:txBody>
@@ -17887,7 +17888,7 @@
                           <a:latin typeface="Calibri"/>
                           <a:cs typeface="Calibri"/>
                         </a:rPr>
-                        <a:t>21.8</a:t>
+                        <a:t>22.1</a:t>
                       </a:r>
                     </a:p>
                   </a:txBody>
@@ -18442,7 +18443,7 @@
           <a:p>
             <a:r>
               <a:rPr/>
-              <a:t>Pack date: 12 May 2021</a:t>
+              <a:t>Pack date: 13 May 2021</a:t>
             </a:r>
           </a:p>
         </p:txBody>
@@ -18600,7 +18601,7 @@
           <a:p>
             <a:r>
               <a:rPr/>
-              <a:t>Pack date: 12 May 2021</a:t>
+              <a:t>Pack date: 13 May 2021</a:t>
             </a:r>
           </a:p>
         </p:txBody>
@@ -18758,7 +18759,7 @@
           <a:p>
             <a:r>
               <a:rPr/>
-              <a:t>Pack date: 12 May 2021</a:t>
+              <a:t>Pack date: 13 May 2021</a:t>
             </a:r>
           </a:p>
         </p:txBody>
@@ -18916,7 +18917,7 @@
           <a:p>
             <a:r>
               <a:rPr/>
-              <a:t>Pack date: 12 May 2021</a:t>
+              <a:t>Pack date: 13 May 2021</a:t>
             </a:r>
           </a:p>
         </p:txBody>
@@ -19074,7 +19075,7 @@
           <a:p>
             <a:r>
               <a:rPr/>
-              <a:t>Pack date: 12 May 2021</a:t>
+              <a:t>Pack date: 13 May 2021</a:t>
             </a:r>
           </a:p>
         </p:txBody>
@@ -19263,7 +19264,7 @@
           <a:p>
             <a:r>
               <a:rPr/>
-              <a:t>Pack date: 12 May 2021</a:t>
+              <a:t>Pack date: 13 May 2021</a:t>
             </a:r>
           </a:p>
         </p:txBody>
@@ -19421,7 +19422,7 @@
           <a:p>
             <a:r>
               <a:rPr/>
-              <a:t>Pack date: 12 May 2021</a:t>
+              <a:t>Pack date: 13 May 2021</a:t>
             </a:r>
           </a:p>
         </p:txBody>
@@ -19579,7 +19580,7 @@
           <a:p>
             <a:r>
               <a:rPr/>
-              <a:t>Pack date: 12 May 2021</a:t>
+              <a:t>Pack date: 13 May 2021</a:t>
             </a:r>
           </a:p>
         </p:txBody>
@@ -19737,7 +19738,7 @@
           <a:p>
             <a:r>
               <a:rPr/>
-              <a:t>Pack date: 12 May 2021</a:t>
+              <a:t>Pack date: 13 May 2021</a:t>
             </a:r>
           </a:p>
         </p:txBody>
@@ -19895,7 +19896,7 @@
           <a:p>
             <a:r>
               <a:rPr/>
-              <a:t>Pack date: 12 May 2021</a:t>
+              <a:t>Pack date: 13 May 2021</a:t>
             </a:r>
           </a:p>
         </p:txBody>
@@ -20027,7 +20028,7 @@
           <a:p>
             <a:r>
               <a:rPr/>
-              <a:t>Pack date: 12 May 2021</a:t>
+              <a:t>Pack date: 13 May 2021</a:t>
             </a:r>
           </a:p>
         </p:txBody>
@@ -20159,7 +20160,7 @@
           <a:p>
             <a:r>
               <a:rPr/>
-              <a:t>Pack date: 12 May 2021</a:t>
+              <a:t>Pack date: 13 May 2021</a:t>
             </a:r>
           </a:p>
         </p:txBody>
@@ -20291,7 +20292,7 @@
           <a:p>
             <a:r>
               <a:rPr/>
-              <a:t>Pack date: 12 May 2021</a:t>
+              <a:t>Pack date: 13 May 2021</a:t>
             </a:r>
           </a:p>
         </p:txBody>
@@ -20423,7 +20424,7 @@
           <a:p>
             <a:r>
               <a:rPr/>
-              <a:t>Pack date: 12 May 2021</a:t>
+              <a:t>Pack date: 13 May 2021</a:t>
             </a:r>
           </a:p>
         </p:txBody>
@@ -20555,7 +20556,7 @@
           <a:p>
             <a:r>
               <a:rPr/>
-              <a:t>Pack date: 12 May 2021</a:t>
+              <a:t>Pack date: 13 May 2021</a:t>
             </a:r>
           </a:p>
         </p:txBody>
@@ -20687,7 +20688,7 @@
           <a:p>
             <a:r>
               <a:rPr/>
-              <a:t>Pack date: 12 May 2021</a:t>
+              <a:t>Pack date: 13 May 2021</a:t>
             </a:r>
           </a:p>
         </p:txBody>

</xml_diff>

<commit_message>
May 25 and mort
</commit_message>
<xml_diff>
--- a/Latest_West_Sussex_C19_slide_deck.pptx
+++ b/Latest_West_Sussex_C19_slide_deck.pptx
@@ -7176,7 +7176,7 @@
           <a:p>
             <a:r>
               <a:rPr/>
-              <a:t>Pack date: 24 May 2021</a:t>
+              <a:t>Pack date: 25 May 2021</a:t>
             </a:r>
           </a:p>
         </p:txBody>
@@ -7308,7 +7308,7 @@
           <a:p>
             <a:r>
               <a:rPr/>
-              <a:t>Pack date: 24 May 2021</a:t>
+              <a:t>Pack date: 25 May 2021</a:t>
             </a:r>
           </a:p>
         </p:txBody>
@@ -7466,7 +7466,7 @@
           <a:p>
             <a:r>
               <a:rPr/>
-              <a:t>Pack date: 24 May 2021</a:t>
+              <a:t>Pack date: 25 May 2021</a:t>
             </a:r>
           </a:p>
         </p:txBody>
@@ -7547,7 +7547,7 @@
           <a:p>
             <a:r>
               <a:rPr/>
-              <a:t>Upper Tier Local Authority cumulative cases as at 24 May</a:t>
+              <a:t>Upper Tier Local Authority cumulative cases as at 25 May</a:t>
             </a:r>
           </a:p>
         </p:txBody>
@@ -8082,7 +8082,7 @@
                           <a:latin typeface="Calibri"/>
                           <a:cs typeface="Calibri"/>
                         </a:rPr>
-                        <a:t>42,125</a:t>
+                        <a:t>42,133</a:t>
                       </a:r>
                     </a:p>
                   </a:txBody>
@@ -8148,7 +8148,7 @@
                           <a:latin typeface="Calibri"/>
                           <a:cs typeface="Calibri"/>
                         </a:rPr>
-                        <a:t>4,875.7</a:t>
+                        <a:t>4,876.6</a:t>
                       </a:r>
                     </a:p>
                   </a:txBody>
@@ -8214,7 +8214,7 @@
                           <a:latin typeface="Calibri"/>
                           <a:cs typeface="Calibri"/>
                         </a:rPr>
-                        <a:t>129th</a:t>
+                        <a:t>130th</a:t>
                       </a:r>
                     </a:p>
                   </a:txBody>
@@ -8414,7 +8414,7 @@
                           <a:latin typeface="Calibri"/>
                           <a:cs typeface="Calibri"/>
                         </a:rPr>
-                        <a:t>3,897,815</a:t>
+                        <a:t>3,899,813</a:t>
                       </a:r>
                     </a:p>
                   </a:txBody>
@@ -8480,7 +8480,7 @@
                           <a:latin typeface="Calibri"/>
                           <a:cs typeface="Calibri"/>
                         </a:rPr>
-                        <a:t>6,924.9</a:t>
+                        <a:t>6,928.4</a:t>
                       </a:r>
                     </a:p>
                   </a:txBody>
@@ -8746,7 +8746,7 @@
                           <a:latin typeface="Calibri"/>
                           <a:cs typeface="Calibri"/>
                         </a:rPr>
-                        <a:t>543,516</a:t>
+                        <a:t>543,748</a:t>
                       </a:r>
                     </a:p>
                   </a:txBody>
@@ -8812,7 +8812,7 @@
                           <a:latin typeface="Calibri"/>
                           <a:cs typeface="Calibri"/>
                         </a:rPr>
-                        <a:t>5,920.6</a:t>
+                        <a:t>5,923.1</a:t>
                       </a:r>
                     </a:p>
                   </a:txBody>
@@ -9061,7 +9061,7 @@
           <a:p>
             <a:r>
               <a:rPr/>
-              <a:t>Pack date: 24 May 2021</a:t>
+              <a:t>Pack date: 25 May 2021</a:t>
             </a:r>
           </a:p>
         </p:txBody>
@@ -9142,7 +9142,7 @@
           <a:p>
             <a:r>
               <a:rPr/>
-              <a:t>Upper Tier Local Authority rolling 7 day cases as at 24 May</a:t>
+              <a:t>Upper Tier Local Authority rolling 7 day cases as at 25 May</a:t>
             </a:r>
           </a:p>
         </p:txBody>
@@ -9223,7 +9223,7 @@
           <a:p>
             <a:r>
               <a:rPr/>
-              <a:t>Note that the very recent days are excluded in the 7-day total as these are thought to be incomplete. As such, this data represents cases in the seven days to 19 May</a:t>
+              <a:t>Note that the very recent days are excluded in the 7-day total as these are thought to be incomplete. As such, this data represents cases in the seven days to 20 May</a:t>
             </a:r>
           </a:p>
         </p:txBody>
@@ -9677,7 +9677,7 @@
                           <a:latin typeface="Calibri"/>
                           <a:cs typeface="Calibri"/>
                         </a:rPr>
-                        <a:t>53</a:t>
+                        <a:t>43</a:t>
                       </a:r>
                     </a:p>
                   </a:txBody>
@@ -9743,7 +9743,7 @@
                           <a:latin typeface="Calibri"/>
                           <a:cs typeface="Calibri"/>
                         </a:rPr>
-                        <a:t>6.1</a:t>
+                        <a:t>5.0</a:t>
                       </a:r>
                     </a:p>
                   </a:txBody>
@@ -9809,7 +9809,7 @@
                           <a:latin typeface="Calibri"/>
                           <a:cs typeface="Calibri"/>
                         </a:rPr>
-                        <a:t>140th</a:t>
+                        <a:t>142nd</a:t>
                       </a:r>
                     </a:p>
                   </a:txBody>
@@ -10010,7 +10010,7 @@
                           <a:latin typeface="Calibri"/>
                           <a:cs typeface="Calibri"/>
                         </a:rPr>
-                        <a:t>12,374</a:t>
+                        <a:t>12,639</a:t>
                       </a:r>
                     </a:p>
                   </a:txBody>
@@ -10076,7 +10076,7 @@
                           <a:latin typeface="Calibri"/>
                           <a:cs typeface="Calibri"/>
                         </a:rPr>
-                        <a:t>22.0</a:t>
+                        <a:t>22.5</a:t>
                       </a:r>
                     </a:p>
                   </a:txBody>
@@ -10342,7 +10342,7 @@
                           <a:latin typeface="Calibri"/>
                           <a:cs typeface="Calibri"/>
                         </a:rPr>
-                        <a:t>1,099</a:t>
+                        <a:t>1,077</a:t>
                       </a:r>
                     </a:p>
                   </a:txBody>
@@ -10408,7 +10408,7 @@
                           <a:latin typeface="Calibri"/>
                           <a:cs typeface="Calibri"/>
                         </a:rPr>
-                        <a:t>12.0</a:t>
+                        <a:t>11.7</a:t>
                       </a:r>
                     </a:p>
                   </a:txBody>
@@ -10657,7 +10657,7 @@
           <a:p>
             <a:r>
               <a:rPr/>
-              <a:t>Pack date: 24 May 2021</a:t>
+              <a:t>Pack date: 25 May 2021</a:t>
             </a:r>
           </a:p>
         </p:txBody>
@@ -10738,7 +10738,7 @@
           <a:p>
             <a:r>
               <a:rPr/>
-              <a:t>Lower Tier Local Authority cumulative cases as at 24 May</a:t>
+              <a:t>Lower Tier Local Authority cumulative cases as at 25 May</a:t>
             </a:r>
           </a:p>
         </p:txBody>
@@ -11246,7 +11246,7 @@
                           <a:latin typeface="Calibri"/>
                           <a:cs typeface="Calibri"/>
                         </a:rPr>
-                        <a:t>2,925</a:t>
+                        <a:t>2,926</a:t>
                       </a:r>
                     </a:p>
                   </a:txBody>
@@ -11312,7 +11312,7 @@
                           <a:latin typeface="Calibri"/>
                           <a:cs typeface="Calibri"/>
                         </a:rPr>
-                        <a:t>4,548.9</a:t>
+                        <a:t>4,550.5</a:t>
                       </a:r>
                     </a:p>
                   </a:txBody>
@@ -11578,7 +11578,7 @@
                           <a:latin typeface="Calibri"/>
                           <a:cs typeface="Calibri"/>
                         </a:rPr>
-                        <a:t>8,328</a:t>
+                        <a:t>8,329</a:t>
                       </a:r>
                     </a:p>
                   </a:txBody>
@@ -11644,7 +11644,7 @@
                           <a:latin typeface="Calibri"/>
                           <a:cs typeface="Calibri"/>
                         </a:rPr>
-                        <a:t>5,180.5</a:t>
+                        <a:t>5,181.1</a:t>
                       </a:r>
                     </a:p>
                   </a:txBody>
@@ -11910,7 +11910,7 @@
                           <a:latin typeface="Calibri"/>
                           <a:cs typeface="Calibri"/>
                         </a:rPr>
-                        <a:t>4,946</a:t>
+                        <a:t>4,947</a:t>
                       </a:r>
                     </a:p>
                   </a:txBody>
@@ -11976,7 +11976,7 @@
                           <a:latin typeface="Calibri"/>
                           <a:cs typeface="Calibri"/>
                         </a:rPr>
-                        <a:t>4,083.3</a:t>
+                        <a:t>4,084.1</a:t>
                       </a:r>
                     </a:p>
                   </a:txBody>
@@ -12242,7 +12242,7 @@
                           <a:latin typeface="Calibri"/>
                           <a:cs typeface="Calibri"/>
                         </a:rPr>
-                        <a:t>8,001</a:t>
+                        <a:t>8,002</a:t>
                       </a:r>
                     </a:p>
                   </a:txBody>
@@ -12308,7 +12308,7 @@
                           <a:latin typeface="Calibri"/>
                           <a:cs typeface="Calibri"/>
                         </a:rPr>
-                        <a:t>7,117.8</a:t>
+                        <a:t>7,118.6</a:t>
                       </a:r>
                     </a:p>
                   </a:txBody>
@@ -12906,7 +12906,7 @@
                           <a:latin typeface="Calibri"/>
                           <a:cs typeface="Calibri"/>
                         </a:rPr>
-                        <a:t>6,855</a:t>
+                        <a:t>6,857</a:t>
                       </a:r>
                     </a:p>
                   </a:txBody>
@@ -12972,7 +12972,7 @@
                           <a:latin typeface="Calibri"/>
                           <a:cs typeface="Calibri"/>
                         </a:rPr>
-                        <a:t>4,539.1</a:t>
+                        <a:t>4,540.4</a:t>
                       </a:r>
                     </a:p>
                   </a:txBody>
@@ -13038,7 +13038,7 @@
                           <a:latin typeface="Calibri"/>
                           <a:cs typeface="Calibri"/>
                         </a:rPr>
-                        <a:t>263rd</a:t>
+                        <a:t>264th</a:t>
                       </a:r>
                     </a:p>
                   </a:txBody>
@@ -13238,7 +13238,7 @@
                           <a:latin typeface="Calibri"/>
                           <a:cs typeface="Calibri"/>
                         </a:rPr>
-                        <a:t>5,343</a:t>
+                        <a:t>5,345</a:t>
                       </a:r>
                     </a:p>
                   </a:txBody>
@@ -13304,7 +13304,7 @@
                           <a:latin typeface="Calibri"/>
                           <a:cs typeface="Calibri"/>
                         </a:rPr>
-                        <a:t>4,832.2</a:t>
+                        <a:t>4,834.0</a:t>
                       </a:r>
                     </a:p>
                   </a:txBody>
@@ -13570,7 +13570,7 @@
                           <a:latin typeface="Calibri"/>
                           <a:cs typeface="Calibri"/>
                         </a:rPr>
-                        <a:t>42,125</a:t>
+                        <a:t>42,133</a:t>
                       </a:r>
                     </a:p>
                   </a:txBody>
@@ -13636,7 +13636,7 @@
                           <a:latin typeface="Calibri"/>
                           <a:cs typeface="Calibri"/>
                         </a:rPr>
-                        <a:t>4,875.7</a:t>
+                        <a:t>4,876.6</a:t>
                       </a:r>
                     </a:p>
                   </a:txBody>
@@ -13902,7 +13902,7 @@
                           <a:latin typeface="Calibri"/>
                           <a:cs typeface="Calibri"/>
                         </a:rPr>
-                        <a:t>543,516</a:t>
+                        <a:t>543,748</a:t>
                       </a:r>
                     </a:p>
                   </a:txBody>
@@ -13968,7 +13968,7 @@
                           <a:latin typeface="Calibri"/>
                           <a:cs typeface="Calibri"/>
                         </a:rPr>
-                        <a:t>5,920.6</a:t>
+                        <a:t>5,923.1</a:t>
                       </a:r>
                     </a:p>
                   </a:txBody>
@@ -14234,7 +14234,7 @@
                           <a:latin typeface="Calibri"/>
                           <a:cs typeface="Calibri"/>
                         </a:rPr>
-                        <a:t>3,897,815</a:t>
+                        <a:t>3,899,813</a:t>
                       </a:r>
                     </a:p>
                   </a:txBody>
@@ -14300,7 +14300,7 @@
                           <a:latin typeface="Calibri"/>
                           <a:cs typeface="Calibri"/>
                         </a:rPr>
-                        <a:t>6,924.9</a:t>
+                        <a:t>6,928.4</a:t>
                       </a:r>
                     </a:p>
                   </a:txBody>
@@ -14549,7 +14549,7 @@
           <a:p>
             <a:r>
               <a:rPr/>
-              <a:t>Pack date: 24 May 2021</a:t>
+              <a:t>Pack date: 25 May 2021</a:t>
             </a:r>
           </a:p>
         </p:txBody>
@@ -14630,7 +14630,7 @@
           <a:p>
             <a:r>
               <a:rPr/>
-              <a:t>Lower Tier Local Authority rolling cases as at 24 May</a:t>
+              <a:t>Lower Tier Local Authority rolling cases as at 25 May</a:t>
             </a:r>
           </a:p>
         </p:txBody>
@@ -14711,7 +14711,7 @@
           <a:p>
             <a:r>
               <a:rPr/>
-              <a:t>Note that the very recent days are excluded in the 7-day total as these are thought to be incomplete. As such, this data represents cases in the seven days to 19 May</a:t>
+              <a:t>Note that the very recent days are excluded in the 7-day total as these are thought to be incomplete. As such, this data represents cases in the seven days to 20 May</a:t>
             </a:r>
           </a:p>
         </p:txBody>
@@ -15165,7 +15165,7 @@
                           <a:latin typeface="Calibri"/>
                           <a:cs typeface="Calibri"/>
                         </a:rPr>
-                        <a:t>7</a:t>
+                        <a:t>6</a:t>
                       </a:r>
                     </a:p>
                   </a:txBody>
@@ -15231,7 +15231,7 @@
                           <a:latin typeface="Calibri"/>
                           <a:cs typeface="Calibri"/>
                         </a:rPr>
-                        <a:t>10.9</a:t>
+                        <a:t>9.3</a:t>
                       </a:r>
                     </a:p>
                   </a:txBody>
@@ -15297,7 +15297,7 @@
                           <a:latin typeface="Calibri"/>
                           <a:cs typeface="Calibri"/>
                         </a:rPr>
-                        <a:t>173rd</a:t>
+                        <a:t>195th</a:t>
                       </a:r>
                     </a:p>
                   </a:txBody>
@@ -15363,7 +15363,7 @@
                           <a:latin typeface="Calibri"/>
                           <a:cs typeface="Calibri"/>
                         </a:rPr>
-                        <a:t>Decile 6</a:t>
+                        <a:t>Decile 7</a:t>
                       </a:r>
                     </a:p>
                   </a:txBody>
@@ -15497,7 +15497,7 @@
                           <a:latin typeface="Calibri"/>
                           <a:cs typeface="Calibri"/>
                         </a:rPr>
-                        <a:t>13</a:t>
+                        <a:t>9</a:t>
                       </a:r>
                     </a:p>
                   </a:txBody>
@@ -15563,7 +15563,7 @@
                           <a:latin typeface="Calibri"/>
                           <a:cs typeface="Calibri"/>
                         </a:rPr>
-                        <a:t>8.1</a:t>
+                        <a:t>5.6</a:t>
                       </a:r>
                     </a:p>
                   </a:txBody>
@@ -15629,7 +15629,671 @@
                           <a:latin typeface="Calibri"/>
                           <a:cs typeface="Calibri"/>
                         </a:rPr>
-                        <a:t>229th</a:t>
+                        <a:t>265th</a:t>
+                      </a:r>
+                    </a:p>
+                  </a:txBody>
+                  <a:tcPr anchor="t" marB="0" marT="0" marR="0" marL="0">
+                    <a:lnL w="0" cmpd="sng" algn="ctr" cap="flat">
+                      <a:solidFill>
+                        <a:srgbClr val="FFFFFF">
+                          <a:alpha val="0"/>
+                        </a:srgbClr>
+                      </a:solidFill>
+                      <a:prstDash val="solid"/>
+                    </a:lnL>
+                    <a:lnR w="0" cmpd="sng" algn="ctr" cap="flat">
+                      <a:solidFill>
+                        <a:srgbClr val="FFFFFF">
+                          <a:alpha val="0"/>
+                        </a:srgbClr>
+                      </a:solidFill>
+                      <a:prstDash val="solid"/>
+                    </a:lnR>
+                    <a:lnT w="0" cmpd="sng" algn="ctr" cap="flat">
+                      <a:solidFill>
+                        <a:srgbClr val="FFFFFF">
+                          <a:alpha val="0"/>
+                        </a:srgbClr>
+                      </a:solidFill>
+                      <a:prstDash val="solid"/>
+                    </a:lnT>
+                    <a:lnB w="0" cmpd="sng" algn="ctr" cap="flat">
+                      <a:solidFill>
+                        <a:srgbClr val="FFFFFF">
+                          <a:alpha val="0"/>
+                        </a:srgbClr>
+                      </a:solidFill>
+                      <a:prstDash val="solid"/>
+                    </a:lnB>
+                  </a:tcPr>
+                </a:tc>
+                <a:tc>
+                  <a:txBody>
+                    <a:bodyPr/>
+                    <a:lstStyle/>
+                    <a:p>
+                      <a:pPr algn="l" marL="63500" marR="63500">
+                        <a:lnSpc>
+                          <a:spcPct val="100000"/>
+                        </a:lnSpc>
+                        <a:spcBef>
+                          <a:spcPts val="200"/>
+                        </a:spcBef>
+                        <a:spcAft>
+                          <a:spcPts val="200"/>
+                        </a:spcAft>
+                        <a:buNone/>
+                      </a:pPr>
+                      <a:r>
+                        <a:rPr sz="1100">
+                          <a:solidFill>
+                            <a:srgbClr val="111111">
+                              <a:alpha val="100000"/>
+                            </a:srgbClr>
+                          </a:solidFill>
+                          <a:latin typeface="Calibri"/>
+                          <a:cs typeface="Calibri"/>
+                        </a:rPr>
+                        <a:t>Decile 9</a:t>
+                      </a:r>
+                    </a:p>
+                  </a:txBody>
+                  <a:tcPr anchor="t" marB="0" marT="0" marR="0" marL="0">
+                    <a:lnL w="0" cmpd="sng" algn="ctr" cap="flat">
+                      <a:solidFill>
+                        <a:srgbClr val="FFFFFF">
+                          <a:alpha val="0"/>
+                        </a:srgbClr>
+                      </a:solidFill>
+                      <a:prstDash val="solid"/>
+                    </a:lnL>
+                    <a:lnR w="0" cmpd="sng" algn="ctr" cap="flat">
+                      <a:solidFill>
+                        <a:srgbClr val="FFFFFF">
+                          <a:alpha val="0"/>
+                        </a:srgbClr>
+                      </a:solidFill>
+                      <a:prstDash val="solid"/>
+                    </a:lnR>
+                    <a:lnT w="0" cmpd="sng" algn="ctr" cap="flat">
+                      <a:solidFill>
+                        <a:srgbClr val="FFFFFF">
+                          <a:alpha val="0"/>
+                        </a:srgbClr>
+                      </a:solidFill>
+                      <a:prstDash val="solid"/>
+                    </a:lnT>
+                    <a:lnB w="0" cmpd="sng" algn="ctr" cap="flat">
+                      <a:solidFill>
+                        <a:srgbClr val="FFFFFF">
+                          <a:alpha val="0"/>
+                        </a:srgbClr>
+                      </a:solidFill>
+                      <a:prstDash val="solid"/>
+                    </a:lnB>
+                  </a:tcPr>
+                </a:tc>
+              </a:tr>
+              <a:tr h="182880">
+                <a:tc>
+                  <a:txBody>
+                    <a:bodyPr/>
+                    <a:lstStyle/>
+                    <a:p>
+                      <a:pPr algn="l" marL="63500" marR="63500">
+                        <a:lnSpc>
+                          <a:spcPct val="100000"/>
+                        </a:lnSpc>
+                        <a:spcBef>
+                          <a:spcPts val="200"/>
+                        </a:spcBef>
+                        <a:spcAft>
+                          <a:spcPts val="200"/>
+                        </a:spcAft>
+                        <a:buNone/>
+                      </a:pPr>
+                      <a:r>
+                        <a:rPr sz="1100">
+                          <a:solidFill>
+                            <a:srgbClr val="111111">
+                              <a:alpha val="100000"/>
+                            </a:srgbClr>
+                          </a:solidFill>
+                          <a:latin typeface="Calibri"/>
+                          <a:cs typeface="Calibri"/>
+                        </a:rPr>
+                        <a:t>Chichester</a:t>
+                      </a:r>
+                    </a:p>
+                  </a:txBody>
+                  <a:tcPr anchor="t" marB="0" marT="0" marR="0" marL="0">
+                    <a:lnL w="0" cmpd="sng" algn="ctr" cap="flat">
+                      <a:solidFill>
+                        <a:srgbClr val="FFFFFF">
+                          <a:alpha val="0"/>
+                        </a:srgbClr>
+                      </a:solidFill>
+                      <a:prstDash val="solid"/>
+                    </a:lnL>
+                    <a:lnR w="0" cmpd="sng" algn="ctr" cap="flat">
+                      <a:solidFill>
+                        <a:srgbClr val="FFFFFF">
+                          <a:alpha val="0"/>
+                        </a:srgbClr>
+                      </a:solidFill>
+                      <a:prstDash val="solid"/>
+                    </a:lnR>
+                    <a:lnT w="0" cmpd="sng" algn="ctr" cap="flat">
+                      <a:solidFill>
+                        <a:srgbClr val="FFFFFF">
+                          <a:alpha val="0"/>
+                        </a:srgbClr>
+                      </a:solidFill>
+                      <a:prstDash val="solid"/>
+                    </a:lnT>
+                    <a:lnB w="0" cmpd="sng" algn="ctr" cap="flat">
+                      <a:solidFill>
+                        <a:srgbClr val="FFFFFF">
+                          <a:alpha val="0"/>
+                        </a:srgbClr>
+                      </a:solidFill>
+                      <a:prstDash val="solid"/>
+                    </a:lnB>
+                  </a:tcPr>
+                </a:tc>
+                <a:tc>
+                  <a:txBody>
+                    <a:bodyPr/>
+                    <a:lstStyle/>
+                    <a:p>
+                      <a:pPr algn="l" marL="63500" marR="63500">
+                        <a:lnSpc>
+                          <a:spcPct val="100000"/>
+                        </a:lnSpc>
+                        <a:spcBef>
+                          <a:spcPts val="200"/>
+                        </a:spcBef>
+                        <a:spcAft>
+                          <a:spcPts val="200"/>
+                        </a:spcAft>
+                        <a:buNone/>
+                      </a:pPr>
+                      <a:r>
+                        <a:rPr sz="1100">
+                          <a:solidFill>
+                            <a:srgbClr val="111111">
+                              <a:alpha val="100000"/>
+                            </a:srgbClr>
+                          </a:solidFill>
+                          <a:latin typeface="Calibri"/>
+                          <a:cs typeface="Calibri"/>
+                        </a:rPr>
+                        <a:t>10</a:t>
+                      </a:r>
+                    </a:p>
+                  </a:txBody>
+                  <a:tcPr anchor="t" marB="0" marT="0" marR="0" marL="0">
+                    <a:lnL w="0" cmpd="sng" algn="ctr" cap="flat">
+                      <a:solidFill>
+                        <a:srgbClr val="FFFFFF">
+                          <a:alpha val="0"/>
+                        </a:srgbClr>
+                      </a:solidFill>
+                      <a:prstDash val="solid"/>
+                    </a:lnL>
+                    <a:lnR w="0" cmpd="sng" algn="ctr" cap="flat">
+                      <a:solidFill>
+                        <a:srgbClr val="FFFFFF">
+                          <a:alpha val="0"/>
+                        </a:srgbClr>
+                      </a:solidFill>
+                      <a:prstDash val="solid"/>
+                    </a:lnR>
+                    <a:lnT w="0" cmpd="sng" algn="ctr" cap="flat">
+                      <a:solidFill>
+                        <a:srgbClr val="FFFFFF">
+                          <a:alpha val="0"/>
+                        </a:srgbClr>
+                      </a:solidFill>
+                      <a:prstDash val="solid"/>
+                    </a:lnT>
+                    <a:lnB w="0" cmpd="sng" algn="ctr" cap="flat">
+                      <a:solidFill>
+                        <a:srgbClr val="FFFFFF">
+                          <a:alpha val="0"/>
+                        </a:srgbClr>
+                      </a:solidFill>
+                      <a:prstDash val="solid"/>
+                    </a:lnB>
+                  </a:tcPr>
+                </a:tc>
+                <a:tc>
+                  <a:txBody>
+                    <a:bodyPr/>
+                    <a:lstStyle/>
+                    <a:p>
+                      <a:pPr algn="l" marL="63500" marR="63500">
+                        <a:lnSpc>
+                          <a:spcPct val="100000"/>
+                        </a:lnSpc>
+                        <a:spcBef>
+                          <a:spcPts val="200"/>
+                        </a:spcBef>
+                        <a:spcAft>
+                          <a:spcPts val="200"/>
+                        </a:spcAft>
+                        <a:buNone/>
+                      </a:pPr>
+                      <a:r>
+                        <a:rPr sz="1100">
+                          <a:solidFill>
+                            <a:srgbClr val="111111">
+                              <a:alpha val="100000"/>
+                            </a:srgbClr>
+                          </a:solidFill>
+                          <a:latin typeface="Calibri"/>
+                          <a:cs typeface="Calibri"/>
+                        </a:rPr>
+                        <a:t>8.3</a:t>
+                      </a:r>
+                    </a:p>
+                  </a:txBody>
+                  <a:tcPr anchor="t" marB="0" marT="0" marR="0" marL="0">
+                    <a:lnL w="0" cmpd="sng" algn="ctr" cap="flat">
+                      <a:solidFill>
+                        <a:srgbClr val="FFFFFF">
+                          <a:alpha val="0"/>
+                        </a:srgbClr>
+                      </a:solidFill>
+                      <a:prstDash val="solid"/>
+                    </a:lnL>
+                    <a:lnR w="0" cmpd="sng" algn="ctr" cap="flat">
+                      <a:solidFill>
+                        <a:srgbClr val="FFFFFF">
+                          <a:alpha val="0"/>
+                        </a:srgbClr>
+                      </a:solidFill>
+                      <a:prstDash val="solid"/>
+                    </a:lnR>
+                    <a:lnT w="0" cmpd="sng" algn="ctr" cap="flat">
+                      <a:solidFill>
+                        <a:srgbClr val="FFFFFF">
+                          <a:alpha val="0"/>
+                        </a:srgbClr>
+                      </a:solidFill>
+                      <a:prstDash val="solid"/>
+                    </a:lnT>
+                    <a:lnB w="0" cmpd="sng" algn="ctr" cap="flat">
+                      <a:solidFill>
+                        <a:srgbClr val="FFFFFF">
+                          <a:alpha val="0"/>
+                        </a:srgbClr>
+                      </a:solidFill>
+                      <a:prstDash val="solid"/>
+                    </a:lnB>
+                  </a:tcPr>
+                </a:tc>
+                <a:tc>
+                  <a:txBody>
+                    <a:bodyPr/>
+                    <a:lstStyle/>
+                    <a:p>
+                      <a:pPr algn="l" marL="63500" marR="63500">
+                        <a:lnSpc>
+                          <a:spcPct val="100000"/>
+                        </a:lnSpc>
+                        <a:spcBef>
+                          <a:spcPts val="200"/>
+                        </a:spcBef>
+                        <a:spcAft>
+                          <a:spcPts val="200"/>
+                        </a:spcAft>
+                        <a:buNone/>
+                      </a:pPr>
+                      <a:r>
+                        <a:rPr sz="1100">
+                          <a:solidFill>
+                            <a:srgbClr val="111111">
+                              <a:alpha val="100000"/>
+                            </a:srgbClr>
+                          </a:solidFill>
+                          <a:latin typeface="Calibri"/>
+                          <a:cs typeface="Calibri"/>
+                        </a:rPr>
+                        <a:t>218th</a:t>
+                      </a:r>
+                    </a:p>
+                  </a:txBody>
+                  <a:tcPr anchor="t" marB="0" marT="0" marR="0" marL="0">
+                    <a:lnL w="0" cmpd="sng" algn="ctr" cap="flat">
+                      <a:solidFill>
+                        <a:srgbClr val="FFFFFF">
+                          <a:alpha val="0"/>
+                        </a:srgbClr>
+                      </a:solidFill>
+                      <a:prstDash val="solid"/>
+                    </a:lnL>
+                    <a:lnR w="0" cmpd="sng" algn="ctr" cap="flat">
+                      <a:solidFill>
+                        <a:srgbClr val="FFFFFF">
+                          <a:alpha val="0"/>
+                        </a:srgbClr>
+                      </a:solidFill>
+                      <a:prstDash val="solid"/>
+                    </a:lnR>
+                    <a:lnT w="0" cmpd="sng" algn="ctr" cap="flat">
+                      <a:solidFill>
+                        <a:srgbClr val="FFFFFF">
+                          <a:alpha val="0"/>
+                        </a:srgbClr>
+                      </a:solidFill>
+                      <a:prstDash val="solid"/>
+                    </a:lnT>
+                    <a:lnB w="0" cmpd="sng" algn="ctr" cap="flat">
+                      <a:solidFill>
+                        <a:srgbClr val="FFFFFF">
+                          <a:alpha val="0"/>
+                        </a:srgbClr>
+                      </a:solidFill>
+                      <a:prstDash val="solid"/>
+                    </a:lnB>
+                  </a:tcPr>
+                </a:tc>
+                <a:tc>
+                  <a:txBody>
+                    <a:bodyPr/>
+                    <a:lstStyle/>
+                    <a:p>
+                      <a:pPr algn="l" marL="63500" marR="63500">
+                        <a:lnSpc>
+                          <a:spcPct val="100000"/>
+                        </a:lnSpc>
+                        <a:spcBef>
+                          <a:spcPts val="200"/>
+                        </a:spcBef>
+                        <a:spcAft>
+                          <a:spcPts val="200"/>
+                        </a:spcAft>
+                        <a:buNone/>
+                      </a:pPr>
+                      <a:r>
+                        <a:rPr sz="1100">
+                          <a:solidFill>
+                            <a:srgbClr val="111111">
+                              <a:alpha val="100000"/>
+                            </a:srgbClr>
+                          </a:solidFill>
+                          <a:latin typeface="Calibri"/>
+                          <a:cs typeface="Calibri"/>
+                        </a:rPr>
+                        <a:t>Decile 7</a:t>
+                      </a:r>
+                    </a:p>
+                  </a:txBody>
+                  <a:tcPr anchor="t" marB="0" marT="0" marR="0" marL="0">
+                    <a:lnL w="0" cmpd="sng" algn="ctr" cap="flat">
+                      <a:solidFill>
+                        <a:srgbClr val="FFFFFF">
+                          <a:alpha val="0"/>
+                        </a:srgbClr>
+                      </a:solidFill>
+                      <a:prstDash val="solid"/>
+                    </a:lnL>
+                    <a:lnR w="0" cmpd="sng" algn="ctr" cap="flat">
+                      <a:solidFill>
+                        <a:srgbClr val="FFFFFF">
+                          <a:alpha val="0"/>
+                        </a:srgbClr>
+                      </a:solidFill>
+                      <a:prstDash val="solid"/>
+                    </a:lnR>
+                    <a:lnT w="0" cmpd="sng" algn="ctr" cap="flat">
+                      <a:solidFill>
+                        <a:srgbClr val="FFFFFF">
+                          <a:alpha val="0"/>
+                        </a:srgbClr>
+                      </a:solidFill>
+                      <a:prstDash val="solid"/>
+                    </a:lnT>
+                    <a:lnB w="0" cmpd="sng" algn="ctr" cap="flat">
+                      <a:solidFill>
+                        <a:srgbClr val="FFFFFF">
+                          <a:alpha val="0"/>
+                        </a:srgbClr>
+                      </a:solidFill>
+                      <a:prstDash val="solid"/>
+                    </a:lnB>
+                  </a:tcPr>
+                </a:tc>
+              </a:tr>
+              <a:tr h="182880">
+                <a:tc>
+                  <a:txBody>
+                    <a:bodyPr/>
+                    <a:lstStyle/>
+                    <a:p>
+                      <a:pPr algn="l" marL="63500" marR="63500">
+                        <a:lnSpc>
+                          <a:spcPct val="100000"/>
+                        </a:lnSpc>
+                        <a:spcBef>
+                          <a:spcPts val="200"/>
+                        </a:spcBef>
+                        <a:spcAft>
+                          <a:spcPts val="200"/>
+                        </a:spcAft>
+                        <a:buNone/>
+                      </a:pPr>
+                      <a:r>
+                        <a:rPr sz="1100">
+                          <a:solidFill>
+                            <a:srgbClr val="111111">
+                              <a:alpha val="100000"/>
+                            </a:srgbClr>
+                          </a:solidFill>
+                          <a:latin typeface="Calibri"/>
+                          <a:cs typeface="Calibri"/>
+                        </a:rPr>
+                        <a:t>Crawley</a:t>
+                      </a:r>
+                    </a:p>
+                  </a:txBody>
+                  <a:tcPr anchor="t" marB="0" marT="0" marR="0" marL="0">
+                    <a:lnL w="0" cmpd="sng" algn="ctr" cap="flat">
+                      <a:solidFill>
+                        <a:srgbClr val="FFFFFF">
+                          <a:alpha val="0"/>
+                        </a:srgbClr>
+                      </a:solidFill>
+                      <a:prstDash val="solid"/>
+                    </a:lnL>
+                    <a:lnR w="0" cmpd="sng" algn="ctr" cap="flat">
+                      <a:solidFill>
+                        <a:srgbClr val="FFFFFF">
+                          <a:alpha val="0"/>
+                        </a:srgbClr>
+                      </a:solidFill>
+                      <a:prstDash val="solid"/>
+                    </a:lnR>
+                    <a:lnT w="0" cmpd="sng" algn="ctr" cap="flat">
+                      <a:solidFill>
+                        <a:srgbClr val="FFFFFF">
+                          <a:alpha val="0"/>
+                        </a:srgbClr>
+                      </a:solidFill>
+                      <a:prstDash val="solid"/>
+                    </a:lnT>
+                    <a:lnB w="0" cmpd="sng" algn="ctr" cap="flat">
+                      <a:solidFill>
+                        <a:srgbClr val="FFFFFF">
+                          <a:alpha val="0"/>
+                        </a:srgbClr>
+                      </a:solidFill>
+                      <a:prstDash val="solid"/>
+                    </a:lnB>
+                  </a:tcPr>
+                </a:tc>
+                <a:tc>
+                  <a:txBody>
+                    <a:bodyPr/>
+                    <a:lstStyle/>
+                    <a:p>
+                      <a:pPr algn="l" marL="63500" marR="63500">
+                        <a:lnSpc>
+                          <a:spcPct val="100000"/>
+                        </a:lnSpc>
+                        <a:spcBef>
+                          <a:spcPts val="200"/>
+                        </a:spcBef>
+                        <a:spcAft>
+                          <a:spcPts val="200"/>
+                        </a:spcAft>
+                        <a:buNone/>
+                      </a:pPr>
+                      <a:r>
+                        <a:rPr sz="1100">
+                          <a:solidFill>
+                            <a:srgbClr val="111111">
+                              <a:alpha val="100000"/>
+                            </a:srgbClr>
+                          </a:solidFill>
+                          <a:latin typeface="Calibri"/>
+                          <a:cs typeface="Calibri"/>
+                        </a:rPr>
+                        <a:t>9</a:t>
+                      </a:r>
+                    </a:p>
+                  </a:txBody>
+                  <a:tcPr anchor="t" marB="0" marT="0" marR="0" marL="0">
+                    <a:lnL w="0" cmpd="sng" algn="ctr" cap="flat">
+                      <a:solidFill>
+                        <a:srgbClr val="FFFFFF">
+                          <a:alpha val="0"/>
+                        </a:srgbClr>
+                      </a:solidFill>
+                      <a:prstDash val="solid"/>
+                    </a:lnL>
+                    <a:lnR w="0" cmpd="sng" algn="ctr" cap="flat">
+                      <a:solidFill>
+                        <a:srgbClr val="FFFFFF">
+                          <a:alpha val="0"/>
+                        </a:srgbClr>
+                      </a:solidFill>
+                      <a:prstDash val="solid"/>
+                    </a:lnR>
+                    <a:lnT w="0" cmpd="sng" algn="ctr" cap="flat">
+                      <a:solidFill>
+                        <a:srgbClr val="FFFFFF">
+                          <a:alpha val="0"/>
+                        </a:srgbClr>
+                      </a:solidFill>
+                      <a:prstDash val="solid"/>
+                    </a:lnT>
+                    <a:lnB w="0" cmpd="sng" algn="ctr" cap="flat">
+                      <a:solidFill>
+                        <a:srgbClr val="FFFFFF">
+                          <a:alpha val="0"/>
+                        </a:srgbClr>
+                      </a:solidFill>
+                      <a:prstDash val="solid"/>
+                    </a:lnB>
+                  </a:tcPr>
+                </a:tc>
+                <a:tc>
+                  <a:txBody>
+                    <a:bodyPr/>
+                    <a:lstStyle/>
+                    <a:p>
+                      <a:pPr algn="l" marL="63500" marR="63500">
+                        <a:lnSpc>
+                          <a:spcPct val="100000"/>
+                        </a:lnSpc>
+                        <a:spcBef>
+                          <a:spcPts val="200"/>
+                        </a:spcBef>
+                        <a:spcAft>
+                          <a:spcPts val="200"/>
+                        </a:spcAft>
+                        <a:buNone/>
+                      </a:pPr>
+                      <a:r>
+                        <a:rPr sz="1100">
+                          <a:solidFill>
+                            <a:srgbClr val="111111">
+                              <a:alpha val="100000"/>
+                            </a:srgbClr>
+                          </a:solidFill>
+                          <a:latin typeface="Calibri"/>
+                          <a:cs typeface="Calibri"/>
+                        </a:rPr>
+                        <a:t>8.0</a:t>
+                      </a:r>
+                    </a:p>
+                  </a:txBody>
+                  <a:tcPr anchor="t" marB="0" marT="0" marR="0" marL="0">
+                    <a:lnL w="0" cmpd="sng" algn="ctr" cap="flat">
+                      <a:solidFill>
+                        <a:srgbClr val="FFFFFF">
+                          <a:alpha val="0"/>
+                        </a:srgbClr>
+                      </a:solidFill>
+                      <a:prstDash val="solid"/>
+                    </a:lnL>
+                    <a:lnR w="0" cmpd="sng" algn="ctr" cap="flat">
+                      <a:solidFill>
+                        <a:srgbClr val="FFFFFF">
+                          <a:alpha val="0"/>
+                        </a:srgbClr>
+                      </a:solidFill>
+                      <a:prstDash val="solid"/>
+                    </a:lnR>
+                    <a:lnT w="0" cmpd="sng" algn="ctr" cap="flat">
+                      <a:solidFill>
+                        <a:srgbClr val="FFFFFF">
+                          <a:alpha val="0"/>
+                        </a:srgbClr>
+                      </a:solidFill>
+                      <a:prstDash val="solid"/>
+                    </a:lnT>
+                    <a:lnB w="0" cmpd="sng" algn="ctr" cap="flat">
+                      <a:solidFill>
+                        <a:srgbClr val="FFFFFF">
+                          <a:alpha val="0"/>
+                        </a:srgbClr>
+                      </a:solidFill>
+                      <a:prstDash val="solid"/>
+                    </a:lnB>
+                  </a:tcPr>
+                </a:tc>
+                <a:tc>
+                  <a:txBody>
+                    <a:bodyPr/>
+                    <a:lstStyle/>
+                    <a:p>
+                      <a:pPr algn="l" marL="63500" marR="63500">
+                        <a:lnSpc>
+                          <a:spcPct val="100000"/>
+                        </a:lnSpc>
+                        <a:spcBef>
+                          <a:spcPts val="200"/>
+                        </a:spcBef>
+                        <a:spcAft>
+                          <a:spcPts val="200"/>
+                        </a:spcAft>
+                        <a:buNone/>
+                      </a:pPr>
+                      <a:r>
+                        <a:rPr sz="1100">
+                          <a:solidFill>
+                            <a:srgbClr val="111111">
+                              <a:alpha val="100000"/>
+                            </a:srgbClr>
+                          </a:solidFill>
+                          <a:latin typeface="Calibri"/>
+                          <a:cs typeface="Calibri"/>
+                        </a:rPr>
+                        <a:t>221st</a:t>
                       </a:r>
                     </a:p>
                   </a:txBody>
@@ -15763,7 +16427,7 @@
                           <a:latin typeface="Calibri"/>
                           <a:cs typeface="Calibri"/>
                         </a:rPr>
-                        <a:t>Chichester</a:t>
+                        <a:t>Horsham</a:t>
                       </a:r>
                     </a:p>
                   </a:txBody>
@@ -15829,7 +16493,7 @@
                           <a:latin typeface="Calibri"/>
                           <a:cs typeface="Calibri"/>
                         </a:rPr>
-                        <a:t>8</a:t>
+                        <a:t>7</a:t>
                       </a:r>
                     </a:p>
                   </a:txBody>
@@ -15895,7 +16559,7 @@
                           <a:latin typeface="Calibri"/>
                           <a:cs typeface="Calibri"/>
                         </a:rPr>
-                        <a:t>6.6</a:t>
+                        <a:t>4.9</a:t>
                       </a:r>
                     </a:p>
                   </a:txBody>
@@ -15961,7 +16625,7 @@
                           <a:latin typeface="Calibri"/>
                           <a:cs typeface="Calibri"/>
                         </a:rPr>
-                        <a:t>255th</a:t>
+                        <a:t>277th</a:t>
                       </a:r>
                     </a:p>
                   </a:txBody>
@@ -16095,7 +16759,7 @@
                           <a:latin typeface="Calibri"/>
                           <a:cs typeface="Calibri"/>
                         </a:rPr>
-                        <a:t>Crawley</a:t>
+                        <a:t>Mid Sussex</a:t>
                       </a:r>
                     </a:p>
                   </a:txBody>
@@ -16161,7 +16825,7 @@
                           <a:latin typeface="Calibri"/>
                           <a:cs typeface="Calibri"/>
                         </a:rPr>
-                        <a:t>12</a:t>
+                        <a:t>1</a:t>
                       </a:r>
                     </a:p>
                   </a:txBody>
@@ -16227,7 +16891,7 @@
                           <a:latin typeface="Calibri"/>
                           <a:cs typeface="Calibri"/>
                         </a:rPr>
-                        <a:t>10.7</a:t>
+                        <a:t>0.7</a:t>
                       </a:r>
                     </a:p>
                   </a:txBody>
@@ -16293,671 +16957,7 @@
                           <a:latin typeface="Calibri"/>
                           <a:cs typeface="Calibri"/>
                         </a:rPr>
-                        <a:t>177th</a:t>
-                      </a:r>
-                    </a:p>
-                  </a:txBody>
-                  <a:tcPr anchor="t" marB="0" marT="0" marR="0" marL="0">
-                    <a:lnL w="0" cmpd="sng" algn="ctr" cap="flat">
-                      <a:solidFill>
-                        <a:srgbClr val="FFFFFF">
-                          <a:alpha val="0"/>
-                        </a:srgbClr>
-                      </a:solidFill>
-                      <a:prstDash val="solid"/>
-                    </a:lnL>
-                    <a:lnR w="0" cmpd="sng" algn="ctr" cap="flat">
-                      <a:solidFill>
-                        <a:srgbClr val="FFFFFF">
-                          <a:alpha val="0"/>
-                        </a:srgbClr>
-                      </a:solidFill>
-                      <a:prstDash val="solid"/>
-                    </a:lnR>
-                    <a:lnT w="0" cmpd="sng" algn="ctr" cap="flat">
-                      <a:solidFill>
-                        <a:srgbClr val="FFFFFF">
-                          <a:alpha val="0"/>
-                        </a:srgbClr>
-                      </a:solidFill>
-                      <a:prstDash val="solid"/>
-                    </a:lnT>
-                    <a:lnB w="0" cmpd="sng" algn="ctr" cap="flat">
-                      <a:solidFill>
-                        <a:srgbClr val="FFFFFF">
-                          <a:alpha val="0"/>
-                        </a:srgbClr>
-                      </a:solidFill>
-                      <a:prstDash val="solid"/>
-                    </a:lnB>
-                  </a:tcPr>
-                </a:tc>
-                <a:tc>
-                  <a:txBody>
-                    <a:bodyPr/>
-                    <a:lstStyle/>
-                    <a:p>
-                      <a:pPr algn="l" marL="63500" marR="63500">
-                        <a:lnSpc>
-                          <a:spcPct val="100000"/>
-                        </a:lnSpc>
-                        <a:spcBef>
-                          <a:spcPts val="200"/>
-                        </a:spcBef>
-                        <a:spcAft>
-                          <a:spcPts val="200"/>
-                        </a:spcAft>
-                        <a:buNone/>
-                      </a:pPr>
-                      <a:r>
-                        <a:rPr sz="1100">
-                          <a:solidFill>
-                            <a:srgbClr val="111111">
-                              <a:alpha val="100000"/>
-                            </a:srgbClr>
-                          </a:solidFill>
-                          <a:latin typeface="Calibri"/>
-                          <a:cs typeface="Calibri"/>
-                        </a:rPr>
-                        <a:t>Decile 6</a:t>
-                      </a:r>
-                    </a:p>
-                  </a:txBody>
-                  <a:tcPr anchor="t" marB="0" marT="0" marR="0" marL="0">
-                    <a:lnL w="0" cmpd="sng" algn="ctr" cap="flat">
-                      <a:solidFill>
-                        <a:srgbClr val="FFFFFF">
-                          <a:alpha val="0"/>
-                        </a:srgbClr>
-                      </a:solidFill>
-                      <a:prstDash val="solid"/>
-                    </a:lnL>
-                    <a:lnR w="0" cmpd="sng" algn="ctr" cap="flat">
-                      <a:solidFill>
-                        <a:srgbClr val="FFFFFF">
-                          <a:alpha val="0"/>
-                        </a:srgbClr>
-                      </a:solidFill>
-                      <a:prstDash val="solid"/>
-                    </a:lnR>
-                    <a:lnT w="0" cmpd="sng" algn="ctr" cap="flat">
-                      <a:solidFill>
-                        <a:srgbClr val="FFFFFF">
-                          <a:alpha val="0"/>
-                        </a:srgbClr>
-                      </a:solidFill>
-                      <a:prstDash val="solid"/>
-                    </a:lnT>
-                    <a:lnB w="0" cmpd="sng" algn="ctr" cap="flat">
-                      <a:solidFill>
-                        <a:srgbClr val="FFFFFF">
-                          <a:alpha val="0"/>
-                        </a:srgbClr>
-                      </a:solidFill>
-                      <a:prstDash val="solid"/>
-                    </a:lnB>
-                  </a:tcPr>
-                </a:tc>
-              </a:tr>
-              <a:tr h="182880">
-                <a:tc>
-                  <a:txBody>
-                    <a:bodyPr/>
-                    <a:lstStyle/>
-                    <a:p>
-                      <a:pPr algn="l" marL="63500" marR="63500">
-                        <a:lnSpc>
-                          <a:spcPct val="100000"/>
-                        </a:lnSpc>
-                        <a:spcBef>
-                          <a:spcPts val="200"/>
-                        </a:spcBef>
-                        <a:spcAft>
-                          <a:spcPts val="200"/>
-                        </a:spcAft>
-                        <a:buNone/>
-                      </a:pPr>
-                      <a:r>
-                        <a:rPr sz="1100">
-                          <a:solidFill>
-                            <a:srgbClr val="111111">
-                              <a:alpha val="100000"/>
-                            </a:srgbClr>
-                          </a:solidFill>
-                          <a:latin typeface="Calibri"/>
-                          <a:cs typeface="Calibri"/>
-                        </a:rPr>
-                        <a:t>Horsham</a:t>
-                      </a:r>
-                    </a:p>
-                  </a:txBody>
-                  <a:tcPr anchor="t" marB="0" marT="0" marR="0" marL="0">
-                    <a:lnL w="0" cmpd="sng" algn="ctr" cap="flat">
-                      <a:solidFill>
-                        <a:srgbClr val="FFFFFF">
-                          <a:alpha val="0"/>
-                        </a:srgbClr>
-                      </a:solidFill>
-                      <a:prstDash val="solid"/>
-                    </a:lnL>
-                    <a:lnR w="0" cmpd="sng" algn="ctr" cap="flat">
-                      <a:solidFill>
-                        <a:srgbClr val="FFFFFF">
-                          <a:alpha val="0"/>
-                        </a:srgbClr>
-                      </a:solidFill>
-                      <a:prstDash val="solid"/>
-                    </a:lnR>
-                    <a:lnT w="0" cmpd="sng" algn="ctr" cap="flat">
-                      <a:solidFill>
-                        <a:srgbClr val="FFFFFF">
-                          <a:alpha val="0"/>
-                        </a:srgbClr>
-                      </a:solidFill>
-                      <a:prstDash val="solid"/>
-                    </a:lnT>
-                    <a:lnB w="0" cmpd="sng" algn="ctr" cap="flat">
-                      <a:solidFill>
-                        <a:srgbClr val="FFFFFF">
-                          <a:alpha val="0"/>
-                        </a:srgbClr>
-                      </a:solidFill>
-                      <a:prstDash val="solid"/>
-                    </a:lnB>
-                  </a:tcPr>
-                </a:tc>
-                <a:tc>
-                  <a:txBody>
-                    <a:bodyPr/>
-                    <a:lstStyle/>
-                    <a:p>
-                      <a:pPr algn="l" marL="63500" marR="63500">
-                        <a:lnSpc>
-                          <a:spcPct val="100000"/>
-                        </a:lnSpc>
-                        <a:spcBef>
-                          <a:spcPts val="200"/>
-                        </a:spcBef>
-                        <a:spcAft>
-                          <a:spcPts val="200"/>
-                        </a:spcAft>
-                        <a:buNone/>
-                      </a:pPr>
-                      <a:r>
-                        <a:rPr sz="1100">
-                          <a:solidFill>
-                            <a:srgbClr val="111111">
-                              <a:alpha val="100000"/>
-                            </a:srgbClr>
-                          </a:solidFill>
-                          <a:latin typeface="Calibri"/>
-                          <a:cs typeface="Calibri"/>
-                        </a:rPr>
-                        <a:t>7</a:t>
-                      </a:r>
-                    </a:p>
-                  </a:txBody>
-                  <a:tcPr anchor="t" marB="0" marT="0" marR="0" marL="0">
-                    <a:lnL w="0" cmpd="sng" algn="ctr" cap="flat">
-                      <a:solidFill>
-                        <a:srgbClr val="FFFFFF">
-                          <a:alpha val="0"/>
-                        </a:srgbClr>
-                      </a:solidFill>
-                      <a:prstDash val="solid"/>
-                    </a:lnL>
-                    <a:lnR w="0" cmpd="sng" algn="ctr" cap="flat">
-                      <a:solidFill>
-                        <a:srgbClr val="FFFFFF">
-                          <a:alpha val="0"/>
-                        </a:srgbClr>
-                      </a:solidFill>
-                      <a:prstDash val="solid"/>
-                    </a:lnR>
-                    <a:lnT w="0" cmpd="sng" algn="ctr" cap="flat">
-                      <a:solidFill>
-                        <a:srgbClr val="FFFFFF">
-                          <a:alpha val="0"/>
-                        </a:srgbClr>
-                      </a:solidFill>
-                      <a:prstDash val="solid"/>
-                    </a:lnT>
-                    <a:lnB w="0" cmpd="sng" algn="ctr" cap="flat">
-                      <a:solidFill>
-                        <a:srgbClr val="FFFFFF">
-                          <a:alpha val="0"/>
-                        </a:srgbClr>
-                      </a:solidFill>
-                      <a:prstDash val="solid"/>
-                    </a:lnB>
-                  </a:tcPr>
-                </a:tc>
-                <a:tc>
-                  <a:txBody>
-                    <a:bodyPr/>
-                    <a:lstStyle/>
-                    <a:p>
-                      <a:pPr algn="l" marL="63500" marR="63500">
-                        <a:lnSpc>
-                          <a:spcPct val="100000"/>
-                        </a:lnSpc>
-                        <a:spcBef>
-                          <a:spcPts val="200"/>
-                        </a:spcBef>
-                        <a:spcAft>
-                          <a:spcPts val="200"/>
-                        </a:spcAft>
-                        <a:buNone/>
-                      </a:pPr>
-                      <a:r>
-                        <a:rPr sz="1100">
-                          <a:solidFill>
-                            <a:srgbClr val="111111">
-                              <a:alpha val="100000"/>
-                            </a:srgbClr>
-                          </a:solidFill>
-                          <a:latin typeface="Calibri"/>
-                          <a:cs typeface="Calibri"/>
-                        </a:rPr>
-                        <a:t>4.9</a:t>
-                      </a:r>
-                    </a:p>
-                  </a:txBody>
-                  <a:tcPr anchor="t" marB="0" marT="0" marR="0" marL="0">
-                    <a:lnL w="0" cmpd="sng" algn="ctr" cap="flat">
-                      <a:solidFill>
-                        <a:srgbClr val="FFFFFF">
-                          <a:alpha val="0"/>
-                        </a:srgbClr>
-                      </a:solidFill>
-                      <a:prstDash val="solid"/>
-                    </a:lnL>
-                    <a:lnR w="0" cmpd="sng" algn="ctr" cap="flat">
-                      <a:solidFill>
-                        <a:srgbClr val="FFFFFF">
-                          <a:alpha val="0"/>
-                        </a:srgbClr>
-                      </a:solidFill>
-                      <a:prstDash val="solid"/>
-                    </a:lnR>
-                    <a:lnT w="0" cmpd="sng" algn="ctr" cap="flat">
-                      <a:solidFill>
-                        <a:srgbClr val="FFFFFF">
-                          <a:alpha val="0"/>
-                        </a:srgbClr>
-                      </a:solidFill>
-                      <a:prstDash val="solid"/>
-                    </a:lnT>
-                    <a:lnB w="0" cmpd="sng" algn="ctr" cap="flat">
-                      <a:solidFill>
-                        <a:srgbClr val="FFFFFF">
-                          <a:alpha val="0"/>
-                        </a:srgbClr>
-                      </a:solidFill>
-                      <a:prstDash val="solid"/>
-                    </a:lnB>
-                  </a:tcPr>
-                </a:tc>
-                <a:tc>
-                  <a:txBody>
-                    <a:bodyPr/>
-                    <a:lstStyle/>
-                    <a:p>
-                      <a:pPr algn="l" marL="63500" marR="63500">
-                        <a:lnSpc>
-                          <a:spcPct val="100000"/>
-                        </a:lnSpc>
-                        <a:spcBef>
-                          <a:spcPts val="200"/>
-                        </a:spcBef>
-                        <a:spcAft>
-                          <a:spcPts val="200"/>
-                        </a:spcAft>
-                        <a:buNone/>
-                      </a:pPr>
-                      <a:r>
-                        <a:rPr sz="1100">
-                          <a:solidFill>
-                            <a:srgbClr val="111111">
-                              <a:alpha val="100000"/>
-                            </a:srgbClr>
-                          </a:solidFill>
-                          <a:latin typeface="Calibri"/>
-                          <a:cs typeface="Calibri"/>
-                        </a:rPr>
-                        <a:t>283rd</a:t>
-                      </a:r>
-                    </a:p>
-                  </a:txBody>
-                  <a:tcPr anchor="t" marB="0" marT="0" marR="0" marL="0">
-                    <a:lnL w="0" cmpd="sng" algn="ctr" cap="flat">
-                      <a:solidFill>
-                        <a:srgbClr val="FFFFFF">
-                          <a:alpha val="0"/>
-                        </a:srgbClr>
-                      </a:solidFill>
-                      <a:prstDash val="solid"/>
-                    </a:lnL>
-                    <a:lnR w="0" cmpd="sng" algn="ctr" cap="flat">
-                      <a:solidFill>
-                        <a:srgbClr val="FFFFFF">
-                          <a:alpha val="0"/>
-                        </a:srgbClr>
-                      </a:solidFill>
-                      <a:prstDash val="solid"/>
-                    </a:lnR>
-                    <a:lnT w="0" cmpd="sng" algn="ctr" cap="flat">
-                      <a:solidFill>
-                        <a:srgbClr val="FFFFFF">
-                          <a:alpha val="0"/>
-                        </a:srgbClr>
-                      </a:solidFill>
-                      <a:prstDash val="solid"/>
-                    </a:lnT>
-                    <a:lnB w="0" cmpd="sng" algn="ctr" cap="flat">
-                      <a:solidFill>
-                        <a:srgbClr val="FFFFFF">
-                          <a:alpha val="0"/>
-                        </a:srgbClr>
-                      </a:solidFill>
-                      <a:prstDash val="solid"/>
-                    </a:lnB>
-                  </a:tcPr>
-                </a:tc>
-                <a:tc>
-                  <a:txBody>
-                    <a:bodyPr/>
-                    <a:lstStyle/>
-                    <a:p>
-                      <a:pPr algn="l" marL="63500" marR="63500">
-                        <a:lnSpc>
-                          <a:spcPct val="100000"/>
-                        </a:lnSpc>
-                        <a:spcBef>
-                          <a:spcPts val="200"/>
-                        </a:spcBef>
-                        <a:spcAft>
-                          <a:spcPts val="200"/>
-                        </a:spcAft>
-                        <a:buNone/>
-                      </a:pPr>
-                      <a:r>
-                        <a:rPr sz="1100">
-                          <a:solidFill>
-                            <a:srgbClr val="111111">
-                              <a:alpha val="100000"/>
-                            </a:srgbClr>
-                          </a:solidFill>
-                          <a:latin typeface="Calibri"/>
-                          <a:cs typeface="Calibri"/>
-                        </a:rPr>
-                        <a:t>Decile 9</a:t>
-                      </a:r>
-                    </a:p>
-                  </a:txBody>
-                  <a:tcPr anchor="t" marB="0" marT="0" marR="0" marL="0">
-                    <a:lnL w="0" cmpd="sng" algn="ctr" cap="flat">
-                      <a:solidFill>
-                        <a:srgbClr val="FFFFFF">
-                          <a:alpha val="0"/>
-                        </a:srgbClr>
-                      </a:solidFill>
-                      <a:prstDash val="solid"/>
-                    </a:lnL>
-                    <a:lnR w="0" cmpd="sng" algn="ctr" cap="flat">
-                      <a:solidFill>
-                        <a:srgbClr val="FFFFFF">
-                          <a:alpha val="0"/>
-                        </a:srgbClr>
-                      </a:solidFill>
-                      <a:prstDash val="solid"/>
-                    </a:lnR>
-                    <a:lnT w="0" cmpd="sng" algn="ctr" cap="flat">
-                      <a:solidFill>
-                        <a:srgbClr val="FFFFFF">
-                          <a:alpha val="0"/>
-                        </a:srgbClr>
-                      </a:solidFill>
-                      <a:prstDash val="solid"/>
-                    </a:lnT>
-                    <a:lnB w="0" cmpd="sng" algn="ctr" cap="flat">
-                      <a:solidFill>
-                        <a:srgbClr val="FFFFFF">
-                          <a:alpha val="0"/>
-                        </a:srgbClr>
-                      </a:solidFill>
-                      <a:prstDash val="solid"/>
-                    </a:lnB>
-                  </a:tcPr>
-                </a:tc>
-              </a:tr>
-              <a:tr h="182880">
-                <a:tc>
-                  <a:txBody>
-                    <a:bodyPr/>
-                    <a:lstStyle/>
-                    <a:p>
-                      <a:pPr algn="l" marL="63500" marR="63500">
-                        <a:lnSpc>
-                          <a:spcPct val="100000"/>
-                        </a:lnSpc>
-                        <a:spcBef>
-                          <a:spcPts val="200"/>
-                        </a:spcBef>
-                        <a:spcAft>
-                          <a:spcPts val="200"/>
-                        </a:spcAft>
-                        <a:buNone/>
-                      </a:pPr>
-                      <a:r>
-                        <a:rPr sz="1100">
-                          <a:solidFill>
-                            <a:srgbClr val="111111">
-                              <a:alpha val="100000"/>
-                            </a:srgbClr>
-                          </a:solidFill>
-                          <a:latin typeface="Calibri"/>
-                          <a:cs typeface="Calibri"/>
-                        </a:rPr>
-                        <a:t>Mid Sussex</a:t>
-                      </a:r>
-                    </a:p>
-                  </a:txBody>
-                  <a:tcPr anchor="t" marB="0" marT="0" marR="0" marL="0">
-                    <a:lnL w="0" cmpd="sng" algn="ctr" cap="flat">
-                      <a:solidFill>
-                        <a:srgbClr val="FFFFFF">
-                          <a:alpha val="0"/>
-                        </a:srgbClr>
-                      </a:solidFill>
-                      <a:prstDash val="solid"/>
-                    </a:lnL>
-                    <a:lnR w="0" cmpd="sng" algn="ctr" cap="flat">
-                      <a:solidFill>
-                        <a:srgbClr val="FFFFFF">
-                          <a:alpha val="0"/>
-                        </a:srgbClr>
-                      </a:solidFill>
-                      <a:prstDash val="solid"/>
-                    </a:lnR>
-                    <a:lnT w="0" cmpd="sng" algn="ctr" cap="flat">
-                      <a:solidFill>
-                        <a:srgbClr val="FFFFFF">
-                          <a:alpha val="0"/>
-                        </a:srgbClr>
-                      </a:solidFill>
-                      <a:prstDash val="solid"/>
-                    </a:lnT>
-                    <a:lnB w="0" cmpd="sng" algn="ctr" cap="flat">
-                      <a:solidFill>
-                        <a:srgbClr val="FFFFFF">
-                          <a:alpha val="0"/>
-                        </a:srgbClr>
-                      </a:solidFill>
-                      <a:prstDash val="solid"/>
-                    </a:lnB>
-                  </a:tcPr>
-                </a:tc>
-                <a:tc>
-                  <a:txBody>
-                    <a:bodyPr/>
-                    <a:lstStyle/>
-                    <a:p>
-                      <a:pPr algn="l" marL="63500" marR="63500">
-                        <a:lnSpc>
-                          <a:spcPct val="100000"/>
-                        </a:lnSpc>
-                        <a:spcBef>
-                          <a:spcPts val="200"/>
-                        </a:spcBef>
-                        <a:spcAft>
-                          <a:spcPts val="200"/>
-                        </a:spcAft>
-                        <a:buNone/>
-                      </a:pPr>
-                      <a:r>
-                        <a:rPr sz="1100">
-                          <a:solidFill>
-                            <a:srgbClr val="111111">
-                              <a:alpha val="100000"/>
-                            </a:srgbClr>
-                          </a:solidFill>
-                          <a:latin typeface="Calibri"/>
-                          <a:cs typeface="Calibri"/>
-                        </a:rPr>
-                        <a:t>4</a:t>
-                      </a:r>
-                    </a:p>
-                  </a:txBody>
-                  <a:tcPr anchor="t" marB="0" marT="0" marR="0" marL="0">
-                    <a:lnL w="0" cmpd="sng" algn="ctr" cap="flat">
-                      <a:solidFill>
-                        <a:srgbClr val="FFFFFF">
-                          <a:alpha val="0"/>
-                        </a:srgbClr>
-                      </a:solidFill>
-                      <a:prstDash val="solid"/>
-                    </a:lnL>
-                    <a:lnR w="0" cmpd="sng" algn="ctr" cap="flat">
-                      <a:solidFill>
-                        <a:srgbClr val="FFFFFF">
-                          <a:alpha val="0"/>
-                        </a:srgbClr>
-                      </a:solidFill>
-                      <a:prstDash val="solid"/>
-                    </a:lnR>
-                    <a:lnT w="0" cmpd="sng" algn="ctr" cap="flat">
-                      <a:solidFill>
-                        <a:srgbClr val="FFFFFF">
-                          <a:alpha val="0"/>
-                        </a:srgbClr>
-                      </a:solidFill>
-                      <a:prstDash val="solid"/>
-                    </a:lnT>
-                    <a:lnB w="0" cmpd="sng" algn="ctr" cap="flat">
-                      <a:solidFill>
-                        <a:srgbClr val="FFFFFF">
-                          <a:alpha val="0"/>
-                        </a:srgbClr>
-                      </a:solidFill>
-                      <a:prstDash val="solid"/>
-                    </a:lnB>
-                  </a:tcPr>
-                </a:tc>
-                <a:tc>
-                  <a:txBody>
-                    <a:bodyPr/>
-                    <a:lstStyle/>
-                    <a:p>
-                      <a:pPr algn="l" marL="63500" marR="63500">
-                        <a:lnSpc>
-                          <a:spcPct val="100000"/>
-                        </a:lnSpc>
-                        <a:spcBef>
-                          <a:spcPts val="200"/>
-                        </a:spcBef>
-                        <a:spcAft>
-                          <a:spcPts val="200"/>
-                        </a:spcAft>
-                        <a:buNone/>
-                      </a:pPr>
-                      <a:r>
-                        <a:rPr sz="1100">
-                          <a:solidFill>
-                            <a:srgbClr val="111111">
-                              <a:alpha val="100000"/>
-                            </a:srgbClr>
-                          </a:solidFill>
-                          <a:latin typeface="Calibri"/>
-                          <a:cs typeface="Calibri"/>
-                        </a:rPr>
-                        <a:t>2.6</a:t>
-                      </a:r>
-                    </a:p>
-                  </a:txBody>
-                  <a:tcPr anchor="t" marB="0" marT="0" marR="0" marL="0">
-                    <a:lnL w="0" cmpd="sng" algn="ctr" cap="flat">
-                      <a:solidFill>
-                        <a:srgbClr val="FFFFFF">
-                          <a:alpha val="0"/>
-                        </a:srgbClr>
-                      </a:solidFill>
-                      <a:prstDash val="solid"/>
-                    </a:lnL>
-                    <a:lnR w="0" cmpd="sng" algn="ctr" cap="flat">
-                      <a:solidFill>
-                        <a:srgbClr val="FFFFFF">
-                          <a:alpha val="0"/>
-                        </a:srgbClr>
-                      </a:solidFill>
-                      <a:prstDash val="solid"/>
-                    </a:lnR>
-                    <a:lnT w="0" cmpd="sng" algn="ctr" cap="flat">
-                      <a:solidFill>
-                        <a:srgbClr val="FFFFFF">
-                          <a:alpha val="0"/>
-                        </a:srgbClr>
-                      </a:solidFill>
-                      <a:prstDash val="solid"/>
-                    </a:lnT>
-                    <a:lnB w="0" cmpd="sng" algn="ctr" cap="flat">
-                      <a:solidFill>
-                        <a:srgbClr val="FFFFFF">
-                          <a:alpha val="0"/>
-                        </a:srgbClr>
-                      </a:solidFill>
-                      <a:prstDash val="solid"/>
-                    </a:lnB>
-                  </a:tcPr>
-                </a:tc>
-                <a:tc>
-                  <a:txBody>
-                    <a:bodyPr/>
-                    <a:lstStyle/>
-                    <a:p>
-                      <a:pPr algn="l" marL="63500" marR="63500">
-                        <a:lnSpc>
-                          <a:spcPct val="100000"/>
-                        </a:lnSpc>
-                        <a:spcBef>
-                          <a:spcPts val="200"/>
-                        </a:spcBef>
-                        <a:spcAft>
-                          <a:spcPts val="200"/>
-                        </a:spcAft>
-                        <a:buNone/>
-                      </a:pPr>
-                      <a:r>
-                        <a:rPr sz="1100">
-                          <a:solidFill>
-                            <a:srgbClr val="111111">
-                              <a:alpha val="100000"/>
-                            </a:srgbClr>
-                          </a:solidFill>
-                          <a:latin typeface="Calibri"/>
-                          <a:cs typeface="Calibri"/>
-                        </a:rPr>
-                        <a:t>307th</a:t>
+                        <a:t>314th</a:t>
                       </a:r>
                     </a:p>
                   </a:txBody>
@@ -17158,7 +17158,7 @@
                           <a:latin typeface="Calibri"/>
                           <a:cs typeface="Calibri"/>
                         </a:rPr>
-                        <a:t>2</a:t>
+                        <a:t>1</a:t>
                       </a:r>
                     </a:p>
                   </a:txBody>
@@ -17224,7 +17224,7 @@
                           <a:latin typeface="Calibri"/>
                           <a:cs typeface="Calibri"/>
                         </a:rPr>
-                        <a:t>1.8</a:t>
+                        <a:t>0.9</a:t>
                       </a:r>
                     </a:p>
                   </a:txBody>
@@ -17290,7 +17290,7 @@
                           <a:latin typeface="Calibri"/>
                           <a:cs typeface="Calibri"/>
                         </a:rPr>
-                        <a:t>311th</a:t>
+                        <a:t>313th</a:t>
                       </a:r>
                     </a:p>
                   </a:txBody>
@@ -17491,7 +17491,7 @@
                           <a:latin typeface="Calibri"/>
                           <a:cs typeface="Calibri"/>
                         </a:rPr>
-                        <a:t>53</a:t>
+                        <a:t>43</a:t>
                       </a:r>
                     </a:p>
                   </a:txBody>
@@ -17557,7 +17557,7 @@
                           <a:latin typeface="Calibri"/>
                           <a:cs typeface="Calibri"/>
                         </a:rPr>
-                        <a:t>6.1</a:t>
+                        <a:t>5.0</a:t>
                       </a:r>
                     </a:p>
                   </a:txBody>
@@ -17823,7 +17823,7 @@
                           <a:latin typeface="Calibri"/>
                           <a:cs typeface="Calibri"/>
                         </a:rPr>
-                        <a:t>12,374</a:t>
+                        <a:t>12,639</a:t>
                       </a:r>
                     </a:p>
                   </a:txBody>
@@ -17889,7 +17889,7 @@
                           <a:latin typeface="Calibri"/>
                           <a:cs typeface="Calibri"/>
                         </a:rPr>
-                        <a:t>22.0</a:t>
+                        <a:t>22.5</a:t>
                       </a:r>
                     </a:p>
                   </a:txBody>
@@ -18155,7 +18155,7 @@
                           <a:latin typeface="Calibri"/>
                           <a:cs typeface="Calibri"/>
                         </a:rPr>
-                        <a:t>1,099</a:t>
+                        <a:t>1,077</a:t>
                       </a:r>
                     </a:p>
                   </a:txBody>
@@ -18221,7 +18221,7 @@
                           <a:latin typeface="Calibri"/>
                           <a:cs typeface="Calibri"/>
                         </a:rPr>
-                        <a:t>12.0</a:t>
+                        <a:t>11.7</a:t>
                       </a:r>
                     </a:p>
                   </a:txBody>
@@ -18444,7 +18444,7 @@
           <a:p>
             <a:r>
               <a:rPr/>
-              <a:t>Pack date: 24 May 2021</a:t>
+              <a:t>Pack date: 25 May 2021</a:t>
             </a:r>
           </a:p>
         </p:txBody>
@@ -18602,7 +18602,7 @@
           <a:p>
             <a:r>
               <a:rPr/>
-              <a:t>Pack date: 24 May 2021</a:t>
+              <a:t>Pack date: 25 May 2021</a:t>
             </a:r>
           </a:p>
         </p:txBody>
@@ -18760,7 +18760,7 @@
           <a:p>
             <a:r>
               <a:rPr/>
-              <a:t>Pack date: 24 May 2021</a:t>
+              <a:t>Pack date: 25 May 2021</a:t>
             </a:r>
           </a:p>
         </p:txBody>
@@ -18918,7 +18918,7 @@
           <a:p>
             <a:r>
               <a:rPr/>
-              <a:t>Pack date: 24 May 2021</a:t>
+              <a:t>Pack date: 25 May 2021</a:t>
             </a:r>
           </a:p>
         </p:txBody>
@@ -19076,7 +19076,7 @@
           <a:p>
             <a:r>
               <a:rPr/>
-              <a:t>Pack date: 24 May 2021</a:t>
+              <a:t>Pack date: 25 May 2021</a:t>
             </a:r>
           </a:p>
         </p:txBody>
@@ -19265,7 +19265,7 @@
           <a:p>
             <a:r>
               <a:rPr/>
-              <a:t>Pack date: 24 May 2021</a:t>
+              <a:t>Pack date: 25 May 2021</a:t>
             </a:r>
           </a:p>
         </p:txBody>
@@ -19423,7 +19423,7 @@
           <a:p>
             <a:r>
               <a:rPr/>
-              <a:t>Pack date: 24 May 2021</a:t>
+              <a:t>Pack date: 25 May 2021</a:t>
             </a:r>
           </a:p>
         </p:txBody>
@@ -19581,7 +19581,7 @@
           <a:p>
             <a:r>
               <a:rPr/>
-              <a:t>Pack date: 24 May 2021</a:t>
+              <a:t>Pack date: 25 May 2021</a:t>
             </a:r>
           </a:p>
         </p:txBody>
@@ -19739,7 +19739,7 @@
           <a:p>
             <a:r>
               <a:rPr/>
-              <a:t>Pack date: 24 May 2021</a:t>
+              <a:t>Pack date: 25 May 2021</a:t>
             </a:r>
           </a:p>
         </p:txBody>
@@ -19897,7 +19897,7 @@
           <a:p>
             <a:r>
               <a:rPr/>
-              <a:t>Pack date: 24 May 2021</a:t>
+              <a:t>Pack date: 25 May 2021</a:t>
             </a:r>
           </a:p>
         </p:txBody>
@@ -20029,7 +20029,7 @@
           <a:p>
             <a:r>
               <a:rPr/>
-              <a:t>Pack date: 24 May 2021</a:t>
+              <a:t>Pack date: 25 May 2021</a:t>
             </a:r>
           </a:p>
         </p:txBody>
@@ -20161,7 +20161,7 @@
           <a:p>
             <a:r>
               <a:rPr/>
-              <a:t>Pack date: 24 May 2021</a:t>
+              <a:t>Pack date: 25 May 2021</a:t>
             </a:r>
           </a:p>
         </p:txBody>
@@ -20293,7 +20293,7 @@
           <a:p>
             <a:r>
               <a:rPr/>
-              <a:t>Pack date: 24 May 2021</a:t>
+              <a:t>Pack date: 25 May 2021</a:t>
             </a:r>
           </a:p>
         </p:txBody>
@@ -20425,7 +20425,7 @@
           <a:p>
             <a:r>
               <a:rPr/>
-              <a:t>Pack date: 24 May 2021</a:t>
+              <a:t>Pack date: 25 May 2021</a:t>
             </a:r>
           </a:p>
         </p:txBody>
@@ -20557,7 +20557,7 @@
           <a:p>
             <a:r>
               <a:rPr/>
-              <a:t>Pack date: 24 May 2021</a:t>
+              <a:t>Pack date: 25 May 2021</a:t>
             </a:r>
           </a:p>
         </p:txBody>
@@ -20689,7 +20689,7 @@
           <a:p>
             <a:r>
               <a:rPr/>
-              <a:t>Pack date: 24 May 2021</a:t>
+              <a:t>Pack date: 25 May 2021</a:t>
             </a:r>
           </a:p>
         </p:txBody>

</xml_diff>

<commit_message>
vaccine update part 2
</commit_message>
<xml_diff>
--- a/Latest_West_Sussex_C19_slide_deck.pptx
+++ b/Latest_West_Sussex_C19_slide_deck.pptx
@@ -7176,7 +7176,7 @@
           <a:p>
             <a:r>
               <a:rPr/>
-              <a:t>Pack date: 07 June 2021</a:t>
+              <a:t>Pack date: 08 June 2021</a:t>
             </a:r>
           </a:p>
         </p:txBody>
@@ -7308,7 +7308,7 @@
           <a:p>
             <a:r>
               <a:rPr/>
-              <a:t>Pack date: 07 June 2021</a:t>
+              <a:t>Pack date: 08 June 2021</a:t>
             </a:r>
           </a:p>
         </p:txBody>
@@ -7466,7 +7466,7 @@
           <a:p>
             <a:r>
               <a:rPr/>
-              <a:t>Pack date: 07 June 2021</a:t>
+              <a:t>Pack date: 08 June 2021</a:t>
             </a:r>
           </a:p>
         </p:txBody>
@@ -7547,7 +7547,7 @@
           <a:p>
             <a:r>
               <a:rPr/>
-              <a:t>Upper Tier Local Authority cumulative cases as at 07 June</a:t>
+              <a:t>Upper Tier Local Authority cumulative cases as at 08 June</a:t>
             </a:r>
           </a:p>
         </p:txBody>
@@ -8082,7 +8082,7 @@
                           <a:latin typeface="Calibri"/>
                           <a:cs typeface="Calibri"/>
                         </a:rPr>
-                        <a:t>42,478</a:t>
+                        <a:t>42,516</a:t>
                       </a:r>
                     </a:p>
                   </a:txBody>
@@ -8148,7 +8148,7 @@
                           <a:latin typeface="Calibri"/>
                           <a:cs typeface="Calibri"/>
                         </a:rPr>
-                        <a:t>4,916.5</a:t>
+                        <a:t>4,920.9</a:t>
                       </a:r>
                     </a:p>
                   </a:txBody>
@@ -8414,7 +8414,7 @@
                           <a:latin typeface="Calibri"/>
                           <a:cs typeface="Calibri"/>
                         </a:rPr>
-                        <a:t>3,944,955</a:t>
+                        <a:t>3,950,123</a:t>
                       </a:r>
                     </a:p>
                   </a:txBody>
@@ -8480,7 +8480,7 @@
                           <a:latin typeface="Calibri"/>
                           <a:cs typeface="Calibri"/>
                         </a:rPr>
-                        <a:t>7,008.6</a:t>
+                        <a:t>7,017.8</a:t>
                       </a:r>
                     </a:p>
                   </a:txBody>
@@ -8746,7 +8746,7 @@
                           <a:latin typeface="Calibri"/>
                           <a:cs typeface="Calibri"/>
                         </a:rPr>
-                        <a:t>548,703</a:t>
+                        <a:t>549,168</a:t>
                       </a:r>
                     </a:p>
                   </a:txBody>
@@ -8812,7 +8812,7 @@
                           <a:latin typeface="Calibri"/>
                           <a:cs typeface="Calibri"/>
                         </a:rPr>
-                        <a:t>5,977.1</a:t>
+                        <a:t>5,982.1</a:t>
                       </a:r>
                     </a:p>
                   </a:txBody>
@@ -9061,7 +9061,7 @@
           <a:p>
             <a:r>
               <a:rPr/>
-              <a:t>Pack date: 07 June 2021</a:t>
+              <a:t>Pack date: 08 June 2021</a:t>
             </a:r>
           </a:p>
         </p:txBody>
@@ -9142,7 +9142,7 @@
           <a:p>
             <a:r>
               <a:rPr/>
-              <a:t>Upper Tier Local Authority rolling 7 day cases as at 07 June</a:t>
+              <a:t>Upper Tier Local Authority rolling 7 day cases as at 08 June</a:t>
             </a:r>
           </a:p>
         </p:txBody>
@@ -9223,7 +9223,7 @@
           <a:p>
             <a:r>
               <a:rPr/>
-              <a:t>Note that the very recent days are excluded in the 7-day total as these are thought to be incomplete. As such, this data represents cases in the seven days to 02 June</a:t>
+              <a:t>Note that the very recent days are excluded in the 7-day total as these are thought to be incomplete. As such, this data represents cases in the seven days to 03 June</a:t>
             </a:r>
           </a:p>
         </p:txBody>
@@ -9677,7 +9677,7 @@
                           <a:latin typeface="Calibri"/>
                           <a:cs typeface="Calibri"/>
                         </a:rPr>
-                        <a:t>176</a:t>
+                        <a:t>196</a:t>
                       </a:r>
                     </a:p>
                   </a:txBody>
@@ -9743,7 +9743,7 @@
                           <a:latin typeface="Calibri"/>
                           <a:cs typeface="Calibri"/>
                         </a:rPr>
-                        <a:t>20.4</a:t>
+                        <a:t>22.7</a:t>
                       </a:r>
                     </a:p>
                   </a:txBody>
@@ -9809,7 +9809,7 @@
                           <a:latin typeface="Calibri"/>
                           <a:cs typeface="Calibri"/>
                         </a:rPr>
-                        <a:t>102nd</a:t>
+                        <a:t>101st</a:t>
                       </a:r>
                     </a:p>
                   </a:txBody>
@@ -10009,7 +10009,7 @@
                           <a:latin typeface="Calibri"/>
                           <a:cs typeface="Calibri"/>
                         </a:rPr>
-                        <a:t>22,827</a:t>
+                        <a:t>24,893</a:t>
                       </a:r>
                     </a:p>
                   </a:txBody>
@@ -10075,7 +10075,7 @@
                           <a:latin typeface="Calibri"/>
                           <a:cs typeface="Calibri"/>
                         </a:rPr>
-                        <a:t>40.6</a:t>
+                        <a:t>44.2</a:t>
                       </a:r>
                     </a:p>
                   </a:txBody>
@@ -10341,7 +10341,7 @@
                           <a:latin typeface="Calibri"/>
                           <a:cs typeface="Calibri"/>
                         </a:rPr>
-                        <a:t>2,581</a:t>
+                        <a:t>2,749</a:t>
                       </a:r>
                     </a:p>
                   </a:txBody>
@@ -10407,7 +10407,7 @@
                           <a:latin typeface="Calibri"/>
                           <a:cs typeface="Calibri"/>
                         </a:rPr>
-                        <a:t>28.1</a:t>
+                        <a:t>29.9</a:t>
                       </a:r>
                     </a:p>
                   </a:txBody>
@@ -10656,7 +10656,7 @@
           <a:p>
             <a:r>
               <a:rPr/>
-              <a:t>Pack date: 07 June 2021</a:t>
+              <a:t>Pack date: 08 June 2021</a:t>
             </a:r>
           </a:p>
         </p:txBody>
@@ -10737,7 +10737,7 @@
           <a:p>
             <a:r>
               <a:rPr/>
-              <a:t>Lower Tier Local Authority cumulative cases as at 07 June</a:t>
+              <a:t>Lower Tier Local Authority cumulative cases as at 08 June</a:t>
             </a:r>
           </a:p>
         </p:txBody>
@@ -11245,7 +11245,7 @@
                           <a:latin typeface="Calibri"/>
                           <a:cs typeface="Calibri"/>
                         </a:rPr>
-                        <a:t>2,938</a:t>
+                        <a:t>2,939</a:t>
                       </a:r>
                     </a:p>
                   </a:txBody>
@@ -11311,7 +11311,7 @@
                           <a:latin typeface="Calibri"/>
                           <a:cs typeface="Calibri"/>
                         </a:rPr>
-                        <a:t>4,569.1</a:t>
+                        <a:t>4,570.7</a:t>
                       </a:r>
                     </a:p>
                   </a:txBody>
@@ -11577,7 +11577,7 @@
                           <a:latin typeface="Calibri"/>
                           <a:cs typeface="Calibri"/>
                         </a:rPr>
-                        <a:t>8,367</a:t>
+                        <a:t>8,370</a:t>
                       </a:r>
                     </a:p>
                   </a:txBody>
@@ -11643,7 +11643,7 @@
                           <a:latin typeface="Calibri"/>
                           <a:cs typeface="Calibri"/>
                         </a:rPr>
-                        <a:t>5,204.7</a:t>
+                        <a:t>5,206.6</a:t>
                       </a:r>
                     </a:p>
                   </a:txBody>
@@ -11909,7 +11909,7 @@
                           <a:latin typeface="Calibri"/>
                           <a:cs typeface="Calibri"/>
                         </a:rPr>
-                        <a:t>4,977</a:t>
+                        <a:t>4,978</a:t>
                       </a:r>
                     </a:p>
                   </a:txBody>
@@ -11975,7 +11975,7 @@
                           <a:latin typeface="Calibri"/>
                           <a:cs typeface="Calibri"/>
                         </a:rPr>
-                        <a:t>4,108.8</a:t>
+                        <a:t>4,109.7</a:t>
                       </a:r>
                     </a:p>
                   </a:txBody>
@@ -12241,7 +12241,7 @@
                           <a:latin typeface="Calibri"/>
                           <a:cs typeface="Calibri"/>
                         </a:rPr>
-                        <a:t>8,050</a:t>
+                        <a:t>8,056</a:t>
                       </a:r>
                     </a:p>
                   </a:txBody>
@@ -12307,7 +12307,7 @@
                           <a:latin typeface="Calibri"/>
                           <a:cs typeface="Calibri"/>
                         </a:rPr>
-                        <a:t>7,161.3</a:t>
+                        <a:t>7,166.7</a:t>
                       </a:r>
                     </a:p>
                   </a:txBody>
@@ -12573,7 +12573,7 @@
                           <a:latin typeface="Calibri"/>
                           <a:cs typeface="Calibri"/>
                         </a:rPr>
-                        <a:t>5,791</a:t>
+                        <a:t>5,796</a:t>
                       </a:r>
                     </a:p>
                   </a:txBody>
@@ -12639,7 +12639,7 @@
                           <a:latin typeface="Calibri"/>
                           <a:cs typeface="Calibri"/>
                         </a:rPr>
-                        <a:t>4,027.4</a:t>
+                        <a:t>4,030.9</a:t>
                       </a:r>
                     </a:p>
                   </a:txBody>
@@ -12905,7 +12905,7 @@
                           <a:latin typeface="Calibri"/>
                           <a:cs typeface="Calibri"/>
                         </a:rPr>
-                        <a:t>6,957</a:t>
+                        <a:t>6,969</a:t>
                       </a:r>
                     </a:p>
                   </a:txBody>
@@ -12971,7 +12971,7 @@
                           <a:latin typeface="Calibri"/>
                           <a:cs typeface="Calibri"/>
                         </a:rPr>
-                        <a:t>4,606.6</a:t>
+                        <a:t>4,614.6</a:t>
                       </a:r>
                     </a:p>
                   </a:txBody>
@@ -13237,7 +13237,7 @@
                           <a:latin typeface="Calibri"/>
                           <a:cs typeface="Calibri"/>
                         </a:rPr>
-                        <a:t>5,398</a:t>
+                        <a:t>5,408</a:t>
                       </a:r>
                     </a:p>
                   </a:txBody>
@@ -13303,7 +13303,7 @@
                           <a:latin typeface="Calibri"/>
                           <a:cs typeface="Calibri"/>
                         </a:rPr>
-                        <a:t>4,882.0</a:t>
+                        <a:t>4,891.0</a:t>
                       </a:r>
                     </a:p>
                   </a:txBody>
@@ -13569,7 +13569,7 @@
                           <a:latin typeface="Calibri"/>
                           <a:cs typeface="Calibri"/>
                         </a:rPr>
-                        <a:t>42,478</a:t>
+                        <a:t>42,516</a:t>
                       </a:r>
                     </a:p>
                   </a:txBody>
@@ -13635,7 +13635,7 @@
                           <a:latin typeface="Calibri"/>
                           <a:cs typeface="Calibri"/>
                         </a:rPr>
-                        <a:t>4,916.5</a:t>
+                        <a:t>4,920.9</a:t>
                       </a:r>
                     </a:p>
                   </a:txBody>
@@ -13901,7 +13901,7 @@
                           <a:latin typeface="Calibri"/>
                           <a:cs typeface="Calibri"/>
                         </a:rPr>
-                        <a:t>548,703</a:t>
+                        <a:t>549,168</a:t>
                       </a:r>
                     </a:p>
                   </a:txBody>
@@ -13967,7 +13967,7 @@
                           <a:latin typeface="Calibri"/>
                           <a:cs typeface="Calibri"/>
                         </a:rPr>
-                        <a:t>5,977.1</a:t>
+                        <a:t>5,982.1</a:t>
                       </a:r>
                     </a:p>
                   </a:txBody>
@@ -14233,7 +14233,7 @@
                           <a:latin typeface="Calibri"/>
                           <a:cs typeface="Calibri"/>
                         </a:rPr>
-                        <a:t>3,944,955</a:t>
+                        <a:t>3,950,123</a:t>
                       </a:r>
                     </a:p>
                   </a:txBody>
@@ -14299,7 +14299,7 @@
                           <a:latin typeface="Calibri"/>
                           <a:cs typeface="Calibri"/>
                         </a:rPr>
-                        <a:t>7,008.6</a:t>
+                        <a:t>7,017.8</a:t>
                       </a:r>
                     </a:p>
                   </a:txBody>
@@ -14548,7 +14548,7 @@
           <a:p>
             <a:r>
               <a:rPr/>
-              <a:t>Pack date: 07 June 2021</a:t>
+              <a:t>Pack date: 08 June 2021</a:t>
             </a:r>
           </a:p>
         </p:txBody>
@@ -14629,7 +14629,7 @@
           <a:p>
             <a:r>
               <a:rPr/>
-              <a:t>Lower Tier Local Authority rolling cases as at 07 June</a:t>
+              <a:t>Lower Tier Local Authority rolling cases as at 08 June</a:t>
             </a:r>
           </a:p>
         </p:txBody>
@@ -14710,7 +14710,7 @@
           <a:p>
             <a:r>
               <a:rPr/>
-              <a:t>Note that the very recent days are excluded in the 7-day total as these are thought to be incomplete. As such, this data represents cases in the seven days to 02 June</a:t>
+              <a:t>Note that the very recent days are excluded in the 7-day total as these are thought to be incomplete. As such, this data represents cases in the seven days to 03 June</a:t>
             </a:r>
           </a:p>
         </p:txBody>
@@ -15164,7 +15164,7 @@
                           <a:latin typeface="Calibri"/>
                           <a:cs typeface="Calibri"/>
                         </a:rPr>
-                        <a:t>10</a:t>
+                        <a:t>11</a:t>
                       </a:r>
                     </a:p>
                   </a:txBody>
@@ -15230,7 +15230,7 @@
                           <a:latin typeface="Calibri"/>
                           <a:cs typeface="Calibri"/>
                         </a:rPr>
-                        <a:t>15.6</a:t>
+                        <a:t>17.1</a:t>
                       </a:r>
                     </a:p>
                   </a:txBody>
@@ -15296,7 +15296,7 @@
                           <a:latin typeface="Calibri"/>
                           <a:cs typeface="Calibri"/>
                         </a:rPr>
-                        <a:t>206th</a:t>
+                        <a:t>205th</a:t>
                       </a:r>
                     </a:p>
                   </a:txBody>
@@ -15628,7 +15628,7 @@
                           <a:latin typeface="Calibri"/>
                           <a:cs typeface="Calibri"/>
                         </a:rPr>
-                        <a:t>219th</a:t>
+                        <a:t>232nd</a:t>
                       </a:r>
                     </a:p>
                   </a:txBody>
@@ -15694,7 +15694,7 @@
                           <a:latin typeface="Calibri"/>
                           <a:cs typeface="Calibri"/>
                         </a:rPr>
-                        <a:t>Decile 7</a:t>
+                        <a:t>Decile 8</a:t>
                       </a:r>
                     </a:p>
                   </a:txBody>
@@ -15960,7 +15960,7 @@
                           <a:latin typeface="Calibri"/>
                           <a:cs typeface="Calibri"/>
                         </a:rPr>
-                        <a:t>274th</a:t>
+                        <a:t>277th</a:t>
                       </a:r>
                     </a:p>
                   </a:txBody>
@@ -16160,7 +16160,7 @@
                           <a:latin typeface="Calibri"/>
                           <a:cs typeface="Calibri"/>
                         </a:rPr>
-                        <a:t>24</a:t>
+                        <a:t>28</a:t>
                       </a:r>
                     </a:p>
                   </a:txBody>
@@ -16226,7 +16226,7 @@
                           <a:latin typeface="Calibri"/>
                           <a:cs typeface="Calibri"/>
                         </a:rPr>
-                        <a:t>21.4</a:t>
+                        <a:t>24.9</a:t>
                       </a:r>
                     </a:p>
                   </a:txBody>
@@ -16292,7 +16292,7 @@
                           <a:latin typeface="Calibri"/>
                           <a:cs typeface="Calibri"/>
                         </a:rPr>
-                        <a:t>162nd</a:t>
+                        <a:t>154th</a:t>
                       </a:r>
                     </a:p>
                   </a:txBody>
@@ -16358,7 +16358,7 @@
                           <a:latin typeface="Calibri"/>
                           <a:cs typeface="Calibri"/>
                         </a:rPr>
-                        <a:t>Decile 6</a:t>
+                        <a:t>Decile 5</a:t>
                       </a:r>
                     </a:p>
                   </a:txBody>
@@ -16492,7 +16492,7 @@
                           <a:latin typeface="Calibri"/>
                           <a:cs typeface="Calibri"/>
                         </a:rPr>
-                        <a:t>31</a:t>
+                        <a:t>41</a:t>
                       </a:r>
                     </a:p>
                   </a:txBody>
@@ -16558,7 +16558,7 @@
                           <a:latin typeface="Calibri"/>
                           <a:cs typeface="Calibri"/>
                         </a:rPr>
-                        <a:t>21.6</a:t>
+                        <a:t>28.5</a:t>
                       </a:r>
                     </a:p>
                   </a:txBody>
@@ -16624,7 +16624,7 @@
                           <a:latin typeface="Calibri"/>
                           <a:cs typeface="Calibri"/>
                         </a:rPr>
-                        <a:t>161st</a:t>
+                        <a:t>136th</a:t>
                       </a:r>
                     </a:p>
                   </a:txBody>
@@ -16690,7 +16690,7 @@
                           <a:latin typeface="Calibri"/>
                           <a:cs typeface="Calibri"/>
                         </a:rPr>
-                        <a:t>Decile 6</a:t>
+                        <a:t>Decile 5</a:t>
                       </a:r>
                     </a:p>
                   </a:txBody>
@@ -16824,7 +16824,7 @@
                           <a:latin typeface="Calibri"/>
                           <a:cs typeface="Calibri"/>
                         </a:rPr>
-                        <a:t>47</a:t>
+                        <a:t>53</a:t>
                       </a:r>
                     </a:p>
                   </a:txBody>
@@ -16890,7 +16890,7 @@
                           <a:latin typeface="Calibri"/>
                           <a:cs typeface="Calibri"/>
                         </a:rPr>
-                        <a:t>31.1</a:t>
+                        <a:t>35.1</a:t>
                       </a:r>
                     </a:p>
                   </a:txBody>
@@ -16956,7 +16956,7 @@
                           <a:latin typeface="Calibri"/>
                           <a:cs typeface="Calibri"/>
                         </a:rPr>
-                        <a:t>112th</a:t>
+                        <a:t>107th</a:t>
                       </a:r>
                     </a:p>
                   </a:txBody>
@@ -17156,7 +17156,7 @@
                           <a:latin typeface="Calibri"/>
                           <a:cs typeface="Calibri"/>
                         </a:rPr>
-                        <a:t>32</a:t>
+                        <a:t>31</a:t>
                       </a:r>
                     </a:p>
                   </a:txBody>
@@ -17222,7 +17222,7 @@
                           <a:latin typeface="Calibri"/>
                           <a:cs typeface="Calibri"/>
                         </a:rPr>
-                        <a:t>28.9</a:t>
+                        <a:t>28.0</a:t>
                       </a:r>
                     </a:p>
                   </a:txBody>
@@ -17288,7 +17288,7 @@
                           <a:latin typeface="Calibri"/>
                           <a:cs typeface="Calibri"/>
                         </a:rPr>
-                        <a:t>121st</a:t>
+                        <a:t>139th</a:t>
                       </a:r>
                     </a:p>
                   </a:txBody>
@@ -17354,7 +17354,7 @@
                           <a:latin typeface="Calibri"/>
                           <a:cs typeface="Calibri"/>
                         </a:rPr>
-                        <a:t>Decile 4</a:t>
+                        <a:t>Decile 5</a:t>
                       </a:r>
                     </a:p>
                   </a:txBody>
@@ -17488,7 +17488,7 @@
                           <a:latin typeface="Calibri"/>
                           <a:cs typeface="Calibri"/>
                         </a:rPr>
-                        <a:t>176</a:t>
+                        <a:t>196</a:t>
                       </a:r>
                     </a:p>
                   </a:txBody>
@@ -17554,7 +17554,7 @@
                           <a:latin typeface="Calibri"/>
                           <a:cs typeface="Calibri"/>
                         </a:rPr>
-                        <a:t>20.4</a:t>
+                        <a:t>22.7</a:t>
                       </a:r>
                     </a:p>
                   </a:txBody>
@@ -17820,7 +17820,7 @@
                           <a:latin typeface="Calibri"/>
                           <a:cs typeface="Calibri"/>
                         </a:rPr>
-                        <a:t>22,827</a:t>
+                        <a:t>24,893</a:t>
                       </a:r>
                     </a:p>
                   </a:txBody>
@@ -17886,7 +17886,7 @@
                           <a:latin typeface="Calibri"/>
                           <a:cs typeface="Calibri"/>
                         </a:rPr>
-                        <a:t>40.6</a:t>
+                        <a:t>44.2</a:t>
                       </a:r>
                     </a:p>
                   </a:txBody>
@@ -18152,7 +18152,7 @@
                           <a:latin typeface="Calibri"/>
                           <a:cs typeface="Calibri"/>
                         </a:rPr>
-                        <a:t>2,581</a:t>
+                        <a:t>2,749</a:t>
                       </a:r>
                     </a:p>
                   </a:txBody>
@@ -18218,7 +18218,7 @@
                           <a:latin typeface="Calibri"/>
                           <a:cs typeface="Calibri"/>
                         </a:rPr>
-                        <a:t>28.1</a:t>
+                        <a:t>29.9</a:t>
                       </a:r>
                     </a:p>
                   </a:txBody>
@@ -18441,7 +18441,7 @@
           <a:p>
             <a:r>
               <a:rPr/>
-              <a:t>Pack date: 07 June 2021</a:t>
+              <a:t>Pack date: 08 June 2021</a:t>
             </a:r>
           </a:p>
         </p:txBody>
@@ -18599,7 +18599,7 @@
           <a:p>
             <a:r>
               <a:rPr/>
-              <a:t>Pack date: 07 June 2021</a:t>
+              <a:t>Pack date: 08 June 2021</a:t>
             </a:r>
           </a:p>
         </p:txBody>
@@ -18757,7 +18757,7 @@
           <a:p>
             <a:r>
               <a:rPr/>
-              <a:t>Pack date: 07 June 2021</a:t>
+              <a:t>Pack date: 08 June 2021</a:t>
             </a:r>
           </a:p>
         </p:txBody>
@@ -18915,7 +18915,7 @@
           <a:p>
             <a:r>
               <a:rPr/>
-              <a:t>Pack date: 07 June 2021</a:t>
+              <a:t>Pack date: 08 June 2021</a:t>
             </a:r>
           </a:p>
         </p:txBody>
@@ -19073,7 +19073,7 @@
           <a:p>
             <a:r>
               <a:rPr/>
-              <a:t>Pack date: 07 June 2021</a:t>
+              <a:t>Pack date: 08 June 2021</a:t>
             </a:r>
           </a:p>
         </p:txBody>
@@ -19262,7 +19262,7 @@
           <a:p>
             <a:r>
               <a:rPr/>
-              <a:t>Pack date: 07 June 2021</a:t>
+              <a:t>Pack date: 08 June 2021</a:t>
             </a:r>
           </a:p>
         </p:txBody>
@@ -19420,7 +19420,7 @@
           <a:p>
             <a:r>
               <a:rPr/>
-              <a:t>Pack date: 07 June 2021</a:t>
+              <a:t>Pack date: 08 June 2021</a:t>
             </a:r>
           </a:p>
         </p:txBody>
@@ -19578,7 +19578,7 @@
           <a:p>
             <a:r>
               <a:rPr/>
-              <a:t>Pack date: 07 June 2021</a:t>
+              <a:t>Pack date: 08 June 2021</a:t>
             </a:r>
           </a:p>
         </p:txBody>
@@ -19736,7 +19736,7 @@
           <a:p>
             <a:r>
               <a:rPr/>
-              <a:t>Pack date: 07 June 2021</a:t>
+              <a:t>Pack date: 08 June 2021</a:t>
             </a:r>
           </a:p>
         </p:txBody>
@@ -19894,7 +19894,7 @@
           <a:p>
             <a:r>
               <a:rPr/>
-              <a:t>Pack date: 07 June 2021</a:t>
+              <a:t>Pack date: 08 June 2021</a:t>
             </a:r>
           </a:p>
         </p:txBody>
@@ -20026,7 +20026,7 @@
           <a:p>
             <a:r>
               <a:rPr/>
-              <a:t>Pack date: 07 June 2021</a:t>
+              <a:t>Pack date: 08 June 2021</a:t>
             </a:r>
           </a:p>
         </p:txBody>
@@ -20158,7 +20158,7 @@
           <a:p>
             <a:r>
               <a:rPr/>
-              <a:t>Pack date: 07 June 2021</a:t>
+              <a:t>Pack date: 08 June 2021</a:t>
             </a:r>
           </a:p>
         </p:txBody>
@@ -20290,7 +20290,7 @@
           <a:p>
             <a:r>
               <a:rPr/>
-              <a:t>Pack date: 07 June 2021</a:t>
+              <a:t>Pack date: 08 June 2021</a:t>
             </a:r>
           </a:p>
         </p:txBody>
@@ -20422,7 +20422,7 @@
           <a:p>
             <a:r>
               <a:rPr/>
-              <a:t>Pack date: 07 June 2021</a:t>
+              <a:t>Pack date: 08 June 2021</a:t>
             </a:r>
           </a:p>
         </p:txBody>
@@ -20554,7 +20554,7 @@
           <a:p>
             <a:r>
               <a:rPr/>
-              <a:t>Pack date: 07 June 2021</a:t>
+              <a:t>Pack date: 08 June 2021</a:t>
             </a:r>
           </a:p>
         </p:txBody>
@@ -20686,7 +20686,7 @@
           <a:p>
             <a:r>
               <a:rPr/>
-              <a:t>Pack date: 07 June 2021</a:t>
+              <a:t>Pack date: 08 June 2021</a:t>
             </a:r>
           </a:p>
         </p:txBody>

</xml_diff>

<commit_message>
Mortality + JCVI cohorts
</commit_message>
<xml_diff>
--- a/Latest_West_Sussex_C19_slide_deck.pptx
+++ b/Latest_West_Sussex_C19_slide_deck.pptx
@@ -7176,7 +7176,7 @@
           <a:p>
             <a:r>
               <a:rPr/>
-              <a:t>Pack date: 14 June 2021</a:t>
+              <a:t>Pack date: 15 June 2021</a:t>
             </a:r>
           </a:p>
         </p:txBody>
@@ -7308,7 +7308,7 @@
           <a:p>
             <a:r>
               <a:rPr/>
-              <a:t>Pack date: 14 June 2021</a:t>
+              <a:t>Pack date: 15 June 2021</a:t>
             </a:r>
           </a:p>
         </p:txBody>
@@ -7466,7 +7466,7 @@
           <a:p>
             <a:r>
               <a:rPr/>
-              <a:t>Pack date: 14 June 2021</a:t>
+              <a:t>Pack date: 15 June 2021</a:t>
             </a:r>
           </a:p>
         </p:txBody>
@@ -9061,7 +9061,7 @@
           <a:p>
             <a:r>
               <a:rPr/>
-              <a:t>Pack date: 14 June 2021</a:t>
+              <a:t>Pack date: 15 June 2021</a:t>
             </a:r>
           </a:p>
         </p:txBody>
@@ -10656,7 +10656,7 @@
           <a:p>
             <a:r>
               <a:rPr/>
-              <a:t>Pack date: 14 June 2021</a:t>
+              <a:t>Pack date: 15 June 2021</a:t>
             </a:r>
           </a:p>
         </p:txBody>
@@ -14548,7 +14548,7 @@
           <a:p>
             <a:r>
               <a:rPr/>
-              <a:t>Pack date: 14 June 2021</a:t>
+              <a:t>Pack date: 15 June 2021</a:t>
             </a:r>
           </a:p>
         </p:txBody>
@@ -18441,7 +18441,7 @@
           <a:p>
             <a:r>
               <a:rPr/>
-              <a:t>Pack date: 14 June 2021</a:t>
+              <a:t>Pack date: 15 June 2021</a:t>
             </a:r>
           </a:p>
         </p:txBody>
@@ -18599,7 +18599,7 @@
           <a:p>
             <a:r>
               <a:rPr/>
-              <a:t>Pack date: 14 June 2021</a:t>
+              <a:t>Pack date: 15 June 2021</a:t>
             </a:r>
           </a:p>
         </p:txBody>
@@ -18757,7 +18757,7 @@
           <a:p>
             <a:r>
               <a:rPr/>
-              <a:t>Pack date: 14 June 2021</a:t>
+              <a:t>Pack date: 15 June 2021</a:t>
             </a:r>
           </a:p>
         </p:txBody>
@@ -18915,7 +18915,7 @@
           <a:p>
             <a:r>
               <a:rPr/>
-              <a:t>Pack date: 14 June 2021</a:t>
+              <a:t>Pack date: 15 June 2021</a:t>
             </a:r>
           </a:p>
         </p:txBody>
@@ -19073,7 +19073,7 @@
           <a:p>
             <a:r>
               <a:rPr/>
-              <a:t>Pack date: 14 June 2021</a:t>
+              <a:t>Pack date: 15 June 2021</a:t>
             </a:r>
           </a:p>
         </p:txBody>
@@ -19262,7 +19262,7 @@
           <a:p>
             <a:r>
               <a:rPr/>
-              <a:t>Pack date: 14 June 2021</a:t>
+              <a:t>Pack date: 15 June 2021</a:t>
             </a:r>
           </a:p>
         </p:txBody>
@@ -19420,7 +19420,7 @@
           <a:p>
             <a:r>
               <a:rPr/>
-              <a:t>Pack date: 14 June 2021</a:t>
+              <a:t>Pack date: 15 June 2021</a:t>
             </a:r>
           </a:p>
         </p:txBody>
@@ -19578,7 +19578,7 @@
           <a:p>
             <a:r>
               <a:rPr/>
-              <a:t>Pack date: 14 June 2021</a:t>
+              <a:t>Pack date: 15 June 2021</a:t>
             </a:r>
           </a:p>
         </p:txBody>
@@ -19736,7 +19736,7 @@
           <a:p>
             <a:r>
               <a:rPr/>
-              <a:t>Pack date: 14 June 2021</a:t>
+              <a:t>Pack date: 15 June 2021</a:t>
             </a:r>
           </a:p>
         </p:txBody>
@@ -19894,7 +19894,7 @@
           <a:p>
             <a:r>
               <a:rPr/>
-              <a:t>Pack date: 14 June 2021</a:t>
+              <a:t>Pack date: 15 June 2021</a:t>
             </a:r>
           </a:p>
         </p:txBody>
@@ -20026,7 +20026,7 @@
           <a:p>
             <a:r>
               <a:rPr/>
-              <a:t>Pack date: 14 June 2021</a:t>
+              <a:t>Pack date: 15 June 2021</a:t>
             </a:r>
           </a:p>
         </p:txBody>
@@ -20158,7 +20158,7 @@
           <a:p>
             <a:r>
               <a:rPr/>
-              <a:t>Pack date: 14 June 2021</a:t>
+              <a:t>Pack date: 15 June 2021</a:t>
             </a:r>
           </a:p>
         </p:txBody>
@@ -20290,7 +20290,7 @@
           <a:p>
             <a:r>
               <a:rPr/>
-              <a:t>Pack date: 14 June 2021</a:t>
+              <a:t>Pack date: 15 June 2021</a:t>
             </a:r>
           </a:p>
         </p:txBody>
@@ -20422,7 +20422,7 @@
           <a:p>
             <a:r>
               <a:rPr/>
-              <a:t>Pack date: 14 June 2021</a:t>
+              <a:t>Pack date: 15 June 2021</a:t>
             </a:r>
           </a:p>
         </p:txBody>
@@ -20554,7 +20554,7 @@
           <a:p>
             <a:r>
               <a:rPr/>
-              <a:t>Pack date: 14 June 2021</a:t>
+              <a:t>Pack date: 15 June 2021</a:t>
             </a:r>
           </a:p>
         </p:txBody>
@@ -20686,7 +20686,7 @@
           <a:p>
             <a:r>
               <a:rPr/>
-              <a:t>Pack date: 14 June 2021</a:t>
+              <a:t>Pack date: 15 June 2021</a:t>
             </a:r>
           </a:p>
         </p:txBody>

</xml_diff>

<commit_message>
Vaccine update july 5
</commit_message>
<xml_diff>
--- a/Latest_West_Sussex_C19_slide_deck.pptx
+++ b/Latest_West_Sussex_C19_slide_deck.pptx
@@ -7176,7 +7176,7 @@
           <a:p>
             <a:r>
               <a:rPr/>
-              <a:t>Pack date: 05 July 2021</a:t>
+              <a:t>Pack date: 06 July 2021</a:t>
             </a:r>
           </a:p>
         </p:txBody>
@@ -7308,7 +7308,7 @@
           <a:p>
             <a:r>
               <a:rPr/>
-              <a:t>Pack date: 05 July 2021</a:t>
+              <a:t>Pack date: 06 July 2021</a:t>
             </a:r>
           </a:p>
         </p:txBody>
@@ -7466,7 +7466,7 @@
           <a:p>
             <a:r>
               <a:rPr/>
-              <a:t>Pack date: 05 July 2021</a:t>
+              <a:t>Pack date: 06 July 2021</a:t>
             </a:r>
           </a:p>
         </p:txBody>
@@ -9101,7 +9101,7 @@
           <a:p>
             <a:r>
               <a:rPr/>
-              <a:t>Pack date: 05 July 2021</a:t>
+              <a:t>Pack date: 06 July 2021</a:t>
             </a:r>
           </a:p>
         </p:txBody>
@@ -10736,7 +10736,7 @@
           <a:p>
             <a:r>
               <a:rPr/>
-              <a:t>Pack date: 05 July 2021</a:t>
+              <a:t>Pack date: 06 July 2021</a:t>
             </a:r>
           </a:p>
         </p:txBody>
@@ -14738,7 +14738,7 @@
           <a:p>
             <a:r>
               <a:rPr/>
-              <a:t>Pack date: 05 July 2021</a:t>
+              <a:t>Pack date: 06 July 2021</a:t>
             </a:r>
           </a:p>
         </p:txBody>
@@ -18741,7 +18741,7 @@
           <a:p>
             <a:r>
               <a:rPr/>
-              <a:t>Pack date: 05 July 2021</a:t>
+              <a:t>Pack date: 06 July 2021</a:t>
             </a:r>
           </a:p>
         </p:txBody>
@@ -18899,7 +18899,7 @@
           <a:p>
             <a:r>
               <a:rPr/>
-              <a:t>Pack date: 05 July 2021</a:t>
+              <a:t>Pack date: 06 July 2021</a:t>
             </a:r>
           </a:p>
         </p:txBody>
@@ -19057,7 +19057,7 @@
           <a:p>
             <a:r>
               <a:rPr/>
-              <a:t>Pack date: 05 July 2021</a:t>
+              <a:t>Pack date: 06 July 2021</a:t>
             </a:r>
           </a:p>
         </p:txBody>
@@ -19215,7 +19215,7 @@
           <a:p>
             <a:r>
               <a:rPr/>
-              <a:t>Pack date: 05 July 2021</a:t>
+              <a:t>Pack date: 06 July 2021</a:t>
             </a:r>
           </a:p>
         </p:txBody>
@@ -19373,7 +19373,7 @@
           <a:p>
             <a:r>
               <a:rPr/>
-              <a:t>Pack date: 05 July 2021</a:t>
+              <a:t>Pack date: 06 July 2021</a:t>
             </a:r>
           </a:p>
         </p:txBody>
@@ -19562,7 +19562,7 @@
           <a:p>
             <a:r>
               <a:rPr/>
-              <a:t>Pack date: 05 July 2021</a:t>
+              <a:t>Pack date: 06 July 2021</a:t>
             </a:r>
           </a:p>
         </p:txBody>
@@ -19720,7 +19720,7 @@
           <a:p>
             <a:r>
               <a:rPr/>
-              <a:t>Pack date: 05 July 2021</a:t>
+              <a:t>Pack date: 06 July 2021</a:t>
             </a:r>
           </a:p>
         </p:txBody>
@@ -19878,7 +19878,7 @@
           <a:p>
             <a:r>
               <a:rPr/>
-              <a:t>Pack date: 05 July 2021</a:t>
+              <a:t>Pack date: 06 July 2021</a:t>
             </a:r>
           </a:p>
         </p:txBody>
@@ -20036,7 +20036,7 @@
           <a:p>
             <a:r>
               <a:rPr/>
-              <a:t>Pack date: 05 July 2021</a:t>
+              <a:t>Pack date: 06 July 2021</a:t>
             </a:r>
           </a:p>
         </p:txBody>
@@ -20194,7 +20194,7 @@
           <a:p>
             <a:r>
               <a:rPr/>
-              <a:t>Pack date: 05 July 2021</a:t>
+              <a:t>Pack date: 06 July 2021</a:t>
             </a:r>
           </a:p>
         </p:txBody>
@@ -20326,7 +20326,7 @@
           <a:p>
             <a:r>
               <a:rPr/>
-              <a:t>Pack date: 05 July 2021</a:t>
+              <a:t>Pack date: 06 July 2021</a:t>
             </a:r>
           </a:p>
         </p:txBody>
@@ -20458,7 +20458,7 @@
           <a:p>
             <a:r>
               <a:rPr/>
-              <a:t>Pack date: 05 July 2021</a:t>
+              <a:t>Pack date: 06 July 2021</a:t>
             </a:r>
           </a:p>
         </p:txBody>
@@ -20590,7 +20590,7 @@
           <a:p>
             <a:r>
               <a:rPr/>
-              <a:t>Pack date: 05 July 2021</a:t>
+              <a:t>Pack date: 06 July 2021</a:t>
             </a:r>
           </a:p>
         </p:txBody>
@@ -20722,7 +20722,7 @@
           <a:p>
             <a:r>
               <a:rPr/>
-              <a:t>Pack date: 05 July 2021</a:t>
+              <a:t>Pack date: 06 July 2021</a:t>
             </a:r>
           </a:p>
         </p:txBody>
@@ -20854,7 +20854,7 @@
           <a:p>
             <a:r>
               <a:rPr/>
-              <a:t>Pack date: 05 July 2021</a:t>
+              <a:t>Pack date: 06 July 2021</a:t>
             </a:r>
           </a:p>
         </p:txBody>
@@ -20986,7 +20986,7 @@
           <a:p>
             <a:r>
               <a:rPr/>
-              <a:t>Pack date: 05 July 2021</a:t>
+              <a:t>Pack date: 06 July 2021</a:t>
             </a:r>
           </a:p>
         </p:txBody>

</xml_diff>

<commit_message>
sept 3 vaccine 16+ added
</commit_message>
<xml_diff>
--- a/Latest_West_Sussex_C19_slide_deck.pptx
+++ b/Latest_West_Sussex_C19_slide_deck.pptx
@@ -7176,7 +7176,7 @@
           <a:p>
             <a:r>
               <a:rPr/>
-              <a:t>Pack date: 03 September 2021</a:t>
+              <a:t>Pack date: 05 September 2021</a:t>
             </a:r>
           </a:p>
         </p:txBody>
@@ -7308,7 +7308,7 @@
           <a:p>
             <a:r>
               <a:rPr/>
-              <a:t>Pack date: 03 September 2021</a:t>
+              <a:t>Pack date: 05 September 2021</a:t>
             </a:r>
           </a:p>
         </p:txBody>
@@ -7466,7 +7466,7 @@
           <a:p>
             <a:r>
               <a:rPr/>
-              <a:t>Pack date: 03 September 2021</a:t>
+              <a:t>Pack date: 05 September 2021</a:t>
             </a:r>
           </a:p>
         </p:txBody>
@@ -7547,7 +7547,7 @@
           <a:p>
             <a:r>
               <a:rPr/>
-              <a:t>Upper Tier Local Authority cumulative cases as at 03 September</a:t>
+              <a:t>Upper Tier Local Authority cumulative cases as at 05 September</a:t>
             </a:r>
           </a:p>
         </p:txBody>
@@ -8096,7 +8096,7 @@
                           <a:ea typeface="Calibri"/>
                           <a:sym typeface="Calibri"/>
                         </a:rPr>
-                        <a:t>68,602</a:t>
+                        <a:t>69,308</a:t>
                       </a:r>
                     </a:p>
                   </a:txBody>
@@ -8164,7 +8164,7 @@
                           <a:ea typeface="Calibri"/>
                           <a:sym typeface="Calibri"/>
                         </a:rPr>
-                        <a:t>7,906.8</a:t>
+                        <a:t>7,988.2</a:t>
                       </a:r>
                     </a:p>
                   </a:txBody>
@@ -8438,7 +8438,7 @@
                           <a:ea typeface="Calibri"/>
                           <a:sym typeface="Calibri"/>
                         </a:rPr>
-                        <a:t>5,964,760</a:t>
+                        <a:t>6,019,976</a:t>
                       </a:r>
                     </a:p>
                   </a:txBody>
@@ -8506,7 +8506,7 @@
                           <a:ea typeface="Calibri"/>
                           <a:sym typeface="Calibri"/>
                         </a:rPr>
-                        <a:t>10,547.7</a:t>
+                        <a:t>10,645.4</a:t>
                       </a:r>
                     </a:p>
                   </a:txBody>
@@ -8780,7 +8780,7 @@
                           <a:ea typeface="Calibri"/>
                           <a:sym typeface="Calibri"/>
                         </a:rPr>
-                        <a:t>818,153</a:t>
+                        <a:t>827,241</a:t>
                       </a:r>
                     </a:p>
                   </a:txBody>
@@ -8848,7 +8848,7 @@
                           <a:ea typeface="Calibri"/>
                           <a:sym typeface="Calibri"/>
                         </a:rPr>
-                        <a:t>8,876.3</a:t>
+                        <a:t>8,974.9</a:t>
                       </a:r>
                     </a:p>
                   </a:txBody>
@@ -9101,7 +9101,7 @@
           <a:p>
             <a:r>
               <a:rPr/>
-              <a:t>Pack date: 03 September 2021</a:t>
+              <a:t>Pack date: 05 September 2021</a:t>
             </a:r>
           </a:p>
         </p:txBody>
@@ -9182,7 +9182,7 @@
           <a:p>
             <a:r>
               <a:rPr/>
-              <a:t>Upper Tier Local Authority rolling 7 day cases as at 03 September</a:t>
+              <a:t>Upper Tier Local Authority rolling 7 day cases as at 05 September</a:t>
             </a:r>
           </a:p>
         </p:txBody>
@@ -9263,7 +9263,7 @@
           <a:p>
             <a:r>
               <a:rPr/>
-              <a:t>Note that the very recent days are excluded in the 7-day total as these are thought to be incomplete. As such, this data represents cases in the seven days to 29 August</a:t>
+              <a:t>Note that the very recent days are excluded in the 7-day total as these are thought to be incomplete. As such, this data represents cases in the seven days to 31 August</a:t>
             </a:r>
           </a:p>
         </p:txBody>
@@ -9731,7 +9731,7 @@
                           <a:ea typeface="Calibri"/>
                           <a:sym typeface="Calibri"/>
                         </a:rPr>
-                        <a:t>2,197</a:t>
+                        <a:t>2,145</a:t>
                       </a:r>
                     </a:p>
                   </a:txBody>
@@ -9799,7 +9799,7 @@
                           <a:ea typeface="Calibri"/>
                           <a:sym typeface="Calibri"/>
                         </a:rPr>
-                        <a:t>253.2</a:t>
+                        <a:t>247.2</a:t>
                       </a:r>
                     </a:p>
                   </a:txBody>
@@ -9867,7 +9867,7 @@
                           <a:ea typeface="Calibri"/>
                           <a:sym typeface="Calibri"/>
                         </a:rPr>
-                        <a:t>118th</a:t>
+                        <a:t>119th</a:t>
                       </a:r>
                     </a:p>
                   </a:txBody>
@@ -10073,7 +10073,7 @@
                           <a:ea typeface="Calibri"/>
                           <a:sym typeface="Calibri"/>
                         </a:rPr>
-                        <a:t>171,166</a:t>
+                        <a:t>171,439</a:t>
                       </a:r>
                     </a:p>
                   </a:txBody>
@@ -10141,7 +10141,7 @@
                           <a:ea typeface="Calibri"/>
                           <a:sym typeface="Calibri"/>
                         </a:rPr>
-                        <a:t>302.7</a:t>
+                        <a:t>303.2</a:t>
                       </a:r>
                     </a:p>
                   </a:txBody>
@@ -10415,7 +10415,7 @@
                           <a:ea typeface="Calibri"/>
                           <a:sym typeface="Calibri"/>
                         </a:rPr>
-                        <a:t>25,282</a:t>
+                        <a:t>25,642</a:t>
                       </a:r>
                     </a:p>
                   </a:txBody>
@@ -10483,7 +10483,7 @@
                           <a:ea typeface="Calibri"/>
                           <a:sym typeface="Calibri"/>
                         </a:rPr>
-                        <a:t>274.3</a:t>
+                        <a:t>278.2</a:t>
                       </a:r>
                     </a:p>
                   </a:txBody>
@@ -10736,7 +10736,7 @@
           <a:p>
             <a:r>
               <a:rPr/>
-              <a:t>Pack date: 03 September 2021</a:t>
+              <a:t>Pack date: 05 September 2021</a:t>
             </a:r>
           </a:p>
         </p:txBody>
@@ -10817,7 +10817,7 @@
           <a:p>
             <a:r>
               <a:rPr/>
-              <a:t>Lower Tier Local Authority cumulative cases as at 03 September</a:t>
+              <a:t>Lower Tier Local Authority cumulative cases as at 05 September</a:t>
             </a:r>
           </a:p>
         </p:txBody>
@@ -11339,7 +11339,7 @@
                           <a:ea typeface="Calibri"/>
                           <a:sym typeface="Calibri"/>
                         </a:rPr>
-                        <a:t>4,966</a:t>
+                        <a:t>5,017</a:t>
                       </a:r>
                     </a:p>
                   </a:txBody>
@@ -11407,7 +11407,7 @@
                           <a:ea typeface="Calibri"/>
                           <a:sym typeface="Calibri"/>
                         </a:rPr>
-                        <a:t>7,736.8</a:t>
+                        <a:t>7,816.2</a:t>
                       </a:r>
                     </a:p>
                   </a:txBody>
@@ -11681,7 +11681,7 @@
                           <a:ea typeface="Calibri"/>
                           <a:sym typeface="Calibri"/>
                         </a:rPr>
-                        <a:t>13,165</a:t>
+                        <a:t>13,275</a:t>
                       </a:r>
                     </a:p>
                   </a:txBody>
@@ -11749,7 +11749,7 @@
                           <a:ea typeface="Calibri"/>
                           <a:sym typeface="Calibri"/>
                         </a:rPr>
-                        <a:t>8,170.8</a:t>
+                        <a:t>8,239.0</a:t>
                       </a:r>
                     </a:p>
                   </a:txBody>
@@ -12023,7 +12023,7 @@
                           <a:ea typeface="Calibri"/>
                           <a:sym typeface="Calibri"/>
                         </a:rPr>
-                        <a:t>8,798</a:t>
+                        <a:t>8,901</a:t>
                       </a:r>
                     </a:p>
                   </a:txBody>
@@ -12091,7 +12091,7 @@
                           <a:ea typeface="Calibri"/>
                           <a:sym typeface="Calibri"/>
                         </a:rPr>
-                        <a:t>7,240.7</a:t>
+                        <a:t>7,325.4</a:t>
                       </a:r>
                     </a:p>
                   </a:txBody>
@@ -12159,7 +12159,7 @@
                           <a:ea typeface="Calibri"/>
                           <a:sym typeface="Calibri"/>
                         </a:rPr>
-                        <a:t>269th</a:t>
+                        <a:t>270th</a:t>
                       </a:r>
                     </a:p>
                   </a:txBody>
@@ -12365,7 +12365,7 @@
                           <a:ea typeface="Calibri"/>
                           <a:sym typeface="Calibri"/>
                         </a:rPr>
-                        <a:t>11,908</a:t>
+                        <a:t>12,008</a:t>
                       </a:r>
                     </a:p>
                   </a:txBody>
@@ -12433,7 +12433,7 @@
                           <a:ea typeface="Calibri"/>
                           <a:sym typeface="Calibri"/>
                         </a:rPr>
-                        <a:t>10,587.3</a:t>
+                        <a:t>10,676.2</a:t>
                       </a:r>
                     </a:p>
                   </a:txBody>
@@ -12501,7 +12501,7 @@
                           <a:ea typeface="Calibri"/>
                           <a:sym typeface="Calibri"/>
                         </a:rPr>
-                        <a:t>121st</a:t>
+                        <a:t>122nd</a:t>
                       </a:r>
                     </a:p>
                   </a:txBody>
@@ -12707,7 +12707,7 @@
                           <a:ea typeface="Calibri"/>
                           <a:sym typeface="Calibri"/>
                         </a:rPr>
-                        <a:t>9,509</a:t>
+                        <a:t>9,629</a:t>
                       </a:r>
                     </a:p>
                   </a:txBody>
@@ -12775,7 +12775,7 @@
                           <a:ea typeface="Calibri"/>
                           <a:sym typeface="Calibri"/>
                         </a:rPr>
-                        <a:t>6,536.6</a:t>
+                        <a:t>6,619.1</a:t>
                       </a:r>
                     </a:p>
                   </a:txBody>
@@ -13050,7 +13050,7 @@
                           <a:ea typeface="Calibri"/>
                           <a:sym typeface="Calibri"/>
                         </a:rPr>
-                        <a:t>11,740</a:t>
+                        <a:t>11,877</a:t>
                       </a:r>
                     </a:p>
                   </a:txBody>
@@ -13118,7 +13118,7 @@
                           <a:ea typeface="Calibri"/>
                           <a:sym typeface="Calibri"/>
                         </a:rPr>
-                        <a:t>7,716.5</a:t>
+                        <a:t>7,806.5</a:t>
                       </a:r>
                     </a:p>
                   </a:txBody>
@@ -13392,7 +13392,7 @@
                           <a:ea typeface="Calibri"/>
                           <a:sym typeface="Calibri"/>
                         </a:rPr>
-                        <a:t>8,516</a:t>
+                        <a:t>8,601</a:t>
                       </a:r>
                     </a:p>
                   </a:txBody>
@@ -13460,7 +13460,7 @@
                           <a:ea typeface="Calibri"/>
                           <a:sym typeface="Calibri"/>
                         </a:rPr>
-                        <a:t>7,691.0</a:t>
+                        <a:t>7,767.8</a:t>
                       </a:r>
                     </a:p>
                   </a:txBody>
@@ -13528,7 +13528,7 @@
                           <a:ea typeface="Calibri"/>
                           <a:sym typeface="Calibri"/>
                         </a:rPr>
-                        <a:t>255th</a:t>
+                        <a:t>256th</a:t>
                       </a:r>
                     </a:p>
                   </a:txBody>
@@ -13734,7 +13734,7 @@
                           <a:ea typeface="Calibri"/>
                           <a:sym typeface="Calibri"/>
                         </a:rPr>
-                        <a:t>68,602</a:t>
+                        <a:t>69,308</a:t>
                       </a:r>
                     </a:p>
                   </a:txBody>
@@ -13802,7 +13802,7 @@
                           <a:ea typeface="Calibri"/>
                           <a:sym typeface="Calibri"/>
                         </a:rPr>
-                        <a:t>7,906.8</a:t>
+                        <a:t>7,988.2</a:t>
                       </a:r>
                     </a:p>
                   </a:txBody>
@@ -14076,7 +14076,7 @@
                           <a:ea typeface="Calibri"/>
                           <a:sym typeface="Calibri"/>
                         </a:rPr>
-                        <a:t>818,153</a:t>
+                        <a:t>827,241</a:t>
                       </a:r>
                     </a:p>
                   </a:txBody>
@@ -14144,7 +14144,7 @@
                           <a:ea typeface="Calibri"/>
                           <a:sym typeface="Calibri"/>
                         </a:rPr>
-                        <a:t>8,876.3</a:t>
+                        <a:t>8,974.9</a:t>
                       </a:r>
                     </a:p>
                   </a:txBody>
@@ -14418,7 +14418,7 @@
                           <a:ea typeface="Calibri"/>
                           <a:sym typeface="Calibri"/>
                         </a:rPr>
-                        <a:t>5,964,760</a:t>
+                        <a:t>6,019,976</a:t>
                       </a:r>
                     </a:p>
                   </a:txBody>
@@ -14486,7 +14486,7 @@
                           <a:ea typeface="Calibri"/>
                           <a:sym typeface="Calibri"/>
                         </a:rPr>
-                        <a:t>10,547.7</a:t>
+                        <a:t>10,645.4</a:t>
                       </a:r>
                     </a:p>
                   </a:txBody>
@@ -14739,7 +14739,7 @@
           <a:p>
             <a:r>
               <a:rPr/>
-              <a:t>Pack date: 03 September 2021</a:t>
+              <a:t>Pack date: 05 September 2021</a:t>
             </a:r>
           </a:p>
         </p:txBody>
@@ -14820,7 +14820,7 @@
           <a:p>
             <a:r>
               <a:rPr/>
-              <a:t>Lower Tier Local Authority rolling cases as at 03 September</a:t>
+              <a:t>Lower Tier Local Authority rolling cases as at 05 September</a:t>
             </a:r>
           </a:p>
         </p:txBody>
@@ -14901,7 +14901,7 @@
           <a:p>
             <a:r>
               <a:rPr/>
-              <a:t>Note that the very recent days are excluded in the 7-day total as these are thought to be incomplete. As such, this data represents cases in the seven days to 29 August</a:t>
+              <a:t>Note that the very recent days are excluded in the 7-day total as these are thought to be incomplete. As such, this data represents cases in the seven days to 31 August</a:t>
             </a:r>
           </a:p>
         </p:txBody>
@@ -15369,7 +15369,7 @@
                           <a:ea typeface="Calibri"/>
                           <a:sym typeface="Calibri"/>
                         </a:rPr>
-                        <a:t>137</a:t>
+                        <a:t>116</a:t>
                       </a:r>
                     </a:p>
                   </a:txBody>
@@ -15437,7 +15437,7 @@
                           <a:ea typeface="Calibri"/>
                           <a:sym typeface="Calibri"/>
                         </a:rPr>
-                        <a:t>213.4</a:t>
+                        <a:t>180.7</a:t>
                       </a:r>
                     </a:p>
                   </a:txBody>
@@ -15505,7 +15505,7 @@
                           <a:ea typeface="Calibri"/>
                           <a:sym typeface="Calibri"/>
                         </a:rPr>
-                        <a:t>292nd</a:t>
+                        <a:t>308th</a:t>
                       </a:r>
                     </a:p>
                   </a:txBody>
@@ -15712,7 +15712,7 @@
                           <a:ea typeface="Calibri"/>
                           <a:sym typeface="Calibri"/>
                         </a:rPr>
-                        <a:t>416</a:t>
+                        <a:t>425</a:t>
                       </a:r>
                     </a:p>
                   </a:txBody>
@@ -15780,7 +15780,7 @@
                           <a:ea typeface="Calibri"/>
                           <a:sym typeface="Calibri"/>
                         </a:rPr>
-                        <a:t>258.2</a:t>
+                        <a:t>263.8</a:t>
                       </a:r>
                     </a:p>
                   </a:txBody>
@@ -16054,7 +16054,7 @@
                           <a:ea typeface="Calibri"/>
                           <a:sym typeface="Calibri"/>
                         </a:rPr>
-                        <a:t>328</a:t>
+                        <a:t>304</a:t>
                       </a:r>
                     </a:p>
                   </a:txBody>
@@ -16122,7 +16122,7 @@
                           <a:ea typeface="Calibri"/>
                           <a:sym typeface="Calibri"/>
                         </a:rPr>
-                        <a:t>269.9</a:t>
+                        <a:t>250.2</a:t>
                       </a:r>
                     </a:p>
                   </a:txBody>
@@ -16190,7 +16190,7 @@
                           <a:ea typeface="Calibri"/>
                           <a:sym typeface="Calibri"/>
                         </a:rPr>
-                        <a:t>201st</a:t>
+                        <a:t>248th</a:t>
                       </a:r>
                     </a:p>
                   </a:txBody>
@@ -16258,7 +16258,7 @@
                           <a:ea typeface="Calibri"/>
                           <a:sym typeface="Calibri"/>
                         </a:rPr>
-                        <a:t>Decile 7</a:t>
+                        <a:t>Decile 8</a:t>
                       </a:r>
                     </a:p>
                   </a:txBody>
@@ -16396,7 +16396,7 @@
                           <a:ea typeface="Calibri"/>
                           <a:sym typeface="Calibri"/>
                         </a:rPr>
-                        <a:t>340</a:t>
+                        <a:t>315</a:t>
                       </a:r>
                     </a:p>
                   </a:txBody>
@@ -16464,7 +16464,7 @@
                           <a:ea typeface="Calibri"/>
                           <a:sym typeface="Calibri"/>
                         </a:rPr>
-                        <a:t>302.3</a:t>
+                        <a:t>280.1</a:t>
                       </a:r>
                     </a:p>
                   </a:txBody>
@@ -16532,7 +16532,7 @@
                           <a:ea typeface="Calibri"/>
                           <a:sym typeface="Calibri"/>
                         </a:rPr>
-                        <a:t>138th</a:t>
+                        <a:t>184th</a:t>
                       </a:r>
                     </a:p>
                   </a:txBody>
@@ -16600,7 +16600,7 @@
                           <a:ea typeface="Calibri"/>
                           <a:sym typeface="Calibri"/>
                         </a:rPr>
-                        <a:t>Decile 5</a:t>
+                        <a:t>Decile 6</a:t>
                       </a:r>
                     </a:p>
                   </a:txBody>
@@ -16738,7 +16738,7 @@
                           <a:ea typeface="Calibri"/>
                           <a:sym typeface="Calibri"/>
                         </a:rPr>
-                        <a:t>357</a:t>
+                        <a:t>355</a:t>
                       </a:r>
                     </a:p>
                   </a:txBody>
@@ -16806,7 +16806,7 @@
                           <a:ea typeface="Calibri"/>
                           <a:sym typeface="Calibri"/>
                         </a:rPr>
-                        <a:t>245.4</a:t>
+                        <a:t>244.0</a:t>
                       </a:r>
                     </a:p>
                   </a:txBody>
@@ -16874,7 +16874,349 @@
                           <a:ea typeface="Calibri"/>
                           <a:sym typeface="Calibri"/>
                         </a:rPr>
-                        <a:t>240th</a:t>
+                        <a:t>255th</a:t>
+                      </a:r>
+                    </a:p>
+                  </a:txBody>
+                  <a:tcPr anchor="t" marB="0" marT="0" marR="0" marL="0">
+                    <a:lnL w="0" cmpd="sng" algn="ctr" cap="flat">
+                      <a:solidFill>
+                        <a:srgbClr val="FFFFFF">
+                          <a:alpha val="0"/>
+                        </a:srgbClr>
+                      </a:solidFill>
+                      <a:prstDash val="solid"/>
+                    </a:lnL>
+                    <a:lnR w="0" cmpd="sng" algn="ctr" cap="flat">
+                      <a:solidFill>
+                        <a:srgbClr val="FFFFFF">
+                          <a:alpha val="0"/>
+                        </a:srgbClr>
+                      </a:solidFill>
+                      <a:prstDash val="solid"/>
+                    </a:lnR>
+                    <a:lnT w="0" cmpd="sng" algn="ctr" cap="flat">
+                      <a:solidFill>
+                        <a:srgbClr val="FFFFFF">
+                          <a:alpha val="0"/>
+                        </a:srgbClr>
+                      </a:solidFill>
+                      <a:prstDash val="solid"/>
+                    </a:lnT>
+                    <a:lnB w="0" cmpd="sng" algn="ctr" cap="flat">
+                      <a:solidFill>
+                        <a:srgbClr val="FFFFFF">
+                          <a:alpha val="0"/>
+                        </a:srgbClr>
+                      </a:solidFill>
+                      <a:prstDash val="solid"/>
+                    </a:lnB>
+                  </a:tcPr>
+                </a:tc>
+                <a:tc>
+                  <a:txBody>
+                    <a:bodyPr/>
+                    <a:lstStyle/>
+                    <a:p>
+                      <a:pPr algn="l" marL="63500" marR="63500">
+                        <a:lnSpc>
+                          <a:spcPct val="100000"/>
+                        </a:lnSpc>
+                        <a:spcBef>
+                          <a:spcPts val="500"/>
+                        </a:spcBef>
+                        <a:spcAft>
+                          <a:spcPts val="500"/>
+                        </a:spcAft>
+                        <a:buNone/>
+                      </a:pPr>
+                      <a:r>
+                        <a:rPr sz="1100">
+                          <a:solidFill>
+                            <a:srgbClr val="000000">
+                              <a:alpha val="100000"/>
+                            </a:srgbClr>
+                          </a:solidFill>
+                          <a:latin typeface="Calibri"/>
+                          <a:cs typeface="Calibri"/>
+                          <a:ea typeface="Calibri"/>
+                          <a:sym typeface="Calibri"/>
+                        </a:rPr>
+                        <a:t>Decile 9</a:t>
+                      </a:r>
+                    </a:p>
+                  </a:txBody>
+                  <a:tcPr anchor="t" marB="0" marT="0" marR="0" marL="0">
+                    <a:lnL w="0" cmpd="sng" algn="ctr" cap="flat">
+                      <a:solidFill>
+                        <a:srgbClr val="FFFFFF">
+                          <a:alpha val="0"/>
+                        </a:srgbClr>
+                      </a:solidFill>
+                      <a:prstDash val="solid"/>
+                    </a:lnL>
+                    <a:lnR w="0" cmpd="sng" algn="ctr" cap="flat">
+                      <a:solidFill>
+                        <a:srgbClr val="FFFFFF">
+                          <a:alpha val="0"/>
+                        </a:srgbClr>
+                      </a:solidFill>
+                      <a:prstDash val="solid"/>
+                    </a:lnR>
+                    <a:lnT w="0" cmpd="sng" algn="ctr" cap="flat">
+                      <a:solidFill>
+                        <a:srgbClr val="FFFFFF">
+                          <a:alpha val="0"/>
+                        </a:srgbClr>
+                      </a:solidFill>
+                      <a:prstDash val="solid"/>
+                    </a:lnT>
+                    <a:lnB w="0" cmpd="sng" algn="ctr" cap="flat">
+                      <a:solidFill>
+                        <a:srgbClr val="FFFFFF">
+                          <a:alpha val="0"/>
+                        </a:srgbClr>
+                      </a:solidFill>
+                      <a:prstDash val="solid"/>
+                    </a:lnB>
+                  </a:tcPr>
+                </a:tc>
+              </a:tr>
+              <a:tr h="182880">
+                <a:tc>
+                  <a:txBody>
+                    <a:bodyPr/>
+                    <a:lstStyle/>
+                    <a:p>
+                      <a:pPr algn="l" marL="63500" marR="63500">
+                        <a:lnSpc>
+                          <a:spcPct val="100000"/>
+                        </a:lnSpc>
+                        <a:spcBef>
+                          <a:spcPts val="500"/>
+                        </a:spcBef>
+                        <a:spcAft>
+                          <a:spcPts val="500"/>
+                        </a:spcAft>
+                        <a:buNone/>
+                      </a:pPr>
+                      <a:r>
+                        <a:rPr sz="1100">
+                          <a:solidFill>
+                            <a:srgbClr val="000000">
+                              <a:alpha val="100000"/>
+                            </a:srgbClr>
+                          </a:solidFill>
+                          <a:latin typeface="Calibri"/>
+                          <a:cs typeface="Calibri"/>
+                          <a:ea typeface="Calibri"/>
+                          <a:sym typeface="Calibri"/>
+                        </a:rPr>
+                        <a:t>Mid Sussex</a:t>
+                      </a:r>
+                    </a:p>
+                  </a:txBody>
+                  <a:tcPr anchor="t" marB="0" marT="0" marR="0" marL="0">
+                    <a:lnL w="0" cmpd="sng" algn="ctr" cap="flat">
+                      <a:solidFill>
+                        <a:srgbClr val="FFFFFF">
+                          <a:alpha val="0"/>
+                        </a:srgbClr>
+                      </a:solidFill>
+                      <a:prstDash val="solid"/>
+                    </a:lnL>
+                    <a:lnR w="0" cmpd="sng" algn="ctr" cap="flat">
+                      <a:solidFill>
+                        <a:srgbClr val="FFFFFF">
+                          <a:alpha val="0"/>
+                        </a:srgbClr>
+                      </a:solidFill>
+                      <a:prstDash val="solid"/>
+                    </a:lnR>
+                    <a:lnT w="0" cmpd="sng" algn="ctr" cap="flat">
+                      <a:solidFill>
+                        <a:srgbClr val="FFFFFF">
+                          <a:alpha val="0"/>
+                        </a:srgbClr>
+                      </a:solidFill>
+                      <a:prstDash val="solid"/>
+                    </a:lnT>
+                    <a:lnB w="0" cmpd="sng" algn="ctr" cap="flat">
+                      <a:solidFill>
+                        <a:srgbClr val="FFFFFF">
+                          <a:alpha val="0"/>
+                        </a:srgbClr>
+                      </a:solidFill>
+                      <a:prstDash val="solid"/>
+                    </a:lnB>
+                  </a:tcPr>
+                </a:tc>
+                <a:tc>
+                  <a:txBody>
+                    <a:bodyPr/>
+                    <a:lstStyle/>
+                    <a:p>
+                      <a:pPr algn="l" marL="63500" marR="63500">
+                        <a:lnSpc>
+                          <a:spcPct val="100000"/>
+                        </a:lnSpc>
+                        <a:spcBef>
+                          <a:spcPts val="500"/>
+                        </a:spcBef>
+                        <a:spcAft>
+                          <a:spcPts val="500"/>
+                        </a:spcAft>
+                        <a:buNone/>
+                      </a:pPr>
+                      <a:r>
+                        <a:rPr sz="1100">
+                          <a:solidFill>
+                            <a:srgbClr val="000000">
+                              <a:alpha val="100000"/>
+                            </a:srgbClr>
+                          </a:solidFill>
+                          <a:latin typeface="Calibri"/>
+                          <a:cs typeface="Calibri"/>
+                          <a:ea typeface="Calibri"/>
+                          <a:sym typeface="Calibri"/>
+                        </a:rPr>
+                        <a:t>392</a:t>
+                      </a:r>
+                    </a:p>
+                  </a:txBody>
+                  <a:tcPr anchor="t" marB="0" marT="0" marR="0" marL="0">
+                    <a:lnL w="0" cmpd="sng" algn="ctr" cap="flat">
+                      <a:solidFill>
+                        <a:srgbClr val="FFFFFF">
+                          <a:alpha val="0"/>
+                        </a:srgbClr>
+                      </a:solidFill>
+                      <a:prstDash val="solid"/>
+                    </a:lnL>
+                    <a:lnR w="0" cmpd="sng" algn="ctr" cap="flat">
+                      <a:solidFill>
+                        <a:srgbClr val="FFFFFF">
+                          <a:alpha val="0"/>
+                        </a:srgbClr>
+                      </a:solidFill>
+                      <a:prstDash val="solid"/>
+                    </a:lnR>
+                    <a:lnT w="0" cmpd="sng" algn="ctr" cap="flat">
+                      <a:solidFill>
+                        <a:srgbClr val="FFFFFF">
+                          <a:alpha val="0"/>
+                        </a:srgbClr>
+                      </a:solidFill>
+                      <a:prstDash val="solid"/>
+                    </a:lnT>
+                    <a:lnB w="0" cmpd="sng" algn="ctr" cap="flat">
+                      <a:solidFill>
+                        <a:srgbClr val="FFFFFF">
+                          <a:alpha val="0"/>
+                        </a:srgbClr>
+                      </a:solidFill>
+                      <a:prstDash val="solid"/>
+                    </a:lnB>
+                  </a:tcPr>
+                </a:tc>
+                <a:tc>
+                  <a:txBody>
+                    <a:bodyPr/>
+                    <a:lstStyle/>
+                    <a:p>
+                      <a:pPr algn="l" marL="63500" marR="63500">
+                        <a:lnSpc>
+                          <a:spcPct val="100000"/>
+                        </a:lnSpc>
+                        <a:spcBef>
+                          <a:spcPts val="500"/>
+                        </a:spcBef>
+                        <a:spcAft>
+                          <a:spcPts val="500"/>
+                        </a:spcAft>
+                        <a:buNone/>
+                      </a:pPr>
+                      <a:r>
+                        <a:rPr sz="1100">
+                          <a:solidFill>
+                            <a:srgbClr val="000000">
+                              <a:alpha val="100000"/>
+                            </a:srgbClr>
+                          </a:solidFill>
+                          <a:latin typeface="Calibri"/>
+                          <a:cs typeface="Calibri"/>
+                          <a:ea typeface="Calibri"/>
+                          <a:sym typeface="Calibri"/>
+                        </a:rPr>
+                        <a:t>257.7</a:t>
+                      </a:r>
+                    </a:p>
+                  </a:txBody>
+                  <a:tcPr anchor="t" marB="0" marT="0" marR="0" marL="0">
+                    <a:lnL w="0" cmpd="sng" algn="ctr" cap="flat">
+                      <a:solidFill>
+                        <a:srgbClr val="FFFFFF">
+                          <a:alpha val="0"/>
+                        </a:srgbClr>
+                      </a:solidFill>
+                      <a:prstDash val="solid"/>
+                    </a:lnL>
+                    <a:lnR w="0" cmpd="sng" algn="ctr" cap="flat">
+                      <a:solidFill>
+                        <a:srgbClr val="FFFFFF">
+                          <a:alpha val="0"/>
+                        </a:srgbClr>
+                      </a:solidFill>
+                      <a:prstDash val="solid"/>
+                    </a:lnR>
+                    <a:lnT w="0" cmpd="sng" algn="ctr" cap="flat">
+                      <a:solidFill>
+                        <a:srgbClr val="FFFFFF">
+                          <a:alpha val="0"/>
+                        </a:srgbClr>
+                      </a:solidFill>
+                      <a:prstDash val="solid"/>
+                    </a:lnT>
+                    <a:lnB w="0" cmpd="sng" algn="ctr" cap="flat">
+                      <a:solidFill>
+                        <a:srgbClr val="FFFFFF">
+                          <a:alpha val="0"/>
+                        </a:srgbClr>
+                      </a:solidFill>
+                      <a:prstDash val="solid"/>
+                    </a:lnB>
+                  </a:tcPr>
+                </a:tc>
+                <a:tc>
+                  <a:txBody>
+                    <a:bodyPr/>
+                    <a:lstStyle/>
+                    <a:p>
+                      <a:pPr algn="l" marL="63500" marR="63500">
+                        <a:lnSpc>
+                          <a:spcPct val="100000"/>
+                        </a:lnSpc>
+                        <a:spcBef>
+                          <a:spcPts val="500"/>
+                        </a:spcBef>
+                        <a:spcAft>
+                          <a:spcPts val="500"/>
+                        </a:spcAft>
+                        <a:buNone/>
+                      </a:pPr>
+                      <a:r>
+                        <a:rPr sz="1100">
+                          <a:solidFill>
+                            <a:srgbClr val="000000">
+                              <a:alpha val="100000"/>
+                            </a:srgbClr>
+                          </a:solidFill>
+                          <a:latin typeface="Calibri"/>
+                          <a:cs typeface="Calibri"/>
+                          <a:ea typeface="Calibri"/>
+                          <a:sym typeface="Calibri"/>
+                        </a:rPr>
+                        <a:t>236th</a:t>
                       </a:r>
                     </a:p>
                   </a:txBody>
@@ -17012,7 +17354,7 @@
                           <a:ea typeface="Calibri"/>
                           <a:sym typeface="Calibri"/>
                         </a:rPr>
-                        <a:t>Mid Sussex</a:t>
+                        <a:t>Worthing</a:t>
                       </a:r>
                     </a:p>
                   </a:txBody>
@@ -17080,7 +17422,7 @@
                           <a:ea typeface="Calibri"/>
                           <a:sym typeface="Calibri"/>
                         </a:rPr>
-                        <a:t>367</a:t>
+                        <a:t>238</a:t>
                       </a:r>
                     </a:p>
                   </a:txBody>
@@ -17148,7 +17490,7 @@
                           <a:ea typeface="Calibri"/>
                           <a:sym typeface="Calibri"/>
                         </a:rPr>
-                        <a:t>241.2</a:t>
+                        <a:t>214.9</a:t>
                       </a:r>
                     </a:p>
                   </a:txBody>
@@ -17216,7 +17558,7 @@
                           <a:ea typeface="Calibri"/>
                           <a:sym typeface="Calibri"/>
                         </a:rPr>
-                        <a:t>251st</a:t>
+                        <a:t>291st</a:t>
                       </a:r>
                     </a:p>
                   </a:txBody>
@@ -17284,349 +17626,8 @@
                           <a:ea typeface="Calibri"/>
                           <a:sym typeface="Calibri"/>
                         </a:rPr>
-                        <a:t>Decile 8</a:t>
-                      </a:r>
-                    </a:p>
-                  </a:txBody>
-                  <a:tcPr anchor="t" marB="0" marT="0" marR="0" marL="0">
-                    <a:lnL w="0" cmpd="sng" algn="ctr" cap="flat">
-                      <a:solidFill>
-                        <a:srgbClr val="FFFFFF">
-                          <a:alpha val="0"/>
-                        </a:srgbClr>
-                      </a:solidFill>
-                      <a:prstDash val="solid"/>
-                    </a:lnL>
-                    <a:lnR w="0" cmpd="sng" algn="ctr" cap="flat">
-                      <a:solidFill>
-                        <a:srgbClr val="FFFFFF">
-                          <a:alpha val="0"/>
-                        </a:srgbClr>
-                      </a:solidFill>
-                      <a:prstDash val="solid"/>
-                    </a:lnR>
-                    <a:lnT w="0" cmpd="sng" algn="ctr" cap="flat">
-                      <a:solidFill>
-                        <a:srgbClr val="FFFFFF">
-                          <a:alpha val="0"/>
-                        </a:srgbClr>
-                      </a:solidFill>
-                      <a:prstDash val="solid"/>
-                    </a:lnT>
-                    <a:lnB w="0" cmpd="sng" algn="ctr" cap="flat">
-                      <a:solidFill>
-                        <a:srgbClr val="FFFFFF">
-                          <a:alpha val="0"/>
-                        </a:srgbClr>
-                      </a:solidFill>
-                      <a:prstDash val="solid"/>
-                    </a:lnB>
-                  </a:tcPr>
-                </a:tc>
-              </a:tr>
-              <a:tr h="182880">
-                <a:tc>
-                  <a:txBody>
-                    <a:bodyPr/>
-                    <a:lstStyle/>
-                    <a:p>
-                      <a:pPr algn="l" marL="63500" marR="63500">
-                        <a:lnSpc>
-                          <a:spcPct val="100000"/>
-                        </a:lnSpc>
-                        <a:spcBef>
-                          <a:spcPts val="500"/>
-                        </a:spcBef>
-                        <a:spcAft>
-                          <a:spcPts val="500"/>
-                        </a:spcAft>
-                        <a:buNone/>
-                      </a:pPr>
-                      <a:r>
-                        <a:rPr sz="1100">
-                          <a:solidFill>
-                            <a:srgbClr val="000000">
-                              <a:alpha val="100000"/>
-                            </a:srgbClr>
-                          </a:solidFill>
-                          <a:latin typeface="Calibri"/>
-                          <a:cs typeface="Calibri"/>
-                          <a:ea typeface="Calibri"/>
-                          <a:sym typeface="Calibri"/>
-                        </a:rPr>
-                        <a:t>Worthing</a:t>
-                      </a:r>
-                    </a:p>
-                  </a:txBody>
-                  <a:tcPr anchor="t" marB="0" marT="0" marR="0" marL="0">
-                    <a:lnL w="0" cmpd="sng" algn="ctr" cap="flat">
-                      <a:solidFill>
-                        <a:srgbClr val="FFFFFF">
-                          <a:alpha val="0"/>
-                        </a:srgbClr>
-                      </a:solidFill>
-                      <a:prstDash val="solid"/>
-                    </a:lnL>
-                    <a:lnR w="0" cmpd="sng" algn="ctr" cap="flat">
-                      <a:solidFill>
-                        <a:srgbClr val="FFFFFF">
-                          <a:alpha val="0"/>
-                        </a:srgbClr>
-                      </a:solidFill>
-                      <a:prstDash val="solid"/>
-                    </a:lnR>
-                    <a:lnT w="0" cmpd="sng" algn="ctr" cap="flat">
-                      <a:solidFill>
-                        <a:srgbClr val="FFFFFF">
-                          <a:alpha val="0"/>
-                        </a:srgbClr>
-                      </a:solidFill>
-                      <a:prstDash val="solid"/>
-                    </a:lnT>
-                    <a:lnB w="0" cmpd="sng" algn="ctr" cap="flat">
-                      <a:solidFill>
-                        <a:srgbClr val="FFFFFF">
-                          <a:alpha val="0"/>
-                        </a:srgbClr>
-                      </a:solidFill>
-                      <a:prstDash val="solid"/>
-                    </a:lnB>
-                  </a:tcPr>
-                </a:tc>
-                <a:tc>
-                  <a:txBody>
-                    <a:bodyPr/>
-                    <a:lstStyle/>
-                    <a:p>
-                      <a:pPr algn="l" marL="63500" marR="63500">
-                        <a:lnSpc>
-                          <a:spcPct val="100000"/>
-                        </a:lnSpc>
-                        <a:spcBef>
-                          <a:spcPts val="500"/>
-                        </a:spcBef>
-                        <a:spcAft>
-                          <a:spcPts val="500"/>
-                        </a:spcAft>
-                        <a:buNone/>
-                      </a:pPr>
-                      <a:r>
-                        <a:rPr sz="1100">
-                          <a:solidFill>
-                            <a:srgbClr val="000000">
-                              <a:alpha val="100000"/>
-                            </a:srgbClr>
-                          </a:solidFill>
-                          <a:latin typeface="Calibri"/>
-                          <a:cs typeface="Calibri"/>
-                          <a:ea typeface="Calibri"/>
-                          <a:sym typeface="Calibri"/>
-                        </a:rPr>
-                        <a:t>252</a:t>
-                      </a:r>
-                    </a:p>
-                  </a:txBody>
-                  <a:tcPr anchor="t" marB="0" marT="0" marR="0" marL="0">
-                    <a:lnL w="0" cmpd="sng" algn="ctr" cap="flat">
-                      <a:solidFill>
-                        <a:srgbClr val="FFFFFF">
-                          <a:alpha val="0"/>
-                        </a:srgbClr>
-                      </a:solidFill>
-                      <a:prstDash val="solid"/>
-                    </a:lnL>
-                    <a:lnR w="0" cmpd="sng" algn="ctr" cap="flat">
-                      <a:solidFill>
-                        <a:srgbClr val="FFFFFF">
-                          <a:alpha val="0"/>
-                        </a:srgbClr>
-                      </a:solidFill>
-                      <a:prstDash val="solid"/>
-                    </a:lnR>
-                    <a:lnT w="0" cmpd="sng" algn="ctr" cap="flat">
-                      <a:solidFill>
-                        <a:srgbClr val="FFFFFF">
-                          <a:alpha val="0"/>
-                        </a:srgbClr>
-                      </a:solidFill>
-                      <a:prstDash val="solid"/>
-                    </a:lnT>
-                    <a:lnB w="0" cmpd="sng" algn="ctr" cap="flat">
-                      <a:solidFill>
-                        <a:srgbClr val="FFFFFF">
-                          <a:alpha val="0"/>
-                        </a:srgbClr>
-                      </a:solidFill>
-                      <a:prstDash val="solid"/>
-                    </a:lnB>
-                  </a:tcPr>
-                </a:tc>
-                <a:tc>
-                  <a:txBody>
-                    <a:bodyPr/>
-                    <a:lstStyle/>
-                    <a:p>
-                      <a:pPr algn="l" marL="63500" marR="63500">
-                        <a:lnSpc>
-                          <a:spcPct val="100000"/>
-                        </a:lnSpc>
-                        <a:spcBef>
-                          <a:spcPts val="500"/>
-                        </a:spcBef>
-                        <a:spcAft>
-                          <a:spcPts val="500"/>
-                        </a:spcAft>
-                        <a:buNone/>
-                      </a:pPr>
-                      <a:r>
-                        <a:rPr sz="1100">
-                          <a:solidFill>
-                            <a:srgbClr val="000000">
-                              <a:alpha val="100000"/>
-                            </a:srgbClr>
-                          </a:solidFill>
-                          <a:latin typeface="Calibri"/>
-                          <a:cs typeface="Calibri"/>
-                          <a:ea typeface="Calibri"/>
-                          <a:sym typeface="Calibri"/>
-                        </a:rPr>
-                        <a:t>227.6</a:t>
-                      </a:r>
-                    </a:p>
-                  </a:txBody>
-                  <a:tcPr anchor="t" marB="0" marT="0" marR="0" marL="0">
-                    <a:lnL w="0" cmpd="sng" algn="ctr" cap="flat">
-                      <a:solidFill>
-                        <a:srgbClr val="FFFFFF">
-                          <a:alpha val="0"/>
-                        </a:srgbClr>
-                      </a:solidFill>
-                      <a:prstDash val="solid"/>
-                    </a:lnL>
-                    <a:lnR w="0" cmpd="sng" algn="ctr" cap="flat">
-                      <a:solidFill>
-                        <a:srgbClr val="FFFFFF">
-                          <a:alpha val="0"/>
-                        </a:srgbClr>
-                      </a:solidFill>
-                      <a:prstDash val="solid"/>
-                    </a:lnR>
-                    <a:lnT w="0" cmpd="sng" algn="ctr" cap="flat">
-                      <a:solidFill>
-                        <a:srgbClr val="FFFFFF">
-                          <a:alpha val="0"/>
-                        </a:srgbClr>
-                      </a:solidFill>
-                      <a:prstDash val="solid"/>
-                    </a:lnT>
-                    <a:lnB w="0" cmpd="sng" algn="ctr" cap="flat">
-                      <a:solidFill>
-                        <a:srgbClr val="FFFFFF">
-                          <a:alpha val="0"/>
-                        </a:srgbClr>
-                      </a:solidFill>
-                      <a:prstDash val="solid"/>
-                    </a:lnB>
-                  </a:tcPr>
-                </a:tc>
-                <a:tc>
-                  <a:txBody>
-                    <a:bodyPr/>
-                    <a:lstStyle/>
-                    <a:p>
-                      <a:pPr algn="l" marL="63500" marR="63500">
-                        <a:lnSpc>
-                          <a:spcPct val="100000"/>
-                        </a:lnSpc>
-                        <a:spcBef>
-                          <a:spcPts val="500"/>
-                        </a:spcBef>
-                        <a:spcAft>
-                          <a:spcPts val="500"/>
-                        </a:spcAft>
-                        <a:buNone/>
-                      </a:pPr>
-                      <a:r>
-                        <a:rPr sz="1100">
-                          <a:solidFill>
-                            <a:srgbClr val="000000">
-                              <a:alpha val="100000"/>
-                            </a:srgbClr>
-                          </a:solidFill>
-                          <a:latin typeface="Calibri"/>
-                          <a:cs typeface="Calibri"/>
-                          <a:ea typeface="Calibri"/>
-                          <a:sym typeface="Calibri"/>
-                        </a:rPr>
-                        <a:t>276th</a:t>
-                      </a:r>
-                    </a:p>
-                  </a:txBody>
-                  <a:tcPr anchor="t" marB="0" marT="0" marR="0" marL="0">
-                    <a:lnL w="0" cmpd="sng" algn="ctr" cap="flat">
-                      <a:solidFill>
-                        <a:srgbClr val="FFFFFF">
-                          <a:alpha val="0"/>
-                        </a:srgbClr>
-                      </a:solidFill>
-                      <a:prstDash val="solid"/>
-                    </a:lnL>
-                    <a:lnR w="0" cmpd="sng" algn="ctr" cap="flat">
-                      <a:solidFill>
-                        <a:srgbClr val="FFFFFF">
-                          <a:alpha val="0"/>
-                        </a:srgbClr>
-                      </a:solidFill>
-                      <a:prstDash val="solid"/>
-                    </a:lnR>
-                    <a:lnT w="0" cmpd="sng" algn="ctr" cap="flat">
-                      <a:solidFill>
-                        <a:srgbClr val="FFFFFF">
-                          <a:alpha val="0"/>
-                        </a:srgbClr>
-                      </a:solidFill>
-                      <a:prstDash val="solid"/>
-                    </a:lnT>
-                    <a:lnB w="0" cmpd="sng" algn="ctr" cap="flat">
-                      <a:solidFill>
-                        <a:srgbClr val="FFFFFF">
-                          <a:alpha val="0"/>
-                        </a:srgbClr>
-                      </a:solidFill>
-                      <a:prstDash val="solid"/>
-                    </a:lnB>
-                  </a:tcPr>
-                </a:tc>
-                <a:tc>
-                  <a:txBody>
-                    <a:bodyPr/>
-                    <a:lstStyle/>
-                    <a:p>
-                      <a:pPr algn="l" marL="63500" marR="63500">
-                        <a:lnSpc>
-                          <a:spcPct val="100000"/>
-                        </a:lnSpc>
-                        <a:spcBef>
-                          <a:spcPts val="500"/>
-                        </a:spcBef>
-                        <a:spcAft>
-                          <a:spcPts val="500"/>
-                        </a:spcAft>
-                        <a:buNone/>
-                      </a:pPr>
-                      <a:r>
-                        <a:rPr sz="1100">
-                          <a:solidFill>
-                            <a:srgbClr val="000000">
-                              <a:alpha val="100000"/>
-                            </a:srgbClr>
-                          </a:solidFill>
-                          <a:latin typeface="Calibri"/>
-                          <a:cs typeface="Calibri"/>
-                          <a:ea typeface="Calibri"/>
-                          <a:sym typeface="Calibri"/>
-                        </a:rPr>
-                        <a:t>Decile 9</a:t>
+                        <a:t>10% of authorities
+with lowest rate</a:t>
                       </a:r>
                     </a:p>
                   </a:txBody>
@@ -17764,7 +17765,7 @@
                           <a:ea typeface="Calibri"/>
                           <a:sym typeface="Calibri"/>
                         </a:rPr>
-                        <a:t>2,197</a:t>
+                        <a:t>2,145</a:t>
                       </a:r>
                     </a:p>
                   </a:txBody>
@@ -17832,7 +17833,7 @@
                           <a:ea typeface="Calibri"/>
                           <a:sym typeface="Calibri"/>
                         </a:rPr>
-                        <a:t>253.2</a:t>
+                        <a:t>247.2</a:t>
                       </a:r>
                     </a:p>
                   </a:txBody>
@@ -18106,7 +18107,7 @@
                           <a:ea typeface="Calibri"/>
                           <a:sym typeface="Calibri"/>
                         </a:rPr>
-                        <a:t>171,166</a:t>
+                        <a:t>171,439</a:t>
                       </a:r>
                     </a:p>
                   </a:txBody>
@@ -18174,7 +18175,7 @@
                           <a:ea typeface="Calibri"/>
                           <a:sym typeface="Calibri"/>
                         </a:rPr>
-                        <a:t>302.7</a:t>
+                        <a:t>303.2</a:t>
                       </a:r>
                     </a:p>
                   </a:txBody>
@@ -18448,7 +18449,7 @@
                           <a:ea typeface="Calibri"/>
                           <a:sym typeface="Calibri"/>
                         </a:rPr>
-                        <a:t>25,282</a:t>
+                        <a:t>25,642</a:t>
                       </a:r>
                     </a:p>
                   </a:txBody>
@@ -18516,7 +18517,7 @@
                           <a:ea typeface="Calibri"/>
                           <a:sym typeface="Calibri"/>
                         </a:rPr>
-                        <a:t>274.3</a:t>
+                        <a:t>278.2</a:t>
                       </a:r>
                     </a:p>
                   </a:txBody>
@@ -18743,7 +18744,7 @@
           <a:p>
             <a:r>
               <a:rPr/>
-              <a:t>Pack date: 03 September 2021</a:t>
+              <a:t>Pack date: 05 September 2021</a:t>
             </a:r>
           </a:p>
         </p:txBody>
@@ -18901,7 +18902,7 @@
           <a:p>
             <a:r>
               <a:rPr/>
-              <a:t>Pack date: 03 September 2021</a:t>
+              <a:t>Pack date: 05 September 2021</a:t>
             </a:r>
           </a:p>
         </p:txBody>
@@ -19059,7 +19060,7 @@
           <a:p>
             <a:r>
               <a:rPr/>
-              <a:t>Pack date: 03 September 2021</a:t>
+              <a:t>Pack date: 05 September 2021</a:t>
             </a:r>
           </a:p>
         </p:txBody>
@@ -19217,7 +19218,7 @@
           <a:p>
             <a:r>
               <a:rPr/>
-              <a:t>Pack date: 03 September 2021</a:t>
+              <a:t>Pack date: 05 September 2021</a:t>
             </a:r>
           </a:p>
         </p:txBody>
@@ -19375,7 +19376,7 @@
           <a:p>
             <a:r>
               <a:rPr/>
-              <a:t>Pack date: 03 September 2021</a:t>
+              <a:t>Pack date: 05 September 2021</a:t>
             </a:r>
           </a:p>
         </p:txBody>
@@ -19564,7 +19565,7 @@
           <a:p>
             <a:r>
               <a:rPr/>
-              <a:t>Pack date: 03 September 2021</a:t>
+              <a:t>Pack date: 05 September 2021</a:t>
             </a:r>
           </a:p>
         </p:txBody>
@@ -19722,7 +19723,7 @@
           <a:p>
             <a:r>
               <a:rPr/>
-              <a:t>Pack date: 03 September 2021</a:t>
+              <a:t>Pack date: 05 September 2021</a:t>
             </a:r>
           </a:p>
         </p:txBody>
@@ -19880,7 +19881,7 @@
           <a:p>
             <a:r>
               <a:rPr/>
-              <a:t>Pack date: 03 September 2021</a:t>
+              <a:t>Pack date: 05 September 2021</a:t>
             </a:r>
           </a:p>
         </p:txBody>
@@ -20038,7 +20039,7 @@
           <a:p>
             <a:r>
               <a:rPr/>
-              <a:t>Pack date: 03 September 2021</a:t>
+              <a:t>Pack date: 05 September 2021</a:t>
             </a:r>
           </a:p>
         </p:txBody>
@@ -20196,7 +20197,7 @@
           <a:p>
             <a:r>
               <a:rPr/>
-              <a:t>Pack date: 03 September 2021</a:t>
+              <a:t>Pack date: 05 September 2021</a:t>
             </a:r>
           </a:p>
         </p:txBody>
@@ -20328,7 +20329,7 @@
           <a:p>
             <a:r>
               <a:rPr/>
-              <a:t>Pack date: 03 September 2021</a:t>
+              <a:t>Pack date: 05 September 2021</a:t>
             </a:r>
           </a:p>
         </p:txBody>
@@ -20460,7 +20461,7 @@
           <a:p>
             <a:r>
               <a:rPr/>
-              <a:t>Pack date: 03 September 2021</a:t>
+              <a:t>Pack date: 05 September 2021</a:t>
             </a:r>
           </a:p>
         </p:txBody>
@@ -20592,7 +20593,7 @@
           <a:p>
             <a:r>
               <a:rPr/>
-              <a:t>Pack date: 03 September 2021</a:t>
+              <a:t>Pack date: 05 September 2021</a:t>
             </a:r>
           </a:p>
         </p:txBody>
@@ -20724,7 +20725,7 @@
           <a:p>
             <a:r>
               <a:rPr/>
-              <a:t>Pack date: 03 September 2021</a:t>
+              <a:t>Pack date: 05 September 2021</a:t>
             </a:r>
           </a:p>
         </p:txBody>
@@ -20856,7 +20857,7 @@
           <a:p>
             <a:r>
               <a:rPr/>
-              <a:t>Pack date: 03 September 2021</a:t>
+              <a:t>Pack date: 05 September 2021</a:t>
             </a:r>
           </a:p>
         </p:txBody>
@@ -20988,7 +20989,7 @@
           <a:p>
             <a:r>
               <a:rPr/>
-              <a:t>Pack date: 03 September 2021</a:t>
+              <a:t>Pack date: 05 September 2021</a:t>
             </a:r>
           </a:p>
         </p:txBody>

</xml_diff>

<commit_message>
updated mortality and ppt
</commit_message>
<xml_diff>
--- a/Latest_West_Sussex_C19_slide_deck.pptx
+++ b/Latest_West_Sussex_C19_slide_deck.pptx
@@ -7176,7 +7176,7 @@
           <a:p>
             <a:r>
               <a:rPr/>
-              <a:t>Pack date: 06 September 2021</a:t>
+              <a:t>Pack date: 07 September 2021</a:t>
             </a:r>
           </a:p>
         </p:txBody>
@@ -7308,7 +7308,7 @@
           <a:p>
             <a:r>
               <a:rPr/>
-              <a:t>Pack date: 06 September 2021</a:t>
+              <a:t>Pack date: 07 September 2021</a:t>
             </a:r>
           </a:p>
         </p:txBody>
@@ -7466,7 +7466,7 @@
           <a:p>
             <a:r>
               <a:rPr/>
-              <a:t>Pack date: 06 September 2021</a:t>
+              <a:t>Pack date: 07 September 2021</a:t>
             </a:r>
           </a:p>
         </p:txBody>
@@ -9101,7 +9101,7 @@
           <a:p>
             <a:r>
               <a:rPr/>
-              <a:t>Pack date: 06 September 2021</a:t>
+              <a:t>Pack date: 07 September 2021</a:t>
             </a:r>
           </a:p>
         </p:txBody>
@@ -10736,7 +10736,7 @@
           <a:p>
             <a:r>
               <a:rPr/>
-              <a:t>Pack date: 06 September 2021</a:t>
+              <a:t>Pack date: 07 September 2021</a:t>
             </a:r>
           </a:p>
         </p:txBody>
@@ -14739,7 +14739,7 @@
           <a:p>
             <a:r>
               <a:rPr/>
-              <a:t>Pack date: 06 September 2021</a:t>
+              <a:t>Pack date: 07 September 2021</a:t>
             </a:r>
           </a:p>
         </p:txBody>
@@ -18744,7 +18744,7 @@
           <a:p>
             <a:r>
               <a:rPr/>
-              <a:t>Pack date: 06 September 2021</a:t>
+              <a:t>Pack date: 07 September 2021</a:t>
             </a:r>
           </a:p>
         </p:txBody>
@@ -18902,7 +18902,7 @@
           <a:p>
             <a:r>
               <a:rPr/>
-              <a:t>Pack date: 06 September 2021</a:t>
+              <a:t>Pack date: 07 September 2021</a:t>
             </a:r>
           </a:p>
         </p:txBody>
@@ -19060,7 +19060,7 @@
           <a:p>
             <a:r>
               <a:rPr/>
-              <a:t>Pack date: 06 September 2021</a:t>
+              <a:t>Pack date: 07 September 2021</a:t>
             </a:r>
           </a:p>
         </p:txBody>
@@ -19218,7 +19218,7 @@
           <a:p>
             <a:r>
               <a:rPr/>
-              <a:t>Pack date: 06 September 2021</a:t>
+              <a:t>Pack date: 07 September 2021</a:t>
             </a:r>
           </a:p>
         </p:txBody>
@@ -19376,7 +19376,7 @@
           <a:p>
             <a:r>
               <a:rPr/>
-              <a:t>Pack date: 06 September 2021</a:t>
+              <a:t>Pack date: 07 September 2021</a:t>
             </a:r>
           </a:p>
         </p:txBody>
@@ -19565,7 +19565,7 @@
           <a:p>
             <a:r>
               <a:rPr/>
-              <a:t>Pack date: 06 September 2021</a:t>
+              <a:t>Pack date: 07 September 2021</a:t>
             </a:r>
           </a:p>
         </p:txBody>
@@ -19723,7 +19723,7 @@
           <a:p>
             <a:r>
               <a:rPr/>
-              <a:t>Pack date: 06 September 2021</a:t>
+              <a:t>Pack date: 07 September 2021</a:t>
             </a:r>
           </a:p>
         </p:txBody>
@@ -19881,7 +19881,7 @@
           <a:p>
             <a:r>
               <a:rPr/>
-              <a:t>Pack date: 06 September 2021</a:t>
+              <a:t>Pack date: 07 September 2021</a:t>
             </a:r>
           </a:p>
         </p:txBody>
@@ -20039,7 +20039,7 @@
           <a:p>
             <a:r>
               <a:rPr/>
-              <a:t>Pack date: 06 September 2021</a:t>
+              <a:t>Pack date: 07 September 2021</a:t>
             </a:r>
           </a:p>
         </p:txBody>
@@ -20197,7 +20197,7 @@
           <a:p>
             <a:r>
               <a:rPr/>
-              <a:t>Pack date: 06 September 2021</a:t>
+              <a:t>Pack date: 07 September 2021</a:t>
             </a:r>
           </a:p>
         </p:txBody>
@@ -20329,7 +20329,7 @@
           <a:p>
             <a:r>
               <a:rPr/>
-              <a:t>Pack date: 06 September 2021</a:t>
+              <a:t>Pack date: 07 September 2021</a:t>
             </a:r>
           </a:p>
         </p:txBody>
@@ -20461,7 +20461,7 @@
           <a:p>
             <a:r>
               <a:rPr/>
-              <a:t>Pack date: 06 September 2021</a:t>
+              <a:t>Pack date: 07 September 2021</a:t>
             </a:r>
           </a:p>
         </p:txBody>
@@ -20593,7 +20593,7 @@
           <a:p>
             <a:r>
               <a:rPr/>
-              <a:t>Pack date: 06 September 2021</a:t>
+              <a:t>Pack date: 07 September 2021</a:t>
             </a:r>
           </a:p>
         </p:txBody>
@@ -20725,7 +20725,7 @@
           <a:p>
             <a:r>
               <a:rPr/>
-              <a:t>Pack date: 06 September 2021</a:t>
+              <a:t>Pack date: 07 September 2021</a:t>
             </a:r>
           </a:p>
         </p:txBody>
@@ -20857,7 +20857,7 @@
           <a:p>
             <a:r>
               <a:rPr/>
-              <a:t>Pack date: 06 September 2021</a:t>
+              <a:t>Pack date: 07 September 2021</a:t>
             </a:r>
           </a:p>
         </p:txBody>
@@ -20989,7 +20989,7 @@
           <a:p>
             <a:r>
               <a:rPr/>
-              <a:t>Pack date: 06 September 2021</a:t>
+              <a:t>Pack date: 07 September 2021</a:t>
             </a:r>
           </a:p>
         </p:txBody>

</xml_diff>

<commit_message>
dec 11 update vaccines
</commit_message>
<xml_diff>
--- a/Latest_West_Sussex_C19_slide_deck.pptx
+++ b/Latest_West_Sussex_C19_slide_deck.pptx
@@ -7176,7 +7176,7 @@
           <a:p>
             <a:r>
               <a:rPr/>
-              <a:t>Pack date: 10 December 2021</a:t>
+              <a:t>Pack date: 11 December 2021</a:t>
             </a:r>
           </a:p>
         </p:txBody>
@@ -7308,7 +7308,7 @@
           <a:p>
             <a:r>
               <a:rPr/>
-              <a:t>Pack date: 10 December 2021</a:t>
+              <a:t>Pack date: 11 December 2021</a:t>
             </a:r>
           </a:p>
         </p:txBody>
@@ -7466,7 +7466,7 @@
           <a:p>
             <a:r>
               <a:rPr/>
-              <a:t>Pack date: 10 December 2021</a:t>
+              <a:t>Pack date: 11 December 2021</a:t>
             </a:r>
           </a:p>
         </p:txBody>
@@ -7547,7 +7547,7 @@
           <a:p>
             <a:r>
               <a:rPr/>
-              <a:t>Upper Tier Local Authority cumulative cases as at 10 December</a:t>
+              <a:t>Upper Tier Local Authority cumulative cases as at 11 December</a:t>
             </a:r>
           </a:p>
         </p:txBody>
@@ -8096,7 +8096,7 @@
                           <a:ea typeface="Calibri"/>
                           <a:sym typeface="Calibri"/>
                         </a:rPr>
-                        <a:t>121,708</a:t>
+                        <a:t>122,489</a:t>
                       </a:r>
                     </a:p>
                   </a:txBody>
@@ -8164,7 +8164,7 @@
                           <a:ea typeface="Calibri"/>
                           <a:sym typeface="Calibri"/>
                         </a:rPr>
-                        <a:t>14,027.6</a:t>
+                        <a:t>14,117.6</a:t>
                       </a:r>
                     </a:p>
                   </a:txBody>
@@ -8438,7 +8438,7 @@
                           <a:ea typeface="Calibri"/>
                           <a:sym typeface="Calibri"/>
                         </a:rPr>
-                        <a:t>9,092,016</a:t>
+                        <a:t>9,138,773</a:t>
                       </a:r>
                     </a:p>
                   </a:txBody>
@@ -8506,7 +8506,7 @@
                           <a:ea typeface="Calibri"/>
                           <a:sym typeface="Calibri"/>
                         </a:rPr>
-                        <a:t>16,077.8</a:t>
+                        <a:t>16,160.5</a:t>
                       </a:r>
                     </a:p>
                   </a:txBody>
@@ -8780,7 +8780,7 @@
                           <a:ea typeface="Calibri"/>
                           <a:sym typeface="Calibri"/>
                         </a:rPr>
-                        <a:t>1,370,863</a:t>
+                        <a:t>1,379,855</a:t>
                       </a:r>
                     </a:p>
                   </a:txBody>
@@ -8848,7 +8848,7 @@
                           <a:ea typeface="Calibri"/>
                           <a:sym typeface="Calibri"/>
                         </a:rPr>
-                        <a:t>14,872.8</a:t>
+                        <a:t>14,970.3</a:t>
                       </a:r>
                     </a:p>
                   </a:txBody>
@@ -9101,7 +9101,7 @@
           <a:p>
             <a:r>
               <a:rPr/>
-              <a:t>Pack date: 10 December 2021</a:t>
+              <a:t>Pack date: 11 December 2021</a:t>
             </a:r>
           </a:p>
         </p:txBody>
@@ -9182,7 +9182,7 @@
           <a:p>
             <a:r>
               <a:rPr/>
-              <a:t>Upper Tier Local Authority rolling 7 day cases as at 10 December</a:t>
+              <a:t>Upper Tier Local Authority rolling 7 day cases as at 11 December</a:t>
             </a:r>
           </a:p>
         </p:txBody>
@@ -9263,7 +9263,7 @@
           <a:p>
             <a:r>
               <a:rPr/>
-              <a:t>Note that the very recent days are excluded in the 7-day total as these are thought to be incomplete. As such, this data represents cases in the seven days to 05 December</a:t>
+              <a:t>Note that the very recent days are excluded in the 7-day total as these are thought to be incomplete. As such, this data represents cases in the seven days to 06 December</a:t>
             </a:r>
           </a:p>
         </p:txBody>
@@ -9731,7 +9731,7 @@
                           <a:ea typeface="Calibri"/>
                           <a:sym typeface="Calibri"/>
                         </a:rPr>
-                        <a:t>5,918</a:t>
+                        <a:t>5,728</a:t>
                       </a:r>
                     </a:p>
                   </a:txBody>
@@ -9799,7 +9799,7 @@
                           <a:ea typeface="Calibri"/>
                           <a:sym typeface="Calibri"/>
                         </a:rPr>
-                        <a:t>682.1</a:t>
+                        <a:t>660.2</a:t>
                       </a:r>
                     </a:p>
                   </a:txBody>
@@ -9867,7 +9867,7 @@
                           <a:ea typeface="Calibri"/>
                           <a:sym typeface="Calibri"/>
                         </a:rPr>
-                        <a:t>14th</a:t>
+                        <a:t>16th</a:t>
                       </a:r>
                     </a:p>
                   </a:txBody>
@@ -9935,8 +9935,7 @@
                           <a:ea typeface="Calibri"/>
                           <a:sym typeface="Calibri"/>
                         </a:rPr>
-                        <a:t>10% of authorities
-with highest rate</a:t>
+                        <a:t>Decile 2</a:t>
                       </a:r>
                     </a:p>
                   </a:txBody>
@@ -10074,7 +10073,7 @@
                           <a:ea typeface="Calibri"/>
                           <a:sym typeface="Calibri"/>
                         </a:rPr>
-                        <a:t>284,902</a:t>
+                        <a:t>287,525</a:t>
                       </a:r>
                     </a:p>
                   </a:txBody>
@@ -10142,7 +10141,7 @@
                           <a:ea typeface="Calibri"/>
                           <a:sym typeface="Calibri"/>
                         </a:rPr>
-                        <a:t>503.8</a:t>
+                        <a:t>508.4</a:t>
                       </a:r>
                     </a:p>
                   </a:txBody>
@@ -10416,7 +10415,7 @@
                           <a:ea typeface="Calibri"/>
                           <a:sym typeface="Calibri"/>
                         </a:rPr>
-                        <a:t>61,279</a:t>
+                        <a:t>61,023</a:t>
                       </a:r>
                     </a:p>
                   </a:txBody>
@@ -10484,7 +10483,7 @@
                           <a:ea typeface="Calibri"/>
                           <a:sym typeface="Calibri"/>
                         </a:rPr>
-                        <a:t>664.8</a:t>
+                        <a:t>662.1</a:t>
                       </a:r>
                     </a:p>
                   </a:txBody>
@@ -10737,7 +10736,7 @@
           <a:p>
             <a:r>
               <a:rPr/>
-              <a:t>Pack date: 10 December 2021</a:t>
+              <a:t>Pack date: 11 December 2021</a:t>
             </a:r>
           </a:p>
         </p:txBody>
@@ -10818,7 +10817,7 @@
           <a:p>
             <a:r>
               <a:rPr/>
-              <a:t>Lower Tier Local Authority cumulative cases as at 10 December</a:t>
+              <a:t>Lower Tier Local Authority cumulative cases as at 11 December</a:t>
             </a:r>
           </a:p>
         </p:txBody>
@@ -11340,7 +11339,7 @@
                           <a:ea typeface="Calibri"/>
                           <a:sym typeface="Calibri"/>
                         </a:rPr>
-                        <a:t>8,290</a:t>
+                        <a:t>8,356</a:t>
                       </a:r>
                     </a:p>
                   </a:txBody>
@@ -11408,7 +11407,7 @@
                           <a:ea typeface="Calibri"/>
                           <a:sym typeface="Calibri"/>
                         </a:rPr>
-                        <a:t>12,915.4</a:t>
+                        <a:t>13,018.2</a:t>
                       </a:r>
                     </a:p>
                   </a:txBody>
@@ -11682,7 +11681,7 @@
                           <a:ea typeface="Calibri"/>
                           <a:sym typeface="Calibri"/>
                         </a:rPr>
-                        <a:t>23,285</a:t>
+                        <a:t>23,425</a:t>
                       </a:r>
                     </a:p>
                   </a:txBody>
@@ -11750,7 +11749,7 @@
                           <a:ea typeface="Calibri"/>
                           <a:sym typeface="Calibri"/>
                         </a:rPr>
-                        <a:t>14,451.7</a:t>
+                        <a:t>14,538.6</a:t>
                       </a:r>
                     </a:p>
                   </a:txBody>
@@ -12024,7 +12023,7 @@
                           <a:ea typeface="Calibri"/>
                           <a:sym typeface="Calibri"/>
                         </a:rPr>
-                        <a:t>15,666</a:t>
+                        <a:t>15,752</a:t>
                       </a:r>
                     </a:p>
                   </a:txBody>
@@ -12092,7 +12091,7 @@
                           <a:ea typeface="Calibri"/>
                           <a:sym typeface="Calibri"/>
                         </a:rPr>
-                        <a:t>12,893.0</a:t>
+                        <a:t>12,963.8</a:t>
                       </a:r>
                     </a:p>
                   </a:txBody>
@@ -12366,7 +12365,7 @@
                           <a:ea typeface="Calibri"/>
                           <a:sym typeface="Calibri"/>
                         </a:rPr>
-                        <a:t>19,287</a:t>
+                        <a:t>19,400</a:t>
                       </a:r>
                     </a:p>
                   </a:txBody>
@@ -12434,7 +12433,7 @@
                           <a:ea typeface="Calibri"/>
                           <a:sym typeface="Calibri"/>
                         </a:rPr>
-                        <a:t>17,148.0</a:t>
+                        <a:t>17,248.4</a:t>
                       </a:r>
                     </a:p>
                   </a:txBody>
@@ -12502,7 +12501,7 @@
                           <a:ea typeface="Calibri"/>
                           <a:sym typeface="Calibri"/>
                         </a:rPr>
-                        <a:t>89th</a:t>
+                        <a:t>88th</a:t>
                       </a:r>
                     </a:p>
                   </a:txBody>
@@ -12708,7 +12707,7 @@
                           <a:ea typeface="Calibri"/>
                           <a:sym typeface="Calibri"/>
                         </a:rPr>
-                        <a:t>18,423</a:t>
+                        <a:t>18,533</a:t>
                       </a:r>
                     </a:p>
                   </a:txBody>
@@ -12776,7 +12775,7 @@
                           <a:ea typeface="Calibri"/>
                           <a:sym typeface="Calibri"/>
                         </a:rPr>
-                        <a:t>12,664.1</a:t>
+                        <a:t>12,739.7</a:t>
                       </a:r>
                     </a:p>
                   </a:txBody>
@@ -13050,7 +13049,7 @@
                           <a:ea typeface="Calibri"/>
                           <a:sym typeface="Calibri"/>
                         </a:rPr>
-                        <a:t>22,062</a:t>
+                        <a:t>22,201</a:t>
                       </a:r>
                     </a:p>
                   </a:txBody>
@@ -13118,7 +13117,7 @@
                           <a:ea typeface="Calibri"/>
                           <a:sym typeface="Calibri"/>
                         </a:rPr>
-                        <a:t>14,500.9</a:t>
+                        <a:t>14,592.3</a:t>
                       </a:r>
                     </a:p>
                   </a:txBody>
@@ -13186,7 +13185,7 @@
                           <a:ea typeface="Calibri"/>
                           <a:sym typeface="Calibri"/>
                         </a:rPr>
-                        <a:t>222nd</a:t>
+                        <a:t>221st</a:t>
                       </a:r>
                     </a:p>
                   </a:txBody>
@@ -13392,7 +13391,7 @@
                           <a:ea typeface="Calibri"/>
                           <a:sym typeface="Calibri"/>
                         </a:rPr>
-                        <a:t>14,695</a:t>
+                        <a:t>14,822</a:t>
                       </a:r>
                     </a:p>
                   </a:txBody>
@@ -13460,7 +13459,7 @@
                           <a:ea typeface="Calibri"/>
                           <a:sym typeface="Calibri"/>
                         </a:rPr>
-                        <a:t>13,271.4</a:t>
+                        <a:t>13,386.1</a:t>
                       </a:r>
                     </a:p>
                   </a:txBody>
@@ -13528,7 +13527,7 @@
                           <a:ea typeface="Calibri"/>
                           <a:sym typeface="Calibri"/>
                         </a:rPr>
-                        <a:t>263rd</a:t>
+                        <a:t>261st</a:t>
                       </a:r>
                     </a:p>
                   </a:txBody>
@@ -13734,7 +13733,7 @@
                           <a:ea typeface="Calibri"/>
                           <a:sym typeface="Calibri"/>
                         </a:rPr>
-                        <a:t>121,708</a:t>
+                        <a:t>122,489</a:t>
                       </a:r>
                     </a:p>
                   </a:txBody>
@@ -13802,7 +13801,7 @@
                           <a:ea typeface="Calibri"/>
                           <a:sym typeface="Calibri"/>
                         </a:rPr>
-                        <a:t>14,027.6</a:t>
+                        <a:t>14,117.6</a:t>
                       </a:r>
                     </a:p>
                   </a:txBody>
@@ -14076,7 +14075,7 @@
                           <a:ea typeface="Calibri"/>
                           <a:sym typeface="Calibri"/>
                         </a:rPr>
-                        <a:t>1,370,863</a:t>
+                        <a:t>1,379,855</a:t>
                       </a:r>
                     </a:p>
                   </a:txBody>
@@ -14144,7 +14143,7 @@
                           <a:ea typeface="Calibri"/>
                           <a:sym typeface="Calibri"/>
                         </a:rPr>
-                        <a:t>14,872.8</a:t>
+                        <a:t>14,970.3</a:t>
                       </a:r>
                     </a:p>
                   </a:txBody>
@@ -14418,7 +14417,7 @@
                           <a:ea typeface="Calibri"/>
                           <a:sym typeface="Calibri"/>
                         </a:rPr>
-                        <a:t>9,092,016</a:t>
+                        <a:t>9,138,773</a:t>
                       </a:r>
                     </a:p>
                   </a:txBody>
@@ -14486,7 +14485,7 @@
                           <a:ea typeface="Calibri"/>
                           <a:sym typeface="Calibri"/>
                         </a:rPr>
-                        <a:t>16,077.8</a:t>
+                        <a:t>16,160.5</a:t>
                       </a:r>
                     </a:p>
                   </a:txBody>
@@ -14739,7 +14738,7 @@
           <a:p>
             <a:r>
               <a:rPr/>
-              <a:t>Pack date: 10 December 2021</a:t>
+              <a:t>Pack date: 11 December 2021</a:t>
             </a:r>
           </a:p>
         </p:txBody>
@@ -14820,7 +14819,7 @@
           <a:p>
             <a:r>
               <a:rPr/>
-              <a:t>Lower Tier Local Authority rolling cases as at 10 December</a:t>
+              <a:t>Lower Tier Local Authority rolling cases as at 11 December</a:t>
             </a:r>
           </a:p>
         </p:txBody>
@@ -14901,7 +14900,7 @@
           <a:p>
             <a:r>
               <a:rPr/>
-              <a:t>Note that the very recent days are excluded in the 7-day total as these are thought to be incomplete. As such, this data represents cases in the seven days to 05 December</a:t>
+              <a:t>Note that the very recent days are excluded in the 7-day total as these are thought to be incomplete. As such, this data represents cases in the seven days to 06 December</a:t>
             </a:r>
           </a:p>
         </p:txBody>
@@ -15369,7 +15368,7 @@
                           <a:ea typeface="Calibri"/>
                           <a:sym typeface="Calibri"/>
                         </a:rPr>
-                        <a:t>381</a:t>
+                        <a:t>364</a:t>
                       </a:r>
                     </a:p>
                   </a:txBody>
@@ -15437,7 +15436,7 @@
                           <a:ea typeface="Calibri"/>
                           <a:sym typeface="Calibri"/>
                         </a:rPr>
-                        <a:t>593.6</a:t>
+                        <a:t>567.1</a:t>
                       </a:r>
                     </a:p>
                   </a:txBody>
@@ -15505,7 +15504,7 @@
                           <a:ea typeface="Calibri"/>
                           <a:sym typeface="Calibri"/>
                         </a:rPr>
-                        <a:t>100th</a:t>
+                        <a:t>121st</a:t>
                       </a:r>
                     </a:p>
                   </a:txBody>
@@ -15711,7 +15710,7 @@
                           <a:ea typeface="Calibri"/>
                           <a:sym typeface="Calibri"/>
                         </a:rPr>
-                        <a:t>1,124</a:t>
+                        <a:t>1,099</a:t>
                       </a:r>
                     </a:p>
                   </a:txBody>
@@ -15779,7 +15778,7 @@
                           <a:ea typeface="Calibri"/>
                           <a:sym typeface="Calibri"/>
                         </a:rPr>
-                        <a:t>697.6</a:t>
+                        <a:t>682.1</a:t>
                       </a:r>
                     </a:p>
                   </a:txBody>
@@ -15847,7 +15846,7 @@
                           <a:ea typeface="Calibri"/>
                           <a:sym typeface="Calibri"/>
                         </a:rPr>
-                        <a:t>39th</a:t>
+                        <a:t>46th</a:t>
                       </a:r>
                     </a:p>
                   </a:txBody>
@@ -16053,7 +16052,7 @@
                           <a:ea typeface="Calibri"/>
                           <a:sym typeface="Calibri"/>
                         </a:rPr>
-                        <a:t>884</a:t>
+                        <a:t>860</a:t>
                       </a:r>
                     </a:p>
                   </a:txBody>
@@ -16121,7 +16120,7 @@
                           <a:ea typeface="Calibri"/>
                           <a:sym typeface="Calibri"/>
                         </a:rPr>
-                        <a:t>727.5</a:t>
+                        <a:t>707.8</a:t>
                       </a:r>
                     </a:p>
                   </a:txBody>
@@ -16189,7 +16188,7 @@
                           <a:ea typeface="Calibri"/>
                           <a:sym typeface="Calibri"/>
                         </a:rPr>
-                        <a:t>33rd</a:t>
+                        <a:t>36th</a:t>
                       </a:r>
                     </a:p>
                   </a:txBody>
@@ -16395,7 +16394,7 @@
                           <a:ea typeface="Calibri"/>
                           <a:sym typeface="Calibri"/>
                         </a:rPr>
-                        <a:t>827</a:t>
+                        <a:t>793</a:t>
                       </a:r>
                     </a:p>
                   </a:txBody>
@@ -16463,7 +16462,7 @@
                           <a:ea typeface="Calibri"/>
                           <a:sym typeface="Calibri"/>
                         </a:rPr>
-                        <a:t>735.3</a:t>
+                        <a:t>705.1</a:t>
                       </a:r>
                     </a:p>
                   </a:txBody>
@@ -16531,7 +16530,691 @@
                           <a:ea typeface="Calibri"/>
                           <a:sym typeface="Calibri"/>
                         </a:rPr>
-                        <a:t>31st</a:t>
+                        <a:t>37th</a:t>
+                      </a:r>
+                    </a:p>
+                  </a:txBody>
+                  <a:tcPr anchor="t" marB="0" marT="0" marR="0" marL="0">
+                    <a:lnL w="0" cmpd="sng" algn="ctr" cap="flat">
+                      <a:solidFill>
+                        <a:srgbClr val="FFFFFF">
+                          <a:alpha val="0"/>
+                        </a:srgbClr>
+                      </a:solidFill>
+                      <a:prstDash val="solid"/>
+                    </a:lnL>
+                    <a:lnR w="0" cmpd="sng" algn="ctr" cap="flat">
+                      <a:solidFill>
+                        <a:srgbClr val="FFFFFF">
+                          <a:alpha val="0"/>
+                        </a:srgbClr>
+                      </a:solidFill>
+                      <a:prstDash val="solid"/>
+                    </a:lnR>
+                    <a:lnT w="0" cmpd="sng" algn="ctr" cap="flat">
+                      <a:solidFill>
+                        <a:srgbClr val="FFFFFF">
+                          <a:alpha val="0"/>
+                        </a:srgbClr>
+                      </a:solidFill>
+                      <a:prstDash val="solid"/>
+                    </a:lnT>
+                    <a:lnB w="0" cmpd="sng" algn="ctr" cap="flat">
+                      <a:solidFill>
+                        <a:srgbClr val="FFFFFF">
+                          <a:alpha val="0"/>
+                        </a:srgbClr>
+                      </a:solidFill>
+                      <a:prstDash val="solid"/>
+                    </a:lnB>
+                  </a:tcPr>
+                </a:tc>
+                <a:tc>
+                  <a:txBody>
+                    <a:bodyPr/>
+                    <a:lstStyle/>
+                    <a:p>
+                      <a:pPr algn="l" marL="63500" marR="63500">
+                        <a:lnSpc>
+                          <a:spcPct val="100000"/>
+                        </a:lnSpc>
+                        <a:spcBef>
+                          <a:spcPts val="500"/>
+                        </a:spcBef>
+                        <a:spcAft>
+                          <a:spcPts val="500"/>
+                        </a:spcAft>
+                        <a:buNone/>
+                      </a:pPr>
+                      <a:r>
+                        <a:rPr sz="1100">
+                          <a:solidFill>
+                            <a:srgbClr val="000000">
+                              <a:alpha val="100000"/>
+                            </a:srgbClr>
+                          </a:solidFill>
+                          <a:latin typeface="Calibri"/>
+                          <a:cs typeface="Calibri"/>
+                          <a:ea typeface="Calibri"/>
+                          <a:sym typeface="Calibri"/>
+                        </a:rPr>
+                        <a:t>Decile 2</a:t>
+                      </a:r>
+                    </a:p>
+                  </a:txBody>
+                  <a:tcPr anchor="t" marB="0" marT="0" marR="0" marL="0">
+                    <a:lnL w="0" cmpd="sng" algn="ctr" cap="flat">
+                      <a:solidFill>
+                        <a:srgbClr val="FFFFFF">
+                          <a:alpha val="0"/>
+                        </a:srgbClr>
+                      </a:solidFill>
+                      <a:prstDash val="solid"/>
+                    </a:lnL>
+                    <a:lnR w="0" cmpd="sng" algn="ctr" cap="flat">
+                      <a:solidFill>
+                        <a:srgbClr val="FFFFFF">
+                          <a:alpha val="0"/>
+                        </a:srgbClr>
+                      </a:solidFill>
+                      <a:prstDash val="solid"/>
+                    </a:lnR>
+                    <a:lnT w="0" cmpd="sng" algn="ctr" cap="flat">
+                      <a:solidFill>
+                        <a:srgbClr val="FFFFFF">
+                          <a:alpha val="0"/>
+                        </a:srgbClr>
+                      </a:solidFill>
+                      <a:prstDash val="solid"/>
+                    </a:lnT>
+                    <a:lnB w="0" cmpd="sng" algn="ctr" cap="flat">
+                      <a:solidFill>
+                        <a:srgbClr val="FFFFFF">
+                          <a:alpha val="0"/>
+                        </a:srgbClr>
+                      </a:solidFill>
+                      <a:prstDash val="solid"/>
+                    </a:lnB>
+                  </a:tcPr>
+                </a:tc>
+              </a:tr>
+              <a:tr h="182880">
+                <a:tc>
+                  <a:txBody>
+                    <a:bodyPr/>
+                    <a:lstStyle/>
+                    <a:p>
+                      <a:pPr algn="l" marL="63500" marR="63500">
+                        <a:lnSpc>
+                          <a:spcPct val="100000"/>
+                        </a:lnSpc>
+                        <a:spcBef>
+                          <a:spcPts val="500"/>
+                        </a:spcBef>
+                        <a:spcAft>
+                          <a:spcPts val="500"/>
+                        </a:spcAft>
+                        <a:buNone/>
+                      </a:pPr>
+                      <a:r>
+                        <a:rPr sz="1100">
+                          <a:solidFill>
+                            <a:srgbClr val="000000">
+                              <a:alpha val="100000"/>
+                            </a:srgbClr>
+                          </a:solidFill>
+                          <a:latin typeface="Calibri"/>
+                          <a:cs typeface="Calibri"/>
+                          <a:ea typeface="Calibri"/>
+                          <a:sym typeface="Calibri"/>
+                        </a:rPr>
+                        <a:t>Horsham</a:t>
+                      </a:r>
+                    </a:p>
+                  </a:txBody>
+                  <a:tcPr anchor="t" marB="0" marT="0" marR="0" marL="0">
+                    <a:lnL w="0" cmpd="sng" algn="ctr" cap="flat">
+                      <a:solidFill>
+                        <a:srgbClr val="FFFFFF">
+                          <a:alpha val="0"/>
+                        </a:srgbClr>
+                      </a:solidFill>
+                      <a:prstDash val="solid"/>
+                    </a:lnL>
+                    <a:lnR w="0" cmpd="sng" algn="ctr" cap="flat">
+                      <a:solidFill>
+                        <a:srgbClr val="FFFFFF">
+                          <a:alpha val="0"/>
+                        </a:srgbClr>
+                      </a:solidFill>
+                      <a:prstDash val="solid"/>
+                    </a:lnR>
+                    <a:lnT w="0" cmpd="sng" algn="ctr" cap="flat">
+                      <a:solidFill>
+                        <a:srgbClr val="FFFFFF">
+                          <a:alpha val="0"/>
+                        </a:srgbClr>
+                      </a:solidFill>
+                      <a:prstDash val="solid"/>
+                    </a:lnT>
+                    <a:lnB w="0" cmpd="sng" algn="ctr" cap="flat">
+                      <a:solidFill>
+                        <a:srgbClr val="FFFFFF">
+                          <a:alpha val="0"/>
+                        </a:srgbClr>
+                      </a:solidFill>
+                      <a:prstDash val="solid"/>
+                    </a:lnB>
+                  </a:tcPr>
+                </a:tc>
+                <a:tc>
+                  <a:txBody>
+                    <a:bodyPr/>
+                    <a:lstStyle/>
+                    <a:p>
+                      <a:pPr algn="l" marL="63500" marR="63500">
+                        <a:lnSpc>
+                          <a:spcPct val="100000"/>
+                        </a:lnSpc>
+                        <a:spcBef>
+                          <a:spcPts val="500"/>
+                        </a:spcBef>
+                        <a:spcAft>
+                          <a:spcPts val="500"/>
+                        </a:spcAft>
+                        <a:buNone/>
+                      </a:pPr>
+                      <a:r>
+                        <a:rPr sz="1100">
+                          <a:solidFill>
+                            <a:srgbClr val="000000">
+                              <a:alpha val="100000"/>
+                            </a:srgbClr>
+                          </a:solidFill>
+                          <a:latin typeface="Calibri"/>
+                          <a:cs typeface="Calibri"/>
+                          <a:ea typeface="Calibri"/>
+                          <a:sym typeface="Calibri"/>
+                        </a:rPr>
+                        <a:t>747</a:t>
+                      </a:r>
+                    </a:p>
+                  </a:txBody>
+                  <a:tcPr anchor="t" marB="0" marT="0" marR="0" marL="0">
+                    <a:lnL w="0" cmpd="sng" algn="ctr" cap="flat">
+                      <a:solidFill>
+                        <a:srgbClr val="FFFFFF">
+                          <a:alpha val="0"/>
+                        </a:srgbClr>
+                      </a:solidFill>
+                      <a:prstDash val="solid"/>
+                    </a:lnL>
+                    <a:lnR w="0" cmpd="sng" algn="ctr" cap="flat">
+                      <a:solidFill>
+                        <a:srgbClr val="FFFFFF">
+                          <a:alpha val="0"/>
+                        </a:srgbClr>
+                      </a:solidFill>
+                      <a:prstDash val="solid"/>
+                    </a:lnR>
+                    <a:lnT w="0" cmpd="sng" algn="ctr" cap="flat">
+                      <a:solidFill>
+                        <a:srgbClr val="FFFFFF">
+                          <a:alpha val="0"/>
+                        </a:srgbClr>
+                      </a:solidFill>
+                      <a:prstDash val="solid"/>
+                    </a:lnT>
+                    <a:lnB w="0" cmpd="sng" algn="ctr" cap="flat">
+                      <a:solidFill>
+                        <a:srgbClr val="FFFFFF">
+                          <a:alpha val="0"/>
+                        </a:srgbClr>
+                      </a:solidFill>
+                      <a:prstDash val="solid"/>
+                    </a:lnB>
+                  </a:tcPr>
+                </a:tc>
+                <a:tc>
+                  <a:txBody>
+                    <a:bodyPr/>
+                    <a:lstStyle/>
+                    <a:p>
+                      <a:pPr algn="l" marL="63500" marR="63500">
+                        <a:lnSpc>
+                          <a:spcPct val="100000"/>
+                        </a:lnSpc>
+                        <a:spcBef>
+                          <a:spcPts val="500"/>
+                        </a:spcBef>
+                        <a:spcAft>
+                          <a:spcPts val="500"/>
+                        </a:spcAft>
+                        <a:buNone/>
+                      </a:pPr>
+                      <a:r>
+                        <a:rPr sz="1100">
+                          <a:solidFill>
+                            <a:srgbClr val="000000">
+                              <a:alpha val="100000"/>
+                            </a:srgbClr>
+                          </a:solidFill>
+                          <a:latin typeface="Calibri"/>
+                          <a:cs typeface="Calibri"/>
+                          <a:ea typeface="Calibri"/>
+                          <a:sym typeface="Calibri"/>
+                        </a:rPr>
+                        <a:t>513.5</a:t>
+                      </a:r>
+                    </a:p>
+                  </a:txBody>
+                  <a:tcPr anchor="t" marB="0" marT="0" marR="0" marL="0">
+                    <a:lnL w="0" cmpd="sng" algn="ctr" cap="flat">
+                      <a:solidFill>
+                        <a:srgbClr val="FFFFFF">
+                          <a:alpha val="0"/>
+                        </a:srgbClr>
+                      </a:solidFill>
+                      <a:prstDash val="solid"/>
+                    </a:lnL>
+                    <a:lnR w="0" cmpd="sng" algn="ctr" cap="flat">
+                      <a:solidFill>
+                        <a:srgbClr val="FFFFFF">
+                          <a:alpha val="0"/>
+                        </a:srgbClr>
+                      </a:solidFill>
+                      <a:prstDash val="solid"/>
+                    </a:lnR>
+                    <a:lnT w="0" cmpd="sng" algn="ctr" cap="flat">
+                      <a:solidFill>
+                        <a:srgbClr val="FFFFFF">
+                          <a:alpha val="0"/>
+                        </a:srgbClr>
+                      </a:solidFill>
+                      <a:prstDash val="solid"/>
+                    </a:lnT>
+                    <a:lnB w="0" cmpd="sng" algn="ctr" cap="flat">
+                      <a:solidFill>
+                        <a:srgbClr val="FFFFFF">
+                          <a:alpha val="0"/>
+                        </a:srgbClr>
+                      </a:solidFill>
+                      <a:prstDash val="solid"/>
+                    </a:lnB>
+                  </a:tcPr>
+                </a:tc>
+                <a:tc>
+                  <a:txBody>
+                    <a:bodyPr/>
+                    <a:lstStyle/>
+                    <a:p>
+                      <a:pPr algn="l" marL="63500" marR="63500">
+                        <a:lnSpc>
+                          <a:spcPct val="100000"/>
+                        </a:lnSpc>
+                        <a:spcBef>
+                          <a:spcPts val="500"/>
+                        </a:spcBef>
+                        <a:spcAft>
+                          <a:spcPts val="500"/>
+                        </a:spcAft>
+                        <a:buNone/>
+                      </a:pPr>
+                      <a:r>
+                        <a:rPr sz="1100">
+                          <a:solidFill>
+                            <a:srgbClr val="000000">
+                              <a:alpha val="100000"/>
+                            </a:srgbClr>
+                          </a:solidFill>
+                          <a:latin typeface="Calibri"/>
+                          <a:cs typeface="Calibri"/>
+                          <a:ea typeface="Calibri"/>
+                          <a:sym typeface="Calibri"/>
+                        </a:rPr>
+                        <a:t>165th</a:t>
+                      </a:r>
+                    </a:p>
+                  </a:txBody>
+                  <a:tcPr anchor="t" marB="0" marT="0" marR="0" marL="0">
+                    <a:lnL w="0" cmpd="sng" algn="ctr" cap="flat">
+                      <a:solidFill>
+                        <a:srgbClr val="FFFFFF">
+                          <a:alpha val="0"/>
+                        </a:srgbClr>
+                      </a:solidFill>
+                      <a:prstDash val="solid"/>
+                    </a:lnL>
+                    <a:lnR w="0" cmpd="sng" algn="ctr" cap="flat">
+                      <a:solidFill>
+                        <a:srgbClr val="FFFFFF">
+                          <a:alpha val="0"/>
+                        </a:srgbClr>
+                      </a:solidFill>
+                      <a:prstDash val="solid"/>
+                    </a:lnR>
+                    <a:lnT w="0" cmpd="sng" algn="ctr" cap="flat">
+                      <a:solidFill>
+                        <a:srgbClr val="FFFFFF">
+                          <a:alpha val="0"/>
+                        </a:srgbClr>
+                      </a:solidFill>
+                      <a:prstDash val="solid"/>
+                    </a:lnT>
+                    <a:lnB w="0" cmpd="sng" algn="ctr" cap="flat">
+                      <a:solidFill>
+                        <a:srgbClr val="FFFFFF">
+                          <a:alpha val="0"/>
+                        </a:srgbClr>
+                      </a:solidFill>
+                      <a:prstDash val="solid"/>
+                    </a:lnB>
+                  </a:tcPr>
+                </a:tc>
+                <a:tc>
+                  <a:txBody>
+                    <a:bodyPr/>
+                    <a:lstStyle/>
+                    <a:p>
+                      <a:pPr algn="l" marL="63500" marR="63500">
+                        <a:lnSpc>
+                          <a:spcPct val="100000"/>
+                        </a:lnSpc>
+                        <a:spcBef>
+                          <a:spcPts val="500"/>
+                        </a:spcBef>
+                        <a:spcAft>
+                          <a:spcPts val="500"/>
+                        </a:spcAft>
+                        <a:buNone/>
+                      </a:pPr>
+                      <a:r>
+                        <a:rPr sz="1100">
+                          <a:solidFill>
+                            <a:srgbClr val="000000">
+                              <a:alpha val="100000"/>
+                            </a:srgbClr>
+                          </a:solidFill>
+                          <a:latin typeface="Calibri"/>
+                          <a:cs typeface="Calibri"/>
+                          <a:ea typeface="Calibri"/>
+                          <a:sym typeface="Calibri"/>
+                        </a:rPr>
+                        <a:t>Decile 6</a:t>
+                      </a:r>
+                    </a:p>
+                  </a:txBody>
+                  <a:tcPr anchor="t" marB="0" marT="0" marR="0" marL="0">
+                    <a:lnL w="0" cmpd="sng" algn="ctr" cap="flat">
+                      <a:solidFill>
+                        <a:srgbClr val="FFFFFF">
+                          <a:alpha val="0"/>
+                        </a:srgbClr>
+                      </a:solidFill>
+                      <a:prstDash val="solid"/>
+                    </a:lnL>
+                    <a:lnR w="0" cmpd="sng" algn="ctr" cap="flat">
+                      <a:solidFill>
+                        <a:srgbClr val="FFFFFF">
+                          <a:alpha val="0"/>
+                        </a:srgbClr>
+                      </a:solidFill>
+                      <a:prstDash val="solid"/>
+                    </a:lnR>
+                    <a:lnT w="0" cmpd="sng" algn="ctr" cap="flat">
+                      <a:solidFill>
+                        <a:srgbClr val="FFFFFF">
+                          <a:alpha val="0"/>
+                        </a:srgbClr>
+                      </a:solidFill>
+                      <a:prstDash val="solid"/>
+                    </a:lnT>
+                    <a:lnB w="0" cmpd="sng" algn="ctr" cap="flat">
+                      <a:solidFill>
+                        <a:srgbClr val="FFFFFF">
+                          <a:alpha val="0"/>
+                        </a:srgbClr>
+                      </a:solidFill>
+                      <a:prstDash val="solid"/>
+                    </a:lnB>
+                  </a:tcPr>
+                </a:tc>
+              </a:tr>
+              <a:tr h="182880">
+                <a:tc>
+                  <a:txBody>
+                    <a:bodyPr/>
+                    <a:lstStyle/>
+                    <a:p>
+                      <a:pPr algn="l" marL="63500" marR="63500">
+                        <a:lnSpc>
+                          <a:spcPct val="100000"/>
+                        </a:lnSpc>
+                        <a:spcBef>
+                          <a:spcPts val="500"/>
+                        </a:spcBef>
+                        <a:spcAft>
+                          <a:spcPts val="500"/>
+                        </a:spcAft>
+                        <a:buNone/>
+                      </a:pPr>
+                      <a:r>
+                        <a:rPr sz="1100">
+                          <a:solidFill>
+                            <a:srgbClr val="000000">
+                              <a:alpha val="100000"/>
+                            </a:srgbClr>
+                          </a:solidFill>
+                          <a:latin typeface="Calibri"/>
+                          <a:cs typeface="Calibri"/>
+                          <a:ea typeface="Calibri"/>
+                          <a:sym typeface="Calibri"/>
+                        </a:rPr>
+                        <a:t>Mid Sussex</a:t>
+                      </a:r>
+                    </a:p>
+                  </a:txBody>
+                  <a:tcPr anchor="t" marB="0" marT="0" marR="0" marL="0">
+                    <a:lnL w="0" cmpd="sng" algn="ctr" cap="flat">
+                      <a:solidFill>
+                        <a:srgbClr val="FFFFFF">
+                          <a:alpha val="0"/>
+                        </a:srgbClr>
+                      </a:solidFill>
+                      <a:prstDash val="solid"/>
+                    </a:lnL>
+                    <a:lnR w="0" cmpd="sng" algn="ctr" cap="flat">
+                      <a:solidFill>
+                        <a:srgbClr val="FFFFFF">
+                          <a:alpha val="0"/>
+                        </a:srgbClr>
+                      </a:solidFill>
+                      <a:prstDash val="solid"/>
+                    </a:lnR>
+                    <a:lnT w="0" cmpd="sng" algn="ctr" cap="flat">
+                      <a:solidFill>
+                        <a:srgbClr val="FFFFFF">
+                          <a:alpha val="0"/>
+                        </a:srgbClr>
+                      </a:solidFill>
+                      <a:prstDash val="solid"/>
+                    </a:lnT>
+                    <a:lnB w="0" cmpd="sng" algn="ctr" cap="flat">
+                      <a:solidFill>
+                        <a:srgbClr val="FFFFFF">
+                          <a:alpha val="0"/>
+                        </a:srgbClr>
+                      </a:solidFill>
+                      <a:prstDash val="solid"/>
+                    </a:lnB>
+                  </a:tcPr>
+                </a:tc>
+                <a:tc>
+                  <a:txBody>
+                    <a:bodyPr/>
+                    <a:lstStyle/>
+                    <a:p>
+                      <a:pPr algn="l" marL="63500" marR="63500">
+                        <a:lnSpc>
+                          <a:spcPct val="100000"/>
+                        </a:lnSpc>
+                        <a:spcBef>
+                          <a:spcPts val="500"/>
+                        </a:spcBef>
+                        <a:spcAft>
+                          <a:spcPts val="500"/>
+                        </a:spcAft>
+                        <a:buNone/>
+                      </a:pPr>
+                      <a:r>
+                        <a:rPr sz="1100">
+                          <a:solidFill>
+                            <a:srgbClr val="000000">
+                              <a:alpha val="100000"/>
+                            </a:srgbClr>
+                          </a:solidFill>
+                          <a:latin typeface="Calibri"/>
+                          <a:cs typeface="Calibri"/>
+                          <a:ea typeface="Calibri"/>
+                          <a:sym typeface="Calibri"/>
+                        </a:rPr>
+                        <a:t>1,166</a:t>
+                      </a:r>
+                    </a:p>
+                  </a:txBody>
+                  <a:tcPr anchor="t" marB="0" marT="0" marR="0" marL="0">
+                    <a:lnL w="0" cmpd="sng" algn="ctr" cap="flat">
+                      <a:solidFill>
+                        <a:srgbClr val="FFFFFF">
+                          <a:alpha val="0"/>
+                        </a:srgbClr>
+                      </a:solidFill>
+                      <a:prstDash val="solid"/>
+                    </a:lnL>
+                    <a:lnR w="0" cmpd="sng" algn="ctr" cap="flat">
+                      <a:solidFill>
+                        <a:srgbClr val="FFFFFF">
+                          <a:alpha val="0"/>
+                        </a:srgbClr>
+                      </a:solidFill>
+                      <a:prstDash val="solid"/>
+                    </a:lnR>
+                    <a:lnT w="0" cmpd="sng" algn="ctr" cap="flat">
+                      <a:solidFill>
+                        <a:srgbClr val="FFFFFF">
+                          <a:alpha val="0"/>
+                        </a:srgbClr>
+                      </a:solidFill>
+                      <a:prstDash val="solid"/>
+                    </a:lnT>
+                    <a:lnB w="0" cmpd="sng" algn="ctr" cap="flat">
+                      <a:solidFill>
+                        <a:srgbClr val="FFFFFF">
+                          <a:alpha val="0"/>
+                        </a:srgbClr>
+                      </a:solidFill>
+                      <a:prstDash val="solid"/>
+                    </a:lnB>
+                  </a:tcPr>
+                </a:tc>
+                <a:tc>
+                  <a:txBody>
+                    <a:bodyPr/>
+                    <a:lstStyle/>
+                    <a:p>
+                      <a:pPr algn="l" marL="63500" marR="63500">
+                        <a:lnSpc>
+                          <a:spcPct val="100000"/>
+                        </a:lnSpc>
+                        <a:spcBef>
+                          <a:spcPts val="500"/>
+                        </a:spcBef>
+                        <a:spcAft>
+                          <a:spcPts val="500"/>
+                        </a:spcAft>
+                        <a:buNone/>
+                      </a:pPr>
+                      <a:r>
+                        <a:rPr sz="1100">
+                          <a:solidFill>
+                            <a:srgbClr val="000000">
+                              <a:alpha val="100000"/>
+                            </a:srgbClr>
+                          </a:solidFill>
+                          <a:latin typeface="Calibri"/>
+                          <a:cs typeface="Calibri"/>
+                          <a:ea typeface="Calibri"/>
+                          <a:sym typeface="Calibri"/>
+                        </a:rPr>
+                        <a:t>766.4</a:t>
+                      </a:r>
+                    </a:p>
+                  </a:txBody>
+                  <a:tcPr anchor="t" marB="0" marT="0" marR="0" marL="0">
+                    <a:lnL w="0" cmpd="sng" algn="ctr" cap="flat">
+                      <a:solidFill>
+                        <a:srgbClr val="FFFFFF">
+                          <a:alpha val="0"/>
+                        </a:srgbClr>
+                      </a:solidFill>
+                      <a:prstDash val="solid"/>
+                    </a:lnL>
+                    <a:lnR w="0" cmpd="sng" algn="ctr" cap="flat">
+                      <a:solidFill>
+                        <a:srgbClr val="FFFFFF">
+                          <a:alpha val="0"/>
+                        </a:srgbClr>
+                      </a:solidFill>
+                      <a:prstDash val="solid"/>
+                    </a:lnR>
+                    <a:lnT w="0" cmpd="sng" algn="ctr" cap="flat">
+                      <a:solidFill>
+                        <a:srgbClr val="FFFFFF">
+                          <a:alpha val="0"/>
+                        </a:srgbClr>
+                      </a:solidFill>
+                      <a:prstDash val="solid"/>
+                    </a:lnT>
+                    <a:lnB w="0" cmpd="sng" algn="ctr" cap="flat">
+                      <a:solidFill>
+                        <a:srgbClr val="FFFFFF">
+                          <a:alpha val="0"/>
+                        </a:srgbClr>
+                      </a:solidFill>
+                      <a:prstDash val="solid"/>
+                    </a:lnB>
+                  </a:tcPr>
+                </a:tc>
+                <a:tc>
+                  <a:txBody>
+                    <a:bodyPr/>
+                    <a:lstStyle/>
+                    <a:p>
+                      <a:pPr algn="l" marL="63500" marR="63500">
+                        <a:lnSpc>
+                          <a:spcPct val="100000"/>
+                        </a:lnSpc>
+                        <a:spcBef>
+                          <a:spcPts val="500"/>
+                        </a:spcBef>
+                        <a:spcAft>
+                          <a:spcPts val="500"/>
+                        </a:spcAft>
+                        <a:buNone/>
+                      </a:pPr>
+                      <a:r>
+                        <a:rPr sz="1100">
+                          <a:solidFill>
+                            <a:srgbClr val="000000">
+                              <a:alpha val="100000"/>
+                            </a:srgbClr>
+                          </a:solidFill>
+                          <a:latin typeface="Calibri"/>
+                          <a:cs typeface="Calibri"/>
+                          <a:ea typeface="Calibri"/>
+                          <a:sym typeface="Calibri"/>
+                        </a:rPr>
+                        <a:t>17th</a:t>
                       </a:r>
                     </a:p>
                   </a:txBody>
@@ -16670,7 +17353,7 @@
                           <a:ea typeface="Calibri"/>
                           <a:sym typeface="Calibri"/>
                         </a:rPr>
-                        <a:t>Horsham</a:t>
+                        <a:t>Worthing</a:t>
                       </a:r>
                     </a:p>
                   </a:txBody>
@@ -16738,7 +17421,7 @@
                           <a:ea typeface="Calibri"/>
                           <a:sym typeface="Calibri"/>
                         </a:rPr>
-                        <a:t>776</a:t>
+                        <a:t>699</a:t>
                       </a:r>
                     </a:p>
                   </a:txBody>
@@ -16806,7 +17489,7 @@
                           <a:ea typeface="Calibri"/>
                           <a:sym typeface="Calibri"/>
                         </a:rPr>
-                        <a:t>533.4</a:t>
+                        <a:t>631.3</a:t>
                       </a:r>
                     </a:p>
                   </a:txBody>
@@ -16874,692 +17557,7 @@
                           <a:ea typeface="Calibri"/>
                           <a:sym typeface="Calibri"/>
                         </a:rPr>
-                        <a:t>143rd</a:t>
-                      </a:r>
-                    </a:p>
-                  </a:txBody>
-                  <a:tcPr anchor="t" marB="0" marT="0" marR="0" marL="0">
-                    <a:lnL w="0" cmpd="sng" algn="ctr" cap="flat">
-                      <a:solidFill>
-                        <a:srgbClr val="FFFFFF">
-                          <a:alpha val="0"/>
-                        </a:srgbClr>
-                      </a:solidFill>
-                      <a:prstDash val="solid"/>
-                    </a:lnL>
-                    <a:lnR w="0" cmpd="sng" algn="ctr" cap="flat">
-                      <a:solidFill>
-                        <a:srgbClr val="FFFFFF">
-                          <a:alpha val="0"/>
-                        </a:srgbClr>
-                      </a:solidFill>
-                      <a:prstDash val="solid"/>
-                    </a:lnR>
-                    <a:lnT w="0" cmpd="sng" algn="ctr" cap="flat">
-                      <a:solidFill>
-                        <a:srgbClr val="FFFFFF">
-                          <a:alpha val="0"/>
-                        </a:srgbClr>
-                      </a:solidFill>
-                      <a:prstDash val="solid"/>
-                    </a:lnT>
-                    <a:lnB w="0" cmpd="sng" algn="ctr" cap="flat">
-                      <a:solidFill>
-                        <a:srgbClr val="FFFFFF">
-                          <a:alpha val="0"/>
-                        </a:srgbClr>
-                      </a:solidFill>
-                      <a:prstDash val="solid"/>
-                    </a:lnB>
-                  </a:tcPr>
-                </a:tc>
-                <a:tc>
-                  <a:txBody>
-                    <a:bodyPr/>
-                    <a:lstStyle/>
-                    <a:p>
-                      <a:pPr algn="l" marL="63500" marR="63500">
-                        <a:lnSpc>
-                          <a:spcPct val="100000"/>
-                        </a:lnSpc>
-                        <a:spcBef>
-                          <a:spcPts val="500"/>
-                        </a:spcBef>
-                        <a:spcAft>
-                          <a:spcPts val="500"/>
-                        </a:spcAft>
-                        <a:buNone/>
-                      </a:pPr>
-                      <a:r>
-                        <a:rPr sz="1100">
-                          <a:solidFill>
-                            <a:srgbClr val="000000">
-                              <a:alpha val="100000"/>
-                            </a:srgbClr>
-                          </a:solidFill>
-                          <a:latin typeface="Calibri"/>
-                          <a:cs typeface="Calibri"/>
-                          <a:ea typeface="Calibri"/>
-                          <a:sym typeface="Calibri"/>
-                        </a:rPr>
-                        <a:t>Decile 5</a:t>
-                      </a:r>
-                    </a:p>
-                  </a:txBody>
-                  <a:tcPr anchor="t" marB="0" marT="0" marR="0" marL="0">
-                    <a:lnL w="0" cmpd="sng" algn="ctr" cap="flat">
-                      <a:solidFill>
-                        <a:srgbClr val="FFFFFF">
-                          <a:alpha val="0"/>
-                        </a:srgbClr>
-                      </a:solidFill>
-                      <a:prstDash val="solid"/>
-                    </a:lnL>
-                    <a:lnR w="0" cmpd="sng" algn="ctr" cap="flat">
-                      <a:solidFill>
-                        <a:srgbClr val="FFFFFF">
-                          <a:alpha val="0"/>
-                        </a:srgbClr>
-                      </a:solidFill>
-                      <a:prstDash val="solid"/>
-                    </a:lnR>
-                    <a:lnT w="0" cmpd="sng" algn="ctr" cap="flat">
-                      <a:solidFill>
-                        <a:srgbClr val="FFFFFF">
-                          <a:alpha val="0"/>
-                        </a:srgbClr>
-                      </a:solidFill>
-                      <a:prstDash val="solid"/>
-                    </a:lnT>
-                    <a:lnB w="0" cmpd="sng" algn="ctr" cap="flat">
-                      <a:solidFill>
-                        <a:srgbClr val="FFFFFF">
-                          <a:alpha val="0"/>
-                        </a:srgbClr>
-                      </a:solidFill>
-                      <a:prstDash val="solid"/>
-                    </a:lnB>
-                  </a:tcPr>
-                </a:tc>
-              </a:tr>
-              <a:tr h="182880">
-                <a:tc>
-                  <a:txBody>
-                    <a:bodyPr/>
-                    <a:lstStyle/>
-                    <a:p>
-                      <a:pPr algn="l" marL="63500" marR="63500">
-                        <a:lnSpc>
-                          <a:spcPct val="100000"/>
-                        </a:lnSpc>
-                        <a:spcBef>
-                          <a:spcPts val="500"/>
-                        </a:spcBef>
-                        <a:spcAft>
-                          <a:spcPts val="500"/>
-                        </a:spcAft>
-                        <a:buNone/>
-                      </a:pPr>
-                      <a:r>
-                        <a:rPr sz="1100">
-                          <a:solidFill>
-                            <a:srgbClr val="000000">
-                              <a:alpha val="100000"/>
-                            </a:srgbClr>
-                          </a:solidFill>
-                          <a:latin typeface="Calibri"/>
-                          <a:cs typeface="Calibri"/>
-                          <a:ea typeface="Calibri"/>
-                          <a:sym typeface="Calibri"/>
-                        </a:rPr>
-                        <a:t>Mid Sussex</a:t>
-                      </a:r>
-                    </a:p>
-                  </a:txBody>
-                  <a:tcPr anchor="t" marB="0" marT="0" marR="0" marL="0">
-                    <a:lnL w="0" cmpd="sng" algn="ctr" cap="flat">
-                      <a:solidFill>
-                        <a:srgbClr val="FFFFFF">
-                          <a:alpha val="0"/>
-                        </a:srgbClr>
-                      </a:solidFill>
-                      <a:prstDash val="solid"/>
-                    </a:lnL>
-                    <a:lnR w="0" cmpd="sng" algn="ctr" cap="flat">
-                      <a:solidFill>
-                        <a:srgbClr val="FFFFFF">
-                          <a:alpha val="0"/>
-                        </a:srgbClr>
-                      </a:solidFill>
-                      <a:prstDash val="solid"/>
-                    </a:lnR>
-                    <a:lnT w="0" cmpd="sng" algn="ctr" cap="flat">
-                      <a:solidFill>
-                        <a:srgbClr val="FFFFFF">
-                          <a:alpha val="0"/>
-                        </a:srgbClr>
-                      </a:solidFill>
-                      <a:prstDash val="solid"/>
-                    </a:lnT>
-                    <a:lnB w="0" cmpd="sng" algn="ctr" cap="flat">
-                      <a:solidFill>
-                        <a:srgbClr val="FFFFFF">
-                          <a:alpha val="0"/>
-                        </a:srgbClr>
-                      </a:solidFill>
-                      <a:prstDash val="solid"/>
-                    </a:lnB>
-                  </a:tcPr>
-                </a:tc>
-                <a:tc>
-                  <a:txBody>
-                    <a:bodyPr/>
-                    <a:lstStyle/>
-                    <a:p>
-                      <a:pPr algn="l" marL="63500" marR="63500">
-                        <a:lnSpc>
-                          <a:spcPct val="100000"/>
-                        </a:lnSpc>
-                        <a:spcBef>
-                          <a:spcPts val="500"/>
-                        </a:spcBef>
-                        <a:spcAft>
-                          <a:spcPts val="500"/>
-                        </a:spcAft>
-                        <a:buNone/>
-                      </a:pPr>
-                      <a:r>
-                        <a:rPr sz="1100">
-                          <a:solidFill>
-                            <a:srgbClr val="000000">
-                              <a:alpha val="100000"/>
-                            </a:srgbClr>
-                          </a:solidFill>
-                          <a:latin typeface="Calibri"/>
-                          <a:cs typeface="Calibri"/>
-                          <a:ea typeface="Calibri"/>
-                          <a:sym typeface="Calibri"/>
-                        </a:rPr>
-                        <a:t>1,230</a:t>
-                      </a:r>
-                    </a:p>
-                  </a:txBody>
-                  <a:tcPr anchor="t" marB="0" marT="0" marR="0" marL="0">
-                    <a:lnL w="0" cmpd="sng" algn="ctr" cap="flat">
-                      <a:solidFill>
-                        <a:srgbClr val="FFFFFF">
-                          <a:alpha val="0"/>
-                        </a:srgbClr>
-                      </a:solidFill>
-                      <a:prstDash val="solid"/>
-                    </a:lnL>
-                    <a:lnR w="0" cmpd="sng" algn="ctr" cap="flat">
-                      <a:solidFill>
-                        <a:srgbClr val="FFFFFF">
-                          <a:alpha val="0"/>
-                        </a:srgbClr>
-                      </a:solidFill>
-                      <a:prstDash val="solid"/>
-                    </a:lnR>
-                    <a:lnT w="0" cmpd="sng" algn="ctr" cap="flat">
-                      <a:solidFill>
-                        <a:srgbClr val="FFFFFF">
-                          <a:alpha val="0"/>
-                        </a:srgbClr>
-                      </a:solidFill>
-                      <a:prstDash val="solid"/>
-                    </a:lnT>
-                    <a:lnB w="0" cmpd="sng" algn="ctr" cap="flat">
-                      <a:solidFill>
-                        <a:srgbClr val="FFFFFF">
-                          <a:alpha val="0"/>
-                        </a:srgbClr>
-                      </a:solidFill>
-                      <a:prstDash val="solid"/>
-                    </a:lnB>
-                  </a:tcPr>
-                </a:tc>
-                <a:tc>
-                  <a:txBody>
-                    <a:bodyPr/>
-                    <a:lstStyle/>
-                    <a:p>
-                      <a:pPr algn="l" marL="63500" marR="63500">
-                        <a:lnSpc>
-                          <a:spcPct val="100000"/>
-                        </a:lnSpc>
-                        <a:spcBef>
-                          <a:spcPts val="500"/>
-                        </a:spcBef>
-                        <a:spcAft>
-                          <a:spcPts val="500"/>
-                        </a:spcAft>
-                        <a:buNone/>
-                      </a:pPr>
-                      <a:r>
-                        <a:rPr sz="1100">
-                          <a:solidFill>
-                            <a:srgbClr val="000000">
-                              <a:alpha val="100000"/>
-                            </a:srgbClr>
-                          </a:solidFill>
-                          <a:latin typeface="Calibri"/>
-                          <a:cs typeface="Calibri"/>
-                          <a:ea typeface="Calibri"/>
-                          <a:sym typeface="Calibri"/>
-                        </a:rPr>
-                        <a:t>808.5</a:t>
-                      </a:r>
-                    </a:p>
-                  </a:txBody>
-                  <a:tcPr anchor="t" marB="0" marT="0" marR="0" marL="0">
-                    <a:lnL w="0" cmpd="sng" algn="ctr" cap="flat">
-                      <a:solidFill>
-                        <a:srgbClr val="FFFFFF">
-                          <a:alpha val="0"/>
-                        </a:srgbClr>
-                      </a:solidFill>
-                      <a:prstDash val="solid"/>
-                    </a:lnL>
-                    <a:lnR w="0" cmpd="sng" algn="ctr" cap="flat">
-                      <a:solidFill>
-                        <a:srgbClr val="FFFFFF">
-                          <a:alpha val="0"/>
-                        </a:srgbClr>
-                      </a:solidFill>
-                      <a:prstDash val="solid"/>
-                    </a:lnR>
-                    <a:lnT w="0" cmpd="sng" algn="ctr" cap="flat">
-                      <a:solidFill>
-                        <a:srgbClr val="FFFFFF">
-                          <a:alpha val="0"/>
-                        </a:srgbClr>
-                      </a:solidFill>
-                      <a:prstDash val="solid"/>
-                    </a:lnT>
-                    <a:lnB w="0" cmpd="sng" algn="ctr" cap="flat">
-                      <a:solidFill>
-                        <a:srgbClr val="FFFFFF">
-                          <a:alpha val="0"/>
-                        </a:srgbClr>
-                      </a:solidFill>
-                      <a:prstDash val="solid"/>
-                    </a:lnB>
-                  </a:tcPr>
-                </a:tc>
-                <a:tc>
-                  <a:txBody>
-                    <a:bodyPr/>
-                    <a:lstStyle/>
-                    <a:p>
-                      <a:pPr algn="l" marL="63500" marR="63500">
-                        <a:lnSpc>
-                          <a:spcPct val="100000"/>
-                        </a:lnSpc>
-                        <a:spcBef>
-                          <a:spcPts val="500"/>
-                        </a:spcBef>
-                        <a:spcAft>
-                          <a:spcPts val="500"/>
-                        </a:spcAft>
-                        <a:buNone/>
-                      </a:pPr>
-                      <a:r>
-                        <a:rPr sz="1100">
-                          <a:solidFill>
-                            <a:srgbClr val="000000">
-                              <a:alpha val="100000"/>
-                            </a:srgbClr>
-                          </a:solidFill>
-                          <a:latin typeface="Calibri"/>
-                          <a:cs typeface="Calibri"/>
-                          <a:ea typeface="Calibri"/>
-                          <a:sym typeface="Calibri"/>
-                        </a:rPr>
-                        <a:t>12th</a:t>
-                      </a:r>
-                    </a:p>
-                  </a:txBody>
-                  <a:tcPr anchor="t" marB="0" marT="0" marR="0" marL="0">
-                    <a:lnL w="0" cmpd="sng" algn="ctr" cap="flat">
-                      <a:solidFill>
-                        <a:srgbClr val="FFFFFF">
-                          <a:alpha val="0"/>
-                        </a:srgbClr>
-                      </a:solidFill>
-                      <a:prstDash val="solid"/>
-                    </a:lnL>
-                    <a:lnR w="0" cmpd="sng" algn="ctr" cap="flat">
-                      <a:solidFill>
-                        <a:srgbClr val="FFFFFF">
-                          <a:alpha val="0"/>
-                        </a:srgbClr>
-                      </a:solidFill>
-                      <a:prstDash val="solid"/>
-                    </a:lnR>
-                    <a:lnT w="0" cmpd="sng" algn="ctr" cap="flat">
-                      <a:solidFill>
-                        <a:srgbClr val="FFFFFF">
-                          <a:alpha val="0"/>
-                        </a:srgbClr>
-                      </a:solidFill>
-                      <a:prstDash val="solid"/>
-                    </a:lnT>
-                    <a:lnB w="0" cmpd="sng" algn="ctr" cap="flat">
-                      <a:solidFill>
-                        <a:srgbClr val="FFFFFF">
-                          <a:alpha val="0"/>
-                        </a:srgbClr>
-                      </a:solidFill>
-                      <a:prstDash val="solid"/>
-                    </a:lnB>
-                  </a:tcPr>
-                </a:tc>
-                <a:tc>
-                  <a:txBody>
-                    <a:bodyPr/>
-                    <a:lstStyle/>
-                    <a:p>
-                      <a:pPr algn="l" marL="63500" marR="63500">
-                        <a:lnSpc>
-                          <a:spcPct val="100000"/>
-                        </a:lnSpc>
-                        <a:spcBef>
-                          <a:spcPts val="500"/>
-                        </a:spcBef>
-                        <a:spcAft>
-                          <a:spcPts val="500"/>
-                        </a:spcAft>
-                        <a:buNone/>
-                      </a:pPr>
-                      <a:r>
-                        <a:rPr sz="1100">
-                          <a:solidFill>
-                            <a:srgbClr val="000000">
-                              <a:alpha val="100000"/>
-                            </a:srgbClr>
-                          </a:solidFill>
-                          <a:latin typeface="Calibri"/>
-                          <a:cs typeface="Calibri"/>
-                          <a:ea typeface="Calibri"/>
-                          <a:sym typeface="Calibri"/>
-                        </a:rPr>
-                        <a:t>10% of authorities
-with highest rate</a:t>
-                      </a:r>
-                    </a:p>
-                  </a:txBody>
-                  <a:tcPr anchor="t" marB="0" marT="0" marR="0" marL="0">
-                    <a:lnL w="0" cmpd="sng" algn="ctr" cap="flat">
-                      <a:solidFill>
-                        <a:srgbClr val="FFFFFF">
-                          <a:alpha val="0"/>
-                        </a:srgbClr>
-                      </a:solidFill>
-                      <a:prstDash val="solid"/>
-                    </a:lnL>
-                    <a:lnR w="0" cmpd="sng" algn="ctr" cap="flat">
-                      <a:solidFill>
-                        <a:srgbClr val="FFFFFF">
-                          <a:alpha val="0"/>
-                        </a:srgbClr>
-                      </a:solidFill>
-                      <a:prstDash val="solid"/>
-                    </a:lnR>
-                    <a:lnT w="0" cmpd="sng" algn="ctr" cap="flat">
-                      <a:solidFill>
-                        <a:srgbClr val="FFFFFF">
-                          <a:alpha val="0"/>
-                        </a:srgbClr>
-                      </a:solidFill>
-                      <a:prstDash val="solid"/>
-                    </a:lnT>
-                    <a:lnB w="0" cmpd="sng" algn="ctr" cap="flat">
-                      <a:solidFill>
-                        <a:srgbClr val="FFFFFF">
-                          <a:alpha val="0"/>
-                        </a:srgbClr>
-                      </a:solidFill>
-                      <a:prstDash val="solid"/>
-                    </a:lnB>
-                  </a:tcPr>
-                </a:tc>
-              </a:tr>
-              <a:tr h="182880">
-                <a:tc>
-                  <a:txBody>
-                    <a:bodyPr/>
-                    <a:lstStyle/>
-                    <a:p>
-                      <a:pPr algn="l" marL="63500" marR="63500">
-                        <a:lnSpc>
-                          <a:spcPct val="100000"/>
-                        </a:lnSpc>
-                        <a:spcBef>
-                          <a:spcPts val="500"/>
-                        </a:spcBef>
-                        <a:spcAft>
-                          <a:spcPts val="500"/>
-                        </a:spcAft>
-                        <a:buNone/>
-                      </a:pPr>
-                      <a:r>
-                        <a:rPr sz="1100">
-                          <a:solidFill>
-                            <a:srgbClr val="000000">
-                              <a:alpha val="100000"/>
-                            </a:srgbClr>
-                          </a:solidFill>
-                          <a:latin typeface="Calibri"/>
-                          <a:cs typeface="Calibri"/>
-                          <a:ea typeface="Calibri"/>
-                          <a:sym typeface="Calibri"/>
-                        </a:rPr>
-                        <a:t>Worthing</a:t>
-                      </a:r>
-                    </a:p>
-                  </a:txBody>
-                  <a:tcPr anchor="t" marB="0" marT="0" marR="0" marL="0">
-                    <a:lnL w="0" cmpd="sng" algn="ctr" cap="flat">
-                      <a:solidFill>
-                        <a:srgbClr val="FFFFFF">
-                          <a:alpha val="0"/>
-                        </a:srgbClr>
-                      </a:solidFill>
-                      <a:prstDash val="solid"/>
-                    </a:lnL>
-                    <a:lnR w="0" cmpd="sng" algn="ctr" cap="flat">
-                      <a:solidFill>
-                        <a:srgbClr val="FFFFFF">
-                          <a:alpha val="0"/>
-                        </a:srgbClr>
-                      </a:solidFill>
-                      <a:prstDash val="solid"/>
-                    </a:lnR>
-                    <a:lnT w="0" cmpd="sng" algn="ctr" cap="flat">
-                      <a:solidFill>
-                        <a:srgbClr val="FFFFFF">
-                          <a:alpha val="0"/>
-                        </a:srgbClr>
-                      </a:solidFill>
-                      <a:prstDash val="solid"/>
-                    </a:lnT>
-                    <a:lnB w="0" cmpd="sng" algn="ctr" cap="flat">
-                      <a:solidFill>
-                        <a:srgbClr val="FFFFFF">
-                          <a:alpha val="0"/>
-                        </a:srgbClr>
-                      </a:solidFill>
-                      <a:prstDash val="solid"/>
-                    </a:lnB>
-                  </a:tcPr>
-                </a:tc>
-                <a:tc>
-                  <a:txBody>
-                    <a:bodyPr/>
-                    <a:lstStyle/>
-                    <a:p>
-                      <a:pPr algn="l" marL="63500" marR="63500">
-                        <a:lnSpc>
-                          <a:spcPct val="100000"/>
-                        </a:lnSpc>
-                        <a:spcBef>
-                          <a:spcPts val="500"/>
-                        </a:spcBef>
-                        <a:spcAft>
-                          <a:spcPts val="500"/>
-                        </a:spcAft>
-                        <a:buNone/>
-                      </a:pPr>
-                      <a:r>
-                        <a:rPr sz="1100">
-                          <a:solidFill>
-                            <a:srgbClr val="000000">
-                              <a:alpha val="100000"/>
-                            </a:srgbClr>
-                          </a:solidFill>
-                          <a:latin typeface="Calibri"/>
-                          <a:cs typeface="Calibri"/>
-                          <a:ea typeface="Calibri"/>
-                          <a:sym typeface="Calibri"/>
-                        </a:rPr>
-                        <a:t>696</a:t>
-                      </a:r>
-                    </a:p>
-                  </a:txBody>
-                  <a:tcPr anchor="t" marB="0" marT="0" marR="0" marL="0">
-                    <a:lnL w="0" cmpd="sng" algn="ctr" cap="flat">
-                      <a:solidFill>
-                        <a:srgbClr val="FFFFFF">
-                          <a:alpha val="0"/>
-                        </a:srgbClr>
-                      </a:solidFill>
-                      <a:prstDash val="solid"/>
-                    </a:lnL>
-                    <a:lnR w="0" cmpd="sng" algn="ctr" cap="flat">
-                      <a:solidFill>
-                        <a:srgbClr val="FFFFFF">
-                          <a:alpha val="0"/>
-                        </a:srgbClr>
-                      </a:solidFill>
-                      <a:prstDash val="solid"/>
-                    </a:lnR>
-                    <a:lnT w="0" cmpd="sng" algn="ctr" cap="flat">
-                      <a:solidFill>
-                        <a:srgbClr val="FFFFFF">
-                          <a:alpha val="0"/>
-                        </a:srgbClr>
-                      </a:solidFill>
-                      <a:prstDash val="solid"/>
-                    </a:lnT>
-                    <a:lnB w="0" cmpd="sng" algn="ctr" cap="flat">
-                      <a:solidFill>
-                        <a:srgbClr val="FFFFFF">
-                          <a:alpha val="0"/>
-                        </a:srgbClr>
-                      </a:solidFill>
-                      <a:prstDash val="solid"/>
-                    </a:lnB>
-                  </a:tcPr>
-                </a:tc>
-                <a:tc>
-                  <a:txBody>
-                    <a:bodyPr/>
-                    <a:lstStyle/>
-                    <a:p>
-                      <a:pPr algn="l" marL="63500" marR="63500">
-                        <a:lnSpc>
-                          <a:spcPct val="100000"/>
-                        </a:lnSpc>
-                        <a:spcBef>
-                          <a:spcPts val="500"/>
-                        </a:spcBef>
-                        <a:spcAft>
-                          <a:spcPts val="500"/>
-                        </a:spcAft>
-                        <a:buNone/>
-                      </a:pPr>
-                      <a:r>
-                        <a:rPr sz="1100">
-                          <a:solidFill>
-                            <a:srgbClr val="000000">
-                              <a:alpha val="100000"/>
-                            </a:srgbClr>
-                          </a:solidFill>
-                          <a:latin typeface="Calibri"/>
-                          <a:cs typeface="Calibri"/>
-                          <a:ea typeface="Calibri"/>
-                          <a:sym typeface="Calibri"/>
-                        </a:rPr>
-                        <a:t>628.6</a:t>
-                      </a:r>
-                    </a:p>
-                  </a:txBody>
-                  <a:tcPr anchor="t" marB="0" marT="0" marR="0" marL="0">
-                    <a:lnL w="0" cmpd="sng" algn="ctr" cap="flat">
-                      <a:solidFill>
-                        <a:srgbClr val="FFFFFF">
-                          <a:alpha val="0"/>
-                        </a:srgbClr>
-                      </a:solidFill>
-                      <a:prstDash val="solid"/>
-                    </a:lnL>
-                    <a:lnR w="0" cmpd="sng" algn="ctr" cap="flat">
-                      <a:solidFill>
-                        <a:srgbClr val="FFFFFF">
-                          <a:alpha val="0"/>
-                        </a:srgbClr>
-                      </a:solidFill>
-                      <a:prstDash val="solid"/>
-                    </a:lnR>
-                    <a:lnT w="0" cmpd="sng" algn="ctr" cap="flat">
-                      <a:solidFill>
-                        <a:srgbClr val="FFFFFF">
-                          <a:alpha val="0"/>
-                        </a:srgbClr>
-                      </a:solidFill>
-                      <a:prstDash val="solid"/>
-                    </a:lnT>
-                    <a:lnB w="0" cmpd="sng" algn="ctr" cap="flat">
-                      <a:solidFill>
-                        <a:srgbClr val="FFFFFF">
-                          <a:alpha val="0"/>
-                        </a:srgbClr>
-                      </a:solidFill>
-                      <a:prstDash val="solid"/>
-                    </a:lnB>
-                  </a:tcPr>
-                </a:tc>
-                <a:tc>
-                  <a:txBody>
-                    <a:bodyPr/>
-                    <a:lstStyle/>
-                    <a:p>
-                      <a:pPr algn="l" marL="63500" marR="63500">
-                        <a:lnSpc>
-                          <a:spcPct val="100000"/>
-                        </a:lnSpc>
-                        <a:spcBef>
-                          <a:spcPts val="500"/>
-                        </a:spcBef>
-                        <a:spcAft>
-                          <a:spcPts val="500"/>
-                        </a:spcAft>
-                        <a:buNone/>
-                      </a:pPr>
-                      <a:r>
-                        <a:rPr sz="1100">
-                          <a:solidFill>
-                            <a:srgbClr val="000000">
-                              <a:alpha val="100000"/>
-                            </a:srgbClr>
-                          </a:solidFill>
-                          <a:latin typeface="Calibri"/>
-                          <a:cs typeface="Calibri"/>
-                          <a:ea typeface="Calibri"/>
-                          <a:sym typeface="Calibri"/>
-                        </a:rPr>
-                        <a:t>80th</a:t>
+                        <a:t>78th</a:t>
                       </a:r>
                     </a:p>
                   </a:txBody>
@@ -17765,7 +17763,7 @@
                           <a:ea typeface="Calibri"/>
                           <a:sym typeface="Calibri"/>
                         </a:rPr>
-                        <a:t>5,918</a:t>
+                        <a:t>5,728</a:t>
                       </a:r>
                     </a:p>
                   </a:txBody>
@@ -17833,7 +17831,7 @@
                           <a:ea typeface="Calibri"/>
                           <a:sym typeface="Calibri"/>
                         </a:rPr>
-                        <a:t>682.1</a:t>
+                        <a:t>660.2</a:t>
                       </a:r>
                     </a:p>
                   </a:txBody>
@@ -18107,7 +18105,7 @@
                           <a:ea typeface="Calibri"/>
                           <a:sym typeface="Calibri"/>
                         </a:rPr>
-                        <a:t>284,902</a:t>
+                        <a:t>287,525</a:t>
                       </a:r>
                     </a:p>
                   </a:txBody>
@@ -18175,7 +18173,7 @@
                           <a:ea typeface="Calibri"/>
                           <a:sym typeface="Calibri"/>
                         </a:rPr>
-                        <a:t>503.8</a:t>
+                        <a:t>508.4</a:t>
                       </a:r>
                     </a:p>
                   </a:txBody>
@@ -18449,7 +18447,7 @@
                           <a:ea typeface="Calibri"/>
                           <a:sym typeface="Calibri"/>
                         </a:rPr>
-                        <a:t>61,279</a:t>
+                        <a:t>61,023</a:t>
                       </a:r>
                     </a:p>
                   </a:txBody>
@@ -18517,7 +18515,7 @@
                           <a:ea typeface="Calibri"/>
                           <a:sym typeface="Calibri"/>
                         </a:rPr>
-                        <a:t>664.8</a:t>
+                        <a:t>662.1</a:t>
                       </a:r>
                     </a:p>
                   </a:txBody>
@@ -18744,7 +18742,7 @@
           <a:p>
             <a:r>
               <a:rPr/>
-              <a:t>Pack date: 10 December 2021</a:t>
+              <a:t>Pack date: 11 December 2021</a:t>
             </a:r>
           </a:p>
         </p:txBody>
@@ -18902,7 +18900,7 @@
           <a:p>
             <a:r>
               <a:rPr/>
-              <a:t>Pack date: 10 December 2021</a:t>
+              <a:t>Pack date: 11 December 2021</a:t>
             </a:r>
           </a:p>
         </p:txBody>
@@ -19060,7 +19058,7 @@
           <a:p>
             <a:r>
               <a:rPr/>
-              <a:t>Pack date: 10 December 2021</a:t>
+              <a:t>Pack date: 11 December 2021</a:t>
             </a:r>
           </a:p>
         </p:txBody>
@@ -19218,7 +19216,7 @@
           <a:p>
             <a:r>
               <a:rPr/>
-              <a:t>Pack date: 10 December 2021</a:t>
+              <a:t>Pack date: 11 December 2021</a:t>
             </a:r>
           </a:p>
         </p:txBody>
@@ -19376,7 +19374,7 @@
           <a:p>
             <a:r>
               <a:rPr/>
-              <a:t>Pack date: 10 December 2021</a:t>
+              <a:t>Pack date: 11 December 2021</a:t>
             </a:r>
           </a:p>
         </p:txBody>
@@ -19565,7 +19563,7 @@
           <a:p>
             <a:r>
               <a:rPr/>
-              <a:t>Pack date: 10 December 2021</a:t>
+              <a:t>Pack date: 11 December 2021</a:t>
             </a:r>
           </a:p>
         </p:txBody>
@@ -19723,7 +19721,7 @@
           <a:p>
             <a:r>
               <a:rPr/>
-              <a:t>Pack date: 10 December 2021</a:t>
+              <a:t>Pack date: 11 December 2021</a:t>
             </a:r>
           </a:p>
         </p:txBody>
@@ -19881,7 +19879,7 @@
           <a:p>
             <a:r>
               <a:rPr/>
-              <a:t>Pack date: 10 December 2021</a:t>
+              <a:t>Pack date: 11 December 2021</a:t>
             </a:r>
           </a:p>
         </p:txBody>
@@ -20039,7 +20037,7 @@
           <a:p>
             <a:r>
               <a:rPr/>
-              <a:t>Pack date: 10 December 2021</a:t>
+              <a:t>Pack date: 11 December 2021</a:t>
             </a:r>
           </a:p>
         </p:txBody>
@@ -20197,7 +20195,7 @@
           <a:p>
             <a:r>
               <a:rPr/>
-              <a:t>Pack date: 10 December 2021</a:t>
+              <a:t>Pack date: 11 December 2021</a:t>
             </a:r>
           </a:p>
         </p:txBody>
@@ -20329,7 +20327,7 @@
           <a:p>
             <a:r>
               <a:rPr/>
-              <a:t>Pack date: 10 December 2021</a:t>
+              <a:t>Pack date: 11 December 2021</a:t>
             </a:r>
           </a:p>
         </p:txBody>
@@ -20461,7 +20459,7 @@
           <a:p>
             <a:r>
               <a:rPr/>
-              <a:t>Pack date: 10 December 2021</a:t>
+              <a:t>Pack date: 11 December 2021</a:t>
             </a:r>
           </a:p>
         </p:txBody>
@@ -20593,7 +20591,7 @@
           <a:p>
             <a:r>
               <a:rPr/>
-              <a:t>Pack date: 10 December 2021</a:t>
+              <a:t>Pack date: 11 December 2021</a:t>
             </a:r>
           </a:p>
         </p:txBody>
@@ -20725,7 +20723,7 @@
           <a:p>
             <a:r>
               <a:rPr/>
-              <a:t>Pack date: 10 December 2021</a:t>
+              <a:t>Pack date: 11 December 2021</a:t>
             </a:r>
           </a:p>
         </p:txBody>
@@ -20857,7 +20855,7 @@
           <a:p>
             <a:r>
               <a:rPr/>
-              <a:t>Pack date: 10 December 2021</a:t>
+              <a:t>Pack date: 11 December 2021</a:t>
             </a:r>
           </a:p>
         </p:txBody>
@@ -20989,7 +20987,7 @@
           <a:p>
             <a:r>
               <a:rPr/>
-              <a:t>Pack date: 10 December 2021</a:t>
+              <a:t>Pack date: 11 December 2021</a:t>
             </a:r>
           </a:p>
         </p:txBody>

</xml_diff>

<commit_message>
jan 27, utla map bug
</commit_message>
<xml_diff>
--- a/Latest_West_Sussex_C19_slide_deck.pptx
+++ b/Latest_West_Sussex_C19_slide_deck.pptx
@@ -7176,7 +7176,7 @@
           <a:p>
             <a:r>
               <a:rPr/>
-              <a:t>Pack date: 26 January 2022</a:t>
+              <a:t>Pack date: 27 January 2022</a:t>
             </a:r>
           </a:p>
         </p:txBody>
@@ -7308,7 +7308,7 @@
           <a:p>
             <a:r>
               <a:rPr/>
-              <a:t>Pack date: 26 January 2022</a:t>
+              <a:t>Pack date: 27 January 2022</a:t>
             </a:r>
           </a:p>
         </p:txBody>
@@ -7466,7 +7466,7 @@
           <a:p>
             <a:r>
               <a:rPr/>
-              <a:t>Pack date: 26 January 2022</a:t>
+              <a:t>Pack date: 27 January 2022</a:t>
             </a:r>
           </a:p>
         </p:txBody>
@@ -7547,7 +7547,7 @@
           <a:p>
             <a:r>
               <a:rPr/>
-              <a:t>Upper Tier Local Authority cumulative cases as at 26 January</a:t>
+              <a:t>Upper Tier Local Authority cumulative cases as at 27 January</a:t>
             </a:r>
           </a:p>
         </p:txBody>
@@ -8096,7 +8096,7 @@
                           <a:ea typeface="Calibri"/>
                           <a:sym typeface="Calibri"/>
                         </a:rPr>
-                        <a:t>184,175</a:t>
+                        <a:t>185,881</a:t>
                       </a:r>
                     </a:p>
                   </a:txBody>
@@ -8164,7 +8164,7 @@
                           <a:ea typeface="Calibri"/>
                           <a:sym typeface="Calibri"/>
                         </a:rPr>
-                        <a:t>21,227.2</a:t>
+                        <a:t>21,423.9</a:t>
                       </a:r>
                     </a:p>
                   </a:txBody>
@@ -8438,7 +8438,7 @@
                           <a:ea typeface="Calibri"/>
                           <a:sym typeface="Calibri"/>
                         </a:rPr>
-                        <a:t>13,732,435</a:t>
+                        <a:t>13,817,017</a:t>
                       </a:r>
                     </a:p>
                   </a:txBody>
@@ -8506,7 +8506,7 @@
                           <a:ea typeface="Calibri"/>
                           <a:sym typeface="Calibri"/>
                         </a:rPr>
-                        <a:t>24,283.6</a:t>
+                        <a:t>24,433.2</a:t>
                       </a:r>
                     </a:p>
                   </a:txBody>
@@ -8780,7 +8780,7 @@
                           <a:ea typeface="Calibri"/>
                           <a:sym typeface="Calibri"/>
                         </a:rPr>
-                        <a:t>2,089,868</a:t>
+                        <a:t>2,106,874</a:t>
                       </a:r>
                     </a:p>
                   </a:txBody>
@@ -8848,7 +8848,7 @@
                           <a:ea typeface="Calibri"/>
                           <a:sym typeface="Calibri"/>
                         </a:rPr>
-                        <a:t>22,673.4</a:t>
+                        <a:t>22,857.9</a:t>
                       </a:r>
                     </a:p>
                   </a:txBody>
@@ -9101,7 +9101,7 @@
           <a:p>
             <a:r>
               <a:rPr/>
-              <a:t>Pack date: 26 January 2022</a:t>
+              <a:t>Pack date: 27 January 2022</a:t>
             </a:r>
           </a:p>
         </p:txBody>
@@ -9182,7 +9182,7 @@
           <a:p>
             <a:r>
               <a:rPr/>
-              <a:t>Upper Tier Local Authority rolling 7 day cases as at 26 January</a:t>
+              <a:t>Upper Tier Local Authority rolling 7 day cases as at 27 January</a:t>
             </a:r>
           </a:p>
         </p:txBody>
@@ -9263,7 +9263,7 @@
           <a:p>
             <a:r>
               <a:rPr/>
-              <a:t>Note that the very recent days are excluded in the 7-day total as these are thought to be incomplete. As such, this data represents cases in the seven days to 21 January</a:t>
+              <a:t>Note that the very recent days are excluded in the 7-day total as these are thought to be incomplete. As such, this data represents cases in the seven days to 22 January</a:t>
             </a:r>
           </a:p>
         </p:txBody>
@@ -9731,7 +9731,7 @@
                           <a:ea typeface="Calibri"/>
                           <a:sym typeface="Calibri"/>
                         </a:rPr>
-                        <a:t>9,096</a:t>
+                        <a:t>9,271</a:t>
                       </a:r>
                     </a:p>
                   </a:txBody>
@@ -9799,7 +9799,7 @@
                           <a:ea typeface="Calibri"/>
                           <a:sym typeface="Calibri"/>
                         </a:rPr>
-                        <a:t>1,048.4</a:t>
+                        <a:t>1,068.5</a:t>
                       </a:r>
                     </a:p>
                   </a:txBody>
@@ -9867,7 +9867,7 @@
                           <a:ea typeface="Calibri"/>
                           <a:sym typeface="Calibri"/>
                         </a:rPr>
-                        <a:t>59th</a:t>
+                        <a:t>53rd</a:t>
                       </a:r>
                     </a:p>
                   </a:txBody>
@@ -10073,7 +10073,7 @@
                           <a:ea typeface="Calibri"/>
                           <a:sym typeface="Calibri"/>
                         </a:rPr>
-                        <a:t>563,231</a:t>
+                        <a:t>565,453</a:t>
                       </a:r>
                     </a:p>
                   </a:txBody>
@@ -10141,7 +10141,7 @@
                           <a:ea typeface="Calibri"/>
                           <a:sym typeface="Calibri"/>
                         </a:rPr>
-                        <a:t>996.0</a:t>
+                        <a:t>999.9</a:t>
                       </a:r>
                     </a:p>
                   </a:txBody>
@@ -10415,7 +10415,7 @@
                           <a:ea typeface="Calibri"/>
                           <a:sym typeface="Calibri"/>
                         </a:rPr>
-                        <a:t>97,039</a:t>
+                        <a:t>99,169</a:t>
                       </a:r>
                     </a:p>
                   </a:txBody>
@@ -10483,7 +10483,7 @@
                           <a:ea typeface="Calibri"/>
                           <a:sym typeface="Calibri"/>
                         </a:rPr>
-                        <a:t>1,052.8</a:t>
+                        <a:t>1,075.9</a:t>
                       </a:r>
                     </a:p>
                   </a:txBody>
@@ -10736,7 +10736,7 @@
           <a:p>
             <a:r>
               <a:rPr/>
-              <a:t>Pack date: 26 January 2022</a:t>
+              <a:t>Pack date: 27 January 2022</a:t>
             </a:r>
           </a:p>
         </p:txBody>
@@ -10817,7 +10817,7 @@
           <a:p>
             <a:r>
               <a:rPr/>
-              <a:t>Lower Tier Local Authority cumulative cases as at 26 January</a:t>
+              <a:t>Lower Tier Local Authority cumulative cases as at 27 January</a:t>
             </a:r>
           </a:p>
         </p:txBody>
@@ -11339,7 +11339,7 @@
                           <a:ea typeface="Calibri"/>
                           <a:sym typeface="Calibri"/>
                         </a:rPr>
-                        <a:t>12,868</a:t>
+                        <a:t>13,005</a:t>
                       </a:r>
                     </a:p>
                   </a:txBody>
@@ -11407,7 +11407,7 @@
                           <a:ea typeface="Calibri"/>
                           <a:sym typeface="Calibri"/>
                         </a:rPr>
-                        <a:t>20,047.7</a:t>
+                        <a:t>20,261.1</a:t>
                       </a:r>
                     </a:p>
                   </a:txBody>
@@ -11475,7 +11475,7 @@
                           <a:ea typeface="Calibri"/>
                           <a:sym typeface="Calibri"/>
                         </a:rPr>
-                        <a:t>270th</a:t>
+                        <a:t>269th</a:t>
                       </a:r>
                     </a:p>
                   </a:txBody>
@@ -11681,7 +11681,7 @@
                           <a:ea typeface="Calibri"/>
                           <a:sym typeface="Calibri"/>
                         </a:rPr>
-                        <a:t>32,760</a:t>
+                        <a:t>33,077</a:t>
                       </a:r>
                     </a:p>
                   </a:txBody>
@@ -11749,7 +11749,7 @@
                           <a:ea typeface="Calibri"/>
                           <a:sym typeface="Calibri"/>
                         </a:rPr>
-                        <a:t>20,332.3</a:t>
+                        <a:t>20,529.0</a:t>
                       </a:r>
                     </a:p>
                   </a:txBody>
@@ -12023,7 +12023,7 @@
                           <a:ea typeface="Calibri"/>
                           <a:sym typeface="Calibri"/>
                         </a:rPr>
-                        <a:t>23,298</a:t>
+                        <a:t>23,532</a:t>
                       </a:r>
                     </a:p>
                   </a:txBody>
@@ -12091,7 +12091,7 @@
                           <a:ea typeface="Calibri"/>
                           <a:sym typeface="Calibri"/>
                         </a:rPr>
-                        <a:t>19,174.0</a:t>
+                        <a:t>19,366.6</a:t>
                       </a:r>
                     </a:p>
                   </a:txBody>
@@ -12365,7 +12365,7 @@
                           <a:ea typeface="Calibri"/>
                           <a:sym typeface="Calibri"/>
                         </a:rPr>
-                        <a:t>29,361</a:t>
+                        <a:t>29,626</a:t>
                       </a:r>
                     </a:p>
                   </a:txBody>
@@ -12433,7 +12433,7 @@
                           <a:ea typeface="Calibri"/>
                           <a:sym typeface="Calibri"/>
                         </a:rPr>
-                        <a:t>26,104.7</a:t>
+                        <a:t>26,340.3</a:t>
                       </a:r>
                     </a:p>
                   </a:txBody>
@@ -12501,7 +12501,7 @@
                           <a:ea typeface="Calibri"/>
                           <a:sym typeface="Calibri"/>
                         </a:rPr>
-                        <a:t>81st</a:t>
+                        <a:t>76th</a:t>
                       </a:r>
                     </a:p>
                   </a:txBody>
@@ -12707,7 +12707,7 @@
                           <a:ea typeface="Calibri"/>
                           <a:sym typeface="Calibri"/>
                         </a:rPr>
-                        <a:t>28,734</a:t>
+                        <a:t>28,997</a:t>
                       </a:r>
                     </a:p>
                   </a:txBody>
@@ -12775,7 +12775,7 @@
                           <a:ea typeface="Calibri"/>
                           <a:sym typeface="Calibri"/>
                         </a:rPr>
-                        <a:t>19,752.0</a:t>
+                        <a:t>19,932.8</a:t>
                       </a:r>
                     </a:p>
                   </a:txBody>
@@ -13049,7 +13049,7 @@
                           <a:ea typeface="Calibri"/>
                           <a:sym typeface="Calibri"/>
                         </a:rPr>
-                        <a:t>34,481</a:t>
+                        <a:t>34,751</a:t>
                       </a:r>
                     </a:p>
                   </a:txBody>
@@ -13117,7 +13117,7 @@
                           <a:ea typeface="Calibri"/>
                           <a:sym typeface="Calibri"/>
                         </a:rPr>
-                        <a:t>22,663.7</a:t>
+                        <a:t>22,841.2</a:t>
                       </a:r>
                     </a:p>
                   </a:txBody>
@@ -13185,7 +13185,7 @@
                           <a:ea typeface="Calibri"/>
                           <a:sym typeface="Calibri"/>
                         </a:rPr>
-                        <a:t>208th</a:t>
+                        <a:t>209th</a:t>
                       </a:r>
                     </a:p>
                   </a:txBody>
@@ -13391,7 +13391,7 @@
                           <a:ea typeface="Calibri"/>
                           <a:sym typeface="Calibri"/>
                         </a:rPr>
-                        <a:t>22,673</a:t>
+                        <a:t>22,893</a:t>
                       </a:r>
                     </a:p>
                   </a:txBody>
@@ -13459,7 +13459,7 @@
                           <a:ea typeface="Calibri"/>
                           <a:sym typeface="Calibri"/>
                         </a:rPr>
-                        <a:t>20,476.5</a:t>
+                        <a:t>20,675.2</a:t>
                       </a:r>
                     </a:p>
                   </a:txBody>
@@ -13527,7 +13527,7 @@
                           <a:ea typeface="Calibri"/>
                           <a:sym typeface="Calibri"/>
                         </a:rPr>
-                        <a:t>259th</a:t>
+                        <a:t>256th</a:t>
                       </a:r>
                     </a:p>
                   </a:txBody>
@@ -13733,7 +13733,7 @@
                           <a:ea typeface="Calibri"/>
                           <a:sym typeface="Calibri"/>
                         </a:rPr>
-                        <a:t>184,175</a:t>
+                        <a:t>185,881</a:t>
                       </a:r>
                     </a:p>
                   </a:txBody>
@@ -13801,7 +13801,7 @@
                           <a:ea typeface="Calibri"/>
                           <a:sym typeface="Calibri"/>
                         </a:rPr>
-                        <a:t>21,227.2</a:t>
+                        <a:t>21,423.9</a:t>
                       </a:r>
                     </a:p>
                   </a:txBody>
@@ -14075,7 +14075,7 @@
                           <a:ea typeface="Calibri"/>
                           <a:sym typeface="Calibri"/>
                         </a:rPr>
-                        <a:t>2,089,868</a:t>
+                        <a:t>2,106,874</a:t>
                       </a:r>
                     </a:p>
                   </a:txBody>
@@ -14143,7 +14143,7 @@
                           <a:ea typeface="Calibri"/>
                           <a:sym typeface="Calibri"/>
                         </a:rPr>
-                        <a:t>22,673.4</a:t>
+                        <a:t>22,857.9</a:t>
                       </a:r>
                     </a:p>
                   </a:txBody>
@@ -14417,7 +14417,7 @@
                           <a:ea typeface="Calibri"/>
                           <a:sym typeface="Calibri"/>
                         </a:rPr>
-                        <a:t>13,732,435</a:t>
+                        <a:t>13,817,017</a:t>
                       </a:r>
                     </a:p>
                   </a:txBody>
@@ -14485,7 +14485,7 @@
                           <a:ea typeface="Calibri"/>
                           <a:sym typeface="Calibri"/>
                         </a:rPr>
-                        <a:t>24,283.6</a:t>
+                        <a:t>24,433.2</a:t>
                       </a:r>
                     </a:p>
                   </a:txBody>
@@ -14738,7 +14738,7 @@
           <a:p>
             <a:r>
               <a:rPr/>
-              <a:t>Pack date: 26 January 2022</a:t>
+              <a:t>Pack date: 27 January 2022</a:t>
             </a:r>
           </a:p>
         </p:txBody>
@@ -14819,7 +14819,7 @@
           <a:p>
             <a:r>
               <a:rPr/>
-              <a:t>Lower Tier Local Authority rolling cases as at 26 January</a:t>
+              <a:t>Lower Tier Local Authority rolling cases as at 27 January</a:t>
             </a:r>
           </a:p>
         </p:txBody>
@@ -14900,7 +14900,7 @@
           <a:p>
             <a:r>
               <a:rPr/>
-              <a:t>Note that the very recent days are excluded in the 7-day total as these are thought to be incomplete. As such, this data represents cases in the seven days to 21 January</a:t>
+              <a:t>Note that the very recent days are excluded in the 7-day total as these are thought to be incomplete. As such, this data represents cases in the seven days to 22 January</a:t>
             </a:r>
           </a:p>
         </p:txBody>
@@ -15368,7 +15368,7 @@
                           <a:ea typeface="Calibri"/>
                           <a:sym typeface="Calibri"/>
                         </a:rPr>
-                        <a:t>707</a:t>
+                        <a:t>711</a:t>
                       </a:r>
                     </a:p>
                   </a:txBody>
@@ -15436,7 +15436,7 @@
                           <a:ea typeface="Calibri"/>
                           <a:sym typeface="Calibri"/>
                         </a:rPr>
-                        <a:t>1,101.5</a:t>
+                        <a:t>1,107.7</a:t>
                       </a:r>
                     </a:p>
                   </a:txBody>
@@ -15504,7 +15504,7 @@
                           <a:ea typeface="Calibri"/>
                           <a:sym typeface="Calibri"/>
                         </a:rPr>
-                        <a:t>92nd</a:t>
+                        <a:t>91st</a:t>
                       </a:r>
                     </a:p>
                   </a:txBody>
@@ -15710,7 +15710,7 @@
                           <a:ea typeface="Calibri"/>
                           <a:sym typeface="Calibri"/>
                         </a:rPr>
-                        <a:t>1,519</a:t>
+                        <a:t>1,568</a:t>
                       </a:r>
                     </a:p>
                   </a:txBody>
@@ -15778,7 +15778,7 @@
                           <a:ea typeface="Calibri"/>
                           <a:sym typeface="Calibri"/>
                         </a:rPr>
-                        <a:t>942.8</a:t>
+                        <a:t>973.2</a:t>
                       </a:r>
                     </a:p>
                   </a:txBody>
@@ -15846,7 +15846,7 @@
                           <a:ea typeface="Calibri"/>
                           <a:sym typeface="Calibri"/>
                         </a:rPr>
-                        <a:t>184th</a:t>
+                        <a:t>168th</a:t>
                       </a:r>
                     </a:p>
                   </a:txBody>
@@ -16052,7 +16052,7 @@
                           <a:ea typeface="Calibri"/>
                           <a:sym typeface="Calibri"/>
                         </a:rPr>
-                        <a:t>1,113</a:t>
+                        <a:t>1,185</a:t>
                       </a:r>
                     </a:p>
                   </a:txBody>
@@ -16120,7 +16120,7 @@
                           <a:ea typeface="Calibri"/>
                           <a:sym typeface="Calibri"/>
                         </a:rPr>
-                        <a:t>916.0</a:t>
+                        <a:t>975.2</a:t>
                       </a:r>
                     </a:p>
                   </a:txBody>
@@ -16188,7 +16188,7 @@
                           <a:ea typeface="Calibri"/>
                           <a:sym typeface="Calibri"/>
                         </a:rPr>
-                        <a:t>203rd</a:t>
+                        <a:t>166th</a:t>
                       </a:r>
                     </a:p>
                   </a:txBody>
@@ -16256,7 +16256,7 @@
                           <a:ea typeface="Calibri"/>
                           <a:sym typeface="Calibri"/>
                         </a:rPr>
-                        <a:t>Decile 7</a:t>
+                        <a:t>Decile 6</a:t>
                       </a:r>
                     </a:p>
                   </a:txBody>
@@ -16394,7 +16394,7 @@
                           <a:ea typeface="Calibri"/>
                           <a:sym typeface="Calibri"/>
                         </a:rPr>
-                        <a:t>1,279</a:t>
+                        <a:t>1,299</a:t>
                       </a:r>
                     </a:p>
                   </a:txBody>
@@ -16462,7 +16462,7 @@
                           <a:ea typeface="Calibri"/>
                           <a:sym typeface="Calibri"/>
                         </a:rPr>
-                        <a:t>1,137.2</a:t>
+                        <a:t>1,154.9</a:t>
                       </a:r>
                     </a:p>
                   </a:txBody>
@@ -16530,7 +16530,7 @@
                           <a:ea typeface="Calibri"/>
                           <a:sym typeface="Calibri"/>
                         </a:rPr>
-                        <a:t>72nd</a:t>
+                        <a:t>64th</a:t>
                       </a:r>
                     </a:p>
                   </a:txBody>
@@ -16736,7 +16736,7 @@
                           <a:ea typeface="Calibri"/>
                           <a:sym typeface="Calibri"/>
                         </a:rPr>
-                        <a:t>1,632</a:t>
+                        <a:t>1,653</a:t>
                       </a:r>
                     </a:p>
                   </a:txBody>
@@ -16804,7 +16804,7 @@
                           <a:ea typeface="Calibri"/>
                           <a:sym typeface="Calibri"/>
                         </a:rPr>
-                        <a:t>1,121.8</a:t>
+                        <a:t>1,136.3</a:t>
                       </a:r>
                     </a:p>
                   </a:txBody>
@@ -16872,7 +16872,7 @@
                           <a:ea typeface="Calibri"/>
                           <a:sym typeface="Calibri"/>
                         </a:rPr>
-                        <a:t>83rd</a:t>
+                        <a:t>73rd</a:t>
                       </a:r>
                     </a:p>
                   </a:txBody>
@@ -17078,7 +17078,7 @@
                           <a:ea typeface="Calibri"/>
                           <a:sym typeface="Calibri"/>
                         </a:rPr>
-                        <a:t>1,708</a:t>
+                        <a:t>1,711</a:t>
                       </a:r>
                     </a:p>
                   </a:txBody>
@@ -17146,7 +17146,7 @@
                           <a:ea typeface="Calibri"/>
                           <a:sym typeface="Calibri"/>
                         </a:rPr>
-                        <a:t>1,122.6</a:t>
+                        <a:t>1,124.6</a:t>
                       </a:r>
                     </a:p>
                   </a:txBody>
@@ -17214,7 +17214,7 @@
                           <a:ea typeface="Calibri"/>
                           <a:sym typeface="Calibri"/>
                         </a:rPr>
-                        <a:t>82nd</a:t>
+                        <a:t>79th</a:t>
                       </a:r>
                     </a:p>
                   </a:txBody>
@@ -17420,7 +17420,7 @@
                           <a:ea typeface="Calibri"/>
                           <a:sym typeface="Calibri"/>
                         </a:rPr>
-                        <a:t>1,138</a:t>
+                        <a:t>1,144</a:t>
                       </a:r>
                     </a:p>
                   </a:txBody>
@@ -17488,7 +17488,7 @@
                           <a:ea typeface="Calibri"/>
                           <a:sym typeface="Calibri"/>
                         </a:rPr>
-                        <a:t>1,027.8</a:t>
+                        <a:t>1,033.2</a:t>
                       </a:r>
                     </a:p>
                   </a:txBody>
@@ -17556,7 +17556,7 @@
                           <a:ea typeface="Calibri"/>
                           <a:sym typeface="Calibri"/>
                         </a:rPr>
-                        <a:t>136th</a:t>
+                        <a:t>140th</a:t>
                       </a:r>
                     </a:p>
                   </a:txBody>
@@ -17762,7 +17762,7 @@
                           <a:ea typeface="Calibri"/>
                           <a:sym typeface="Calibri"/>
                         </a:rPr>
-                        <a:t>9,096</a:t>
+                        <a:t>9,271</a:t>
                       </a:r>
                     </a:p>
                   </a:txBody>
@@ -17830,7 +17830,7 @@
                           <a:ea typeface="Calibri"/>
                           <a:sym typeface="Calibri"/>
                         </a:rPr>
-                        <a:t>1,048.4</a:t>
+                        <a:t>1,068.5</a:t>
                       </a:r>
                     </a:p>
                   </a:txBody>
@@ -18104,7 +18104,7 @@
                           <a:ea typeface="Calibri"/>
                           <a:sym typeface="Calibri"/>
                         </a:rPr>
-                        <a:t>563,231</a:t>
+                        <a:t>565,453</a:t>
                       </a:r>
                     </a:p>
                   </a:txBody>
@@ -18172,7 +18172,7 @@
                           <a:ea typeface="Calibri"/>
                           <a:sym typeface="Calibri"/>
                         </a:rPr>
-                        <a:t>996.0</a:t>
+                        <a:t>999.9</a:t>
                       </a:r>
                     </a:p>
                   </a:txBody>
@@ -18446,7 +18446,7 @@
                           <a:ea typeface="Calibri"/>
                           <a:sym typeface="Calibri"/>
                         </a:rPr>
-                        <a:t>97,039</a:t>
+                        <a:t>99,169</a:t>
                       </a:r>
                     </a:p>
                   </a:txBody>
@@ -18514,7 +18514,7 @@
                           <a:ea typeface="Calibri"/>
                           <a:sym typeface="Calibri"/>
                         </a:rPr>
-                        <a:t>1,052.8</a:t>
+                        <a:t>1,075.9</a:t>
                       </a:r>
                     </a:p>
                   </a:txBody>
@@ -18741,7 +18741,7 @@
           <a:p>
             <a:r>
               <a:rPr/>
-              <a:t>Pack date: 26 January 2022</a:t>
+              <a:t>Pack date: 27 January 2022</a:t>
             </a:r>
           </a:p>
         </p:txBody>
@@ -18899,7 +18899,7 @@
           <a:p>
             <a:r>
               <a:rPr/>
-              <a:t>Pack date: 26 January 2022</a:t>
+              <a:t>Pack date: 27 January 2022</a:t>
             </a:r>
           </a:p>
         </p:txBody>
@@ -19057,7 +19057,7 @@
           <a:p>
             <a:r>
               <a:rPr/>
-              <a:t>Pack date: 26 January 2022</a:t>
+              <a:t>Pack date: 27 January 2022</a:t>
             </a:r>
           </a:p>
         </p:txBody>
@@ -19215,7 +19215,7 @@
           <a:p>
             <a:r>
               <a:rPr/>
-              <a:t>Pack date: 26 January 2022</a:t>
+              <a:t>Pack date: 27 January 2022</a:t>
             </a:r>
           </a:p>
         </p:txBody>
@@ -19373,7 +19373,7 @@
           <a:p>
             <a:r>
               <a:rPr/>
-              <a:t>Pack date: 26 January 2022</a:t>
+              <a:t>Pack date: 27 January 2022</a:t>
             </a:r>
           </a:p>
         </p:txBody>
@@ -19562,7 +19562,7 @@
           <a:p>
             <a:r>
               <a:rPr/>
-              <a:t>Pack date: 26 January 2022</a:t>
+              <a:t>Pack date: 27 January 2022</a:t>
             </a:r>
           </a:p>
         </p:txBody>
@@ -19720,7 +19720,7 @@
           <a:p>
             <a:r>
               <a:rPr/>
-              <a:t>Pack date: 26 January 2022</a:t>
+              <a:t>Pack date: 27 January 2022</a:t>
             </a:r>
           </a:p>
         </p:txBody>
@@ -19878,7 +19878,7 @@
           <a:p>
             <a:r>
               <a:rPr/>
-              <a:t>Pack date: 26 January 2022</a:t>
+              <a:t>Pack date: 27 January 2022</a:t>
             </a:r>
           </a:p>
         </p:txBody>
@@ -20036,7 +20036,7 @@
           <a:p>
             <a:r>
               <a:rPr/>
-              <a:t>Pack date: 26 January 2022</a:t>
+              <a:t>Pack date: 27 January 2022</a:t>
             </a:r>
           </a:p>
         </p:txBody>
@@ -20194,7 +20194,7 @@
           <a:p>
             <a:r>
               <a:rPr/>
-              <a:t>Pack date: 26 January 2022</a:t>
+              <a:t>Pack date: 27 January 2022</a:t>
             </a:r>
           </a:p>
         </p:txBody>
@@ -20326,7 +20326,7 @@
           <a:p>
             <a:r>
               <a:rPr/>
-              <a:t>Pack date: 26 January 2022</a:t>
+              <a:t>Pack date: 27 January 2022</a:t>
             </a:r>
           </a:p>
         </p:txBody>
@@ -20458,7 +20458,7 @@
           <a:p>
             <a:r>
               <a:rPr/>
-              <a:t>Pack date: 26 January 2022</a:t>
+              <a:t>Pack date: 27 January 2022</a:t>
             </a:r>
           </a:p>
         </p:txBody>
@@ -20590,7 +20590,7 @@
           <a:p>
             <a:r>
               <a:rPr/>
-              <a:t>Pack date: 26 January 2022</a:t>
+              <a:t>Pack date: 27 January 2022</a:t>
             </a:r>
           </a:p>
         </p:txBody>
@@ -20722,7 +20722,7 @@
           <a:p>
             <a:r>
               <a:rPr/>
-              <a:t>Pack date: 26 January 2022</a:t>
+              <a:t>Pack date: 27 January 2022</a:t>
             </a:r>
           </a:p>
         </p:txBody>
@@ -20854,7 +20854,7 @@
           <a:p>
             <a:r>
               <a:rPr/>
-              <a:t>Pack date: 26 January 2022</a:t>
+              <a:t>Pack date: 27 January 2022</a:t>
             </a:r>
           </a:p>
         </p:txBody>
@@ -20986,7 +20986,7 @@
           <a:p>
             <a:r>
               <a:rPr/>
-              <a:t>Pack date: 26 January 2022</a:t>
+              <a:t>Pack date: 27 January 2022</a:t>
             </a:r>
           </a:p>
         </p:txBody>

</xml_diff>

<commit_message>
april 11 plus local vac
</commit_message>
<xml_diff>
--- a/Latest_West_Sussex_C19_slide_deck.pptx
+++ b/Latest_West_Sussex_C19_slide_deck.pptx
@@ -7176,7 +7176,7 @@
           <a:p>
             <a:r>
               <a:rPr/>
-              <a:t>Pack date: 07 April 2022</a:t>
+              <a:t>Pack date: 12 April 2022</a:t>
             </a:r>
           </a:p>
         </p:txBody>
@@ -7308,7 +7308,7 @@
           <a:p>
             <a:r>
               <a:rPr/>
-              <a:t>Pack date: 07 April 2022</a:t>
+              <a:t>Pack date: 12 April 2022</a:t>
             </a:r>
           </a:p>
         </p:txBody>
@@ -7466,7 +7466,7 @@
           <a:p>
             <a:r>
               <a:rPr/>
-              <a:t>Pack date: 07 April 2022</a:t>
+              <a:t>Pack date: 12 April 2022</a:t>
             </a:r>
           </a:p>
         </p:txBody>
@@ -7547,7 +7547,7 @@
           <a:p>
             <a:r>
               <a:rPr/>
-              <a:t>Upper Tier Local Authority cumulative cases as at 07 April</a:t>
+              <a:t>Upper Tier Local Authority cumulative cases as at 11 April</a:t>
             </a:r>
           </a:p>
         </p:txBody>
@@ -8096,7 +8096,7 @@
                           <a:ea typeface="Calibri"/>
                           <a:sym typeface="Calibri"/>
                         </a:rPr>
-                        <a:t>266,499</a:t>
+                        <a:t>268,439</a:t>
                       </a:r>
                     </a:p>
                   </a:txBody>
@@ -8164,7 +8164,7 @@
                           <a:ea typeface="Calibri"/>
                           <a:sym typeface="Calibri"/>
                         </a:rPr>
-                        <a:t>30,715.6</a:t>
+                        <a:t>30,939.2</a:t>
                       </a:r>
                     </a:p>
                   </a:txBody>
@@ -8232,7 +8232,7 @@
                           <a:ea typeface="Calibri"/>
                           <a:sym typeface="Calibri"/>
                         </a:rPr>
-                        <a:t>115th</a:t>
+                        <a:t>114th</a:t>
                       </a:r>
                     </a:p>
                   </a:txBody>
@@ -8438,7 +8438,7 @@
                           <a:ea typeface="Calibri"/>
                           <a:sym typeface="Calibri"/>
                         </a:rPr>
-                        <a:t>18,108,626</a:t>
+                        <a:t>18,217,512</a:t>
                       </a:r>
                     </a:p>
                   </a:txBody>
@@ -8506,7 +8506,7 @@
                           <a:ea typeface="Calibri"/>
                           <a:sym typeface="Calibri"/>
                         </a:rPr>
-                        <a:t>32,022.2</a:t>
+                        <a:t>32,214.8</a:t>
                       </a:r>
                     </a:p>
                   </a:txBody>
@@ -8780,7 +8780,7 @@
                           <a:ea typeface="Calibri"/>
                           <a:sym typeface="Calibri"/>
                         </a:rPr>
-                        <a:t>2,916,641</a:t>
+                        <a:t>2,936,774</a:t>
                       </a:r>
                     </a:p>
                   </a:txBody>
@@ -8848,7 +8848,7 @@
                           <a:ea typeface="Calibri"/>
                           <a:sym typeface="Calibri"/>
                         </a:rPr>
-                        <a:t>31,643.2</a:t>
+                        <a:t>31,861.7</a:t>
                       </a:r>
                     </a:p>
                   </a:txBody>
@@ -9101,7 +9101,7 @@
           <a:p>
             <a:r>
               <a:rPr/>
-              <a:t>Pack date: 07 April 2022</a:t>
+              <a:t>Pack date: 12 April 2022</a:t>
             </a:r>
           </a:p>
         </p:txBody>
@@ -9182,7 +9182,7 @@
           <a:p>
             <a:r>
               <a:rPr/>
-              <a:t>Upper Tier Local Authority rolling 7 day cases as at 07 April</a:t>
+              <a:t>Upper Tier Local Authority rolling 7 day cases as at 11 April</a:t>
             </a:r>
           </a:p>
         </p:txBody>
@@ -9263,7 +9263,7 @@
           <a:p>
             <a:r>
               <a:rPr/>
-              <a:t>Note that the very recent days are excluded in the 7-day total as these are thought to be incomplete. As such, this data represents cases in the seven days to 02 April</a:t>
+              <a:t>Note that the very recent days are excluded in the 7-day total as these are thought to be incomplete. As such, this data represents cases in the seven days to 06 April</a:t>
             </a:r>
           </a:p>
         </p:txBody>
@@ -9731,7 +9731,7 @@
                           <a:ea typeface="Calibri"/>
                           <a:sym typeface="Calibri"/>
                         </a:rPr>
-                        <a:t>6,346</a:t>
+                        <a:t>4,573</a:t>
                       </a:r>
                     </a:p>
                   </a:txBody>
@@ -9799,7 +9799,7 @@
                           <a:ea typeface="Calibri"/>
                           <a:sym typeface="Calibri"/>
                         </a:rPr>
-                        <a:t>731.4</a:t>
+                        <a:t>527.1</a:t>
                       </a:r>
                     </a:p>
                   </a:txBody>
@@ -9867,7 +9867,7 @@
                           <a:ea typeface="Calibri"/>
                           <a:sym typeface="Calibri"/>
                         </a:rPr>
-                        <a:t>52nd</a:t>
+                        <a:t>50th</a:t>
                       </a:r>
                     </a:p>
                   </a:txBody>
@@ -10073,7 +10073,7 @@
                           <a:ea typeface="Calibri"/>
                           <a:sym typeface="Calibri"/>
                         </a:rPr>
-                        <a:t>383,149</a:t>
+                        <a:t>273,624</a:t>
                       </a:r>
                     </a:p>
                   </a:txBody>
@@ -10141,7 +10141,7 @@
                           <a:ea typeface="Calibri"/>
                           <a:sym typeface="Calibri"/>
                         </a:rPr>
-                        <a:t>677.5</a:t>
+                        <a:t>483.9</a:t>
                       </a:r>
                     </a:p>
                   </a:txBody>
@@ -10415,7 +10415,7 @@
                           <a:ea typeface="Calibri"/>
                           <a:sym typeface="Calibri"/>
                         </a:rPr>
-                        <a:t>70,275</a:t>
+                        <a:t>50,317</a:t>
                       </a:r>
                     </a:p>
                   </a:txBody>
@@ -10483,7 +10483,7 @@
                           <a:ea typeface="Calibri"/>
                           <a:sym typeface="Calibri"/>
                         </a:rPr>
-                        <a:t>762.4</a:t>
+                        <a:t>545.9</a:t>
                       </a:r>
                     </a:p>
                   </a:txBody>
@@ -10736,7 +10736,7 @@
           <a:p>
             <a:r>
               <a:rPr/>
-              <a:t>Pack date: 07 April 2022</a:t>
+              <a:t>Pack date: 12 April 2022</a:t>
             </a:r>
           </a:p>
         </p:txBody>
@@ -10817,7 +10817,7 @@
           <a:p>
             <a:r>
               <a:rPr/>
-              <a:t>Lower Tier Local Authority cumulative cases as at 07 April</a:t>
+              <a:t>Lower Tier Local Authority cumulative cases as at 11 April</a:t>
             </a:r>
           </a:p>
         </p:txBody>
@@ -11339,7 +11339,7 @@
                           <a:ea typeface="Calibri"/>
                           <a:sym typeface="Calibri"/>
                         </a:rPr>
-                        <a:t>18,917</a:t>
+                        <a:t>19,066</a:t>
                       </a:r>
                     </a:p>
                   </a:txBody>
@@ -11407,7 +11407,7 @@
                           <a:ea typeface="Calibri"/>
                           <a:sym typeface="Calibri"/>
                         </a:rPr>
-                        <a:t>29,471.7</a:t>
+                        <a:t>29,703.8</a:t>
                       </a:r>
                     </a:p>
                   </a:txBody>
@@ -11681,7 +11681,7 @@
                           <a:ea typeface="Calibri"/>
                           <a:sym typeface="Calibri"/>
                         </a:rPr>
-                        <a:t>47,312</a:t>
+                        <a:t>47,689</a:t>
                       </a:r>
                     </a:p>
                   </a:txBody>
@@ -11749,7 +11749,7 @@
                           <a:ea typeface="Calibri"/>
                           <a:sym typeface="Calibri"/>
                         </a:rPr>
-                        <a:t>29,363.9</a:t>
+                        <a:t>29,597.9</a:t>
                       </a:r>
                     </a:p>
                   </a:txBody>
@@ -12023,7 +12023,7 @@
                           <a:ea typeface="Calibri"/>
                           <a:sym typeface="Calibri"/>
                         </a:rPr>
-                        <a:t>34,139</a:t>
+                        <a:t>34,407</a:t>
                       </a:r>
                     </a:p>
                   </a:txBody>
@@ -12091,7 +12091,7 @@
                           <a:ea typeface="Calibri"/>
                           <a:sym typeface="Calibri"/>
                         </a:rPr>
-                        <a:t>28,096.1</a:t>
+                        <a:t>28,316.7</a:t>
                       </a:r>
                     </a:p>
                   </a:txBody>
@@ -12365,7 +12365,7 @@
                           <a:ea typeface="Calibri"/>
                           <a:sym typeface="Calibri"/>
                         </a:rPr>
-                        <a:t>39,697</a:t>
+                        <a:t>39,889</a:t>
                       </a:r>
                     </a:p>
                   </a:txBody>
@@ -12433,7 +12433,7 @@
                           <a:ea typeface="Calibri"/>
                           <a:sym typeface="Calibri"/>
                         </a:rPr>
-                        <a:t>35,294.4</a:t>
+                        <a:t>35,465.1</a:t>
                       </a:r>
                     </a:p>
                   </a:txBody>
@@ -12501,7 +12501,7 @@
                           <a:ea typeface="Calibri"/>
                           <a:sym typeface="Calibri"/>
                         </a:rPr>
-                        <a:t>19th</a:t>
+                        <a:t>20th</a:t>
                       </a:r>
                     </a:p>
                   </a:txBody>
@@ -12708,7 +12708,7 @@
                           <a:ea typeface="Calibri"/>
                           <a:sym typeface="Calibri"/>
                         </a:rPr>
-                        <a:t>43,206</a:t>
+                        <a:t>43,521</a:t>
                       </a:r>
                     </a:p>
                   </a:txBody>
@@ -12776,7 +12776,7 @@
                           <a:ea typeface="Calibri"/>
                           <a:sym typeface="Calibri"/>
                         </a:rPr>
-                        <a:t>29,700.2</a:t>
+                        <a:t>29,916.7</a:t>
                       </a:r>
                     </a:p>
                   </a:txBody>
@@ -12844,7 +12844,7 @@
                           <a:ea typeface="Calibri"/>
                           <a:sym typeface="Calibri"/>
                         </a:rPr>
-                        <a:t>247th</a:t>
+                        <a:t>246th</a:t>
                       </a:r>
                     </a:p>
                   </a:txBody>
@@ -13050,7 +13050,7 @@
                           <a:ea typeface="Calibri"/>
                           <a:sym typeface="Calibri"/>
                         </a:rPr>
-                        <a:t>49,173</a:t>
+                        <a:t>49,558</a:t>
                       </a:r>
                     </a:p>
                   </a:txBody>
@@ -13118,7 +13118,7 @@
                           <a:ea typeface="Calibri"/>
                           <a:sym typeface="Calibri"/>
                         </a:rPr>
-                        <a:t>32,320.5</a:t>
+                        <a:t>32,573.5</a:t>
                       </a:r>
                     </a:p>
                   </a:txBody>
@@ -13186,7 +13186,7 @@
                           <a:ea typeface="Calibri"/>
                           <a:sym typeface="Calibri"/>
                         </a:rPr>
-                        <a:t>135th</a:t>
+                        <a:t>133rd</a:t>
                       </a:r>
                     </a:p>
                   </a:txBody>
@@ -13392,7 +13392,7 @@
                           <a:ea typeface="Calibri"/>
                           <a:sym typeface="Calibri"/>
                         </a:rPr>
-                        <a:t>34,055</a:t>
+                        <a:t>34,309</a:t>
                       </a:r>
                     </a:p>
                   </a:txBody>
@@ -13460,7 +13460,7 @@
                           <a:ea typeface="Calibri"/>
                           <a:sym typeface="Calibri"/>
                         </a:rPr>
-                        <a:t>30,755.8</a:t>
+                        <a:t>30,985.2</a:t>
                       </a:r>
                     </a:p>
                   </a:txBody>
@@ -13528,7 +13528,7 @@
                           <a:ea typeface="Calibri"/>
                           <a:sym typeface="Calibri"/>
                         </a:rPr>
-                        <a:t>212th</a:t>
+                        <a:t>210th</a:t>
                       </a:r>
                     </a:p>
                   </a:txBody>
@@ -13734,7 +13734,7 @@
                           <a:ea typeface="Calibri"/>
                           <a:sym typeface="Calibri"/>
                         </a:rPr>
-                        <a:t>266,499</a:t>
+                        <a:t>268,439</a:t>
                       </a:r>
                     </a:p>
                   </a:txBody>
@@ -13802,7 +13802,7 @@
                           <a:ea typeface="Calibri"/>
                           <a:sym typeface="Calibri"/>
                         </a:rPr>
-                        <a:t>30,715.6</a:t>
+                        <a:t>30,939.2</a:t>
                       </a:r>
                     </a:p>
                   </a:txBody>
@@ -14076,7 +14076,7 @@
                           <a:ea typeface="Calibri"/>
                           <a:sym typeface="Calibri"/>
                         </a:rPr>
-                        <a:t>2,916,641</a:t>
+                        <a:t>2,936,774</a:t>
                       </a:r>
                     </a:p>
                   </a:txBody>
@@ -14144,7 +14144,7 @@
                           <a:ea typeface="Calibri"/>
                           <a:sym typeface="Calibri"/>
                         </a:rPr>
-                        <a:t>31,643.2</a:t>
+                        <a:t>31,861.7</a:t>
                       </a:r>
                     </a:p>
                   </a:txBody>
@@ -14418,7 +14418,7 @@
                           <a:ea typeface="Calibri"/>
                           <a:sym typeface="Calibri"/>
                         </a:rPr>
-                        <a:t>18,108,626</a:t>
+                        <a:t>18,217,512</a:t>
                       </a:r>
                     </a:p>
                   </a:txBody>
@@ -14486,7 +14486,7 @@
                           <a:ea typeface="Calibri"/>
                           <a:sym typeface="Calibri"/>
                         </a:rPr>
-                        <a:t>32,022.2</a:t>
+                        <a:t>32,214.8</a:t>
                       </a:r>
                     </a:p>
                   </a:txBody>
@@ -14739,7 +14739,7 @@
           <a:p>
             <a:r>
               <a:rPr/>
-              <a:t>Pack date: 07 April 2022</a:t>
+              <a:t>Pack date: 12 April 2022</a:t>
             </a:r>
           </a:p>
         </p:txBody>
@@ -14820,7 +14820,7 @@
           <a:p>
             <a:r>
               <a:rPr/>
-              <a:t>Lower Tier Local Authority rolling cases as at 07 April</a:t>
+              <a:t>Lower Tier Local Authority rolling cases as at 11 April</a:t>
             </a:r>
           </a:p>
         </p:txBody>
@@ -14901,7 +14901,7 @@
           <a:p>
             <a:r>
               <a:rPr/>
-              <a:t>Note that the very recent days are excluded in the 7-day total as these are thought to be incomplete. As such, this data represents cases in the seven days to 02 April</a:t>
+              <a:t>Note that the very recent days are excluded in the 7-day total as these are thought to be incomplete. As such, this data represents cases in the seven days to 06 April</a:t>
             </a:r>
           </a:p>
         </p:txBody>
@@ -15369,7 +15369,7 @@
                           <a:ea typeface="Calibri"/>
                           <a:sym typeface="Calibri"/>
                         </a:rPr>
-                        <a:t>422</a:t>
+                        <a:t>310</a:t>
                       </a:r>
                     </a:p>
                   </a:txBody>
@@ -15437,7 +15437,7 @@
                           <a:ea typeface="Calibri"/>
                           <a:sym typeface="Calibri"/>
                         </a:rPr>
-                        <a:t>657.5</a:t>
+                        <a:t>483.0</a:t>
                       </a:r>
                     </a:p>
                   </a:txBody>
@@ -15505,7 +15505,7 @@
                           <a:ea typeface="Calibri"/>
                           <a:sym typeface="Calibri"/>
                         </a:rPr>
-                        <a:t>206th</a:t>
+                        <a:t>190th</a:t>
                       </a:r>
                     </a:p>
                   </a:txBody>
@@ -15711,7 +15711,7 @@
                           <a:ea typeface="Calibri"/>
                           <a:sym typeface="Calibri"/>
                         </a:rPr>
-                        <a:t>1,096</a:t>
+                        <a:t>837</a:t>
                       </a:r>
                     </a:p>
                   </a:txBody>
@@ -15779,7 +15779,7 @@
                           <a:ea typeface="Calibri"/>
                           <a:sym typeface="Calibri"/>
                         </a:rPr>
-                        <a:t>680.2</a:t>
+                        <a:t>519.5</a:t>
                       </a:r>
                     </a:p>
                   </a:txBody>
@@ -15847,7 +15847,1033 @@
                           <a:ea typeface="Calibri"/>
                           <a:sym typeface="Calibri"/>
                         </a:rPr>
-                        <a:t>187th</a:t>
+                        <a:t>149th</a:t>
+                      </a:r>
+                    </a:p>
+                  </a:txBody>
+                  <a:tcPr anchor="t" marB="0" marT="0" marR="0" marL="0">
+                    <a:lnL w="0" cmpd="sng" algn="ctr" cap="flat">
+                      <a:solidFill>
+                        <a:srgbClr val="FFFFFF">
+                          <a:alpha val="0"/>
+                        </a:srgbClr>
+                      </a:solidFill>
+                      <a:prstDash val="solid"/>
+                    </a:lnL>
+                    <a:lnR w="0" cmpd="sng" algn="ctr" cap="flat">
+                      <a:solidFill>
+                        <a:srgbClr val="FFFFFF">
+                          <a:alpha val="0"/>
+                        </a:srgbClr>
+                      </a:solidFill>
+                      <a:prstDash val="solid"/>
+                    </a:lnR>
+                    <a:lnT w="0" cmpd="sng" algn="ctr" cap="flat">
+                      <a:solidFill>
+                        <a:srgbClr val="FFFFFF">
+                          <a:alpha val="0"/>
+                        </a:srgbClr>
+                      </a:solidFill>
+                      <a:prstDash val="solid"/>
+                    </a:lnT>
+                    <a:lnB w="0" cmpd="sng" algn="ctr" cap="flat">
+                      <a:solidFill>
+                        <a:srgbClr val="FFFFFF">
+                          <a:alpha val="0"/>
+                        </a:srgbClr>
+                      </a:solidFill>
+                      <a:prstDash val="solid"/>
+                    </a:lnB>
+                  </a:tcPr>
+                </a:tc>
+                <a:tc>
+                  <a:txBody>
+                    <a:bodyPr/>
+                    <a:lstStyle/>
+                    <a:p>
+                      <a:pPr algn="l" marL="63500" marR="63500">
+                        <a:lnSpc>
+                          <a:spcPct val="100000"/>
+                        </a:lnSpc>
+                        <a:spcBef>
+                          <a:spcPts val="500"/>
+                        </a:spcBef>
+                        <a:spcAft>
+                          <a:spcPts val="500"/>
+                        </a:spcAft>
+                        <a:buNone/>
+                      </a:pPr>
+                      <a:r>
+                        <a:rPr sz="1100">
+                          <a:solidFill>
+                            <a:srgbClr val="000000">
+                              <a:alpha val="100000"/>
+                            </a:srgbClr>
+                          </a:solidFill>
+                          <a:latin typeface="Calibri"/>
+                          <a:cs typeface="Calibri"/>
+                          <a:ea typeface="Calibri"/>
+                          <a:sym typeface="Calibri"/>
+                        </a:rPr>
+                        <a:t>Decile 5</a:t>
+                      </a:r>
+                    </a:p>
+                  </a:txBody>
+                  <a:tcPr anchor="t" marB="0" marT="0" marR="0" marL="0">
+                    <a:lnL w="0" cmpd="sng" algn="ctr" cap="flat">
+                      <a:solidFill>
+                        <a:srgbClr val="FFFFFF">
+                          <a:alpha val="0"/>
+                        </a:srgbClr>
+                      </a:solidFill>
+                      <a:prstDash val="solid"/>
+                    </a:lnL>
+                    <a:lnR w="0" cmpd="sng" algn="ctr" cap="flat">
+                      <a:solidFill>
+                        <a:srgbClr val="FFFFFF">
+                          <a:alpha val="0"/>
+                        </a:srgbClr>
+                      </a:solidFill>
+                      <a:prstDash val="solid"/>
+                    </a:lnR>
+                    <a:lnT w="0" cmpd="sng" algn="ctr" cap="flat">
+                      <a:solidFill>
+                        <a:srgbClr val="FFFFFF">
+                          <a:alpha val="0"/>
+                        </a:srgbClr>
+                      </a:solidFill>
+                      <a:prstDash val="solid"/>
+                    </a:lnT>
+                    <a:lnB w="0" cmpd="sng" algn="ctr" cap="flat">
+                      <a:solidFill>
+                        <a:srgbClr val="FFFFFF">
+                          <a:alpha val="0"/>
+                        </a:srgbClr>
+                      </a:solidFill>
+                      <a:prstDash val="solid"/>
+                    </a:lnB>
+                  </a:tcPr>
+                </a:tc>
+              </a:tr>
+              <a:tr h="182880">
+                <a:tc>
+                  <a:txBody>
+                    <a:bodyPr/>
+                    <a:lstStyle/>
+                    <a:p>
+                      <a:pPr algn="l" marL="63500" marR="63500">
+                        <a:lnSpc>
+                          <a:spcPct val="100000"/>
+                        </a:lnSpc>
+                        <a:spcBef>
+                          <a:spcPts val="500"/>
+                        </a:spcBef>
+                        <a:spcAft>
+                          <a:spcPts val="500"/>
+                        </a:spcAft>
+                        <a:buNone/>
+                      </a:pPr>
+                      <a:r>
+                        <a:rPr sz="1100">
+                          <a:solidFill>
+                            <a:srgbClr val="000000">
+                              <a:alpha val="100000"/>
+                            </a:srgbClr>
+                          </a:solidFill>
+                          <a:latin typeface="Calibri"/>
+                          <a:cs typeface="Calibri"/>
+                          <a:ea typeface="Calibri"/>
+                          <a:sym typeface="Calibri"/>
+                        </a:rPr>
+                        <a:t>Chichester</a:t>
+                      </a:r>
+                    </a:p>
+                  </a:txBody>
+                  <a:tcPr anchor="t" marB="0" marT="0" marR="0" marL="0">
+                    <a:lnL w="0" cmpd="sng" algn="ctr" cap="flat">
+                      <a:solidFill>
+                        <a:srgbClr val="FFFFFF">
+                          <a:alpha val="0"/>
+                        </a:srgbClr>
+                      </a:solidFill>
+                      <a:prstDash val="solid"/>
+                    </a:lnL>
+                    <a:lnR w="0" cmpd="sng" algn="ctr" cap="flat">
+                      <a:solidFill>
+                        <a:srgbClr val="FFFFFF">
+                          <a:alpha val="0"/>
+                        </a:srgbClr>
+                      </a:solidFill>
+                      <a:prstDash val="solid"/>
+                    </a:lnR>
+                    <a:lnT w="0" cmpd="sng" algn="ctr" cap="flat">
+                      <a:solidFill>
+                        <a:srgbClr val="FFFFFF">
+                          <a:alpha val="0"/>
+                        </a:srgbClr>
+                      </a:solidFill>
+                      <a:prstDash val="solid"/>
+                    </a:lnT>
+                    <a:lnB w="0" cmpd="sng" algn="ctr" cap="flat">
+                      <a:solidFill>
+                        <a:srgbClr val="FFFFFF">
+                          <a:alpha val="0"/>
+                        </a:srgbClr>
+                      </a:solidFill>
+                      <a:prstDash val="solid"/>
+                    </a:lnB>
+                  </a:tcPr>
+                </a:tc>
+                <a:tc>
+                  <a:txBody>
+                    <a:bodyPr/>
+                    <a:lstStyle/>
+                    <a:p>
+                      <a:pPr algn="l" marL="63500" marR="63500">
+                        <a:lnSpc>
+                          <a:spcPct val="100000"/>
+                        </a:lnSpc>
+                        <a:spcBef>
+                          <a:spcPts val="500"/>
+                        </a:spcBef>
+                        <a:spcAft>
+                          <a:spcPts val="500"/>
+                        </a:spcAft>
+                        <a:buNone/>
+                      </a:pPr>
+                      <a:r>
+                        <a:rPr sz="1100">
+                          <a:solidFill>
+                            <a:srgbClr val="000000">
+                              <a:alpha val="100000"/>
+                            </a:srgbClr>
+                          </a:solidFill>
+                          <a:latin typeface="Calibri"/>
+                          <a:cs typeface="Calibri"/>
+                          <a:ea typeface="Calibri"/>
+                          <a:sym typeface="Calibri"/>
+                        </a:rPr>
+                        <a:t>635</a:t>
+                      </a:r>
+                    </a:p>
+                  </a:txBody>
+                  <a:tcPr anchor="t" marB="0" marT="0" marR="0" marL="0">
+                    <a:lnL w="0" cmpd="sng" algn="ctr" cap="flat">
+                      <a:solidFill>
+                        <a:srgbClr val="FFFFFF">
+                          <a:alpha val="0"/>
+                        </a:srgbClr>
+                      </a:solidFill>
+                      <a:prstDash val="solid"/>
+                    </a:lnL>
+                    <a:lnR w="0" cmpd="sng" algn="ctr" cap="flat">
+                      <a:solidFill>
+                        <a:srgbClr val="FFFFFF">
+                          <a:alpha val="0"/>
+                        </a:srgbClr>
+                      </a:solidFill>
+                      <a:prstDash val="solid"/>
+                    </a:lnR>
+                    <a:lnT w="0" cmpd="sng" algn="ctr" cap="flat">
+                      <a:solidFill>
+                        <a:srgbClr val="FFFFFF">
+                          <a:alpha val="0"/>
+                        </a:srgbClr>
+                      </a:solidFill>
+                      <a:prstDash val="solid"/>
+                    </a:lnT>
+                    <a:lnB w="0" cmpd="sng" algn="ctr" cap="flat">
+                      <a:solidFill>
+                        <a:srgbClr val="FFFFFF">
+                          <a:alpha val="0"/>
+                        </a:srgbClr>
+                      </a:solidFill>
+                      <a:prstDash val="solid"/>
+                    </a:lnB>
+                  </a:tcPr>
+                </a:tc>
+                <a:tc>
+                  <a:txBody>
+                    <a:bodyPr/>
+                    <a:lstStyle/>
+                    <a:p>
+                      <a:pPr algn="l" marL="63500" marR="63500">
+                        <a:lnSpc>
+                          <a:spcPct val="100000"/>
+                        </a:lnSpc>
+                        <a:spcBef>
+                          <a:spcPts val="500"/>
+                        </a:spcBef>
+                        <a:spcAft>
+                          <a:spcPts val="500"/>
+                        </a:spcAft>
+                        <a:buNone/>
+                      </a:pPr>
+                      <a:r>
+                        <a:rPr sz="1100">
+                          <a:solidFill>
+                            <a:srgbClr val="000000">
+                              <a:alpha val="100000"/>
+                            </a:srgbClr>
+                          </a:solidFill>
+                          <a:latin typeface="Calibri"/>
+                          <a:cs typeface="Calibri"/>
+                          <a:ea typeface="Calibri"/>
+                          <a:sym typeface="Calibri"/>
+                        </a:rPr>
+                        <a:t>522.6</a:t>
+                      </a:r>
+                    </a:p>
+                  </a:txBody>
+                  <a:tcPr anchor="t" marB="0" marT="0" marR="0" marL="0">
+                    <a:lnL w="0" cmpd="sng" algn="ctr" cap="flat">
+                      <a:solidFill>
+                        <a:srgbClr val="FFFFFF">
+                          <a:alpha val="0"/>
+                        </a:srgbClr>
+                      </a:solidFill>
+                      <a:prstDash val="solid"/>
+                    </a:lnL>
+                    <a:lnR w="0" cmpd="sng" algn="ctr" cap="flat">
+                      <a:solidFill>
+                        <a:srgbClr val="FFFFFF">
+                          <a:alpha val="0"/>
+                        </a:srgbClr>
+                      </a:solidFill>
+                      <a:prstDash val="solid"/>
+                    </a:lnR>
+                    <a:lnT w="0" cmpd="sng" algn="ctr" cap="flat">
+                      <a:solidFill>
+                        <a:srgbClr val="FFFFFF">
+                          <a:alpha val="0"/>
+                        </a:srgbClr>
+                      </a:solidFill>
+                      <a:prstDash val="solid"/>
+                    </a:lnT>
+                    <a:lnB w="0" cmpd="sng" algn="ctr" cap="flat">
+                      <a:solidFill>
+                        <a:srgbClr val="FFFFFF">
+                          <a:alpha val="0"/>
+                        </a:srgbClr>
+                      </a:solidFill>
+                      <a:prstDash val="solid"/>
+                    </a:lnB>
+                  </a:tcPr>
+                </a:tc>
+                <a:tc>
+                  <a:txBody>
+                    <a:bodyPr/>
+                    <a:lstStyle/>
+                    <a:p>
+                      <a:pPr algn="l" marL="63500" marR="63500">
+                        <a:lnSpc>
+                          <a:spcPct val="100000"/>
+                        </a:lnSpc>
+                        <a:spcBef>
+                          <a:spcPts val="500"/>
+                        </a:spcBef>
+                        <a:spcAft>
+                          <a:spcPts val="500"/>
+                        </a:spcAft>
+                        <a:buNone/>
+                      </a:pPr>
+                      <a:r>
+                        <a:rPr sz="1100">
+                          <a:solidFill>
+                            <a:srgbClr val="000000">
+                              <a:alpha val="100000"/>
+                            </a:srgbClr>
+                          </a:solidFill>
+                          <a:latin typeface="Calibri"/>
+                          <a:cs typeface="Calibri"/>
+                          <a:ea typeface="Calibri"/>
+                          <a:sym typeface="Calibri"/>
+                        </a:rPr>
+                        <a:t>145th</a:t>
+                      </a:r>
+                    </a:p>
+                  </a:txBody>
+                  <a:tcPr anchor="t" marB="0" marT="0" marR="0" marL="0">
+                    <a:lnL w="0" cmpd="sng" algn="ctr" cap="flat">
+                      <a:solidFill>
+                        <a:srgbClr val="FFFFFF">
+                          <a:alpha val="0"/>
+                        </a:srgbClr>
+                      </a:solidFill>
+                      <a:prstDash val="solid"/>
+                    </a:lnL>
+                    <a:lnR w="0" cmpd="sng" algn="ctr" cap="flat">
+                      <a:solidFill>
+                        <a:srgbClr val="FFFFFF">
+                          <a:alpha val="0"/>
+                        </a:srgbClr>
+                      </a:solidFill>
+                      <a:prstDash val="solid"/>
+                    </a:lnR>
+                    <a:lnT w="0" cmpd="sng" algn="ctr" cap="flat">
+                      <a:solidFill>
+                        <a:srgbClr val="FFFFFF">
+                          <a:alpha val="0"/>
+                        </a:srgbClr>
+                      </a:solidFill>
+                      <a:prstDash val="solid"/>
+                    </a:lnT>
+                    <a:lnB w="0" cmpd="sng" algn="ctr" cap="flat">
+                      <a:solidFill>
+                        <a:srgbClr val="FFFFFF">
+                          <a:alpha val="0"/>
+                        </a:srgbClr>
+                      </a:solidFill>
+                      <a:prstDash val="solid"/>
+                    </a:lnB>
+                  </a:tcPr>
+                </a:tc>
+                <a:tc>
+                  <a:txBody>
+                    <a:bodyPr/>
+                    <a:lstStyle/>
+                    <a:p>
+                      <a:pPr algn="l" marL="63500" marR="63500">
+                        <a:lnSpc>
+                          <a:spcPct val="100000"/>
+                        </a:lnSpc>
+                        <a:spcBef>
+                          <a:spcPts val="500"/>
+                        </a:spcBef>
+                        <a:spcAft>
+                          <a:spcPts val="500"/>
+                        </a:spcAft>
+                        <a:buNone/>
+                      </a:pPr>
+                      <a:r>
+                        <a:rPr sz="1100">
+                          <a:solidFill>
+                            <a:srgbClr val="000000">
+                              <a:alpha val="100000"/>
+                            </a:srgbClr>
+                          </a:solidFill>
+                          <a:latin typeface="Calibri"/>
+                          <a:cs typeface="Calibri"/>
+                          <a:ea typeface="Calibri"/>
+                          <a:sym typeface="Calibri"/>
+                        </a:rPr>
+                        <a:t>Decile 5</a:t>
+                      </a:r>
+                    </a:p>
+                  </a:txBody>
+                  <a:tcPr anchor="t" marB="0" marT="0" marR="0" marL="0">
+                    <a:lnL w="0" cmpd="sng" algn="ctr" cap="flat">
+                      <a:solidFill>
+                        <a:srgbClr val="FFFFFF">
+                          <a:alpha val="0"/>
+                        </a:srgbClr>
+                      </a:solidFill>
+                      <a:prstDash val="solid"/>
+                    </a:lnL>
+                    <a:lnR w="0" cmpd="sng" algn="ctr" cap="flat">
+                      <a:solidFill>
+                        <a:srgbClr val="FFFFFF">
+                          <a:alpha val="0"/>
+                        </a:srgbClr>
+                      </a:solidFill>
+                      <a:prstDash val="solid"/>
+                    </a:lnR>
+                    <a:lnT w="0" cmpd="sng" algn="ctr" cap="flat">
+                      <a:solidFill>
+                        <a:srgbClr val="FFFFFF">
+                          <a:alpha val="0"/>
+                        </a:srgbClr>
+                      </a:solidFill>
+                      <a:prstDash val="solid"/>
+                    </a:lnT>
+                    <a:lnB w="0" cmpd="sng" algn="ctr" cap="flat">
+                      <a:solidFill>
+                        <a:srgbClr val="FFFFFF">
+                          <a:alpha val="0"/>
+                        </a:srgbClr>
+                      </a:solidFill>
+                      <a:prstDash val="solid"/>
+                    </a:lnB>
+                  </a:tcPr>
+                </a:tc>
+              </a:tr>
+              <a:tr h="182880">
+                <a:tc>
+                  <a:txBody>
+                    <a:bodyPr/>
+                    <a:lstStyle/>
+                    <a:p>
+                      <a:pPr algn="l" marL="63500" marR="63500">
+                        <a:lnSpc>
+                          <a:spcPct val="100000"/>
+                        </a:lnSpc>
+                        <a:spcBef>
+                          <a:spcPts val="500"/>
+                        </a:spcBef>
+                        <a:spcAft>
+                          <a:spcPts val="500"/>
+                        </a:spcAft>
+                        <a:buNone/>
+                      </a:pPr>
+                      <a:r>
+                        <a:rPr sz="1100">
+                          <a:solidFill>
+                            <a:srgbClr val="000000">
+                              <a:alpha val="100000"/>
+                            </a:srgbClr>
+                          </a:solidFill>
+                          <a:latin typeface="Calibri"/>
+                          <a:cs typeface="Calibri"/>
+                          <a:ea typeface="Calibri"/>
+                          <a:sym typeface="Calibri"/>
+                        </a:rPr>
+                        <a:t>Crawley</a:t>
+                      </a:r>
+                    </a:p>
+                  </a:txBody>
+                  <a:tcPr anchor="t" marB="0" marT="0" marR="0" marL="0">
+                    <a:lnL w="0" cmpd="sng" algn="ctr" cap="flat">
+                      <a:solidFill>
+                        <a:srgbClr val="FFFFFF">
+                          <a:alpha val="0"/>
+                        </a:srgbClr>
+                      </a:solidFill>
+                      <a:prstDash val="solid"/>
+                    </a:lnL>
+                    <a:lnR w="0" cmpd="sng" algn="ctr" cap="flat">
+                      <a:solidFill>
+                        <a:srgbClr val="FFFFFF">
+                          <a:alpha val="0"/>
+                        </a:srgbClr>
+                      </a:solidFill>
+                      <a:prstDash val="solid"/>
+                    </a:lnR>
+                    <a:lnT w="0" cmpd="sng" algn="ctr" cap="flat">
+                      <a:solidFill>
+                        <a:srgbClr val="FFFFFF">
+                          <a:alpha val="0"/>
+                        </a:srgbClr>
+                      </a:solidFill>
+                      <a:prstDash val="solid"/>
+                    </a:lnT>
+                    <a:lnB w="0" cmpd="sng" algn="ctr" cap="flat">
+                      <a:solidFill>
+                        <a:srgbClr val="FFFFFF">
+                          <a:alpha val="0"/>
+                        </a:srgbClr>
+                      </a:solidFill>
+                      <a:prstDash val="solid"/>
+                    </a:lnB>
+                  </a:tcPr>
+                </a:tc>
+                <a:tc>
+                  <a:txBody>
+                    <a:bodyPr/>
+                    <a:lstStyle/>
+                    <a:p>
+                      <a:pPr algn="l" marL="63500" marR="63500">
+                        <a:lnSpc>
+                          <a:spcPct val="100000"/>
+                        </a:lnSpc>
+                        <a:spcBef>
+                          <a:spcPts val="500"/>
+                        </a:spcBef>
+                        <a:spcAft>
+                          <a:spcPts val="500"/>
+                        </a:spcAft>
+                        <a:buNone/>
+                      </a:pPr>
+                      <a:r>
+                        <a:rPr sz="1100">
+                          <a:solidFill>
+                            <a:srgbClr val="000000">
+                              <a:alpha val="100000"/>
+                            </a:srgbClr>
+                          </a:solidFill>
+                          <a:latin typeface="Calibri"/>
+                          <a:cs typeface="Calibri"/>
+                          <a:ea typeface="Calibri"/>
+                          <a:sym typeface="Calibri"/>
+                        </a:rPr>
+                        <a:t>523</a:t>
+                      </a:r>
+                    </a:p>
+                  </a:txBody>
+                  <a:tcPr anchor="t" marB="0" marT="0" marR="0" marL="0">
+                    <a:lnL w="0" cmpd="sng" algn="ctr" cap="flat">
+                      <a:solidFill>
+                        <a:srgbClr val="FFFFFF">
+                          <a:alpha val="0"/>
+                        </a:srgbClr>
+                      </a:solidFill>
+                      <a:prstDash val="solid"/>
+                    </a:lnL>
+                    <a:lnR w="0" cmpd="sng" algn="ctr" cap="flat">
+                      <a:solidFill>
+                        <a:srgbClr val="FFFFFF">
+                          <a:alpha val="0"/>
+                        </a:srgbClr>
+                      </a:solidFill>
+                      <a:prstDash val="solid"/>
+                    </a:lnR>
+                    <a:lnT w="0" cmpd="sng" algn="ctr" cap="flat">
+                      <a:solidFill>
+                        <a:srgbClr val="FFFFFF">
+                          <a:alpha val="0"/>
+                        </a:srgbClr>
+                      </a:solidFill>
+                      <a:prstDash val="solid"/>
+                    </a:lnT>
+                    <a:lnB w="0" cmpd="sng" algn="ctr" cap="flat">
+                      <a:solidFill>
+                        <a:srgbClr val="FFFFFF">
+                          <a:alpha val="0"/>
+                        </a:srgbClr>
+                      </a:solidFill>
+                      <a:prstDash val="solid"/>
+                    </a:lnB>
+                  </a:tcPr>
+                </a:tc>
+                <a:tc>
+                  <a:txBody>
+                    <a:bodyPr/>
+                    <a:lstStyle/>
+                    <a:p>
+                      <a:pPr algn="l" marL="63500" marR="63500">
+                        <a:lnSpc>
+                          <a:spcPct val="100000"/>
+                        </a:lnSpc>
+                        <a:spcBef>
+                          <a:spcPts val="500"/>
+                        </a:spcBef>
+                        <a:spcAft>
+                          <a:spcPts val="500"/>
+                        </a:spcAft>
+                        <a:buNone/>
+                      </a:pPr>
+                      <a:r>
+                        <a:rPr sz="1100">
+                          <a:solidFill>
+                            <a:srgbClr val="000000">
+                              <a:alpha val="100000"/>
+                            </a:srgbClr>
+                          </a:solidFill>
+                          <a:latin typeface="Calibri"/>
+                          <a:cs typeface="Calibri"/>
+                          <a:ea typeface="Calibri"/>
+                          <a:sym typeface="Calibri"/>
+                        </a:rPr>
+                        <a:t>465.0</a:t>
+                      </a:r>
+                    </a:p>
+                  </a:txBody>
+                  <a:tcPr anchor="t" marB="0" marT="0" marR="0" marL="0">
+                    <a:lnL w="0" cmpd="sng" algn="ctr" cap="flat">
+                      <a:solidFill>
+                        <a:srgbClr val="FFFFFF">
+                          <a:alpha val="0"/>
+                        </a:srgbClr>
+                      </a:solidFill>
+                      <a:prstDash val="solid"/>
+                    </a:lnL>
+                    <a:lnR w="0" cmpd="sng" algn="ctr" cap="flat">
+                      <a:solidFill>
+                        <a:srgbClr val="FFFFFF">
+                          <a:alpha val="0"/>
+                        </a:srgbClr>
+                      </a:solidFill>
+                      <a:prstDash val="solid"/>
+                    </a:lnR>
+                    <a:lnT w="0" cmpd="sng" algn="ctr" cap="flat">
+                      <a:solidFill>
+                        <a:srgbClr val="FFFFFF">
+                          <a:alpha val="0"/>
+                        </a:srgbClr>
+                      </a:solidFill>
+                      <a:prstDash val="solid"/>
+                    </a:lnT>
+                    <a:lnB w="0" cmpd="sng" algn="ctr" cap="flat">
+                      <a:solidFill>
+                        <a:srgbClr val="FFFFFF">
+                          <a:alpha val="0"/>
+                        </a:srgbClr>
+                      </a:solidFill>
+                      <a:prstDash val="solid"/>
+                    </a:lnB>
+                  </a:tcPr>
+                </a:tc>
+                <a:tc>
+                  <a:txBody>
+                    <a:bodyPr/>
+                    <a:lstStyle/>
+                    <a:p>
+                      <a:pPr algn="l" marL="63500" marR="63500">
+                        <a:lnSpc>
+                          <a:spcPct val="100000"/>
+                        </a:lnSpc>
+                        <a:spcBef>
+                          <a:spcPts val="500"/>
+                        </a:spcBef>
+                        <a:spcAft>
+                          <a:spcPts val="500"/>
+                        </a:spcAft>
+                        <a:buNone/>
+                      </a:pPr>
+                      <a:r>
+                        <a:rPr sz="1100">
+                          <a:solidFill>
+                            <a:srgbClr val="000000">
+                              <a:alpha val="100000"/>
+                            </a:srgbClr>
+                          </a:solidFill>
+                          <a:latin typeface="Calibri"/>
+                          <a:cs typeface="Calibri"/>
+                          <a:ea typeface="Calibri"/>
+                          <a:sym typeface="Calibri"/>
+                        </a:rPr>
+                        <a:t>204th</a:t>
+                      </a:r>
+                    </a:p>
+                  </a:txBody>
+                  <a:tcPr anchor="t" marB="0" marT="0" marR="0" marL="0">
+                    <a:lnL w="0" cmpd="sng" algn="ctr" cap="flat">
+                      <a:solidFill>
+                        <a:srgbClr val="FFFFFF">
+                          <a:alpha val="0"/>
+                        </a:srgbClr>
+                      </a:solidFill>
+                      <a:prstDash val="solid"/>
+                    </a:lnL>
+                    <a:lnR w="0" cmpd="sng" algn="ctr" cap="flat">
+                      <a:solidFill>
+                        <a:srgbClr val="FFFFFF">
+                          <a:alpha val="0"/>
+                        </a:srgbClr>
+                      </a:solidFill>
+                      <a:prstDash val="solid"/>
+                    </a:lnR>
+                    <a:lnT w="0" cmpd="sng" algn="ctr" cap="flat">
+                      <a:solidFill>
+                        <a:srgbClr val="FFFFFF">
+                          <a:alpha val="0"/>
+                        </a:srgbClr>
+                      </a:solidFill>
+                      <a:prstDash val="solid"/>
+                    </a:lnT>
+                    <a:lnB w="0" cmpd="sng" algn="ctr" cap="flat">
+                      <a:solidFill>
+                        <a:srgbClr val="FFFFFF">
+                          <a:alpha val="0"/>
+                        </a:srgbClr>
+                      </a:solidFill>
+                      <a:prstDash val="solid"/>
+                    </a:lnB>
+                  </a:tcPr>
+                </a:tc>
+                <a:tc>
+                  <a:txBody>
+                    <a:bodyPr/>
+                    <a:lstStyle/>
+                    <a:p>
+                      <a:pPr algn="l" marL="63500" marR="63500">
+                        <a:lnSpc>
+                          <a:spcPct val="100000"/>
+                        </a:lnSpc>
+                        <a:spcBef>
+                          <a:spcPts val="500"/>
+                        </a:spcBef>
+                        <a:spcAft>
+                          <a:spcPts val="500"/>
+                        </a:spcAft>
+                        <a:buNone/>
+                      </a:pPr>
+                      <a:r>
+                        <a:rPr sz="1100">
+                          <a:solidFill>
+                            <a:srgbClr val="000000">
+                              <a:alpha val="100000"/>
+                            </a:srgbClr>
+                          </a:solidFill>
+                          <a:latin typeface="Calibri"/>
+                          <a:cs typeface="Calibri"/>
+                          <a:ea typeface="Calibri"/>
+                          <a:sym typeface="Calibri"/>
+                        </a:rPr>
+                        <a:t>Decile 7</a:t>
+                      </a:r>
+                    </a:p>
+                  </a:txBody>
+                  <a:tcPr anchor="t" marB="0" marT="0" marR="0" marL="0">
+                    <a:lnL w="0" cmpd="sng" algn="ctr" cap="flat">
+                      <a:solidFill>
+                        <a:srgbClr val="FFFFFF">
+                          <a:alpha val="0"/>
+                        </a:srgbClr>
+                      </a:solidFill>
+                      <a:prstDash val="solid"/>
+                    </a:lnL>
+                    <a:lnR w="0" cmpd="sng" algn="ctr" cap="flat">
+                      <a:solidFill>
+                        <a:srgbClr val="FFFFFF">
+                          <a:alpha val="0"/>
+                        </a:srgbClr>
+                      </a:solidFill>
+                      <a:prstDash val="solid"/>
+                    </a:lnR>
+                    <a:lnT w="0" cmpd="sng" algn="ctr" cap="flat">
+                      <a:solidFill>
+                        <a:srgbClr val="FFFFFF">
+                          <a:alpha val="0"/>
+                        </a:srgbClr>
+                      </a:solidFill>
+                      <a:prstDash val="solid"/>
+                    </a:lnT>
+                    <a:lnB w="0" cmpd="sng" algn="ctr" cap="flat">
+                      <a:solidFill>
+                        <a:srgbClr val="FFFFFF">
+                          <a:alpha val="0"/>
+                        </a:srgbClr>
+                      </a:solidFill>
+                      <a:prstDash val="solid"/>
+                    </a:lnB>
+                  </a:tcPr>
+                </a:tc>
+              </a:tr>
+              <a:tr h="182880">
+                <a:tc>
+                  <a:txBody>
+                    <a:bodyPr/>
+                    <a:lstStyle/>
+                    <a:p>
+                      <a:pPr algn="l" marL="63500" marR="63500">
+                        <a:lnSpc>
+                          <a:spcPct val="100000"/>
+                        </a:lnSpc>
+                        <a:spcBef>
+                          <a:spcPts val="500"/>
+                        </a:spcBef>
+                        <a:spcAft>
+                          <a:spcPts val="500"/>
+                        </a:spcAft>
+                        <a:buNone/>
+                      </a:pPr>
+                      <a:r>
+                        <a:rPr sz="1100">
+                          <a:solidFill>
+                            <a:srgbClr val="000000">
+                              <a:alpha val="100000"/>
+                            </a:srgbClr>
+                          </a:solidFill>
+                          <a:latin typeface="Calibri"/>
+                          <a:cs typeface="Calibri"/>
+                          <a:ea typeface="Calibri"/>
+                          <a:sym typeface="Calibri"/>
+                        </a:rPr>
+                        <a:t>Horsham</a:t>
+                      </a:r>
+                    </a:p>
+                  </a:txBody>
+                  <a:tcPr anchor="t" marB="0" marT="0" marR="0" marL="0">
+                    <a:lnL w="0" cmpd="sng" algn="ctr" cap="flat">
+                      <a:solidFill>
+                        <a:srgbClr val="FFFFFF">
+                          <a:alpha val="0"/>
+                        </a:srgbClr>
+                      </a:solidFill>
+                      <a:prstDash val="solid"/>
+                    </a:lnL>
+                    <a:lnR w="0" cmpd="sng" algn="ctr" cap="flat">
+                      <a:solidFill>
+                        <a:srgbClr val="FFFFFF">
+                          <a:alpha val="0"/>
+                        </a:srgbClr>
+                      </a:solidFill>
+                      <a:prstDash val="solid"/>
+                    </a:lnR>
+                    <a:lnT w="0" cmpd="sng" algn="ctr" cap="flat">
+                      <a:solidFill>
+                        <a:srgbClr val="FFFFFF">
+                          <a:alpha val="0"/>
+                        </a:srgbClr>
+                      </a:solidFill>
+                      <a:prstDash val="solid"/>
+                    </a:lnT>
+                    <a:lnB w="0" cmpd="sng" algn="ctr" cap="flat">
+                      <a:solidFill>
+                        <a:srgbClr val="FFFFFF">
+                          <a:alpha val="0"/>
+                        </a:srgbClr>
+                      </a:solidFill>
+                      <a:prstDash val="solid"/>
+                    </a:lnB>
+                  </a:tcPr>
+                </a:tc>
+                <a:tc>
+                  <a:txBody>
+                    <a:bodyPr/>
+                    <a:lstStyle/>
+                    <a:p>
+                      <a:pPr algn="l" marL="63500" marR="63500">
+                        <a:lnSpc>
+                          <a:spcPct val="100000"/>
+                        </a:lnSpc>
+                        <a:spcBef>
+                          <a:spcPts val="500"/>
+                        </a:spcBef>
+                        <a:spcAft>
+                          <a:spcPts val="500"/>
+                        </a:spcAft>
+                        <a:buNone/>
+                      </a:pPr>
+                      <a:r>
+                        <a:rPr sz="1100">
+                          <a:solidFill>
+                            <a:srgbClr val="000000">
+                              <a:alpha val="100000"/>
+                            </a:srgbClr>
+                          </a:solidFill>
+                          <a:latin typeface="Calibri"/>
+                          <a:cs typeface="Calibri"/>
+                          <a:ea typeface="Calibri"/>
+                          <a:sym typeface="Calibri"/>
+                        </a:rPr>
+                        <a:t>732</a:t>
+                      </a:r>
+                    </a:p>
+                  </a:txBody>
+                  <a:tcPr anchor="t" marB="0" marT="0" marR="0" marL="0">
+                    <a:lnL w="0" cmpd="sng" algn="ctr" cap="flat">
+                      <a:solidFill>
+                        <a:srgbClr val="FFFFFF">
+                          <a:alpha val="0"/>
+                        </a:srgbClr>
+                      </a:solidFill>
+                      <a:prstDash val="solid"/>
+                    </a:lnL>
+                    <a:lnR w="0" cmpd="sng" algn="ctr" cap="flat">
+                      <a:solidFill>
+                        <a:srgbClr val="FFFFFF">
+                          <a:alpha val="0"/>
+                        </a:srgbClr>
+                      </a:solidFill>
+                      <a:prstDash val="solid"/>
+                    </a:lnR>
+                    <a:lnT w="0" cmpd="sng" algn="ctr" cap="flat">
+                      <a:solidFill>
+                        <a:srgbClr val="FFFFFF">
+                          <a:alpha val="0"/>
+                        </a:srgbClr>
+                      </a:solidFill>
+                      <a:prstDash val="solid"/>
+                    </a:lnT>
+                    <a:lnB w="0" cmpd="sng" algn="ctr" cap="flat">
+                      <a:solidFill>
+                        <a:srgbClr val="FFFFFF">
+                          <a:alpha val="0"/>
+                        </a:srgbClr>
+                      </a:solidFill>
+                      <a:prstDash val="solid"/>
+                    </a:lnB>
+                  </a:tcPr>
+                </a:tc>
+                <a:tc>
+                  <a:txBody>
+                    <a:bodyPr/>
+                    <a:lstStyle/>
+                    <a:p>
+                      <a:pPr algn="l" marL="63500" marR="63500">
+                        <a:lnSpc>
+                          <a:spcPct val="100000"/>
+                        </a:lnSpc>
+                        <a:spcBef>
+                          <a:spcPts val="500"/>
+                        </a:spcBef>
+                        <a:spcAft>
+                          <a:spcPts val="500"/>
+                        </a:spcAft>
+                        <a:buNone/>
+                      </a:pPr>
+                      <a:r>
+                        <a:rPr sz="1100">
+                          <a:solidFill>
+                            <a:srgbClr val="000000">
+                              <a:alpha val="100000"/>
+                            </a:srgbClr>
+                          </a:solidFill>
+                          <a:latin typeface="Calibri"/>
+                          <a:cs typeface="Calibri"/>
+                          <a:ea typeface="Calibri"/>
+                          <a:sym typeface="Calibri"/>
+                        </a:rPr>
+                        <a:t>503.2</a:t>
+                      </a:r>
+                    </a:p>
+                  </a:txBody>
+                  <a:tcPr anchor="t" marB="0" marT="0" marR="0" marL="0">
+                    <a:lnL w="0" cmpd="sng" algn="ctr" cap="flat">
+                      <a:solidFill>
+                        <a:srgbClr val="FFFFFF">
+                          <a:alpha val="0"/>
+                        </a:srgbClr>
+                      </a:solidFill>
+                      <a:prstDash val="solid"/>
+                    </a:lnL>
+                    <a:lnR w="0" cmpd="sng" algn="ctr" cap="flat">
+                      <a:solidFill>
+                        <a:srgbClr val="FFFFFF">
+                          <a:alpha val="0"/>
+                        </a:srgbClr>
+                      </a:solidFill>
+                      <a:prstDash val="solid"/>
+                    </a:lnR>
+                    <a:lnT w="0" cmpd="sng" algn="ctr" cap="flat">
+                      <a:solidFill>
+                        <a:srgbClr val="FFFFFF">
+                          <a:alpha val="0"/>
+                        </a:srgbClr>
+                      </a:solidFill>
+                      <a:prstDash val="solid"/>
+                    </a:lnT>
+                    <a:lnB w="0" cmpd="sng" algn="ctr" cap="flat">
+                      <a:solidFill>
+                        <a:srgbClr val="FFFFFF">
+                          <a:alpha val="0"/>
+                        </a:srgbClr>
+                      </a:solidFill>
+                      <a:prstDash val="solid"/>
+                    </a:lnB>
+                  </a:tcPr>
+                </a:tc>
+                <a:tc>
+                  <a:txBody>
+                    <a:bodyPr/>
+                    <a:lstStyle/>
+                    <a:p>
+                      <a:pPr algn="l" marL="63500" marR="63500">
+                        <a:lnSpc>
+                          <a:spcPct val="100000"/>
+                        </a:lnSpc>
+                        <a:spcBef>
+                          <a:spcPts val="500"/>
+                        </a:spcBef>
+                        <a:spcAft>
+                          <a:spcPts val="500"/>
+                        </a:spcAft>
+                        <a:buNone/>
+                      </a:pPr>
+                      <a:r>
+                        <a:rPr sz="1100">
+                          <a:solidFill>
+                            <a:srgbClr val="000000">
+                              <a:alpha val="100000"/>
+                            </a:srgbClr>
+                          </a:solidFill>
+                          <a:latin typeface="Calibri"/>
+                          <a:cs typeface="Calibri"/>
+                          <a:ea typeface="Calibri"/>
+                          <a:sym typeface="Calibri"/>
+                        </a:rPr>
+                        <a:t>165th</a:t>
                       </a:r>
                     </a:p>
                   </a:txBody>
@@ -15985,7 +17011,7 @@
                           <a:ea typeface="Calibri"/>
                           <a:sym typeface="Calibri"/>
                         </a:rPr>
-                        <a:t>Chichester</a:t>
+                        <a:t>Mid Sussex</a:t>
                       </a:r>
                     </a:p>
                   </a:txBody>
@@ -16053,7 +17079,7 @@
                           <a:ea typeface="Calibri"/>
                           <a:sym typeface="Calibri"/>
                         </a:rPr>
-                        <a:t>938</a:t>
+                        <a:t>896</a:t>
                       </a:r>
                     </a:p>
                   </a:txBody>
@@ -16121,7 +17147,7 @@
                           <a:ea typeface="Calibri"/>
                           <a:sym typeface="Calibri"/>
                         </a:rPr>
-                        <a:t>772.0</a:t>
+                        <a:t>588.9</a:t>
                       </a:r>
                     </a:p>
                   </a:txBody>
@@ -16189,7 +17215,349 @@
                           <a:ea typeface="Calibri"/>
                           <a:sym typeface="Calibri"/>
                         </a:rPr>
-                        <a:t>93rd</a:t>
+                        <a:t>59th</a:t>
+                      </a:r>
+                    </a:p>
+                  </a:txBody>
+                  <a:tcPr anchor="t" marB="0" marT="0" marR="0" marL="0">
+                    <a:lnL w="0" cmpd="sng" algn="ctr" cap="flat">
+                      <a:solidFill>
+                        <a:srgbClr val="FFFFFF">
+                          <a:alpha val="0"/>
+                        </a:srgbClr>
+                      </a:solidFill>
+                      <a:prstDash val="solid"/>
+                    </a:lnL>
+                    <a:lnR w="0" cmpd="sng" algn="ctr" cap="flat">
+                      <a:solidFill>
+                        <a:srgbClr val="FFFFFF">
+                          <a:alpha val="0"/>
+                        </a:srgbClr>
+                      </a:solidFill>
+                      <a:prstDash val="solid"/>
+                    </a:lnR>
+                    <a:lnT w="0" cmpd="sng" algn="ctr" cap="flat">
+                      <a:solidFill>
+                        <a:srgbClr val="FFFFFF">
+                          <a:alpha val="0"/>
+                        </a:srgbClr>
+                      </a:solidFill>
+                      <a:prstDash val="solid"/>
+                    </a:lnT>
+                    <a:lnB w="0" cmpd="sng" algn="ctr" cap="flat">
+                      <a:solidFill>
+                        <a:srgbClr val="FFFFFF">
+                          <a:alpha val="0"/>
+                        </a:srgbClr>
+                      </a:solidFill>
+                      <a:prstDash val="solid"/>
+                    </a:lnB>
+                  </a:tcPr>
+                </a:tc>
+                <a:tc>
+                  <a:txBody>
+                    <a:bodyPr/>
+                    <a:lstStyle/>
+                    <a:p>
+                      <a:pPr algn="l" marL="63500" marR="63500">
+                        <a:lnSpc>
+                          <a:spcPct val="100000"/>
+                        </a:lnSpc>
+                        <a:spcBef>
+                          <a:spcPts val="500"/>
+                        </a:spcBef>
+                        <a:spcAft>
+                          <a:spcPts val="500"/>
+                        </a:spcAft>
+                        <a:buNone/>
+                      </a:pPr>
+                      <a:r>
+                        <a:rPr sz="1100">
+                          <a:solidFill>
+                            <a:srgbClr val="000000">
+                              <a:alpha val="100000"/>
+                            </a:srgbClr>
+                          </a:solidFill>
+                          <a:latin typeface="Calibri"/>
+                          <a:cs typeface="Calibri"/>
+                          <a:ea typeface="Calibri"/>
+                          <a:sym typeface="Calibri"/>
+                        </a:rPr>
+                        <a:t>Decile 2</a:t>
+                      </a:r>
+                    </a:p>
+                  </a:txBody>
+                  <a:tcPr anchor="t" marB="0" marT="0" marR="0" marL="0">
+                    <a:lnL w="0" cmpd="sng" algn="ctr" cap="flat">
+                      <a:solidFill>
+                        <a:srgbClr val="FFFFFF">
+                          <a:alpha val="0"/>
+                        </a:srgbClr>
+                      </a:solidFill>
+                      <a:prstDash val="solid"/>
+                    </a:lnL>
+                    <a:lnR w="0" cmpd="sng" algn="ctr" cap="flat">
+                      <a:solidFill>
+                        <a:srgbClr val="FFFFFF">
+                          <a:alpha val="0"/>
+                        </a:srgbClr>
+                      </a:solidFill>
+                      <a:prstDash val="solid"/>
+                    </a:lnR>
+                    <a:lnT w="0" cmpd="sng" algn="ctr" cap="flat">
+                      <a:solidFill>
+                        <a:srgbClr val="FFFFFF">
+                          <a:alpha val="0"/>
+                        </a:srgbClr>
+                      </a:solidFill>
+                      <a:prstDash val="solid"/>
+                    </a:lnT>
+                    <a:lnB w="0" cmpd="sng" algn="ctr" cap="flat">
+                      <a:solidFill>
+                        <a:srgbClr val="FFFFFF">
+                          <a:alpha val="0"/>
+                        </a:srgbClr>
+                      </a:solidFill>
+                      <a:prstDash val="solid"/>
+                    </a:lnB>
+                  </a:tcPr>
+                </a:tc>
+              </a:tr>
+              <a:tr h="182880">
+                <a:tc>
+                  <a:txBody>
+                    <a:bodyPr/>
+                    <a:lstStyle/>
+                    <a:p>
+                      <a:pPr algn="l" marL="63500" marR="63500">
+                        <a:lnSpc>
+                          <a:spcPct val="100000"/>
+                        </a:lnSpc>
+                        <a:spcBef>
+                          <a:spcPts val="500"/>
+                        </a:spcBef>
+                        <a:spcAft>
+                          <a:spcPts val="500"/>
+                        </a:spcAft>
+                        <a:buNone/>
+                      </a:pPr>
+                      <a:r>
+                        <a:rPr sz="1100">
+                          <a:solidFill>
+                            <a:srgbClr val="000000">
+                              <a:alpha val="100000"/>
+                            </a:srgbClr>
+                          </a:solidFill>
+                          <a:latin typeface="Calibri"/>
+                          <a:cs typeface="Calibri"/>
+                          <a:ea typeface="Calibri"/>
+                          <a:sym typeface="Calibri"/>
+                        </a:rPr>
+                        <a:t>Worthing</a:t>
+                      </a:r>
+                    </a:p>
+                  </a:txBody>
+                  <a:tcPr anchor="t" marB="0" marT="0" marR="0" marL="0">
+                    <a:lnL w="0" cmpd="sng" algn="ctr" cap="flat">
+                      <a:solidFill>
+                        <a:srgbClr val="FFFFFF">
+                          <a:alpha val="0"/>
+                        </a:srgbClr>
+                      </a:solidFill>
+                      <a:prstDash val="solid"/>
+                    </a:lnL>
+                    <a:lnR w="0" cmpd="sng" algn="ctr" cap="flat">
+                      <a:solidFill>
+                        <a:srgbClr val="FFFFFF">
+                          <a:alpha val="0"/>
+                        </a:srgbClr>
+                      </a:solidFill>
+                      <a:prstDash val="solid"/>
+                    </a:lnR>
+                    <a:lnT w="0" cmpd="sng" algn="ctr" cap="flat">
+                      <a:solidFill>
+                        <a:srgbClr val="FFFFFF">
+                          <a:alpha val="0"/>
+                        </a:srgbClr>
+                      </a:solidFill>
+                      <a:prstDash val="solid"/>
+                    </a:lnT>
+                    <a:lnB w="0" cmpd="sng" algn="ctr" cap="flat">
+                      <a:solidFill>
+                        <a:srgbClr val="FFFFFF">
+                          <a:alpha val="0"/>
+                        </a:srgbClr>
+                      </a:solidFill>
+                      <a:prstDash val="solid"/>
+                    </a:lnB>
+                  </a:tcPr>
+                </a:tc>
+                <a:tc>
+                  <a:txBody>
+                    <a:bodyPr/>
+                    <a:lstStyle/>
+                    <a:p>
+                      <a:pPr algn="l" marL="63500" marR="63500">
+                        <a:lnSpc>
+                          <a:spcPct val="100000"/>
+                        </a:lnSpc>
+                        <a:spcBef>
+                          <a:spcPts val="500"/>
+                        </a:spcBef>
+                        <a:spcAft>
+                          <a:spcPts val="500"/>
+                        </a:spcAft>
+                        <a:buNone/>
+                      </a:pPr>
+                      <a:r>
+                        <a:rPr sz="1100">
+                          <a:solidFill>
+                            <a:srgbClr val="000000">
+                              <a:alpha val="100000"/>
+                            </a:srgbClr>
+                          </a:solidFill>
+                          <a:latin typeface="Calibri"/>
+                          <a:cs typeface="Calibri"/>
+                          <a:ea typeface="Calibri"/>
+                          <a:sym typeface="Calibri"/>
+                        </a:rPr>
+                        <a:t>640</a:t>
+                      </a:r>
+                    </a:p>
+                  </a:txBody>
+                  <a:tcPr anchor="t" marB="0" marT="0" marR="0" marL="0">
+                    <a:lnL w="0" cmpd="sng" algn="ctr" cap="flat">
+                      <a:solidFill>
+                        <a:srgbClr val="FFFFFF">
+                          <a:alpha val="0"/>
+                        </a:srgbClr>
+                      </a:solidFill>
+                      <a:prstDash val="solid"/>
+                    </a:lnL>
+                    <a:lnR w="0" cmpd="sng" algn="ctr" cap="flat">
+                      <a:solidFill>
+                        <a:srgbClr val="FFFFFF">
+                          <a:alpha val="0"/>
+                        </a:srgbClr>
+                      </a:solidFill>
+                      <a:prstDash val="solid"/>
+                    </a:lnR>
+                    <a:lnT w="0" cmpd="sng" algn="ctr" cap="flat">
+                      <a:solidFill>
+                        <a:srgbClr val="FFFFFF">
+                          <a:alpha val="0"/>
+                        </a:srgbClr>
+                      </a:solidFill>
+                      <a:prstDash val="solid"/>
+                    </a:lnT>
+                    <a:lnB w="0" cmpd="sng" algn="ctr" cap="flat">
+                      <a:solidFill>
+                        <a:srgbClr val="FFFFFF">
+                          <a:alpha val="0"/>
+                        </a:srgbClr>
+                      </a:solidFill>
+                      <a:prstDash val="solid"/>
+                    </a:lnB>
+                  </a:tcPr>
+                </a:tc>
+                <a:tc>
+                  <a:txBody>
+                    <a:bodyPr/>
+                    <a:lstStyle/>
+                    <a:p>
+                      <a:pPr algn="l" marL="63500" marR="63500">
+                        <a:lnSpc>
+                          <a:spcPct val="100000"/>
+                        </a:lnSpc>
+                        <a:spcBef>
+                          <a:spcPts val="500"/>
+                        </a:spcBef>
+                        <a:spcAft>
+                          <a:spcPts val="500"/>
+                        </a:spcAft>
+                        <a:buNone/>
+                      </a:pPr>
+                      <a:r>
+                        <a:rPr sz="1100">
+                          <a:solidFill>
+                            <a:srgbClr val="000000">
+                              <a:alpha val="100000"/>
+                            </a:srgbClr>
+                          </a:solidFill>
+                          <a:latin typeface="Calibri"/>
+                          <a:cs typeface="Calibri"/>
+                          <a:ea typeface="Calibri"/>
+                          <a:sym typeface="Calibri"/>
+                        </a:rPr>
+                        <a:t>578.0</a:t>
+                      </a:r>
+                    </a:p>
+                  </a:txBody>
+                  <a:tcPr anchor="t" marB="0" marT="0" marR="0" marL="0">
+                    <a:lnL w="0" cmpd="sng" algn="ctr" cap="flat">
+                      <a:solidFill>
+                        <a:srgbClr val="FFFFFF">
+                          <a:alpha val="0"/>
+                        </a:srgbClr>
+                      </a:solidFill>
+                      <a:prstDash val="solid"/>
+                    </a:lnL>
+                    <a:lnR w="0" cmpd="sng" algn="ctr" cap="flat">
+                      <a:solidFill>
+                        <a:srgbClr val="FFFFFF">
+                          <a:alpha val="0"/>
+                        </a:srgbClr>
+                      </a:solidFill>
+                      <a:prstDash val="solid"/>
+                    </a:lnR>
+                    <a:lnT w="0" cmpd="sng" algn="ctr" cap="flat">
+                      <a:solidFill>
+                        <a:srgbClr val="FFFFFF">
+                          <a:alpha val="0"/>
+                        </a:srgbClr>
+                      </a:solidFill>
+                      <a:prstDash val="solid"/>
+                    </a:lnT>
+                    <a:lnB w="0" cmpd="sng" algn="ctr" cap="flat">
+                      <a:solidFill>
+                        <a:srgbClr val="FFFFFF">
+                          <a:alpha val="0"/>
+                        </a:srgbClr>
+                      </a:solidFill>
+                      <a:prstDash val="solid"/>
+                    </a:lnB>
+                  </a:tcPr>
+                </a:tc>
+                <a:tc>
+                  <a:txBody>
+                    <a:bodyPr/>
+                    <a:lstStyle/>
+                    <a:p>
+                      <a:pPr algn="l" marL="63500" marR="63500">
+                        <a:lnSpc>
+                          <a:spcPct val="100000"/>
+                        </a:lnSpc>
+                        <a:spcBef>
+                          <a:spcPts val="500"/>
+                        </a:spcBef>
+                        <a:spcAft>
+                          <a:spcPts val="500"/>
+                        </a:spcAft>
+                        <a:buNone/>
+                      </a:pPr>
+                      <a:r>
+                        <a:rPr sz="1100">
+                          <a:solidFill>
+                            <a:srgbClr val="000000">
+                              <a:alpha val="100000"/>
+                            </a:srgbClr>
+                          </a:solidFill>
+                          <a:latin typeface="Calibri"/>
+                          <a:cs typeface="Calibri"/>
+                          <a:ea typeface="Calibri"/>
+                          <a:sym typeface="Calibri"/>
+                        </a:rPr>
+                        <a:t>76th</a:t>
                       </a:r>
                     </a:p>
                   </a:txBody>
@@ -16327,7 +17695,7 @@
                           <a:ea typeface="Calibri"/>
                           <a:sym typeface="Calibri"/>
                         </a:rPr>
-                        <a:t>Crawley</a:t>
+                        <a:t>West Sussex</a:t>
                       </a:r>
                     </a:p>
                   </a:txBody>
@@ -16395,7 +17763,7 @@
                           <a:ea typeface="Calibri"/>
                           <a:sym typeface="Calibri"/>
                         </a:rPr>
-                        <a:t>777</a:t>
+                        <a:t>4,573</a:t>
                       </a:r>
                     </a:p>
                   </a:txBody>
@@ -16463,1375 +17831,7 @@
                           <a:ea typeface="Calibri"/>
                           <a:sym typeface="Calibri"/>
                         </a:rPr>
-                        <a:t>690.8</a:t>
-                      </a:r>
-                    </a:p>
-                  </a:txBody>
-                  <a:tcPr anchor="t" marB="0" marT="0" marR="0" marL="0">
-                    <a:lnL w="0" cmpd="sng" algn="ctr" cap="flat">
-                      <a:solidFill>
-                        <a:srgbClr val="FFFFFF">
-                          <a:alpha val="0"/>
-                        </a:srgbClr>
-                      </a:solidFill>
-                      <a:prstDash val="solid"/>
-                    </a:lnL>
-                    <a:lnR w="0" cmpd="sng" algn="ctr" cap="flat">
-                      <a:solidFill>
-                        <a:srgbClr val="FFFFFF">
-                          <a:alpha val="0"/>
-                        </a:srgbClr>
-                      </a:solidFill>
-                      <a:prstDash val="solid"/>
-                    </a:lnR>
-                    <a:lnT w="0" cmpd="sng" algn="ctr" cap="flat">
-                      <a:solidFill>
-                        <a:srgbClr val="FFFFFF">
-                          <a:alpha val="0"/>
-                        </a:srgbClr>
-                      </a:solidFill>
-                      <a:prstDash val="solid"/>
-                    </a:lnT>
-                    <a:lnB w="0" cmpd="sng" algn="ctr" cap="flat">
-                      <a:solidFill>
-                        <a:srgbClr val="FFFFFF">
-                          <a:alpha val="0"/>
-                        </a:srgbClr>
-                      </a:solidFill>
-                      <a:prstDash val="solid"/>
-                    </a:lnB>
-                  </a:tcPr>
-                </a:tc>
-                <a:tc>
-                  <a:txBody>
-                    <a:bodyPr/>
-                    <a:lstStyle/>
-                    <a:p>
-                      <a:pPr algn="l" marL="63500" marR="63500">
-                        <a:lnSpc>
-                          <a:spcPct val="100000"/>
-                        </a:lnSpc>
-                        <a:spcBef>
-                          <a:spcPts val="500"/>
-                        </a:spcBef>
-                        <a:spcAft>
-                          <a:spcPts val="500"/>
-                        </a:spcAft>
-                        <a:buNone/>
-                      </a:pPr>
-                      <a:r>
-                        <a:rPr sz="1100">
-                          <a:solidFill>
-                            <a:srgbClr val="000000">
-                              <a:alpha val="100000"/>
-                            </a:srgbClr>
-                          </a:solidFill>
-                          <a:latin typeface="Calibri"/>
-                          <a:cs typeface="Calibri"/>
-                          <a:ea typeface="Calibri"/>
-                          <a:sym typeface="Calibri"/>
-                        </a:rPr>
-                        <a:t>176th</a:t>
-                      </a:r>
-                    </a:p>
-                  </a:txBody>
-                  <a:tcPr anchor="t" marB="0" marT="0" marR="0" marL="0">
-                    <a:lnL w="0" cmpd="sng" algn="ctr" cap="flat">
-                      <a:solidFill>
-                        <a:srgbClr val="FFFFFF">
-                          <a:alpha val="0"/>
-                        </a:srgbClr>
-                      </a:solidFill>
-                      <a:prstDash val="solid"/>
-                    </a:lnL>
-                    <a:lnR w="0" cmpd="sng" algn="ctr" cap="flat">
-                      <a:solidFill>
-                        <a:srgbClr val="FFFFFF">
-                          <a:alpha val="0"/>
-                        </a:srgbClr>
-                      </a:solidFill>
-                      <a:prstDash val="solid"/>
-                    </a:lnR>
-                    <a:lnT w="0" cmpd="sng" algn="ctr" cap="flat">
-                      <a:solidFill>
-                        <a:srgbClr val="FFFFFF">
-                          <a:alpha val="0"/>
-                        </a:srgbClr>
-                      </a:solidFill>
-                      <a:prstDash val="solid"/>
-                    </a:lnT>
-                    <a:lnB w="0" cmpd="sng" algn="ctr" cap="flat">
-                      <a:solidFill>
-                        <a:srgbClr val="FFFFFF">
-                          <a:alpha val="0"/>
-                        </a:srgbClr>
-                      </a:solidFill>
-                      <a:prstDash val="solid"/>
-                    </a:lnB>
-                  </a:tcPr>
-                </a:tc>
-                <a:tc>
-                  <a:txBody>
-                    <a:bodyPr/>
-                    <a:lstStyle/>
-                    <a:p>
-                      <a:pPr algn="l" marL="63500" marR="63500">
-                        <a:lnSpc>
-                          <a:spcPct val="100000"/>
-                        </a:lnSpc>
-                        <a:spcBef>
-                          <a:spcPts val="500"/>
-                        </a:spcBef>
-                        <a:spcAft>
-                          <a:spcPts val="500"/>
-                        </a:spcAft>
-                        <a:buNone/>
-                      </a:pPr>
-                      <a:r>
-                        <a:rPr sz="1100">
-                          <a:solidFill>
-                            <a:srgbClr val="000000">
-                              <a:alpha val="100000"/>
-                            </a:srgbClr>
-                          </a:solidFill>
-                          <a:latin typeface="Calibri"/>
-                          <a:cs typeface="Calibri"/>
-                          <a:ea typeface="Calibri"/>
-                          <a:sym typeface="Calibri"/>
-                        </a:rPr>
-                        <a:t>Decile 6</a:t>
-                      </a:r>
-                    </a:p>
-                  </a:txBody>
-                  <a:tcPr anchor="t" marB="0" marT="0" marR="0" marL="0">
-                    <a:lnL w="0" cmpd="sng" algn="ctr" cap="flat">
-                      <a:solidFill>
-                        <a:srgbClr val="FFFFFF">
-                          <a:alpha val="0"/>
-                        </a:srgbClr>
-                      </a:solidFill>
-                      <a:prstDash val="solid"/>
-                    </a:lnL>
-                    <a:lnR w="0" cmpd="sng" algn="ctr" cap="flat">
-                      <a:solidFill>
-                        <a:srgbClr val="FFFFFF">
-                          <a:alpha val="0"/>
-                        </a:srgbClr>
-                      </a:solidFill>
-                      <a:prstDash val="solid"/>
-                    </a:lnR>
-                    <a:lnT w="0" cmpd="sng" algn="ctr" cap="flat">
-                      <a:solidFill>
-                        <a:srgbClr val="FFFFFF">
-                          <a:alpha val="0"/>
-                        </a:srgbClr>
-                      </a:solidFill>
-                      <a:prstDash val="solid"/>
-                    </a:lnT>
-                    <a:lnB w="0" cmpd="sng" algn="ctr" cap="flat">
-                      <a:solidFill>
-                        <a:srgbClr val="FFFFFF">
-                          <a:alpha val="0"/>
-                        </a:srgbClr>
-                      </a:solidFill>
-                      <a:prstDash val="solid"/>
-                    </a:lnB>
-                  </a:tcPr>
-                </a:tc>
-              </a:tr>
-              <a:tr h="182880">
-                <a:tc>
-                  <a:txBody>
-                    <a:bodyPr/>
-                    <a:lstStyle/>
-                    <a:p>
-                      <a:pPr algn="l" marL="63500" marR="63500">
-                        <a:lnSpc>
-                          <a:spcPct val="100000"/>
-                        </a:lnSpc>
-                        <a:spcBef>
-                          <a:spcPts val="500"/>
-                        </a:spcBef>
-                        <a:spcAft>
-                          <a:spcPts val="500"/>
-                        </a:spcAft>
-                        <a:buNone/>
-                      </a:pPr>
-                      <a:r>
-                        <a:rPr sz="1100">
-                          <a:solidFill>
-                            <a:srgbClr val="000000">
-                              <a:alpha val="100000"/>
-                            </a:srgbClr>
-                          </a:solidFill>
-                          <a:latin typeface="Calibri"/>
-                          <a:cs typeface="Calibri"/>
-                          <a:ea typeface="Calibri"/>
-                          <a:sym typeface="Calibri"/>
-                        </a:rPr>
-                        <a:t>Horsham</a:t>
-                      </a:r>
-                    </a:p>
-                  </a:txBody>
-                  <a:tcPr anchor="t" marB="0" marT="0" marR="0" marL="0">
-                    <a:lnL w="0" cmpd="sng" algn="ctr" cap="flat">
-                      <a:solidFill>
-                        <a:srgbClr val="FFFFFF">
-                          <a:alpha val="0"/>
-                        </a:srgbClr>
-                      </a:solidFill>
-                      <a:prstDash val="solid"/>
-                    </a:lnL>
-                    <a:lnR w="0" cmpd="sng" algn="ctr" cap="flat">
-                      <a:solidFill>
-                        <a:srgbClr val="FFFFFF">
-                          <a:alpha val="0"/>
-                        </a:srgbClr>
-                      </a:solidFill>
-                      <a:prstDash val="solid"/>
-                    </a:lnR>
-                    <a:lnT w="0" cmpd="sng" algn="ctr" cap="flat">
-                      <a:solidFill>
-                        <a:srgbClr val="FFFFFF">
-                          <a:alpha val="0"/>
-                        </a:srgbClr>
-                      </a:solidFill>
-                      <a:prstDash val="solid"/>
-                    </a:lnT>
-                    <a:lnB w="0" cmpd="sng" algn="ctr" cap="flat">
-                      <a:solidFill>
-                        <a:srgbClr val="FFFFFF">
-                          <a:alpha val="0"/>
-                        </a:srgbClr>
-                      </a:solidFill>
-                      <a:prstDash val="solid"/>
-                    </a:lnB>
-                  </a:tcPr>
-                </a:tc>
-                <a:tc>
-                  <a:txBody>
-                    <a:bodyPr/>
-                    <a:lstStyle/>
-                    <a:p>
-                      <a:pPr algn="l" marL="63500" marR="63500">
-                        <a:lnSpc>
-                          <a:spcPct val="100000"/>
-                        </a:lnSpc>
-                        <a:spcBef>
-                          <a:spcPts val="500"/>
-                        </a:spcBef>
-                        <a:spcAft>
-                          <a:spcPts val="500"/>
-                        </a:spcAft>
-                        <a:buNone/>
-                      </a:pPr>
-                      <a:r>
-                        <a:rPr sz="1100">
-                          <a:solidFill>
-                            <a:srgbClr val="000000">
-                              <a:alpha val="100000"/>
-                            </a:srgbClr>
-                          </a:solidFill>
-                          <a:latin typeface="Calibri"/>
-                          <a:cs typeface="Calibri"/>
-                          <a:ea typeface="Calibri"/>
-                          <a:sym typeface="Calibri"/>
-                        </a:rPr>
-                        <a:t>1,065</a:t>
-                      </a:r>
-                    </a:p>
-                  </a:txBody>
-                  <a:tcPr anchor="t" marB="0" marT="0" marR="0" marL="0">
-                    <a:lnL w="0" cmpd="sng" algn="ctr" cap="flat">
-                      <a:solidFill>
-                        <a:srgbClr val="FFFFFF">
-                          <a:alpha val="0"/>
-                        </a:srgbClr>
-                      </a:solidFill>
-                      <a:prstDash val="solid"/>
-                    </a:lnL>
-                    <a:lnR w="0" cmpd="sng" algn="ctr" cap="flat">
-                      <a:solidFill>
-                        <a:srgbClr val="FFFFFF">
-                          <a:alpha val="0"/>
-                        </a:srgbClr>
-                      </a:solidFill>
-                      <a:prstDash val="solid"/>
-                    </a:lnR>
-                    <a:lnT w="0" cmpd="sng" algn="ctr" cap="flat">
-                      <a:solidFill>
-                        <a:srgbClr val="FFFFFF">
-                          <a:alpha val="0"/>
-                        </a:srgbClr>
-                      </a:solidFill>
-                      <a:prstDash val="solid"/>
-                    </a:lnT>
-                    <a:lnB w="0" cmpd="sng" algn="ctr" cap="flat">
-                      <a:solidFill>
-                        <a:srgbClr val="FFFFFF">
-                          <a:alpha val="0"/>
-                        </a:srgbClr>
-                      </a:solidFill>
-                      <a:prstDash val="solid"/>
-                    </a:lnB>
-                  </a:tcPr>
-                </a:tc>
-                <a:tc>
-                  <a:txBody>
-                    <a:bodyPr/>
-                    <a:lstStyle/>
-                    <a:p>
-                      <a:pPr algn="l" marL="63500" marR="63500">
-                        <a:lnSpc>
-                          <a:spcPct val="100000"/>
-                        </a:lnSpc>
-                        <a:spcBef>
-                          <a:spcPts val="500"/>
-                        </a:spcBef>
-                        <a:spcAft>
-                          <a:spcPts val="500"/>
-                        </a:spcAft>
-                        <a:buNone/>
-                      </a:pPr>
-                      <a:r>
-                        <a:rPr sz="1100">
-                          <a:solidFill>
-                            <a:srgbClr val="000000">
-                              <a:alpha val="100000"/>
-                            </a:srgbClr>
-                          </a:solidFill>
-                          <a:latin typeface="Calibri"/>
-                          <a:cs typeface="Calibri"/>
-                          <a:ea typeface="Calibri"/>
-                          <a:sym typeface="Calibri"/>
-                        </a:rPr>
-                        <a:t>732.1</a:t>
-                      </a:r>
-                    </a:p>
-                  </a:txBody>
-                  <a:tcPr anchor="t" marB="0" marT="0" marR="0" marL="0">
-                    <a:lnL w="0" cmpd="sng" algn="ctr" cap="flat">
-                      <a:solidFill>
-                        <a:srgbClr val="FFFFFF">
-                          <a:alpha val="0"/>
-                        </a:srgbClr>
-                      </a:solidFill>
-                      <a:prstDash val="solid"/>
-                    </a:lnL>
-                    <a:lnR w="0" cmpd="sng" algn="ctr" cap="flat">
-                      <a:solidFill>
-                        <a:srgbClr val="FFFFFF">
-                          <a:alpha val="0"/>
-                        </a:srgbClr>
-                      </a:solidFill>
-                      <a:prstDash val="solid"/>
-                    </a:lnR>
-                    <a:lnT w="0" cmpd="sng" algn="ctr" cap="flat">
-                      <a:solidFill>
-                        <a:srgbClr val="FFFFFF">
-                          <a:alpha val="0"/>
-                        </a:srgbClr>
-                      </a:solidFill>
-                      <a:prstDash val="solid"/>
-                    </a:lnT>
-                    <a:lnB w="0" cmpd="sng" algn="ctr" cap="flat">
-                      <a:solidFill>
-                        <a:srgbClr val="FFFFFF">
-                          <a:alpha val="0"/>
-                        </a:srgbClr>
-                      </a:solidFill>
-                      <a:prstDash val="solid"/>
-                    </a:lnB>
-                  </a:tcPr>
-                </a:tc>
-                <a:tc>
-                  <a:txBody>
-                    <a:bodyPr/>
-                    <a:lstStyle/>
-                    <a:p>
-                      <a:pPr algn="l" marL="63500" marR="63500">
-                        <a:lnSpc>
-                          <a:spcPct val="100000"/>
-                        </a:lnSpc>
-                        <a:spcBef>
-                          <a:spcPts val="500"/>
-                        </a:spcBef>
-                        <a:spcAft>
-                          <a:spcPts val="500"/>
-                        </a:spcAft>
-                        <a:buNone/>
-                      </a:pPr>
-                      <a:r>
-                        <a:rPr sz="1100">
-                          <a:solidFill>
-                            <a:srgbClr val="000000">
-                              <a:alpha val="100000"/>
-                            </a:srgbClr>
-                          </a:solidFill>
-                          <a:latin typeface="Calibri"/>
-                          <a:cs typeface="Calibri"/>
-                          <a:ea typeface="Calibri"/>
-                          <a:sym typeface="Calibri"/>
-                        </a:rPr>
-                        <a:t>136th</a:t>
-                      </a:r>
-                    </a:p>
-                  </a:txBody>
-                  <a:tcPr anchor="t" marB="0" marT="0" marR="0" marL="0">
-                    <a:lnL w="0" cmpd="sng" algn="ctr" cap="flat">
-                      <a:solidFill>
-                        <a:srgbClr val="FFFFFF">
-                          <a:alpha val="0"/>
-                        </a:srgbClr>
-                      </a:solidFill>
-                      <a:prstDash val="solid"/>
-                    </a:lnL>
-                    <a:lnR w="0" cmpd="sng" algn="ctr" cap="flat">
-                      <a:solidFill>
-                        <a:srgbClr val="FFFFFF">
-                          <a:alpha val="0"/>
-                        </a:srgbClr>
-                      </a:solidFill>
-                      <a:prstDash val="solid"/>
-                    </a:lnR>
-                    <a:lnT w="0" cmpd="sng" algn="ctr" cap="flat">
-                      <a:solidFill>
-                        <a:srgbClr val="FFFFFF">
-                          <a:alpha val="0"/>
-                        </a:srgbClr>
-                      </a:solidFill>
-                      <a:prstDash val="solid"/>
-                    </a:lnT>
-                    <a:lnB w="0" cmpd="sng" algn="ctr" cap="flat">
-                      <a:solidFill>
-                        <a:srgbClr val="FFFFFF">
-                          <a:alpha val="0"/>
-                        </a:srgbClr>
-                      </a:solidFill>
-                      <a:prstDash val="solid"/>
-                    </a:lnB>
-                  </a:tcPr>
-                </a:tc>
-                <a:tc>
-                  <a:txBody>
-                    <a:bodyPr/>
-                    <a:lstStyle/>
-                    <a:p>
-                      <a:pPr algn="l" marL="63500" marR="63500">
-                        <a:lnSpc>
-                          <a:spcPct val="100000"/>
-                        </a:lnSpc>
-                        <a:spcBef>
-                          <a:spcPts val="500"/>
-                        </a:spcBef>
-                        <a:spcAft>
-                          <a:spcPts val="500"/>
-                        </a:spcAft>
-                        <a:buNone/>
-                      </a:pPr>
-                      <a:r>
-                        <a:rPr sz="1100">
-                          <a:solidFill>
-                            <a:srgbClr val="000000">
-                              <a:alpha val="100000"/>
-                            </a:srgbClr>
-                          </a:solidFill>
-                          <a:latin typeface="Calibri"/>
-                          <a:cs typeface="Calibri"/>
-                          <a:ea typeface="Calibri"/>
-                          <a:sym typeface="Calibri"/>
-                        </a:rPr>
-                        <a:t>Decile 5</a:t>
-                      </a:r>
-                    </a:p>
-                  </a:txBody>
-                  <a:tcPr anchor="t" marB="0" marT="0" marR="0" marL="0">
-                    <a:lnL w="0" cmpd="sng" algn="ctr" cap="flat">
-                      <a:solidFill>
-                        <a:srgbClr val="FFFFFF">
-                          <a:alpha val="0"/>
-                        </a:srgbClr>
-                      </a:solidFill>
-                      <a:prstDash val="solid"/>
-                    </a:lnL>
-                    <a:lnR w="0" cmpd="sng" algn="ctr" cap="flat">
-                      <a:solidFill>
-                        <a:srgbClr val="FFFFFF">
-                          <a:alpha val="0"/>
-                        </a:srgbClr>
-                      </a:solidFill>
-                      <a:prstDash val="solid"/>
-                    </a:lnR>
-                    <a:lnT w="0" cmpd="sng" algn="ctr" cap="flat">
-                      <a:solidFill>
-                        <a:srgbClr val="FFFFFF">
-                          <a:alpha val="0"/>
-                        </a:srgbClr>
-                      </a:solidFill>
-                      <a:prstDash val="solid"/>
-                    </a:lnT>
-                    <a:lnB w="0" cmpd="sng" algn="ctr" cap="flat">
-                      <a:solidFill>
-                        <a:srgbClr val="FFFFFF">
-                          <a:alpha val="0"/>
-                        </a:srgbClr>
-                      </a:solidFill>
-                      <a:prstDash val="solid"/>
-                    </a:lnB>
-                  </a:tcPr>
-                </a:tc>
-              </a:tr>
-              <a:tr h="182880">
-                <a:tc>
-                  <a:txBody>
-                    <a:bodyPr/>
-                    <a:lstStyle/>
-                    <a:p>
-                      <a:pPr algn="l" marL="63500" marR="63500">
-                        <a:lnSpc>
-                          <a:spcPct val="100000"/>
-                        </a:lnSpc>
-                        <a:spcBef>
-                          <a:spcPts val="500"/>
-                        </a:spcBef>
-                        <a:spcAft>
-                          <a:spcPts val="500"/>
-                        </a:spcAft>
-                        <a:buNone/>
-                      </a:pPr>
-                      <a:r>
-                        <a:rPr sz="1100">
-                          <a:solidFill>
-                            <a:srgbClr val="000000">
-                              <a:alpha val="100000"/>
-                            </a:srgbClr>
-                          </a:solidFill>
-                          <a:latin typeface="Calibri"/>
-                          <a:cs typeface="Calibri"/>
-                          <a:ea typeface="Calibri"/>
-                          <a:sym typeface="Calibri"/>
-                        </a:rPr>
-                        <a:t>Mid Sussex</a:t>
-                      </a:r>
-                    </a:p>
-                  </a:txBody>
-                  <a:tcPr anchor="t" marB="0" marT="0" marR="0" marL="0">
-                    <a:lnL w="0" cmpd="sng" algn="ctr" cap="flat">
-                      <a:solidFill>
-                        <a:srgbClr val="FFFFFF">
-                          <a:alpha val="0"/>
-                        </a:srgbClr>
-                      </a:solidFill>
-                      <a:prstDash val="solid"/>
-                    </a:lnL>
-                    <a:lnR w="0" cmpd="sng" algn="ctr" cap="flat">
-                      <a:solidFill>
-                        <a:srgbClr val="FFFFFF">
-                          <a:alpha val="0"/>
-                        </a:srgbClr>
-                      </a:solidFill>
-                      <a:prstDash val="solid"/>
-                    </a:lnR>
-                    <a:lnT w="0" cmpd="sng" algn="ctr" cap="flat">
-                      <a:solidFill>
-                        <a:srgbClr val="FFFFFF">
-                          <a:alpha val="0"/>
-                        </a:srgbClr>
-                      </a:solidFill>
-                      <a:prstDash val="solid"/>
-                    </a:lnT>
-                    <a:lnB w="0" cmpd="sng" algn="ctr" cap="flat">
-                      <a:solidFill>
-                        <a:srgbClr val="FFFFFF">
-                          <a:alpha val="0"/>
-                        </a:srgbClr>
-                      </a:solidFill>
-                      <a:prstDash val="solid"/>
-                    </a:lnB>
-                  </a:tcPr>
-                </a:tc>
-                <a:tc>
-                  <a:txBody>
-                    <a:bodyPr/>
-                    <a:lstStyle/>
-                    <a:p>
-                      <a:pPr algn="l" marL="63500" marR="63500">
-                        <a:lnSpc>
-                          <a:spcPct val="100000"/>
-                        </a:lnSpc>
-                        <a:spcBef>
-                          <a:spcPts val="500"/>
-                        </a:spcBef>
-                        <a:spcAft>
-                          <a:spcPts val="500"/>
-                        </a:spcAft>
-                        <a:buNone/>
-                      </a:pPr>
-                      <a:r>
-                        <a:rPr sz="1100">
-                          <a:solidFill>
-                            <a:srgbClr val="000000">
-                              <a:alpha val="100000"/>
-                            </a:srgbClr>
-                          </a:solidFill>
-                          <a:latin typeface="Calibri"/>
-                          <a:cs typeface="Calibri"/>
-                          <a:ea typeface="Calibri"/>
-                          <a:sym typeface="Calibri"/>
-                        </a:rPr>
-                        <a:t>1,232</a:t>
-                      </a:r>
-                    </a:p>
-                  </a:txBody>
-                  <a:tcPr anchor="t" marB="0" marT="0" marR="0" marL="0">
-                    <a:lnL w="0" cmpd="sng" algn="ctr" cap="flat">
-                      <a:solidFill>
-                        <a:srgbClr val="FFFFFF">
-                          <a:alpha val="0"/>
-                        </a:srgbClr>
-                      </a:solidFill>
-                      <a:prstDash val="solid"/>
-                    </a:lnL>
-                    <a:lnR w="0" cmpd="sng" algn="ctr" cap="flat">
-                      <a:solidFill>
-                        <a:srgbClr val="FFFFFF">
-                          <a:alpha val="0"/>
-                        </a:srgbClr>
-                      </a:solidFill>
-                      <a:prstDash val="solid"/>
-                    </a:lnR>
-                    <a:lnT w="0" cmpd="sng" algn="ctr" cap="flat">
-                      <a:solidFill>
-                        <a:srgbClr val="FFFFFF">
-                          <a:alpha val="0"/>
-                        </a:srgbClr>
-                      </a:solidFill>
-                      <a:prstDash val="solid"/>
-                    </a:lnT>
-                    <a:lnB w="0" cmpd="sng" algn="ctr" cap="flat">
-                      <a:solidFill>
-                        <a:srgbClr val="FFFFFF">
-                          <a:alpha val="0"/>
-                        </a:srgbClr>
-                      </a:solidFill>
-                      <a:prstDash val="solid"/>
-                    </a:lnB>
-                  </a:tcPr>
-                </a:tc>
-                <a:tc>
-                  <a:txBody>
-                    <a:bodyPr/>
-                    <a:lstStyle/>
-                    <a:p>
-                      <a:pPr algn="l" marL="63500" marR="63500">
-                        <a:lnSpc>
-                          <a:spcPct val="100000"/>
-                        </a:lnSpc>
-                        <a:spcBef>
-                          <a:spcPts val="500"/>
-                        </a:spcBef>
-                        <a:spcAft>
-                          <a:spcPts val="500"/>
-                        </a:spcAft>
-                        <a:buNone/>
-                      </a:pPr>
-                      <a:r>
-                        <a:rPr sz="1100">
-                          <a:solidFill>
-                            <a:srgbClr val="000000">
-                              <a:alpha val="100000"/>
-                            </a:srgbClr>
-                          </a:solidFill>
-                          <a:latin typeface="Calibri"/>
-                          <a:cs typeface="Calibri"/>
-                          <a:ea typeface="Calibri"/>
-                          <a:sym typeface="Calibri"/>
-                        </a:rPr>
-                        <a:t>809.8</a:t>
-                      </a:r>
-                    </a:p>
-                  </a:txBody>
-                  <a:tcPr anchor="t" marB="0" marT="0" marR="0" marL="0">
-                    <a:lnL w="0" cmpd="sng" algn="ctr" cap="flat">
-                      <a:solidFill>
-                        <a:srgbClr val="FFFFFF">
-                          <a:alpha val="0"/>
-                        </a:srgbClr>
-                      </a:solidFill>
-                      <a:prstDash val="solid"/>
-                    </a:lnL>
-                    <a:lnR w="0" cmpd="sng" algn="ctr" cap="flat">
-                      <a:solidFill>
-                        <a:srgbClr val="FFFFFF">
-                          <a:alpha val="0"/>
-                        </a:srgbClr>
-                      </a:solidFill>
-                      <a:prstDash val="solid"/>
-                    </a:lnR>
-                    <a:lnT w="0" cmpd="sng" algn="ctr" cap="flat">
-                      <a:solidFill>
-                        <a:srgbClr val="FFFFFF">
-                          <a:alpha val="0"/>
-                        </a:srgbClr>
-                      </a:solidFill>
-                      <a:prstDash val="solid"/>
-                    </a:lnT>
-                    <a:lnB w="0" cmpd="sng" algn="ctr" cap="flat">
-                      <a:solidFill>
-                        <a:srgbClr val="FFFFFF">
-                          <a:alpha val="0"/>
-                        </a:srgbClr>
-                      </a:solidFill>
-                      <a:prstDash val="solid"/>
-                    </a:lnB>
-                  </a:tcPr>
-                </a:tc>
-                <a:tc>
-                  <a:txBody>
-                    <a:bodyPr/>
-                    <a:lstStyle/>
-                    <a:p>
-                      <a:pPr algn="l" marL="63500" marR="63500">
-                        <a:lnSpc>
-                          <a:spcPct val="100000"/>
-                        </a:lnSpc>
-                        <a:spcBef>
-                          <a:spcPts val="500"/>
-                        </a:spcBef>
-                        <a:spcAft>
-                          <a:spcPts val="500"/>
-                        </a:spcAft>
-                        <a:buNone/>
-                      </a:pPr>
-                      <a:r>
-                        <a:rPr sz="1100">
-                          <a:solidFill>
-                            <a:srgbClr val="000000">
-                              <a:alpha val="100000"/>
-                            </a:srgbClr>
-                          </a:solidFill>
-                          <a:latin typeface="Calibri"/>
-                          <a:cs typeface="Calibri"/>
-                          <a:ea typeface="Calibri"/>
-                          <a:sym typeface="Calibri"/>
-                        </a:rPr>
-                        <a:t>63rd</a:t>
-                      </a:r>
-                    </a:p>
-                  </a:txBody>
-                  <a:tcPr anchor="t" marB="0" marT="0" marR="0" marL="0">
-                    <a:lnL w="0" cmpd="sng" algn="ctr" cap="flat">
-                      <a:solidFill>
-                        <a:srgbClr val="FFFFFF">
-                          <a:alpha val="0"/>
-                        </a:srgbClr>
-                      </a:solidFill>
-                      <a:prstDash val="solid"/>
-                    </a:lnL>
-                    <a:lnR w="0" cmpd="sng" algn="ctr" cap="flat">
-                      <a:solidFill>
-                        <a:srgbClr val="FFFFFF">
-                          <a:alpha val="0"/>
-                        </a:srgbClr>
-                      </a:solidFill>
-                      <a:prstDash val="solid"/>
-                    </a:lnR>
-                    <a:lnT w="0" cmpd="sng" algn="ctr" cap="flat">
-                      <a:solidFill>
-                        <a:srgbClr val="FFFFFF">
-                          <a:alpha val="0"/>
-                        </a:srgbClr>
-                      </a:solidFill>
-                      <a:prstDash val="solid"/>
-                    </a:lnT>
-                    <a:lnB w="0" cmpd="sng" algn="ctr" cap="flat">
-                      <a:solidFill>
-                        <a:srgbClr val="FFFFFF">
-                          <a:alpha val="0"/>
-                        </a:srgbClr>
-                      </a:solidFill>
-                      <a:prstDash val="solid"/>
-                    </a:lnB>
-                  </a:tcPr>
-                </a:tc>
-                <a:tc>
-                  <a:txBody>
-                    <a:bodyPr/>
-                    <a:lstStyle/>
-                    <a:p>
-                      <a:pPr algn="l" marL="63500" marR="63500">
-                        <a:lnSpc>
-                          <a:spcPct val="100000"/>
-                        </a:lnSpc>
-                        <a:spcBef>
-                          <a:spcPts val="500"/>
-                        </a:spcBef>
-                        <a:spcAft>
-                          <a:spcPts val="500"/>
-                        </a:spcAft>
-                        <a:buNone/>
-                      </a:pPr>
-                      <a:r>
-                        <a:rPr sz="1100">
-                          <a:solidFill>
-                            <a:srgbClr val="000000">
-                              <a:alpha val="100000"/>
-                            </a:srgbClr>
-                          </a:solidFill>
-                          <a:latin typeface="Calibri"/>
-                          <a:cs typeface="Calibri"/>
-                          <a:ea typeface="Calibri"/>
-                          <a:sym typeface="Calibri"/>
-                        </a:rPr>
-                        <a:t>Decile 3</a:t>
-                      </a:r>
-                    </a:p>
-                  </a:txBody>
-                  <a:tcPr anchor="t" marB="0" marT="0" marR="0" marL="0">
-                    <a:lnL w="0" cmpd="sng" algn="ctr" cap="flat">
-                      <a:solidFill>
-                        <a:srgbClr val="FFFFFF">
-                          <a:alpha val="0"/>
-                        </a:srgbClr>
-                      </a:solidFill>
-                      <a:prstDash val="solid"/>
-                    </a:lnL>
-                    <a:lnR w="0" cmpd="sng" algn="ctr" cap="flat">
-                      <a:solidFill>
-                        <a:srgbClr val="FFFFFF">
-                          <a:alpha val="0"/>
-                        </a:srgbClr>
-                      </a:solidFill>
-                      <a:prstDash val="solid"/>
-                    </a:lnR>
-                    <a:lnT w="0" cmpd="sng" algn="ctr" cap="flat">
-                      <a:solidFill>
-                        <a:srgbClr val="FFFFFF">
-                          <a:alpha val="0"/>
-                        </a:srgbClr>
-                      </a:solidFill>
-                      <a:prstDash val="solid"/>
-                    </a:lnT>
-                    <a:lnB w="0" cmpd="sng" algn="ctr" cap="flat">
-                      <a:solidFill>
-                        <a:srgbClr val="FFFFFF">
-                          <a:alpha val="0"/>
-                        </a:srgbClr>
-                      </a:solidFill>
-                      <a:prstDash val="solid"/>
-                    </a:lnB>
-                  </a:tcPr>
-                </a:tc>
-              </a:tr>
-              <a:tr h="182880">
-                <a:tc>
-                  <a:txBody>
-                    <a:bodyPr/>
-                    <a:lstStyle/>
-                    <a:p>
-                      <a:pPr algn="l" marL="63500" marR="63500">
-                        <a:lnSpc>
-                          <a:spcPct val="100000"/>
-                        </a:lnSpc>
-                        <a:spcBef>
-                          <a:spcPts val="500"/>
-                        </a:spcBef>
-                        <a:spcAft>
-                          <a:spcPts val="500"/>
-                        </a:spcAft>
-                        <a:buNone/>
-                      </a:pPr>
-                      <a:r>
-                        <a:rPr sz="1100">
-                          <a:solidFill>
-                            <a:srgbClr val="000000">
-                              <a:alpha val="100000"/>
-                            </a:srgbClr>
-                          </a:solidFill>
-                          <a:latin typeface="Calibri"/>
-                          <a:cs typeface="Calibri"/>
-                          <a:ea typeface="Calibri"/>
-                          <a:sym typeface="Calibri"/>
-                        </a:rPr>
-                        <a:t>Worthing</a:t>
-                      </a:r>
-                    </a:p>
-                  </a:txBody>
-                  <a:tcPr anchor="t" marB="0" marT="0" marR="0" marL="0">
-                    <a:lnL w="0" cmpd="sng" algn="ctr" cap="flat">
-                      <a:solidFill>
-                        <a:srgbClr val="FFFFFF">
-                          <a:alpha val="0"/>
-                        </a:srgbClr>
-                      </a:solidFill>
-                      <a:prstDash val="solid"/>
-                    </a:lnL>
-                    <a:lnR w="0" cmpd="sng" algn="ctr" cap="flat">
-                      <a:solidFill>
-                        <a:srgbClr val="FFFFFF">
-                          <a:alpha val="0"/>
-                        </a:srgbClr>
-                      </a:solidFill>
-                      <a:prstDash val="solid"/>
-                    </a:lnR>
-                    <a:lnT w="0" cmpd="sng" algn="ctr" cap="flat">
-                      <a:solidFill>
-                        <a:srgbClr val="FFFFFF">
-                          <a:alpha val="0"/>
-                        </a:srgbClr>
-                      </a:solidFill>
-                      <a:prstDash val="solid"/>
-                    </a:lnT>
-                    <a:lnB w="0" cmpd="sng" algn="ctr" cap="flat">
-                      <a:solidFill>
-                        <a:srgbClr val="FFFFFF">
-                          <a:alpha val="0"/>
-                        </a:srgbClr>
-                      </a:solidFill>
-                      <a:prstDash val="solid"/>
-                    </a:lnB>
-                  </a:tcPr>
-                </a:tc>
-                <a:tc>
-                  <a:txBody>
-                    <a:bodyPr/>
-                    <a:lstStyle/>
-                    <a:p>
-                      <a:pPr algn="l" marL="63500" marR="63500">
-                        <a:lnSpc>
-                          <a:spcPct val="100000"/>
-                        </a:lnSpc>
-                        <a:spcBef>
-                          <a:spcPts val="500"/>
-                        </a:spcBef>
-                        <a:spcAft>
-                          <a:spcPts val="500"/>
-                        </a:spcAft>
-                        <a:buNone/>
-                      </a:pPr>
-                      <a:r>
-                        <a:rPr sz="1100">
-                          <a:solidFill>
-                            <a:srgbClr val="000000">
-                              <a:alpha val="100000"/>
-                            </a:srgbClr>
-                          </a:solidFill>
-                          <a:latin typeface="Calibri"/>
-                          <a:cs typeface="Calibri"/>
-                          <a:ea typeface="Calibri"/>
-                          <a:sym typeface="Calibri"/>
-                        </a:rPr>
-                        <a:t>816</a:t>
-                      </a:r>
-                    </a:p>
-                  </a:txBody>
-                  <a:tcPr anchor="t" marB="0" marT="0" marR="0" marL="0">
-                    <a:lnL w="0" cmpd="sng" algn="ctr" cap="flat">
-                      <a:solidFill>
-                        <a:srgbClr val="FFFFFF">
-                          <a:alpha val="0"/>
-                        </a:srgbClr>
-                      </a:solidFill>
-                      <a:prstDash val="solid"/>
-                    </a:lnL>
-                    <a:lnR w="0" cmpd="sng" algn="ctr" cap="flat">
-                      <a:solidFill>
-                        <a:srgbClr val="FFFFFF">
-                          <a:alpha val="0"/>
-                        </a:srgbClr>
-                      </a:solidFill>
-                      <a:prstDash val="solid"/>
-                    </a:lnR>
-                    <a:lnT w="0" cmpd="sng" algn="ctr" cap="flat">
-                      <a:solidFill>
-                        <a:srgbClr val="FFFFFF">
-                          <a:alpha val="0"/>
-                        </a:srgbClr>
-                      </a:solidFill>
-                      <a:prstDash val="solid"/>
-                    </a:lnT>
-                    <a:lnB w="0" cmpd="sng" algn="ctr" cap="flat">
-                      <a:solidFill>
-                        <a:srgbClr val="FFFFFF">
-                          <a:alpha val="0"/>
-                        </a:srgbClr>
-                      </a:solidFill>
-                      <a:prstDash val="solid"/>
-                    </a:lnB>
-                  </a:tcPr>
-                </a:tc>
-                <a:tc>
-                  <a:txBody>
-                    <a:bodyPr/>
-                    <a:lstStyle/>
-                    <a:p>
-                      <a:pPr algn="l" marL="63500" marR="63500">
-                        <a:lnSpc>
-                          <a:spcPct val="100000"/>
-                        </a:lnSpc>
-                        <a:spcBef>
-                          <a:spcPts val="500"/>
-                        </a:spcBef>
-                        <a:spcAft>
-                          <a:spcPts val="500"/>
-                        </a:spcAft>
-                        <a:buNone/>
-                      </a:pPr>
-                      <a:r>
-                        <a:rPr sz="1100">
-                          <a:solidFill>
-                            <a:srgbClr val="000000">
-                              <a:alpha val="100000"/>
-                            </a:srgbClr>
-                          </a:solidFill>
-                          <a:latin typeface="Calibri"/>
-                          <a:cs typeface="Calibri"/>
-                          <a:ea typeface="Calibri"/>
-                          <a:sym typeface="Calibri"/>
-                        </a:rPr>
-                        <a:t>736.9</a:t>
-                      </a:r>
-                    </a:p>
-                  </a:txBody>
-                  <a:tcPr anchor="t" marB="0" marT="0" marR="0" marL="0">
-                    <a:lnL w="0" cmpd="sng" algn="ctr" cap="flat">
-                      <a:solidFill>
-                        <a:srgbClr val="FFFFFF">
-                          <a:alpha val="0"/>
-                        </a:srgbClr>
-                      </a:solidFill>
-                      <a:prstDash val="solid"/>
-                    </a:lnL>
-                    <a:lnR w="0" cmpd="sng" algn="ctr" cap="flat">
-                      <a:solidFill>
-                        <a:srgbClr val="FFFFFF">
-                          <a:alpha val="0"/>
-                        </a:srgbClr>
-                      </a:solidFill>
-                      <a:prstDash val="solid"/>
-                    </a:lnR>
-                    <a:lnT w="0" cmpd="sng" algn="ctr" cap="flat">
-                      <a:solidFill>
-                        <a:srgbClr val="FFFFFF">
-                          <a:alpha val="0"/>
-                        </a:srgbClr>
-                      </a:solidFill>
-                      <a:prstDash val="solid"/>
-                    </a:lnT>
-                    <a:lnB w="0" cmpd="sng" algn="ctr" cap="flat">
-                      <a:solidFill>
-                        <a:srgbClr val="FFFFFF">
-                          <a:alpha val="0"/>
-                        </a:srgbClr>
-                      </a:solidFill>
-                      <a:prstDash val="solid"/>
-                    </a:lnB>
-                  </a:tcPr>
-                </a:tc>
-                <a:tc>
-                  <a:txBody>
-                    <a:bodyPr/>
-                    <a:lstStyle/>
-                    <a:p>
-                      <a:pPr algn="l" marL="63500" marR="63500">
-                        <a:lnSpc>
-                          <a:spcPct val="100000"/>
-                        </a:lnSpc>
-                        <a:spcBef>
-                          <a:spcPts val="500"/>
-                        </a:spcBef>
-                        <a:spcAft>
-                          <a:spcPts val="500"/>
-                        </a:spcAft>
-                        <a:buNone/>
-                      </a:pPr>
-                      <a:r>
-                        <a:rPr sz="1100">
-                          <a:solidFill>
-                            <a:srgbClr val="000000">
-                              <a:alpha val="100000"/>
-                            </a:srgbClr>
-                          </a:solidFill>
-                          <a:latin typeface="Calibri"/>
-                          <a:cs typeface="Calibri"/>
-                          <a:ea typeface="Calibri"/>
-                          <a:sym typeface="Calibri"/>
-                        </a:rPr>
-                        <a:t>132nd</a:t>
-                      </a:r>
-                    </a:p>
-                  </a:txBody>
-                  <a:tcPr anchor="t" marB="0" marT="0" marR="0" marL="0">
-                    <a:lnL w="0" cmpd="sng" algn="ctr" cap="flat">
-                      <a:solidFill>
-                        <a:srgbClr val="FFFFFF">
-                          <a:alpha val="0"/>
-                        </a:srgbClr>
-                      </a:solidFill>
-                      <a:prstDash val="solid"/>
-                    </a:lnL>
-                    <a:lnR w="0" cmpd="sng" algn="ctr" cap="flat">
-                      <a:solidFill>
-                        <a:srgbClr val="FFFFFF">
-                          <a:alpha val="0"/>
-                        </a:srgbClr>
-                      </a:solidFill>
-                      <a:prstDash val="solid"/>
-                    </a:lnR>
-                    <a:lnT w="0" cmpd="sng" algn="ctr" cap="flat">
-                      <a:solidFill>
-                        <a:srgbClr val="FFFFFF">
-                          <a:alpha val="0"/>
-                        </a:srgbClr>
-                      </a:solidFill>
-                      <a:prstDash val="solid"/>
-                    </a:lnT>
-                    <a:lnB w="0" cmpd="sng" algn="ctr" cap="flat">
-                      <a:solidFill>
-                        <a:srgbClr val="FFFFFF">
-                          <a:alpha val="0"/>
-                        </a:srgbClr>
-                      </a:solidFill>
-                      <a:prstDash val="solid"/>
-                    </a:lnB>
-                  </a:tcPr>
-                </a:tc>
-                <a:tc>
-                  <a:txBody>
-                    <a:bodyPr/>
-                    <a:lstStyle/>
-                    <a:p>
-                      <a:pPr algn="l" marL="63500" marR="63500">
-                        <a:lnSpc>
-                          <a:spcPct val="100000"/>
-                        </a:lnSpc>
-                        <a:spcBef>
-                          <a:spcPts val="500"/>
-                        </a:spcBef>
-                        <a:spcAft>
-                          <a:spcPts val="500"/>
-                        </a:spcAft>
-                        <a:buNone/>
-                      </a:pPr>
-                      <a:r>
-                        <a:rPr sz="1100">
-                          <a:solidFill>
-                            <a:srgbClr val="000000">
-                              <a:alpha val="100000"/>
-                            </a:srgbClr>
-                          </a:solidFill>
-                          <a:latin typeface="Calibri"/>
-                          <a:cs typeface="Calibri"/>
-                          <a:ea typeface="Calibri"/>
-                          <a:sym typeface="Calibri"/>
-                        </a:rPr>
-                        <a:t>Decile 5</a:t>
-                      </a:r>
-                    </a:p>
-                  </a:txBody>
-                  <a:tcPr anchor="t" marB="0" marT="0" marR="0" marL="0">
-                    <a:lnL w="0" cmpd="sng" algn="ctr" cap="flat">
-                      <a:solidFill>
-                        <a:srgbClr val="FFFFFF">
-                          <a:alpha val="0"/>
-                        </a:srgbClr>
-                      </a:solidFill>
-                      <a:prstDash val="solid"/>
-                    </a:lnL>
-                    <a:lnR w="0" cmpd="sng" algn="ctr" cap="flat">
-                      <a:solidFill>
-                        <a:srgbClr val="FFFFFF">
-                          <a:alpha val="0"/>
-                        </a:srgbClr>
-                      </a:solidFill>
-                      <a:prstDash val="solid"/>
-                    </a:lnR>
-                    <a:lnT w="0" cmpd="sng" algn="ctr" cap="flat">
-                      <a:solidFill>
-                        <a:srgbClr val="FFFFFF">
-                          <a:alpha val="0"/>
-                        </a:srgbClr>
-                      </a:solidFill>
-                      <a:prstDash val="solid"/>
-                    </a:lnT>
-                    <a:lnB w="0" cmpd="sng" algn="ctr" cap="flat">
-                      <a:solidFill>
-                        <a:srgbClr val="FFFFFF">
-                          <a:alpha val="0"/>
-                        </a:srgbClr>
-                      </a:solidFill>
-                      <a:prstDash val="solid"/>
-                    </a:lnB>
-                  </a:tcPr>
-                </a:tc>
-              </a:tr>
-              <a:tr h="182880">
-                <a:tc>
-                  <a:txBody>
-                    <a:bodyPr/>
-                    <a:lstStyle/>
-                    <a:p>
-                      <a:pPr algn="l" marL="63500" marR="63500">
-                        <a:lnSpc>
-                          <a:spcPct val="100000"/>
-                        </a:lnSpc>
-                        <a:spcBef>
-                          <a:spcPts val="500"/>
-                        </a:spcBef>
-                        <a:spcAft>
-                          <a:spcPts val="500"/>
-                        </a:spcAft>
-                        <a:buNone/>
-                      </a:pPr>
-                      <a:r>
-                        <a:rPr sz="1100">
-                          <a:solidFill>
-                            <a:srgbClr val="000000">
-                              <a:alpha val="100000"/>
-                            </a:srgbClr>
-                          </a:solidFill>
-                          <a:latin typeface="Calibri"/>
-                          <a:cs typeface="Calibri"/>
-                          <a:ea typeface="Calibri"/>
-                          <a:sym typeface="Calibri"/>
-                        </a:rPr>
-                        <a:t>West Sussex</a:t>
-                      </a:r>
-                    </a:p>
-                  </a:txBody>
-                  <a:tcPr anchor="t" marB="0" marT="0" marR="0" marL="0">
-                    <a:lnL w="0" cmpd="sng" algn="ctr" cap="flat">
-                      <a:solidFill>
-                        <a:srgbClr val="FFFFFF">
-                          <a:alpha val="0"/>
-                        </a:srgbClr>
-                      </a:solidFill>
-                      <a:prstDash val="solid"/>
-                    </a:lnL>
-                    <a:lnR w="0" cmpd="sng" algn="ctr" cap="flat">
-                      <a:solidFill>
-                        <a:srgbClr val="FFFFFF">
-                          <a:alpha val="0"/>
-                        </a:srgbClr>
-                      </a:solidFill>
-                      <a:prstDash val="solid"/>
-                    </a:lnR>
-                    <a:lnT w="0" cmpd="sng" algn="ctr" cap="flat">
-                      <a:solidFill>
-                        <a:srgbClr val="FFFFFF">
-                          <a:alpha val="0"/>
-                        </a:srgbClr>
-                      </a:solidFill>
-                      <a:prstDash val="solid"/>
-                    </a:lnT>
-                    <a:lnB w="0" cmpd="sng" algn="ctr" cap="flat">
-                      <a:solidFill>
-                        <a:srgbClr val="FFFFFF">
-                          <a:alpha val="0"/>
-                        </a:srgbClr>
-                      </a:solidFill>
-                      <a:prstDash val="solid"/>
-                    </a:lnB>
-                  </a:tcPr>
-                </a:tc>
-                <a:tc>
-                  <a:txBody>
-                    <a:bodyPr/>
-                    <a:lstStyle/>
-                    <a:p>
-                      <a:pPr algn="l" marL="63500" marR="63500">
-                        <a:lnSpc>
-                          <a:spcPct val="100000"/>
-                        </a:lnSpc>
-                        <a:spcBef>
-                          <a:spcPts val="500"/>
-                        </a:spcBef>
-                        <a:spcAft>
-                          <a:spcPts val="500"/>
-                        </a:spcAft>
-                        <a:buNone/>
-                      </a:pPr>
-                      <a:r>
-                        <a:rPr sz="1100">
-                          <a:solidFill>
-                            <a:srgbClr val="000000">
-                              <a:alpha val="100000"/>
-                            </a:srgbClr>
-                          </a:solidFill>
-                          <a:latin typeface="Calibri"/>
-                          <a:cs typeface="Calibri"/>
-                          <a:ea typeface="Calibri"/>
-                          <a:sym typeface="Calibri"/>
-                        </a:rPr>
-                        <a:t>6,346</a:t>
-                      </a:r>
-                    </a:p>
-                  </a:txBody>
-                  <a:tcPr anchor="t" marB="0" marT="0" marR="0" marL="0">
-                    <a:lnL w="0" cmpd="sng" algn="ctr" cap="flat">
-                      <a:solidFill>
-                        <a:srgbClr val="FFFFFF">
-                          <a:alpha val="0"/>
-                        </a:srgbClr>
-                      </a:solidFill>
-                      <a:prstDash val="solid"/>
-                    </a:lnL>
-                    <a:lnR w="0" cmpd="sng" algn="ctr" cap="flat">
-                      <a:solidFill>
-                        <a:srgbClr val="FFFFFF">
-                          <a:alpha val="0"/>
-                        </a:srgbClr>
-                      </a:solidFill>
-                      <a:prstDash val="solid"/>
-                    </a:lnR>
-                    <a:lnT w="0" cmpd="sng" algn="ctr" cap="flat">
-                      <a:solidFill>
-                        <a:srgbClr val="FFFFFF">
-                          <a:alpha val="0"/>
-                        </a:srgbClr>
-                      </a:solidFill>
-                      <a:prstDash val="solid"/>
-                    </a:lnT>
-                    <a:lnB w="0" cmpd="sng" algn="ctr" cap="flat">
-                      <a:solidFill>
-                        <a:srgbClr val="FFFFFF">
-                          <a:alpha val="0"/>
-                        </a:srgbClr>
-                      </a:solidFill>
-                      <a:prstDash val="solid"/>
-                    </a:lnB>
-                  </a:tcPr>
-                </a:tc>
-                <a:tc>
-                  <a:txBody>
-                    <a:bodyPr/>
-                    <a:lstStyle/>
-                    <a:p>
-                      <a:pPr algn="l" marL="63500" marR="63500">
-                        <a:lnSpc>
-                          <a:spcPct val="100000"/>
-                        </a:lnSpc>
-                        <a:spcBef>
-                          <a:spcPts val="500"/>
-                        </a:spcBef>
-                        <a:spcAft>
-                          <a:spcPts val="500"/>
-                        </a:spcAft>
-                        <a:buNone/>
-                      </a:pPr>
-                      <a:r>
-                        <a:rPr sz="1100">
-                          <a:solidFill>
-                            <a:srgbClr val="000000">
-                              <a:alpha val="100000"/>
-                            </a:srgbClr>
-                          </a:solidFill>
-                          <a:latin typeface="Calibri"/>
-                          <a:cs typeface="Calibri"/>
-                          <a:ea typeface="Calibri"/>
-                          <a:sym typeface="Calibri"/>
-                        </a:rPr>
-                        <a:t>731.4</a:t>
+                        <a:t>527.1</a:t>
                       </a:r>
                     </a:p>
                   </a:txBody>
@@ -18105,7 +18105,7 @@
                           <a:ea typeface="Calibri"/>
                           <a:sym typeface="Calibri"/>
                         </a:rPr>
-                        <a:t>383,149</a:t>
+                        <a:t>273,624</a:t>
                       </a:r>
                     </a:p>
                   </a:txBody>
@@ -18173,7 +18173,7 @@
                           <a:ea typeface="Calibri"/>
                           <a:sym typeface="Calibri"/>
                         </a:rPr>
-                        <a:t>677.5</a:t>
+                        <a:t>483.9</a:t>
                       </a:r>
                     </a:p>
                   </a:txBody>
@@ -18447,7 +18447,7 @@
                           <a:ea typeface="Calibri"/>
                           <a:sym typeface="Calibri"/>
                         </a:rPr>
-                        <a:t>70,275</a:t>
+                        <a:t>50,317</a:t>
                       </a:r>
                     </a:p>
                   </a:txBody>
@@ -18515,7 +18515,7 @@
                           <a:ea typeface="Calibri"/>
                           <a:sym typeface="Calibri"/>
                         </a:rPr>
-                        <a:t>762.4</a:t>
+                        <a:t>545.9</a:t>
                       </a:r>
                     </a:p>
                   </a:txBody>
@@ -18742,7 +18742,7 @@
           <a:p>
             <a:r>
               <a:rPr/>
-              <a:t>Pack date: 07 April 2022</a:t>
+              <a:t>Pack date: 12 April 2022</a:t>
             </a:r>
           </a:p>
         </p:txBody>
@@ -18900,7 +18900,7 @@
           <a:p>
             <a:r>
               <a:rPr/>
-              <a:t>Pack date: 07 April 2022</a:t>
+              <a:t>Pack date: 12 April 2022</a:t>
             </a:r>
           </a:p>
         </p:txBody>
@@ -19058,7 +19058,7 @@
           <a:p>
             <a:r>
               <a:rPr/>
-              <a:t>Pack date: 07 April 2022</a:t>
+              <a:t>Pack date: 12 April 2022</a:t>
             </a:r>
           </a:p>
         </p:txBody>
@@ -19216,7 +19216,7 @@
           <a:p>
             <a:r>
               <a:rPr/>
-              <a:t>Pack date: 07 April 2022</a:t>
+              <a:t>Pack date: 12 April 2022</a:t>
             </a:r>
           </a:p>
         </p:txBody>
@@ -19374,7 +19374,7 @@
           <a:p>
             <a:r>
               <a:rPr/>
-              <a:t>Pack date: 07 April 2022</a:t>
+              <a:t>Pack date: 12 April 2022</a:t>
             </a:r>
           </a:p>
         </p:txBody>
@@ -19563,7 +19563,7 @@
           <a:p>
             <a:r>
               <a:rPr/>
-              <a:t>Pack date: 07 April 2022</a:t>
+              <a:t>Pack date: 12 April 2022</a:t>
             </a:r>
           </a:p>
         </p:txBody>
@@ -19721,7 +19721,7 @@
           <a:p>
             <a:r>
               <a:rPr/>
-              <a:t>Pack date: 07 April 2022</a:t>
+              <a:t>Pack date: 12 April 2022</a:t>
             </a:r>
           </a:p>
         </p:txBody>
@@ -19879,7 +19879,7 @@
           <a:p>
             <a:r>
               <a:rPr/>
-              <a:t>Pack date: 07 April 2022</a:t>
+              <a:t>Pack date: 12 April 2022</a:t>
             </a:r>
           </a:p>
         </p:txBody>
@@ -20037,7 +20037,7 @@
           <a:p>
             <a:r>
               <a:rPr/>
-              <a:t>Pack date: 07 April 2022</a:t>
+              <a:t>Pack date: 12 April 2022</a:t>
             </a:r>
           </a:p>
         </p:txBody>
@@ -20195,7 +20195,7 @@
           <a:p>
             <a:r>
               <a:rPr/>
-              <a:t>Pack date: 07 April 2022</a:t>
+              <a:t>Pack date: 12 April 2022</a:t>
             </a:r>
           </a:p>
         </p:txBody>
@@ -20327,7 +20327,7 @@
           <a:p>
             <a:r>
               <a:rPr/>
-              <a:t>Pack date: 07 April 2022</a:t>
+              <a:t>Pack date: 12 April 2022</a:t>
             </a:r>
           </a:p>
         </p:txBody>
@@ -20459,7 +20459,7 @@
           <a:p>
             <a:r>
               <a:rPr/>
-              <a:t>Pack date: 07 April 2022</a:t>
+              <a:t>Pack date: 12 April 2022</a:t>
             </a:r>
           </a:p>
         </p:txBody>
@@ -20591,7 +20591,7 @@
           <a:p>
             <a:r>
               <a:rPr/>
-              <a:t>Pack date: 07 April 2022</a:t>
+              <a:t>Pack date: 12 April 2022</a:t>
             </a:r>
           </a:p>
         </p:txBody>
@@ -20723,7 +20723,7 @@
           <a:p>
             <a:r>
               <a:rPr/>
-              <a:t>Pack date: 07 April 2022</a:t>
+              <a:t>Pack date: 12 April 2022</a:t>
             </a:r>
           </a:p>
         </p:txBody>
@@ -20855,7 +20855,7 @@
           <a:p>
             <a:r>
               <a:rPr/>
-              <a:t>Pack date: 07 April 2022</a:t>
+              <a:t>Pack date: 12 April 2022</a:t>
             </a:r>
           </a:p>
         </p:txBody>
@@ -20987,7 +20987,7 @@
           <a:p>
             <a:r>
               <a:rPr/>
-              <a:t>Pack date: 07 April 2022</a:t>
+              <a:t>Pack date: 12 April 2022</a:t>
             </a:r>
           </a:p>
         </p:txBody>

</xml_diff>

<commit_message>
added five year average deaths
</commit_message>
<xml_diff>
--- a/Latest_West_Sussex_C19_slide_deck.pptx
+++ b/Latest_West_Sussex_C19_slide_deck.pptx
@@ -7176,7 +7176,7 @@
           <a:p>
             <a:r>
               <a:rPr/>
-              <a:t>Pack date: 19 April 2022</a:t>
+              <a:t>Pack date: 20 April 2022</a:t>
             </a:r>
           </a:p>
         </p:txBody>
@@ -7308,7 +7308,7 @@
           <a:p>
             <a:r>
               <a:rPr/>
-              <a:t>Pack date: 19 April 2022</a:t>
+              <a:t>Pack date: 20 April 2022</a:t>
             </a:r>
           </a:p>
         </p:txBody>
@@ -7466,7 +7466,7 @@
           <a:p>
             <a:r>
               <a:rPr/>
-              <a:t>Pack date: 19 April 2022</a:t>
+              <a:t>Pack date: 20 April 2022</a:t>
             </a:r>
           </a:p>
         </p:txBody>
@@ -7547,7 +7547,7 @@
           <a:p>
             <a:r>
               <a:rPr/>
-              <a:t>Upper Tier Local Authority cumulative cases as at 19 April</a:t>
+              <a:t>Upper Tier Local Authority cumulative cases as at 20 April</a:t>
             </a:r>
           </a:p>
         </p:txBody>
@@ -8096,7 +8096,7 @@
                           <a:ea typeface="Calibri"/>
                           <a:sym typeface="Calibri"/>
                         </a:rPr>
-                        <a:t>271,403</a:t>
+                        <a:t>271,711</a:t>
                       </a:r>
                     </a:p>
                   </a:txBody>
@@ -8164,7 +8164,7 @@
                           <a:ea typeface="Calibri"/>
                           <a:sym typeface="Calibri"/>
                         </a:rPr>
-                        <a:t>31,280.8</a:t>
+                        <a:t>31,316.3</a:t>
                       </a:r>
                     </a:p>
                   </a:txBody>
@@ -8438,7 +8438,7 @@
                           <a:ea typeface="Calibri"/>
                           <a:sym typeface="Calibri"/>
                         </a:rPr>
-                        <a:t>18,398,440</a:t>
+                        <a:t>18,419,203</a:t>
                       </a:r>
                     </a:p>
                   </a:txBody>
@@ -8506,7 +8506,7 @@
                           <a:ea typeface="Calibri"/>
                           <a:sym typeface="Calibri"/>
                         </a:rPr>
-                        <a:t>32,534.7</a:t>
+                        <a:t>32,571.5</a:t>
                       </a:r>
                     </a:p>
                   </a:txBody>
@@ -8780,7 +8780,7 @@
                           <a:ea typeface="Calibri"/>
                           <a:sym typeface="Calibri"/>
                         </a:rPr>
-                        <a:t>2,968,504</a:t>
+                        <a:t>2,971,931</a:t>
                       </a:r>
                     </a:p>
                   </a:txBody>
@@ -8848,7 +8848,7 @@
                           <a:ea typeface="Calibri"/>
                           <a:sym typeface="Calibri"/>
                         </a:rPr>
-                        <a:t>32,205.9</a:t>
+                        <a:t>32,243.1</a:t>
                       </a:r>
                     </a:p>
                   </a:txBody>
@@ -9101,7 +9101,7 @@
           <a:p>
             <a:r>
               <a:rPr/>
-              <a:t>Pack date: 19 April 2022</a:t>
+              <a:t>Pack date: 20 April 2022</a:t>
             </a:r>
           </a:p>
         </p:txBody>
@@ -9182,7 +9182,7 @@
           <a:p>
             <a:r>
               <a:rPr/>
-              <a:t>Upper Tier Local Authority rolling 7 day cases as at 19 April</a:t>
+              <a:t>Upper Tier Local Authority rolling 7 day cases as at 20 April</a:t>
             </a:r>
           </a:p>
         </p:txBody>
@@ -9263,7 +9263,7 @@
           <a:p>
             <a:r>
               <a:rPr/>
-              <a:t>Note that the very recent days are excluded in the 7-day total as these are thought to be incomplete. As such, this data represents cases in the seven days to 14 April</a:t>
+              <a:t>Note that the very recent days are excluded in the 7-day total as these are thought to be incomplete. As such, this data represents cases in the seven days to 15 April</a:t>
             </a:r>
           </a:p>
         </p:txBody>
@@ -9731,7 +9731,7 @@
                           <a:ea typeface="Calibri"/>
                           <a:sym typeface="Calibri"/>
                         </a:rPr>
-                        <a:t>3,073</a:t>
+                        <a:t>2,911</a:t>
                       </a:r>
                     </a:p>
                   </a:txBody>
@@ -9799,7 +9799,7 @@
                           <a:ea typeface="Calibri"/>
                           <a:sym typeface="Calibri"/>
                         </a:rPr>
-                        <a:t>354.2</a:t>
+                        <a:t>335.5</a:t>
                       </a:r>
                     </a:p>
                   </a:txBody>
@@ -9867,7 +9867,7 @@
                           <a:ea typeface="Calibri"/>
                           <a:sym typeface="Calibri"/>
                         </a:rPr>
-                        <a:t>44th</a:t>
+                        <a:t>41st</a:t>
                       </a:r>
                     </a:p>
                   </a:txBody>
@@ -10073,7 +10073,7 @@
                           <a:ea typeface="Calibri"/>
                           <a:sym typeface="Calibri"/>
                         </a:rPr>
-                        <a:t>179,225</a:t>
+                        <a:t>169,666</a:t>
                       </a:r>
                     </a:p>
                   </a:txBody>
@@ -10141,7 +10141,7 @@
                           <a:ea typeface="Calibri"/>
                           <a:sym typeface="Calibri"/>
                         </a:rPr>
-                        <a:t>316.9</a:t>
+                        <a:t>300.0</a:t>
                       </a:r>
                     </a:p>
                   </a:txBody>
@@ -10415,7 +10415,7 @@
                           <a:ea typeface="Calibri"/>
                           <a:sym typeface="Calibri"/>
                         </a:rPr>
-                        <a:t>32,696</a:t>
+                        <a:t>30,487</a:t>
                       </a:r>
                     </a:p>
                   </a:txBody>
@@ -10483,7 +10483,7 @@
                           <a:ea typeface="Calibri"/>
                           <a:sym typeface="Calibri"/>
                         </a:rPr>
-                        <a:t>354.7</a:t>
+                        <a:t>330.8</a:t>
                       </a:r>
                     </a:p>
                   </a:txBody>
@@ -10736,7 +10736,7 @@
           <a:p>
             <a:r>
               <a:rPr/>
-              <a:t>Pack date: 19 April 2022</a:t>
+              <a:t>Pack date: 20 April 2022</a:t>
             </a:r>
           </a:p>
         </p:txBody>
@@ -10817,7 +10817,7 @@
           <a:p>
             <a:r>
               <a:rPr/>
-              <a:t>Lower Tier Local Authority cumulative cases as at 19 April</a:t>
+              <a:t>Lower Tier Local Authority cumulative cases as at 20 April</a:t>
             </a:r>
           </a:p>
         </p:txBody>
@@ -11339,7 +11339,7 @@
                           <a:ea typeface="Calibri"/>
                           <a:sym typeface="Calibri"/>
                         </a:rPr>
-                        <a:t>19,261</a:t>
+                        <a:t>19,277</a:t>
                       </a:r>
                     </a:p>
                   </a:txBody>
@@ -11407,7 +11407,7 @@
                           <a:ea typeface="Calibri"/>
                           <a:sym typeface="Calibri"/>
                         </a:rPr>
-                        <a:t>30,007.6</a:t>
+                        <a:t>30,032.6</a:t>
                       </a:r>
                     </a:p>
                   </a:txBody>
@@ -11681,7 +11681,7 @@
                           <a:ea typeface="Calibri"/>
                           <a:sym typeface="Calibri"/>
                         </a:rPr>
-                        <a:t>48,210</a:t>
+                        <a:t>48,271</a:t>
                       </a:r>
                     </a:p>
                   </a:txBody>
@@ -11749,7 +11749,7 @@
                           <a:ea typeface="Calibri"/>
                           <a:sym typeface="Calibri"/>
                         </a:rPr>
-                        <a:t>29,921.2</a:t>
+                        <a:t>29,959.1</a:t>
                       </a:r>
                     </a:p>
                   </a:txBody>
@@ -12023,7 +12023,7 @@
                           <a:ea typeface="Calibri"/>
                           <a:sym typeface="Calibri"/>
                         </a:rPr>
-                        <a:t>34,820</a:t>
+                        <a:t>34,871</a:t>
                       </a:r>
                     </a:p>
                   </a:txBody>
@@ -12091,7 +12091,7 @@
                           <a:ea typeface="Calibri"/>
                           <a:sym typeface="Calibri"/>
                         </a:rPr>
-                        <a:t>28,656.5</a:t>
+                        <a:t>28,698.5</a:t>
                       </a:r>
                     </a:p>
                   </a:txBody>
@@ -12159,7 +12159,7 @@
                           <a:ea typeface="Calibri"/>
                           <a:sym typeface="Calibri"/>
                         </a:rPr>
-                        <a:t>277th</a:t>
+                        <a:t>278th</a:t>
                       </a:r>
                     </a:p>
                   </a:txBody>
@@ -12365,7 +12365,7 @@
                           <a:ea typeface="Calibri"/>
                           <a:sym typeface="Calibri"/>
                         </a:rPr>
-                        <a:t>40,227</a:t>
+                        <a:t>40,267</a:t>
                       </a:r>
                     </a:p>
                   </a:txBody>
@@ -12433,7 +12433,7 @@
                           <a:ea typeface="Calibri"/>
                           <a:sym typeface="Calibri"/>
                         </a:rPr>
-                        <a:t>35,765.6</a:t>
+                        <a:t>35,801.2</a:t>
                       </a:r>
                     </a:p>
                   </a:txBody>
@@ -12708,7 +12708,7 @@
                           <a:ea typeface="Calibri"/>
                           <a:sym typeface="Calibri"/>
                         </a:rPr>
-                        <a:t>44,041</a:t>
+                        <a:t>44,087</a:t>
                       </a:r>
                     </a:p>
                   </a:txBody>
@@ -12776,7 +12776,7 @@
                           <a:ea typeface="Calibri"/>
                           <a:sym typeface="Calibri"/>
                         </a:rPr>
-                        <a:t>30,274.1</a:t>
+                        <a:t>30,305.8</a:t>
                       </a:r>
                     </a:p>
                   </a:txBody>
@@ -12844,7 +12844,7 @@
                           <a:ea typeface="Calibri"/>
                           <a:sym typeface="Calibri"/>
                         </a:rPr>
-                        <a:t>245th</a:t>
+                        <a:t>246th</a:t>
                       </a:r>
                     </a:p>
                   </a:txBody>
@@ -13050,7 +13050,7 @@
                           <a:ea typeface="Calibri"/>
                           <a:sym typeface="Calibri"/>
                         </a:rPr>
-                        <a:t>50,143</a:t>
+                        <a:t>50,202</a:t>
                       </a:r>
                     </a:p>
                   </a:txBody>
@@ -13118,7 +13118,7 @@
                           <a:ea typeface="Calibri"/>
                           <a:sym typeface="Calibri"/>
                         </a:rPr>
-                        <a:t>32,958.0</a:t>
+                        <a:t>32,996.8</a:t>
                       </a:r>
                     </a:p>
                   </a:txBody>
@@ -13392,7 +13392,7 @@
                           <a:ea typeface="Calibri"/>
                           <a:sym typeface="Calibri"/>
                         </a:rPr>
-                        <a:t>34,701</a:t>
+                        <a:t>34,736</a:t>
                       </a:r>
                     </a:p>
                   </a:txBody>
@@ -13460,7 +13460,7 @@
                           <a:ea typeface="Calibri"/>
                           <a:sym typeface="Calibri"/>
                         </a:rPr>
-                        <a:t>31,339.2</a:t>
+                        <a:t>31,370.8</a:t>
                       </a:r>
                     </a:p>
                   </a:txBody>
@@ -13734,7 +13734,7 @@
                           <a:ea typeface="Calibri"/>
                           <a:sym typeface="Calibri"/>
                         </a:rPr>
-                        <a:t>271,403</a:t>
+                        <a:t>271,711</a:t>
                       </a:r>
                     </a:p>
                   </a:txBody>
@@ -13802,7 +13802,7 @@
                           <a:ea typeface="Calibri"/>
                           <a:sym typeface="Calibri"/>
                         </a:rPr>
-                        <a:t>31,280.8</a:t>
+                        <a:t>31,316.3</a:t>
                       </a:r>
                     </a:p>
                   </a:txBody>
@@ -14076,7 +14076,7 @@
                           <a:ea typeface="Calibri"/>
                           <a:sym typeface="Calibri"/>
                         </a:rPr>
-                        <a:t>2,968,504</a:t>
+                        <a:t>2,971,931</a:t>
                       </a:r>
                     </a:p>
                   </a:txBody>
@@ -14144,7 +14144,7 @@
                           <a:ea typeface="Calibri"/>
                           <a:sym typeface="Calibri"/>
                         </a:rPr>
-                        <a:t>32,205.9</a:t>
+                        <a:t>32,243.1</a:t>
                       </a:r>
                     </a:p>
                   </a:txBody>
@@ -14418,7 +14418,7 @@
                           <a:ea typeface="Calibri"/>
                           <a:sym typeface="Calibri"/>
                         </a:rPr>
-                        <a:t>18,398,440</a:t>
+                        <a:t>18,419,203</a:t>
                       </a:r>
                     </a:p>
                   </a:txBody>
@@ -14486,7 +14486,7 @@
                           <a:ea typeface="Calibri"/>
                           <a:sym typeface="Calibri"/>
                         </a:rPr>
-                        <a:t>32,534.7</a:t>
+                        <a:t>32,571.5</a:t>
                       </a:r>
                     </a:p>
                   </a:txBody>
@@ -14739,7 +14739,7 @@
           <a:p>
             <a:r>
               <a:rPr/>
-              <a:t>Pack date: 19 April 2022</a:t>
+              <a:t>Pack date: 20 April 2022</a:t>
             </a:r>
           </a:p>
         </p:txBody>
@@ -14820,7 +14820,7 @@
           <a:p>
             <a:r>
               <a:rPr/>
-              <a:t>Lower Tier Local Authority rolling cases as at 19 April</a:t>
+              <a:t>Lower Tier Local Authority rolling cases as at 20 April</a:t>
             </a:r>
           </a:p>
         </p:txBody>
@@ -14901,7 +14901,7 @@
           <a:p>
             <a:r>
               <a:rPr/>
-              <a:t>Note that the very recent days are excluded in the 7-day total as these are thought to be incomplete. As such, this data represents cases in the seven days to 14 April</a:t>
+              <a:t>Note that the very recent days are excluded in the 7-day total as these are thought to be incomplete. As such, this data represents cases in the seven days to 15 April</a:t>
             </a:r>
           </a:p>
         </p:txBody>
@@ -15369,7 +15369,7 @@
                           <a:ea typeface="Calibri"/>
                           <a:sym typeface="Calibri"/>
                         </a:rPr>
-                        <a:t>212</a:t>
+                        <a:t>200</a:t>
                       </a:r>
                     </a:p>
                   </a:txBody>
@@ -15437,7 +15437,7 @@
                           <a:ea typeface="Calibri"/>
                           <a:sym typeface="Calibri"/>
                         </a:rPr>
-                        <a:t>330.3</a:t>
+                        <a:t>311.6</a:t>
                       </a:r>
                     </a:p>
                   </a:txBody>
@@ -15711,7 +15711,7 @@
                           <a:ea typeface="Calibri"/>
                           <a:sym typeface="Calibri"/>
                         </a:rPr>
-                        <a:t>549</a:t>
+                        <a:t>507</a:t>
                       </a:r>
                     </a:p>
                   </a:txBody>
@@ -15779,7 +15779,7 @@
                           <a:ea typeface="Calibri"/>
                           <a:sym typeface="Calibri"/>
                         </a:rPr>
-                        <a:t>340.7</a:t>
+                        <a:t>314.7</a:t>
                       </a:r>
                     </a:p>
                   </a:txBody>
@@ -15847,7 +15847,7 @@
                           <a:ea typeface="Calibri"/>
                           <a:sym typeface="Calibri"/>
                         </a:rPr>
-                        <a:t>153rd</a:t>
+                        <a:t>165th</a:t>
                       </a:r>
                     </a:p>
                   </a:txBody>
@@ -15915,7 +15915,7 @@
                           <a:ea typeface="Calibri"/>
                           <a:sym typeface="Calibri"/>
                         </a:rPr>
-                        <a:t>Decile 5</a:t>
+                        <a:t>Decile 6</a:t>
                       </a:r>
                     </a:p>
                   </a:txBody>
@@ -16053,7 +16053,7 @@
                           <a:ea typeface="Calibri"/>
                           <a:sym typeface="Calibri"/>
                         </a:rPr>
-                        <a:t>421</a:t>
+                        <a:t>412</a:t>
                       </a:r>
                     </a:p>
                   </a:txBody>
@@ -16121,7 +16121,7 @@
                           <a:ea typeface="Calibri"/>
                           <a:sym typeface="Calibri"/>
                         </a:rPr>
-                        <a:t>346.5</a:t>
+                        <a:t>339.1</a:t>
                       </a:r>
                     </a:p>
                   </a:txBody>
@@ -16189,7 +16189,7 @@
                           <a:ea typeface="Calibri"/>
                           <a:sym typeface="Calibri"/>
                         </a:rPr>
-                        <a:t>142nd</a:t>
+                        <a:t>119th</a:t>
                       </a:r>
                     </a:p>
                   </a:txBody>
@@ -16257,7 +16257,7 @@
                           <a:ea typeface="Calibri"/>
                           <a:sym typeface="Calibri"/>
                         </a:rPr>
-                        <a:t>Decile 5</a:t>
+                        <a:t>Decile 4</a:t>
                       </a:r>
                     </a:p>
                   </a:txBody>
@@ -16395,7 +16395,7 @@
                           <a:ea typeface="Calibri"/>
                           <a:sym typeface="Calibri"/>
                         </a:rPr>
-                        <a:t>331</a:t>
+                        <a:t>314</a:t>
                       </a:r>
                     </a:p>
                   </a:txBody>
@@ -16463,7 +16463,7 @@
                           <a:ea typeface="Calibri"/>
                           <a:sym typeface="Calibri"/>
                         </a:rPr>
-                        <a:t>294.3</a:t>
+                        <a:t>279.2</a:t>
                       </a:r>
                     </a:p>
                   </a:txBody>
@@ -16531,7 +16531,7 @@
                           <a:ea typeface="Calibri"/>
                           <a:sym typeface="Calibri"/>
                         </a:rPr>
-                        <a:t>223rd</a:t>
+                        <a:t>222nd</a:t>
                       </a:r>
                     </a:p>
                   </a:txBody>
@@ -16737,7 +16737,7 @@
                           <a:ea typeface="Calibri"/>
                           <a:sym typeface="Calibri"/>
                         </a:rPr>
-                        <a:t>518</a:t>
+                        <a:t>506</a:t>
                       </a:r>
                     </a:p>
                   </a:txBody>
@@ -16805,7 +16805,7 @@
                           <a:ea typeface="Calibri"/>
                           <a:sym typeface="Calibri"/>
                         </a:rPr>
-                        <a:t>356.1</a:t>
+                        <a:t>347.8</a:t>
                       </a:r>
                     </a:p>
                   </a:txBody>
@@ -16873,7 +16873,7 @@
                           <a:ea typeface="Calibri"/>
                           <a:sym typeface="Calibri"/>
                         </a:rPr>
-                        <a:t>124th</a:t>
+                        <a:t>105th</a:t>
                       </a:r>
                     </a:p>
                   </a:txBody>
@@ -17079,7 +17079,7 @@
                           <a:ea typeface="Calibri"/>
                           <a:sym typeface="Calibri"/>
                         </a:rPr>
-                        <a:t>618</a:t>
+                        <a:t>570</a:t>
                       </a:r>
                     </a:p>
                   </a:txBody>
@@ -17147,7 +17147,7 @@
                           <a:ea typeface="Calibri"/>
                           <a:sym typeface="Calibri"/>
                         </a:rPr>
-                        <a:t>406.2</a:t>
+                        <a:t>374.6</a:t>
                       </a:r>
                     </a:p>
                   </a:txBody>
@@ -17215,7 +17215,7 @@
                           <a:ea typeface="Calibri"/>
                           <a:sym typeface="Calibri"/>
                         </a:rPr>
-                        <a:t>46th</a:t>
+                        <a:t>62nd</a:t>
                       </a:r>
                     </a:p>
                   </a:txBody>
@@ -17421,7 +17421,7 @@
                           <a:ea typeface="Calibri"/>
                           <a:sym typeface="Calibri"/>
                         </a:rPr>
-                        <a:t>424</a:t>
+                        <a:t>402</a:t>
                       </a:r>
                     </a:p>
                   </a:txBody>
@@ -17489,7 +17489,7 @@
                           <a:ea typeface="Calibri"/>
                           <a:sym typeface="Calibri"/>
                         </a:rPr>
-                        <a:t>382.9</a:t>
+                        <a:t>363.1</a:t>
                       </a:r>
                     </a:p>
                   </a:txBody>
@@ -17557,7 +17557,7 @@
                           <a:ea typeface="Calibri"/>
                           <a:sym typeface="Calibri"/>
                         </a:rPr>
-                        <a:t>82nd</a:t>
+                        <a:t>80th</a:t>
                       </a:r>
                     </a:p>
                   </a:txBody>
@@ -17763,7 +17763,7 @@
                           <a:ea typeface="Calibri"/>
                           <a:sym typeface="Calibri"/>
                         </a:rPr>
-                        <a:t>3,073</a:t>
+                        <a:t>2,911</a:t>
                       </a:r>
                     </a:p>
                   </a:txBody>
@@ -17831,7 +17831,7 @@
                           <a:ea typeface="Calibri"/>
                           <a:sym typeface="Calibri"/>
                         </a:rPr>
-                        <a:t>354.2</a:t>
+                        <a:t>335.5</a:t>
                       </a:r>
                     </a:p>
                   </a:txBody>
@@ -18105,7 +18105,7 @@
                           <a:ea typeface="Calibri"/>
                           <a:sym typeface="Calibri"/>
                         </a:rPr>
-                        <a:t>179,225</a:t>
+                        <a:t>169,666</a:t>
                       </a:r>
                     </a:p>
                   </a:txBody>
@@ -18173,7 +18173,7 @@
                           <a:ea typeface="Calibri"/>
                           <a:sym typeface="Calibri"/>
                         </a:rPr>
-                        <a:t>316.9</a:t>
+                        <a:t>300.0</a:t>
                       </a:r>
                     </a:p>
                   </a:txBody>
@@ -18447,7 +18447,7 @@
                           <a:ea typeface="Calibri"/>
                           <a:sym typeface="Calibri"/>
                         </a:rPr>
-                        <a:t>32,696</a:t>
+                        <a:t>30,487</a:t>
                       </a:r>
                     </a:p>
                   </a:txBody>
@@ -18515,7 +18515,7 @@
                           <a:ea typeface="Calibri"/>
                           <a:sym typeface="Calibri"/>
                         </a:rPr>
-                        <a:t>354.7</a:t>
+                        <a:t>330.8</a:t>
                       </a:r>
                     </a:p>
                   </a:txBody>
@@ -18742,7 +18742,7 @@
           <a:p>
             <a:r>
               <a:rPr/>
-              <a:t>Pack date: 19 April 2022</a:t>
+              <a:t>Pack date: 20 April 2022</a:t>
             </a:r>
           </a:p>
         </p:txBody>
@@ -18900,7 +18900,7 @@
           <a:p>
             <a:r>
               <a:rPr/>
-              <a:t>Pack date: 19 April 2022</a:t>
+              <a:t>Pack date: 20 April 2022</a:t>
             </a:r>
           </a:p>
         </p:txBody>
@@ -19058,7 +19058,7 @@
           <a:p>
             <a:r>
               <a:rPr/>
-              <a:t>Pack date: 19 April 2022</a:t>
+              <a:t>Pack date: 20 April 2022</a:t>
             </a:r>
           </a:p>
         </p:txBody>
@@ -19216,7 +19216,7 @@
           <a:p>
             <a:r>
               <a:rPr/>
-              <a:t>Pack date: 19 April 2022</a:t>
+              <a:t>Pack date: 20 April 2022</a:t>
             </a:r>
           </a:p>
         </p:txBody>
@@ -19374,7 +19374,7 @@
           <a:p>
             <a:r>
               <a:rPr/>
-              <a:t>Pack date: 19 April 2022</a:t>
+              <a:t>Pack date: 20 April 2022</a:t>
             </a:r>
           </a:p>
         </p:txBody>
@@ -19563,7 +19563,7 @@
           <a:p>
             <a:r>
               <a:rPr/>
-              <a:t>Pack date: 19 April 2022</a:t>
+              <a:t>Pack date: 20 April 2022</a:t>
             </a:r>
           </a:p>
         </p:txBody>
@@ -19721,7 +19721,7 @@
           <a:p>
             <a:r>
               <a:rPr/>
-              <a:t>Pack date: 19 April 2022</a:t>
+              <a:t>Pack date: 20 April 2022</a:t>
             </a:r>
           </a:p>
         </p:txBody>
@@ -19879,7 +19879,7 @@
           <a:p>
             <a:r>
               <a:rPr/>
-              <a:t>Pack date: 19 April 2022</a:t>
+              <a:t>Pack date: 20 April 2022</a:t>
             </a:r>
           </a:p>
         </p:txBody>
@@ -20037,7 +20037,7 @@
           <a:p>
             <a:r>
               <a:rPr/>
-              <a:t>Pack date: 19 April 2022</a:t>
+              <a:t>Pack date: 20 April 2022</a:t>
             </a:r>
           </a:p>
         </p:txBody>
@@ -20195,7 +20195,7 @@
           <a:p>
             <a:r>
               <a:rPr/>
-              <a:t>Pack date: 19 April 2022</a:t>
+              <a:t>Pack date: 20 April 2022</a:t>
             </a:r>
           </a:p>
         </p:txBody>
@@ -20327,7 +20327,7 @@
           <a:p>
             <a:r>
               <a:rPr/>
-              <a:t>Pack date: 19 April 2022</a:t>
+              <a:t>Pack date: 20 April 2022</a:t>
             </a:r>
           </a:p>
         </p:txBody>
@@ -20459,7 +20459,7 @@
           <a:p>
             <a:r>
               <a:rPr/>
-              <a:t>Pack date: 19 April 2022</a:t>
+              <a:t>Pack date: 20 April 2022</a:t>
             </a:r>
           </a:p>
         </p:txBody>
@@ -20591,7 +20591,7 @@
           <a:p>
             <a:r>
               <a:rPr/>
-              <a:t>Pack date: 19 April 2022</a:t>
+              <a:t>Pack date: 20 April 2022</a:t>
             </a:r>
           </a:p>
         </p:txBody>
@@ -20723,7 +20723,7 @@
           <a:p>
             <a:r>
               <a:rPr/>
-              <a:t>Pack date: 19 April 2022</a:t>
+              <a:t>Pack date: 20 April 2022</a:t>
             </a:r>
           </a:p>
         </p:txBody>
@@ -20855,7 +20855,7 @@
           <a:p>
             <a:r>
               <a:rPr/>
-              <a:t>Pack date: 19 April 2022</a:t>
+              <a:t>Pack date: 20 April 2022</a:t>
             </a:r>
           </a:p>
         </p:txBody>
@@ -20987,7 +20987,7 @@
           <a:p>
             <a:r>
               <a:rPr/>
-              <a:t>Pack date: 19 April 2022</a:t>
+              <a:t>Pack date: 20 April 2022</a:t>
             </a:r>
           </a:p>
         </p:txBody>

</xml_diff>

<commit_message>
Update - without vaccine local data
</commit_message>
<xml_diff>
--- a/Latest_West_Sussex_C19_slide_deck.pptx
+++ b/Latest_West_Sussex_C19_slide_deck.pptx
@@ -7176,7 +7176,7 @@
           <a:p>
             <a:r>
               <a:rPr/>
-              <a:t>Pack date: 24 May 2022</a:t>
+              <a:t>Pack date: 06 June 2022</a:t>
             </a:r>
           </a:p>
         </p:txBody>
@@ -7308,7 +7308,7 @@
           <a:p>
             <a:r>
               <a:rPr/>
-              <a:t>Pack date: 24 May 2022</a:t>
+              <a:t>Pack date: 06 June 2022</a:t>
             </a:r>
           </a:p>
         </p:txBody>
@@ -7466,7 +7466,7 @@
           <a:p>
             <a:r>
               <a:rPr/>
-              <a:t>Pack date: 24 May 2022</a:t>
+              <a:t>Pack date: 06 June 2022</a:t>
             </a:r>
           </a:p>
         </p:txBody>
@@ -7547,7 +7547,7 @@
           <a:p>
             <a:r>
               <a:rPr/>
-              <a:t>Upper Tier Local Authority cumulative cases as at 23 May</a:t>
+              <a:t>Upper Tier Local Authority cumulative cases as at 06 June</a:t>
             </a:r>
           </a:p>
         </p:txBody>
@@ -8096,7 +8096,7 @@
                           <a:ea typeface="Calibri"/>
                           <a:sym typeface="Calibri"/>
                         </a:rPr>
-                        <a:t>276,660</a:t>
+                        <a:t>278,081</a:t>
                       </a:r>
                     </a:p>
                   </a:txBody>
@@ -8164,7 +8164,7 @@
                           <a:ea typeface="Calibri"/>
                           <a:sym typeface="Calibri"/>
                         </a:rPr>
-                        <a:t>31,886.7</a:t>
+                        <a:t>32,050.5</a:t>
                       </a:r>
                     </a:p>
                   </a:txBody>
@@ -8232,7 +8232,7 @@
                           <a:ea typeface="Calibri"/>
                           <a:sym typeface="Calibri"/>
                         </a:rPr>
-                        <a:t>112th</a:t>
+                        <a:t>111th</a:t>
                       </a:r>
                     </a:p>
                   </a:txBody>
@@ -8438,7 +8438,7 @@
                           <a:ea typeface="Calibri"/>
                           <a:sym typeface="Calibri"/>
                         </a:rPr>
-                        <a:t>18,716,214</a:t>
+                        <a:t>18,792,128</a:t>
                       </a:r>
                     </a:p>
                   </a:txBody>
@@ -8506,7 +8506,7 @@
                           <a:ea typeface="Calibri"/>
                           <a:sym typeface="Calibri"/>
                         </a:rPr>
-                        <a:t>33,096.7</a:t>
+                        <a:t>33,230.9</a:t>
                       </a:r>
                     </a:p>
                   </a:txBody>
@@ -8780,7 +8780,7 @@
                           <a:ea typeface="Calibri"/>
                           <a:sym typeface="Calibri"/>
                         </a:rPr>
-                        <a:t>3,020,742</a:t>
+                        <a:t>3,034,883</a:t>
                       </a:r>
                     </a:p>
                   </a:txBody>
@@ -8848,7 +8848,7 @@
                           <a:ea typeface="Calibri"/>
                           <a:sym typeface="Calibri"/>
                         </a:rPr>
-                        <a:t>32,772.7</a:t>
+                        <a:t>32,926.1</a:t>
                       </a:r>
                     </a:p>
                   </a:txBody>
@@ -9101,7 +9101,7 @@
           <a:p>
             <a:r>
               <a:rPr/>
-              <a:t>Pack date: 24 May 2022</a:t>
+              <a:t>Pack date: 06 June 2022</a:t>
             </a:r>
           </a:p>
         </p:txBody>
@@ -9182,7 +9182,7 @@
           <a:p>
             <a:r>
               <a:rPr/>
-              <a:t>Upper Tier Local Authority rolling 7 day cases as at 23 May</a:t>
+              <a:t>Upper Tier Local Authority rolling 7 day cases as at 06 June</a:t>
             </a:r>
           </a:p>
         </p:txBody>
@@ -9263,7 +9263,7 @@
           <a:p>
             <a:r>
               <a:rPr/>
-              <a:t>Note that the very recent days are excluded in the 7-day total as these are thought to be incomplete. As such, this data represents cases in the seven days to 18 May</a:t>
+              <a:t>Note that the very recent days are excluded in the 7-day total as these are thought to be incomplete. As such, this data represents cases in the seven days to 01 June</a:t>
             </a:r>
           </a:p>
         </p:txBody>
@@ -9731,7 +9731,7 @@
                           <a:ea typeface="Calibri"/>
                           <a:sym typeface="Calibri"/>
                         </a:rPr>
-                        <a:t>814</a:t>
+                        <a:t>698</a:t>
                       </a:r>
                     </a:p>
                   </a:txBody>
@@ -9799,7 +9799,7 @@
                           <a:ea typeface="Calibri"/>
                           <a:sym typeface="Calibri"/>
                         </a:rPr>
-                        <a:t>93.8</a:t>
+                        <a:t>80.4</a:t>
                       </a:r>
                     </a:p>
                   </a:txBody>
@@ -9867,7 +9867,7 @@
                           <a:ea typeface="Calibri"/>
                           <a:sym typeface="Calibri"/>
                         </a:rPr>
-                        <a:t>16th</a:t>
+                        <a:t>8th</a:t>
                       </a:r>
                     </a:p>
                   </a:txBody>
@@ -9935,7 +9935,8 @@
                           <a:ea typeface="Calibri"/>
                           <a:sym typeface="Calibri"/>
                         </a:rPr>
-                        <a:t>Decile 2</a:t>
+                        <a:t>10% of authorities
+with highest rate</a:t>
                       </a:r>
                     </a:p>
                   </a:txBody>
@@ -10073,7 +10074,7 @@
                           <a:ea typeface="Calibri"/>
                           <a:sym typeface="Calibri"/>
                         </a:rPr>
-                        <a:t>44,680</a:t>
+                        <a:t>34,970</a:t>
                       </a:r>
                     </a:p>
                   </a:txBody>
@@ -10141,7 +10142,7 @@
                           <a:ea typeface="Calibri"/>
                           <a:sym typeface="Calibri"/>
                         </a:rPr>
-                        <a:t>79.0</a:t>
+                        <a:t>61.8</a:t>
                       </a:r>
                     </a:p>
                   </a:txBody>
@@ -10415,7 +10416,7 @@
                           <a:ea typeface="Calibri"/>
                           <a:sym typeface="Calibri"/>
                         </a:rPr>
-                        <a:t>7,639</a:t>
+                        <a:t>6,566</a:t>
                       </a:r>
                     </a:p>
                   </a:txBody>
@@ -10483,7 +10484,7 @@
                           <a:ea typeface="Calibri"/>
                           <a:sym typeface="Calibri"/>
                         </a:rPr>
-                        <a:t>82.9</a:t>
+                        <a:t>71.2</a:t>
                       </a:r>
                     </a:p>
                   </a:txBody>
@@ -10736,7 +10737,7 @@
           <a:p>
             <a:r>
               <a:rPr/>
-              <a:t>Pack date: 24 May 2022</a:t>
+              <a:t>Pack date: 06 June 2022</a:t>
             </a:r>
           </a:p>
         </p:txBody>
@@ -10817,7 +10818,7 @@
           <a:p>
             <a:r>
               <a:rPr/>
-              <a:t>Lower Tier Local Authority cumulative cases as at 23 May</a:t>
+              <a:t>Lower Tier Local Authority cumulative cases as at 06 June</a:t>
             </a:r>
           </a:p>
         </p:txBody>
@@ -11339,7 +11340,7 @@
                           <a:ea typeface="Calibri"/>
                           <a:sym typeface="Calibri"/>
                         </a:rPr>
-                        <a:t>19,627</a:t>
+                        <a:t>19,713</a:t>
                       </a:r>
                     </a:p>
                   </a:txBody>
@@ -11407,7 +11408,7 @@
                           <a:ea typeface="Calibri"/>
                           <a:sym typeface="Calibri"/>
                         </a:rPr>
-                        <a:t>30,577.8</a:t>
+                        <a:t>30,711.8</a:t>
                       </a:r>
                     </a:p>
                   </a:txBody>
@@ -11475,7 +11476,349 @@
                           <a:ea typeface="Calibri"/>
                           <a:sym typeface="Calibri"/>
                         </a:rPr>
-                        <a:t>252nd</a:t>
+                        <a:t>251st</a:t>
+                      </a:r>
+                    </a:p>
+                  </a:txBody>
+                  <a:tcPr anchor="t" marB="0" marT="0" marR="0" marL="0">
+                    <a:lnL w="0" cmpd="sng" algn="ctr" cap="flat">
+                      <a:solidFill>
+                        <a:srgbClr val="FFFFFF">
+                          <a:alpha val="0"/>
+                        </a:srgbClr>
+                      </a:solidFill>
+                      <a:prstDash val="solid"/>
+                    </a:lnL>
+                    <a:lnR w="0" cmpd="sng" algn="ctr" cap="flat">
+                      <a:solidFill>
+                        <a:srgbClr val="FFFFFF">
+                          <a:alpha val="0"/>
+                        </a:srgbClr>
+                      </a:solidFill>
+                      <a:prstDash val="solid"/>
+                    </a:lnR>
+                    <a:lnT w="0" cmpd="sng" algn="ctr" cap="flat">
+                      <a:solidFill>
+                        <a:srgbClr val="FFFFFF">
+                          <a:alpha val="0"/>
+                        </a:srgbClr>
+                      </a:solidFill>
+                      <a:prstDash val="solid"/>
+                    </a:lnT>
+                    <a:lnB w="0" cmpd="sng" algn="ctr" cap="flat">
+                      <a:solidFill>
+                        <a:srgbClr val="FFFFFF">
+                          <a:alpha val="0"/>
+                        </a:srgbClr>
+                      </a:solidFill>
+                      <a:prstDash val="solid"/>
+                    </a:lnB>
+                  </a:tcPr>
+                </a:tc>
+                <a:tc>
+                  <a:txBody>
+                    <a:bodyPr/>
+                    <a:lstStyle/>
+                    <a:p>
+                      <a:pPr algn="l" marL="63500" marR="63500">
+                        <a:lnSpc>
+                          <a:spcPct val="100000"/>
+                        </a:lnSpc>
+                        <a:spcBef>
+                          <a:spcPts val="500"/>
+                        </a:spcBef>
+                        <a:spcAft>
+                          <a:spcPts val="500"/>
+                        </a:spcAft>
+                        <a:buNone/>
+                      </a:pPr>
+                      <a:r>
+                        <a:rPr sz="1100">
+                          <a:solidFill>
+                            <a:srgbClr val="000000">
+                              <a:alpha val="100000"/>
+                            </a:srgbClr>
+                          </a:solidFill>
+                          <a:latin typeface="Calibri"/>
+                          <a:cs typeface="Calibri"/>
+                          <a:ea typeface="Calibri"/>
+                          <a:sym typeface="Calibri"/>
+                        </a:rPr>
+                        <a:t>Decile 8</a:t>
+                      </a:r>
+                    </a:p>
+                  </a:txBody>
+                  <a:tcPr anchor="t" marB="0" marT="0" marR="0" marL="0">
+                    <a:lnL w="0" cmpd="sng" algn="ctr" cap="flat">
+                      <a:solidFill>
+                        <a:srgbClr val="FFFFFF">
+                          <a:alpha val="0"/>
+                        </a:srgbClr>
+                      </a:solidFill>
+                      <a:prstDash val="solid"/>
+                    </a:lnL>
+                    <a:lnR w="0" cmpd="sng" algn="ctr" cap="flat">
+                      <a:solidFill>
+                        <a:srgbClr val="FFFFFF">
+                          <a:alpha val="0"/>
+                        </a:srgbClr>
+                      </a:solidFill>
+                      <a:prstDash val="solid"/>
+                    </a:lnR>
+                    <a:lnT w="0" cmpd="sng" algn="ctr" cap="flat">
+                      <a:solidFill>
+                        <a:srgbClr val="FFFFFF">
+                          <a:alpha val="0"/>
+                        </a:srgbClr>
+                      </a:solidFill>
+                      <a:prstDash val="solid"/>
+                    </a:lnT>
+                    <a:lnB w="0" cmpd="sng" algn="ctr" cap="flat">
+                      <a:solidFill>
+                        <a:srgbClr val="FFFFFF">
+                          <a:alpha val="0"/>
+                        </a:srgbClr>
+                      </a:solidFill>
+                      <a:prstDash val="solid"/>
+                    </a:lnB>
+                  </a:tcPr>
+                </a:tc>
+              </a:tr>
+              <a:tr h="182880">
+                <a:tc>
+                  <a:txBody>
+                    <a:bodyPr/>
+                    <a:lstStyle/>
+                    <a:p>
+                      <a:pPr algn="l" marL="63500" marR="63500">
+                        <a:lnSpc>
+                          <a:spcPct val="100000"/>
+                        </a:lnSpc>
+                        <a:spcBef>
+                          <a:spcPts val="500"/>
+                        </a:spcBef>
+                        <a:spcAft>
+                          <a:spcPts val="500"/>
+                        </a:spcAft>
+                        <a:buNone/>
+                      </a:pPr>
+                      <a:r>
+                        <a:rPr sz="1100">
+                          <a:solidFill>
+                            <a:srgbClr val="000000">
+                              <a:alpha val="100000"/>
+                            </a:srgbClr>
+                          </a:solidFill>
+                          <a:latin typeface="Calibri"/>
+                          <a:cs typeface="Calibri"/>
+                          <a:ea typeface="Calibri"/>
+                          <a:sym typeface="Calibri"/>
+                        </a:rPr>
+                        <a:t>Arun</a:t>
+                      </a:r>
+                    </a:p>
+                  </a:txBody>
+                  <a:tcPr anchor="t" marB="0" marT="0" marR="0" marL="0">
+                    <a:lnL w="0" cmpd="sng" algn="ctr" cap="flat">
+                      <a:solidFill>
+                        <a:srgbClr val="FFFFFF">
+                          <a:alpha val="0"/>
+                        </a:srgbClr>
+                      </a:solidFill>
+                      <a:prstDash val="solid"/>
+                    </a:lnL>
+                    <a:lnR w="0" cmpd="sng" algn="ctr" cap="flat">
+                      <a:solidFill>
+                        <a:srgbClr val="FFFFFF">
+                          <a:alpha val="0"/>
+                        </a:srgbClr>
+                      </a:solidFill>
+                      <a:prstDash val="solid"/>
+                    </a:lnR>
+                    <a:lnT w="0" cmpd="sng" algn="ctr" cap="flat">
+                      <a:solidFill>
+                        <a:srgbClr val="FFFFFF">
+                          <a:alpha val="0"/>
+                        </a:srgbClr>
+                      </a:solidFill>
+                      <a:prstDash val="solid"/>
+                    </a:lnT>
+                    <a:lnB w="0" cmpd="sng" algn="ctr" cap="flat">
+                      <a:solidFill>
+                        <a:srgbClr val="FFFFFF">
+                          <a:alpha val="0"/>
+                        </a:srgbClr>
+                      </a:solidFill>
+                      <a:prstDash val="solid"/>
+                    </a:lnB>
+                  </a:tcPr>
+                </a:tc>
+                <a:tc>
+                  <a:txBody>
+                    <a:bodyPr/>
+                    <a:lstStyle/>
+                    <a:p>
+                      <a:pPr algn="l" marL="63500" marR="63500">
+                        <a:lnSpc>
+                          <a:spcPct val="100000"/>
+                        </a:lnSpc>
+                        <a:spcBef>
+                          <a:spcPts val="500"/>
+                        </a:spcBef>
+                        <a:spcAft>
+                          <a:spcPts val="500"/>
+                        </a:spcAft>
+                        <a:buNone/>
+                      </a:pPr>
+                      <a:r>
+                        <a:rPr sz="1100">
+                          <a:solidFill>
+                            <a:srgbClr val="000000">
+                              <a:alpha val="100000"/>
+                            </a:srgbClr>
+                          </a:solidFill>
+                          <a:latin typeface="Calibri"/>
+                          <a:cs typeface="Calibri"/>
+                          <a:ea typeface="Calibri"/>
+                          <a:sym typeface="Calibri"/>
+                        </a:rPr>
+                        <a:t>49,421</a:t>
+                      </a:r>
+                    </a:p>
+                  </a:txBody>
+                  <a:tcPr anchor="t" marB="0" marT="0" marR="0" marL="0">
+                    <a:lnL w="0" cmpd="sng" algn="ctr" cap="flat">
+                      <a:solidFill>
+                        <a:srgbClr val="FFFFFF">
+                          <a:alpha val="0"/>
+                        </a:srgbClr>
+                      </a:solidFill>
+                      <a:prstDash val="solid"/>
+                    </a:lnL>
+                    <a:lnR w="0" cmpd="sng" algn="ctr" cap="flat">
+                      <a:solidFill>
+                        <a:srgbClr val="FFFFFF">
+                          <a:alpha val="0"/>
+                        </a:srgbClr>
+                      </a:solidFill>
+                      <a:prstDash val="solid"/>
+                    </a:lnR>
+                    <a:lnT w="0" cmpd="sng" algn="ctr" cap="flat">
+                      <a:solidFill>
+                        <a:srgbClr val="FFFFFF">
+                          <a:alpha val="0"/>
+                        </a:srgbClr>
+                      </a:solidFill>
+                      <a:prstDash val="solid"/>
+                    </a:lnT>
+                    <a:lnB w="0" cmpd="sng" algn="ctr" cap="flat">
+                      <a:solidFill>
+                        <a:srgbClr val="FFFFFF">
+                          <a:alpha val="0"/>
+                        </a:srgbClr>
+                      </a:solidFill>
+                      <a:prstDash val="solid"/>
+                    </a:lnB>
+                  </a:tcPr>
+                </a:tc>
+                <a:tc>
+                  <a:txBody>
+                    <a:bodyPr/>
+                    <a:lstStyle/>
+                    <a:p>
+                      <a:pPr algn="l" marL="63500" marR="63500">
+                        <a:lnSpc>
+                          <a:spcPct val="100000"/>
+                        </a:lnSpc>
+                        <a:spcBef>
+                          <a:spcPts val="500"/>
+                        </a:spcBef>
+                        <a:spcAft>
+                          <a:spcPts val="500"/>
+                        </a:spcAft>
+                        <a:buNone/>
+                      </a:pPr>
+                      <a:r>
+                        <a:rPr sz="1100">
+                          <a:solidFill>
+                            <a:srgbClr val="000000">
+                              <a:alpha val="100000"/>
+                            </a:srgbClr>
+                          </a:solidFill>
+                          <a:latin typeface="Calibri"/>
+                          <a:cs typeface="Calibri"/>
+                          <a:ea typeface="Calibri"/>
+                          <a:sym typeface="Calibri"/>
+                        </a:rPr>
+                        <a:t>30,672.8</a:t>
+                      </a:r>
+                    </a:p>
+                  </a:txBody>
+                  <a:tcPr anchor="t" marB="0" marT="0" marR="0" marL="0">
+                    <a:lnL w="0" cmpd="sng" algn="ctr" cap="flat">
+                      <a:solidFill>
+                        <a:srgbClr val="FFFFFF">
+                          <a:alpha val="0"/>
+                        </a:srgbClr>
+                      </a:solidFill>
+                      <a:prstDash val="solid"/>
+                    </a:lnL>
+                    <a:lnR w="0" cmpd="sng" algn="ctr" cap="flat">
+                      <a:solidFill>
+                        <a:srgbClr val="FFFFFF">
+                          <a:alpha val="0"/>
+                        </a:srgbClr>
+                      </a:solidFill>
+                      <a:prstDash val="solid"/>
+                    </a:lnR>
+                    <a:lnT w="0" cmpd="sng" algn="ctr" cap="flat">
+                      <a:solidFill>
+                        <a:srgbClr val="FFFFFF">
+                          <a:alpha val="0"/>
+                        </a:srgbClr>
+                      </a:solidFill>
+                      <a:prstDash val="solid"/>
+                    </a:lnT>
+                    <a:lnB w="0" cmpd="sng" algn="ctr" cap="flat">
+                      <a:solidFill>
+                        <a:srgbClr val="FFFFFF">
+                          <a:alpha val="0"/>
+                        </a:srgbClr>
+                      </a:solidFill>
+                      <a:prstDash val="solid"/>
+                    </a:lnB>
+                  </a:tcPr>
+                </a:tc>
+                <a:tc>
+                  <a:txBody>
+                    <a:bodyPr/>
+                    <a:lstStyle/>
+                    <a:p>
+                      <a:pPr algn="l" marL="63500" marR="63500">
+                        <a:lnSpc>
+                          <a:spcPct val="100000"/>
+                        </a:lnSpc>
+                        <a:spcBef>
+                          <a:spcPts val="500"/>
+                        </a:spcBef>
+                        <a:spcAft>
+                          <a:spcPts val="500"/>
+                        </a:spcAft>
+                        <a:buNone/>
+                      </a:pPr>
+                      <a:r>
+                        <a:rPr sz="1100">
+                          <a:solidFill>
+                            <a:srgbClr val="000000">
+                              <a:alpha val="100000"/>
+                            </a:srgbClr>
+                          </a:solidFill>
+                          <a:latin typeface="Calibri"/>
+                          <a:cs typeface="Calibri"/>
+                          <a:ea typeface="Calibri"/>
+                          <a:sym typeface="Calibri"/>
+                        </a:rPr>
+                        <a:t>253rd</a:t>
                       </a:r>
                     </a:p>
                   </a:txBody>
@@ -11613,7 +11956,7 @@
                           <a:ea typeface="Calibri"/>
                           <a:sym typeface="Calibri"/>
                         </a:rPr>
-                        <a:t>Arun</a:t>
+                        <a:t>Chichester</a:t>
                       </a:r>
                     </a:p>
                   </a:txBody>
@@ -11681,7 +12024,7 @@
                           <a:ea typeface="Calibri"/>
                           <a:sym typeface="Calibri"/>
                         </a:rPr>
-                        <a:t>49,162</a:t>
+                        <a:t>35,811</a:t>
                       </a:r>
                     </a:p>
                   </a:txBody>
@@ -11749,7 +12092,7 @@
                           <a:ea typeface="Calibri"/>
                           <a:sym typeface="Calibri"/>
                         </a:rPr>
-                        <a:t>30,512.1</a:t>
+                        <a:t>29,472.1</a:t>
                       </a:r>
                     </a:p>
                   </a:txBody>
@@ -11817,7 +12160,7 @@
                           <a:ea typeface="Calibri"/>
                           <a:sym typeface="Calibri"/>
                         </a:rPr>
-                        <a:t>254th</a:t>
+                        <a:t>273rd</a:t>
                       </a:r>
                     </a:p>
                   </a:txBody>
@@ -11955,7 +12298,7 @@
                           <a:ea typeface="Calibri"/>
                           <a:sym typeface="Calibri"/>
                         </a:rPr>
-                        <a:t>Chichester</a:t>
+                        <a:t>Crawley</a:t>
                       </a:r>
                     </a:p>
                   </a:txBody>
@@ -12023,7 +12366,7 @@
                           <a:ea typeface="Calibri"/>
                           <a:sym typeface="Calibri"/>
                         </a:rPr>
-                        <a:t>35,560</a:t>
+                        <a:t>40,954</a:t>
                       </a:r>
                     </a:p>
                   </a:txBody>
@@ -12091,7 +12434,7 @@
                           <a:ea typeface="Calibri"/>
                           <a:sym typeface="Calibri"/>
                         </a:rPr>
-                        <a:t>29,265.6</a:t>
+                        <a:t>36,412.0</a:t>
                       </a:r>
                     </a:p>
                   </a:txBody>
@@ -12159,349 +12502,7 @@
                           <a:ea typeface="Calibri"/>
                           <a:sym typeface="Calibri"/>
                         </a:rPr>
-                        <a:t>276th</a:t>
-                      </a:r>
-                    </a:p>
-                  </a:txBody>
-                  <a:tcPr anchor="t" marB="0" marT="0" marR="0" marL="0">
-                    <a:lnL w="0" cmpd="sng" algn="ctr" cap="flat">
-                      <a:solidFill>
-                        <a:srgbClr val="FFFFFF">
-                          <a:alpha val="0"/>
-                        </a:srgbClr>
-                      </a:solidFill>
-                      <a:prstDash val="solid"/>
-                    </a:lnL>
-                    <a:lnR w="0" cmpd="sng" algn="ctr" cap="flat">
-                      <a:solidFill>
-                        <a:srgbClr val="FFFFFF">
-                          <a:alpha val="0"/>
-                        </a:srgbClr>
-                      </a:solidFill>
-                      <a:prstDash val="solid"/>
-                    </a:lnR>
-                    <a:lnT w="0" cmpd="sng" algn="ctr" cap="flat">
-                      <a:solidFill>
-                        <a:srgbClr val="FFFFFF">
-                          <a:alpha val="0"/>
-                        </a:srgbClr>
-                      </a:solidFill>
-                      <a:prstDash val="solid"/>
-                    </a:lnT>
-                    <a:lnB w="0" cmpd="sng" algn="ctr" cap="flat">
-                      <a:solidFill>
-                        <a:srgbClr val="FFFFFF">
-                          <a:alpha val="0"/>
-                        </a:srgbClr>
-                      </a:solidFill>
-                      <a:prstDash val="solid"/>
-                    </a:lnB>
-                  </a:tcPr>
-                </a:tc>
-                <a:tc>
-                  <a:txBody>
-                    <a:bodyPr/>
-                    <a:lstStyle/>
-                    <a:p>
-                      <a:pPr algn="l" marL="63500" marR="63500">
-                        <a:lnSpc>
-                          <a:spcPct val="100000"/>
-                        </a:lnSpc>
-                        <a:spcBef>
-                          <a:spcPts val="500"/>
-                        </a:spcBef>
-                        <a:spcAft>
-                          <a:spcPts val="500"/>
-                        </a:spcAft>
-                        <a:buNone/>
-                      </a:pPr>
-                      <a:r>
-                        <a:rPr sz="1100">
-                          <a:solidFill>
-                            <a:srgbClr val="000000">
-                              <a:alpha val="100000"/>
-                            </a:srgbClr>
-                          </a:solidFill>
-                          <a:latin typeface="Calibri"/>
-                          <a:cs typeface="Calibri"/>
-                          <a:ea typeface="Calibri"/>
-                          <a:sym typeface="Calibri"/>
-                        </a:rPr>
-                        <a:t>Decile 9</a:t>
-                      </a:r>
-                    </a:p>
-                  </a:txBody>
-                  <a:tcPr anchor="t" marB="0" marT="0" marR="0" marL="0">
-                    <a:lnL w="0" cmpd="sng" algn="ctr" cap="flat">
-                      <a:solidFill>
-                        <a:srgbClr val="FFFFFF">
-                          <a:alpha val="0"/>
-                        </a:srgbClr>
-                      </a:solidFill>
-                      <a:prstDash val="solid"/>
-                    </a:lnL>
-                    <a:lnR w="0" cmpd="sng" algn="ctr" cap="flat">
-                      <a:solidFill>
-                        <a:srgbClr val="FFFFFF">
-                          <a:alpha val="0"/>
-                        </a:srgbClr>
-                      </a:solidFill>
-                      <a:prstDash val="solid"/>
-                    </a:lnR>
-                    <a:lnT w="0" cmpd="sng" algn="ctr" cap="flat">
-                      <a:solidFill>
-                        <a:srgbClr val="FFFFFF">
-                          <a:alpha val="0"/>
-                        </a:srgbClr>
-                      </a:solidFill>
-                      <a:prstDash val="solid"/>
-                    </a:lnT>
-                    <a:lnB w="0" cmpd="sng" algn="ctr" cap="flat">
-                      <a:solidFill>
-                        <a:srgbClr val="FFFFFF">
-                          <a:alpha val="0"/>
-                        </a:srgbClr>
-                      </a:solidFill>
-                      <a:prstDash val="solid"/>
-                    </a:lnB>
-                  </a:tcPr>
-                </a:tc>
-              </a:tr>
-              <a:tr h="182880">
-                <a:tc>
-                  <a:txBody>
-                    <a:bodyPr/>
-                    <a:lstStyle/>
-                    <a:p>
-                      <a:pPr algn="l" marL="63500" marR="63500">
-                        <a:lnSpc>
-                          <a:spcPct val="100000"/>
-                        </a:lnSpc>
-                        <a:spcBef>
-                          <a:spcPts val="500"/>
-                        </a:spcBef>
-                        <a:spcAft>
-                          <a:spcPts val="500"/>
-                        </a:spcAft>
-                        <a:buNone/>
-                      </a:pPr>
-                      <a:r>
-                        <a:rPr sz="1100">
-                          <a:solidFill>
-                            <a:srgbClr val="000000">
-                              <a:alpha val="100000"/>
-                            </a:srgbClr>
-                          </a:solidFill>
-                          <a:latin typeface="Calibri"/>
-                          <a:cs typeface="Calibri"/>
-                          <a:ea typeface="Calibri"/>
-                          <a:sym typeface="Calibri"/>
-                        </a:rPr>
-                        <a:t>Crawley</a:t>
-                      </a:r>
-                    </a:p>
-                  </a:txBody>
-                  <a:tcPr anchor="t" marB="0" marT="0" marR="0" marL="0">
-                    <a:lnL w="0" cmpd="sng" algn="ctr" cap="flat">
-                      <a:solidFill>
-                        <a:srgbClr val="FFFFFF">
-                          <a:alpha val="0"/>
-                        </a:srgbClr>
-                      </a:solidFill>
-                      <a:prstDash val="solid"/>
-                    </a:lnL>
-                    <a:lnR w="0" cmpd="sng" algn="ctr" cap="flat">
-                      <a:solidFill>
-                        <a:srgbClr val="FFFFFF">
-                          <a:alpha val="0"/>
-                        </a:srgbClr>
-                      </a:solidFill>
-                      <a:prstDash val="solid"/>
-                    </a:lnR>
-                    <a:lnT w="0" cmpd="sng" algn="ctr" cap="flat">
-                      <a:solidFill>
-                        <a:srgbClr val="FFFFFF">
-                          <a:alpha val="0"/>
-                        </a:srgbClr>
-                      </a:solidFill>
-                      <a:prstDash val="solid"/>
-                    </a:lnT>
-                    <a:lnB w="0" cmpd="sng" algn="ctr" cap="flat">
-                      <a:solidFill>
-                        <a:srgbClr val="FFFFFF">
-                          <a:alpha val="0"/>
-                        </a:srgbClr>
-                      </a:solidFill>
-                      <a:prstDash val="solid"/>
-                    </a:lnB>
-                  </a:tcPr>
-                </a:tc>
-                <a:tc>
-                  <a:txBody>
-                    <a:bodyPr/>
-                    <a:lstStyle/>
-                    <a:p>
-                      <a:pPr algn="l" marL="63500" marR="63500">
-                        <a:lnSpc>
-                          <a:spcPct val="100000"/>
-                        </a:lnSpc>
-                        <a:spcBef>
-                          <a:spcPts val="500"/>
-                        </a:spcBef>
-                        <a:spcAft>
-                          <a:spcPts val="500"/>
-                        </a:spcAft>
-                        <a:buNone/>
-                      </a:pPr>
-                      <a:r>
-                        <a:rPr sz="1100">
-                          <a:solidFill>
-                            <a:srgbClr val="000000">
-                              <a:alpha val="100000"/>
-                            </a:srgbClr>
-                          </a:solidFill>
-                          <a:latin typeface="Calibri"/>
-                          <a:cs typeface="Calibri"/>
-                          <a:ea typeface="Calibri"/>
-                          <a:sym typeface="Calibri"/>
-                        </a:rPr>
-                        <a:t>40,805</a:t>
-                      </a:r>
-                    </a:p>
-                  </a:txBody>
-                  <a:tcPr anchor="t" marB="0" marT="0" marR="0" marL="0">
-                    <a:lnL w="0" cmpd="sng" algn="ctr" cap="flat">
-                      <a:solidFill>
-                        <a:srgbClr val="FFFFFF">
-                          <a:alpha val="0"/>
-                        </a:srgbClr>
-                      </a:solidFill>
-                      <a:prstDash val="solid"/>
-                    </a:lnL>
-                    <a:lnR w="0" cmpd="sng" algn="ctr" cap="flat">
-                      <a:solidFill>
-                        <a:srgbClr val="FFFFFF">
-                          <a:alpha val="0"/>
-                        </a:srgbClr>
-                      </a:solidFill>
-                      <a:prstDash val="solid"/>
-                    </a:lnR>
-                    <a:lnT w="0" cmpd="sng" algn="ctr" cap="flat">
-                      <a:solidFill>
-                        <a:srgbClr val="FFFFFF">
-                          <a:alpha val="0"/>
-                        </a:srgbClr>
-                      </a:solidFill>
-                      <a:prstDash val="solid"/>
-                    </a:lnT>
-                    <a:lnB w="0" cmpd="sng" algn="ctr" cap="flat">
-                      <a:solidFill>
-                        <a:srgbClr val="FFFFFF">
-                          <a:alpha val="0"/>
-                        </a:srgbClr>
-                      </a:solidFill>
-                      <a:prstDash val="solid"/>
-                    </a:lnB>
-                  </a:tcPr>
-                </a:tc>
-                <a:tc>
-                  <a:txBody>
-                    <a:bodyPr/>
-                    <a:lstStyle/>
-                    <a:p>
-                      <a:pPr algn="l" marL="63500" marR="63500">
-                        <a:lnSpc>
-                          <a:spcPct val="100000"/>
-                        </a:lnSpc>
-                        <a:spcBef>
-                          <a:spcPts val="500"/>
-                        </a:spcBef>
-                        <a:spcAft>
-                          <a:spcPts val="500"/>
-                        </a:spcAft>
-                        <a:buNone/>
-                      </a:pPr>
-                      <a:r>
-                        <a:rPr sz="1100">
-                          <a:solidFill>
-                            <a:srgbClr val="000000">
-                              <a:alpha val="100000"/>
-                            </a:srgbClr>
-                          </a:solidFill>
-                          <a:latin typeface="Calibri"/>
-                          <a:cs typeface="Calibri"/>
-                          <a:ea typeface="Calibri"/>
-                          <a:sym typeface="Calibri"/>
-                        </a:rPr>
-                        <a:t>36,279.5</a:t>
-                      </a:r>
-                    </a:p>
-                  </a:txBody>
-                  <a:tcPr anchor="t" marB="0" marT="0" marR="0" marL="0">
-                    <a:lnL w="0" cmpd="sng" algn="ctr" cap="flat">
-                      <a:solidFill>
-                        <a:srgbClr val="FFFFFF">
-                          <a:alpha val="0"/>
-                        </a:srgbClr>
-                      </a:solidFill>
-                      <a:prstDash val="solid"/>
-                    </a:lnL>
-                    <a:lnR w="0" cmpd="sng" algn="ctr" cap="flat">
-                      <a:solidFill>
-                        <a:srgbClr val="FFFFFF">
-                          <a:alpha val="0"/>
-                        </a:srgbClr>
-                      </a:solidFill>
-                      <a:prstDash val="solid"/>
-                    </a:lnR>
-                    <a:lnT w="0" cmpd="sng" algn="ctr" cap="flat">
-                      <a:solidFill>
-                        <a:srgbClr val="FFFFFF">
-                          <a:alpha val="0"/>
-                        </a:srgbClr>
-                      </a:solidFill>
-                      <a:prstDash val="solid"/>
-                    </a:lnT>
-                    <a:lnB w="0" cmpd="sng" algn="ctr" cap="flat">
-                      <a:solidFill>
-                        <a:srgbClr val="FFFFFF">
-                          <a:alpha val="0"/>
-                        </a:srgbClr>
-                      </a:solidFill>
-                      <a:prstDash val="solid"/>
-                    </a:lnB>
-                  </a:tcPr>
-                </a:tc>
-                <a:tc>
-                  <a:txBody>
-                    <a:bodyPr/>
-                    <a:lstStyle/>
-                    <a:p>
-                      <a:pPr algn="l" marL="63500" marR="63500">
-                        <a:lnSpc>
-                          <a:spcPct val="100000"/>
-                        </a:lnSpc>
-                        <a:spcBef>
-                          <a:spcPts val="500"/>
-                        </a:spcBef>
-                        <a:spcAft>
-                          <a:spcPts val="500"/>
-                        </a:spcAft>
-                        <a:buNone/>
-                      </a:pPr>
-                      <a:r>
-                        <a:rPr sz="1100">
-                          <a:solidFill>
-                            <a:srgbClr val="000000">
-                              <a:alpha val="100000"/>
-                            </a:srgbClr>
-                          </a:solidFill>
-                          <a:latin typeface="Calibri"/>
-                          <a:cs typeface="Calibri"/>
-                          <a:ea typeface="Calibri"/>
-                          <a:sym typeface="Calibri"/>
-                        </a:rPr>
-                        <a:t>22nd</a:t>
+                        <a:t>21st</a:t>
                       </a:r>
                     </a:p>
                   </a:txBody>
@@ -12708,7 +12709,7 @@
                           <a:ea typeface="Calibri"/>
                           <a:sym typeface="Calibri"/>
                         </a:rPr>
-                        <a:t>45,091</a:t>
+                        <a:t>45,339</a:t>
                       </a:r>
                     </a:p>
                   </a:txBody>
@@ -12776,7 +12777,7 @@
                           <a:ea typeface="Calibri"/>
                           <a:sym typeface="Calibri"/>
                         </a:rPr>
-                        <a:t>30,995.9</a:t>
+                        <a:t>31,166.4</a:t>
                       </a:r>
                     </a:p>
                   </a:txBody>
@@ -12844,7 +12845,7 @@
                           <a:ea typeface="Calibri"/>
                           <a:sym typeface="Calibri"/>
                         </a:rPr>
-                        <a:t>242nd</a:t>
+                        <a:t>241st</a:t>
                       </a:r>
                     </a:p>
                   </a:txBody>
@@ -13050,7 +13051,7 @@
                           <a:ea typeface="Calibri"/>
                           <a:sym typeface="Calibri"/>
                         </a:rPr>
-                        <a:t>51,072</a:t>
+                        <a:t>51,336</a:t>
                       </a:r>
                     </a:p>
                   </a:txBody>
@@ -13118,7 +13119,7 @@
                           <a:ea typeface="Calibri"/>
                           <a:sym typeface="Calibri"/>
                         </a:rPr>
-                        <a:t>33,568.6</a:t>
+                        <a:t>33,742.2</a:t>
                       </a:r>
                     </a:p>
                   </a:txBody>
@@ -13186,7 +13187,7 @@
                           <a:ea typeface="Calibri"/>
                           <a:sym typeface="Calibri"/>
                         </a:rPr>
-                        <a:t>126th</a:t>
+                        <a:t>124th</a:t>
                       </a:r>
                     </a:p>
                   </a:txBody>
@@ -13254,7 +13255,7 @@
                           <a:ea typeface="Calibri"/>
                           <a:sym typeface="Calibri"/>
                         </a:rPr>
-                        <a:t>Decile 5</a:t>
+                        <a:t>Decile 4</a:t>
                       </a:r>
                     </a:p>
                   </a:txBody>
@@ -13392,7 +13393,7 @@
                           <a:ea typeface="Calibri"/>
                           <a:sym typeface="Calibri"/>
                         </a:rPr>
-                        <a:t>35,343</a:t>
+                        <a:t>35,507</a:t>
                       </a:r>
                     </a:p>
                   </a:txBody>
@@ -13460,7 +13461,7 @@
                           <a:ea typeface="Calibri"/>
                           <a:sym typeface="Calibri"/>
                         </a:rPr>
-                        <a:t>31,919.0</a:t>
+                        <a:t>32,067.2</a:t>
                       </a:r>
                     </a:p>
                   </a:txBody>
@@ -13528,7 +13529,7 @@
                           <a:ea typeface="Calibri"/>
                           <a:sym typeface="Calibri"/>
                         </a:rPr>
-                        <a:t>210th</a:t>
+                        <a:t>209th</a:t>
                       </a:r>
                     </a:p>
                   </a:txBody>
@@ -13734,7 +13735,7 @@
                           <a:ea typeface="Calibri"/>
                           <a:sym typeface="Calibri"/>
                         </a:rPr>
-                        <a:t>276,660</a:t>
+                        <a:t>278,081</a:t>
                       </a:r>
                     </a:p>
                   </a:txBody>
@@ -13802,7 +13803,7 @@
                           <a:ea typeface="Calibri"/>
                           <a:sym typeface="Calibri"/>
                         </a:rPr>
-                        <a:t>31,886.7</a:t>
+                        <a:t>32,050.5</a:t>
                       </a:r>
                     </a:p>
                   </a:txBody>
@@ -14076,7 +14077,7 @@
                           <a:ea typeface="Calibri"/>
                           <a:sym typeface="Calibri"/>
                         </a:rPr>
-                        <a:t>3,020,742</a:t>
+                        <a:t>3,034,883</a:t>
                       </a:r>
                     </a:p>
                   </a:txBody>
@@ -14144,7 +14145,7 @@
                           <a:ea typeface="Calibri"/>
                           <a:sym typeface="Calibri"/>
                         </a:rPr>
-                        <a:t>32,772.7</a:t>
+                        <a:t>32,926.1</a:t>
                       </a:r>
                     </a:p>
                   </a:txBody>
@@ -14418,7 +14419,7 @@
                           <a:ea typeface="Calibri"/>
                           <a:sym typeface="Calibri"/>
                         </a:rPr>
-                        <a:t>18,716,214</a:t>
+                        <a:t>18,792,128</a:t>
                       </a:r>
                     </a:p>
                   </a:txBody>
@@ -14486,7 +14487,7 @@
                           <a:ea typeface="Calibri"/>
                           <a:sym typeface="Calibri"/>
                         </a:rPr>
-                        <a:t>33,096.7</a:t>
+                        <a:t>33,230.9</a:t>
                       </a:r>
                     </a:p>
                   </a:txBody>
@@ -14739,7 +14740,7 @@
           <a:p>
             <a:r>
               <a:rPr/>
-              <a:t>Pack date: 24 May 2022</a:t>
+              <a:t>Pack date: 06 June 2022</a:t>
             </a:r>
           </a:p>
         </p:txBody>
@@ -14820,7 +14821,7 @@
           <a:p>
             <a:r>
               <a:rPr/>
-              <a:t>Lower Tier Local Authority rolling cases as at 23 May</a:t>
+              <a:t>Lower Tier Local Authority rolling cases as at 06 June</a:t>
             </a:r>
           </a:p>
         </p:txBody>
@@ -14901,7 +14902,7 @@
           <a:p>
             <a:r>
               <a:rPr/>
-              <a:t>Note that the very recent days are excluded in the 7-day total as these are thought to be incomplete. As such, this data represents cases in the seven days to 18 May</a:t>
+              <a:t>Note that the very recent days are excluded in the 7-day total as these are thought to be incomplete. As such, this data represents cases in the seven days to 01 June</a:t>
             </a:r>
           </a:p>
         </p:txBody>
@@ -15369,7 +15370,7 @@
                           <a:ea typeface="Calibri"/>
                           <a:sym typeface="Calibri"/>
                         </a:rPr>
-                        <a:t>75</a:t>
+                        <a:t>46</a:t>
                       </a:r>
                     </a:p>
                   </a:txBody>
@@ -15437,7 +15438,7 @@
                           <a:ea typeface="Calibri"/>
                           <a:sym typeface="Calibri"/>
                         </a:rPr>
-                        <a:t>116.8</a:t>
+                        <a:t>71.7</a:t>
                       </a:r>
                     </a:p>
                   </a:txBody>
@@ -15505,7 +15506,691 @@
                           <a:ea typeface="Calibri"/>
                           <a:sym typeface="Calibri"/>
                         </a:rPr>
-                        <a:t>4th</a:t>
+                        <a:t>65th</a:t>
+                      </a:r>
+                    </a:p>
+                  </a:txBody>
+                  <a:tcPr anchor="t" marB="0" marT="0" marR="0" marL="0">
+                    <a:lnL w="0" cmpd="sng" algn="ctr" cap="flat">
+                      <a:solidFill>
+                        <a:srgbClr val="FFFFFF">
+                          <a:alpha val="0"/>
+                        </a:srgbClr>
+                      </a:solidFill>
+                      <a:prstDash val="solid"/>
+                    </a:lnL>
+                    <a:lnR w="0" cmpd="sng" algn="ctr" cap="flat">
+                      <a:solidFill>
+                        <a:srgbClr val="FFFFFF">
+                          <a:alpha val="0"/>
+                        </a:srgbClr>
+                      </a:solidFill>
+                      <a:prstDash val="solid"/>
+                    </a:lnR>
+                    <a:lnT w="0" cmpd="sng" algn="ctr" cap="flat">
+                      <a:solidFill>
+                        <a:srgbClr val="FFFFFF">
+                          <a:alpha val="0"/>
+                        </a:srgbClr>
+                      </a:solidFill>
+                      <a:prstDash val="solid"/>
+                    </a:lnT>
+                    <a:lnB w="0" cmpd="sng" algn="ctr" cap="flat">
+                      <a:solidFill>
+                        <a:srgbClr val="FFFFFF">
+                          <a:alpha val="0"/>
+                        </a:srgbClr>
+                      </a:solidFill>
+                      <a:prstDash val="solid"/>
+                    </a:lnB>
+                  </a:tcPr>
+                </a:tc>
+                <a:tc>
+                  <a:txBody>
+                    <a:bodyPr/>
+                    <a:lstStyle/>
+                    <a:p>
+                      <a:pPr algn="l" marL="63500" marR="63500">
+                        <a:lnSpc>
+                          <a:spcPct val="100000"/>
+                        </a:lnSpc>
+                        <a:spcBef>
+                          <a:spcPts val="500"/>
+                        </a:spcBef>
+                        <a:spcAft>
+                          <a:spcPts val="500"/>
+                        </a:spcAft>
+                        <a:buNone/>
+                      </a:pPr>
+                      <a:r>
+                        <a:rPr sz="1100">
+                          <a:solidFill>
+                            <a:srgbClr val="000000">
+                              <a:alpha val="100000"/>
+                            </a:srgbClr>
+                          </a:solidFill>
+                          <a:latin typeface="Calibri"/>
+                          <a:cs typeface="Calibri"/>
+                          <a:ea typeface="Calibri"/>
+                          <a:sym typeface="Calibri"/>
+                        </a:rPr>
+                        <a:t>Decile 3</a:t>
+                      </a:r>
+                    </a:p>
+                  </a:txBody>
+                  <a:tcPr anchor="t" marB="0" marT="0" marR="0" marL="0">
+                    <a:lnL w="0" cmpd="sng" algn="ctr" cap="flat">
+                      <a:solidFill>
+                        <a:srgbClr val="FFFFFF">
+                          <a:alpha val="0"/>
+                        </a:srgbClr>
+                      </a:solidFill>
+                      <a:prstDash val="solid"/>
+                    </a:lnL>
+                    <a:lnR w="0" cmpd="sng" algn="ctr" cap="flat">
+                      <a:solidFill>
+                        <a:srgbClr val="FFFFFF">
+                          <a:alpha val="0"/>
+                        </a:srgbClr>
+                      </a:solidFill>
+                      <a:prstDash val="solid"/>
+                    </a:lnR>
+                    <a:lnT w="0" cmpd="sng" algn="ctr" cap="flat">
+                      <a:solidFill>
+                        <a:srgbClr val="FFFFFF">
+                          <a:alpha val="0"/>
+                        </a:srgbClr>
+                      </a:solidFill>
+                      <a:prstDash val="solid"/>
+                    </a:lnT>
+                    <a:lnB w="0" cmpd="sng" algn="ctr" cap="flat">
+                      <a:solidFill>
+                        <a:srgbClr val="FFFFFF">
+                          <a:alpha val="0"/>
+                        </a:srgbClr>
+                      </a:solidFill>
+                      <a:prstDash val="solid"/>
+                    </a:lnB>
+                  </a:tcPr>
+                </a:tc>
+              </a:tr>
+              <a:tr h="182880">
+                <a:tc>
+                  <a:txBody>
+                    <a:bodyPr/>
+                    <a:lstStyle/>
+                    <a:p>
+                      <a:pPr algn="l" marL="63500" marR="63500">
+                        <a:lnSpc>
+                          <a:spcPct val="100000"/>
+                        </a:lnSpc>
+                        <a:spcBef>
+                          <a:spcPts val="500"/>
+                        </a:spcBef>
+                        <a:spcAft>
+                          <a:spcPts val="500"/>
+                        </a:spcAft>
+                        <a:buNone/>
+                      </a:pPr>
+                      <a:r>
+                        <a:rPr sz="1100">
+                          <a:solidFill>
+                            <a:srgbClr val="000000">
+                              <a:alpha val="100000"/>
+                            </a:srgbClr>
+                          </a:solidFill>
+                          <a:latin typeface="Calibri"/>
+                          <a:cs typeface="Calibri"/>
+                          <a:ea typeface="Calibri"/>
+                          <a:sym typeface="Calibri"/>
+                        </a:rPr>
+                        <a:t>Arun</a:t>
+                      </a:r>
+                    </a:p>
+                  </a:txBody>
+                  <a:tcPr anchor="t" marB="0" marT="0" marR="0" marL="0">
+                    <a:lnL w="0" cmpd="sng" algn="ctr" cap="flat">
+                      <a:solidFill>
+                        <a:srgbClr val="FFFFFF">
+                          <a:alpha val="0"/>
+                        </a:srgbClr>
+                      </a:solidFill>
+                      <a:prstDash val="solid"/>
+                    </a:lnL>
+                    <a:lnR w="0" cmpd="sng" algn="ctr" cap="flat">
+                      <a:solidFill>
+                        <a:srgbClr val="FFFFFF">
+                          <a:alpha val="0"/>
+                        </a:srgbClr>
+                      </a:solidFill>
+                      <a:prstDash val="solid"/>
+                    </a:lnR>
+                    <a:lnT w="0" cmpd="sng" algn="ctr" cap="flat">
+                      <a:solidFill>
+                        <a:srgbClr val="FFFFFF">
+                          <a:alpha val="0"/>
+                        </a:srgbClr>
+                      </a:solidFill>
+                      <a:prstDash val="solid"/>
+                    </a:lnT>
+                    <a:lnB w="0" cmpd="sng" algn="ctr" cap="flat">
+                      <a:solidFill>
+                        <a:srgbClr val="FFFFFF">
+                          <a:alpha val="0"/>
+                        </a:srgbClr>
+                      </a:solidFill>
+                      <a:prstDash val="solid"/>
+                    </a:lnB>
+                  </a:tcPr>
+                </a:tc>
+                <a:tc>
+                  <a:txBody>
+                    <a:bodyPr/>
+                    <a:lstStyle/>
+                    <a:p>
+                      <a:pPr algn="l" marL="63500" marR="63500">
+                        <a:lnSpc>
+                          <a:spcPct val="100000"/>
+                        </a:lnSpc>
+                        <a:spcBef>
+                          <a:spcPts val="500"/>
+                        </a:spcBef>
+                        <a:spcAft>
+                          <a:spcPts val="500"/>
+                        </a:spcAft>
+                        <a:buNone/>
+                      </a:pPr>
+                      <a:r>
+                        <a:rPr sz="1100">
+                          <a:solidFill>
+                            <a:srgbClr val="000000">
+                              <a:alpha val="100000"/>
+                            </a:srgbClr>
+                          </a:solidFill>
+                          <a:latin typeface="Calibri"/>
+                          <a:cs typeface="Calibri"/>
+                          <a:ea typeface="Calibri"/>
+                          <a:sym typeface="Calibri"/>
+                        </a:rPr>
+                        <a:t>127</a:t>
+                      </a:r>
+                    </a:p>
+                  </a:txBody>
+                  <a:tcPr anchor="t" marB="0" marT="0" marR="0" marL="0">
+                    <a:lnL w="0" cmpd="sng" algn="ctr" cap="flat">
+                      <a:solidFill>
+                        <a:srgbClr val="FFFFFF">
+                          <a:alpha val="0"/>
+                        </a:srgbClr>
+                      </a:solidFill>
+                      <a:prstDash val="solid"/>
+                    </a:lnL>
+                    <a:lnR w="0" cmpd="sng" algn="ctr" cap="flat">
+                      <a:solidFill>
+                        <a:srgbClr val="FFFFFF">
+                          <a:alpha val="0"/>
+                        </a:srgbClr>
+                      </a:solidFill>
+                      <a:prstDash val="solid"/>
+                    </a:lnR>
+                    <a:lnT w="0" cmpd="sng" algn="ctr" cap="flat">
+                      <a:solidFill>
+                        <a:srgbClr val="FFFFFF">
+                          <a:alpha val="0"/>
+                        </a:srgbClr>
+                      </a:solidFill>
+                      <a:prstDash val="solid"/>
+                    </a:lnT>
+                    <a:lnB w="0" cmpd="sng" algn="ctr" cap="flat">
+                      <a:solidFill>
+                        <a:srgbClr val="FFFFFF">
+                          <a:alpha val="0"/>
+                        </a:srgbClr>
+                      </a:solidFill>
+                      <a:prstDash val="solid"/>
+                    </a:lnB>
+                  </a:tcPr>
+                </a:tc>
+                <a:tc>
+                  <a:txBody>
+                    <a:bodyPr/>
+                    <a:lstStyle/>
+                    <a:p>
+                      <a:pPr algn="l" marL="63500" marR="63500">
+                        <a:lnSpc>
+                          <a:spcPct val="100000"/>
+                        </a:lnSpc>
+                        <a:spcBef>
+                          <a:spcPts val="500"/>
+                        </a:spcBef>
+                        <a:spcAft>
+                          <a:spcPts val="500"/>
+                        </a:spcAft>
+                        <a:buNone/>
+                      </a:pPr>
+                      <a:r>
+                        <a:rPr sz="1100">
+                          <a:solidFill>
+                            <a:srgbClr val="000000">
+                              <a:alpha val="100000"/>
+                            </a:srgbClr>
+                          </a:solidFill>
+                          <a:latin typeface="Calibri"/>
+                          <a:cs typeface="Calibri"/>
+                          <a:ea typeface="Calibri"/>
+                          <a:sym typeface="Calibri"/>
+                        </a:rPr>
+                        <a:t>78.8</a:t>
+                      </a:r>
+                    </a:p>
+                  </a:txBody>
+                  <a:tcPr anchor="t" marB="0" marT="0" marR="0" marL="0">
+                    <a:lnL w="0" cmpd="sng" algn="ctr" cap="flat">
+                      <a:solidFill>
+                        <a:srgbClr val="FFFFFF">
+                          <a:alpha val="0"/>
+                        </a:srgbClr>
+                      </a:solidFill>
+                      <a:prstDash val="solid"/>
+                    </a:lnL>
+                    <a:lnR w="0" cmpd="sng" algn="ctr" cap="flat">
+                      <a:solidFill>
+                        <a:srgbClr val="FFFFFF">
+                          <a:alpha val="0"/>
+                        </a:srgbClr>
+                      </a:solidFill>
+                      <a:prstDash val="solid"/>
+                    </a:lnR>
+                    <a:lnT w="0" cmpd="sng" algn="ctr" cap="flat">
+                      <a:solidFill>
+                        <a:srgbClr val="FFFFFF">
+                          <a:alpha val="0"/>
+                        </a:srgbClr>
+                      </a:solidFill>
+                      <a:prstDash val="solid"/>
+                    </a:lnT>
+                    <a:lnB w="0" cmpd="sng" algn="ctr" cap="flat">
+                      <a:solidFill>
+                        <a:srgbClr val="FFFFFF">
+                          <a:alpha val="0"/>
+                        </a:srgbClr>
+                      </a:solidFill>
+                      <a:prstDash val="solid"/>
+                    </a:lnB>
+                  </a:tcPr>
+                </a:tc>
+                <a:tc>
+                  <a:txBody>
+                    <a:bodyPr/>
+                    <a:lstStyle/>
+                    <a:p>
+                      <a:pPr algn="l" marL="63500" marR="63500">
+                        <a:lnSpc>
+                          <a:spcPct val="100000"/>
+                        </a:lnSpc>
+                        <a:spcBef>
+                          <a:spcPts val="500"/>
+                        </a:spcBef>
+                        <a:spcAft>
+                          <a:spcPts val="500"/>
+                        </a:spcAft>
+                        <a:buNone/>
+                      </a:pPr>
+                      <a:r>
+                        <a:rPr sz="1100">
+                          <a:solidFill>
+                            <a:srgbClr val="000000">
+                              <a:alpha val="100000"/>
+                            </a:srgbClr>
+                          </a:solidFill>
+                          <a:latin typeface="Calibri"/>
+                          <a:cs typeface="Calibri"/>
+                          <a:ea typeface="Calibri"/>
+                          <a:sym typeface="Calibri"/>
+                        </a:rPr>
+                        <a:t>36th</a:t>
+                      </a:r>
+                    </a:p>
+                  </a:txBody>
+                  <a:tcPr anchor="t" marB="0" marT="0" marR="0" marL="0">
+                    <a:lnL w="0" cmpd="sng" algn="ctr" cap="flat">
+                      <a:solidFill>
+                        <a:srgbClr val="FFFFFF">
+                          <a:alpha val="0"/>
+                        </a:srgbClr>
+                      </a:solidFill>
+                      <a:prstDash val="solid"/>
+                    </a:lnL>
+                    <a:lnR w="0" cmpd="sng" algn="ctr" cap="flat">
+                      <a:solidFill>
+                        <a:srgbClr val="FFFFFF">
+                          <a:alpha val="0"/>
+                        </a:srgbClr>
+                      </a:solidFill>
+                      <a:prstDash val="solid"/>
+                    </a:lnR>
+                    <a:lnT w="0" cmpd="sng" algn="ctr" cap="flat">
+                      <a:solidFill>
+                        <a:srgbClr val="FFFFFF">
+                          <a:alpha val="0"/>
+                        </a:srgbClr>
+                      </a:solidFill>
+                      <a:prstDash val="solid"/>
+                    </a:lnT>
+                    <a:lnB w="0" cmpd="sng" algn="ctr" cap="flat">
+                      <a:solidFill>
+                        <a:srgbClr val="FFFFFF">
+                          <a:alpha val="0"/>
+                        </a:srgbClr>
+                      </a:solidFill>
+                      <a:prstDash val="solid"/>
+                    </a:lnB>
+                  </a:tcPr>
+                </a:tc>
+                <a:tc>
+                  <a:txBody>
+                    <a:bodyPr/>
+                    <a:lstStyle/>
+                    <a:p>
+                      <a:pPr algn="l" marL="63500" marR="63500">
+                        <a:lnSpc>
+                          <a:spcPct val="100000"/>
+                        </a:lnSpc>
+                        <a:spcBef>
+                          <a:spcPts val="500"/>
+                        </a:spcBef>
+                        <a:spcAft>
+                          <a:spcPts val="500"/>
+                        </a:spcAft>
+                        <a:buNone/>
+                      </a:pPr>
+                      <a:r>
+                        <a:rPr sz="1100">
+                          <a:solidFill>
+                            <a:srgbClr val="000000">
+                              <a:alpha val="100000"/>
+                            </a:srgbClr>
+                          </a:solidFill>
+                          <a:latin typeface="Calibri"/>
+                          <a:cs typeface="Calibri"/>
+                          <a:ea typeface="Calibri"/>
+                          <a:sym typeface="Calibri"/>
+                        </a:rPr>
+                        <a:t>Decile 2</a:t>
+                      </a:r>
+                    </a:p>
+                  </a:txBody>
+                  <a:tcPr anchor="t" marB="0" marT="0" marR="0" marL="0">
+                    <a:lnL w="0" cmpd="sng" algn="ctr" cap="flat">
+                      <a:solidFill>
+                        <a:srgbClr val="FFFFFF">
+                          <a:alpha val="0"/>
+                        </a:srgbClr>
+                      </a:solidFill>
+                      <a:prstDash val="solid"/>
+                    </a:lnL>
+                    <a:lnR w="0" cmpd="sng" algn="ctr" cap="flat">
+                      <a:solidFill>
+                        <a:srgbClr val="FFFFFF">
+                          <a:alpha val="0"/>
+                        </a:srgbClr>
+                      </a:solidFill>
+                      <a:prstDash val="solid"/>
+                    </a:lnR>
+                    <a:lnT w="0" cmpd="sng" algn="ctr" cap="flat">
+                      <a:solidFill>
+                        <a:srgbClr val="FFFFFF">
+                          <a:alpha val="0"/>
+                        </a:srgbClr>
+                      </a:solidFill>
+                      <a:prstDash val="solid"/>
+                    </a:lnT>
+                    <a:lnB w="0" cmpd="sng" algn="ctr" cap="flat">
+                      <a:solidFill>
+                        <a:srgbClr val="FFFFFF">
+                          <a:alpha val="0"/>
+                        </a:srgbClr>
+                      </a:solidFill>
+                      <a:prstDash val="solid"/>
+                    </a:lnB>
+                  </a:tcPr>
+                </a:tc>
+              </a:tr>
+              <a:tr h="182880">
+                <a:tc>
+                  <a:txBody>
+                    <a:bodyPr/>
+                    <a:lstStyle/>
+                    <a:p>
+                      <a:pPr algn="l" marL="63500" marR="63500">
+                        <a:lnSpc>
+                          <a:spcPct val="100000"/>
+                        </a:lnSpc>
+                        <a:spcBef>
+                          <a:spcPts val="500"/>
+                        </a:spcBef>
+                        <a:spcAft>
+                          <a:spcPts val="500"/>
+                        </a:spcAft>
+                        <a:buNone/>
+                      </a:pPr>
+                      <a:r>
+                        <a:rPr sz="1100">
+                          <a:solidFill>
+                            <a:srgbClr val="000000">
+                              <a:alpha val="100000"/>
+                            </a:srgbClr>
+                          </a:solidFill>
+                          <a:latin typeface="Calibri"/>
+                          <a:cs typeface="Calibri"/>
+                          <a:ea typeface="Calibri"/>
+                          <a:sym typeface="Calibri"/>
+                        </a:rPr>
+                        <a:t>Chichester</a:t>
+                      </a:r>
+                    </a:p>
+                  </a:txBody>
+                  <a:tcPr anchor="t" marB="0" marT="0" marR="0" marL="0">
+                    <a:lnL w="0" cmpd="sng" algn="ctr" cap="flat">
+                      <a:solidFill>
+                        <a:srgbClr val="FFFFFF">
+                          <a:alpha val="0"/>
+                        </a:srgbClr>
+                      </a:solidFill>
+                      <a:prstDash val="solid"/>
+                    </a:lnL>
+                    <a:lnR w="0" cmpd="sng" algn="ctr" cap="flat">
+                      <a:solidFill>
+                        <a:srgbClr val="FFFFFF">
+                          <a:alpha val="0"/>
+                        </a:srgbClr>
+                      </a:solidFill>
+                      <a:prstDash val="solid"/>
+                    </a:lnR>
+                    <a:lnT w="0" cmpd="sng" algn="ctr" cap="flat">
+                      <a:solidFill>
+                        <a:srgbClr val="FFFFFF">
+                          <a:alpha val="0"/>
+                        </a:srgbClr>
+                      </a:solidFill>
+                      <a:prstDash val="solid"/>
+                    </a:lnT>
+                    <a:lnB w="0" cmpd="sng" algn="ctr" cap="flat">
+                      <a:solidFill>
+                        <a:srgbClr val="FFFFFF">
+                          <a:alpha val="0"/>
+                        </a:srgbClr>
+                      </a:solidFill>
+                      <a:prstDash val="solid"/>
+                    </a:lnB>
+                  </a:tcPr>
+                </a:tc>
+                <a:tc>
+                  <a:txBody>
+                    <a:bodyPr/>
+                    <a:lstStyle/>
+                    <a:p>
+                      <a:pPr algn="l" marL="63500" marR="63500">
+                        <a:lnSpc>
+                          <a:spcPct val="100000"/>
+                        </a:lnSpc>
+                        <a:spcBef>
+                          <a:spcPts val="500"/>
+                        </a:spcBef>
+                        <a:spcAft>
+                          <a:spcPts val="500"/>
+                        </a:spcAft>
+                        <a:buNone/>
+                      </a:pPr>
+                      <a:r>
+                        <a:rPr sz="1100">
+                          <a:solidFill>
+                            <a:srgbClr val="000000">
+                              <a:alpha val="100000"/>
+                            </a:srgbClr>
+                          </a:solidFill>
+                          <a:latin typeface="Calibri"/>
+                          <a:cs typeface="Calibri"/>
+                          <a:ea typeface="Calibri"/>
+                          <a:sym typeface="Calibri"/>
+                        </a:rPr>
+                        <a:t>141</a:t>
+                      </a:r>
+                    </a:p>
+                  </a:txBody>
+                  <a:tcPr anchor="t" marB="0" marT="0" marR="0" marL="0">
+                    <a:lnL w="0" cmpd="sng" algn="ctr" cap="flat">
+                      <a:solidFill>
+                        <a:srgbClr val="FFFFFF">
+                          <a:alpha val="0"/>
+                        </a:srgbClr>
+                      </a:solidFill>
+                      <a:prstDash val="solid"/>
+                    </a:lnL>
+                    <a:lnR w="0" cmpd="sng" algn="ctr" cap="flat">
+                      <a:solidFill>
+                        <a:srgbClr val="FFFFFF">
+                          <a:alpha val="0"/>
+                        </a:srgbClr>
+                      </a:solidFill>
+                      <a:prstDash val="solid"/>
+                    </a:lnR>
+                    <a:lnT w="0" cmpd="sng" algn="ctr" cap="flat">
+                      <a:solidFill>
+                        <a:srgbClr val="FFFFFF">
+                          <a:alpha val="0"/>
+                        </a:srgbClr>
+                      </a:solidFill>
+                      <a:prstDash val="solid"/>
+                    </a:lnT>
+                    <a:lnB w="0" cmpd="sng" algn="ctr" cap="flat">
+                      <a:solidFill>
+                        <a:srgbClr val="FFFFFF">
+                          <a:alpha val="0"/>
+                        </a:srgbClr>
+                      </a:solidFill>
+                      <a:prstDash val="solid"/>
+                    </a:lnB>
+                  </a:tcPr>
+                </a:tc>
+                <a:tc>
+                  <a:txBody>
+                    <a:bodyPr/>
+                    <a:lstStyle/>
+                    <a:p>
+                      <a:pPr algn="l" marL="63500" marR="63500">
+                        <a:lnSpc>
+                          <a:spcPct val="100000"/>
+                        </a:lnSpc>
+                        <a:spcBef>
+                          <a:spcPts val="500"/>
+                        </a:spcBef>
+                        <a:spcAft>
+                          <a:spcPts val="500"/>
+                        </a:spcAft>
+                        <a:buNone/>
+                      </a:pPr>
+                      <a:r>
+                        <a:rPr sz="1100">
+                          <a:solidFill>
+                            <a:srgbClr val="000000">
+                              <a:alpha val="100000"/>
+                            </a:srgbClr>
+                          </a:solidFill>
+                          <a:latin typeface="Calibri"/>
+                          <a:cs typeface="Calibri"/>
+                          <a:ea typeface="Calibri"/>
+                          <a:sym typeface="Calibri"/>
+                        </a:rPr>
+                        <a:t>116.0</a:t>
+                      </a:r>
+                    </a:p>
+                  </a:txBody>
+                  <a:tcPr anchor="t" marB="0" marT="0" marR="0" marL="0">
+                    <a:lnL w="0" cmpd="sng" algn="ctr" cap="flat">
+                      <a:solidFill>
+                        <a:srgbClr val="FFFFFF">
+                          <a:alpha val="0"/>
+                        </a:srgbClr>
+                      </a:solidFill>
+                      <a:prstDash val="solid"/>
+                    </a:lnL>
+                    <a:lnR w="0" cmpd="sng" algn="ctr" cap="flat">
+                      <a:solidFill>
+                        <a:srgbClr val="FFFFFF">
+                          <a:alpha val="0"/>
+                        </a:srgbClr>
+                      </a:solidFill>
+                      <a:prstDash val="solid"/>
+                    </a:lnR>
+                    <a:lnT w="0" cmpd="sng" algn="ctr" cap="flat">
+                      <a:solidFill>
+                        <a:srgbClr val="FFFFFF">
+                          <a:alpha val="0"/>
+                        </a:srgbClr>
+                      </a:solidFill>
+                      <a:prstDash val="solid"/>
+                    </a:lnT>
+                    <a:lnB w="0" cmpd="sng" algn="ctr" cap="flat">
+                      <a:solidFill>
+                        <a:srgbClr val="FFFFFF">
+                          <a:alpha val="0"/>
+                        </a:srgbClr>
+                      </a:solidFill>
+                      <a:prstDash val="solid"/>
+                    </a:lnB>
+                  </a:tcPr>
+                </a:tc>
+                <a:tc>
+                  <a:txBody>
+                    <a:bodyPr/>
+                    <a:lstStyle/>
+                    <a:p>
+                      <a:pPr algn="l" marL="63500" marR="63500">
+                        <a:lnSpc>
+                          <a:spcPct val="100000"/>
+                        </a:lnSpc>
+                        <a:spcBef>
+                          <a:spcPts val="500"/>
+                        </a:spcBef>
+                        <a:spcAft>
+                          <a:spcPts val="500"/>
+                        </a:spcAft>
+                        <a:buNone/>
+                      </a:pPr>
+                      <a:r>
+                        <a:rPr sz="1100">
+                          <a:solidFill>
+                            <a:srgbClr val="000000">
+                              <a:alpha val="100000"/>
+                            </a:srgbClr>
+                          </a:solidFill>
+                          <a:latin typeface="Calibri"/>
+                          <a:cs typeface="Calibri"/>
+                          <a:ea typeface="Calibri"/>
+                          <a:sym typeface="Calibri"/>
+                        </a:rPr>
+                        <a:t>2nd</a:t>
                       </a:r>
                     </a:p>
                   </a:txBody>
@@ -15644,7 +16329,7 @@
                           <a:ea typeface="Calibri"/>
                           <a:sym typeface="Calibri"/>
                         </a:rPr>
-                        <a:t>Arun</a:t>
+                        <a:t>Crawley</a:t>
                       </a:r>
                     </a:p>
                   </a:txBody>
@@ -15712,7 +16397,7 @@
                           <a:ea typeface="Calibri"/>
                           <a:sym typeface="Calibri"/>
                         </a:rPr>
-                        <a:t>154</a:t>
+                        <a:t>69</a:t>
                       </a:r>
                     </a:p>
                   </a:txBody>
@@ -15780,7 +16465,7 @@
                           <a:ea typeface="Calibri"/>
                           <a:sym typeface="Calibri"/>
                         </a:rPr>
-                        <a:t>95.6</a:t>
+                        <a:t>61.3</a:t>
                       </a:r>
                     </a:p>
                   </a:txBody>
@@ -15848,7 +16533,7 @@
                           <a:ea typeface="Calibri"/>
                           <a:sym typeface="Calibri"/>
                         </a:rPr>
-                        <a:t>37th</a:t>
+                        <a:t>129th</a:t>
                       </a:r>
                     </a:p>
                   </a:txBody>
@@ -15916,7 +16601,7 @@
                           <a:ea typeface="Calibri"/>
                           <a:sym typeface="Calibri"/>
                         </a:rPr>
-                        <a:t>Decile 2</a:t>
+                        <a:t>Decile 5</a:t>
                       </a:r>
                     </a:p>
                   </a:txBody>
@@ -15986,7 +16671,7 @@
                           <a:ea typeface="Calibri"/>
                           <a:sym typeface="Calibri"/>
                         </a:rPr>
-                        <a:t>Chichester</a:t>
+                        <a:t>Horsham</a:t>
                       </a:r>
                     </a:p>
                   </a:txBody>
@@ -16122,7 +16807,7 @@
                           <a:ea typeface="Calibri"/>
                           <a:sym typeface="Calibri"/>
                         </a:rPr>
-                        <a:t>83.1</a:t>
+                        <a:t>69.4</a:t>
                       </a:r>
                     </a:p>
                   </a:txBody>
@@ -16190,7 +16875,7 @@
                           <a:ea typeface="Calibri"/>
                           <a:sym typeface="Calibri"/>
                         </a:rPr>
-                        <a:t>107th</a:t>
+                        <a:t>77th</a:t>
                       </a:r>
                     </a:p>
                   </a:txBody>
@@ -16258,7 +16943,7 @@
                           <a:ea typeface="Calibri"/>
                           <a:sym typeface="Calibri"/>
                         </a:rPr>
-                        <a:t>Decile 4</a:t>
+                        <a:t>Decile 3</a:t>
                       </a:r>
                     </a:p>
                   </a:txBody>
@@ -16328,7 +17013,7 @@
                           <a:ea typeface="Calibri"/>
                           <a:sym typeface="Calibri"/>
                         </a:rPr>
-                        <a:t>Crawley</a:t>
+                        <a:t>Mid Sussex</a:t>
                       </a:r>
                     </a:p>
                   </a:txBody>
@@ -16396,7 +17081,7 @@
                           <a:ea typeface="Calibri"/>
                           <a:sym typeface="Calibri"/>
                         </a:rPr>
-                        <a:t>81</a:t>
+                        <a:t>129</a:t>
                       </a:r>
                     </a:p>
                   </a:txBody>
@@ -16464,7 +17149,7 @@
                           <a:ea typeface="Calibri"/>
                           <a:sym typeface="Calibri"/>
                         </a:rPr>
-                        <a:t>72.0</a:t>
+                        <a:t>84.8</a:t>
                       </a:r>
                     </a:p>
                   </a:txBody>
@@ -16532,349 +17217,7 @@
                           <a:ea typeface="Calibri"/>
                           <a:sym typeface="Calibri"/>
                         </a:rPr>
-                        <a:t>198th</a:t>
-                      </a:r>
-                    </a:p>
-                  </a:txBody>
-                  <a:tcPr anchor="t" marB="0" marT="0" marR="0" marL="0">
-                    <a:lnL w="0" cmpd="sng" algn="ctr" cap="flat">
-                      <a:solidFill>
-                        <a:srgbClr val="FFFFFF">
-                          <a:alpha val="0"/>
-                        </a:srgbClr>
-                      </a:solidFill>
-                      <a:prstDash val="solid"/>
-                    </a:lnL>
-                    <a:lnR w="0" cmpd="sng" algn="ctr" cap="flat">
-                      <a:solidFill>
-                        <a:srgbClr val="FFFFFF">
-                          <a:alpha val="0"/>
-                        </a:srgbClr>
-                      </a:solidFill>
-                      <a:prstDash val="solid"/>
-                    </a:lnR>
-                    <a:lnT w="0" cmpd="sng" algn="ctr" cap="flat">
-                      <a:solidFill>
-                        <a:srgbClr val="FFFFFF">
-                          <a:alpha val="0"/>
-                        </a:srgbClr>
-                      </a:solidFill>
-                      <a:prstDash val="solid"/>
-                    </a:lnT>
-                    <a:lnB w="0" cmpd="sng" algn="ctr" cap="flat">
-                      <a:solidFill>
-                        <a:srgbClr val="FFFFFF">
-                          <a:alpha val="0"/>
-                        </a:srgbClr>
-                      </a:solidFill>
-                      <a:prstDash val="solid"/>
-                    </a:lnB>
-                  </a:tcPr>
-                </a:tc>
-                <a:tc>
-                  <a:txBody>
-                    <a:bodyPr/>
-                    <a:lstStyle/>
-                    <a:p>
-                      <a:pPr algn="l" marL="63500" marR="63500">
-                        <a:lnSpc>
-                          <a:spcPct val="100000"/>
-                        </a:lnSpc>
-                        <a:spcBef>
-                          <a:spcPts val="500"/>
-                        </a:spcBef>
-                        <a:spcAft>
-                          <a:spcPts val="500"/>
-                        </a:spcAft>
-                        <a:buNone/>
-                      </a:pPr>
-                      <a:r>
-                        <a:rPr sz="1100">
-                          <a:solidFill>
-                            <a:srgbClr val="000000">
-                              <a:alpha val="100000"/>
-                            </a:srgbClr>
-                          </a:solidFill>
-                          <a:latin typeface="Calibri"/>
-                          <a:cs typeface="Calibri"/>
-                          <a:ea typeface="Calibri"/>
-                          <a:sym typeface="Calibri"/>
-                        </a:rPr>
-                        <a:t>Decile 7</a:t>
-                      </a:r>
-                    </a:p>
-                  </a:txBody>
-                  <a:tcPr anchor="t" marB="0" marT="0" marR="0" marL="0">
-                    <a:lnL w="0" cmpd="sng" algn="ctr" cap="flat">
-                      <a:solidFill>
-                        <a:srgbClr val="FFFFFF">
-                          <a:alpha val="0"/>
-                        </a:srgbClr>
-                      </a:solidFill>
-                      <a:prstDash val="solid"/>
-                    </a:lnL>
-                    <a:lnR w="0" cmpd="sng" algn="ctr" cap="flat">
-                      <a:solidFill>
-                        <a:srgbClr val="FFFFFF">
-                          <a:alpha val="0"/>
-                        </a:srgbClr>
-                      </a:solidFill>
-                      <a:prstDash val="solid"/>
-                    </a:lnR>
-                    <a:lnT w="0" cmpd="sng" algn="ctr" cap="flat">
-                      <a:solidFill>
-                        <a:srgbClr val="FFFFFF">
-                          <a:alpha val="0"/>
-                        </a:srgbClr>
-                      </a:solidFill>
-                      <a:prstDash val="solid"/>
-                    </a:lnT>
-                    <a:lnB w="0" cmpd="sng" algn="ctr" cap="flat">
-                      <a:solidFill>
-                        <a:srgbClr val="FFFFFF">
-                          <a:alpha val="0"/>
-                        </a:srgbClr>
-                      </a:solidFill>
-                      <a:prstDash val="solid"/>
-                    </a:lnB>
-                  </a:tcPr>
-                </a:tc>
-              </a:tr>
-              <a:tr h="182880">
-                <a:tc>
-                  <a:txBody>
-                    <a:bodyPr/>
-                    <a:lstStyle/>
-                    <a:p>
-                      <a:pPr algn="l" marL="63500" marR="63500">
-                        <a:lnSpc>
-                          <a:spcPct val="100000"/>
-                        </a:lnSpc>
-                        <a:spcBef>
-                          <a:spcPts val="500"/>
-                        </a:spcBef>
-                        <a:spcAft>
-                          <a:spcPts val="500"/>
-                        </a:spcAft>
-                        <a:buNone/>
-                      </a:pPr>
-                      <a:r>
-                        <a:rPr sz="1100">
-                          <a:solidFill>
-                            <a:srgbClr val="000000">
-                              <a:alpha val="100000"/>
-                            </a:srgbClr>
-                          </a:solidFill>
-                          <a:latin typeface="Calibri"/>
-                          <a:cs typeface="Calibri"/>
-                          <a:ea typeface="Calibri"/>
-                          <a:sym typeface="Calibri"/>
-                        </a:rPr>
-                        <a:t>Horsham</a:t>
-                      </a:r>
-                    </a:p>
-                  </a:txBody>
-                  <a:tcPr anchor="t" marB="0" marT="0" marR="0" marL="0">
-                    <a:lnL w="0" cmpd="sng" algn="ctr" cap="flat">
-                      <a:solidFill>
-                        <a:srgbClr val="FFFFFF">
-                          <a:alpha val="0"/>
-                        </a:srgbClr>
-                      </a:solidFill>
-                      <a:prstDash val="solid"/>
-                    </a:lnL>
-                    <a:lnR w="0" cmpd="sng" algn="ctr" cap="flat">
-                      <a:solidFill>
-                        <a:srgbClr val="FFFFFF">
-                          <a:alpha val="0"/>
-                        </a:srgbClr>
-                      </a:solidFill>
-                      <a:prstDash val="solid"/>
-                    </a:lnR>
-                    <a:lnT w="0" cmpd="sng" algn="ctr" cap="flat">
-                      <a:solidFill>
-                        <a:srgbClr val="FFFFFF">
-                          <a:alpha val="0"/>
-                        </a:srgbClr>
-                      </a:solidFill>
-                      <a:prstDash val="solid"/>
-                    </a:lnT>
-                    <a:lnB w="0" cmpd="sng" algn="ctr" cap="flat">
-                      <a:solidFill>
-                        <a:srgbClr val="FFFFFF">
-                          <a:alpha val="0"/>
-                        </a:srgbClr>
-                      </a:solidFill>
-                      <a:prstDash val="solid"/>
-                    </a:lnB>
-                  </a:tcPr>
-                </a:tc>
-                <a:tc>
-                  <a:txBody>
-                    <a:bodyPr/>
-                    <a:lstStyle/>
-                    <a:p>
-                      <a:pPr algn="l" marL="63500" marR="63500">
-                        <a:lnSpc>
-                          <a:spcPct val="100000"/>
-                        </a:lnSpc>
-                        <a:spcBef>
-                          <a:spcPts val="500"/>
-                        </a:spcBef>
-                        <a:spcAft>
-                          <a:spcPts val="500"/>
-                        </a:spcAft>
-                        <a:buNone/>
-                      </a:pPr>
-                      <a:r>
-                        <a:rPr sz="1100">
-                          <a:solidFill>
-                            <a:srgbClr val="000000">
-                              <a:alpha val="100000"/>
-                            </a:srgbClr>
-                          </a:solidFill>
-                          <a:latin typeface="Calibri"/>
-                          <a:cs typeface="Calibri"/>
-                          <a:ea typeface="Calibri"/>
-                          <a:sym typeface="Calibri"/>
-                        </a:rPr>
-                        <a:t>173</a:t>
-                      </a:r>
-                    </a:p>
-                  </a:txBody>
-                  <a:tcPr anchor="t" marB="0" marT="0" marR="0" marL="0">
-                    <a:lnL w="0" cmpd="sng" algn="ctr" cap="flat">
-                      <a:solidFill>
-                        <a:srgbClr val="FFFFFF">
-                          <a:alpha val="0"/>
-                        </a:srgbClr>
-                      </a:solidFill>
-                      <a:prstDash val="solid"/>
-                    </a:lnL>
-                    <a:lnR w="0" cmpd="sng" algn="ctr" cap="flat">
-                      <a:solidFill>
-                        <a:srgbClr val="FFFFFF">
-                          <a:alpha val="0"/>
-                        </a:srgbClr>
-                      </a:solidFill>
-                      <a:prstDash val="solid"/>
-                    </a:lnR>
-                    <a:lnT w="0" cmpd="sng" algn="ctr" cap="flat">
-                      <a:solidFill>
-                        <a:srgbClr val="FFFFFF">
-                          <a:alpha val="0"/>
-                        </a:srgbClr>
-                      </a:solidFill>
-                      <a:prstDash val="solid"/>
-                    </a:lnT>
-                    <a:lnB w="0" cmpd="sng" algn="ctr" cap="flat">
-                      <a:solidFill>
-                        <a:srgbClr val="FFFFFF">
-                          <a:alpha val="0"/>
-                        </a:srgbClr>
-                      </a:solidFill>
-                      <a:prstDash val="solid"/>
-                    </a:lnB>
-                  </a:tcPr>
-                </a:tc>
-                <a:tc>
-                  <a:txBody>
-                    <a:bodyPr/>
-                    <a:lstStyle/>
-                    <a:p>
-                      <a:pPr algn="l" marL="63500" marR="63500">
-                        <a:lnSpc>
-                          <a:spcPct val="100000"/>
-                        </a:lnSpc>
-                        <a:spcBef>
-                          <a:spcPts val="500"/>
-                        </a:spcBef>
-                        <a:spcAft>
-                          <a:spcPts val="500"/>
-                        </a:spcAft>
-                        <a:buNone/>
-                      </a:pPr>
-                      <a:r>
-                        <a:rPr sz="1100">
-                          <a:solidFill>
-                            <a:srgbClr val="000000">
-                              <a:alpha val="100000"/>
-                            </a:srgbClr>
-                          </a:solidFill>
-                          <a:latin typeface="Calibri"/>
-                          <a:cs typeface="Calibri"/>
-                          <a:ea typeface="Calibri"/>
-                          <a:sym typeface="Calibri"/>
-                        </a:rPr>
-                        <a:t>118.9</a:t>
-                      </a:r>
-                    </a:p>
-                  </a:txBody>
-                  <a:tcPr anchor="t" marB="0" marT="0" marR="0" marL="0">
-                    <a:lnL w="0" cmpd="sng" algn="ctr" cap="flat">
-                      <a:solidFill>
-                        <a:srgbClr val="FFFFFF">
-                          <a:alpha val="0"/>
-                        </a:srgbClr>
-                      </a:solidFill>
-                      <a:prstDash val="solid"/>
-                    </a:lnL>
-                    <a:lnR w="0" cmpd="sng" algn="ctr" cap="flat">
-                      <a:solidFill>
-                        <a:srgbClr val="FFFFFF">
-                          <a:alpha val="0"/>
-                        </a:srgbClr>
-                      </a:solidFill>
-                      <a:prstDash val="solid"/>
-                    </a:lnR>
-                    <a:lnT w="0" cmpd="sng" algn="ctr" cap="flat">
-                      <a:solidFill>
-                        <a:srgbClr val="FFFFFF">
-                          <a:alpha val="0"/>
-                        </a:srgbClr>
-                      </a:solidFill>
-                      <a:prstDash val="solid"/>
-                    </a:lnT>
-                    <a:lnB w="0" cmpd="sng" algn="ctr" cap="flat">
-                      <a:solidFill>
-                        <a:srgbClr val="FFFFFF">
-                          <a:alpha val="0"/>
-                        </a:srgbClr>
-                      </a:solidFill>
-                      <a:prstDash val="solid"/>
-                    </a:lnB>
-                  </a:tcPr>
-                </a:tc>
-                <a:tc>
-                  <a:txBody>
-                    <a:bodyPr/>
-                    <a:lstStyle/>
-                    <a:p>
-                      <a:pPr algn="l" marL="63500" marR="63500">
-                        <a:lnSpc>
-                          <a:spcPct val="100000"/>
-                        </a:lnSpc>
-                        <a:spcBef>
-                          <a:spcPts val="500"/>
-                        </a:spcBef>
-                        <a:spcAft>
-                          <a:spcPts val="500"/>
-                        </a:spcAft>
-                        <a:buNone/>
-                      </a:pPr>
-                      <a:r>
-                        <a:rPr sz="1100">
-                          <a:solidFill>
-                            <a:srgbClr val="000000">
-                              <a:alpha val="100000"/>
-                            </a:srgbClr>
-                          </a:solidFill>
-                          <a:latin typeface="Calibri"/>
-                          <a:cs typeface="Calibri"/>
-                          <a:ea typeface="Calibri"/>
-                          <a:sym typeface="Calibri"/>
-                        </a:rPr>
-                        <a:t>3rd</a:t>
+                        <a:t>15th</a:t>
                       </a:r>
                     </a:p>
                   </a:txBody>
@@ -17013,7 +17356,7 @@
                           <a:ea typeface="Calibri"/>
                           <a:sym typeface="Calibri"/>
                         </a:rPr>
-                        <a:t>Mid Sussex</a:t>
+                        <a:t>Worthing</a:t>
                       </a:r>
                     </a:p>
                   </a:txBody>
@@ -17081,7 +17424,7 @@
                           <a:ea typeface="Calibri"/>
                           <a:sym typeface="Calibri"/>
                         </a:rPr>
-                        <a:t>147</a:t>
+                        <a:t>85</a:t>
                       </a:r>
                     </a:p>
                   </a:txBody>
@@ -17149,7 +17492,7 @@
                           <a:ea typeface="Calibri"/>
                           <a:sym typeface="Calibri"/>
                         </a:rPr>
-                        <a:t>96.6</a:t>
+                        <a:t>76.8</a:t>
                       </a:r>
                     </a:p>
                   </a:txBody>
@@ -17217,7 +17560,7 @@
                           <a:ea typeface="Calibri"/>
                           <a:sym typeface="Calibri"/>
                         </a:rPr>
-                        <a:t>33rd</a:t>
+                        <a:t>49th</a:t>
                       </a:r>
                     </a:p>
                   </a:txBody>
@@ -17355,7 +17698,7 @@
                           <a:ea typeface="Calibri"/>
                           <a:sym typeface="Calibri"/>
                         </a:rPr>
-                        <a:t>Worthing</a:t>
+                        <a:t>West Sussex</a:t>
                       </a:r>
                     </a:p>
                   </a:txBody>
@@ -17423,7 +17766,7 @@
                           <a:ea typeface="Calibri"/>
                           <a:sym typeface="Calibri"/>
                         </a:rPr>
-                        <a:t>83</a:t>
+                        <a:t>698</a:t>
                       </a:r>
                     </a:p>
                   </a:txBody>
@@ -17491,349 +17834,7 @@
                           <a:ea typeface="Calibri"/>
                           <a:sym typeface="Calibri"/>
                         </a:rPr>
-                        <a:t>75.0</a:t>
-                      </a:r>
-                    </a:p>
-                  </a:txBody>
-                  <a:tcPr anchor="t" marB="0" marT="0" marR="0" marL="0">
-                    <a:lnL w="0" cmpd="sng" algn="ctr" cap="flat">
-                      <a:solidFill>
-                        <a:srgbClr val="FFFFFF">
-                          <a:alpha val="0"/>
-                        </a:srgbClr>
-                      </a:solidFill>
-                      <a:prstDash val="solid"/>
-                    </a:lnL>
-                    <a:lnR w="0" cmpd="sng" algn="ctr" cap="flat">
-                      <a:solidFill>
-                        <a:srgbClr val="FFFFFF">
-                          <a:alpha val="0"/>
-                        </a:srgbClr>
-                      </a:solidFill>
-                      <a:prstDash val="solid"/>
-                    </a:lnR>
-                    <a:lnT w="0" cmpd="sng" algn="ctr" cap="flat">
-                      <a:solidFill>
-                        <a:srgbClr val="FFFFFF">
-                          <a:alpha val="0"/>
-                        </a:srgbClr>
-                      </a:solidFill>
-                      <a:prstDash val="solid"/>
-                    </a:lnT>
-                    <a:lnB w="0" cmpd="sng" algn="ctr" cap="flat">
-                      <a:solidFill>
-                        <a:srgbClr val="FFFFFF">
-                          <a:alpha val="0"/>
-                        </a:srgbClr>
-                      </a:solidFill>
-                      <a:prstDash val="solid"/>
-                    </a:lnB>
-                  </a:tcPr>
-                </a:tc>
-                <a:tc>
-                  <a:txBody>
-                    <a:bodyPr/>
-                    <a:lstStyle/>
-                    <a:p>
-                      <a:pPr algn="l" marL="63500" marR="63500">
-                        <a:lnSpc>
-                          <a:spcPct val="100000"/>
-                        </a:lnSpc>
-                        <a:spcBef>
-                          <a:spcPts val="500"/>
-                        </a:spcBef>
-                        <a:spcAft>
-                          <a:spcPts val="500"/>
-                        </a:spcAft>
-                        <a:buNone/>
-                      </a:pPr>
-                      <a:r>
-                        <a:rPr sz="1100">
-                          <a:solidFill>
-                            <a:srgbClr val="000000">
-                              <a:alpha val="100000"/>
-                            </a:srgbClr>
-                          </a:solidFill>
-                          <a:latin typeface="Calibri"/>
-                          <a:cs typeface="Calibri"/>
-                          <a:ea typeface="Calibri"/>
-                          <a:sym typeface="Calibri"/>
-                        </a:rPr>
-                        <a:t>175th</a:t>
-                      </a:r>
-                    </a:p>
-                  </a:txBody>
-                  <a:tcPr anchor="t" marB="0" marT="0" marR="0" marL="0">
-                    <a:lnL w="0" cmpd="sng" algn="ctr" cap="flat">
-                      <a:solidFill>
-                        <a:srgbClr val="FFFFFF">
-                          <a:alpha val="0"/>
-                        </a:srgbClr>
-                      </a:solidFill>
-                      <a:prstDash val="solid"/>
-                    </a:lnL>
-                    <a:lnR w="0" cmpd="sng" algn="ctr" cap="flat">
-                      <a:solidFill>
-                        <a:srgbClr val="FFFFFF">
-                          <a:alpha val="0"/>
-                        </a:srgbClr>
-                      </a:solidFill>
-                      <a:prstDash val="solid"/>
-                    </a:lnR>
-                    <a:lnT w="0" cmpd="sng" algn="ctr" cap="flat">
-                      <a:solidFill>
-                        <a:srgbClr val="FFFFFF">
-                          <a:alpha val="0"/>
-                        </a:srgbClr>
-                      </a:solidFill>
-                      <a:prstDash val="solid"/>
-                    </a:lnT>
-                    <a:lnB w="0" cmpd="sng" algn="ctr" cap="flat">
-                      <a:solidFill>
-                        <a:srgbClr val="FFFFFF">
-                          <a:alpha val="0"/>
-                        </a:srgbClr>
-                      </a:solidFill>
-                      <a:prstDash val="solid"/>
-                    </a:lnB>
-                  </a:tcPr>
-                </a:tc>
-                <a:tc>
-                  <a:txBody>
-                    <a:bodyPr/>
-                    <a:lstStyle/>
-                    <a:p>
-                      <a:pPr algn="l" marL="63500" marR="63500">
-                        <a:lnSpc>
-                          <a:spcPct val="100000"/>
-                        </a:lnSpc>
-                        <a:spcBef>
-                          <a:spcPts val="500"/>
-                        </a:spcBef>
-                        <a:spcAft>
-                          <a:spcPts val="500"/>
-                        </a:spcAft>
-                        <a:buNone/>
-                      </a:pPr>
-                      <a:r>
-                        <a:rPr sz="1100">
-                          <a:solidFill>
-                            <a:srgbClr val="000000">
-                              <a:alpha val="100000"/>
-                            </a:srgbClr>
-                          </a:solidFill>
-                          <a:latin typeface="Calibri"/>
-                          <a:cs typeface="Calibri"/>
-                          <a:ea typeface="Calibri"/>
-                          <a:sym typeface="Calibri"/>
-                        </a:rPr>
-                        <a:t>Decile 6</a:t>
-                      </a:r>
-                    </a:p>
-                  </a:txBody>
-                  <a:tcPr anchor="t" marB="0" marT="0" marR="0" marL="0">
-                    <a:lnL w="0" cmpd="sng" algn="ctr" cap="flat">
-                      <a:solidFill>
-                        <a:srgbClr val="FFFFFF">
-                          <a:alpha val="0"/>
-                        </a:srgbClr>
-                      </a:solidFill>
-                      <a:prstDash val="solid"/>
-                    </a:lnL>
-                    <a:lnR w="0" cmpd="sng" algn="ctr" cap="flat">
-                      <a:solidFill>
-                        <a:srgbClr val="FFFFFF">
-                          <a:alpha val="0"/>
-                        </a:srgbClr>
-                      </a:solidFill>
-                      <a:prstDash val="solid"/>
-                    </a:lnR>
-                    <a:lnT w="0" cmpd="sng" algn="ctr" cap="flat">
-                      <a:solidFill>
-                        <a:srgbClr val="FFFFFF">
-                          <a:alpha val="0"/>
-                        </a:srgbClr>
-                      </a:solidFill>
-                      <a:prstDash val="solid"/>
-                    </a:lnT>
-                    <a:lnB w="0" cmpd="sng" algn="ctr" cap="flat">
-                      <a:solidFill>
-                        <a:srgbClr val="FFFFFF">
-                          <a:alpha val="0"/>
-                        </a:srgbClr>
-                      </a:solidFill>
-                      <a:prstDash val="solid"/>
-                    </a:lnB>
-                  </a:tcPr>
-                </a:tc>
-              </a:tr>
-              <a:tr h="182880">
-                <a:tc>
-                  <a:txBody>
-                    <a:bodyPr/>
-                    <a:lstStyle/>
-                    <a:p>
-                      <a:pPr algn="l" marL="63500" marR="63500">
-                        <a:lnSpc>
-                          <a:spcPct val="100000"/>
-                        </a:lnSpc>
-                        <a:spcBef>
-                          <a:spcPts val="500"/>
-                        </a:spcBef>
-                        <a:spcAft>
-                          <a:spcPts val="500"/>
-                        </a:spcAft>
-                        <a:buNone/>
-                      </a:pPr>
-                      <a:r>
-                        <a:rPr sz="1100">
-                          <a:solidFill>
-                            <a:srgbClr val="000000">
-                              <a:alpha val="100000"/>
-                            </a:srgbClr>
-                          </a:solidFill>
-                          <a:latin typeface="Calibri"/>
-                          <a:cs typeface="Calibri"/>
-                          <a:ea typeface="Calibri"/>
-                          <a:sym typeface="Calibri"/>
-                        </a:rPr>
-                        <a:t>West Sussex</a:t>
-                      </a:r>
-                    </a:p>
-                  </a:txBody>
-                  <a:tcPr anchor="t" marB="0" marT="0" marR="0" marL="0">
-                    <a:lnL w="0" cmpd="sng" algn="ctr" cap="flat">
-                      <a:solidFill>
-                        <a:srgbClr val="FFFFFF">
-                          <a:alpha val="0"/>
-                        </a:srgbClr>
-                      </a:solidFill>
-                      <a:prstDash val="solid"/>
-                    </a:lnL>
-                    <a:lnR w="0" cmpd="sng" algn="ctr" cap="flat">
-                      <a:solidFill>
-                        <a:srgbClr val="FFFFFF">
-                          <a:alpha val="0"/>
-                        </a:srgbClr>
-                      </a:solidFill>
-                      <a:prstDash val="solid"/>
-                    </a:lnR>
-                    <a:lnT w="0" cmpd="sng" algn="ctr" cap="flat">
-                      <a:solidFill>
-                        <a:srgbClr val="FFFFFF">
-                          <a:alpha val="0"/>
-                        </a:srgbClr>
-                      </a:solidFill>
-                      <a:prstDash val="solid"/>
-                    </a:lnT>
-                    <a:lnB w="0" cmpd="sng" algn="ctr" cap="flat">
-                      <a:solidFill>
-                        <a:srgbClr val="FFFFFF">
-                          <a:alpha val="0"/>
-                        </a:srgbClr>
-                      </a:solidFill>
-                      <a:prstDash val="solid"/>
-                    </a:lnB>
-                  </a:tcPr>
-                </a:tc>
-                <a:tc>
-                  <a:txBody>
-                    <a:bodyPr/>
-                    <a:lstStyle/>
-                    <a:p>
-                      <a:pPr algn="l" marL="63500" marR="63500">
-                        <a:lnSpc>
-                          <a:spcPct val="100000"/>
-                        </a:lnSpc>
-                        <a:spcBef>
-                          <a:spcPts val="500"/>
-                        </a:spcBef>
-                        <a:spcAft>
-                          <a:spcPts val="500"/>
-                        </a:spcAft>
-                        <a:buNone/>
-                      </a:pPr>
-                      <a:r>
-                        <a:rPr sz="1100">
-                          <a:solidFill>
-                            <a:srgbClr val="000000">
-                              <a:alpha val="100000"/>
-                            </a:srgbClr>
-                          </a:solidFill>
-                          <a:latin typeface="Calibri"/>
-                          <a:cs typeface="Calibri"/>
-                          <a:ea typeface="Calibri"/>
-                          <a:sym typeface="Calibri"/>
-                        </a:rPr>
-                        <a:t>814</a:t>
-                      </a:r>
-                    </a:p>
-                  </a:txBody>
-                  <a:tcPr anchor="t" marB="0" marT="0" marR="0" marL="0">
-                    <a:lnL w="0" cmpd="sng" algn="ctr" cap="flat">
-                      <a:solidFill>
-                        <a:srgbClr val="FFFFFF">
-                          <a:alpha val="0"/>
-                        </a:srgbClr>
-                      </a:solidFill>
-                      <a:prstDash val="solid"/>
-                    </a:lnL>
-                    <a:lnR w="0" cmpd="sng" algn="ctr" cap="flat">
-                      <a:solidFill>
-                        <a:srgbClr val="FFFFFF">
-                          <a:alpha val="0"/>
-                        </a:srgbClr>
-                      </a:solidFill>
-                      <a:prstDash val="solid"/>
-                    </a:lnR>
-                    <a:lnT w="0" cmpd="sng" algn="ctr" cap="flat">
-                      <a:solidFill>
-                        <a:srgbClr val="FFFFFF">
-                          <a:alpha val="0"/>
-                        </a:srgbClr>
-                      </a:solidFill>
-                      <a:prstDash val="solid"/>
-                    </a:lnT>
-                    <a:lnB w="0" cmpd="sng" algn="ctr" cap="flat">
-                      <a:solidFill>
-                        <a:srgbClr val="FFFFFF">
-                          <a:alpha val="0"/>
-                        </a:srgbClr>
-                      </a:solidFill>
-                      <a:prstDash val="solid"/>
-                    </a:lnB>
-                  </a:tcPr>
-                </a:tc>
-                <a:tc>
-                  <a:txBody>
-                    <a:bodyPr/>
-                    <a:lstStyle/>
-                    <a:p>
-                      <a:pPr algn="l" marL="63500" marR="63500">
-                        <a:lnSpc>
-                          <a:spcPct val="100000"/>
-                        </a:lnSpc>
-                        <a:spcBef>
-                          <a:spcPts val="500"/>
-                        </a:spcBef>
-                        <a:spcAft>
-                          <a:spcPts val="500"/>
-                        </a:spcAft>
-                        <a:buNone/>
-                      </a:pPr>
-                      <a:r>
-                        <a:rPr sz="1100">
-                          <a:solidFill>
-                            <a:srgbClr val="000000">
-                              <a:alpha val="100000"/>
-                            </a:srgbClr>
-                          </a:solidFill>
-                          <a:latin typeface="Calibri"/>
-                          <a:cs typeface="Calibri"/>
-                          <a:ea typeface="Calibri"/>
-                          <a:sym typeface="Calibri"/>
-                        </a:rPr>
-                        <a:t>93.8</a:t>
+                        <a:t>80.4</a:t>
                       </a:r>
                     </a:p>
                   </a:txBody>
@@ -18107,7 +18108,7 @@
                           <a:ea typeface="Calibri"/>
                           <a:sym typeface="Calibri"/>
                         </a:rPr>
-                        <a:t>44,680</a:t>
+                        <a:t>34,970</a:t>
                       </a:r>
                     </a:p>
                   </a:txBody>
@@ -18175,7 +18176,7 @@
                           <a:ea typeface="Calibri"/>
                           <a:sym typeface="Calibri"/>
                         </a:rPr>
-                        <a:t>79.0</a:t>
+                        <a:t>61.8</a:t>
                       </a:r>
                     </a:p>
                   </a:txBody>
@@ -18449,7 +18450,7 @@
                           <a:ea typeface="Calibri"/>
                           <a:sym typeface="Calibri"/>
                         </a:rPr>
-                        <a:t>7,639</a:t>
+                        <a:t>6,566</a:t>
                       </a:r>
                     </a:p>
                   </a:txBody>
@@ -18517,7 +18518,7 @@
                           <a:ea typeface="Calibri"/>
                           <a:sym typeface="Calibri"/>
                         </a:rPr>
-                        <a:t>82.9</a:t>
+                        <a:t>71.2</a:t>
                       </a:r>
                     </a:p>
                   </a:txBody>
@@ -18744,7 +18745,7 @@
           <a:p>
             <a:r>
               <a:rPr/>
-              <a:t>Pack date: 24 May 2022</a:t>
+              <a:t>Pack date: 06 June 2022</a:t>
             </a:r>
           </a:p>
         </p:txBody>
@@ -18902,7 +18903,7 @@
           <a:p>
             <a:r>
               <a:rPr/>
-              <a:t>Pack date: 24 May 2022</a:t>
+              <a:t>Pack date: 06 June 2022</a:t>
             </a:r>
           </a:p>
         </p:txBody>
@@ -19060,7 +19061,7 @@
           <a:p>
             <a:r>
               <a:rPr/>
-              <a:t>Pack date: 24 May 2022</a:t>
+              <a:t>Pack date: 06 June 2022</a:t>
             </a:r>
           </a:p>
         </p:txBody>
@@ -19218,7 +19219,7 @@
           <a:p>
             <a:r>
               <a:rPr/>
-              <a:t>Pack date: 24 May 2022</a:t>
+              <a:t>Pack date: 06 June 2022</a:t>
             </a:r>
           </a:p>
         </p:txBody>
@@ -19376,7 +19377,7 @@
           <a:p>
             <a:r>
               <a:rPr/>
-              <a:t>Pack date: 24 May 2022</a:t>
+              <a:t>Pack date: 06 June 2022</a:t>
             </a:r>
           </a:p>
         </p:txBody>
@@ -19565,7 +19566,7 @@
           <a:p>
             <a:r>
               <a:rPr/>
-              <a:t>Pack date: 24 May 2022</a:t>
+              <a:t>Pack date: 06 June 2022</a:t>
             </a:r>
           </a:p>
         </p:txBody>
@@ -19723,7 +19724,7 @@
           <a:p>
             <a:r>
               <a:rPr/>
-              <a:t>Pack date: 24 May 2022</a:t>
+              <a:t>Pack date: 06 June 2022</a:t>
             </a:r>
           </a:p>
         </p:txBody>
@@ -19881,7 +19882,7 @@
           <a:p>
             <a:r>
               <a:rPr/>
-              <a:t>Pack date: 24 May 2022</a:t>
+              <a:t>Pack date: 06 June 2022</a:t>
             </a:r>
           </a:p>
         </p:txBody>
@@ -20039,7 +20040,7 @@
           <a:p>
             <a:r>
               <a:rPr/>
-              <a:t>Pack date: 24 May 2022</a:t>
+              <a:t>Pack date: 06 June 2022</a:t>
             </a:r>
           </a:p>
         </p:txBody>
@@ -20197,7 +20198,7 @@
           <a:p>
             <a:r>
               <a:rPr/>
-              <a:t>Pack date: 24 May 2022</a:t>
+              <a:t>Pack date: 06 June 2022</a:t>
             </a:r>
           </a:p>
         </p:txBody>
@@ -20329,7 +20330,7 @@
           <a:p>
             <a:r>
               <a:rPr/>
-              <a:t>Pack date: 24 May 2022</a:t>
+              <a:t>Pack date: 06 June 2022</a:t>
             </a:r>
           </a:p>
         </p:txBody>
@@ -20461,7 +20462,7 @@
           <a:p>
             <a:r>
               <a:rPr/>
-              <a:t>Pack date: 24 May 2022</a:t>
+              <a:t>Pack date: 06 June 2022</a:t>
             </a:r>
           </a:p>
         </p:txBody>
@@ -20593,7 +20594,7 @@
           <a:p>
             <a:r>
               <a:rPr/>
-              <a:t>Pack date: 24 May 2022</a:t>
+              <a:t>Pack date: 06 June 2022</a:t>
             </a:r>
           </a:p>
         </p:txBody>
@@ -20725,7 +20726,7 @@
           <a:p>
             <a:r>
               <a:rPr/>
-              <a:t>Pack date: 24 May 2022</a:t>
+              <a:t>Pack date: 06 June 2022</a:t>
             </a:r>
           </a:p>
         </p:txBody>
@@ -20857,7 +20858,7 @@
           <a:p>
             <a:r>
               <a:rPr/>
-              <a:t>Pack date: 24 May 2022</a:t>
+              <a:t>Pack date: 06 June 2022</a:t>
             </a:r>
           </a:p>
         </p:txBody>
@@ -20989,7 +20990,7 @@
           <a:p>
             <a:r>
               <a:rPr/>
-              <a:t>Pack date: 24 May 2022</a:t>
+              <a:t>Pack date: 06 June 2022</a:t>
             </a:r>
           </a:p>
         </p:txBody>

</xml_diff>

<commit_message>
dec 12 fix utla geographies
</commit_message>
<xml_diff>
--- a/Latest_West_Sussex_C19_slide_deck.pptx
+++ b/Latest_West_Sussex_C19_slide_deck.pptx
@@ -7176,7 +7176,7 @@
           <a:p>
             <a:r>
               <a:rPr/>
-              <a:t>Pack date: 02 December 2022</a:t>
+              <a:t>Pack date: 12 December 2022</a:t>
             </a:r>
           </a:p>
         </p:txBody>
@@ -7308,7 +7308,7 @@
           <a:p>
             <a:r>
               <a:rPr/>
-              <a:t>Pack date: 02 December 2022</a:t>
+              <a:t>Pack date: 12 December 2022</a:t>
             </a:r>
           </a:p>
         </p:txBody>
@@ -7466,7 +7466,7 @@
           <a:p>
             <a:r>
               <a:rPr/>
-              <a:t>Pack date: 02 December 2022</a:t>
+              <a:t>Pack date: 12 December 2022</a:t>
             </a:r>
           </a:p>
         </p:txBody>
@@ -7547,7 +7547,7 @@
           <a:p>
             <a:r>
               <a:rPr/>
-              <a:t>Upper Tier Local Authority cumulative cases as at 01 December</a:t>
+              <a:t>Upper Tier Local Authority cumulative cases as at 08 December</a:t>
             </a:r>
           </a:p>
         </p:txBody>
@@ -8070,7 +8070,7 @@
                           <a:ea typeface="Calibri"/>
                           <a:sym typeface="Calibri"/>
                         </a:rPr>
-                        <a:t>303,093</a:t>
+                        <a:t>303,619</a:t>
                       </a:r>
                     </a:p>
                   </a:txBody>
@@ -8127,7 +8127,7 @@
                           <a:ea typeface="Calibri"/>
                           <a:sym typeface="Calibri"/>
                         </a:rPr>
-                        <a:t>34,933.2</a:t>
+                        <a:t>34,993.9</a:t>
                       </a:r>
                     </a:p>
                   </a:txBody>
@@ -8184,7 +8184,7 @@
                           <a:ea typeface="Calibri"/>
                           <a:sym typeface="Calibri"/>
                         </a:rPr>
-                        <a:t>104th</a:t>
+                        <a:t>103rd</a:t>
                       </a:r>
                     </a:p>
                   </a:txBody>
@@ -8357,7 +8357,7 @@
                           <a:ea typeface="Calibri"/>
                           <a:sym typeface="Calibri"/>
                         </a:rPr>
-                        <a:t>20,291,473</a:t>
+                        <a:t>20,317,848</a:t>
                       </a:r>
                     </a:p>
                   </a:txBody>
@@ -8414,7 +8414,7 @@
                           <a:ea typeface="Calibri"/>
                           <a:sym typeface="Calibri"/>
                         </a:rPr>
-                        <a:t>35,882.3</a:t>
+                        <a:t>35,928.9</a:t>
                       </a:r>
                     </a:p>
                   </a:txBody>
@@ -8648,7 +8648,7 @@
                           <a:ea typeface="Calibri"/>
                           <a:sym typeface="Calibri"/>
                         </a:rPr>
-                        <a:t>3,300,075</a:t>
+                        <a:t>3,304,811</a:t>
                       </a:r>
                     </a:p>
                   </a:txBody>
@@ -8709,7 +8709,7 @@
                           <a:ea typeface="Calibri"/>
                           <a:sym typeface="Calibri"/>
                         </a:rPr>
-                        <a:t>35,803.2</a:t>
+                        <a:t>35,854.6</a:t>
                       </a:r>
                     </a:p>
                   </a:txBody>
@@ -8941,7 +8941,7 @@
           <a:p>
             <a:r>
               <a:rPr/>
-              <a:t>Pack date: 02 December 2022</a:t>
+              <a:t>Pack date: 12 December 2022</a:t>
             </a:r>
           </a:p>
         </p:txBody>
@@ -9022,7 +9022,7 @@
           <a:p>
             <a:r>
               <a:rPr/>
-              <a:t>Upper Tier Local Authority rolling 7 day cases as at 01 December</a:t>
+              <a:t>Upper Tier Local Authority rolling 7 day cases as at 08 December</a:t>
             </a:r>
           </a:p>
         </p:txBody>
@@ -9103,7 +9103,7 @@
           <a:p>
             <a:r>
               <a:rPr/>
-              <a:t>Note that the very recent days are excluded in the 7-day total as these are thought to be incomplete. As such, this data represents cases in the seven days to 26 November</a:t>
+              <a:t>Note that the very recent days are excluded in the 7-day total as these are thought to be incomplete. As such, this data represents cases in the seven days to 03 December</a:t>
             </a:r>
           </a:p>
         </p:txBody>
@@ -9545,7 +9545,7 @@
                           <a:ea typeface="Calibri"/>
                           <a:sym typeface="Calibri"/>
                         </a:rPr>
-                        <a:t>325</a:t>
+                        <a:t>468</a:t>
                       </a:r>
                     </a:p>
                   </a:txBody>
@@ -9602,7 +9602,7 @@
                           <a:ea typeface="Calibri"/>
                           <a:sym typeface="Calibri"/>
                         </a:rPr>
-                        <a:t>37.5</a:t>
+                        <a:t>53.9</a:t>
                       </a:r>
                     </a:p>
                   </a:txBody>
@@ -9659,7 +9659,7 @@
                           <a:ea typeface="Calibri"/>
                           <a:sym typeface="Calibri"/>
                         </a:rPr>
-                        <a:t>52nd</a:t>
+                        <a:t>10th</a:t>
                       </a:r>
                     </a:p>
                   </a:txBody>
@@ -9716,7 +9716,34 @@
                           <a:ea typeface="Calibri"/>
                           <a:sym typeface="Calibri"/>
                         </a:rPr>
-                        <a:t>Decile 4</a:t>
+                        <a:t>10% of authorities</a:t>
+                      </a:r>
+                      <a:br>
+                        <a:rPr cap="none" sz="1100" i="0" b="0" u="none">
+                          <a:solidFill>
+                            <a:srgbClr val="000000">
+                              <a:alpha val="100000"/>
+                            </a:srgbClr>
+                          </a:solidFill>
+                          <a:latin typeface="Calibri"/>
+                          <a:cs typeface="Calibri"/>
+                          <a:ea typeface="Calibri"/>
+                          <a:sym typeface="Calibri"/>
+                        </a:rPr>
+                      </a:br>
+                      <a:r>
+                        <a:rPr cap="none" sz="1100" i="0" b="0" u="none">
+                          <a:solidFill>
+                            <a:srgbClr val="000000">
+                              <a:alpha val="100000"/>
+                            </a:srgbClr>
+                          </a:solidFill>
+                          <a:latin typeface="Calibri"/>
+                          <a:cs typeface="Calibri"/>
+                          <a:ea typeface="Calibri"/>
+                          <a:sym typeface="Calibri"/>
+                        </a:rPr>
+                        <a:t>with highest rate</a:t>
                       </a:r>
                     </a:p>
                   </a:txBody>
@@ -9832,7 +9859,7 @@
                           <a:ea typeface="Calibri"/>
                           <a:sym typeface="Calibri"/>
                         </a:rPr>
-                        <a:t>20,281</a:t>
+                        <a:t>23,216</a:t>
                       </a:r>
                     </a:p>
                   </a:txBody>
@@ -9889,7 +9916,7 @@
                           <a:ea typeface="Calibri"/>
                           <a:sym typeface="Calibri"/>
                         </a:rPr>
-                        <a:t>35.9</a:t>
+                        <a:t>41.1</a:t>
                       </a:r>
                     </a:p>
                   </a:txBody>
@@ -10123,7 +10150,7 @@
                           <a:ea typeface="Calibri"/>
                           <a:sym typeface="Calibri"/>
                         </a:rPr>
-                        <a:t>3,544</a:t>
+                        <a:t>4,195</a:t>
                       </a:r>
                     </a:p>
                   </a:txBody>
@@ -10184,7 +10211,7 @@
                           <a:ea typeface="Calibri"/>
                           <a:sym typeface="Calibri"/>
                         </a:rPr>
-                        <a:t>38.4</a:t>
+                        <a:t>45.5</a:t>
                       </a:r>
                     </a:p>
                   </a:txBody>
@@ -10416,7 +10443,7 @@
           <a:p>
             <a:r>
               <a:rPr/>
-              <a:t>Pack date: 02 December 2022</a:t>
+              <a:t>Pack date: 12 December 2022</a:t>
             </a:r>
           </a:p>
         </p:txBody>
@@ -10497,7 +10524,7 @@
           <a:p>
             <a:r>
               <a:rPr/>
-              <a:t>Lower Tier Local Authority cumulative cases as at 01 December</a:t>
+              <a:t>Lower Tier Local Authority cumulative cases as at 08 December</a:t>
             </a:r>
           </a:p>
         </p:txBody>
@@ -10993,7 +11020,7 @@
                           <a:ea typeface="Calibri"/>
                           <a:sym typeface="Calibri"/>
                         </a:rPr>
-                        <a:t>21,466</a:t>
+                        <a:t>21,506</a:t>
                       </a:r>
                     </a:p>
                   </a:txBody>
@@ -11050,7 +11077,7 @@
                           <a:ea typeface="Calibri"/>
                           <a:sym typeface="Calibri"/>
                         </a:rPr>
-                        <a:t>33,442.9</a:t>
+                        <a:t>33,505.2</a:t>
                       </a:r>
                     </a:p>
                   </a:txBody>
@@ -11107,7 +11134,581 @@
                           <a:ea typeface="Calibri"/>
                           <a:sym typeface="Calibri"/>
                         </a:rPr>
-                        <a:t>252nd</a:t>
+                        <a:t>251st</a:t>
+                      </a:r>
+                    </a:p>
+                  </a:txBody>
+                  <a:tcPr anchor="t" marB="63500" marT="63500" marR="0" marL="0">
+                    <a:lnL algn="ctr" cmpd="sng" cap="flat" w="0">
+                      <a:noFill/>
+                      <a:prstDash val="solid"/>
+                    </a:lnL>
+                    <a:lnR algn="ctr" cmpd="sng" cap="flat" w="0">
+                      <a:noFill/>
+                      <a:prstDash val="solid"/>
+                    </a:lnR>
+                    <a:lnT algn="ctr" cmpd="sng" cap="flat" w="0">
+                      <a:noFill/>
+                      <a:prstDash val="solid"/>
+                    </a:lnT>
+                    <a:lnB algn="ctr" cmpd="sng" cap="flat" w="0">
+                      <a:noFill/>
+                      <a:prstDash val="solid"/>
+                    </a:lnB>
+                    <a:solidFill>
+                      <a:srgbClr val="FFFFFF">
+                        <a:alpha val="0"/>
+                      </a:srgbClr>
+                    </a:solidFill>
+                  </a:tcPr>
+                </a:tc>
+                <a:tc>
+                  <a:txBody>
+                    <a:bodyPr/>
+                    <a:lstStyle/>
+                    <a:p>
+                      <a:pPr algn="l" marL="63500" marR="63500">
+                        <a:lnSpc>
+                          <a:spcPct val="100000"/>
+                        </a:lnSpc>
+                        <a:spcBef>
+                          <a:spcPts val="500"/>
+                        </a:spcBef>
+                        <a:spcAft>
+                          <a:spcPts val="500"/>
+                        </a:spcAft>
+                        <a:buNone/>
+                      </a:pPr>
+                      <a:r>
+                        <a:rPr cap="none" sz="1100" i="0" b="0" u="none">
+                          <a:solidFill>
+                            <a:srgbClr val="000000">
+                              <a:alpha val="100000"/>
+                            </a:srgbClr>
+                          </a:solidFill>
+                          <a:latin typeface="Calibri"/>
+                          <a:cs typeface="Calibri"/>
+                          <a:ea typeface="Calibri"/>
+                          <a:sym typeface="Calibri"/>
+                        </a:rPr>
+                        <a:t>Decile 8</a:t>
+                      </a:r>
+                    </a:p>
+                  </a:txBody>
+                  <a:tcPr anchor="t" marB="63500" marT="63500" marR="0" marL="0">
+                    <a:lnL algn="ctr" cmpd="sng" cap="flat" w="0">
+                      <a:noFill/>
+                      <a:prstDash val="solid"/>
+                    </a:lnL>
+                    <a:lnR algn="ctr" cmpd="sng" cap="flat" w="0">
+                      <a:noFill/>
+                      <a:prstDash val="solid"/>
+                    </a:lnR>
+                    <a:lnT algn="ctr" cmpd="sng" cap="flat" w="0">
+                      <a:noFill/>
+                      <a:prstDash val="solid"/>
+                    </a:lnT>
+                    <a:lnB algn="ctr" cmpd="sng" cap="flat" w="0">
+                      <a:noFill/>
+                      <a:prstDash val="solid"/>
+                    </a:lnB>
+                    <a:solidFill>
+                      <a:srgbClr val="FFFFFF">
+                        <a:alpha val="0"/>
+                      </a:srgbClr>
+                    </a:solidFill>
+                  </a:tcPr>
+                </a:tc>
+              </a:tr>
+              <a:tr h="182880">
+                <a:tc>
+                  <a:txBody>
+                    <a:bodyPr/>
+                    <a:lstStyle/>
+                    <a:p>
+                      <a:pPr algn="l" marL="63500" marR="63500">
+                        <a:lnSpc>
+                          <a:spcPct val="100000"/>
+                        </a:lnSpc>
+                        <a:spcBef>
+                          <a:spcPts val="500"/>
+                        </a:spcBef>
+                        <a:spcAft>
+                          <a:spcPts val="500"/>
+                        </a:spcAft>
+                        <a:buNone/>
+                      </a:pPr>
+                      <a:r>
+                        <a:rPr cap="none" sz="1100" i="0" b="0" u="none">
+                          <a:solidFill>
+                            <a:srgbClr val="000000">
+                              <a:alpha val="100000"/>
+                            </a:srgbClr>
+                          </a:solidFill>
+                          <a:latin typeface="Calibri"/>
+                          <a:cs typeface="Calibri"/>
+                          <a:ea typeface="Calibri"/>
+                          <a:sym typeface="Calibri"/>
+                        </a:rPr>
+                        <a:t>Arun</a:t>
+                      </a:r>
+                    </a:p>
+                  </a:txBody>
+                  <a:tcPr anchor="t" marB="63500" marT="63500" marR="0" marL="0">
+                    <a:lnL algn="ctr" cmpd="sng" cap="flat" w="0">
+                      <a:noFill/>
+                      <a:prstDash val="solid"/>
+                    </a:lnL>
+                    <a:lnR algn="ctr" cmpd="sng" cap="flat" w="0">
+                      <a:noFill/>
+                      <a:prstDash val="solid"/>
+                    </a:lnR>
+                    <a:lnT algn="ctr" cmpd="sng" cap="flat" w="0">
+                      <a:noFill/>
+                      <a:prstDash val="solid"/>
+                    </a:lnT>
+                    <a:lnB algn="ctr" cmpd="sng" cap="flat" w="0">
+                      <a:noFill/>
+                      <a:prstDash val="solid"/>
+                    </a:lnB>
+                    <a:solidFill>
+                      <a:srgbClr val="FFFFFF">
+                        <a:alpha val="0"/>
+                      </a:srgbClr>
+                    </a:solidFill>
+                  </a:tcPr>
+                </a:tc>
+                <a:tc>
+                  <a:txBody>
+                    <a:bodyPr/>
+                    <a:lstStyle/>
+                    <a:p>
+                      <a:pPr algn="l" marL="63500" marR="63500">
+                        <a:lnSpc>
+                          <a:spcPct val="100000"/>
+                        </a:lnSpc>
+                        <a:spcBef>
+                          <a:spcPts val="500"/>
+                        </a:spcBef>
+                        <a:spcAft>
+                          <a:spcPts val="500"/>
+                        </a:spcAft>
+                        <a:buNone/>
+                      </a:pPr>
+                      <a:r>
+                        <a:rPr cap="none" sz="1100" i="0" b="0" u="none">
+                          <a:solidFill>
+                            <a:srgbClr val="000000">
+                              <a:alpha val="100000"/>
+                            </a:srgbClr>
+                          </a:solidFill>
+                          <a:latin typeface="Calibri"/>
+                          <a:cs typeface="Calibri"/>
+                          <a:ea typeface="Calibri"/>
+                          <a:sym typeface="Calibri"/>
+                        </a:rPr>
+                        <a:t>54,239</a:t>
+                      </a:r>
+                    </a:p>
+                  </a:txBody>
+                  <a:tcPr anchor="t" marB="63500" marT="63500" marR="0" marL="0">
+                    <a:lnL algn="ctr" cmpd="sng" cap="flat" w="0">
+                      <a:noFill/>
+                      <a:prstDash val="solid"/>
+                    </a:lnL>
+                    <a:lnR algn="ctr" cmpd="sng" cap="flat" w="0">
+                      <a:noFill/>
+                      <a:prstDash val="solid"/>
+                    </a:lnR>
+                    <a:lnT algn="ctr" cmpd="sng" cap="flat" w="0">
+                      <a:noFill/>
+                      <a:prstDash val="solid"/>
+                    </a:lnT>
+                    <a:lnB algn="ctr" cmpd="sng" cap="flat" w="0">
+                      <a:noFill/>
+                      <a:prstDash val="solid"/>
+                    </a:lnB>
+                    <a:solidFill>
+                      <a:srgbClr val="FFFFFF">
+                        <a:alpha val="0"/>
+                      </a:srgbClr>
+                    </a:solidFill>
+                  </a:tcPr>
+                </a:tc>
+                <a:tc>
+                  <a:txBody>
+                    <a:bodyPr/>
+                    <a:lstStyle/>
+                    <a:p>
+                      <a:pPr algn="l" marL="63500" marR="63500">
+                        <a:lnSpc>
+                          <a:spcPct val="100000"/>
+                        </a:lnSpc>
+                        <a:spcBef>
+                          <a:spcPts val="500"/>
+                        </a:spcBef>
+                        <a:spcAft>
+                          <a:spcPts val="500"/>
+                        </a:spcAft>
+                        <a:buNone/>
+                      </a:pPr>
+                      <a:r>
+                        <a:rPr cap="none" sz="1100" i="0" b="0" u="none">
+                          <a:solidFill>
+                            <a:srgbClr val="000000">
+                              <a:alpha val="100000"/>
+                            </a:srgbClr>
+                          </a:solidFill>
+                          <a:latin typeface="Calibri"/>
+                          <a:cs typeface="Calibri"/>
+                          <a:ea typeface="Calibri"/>
+                          <a:sym typeface="Calibri"/>
+                        </a:rPr>
+                        <a:t>33,663.1</a:t>
+                      </a:r>
+                    </a:p>
+                  </a:txBody>
+                  <a:tcPr anchor="t" marB="63500" marT="63500" marR="0" marL="0">
+                    <a:lnL algn="ctr" cmpd="sng" cap="flat" w="0">
+                      <a:noFill/>
+                      <a:prstDash val="solid"/>
+                    </a:lnL>
+                    <a:lnR algn="ctr" cmpd="sng" cap="flat" w="0">
+                      <a:noFill/>
+                      <a:prstDash val="solid"/>
+                    </a:lnR>
+                    <a:lnT algn="ctr" cmpd="sng" cap="flat" w="0">
+                      <a:noFill/>
+                      <a:prstDash val="solid"/>
+                    </a:lnT>
+                    <a:lnB algn="ctr" cmpd="sng" cap="flat" w="0">
+                      <a:noFill/>
+                      <a:prstDash val="solid"/>
+                    </a:lnB>
+                    <a:solidFill>
+                      <a:srgbClr val="FFFFFF">
+                        <a:alpha val="0"/>
+                      </a:srgbClr>
+                    </a:solidFill>
+                  </a:tcPr>
+                </a:tc>
+                <a:tc>
+                  <a:txBody>
+                    <a:bodyPr/>
+                    <a:lstStyle/>
+                    <a:p>
+                      <a:pPr algn="l" marL="63500" marR="63500">
+                        <a:lnSpc>
+                          <a:spcPct val="100000"/>
+                        </a:lnSpc>
+                        <a:spcBef>
+                          <a:spcPts val="500"/>
+                        </a:spcBef>
+                        <a:spcAft>
+                          <a:spcPts val="500"/>
+                        </a:spcAft>
+                        <a:buNone/>
+                      </a:pPr>
+                      <a:r>
+                        <a:rPr cap="none" sz="1100" i="0" b="0" u="none">
+                          <a:solidFill>
+                            <a:srgbClr val="000000">
+                              <a:alpha val="100000"/>
+                            </a:srgbClr>
+                          </a:solidFill>
+                          <a:latin typeface="Calibri"/>
+                          <a:cs typeface="Calibri"/>
+                          <a:ea typeface="Calibri"/>
+                          <a:sym typeface="Calibri"/>
+                        </a:rPr>
+                        <a:t>248th</a:t>
+                      </a:r>
+                    </a:p>
+                  </a:txBody>
+                  <a:tcPr anchor="t" marB="63500" marT="63500" marR="0" marL="0">
+                    <a:lnL algn="ctr" cmpd="sng" cap="flat" w="0">
+                      <a:noFill/>
+                      <a:prstDash val="solid"/>
+                    </a:lnL>
+                    <a:lnR algn="ctr" cmpd="sng" cap="flat" w="0">
+                      <a:noFill/>
+                      <a:prstDash val="solid"/>
+                    </a:lnR>
+                    <a:lnT algn="ctr" cmpd="sng" cap="flat" w="0">
+                      <a:noFill/>
+                      <a:prstDash val="solid"/>
+                    </a:lnT>
+                    <a:lnB algn="ctr" cmpd="sng" cap="flat" w="0">
+                      <a:noFill/>
+                      <a:prstDash val="solid"/>
+                    </a:lnB>
+                    <a:solidFill>
+                      <a:srgbClr val="FFFFFF">
+                        <a:alpha val="0"/>
+                      </a:srgbClr>
+                    </a:solidFill>
+                  </a:tcPr>
+                </a:tc>
+                <a:tc>
+                  <a:txBody>
+                    <a:bodyPr/>
+                    <a:lstStyle/>
+                    <a:p>
+                      <a:pPr algn="l" marL="63500" marR="63500">
+                        <a:lnSpc>
+                          <a:spcPct val="100000"/>
+                        </a:lnSpc>
+                        <a:spcBef>
+                          <a:spcPts val="500"/>
+                        </a:spcBef>
+                        <a:spcAft>
+                          <a:spcPts val="500"/>
+                        </a:spcAft>
+                        <a:buNone/>
+                      </a:pPr>
+                      <a:r>
+                        <a:rPr cap="none" sz="1100" i="0" b="0" u="none">
+                          <a:solidFill>
+                            <a:srgbClr val="000000">
+                              <a:alpha val="100000"/>
+                            </a:srgbClr>
+                          </a:solidFill>
+                          <a:latin typeface="Calibri"/>
+                          <a:cs typeface="Calibri"/>
+                          <a:ea typeface="Calibri"/>
+                          <a:sym typeface="Calibri"/>
+                        </a:rPr>
+                        <a:t>Decile 8</a:t>
+                      </a:r>
+                    </a:p>
+                  </a:txBody>
+                  <a:tcPr anchor="t" marB="63500" marT="63500" marR="0" marL="0">
+                    <a:lnL algn="ctr" cmpd="sng" cap="flat" w="0">
+                      <a:noFill/>
+                      <a:prstDash val="solid"/>
+                    </a:lnL>
+                    <a:lnR algn="ctr" cmpd="sng" cap="flat" w="0">
+                      <a:noFill/>
+                      <a:prstDash val="solid"/>
+                    </a:lnR>
+                    <a:lnT algn="ctr" cmpd="sng" cap="flat" w="0">
+                      <a:noFill/>
+                      <a:prstDash val="solid"/>
+                    </a:lnT>
+                    <a:lnB algn="ctr" cmpd="sng" cap="flat" w="0">
+                      <a:noFill/>
+                      <a:prstDash val="solid"/>
+                    </a:lnB>
+                    <a:solidFill>
+                      <a:srgbClr val="FFFFFF">
+                        <a:alpha val="0"/>
+                      </a:srgbClr>
+                    </a:solidFill>
+                  </a:tcPr>
+                </a:tc>
+              </a:tr>
+              <a:tr h="182880">
+                <a:tc>
+                  <a:txBody>
+                    <a:bodyPr/>
+                    <a:lstStyle/>
+                    <a:p>
+                      <a:pPr algn="l" marL="63500" marR="63500">
+                        <a:lnSpc>
+                          <a:spcPct val="100000"/>
+                        </a:lnSpc>
+                        <a:spcBef>
+                          <a:spcPts val="500"/>
+                        </a:spcBef>
+                        <a:spcAft>
+                          <a:spcPts val="500"/>
+                        </a:spcAft>
+                        <a:buNone/>
+                      </a:pPr>
+                      <a:r>
+                        <a:rPr cap="none" sz="1100" i="0" b="0" u="none">
+                          <a:solidFill>
+                            <a:srgbClr val="000000">
+                              <a:alpha val="100000"/>
+                            </a:srgbClr>
+                          </a:solidFill>
+                          <a:latin typeface="Calibri"/>
+                          <a:cs typeface="Calibri"/>
+                          <a:ea typeface="Calibri"/>
+                          <a:sym typeface="Calibri"/>
+                        </a:rPr>
+                        <a:t>Chichester</a:t>
+                      </a:r>
+                    </a:p>
+                  </a:txBody>
+                  <a:tcPr anchor="t" marB="63500" marT="63500" marR="0" marL="0">
+                    <a:lnL algn="ctr" cmpd="sng" cap="flat" w="0">
+                      <a:noFill/>
+                      <a:prstDash val="solid"/>
+                    </a:lnL>
+                    <a:lnR algn="ctr" cmpd="sng" cap="flat" w="0">
+                      <a:noFill/>
+                      <a:prstDash val="solid"/>
+                    </a:lnR>
+                    <a:lnT algn="ctr" cmpd="sng" cap="flat" w="0">
+                      <a:noFill/>
+                      <a:prstDash val="solid"/>
+                    </a:lnT>
+                    <a:lnB algn="ctr" cmpd="sng" cap="flat" w="0">
+                      <a:noFill/>
+                      <a:prstDash val="solid"/>
+                    </a:lnB>
+                    <a:solidFill>
+                      <a:srgbClr val="FFFFFF">
+                        <a:alpha val="0"/>
+                      </a:srgbClr>
+                    </a:solidFill>
+                  </a:tcPr>
+                </a:tc>
+                <a:tc>
+                  <a:txBody>
+                    <a:bodyPr/>
+                    <a:lstStyle/>
+                    <a:p>
+                      <a:pPr algn="l" marL="63500" marR="63500">
+                        <a:lnSpc>
+                          <a:spcPct val="100000"/>
+                        </a:lnSpc>
+                        <a:spcBef>
+                          <a:spcPts val="500"/>
+                        </a:spcBef>
+                        <a:spcAft>
+                          <a:spcPts val="500"/>
+                        </a:spcAft>
+                        <a:buNone/>
+                      </a:pPr>
+                      <a:r>
+                        <a:rPr cap="none" sz="1100" i="0" b="0" u="none">
+                          <a:solidFill>
+                            <a:srgbClr val="000000">
+                              <a:alpha val="100000"/>
+                            </a:srgbClr>
+                          </a:solidFill>
+                          <a:latin typeface="Calibri"/>
+                          <a:cs typeface="Calibri"/>
+                          <a:ea typeface="Calibri"/>
+                          <a:sym typeface="Calibri"/>
+                        </a:rPr>
+                        <a:t>39,420</a:t>
+                      </a:r>
+                    </a:p>
+                  </a:txBody>
+                  <a:tcPr anchor="t" marB="63500" marT="63500" marR="0" marL="0">
+                    <a:lnL algn="ctr" cmpd="sng" cap="flat" w="0">
+                      <a:noFill/>
+                      <a:prstDash val="solid"/>
+                    </a:lnL>
+                    <a:lnR algn="ctr" cmpd="sng" cap="flat" w="0">
+                      <a:noFill/>
+                      <a:prstDash val="solid"/>
+                    </a:lnR>
+                    <a:lnT algn="ctr" cmpd="sng" cap="flat" w="0">
+                      <a:noFill/>
+                      <a:prstDash val="solid"/>
+                    </a:lnT>
+                    <a:lnB algn="ctr" cmpd="sng" cap="flat" w="0">
+                      <a:noFill/>
+                      <a:prstDash val="solid"/>
+                    </a:lnB>
+                    <a:solidFill>
+                      <a:srgbClr val="FFFFFF">
+                        <a:alpha val="0"/>
+                      </a:srgbClr>
+                    </a:solidFill>
+                  </a:tcPr>
+                </a:tc>
+                <a:tc>
+                  <a:txBody>
+                    <a:bodyPr/>
+                    <a:lstStyle/>
+                    <a:p>
+                      <a:pPr algn="l" marL="63500" marR="63500">
+                        <a:lnSpc>
+                          <a:spcPct val="100000"/>
+                        </a:lnSpc>
+                        <a:spcBef>
+                          <a:spcPts val="500"/>
+                        </a:spcBef>
+                        <a:spcAft>
+                          <a:spcPts val="500"/>
+                        </a:spcAft>
+                        <a:buNone/>
+                      </a:pPr>
+                      <a:r>
+                        <a:rPr cap="none" sz="1100" i="0" b="0" u="none">
+                          <a:solidFill>
+                            <a:srgbClr val="000000">
+                              <a:alpha val="100000"/>
+                            </a:srgbClr>
+                          </a:solidFill>
+                          <a:latin typeface="Calibri"/>
+                          <a:cs typeface="Calibri"/>
+                          <a:ea typeface="Calibri"/>
+                          <a:sym typeface="Calibri"/>
+                        </a:rPr>
+                        <a:t>32,442.3</a:t>
+                      </a:r>
+                    </a:p>
+                  </a:txBody>
+                  <a:tcPr anchor="t" marB="63500" marT="63500" marR="0" marL="0">
+                    <a:lnL algn="ctr" cmpd="sng" cap="flat" w="0">
+                      <a:noFill/>
+                      <a:prstDash val="solid"/>
+                    </a:lnL>
+                    <a:lnR algn="ctr" cmpd="sng" cap="flat" w="0">
+                      <a:noFill/>
+                      <a:prstDash val="solid"/>
+                    </a:lnR>
+                    <a:lnT algn="ctr" cmpd="sng" cap="flat" w="0">
+                      <a:noFill/>
+                      <a:prstDash val="solid"/>
+                    </a:lnT>
+                    <a:lnB algn="ctr" cmpd="sng" cap="flat" w="0">
+                      <a:noFill/>
+                      <a:prstDash val="solid"/>
+                    </a:lnB>
+                    <a:solidFill>
+                      <a:srgbClr val="FFFFFF">
+                        <a:alpha val="0"/>
+                      </a:srgbClr>
+                    </a:solidFill>
+                  </a:tcPr>
+                </a:tc>
+                <a:tc>
+                  <a:txBody>
+                    <a:bodyPr/>
+                    <a:lstStyle/>
+                    <a:p>
+                      <a:pPr algn="l" marL="63500" marR="63500">
+                        <a:lnSpc>
+                          <a:spcPct val="100000"/>
+                        </a:lnSpc>
+                        <a:spcBef>
+                          <a:spcPts val="500"/>
+                        </a:spcBef>
+                        <a:spcAft>
+                          <a:spcPts val="500"/>
+                        </a:spcAft>
+                        <a:buNone/>
+                      </a:pPr>
+                      <a:r>
+                        <a:rPr cap="none" sz="1100" i="0" b="0" u="none">
+                          <a:solidFill>
+                            <a:srgbClr val="000000">
+                              <a:alpha val="100000"/>
+                            </a:srgbClr>
+                          </a:solidFill>
+                          <a:latin typeface="Calibri"/>
+                          <a:cs typeface="Calibri"/>
+                          <a:ea typeface="Calibri"/>
+                          <a:sym typeface="Calibri"/>
+                        </a:rPr>
+                        <a:t>270th</a:t>
                       </a:r>
                     </a:p>
                   </a:txBody>
@@ -11223,7 +11824,7 @@
                           <a:ea typeface="Calibri"/>
                           <a:sym typeface="Calibri"/>
                         </a:rPr>
-                        <a:t>Arun</a:t>
+                        <a:t>Crawley</a:t>
                       </a:r>
                     </a:p>
                   </a:txBody>
@@ -11280,7 +11881,7 @@
                           <a:ea typeface="Calibri"/>
                           <a:sym typeface="Calibri"/>
                         </a:rPr>
-                        <a:t>54,116</a:t>
+                        <a:t>43,957</a:t>
                       </a:r>
                     </a:p>
                   </a:txBody>
@@ -11337,581 +11938,7 @@
                           <a:ea typeface="Calibri"/>
                           <a:sym typeface="Calibri"/>
                         </a:rPr>
-                        <a:t>33,586.8</a:t>
-                      </a:r>
-                    </a:p>
-                  </a:txBody>
-                  <a:tcPr anchor="t" marB="63500" marT="63500" marR="0" marL="0">
-                    <a:lnL algn="ctr" cmpd="sng" cap="flat" w="0">
-                      <a:noFill/>
-                      <a:prstDash val="solid"/>
-                    </a:lnL>
-                    <a:lnR algn="ctr" cmpd="sng" cap="flat" w="0">
-                      <a:noFill/>
-                      <a:prstDash val="solid"/>
-                    </a:lnR>
-                    <a:lnT algn="ctr" cmpd="sng" cap="flat" w="0">
-                      <a:noFill/>
-                      <a:prstDash val="solid"/>
-                    </a:lnT>
-                    <a:lnB algn="ctr" cmpd="sng" cap="flat" w="0">
-                      <a:noFill/>
-                      <a:prstDash val="solid"/>
-                    </a:lnB>
-                    <a:solidFill>
-                      <a:srgbClr val="FFFFFF">
-                        <a:alpha val="0"/>
-                      </a:srgbClr>
-                    </a:solidFill>
-                  </a:tcPr>
-                </a:tc>
-                <a:tc>
-                  <a:txBody>
-                    <a:bodyPr/>
-                    <a:lstStyle/>
-                    <a:p>
-                      <a:pPr algn="l" marL="63500" marR="63500">
-                        <a:lnSpc>
-                          <a:spcPct val="100000"/>
-                        </a:lnSpc>
-                        <a:spcBef>
-                          <a:spcPts val="500"/>
-                        </a:spcBef>
-                        <a:spcAft>
-                          <a:spcPts val="500"/>
-                        </a:spcAft>
-                        <a:buNone/>
-                      </a:pPr>
-                      <a:r>
-                        <a:rPr cap="none" sz="1100" i="0" b="0" u="none">
-                          <a:solidFill>
-                            <a:srgbClr val="000000">
-                              <a:alpha val="100000"/>
-                            </a:srgbClr>
-                          </a:solidFill>
-                          <a:latin typeface="Calibri"/>
-                          <a:cs typeface="Calibri"/>
-                          <a:ea typeface="Calibri"/>
-                          <a:sym typeface="Calibri"/>
-                        </a:rPr>
-                        <a:t>248th</a:t>
-                      </a:r>
-                    </a:p>
-                  </a:txBody>
-                  <a:tcPr anchor="t" marB="63500" marT="63500" marR="0" marL="0">
-                    <a:lnL algn="ctr" cmpd="sng" cap="flat" w="0">
-                      <a:noFill/>
-                      <a:prstDash val="solid"/>
-                    </a:lnL>
-                    <a:lnR algn="ctr" cmpd="sng" cap="flat" w="0">
-                      <a:noFill/>
-                      <a:prstDash val="solid"/>
-                    </a:lnR>
-                    <a:lnT algn="ctr" cmpd="sng" cap="flat" w="0">
-                      <a:noFill/>
-                      <a:prstDash val="solid"/>
-                    </a:lnT>
-                    <a:lnB algn="ctr" cmpd="sng" cap="flat" w="0">
-                      <a:noFill/>
-                      <a:prstDash val="solid"/>
-                    </a:lnB>
-                    <a:solidFill>
-                      <a:srgbClr val="FFFFFF">
-                        <a:alpha val="0"/>
-                      </a:srgbClr>
-                    </a:solidFill>
-                  </a:tcPr>
-                </a:tc>
-                <a:tc>
-                  <a:txBody>
-                    <a:bodyPr/>
-                    <a:lstStyle/>
-                    <a:p>
-                      <a:pPr algn="l" marL="63500" marR="63500">
-                        <a:lnSpc>
-                          <a:spcPct val="100000"/>
-                        </a:lnSpc>
-                        <a:spcBef>
-                          <a:spcPts val="500"/>
-                        </a:spcBef>
-                        <a:spcAft>
-                          <a:spcPts val="500"/>
-                        </a:spcAft>
-                        <a:buNone/>
-                      </a:pPr>
-                      <a:r>
-                        <a:rPr cap="none" sz="1100" i="0" b="0" u="none">
-                          <a:solidFill>
-                            <a:srgbClr val="000000">
-                              <a:alpha val="100000"/>
-                            </a:srgbClr>
-                          </a:solidFill>
-                          <a:latin typeface="Calibri"/>
-                          <a:cs typeface="Calibri"/>
-                          <a:ea typeface="Calibri"/>
-                          <a:sym typeface="Calibri"/>
-                        </a:rPr>
-                        <a:t>Decile 8</a:t>
-                      </a:r>
-                    </a:p>
-                  </a:txBody>
-                  <a:tcPr anchor="t" marB="63500" marT="63500" marR="0" marL="0">
-                    <a:lnL algn="ctr" cmpd="sng" cap="flat" w="0">
-                      <a:noFill/>
-                      <a:prstDash val="solid"/>
-                    </a:lnL>
-                    <a:lnR algn="ctr" cmpd="sng" cap="flat" w="0">
-                      <a:noFill/>
-                      <a:prstDash val="solid"/>
-                    </a:lnR>
-                    <a:lnT algn="ctr" cmpd="sng" cap="flat" w="0">
-                      <a:noFill/>
-                      <a:prstDash val="solid"/>
-                    </a:lnT>
-                    <a:lnB algn="ctr" cmpd="sng" cap="flat" w="0">
-                      <a:noFill/>
-                      <a:prstDash val="solid"/>
-                    </a:lnB>
-                    <a:solidFill>
-                      <a:srgbClr val="FFFFFF">
-                        <a:alpha val="0"/>
-                      </a:srgbClr>
-                    </a:solidFill>
-                  </a:tcPr>
-                </a:tc>
-              </a:tr>
-              <a:tr h="182880">
-                <a:tc>
-                  <a:txBody>
-                    <a:bodyPr/>
-                    <a:lstStyle/>
-                    <a:p>
-                      <a:pPr algn="l" marL="63500" marR="63500">
-                        <a:lnSpc>
-                          <a:spcPct val="100000"/>
-                        </a:lnSpc>
-                        <a:spcBef>
-                          <a:spcPts val="500"/>
-                        </a:spcBef>
-                        <a:spcAft>
-                          <a:spcPts val="500"/>
-                        </a:spcAft>
-                        <a:buNone/>
-                      </a:pPr>
-                      <a:r>
-                        <a:rPr cap="none" sz="1100" i="0" b="0" u="none">
-                          <a:solidFill>
-                            <a:srgbClr val="000000">
-                              <a:alpha val="100000"/>
-                            </a:srgbClr>
-                          </a:solidFill>
-                          <a:latin typeface="Calibri"/>
-                          <a:cs typeface="Calibri"/>
-                          <a:ea typeface="Calibri"/>
-                          <a:sym typeface="Calibri"/>
-                        </a:rPr>
-                        <a:t>Chichester</a:t>
-                      </a:r>
-                    </a:p>
-                  </a:txBody>
-                  <a:tcPr anchor="t" marB="63500" marT="63500" marR="0" marL="0">
-                    <a:lnL algn="ctr" cmpd="sng" cap="flat" w="0">
-                      <a:noFill/>
-                      <a:prstDash val="solid"/>
-                    </a:lnL>
-                    <a:lnR algn="ctr" cmpd="sng" cap="flat" w="0">
-                      <a:noFill/>
-                      <a:prstDash val="solid"/>
-                    </a:lnR>
-                    <a:lnT algn="ctr" cmpd="sng" cap="flat" w="0">
-                      <a:noFill/>
-                      <a:prstDash val="solid"/>
-                    </a:lnT>
-                    <a:lnB algn="ctr" cmpd="sng" cap="flat" w="0">
-                      <a:noFill/>
-                      <a:prstDash val="solid"/>
-                    </a:lnB>
-                    <a:solidFill>
-                      <a:srgbClr val="FFFFFF">
-                        <a:alpha val="0"/>
-                      </a:srgbClr>
-                    </a:solidFill>
-                  </a:tcPr>
-                </a:tc>
-                <a:tc>
-                  <a:txBody>
-                    <a:bodyPr/>
-                    <a:lstStyle/>
-                    <a:p>
-                      <a:pPr algn="l" marL="63500" marR="63500">
-                        <a:lnSpc>
-                          <a:spcPct val="100000"/>
-                        </a:lnSpc>
-                        <a:spcBef>
-                          <a:spcPts val="500"/>
-                        </a:spcBef>
-                        <a:spcAft>
-                          <a:spcPts val="500"/>
-                        </a:spcAft>
-                        <a:buNone/>
-                      </a:pPr>
-                      <a:r>
-                        <a:rPr cap="none" sz="1100" i="0" b="0" u="none">
-                          <a:solidFill>
-                            <a:srgbClr val="000000">
-                              <a:alpha val="100000"/>
-                            </a:srgbClr>
-                          </a:solidFill>
-                          <a:latin typeface="Calibri"/>
-                          <a:cs typeface="Calibri"/>
-                          <a:ea typeface="Calibri"/>
-                          <a:sym typeface="Calibri"/>
-                        </a:rPr>
-                        <a:t>39,357</a:t>
-                      </a:r>
-                    </a:p>
-                  </a:txBody>
-                  <a:tcPr anchor="t" marB="63500" marT="63500" marR="0" marL="0">
-                    <a:lnL algn="ctr" cmpd="sng" cap="flat" w="0">
-                      <a:noFill/>
-                      <a:prstDash val="solid"/>
-                    </a:lnL>
-                    <a:lnR algn="ctr" cmpd="sng" cap="flat" w="0">
-                      <a:noFill/>
-                      <a:prstDash val="solid"/>
-                    </a:lnR>
-                    <a:lnT algn="ctr" cmpd="sng" cap="flat" w="0">
-                      <a:noFill/>
-                      <a:prstDash val="solid"/>
-                    </a:lnT>
-                    <a:lnB algn="ctr" cmpd="sng" cap="flat" w="0">
-                      <a:noFill/>
-                      <a:prstDash val="solid"/>
-                    </a:lnB>
-                    <a:solidFill>
-                      <a:srgbClr val="FFFFFF">
-                        <a:alpha val="0"/>
-                      </a:srgbClr>
-                    </a:solidFill>
-                  </a:tcPr>
-                </a:tc>
-                <a:tc>
-                  <a:txBody>
-                    <a:bodyPr/>
-                    <a:lstStyle/>
-                    <a:p>
-                      <a:pPr algn="l" marL="63500" marR="63500">
-                        <a:lnSpc>
-                          <a:spcPct val="100000"/>
-                        </a:lnSpc>
-                        <a:spcBef>
-                          <a:spcPts val="500"/>
-                        </a:spcBef>
-                        <a:spcAft>
-                          <a:spcPts val="500"/>
-                        </a:spcAft>
-                        <a:buNone/>
-                      </a:pPr>
-                      <a:r>
-                        <a:rPr cap="none" sz="1100" i="0" b="0" u="none">
-                          <a:solidFill>
-                            <a:srgbClr val="000000">
-                              <a:alpha val="100000"/>
-                            </a:srgbClr>
-                          </a:solidFill>
-                          <a:latin typeface="Calibri"/>
-                          <a:cs typeface="Calibri"/>
-                          <a:ea typeface="Calibri"/>
-                          <a:sym typeface="Calibri"/>
-                        </a:rPr>
-                        <a:t>32,390.5</a:t>
-                      </a:r>
-                    </a:p>
-                  </a:txBody>
-                  <a:tcPr anchor="t" marB="63500" marT="63500" marR="0" marL="0">
-                    <a:lnL algn="ctr" cmpd="sng" cap="flat" w="0">
-                      <a:noFill/>
-                      <a:prstDash val="solid"/>
-                    </a:lnL>
-                    <a:lnR algn="ctr" cmpd="sng" cap="flat" w="0">
-                      <a:noFill/>
-                      <a:prstDash val="solid"/>
-                    </a:lnR>
-                    <a:lnT algn="ctr" cmpd="sng" cap="flat" w="0">
-                      <a:noFill/>
-                      <a:prstDash val="solid"/>
-                    </a:lnT>
-                    <a:lnB algn="ctr" cmpd="sng" cap="flat" w="0">
-                      <a:noFill/>
-                      <a:prstDash val="solid"/>
-                    </a:lnB>
-                    <a:solidFill>
-                      <a:srgbClr val="FFFFFF">
-                        <a:alpha val="0"/>
-                      </a:srgbClr>
-                    </a:solidFill>
-                  </a:tcPr>
-                </a:tc>
-                <a:tc>
-                  <a:txBody>
-                    <a:bodyPr/>
-                    <a:lstStyle/>
-                    <a:p>
-                      <a:pPr algn="l" marL="63500" marR="63500">
-                        <a:lnSpc>
-                          <a:spcPct val="100000"/>
-                        </a:lnSpc>
-                        <a:spcBef>
-                          <a:spcPts val="500"/>
-                        </a:spcBef>
-                        <a:spcAft>
-                          <a:spcPts val="500"/>
-                        </a:spcAft>
-                        <a:buNone/>
-                      </a:pPr>
-                      <a:r>
-                        <a:rPr cap="none" sz="1100" i="0" b="0" u="none">
-                          <a:solidFill>
-                            <a:srgbClr val="000000">
-                              <a:alpha val="100000"/>
-                            </a:srgbClr>
-                          </a:solidFill>
-                          <a:latin typeface="Calibri"/>
-                          <a:cs typeface="Calibri"/>
-                          <a:ea typeface="Calibri"/>
-                          <a:sym typeface="Calibri"/>
-                        </a:rPr>
-                        <a:t>270th</a:t>
-                      </a:r>
-                    </a:p>
-                  </a:txBody>
-                  <a:tcPr anchor="t" marB="63500" marT="63500" marR="0" marL="0">
-                    <a:lnL algn="ctr" cmpd="sng" cap="flat" w="0">
-                      <a:noFill/>
-                      <a:prstDash val="solid"/>
-                    </a:lnL>
-                    <a:lnR algn="ctr" cmpd="sng" cap="flat" w="0">
-                      <a:noFill/>
-                      <a:prstDash val="solid"/>
-                    </a:lnR>
-                    <a:lnT algn="ctr" cmpd="sng" cap="flat" w="0">
-                      <a:noFill/>
-                      <a:prstDash val="solid"/>
-                    </a:lnT>
-                    <a:lnB algn="ctr" cmpd="sng" cap="flat" w="0">
-                      <a:noFill/>
-                      <a:prstDash val="solid"/>
-                    </a:lnB>
-                    <a:solidFill>
-                      <a:srgbClr val="FFFFFF">
-                        <a:alpha val="0"/>
-                      </a:srgbClr>
-                    </a:solidFill>
-                  </a:tcPr>
-                </a:tc>
-                <a:tc>
-                  <a:txBody>
-                    <a:bodyPr/>
-                    <a:lstStyle/>
-                    <a:p>
-                      <a:pPr algn="l" marL="63500" marR="63500">
-                        <a:lnSpc>
-                          <a:spcPct val="100000"/>
-                        </a:lnSpc>
-                        <a:spcBef>
-                          <a:spcPts val="500"/>
-                        </a:spcBef>
-                        <a:spcAft>
-                          <a:spcPts val="500"/>
-                        </a:spcAft>
-                        <a:buNone/>
-                      </a:pPr>
-                      <a:r>
-                        <a:rPr cap="none" sz="1100" i="0" b="0" u="none">
-                          <a:solidFill>
-                            <a:srgbClr val="000000">
-                              <a:alpha val="100000"/>
-                            </a:srgbClr>
-                          </a:solidFill>
-                          <a:latin typeface="Calibri"/>
-                          <a:cs typeface="Calibri"/>
-                          <a:ea typeface="Calibri"/>
-                          <a:sym typeface="Calibri"/>
-                        </a:rPr>
-                        <a:t>Decile 9</a:t>
-                      </a:r>
-                    </a:p>
-                  </a:txBody>
-                  <a:tcPr anchor="t" marB="63500" marT="63500" marR="0" marL="0">
-                    <a:lnL algn="ctr" cmpd="sng" cap="flat" w="0">
-                      <a:noFill/>
-                      <a:prstDash val="solid"/>
-                    </a:lnL>
-                    <a:lnR algn="ctr" cmpd="sng" cap="flat" w="0">
-                      <a:noFill/>
-                      <a:prstDash val="solid"/>
-                    </a:lnR>
-                    <a:lnT algn="ctr" cmpd="sng" cap="flat" w="0">
-                      <a:noFill/>
-                      <a:prstDash val="solid"/>
-                    </a:lnT>
-                    <a:lnB algn="ctr" cmpd="sng" cap="flat" w="0">
-                      <a:noFill/>
-                      <a:prstDash val="solid"/>
-                    </a:lnB>
-                    <a:solidFill>
-                      <a:srgbClr val="FFFFFF">
-                        <a:alpha val="0"/>
-                      </a:srgbClr>
-                    </a:solidFill>
-                  </a:tcPr>
-                </a:tc>
-              </a:tr>
-              <a:tr h="182880">
-                <a:tc>
-                  <a:txBody>
-                    <a:bodyPr/>
-                    <a:lstStyle/>
-                    <a:p>
-                      <a:pPr algn="l" marL="63500" marR="63500">
-                        <a:lnSpc>
-                          <a:spcPct val="100000"/>
-                        </a:lnSpc>
-                        <a:spcBef>
-                          <a:spcPts val="500"/>
-                        </a:spcBef>
-                        <a:spcAft>
-                          <a:spcPts val="500"/>
-                        </a:spcAft>
-                        <a:buNone/>
-                      </a:pPr>
-                      <a:r>
-                        <a:rPr cap="none" sz="1100" i="0" b="0" u="none">
-                          <a:solidFill>
-                            <a:srgbClr val="000000">
-                              <a:alpha val="100000"/>
-                            </a:srgbClr>
-                          </a:solidFill>
-                          <a:latin typeface="Calibri"/>
-                          <a:cs typeface="Calibri"/>
-                          <a:ea typeface="Calibri"/>
-                          <a:sym typeface="Calibri"/>
-                        </a:rPr>
-                        <a:t>Crawley</a:t>
-                      </a:r>
-                    </a:p>
-                  </a:txBody>
-                  <a:tcPr anchor="t" marB="63500" marT="63500" marR="0" marL="0">
-                    <a:lnL algn="ctr" cmpd="sng" cap="flat" w="0">
-                      <a:noFill/>
-                      <a:prstDash val="solid"/>
-                    </a:lnL>
-                    <a:lnR algn="ctr" cmpd="sng" cap="flat" w="0">
-                      <a:noFill/>
-                      <a:prstDash val="solid"/>
-                    </a:lnR>
-                    <a:lnT algn="ctr" cmpd="sng" cap="flat" w="0">
-                      <a:noFill/>
-                      <a:prstDash val="solid"/>
-                    </a:lnT>
-                    <a:lnB algn="ctr" cmpd="sng" cap="flat" w="0">
-                      <a:noFill/>
-                      <a:prstDash val="solid"/>
-                    </a:lnB>
-                    <a:solidFill>
-                      <a:srgbClr val="FFFFFF">
-                        <a:alpha val="0"/>
-                      </a:srgbClr>
-                    </a:solidFill>
-                  </a:tcPr>
-                </a:tc>
-                <a:tc>
-                  <a:txBody>
-                    <a:bodyPr/>
-                    <a:lstStyle/>
-                    <a:p>
-                      <a:pPr algn="l" marL="63500" marR="63500">
-                        <a:lnSpc>
-                          <a:spcPct val="100000"/>
-                        </a:lnSpc>
-                        <a:spcBef>
-                          <a:spcPts val="500"/>
-                        </a:spcBef>
-                        <a:spcAft>
-                          <a:spcPts val="500"/>
-                        </a:spcAft>
-                        <a:buNone/>
-                      </a:pPr>
-                      <a:r>
-                        <a:rPr cap="none" sz="1100" i="0" b="0" u="none">
-                          <a:solidFill>
-                            <a:srgbClr val="000000">
-                              <a:alpha val="100000"/>
-                            </a:srgbClr>
-                          </a:solidFill>
-                          <a:latin typeface="Calibri"/>
-                          <a:cs typeface="Calibri"/>
-                          <a:ea typeface="Calibri"/>
-                          <a:sym typeface="Calibri"/>
-                        </a:rPr>
-                        <a:t>43,901</a:t>
-                      </a:r>
-                    </a:p>
-                  </a:txBody>
-                  <a:tcPr anchor="t" marB="63500" marT="63500" marR="0" marL="0">
-                    <a:lnL algn="ctr" cmpd="sng" cap="flat" w="0">
-                      <a:noFill/>
-                      <a:prstDash val="solid"/>
-                    </a:lnL>
-                    <a:lnR algn="ctr" cmpd="sng" cap="flat" w="0">
-                      <a:noFill/>
-                      <a:prstDash val="solid"/>
-                    </a:lnR>
-                    <a:lnT algn="ctr" cmpd="sng" cap="flat" w="0">
-                      <a:noFill/>
-                      <a:prstDash val="solid"/>
-                    </a:lnT>
-                    <a:lnB algn="ctr" cmpd="sng" cap="flat" w="0">
-                      <a:noFill/>
-                      <a:prstDash val="solid"/>
-                    </a:lnB>
-                    <a:solidFill>
-                      <a:srgbClr val="FFFFFF">
-                        <a:alpha val="0"/>
-                      </a:srgbClr>
-                    </a:solidFill>
-                  </a:tcPr>
-                </a:tc>
-                <a:tc>
-                  <a:txBody>
-                    <a:bodyPr/>
-                    <a:lstStyle/>
-                    <a:p>
-                      <a:pPr algn="l" marL="63500" marR="63500">
-                        <a:lnSpc>
-                          <a:spcPct val="100000"/>
-                        </a:lnSpc>
-                        <a:spcBef>
-                          <a:spcPts val="500"/>
-                        </a:spcBef>
-                        <a:spcAft>
-                          <a:spcPts val="500"/>
-                        </a:spcAft>
-                        <a:buNone/>
-                      </a:pPr>
-                      <a:r>
-                        <a:rPr cap="none" sz="1100" i="0" b="0" u="none">
-                          <a:solidFill>
-                            <a:srgbClr val="000000">
-                              <a:alpha val="100000"/>
-                            </a:srgbClr>
-                          </a:solidFill>
-                          <a:latin typeface="Calibri"/>
-                          <a:cs typeface="Calibri"/>
-                          <a:ea typeface="Calibri"/>
-                          <a:sym typeface="Calibri"/>
-                        </a:rPr>
-                        <a:t>39,032.1</a:t>
+                        <a:t>39,081.9</a:t>
                       </a:r>
                     </a:p>
                   </a:txBody>
@@ -12168,7 +12195,7 @@
                           <a:ea typeface="Calibri"/>
                           <a:sym typeface="Calibri"/>
                         </a:rPr>
-                        <a:t>49,521</a:t>
+                        <a:t>49,612</a:t>
                       </a:r>
                     </a:p>
                   </a:txBody>
@@ -12225,7 +12252,7 @@
                           <a:ea typeface="Calibri"/>
                           <a:sym typeface="Calibri"/>
                         </a:rPr>
-                        <a:t>34,041.1</a:t>
+                        <a:t>34,103.7</a:t>
                       </a:r>
                     </a:p>
                   </a:txBody>
@@ -12455,7 +12482,7 @@
                           <a:ea typeface="Calibri"/>
                           <a:sym typeface="Calibri"/>
                         </a:rPr>
-                        <a:t>56,059</a:t>
+                        <a:t>56,142</a:t>
                       </a:r>
                     </a:p>
                   </a:txBody>
@@ -12512,7 +12539,7 @@
                           <a:ea typeface="Calibri"/>
                           <a:sym typeface="Calibri"/>
                         </a:rPr>
-                        <a:t>36,846.5</a:t>
+                        <a:t>36,901.1</a:t>
                       </a:r>
                     </a:p>
                   </a:txBody>
@@ -12742,7 +12769,7 @@
                           <a:ea typeface="Calibri"/>
                           <a:sym typeface="Calibri"/>
                         </a:rPr>
-                        <a:t>38,673</a:t>
+                        <a:t>38,743</a:t>
                       </a:r>
                     </a:p>
                   </a:txBody>
@@ -12799,7 +12826,7 @@
                           <a:ea typeface="Calibri"/>
                           <a:sym typeface="Calibri"/>
                         </a:rPr>
-                        <a:t>34,926.4</a:t>
+                        <a:t>34,989.7</a:t>
                       </a:r>
                     </a:p>
                   </a:txBody>
@@ -13029,7 +13056,7 @@
                           <a:ea typeface="Calibri"/>
                           <a:sym typeface="Calibri"/>
                         </a:rPr>
-                        <a:t>303,093</a:t>
+                        <a:t>303,619</a:t>
                       </a:r>
                     </a:p>
                   </a:txBody>
@@ -13086,7 +13113,7 @@
                           <a:ea typeface="Calibri"/>
                           <a:sym typeface="Calibri"/>
                         </a:rPr>
-                        <a:t>34,933.2</a:t>
+                        <a:t>34,993.9</a:t>
                       </a:r>
                     </a:p>
                   </a:txBody>
@@ -13316,7 +13343,7 @@
                           <a:ea typeface="Calibri"/>
                           <a:sym typeface="Calibri"/>
                         </a:rPr>
-                        <a:t>3,300,075</a:t>
+                        <a:t>3,304,811</a:t>
                       </a:r>
                     </a:p>
                   </a:txBody>
@@ -13373,7 +13400,7 @@
                           <a:ea typeface="Calibri"/>
                           <a:sym typeface="Calibri"/>
                         </a:rPr>
-                        <a:t>35,803.2</a:t>
+                        <a:t>35,854.6</a:t>
                       </a:r>
                     </a:p>
                   </a:txBody>
@@ -13607,7 +13634,7 @@
                           <a:ea typeface="Calibri"/>
                           <a:sym typeface="Calibri"/>
                         </a:rPr>
-                        <a:t>20,291,473</a:t>
+                        <a:t>20,317,848</a:t>
                       </a:r>
                     </a:p>
                   </a:txBody>
@@ -13668,7 +13695,7 @@
                           <a:ea typeface="Calibri"/>
                           <a:sym typeface="Calibri"/>
                         </a:rPr>
-                        <a:t>35,882.3</a:t>
+                        <a:t>35,928.9</a:t>
                       </a:r>
                     </a:p>
                   </a:txBody>
@@ -13900,7 +13927,7 @@
           <a:p>
             <a:r>
               <a:rPr/>
-              <a:t>Pack date: 02 December 2022</a:t>
+              <a:t>Pack date: 12 December 2022</a:t>
             </a:r>
           </a:p>
         </p:txBody>
@@ -13981,7 +14008,7 @@
           <a:p>
             <a:r>
               <a:rPr/>
-              <a:t>Lower Tier Local Authority rolling cases as at 01 December</a:t>
+              <a:t>Lower Tier Local Authority rolling cases as at 08 December</a:t>
             </a:r>
           </a:p>
         </p:txBody>
@@ -14062,7 +14089,7 @@
           <a:p>
             <a:r>
               <a:rPr/>
-              <a:t>Note that the very recent days are excluded in the 7-day total as these are thought to be incomplete. As such, this data represents cases in the seven days to 26 November</a:t>
+              <a:t>Note that the very recent days are excluded in the 7-day total as these are thought to be incomplete. As such, this data represents cases in the seven days to 03 December</a:t>
             </a:r>
           </a:p>
         </p:txBody>
@@ -14504,7 +14531,7 @@
                           <a:ea typeface="Calibri"/>
                           <a:sym typeface="Calibri"/>
                         </a:rPr>
-                        <a:t>16</a:t>
+                        <a:t>31</a:t>
                       </a:r>
                     </a:p>
                   </a:txBody>
@@ -14561,7 +14588,7 @@
                           <a:ea typeface="Calibri"/>
                           <a:sym typeface="Calibri"/>
                         </a:rPr>
-                        <a:t>24.9</a:t>
+                        <a:t>48.3</a:t>
                       </a:r>
                     </a:p>
                   </a:txBody>
@@ -14618,7 +14645,7 @@
                           <a:ea typeface="Calibri"/>
                           <a:sym typeface="Calibri"/>
                         </a:rPr>
-                        <a:t>293rd</a:t>
+                        <a:t>79th</a:t>
                       </a:r>
                     </a:p>
                   </a:txBody>
@@ -14675,34 +14702,7 @@
                           <a:ea typeface="Calibri"/>
                           <a:sym typeface="Calibri"/>
                         </a:rPr>
-                        <a:t>10% of authorities</a:t>
-                      </a:r>
-                      <a:br>
-                        <a:rPr cap="none" sz="1100" i="0" b="0" u="none">
-                          <a:solidFill>
-                            <a:srgbClr val="000000">
-                              <a:alpha val="100000"/>
-                            </a:srgbClr>
-                          </a:solidFill>
-                          <a:latin typeface="Calibri"/>
-                          <a:cs typeface="Calibri"/>
-                          <a:ea typeface="Calibri"/>
-                          <a:sym typeface="Calibri"/>
-                        </a:rPr>
-                      </a:br>
-                      <a:r>
-                        <a:rPr cap="none" sz="1100" i="0" b="0" u="none">
-                          <a:solidFill>
-                            <a:srgbClr val="000000">
-                              <a:alpha val="100000"/>
-                            </a:srgbClr>
-                          </a:solidFill>
-                          <a:latin typeface="Calibri"/>
-                          <a:cs typeface="Calibri"/>
-                          <a:ea typeface="Calibri"/>
-                          <a:sym typeface="Calibri"/>
-                        </a:rPr>
-                        <a:t>with lowest rate</a:t>
+                        <a:t>Decile 3</a:t>
                       </a:r>
                     </a:p>
                   </a:txBody>
@@ -14818,7 +14818,7 @@
                           <a:ea typeface="Calibri"/>
                           <a:sym typeface="Calibri"/>
                         </a:rPr>
-                        <a:t>80</a:t>
+                        <a:t>108</a:t>
                       </a:r>
                     </a:p>
                   </a:txBody>
@@ -14875,7 +14875,7 @@
                           <a:ea typeface="Calibri"/>
                           <a:sym typeface="Calibri"/>
                         </a:rPr>
-                        <a:t>49.7</a:t>
+                        <a:t>67.0</a:t>
                       </a:r>
                     </a:p>
                   </a:txBody>
@@ -14932,7 +14932,7 @@
                           <a:ea typeface="Calibri"/>
                           <a:sym typeface="Calibri"/>
                         </a:rPr>
-                        <a:t>29th</a:t>
+                        <a:t>10th</a:t>
                       </a:r>
                     </a:p>
                   </a:txBody>
@@ -15132,7 +15132,7 @@
                           <a:ea typeface="Calibri"/>
                           <a:sym typeface="Calibri"/>
                         </a:rPr>
-                        <a:t>29</a:t>
+                        <a:t>67</a:t>
                       </a:r>
                     </a:p>
                   </a:txBody>
@@ -15189,7 +15189,7 @@
                           <a:ea typeface="Calibri"/>
                           <a:sym typeface="Calibri"/>
                         </a:rPr>
-                        <a:t>23.9</a:t>
+                        <a:t>55.1</a:t>
                       </a:r>
                     </a:p>
                   </a:txBody>
@@ -15246,7 +15246,1155 @@
                           <a:ea typeface="Calibri"/>
                           <a:sym typeface="Calibri"/>
                         </a:rPr>
-                        <a:t>299th</a:t>
+                        <a:t>48th</a:t>
+                      </a:r>
+                    </a:p>
+                  </a:txBody>
+                  <a:tcPr anchor="t" marB="63500" marT="63500" marR="0" marL="0">
+                    <a:lnL algn="ctr" cmpd="sng" cap="flat" w="0">
+                      <a:noFill/>
+                      <a:prstDash val="solid"/>
+                    </a:lnL>
+                    <a:lnR algn="ctr" cmpd="sng" cap="flat" w="0">
+                      <a:noFill/>
+                      <a:prstDash val="solid"/>
+                    </a:lnR>
+                    <a:lnT algn="ctr" cmpd="sng" cap="flat" w="0">
+                      <a:noFill/>
+                      <a:prstDash val="solid"/>
+                    </a:lnT>
+                    <a:lnB algn="ctr" cmpd="sng" cap="flat" w="0">
+                      <a:noFill/>
+                      <a:prstDash val="solid"/>
+                    </a:lnB>
+                    <a:solidFill>
+                      <a:srgbClr val="FFFFFF">
+                        <a:alpha val="0"/>
+                      </a:srgbClr>
+                    </a:solidFill>
+                  </a:tcPr>
+                </a:tc>
+                <a:tc>
+                  <a:txBody>
+                    <a:bodyPr/>
+                    <a:lstStyle/>
+                    <a:p>
+                      <a:pPr algn="l" marL="63500" marR="63500">
+                        <a:lnSpc>
+                          <a:spcPct val="100000"/>
+                        </a:lnSpc>
+                        <a:spcBef>
+                          <a:spcPts val="500"/>
+                        </a:spcBef>
+                        <a:spcAft>
+                          <a:spcPts val="500"/>
+                        </a:spcAft>
+                        <a:buNone/>
+                      </a:pPr>
+                      <a:r>
+                        <a:rPr cap="none" sz="1100" i="0" b="0" u="none">
+                          <a:solidFill>
+                            <a:srgbClr val="000000">
+                              <a:alpha val="100000"/>
+                            </a:srgbClr>
+                          </a:solidFill>
+                          <a:latin typeface="Calibri"/>
+                          <a:cs typeface="Calibri"/>
+                          <a:ea typeface="Calibri"/>
+                          <a:sym typeface="Calibri"/>
+                        </a:rPr>
+                        <a:t>Decile 2</a:t>
+                      </a:r>
+                    </a:p>
+                  </a:txBody>
+                  <a:tcPr anchor="t" marB="63500" marT="63500" marR="0" marL="0">
+                    <a:lnL algn="ctr" cmpd="sng" cap="flat" w="0">
+                      <a:noFill/>
+                      <a:prstDash val="solid"/>
+                    </a:lnL>
+                    <a:lnR algn="ctr" cmpd="sng" cap="flat" w="0">
+                      <a:noFill/>
+                      <a:prstDash val="solid"/>
+                    </a:lnR>
+                    <a:lnT algn="ctr" cmpd="sng" cap="flat" w="0">
+                      <a:noFill/>
+                      <a:prstDash val="solid"/>
+                    </a:lnT>
+                    <a:lnB algn="ctr" cmpd="sng" cap="flat" w="0">
+                      <a:noFill/>
+                      <a:prstDash val="solid"/>
+                    </a:lnB>
+                    <a:solidFill>
+                      <a:srgbClr val="FFFFFF">
+                        <a:alpha val="0"/>
+                      </a:srgbClr>
+                    </a:solidFill>
+                  </a:tcPr>
+                </a:tc>
+              </a:tr>
+              <a:tr h="182880">
+                <a:tc>
+                  <a:txBody>
+                    <a:bodyPr/>
+                    <a:lstStyle/>
+                    <a:p>
+                      <a:pPr algn="l" marL="63500" marR="63500">
+                        <a:lnSpc>
+                          <a:spcPct val="100000"/>
+                        </a:lnSpc>
+                        <a:spcBef>
+                          <a:spcPts val="500"/>
+                        </a:spcBef>
+                        <a:spcAft>
+                          <a:spcPts val="500"/>
+                        </a:spcAft>
+                        <a:buNone/>
+                      </a:pPr>
+                      <a:r>
+                        <a:rPr cap="none" sz="1100" i="0" b="0" u="none">
+                          <a:solidFill>
+                            <a:srgbClr val="000000">
+                              <a:alpha val="100000"/>
+                            </a:srgbClr>
+                          </a:solidFill>
+                          <a:latin typeface="Calibri"/>
+                          <a:cs typeface="Calibri"/>
+                          <a:ea typeface="Calibri"/>
+                          <a:sym typeface="Calibri"/>
+                        </a:rPr>
+                        <a:t>Crawley</a:t>
+                      </a:r>
+                    </a:p>
+                  </a:txBody>
+                  <a:tcPr anchor="t" marB="63500" marT="63500" marR="0" marL="0">
+                    <a:lnL algn="ctr" cmpd="sng" cap="flat" w="0">
+                      <a:noFill/>
+                      <a:prstDash val="solid"/>
+                    </a:lnL>
+                    <a:lnR algn="ctr" cmpd="sng" cap="flat" w="0">
+                      <a:noFill/>
+                      <a:prstDash val="solid"/>
+                    </a:lnR>
+                    <a:lnT algn="ctr" cmpd="sng" cap="flat" w="0">
+                      <a:noFill/>
+                      <a:prstDash val="solid"/>
+                    </a:lnT>
+                    <a:lnB algn="ctr" cmpd="sng" cap="flat" w="0">
+                      <a:noFill/>
+                      <a:prstDash val="solid"/>
+                    </a:lnB>
+                    <a:solidFill>
+                      <a:srgbClr val="FFFFFF">
+                        <a:alpha val="0"/>
+                      </a:srgbClr>
+                    </a:solidFill>
+                  </a:tcPr>
+                </a:tc>
+                <a:tc>
+                  <a:txBody>
+                    <a:bodyPr/>
+                    <a:lstStyle/>
+                    <a:p>
+                      <a:pPr algn="l" marL="63500" marR="63500">
+                        <a:lnSpc>
+                          <a:spcPct val="100000"/>
+                        </a:lnSpc>
+                        <a:spcBef>
+                          <a:spcPts val="500"/>
+                        </a:spcBef>
+                        <a:spcAft>
+                          <a:spcPts val="500"/>
+                        </a:spcAft>
+                        <a:buNone/>
+                      </a:pPr>
+                      <a:r>
+                        <a:rPr cap="none" sz="1100" i="0" b="0" u="none">
+                          <a:solidFill>
+                            <a:srgbClr val="000000">
+                              <a:alpha val="100000"/>
+                            </a:srgbClr>
+                          </a:solidFill>
+                          <a:latin typeface="Calibri"/>
+                          <a:cs typeface="Calibri"/>
+                          <a:ea typeface="Calibri"/>
+                          <a:sym typeface="Calibri"/>
+                        </a:rPr>
+                        <a:t>50</a:t>
+                      </a:r>
+                    </a:p>
+                  </a:txBody>
+                  <a:tcPr anchor="t" marB="63500" marT="63500" marR="0" marL="0">
+                    <a:lnL algn="ctr" cmpd="sng" cap="flat" w="0">
+                      <a:noFill/>
+                      <a:prstDash val="solid"/>
+                    </a:lnL>
+                    <a:lnR algn="ctr" cmpd="sng" cap="flat" w="0">
+                      <a:noFill/>
+                      <a:prstDash val="solid"/>
+                    </a:lnR>
+                    <a:lnT algn="ctr" cmpd="sng" cap="flat" w="0">
+                      <a:noFill/>
+                      <a:prstDash val="solid"/>
+                    </a:lnT>
+                    <a:lnB algn="ctr" cmpd="sng" cap="flat" w="0">
+                      <a:noFill/>
+                      <a:prstDash val="solid"/>
+                    </a:lnB>
+                    <a:solidFill>
+                      <a:srgbClr val="FFFFFF">
+                        <a:alpha val="0"/>
+                      </a:srgbClr>
+                    </a:solidFill>
+                  </a:tcPr>
+                </a:tc>
+                <a:tc>
+                  <a:txBody>
+                    <a:bodyPr/>
+                    <a:lstStyle/>
+                    <a:p>
+                      <a:pPr algn="l" marL="63500" marR="63500">
+                        <a:lnSpc>
+                          <a:spcPct val="100000"/>
+                        </a:lnSpc>
+                        <a:spcBef>
+                          <a:spcPts val="500"/>
+                        </a:spcBef>
+                        <a:spcAft>
+                          <a:spcPts val="500"/>
+                        </a:spcAft>
+                        <a:buNone/>
+                      </a:pPr>
+                      <a:r>
+                        <a:rPr cap="none" sz="1100" i="0" b="0" u="none">
+                          <a:solidFill>
+                            <a:srgbClr val="000000">
+                              <a:alpha val="100000"/>
+                            </a:srgbClr>
+                          </a:solidFill>
+                          <a:latin typeface="Calibri"/>
+                          <a:cs typeface="Calibri"/>
+                          <a:ea typeface="Calibri"/>
+                          <a:sym typeface="Calibri"/>
+                        </a:rPr>
+                        <a:t>44.5</a:t>
+                      </a:r>
+                    </a:p>
+                  </a:txBody>
+                  <a:tcPr anchor="t" marB="63500" marT="63500" marR="0" marL="0">
+                    <a:lnL algn="ctr" cmpd="sng" cap="flat" w="0">
+                      <a:noFill/>
+                      <a:prstDash val="solid"/>
+                    </a:lnL>
+                    <a:lnR algn="ctr" cmpd="sng" cap="flat" w="0">
+                      <a:noFill/>
+                      <a:prstDash val="solid"/>
+                    </a:lnR>
+                    <a:lnT algn="ctr" cmpd="sng" cap="flat" w="0">
+                      <a:noFill/>
+                      <a:prstDash val="solid"/>
+                    </a:lnT>
+                    <a:lnB algn="ctr" cmpd="sng" cap="flat" w="0">
+                      <a:noFill/>
+                      <a:prstDash val="solid"/>
+                    </a:lnB>
+                    <a:solidFill>
+                      <a:srgbClr val="FFFFFF">
+                        <a:alpha val="0"/>
+                      </a:srgbClr>
+                    </a:solidFill>
+                  </a:tcPr>
+                </a:tc>
+                <a:tc>
+                  <a:txBody>
+                    <a:bodyPr/>
+                    <a:lstStyle/>
+                    <a:p>
+                      <a:pPr algn="l" marL="63500" marR="63500">
+                        <a:lnSpc>
+                          <a:spcPct val="100000"/>
+                        </a:lnSpc>
+                        <a:spcBef>
+                          <a:spcPts val="500"/>
+                        </a:spcBef>
+                        <a:spcAft>
+                          <a:spcPts val="500"/>
+                        </a:spcAft>
+                        <a:buNone/>
+                      </a:pPr>
+                      <a:r>
+                        <a:rPr cap="none" sz="1100" i="0" b="0" u="none">
+                          <a:solidFill>
+                            <a:srgbClr val="000000">
+                              <a:alpha val="100000"/>
+                            </a:srgbClr>
+                          </a:solidFill>
+                          <a:latin typeface="Calibri"/>
+                          <a:cs typeface="Calibri"/>
+                          <a:ea typeface="Calibri"/>
+                          <a:sym typeface="Calibri"/>
+                        </a:rPr>
+                        <a:t>111th</a:t>
+                      </a:r>
+                    </a:p>
+                  </a:txBody>
+                  <a:tcPr anchor="t" marB="63500" marT="63500" marR="0" marL="0">
+                    <a:lnL algn="ctr" cmpd="sng" cap="flat" w="0">
+                      <a:noFill/>
+                      <a:prstDash val="solid"/>
+                    </a:lnL>
+                    <a:lnR algn="ctr" cmpd="sng" cap="flat" w="0">
+                      <a:noFill/>
+                      <a:prstDash val="solid"/>
+                    </a:lnR>
+                    <a:lnT algn="ctr" cmpd="sng" cap="flat" w="0">
+                      <a:noFill/>
+                      <a:prstDash val="solid"/>
+                    </a:lnT>
+                    <a:lnB algn="ctr" cmpd="sng" cap="flat" w="0">
+                      <a:noFill/>
+                      <a:prstDash val="solid"/>
+                    </a:lnB>
+                    <a:solidFill>
+                      <a:srgbClr val="FFFFFF">
+                        <a:alpha val="0"/>
+                      </a:srgbClr>
+                    </a:solidFill>
+                  </a:tcPr>
+                </a:tc>
+                <a:tc>
+                  <a:txBody>
+                    <a:bodyPr/>
+                    <a:lstStyle/>
+                    <a:p>
+                      <a:pPr algn="l" marL="63500" marR="63500">
+                        <a:lnSpc>
+                          <a:spcPct val="100000"/>
+                        </a:lnSpc>
+                        <a:spcBef>
+                          <a:spcPts val="500"/>
+                        </a:spcBef>
+                        <a:spcAft>
+                          <a:spcPts val="500"/>
+                        </a:spcAft>
+                        <a:buNone/>
+                      </a:pPr>
+                      <a:r>
+                        <a:rPr cap="none" sz="1100" i="0" b="0" u="none">
+                          <a:solidFill>
+                            <a:srgbClr val="000000">
+                              <a:alpha val="100000"/>
+                            </a:srgbClr>
+                          </a:solidFill>
+                          <a:latin typeface="Calibri"/>
+                          <a:cs typeface="Calibri"/>
+                          <a:ea typeface="Calibri"/>
+                          <a:sym typeface="Calibri"/>
+                        </a:rPr>
+                        <a:t>Decile 4</a:t>
+                      </a:r>
+                    </a:p>
+                  </a:txBody>
+                  <a:tcPr anchor="t" marB="63500" marT="63500" marR="0" marL="0">
+                    <a:lnL algn="ctr" cmpd="sng" cap="flat" w="0">
+                      <a:noFill/>
+                      <a:prstDash val="solid"/>
+                    </a:lnL>
+                    <a:lnR algn="ctr" cmpd="sng" cap="flat" w="0">
+                      <a:noFill/>
+                      <a:prstDash val="solid"/>
+                    </a:lnR>
+                    <a:lnT algn="ctr" cmpd="sng" cap="flat" w="0">
+                      <a:noFill/>
+                      <a:prstDash val="solid"/>
+                    </a:lnT>
+                    <a:lnB algn="ctr" cmpd="sng" cap="flat" w="0">
+                      <a:noFill/>
+                      <a:prstDash val="solid"/>
+                    </a:lnB>
+                    <a:solidFill>
+                      <a:srgbClr val="FFFFFF">
+                        <a:alpha val="0"/>
+                      </a:srgbClr>
+                    </a:solidFill>
+                  </a:tcPr>
+                </a:tc>
+              </a:tr>
+              <a:tr h="182880">
+                <a:tc>
+                  <a:txBody>
+                    <a:bodyPr/>
+                    <a:lstStyle/>
+                    <a:p>
+                      <a:pPr algn="l" marL="63500" marR="63500">
+                        <a:lnSpc>
+                          <a:spcPct val="100000"/>
+                        </a:lnSpc>
+                        <a:spcBef>
+                          <a:spcPts val="500"/>
+                        </a:spcBef>
+                        <a:spcAft>
+                          <a:spcPts val="500"/>
+                        </a:spcAft>
+                        <a:buNone/>
+                      </a:pPr>
+                      <a:r>
+                        <a:rPr cap="none" sz="1100" i="0" b="0" u="none">
+                          <a:solidFill>
+                            <a:srgbClr val="000000">
+                              <a:alpha val="100000"/>
+                            </a:srgbClr>
+                          </a:solidFill>
+                          <a:latin typeface="Calibri"/>
+                          <a:cs typeface="Calibri"/>
+                          <a:ea typeface="Calibri"/>
+                          <a:sym typeface="Calibri"/>
+                        </a:rPr>
+                        <a:t>Horsham</a:t>
+                      </a:r>
+                    </a:p>
+                  </a:txBody>
+                  <a:tcPr anchor="t" marB="63500" marT="63500" marR="0" marL="0">
+                    <a:lnL algn="ctr" cmpd="sng" cap="flat" w="0">
+                      <a:noFill/>
+                      <a:prstDash val="solid"/>
+                    </a:lnL>
+                    <a:lnR algn="ctr" cmpd="sng" cap="flat" w="0">
+                      <a:noFill/>
+                      <a:prstDash val="solid"/>
+                    </a:lnR>
+                    <a:lnT algn="ctr" cmpd="sng" cap="flat" w="0">
+                      <a:noFill/>
+                      <a:prstDash val="solid"/>
+                    </a:lnT>
+                    <a:lnB algn="ctr" cmpd="sng" cap="flat" w="0">
+                      <a:noFill/>
+                      <a:prstDash val="solid"/>
+                    </a:lnB>
+                    <a:solidFill>
+                      <a:srgbClr val="FFFFFF">
+                        <a:alpha val="0"/>
+                      </a:srgbClr>
+                    </a:solidFill>
+                  </a:tcPr>
+                </a:tc>
+                <a:tc>
+                  <a:txBody>
+                    <a:bodyPr/>
+                    <a:lstStyle/>
+                    <a:p>
+                      <a:pPr algn="l" marL="63500" marR="63500">
+                        <a:lnSpc>
+                          <a:spcPct val="100000"/>
+                        </a:lnSpc>
+                        <a:spcBef>
+                          <a:spcPts val="500"/>
+                        </a:spcBef>
+                        <a:spcAft>
+                          <a:spcPts val="500"/>
+                        </a:spcAft>
+                        <a:buNone/>
+                      </a:pPr>
+                      <a:r>
+                        <a:rPr cap="none" sz="1100" i="0" b="0" u="none">
+                          <a:solidFill>
+                            <a:srgbClr val="000000">
+                              <a:alpha val="100000"/>
+                            </a:srgbClr>
+                          </a:solidFill>
+                          <a:latin typeface="Calibri"/>
+                          <a:cs typeface="Calibri"/>
+                          <a:ea typeface="Calibri"/>
+                          <a:sym typeface="Calibri"/>
+                        </a:rPr>
+                        <a:t>68</a:t>
+                      </a:r>
+                    </a:p>
+                  </a:txBody>
+                  <a:tcPr anchor="t" marB="63500" marT="63500" marR="0" marL="0">
+                    <a:lnL algn="ctr" cmpd="sng" cap="flat" w="0">
+                      <a:noFill/>
+                      <a:prstDash val="solid"/>
+                    </a:lnL>
+                    <a:lnR algn="ctr" cmpd="sng" cap="flat" w="0">
+                      <a:noFill/>
+                      <a:prstDash val="solid"/>
+                    </a:lnR>
+                    <a:lnT algn="ctr" cmpd="sng" cap="flat" w="0">
+                      <a:noFill/>
+                      <a:prstDash val="solid"/>
+                    </a:lnT>
+                    <a:lnB algn="ctr" cmpd="sng" cap="flat" w="0">
+                      <a:noFill/>
+                      <a:prstDash val="solid"/>
+                    </a:lnB>
+                    <a:solidFill>
+                      <a:srgbClr val="FFFFFF">
+                        <a:alpha val="0"/>
+                      </a:srgbClr>
+                    </a:solidFill>
+                  </a:tcPr>
+                </a:tc>
+                <a:tc>
+                  <a:txBody>
+                    <a:bodyPr/>
+                    <a:lstStyle/>
+                    <a:p>
+                      <a:pPr algn="l" marL="63500" marR="63500">
+                        <a:lnSpc>
+                          <a:spcPct val="100000"/>
+                        </a:lnSpc>
+                        <a:spcBef>
+                          <a:spcPts val="500"/>
+                        </a:spcBef>
+                        <a:spcAft>
+                          <a:spcPts val="500"/>
+                        </a:spcAft>
+                        <a:buNone/>
+                      </a:pPr>
+                      <a:r>
+                        <a:rPr cap="none" sz="1100" i="0" b="0" u="none">
+                          <a:solidFill>
+                            <a:srgbClr val="000000">
+                              <a:alpha val="100000"/>
+                            </a:srgbClr>
+                          </a:solidFill>
+                          <a:latin typeface="Calibri"/>
+                          <a:cs typeface="Calibri"/>
+                          <a:ea typeface="Calibri"/>
+                          <a:sym typeface="Calibri"/>
+                        </a:rPr>
+                        <a:t>46.7</a:t>
+                      </a:r>
+                    </a:p>
+                  </a:txBody>
+                  <a:tcPr anchor="t" marB="63500" marT="63500" marR="0" marL="0">
+                    <a:lnL algn="ctr" cmpd="sng" cap="flat" w="0">
+                      <a:noFill/>
+                      <a:prstDash val="solid"/>
+                    </a:lnL>
+                    <a:lnR algn="ctr" cmpd="sng" cap="flat" w="0">
+                      <a:noFill/>
+                      <a:prstDash val="solid"/>
+                    </a:lnR>
+                    <a:lnT algn="ctr" cmpd="sng" cap="flat" w="0">
+                      <a:noFill/>
+                      <a:prstDash val="solid"/>
+                    </a:lnT>
+                    <a:lnB algn="ctr" cmpd="sng" cap="flat" w="0">
+                      <a:noFill/>
+                      <a:prstDash val="solid"/>
+                    </a:lnB>
+                    <a:solidFill>
+                      <a:srgbClr val="FFFFFF">
+                        <a:alpha val="0"/>
+                      </a:srgbClr>
+                    </a:solidFill>
+                  </a:tcPr>
+                </a:tc>
+                <a:tc>
+                  <a:txBody>
+                    <a:bodyPr/>
+                    <a:lstStyle/>
+                    <a:p>
+                      <a:pPr algn="l" marL="63500" marR="63500">
+                        <a:lnSpc>
+                          <a:spcPct val="100000"/>
+                        </a:lnSpc>
+                        <a:spcBef>
+                          <a:spcPts val="500"/>
+                        </a:spcBef>
+                        <a:spcAft>
+                          <a:spcPts val="500"/>
+                        </a:spcAft>
+                        <a:buNone/>
+                      </a:pPr>
+                      <a:r>
+                        <a:rPr cap="none" sz="1100" i="0" b="0" u="none">
+                          <a:solidFill>
+                            <a:srgbClr val="000000">
+                              <a:alpha val="100000"/>
+                            </a:srgbClr>
+                          </a:solidFill>
+                          <a:latin typeface="Calibri"/>
+                          <a:cs typeface="Calibri"/>
+                          <a:ea typeface="Calibri"/>
+                          <a:sym typeface="Calibri"/>
+                        </a:rPr>
+                        <a:t>92nd</a:t>
+                      </a:r>
+                    </a:p>
+                  </a:txBody>
+                  <a:tcPr anchor="t" marB="63500" marT="63500" marR="0" marL="0">
+                    <a:lnL algn="ctr" cmpd="sng" cap="flat" w="0">
+                      <a:noFill/>
+                      <a:prstDash val="solid"/>
+                    </a:lnL>
+                    <a:lnR algn="ctr" cmpd="sng" cap="flat" w="0">
+                      <a:noFill/>
+                      <a:prstDash val="solid"/>
+                    </a:lnR>
+                    <a:lnT algn="ctr" cmpd="sng" cap="flat" w="0">
+                      <a:noFill/>
+                      <a:prstDash val="solid"/>
+                    </a:lnT>
+                    <a:lnB algn="ctr" cmpd="sng" cap="flat" w="0">
+                      <a:noFill/>
+                      <a:prstDash val="solid"/>
+                    </a:lnB>
+                    <a:solidFill>
+                      <a:srgbClr val="FFFFFF">
+                        <a:alpha val="0"/>
+                      </a:srgbClr>
+                    </a:solidFill>
+                  </a:tcPr>
+                </a:tc>
+                <a:tc>
+                  <a:txBody>
+                    <a:bodyPr/>
+                    <a:lstStyle/>
+                    <a:p>
+                      <a:pPr algn="l" marL="63500" marR="63500">
+                        <a:lnSpc>
+                          <a:spcPct val="100000"/>
+                        </a:lnSpc>
+                        <a:spcBef>
+                          <a:spcPts val="500"/>
+                        </a:spcBef>
+                        <a:spcAft>
+                          <a:spcPts val="500"/>
+                        </a:spcAft>
+                        <a:buNone/>
+                      </a:pPr>
+                      <a:r>
+                        <a:rPr cap="none" sz="1100" i="0" b="0" u="none">
+                          <a:solidFill>
+                            <a:srgbClr val="000000">
+                              <a:alpha val="100000"/>
+                            </a:srgbClr>
+                          </a:solidFill>
+                          <a:latin typeface="Calibri"/>
+                          <a:cs typeface="Calibri"/>
+                          <a:ea typeface="Calibri"/>
+                          <a:sym typeface="Calibri"/>
+                        </a:rPr>
+                        <a:t>Decile 3</a:t>
+                      </a:r>
+                    </a:p>
+                  </a:txBody>
+                  <a:tcPr anchor="t" marB="63500" marT="63500" marR="0" marL="0">
+                    <a:lnL algn="ctr" cmpd="sng" cap="flat" w="0">
+                      <a:noFill/>
+                      <a:prstDash val="solid"/>
+                    </a:lnL>
+                    <a:lnR algn="ctr" cmpd="sng" cap="flat" w="0">
+                      <a:noFill/>
+                      <a:prstDash val="solid"/>
+                    </a:lnR>
+                    <a:lnT algn="ctr" cmpd="sng" cap="flat" w="0">
+                      <a:noFill/>
+                      <a:prstDash val="solid"/>
+                    </a:lnT>
+                    <a:lnB algn="ctr" cmpd="sng" cap="flat" w="0">
+                      <a:noFill/>
+                      <a:prstDash val="solid"/>
+                    </a:lnB>
+                    <a:solidFill>
+                      <a:srgbClr val="FFFFFF">
+                        <a:alpha val="0"/>
+                      </a:srgbClr>
+                    </a:solidFill>
+                  </a:tcPr>
+                </a:tc>
+              </a:tr>
+              <a:tr h="182880">
+                <a:tc>
+                  <a:txBody>
+                    <a:bodyPr/>
+                    <a:lstStyle/>
+                    <a:p>
+                      <a:pPr algn="l" marL="63500" marR="63500">
+                        <a:lnSpc>
+                          <a:spcPct val="100000"/>
+                        </a:lnSpc>
+                        <a:spcBef>
+                          <a:spcPts val="500"/>
+                        </a:spcBef>
+                        <a:spcAft>
+                          <a:spcPts val="500"/>
+                        </a:spcAft>
+                        <a:buNone/>
+                      </a:pPr>
+                      <a:r>
+                        <a:rPr cap="none" sz="1100" i="0" b="0" u="none">
+                          <a:solidFill>
+                            <a:srgbClr val="000000">
+                              <a:alpha val="100000"/>
+                            </a:srgbClr>
+                          </a:solidFill>
+                          <a:latin typeface="Calibri"/>
+                          <a:cs typeface="Calibri"/>
+                          <a:ea typeface="Calibri"/>
+                          <a:sym typeface="Calibri"/>
+                        </a:rPr>
+                        <a:t>Mid Sussex</a:t>
+                      </a:r>
+                    </a:p>
+                  </a:txBody>
+                  <a:tcPr anchor="t" marB="63500" marT="63500" marR="0" marL="0">
+                    <a:lnL algn="ctr" cmpd="sng" cap="flat" w="0">
+                      <a:noFill/>
+                      <a:prstDash val="solid"/>
+                    </a:lnL>
+                    <a:lnR algn="ctr" cmpd="sng" cap="flat" w="0">
+                      <a:noFill/>
+                      <a:prstDash val="solid"/>
+                    </a:lnR>
+                    <a:lnT algn="ctr" cmpd="sng" cap="flat" w="0">
+                      <a:noFill/>
+                      <a:prstDash val="solid"/>
+                    </a:lnT>
+                    <a:lnB algn="ctr" cmpd="sng" cap="flat" w="0">
+                      <a:noFill/>
+                      <a:prstDash val="solid"/>
+                    </a:lnB>
+                    <a:solidFill>
+                      <a:srgbClr val="FFFFFF">
+                        <a:alpha val="0"/>
+                      </a:srgbClr>
+                    </a:solidFill>
+                  </a:tcPr>
+                </a:tc>
+                <a:tc>
+                  <a:txBody>
+                    <a:bodyPr/>
+                    <a:lstStyle/>
+                    <a:p>
+                      <a:pPr algn="l" marL="63500" marR="63500">
+                        <a:lnSpc>
+                          <a:spcPct val="100000"/>
+                        </a:lnSpc>
+                        <a:spcBef>
+                          <a:spcPts val="500"/>
+                        </a:spcBef>
+                        <a:spcAft>
+                          <a:spcPts val="500"/>
+                        </a:spcAft>
+                        <a:buNone/>
+                      </a:pPr>
+                      <a:r>
+                        <a:rPr cap="none" sz="1100" i="0" b="0" u="none">
+                          <a:solidFill>
+                            <a:srgbClr val="000000">
+                              <a:alpha val="100000"/>
+                            </a:srgbClr>
+                          </a:solidFill>
+                          <a:latin typeface="Calibri"/>
+                          <a:cs typeface="Calibri"/>
+                          <a:ea typeface="Calibri"/>
+                          <a:sym typeface="Calibri"/>
+                        </a:rPr>
+                        <a:t>75</a:t>
+                      </a:r>
+                    </a:p>
+                  </a:txBody>
+                  <a:tcPr anchor="t" marB="63500" marT="63500" marR="0" marL="0">
+                    <a:lnL algn="ctr" cmpd="sng" cap="flat" w="0">
+                      <a:noFill/>
+                      <a:prstDash val="solid"/>
+                    </a:lnL>
+                    <a:lnR algn="ctr" cmpd="sng" cap="flat" w="0">
+                      <a:noFill/>
+                      <a:prstDash val="solid"/>
+                    </a:lnR>
+                    <a:lnT algn="ctr" cmpd="sng" cap="flat" w="0">
+                      <a:noFill/>
+                      <a:prstDash val="solid"/>
+                    </a:lnT>
+                    <a:lnB algn="ctr" cmpd="sng" cap="flat" w="0">
+                      <a:noFill/>
+                      <a:prstDash val="solid"/>
+                    </a:lnB>
+                    <a:solidFill>
+                      <a:srgbClr val="FFFFFF">
+                        <a:alpha val="0"/>
+                      </a:srgbClr>
+                    </a:solidFill>
+                  </a:tcPr>
+                </a:tc>
+                <a:tc>
+                  <a:txBody>
+                    <a:bodyPr/>
+                    <a:lstStyle/>
+                    <a:p>
+                      <a:pPr algn="l" marL="63500" marR="63500">
+                        <a:lnSpc>
+                          <a:spcPct val="100000"/>
+                        </a:lnSpc>
+                        <a:spcBef>
+                          <a:spcPts val="500"/>
+                        </a:spcBef>
+                        <a:spcAft>
+                          <a:spcPts val="500"/>
+                        </a:spcAft>
+                        <a:buNone/>
+                      </a:pPr>
+                      <a:r>
+                        <a:rPr cap="none" sz="1100" i="0" b="0" u="none">
+                          <a:solidFill>
+                            <a:srgbClr val="000000">
+                              <a:alpha val="100000"/>
+                            </a:srgbClr>
+                          </a:solidFill>
+                          <a:latin typeface="Calibri"/>
+                          <a:cs typeface="Calibri"/>
+                          <a:ea typeface="Calibri"/>
+                          <a:sym typeface="Calibri"/>
+                        </a:rPr>
+                        <a:t>49.3</a:t>
+                      </a:r>
+                    </a:p>
+                  </a:txBody>
+                  <a:tcPr anchor="t" marB="63500" marT="63500" marR="0" marL="0">
+                    <a:lnL algn="ctr" cmpd="sng" cap="flat" w="0">
+                      <a:noFill/>
+                      <a:prstDash val="solid"/>
+                    </a:lnL>
+                    <a:lnR algn="ctr" cmpd="sng" cap="flat" w="0">
+                      <a:noFill/>
+                      <a:prstDash val="solid"/>
+                    </a:lnR>
+                    <a:lnT algn="ctr" cmpd="sng" cap="flat" w="0">
+                      <a:noFill/>
+                      <a:prstDash val="solid"/>
+                    </a:lnT>
+                    <a:lnB algn="ctr" cmpd="sng" cap="flat" w="0">
+                      <a:noFill/>
+                      <a:prstDash val="solid"/>
+                    </a:lnB>
+                    <a:solidFill>
+                      <a:srgbClr val="FFFFFF">
+                        <a:alpha val="0"/>
+                      </a:srgbClr>
+                    </a:solidFill>
+                  </a:tcPr>
+                </a:tc>
+                <a:tc>
+                  <a:txBody>
+                    <a:bodyPr/>
+                    <a:lstStyle/>
+                    <a:p>
+                      <a:pPr algn="l" marL="63500" marR="63500">
+                        <a:lnSpc>
+                          <a:spcPct val="100000"/>
+                        </a:lnSpc>
+                        <a:spcBef>
+                          <a:spcPts val="500"/>
+                        </a:spcBef>
+                        <a:spcAft>
+                          <a:spcPts val="500"/>
+                        </a:spcAft>
+                        <a:buNone/>
+                      </a:pPr>
+                      <a:r>
+                        <a:rPr cap="none" sz="1100" i="0" b="0" u="none">
+                          <a:solidFill>
+                            <a:srgbClr val="000000">
+                              <a:alpha val="100000"/>
+                            </a:srgbClr>
+                          </a:solidFill>
+                          <a:latin typeface="Calibri"/>
+                          <a:cs typeface="Calibri"/>
+                          <a:ea typeface="Calibri"/>
+                          <a:sym typeface="Calibri"/>
+                        </a:rPr>
+                        <a:t>72nd</a:t>
+                      </a:r>
+                    </a:p>
+                  </a:txBody>
+                  <a:tcPr anchor="t" marB="63500" marT="63500" marR="0" marL="0">
+                    <a:lnL algn="ctr" cmpd="sng" cap="flat" w="0">
+                      <a:noFill/>
+                      <a:prstDash val="solid"/>
+                    </a:lnL>
+                    <a:lnR algn="ctr" cmpd="sng" cap="flat" w="0">
+                      <a:noFill/>
+                      <a:prstDash val="solid"/>
+                    </a:lnR>
+                    <a:lnT algn="ctr" cmpd="sng" cap="flat" w="0">
+                      <a:noFill/>
+                      <a:prstDash val="solid"/>
+                    </a:lnT>
+                    <a:lnB algn="ctr" cmpd="sng" cap="flat" w="0">
+                      <a:noFill/>
+                      <a:prstDash val="solid"/>
+                    </a:lnB>
+                    <a:solidFill>
+                      <a:srgbClr val="FFFFFF">
+                        <a:alpha val="0"/>
+                      </a:srgbClr>
+                    </a:solidFill>
+                  </a:tcPr>
+                </a:tc>
+                <a:tc>
+                  <a:txBody>
+                    <a:bodyPr/>
+                    <a:lstStyle/>
+                    <a:p>
+                      <a:pPr algn="l" marL="63500" marR="63500">
+                        <a:lnSpc>
+                          <a:spcPct val="100000"/>
+                        </a:lnSpc>
+                        <a:spcBef>
+                          <a:spcPts val="500"/>
+                        </a:spcBef>
+                        <a:spcAft>
+                          <a:spcPts val="500"/>
+                        </a:spcAft>
+                        <a:buNone/>
+                      </a:pPr>
+                      <a:r>
+                        <a:rPr cap="none" sz="1100" i="0" b="0" u="none">
+                          <a:solidFill>
+                            <a:srgbClr val="000000">
+                              <a:alpha val="100000"/>
+                            </a:srgbClr>
+                          </a:solidFill>
+                          <a:latin typeface="Calibri"/>
+                          <a:cs typeface="Calibri"/>
+                          <a:ea typeface="Calibri"/>
+                          <a:sym typeface="Calibri"/>
+                        </a:rPr>
+                        <a:t>Decile 3</a:t>
+                      </a:r>
+                    </a:p>
+                  </a:txBody>
+                  <a:tcPr anchor="t" marB="63500" marT="63500" marR="0" marL="0">
+                    <a:lnL algn="ctr" cmpd="sng" cap="flat" w="0">
+                      <a:noFill/>
+                      <a:prstDash val="solid"/>
+                    </a:lnL>
+                    <a:lnR algn="ctr" cmpd="sng" cap="flat" w="0">
+                      <a:noFill/>
+                      <a:prstDash val="solid"/>
+                    </a:lnR>
+                    <a:lnT algn="ctr" cmpd="sng" cap="flat" w="0">
+                      <a:noFill/>
+                      <a:prstDash val="solid"/>
+                    </a:lnT>
+                    <a:lnB algn="ctr" cmpd="sng" cap="flat" w="0">
+                      <a:noFill/>
+                      <a:prstDash val="solid"/>
+                    </a:lnB>
+                    <a:solidFill>
+                      <a:srgbClr val="FFFFFF">
+                        <a:alpha val="0"/>
+                      </a:srgbClr>
+                    </a:solidFill>
+                  </a:tcPr>
+                </a:tc>
+              </a:tr>
+              <a:tr h="182880">
+                <a:tc>
+                  <a:txBody>
+                    <a:bodyPr/>
+                    <a:lstStyle/>
+                    <a:p>
+                      <a:pPr algn="l" marL="63500" marR="63500">
+                        <a:lnSpc>
+                          <a:spcPct val="100000"/>
+                        </a:lnSpc>
+                        <a:spcBef>
+                          <a:spcPts val="500"/>
+                        </a:spcBef>
+                        <a:spcAft>
+                          <a:spcPts val="500"/>
+                        </a:spcAft>
+                        <a:buNone/>
+                      </a:pPr>
+                      <a:r>
+                        <a:rPr cap="none" sz="1100" i="0" b="0" u="none">
+                          <a:solidFill>
+                            <a:srgbClr val="000000">
+                              <a:alpha val="100000"/>
+                            </a:srgbClr>
+                          </a:solidFill>
+                          <a:latin typeface="Calibri"/>
+                          <a:cs typeface="Calibri"/>
+                          <a:ea typeface="Calibri"/>
+                          <a:sym typeface="Calibri"/>
+                        </a:rPr>
+                        <a:t>Worthing</a:t>
+                      </a:r>
+                    </a:p>
+                  </a:txBody>
+                  <a:tcPr anchor="t" marB="63500" marT="63500" marR="0" marL="0">
+                    <a:lnL algn="ctr" cmpd="sng" cap="flat" w="0">
+                      <a:noFill/>
+                      <a:prstDash val="solid"/>
+                    </a:lnL>
+                    <a:lnR algn="ctr" cmpd="sng" cap="flat" w="0">
+                      <a:noFill/>
+                      <a:prstDash val="solid"/>
+                    </a:lnR>
+                    <a:lnT algn="ctr" cmpd="sng" cap="flat" w="0">
+                      <a:noFill/>
+                      <a:prstDash val="solid"/>
+                    </a:lnT>
+                    <a:lnB algn="ctr" cmpd="sng" cap="flat" w="0">
+                      <a:noFill/>
+                      <a:prstDash val="solid"/>
+                    </a:lnB>
+                    <a:solidFill>
+                      <a:srgbClr val="FFFFFF">
+                        <a:alpha val="0"/>
+                      </a:srgbClr>
+                    </a:solidFill>
+                  </a:tcPr>
+                </a:tc>
+                <a:tc>
+                  <a:txBody>
+                    <a:bodyPr/>
+                    <a:lstStyle/>
+                    <a:p>
+                      <a:pPr algn="l" marL="63500" marR="63500">
+                        <a:lnSpc>
+                          <a:spcPct val="100000"/>
+                        </a:lnSpc>
+                        <a:spcBef>
+                          <a:spcPts val="500"/>
+                        </a:spcBef>
+                        <a:spcAft>
+                          <a:spcPts val="500"/>
+                        </a:spcAft>
+                        <a:buNone/>
+                      </a:pPr>
+                      <a:r>
+                        <a:rPr cap="none" sz="1100" i="0" b="0" u="none">
+                          <a:solidFill>
+                            <a:srgbClr val="000000">
+                              <a:alpha val="100000"/>
+                            </a:srgbClr>
+                          </a:solidFill>
+                          <a:latin typeface="Calibri"/>
+                          <a:cs typeface="Calibri"/>
+                          <a:ea typeface="Calibri"/>
+                          <a:sym typeface="Calibri"/>
+                        </a:rPr>
+                        <a:t>69</a:t>
+                      </a:r>
+                    </a:p>
+                  </a:txBody>
+                  <a:tcPr anchor="t" marB="63500" marT="63500" marR="0" marL="0">
+                    <a:lnL algn="ctr" cmpd="sng" cap="flat" w="0">
+                      <a:noFill/>
+                      <a:prstDash val="solid"/>
+                    </a:lnL>
+                    <a:lnR algn="ctr" cmpd="sng" cap="flat" w="0">
+                      <a:noFill/>
+                      <a:prstDash val="solid"/>
+                    </a:lnR>
+                    <a:lnT algn="ctr" cmpd="sng" cap="flat" w="0">
+                      <a:noFill/>
+                      <a:prstDash val="solid"/>
+                    </a:lnT>
+                    <a:lnB algn="ctr" cmpd="sng" cap="flat" w="0">
+                      <a:noFill/>
+                      <a:prstDash val="solid"/>
+                    </a:lnB>
+                    <a:solidFill>
+                      <a:srgbClr val="FFFFFF">
+                        <a:alpha val="0"/>
+                      </a:srgbClr>
+                    </a:solidFill>
+                  </a:tcPr>
+                </a:tc>
+                <a:tc>
+                  <a:txBody>
+                    <a:bodyPr/>
+                    <a:lstStyle/>
+                    <a:p>
+                      <a:pPr algn="l" marL="63500" marR="63500">
+                        <a:lnSpc>
+                          <a:spcPct val="100000"/>
+                        </a:lnSpc>
+                        <a:spcBef>
+                          <a:spcPts val="500"/>
+                        </a:spcBef>
+                        <a:spcAft>
+                          <a:spcPts val="500"/>
+                        </a:spcAft>
+                        <a:buNone/>
+                      </a:pPr>
+                      <a:r>
+                        <a:rPr cap="none" sz="1100" i="0" b="0" u="none">
+                          <a:solidFill>
+                            <a:srgbClr val="000000">
+                              <a:alpha val="100000"/>
+                            </a:srgbClr>
+                          </a:solidFill>
+                          <a:latin typeface="Calibri"/>
+                          <a:cs typeface="Calibri"/>
+                          <a:ea typeface="Calibri"/>
+                          <a:sym typeface="Calibri"/>
+                        </a:rPr>
+                        <a:t>62.3</a:t>
+                      </a:r>
+                    </a:p>
+                  </a:txBody>
+                  <a:tcPr anchor="t" marB="63500" marT="63500" marR="0" marL="0">
+                    <a:lnL algn="ctr" cmpd="sng" cap="flat" w="0">
+                      <a:noFill/>
+                      <a:prstDash val="solid"/>
+                    </a:lnL>
+                    <a:lnR algn="ctr" cmpd="sng" cap="flat" w="0">
+                      <a:noFill/>
+                      <a:prstDash val="solid"/>
+                    </a:lnR>
+                    <a:lnT algn="ctr" cmpd="sng" cap="flat" w="0">
+                      <a:noFill/>
+                      <a:prstDash val="solid"/>
+                    </a:lnT>
+                    <a:lnB algn="ctr" cmpd="sng" cap="flat" w="0">
+                      <a:noFill/>
+                      <a:prstDash val="solid"/>
+                    </a:lnB>
+                    <a:solidFill>
+                      <a:srgbClr val="FFFFFF">
+                        <a:alpha val="0"/>
+                      </a:srgbClr>
+                    </a:solidFill>
+                  </a:tcPr>
+                </a:tc>
+                <a:tc>
+                  <a:txBody>
+                    <a:bodyPr/>
+                    <a:lstStyle/>
+                    <a:p>
+                      <a:pPr algn="l" marL="63500" marR="63500">
+                        <a:lnSpc>
+                          <a:spcPct val="100000"/>
+                        </a:lnSpc>
+                        <a:spcBef>
+                          <a:spcPts val="500"/>
+                        </a:spcBef>
+                        <a:spcAft>
+                          <a:spcPts val="500"/>
+                        </a:spcAft>
+                        <a:buNone/>
+                      </a:pPr>
+                      <a:r>
+                        <a:rPr cap="none" sz="1100" i="0" b="0" u="none">
+                          <a:solidFill>
+                            <a:srgbClr val="000000">
+                              <a:alpha val="100000"/>
+                            </a:srgbClr>
+                          </a:solidFill>
+                          <a:latin typeface="Calibri"/>
+                          <a:cs typeface="Calibri"/>
+                          <a:ea typeface="Calibri"/>
+                          <a:sym typeface="Calibri"/>
+                        </a:rPr>
+                        <a:t>23rd</a:t>
                       </a:r>
                     </a:p>
                   </a:txBody>
@@ -15330,1155 +16478,7 @@
                           <a:ea typeface="Calibri"/>
                           <a:sym typeface="Calibri"/>
                         </a:rPr>
-                        <a:t>with lowest rate</a:t>
-                      </a:r>
-                    </a:p>
-                  </a:txBody>
-                  <a:tcPr anchor="t" marB="63500" marT="63500" marR="0" marL="0">
-                    <a:lnL algn="ctr" cmpd="sng" cap="flat" w="0">
-                      <a:noFill/>
-                      <a:prstDash val="solid"/>
-                    </a:lnL>
-                    <a:lnR algn="ctr" cmpd="sng" cap="flat" w="0">
-                      <a:noFill/>
-                      <a:prstDash val="solid"/>
-                    </a:lnR>
-                    <a:lnT algn="ctr" cmpd="sng" cap="flat" w="0">
-                      <a:noFill/>
-                      <a:prstDash val="solid"/>
-                    </a:lnT>
-                    <a:lnB algn="ctr" cmpd="sng" cap="flat" w="0">
-                      <a:noFill/>
-                      <a:prstDash val="solid"/>
-                    </a:lnB>
-                    <a:solidFill>
-                      <a:srgbClr val="FFFFFF">
-                        <a:alpha val="0"/>
-                      </a:srgbClr>
-                    </a:solidFill>
-                  </a:tcPr>
-                </a:tc>
-              </a:tr>
-              <a:tr h="182880">
-                <a:tc>
-                  <a:txBody>
-                    <a:bodyPr/>
-                    <a:lstStyle/>
-                    <a:p>
-                      <a:pPr algn="l" marL="63500" marR="63500">
-                        <a:lnSpc>
-                          <a:spcPct val="100000"/>
-                        </a:lnSpc>
-                        <a:spcBef>
-                          <a:spcPts val="500"/>
-                        </a:spcBef>
-                        <a:spcAft>
-                          <a:spcPts val="500"/>
-                        </a:spcAft>
-                        <a:buNone/>
-                      </a:pPr>
-                      <a:r>
-                        <a:rPr cap="none" sz="1100" i="0" b="0" u="none">
-                          <a:solidFill>
-                            <a:srgbClr val="000000">
-                              <a:alpha val="100000"/>
-                            </a:srgbClr>
-                          </a:solidFill>
-                          <a:latin typeface="Calibri"/>
-                          <a:cs typeface="Calibri"/>
-                          <a:ea typeface="Calibri"/>
-                          <a:sym typeface="Calibri"/>
-                        </a:rPr>
-                        <a:t>Crawley</a:t>
-                      </a:r>
-                    </a:p>
-                  </a:txBody>
-                  <a:tcPr anchor="t" marB="63500" marT="63500" marR="0" marL="0">
-                    <a:lnL algn="ctr" cmpd="sng" cap="flat" w="0">
-                      <a:noFill/>
-                      <a:prstDash val="solid"/>
-                    </a:lnL>
-                    <a:lnR algn="ctr" cmpd="sng" cap="flat" w="0">
-                      <a:noFill/>
-                      <a:prstDash val="solid"/>
-                    </a:lnR>
-                    <a:lnT algn="ctr" cmpd="sng" cap="flat" w="0">
-                      <a:noFill/>
-                      <a:prstDash val="solid"/>
-                    </a:lnT>
-                    <a:lnB algn="ctr" cmpd="sng" cap="flat" w="0">
-                      <a:noFill/>
-                      <a:prstDash val="solid"/>
-                    </a:lnB>
-                    <a:solidFill>
-                      <a:srgbClr val="FFFFFF">
-                        <a:alpha val="0"/>
-                      </a:srgbClr>
-                    </a:solidFill>
-                  </a:tcPr>
-                </a:tc>
-                <a:tc>
-                  <a:txBody>
-                    <a:bodyPr/>
-                    <a:lstStyle/>
-                    <a:p>
-                      <a:pPr algn="l" marL="63500" marR="63500">
-                        <a:lnSpc>
-                          <a:spcPct val="100000"/>
-                        </a:lnSpc>
-                        <a:spcBef>
-                          <a:spcPts val="500"/>
-                        </a:spcBef>
-                        <a:spcAft>
-                          <a:spcPts val="500"/>
-                        </a:spcAft>
-                        <a:buNone/>
-                      </a:pPr>
-                      <a:r>
-                        <a:rPr cap="none" sz="1100" i="0" b="0" u="none">
-                          <a:solidFill>
-                            <a:srgbClr val="000000">
-                              <a:alpha val="100000"/>
-                            </a:srgbClr>
-                          </a:solidFill>
-                          <a:latin typeface="Calibri"/>
-                          <a:cs typeface="Calibri"/>
-                          <a:ea typeface="Calibri"/>
-                          <a:sym typeface="Calibri"/>
-                        </a:rPr>
-                        <a:t>44</a:t>
-                      </a:r>
-                    </a:p>
-                  </a:txBody>
-                  <a:tcPr anchor="t" marB="63500" marT="63500" marR="0" marL="0">
-                    <a:lnL algn="ctr" cmpd="sng" cap="flat" w="0">
-                      <a:noFill/>
-                      <a:prstDash val="solid"/>
-                    </a:lnL>
-                    <a:lnR algn="ctr" cmpd="sng" cap="flat" w="0">
-                      <a:noFill/>
-                      <a:prstDash val="solid"/>
-                    </a:lnR>
-                    <a:lnT algn="ctr" cmpd="sng" cap="flat" w="0">
-                      <a:noFill/>
-                      <a:prstDash val="solid"/>
-                    </a:lnT>
-                    <a:lnB algn="ctr" cmpd="sng" cap="flat" w="0">
-                      <a:noFill/>
-                      <a:prstDash val="solid"/>
-                    </a:lnB>
-                    <a:solidFill>
-                      <a:srgbClr val="FFFFFF">
-                        <a:alpha val="0"/>
-                      </a:srgbClr>
-                    </a:solidFill>
-                  </a:tcPr>
-                </a:tc>
-                <a:tc>
-                  <a:txBody>
-                    <a:bodyPr/>
-                    <a:lstStyle/>
-                    <a:p>
-                      <a:pPr algn="l" marL="63500" marR="63500">
-                        <a:lnSpc>
-                          <a:spcPct val="100000"/>
-                        </a:lnSpc>
-                        <a:spcBef>
-                          <a:spcPts val="500"/>
-                        </a:spcBef>
-                        <a:spcAft>
-                          <a:spcPts val="500"/>
-                        </a:spcAft>
-                        <a:buNone/>
-                      </a:pPr>
-                      <a:r>
-                        <a:rPr cap="none" sz="1100" i="0" b="0" u="none">
-                          <a:solidFill>
-                            <a:srgbClr val="000000">
-                              <a:alpha val="100000"/>
-                            </a:srgbClr>
-                          </a:solidFill>
-                          <a:latin typeface="Calibri"/>
-                          <a:cs typeface="Calibri"/>
-                          <a:ea typeface="Calibri"/>
-                          <a:sym typeface="Calibri"/>
-                        </a:rPr>
-                        <a:t>39.1</a:t>
-                      </a:r>
-                    </a:p>
-                  </a:txBody>
-                  <a:tcPr anchor="t" marB="63500" marT="63500" marR="0" marL="0">
-                    <a:lnL algn="ctr" cmpd="sng" cap="flat" w="0">
-                      <a:noFill/>
-                      <a:prstDash val="solid"/>
-                    </a:lnL>
-                    <a:lnR algn="ctr" cmpd="sng" cap="flat" w="0">
-                      <a:noFill/>
-                      <a:prstDash val="solid"/>
-                    </a:lnR>
-                    <a:lnT algn="ctr" cmpd="sng" cap="flat" w="0">
-                      <a:noFill/>
-                      <a:prstDash val="solid"/>
-                    </a:lnT>
-                    <a:lnB algn="ctr" cmpd="sng" cap="flat" w="0">
-                      <a:noFill/>
-                      <a:prstDash val="solid"/>
-                    </a:lnB>
-                    <a:solidFill>
-                      <a:srgbClr val="FFFFFF">
-                        <a:alpha val="0"/>
-                      </a:srgbClr>
-                    </a:solidFill>
-                  </a:tcPr>
-                </a:tc>
-                <a:tc>
-                  <a:txBody>
-                    <a:bodyPr/>
-                    <a:lstStyle/>
-                    <a:p>
-                      <a:pPr algn="l" marL="63500" marR="63500">
-                        <a:lnSpc>
-                          <a:spcPct val="100000"/>
-                        </a:lnSpc>
-                        <a:spcBef>
-                          <a:spcPts val="500"/>
-                        </a:spcBef>
-                        <a:spcAft>
-                          <a:spcPts val="500"/>
-                        </a:spcAft>
-                        <a:buNone/>
-                      </a:pPr>
-                      <a:r>
-                        <a:rPr cap="none" sz="1100" i="0" b="0" u="none">
-                          <a:solidFill>
-                            <a:srgbClr val="000000">
-                              <a:alpha val="100000"/>
-                            </a:srgbClr>
-                          </a:solidFill>
-                          <a:latin typeface="Calibri"/>
-                          <a:cs typeface="Calibri"/>
-                          <a:ea typeface="Calibri"/>
-                          <a:sym typeface="Calibri"/>
-                        </a:rPr>
-                        <a:t>113th</a:t>
-                      </a:r>
-                    </a:p>
-                  </a:txBody>
-                  <a:tcPr anchor="t" marB="63500" marT="63500" marR="0" marL="0">
-                    <a:lnL algn="ctr" cmpd="sng" cap="flat" w="0">
-                      <a:noFill/>
-                      <a:prstDash val="solid"/>
-                    </a:lnL>
-                    <a:lnR algn="ctr" cmpd="sng" cap="flat" w="0">
-                      <a:noFill/>
-                      <a:prstDash val="solid"/>
-                    </a:lnR>
-                    <a:lnT algn="ctr" cmpd="sng" cap="flat" w="0">
-                      <a:noFill/>
-                      <a:prstDash val="solid"/>
-                    </a:lnT>
-                    <a:lnB algn="ctr" cmpd="sng" cap="flat" w="0">
-                      <a:noFill/>
-                      <a:prstDash val="solid"/>
-                    </a:lnB>
-                    <a:solidFill>
-                      <a:srgbClr val="FFFFFF">
-                        <a:alpha val="0"/>
-                      </a:srgbClr>
-                    </a:solidFill>
-                  </a:tcPr>
-                </a:tc>
-                <a:tc>
-                  <a:txBody>
-                    <a:bodyPr/>
-                    <a:lstStyle/>
-                    <a:p>
-                      <a:pPr algn="l" marL="63500" marR="63500">
-                        <a:lnSpc>
-                          <a:spcPct val="100000"/>
-                        </a:lnSpc>
-                        <a:spcBef>
-                          <a:spcPts val="500"/>
-                        </a:spcBef>
-                        <a:spcAft>
-                          <a:spcPts val="500"/>
-                        </a:spcAft>
-                        <a:buNone/>
-                      </a:pPr>
-                      <a:r>
-                        <a:rPr cap="none" sz="1100" i="0" b="0" u="none">
-                          <a:solidFill>
-                            <a:srgbClr val="000000">
-                              <a:alpha val="100000"/>
-                            </a:srgbClr>
-                          </a:solidFill>
-                          <a:latin typeface="Calibri"/>
-                          <a:cs typeface="Calibri"/>
-                          <a:ea typeface="Calibri"/>
-                          <a:sym typeface="Calibri"/>
-                        </a:rPr>
-                        <a:t>Decile 4</a:t>
-                      </a:r>
-                    </a:p>
-                  </a:txBody>
-                  <a:tcPr anchor="t" marB="63500" marT="63500" marR="0" marL="0">
-                    <a:lnL algn="ctr" cmpd="sng" cap="flat" w="0">
-                      <a:noFill/>
-                      <a:prstDash val="solid"/>
-                    </a:lnL>
-                    <a:lnR algn="ctr" cmpd="sng" cap="flat" w="0">
-                      <a:noFill/>
-                      <a:prstDash val="solid"/>
-                    </a:lnR>
-                    <a:lnT algn="ctr" cmpd="sng" cap="flat" w="0">
-                      <a:noFill/>
-                      <a:prstDash val="solid"/>
-                    </a:lnT>
-                    <a:lnB algn="ctr" cmpd="sng" cap="flat" w="0">
-                      <a:noFill/>
-                      <a:prstDash val="solid"/>
-                    </a:lnB>
-                    <a:solidFill>
-                      <a:srgbClr val="FFFFFF">
-                        <a:alpha val="0"/>
-                      </a:srgbClr>
-                    </a:solidFill>
-                  </a:tcPr>
-                </a:tc>
-              </a:tr>
-              <a:tr h="182880">
-                <a:tc>
-                  <a:txBody>
-                    <a:bodyPr/>
-                    <a:lstStyle/>
-                    <a:p>
-                      <a:pPr algn="l" marL="63500" marR="63500">
-                        <a:lnSpc>
-                          <a:spcPct val="100000"/>
-                        </a:lnSpc>
-                        <a:spcBef>
-                          <a:spcPts val="500"/>
-                        </a:spcBef>
-                        <a:spcAft>
-                          <a:spcPts val="500"/>
-                        </a:spcAft>
-                        <a:buNone/>
-                      </a:pPr>
-                      <a:r>
-                        <a:rPr cap="none" sz="1100" i="0" b="0" u="none">
-                          <a:solidFill>
-                            <a:srgbClr val="000000">
-                              <a:alpha val="100000"/>
-                            </a:srgbClr>
-                          </a:solidFill>
-                          <a:latin typeface="Calibri"/>
-                          <a:cs typeface="Calibri"/>
-                          <a:ea typeface="Calibri"/>
-                          <a:sym typeface="Calibri"/>
-                        </a:rPr>
-                        <a:t>Horsham</a:t>
-                      </a:r>
-                    </a:p>
-                  </a:txBody>
-                  <a:tcPr anchor="t" marB="63500" marT="63500" marR="0" marL="0">
-                    <a:lnL algn="ctr" cmpd="sng" cap="flat" w="0">
-                      <a:noFill/>
-                      <a:prstDash val="solid"/>
-                    </a:lnL>
-                    <a:lnR algn="ctr" cmpd="sng" cap="flat" w="0">
-                      <a:noFill/>
-                      <a:prstDash val="solid"/>
-                    </a:lnR>
-                    <a:lnT algn="ctr" cmpd="sng" cap="flat" w="0">
-                      <a:noFill/>
-                      <a:prstDash val="solid"/>
-                    </a:lnT>
-                    <a:lnB algn="ctr" cmpd="sng" cap="flat" w="0">
-                      <a:noFill/>
-                      <a:prstDash val="solid"/>
-                    </a:lnB>
-                    <a:solidFill>
-                      <a:srgbClr val="FFFFFF">
-                        <a:alpha val="0"/>
-                      </a:srgbClr>
-                    </a:solidFill>
-                  </a:tcPr>
-                </a:tc>
-                <a:tc>
-                  <a:txBody>
-                    <a:bodyPr/>
-                    <a:lstStyle/>
-                    <a:p>
-                      <a:pPr algn="l" marL="63500" marR="63500">
-                        <a:lnSpc>
-                          <a:spcPct val="100000"/>
-                        </a:lnSpc>
-                        <a:spcBef>
-                          <a:spcPts val="500"/>
-                        </a:spcBef>
-                        <a:spcAft>
-                          <a:spcPts val="500"/>
-                        </a:spcAft>
-                        <a:buNone/>
-                      </a:pPr>
-                      <a:r>
-                        <a:rPr cap="none" sz="1100" i="0" b="0" u="none">
-                          <a:solidFill>
-                            <a:srgbClr val="000000">
-                              <a:alpha val="100000"/>
-                            </a:srgbClr>
-                          </a:solidFill>
-                          <a:latin typeface="Calibri"/>
-                          <a:cs typeface="Calibri"/>
-                          <a:ea typeface="Calibri"/>
-                          <a:sym typeface="Calibri"/>
-                        </a:rPr>
-                        <a:t>56</a:t>
-                      </a:r>
-                    </a:p>
-                  </a:txBody>
-                  <a:tcPr anchor="t" marB="63500" marT="63500" marR="0" marL="0">
-                    <a:lnL algn="ctr" cmpd="sng" cap="flat" w="0">
-                      <a:noFill/>
-                      <a:prstDash val="solid"/>
-                    </a:lnL>
-                    <a:lnR algn="ctr" cmpd="sng" cap="flat" w="0">
-                      <a:noFill/>
-                      <a:prstDash val="solid"/>
-                    </a:lnR>
-                    <a:lnT algn="ctr" cmpd="sng" cap="flat" w="0">
-                      <a:noFill/>
-                      <a:prstDash val="solid"/>
-                    </a:lnT>
-                    <a:lnB algn="ctr" cmpd="sng" cap="flat" w="0">
-                      <a:noFill/>
-                      <a:prstDash val="solid"/>
-                    </a:lnB>
-                    <a:solidFill>
-                      <a:srgbClr val="FFFFFF">
-                        <a:alpha val="0"/>
-                      </a:srgbClr>
-                    </a:solidFill>
-                  </a:tcPr>
-                </a:tc>
-                <a:tc>
-                  <a:txBody>
-                    <a:bodyPr/>
-                    <a:lstStyle/>
-                    <a:p>
-                      <a:pPr algn="l" marL="63500" marR="63500">
-                        <a:lnSpc>
-                          <a:spcPct val="100000"/>
-                        </a:lnSpc>
-                        <a:spcBef>
-                          <a:spcPts val="500"/>
-                        </a:spcBef>
-                        <a:spcAft>
-                          <a:spcPts val="500"/>
-                        </a:spcAft>
-                        <a:buNone/>
-                      </a:pPr>
-                      <a:r>
-                        <a:rPr cap="none" sz="1100" i="0" b="0" u="none">
-                          <a:solidFill>
-                            <a:srgbClr val="000000">
-                              <a:alpha val="100000"/>
-                            </a:srgbClr>
-                          </a:solidFill>
-                          <a:latin typeface="Calibri"/>
-                          <a:cs typeface="Calibri"/>
-                          <a:ea typeface="Calibri"/>
-                          <a:sym typeface="Calibri"/>
-                        </a:rPr>
-                        <a:t>38.5</a:t>
-                      </a:r>
-                    </a:p>
-                  </a:txBody>
-                  <a:tcPr anchor="t" marB="63500" marT="63500" marR="0" marL="0">
-                    <a:lnL algn="ctr" cmpd="sng" cap="flat" w="0">
-                      <a:noFill/>
-                      <a:prstDash val="solid"/>
-                    </a:lnL>
-                    <a:lnR algn="ctr" cmpd="sng" cap="flat" w="0">
-                      <a:noFill/>
-                      <a:prstDash val="solid"/>
-                    </a:lnR>
-                    <a:lnT algn="ctr" cmpd="sng" cap="flat" w="0">
-                      <a:noFill/>
-                      <a:prstDash val="solid"/>
-                    </a:lnT>
-                    <a:lnB algn="ctr" cmpd="sng" cap="flat" w="0">
-                      <a:noFill/>
-                      <a:prstDash val="solid"/>
-                    </a:lnB>
-                    <a:solidFill>
-                      <a:srgbClr val="FFFFFF">
-                        <a:alpha val="0"/>
-                      </a:srgbClr>
-                    </a:solidFill>
-                  </a:tcPr>
-                </a:tc>
-                <a:tc>
-                  <a:txBody>
-                    <a:bodyPr/>
-                    <a:lstStyle/>
-                    <a:p>
-                      <a:pPr algn="l" marL="63500" marR="63500">
-                        <a:lnSpc>
-                          <a:spcPct val="100000"/>
-                        </a:lnSpc>
-                        <a:spcBef>
-                          <a:spcPts val="500"/>
-                        </a:spcBef>
-                        <a:spcAft>
-                          <a:spcPts val="500"/>
-                        </a:spcAft>
-                        <a:buNone/>
-                      </a:pPr>
-                      <a:r>
-                        <a:rPr cap="none" sz="1100" i="0" b="0" u="none">
-                          <a:solidFill>
-                            <a:srgbClr val="000000">
-                              <a:alpha val="100000"/>
-                            </a:srgbClr>
-                          </a:solidFill>
-                          <a:latin typeface="Calibri"/>
-                          <a:cs typeface="Calibri"/>
-                          <a:ea typeface="Calibri"/>
-                          <a:sym typeface="Calibri"/>
-                        </a:rPr>
-                        <a:t>125th</a:t>
-                      </a:r>
-                    </a:p>
-                  </a:txBody>
-                  <a:tcPr anchor="t" marB="63500" marT="63500" marR="0" marL="0">
-                    <a:lnL algn="ctr" cmpd="sng" cap="flat" w="0">
-                      <a:noFill/>
-                      <a:prstDash val="solid"/>
-                    </a:lnL>
-                    <a:lnR algn="ctr" cmpd="sng" cap="flat" w="0">
-                      <a:noFill/>
-                      <a:prstDash val="solid"/>
-                    </a:lnR>
-                    <a:lnT algn="ctr" cmpd="sng" cap="flat" w="0">
-                      <a:noFill/>
-                      <a:prstDash val="solid"/>
-                    </a:lnT>
-                    <a:lnB algn="ctr" cmpd="sng" cap="flat" w="0">
-                      <a:noFill/>
-                      <a:prstDash val="solid"/>
-                    </a:lnB>
-                    <a:solidFill>
-                      <a:srgbClr val="FFFFFF">
-                        <a:alpha val="0"/>
-                      </a:srgbClr>
-                    </a:solidFill>
-                  </a:tcPr>
-                </a:tc>
-                <a:tc>
-                  <a:txBody>
-                    <a:bodyPr/>
-                    <a:lstStyle/>
-                    <a:p>
-                      <a:pPr algn="l" marL="63500" marR="63500">
-                        <a:lnSpc>
-                          <a:spcPct val="100000"/>
-                        </a:lnSpc>
-                        <a:spcBef>
-                          <a:spcPts val="500"/>
-                        </a:spcBef>
-                        <a:spcAft>
-                          <a:spcPts val="500"/>
-                        </a:spcAft>
-                        <a:buNone/>
-                      </a:pPr>
-                      <a:r>
-                        <a:rPr cap="none" sz="1100" i="0" b="0" u="none">
-                          <a:solidFill>
-                            <a:srgbClr val="000000">
-                              <a:alpha val="100000"/>
-                            </a:srgbClr>
-                          </a:solidFill>
-                          <a:latin typeface="Calibri"/>
-                          <a:cs typeface="Calibri"/>
-                          <a:ea typeface="Calibri"/>
-                          <a:sym typeface="Calibri"/>
-                        </a:rPr>
-                        <a:t>Decile 5</a:t>
-                      </a:r>
-                    </a:p>
-                  </a:txBody>
-                  <a:tcPr anchor="t" marB="63500" marT="63500" marR="0" marL="0">
-                    <a:lnL algn="ctr" cmpd="sng" cap="flat" w="0">
-                      <a:noFill/>
-                      <a:prstDash val="solid"/>
-                    </a:lnL>
-                    <a:lnR algn="ctr" cmpd="sng" cap="flat" w="0">
-                      <a:noFill/>
-                      <a:prstDash val="solid"/>
-                    </a:lnR>
-                    <a:lnT algn="ctr" cmpd="sng" cap="flat" w="0">
-                      <a:noFill/>
-                      <a:prstDash val="solid"/>
-                    </a:lnT>
-                    <a:lnB algn="ctr" cmpd="sng" cap="flat" w="0">
-                      <a:noFill/>
-                      <a:prstDash val="solid"/>
-                    </a:lnB>
-                    <a:solidFill>
-                      <a:srgbClr val="FFFFFF">
-                        <a:alpha val="0"/>
-                      </a:srgbClr>
-                    </a:solidFill>
-                  </a:tcPr>
-                </a:tc>
-              </a:tr>
-              <a:tr h="182880">
-                <a:tc>
-                  <a:txBody>
-                    <a:bodyPr/>
-                    <a:lstStyle/>
-                    <a:p>
-                      <a:pPr algn="l" marL="63500" marR="63500">
-                        <a:lnSpc>
-                          <a:spcPct val="100000"/>
-                        </a:lnSpc>
-                        <a:spcBef>
-                          <a:spcPts val="500"/>
-                        </a:spcBef>
-                        <a:spcAft>
-                          <a:spcPts val="500"/>
-                        </a:spcAft>
-                        <a:buNone/>
-                      </a:pPr>
-                      <a:r>
-                        <a:rPr cap="none" sz="1100" i="0" b="0" u="none">
-                          <a:solidFill>
-                            <a:srgbClr val="000000">
-                              <a:alpha val="100000"/>
-                            </a:srgbClr>
-                          </a:solidFill>
-                          <a:latin typeface="Calibri"/>
-                          <a:cs typeface="Calibri"/>
-                          <a:ea typeface="Calibri"/>
-                          <a:sym typeface="Calibri"/>
-                        </a:rPr>
-                        <a:t>Mid Sussex</a:t>
-                      </a:r>
-                    </a:p>
-                  </a:txBody>
-                  <a:tcPr anchor="t" marB="63500" marT="63500" marR="0" marL="0">
-                    <a:lnL algn="ctr" cmpd="sng" cap="flat" w="0">
-                      <a:noFill/>
-                      <a:prstDash val="solid"/>
-                    </a:lnL>
-                    <a:lnR algn="ctr" cmpd="sng" cap="flat" w="0">
-                      <a:noFill/>
-                      <a:prstDash val="solid"/>
-                    </a:lnR>
-                    <a:lnT algn="ctr" cmpd="sng" cap="flat" w="0">
-                      <a:noFill/>
-                      <a:prstDash val="solid"/>
-                    </a:lnT>
-                    <a:lnB algn="ctr" cmpd="sng" cap="flat" w="0">
-                      <a:noFill/>
-                      <a:prstDash val="solid"/>
-                    </a:lnB>
-                    <a:solidFill>
-                      <a:srgbClr val="FFFFFF">
-                        <a:alpha val="0"/>
-                      </a:srgbClr>
-                    </a:solidFill>
-                  </a:tcPr>
-                </a:tc>
-                <a:tc>
-                  <a:txBody>
-                    <a:bodyPr/>
-                    <a:lstStyle/>
-                    <a:p>
-                      <a:pPr algn="l" marL="63500" marR="63500">
-                        <a:lnSpc>
-                          <a:spcPct val="100000"/>
-                        </a:lnSpc>
-                        <a:spcBef>
-                          <a:spcPts val="500"/>
-                        </a:spcBef>
-                        <a:spcAft>
-                          <a:spcPts val="500"/>
-                        </a:spcAft>
-                        <a:buNone/>
-                      </a:pPr>
-                      <a:r>
-                        <a:rPr cap="none" sz="1100" i="0" b="0" u="none">
-                          <a:solidFill>
-                            <a:srgbClr val="000000">
-                              <a:alpha val="100000"/>
-                            </a:srgbClr>
-                          </a:solidFill>
-                          <a:latin typeface="Calibri"/>
-                          <a:cs typeface="Calibri"/>
-                          <a:ea typeface="Calibri"/>
-                          <a:sym typeface="Calibri"/>
-                        </a:rPr>
-                        <a:t>52</a:t>
-                      </a:r>
-                    </a:p>
-                  </a:txBody>
-                  <a:tcPr anchor="t" marB="63500" marT="63500" marR="0" marL="0">
-                    <a:lnL algn="ctr" cmpd="sng" cap="flat" w="0">
-                      <a:noFill/>
-                      <a:prstDash val="solid"/>
-                    </a:lnL>
-                    <a:lnR algn="ctr" cmpd="sng" cap="flat" w="0">
-                      <a:noFill/>
-                      <a:prstDash val="solid"/>
-                    </a:lnR>
-                    <a:lnT algn="ctr" cmpd="sng" cap="flat" w="0">
-                      <a:noFill/>
-                      <a:prstDash val="solid"/>
-                    </a:lnT>
-                    <a:lnB algn="ctr" cmpd="sng" cap="flat" w="0">
-                      <a:noFill/>
-                      <a:prstDash val="solid"/>
-                    </a:lnB>
-                    <a:solidFill>
-                      <a:srgbClr val="FFFFFF">
-                        <a:alpha val="0"/>
-                      </a:srgbClr>
-                    </a:solidFill>
-                  </a:tcPr>
-                </a:tc>
-                <a:tc>
-                  <a:txBody>
-                    <a:bodyPr/>
-                    <a:lstStyle/>
-                    <a:p>
-                      <a:pPr algn="l" marL="63500" marR="63500">
-                        <a:lnSpc>
-                          <a:spcPct val="100000"/>
-                        </a:lnSpc>
-                        <a:spcBef>
-                          <a:spcPts val="500"/>
-                        </a:spcBef>
-                        <a:spcAft>
-                          <a:spcPts val="500"/>
-                        </a:spcAft>
-                        <a:buNone/>
-                      </a:pPr>
-                      <a:r>
-                        <a:rPr cap="none" sz="1100" i="0" b="0" u="none">
-                          <a:solidFill>
-                            <a:srgbClr val="000000">
-                              <a:alpha val="100000"/>
-                            </a:srgbClr>
-                          </a:solidFill>
-                          <a:latin typeface="Calibri"/>
-                          <a:cs typeface="Calibri"/>
-                          <a:ea typeface="Calibri"/>
-                          <a:sym typeface="Calibri"/>
-                        </a:rPr>
-                        <a:t>34.2</a:t>
-                      </a:r>
-                    </a:p>
-                  </a:txBody>
-                  <a:tcPr anchor="t" marB="63500" marT="63500" marR="0" marL="0">
-                    <a:lnL algn="ctr" cmpd="sng" cap="flat" w="0">
-                      <a:noFill/>
-                      <a:prstDash val="solid"/>
-                    </a:lnL>
-                    <a:lnR algn="ctr" cmpd="sng" cap="flat" w="0">
-                      <a:noFill/>
-                      <a:prstDash val="solid"/>
-                    </a:lnR>
-                    <a:lnT algn="ctr" cmpd="sng" cap="flat" w="0">
-                      <a:noFill/>
-                      <a:prstDash val="solid"/>
-                    </a:lnT>
-                    <a:lnB algn="ctr" cmpd="sng" cap="flat" w="0">
-                      <a:noFill/>
-                      <a:prstDash val="solid"/>
-                    </a:lnB>
-                    <a:solidFill>
-                      <a:srgbClr val="FFFFFF">
-                        <a:alpha val="0"/>
-                      </a:srgbClr>
-                    </a:solidFill>
-                  </a:tcPr>
-                </a:tc>
-                <a:tc>
-                  <a:txBody>
-                    <a:bodyPr/>
-                    <a:lstStyle/>
-                    <a:p>
-                      <a:pPr algn="l" marL="63500" marR="63500">
-                        <a:lnSpc>
-                          <a:spcPct val="100000"/>
-                        </a:lnSpc>
-                        <a:spcBef>
-                          <a:spcPts val="500"/>
-                        </a:spcBef>
-                        <a:spcAft>
-                          <a:spcPts val="500"/>
-                        </a:spcAft>
-                        <a:buNone/>
-                      </a:pPr>
-                      <a:r>
-                        <a:rPr cap="none" sz="1100" i="0" b="0" u="none">
-                          <a:solidFill>
-                            <a:srgbClr val="000000">
-                              <a:alpha val="100000"/>
-                            </a:srgbClr>
-                          </a:solidFill>
-                          <a:latin typeface="Calibri"/>
-                          <a:cs typeface="Calibri"/>
-                          <a:ea typeface="Calibri"/>
-                          <a:sym typeface="Calibri"/>
-                        </a:rPr>
-                        <a:t>171st</a:t>
-                      </a:r>
-                    </a:p>
-                  </a:txBody>
-                  <a:tcPr anchor="t" marB="63500" marT="63500" marR="0" marL="0">
-                    <a:lnL algn="ctr" cmpd="sng" cap="flat" w="0">
-                      <a:noFill/>
-                      <a:prstDash val="solid"/>
-                    </a:lnL>
-                    <a:lnR algn="ctr" cmpd="sng" cap="flat" w="0">
-                      <a:noFill/>
-                      <a:prstDash val="solid"/>
-                    </a:lnR>
-                    <a:lnT algn="ctr" cmpd="sng" cap="flat" w="0">
-                      <a:noFill/>
-                      <a:prstDash val="solid"/>
-                    </a:lnT>
-                    <a:lnB algn="ctr" cmpd="sng" cap="flat" w="0">
-                      <a:noFill/>
-                      <a:prstDash val="solid"/>
-                    </a:lnB>
-                    <a:solidFill>
-                      <a:srgbClr val="FFFFFF">
-                        <a:alpha val="0"/>
-                      </a:srgbClr>
-                    </a:solidFill>
-                  </a:tcPr>
-                </a:tc>
-                <a:tc>
-                  <a:txBody>
-                    <a:bodyPr/>
-                    <a:lstStyle/>
-                    <a:p>
-                      <a:pPr algn="l" marL="63500" marR="63500">
-                        <a:lnSpc>
-                          <a:spcPct val="100000"/>
-                        </a:lnSpc>
-                        <a:spcBef>
-                          <a:spcPts val="500"/>
-                        </a:spcBef>
-                        <a:spcAft>
-                          <a:spcPts val="500"/>
-                        </a:spcAft>
-                        <a:buNone/>
-                      </a:pPr>
-                      <a:r>
-                        <a:rPr cap="none" sz="1100" i="0" b="0" u="none">
-                          <a:solidFill>
-                            <a:srgbClr val="000000">
-                              <a:alpha val="100000"/>
-                            </a:srgbClr>
-                          </a:solidFill>
-                          <a:latin typeface="Calibri"/>
-                          <a:cs typeface="Calibri"/>
-                          <a:ea typeface="Calibri"/>
-                          <a:sym typeface="Calibri"/>
-                        </a:rPr>
-                        <a:t>Decile 6</a:t>
-                      </a:r>
-                    </a:p>
-                  </a:txBody>
-                  <a:tcPr anchor="t" marB="63500" marT="63500" marR="0" marL="0">
-                    <a:lnL algn="ctr" cmpd="sng" cap="flat" w="0">
-                      <a:noFill/>
-                      <a:prstDash val="solid"/>
-                    </a:lnL>
-                    <a:lnR algn="ctr" cmpd="sng" cap="flat" w="0">
-                      <a:noFill/>
-                      <a:prstDash val="solid"/>
-                    </a:lnR>
-                    <a:lnT algn="ctr" cmpd="sng" cap="flat" w="0">
-                      <a:noFill/>
-                      <a:prstDash val="solid"/>
-                    </a:lnT>
-                    <a:lnB algn="ctr" cmpd="sng" cap="flat" w="0">
-                      <a:noFill/>
-                      <a:prstDash val="solid"/>
-                    </a:lnB>
-                    <a:solidFill>
-                      <a:srgbClr val="FFFFFF">
-                        <a:alpha val="0"/>
-                      </a:srgbClr>
-                    </a:solidFill>
-                  </a:tcPr>
-                </a:tc>
-              </a:tr>
-              <a:tr h="182880">
-                <a:tc>
-                  <a:txBody>
-                    <a:bodyPr/>
-                    <a:lstStyle/>
-                    <a:p>
-                      <a:pPr algn="l" marL="63500" marR="63500">
-                        <a:lnSpc>
-                          <a:spcPct val="100000"/>
-                        </a:lnSpc>
-                        <a:spcBef>
-                          <a:spcPts val="500"/>
-                        </a:spcBef>
-                        <a:spcAft>
-                          <a:spcPts val="500"/>
-                        </a:spcAft>
-                        <a:buNone/>
-                      </a:pPr>
-                      <a:r>
-                        <a:rPr cap="none" sz="1100" i="0" b="0" u="none">
-                          <a:solidFill>
-                            <a:srgbClr val="000000">
-                              <a:alpha val="100000"/>
-                            </a:srgbClr>
-                          </a:solidFill>
-                          <a:latin typeface="Calibri"/>
-                          <a:cs typeface="Calibri"/>
-                          <a:ea typeface="Calibri"/>
-                          <a:sym typeface="Calibri"/>
-                        </a:rPr>
-                        <a:t>Worthing</a:t>
-                      </a:r>
-                    </a:p>
-                  </a:txBody>
-                  <a:tcPr anchor="t" marB="63500" marT="63500" marR="0" marL="0">
-                    <a:lnL algn="ctr" cmpd="sng" cap="flat" w="0">
-                      <a:noFill/>
-                      <a:prstDash val="solid"/>
-                    </a:lnL>
-                    <a:lnR algn="ctr" cmpd="sng" cap="flat" w="0">
-                      <a:noFill/>
-                      <a:prstDash val="solid"/>
-                    </a:lnR>
-                    <a:lnT algn="ctr" cmpd="sng" cap="flat" w="0">
-                      <a:noFill/>
-                      <a:prstDash val="solid"/>
-                    </a:lnT>
-                    <a:lnB algn="ctr" cmpd="sng" cap="flat" w="0">
-                      <a:noFill/>
-                      <a:prstDash val="solid"/>
-                    </a:lnB>
-                    <a:solidFill>
-                      <a:srgbClr val="FFFFFF">
-                        <a:alpha val="0"/>
-                      </a:srgbClr>
-                    </a:solidFill>
-                  </a:tcPr>
-                </a:tc>
-                <a:tc>
-                  <a:txBody>
-                    <a:bodyPr/>
-                    <a:lstStyle/>
-                    <a:p>
-                      <a:pPr algn="l" marL="63500" marR="63500">
-                        <a:lnSpc>
-                          <a:spcPct val="100000"/>
-                        </a:lnSpc>
-                        <a:spcBef>
-                          <a:spcPts val="500"/>
-                        </a:spcBef>
-                        <a:spcAft>
-                          <a:spcPts val="500"/>
-                        </a:spcAft>
-                        <a:buNone/>
-                      </a:pPr>
-                      <a:r>
-                        <a:rPr cap="none" sz="1100" i="0" b="0" u="none">
-                          <a:solidFill>
-                            <a:srgbClr val="000000">
-                              <a:alpha val="100000"/>
-                            </a:srgbClr>
-                          </a:solidFill>
-                          <a:latin typeface="Calibri"/>
-                          <a:cs typeface="Calibri"/>
-                          <a:ea typeface="Calibri"/>
-                          <a:sym typeface="Calibri"/>
-                        </a:rPr>
-                        <a:t>48</a:t>
-                      </a:r>
-                    </a:p>
-                  </a:txBody>
-                  <a:tcPr anchor="t" marB="63500" marT="63500" marR="0" marL="0">
-                    <a:lnL algn="ctr" cmpd="sng" cap="flat" w="0">
-                      <a:noFill/>
-                      <a:prstDash val="solid"/>
-                    </a:lnL>
-                    <a:lnR algn="ctr" cmpd="sng" cap="flat" w="0">
-                      <a:noFill/>
-                      <a:prstDash val="solid"/>
-                    </a:lnR>
-                    <a:lnT algn="ctr" cmpd="sng" cap="flat" w="0">
-                      <a:noFill/>
-                      <a:prstDash val="solid"/>
-                    </a:lnT>
-                    <a:lnB algn="ctr" cmpd="sng" cap="flat" w="0">
-                      <a:noFill/>
-                      <a:prstDash val="solid"/>
-                    </a:lnB>
-                    <a:solidFill>
-                      <a:srgbClr val="FFFFFF">
-                        <a:alpha val="0"/>
-                      </a:srgbClr>
-                    </a:solidFill>
-                  </a:tcPr>
-                </a:tc>
-                <a:tc>
-                  <a:txBody>
-                    <a:bodyPr/>
-                    <a:lstStyle/>
-                    <a:p>
-                      <a:pPr algn="l" marL="63500" marR="63500">
-                        <a:lnSpc>
-                          <a:spcPct val="100000"/>
-                        </a:lnSpc>
-                        <a:spcBef>
-                          <a:spcPts val="500"/>
-                        </a:spcBef>
-                        <a:spcAft>
-                          <a:spcPts val="500"/>
-                        </a:spcAft>
-                        <a:buNone/>
-                      </a:pPr>
-                      <a:r>
-                        <a:rPr cap="none" sz="1100" i="0" b="0" u="none">
-                          <a:solidFill>
-                            <a:srgbClr val="000000">
-                              <a:alpha val="100000"/>
-                            </a:srgbClr>
-                          </a:solidFill>
-                          <a:latin typeface="Calibri"/>
-                          <a:cs typeface="Calibri"/>
-                          <a:ea typeface="Calibri"/>
-                          <a:sym typeface="Calibri"/>
-                        </a:rPr>
-                        <a:t>43.3</a:t>
-                      </a:r>
-                    </a:p>
-                  </a:txBody>
-                  <a:tcPr anchor="t" marB="63500" marT="63500" marR="0" marL="0">
-                    <a:lnL algn="ctr" cmpd="sng" cap="flat" w="0">
-                      <a:noFill/>
-                      <a:prstDash val="solid"/>
-                    </a:lnL>
-                    <a:lnR algn="ctr" cmpd="sng" cap="flat" w="0">
-                      <a:noFill/>
-                      <a:prstDash val="solid"/>
-                    </a:lnR>
-                    <a:lnT algn="ctr" cmpd="sng" cap="flat" w="0">
-                      <a:noFill/>
-                      <a:prstDash val="solid"/>
-                    </a:lnT>
-                    <a:lnB algn="ctr" cmpd="sng" cap="flat" w="0">
-                      <a:noFill/>
-                      <a:prstDash val="solid"/>
-                    </a:lnB>
-                    <a:solidFill>
-                      <a:srgbClr val="FFFFFF">
-                        <a:alpha val="0"/>
-                      </a:srgbClr>
-                    </a:solidFill>
-                  </a:tcPr>
-                </a:tc>
-                <a:tc>
-                  <a:txBody>
-                    <a:bodyPr/>
-                    <a:lstStyle/>
-                    <a:p>
-                      <a:pPr algn="l" marL="63500" marR="63500">
-                        <a:lnSpc>
-                          <a:spcPct val="100000"/>
-                        </a:lnSpc>
-                        <a:spcBef>
-                          <a:spcPts val="500"/>
-                        </a:spcBef>
-                        <a:spcAft>
-                          <a:spcPts val="500"/>
-                        </a:spcAft>
-                        <a:buNone/>
-                      </a:pPr>
-                      <a:r>
-                        <a:rPr cap="none" sz="1100" i="0" b="0" u="none">
-                          <a:solidFill>
-                            <a:srgbClr val="000000">
-                              <a:alpha val="100000"/>
-                            </a:srgbClr>
-                          </a:solidFill>
-                          <a:latin typeface="Calibri"/>
-                          <a:cs typeface="Calibri"/>
-                          <a:ea typeface="Calibri"/>
-                          <a:sym typeface="Calibri"/>
-                        </a:rPr>
-                        <a:t>78th</a:t>
-                      </a:r>
-                    </a:p>
-                  </a:txBody>
-                  <a:tcPr anchor="t" marB="63500" marT="63500" marR="0" marL="0">
-                    <a:lnL algn="ctr" cmpd="sng" cap="flat" w="0">
-                      <a:noFill/>
-                      <a:prstDash val="solid"/>
-                    </a:lnL>
-                    <a:lnR algn="ctr" cmpd="sng" cap="flat" w="0">
-                      <a:noFill/>
-                      <a:prstDash val="solid"/>
-                    </a:lnR>
-                    <a:lnT algn="ctr" cmpd="sng" cap="flat" w="0">
-                      <a:noFill/>
-                      <a:prstDash val="solid"/>
-                    </a:lnT>
-                    <a:lnB algn="ctr" cmpd="sng" cap="flat" w="0">
-                      <a:noFill/>
-                      <a:prstDash val="solid"/>
-                    </a:lnB>
-                    <a:solidFill>
-                      <a:srgbClr val="FFFFFF">
-                        <a:alpha val="0"/>
-                      </a:srgbClr>
-                    </a:solidFill>
-                  </a:tcPr>
-                </a:tc>
-                <a:tc>
-                  <a:txBody>
-                    <a:bodyPr/>
-                    <a:lstStyle/>
-                    <a:p>
-                      <a:pPr algn="l" marL="63500" marR="63500">
-                        <a:lnSpc>
-                          <a:spcPct val="100000"/>
-                        </a:lnSpc>
-                        <a:spcBef>
-                          <a:spcPts val="500"/>
-                        </a:spcBef>
-                        <a:spcAft>
-                          <a:spcPts val="500"/>
-                        </a:spcAft>
-                        <a:buNone/>
-                      </a:pPr>
-                      <a:r>
-                        <a:rPr cap="none" sz="1100" i="0" b="0" u="none">
-                          <a:solidFill>
-                            <a:srgbClr val="000000">
-                              <a:alpha val="100000"/>
-                            </a:srgbClr>
-                          </a:solidFill>
-                          <a:latin typeface="Calibri"/>
-                          <a:cs typeface="Calibri"/>
-                          <a:ea typeface="Calibri"/>
-                          <a:sym typeface="Calibri"/>
-                        </a:rPr>
-                        <a:t>Decile 3</a:t>
+                        <a:t>with highest rate</a:t>
                       </a:r>
                     </a:p>
                   </a:txBody>
@@ -16594,7 +16594,7 @@
                           <a:ea typeface="Calibri"/>
                           <a:sym typeface="Calibri"/>
                         </a:rPr>
-                        <a:t>325</a:t>
+                        <a:t>468</a:t>
                       </a:r>
                     </a:p>
                   </a:txBody>
@@ -16651,7 +16651,7 @@
                           <a:ea typeface="Calibri"/>
                           <a:sym typeface="Calibri"/>
                         </a:rPr>
-                        <a:t>37.5</a:t>
+                        <a:t>53.9</a:t>
                       </a:r>
                     </a:p>
                   </a:txBody>
@@ -16881,7 +16881,7 @@
                           <a:ea typeface="Calibri"/>
                           <a:sym typeface="Calibri"/>
                         </a:rPr>
-                        <a:t>20,281</a:t>
+                        <a:t>23,216</a:t>
                       </a:r>
                     </a:p>
                   </a:txBody>
@@ -16938,7 +16938,7 @@
                           <a:ea typeface="Calibri"/>
                           <a:sym typeface="Calibri"/>
                         </a:rPr>
-                        <a:t>35.9</a:t>
+                        <a:t>41.1</a:t>
                       </a:r>
                     </a:p>
                   </a:txBody>
@@ -17172,7 +17172,7 @@
                           <a:ea typeface="Calibri"/>
                           <a:sym typeface="Calibri"/>
                         </a:rPr>
-                        <a:t>3,544</a:t>
+                        <a:t>4,195</a:t>
                       </a:r>
                     </a:p>
                   </a:txBody>
@@ -17233,7 +17233,7 @@
                           <a:ea typeface="Calibri"/>
                           <a:sym typeface="Calibri"/>
                         </a:rPr>
-                        <a:t>38.4</a:t>
+                        <a:t>45.5</a:t>
                       </a:r>
                     </a:p>
                   </a:txBody>
@@ -17439,7 +17439,7 @@
           <a:p>
             <a:r>
               <a:rPr/>
-              <a:t>Pack date: 02 December 2022</a:t>
+              <a:t>Pack date: 12 December 2022</a:t>
             </a:r>
           </a:p>
         </p:txBody>
@@ -17597,7 +17597,7 @@
           <a:p>
             <a:r>
               <a:rPr/>
-              <a:t>Pack date: 02 December 2022</a:t>
+              <a:t>Pack date: 12 December 2022</a:t>
             </a:r>
           </a:p>
         </p:txBody>
@@ -17755,7 +17755,7 @@
           <a:p>
             <a:r>
               <a:rPr/>
-              <a:t>Pack date: 02 December 2022</a:t>
+              <a:t>Pack date: 12 December 2022</a:t>
             </a:r>
           </a:p>
         </p:txBody>
@@ -17913,7 +17913,7 @@
           <a:p>
             <a:r>
               <a:rPr/>
-              <a:t>Pack date: 02 December 2022</a:t>
+              <a:t>Pack date: 12 December 2022</a:t>
             </a:r>
           </a:p>
         </p:txBody>
@@ -18071,7 +18071,7 @@
           <a:p>
             <a:r>
               <a:rPr/>
-              <a:t>Pack date: 02 December 2022</a:t>
+              <a:t>Pack date: 12 December 2022</a:t>
             </a:r>
           </a:p>
         </p:txBody>
@@ -18260,7 +18260,7 @@
           <a:p>
             <a:r>
               <a:rPr/>
-              <a:t>Pack date: 02 December 2022</a:t>
+              <a:t>Pack date: 12 December 2022</a:t>
             </a:r>
           </a:p>
         </p:txBody>
@@ -18418,7 +18418,7 @@
           <a:p>
             <a:r>
               <a:rPr/>
-              <a:t>Pack date: 02 December 2022</a:t>
+              <a:t>Pack date: 12 December 2022</a:t>
             </a:r>
           </a:p>
         </p:txBody>
@@ -18576,7 +18576,7 @@
           <a:p>
             <a:r>
               <a:rPr/>
-              <a:t>Pack date: 02 December 2022</a:t>
+              <a:t>Pack date: 12 December 2022</a:t>
             </a:r>
           </a:p>
         </p:txBody>
@@ -18734,7 +18734,7 @@
           <a:p>
             <a:r>
               <a:rPr/>
-              <a:t>Pack date: 02 December 2022</a:t>
+              <a:t>Pack date: 12 December 2022</a:t>
             </a:r>
           </a:p>
         </p:txBody>
@@ -18892,7 +18892,7 @@
           <a:p>
             <a:r>
               <a:rPr/>
-              <a:t>Pack date: 02 December 2022</a:t>
+              <a:t>Pack date: 12 December 2022</a:t>
             </a:r>
           </a:p>
         </p:txBody>
@@ -19024,7 +19024,7 @@
           <a:p>
             <a:r>
               <a:rPr/>
-              <a:t>Pack date: 02 December 2022</a:t>
+              <a:t>Pack date: 12 December 2022</a:t>
             </a:r>
           </a:p>
         </p:txBody>
@@ -19156,7 +19156,7 @@
           <a:p>
             <a:r>
               <a:rPr/>
-              <a:t>Pack date: 02 December 2022</a:t>
+              <a:t>Pack date: 12 December 2022</a:t>
             </a:r>
           </a:p>
         </p:txBody>
@@ -19288,7 +19288,7 @@
           <a:p>
             <a:r>
               <a:rPr/>
-              <a:t>Pack date: 02 December 2022</a:t>
+              <a:t>Pack date: 12 December 2022</a:t>
             </a:r>
           </a:p>
         </p:txBody>
@@ -19420,7 +19420,7 @@
           <a:p>
             <a:r>
               <a:rPr/>
-              <a:t>Pack date: 02 December 2022</a:t>
+              <a:t>Pack date: 12 December 2022</a:t>
             </a:r>
           </a:p>
         </p:txBody>
@@ -19552,7 +19552,7 @@
           <a:p>
             <a:r>
               <a:rPr/>
-              <a:t>Pack date: 02 December 2022</a:t>
+              <a:t>Pack date: 12 December 2022</a:t>
             </a:r>
           </a:p>
         </p:txBody>
@@ -19684,7 +19684,7 @@
           <a:p>
             <a:r>
               <a:rPr/>
-              <a:t>Pack date: 02 December 2022</a:t>
+              <a:t>Pack date: 12 December 2022</a:t>
             </a:r>
           </a:p>
         </p:txBody>

</xml_diff>

<commit_message>
update post 22 - last of the summer wine
</commit_message>
<xml_diff>
--- a/Latest_West_Sussex_C19_slide_deck.pptx
+++ b/Latest_West_Sussex_C19_slide_deck.pptx
@@ -7547,7 +7547,7 @@
           <a:p>
             <a:r>
               <a:rPr/>
-              <a:t>Upper Tier Local Authority cumulative cases as at 15 December</a:t>
+              <a:t>Upper Tier Local Authority cumulative cases as at 22 December</a:t>
             </a:r>
           </a:p>
         </p:txBody>
@@ -8070,7 +8070,7 @@
                           <a:ea typeface="Calibri"/>
                           <a:sym typeface="Calibri"/>
                         </a:rPr>
-                        <a:t>304,335</a:t>
+                        <a:t>305,302</a:t>
                       </a:r>
                     </a:p>
                   </a:txBody>
@@ -8127,7 +8127,7 @@
                           <a:ea typeface="Calibri"/>
                           <a:sym typeface="Calibri"/>
                         </a:rPr>
-                        <a:t>35,076.4</a:t>
+                        <a:t>35,187.8</a:t>
                       </a:r>
                     </a:p>
                   </a:txBody>
@@ -8184,7 +8184,7 @@
                           <a:ea typeface="Calibri"/>
                           <a:sym typeface="Calibri"/>
                         </a:rPr>
-                        <a:t>103rd</a:t>
+                        <a:t>100th</a:t>
                       </a:r>
                     </a:p>
                   </a:txBody>
@@ -8357,7 +8357,7 @@
                           <a:ea typeface="Calibri"/>
                           <a:sym typeface="Calibri"/>
                         </a:rPr>
-                        <a:t>20,350,226</a:t>
+                        <a:t>20,392,339</a:t>
                       </a:r>
                     </a:p>
                   </a:txBody>
@@ -8414,7 +8414,7 @@
                           <a:ea typeface="Calibri"/>
                           <a:sym typeface="Calibri"/>
                         </a:rPr>
-                        <a:t>35,986.2</a:t>
+                        <a:t>36,060.6</a:t>
                       </a:r>
                     </a:p>
                   </a:txBody>
@@ -8648,7 +8648,7 @@
                           <a:ea typeface="Calibri"/>
                           <a:sym typeface="Calibri"/>
                         </a:rPr>
-                        <a:t>3,310,961</a:t>
+                        <a:t>3,319,239</a:t>
                       </a:r>
                     </a:p>
                   </a:txBody>
@@ -8709,7 +8709,7 @@
                           <a:ea typeface="Calibri"/>
                           <a:sym typeface="Calibri"/>
                         </a:rPr>
-                        <a:t>35,921.3</a:t>
+                        <a:t>36,011.1</a:t>
                       </a:r>
                     </a:p>
                   </a:txBody>
@@ -9022,7 +9022,7 @@
           <a:p>
             <a:r>
               <a:rPr/>
-              <a:t>Upper Tier Local Authority rolling 7 day cases as at 15 December</a:t>
+              <a:t>Upper Tier Local Authority rolling 7 day cases as at 22 December</a:t>
             </a:r>
           </a:p>
         </p:txBody>
@@ -9103,7 +9103,7 @@
           <a:p>
             <a:r>
               <a:rPr/>
-              <a:t>Note that the very recent days are excluded in the 7-day total as these are thought to be incomplete. As such, this data represents cases in the seven days to 10 December</a:t>
+              <a:t>Note that the very recent days are excluded in the 7-day total as these are thought to be incomplete. As such, this data represents cases in the seven days to 17 December</a:t>
             </a:r>
           </a:p>
         </p:txBody>
@@ -9545,7 +9545,7 @@
                           <a:ea typeface="Calibri"/>
                           <a:sym typeface="Calibri"/>
                         </a:rPr>
-                        <a:t>579</a:t>
+                        <a:t>791</a:t>
                       </a:r>
                     </a:p>
                   </a:txBody>
@@ -9602,7 +9602,7 @@
                           <a:ea typeface="Calibri"/>
                           <a:sym typeface="Calibri"/>
                         </a:rPr>
-                        <a:t>66.7</a:t>
+                        <a:t>91.2</a:t>
                       </a:r>
                     </a:p>
                   </a:txBody>
@@ -9659,7 +9659,7 @@
                           <a:ea typeface="Calibri"/>
                           <a:sym typeface="Calibri"/>
                         </a:rPr>
-                        <a:t>10th</a:t>
+                        <a:t>13th</a:t>
                       </a:r>
                     </a:p>
                   </a:txBody>
@@ -9859,7 +9859,7 @@
                           <a:ea typeface="Calibri"/>
                           <a:sym typeface="Calibri"/>
                         </a:rPr>
-                        <a:t>27,830</a:t>
+                        <a:t>36,963</a:t>
                       </a:r>
                     </a:p>
                   </a:txBody>
@@ -9916,7 +9916,7 @@
                           <a:ea typeface="Calibri"/>
                           <a:sym typeface="Calibri"/>
                         </a:rPr>
-                        <a:t>49.2</a:t>
+                        <a:t>65.4</a:t>
                       </a:r>
                     </a:p>
                   </a:txBody>
@@ -10150,7 +10150,7 @@
                           <a:ea typeface="Calibri"/>
                           <a:sym typeface="Calibri"/>
                         </a:rPr>
-                        <a:t>5,099</a:t>
+                        <a:t>7,260</a:t>
                       </a:r>
                     </a:p>
                   </a:txBody>
@@ -10211,7 +10211,7 @@
                           <a:ea typeface="Calibri"/>
                           <a:sym typeface="Calibri"/>
                         </a:rPr>
-                        <a:t>55.3</a:t>
+                        <a:t>78.8</a:t>
                       </a:r>
                     </a:p>
                   </a:txBody>
@@ -10524,7 +10524,7 @@
           <a:p>
             <a:r>
               <a:rPr/>
-              <a:t>Lower Tier Local Authority cumulative cases as at 15 December</a:t>
+              <a:t>Lower Tier Local Authority cumulative cases as at 22 December</a:t>
             </a:r>
           </a:p>
         </p:txBody>
@@ -11020,7 +11020,7 @@
                           <a:ea typeface="Calibri"/>
                           <a:sym typeface="Calibri"/>
                         </a:rPr>
-                        <a:t>21,547</a:t>
+                        <a:t>21,596</a:t>
                       </a:r>
                     </a:p>
                   </a:txBody>
@@ -11077,7 +11077,7 @@
                           <a:ea typeface="Calibri"/>
                           <a:sym typeface="Calibri"/>
                         </a:rPr>
-                        <a:t>33,569.1</a:t>
+                        <a:t>33,645.4</a:t>
                       </a:r>
                     </a:p>
                   </a:txBody>
@@ -11134,7 +11134,294 @@
                           <a:ea typeface="Calibri"/>
                           <a:sym typeface="Calibri"/>
                         </a:rPr>
-                        <a:t>251st</a:t>
+                        <a:t>252nd</a:t>
+                      </a:r>
+                    </a:p>
+                  </a:txBody>
+                  <a:tcPr anchor="t" marB="63500" marT="63500" marR="0" marL="0">
+                    <a:lnL algn="ctr" cmpd="sng" cap="flat" w="0">
+                      <a:noFill/>
+                      <a:prstDash val="solid"/>
+                    </a:lnL>
+                    <a:lnR algn="ctr" cmpd="sng" cap="flat" w="0">
+                      <a:noFill/>
+                      <a:prstDash val="solid"/>
+                    </a:lnR>
+                    <a:lnT algn="ctr" cmpd="sng" cap="flat" w="0">
+                      <a:noFill/>
+                      <a:prstDash val="solid"/>
+                    </a:lnT>
+                    <a:lnB algn="ctr" cmpd="sng" cap="flat" w="0">
+                      <a:noFill/>
+                      <a:prstDash val="solid"/>
+                    </a:lnB>
+                    <a:solidFill>
+                      <a:srgbClr val="FFFFFF">
+                        <a:alpha val="0"/>
+                      </a:srgbClr>
+                    </a:solidFill>
+                  </a:tcPr>
+                </a:tc>
+                <a:tc>
+                  <a:txBody>
+                    <a:bodyPr/>
+                    <a:lstStyle/>
+                    <a:p>
+                      <a:pPr algn="l" marL="63500" marR="63500">
+                        <a:lnSpc>
+                          <a:spcPct val="100000"/>
+                        </a:lnSpc>
+                        <a:spcBef>
+                          <a:spcPts val="500"/>
+                        </a:spcBef>
+                        <a:spcAft>
+                          <a:spcPts val="500"/>
+                        </a:spcAft>
+                        <a:buNone/>
+                      </a:pPr>
+                      <a:r>
+                        <a:rPr cap="none" sz="1100" i="0" b="0" u="none">
+                          <a:solidFill>
+                            <a:srgbClr val="000000">
+                              <a:alpha val="100000"/>
+                            </a:srgbClr>
+                          </a:solidFill>
+                          <a:latin typeface="Calibri"/>
+                          <a:cs typeface="Calibri"/>
+                          <a:ea typeface="Calibri"/>
+                          <a:sym typeface="Calibri"/>
+                        </a:rPr>
+                        <a:t>Decile 9</a:t>
+                      </a:r>
+                    </a:p>
+                  </a:txBody>
+                  <a:tcPr anchor="t" marB="63500" marT="63500" marR="0" marL="0">
+                    <a:lnL algn="ctr" cmpd="sng" cap="flat" w="0">
+                      <a:noFill/>
+                      <a:prstDash val="solid"/>
+                    </a:lnL>
+                    <a:lnR algn="ctr" cmpd="sng" cap="flat" w="0">
+                      <a:noFill/>
+                      <a:prstDash val="solid"/>
+                    </a:lnR>
+                    <a:lnT algn="ctr" cmpd="sng" cap="flat" w="0">
+                      <a:noFill/>
+                      <a:prstDash val="solid"/>
+                    </a:lnT>
+                    <a:lnB algn="ctr" cmpd="sng" cap="flat" w="0">
+                      <a:noFill/>
+                      <a:prstDash val="solid"/>
+                    </a:lnB>
+                    <a:solidFill>
+                      <a:srgbClr val="FFFFFF">
+                        <a:alpha val="0"/>
+                      </a:srgbClr>
+                    </a:solidFill>
+                  </a:tcPr>
+                </a:tc>
+              </a:tr>
+              <a:tr h="182880">
+                <a:tc>
+                  <a:txBody>
+                    <a:bodyPr/>
+                    <a:lstStyle/>
+                    <a:p>
+                      <a:pPr algn="l" marL="63500" marR="63500">
+                        <a:lnSpc>
+                          <a:spcPct val="100000"/>
+                        </a:lnSpc>
+                        <a:spcBef>
+                          <a:spcPts val="500"/>
+                        </a:spcBef>
+                        <a:spcAft>
+                          <a:spcPts val="500"/>
+                        </a:spcAft>
+                        <a:buNone/>
+                      </a:pPr>
+                      <a:r>
+                        <a:rPr cap="none" sz="1100" i="0" b="0" u="none">
+                          <a:solidFill>
+                            <a:srgbClr val="000000">
+                              <a:alpha val="100000"/>
+                            </a:srgbClr>
+                          </a:solidFill>
+                          <a:latin typeface="Calibri"/>
+                          <a:cs typeface="Calibri"/>
+                          <a:ea typeface="Calibri"/>
+                          <a:sym typeface="Calibri"/>
+                        </a:rPr>
+                        <a:t>Arun</a:t>
+                      </a:r>
+                    </a:p>
+                  </a:txBody>
+                  <a:tcPr anchor="t" marB="63500" marT="63500" marR="0" marL="0">
+                    <a:lnL algn="ctr" cmpd="sng" cap="flat" w="0">
+                      <a:noFill/>
+                      <a:prstDash val="solid"/>
+                    </a:lnL>
+                    <a:lnR algn="ctr" cmpd="sng" cap="flat" w="0">
+                      <a:noFill/>
+                      <a:prstDash val="solid"/>
+                    </a:lnR>
+                    <a:lnT algn="ctr" cmpd="sng" cap="flat" w="0">
+                      <a:noFill/>
+                      <a:prstDash val="solid"/>
+                    </a:lnT>
+                    <a:lnB algn="ctr" cmpd="sng" cap="flat" w="0">
+                      <a:noFill/>
+                      <a:prstDash val="solid"/>
+                    </a:lnB>
+                    <a:solidFill>
+                      <a:srgbClr val="FFFFFF">
+                        <a:alpha val="0"/>
+                      </a:srgbClr>
+                    </a:solidFill>
+                  </a:tcPr>
+                </a:tc>
+                <a:tc>
+                  <a:txBody>
+                    <a:bodyPr/>
+                    <a:lstStyle/>
+                    <a:p>
+                      <a:pPr algn="l" marL="63500" marR="63500">
+                        <a:lnSpc>
+                          <a:spcPct val="100000"/>
+                        </a:lnSpc>
+                        <a:spcBef>
+                          <a:spcPts val="500"/>
+                        </a:spcBef>
+                        <a:spcAft>
+                          <a:spcPts val="500"/>
+                        </a:spcAft>
+                        <a:buNone/>
+                      </a:pPr>
+                      <a:r>
+                        <a:rPr cap="none" sz="1100" i="0" b="0" u="none">
+                          <a:solidFill>
+                            <a:srgbClr val="000000">
+                              <a:alpha val="100000"/>
+                            </a:srgbClr>
+                          </a:solidFill>
+                          <a:latin typeface="Calibri"/>
+                          <a:cs typeface="Calibri"/>
+                          <a:ea typeface="Calibri"/>
+                          <a:sym typeface="Calibri"/>
+                        </a:rPr>
+                        <a:t>54,650</a:t>
+                      </a:r>
+                    </a:p>
+                  </a:txBody>
+                  <a:tcPr anchor="t" marB="63500" marT="63500" marR="0" marL="0">
+                    <a:lnL algn="ctr" cmpd="sng" cap="flat" w="0">
+                      <a:noFill/>
+                      <a:prstDash val="solid"/>
+                    </a:lnL>
+                    <a:lnR algn="ctr" cmpd="sng" cap="flat" w="0">
+                      <a:noFill/>
+                      <a:prstDash val="solid"/>
+                    </a:lnR>
+                    <a:lnT algn="ctr" cmpd="sng" cap="flat" w="0">
+                      <a:noFill/>
+                      <a:prstDash val="solid"/>
+                    </a:lnT>
+                    <a:lnB algn="ctr" cmpd="sng" cap="flat" w="0">
+                      <a:noFill/>
+                      <a:prstDash val="solid"/>
+                    </a:lnB>
+                    <a:solidFill>
+                      <a:srgbClr val="FFFFFF">
+                        <a:alpha val="0"/>
+                      </a:srgbClr>
+                    </a:solidFill>
+                  </a:tcPr>
+                </a:tc>
+                <a:tc>
+                  <a:txBody>
+                    <a:bodyPr/>
+                    <a:lstStyle/>
+                    <a:p>
+                      <a:pPr algn="l" marL="63500" marR="63500">
+                        <a:lnSpc>
+                          <a:spcPct val="100000"/>
+                        </a:lnSpc>
+                        <a:spcBef>
+                          <a:spcPts val="500"/>
+                        </a:spcBef>
+                        <a:spcAft>
+                          <a:spcPts val="500"/>
+                        </a:spcAft>
+                        <a:buNone/>
+                      </a:pPr>
+                      <a:r>
+                        <a:rPr cap="none" sz="1100" i="0" b="0" u="none">
+                          <a:solidFill>
+                            <a:srgbClr val="000000">
+                              <a:alpha val="100000"/>
+                            </a:srgbClr>
+                          </a:solidFill>
+                          <a:latin typeface="Calibri"/>
+                          <a:cs typeface="Calibri"/>
+                          <a:ea typeface="Calibri"/>
+                          <a:sym typeface="Calibri"/>
+                        </a:rPr>
+                        <a:t>33,918.2</a:t>
+                      </a:r>
+                    </a:p>
+                  </a:txBody>
+                  <a:tcPr anchor="t" marB="63500" marT="63500" marR="0" marL="0">
+                    <a:lnL algn="ctr" cmpd="sng" cap="flat" w="0">
+                      <a:noFill/>
+                      <a:prstDash val="solid"/>
+                    </a:lnL>
+                    <a:lnR algn="ctr" cmpd="sng" cap="flat" w="0">
+                      <a:noFill/>
+                      <a:prstDash val="solid"/>
+                    </a:lnR>
+                    <a:lnT algn="ctr" cmpd="sng" cap="flat" w="0">
+                      <a:noFill/>
+                      <a:prstDash val="solid"/>
+                    </a:lnT>
+                    <a:lnB algn="ctr" cmpd="sng" cap="flat" w="0">
+                      <a:noFill/>
+                      <a:prstDash val="solid"/>
+                    </a:lnB>
+                    <a:solidFill>
+                      <a:srgbClr val="FFFFFF">
+                        <a:alpha val="0"/>
+                      </a:srgbClr>
+                    </a:solidFill>
+                  </a:tcPr>
+                </a:tc>
+                <a:tc>
+                  <a:txBody>
+                    <a:bodyPr/>
+                    <a:lstStyle/>
+                    <a:p>
+                      <a:pPr algn="l" marL="63500" marR="63500">
+                        <a:lnSpc>
+                          <a:spcPct val="100000"/>
+                        </a:lnSpc>
+                        <a:spcBef>
+                          <a:spcPts val="500"/>
+                        </a:spcBef>
+                        <a:spcAft>
+                          <a:spcPts val="500"/>
+                        </a:spcAft>
+                        <a:buNone/>
+                      </a:pPr>
+                      <a:r>
+                        <a:rPr cap="none" sz="1100" i="0" b="0" u="none">
+                          <a:solidFill>
+                            <a:srgbClr val="000000">
+                              <a:alpha val="100000"/>
+                            </a:srgbClr>
+                          </a:solidFill>
+                          <a:latin typeface="Calibri"/>
+                          <a:cs typeface="Calibri"/>
+                          <a:ea typeface="Calibri"/>
+                          <a:sym typeface="Calibri"/>
+                        </a:rPr>
+                        <a:t>245th</a:t>
                       </a:r>
                     </a:p>
                   </a:txBody>
@@ -11250,7 +11537,7 @@
                           <a:ea typeface="Calibri"/>
                           <a:sym typeface="Calibri"/>
                         </a:rPr>
-                        <a:t>Arun</a:t>
+                        <a:t>Chichester</a:t>
                       </a:r>
                     </a:p>
                   </a:txBody>
@@ -11307,7 +11594,7 @@
                           <a:ea typeface="Calibri"/>
                           <a:sym typeface="Calibri"/>
                         </a:rPr>
-                        <a:t>54,419</a:t>
+                        <a:t>39,633</a:t>
                       </a:r>
                     </a:p>
                   </a:txBody>
@@ -11364,294 +11651,7 @@
                           <a:ea typeface="Calibri"/>
                           <a:sym typeface="Calibri"/>
                         </a:rPr>
-                        <a:t>33,774.8</a:t>
-                      </a:r>
-                    </a:p>
-                  </a:txBody>
-                  <a:tcPr anchor="t" marB="63500" marT="63500" marR="0" marL="0">
-                    <a:lnL algn="ctr" cmpd="sng" cap="flat" w="0">
-                      <a:noFill/>
-                      <a:prstDash val="solid"/>
-                    </a:lnL>
-                    <a:lnR algn="ctr" cmpd="sng" cap="flat" w="0">
-                      <a:noFill/>
-                      <a:prstDash val="solid"/>
-                    </a:lnR>
-                    <a:lnT algn="ctr" cmpd="sng" cap="flat" w="0">
-                      <a:noFill/>
-                      <a:prstDash val="solid"/>
-                    </a:lnT>
-                    <a:lnB algn="ctr" cmpd="sng" cap="flat" w="0">
-                      <a:noFill/>
-                      <a:prstDash val="solid"/>
-                    </a:lnB>
-                    <a:solidFill>
-                      <a:srgbClr val="FFFFFF">
-                        <a:alpha val="0"/>
-                      </a:srgbClr>
-                    </a:solidFill>
-                  </a:tcPr>
-                </a:tc>
-                <a:tc>
-                  <a:txBody>
-                    <a:bodyPr/>
-                    <a:lstStyle/>
-                    <a:p>
-                      <a:pPr algn="l" marL="63500" marR="63500">
-                        <a:lnSpc>
-                          <a:spcPct val="100000"/>
-                        </a:lnSpc>
-                        <a:spcBef>
-                          <a:spcPts val="500"/>
-                        </a:spcBef>
-                        <a:spcAft>
-                          <a:spcPts val="500"/>
-                        </a:spcAft>
-                        <a:buNone/>
-                      </a:pPr>
-                      <a:r>
-                        <a:rPr cap="none" sz="1100" i="0" b="0" u="none">
-                          <a:solidFill>
-                            <a:srgbClr val="000000">
-                              <a:alpha val="100000"/>
-                            </a:srgbClr>
-                          </a:solidFill>
-                          <a:latin typeface="Calibri"/>
-                          <a:cs typeface="Calibri"/>
-                          <a:ea typeface="Calibri"/>
-                          <a:sym typeface="Calibri"/>
-                        </a:rPr>
-                        <a:t>247th</a:t>
-                      </a:r>
-                    </a:p>
-                  </a:txBody>
-                  <a:tcPr anchor="t" marB="63500" marT="63500" marR="0" marL="0">
-                    <a:lnL algn="ctr" cmpd="sng" cap="flat" w="0">
-                      <a:noFill/>
-                      <a:prstDash val="solid"/>
-                    </a:lnL>
-                    <a:lnR algn="ctr" cmpd="sng" cap="flat" w="0">
-                      <a:noFill/>
-                      <a:prstDash val="solid"/>
-                    </a:lnR>
-                    <a:lnT algn="ctr" cmpd="sng" cap="flat" w="0">
-                      <a:noFill/>
-                      <a:prstDash val="solid"/>
-                    </a:lnT>
-                    <a:lnB algn="ctr" cmpd="sng" cap="flat" w="0">
-                      <a:noFill/>
-                      <a:prstDash val="solid"/>
-                    </a:lnB>
-                    <a:solidFill>
-                      <a:srgbClr val="FFFFFF">
-                        <a:alpha val="0"/>
-                      </a:srgbClr>
-                    </a:solidFill>
-                  </a:tcPr>
-                </a:tc>
-                <a:tc>
-                  <a:txBody>
-                    <a:bodyPr/>
-                    <a:lstStyle/>
-                    <a:p>
-                      <a:pPr algn="l" marL="63500" marR="63500">
-                        <a:lnSpc>
-                          <a:spcPct val="100000"/>
-                        </a:lnSpc>
-                        <a:spcBef>
-                          <a:spcPts val="500"/>
-                        </a:spcBef>
-                        <a:spcAft>
-                          <a:spcPts val="500"/>
-                        </a:spcAft>
-                        <a:buNone/>
-                      </a:pPr>
-                      <a:r>
-                        <a:rPr cap="none" sz="1100" i="0" b="0" u="none">
-                          <a:solidFill>
-                            <a:srgbClr val="000000">
-                              <a:alpha val="100000"/>
-                            </a:srgbClr>
-                          </a:solidFill>
-                          <a:latin typeface="Calibri"/>
-                          <a:cs typeface="Calibri"/>
-                          <a:ea typeface="Calibri"/>
-                          <a:sym typeface="Calibri"/>
-                        </a:rPr>
-                        <a:t>Decile 8</a:t>
-                      </a:r>
-                    </a:p>
-                  </a:txBody>
-                  <a:tcPr anchor="t" marB="63500" marT="63500" marR="0" marL="0">
-                    <a:lnL algn="ctr" cmpd="sng" cap="flat" w="0">
-                      <a:noFill/>
-                      <a:prstDash val="solid"/>
-                    </a:lnL>
-                    <a:lnR algn="ctr" cmpd="sng" cap="flat" w="0">
-                      <a:noFill/>
-                      <a:prstDash val="solid"/>
-                    </a:lnR>
-                    <a:lnT algn="ctr" cmpd="sng" cap="flat" w="0">
-                      <a:noFill/>
-                      <a:prstDash val="solid"/>
-                    </a:lnT>
-                    <a:lnB algn="ctr" cmpd="sng" cap="flat" w="0">
-                      <a:noFill/>
-                      <a:prstDash val="solid"/>
-                    </a:lnB>
-                    <a:solidFill>
-                      <a:srgbClr val="FFFFFF">
-                        <a:alpha val="0"/>
-                      </a:srgbClr>
-                    </a:solidFill>
-                  </a:tcPr>
-                </a:tc>
-              </a:tr>
-              <a:tr h="182880">
-                <a:tc>
-                  <a:txBody>
-                    <a:bodyPr/>
-                    <a:lstStyle/>
-                    <a:p>
-                      <a:pPr algn="l" marL="63500" marR="63500">
-                        <a:lnSpc>
-                          <a:spcPct val="100000"/>
-                        </a:lnSpc>
-                        <a:spcBef>
-                          <a:spcPts val="500"/>
-                        </a:spcBef>
-                        <a:spcAft>
-                          <a:spcPts val="500"/>
-                        </a:spcAft>
-                        <a:buNone/>
-                      </a:pPr>
-                      <a:r>
-                        <a:rPr cap="none" sz="1100" i="0" b="0" u="none">
-                          <a:solidFill>
-                            <a:srgbClr val="000000">
-                              <a:alpha val="100000"/>
-                            </a:srgbClr>
-                          </a:solidFill>
-                          <a:latin typeface="Calibri"/>
-                          <a:cs typeface="Calibri"/>
-                          <a:ea typeface="Calibri"/>
-                          <a:sym typeface="Calibri"/>
-                        </a:rPr>
-                        <a:t>Chichester</a:t>
-                      </a:r>
-                    </a:p>
-                  </a:txBody>
-                  <a:tcPr anchor="t" marB="63500" marT="63500" marR="0" marL="0">
-                    <a:lnL algn="ctr" cmpd="sng" cap="flat" w="0">
-                      <a:noFill/>
-                      <a:prstDash val="solid"/>
-                    </a:lnL>
-                    <a:lnR algn="ctr" cmpd="sng" cap="flat" w="0">
-                      <a:noFill/>
-                      <a:prstDash val="solid"/>
-                    </a:lnR>
-                    <a:lnT algn="ctr" cmpd="sng" cap="flat" w="0">
-                      <a:noFill/>
-                      <a:prstDash val="solid"/>
-                    </a:lnT>
-                    <a:lnB algn="ctr" cmpd="sng" cap="flat" w="0">
-                      <a:noFill/>
-                      <a:prstDash val="solid"/>
-                    </a:lnB>
-                    <a:solidFill>
-                      <a:srgbClr val="FFFFFF">
-                        <a:alpha val="0"/>
-                      </a:srgbClr>
-                    </a:solidFill>
-                  </a:tcPr>
-                </a:tc>
-                <a:tc>
-                  <a:txBody>
-                    <a:bodyPr/>
-                    <a:lstStyle/>
-                    <a:p>
-                      <a:pPr algn="l" marL="63500" marR="63500">
-                        <a:lnSpc>
-                          <a:spcPct val="100000"/>
-                        </a:lnSpc>
-                        <a:spcBef>
-                          <a:spcPts val="500"/>
-                        </a:spcBef>
-                        <a:spcAft>
-                          <a:spcPts val="500"/>
-                        </a:spcAft>
-                        <a:buNone/>
-                      </a:pPr>
-                      <a:r>
-                        <a:rPr cap="none" sz="1100" i="0" b="0" u="none">
-                          <a:solidFill>
-                            <a:srgbClr val="000000">
-                              <a:alpha val="100000"/>
-                            </a:srgbClr>
-                          </a:solidFill>
-                          <a:latin typeface="Calibri"/>
-                          <a:cs typeface="Calibri"/>
-                          <a:ea typeface="Calibri"/>
-                          <a:sym typeface="Calibri"/>
-                        </a:rPr>
-                        <a:t>39,520</a:t>
-                      </a:r>
-                    </a:p>
-                  </a:txBody>
-                  <a:tcPr anchor="t" marB="63500" marT="63500" marR="0" marL="0">
-                    <a:lnL algn="ctr" cmpd="sng" cap="flat" w="0">
-                      <a:noFill/>
-                      <a:prstDash val="solid"/>
-                    </a:lnL>
-                    <a:lnR algn="ctr" cmpd="sng" cap="flat" w="0">
-                      <a:noFill/>
-                      <a:prstDash val="solid"/>
-                    </a:lnR>
-                    <a:lnT algn="ctr" cmpd="sng" cap="flat" w="0">
-                      <a:noFill/>
-                      <a:prstDash val="solid"/>
-                    </a:lnT>
-                    <a:lnB algn="ctr" cmpd="sng" cap="flat" w="0">
-                      <a:noFill/>
-                      <a:prstDash val="solid"/>
-                    </a:lnB>
-                    <a:solidFill>
-                      <a:srgbClr val="FFFFFF">
-                        <a:alpha val="0"/>
-                      </a:srgbClr>
-                    </a:solidFill>
-                  </a:tcPr>
-                </a:tc>
-                <a:tc>
-                  <a:txBody>
-                    <a:bodyPr/>
-                    <a:lstStyle/>
-                    <a:p>
-                      <a:pPr algn="l" marL="63500" marR="63500">
-                        <a:lnSpc>
-                          <a:spcPct val="100000"/>
-                        </a:lnSpc>
-                        <a:spcBef>
-                          <a:spcPts val="500"/>
-                        </a:spcBef>
-                        <a:spcAft>
-                          <a:spcPts val="500"/>
-                        </a:spcAft>
-                        <a:buNone/>
-                      </a:pPr>
-                      <a:r>
-                        <a:rPr cap="none" sz="1100" i="0" b="0" u="none">
-                          <a:solidFill>
-                            <a:srgbClr val="000000">
-                              <a:alpha val="100000"/>
-                            </a:srgbClr>
-                          </a:solidFill>
-                          <a:latin typeface="Calibri"/>
-                          <a:cs typeface="Calibri"/>
-                          <a:ea typeface="Calibri"/>
-                          <a:sym typeface="Calibri"/>
-                        </a:rPr>
-                        <a:t>32,524.6</a:t>
+                        <a:t>32,617.6</a:t>
                       </a:r>
                     </a:p>
                   </a:txBody>
@@ -11881,7 +11881,7 @@
                           <a:ea typeface="Calibri"/>
                           <a:sym typeface="Calibri"/>
                         </a:rPr>
-                        <a:t>44,017</a:t>
+                        <a:t>44,106</a:t>
                       </a:r>
                     </a:p>
                   </a:txBody>
@@ -11938,7 +11938,7 @@
                           <a:ea typeface="Calibri"/>
                           <a:sym typeface="Calibri"/>
                         </a:rPr>
-                        <a:t>39,135.3</a:t>
+                        <a:t>39,214.4</a:t>
                       </a:r>
                     </a:p>
                   </a:txBody>
@@ -11995,7 +11995,7 @@
                           <a:ea typeface="Calibri"/>
                           <a:sym typeface="Calibri"/>
                         </a:rPr>
-                        <a:t>25th</a:t>
+                        <a:t>24th</a:t>
                       </a:r>
                     </a:p>
                   </a:txBody>
@@ -12195,7 +12195,7 @@
                           <a:ea typeface="Calibri"/>
                           <a:sym typeface="Calibri"/>
                         </a:rPr>
-                        <a:t>49,729</a:t>
+                        <a:t>49,887</a:t>
                       </a:r>
                     </a:p>
                   </a:txBody>
@@ -12252,7 +12252,7 @@
                           <a:ea typeface="Calibri"/>
                           <a:sym typeface="Calibri"/>
                         </a:rPr>
-                        <a:t>34,184.1</a:t>
+                        <a:t>34,292.7</a:t>
                       </a:r>
                     </a:p>
                   </a:txBody>
@@ -12309,7 +12309,7 @@
                           <a:ea typeface="Calibri"/>
                           <a:sym typeface="Calibri"/>
                         </a:rPr>
-                        <a:t>236th</a:t>
+                        <a:t>230th</a:t>
                       </a:r>
                     </a:p>
                   </a:txBody>
@@ -12482,7 +12482,7 @@
                           <a:ea typeface="Calibri"/>
                           <a:sym typeface="Calibri"/>
                         </a:rPr>
-                        <a:t>56,255</a:t>
+                        <a:t>56,403</a:t>
                       </a:r>
                     </a:p>
                   </a:txBody>
@@ -12539,7 +12539,7 @@
                           <a:ea typeface="Calibri"/>
                           <a:sym typeface="Calibri"/>
                         </a:rPr>
-                        <a:t>36,975.3</a:t>
+                        <a:t>37,072.6</a:t>
                       </a:r>
                     </a:p>
                   </a:txBody>
@@ -12596,7 +12596,7 @@
                           <a:ea typeface="Calibri"/>
                           <a:sym typeface="Calibri"/>
                         </a:rPr>
-                        <a:t>105th</a:t>
+                        <a:t>103rd</a:t>
                       </a:r>
                     </a:p>
                   </a:txBody>
@@ -12769,7 +12769,7 @@
                           <a:ea typeface="Calibri"/>
                           <a:sym typeface="Calibri"/>
                         </a:rPr>
-                        <a:t>38,848</a:t>
+                        <a:t>39,027</a:t>
                       </a:r>
                     </a:p>
                   </a:txBody>
@@ -12826,7 +12826,7 @@
                           <a:ea typeface="Calibri"/>
                           <a:sym typeface="Calibri"/>
                         </a:rPr>
-                        <a:t>35,084.5</a:t>
+                        <a:t>35,246.1</a:t>
                       </a:r>
                     </a:p>
                   </a:txBody>
@@ -12883,7 +12883,7 @@
                           <a:ea typeface="Calibri"/>
                           <a:sym typeface="Calibri"/>
                         </a:rPr>
-                        <a:t>199th</a:t>
+                        <a:t>196th</a:t>
                       </a:r>
                     </a:p>
                   </a:txBody>
@@ -13056,7 +13056,7 @@
                           <a:ea typeface="Calibri"/>
                           <a:sym typeface="Calibri"/>
                         </a:rPr>
-                        <a:t>304,335</a:t>
+                        <a:t>305,302</a:t>
                       </a:r>
                     </a:p>
                   </a:txBody>
@@ -13113,7 +13113,7 @@
                           <a:ea typeface="Calibri"/>
                           <a:sym typeface="Calibri"/>
                         </a:rPr>
-                        <a:t>35,076.4</a:t>
+                        <a:t>35,187.8</a:t>
                       </a:r>
                     </a:p>
                   </a:txBody>
@@ -13343,7 +13343,7 @@
                           <a:ea typeface="Calibri"/>
                           <a:sym typeface="Calibri"/>
                         </a:rPr>
-                        <a:t>3,310,961</a:t>
+                        <a:t>3,319,239</a:t>
                       </a:r>
                     </a:p>
                   </a:txBody>
@@ -13400,7 +13400,7 @@
                           <a:ea typeface="Calibri"/>
                           <a:sym typeface="Calibri"/>
                         </a:rPr>
-                        <a:t>35,921.3</a:t>
+                        <a:t>36,011.1</a:t>
                       </a:r>
                     </a:p>
                   </a:txBody>
@@ -13634,7 +13634,7 @@
                           <a:ea typeface="Calibri"/>
                           <a:sym typeface="Calibri"/>
                         </a:rPr>
-                        <a:t>20,350,226</a:t>
+                        <a:t>20,392,339</a:t>
                       </a:r>
                     </a:p>
                   </a:txBody>
@@ -13695,7 +13695,7 @@
                           <a:ea typeface="Calibri"/>
                           <a:sym typeface="Calibri"/>
                         </a:rPr>
-                        <a:t>35,986.2</a:t>
+                        <a:t>36,060.6</a:t>
                       </a:r>
                     </a:p>
                   </a:txBody>
@@ -14008,7 +14008,7 @@
           <a:p>
             <a:r>
               <a:rPr/>
-              <a:t>Lower Tier Local Authority rolling cases as at 15 December</a:t>
+              <a:t>Lower Tier Local Authority rolling cases as at 22 December</a:t>
             </a:r>
           </a:p>
         </p:txBody>
@@ -14089,7 +14089,7 @@
           <a:p>
             <a:r>
               <a:rPr/>
-              <a:t>Note that the very recent days are excluded in the 7-day total as these are thought to be incomplete. As such, this data represents cases in the seven days to 10 December</a:t>
+              <a:t>Note that the very recent days are excluded in the 7-day total as these are thought to be incomplete. As such, this data represents cases in the seven days to 17 December</a:t>
             </a:r>
           </a:p>
         </p:txBody>
@@ -14531,7 +14531,7 @@
                           <a:ea typeface="Calibri"/>
                           <a:sym typeface="Calibri"/>
                         </a:rPr>
-                        <a:t>34</a:t>
+                        <a:t>39</a:t>
                       </a:r>
                     </a:p>
                   </a:txBody>
@@ -14588,7 +14588,7 @@
                           <a:ea typeface="Calibri"/>
                           <a:sym typeface="Calibri"/>
                         </a:rPr>
-                        <a:t>53.0</a:t>
+                        <a:t>60.8</a:t>
                       </a:r>
                     </a:p>
                   </a:txBody>
@@ -14645,7 +14645,7 @@
                           <a:ea typeface="Calibri"/>
                           <a:sym typeface="Calibri"/>
                         </a:rPr>
-                        <a:t>121st</a:t>
+                        <a:t>181st</a:t>
                       </a:r>
                     </a:p>
                   </a:txBody>
@@ -14702,7 +14702,7 @@
                           <a:ea typeface="Calibri"/>
                           <a:sym typeface="Calibri"/>
                         </a:rPr>
-                        <a:t>Decile 4</a:t>
+                        <a:t>Decile 6</a:t>
                       </a:r>
                     </a:p>
                   </a:txBody>
@@ -14818,7 +14818,7 @@
                           <a:ea typeface="Calibri"/>
                           <a:sym typeface="Calibri"/>
                         </a:rPr>
-                        <a:t>165</a:t>
+                        <a:t>172</a:t>
                       </a:r>
                     </a:p>
                   </a:txBody>
@@ -14875,7 +14875,7 @@
                           <a:ea typeface="Calibri"/>
                           <a:sym typeface="Calibri"/>
                         </a:rPr>
-                        <a:t>102.4</a:t>
+                        <a:t>106.8</a:t>
                       </a:r>
                     </a:p>
                   </a:txBody>
@@ -14932,7 +14932,7 @@
                           <a:ea typeface="Calibri"/>
                           <a:sym typeface="Calibri"/>
                         </a:rPr>
-                        <a:t>1st</a:t>
+                        <a:t>26th</a:t>
                       </a:r>
                     </a:p>
                   </a:txBody>
@@ -15132,7 +15132,7 @@
                           <a:ea typeface="Calibri"/>
                           <a:sym typeface="Calibri"/>
                         </a:rPr>
-                        <a:t>76</a:t>
+                        <a:t>90</a:t>
                       </a:r>
                     </a:p>
                   </a:txBody>
@@ -15189,7 +15189,7 @@
                           <a:ea typeface="Calibri"/>
                           <a:sym typeface="Calibri"/>
                         </a:rPr>
-                        <a:t>62.5</a:t>
+                        <a:t>74.1</a:t>
                       </a:r>
                     </a:p>
                   </a:txBody>
@@ -15246,7 +15246,895 @@
                           <a:ea typeface="Calibri"/>
                           <a:sym typeface="Calibri"/>
                         </a:rPr>
-                        <a:t>59th</a:t>
+                        <a:t>106th</a:t>
+                      </a:r>
+                    </a:p>
+                  </a:txBody>
+                  <a:tcPr anchor="t" marB="63500" marT="63500" marR="0" marL="0">
+                    <a:lnL algn="ctr" cmpd="sng" cap="flat" w="0">
+                      <a:noFill/>
+                      <a:prstDash val="solid"/>
+                    </a:lnL>
+                    <a:lnR algn="ctr" cmpd="sng" cap="flat" w="0">
+                      <a:noFill/>
+                      <a:prstDash val="solid"/>
+                    </a:lnR>
+                    <a:lnT algn="ctr" cmpd="sng" cap="flat" w="0">
+                      <a:noFill/>
+                      <a:prstDash val="solid"/>
+                    </a:lnT>
+                    <a:lnB algn="ctr" cmpd="sng" cap="flat" w="0">
+                      <a:noFill/>
+                      <a:prstDash val="solid"/>
+                    </a:lnB>
+                    <a:solidFill>
+                      <a:srgbClr val="FFFFFF">
+                        <a:alpha val="0"/>
+                      </a:srgbClr>
+                    </a:solidFill>
+                  </a:tcPr>
+                </a:tc>
+                <a:tc>
+                  <a:txBody>
+                    <a:bodyPr/>
+                    <a:lstStyle/>
+                    <a:p>
+                      <a:pPr algn="l" marL="63500" marR="63500">
+                        <a:lnSpc>
+                          <a:spcPct val="100000"/>
+                        </a:lnSpc>
+                        <a:spcBef>
+                          <a:spcPts val="500"/>
+                        </a:spcBef>
+                        <a:spcAft>
+                          <a:spcPts val="500"/>
+                        </a:spcAft>
+                        <a:buNone/>
+                      </a:pPr>
+                      <a:r>
+                        <a:rPr cap="none" sz="1100" i="0" b="0" u="none">
+                          <a:solidFill>
+                            <a:srgbClr val="000000">
+                              <a:alpha val="100000"/>
+                            </a:srgbClr>
+                          </a:solidFill>
+                          <a:latin typeface="Calibri"/>
+                          <a:cs typeface="Calibri"/>
+                          <a:ea typeface="Calibri"/>
+                          <a:sym typeface="Calibri"/>
+                        </a:rPr>
+                        <a:t>Decile 4</a:t>
+                      </a:r>
+                    </a:p>
+                  </a:txBody>
+                  <a:tcPr anchor="t" marB="63500" marT="63500" marR="0" marL="0">
+                    <a:lnL algn="ctr" cmpd="sng" cap="flat" w="0">
+                      <a:noFill/>
+                      <a:prstDash val="solid"/>
+                    </a:lnL>
+                    <a:lnR algn="ctr" cmpd="sng" cap="flat" w="0">
+                      <a:noFill/>
+                      <a:prstDash val="solid"/>
+                    </a:lnR>
+                    <a:lnT algn="ctr" cmpd="sng" cap="flat" w="0">
+                      <a:noFill/>
+                      <a:prstDash val="solid"/>
+                    </a:lnT>
+                    <a:lnB algn="ctr" cmpd="sng" cap="flat" w="0">
+                      <a:noFill/>
+                      <a:prstDash val="solid"/>
+                    </a:lnB>
+                    <a:solidFill>
+                      <a:srgbClr val="FFFFFF">
+                        <a:alpha val="0"/>
+                      </a:srgbClr>
+                    </a:solidFill>
+                  </a:tcPr>
+                </a:tc>
+              </a:tr>
+              <a:tr h="182880">
+                <a:tc>
+                  <a:txBody>
+                    <a:bodyPr/>
+                    <a:lstStyle/>
+                    <a:p>
+                      <a:pPr algn="l" marL="63500" marR="63500">
+                        <a:lnSpc>
+                          <a:spcPct val="100000"/>
+                        </a:lnSpc>
+                        <a:spcBef>
+                          <a:spcPts val="500"/>
+                        </a:spcBef>
+                        <a:spcAft>
+                          <a:spcPts val="500"/>
+                        </a:spcAft>
+                        <a:buNone/>
+                      </a:pPr>
+                      <a:r>
+                        <a:rPr cap="none" sz="1100" i="0" b="0" u="none">
+                          <a:solidFill>
+                            <a:srgbClr val="000000">
+                              <a:alpha val="100000"/>
+                            </a:srgbClr>
+                          </a:solidFill>
+                          <a:latin typeface="Calibri"/>
+                          <a:cs typeface="Calibri"/>
+                          <a:ea typeface="Calibri"/>
+                          <a:sym typeface="Calibri"/>
+                        </a:rPr>
+                        <a:t>Crawley</a:t>
+                      </a:r>
+                    </a:p>
+                  </a:txBody>
+                  <a:tcPr anchor="t" marB="63500" marT="63500" marR="0" marL="0">
+                    <a:lnL algn="ctr" cmpd="sng" cap="flat" w="0">
+                      <a:noFill/>
+                      <a:prstDash val="solid"/>
+                    </a:lnL>
+                    <a:lnR algn="ctr" cmpd="sng" cap="flat" w="0">
+                      <a:noFill/>
+                      <a:prstDash val="solid"/>
+                    </a:lnR>
+                    <a:lnT algn="ctr" cmpd="sng" cap="flat" w="0">
+                      <a:noFill/>
+                      <a:prstDash val="solid"/>
+                    </a:lnT>
+                    <a:lnB algn="ctr" cmpd="sng" cap="flat" w="0">
+                      <a:noFill/>
+                      <a:prstDash val="solid"/>
+                    </a:lnB>
+                    <a:solidFill>
+                      <a:srgbClr val="FFFFFF">
+                        <a:alpha val="0"/>
+                      </a:srgbClr>
+                    </a:solidFill>
+                  </a:tcPr>
+                </a:tc>
+                <a:tc>
+                  <a:txBody>
+                    <a:bodyPr/>
+                    <a:lstStyle/>
+                    <a:p>
+                      <a:pPr algn="l" marL="63500" marR="63500">
+                        <a:lnSpc>
+                          <a:spcPct val="100000"/>
+                        </a:lnSpc>
+                        <a:spcBef>
+                          <a:spcPts val="500"/>
+                        </a:spcBef>
+                        <a:spcAft>
+                          <a:spcPts val="500"/>
+                        </a:spcAft>
+                        <a:buNone/>
+                      </a:pPr>
+                      <a:r>
+                        <a:rPr cap="none" sz="1100" i="0" b="0" u="none">
+                          <a:solidFill>
+                            <a:srgbClr val="000000">
+                              <a:alpha val="100000"/>
+                            </a:srgbClr>
+                          </a:solidFill>
+                          <a:latin typeface="Calibri"/>
+                          <a:cs typeface="Calibri"/>
+                          <a:ea typeface="Calibri"/>
+                          <a:sym typeface="Calibri"/>
+                        </a:rPr>
+                        <a:t>59</a:t>
+                      </a:r>
+                    </a:p>
+                  </a:txBody>
+                  <a:tcPr anchor="t" marB="63500" marT="63500" marR="0" marL="0">
+                    <a:lnL algn="ctr" cmpd="sng" cap="flat" w="0">
+                      <a:noFill/>
+                      <a:prstDash val="solid"/>
+                    </a:lnL>
+                    <a:lnR algn="ctr" cmpd="sng" cap="flat" w="0">
+                      <a:noFill/>
+                      <a:prstDash val="solid"/>
+                    </a:lnR>
+                    <a:lnT algn="ctr" cmpd="sng" cap="flat" w="0">
+                      <a:noFill/>
+                      <a:prstDash val="solid"/>
+                    </a:lnT>
+                    <a:lnB algn="ctr" cmpd="sng" cap="flat" w="0">
+                      <a:noFill/>
+                      <a:prstDash val="solid"/>
+                    </a:lnB>
+                    <a:solidFill>
+                      <a:srgbClr val="FFFFFF">
+                        <a:alpha val="0"/>
+                      </a:srgbClr>
+                    </a:solidFill>
+                  </a:tcPr>
+                </a:tc>
+                <a:tc>
+                  <a:txBody>
+                    <a:bodyPr/>
+                    <a:lstStyle/>
+                    <a:p>
+                      <a:pPr algn="l" marL="63500" marR="63500">
+                        <a:lnSpc>
+                          <a:spcPct val="100000"/>
+                        </a:lnSpc>
+                        <a:spcBef>
+                          <a:spcPts val="500"/>
+                        </a:spcBef>
+                        <a:spcAft>
+                          <a:spcPts val="500"/>
+                        </a:spcAft>
+                        <a:buNone/>
+                      </a:pPr>
+                      <a:r>
+                        <a:rPr cap="none" sz="1100" i="0" b="0" u="none">
+                          <a:solidFill>
+                            <a:srgbClr val="000000">
+                              <a:alpha val="100000"/>
+                            </a:srgbClr>
+                          </a:solidFill>
+                          <a:latin typeface="Calibri"/>
+                          <a:cs typeface="Calibri"/>
+                          <a:ea typeface="Calibri"/>
+                          <a:sym typeface="Calibri"/>
+                        </a:rPr>
+                        <a:t>52.5</a:t>
+                      </a:r>
+                    </a:p>
+                  </a:txBody>
+                  <a:tcPr anchor="t" marB="63500" marT="63500" marR="0" marL="0">
+                    <a:lnL algn="ctr" cmpd="sng" cap="flat" w="0">
+                      <a:noFill/>
+                      <a:prstDash val="solid"/>
+                    </a:lnL>
+                    <a:lnR algn="ctr" cmpd="sng" cap="flat" w="0">
+                      <a:noFill/>
+                      <a:prstDash val="solid"/>
+                    </a:lnR>
+                    <a:lnT algn="ctr" cmpd="sng" cap="flat" w="0">
+                      <a:noFill/>
+                      <a:prstDash val="solid"/>
+                    </a:lnT>
+                    <a:lnB algn="ctr" cmpd="sng" cap="flat" w="0">
+                      <a:noFill/>
+                      <a:prstDash val="solid"/>
+                    </a:lnB>
+                    <a:solidFill>
+                      <a:srgbClr val="FFFFFF">
+                        <a:alpha val="0"/>
+                      </a:srgbClr>
+                    </a:solidFill>
+                  </a:tcPr>
+                </a:tc>
+                <a:tc>
+                  <a:txBody>
+                    <a:bodyPr/>
+                    <a:lstStyle/>
+                    <a:p>
+                      <a:pPr algn="l" marL="63500" marR="63500">
+                        <a:lnSpc>
+                          <a:spcPct val="100000"/>
+                        </a:lnSpc>
+                        <a:spcBef>
+                          <a:spcPts val="500"/>
+                        </a:spcBef>
+                        <a:spcAft>
+                          <a:spcPts val="500"/>
+                        </a:spcAft>
+                        <a:buNone/>
+                      </a:pPr>
+                      <a:r>
+                        <a:rPr cap="none" sz="1100" i="0" b="0" u="none">
+                          <a:solidFill>
+                            <a:srgbClr val="000000">
+                              <a:alpha val="100000"/>
+                            </a:srgbClr>
+                          </a:solidFill>
+                          <a:latin typeface="Calibri"/>
+                          <a:cs typeface="Calibri"/>
+                          <a:ea typeface="Calibri"/>
+                          <a:sym typeface="Calibri"/>
+                        </a:rPr>
+                        <a:t>226th</a:t>
+                      </a:r>
+                    </a:p>
+                  </a:txBody>
+                  <a:tcPr anchor="t" marB="63500" marT="63500" marR="0" marL="0">
+                    <a:lnL algn="ctr" cmpd="sng" cap="flat" w="0">
+                      <a:noFill/>
+                      <a:prstDash val="solid"/>
+                    </a:lnL>
+                    <a:lnR algn="ctr" cmpd="sng" cap="flat" w="0">
+                      <a:noFill/>
+                      <a:prstDash val="solid"/>
+                    </a:lnR>
+                    <a:lnT algn="ctr" cmpd="sng" cap="flat" w="0">
+                      <a:noFill/>
+                      <a:prstDash val="solid"/>
+                    </a:lnT>
+                    <a:lnB algn="ctr" cmpd="sng" cap="flat" w="0">
+                      <a:noFill/>
+                      <a:prstDash val="solid"/>
+                    </a:lnB>
+                    <a:solidFill>
+                      <a:srgbClr val="FFFFFF">
+                        <a:alpha val="0"/>
+                      </a:srgbClr>
+                    </a:solidFill>
+                  </a:tcPr>
+                </a:tc>
+                <a:tc>
+                  <a:txBody>
+                    <a:bodyPr/>
+                    <a:lstStyle/>
+                    <a:p>
+                      <a:pPr algn="l" marL="63500" marR="63500">
+                        <a:lnSpc>
+                          <a:spcPct val="100000"/>
+                        </a:lnSpc>
+                        <a:spcBef>
+                          <a:spcPts val="500"/>
+                        </a:spcBef>
+                        <a:spcAft>
+                          <a:spcPts val="500"/>
+                        </a:spcAft>
+                        <a:buNone/>
+                      </a:pPr>
+                      <a:r>
+                        <a:rPr cap="none" sz="1100" i="0" b="0" u="none">
+                          <a:solidFill>
+                            <a:srgbClr val="000000">
+                              <a:alpha val="100000"/>
+                            </a:srgbClr>
+                          </a:solidFill>
+                          <a:latin typeface="Calibri"/>
+                          <a:cs typeface="Calibri"/>
+                          <a:ea typeface="Calibri"/>
+                          <a:sym typeface="Calibri"/>
+                        </a:rPr>
+                        <a:t>Decile 8</a:t>
+                      </a:r>
+                    </a:p>
+                  </a:txBody>
+                  <a:tcPr anchor="t" marB="63500" marT="63500" marR="0" marL="0">
+                    <a:lnL algn="ctr" cmpd="sng" cap="flat" w="0">
+                      <a:noFill/>
+                      <a:prstDash val="solid"/>
+                    </a:lnL>
+                    <a:lnR algn="ctr" cmpd="sng" cap="flat" w="0">
+                      <a:noFill/>
+                      <a:prstDash val="solid"/>
+                    </a:lnR>
+                    <a:lnT algn="ctr" cmpd="sng" cap="flat" w="0">
+                      <a:noFill/>
+                      <a:prstDash val="solid"/>
+                    </a:lnT>
+                    <a:lnB algn="ctr" cmpd="sng" cap="flat" w="0">
+                      <a:noFill/>
+                      <a:prstDash val="solid"/>
+                    </a:lnB>
+                    <a:solidFill>
+                      <a:srgbClr val="FFFFFF">
+                        <a:alpha val="0"/>
+                      </a:srgbClr>
+                    </a:solidFill>
+                  </a:tcPr>
+                </a:tc>
+              </a:tr>
+              <a:tr h="182880">
+                <a:tc>
+                  <a:txBody>
+                    <a:bodyPr/>
+                    <a:lstStyle/>
+                    <a:p>
+                      <a:pPr algn="l" marL="63500" marR="63500">
+                        <a:lnSpc>
+                          <a:spcPct val="100000"/>
+                        </a:lnSpc>
+                        <a:spcBef>
+                          <a:spcPts val="500"/>
+                        </a:spcBef>
+                        <a:spcAft>
+                          <a:spcPts val="500"/>
+                        </a:spcAft>
+                        <a:buNone/>
+                      </a:pPr>
+                      <a:r>
+                        <a:rPr cap="none" sz="1100" i="0" b="0" u="none">
+                          <a:solidFill>
+                            <a:srgbClr val="000000">
+                              <a:alpha val="100000"/>
+                            </a:srgbClr>
+                          </a:solidFill>
+                          <a:latin typeface="Calibri"/>
+                          <a:cs typeface="Calibri"/>
+                          <a:ea typeface="Calibri"/>
+                          <a:sym typeface="Calibri"/>
+                        </a:rPr>
+                        <a:t>Horsham</a:t>
+                      </a:r>
+                    </a:p>
+                  </a:txBody>
+                  <a:tcPr anchor="t" marB="63500" marT="63500" marR="0" marL="0">
+                    <a:lnL algn="ctr" cmpd="sng" cap="flat" w="0">
+                      <a:noFill/>
+                      <a:prstDash val="solid"/>
+                    </a:lnL>
+                    <a:lnR algn="ctr" cmpd="sng" cap="flat" w="0">
+                      <a:noFill/>
+                      <a:prstDash val="solid"/>
+                    </a:lnR>
+                    <a:lnT algn="ctr" cmpd="sng" cap="flat" w="0">
+                      <a:noFill/>
+                      <a:prstDash val="solid"/>
+                    </a:lnT>
+                    <a:lnB algn="ctr" cmpd="sng" cap="flat" w="0">
+                      <a:noFill/>
+                      <a:prstDash val="solid"/>
+                    </a:lnB>
+                    <a:solidFill>
+                      <a:srgbClr val="FFFFFF">
+                        <a:alpha val="0"/>
+                      </a:srgbClr>
+                    </a:solidFill>
+                  </a:tcPr>
+                </a:tc>
+                <a:tc>
+                  <a:txBody>
+                    <a:bodyPr/>
+                    <a:lstStyle/>
+                    <a:p>
+                      <a:pPr algn="l" marL="63500" marR="63500">
+                        <a:lnSpc>
+                          <a:spcPct val="100000"/>
+                        </a:lnSpc>
+                        <a:spcBef>
+                          <a:spcPts val="500"/>
+                        </a:spcBef>
+                        <a:spcAft>
+                          <a:spcPts val="500"/>
+                        </a:spcAft>
+                        <a:buNone/>
+                      </a:pPr>
+                      <a:r>
+                        <a:rPr cap="none" sz="1100" i="0" b="0" u="none">
+                          <a:solidFill>
+                            <a:srgbClr val="000000">
+                              <a:alpha val="100000"/>
+                            </a:srgbClr>
+                          </a:solidFill>
+                          <a:latin typeface="Calibri"/>
+                          <a:cs typeface="Calibri"/>
+                          <a:ea typeface="Calibri"/>
+                          <a:sym typeface="Calibri"/>
+                        </a:rPr>
+                        <a:t>153</a:t>
+                      </a:r>
+                    </a:p>
+                  </a:txBody>
+                  <a:tcPr anchor="t" marB="63500" marT="63500" marR="0" marL="0">
+                    <a:lnL algn="ctr" cmpd="sng" cap="flat" w="0">
+                      <a:noFill/>
+                      <a:prstDash val="solid"/>
+                    </a:lnL>
+                    <a:lnR algn="ctr" cmpd="sng" cap="flat" w="0">
+                      <a:noFill/>
+                      <a:prstDash val="solid"/>
+                    </a:lnR>
+                    <a:lnT algn="ctr" cmpd="sng" cap="flat" w="0">
+                      <a:noFill/>
+                      <a:prstDash val="solid"/>
+                    </a:lnT>
+                    <a:lnB algn="ctr" cmpd="sng" cap="flat" w="0">
+                      <a:noFill/>
+                      <a:prstDash val="solid"/>
+                    </a:lnB>
+                    <a:solidFill>
+                      <a:srgbClr val="FFFFFF">
+                        <a:alpha val="0"/>
+                      </a:srgbClr>
+                    </a:solidFill>
+                  </a:tcPr>
+                </a:tc>
+                <a:tc>
+                  <a:txBody>
+                    <a:bodyPr/>
+                    <a:lstStyle/>
+                    <a:p>
+                      <a:pPr algn="l" marL="63500" marR="63500">
+                        <a:lnSpc>
+                          <a:spcPct val="100000"/>
+                        </a:lnSpc>
+                        <a:spcBef>
+                          <a:spcPts val="500"/>
+                        </a:spcBef>
+                        <a:spcAft>
+                          <a:spcPts val="500"/>
+                        </a:spcAft>
+                        <a:buNone/>
+                      </a:pPr>
+                      <a:r>
+                        <a:rPr cap="none" sz="1100" i="0" b="0" u="none">
+                          <a:solidFill>
+                            <a:srgbClr val="000000">
+                              <a:alpha val="100000"/>
+                            </a:srgbClr>
+                          </a:solidFill>
+                          <a:latin typeface="Calibri"/>
+                          <a:cs typeface="Calibri"/>
+                          <a:ea typeface="Calibri"/>
+                          <a:sym typeface="Calibri"/>
+                        </a:rPr>
+                        <a:t>105.2</a:t>
+                      </a:r>
+                    </a:p>
+                  </a:txBody>
+                  <a:tcPr anchor="t" marB="63500" marT="63500" marR="0" marL="0">
+                    <a:lnL algn="ctr" cmpd="sng" cap="flat" w="0">
+                      <a:noFill/>
+                      <a:prstDash val="solid"/>
+                    </a:lnL>
+                    <a:lnR algn="ctr" cmpd="sng" cap="flat" w="0">
+                      <a:noFill/>
+                      <a:prstDash val="solid"/>
+                    </a:lnR>
+                    <a:lnT algn="ctr" cmpd="sng" cap="flat" w="0">
+                      <a:noFill/>
+                      <a:prstDash val="solid"/>
+                    </a:lnT>
+                    <a:lnB algn="ctr" cmpd="sng" cap="flat" w="0">
+                      <a:noFill/>
+                      <a:prstDash val="solid"/>
+                    </a:lnB>
+                    <a:solidFill>
+                      <a:srgbClr val="FFFFFF">
+                        <a:alpha val="0"/>
+                      </a:srgbClr>
+                    </a:solidFill>
+                  </a:tcPr>
+                </a:tc>
+                <a:tc>
+                  <a:txBody>
+                    <a:bodyPr/>
+                    <a:lstStyle/>
+                    <a:p>
+                      <a:pPr algn="l" marL="63500" marR="63500">
+                        <a:lnSpc>
+                          <a:spcPct val="100000"/>
+                        </a:lnSpc>
+                        <a:spcBef>
+                          <a:spcPts val="500"/>
+                        </a:spcBef>
+                        <a:spcAft>
+                          <a:spcPts val="500"/>
+                        </a:spcAft>
+                        <a:buNone/>
+                      </a:pPr>
+                      <a:r>
+                        <a:rPr cap="none" sz="1100" i="0" b="0" u="none">
+                          <a:solidFill>
+                            <a:srgbClr val="000000">
+                              <a:alpha val="100000"/>
+                            </a:srgbClr>
+                          </a:solidFill>
+                          <a:latin typeface="Calibri"/>
+                          <a:cs typeface="Calibri"/>
+                          <a:ea typeface="Calibri"/>
+                          <a:sym typeface="Calibri"/>
+                        </a:rPr>
+                        <a:t>27th</a:t>
+                      </a:r>
+                    </a:p>
+                  </a:txBody>
+                  <a:tcPr anchor="t" marB="63500" marT="63500" marR="0" marL="0">
+                    <a:lnL algn="ctr" cmpd="sng" cap="flat" w="0">
+                      <a:noFill/>
+                      <a:prstDash val="solid"/>
+                    </a:lnL>
+                    <a:lnR algn="ctr" cmpd="sng" cap="flat" w="0">
+                      <a:noFill/>
+                      <a:prstDash val="solid"/>
+                    </a:lnR>
+                    <a:lnT algn="ctr" cmpd="sng" cap="flat" w="0">
+                      <a:noFill/>
+                      <a:prstDash val="solid"/>
+                    </a:lnT>
+                    <a:lnB algn="ctr" cmpd="sng" cap="flat" w="0">
+                      <a:noFill/>
+                      <a:prstDash val="solid"/>
+                    </a:lnB>
+                    <a:solidFill>
+                      <a:srgbClr val="FFFFFF">
+                        <a:alpha val="0"/>
+                      </a:srgbClr>
+                    </a:solidFill>
+                  </a:tcPr>
+                </a:tc>
+                <a:tc>
+                  <a:txBody>
+                    <a:bodyPr/>
+                    <a:lstStyle/>
+                    <a:p>
+                      <a:pPr algn="l" marL="63500" marR="63500">
+                        <a:lnSpc>
+                          <a:spcPct val="100000"/>
+                        </a:lnSpc>
+                        <a:spcBef>
+                          <a:spcPts val="500"/>
+                        </a:spcBef>
+                        <a:spcAft>
+                          <a:spcPts val="500"/>
+                        </a:spcAft>
+                        <a:buNone/>
+                      </a:pPr>
+                      <a:r>
+                        <a:rPr cap="none" sz="1100" i="0" b="0" u="none">
+                          <a:solidFill>
+                            <a:srgbClr val="000000">
+                              <a:alpha val="100000"/>
+                            </a:srgbClr>
+                          </a:solidFill>
+                          <a:latin typeface="Calibri"/>
+                          <a:cs typeface="Calibri"/>
+                          <a:ea typeface="Calibri"/>
+                          <a:sym typeface="Calibri"/>
+                        </a:rPr>
+                        <a:t>10% of authorities</a:t>
+                      </a:r>
+                      <a:br>
+                        <a:rPr cap="none" sz="1100" i="0" b="0" u="none">
+                          <a:solidFill>
+                            <a:srgbClr val="000000">
+                              <a:alpha val="100000"/>
+                            </a:srgbClr>
+                          </a:solidFill>
+                          <a:latin typeface="Calibri"/>
+                          <a:cs typeface="Calibri"/>
+                          <a:ea typeface="Calibri"/>
+                          <a:sym typeface="Calibri"/>
+                        </a:rPr>
+                      </a:br>
+                      <a:r>
+                        <a:rPr cap="none" sz="1100" i="0" b="0" u="none">
+                          <a:solidFill>
+                            <a:srgbClr val="000000">
+                              <a:alpha val="100000"/>
+                            </a:srgbClr>
+                          </a:solidFill>
+                          <a:latin typeface="Calibri"/>
+                          <a:cs typeface="Calibri"/>
+                          <a:ea typeface="Calibri"/>
+                          <a:sym typeface="Calibri"/>
+                        </a:rPr>
+                        <a:t>with highest rate</a:t>
+                      </a:r>
+                    </a:p>
+                  </a:txBody>
+                  <a:tcPr anchor="t" marB="63500" marT="63500" marR="0" marL="0">
+                    <a:lnL algn="ctr" cmpd="sng" cap="flat" w="0">
+                      <a:noFill/>
+                      <a:prstDash val="solid"/>
+                    </a:lnL>
+                    <a:lnR algn="ctr" cmpd="sng" cap="flat" w="0">
+                      <a:noFill/>
+                      <a:prstDash val="solid"/>
+                    </a:lnR>
+                    <a:lnT algn="ctr" cmpd="sng" cap="flat" w="0">
+                      <a:noFill/>
+                      <a:prstDash val="solid"/>
+                    </a:lnT>
+                    <a:lnB algn="ctr" cmpd="sng" cap="flat" w="0">
+                      <a:noFill/>
+                      <a:prstDash val="solid"/>
+                    </a:lnB>
+                    <a:solidFill>
+                      <a:srgbClr val="FFFFFF">
+                        <a:alpha val="0"/>
+                      </a:srgbClr>
+                    </a:solidFill>
+                  </a:tcPr>
+                </a:tc>
+              </a:tr>
+              <a:tr h="182880">
+                <a:tc>
+                  <a:txBody>
+                    <a:bodyPr/>
+                    <a:lstStyle/>
+                    <a:p>
+                      <a:pPr algn="l" marL="63500" marR="63500">
+                        <a:lnSpc>
+                          <a:spcPct val="100000"/>
+                        </a:lnSpc>
+                        <a:spcBef>
+                          <a:spcPts val="500"/>
+                        </a:spcBef>
+                        <a:spcAft>
+                          <a:spcPts val="500"/>
+                        </a:spcAft>
+                        <a:buNone/>
+                      </a:pPr>
+                      <a:r>
+                        <a:rPr cap="none" sz="1100" i="0" b="0" u="none">
+                          <a:solidFill>
+                            <a:srgbClr val="000000">
+                              <a:alpha val="100000"/>
+                            </a:srgbClr>
+                          </a:solidFill>
+                          <a:latin typeface="Calibri"/>
+                          <a:cs typeface="Calibri"/>
+                          <a:ea typeface="Calibri"/>
+                          <a:sym typeface="Calibri"/>
+                        </a:rPr>
+                        <a:t>Mid Sussex</a:t>
+                      </a:r>
+                    </a:p>
+                  </a:txBody>
+                  <a:tcPr anchor="t" marB="63500" marT="63500" marR="0" marL="0">
+                    <a:lnL algn="ctr" cmpd="sng" cap="flat" w="0">
+                      <a:noFill/>
+                      <a:prstDash val="solid"/>
+                    </a:lnL>
+                    <a:lnR algn="ctr" cmpd="sng" cap="flat" w="0">
+                      <a:noFill/>
+                      <a:prstDash val="solid"/>
+                    </a:lnR>
+                    <a:lnT algn="ctr" cmpd="sng" cap="flat" w="0">
+                      <a:noFill/>
+                      <a:prstDash val="solid"/>
+                    </a:lnT>
+                    <a:lnB algn="ctr" cmpd="sng" cap="flat" w="0">
+                      <a:noFill/>
+                      <a:prstDash val="solid"/>
+                    </a:lnB>
+                    <a:solidFill>
+                      <a:srgbClr val="FFFFFF">
+                        <a:alpha val="0"/>
+                      </a:srgbClr>
+                    </a:solidFill>
+                  </a:tcPr>
+                </a:tc>
+                <a:tc>
+                  <a:txBody>
+                    <a:bodyPr/>
+                    <a:lstStyle/>
+                    <a:p>
+                      <a:pPr algn="l" marL="63500" marR="63500">
+                        <a:lnSpc>
+                          <a:spcPct val="100000"/>
+                        </a:lnSpc>
+                        <a:spcBef>
+                          <a:spcPts val="500"/>
+                        </a:spcBef>
+                        <a:spcAft>
+                          <a:spcPts val="500"/>
+                        </a:spcAft>
+                        <a:buNone/>
+                      </a:pPr>
+                      <a:r>
+                        <a:rPr cap="none" sz="1100" i="0" b="0" u="none">
+                          <a:solidFill>
+                            <a:srgbClr val="000000">
+                              <a:alpha val="100000"/>
+                            </a:srgbClr>
+                          </a:solidFill>
+                          <a:latin typeface="Calibri"/>
+                          <a:cs typeface="Calibri"/>
+                          <a:ea typeface="Calibri"/>
+                          <a:sym typeface="Calibri"/>
+                        </a:rPr>
+                        <a:t>142</a:t>
+                      </a:r>
+                    </a:p>
+                  </a:txBody>
+                  <a:tcPr anchor="t" marB="63500" marT="63500" marR="0" marL="0">
+                    <a:lnL algn="ctr" cmpd="sng" cap="flat" w="0">
+                      <a:noFill/>
+                      <a:prstDash val="solid"/>
+                    </a:lnL>
+                    <a:lnR algn="ctr" cmpd="sng" cap="flat" w="0">
+                      <a:noFill/>
+                      <a:prstDash val="solid"/>
+                    </a:lnR>
+                    <a:lnT algn="ctr" cmpd="sng" cap="flat" w="0">
+                      <a:noFill/>
+                      <a:prstDash val="solid"/>
+                    </a:lnT>
+                    <a:lnB algn="ctr" cmpd="sng" cap="flat" w="0">
+                      <a:noFill/>
+                      <a:prstDash val="solid"/>
+                    </a:lnB>
+                    <a:solidFill>
+                      <a:srgbClr val="FFFFFF">
+                        <a:alpha val="0"/>
+                      </a:srgbClr>
+                    </a:solidFill>
+                  </a:tcPr>
+                </a:tc>
+                <a:tc>
+                  <a:txBody>
+                    <a:bodyPr/>
+                    <a:lstStyle/>
+                    <a:p>
+                      <a:pPr algn="l" marL="63500" marR="63500">
+                        <a:lnSpc>
+                          <a:spcPct val="100000"/>
+                        </a:lnSpc>
+                        <a:spcBef>
+                          <a:spcPts val="500"/>
+                        </a:spcBef>
+                        <a:spcAft>
+                          <a:spcPts val="500"/>
+                        </a:spcAft>
+                        <a:buNone/>
+                      </a:pPr>
+                      <a:r>
+                        <a:rPr cap="none" sz="1100" i="0" b="0" u="none">
+                          <a:solidFill>
+                            <a:srgbClr val="000000">
+                              <a:alpha val="100000"/>
+                            </a:srgbClr>
+                          </a:solidFill>
+                          <a:latin typeface="Calibri"/>
+                          <a:cs typeface="Calibri"/>
+                          <a:ea typeface="Calibri"/>
+                          <a:sym typeface="Calibri"/>
+                        </a:rPr>
+                        <a:t>93.3</a:t>
+                      </a:r>
+                    </a:p>
+                  </a:txBody>
+                  <a:tcPr anchor="t" marB="63500" marT="63500" marR="0" marL="0">
+                    <a:lnL algn="ctr" cmpd="sng" cap="flat" w="0">
+                      <a:noFill/>
+                      <a:prstDash val="solid"/>
+                    </a:lnL>
+                    <a:lnR algn="ctr" cmpd="sng" cap="flat" w="0">
+                      <a:noFill/>
+                      <a:prstDash val="solid"/>
+                    </a:lnR>
+                    <a:lnT algn="ctr" cmpd="sng" cap="flat" w="0">
+                      <a:noFill/>
+                      <a:prstDash val="solid"/>
+                    </a:lnT>
+                    <a:lnB algn="ctr" cmpd="sng" cap="flat" w="0">
+                      <a:noFill/>
+                      <a:prstDash val="solid"/>
+                    </a:lnB>
+                    <a:solidFill>
+                      <a:srgbClr val="FFFFFF">
+                        <a:alpha val="0"/>
+                      </a:srgbClr>
+                    </a:solidFill>
+                  </a:tcPr>
+                </a:tc>
+                <a:tc>
+                  <a:txBody>
+                    <a:bodyPr/>
+                    <a:lstStyle/>
+                    <a:p>
+                      <a:pPr algn="l" marL="63500" marR="63500">
+                        <a:lnSpc>
+                          <a:spcPct val="100000"/>
+                        </a:lnSpc>
+                        <a:spcBef>
+                          <a:spcPts val="500"/>
+                        </a:spcBef>
+                        <a:spcAft>
+                          <a:spcPts val="500"/>
+                        </a:spcAft>
+                        <a:buNone/>
+                      </a:pPr>
+                      <a:r>
+                        <a:rPr cap="none" sz="1100" i="0" b="0" u="none">
+                          <a:solidFill>
+                            <a:srgbClr val="000000">
+                              <a:alpha val="100000"/>
+                            </a:srgbClr>
+                          </a:solidFill>
+                          <a:latin typeface="Calibri"/>
+                          <a:cs typeface="Calibri"/>
+                          <a:ea typeface="Calibri"/>
+                          <a:sym typeface="Calibri"/>
+                        </a:rPr>
+                        <a:t>41st</a:t>
                       </a:r>
                     </a:p>
                   </a:txBody>
@@ -15362,7 +16250,7 @@
                           <a:ea typeface="Calibri"/>
                           <a:sym typeface="Calibri"/>
                         </a:rPr>
-                        <a:t>Crawley</a:t>
+                        <a:t>Worthing</a:t>
                       </a:r>
                     </a:p>
                   </a:txBody>
@@ -15419,7 +16307,7 @@
                           <a:ea typeface="Calibri"/>
                           <a:sym typeface="Calibri"/>
                         </a:rPr>
-                        <a:t>56</a:t>
+                        <a:t>136</a:t>
                       </a:r>
                     </a:p>
                   </a:txBody>
@@ -15476,7 +16364,7 @@
                           <a:ea typeface="Calibri"/>
                           <a:sym typeface="Calibri"/>
                         </a:rPr>
-                        <a:t>49.8</a:t>
+                        <a:t>122.8</a:t>
                       </a:r>
                     </a:p>
                   </a:txBody>
@@ -15533,7 +16421,7 @@
                           <a:ea typeface="Calibri"/>
                           <a:sym typeface="Calibri"/>
                         </a:rPr>
-                        <a:t>155th</a:t>
+                        <a:t>12th</a:t>
                       </a:r>
                     </a:p>
                   </a:txBody>
@@ -15590,53 +16478,21 @@
                           <a:ea typeface="Calibri"/>
                           <a:sym typeface="Calibri"/>
                         </a:rPr>
-                        <a:t>Decile 5</a:t>
+                        <a:t>10% of authorities</a:t>
                       </a:r>
-                    </a:p>
-                  </a:txBody>
-                  <a:tcPr anchor="t" marB="63500" marT="63500" marR="0" marL="0">
-                    <a:lnL algn="ctr" cmpd="sng" cap="flat" w="0">
-                      <a:noFill/>
-                      <a:prstDash val="solid"/>
-                    </a:lnL>
-                    <a:lnR algn="ctr" cmpd="sng" cap="flat" w="0">
-                      <a:noFill/>
-                      <a:prstDash val="solid"/>
-                    </a:lnR>
-                    <a:lnT algn="ctr" cmpd="sng" cap="flat" w="0">
-                      <a:noFill/>
-                      <a:prstDash val="solid"/>
-                    </a:lnT>
-                    <a:lnB algn="ctr" cmpd="sng" cap="flat" w="0">
-                      <a:noFill/>
-                      <a:prstDash val="solid"/>
-                    </a:lnB>
-                    <a:solidFill>
-                      <a:srgbClr val="FFFFFF">
-                        <a:alpha val="0"/>
-                      </a:srgbClr>
-                    </a:solidFill>
-                  </a:tcPr>
-                </a:tc>
-              </a:tr>
-              <a:tr h="182880">
-                <a:tc>
-                  <a:txBody>
-                    <a:bodyPr/>
-                    <a:lstStyle/>
-                    <a:p>
-                      <a:pPr algn="l" marL="63500" marR="63500">
-                        <a:lnSpc>
-                          <a:spcPct val="100000"/>
-                        </a:lnSpc>
-                        <a:spcBef>
-                          <a:spcPts val="500"/>
-                        </a:spcBef>
-                        <a:spcAft>
-                          <a:spcPts val="500"/>
-                        </a:spcAft>
-                        <a:buNone/>
-                      </a:pPr>
+                      <a:br>
+                        <a:rPr cap="none" sz="1100" i="0" b="0" u="none">
+                          <a:solidFill>
+                            <a:srgbClr val="000000">
+                              <a:alpha val="100000"/>
+                            </a:srgbClr>
+                          </a:solidFill>
+                          <a:latin typeface="Calibri"/>
+                          <a:cs typeface="Calibri"/>
+                          <a:ea typeface="Calibri"/>
+                          <a:sym typeface="Calibri"/>
+                        </a:rPr>
+                      </a:br>
                       <a:r>
                         <a:rPr cap="none" sz="1100" i="0" b="0" u="none">
                           <a:solidFill>
@@ -15649,809 +16505,7 @@
                           <a:ea typeface="Calibri"/>
                           <a:sym typeface="Calibri"/>
                         </a:rPr>
-                        <a:t>Horsham</a:t>
-                      </a:r>
-                    </a:p>
-                  </a:txBody>
-                  <a:tcPr anchor="t" marB="63500" marT="63500" marR="0" marL="0">
-                    <a:lnL algn="ctr" cmpd="sng" cap="flat" w="0">
-                      <a:noFill/>
-                      <a:prstDash val="solid"/>
-                    </a:lnL>
-                    <a:lnR algn="ctr" cmpd="sng" cap="flat" w="0">
-                      <a:noFill/>
-                      <a:prstDash val="solid"/>
-                    </a:lnR>
-                    <a:lnT algn="ctr" cmpd="sng" cap="flat" w="0">
-                      <a:noFill/>
-                      <a:prstDash val="solid"/>
-                    </a:lnT>
-                    <a:lnB algn="ctr" cmpd="sng" cap="flat" w="0">
-                      <a:noFill/>
-                      <a:prstDash val="solid"/>
-                    </a:lnB>
-                    <a:solidFill>
-                      <a:srgbClr val="FFFFFF">
-                        <a:alpha val="0"/>
-                      </a:srgbClr>
-                    </a:solidFill>
-                  </a:tcPr>
-                </a:tc>
-                <a:tc>
-                  <a:txBody>
-                    <a:bodyPr/>
-                    <a:lstStyle/>
-                    <a:p>
-                      <a:pPr algn="l" marL="63500" marR="63500">
-                        <a:lnSpc>
-                          <a:spcPct val="100000"/>
-                        </a:lnSpc>
-                        <a:spcBef>
-                          <a:spcPts val="500"/>
-                        </a:spcBef>
-                        <a:spcAft>
-                          <a:spcPts val="500"/>
-                        </a:spcAft>
-                        <a:buNone/>
-                      </a:pPr>
-                      <a:r>
-                        <a:rPr cap="none" sz="1100" i="0" b="0" u="none">
-                          <a:solidFill>
-                            <a:srgbClr val="000000">
-                              <a:alpha val="100000"/>
-                            </a:srgbClr>
-                          </a:solidFill>
-                          <a:latin typeface="Calibri"/>
-                          <a:cs typeface="Calibri"/>
-                          <a:ea typeface="Calibri"/>
-                          <a:sym typeface="Calibri"/>
-                        </a:rPr>
-                        <a:t>94</a:t>
-                      </a:r>
-                    </a:p>
-                  </a:txBody>
-                  <a:tcPr anchor="t" marB="63500" marT="63500" marR="0" marL="0">
-                    <a:lnL algn="ctr" cmpd="sng" cap="flat" w="0">
-                      <a:noFill/>
-                      <a:prstDash val="solid"/>
-                    </a:lnL>
-                    <a:lnR algn="ctr" cmpd="sng" cap="flat" w="0">
-                      <a:noFill/>
-                      <a:prstDash val="solid"/>
-                    </a:lnR>
-                    <a:lnT algn="ctr" cmpd="sng" cap="flat" w="0">
-                      <a:noFill/>
-                      <a:prstDash val="solid"/>
-                    </a:lnT>
-                    <a:lnB algn="ctr" cmpd="sng" cap="flat" w="0">
-                      <a:noFill/>
-                      <a:prstDash val="solid"/>
-                    </a:lnB>
-                    <a:solidFill>
-                      <a:srgbClr val="FFFFFF">
-                        <a:alpha val="0"/>
-                      </a:srgbClr>
-                    </a:solidFill>
-                  </a:tcPr>
-                </a:tc>
-                <a:tc>
-                  <a:txBody>
-                    <a:bodyPr/>
-                    <a:lstStyle/>
-                    <a:p>
-                      <a:pPr algn="l" marL="63500" marR="63500">
-                        <a:lnSpc>
-                          <a:spcPct val="100000"/>
-                        </a:lnSpc>
-                        <a:spcBef>
-                          <a:spcPts val="500"/>
-                        </a:spcBef>
-                        <a:spcAft>
-                          <a:spcPts val="500"/>
-                        </a:spcAft>
-                        <a:buNone/>
-                      </a:pPr>
-                      <a:r>
-                        <a:rPr cap="none" sz="1100" i="0" b="0" u="none">
-                          <a:solidFill>
-                            <a:srgbClr val="000000">
-                              <a:alpha val="100000"/>
-                            </a:srgbClr>
-                          </a:solidFill>
-                          <a:latin typeface="Calibri"/>
-                          <a:cs typeface="Calibri"/>
-                          <a:ea typeface="Calibri"/>
-                          <a:sym typeface="Calibri"/>
-                        </a:rPr>
-                        <a:t>64.6</a:t>
-                      </a:r>
-                    </a:p>
-                  </a:txBody>
-                  <a:tcPr anchor="t" marB="63500" marT="63500" marR="0" marL="0">
-                    <a:lnL algn="ctr" cmpd="sng" cap="flat" w="0">
-                      <a:noFill/>
-                      <a:prstDash val="solid"/>
-                    </a:lnL>
-                    <a:lnR algn="ctr" cmpd="sng" cap="flat" w="0">
-                      <a:noFill/>
-                      <a:prstDash val="solid"/>
-                    </a:lnR>
-                    <a:lnT algn="ctr" cmpd="sng" cap="flat" w="0">
-                      <a:noFill/>
-                      <a:prstDash val="solid"/>
-                    </a:lnT>
-                    <a:lnB algn="ctr" cmpd="sng" cap="flat" w="0">
-                      <a:noFill/>
-                      <a:prstDash val="solid"/>
-                    </a:lnB>
-                    <a:solidFill>
-                      <a:srgbClr val="FFFFFF">
-                        <a:alpha val="0"/>
-                      </a:srgbClr>
-                    </a:solidFill>
-                  </a:tcPr>
-                </a:tc>
-                <a:tc>
-                  <a:txBody>
-                    <a:bodyPr/>
-                    <a:lstStyle/>
-                    <a:p>
-                      <a:pPr algn="l" marL="63500" marR="63500">
-                        <a:lnSpc>
-                          <a:spcPct val="100000"/>
-                        </a:lnSpc>
-                        <a:spcBef>
-                          <a:spcPts val="500"/>
-                        </a:spcBef>
-                        <a:spcAft>
-                          <a:spcPts val="500"/>
-                        </a:spcAft>
-                        <a:buNone/>
-                      </a:pPr>
-                      <a:r>
-                        <a:rPr cap="none" sz="1100" i="0" b="0" u="none">
-                          <a:solidFill>
-                            <a:srgbClr val="000000">
-                              <a:alpha val="100000"/>
-                            </a:srgbClr>
-                          </a:solidFill>
-                          <a:latin typeface="Calibri"/>
-                          <a:cs typeface="Calibri"/>
-                          <a:ea typeface="Calibri"/>
-                          <a:sym typeface="Calibri"/>
-                        </a:rPr>
-                        <a:t>52nd</a:t>
-                      </a:r>
-                    </a:p>
-                  </a:txBody>
-                  <a:tcPr anchor="t" marB="63500" marT="63500" marR="0" marL="0">
-                    <a:lnL algn="ctr" cmpd="sng" cap="flat" w="0">
-                      <a:noFill/>
-                      <a:prstDash val="solid"/>
-                    </a:lnL>
-                    <a:lnR algn="ctr" cmpd="sng" cap="flat" w="0">
-                      <a:noFill/>
-                      <a:prstDash val="solid"/>
-                    </a:lnR>
-                    <a:lnT algn="ctr" cmpd="sng" cap="flat" w="0">
-                      <a:noFill/>
-                      <a:prstDash val="solid"/>
-                    </a:lnT>
-                    <a:lnB algn="ctr" cmpd="sng" cap="flat" w="0">
-                      <a:noFill/>
-                      <a:prstDash val="solid"/>
-                    </a:lnB>
-                    <a:solidFill>
-                      <a:srgbClr val="FFFFFF">
-                        <a:alpha val="0"/>
-                      </a:srgbClr>
-                    </a:solidFill>
-                  </a:tcPr>
-                </a:tc>
-                <a:tc>
-                  <a:txBody>
-                    <a:bodyPr/>
-                    <a:lstStyle/>
-                    <a:p>
-                      <a:pPr algn="l" marL="63500" marR="63500">
-                        <a:lnSpc>
-                          <a:spcPct val="100000"/>
-                        </a:lnSpc>
-                        <a:spcBef>
-                          <a:spcPts val="500"/>
-                        </a:spcBef>
-                        <a:spcAft>
-                          <a:spcPts val="500"/>
-                        </a:spcAft>
-                        <a:buNone/>
-                      </a:pPr>
-                      <a:r>
-                        <a:rPr cap="none" sz="1100" i="0" b="0" u="none">
-                          <a:solidFill>
-                            <a:srgbClr val="000000">
-                              <a:alpha val="100000"/>
-                            </a:srgbClr>
-                          </a:solidFill>
-                          <a:latin typeface="Calibri"/>
-                          <a:cs typeface="Calibri"/>
-                          <a:ea typeface="Calibri"/>
-                          <a:sym typeface="Calibri"/>
-                        </a:rPr>
-                        <a:t>Decile 2</a:t>
-                      </a:r>
-                    </a:p>
-                  </a:txBody>
-                  <a:tcPr anchor="t" marB="63500" marT="63500" marR="0" marL="0">
-                    <a:lnL algn="ctr" cmpd="sng" cap="flat" w="0">
-                      <a:noFill/>
-                      <a:prstDash val="solid"/>
-                    </a:lnL>
-                    <a:lnR algn="ctr" cmpd="sng" cap="flat" w="0">
-                      <a:noFill/>
-                      <a:prstDash val="solid"/>
-                    </a:lnR>
-                    <a:lnT algn="ctr" cmpd="sng" cap="flat" w="0">
-                      <a:noFill/>
-                      <a:prstDash val="solid"/>
-                    </a:lnT>
-                    <a:lnB algn="ctr" cmpd="sng" cap="flat" w="0">
-                      <a:noFill/>
-                      <a:prstDash val="solid"/>
-                    </a:lnB>
-                    <a:solidFill>
-                      <a:srgbClr val="FFFFFF">
-                        <a:alpha val="0"/>
-                      </a:srgbClr>
-                    </a:solidFill>
-                  </a:tcPr>
-                </a:tc>
-              </a:tr>
-              <a:tr h="182880">
-                <a:tc>
-                  <a:txBody>
-                    <a:bodyPr/>
-                    <a:lstStyle/>
-                    <a:p>
-                      <a:pPr algn="l" marL="63500" marR="63500">
-                        <a:lnSpc>
-                          <a:spcPct val="100000"/>
-                        </a:lnSpc>
-                        <a:spcBef>
-                          <a:spcPts val="500"/>
-                        </a:spcBef>
-                        <a:spcAft>
-                          <a:spcPts val="500"/>
-                        </a:spcAft>
-                        <a:buNone/>
-                      </a:pPr>
-                      <a:r>
-                        <a:rPr cap="none" sz="1100" i="0" b="0" u="none">
-                          <a:solidFill>
-                            <a:srgbClr val="000000">
-                              <a:alpha val="100000"/>
-                            </a:srgbClr>
-                          </a:solidFill>
-                          <a:latin typeface="Calibri"/>
-                          <a:cs typeface="Calibri"/>
-                          <a:ea typeface="Calibri"/>
-                          <a:sym typeface="Calibri"/>
-                        </a:rPr>
-                        <a:t>Mid Sussex</a:t>
-                      </a:r>
-                    </a:p>
-                  </a:txBody>
-                  <a:tcPr anchor="t" marB="63500" marT="63500" marR="0" marL="0">
-                    <a:lnL algn="ctr" cmpd="sng" cap="flat" w="0">
-                      <a:noFill/>
-                      <a:prstDash val="solid"/>
-                    </a:lnL>
-                    <a:lnR algn="ctr" cmpd="sng" cap="flat" w="0">
-                      <a:noFill/>
-                      <a:prstDash val="solid"/>
-                    </a:lnR>
-                    <a:lnT algn="ctr" cmpd="sng" cap="flat" w="0">
-                      <a:noFill/>
-                      <a:prstDash val="solid"/>
-                    </a:lnT>
-                    <a:lnB algn="ctr" cmpd="sng" cap="flat" w="0">
-                      <a:noFill/>
-                      <a:prstDash val="solid"/>
-                    </a:lnB>
-                    <a:solidFill>
-                      <a:srgbClr val="FFFFFF">
-                        <a:alpha val="0"/>
-                      </a:srgbClr>
-                    </a:solidFill>
-                  </a:tcPr>
-                </a:tc>
-                <a:tc>
-                  <a:txBody>
-                    <a:bodyPr/>
-                    <a:lstStyle/>
-                    <a:p>
-                      <a:pPr algn="l" marL="63500" marR="63500">
-                        <a:lnSpc>
-                          <a:spcPct val="100000"/>
-                        </a:lnSpc>
-                        <a:spcBef>
-                          <a:spcPts val="500"/>
-                        </a:spcBef>
-                        <a:spcAft>
-                          <a:spcPts val="500"/>
-                        </a:spcAft>
-                        <a:buNone/>
-                      </a:pPr>
-                      <a:r>
-                        <a:rPr cap="none" sz="1100" i="0" b="0" u="none">
-                          <a:solidFill>
-                            <a:srgbClr val="000000">
-                              <a:alpha val="100000"/>
-                            </a:srgbClr>
-                          </a:solidFill>
-                          <a:latin typeface="Calibri"/>
-                          <a:cs typeface="Calibri"/>
-                          <a:ea typeface="Calibri"/>
-                          <a:sym typeface="Calibri"/>
-                        </a:rPr>
-                        <a:t>81</a:t>
-                      </a:r>
-                    </a:p>
-                  </a:txBody>
-                  <a:tcPr anchor="t" marB="63500" marT="63500" marR="0" marL="0">
-                    <a:lnL algn="ctr" cmpd="sng" cap="flat" w="0">
-                      <a:noFill/>
-                      <a:prstDash val="solid"/>
-                    </a:lnL>
-                    <a:lnR algn="ctr" cmpd="sng" cap="flat" w="0">
-                      <a:noFill/>
-                      <a:prstDash val="solid"/>
-                    </a:lnR>
-                    <a:lnT algn="ctr" cmpd="sng" cap="flat" w="0">
-                      <a:noFill/>
-                      <a:prstDash val="solid"/>
-                    </a:lnT>
-                    <a:lnB algn="ctr" cmpd="sng" cap="flat" w="0">
-                      <a:noFill/>
-                      <a:prstDash val="solid"/>
-                    </a:lnB>
-                    <a:solidFill>
-                      <a:srgbClr val="FFFFFF">
-                        <a:alpha val="0"/>
-                      </a:srgbClr>
-                    </a:solidFill>
-                  </a:tcPr>
-                </a:tc>
-                <a:tc>
-                  <a:txBody>
-                    <a:bodyPr/>
-                    <a:lstStyle/>
-                    <a:p>
-                      <a:pPr algn="l" marL="63500" marR="63500">
-                        <a:lnSpc>
-                          <a:spcPct val="100000"/>
-                        </a:lnSpc>
-                        <a:spcBef>
-                          <a:spcPts val="500"/>
-                        </a:spcBef>
-                        <a:spcAft>
-                          <a:spcPts val="500"/>
-                        </a:spcAft>
-                        <a:buNone/>
-                      </a:pPr>
-                      <a:r>
-                        <a:rPr cap="none" sz="1100" i="0" b="0" u="none">
-                          <a:solidFill>
-                            <a:srgbClr val="000000">
-                              <a:alpha val="100000"/>
-                            </a:srgbClr>
-                          </a:solidFill>
-                          <a:latin typeface="Calibri"/>
-                          <a:cs typeface="Calibri"/>
-                          <a:ea typeface="Calibri"/>
-                          <a:sym typeface="Calibri"/>
-                        </a:rPr>
-                        <a:t>53.2</a:t>
-                      </a:r>
-                    </a:p>
-                  </a:txBody>
-                  <a:tcPr anchor="t" marB="63500" marT="63500" marR="0" marL="0">
-                    <a:lnL algn="ctr" cmpd="sng" cap="flat" w="0">
-                      <a:noFill/>
-                      <a:prstDash val="solid"/>
-                    </a:lnL>
-                    <a:lnR algn="ctr" cmpd="sng" cap="flat" w="0">
-                      <a:noFill/>
-                      <a:prstDash val="solid"/>
-                    </a:lnR>
-                    <a:lnT algn="ctr" cmpd="sng" cap="flat" w="0">
-                      <a:noFill/>
-                      <a:prstDash val="solid"/>
-                    </a:lnT>
-                    <a:lnB algn="ctr" cmpd="sng" cap="flat" w="0">
-                      <a:noFill/>
-                      <a:prstDash val="solid"/>
-                    </a:lnB>
-                    <a:solidFill>
-                      <a:srgbClr val="FFFFFF">
-                        <a:alpha val="0"/>
-                      </a:srgbClr>
-                    </a:solidFill>
-                  </a:tcPr>
-                </a:tc>
-                <a:tc>
-                  <a:txBody>
-                    <a:bodyPr/>
-                    <a:lstStyle/>
-                    <a:p>
-                      <a:pPr algn="l" marL="63500" marR="63500">
-                        <a:lnSpc>
-                          <a:spcPct val="100000"/>
-                        </a:lnSpc>
-                        <a:spcBef>
-                          <a:spcPts val="500"/>
-                        </a:spcBef>
-                        <a:spcAft>
-                          <a:spcPts val="500"/>
-                        </a:spcAft>
-                        <a:buNone/>
-                      </a:pPr>
-                      <a:r>
-                        <a:rPr cap="none" sz="1100" i="0" b="0" u="none">
-                          <a:solidFill>
-                            <a:srgbClr val="000000">
-                              <a:alpha val="100000"/>
-                            </a:srgbClr>
-                          </a:solidFill>
-                          <a:latin typeface="Calibri"/>
-                          <a:cs typeface="Calibri"/>
-                          <a:ea typeface="Calibri"/>
-                          <a:sym typeface="Calibri"/>
-                        </a:rPr>
-                        <a:t>116th</a:t>
-                      </a:r>
-                    </a:p>
-                  </a:txBody>
-                  <a:tcPr anchor="t" marB="63500" marT="63500" marR="0" marL="0">
-                    <a:lnL algn="ctr" cmpd="sng" cap="flat" w="0">
-                      <a:noFill/>
-                      <a:prstDash val="solid"/>
-                    </a:lnL>
-                    <a:lnR algn="ctr" cmpd="sng" cap="flat" w="0">
-                      <a:noFill/>
-                      <a:prstDash val="solid"/>
-                    </a:lnR>
-                    <a:lnT algn="ctr" cmpd="sng" cap="flat" w="0">
-                      <a:noFill/>
-                      <a:prstDash val="solid"/>
-                    </a:lnT>
-                    <a:lnB algn="ctr" cmpd="sng" cap="flat" w="0">
-                      <a:noFill/>
-                      <a:prstDash val="solid"/>
-                    </a:lnB>
-                    <a:solidFill>
-                      <a:srgbClr val="FFFFFF">
-                        <a:alpha val="0"/>
-                      </a:srgbClr>
-                    </a:solidFill>
-                  </a:tcPr>
-                </a:tc>
-                <a:tc>
-                  <a:txBody>
-                    <a:bodyPr/>
-                    <a:lstStyle/>
-                    <a:p>
-                      <a:pPr algn="l" marL="63500" marR="63500">
-                        <a:lnSpc>
-                          <a:spcPct val="100000"/>
-                        </a:lnSpc>
-                        <a:spcBef>
-                          <a:spcPts val="500"/>
-                        </a:spcBef>
-                        <a:spcAft>
-                          <a:spcPts val="500"/>
-                        </a:spcAft>
-                        <a:buNone/>
-                      </a:pPr>
-                      <a:r>
-                        <a:rPr cap="none" sz="1100" i="0" b="0" u="none">
-                          <a:solidFill>
-                            <a:srgbClr val="000000">
-                              <a:alpha val="100000"/>
-                            </a:srgbClr>
-                          </a:solidFill>
-                          <a:latin typeface="Calibri"/>
-                          <a:cs typeface="Calibri"/>
-                          <a:ea typeface="Calibri"/>
-                          <a:sym typeface="Calibri"/>
-                        </a:rPr>
-                        <a:t>Decile 4</a:t>
-                      </a:r>
-                    </a:p>
-                  </a:txBody>
-                  <a:tcPr anchor="t" marB="63500" marT="63500" marR="0" marL="0">
-                    <a:lnL algn="ctr" cmpd="sng" cap="flat" w="0">
-                      <a:noFill/>
-                      <a:prstDash val="solid"/>
-                    </a:lnL>
-                    <a:lnR algn="ctr" cmpd="sng" cap="flat" w="0">
-                      <a:noFill/>
-                      <a:prstDash val="solid"/>
-                    </a:lnR>
-                    <a:lnT algn="ctr" cmpd="sng" cap="flat" w="0">
-                      <a:noFill/>
-                      <a:prstDash val="solid"/>
-                    </a:lnT>
-                    <a:lnB algn="ctr" cmpd="sng" cap="flat" w="0">
-                      <a:noFill/>
-                      <a:prstDash val="solid"/>
-                    </a:lnB>
-                    <a:solidFill>
-                      <a:srgbClr val="FFFFFF">
-                        <a:alpha val="0"/>
-                      </a:srgbClr>
-                    </a:solidFill>
-                  </a:tcPr>
-                </a:tc>
-              </a:tr>
-              <a:tr h="182880">
-                <a:tc>
-                  <a:txBody>
-                    <a:bodyPr/>
-                    <a:lstStyle/>
-                    <a:p>
-                      <a:pPr algn="l" marL="63500" marR="63500">
-                        <a:lnSpc>
-                          <a:spcPct val="100000"/>
-                        </a:lnSpc>
-                        <a:spcBef>
-                          <a:spcPts val="500"/>
-                        </a:spcBef>
-                        <a:spcAft>
-                          <a:spcPts val="500"/>
-                        </a:spcAft>
-                        <a:buNone/>
-                      </a:pPr>
-                      <a:r>
-                        <a:rPr cap="none" sz="1100" i="0" b="0" u="none">
-                          <a:solidFill>
-                            <a:srgbClr val="000000">
-                              <a:alpha val="100000"/>
-                            </a:srgbClr>
-                          </a:solidFill>
-                          <a:latin typeface="Calibri"/>
-                          <a:cs typeface="Calibri"/>
-                          <a:ea typeface="Calibri"/>
-                          <a:sym typeface="Calibri"/>
-                        </a:rPr>
-                        <a:t>Worthing</a:t>
-                      </a:r>
-                    </a:p>
-                  </a:txBody>
-                  <a:tcPr anchor="t" marB="63500" marT="63500" marR="0" marL="0">
-                    <a:lnL algn="ctr" cmpd="sng" cap="flat" w="0">
-                      <a:noFill/>
-                      <a:prstDash val="solid"/>
-                    </a:lnL>
-                    <a:lnR algn="ctr" cmpd="sng" cap="flat" w="0">
-                      <a:noFill/>
-                      <a:prstDash val="solid"/>
-                    </a:lnR>
-                    <a:lnT algn="ctr" cmpd="sng" cap="flat" w="0">
-                      <a:noFill/>
-                      <a:prstDash val="solid"/>
-                    </a:lnT>
-                    <a:lnB algn="ctr" cmpd="sng" cap="flat" w="0">
-                      <a:noFill/>
-                      <a:prstDash val="solid"/>
-                    </a:lnB>
-                    <a:solidFill>
-                      <a:srgbClr val="FFFFFF">
-                        <a:alpha val="0"/>
-                      </a:srgbClr>
-                    </a:solidFill>
-                  </a:tcPr>
-                </a:tc>
-                <a:tc>
-                  <a:txBody>
-                    <a:bodyPr/>
-                    <a:lstStyle/>
-                    <a:p>
-                      <a:pPr algn="l" marL="63500" marR="63500">
-                        <a:lnSpc>
-                          <a:spcPct val="100000"/>
-                        </a:lnSpc>
-                        <a:spcBef>
-                          <a:spcPts val="500"/>
-                        </a:spcBef>
-                        <a:spcAft>
-                          <a:spcPts val="500"/>
-                        </a:spcAft>
-                        <a:buNone/>
-                      </a:pPr>
-                      <a:r>
-                        <a:rPr cap="none" sz="1100" i="0" b="0" u="none">
-                          <a:solidFill>
-                            <a:srgbClr val="000000">
-                              <a:alpha val="100000"/>
-                            </a:srgbClr>
-                          </a:solidFill>
-                          <a:latin typeface="Calibri"/>
-                          <a:cs typeface="Calibri"/>
-                          <a:ea typeface="Calibri"/>
-                          <a:sym typeface="Calibri"/>
-                        </a:rPr>
-                        <a:t>73</a:t>
-                      </a:r>
-                    </a:p>
-                  </a:txBody>
-                  <a:tcPr anchor="t" marB="63500" marT="63500" marR="0" marL="0">
-                    <a:lnL algn="ctr" cmpd="sng" cap="flat" w="0">
-                      <a:noFill/>
-                      <a:prstDash val="solid"/>
-                    </a:lnL>
-                    <a:lnR algn="ctr" cmpd="sng" cap="flat" w="0">
-                      <a:noFill/>
-                      <a:prstDash val="solid"/>
-                    </a:lnR>
-                    <a:lnT algn="ctr" cmpd="sng" cap="flat" w="0">
-                      <a:noFill/>
-                      <a:prstDash val="solid"/>
-                    </a:lnT>
-                    <a:lnB algn="ctr" cmpd="sng" cap="flat" w="0">
-                      <a:noFill/>
-                      <a:prstDash val="solid"/>
-                    </a:lnB>
-                    <a:solidFill>
-                      <a:srgbClr val="FFFFFF">
-                        <a:alpha val="0"/>
-                      </a:srgbClr>
-                    </a:solidFill>
-                  </a:tcPr>
-                </a:tc>
-                <a:tc>
-                  <a:txBody>
-                    <a:bodyPr/>
-                    <a:lstStyle/>
-                    <a:p>
-                      <a:pPr algn="l" marL="63500" marR="63500">
-                        <a:lnSpc>
-                          <a:spcPct val="100000"/>
-                        </a:lnSpc>
-                        <a:spcBef>
-                          <a:spcPts val="500"/>
-                        </a:spcBef>
-                        <a:spcAft>
-                          <a:spcPts val="500"/>
-                        </a:spcAft>
-                        <a:buNone/>
-                      </a:pPr>
-                      <a:r>
-                        <a:rPr cap="none" sz="1100" i="0" b="0" u="none">
-                          <a:solidFill>
-                            <a:srgbClr val="000000">
-                              <a:alpha val="100000"/>
-                            </a:srgbClr>
-                          </a:solidFill>
-                          <a:latin typeface="Calibri"/>
-                          <a:cs typeface="Calibri"/>
-                          <a:ea typeface="Calibri"/>
-                          <a:sym typeface="Calibri"/>
-                        </a:rPr>
-                        <a:t>65.9</a:t>
-                      </a:r>
-                    </a:p>
-                  </a:txBody>
-                  <a:tcPr anchor="t" marB="63500" marT="63500" marR="0" marL="0">
-                    <a:lnL algn="ctr" cmpd="sng" cap="flat" w="0">
-                      <a:noFill/>
-                      <a:prstDash val="solid"/>
-                    </a:lnL>
-                    <a:lnR algn="ctr" cmpd="sng" cap="flat" w="0">
-                      <a:noFill/>
-                      <a:prstDash val="solid"/>
-                    </a:lnR>
-                    <a:lnT algn="ctr" cmpd="sng" cap="flat" w="0">
-                      <a:noFill/>
-                      <a:prstDash val="solid"/>
-                    </a:lnT>
-                    <a:lnB algn="ctr" cmpd="sng" cap="flat" w="0">
-                      <a:noFill/>
-                      <a:prstDash val="solid"/>
-                    </a:lnB>
-                    <a:solidFill>
-                      <a:srgbClr val="FFFFFF">
-                        <a:alpha val="0"/>
-                      </a:srgbClr>
-                    </a:solidFill>
-                  </a:tcPr>
-                </a:tc>
-                <a:tc>
-                  <a:txBody>
-                    <a:bodyPr/>
-                    <a:lstStyle/>
-                    <a:p>
-                      <a:pPr algn="l" marL="63500" marR="63500">
-                        <a:lnSpc>
-                          <a:spcPct val="100000"/>
-                        </a:lnSpc>
-                        <a:spcBef>
-                          <a:spcPts val="500"/>
-                        </a:spcBef>
-                        <a:spcAft>
-                          <a:spcPts val="500"/>
-                        </a:spcAft>
-                        <a:buNone/>
-                      </a:pPr>
-                      <a:r>
-                        <a:rPr cap="none" sz="1100" i="0" b="0" u="none">
-                          <a:solidFill>
-                            <a:srgbClr val="000000">
-                              <a:alpha val="100000"/>
-                            </a:srgbClr>
-                          </a:solidFill>
-                          <a:latin typeface="Calibri"/>
-                          <a:cs typeface="Calibri"/>
-                          <a:ea typeface="Calibri"/>
-                          <a:sym typeface="Calibri"/>
-                        </a:rPr>
-                        <a:t>43rd</a:t>
-                      </a:r>
-                    </a:p>
-                  </a:txBody>
-                  <a:tcPr anchor="t" marB="63500" marT="63500" marR="0" marL="0">
-                    <a:lnL algn="ctr" cmpd="sng" cap="flat" w="0">
-                      <a:noFill/>
-                      <a:prstDash val="solid"/>
-                    </a:lnL>
-                    <a:lnR algn="ctr" cmpd="sng" cap="flat" w="0">
-                      <a:noFill/>
-                      <a:prstDash val="solid"/>
-                    </a:lnR>
-                    <a:lnT algn="ctr" cmpd="sng" cap="flat" w="0">
-                      <a:noFill/>
-                      <a:prstDash val="solid"/>
-                    </a:lnT>
-                    <a:lnB algn="ctr" cmpd="sng" cap="flat" w="0">
-                      <a:noFill/>
-                      <a:prstDash val="solid"/>
-                    </a:lnB>
-                    <a:solidFill>
-                      <a:srgbClr val="FFFFFF">
-                        <a:alpha val="0"/>
-                      </a:srgbClr>
-                    </a:solidFill>
-                  </a:tcPr>
-                </a:tc>
-                <a:tc>
-                  <a:txBody>
-                    <a:bodyPr/>
-                    <a:lstStyle/>
-                    <a:p>
-                      <a:pPr algn="l" marL="63500" marR="63500">
-                        <a:lnSpc>
-                          <a:spcPct val="100000"/>
-                        </a:lnSpc>
-                        <a:spcBef>
-                          <a:spcPts val="500"/>
-                        </a:spcBef>
-                        <a:spcAft>
-                          <a:spcPts val="500"/>
-                        </a:spcAft>
-                        <a:buNone/>
-                      </a:pPr>
-                      <a:r>
-                        <a:rPr cap="none" sz="1100" i="0" b="0" u="none">
-                          <a:solidFill>
-                            <a:srgbClr val="000000">
-                              <a:alpha val="100000"/>
-                            </a:srgbClr>
-                          </a:solidFill>
-                          <a:latin typeface="Calibri"/>
-                          <a:cs typeface="Calibri"/>
-                          <a:ea typeface="Calibri"/>
-                          <a:sym typeface="Calibri"/>
-                        </a:rPr>
-                        <a:t>Decile 2</a:t>
+                        <a:t>with highest rate</a:t>
                       </a:r>
                     </a:p>
                   </a:txBody>
@@ -16567,7 +16621,7 @@
                           <a:ea typeface="Calibri"/>
                           <a:sym typeface="Calibri"/>
                         </a:rPr>
-                        <a:t>579</a:t>
+                        <a:t>791</a:t>
                       </a:r>
                     </a:p>
                   </a:txBody>
@@ -16624,7 +16678,7 @@
                           <a:ea typeface="Calibri"/>
                           <a:sym typeface="Calibri"/>
                         </a:rPr>
-                        <a:t>66.7</a:t>
+                        <a:t>91.2</a:t>
                       </a:r>
                     </a:p>
                   </a:txBody>
@@ -16854,7 +16908,7 @@
                           <a:ea typeface="Calibri"/>
                           <a:sym typeface="Calibri"/>
                         </a:rPr>
-                        <a:t>27,830</a:t>
+                        <a:t>36,963</a:t>
                       </a:r>
                     </a:p>
                   </a:txBody>
@@ -16911,7 +16965,7 @@
                           <a:ea typeface="Calibri"/>
                           <a:sym typeface="Calibri"/>
                         </a:rPr>
-                        <a:t>49.2</a:t>
+                        <a:t>65.4</a:t>
                       </a:r>
                     </a:p>
                   </a:txBody>
@@ -17145,7 +17199,7 @@
                           <a:ea typeface="Calibri"/>
                           <a:sym typeface="Calibri"/>
                         </a:rPr>
-                        <a:t>5,099</a:t>
+                        <a:t>7,260</a:t>
                       </a:r>
                     </a:p>
                   </a:txBody>
@@ -17206,7 +17260,7 @@
                           <a:ea typeface="Calibri"/>
                           <a:sym typeface="Calibri"/>
                         </a:rPr>
-                        <a:t>55.3</a:t>
+                        <a:t>78.8</a:t>
                       </a:r>
                     </a:p>
                   </a:txBody>

</xml_diff>

<commit_message>
long awaited mort update
</commit_message>
<xml_diff>
--- a/Latest_West_Sussex_C19_slide_deck.pptx
+++ b/Latest_West_Sussex_C19_slide_deck.pptx
@@ -7176,7 +7176,7 @@
           <a:p>
             <a:r>
               <a:rPr/>
-              <a:t>Pack date: 06 January 2023</a:t>
+              <a:t>Pack date: 03 February 2023</a:t>
             </a:r>
           </a:p>
         </p:txBody>
@@ -7308,7 +7308,7 @@
           <a:p>
             <a:r>
               <a:rPr/>
-              <a:t>Pack date: 06 January 2023</a:t>
+              <a:t>Pack date: 03 February 2023</a:t>
             </a:r>
           </a:p>
         </p:txBody>
@@ -7466,7 +7466,7 @@
           <a:p>
             <a:r>
               <a:rPr/>
-              <a:t>Pack date: 06 January 2023</a:t>
+              <a:t>Pack date: 03 February 2023</a:t>
             </a:r>
           </a:p>
         </p:txBody>
@@ -7547,7 +7547,7 @@
           <a:p>
             <a:r>
               <a:rPr/>
-              <a:t>Upper Tier Local Authority cumulative cases as at 05 January</a:t>
+              <a:t>Upper Tier Local Authority cumulative cases as at 02 February</a:t>
             </a:r>
           </a:p>
         </p:txBody>
@@ -8070,7 +8070,7 @@
                           <a:ea typeface="Calibri"/>
                           <a:sym typeface="Calibri"/>
                         </a:rPr>
-                        <a:t>306,863</a:t>
+                        <a:t>307,884</a:t>
                       </a:r>
                     </a:p>
                   </a:txBody>
@@ -8127,7 +8127,7 @@
                           <a:ea typeface="Calibri"/>
                           <a:sym typeface="Calibri"/>
                         </a:rPr>
-                        <a:t>35,367.8</a:t>
+                        <a:t>35,485.4</a:t>
                       </a:r>
                     </a:p>
                   </a:txBody>
@@ -8357,7 +8357,7 @@
                           <a:ea typeface="Calibri"/>
                           <a:sym typeface="Calibri"/>
                         </a:rPr>
-                        <a:t>20,465,614</a:t>
+                        <a:t>20,535,061</a:t>
                       </a:r>
                     </a:p>
                   </a:txBody>
@@ -8414,7 +8414,7 @@
                           <a:ea typeface="Calibri"/>
                           <a:sym typeface="Calibri"/>
                         </a:rPr>
-                        <a:t>36,190.2</a:t>
+                        <a:t>36,313.0</a:t>
                       </a:r>
                     </a:p>
                   </a:txBody>
@@ -8648,7 +8648,7 @@
                           <a:ea typeface="Calibri"/>
                           <a:sym typeface="Calibri"/>
                         </a:rPr>
-                        <a:t>3,332,780</a:t>
+                        <a:t>3,344,110</a:t>
                       </a:r>
                     </a:p>
                   </a:txBody>
@@ -8709,7 +8709,7 @@
                           <a:ea typeface="Calibri"/>
                           <a:sym typeface="Calibri"/>
                         </a:rPr>
-                        <a:t>36,158.0</a:t>
+                        <a:t>36,280.9</a:t>
                       </a:r>
                     </a:p>
                   </a:txBody>
@@ -8941,7 +8941,7 @@
           <a:p>
             <a:r>
               <a:rPr/>
-              <a:t>Pack date: 06 January 2023</a:t>
+              <a:t>Pack date: 03 February 2023</a:t>
             </a:r>
           </a:p>
         </p:txBody>
@@ -9022,7 +9022,7 @@
           <a:p>
             <a:r>
               <a:rPr/>
-              <a:t>Upper Tier Local Authority rolling 7 day cases as at 05 January</a:t>
+              <a:t>Upper Tier Local Authority rolling 7 day cases as at 02 February</a:t>
             </a:r>
           </a:p>
         </p:txBody>
@@ -9103,7 +9103,7 @@
           <a:p>
             <a:r>
               <a:rPr/>
-              <a:t>Note that the very recent days are excluded in the 7-day total as these are thought to be incomplete. As such, this data represents cases in the seven days to 31 December</a:t>
+              <a:t>Note that the very recent days are excluded in the 7-day total as these are thought to be incomplete. As such, this data represents cases in the seven days to 28 January</a:t>
             </a:r>
           </a:p>
         </p:txBody>
@@ -9545,7 +9545,7 @@
                           <a:ea typeface="Calibri"/>
                           <a:sym typeface="Calibri"/>
                         </a:rPr>
-                        <a:t>740</a:t>
+                        <a:t>189</a:t>
                       </a:r>
                     </a:p>
                   </a:txBody>
@@ -9602,7 +9602,7 @@
                           <a:ea typeface="Calibri"/>
                           <a:sym typeface="Calibri"/>
                         </a:rPr>
-                        <a:t>85.3</a:t>
+                        <a:t>21.8</a:t>
                       </a:r>
                     </a:p>
                   </a:txBody>
@@ -9659,7 +9659,7 @@
                           <a:ea typeface="Calibri"/>
                           <a:sym typeface="Calibri"/>
                         </a:rPr>
-                        <a:t>25th</a:t>
+                        <a:t>96th</a:t>
                       </a:r>
                     </a:p>
                   </a:txBody>
@@ -9716,7 +9716,7 @@
                           <a:ea typeface="Calibri"/>
                           <a:sym typeface="Calibri"/>
                         </a:rPr>
-                        <a:t>Decile 2</a:t>
+                        <a:t>Decile 7</a:t>
                       </a:r>
                     </a:p>
                   </a:txBody>
@@ -9832,7 +9832,7 @@
                           <a:ea typeface="Calibri"/>
                           <a:sym typeface="Calibri"/>
                         </a:rPr>
-                        <a:t>36,605</a:t>
+                        <a:t>15,135</a:t>
                       </a:r>
                     </a:p>
                   </a:txBody>
@@ -9889,7 +9889,7 @@
                           <a:ea typeface="Calibri"/>
                           <a:sym typeface="Calibri"/>
                         </a:rPr>
-                        <a:t>64.7</a:t>
+                        <a:t>26.8</a:t>
                       </a:r>
                     </a:p>
                   </a:txBody>
@@ -10123,7 +10123,7 @@
                           <a:ea typeface="Calibri"/>
                           <a:sym typeface="Calibri"/>
                         </a:rPr>
-                        <a:t>6,761</a:t>
+                        <a:t>2,544</a:t>
                       </a:r>
                     </a:p>
                   </a:txBody>
@@ -10184,7 +10184,7 @@
                           <a:ea typeface="Calibri"/>
                           <a:sym typeface="Calibri"/>
                         </a:rPr>
-                        <a:t>73.4</a:t>
+                        <a:t>27.6</a:t>
                       </a:r>
                     </a:p>
                   </a:txBody>
@@ -10416,7 +10416,7 @@
           <a:p>
             <a:r>
               <a:rPr/>
-              <a:t>Pack date: 06 January 2023</a:t>
+              <a:t>Pack date: 03 February 2023</a:t>
             </a:r>
           </a:p>
         </p:txBody>
@@ -10497,7 +10497,7 @@
           <a:p>
             <a:r>
               <a:rPr/>
-              <a:t>Lower Tier Local Authority cumulative cases as at 05 January</a:t>
+              <a:t>Lower Tier Local Authority cumulative cases as at 02 February</a:t>
             </a:r>
           </a:p>
         </p:txBody>
@@ -10993,7 +10993,7 @@
                           <a:ea typeface="Calibri"/>
                           <a:sym typeface="Calibri"/>
                         </a:rPr>
-                        <a:t>21,725</a:t>
+                        <a:t>21,815</a:t>
                       </a:r>
                     </a:p>
                   </a:txBody>
@@ -11050,7 +11050,7 @@
                           <a:ea typeface="Calibri"/>
                           <a:sym typeface="Calibri"/>
                         </a:rPr>
-                        <a:t>33,846.4</a:t>
+                        <a:t>33,986.6</a:t>
                       </a:r>
                     </a:p>
                   </a:txBody>
@@ -11107,7 +11107,7 @@
                           <a:ea typeface="Calibri"/>
                           <a:sym typeface="Calibri"/>
                         </a:rPr>
-                        <a:t>251st</a:t>
+                        <a:t>249th</a:t>
                       </a:r>
                     </a:p>
                   </a:txBody>
@@ -11280,7 +11280,7 @@
                           <a:ea typeface="Calibri"/>
                           <a:sym typeface="Calibri"/>
                         </a:rPr>
-                        <a:t>54,999</a:t>
+                        <a:t>55,187</a:t>
                       </a:r>
                     </a:p>
                   </a:txBody>
@@ -11337,7 +11337,7 @@
                           <a:ea typeface="Calibri"/>
                           <a:sym typeface="Calibri"/>
                         </a:rPr>
-                        <a:t>34,134.8</a:t>
+                        <a:t>34,251.5</a:t>
                       </a:r>
                     </a:p>
                   </a:txBody>
@@ -11567,7 +11567,7 @@
                           <a:ea typeface="Calibri"/>
                           <a:sym typeface="Calibri"/>
                         </a:rPr>
-                        <a:t>39,874</a:t>
+                        <a:t>40,013</a:t>
                       </a:r>
                     </a:p>
                   </a:txBody>
@@ -11624,7 +11624,7 @@
                           <a:ea typeface="Calibri"/>
                           <a:sym typeface="Calibri"/>
                         </a:rPr>
-                        <a:t>32,815.9</a:t>
+                        <a:t>32,930.3</a:t>
                       </a:r>
                     </a:p>
                   </a:txBody>
@@ -11854,7 +11854,7 @@
                           <a:ea typeface="Calibri"/>
                           <a:sym typeface="Calibri"/>
                         </a:rPr>
-                        <a:t>44,254</a:t>
+                        <a:t>44,385</a:t>
                       </a:r>
                     </a:p>
                   </a:txBody>
@@ -11911,7 +11911,7 @@
                           <a:ea typeface="Calibri"/>
                           <a:sym typeface="Calibri"/>
                         </a:rPr>
-                        <a:t>39,346.0</a:t>
+                        <a:t>39,462.5</a:t>
                       </a:r>
                     </a:p>
                   </a:txBody>
@@ -11968,7 +11968,7 @@
                           <a:ea typeface="Calibri"/>
                           <a:sym typeface="Calibri"/>
                         </a:rPr>
-                        <a:t>24th</a:t>
+                        <a:t>23rd</a:t>
                       </a:r>
                     </a:p>
                   </a:txBody>
@@ -12168,7 +12168,7 @@
                           <a:ea typeface="Calibri"/>
                           <a:sym typeface="Calibri"/>
                         </a:rPr>
-                        <a:t>50,093</a:t>
+                        <a:t>50,241</a:t>
                       </a:r>
                     </a:p>
                   </a:txBody>
@@ -12225,7 +12225,7 @@
                           <a:ea typeface="Calibri"/>
                           <a:sym typeface="Calibri"/>
                         </a:rPr>
-                        <a:t>34,434.3</a:t>
+                        <a:t>34,536.1</a:t>
                       </a:r>
                     </a:p>
                   </a:txBody>
@@ -12455,7 +12455,7 @@
                           <a:ea typeface="Calibri"/>
                           <a:sym typeface="Calibri"/>
                         </a:rPr>
-                        <a:t>56,636</a:t>
+                        <a:t>56,839</a:t>
                       </a:r>
                     </a:p>
                   </a:txBody>
@@ -12512,7 +12512,7 @@
                           <a:ea typeface="Calibri"/>
                           <a:sym typeface="Calibri"/>
                         </a:rPr>
-                        <a:t>37,225.7</a:t>
+                        <a:t>37,359.2</a:t>
                       </a:r>
                     </a:p>
                   </a:txBody>
@@ -12742,7 +12742,7 @@
                           <a:ea typeface="Calibri"/>
                           <a:sym typeface="Calibri"/>
                         </a:rPr>
-                        <a:t>39,282</a:t>
+                        <a:t>39,404</a:t>
                       </a:r>
                     </a:p>
                   </a:txBody>
@@ -12799,7 +12799,7 @@
                           <a:ea typeface="Calibri"/>
                           <a:sym typeface="Calibri"/>
                         </a:rPr>
-                        <a:t>35,476.4</a:t>
+                        <a:t>35,586.6</a:t>
                       </a:r>
                     </a:p>
                   </a:txBody>
@@ -13029,7 +13029,7 @@
                           <a:ea typeface="Calibri"/>
                           <a:sym typeface="Calibri"/>
                         </a:rPr>
-                        <a:t>306,863</a:t>
+                        <a:t>307,884</a:t>
                       </a:r>
                     </a:p>
                   </a:txBody>
@@ -13086,7 +13086,7 @@
                           <a:ea typeface="Calibri"/>
                           <a:sym typeface="Calibri"/>
                         </a:rPr>
-                        <a:t>35,367.8</a:t>
+                        <a:t>35,485.4</a:t>
                       </a:r>
                     </a:p>
                   </a:txBody>
@@ -13316,7 +13316,7 @@
                           <a:ea typeface="Calibri"/>
                           <a:sym typeface="Calibri"/>
                         </a:rPr>
-                        <a:t>3,332,780</a:t>
+                        <a:t>3,344,110</a:t>
                       </a:r>
                     </a:p>
                   </a:txBody>
@@ -13373,7 +13373,7 @@
                           <a:ea typeface="Calibri"/>
                           <a:sym typeface="Calibri"/>
                         </a:rPr>
-                        <a:t>36,158.0</a:t>
+                        <a:t>36,280.9</a:t>
                       </a:r>
                     </a:p>
                   </a:txBody>
@@ -13607,7 +13607,7 @@
                           <a:ea typeface="Calibri"/>
                           <a:sym typeface="Calibri"/>
                         </a:rPr>
-                        <a:t>20,465,614</a:t>
+                        <a:t>20,535,061</a:t>
                       </a:r>
                     </a:p>
                   </a:txBody>
@@ -13668,7 +13668,7 @@
                           <a:ea typeface="Calibri"/>
                           <a:sym typeface="Calibri"/>
                         </a:rPr>
-                        <a:t>36,190.2</a:t>
+                        <a:t>36,313.0</a:t>
                       </a:r>
                     </a:p>
                   </a:txBody>
@@ -13900,7 +13900,7 @@
           <a:p>
             <a:r>
               <a:rPr/>
-              <a:t>Pack date: 06 January 2023</a:t>
+              <a:t>Pack date: 03 February 2023</a:t>
             </a:r>
           </a:p>
         </p:txBody>
@@ -13981,7 +13981,7 @@
           <a:p>
             <a:r>
               <a:rPr/>
-              <a:t>Lower Tier Local Authority rolling cases as at 05 January</a:t>
+              <a:t>Lower Tier Local Authority rolling cases as at 02 February</a:t>
             </a:r>
           </a:p>
         </p:txBody>
@@ -14062,7 +14062,7 @@
           <a:p>
             <a:r>
               <a:rPr/>
-              <a:t>Note that the very recent days are excluded in the 7-day total as these are thought to be incomplete. As such, this data represents cases in the seven days to 31 December</a:t>
+              <a:t>Note that the very recent days are excluded in the 7-day total as these are thought to be incomplete. As such, this data represents cases in the seven days to 28 January</a:t>
             </a:r>
           </a:p>
         </p:txBody>
@@ -14504,7 +14504,7 @@
                           <a:ea typeface="Calibri"/>
                           <a:sym typeface="Calibri"/>
                         </a:rPr>
-                        <a:t>83</a:t>
+                        <a:t>20</a:t>
                       </a:r>
                     </a:p>
                   </a:txBody>
@@ -14561,7 +14561,7 @@
                           <a:ea typeface="Calibri"/>
                           <a:sym typeface="Calibri"/>
                         </a:rPr>
-                        <a:t>129.3</a:t>
+                        <a:t>31.2</a:t>
                       </a:r>
                     </a:p>
                   </a:txBody>
@@ -14618,7 +14618,868 @@
                           <a:ea typeface="Calibri"/>
                           <a:sym typeface="Calibri"/>
                         </a:rPr>
-                        <a:t>6th</a:t>
+                        <a:t>85th</a:t>
+                      </a:r>
+                    </a:p>
+                  </a:txBody>
+                  <a:tcPr anchor="t" marB="63500" marT="63500" marR="0" marL="0">
+                    <a:lnL algn="ctr" cmpd="sng" cap="flat" w="0">
+                      <a:noFill/>
+                      <a:prstDash val="solid"/>
+                    </a:lnL>
+                    <a:lnR algn="ctr" cmpd="sng" cap="flat" w="0">
+                      <a:noFill/>
+                      <a:prstDash val="solid"/>
+                    </a:lnR>
+                    <a:lnT algn="ctr" cmpd="sng" cap="flat" w="0">
+                      <a:noFill/>
+                      <a:prstDash val="solid"/>
+                    </a:lnT>
+                    <a:lnB algn="ctr" cmpd="sng" cap="flat" w="0">
+                      <a:noFill/>
+                      <a:prstDash val="solid"/>
+                    </a:lnB>
+                    <a:solidFill>
+                      <a:srgbClr val="FFFFFF">
+                        <a:alpha val="0"/>
+                      </a:srgbClr>
+                    </a:solidFill>
+                  </a:tcPr>
+                </a:tc>
+                <a:tc>
+                  <a:txBody>
+                    <a:bodyPr/>
+                    <a:lstStyle/>
+                    <a:p>
+                      <a:pPr algn="l" marL="63500" marR="63500">
+                        <a:lnSpc>
+                          <a:spcPct val="100000"/>
+                        </a:lnSpc>
+                        <a:spcBef>
+                          <a:spcPts val="500"/>
+                        </a:spcBef>
+                        <a:spcAft>
+                          <a:spcPts val="500"/>
+                        </a:spcAft>
+                        <a:buNone/>
+                      </a:pPr>
+                      <a:r>
+                        <a:rPr cap="none" sz="1100" i="0" b="0" u="none">
+                          <a:solidFill>
+                            <a:srgbClr val="000000">
+                              <a:alpha val="100000"/>
+                            </a:srgbClr>
+                          </a:solidFill>
+                          <a:latin typeface="Calibri"/>
+                          <a:cs typeface="Calibri"/>
+                          <a:ea typeface="Calibri"/>
+                          <a:sym typeface="Calibri"/>
+                        </a:rPr>
+                        <a:t>Decile 3</a:t>
+                      </a:r>
+                    </a:p>
+                  </a:txBody>
+                  <a:tcPr anchor="t" marB="63500" marT="63500" marR="0" marL="0">
+                    <a:lnL algn="ctr" cmpd="sng" cap="flat" w="0">
+                      <a:noFill/>
+                      <a:prstDash val="solid"/>
+                    </a:lnL>
+                    <a:lnR algn="ctr" cmpd="sng" cap="flat" w="0">
+                      <a:noFill/>
+                      <a:prstDash val="solid"/>
+                    </a:lnR>
+                    <a:lnT algn="ctr" cmpd="sng" cap="flat" w="0">
+                      <a:noFill/>
+                      <a:prstDash val="solid"/>
+                    </a:lnT>
+                    <a:lnB algn="ctr" cmpd="sng" cap="flat" w="0">
+                      <a:noFill/>
+                      <a:prstDash val="solid"/>
+                    </a:lnB>
+                    <a:solidFill>
+                      <a:srgbClr val="FFFFFF">
+                        <a:alpha val="0"/>
+                      </a:srgbClr>
+                    </a:solidFill>
+                  </a:tcPr>
+                </a:tc>
+              </a:tr>
+              <a:tr h="182880">
+                <a:tc>
+                  <a:txBody>
+                    <a:bodyPr/>
+                    <a:lstStyle/>
+                    <a:p>
+                      <a:pPr algn="l" marL="63500" marR="63500">
+                        <a:lnSpc>
+                          <a:spcPct val="100000"/>
+                        </a:lnSpc>
+                        <a:spcBef>
+                          <a:spcPts val="500"/>
+                        </a:spcBef>
+                        <a:spcAft>
+                          <a:spcPts val="500"/>
+                        </a:spcAft>
+                        <a:buNone/>
+                      </a:pPr>
+                      <a:r>
+                        <a:rPr cap="none" sz="1100" i="0" b="0" u="none">
+                          <a:solidFill>
+                            <a:srgbClr val="000000">
+                              <a:alpha val="100000"/>
+                            </a:srgbClr>
+                          </a:solidFill>
+                          <a:latin typeface="Calibri"/>
+                          <a:cs typeface="Calibri"/>
+                          <a:ea typeface="Calibri"/>
+                          <a:sym typeface="Calibri"/>
+                        </a:rPr>
+                        <a:t>Arun</a:t>
+                      </a:r>
+                    </a:p>
+                  </a:txBody>
+                  <a:tcPr anchor="t" marB="63500" marT="63500" marR="0" marL="0">
+                    <a:lnL algn="ctr" cmpd="sng" cap="flat" w="0">
+                      <a:noFill/>
+                      <a:prstDash val="solid"/>
+                    </a:lnL>
+                    <a:lnR algn="ctr" cmpd="sng" cap="flat" w="0">
+                      <a:noFill/>
+                      <a:prstDash val="solid"/>
+                    </a:lnR>
+                    <a:lnT algn="ctr" cmpd="sng" cap="flat" w="0">
+                      <a:noFill/>
+                      <a:prstDash val="solid"/>
+                    </a:lnT>
+                    <a:lnB algn="ctr" cmpd="sng" cap="flat" w="0">
+                      <a:noFill/>
+                      <a:prstDash val="solid"/>
+                    </a:lnB>
+                    <a:solidFill>
+                      <a:srgbClr val="FFFFFF">
+                        <a:alpha val="0"/>
+                      </a:srgbClr>
+                    </a:solidFill>
+                  </a:tcPr>
+                </a:tc>
+                <a:tc>
+                  <a:txBody>
+                    <a:bodyPr/>
+                    <a:lstStyle/>
+                    <a:p>
+                      <a:pPr algn="l" marL="63500" marR="63500">
+                        <a:lnSpc>
+                          <a:spcPct val="100000"/>
+                        </a:lnSpc>
+                        <a:spcBef>
+                          <a:spcPts val="500"/>
+                        </a:spcBef>
+                        <a:spcAft>
+                          <a:spcPts val="500"/>
+                        </a:spcAft>
+                        <a:buNone/>
+                      </a:pPr>
+                      <a:r>
+                        <a:rPr cap="none" sz="1100" i="0" b="0" u="none">
+                          <a:solidFill>
+                            <a:srgbClr val="000000">
+                              <a:alpha val="100000"/>
+                            </a:srgbClr>
+                          </a:solidFill>
+                          <a:latin typeface="Calibri"/>
+                          <a:cs typeface="Calibri"/>
+                          <a:ea typeface="Calibri"/>
+                          <a:sym typeface="Calibri"/>
+                        </a:rPr>
+                        <a:t>45</a:t>
+                      </a:r>
+                    </a:p>
+                  </a:txBody>
+                  <a:tcPr anchor="t" marB="63500" marT="63500" marR="0" marL="0">
+                    <a:lnL algn="ctr" cmpd="sng" cap="flat" w="0">
+                      <a:noFill/>
+                      <a:prstDash val="solid"/>
+                    </a:lnL>
+                    <a:lnR algn="ctr" cmpd="sng" cap="flat" w="0">
+                      <a:noFill/>
+                      <a:prstDash val="solid"/>
+                    </a:lnR>
+                    <a:lnT algn="ctr" cmpd="sng" cap="flat" w="0">
+                      <a:noFill/>
+                      <a:prstDash val="solid"/>
+                    </a:lnT>
+                    <a:lnB algn="ctr" cmpd="sng" cap="flat" w="0">
+                      <a:noFill/>
+                      <a:prstDash val="solid"/>
+                    </a:lnB>
+                    <a:solidFill>
+                      <a:srgbClr val="FFFFFF">
+                        <a:alpha val="0"/>
+                      </a:srgbClr>
+                    </a:solidFill>
+                  </a:tcPr>
+                </a:tc>
+                <a:tc>
+                  <a:txBody>
+                    <a:bodyPr/>
+                    <a:lstStyle/>
+                    <a:p>
+                      <a:pPr algn="l" marL="63500" marR="63500">
+                        <a:lnSpc>
+                          <a:spcPct val="100000"/>
+                        </a:lnSpc>
+                        <a:spcBef>
+                          <a:spcPts val="500"/>
+                        </a:spcBef>
+                        <a:spcAft>
+                          <a:spcPts val="500"/>
+                        </a:spcAft>
+                        <a:buNone/>
+                      </a:pPr>
+                      <a:r>
+                        <a:rPr cap="none" sz="1100" i="0" b="0" u="none">
+                          <a:solidFill>
+                            <a:srgbClr val="000000">
+                              <a:alpha val="100000"/>
+                            </a:srgbClr>
+                          </a:solidFill>
+                          <a:latin typeface="Calibri"/>
+                          <a:cs typeface="Calibri"/>
+                          <a:ea typeface="Calibri"/>
+                          <a:sym typeface="Calibri"/>
+                        </a:rPr>
+                        <a:t>27.9</a:t>
+                      </a:r>
+                    </a:p>
+                  </a:txBody>
+                  <a:tcPr anchor="t" marB="63500" marT="63500" marR="0" marL="0">
+                    <a:lnL algn="ctr" cmpd="sng" cap="flat" w="0">
+                      <a:noFill/>
+                      <a:prstDash val="solid"/>
+                    </a:lnL>
+                    <a:lnR algn="ctr" cmpd="sng" cap="flat" w="0">
+                      <a:noFill/>
+                      <a:prstDash val="solid"/>
+                    </a:lnR>
+                    <a:lnT algn="ctr" cmpd="sng" cap="flat" w="0">
+                      <a:noFill/>
+                      <a:prstDash val="solid"/>
+                    </a:lnT>
+                    <a:lnB algn="ctr" cmpd="sng" cap="flat" w="0">
+                      <a:noFill/>
+                      <a:prstDash val="solid"/>
+                    </a:lnB>
+                    <a:solidFill>
+                      <a:srgbClr val="FFFFFF">
+                        <a:alpha val="0"/>
+                      </a:srgbClr>
+                    </a:solidFill>
+                  </a:tcPr>
+                </a:tc>
+                <a:tc>
+                  <a:txBody>
+                    <a:bodyPr/>
+                    <a:lstStyle/>
+                    <a:p>
+                      <a:pPr algn="l" marL="63500" marR="63500">
+                        <a:lnSpc>
+                          <a:spcPct val="100000"/>
+                        </a:lnSpc>
+                        <a:spcBef>
+                          <a:spcPts val="500"/>
+                        </a:spcBef>
+                        <a:spcAft>
+                          <a:spcPts val="500"/>
+                        </a:spcAft>
+                        <a:buNone/>
+                      </a:pPr>
+                      <a:r>
+                        <a:rPr cap="none" sz="1100" i="0" b="0" u="none">
+                          <a:solidFill>
+                            <a:srgbClr val="000000">
+                              <a:alpha val="100000"/>
+                            </a:srgbClr>
+                          </a:solidFill>
+                          <a:latin typeface="Calibri"/>
+                          <a:cs typeface="Calibri"/>
+                          <a:ea typeface="Calibri"/>
+                          <a:sym typeface="Calibri"/>
+                        </a:rPr>
+                        <a:t>131st</a:t>
+                      </a:r>
+                    </a:p>
+                  </a:txBody>
+                  <a:tcPr anchor="t" marB="63500" marT="63500" marR="0" marL="0">
+                    <a:lnL algn="ctr" cmpd="sng" cap="flat" w="0">
+                      <a:noFill/>
+                      <a:prstDash val="solid"/>
+                    </a:lnL>
+                    <a:lnR algn="ctr" cmpd="sng" cap="flat" w="0">
+                      <a:noFill/>
+                      <a:prstDash val="solid"/>
+                    </a:lnR>
+                    <a:lnT algn="ctr" cmpd="sng" cap="flat" w="0">
+                      <a:noFill/>
+                      <a:prstDash val="solid"/>
+                    </a:lnT>
+                    <a:lnB algn="ctr" cmpd="sng" cap="flat" w="0">
+                      <a:noFill/>
+                      <a:prstDash val="solid"/>
+                    </a:lnB>
+                    <a:solidFill>
+                      <a:srgbClr val="FFFFFF">
+                        <a:alpha val="0"/>
+                      </a:srgbClr>
+                    </a:solidFill>
+                  </a:tcPr>
+                </a:tc>
+                <a:tc>
+                  <a:txBody>
+                    <a:bodyPr/>
+                    <a:lstStyle/>
+                    <a:p>
+                      <a:pPr algn="l" marL="63500" marR="63500">
+                        <a:lnSpc>
+                          <a:spcPct val="100000"/>
+                        </a:lnSpc>
+                        <a:spcBef>
+                          <a:spcPts val="500"/>
+                        </a:spcBef>
+                        <a:spcAft>
+                          <a:spcPts val="500"/>
+                        </a:spcAft>
+                        <a:buNone/>
+                      </a:pPr>
+                      <a:r>
+                        <a:rPr cap="none" sz="1100" i="0" b="0" u="none">
+                          <a:solidFill>
+                            <a:srgbClr val="000000">
+                              <a:alpha val="100000"/>
+                            </a:srgbClr>
+                          </a:solidFill>
+                          <a:latin typeface="Calibri"/>
+                          <a:cs typeface="Calibri"/>
+                          <a:ea typeface="Calibri"/>
+                          <a:sym typeface="Calibri"/>
+                        </a:rPr>
+                        <a:t>Decile 5</a:t>
+                      </a:r>
+                    </a:p>
+                  </a:txBody>
+                  <a:tcPr anchor="t" marB="63500" marT="63500" marR="0" marL="0">
+                    <a:lnL algn="ctr" cmpd="sng" cap="flat" w="0">
+                      <a:noFill/>
+                      <a:prstDash val="solid"/>
+                    </a:lnL>
+                    <a:lnR algn="ctr" cmpd="sng" cap="flat" w="0">
+                      <a:noFill/>
+                      <a:prstDash val="solid"/>
+                    </a:lnR>
+                    <a:lnT algn="ctr" cmpd="sng" cap="flat" w="0">
+                      <a:noFill/>
+                      <a:prstDash val="solid"/>
+                    </a:lnT>
+                    <a:lnB algn="ctr" cmpd="sng" cap="flat" w="0">
+                      <a:noFill/>
+                      <a:prstDash val="solid"/>
+                    </a:lnB>
+                    <a:solidFill>
+                      <a:srgbClr val="FFFFFF">
+                        <a:alpha val="0"/>
+                      </a:srgbClr>
+                    </a:solidFill>
+                  </a:tcPr>
+                </a:tc>
+              </a:tr>
+              <a:tr h="182880">
+                <a:tc>
+                  <a:txBody>
+                    <a:bodyPr/>
+                    <a:lstStyle/>
+                    <a:p>
+                      <a:pPr algn="l" marL="63500" marR="63500">
+                        <a:lnSpc>
+                          <a:spcPct val="100000"/>
+                        </a:lnSpc>
+                        <a:spcBef>
+                          <a:spcPts val="500"/>
+                        </a:spcBef>
+                        <a:spcAft>
+                          <a:spcPts val="500"/>
+                        </a:spcAft>
+                        <a:buNone/>
+                      </a:pPr>
+                      <a:r>
+                        <a:rPr cap="none" sz="1100" i="0" b="0" u="none">
+                          <a:solidFill>
+                            <a:srgbClr val="000000">
+                              <a:alpha val="100000"/>
+                            </a:srgbClr>
+                          </a:solidFill>
+                          <a:latin typeface="Calibri"/>
+                          <a:cs typeface="Calibri"/>
+                          <a:ea typeface="Calibri"/>
+                          <a:sym typeface="Calibri"/>
+                        </a:rPr>
+                        <a:t>Chichester</a:t>
+                      </a:r>
+                    </a:p>
+                  </a:txBody>
+                  <a:tcPr anchor="t" marB="63500" marT="63500" marR="0" marL="0">
+                    <a:lnL algn="ctr" cmpd="sng" cap="flat" w="0">
+                      <a:noFill/>
+                      <a:prstDash val="solid"/>
+                    </a:lnL>
+                    <a:lnR algn="ctr" cmpd="sng" cap="flat" w="0">
+                      <a:noFill/>
+                      <a:prstDash val="solid"/>
+                    </a:lnR>
+                    <a:lnT algn="ctr" cmpd="sng" cap="flat" w="0">
+                      <a:noFill/>
+                      <a:prstDash val="solid"/>
+                    </a:lnT>
+                    <a:lnB algn="ctr" cmpd="sng" cap="flat" w="0">
+                      <a:noFill/>
+                      <a:prstDash val="solid"/>
+                    </a:lnB>
+                    <a:solidFill>
+                      <a:srgbClr val="FFFFFF">
+                        <a:alpha val="0"/>
+                      </a:srgbClr>
+                    </a:solidFill>
+                  </a:tcPr>
+                </a:tc>
+                <a:tc>
+                  <a:txBody>
+                    <a:bodyPr/>
+                    <a:lstStyle/>
+                    <a:p>
+                      <a:pPr algn="l" marL="63500" marR="63500">
+                        <a:lnSpc>
+                          <a:spcPct val="100000"/>
+                        </a:lnSpc>
+                        <a:spcBef>
+                          <a:spcPts val="500"/>
+                        </a:spcBef>
+                        <a:spcAft>
+                          <a:spcPts val="500"/>
+                        </a:spcAft>
+                        <a:buNone/>
+                      </a:pPr>
+                      <a:r>
+                        <a:rPr cap="none" sz="1100" i="0" b="0" u="none">
+                          <a:solidFill>
+                            <a:srgbClr val="000000">
+                              <a:alpha val="100000"/>
+                            </a:srgbClr>
+                          </a:solidFill>
+                          <a:latin typeface="Calibri"/>
+                          <a:cs typeface="Calibri"/>
+                          <a:ea typeface="Calibri"/>
+                          <a:sym typeface="Calibri"/>
+                        </a:rPr>
+                        <a:t>23</a:t>
+                      </a:r>
+                    </a:p>
+                  </a:txBody>
+                  <a:tcPr anchor="t" marB="63500" marT="63500" marR="0" marL="0">
+                    <a:lnL algn="ctr" cmpd="sng" cap="flat" w="0">
+                      <a:noFill/>
+                      <a:prstDash val="solid"/>
+                    </a:lnL>
+                    <a:lnR algn="ctr" cmpd="sng" cap="flat" w="0">
+                      <a:noFill/>
+                      <a:prstDash val="solid"/>
+                    </a:lnR>
+                    <a:lnT algn="ctr" cmpd="sng" cap="flat" w="0">
+                      <a:noFill/>
+                      <a:prstDash val="solid"/>
+                    </a:lnT>
+                    <a:lnB algn="ctr" cmpd="sng" cap="flat" w="0">
+                      <a:noFill/>
+                      <a:prstDash val="solid"/>
+                    </a:lnB>
+                    <a:solidFill>
+                      <a:srgbClr val="FFFFFF">
+                        <a:alpha val="0"/>
+                      </a:srgbClr>
+                    </a:solidFill>
+                  </a:tcPr>
+                </a:tc>
+                <a:tc>
+                  <a:txBody>
+                    <a:bodyPr/>
+                    <a:lstStyle/>
+                    <a:p>
+                      <a:pPr algn="l" marL="63500" marR="63500">
+                        <a:lnSpc>
+                          <a:spcPct val="100000"/>
+                        </a:lnSpc>
+                        <a:spcBef>
+                          <a:spcPts val="500"/>
+                        </a:spcBef>
+                        <a:spcAft>
+                          <a:spcPts val="500"/>
+                        </a:spcAft>
+                        <a:buNone/>
+                      </a:pPr>
+                      <a:r>
+                        <a:rPr cap="none" sz="1100" i="0" b="0" u="none">
+                          <a:solidFill>
+                            <a:srgbClr val="000000">
+                              <a:alpha val="100000"/>
+                            </a:srgbClr>
+                          </a:solidFill>
+                          <a:latin typeface="Calibri"/>
+                          <a:cs typeface="Calibri"/>
+                          <a:ea typeface="Calibri"/>
+                          <a:sym typeface="Calibri"/>
+                        </a:rPr>
+                        <a:t>18.9</a:t>
+                      </a:r>
+                    </a:p>
+                  </a:txBody>
+                  <a:tcPr anchor="t" marB="63500" marT="63500" marR="0" marL="0">
+                    <a:lnL algn="ctr" cmpd="sng" cap="flat" w="0">
+                      <a:noFill/>
+                      <a:prstDash val="solid"/>
+                    </a:lnL>
+                    <a:lnR algn="ctr" cmpd="sng" cap="flat" w="0">
+                      <a:noFill/>
+                      <a:prstDash val="solid"/>
+                    </a:lnR>
+                    <a:lnT algn="ctr" cmpd="sng" cap="flat" w="0">
+                      <a:noFill/>
+                      <a:prstDash val="solid"/>
+                    </a:lnT>
+                    <a:lnB algn="ctr" cmpd="sng" cap="flat" w="0">
+                      <a:noFill/>
+                      <a:prstDash val="solid"/>
+                    </a:lnB>
+                    <a:solidFill>
+                      <a:srgbClr val="FFFFFF">
+                        <a:alpha val="0"/>
+                      </a:srgbClr>
+                    </a:solidFill>
+                  </a:tcPr>
+                </a:tc>
+                <a:tc>
+                  <a:txBody>
+                    <a:bodyPr/>
+                    <a:lstStyle/>
+                    <a:p>
+                      <a:pPr algn="l" marL="63500" marR="63500">
+                        <a:lnSpc>
+                          <a:spcPct val="100000"/>
+                        </a:lnSpc>
+                        <a:spcBef>
+                          <a:spcPts val="500"/>
+                        </a:spcBef>
+                        <a:spcAft>
+                          <a:spcPts val="500"/>
+                        </a:spcAft>
+                        <a:buNone/>
+                      </a:pPr>
+                      <a:r>
+                        <a:rPr cap="none" sz="1100" i="0" b="0" u="none">
+                          <a:solidFill>
+                            <a:srgbClr val="000000">
+                              <a:alpha val="100000"/>
+                            </a:srgbClr>
+                          </a:solidFill>
+                          <a:latin typeface="Calibri"/>
+                          <a:cs typeface="Calibri"/>
+                          <a:ea typeface="Calibri"/>
+                          <a:sym typeface="Calibri"/>
+                        </a:rPr>
+                        <a:t>254th</a:t>
+                      </a:r>
+                    </a:p>
+                  </a:txBody>
+                  <a:tcPr anchor="t" marB="63500" marT="63500" marR="0" marL="0">
+                    <a:lnL algn="ctr" cmpd="sng" cap="flat" w="0">
+                      <a:noFill/>
+                      <a:prstDash val="solid"/>
+                    </a:lnL>
+                    <a:lnR algn="ctr" cmpd="sng" cap="flat" w="0">
+                      <a:noFill/>
+                      <a:prstDash val="solid"/>
+                    </a:lnR>
+                    <a:lnT algn="ctr" cmpd="sng" cap="flat" w="0">
+                      <a:noFill/>
+                      <a:prstDash val="solid"/>
+                    </a:lnT>
+                    <a:lnB algn="ctr" cmpd="sng" cap="flat" w="0">
+                      <a:noFill/>
+                      <a:prstDash val="solid"/>
+                    </a:lnB>
+                    <a:solidFill>
+                      <a:srgbClr val="FFFFFF">
+                        <a:alpha val="0"/>
+                      </a:srgbClr>
+                    </a:solidFill>
+                  </a:tcPr>
+                </a:tc>
+                <a:tc>
+                  <a:txBody>
+                    <a:bodyPr/>
+                    <a:lstStyle/>
+                    <a:p>
+                      <a:pPr algn="l" marL="63500" marR="63500">
+                        <a:lnSpc>
+                          <a:spcPct val="100000"/>
+                        </a:lnSpc>
+                        <a:spcBef>
+                          <a:spcPts val="500"/>
+                        </a:spcBef>
+                        <a:spcAft>
+                          <a:spcPts val="500"/>
+                        </a:spcAft>
+                        <a:buNone/>
+                      </a:pPr>
+                      <a:r>
+                        <a:rPr cap="none" sz="1100" i="0" b="0" u="none">
+                          <a:solidFill>
+                            <a:srgbClr val="000000">
+                              <a:alpha val="100000"/>
+                            </a:srgbClr>
+                          </a:solidFill>
+                          <a:latin typeface="Calibri"/>
+                          <a:cs typeface="Calibri"/>
+                          <a:ea typeface="Calibri"/>
+                          <a:sym typeface="Calibri"/>
+                        </a:rPr>
+                        <a:t>Decile 9</a:t>
+                      </a:r>
+                    </a:p>
+                  </a:txBody>
+                  <a:tcPr anchor="t" marB="63500" marT="63500" marR="0" marL="0">
+                    <a:lnL algn="ctr" cmpd="sng" cap="flat" w="0">
+                      <a:noFill/>
+                      <a:prstDash val="solid"/>
+                    </a:lnL>
+                    <a:lnR algn="ctr" cmpd="sng" cap="flat" w="0">
+                      <a:noFill/>
+                      <a:prstDash val="solid"/>
+                    </a:lnR>
+                    <a:lnT algn="ctr" cmpd="sng" cap="flat" w="0">
+                      <a:noFill/>
+                      <a:prstDash val="solid"/>
+                    </a:lnT>
+                    <a:lnB algn="ctr" cmpd="sng" cap="flat" w="0">
+                      <a:noFill/>
+                      <a:prstDash val="solid"/>
+                    </a:lnB>
+                    <a:solidFill>
+                      <a:srgbClr val="FFFFFF">
+                        <a:alpha val="0"/>
+                      </a:srgbClr>
+                    </a:solidFill>
+                  </a:tcPr>
+                </a:tc>
+              </a:tr>
+              <a:tr h="182880">
+                <a:tc>
+                  <a:txBody>
+                    <a:bodyPr/>
+                    <a:lstStyle/>
+                    <a:p>
+                      <a:pPr algn="l" marL="63500" marR="63500">
+                        <a:lnSpc>
+                          <a:spcPct val="100000"/>
+                        </a:lnSpc>
+                        <a:spcBef>
+                          <a:spcPts val="500"/>
+                        </a:spcBef>
+                        <a:spcAft>
+                          <a:spcPts val="500"/>
+                        </a:spcAft>
+                        <a:buNone/>
+                      </a:pPr>
+                      <a:r>
+                        <a:rPr cap="none" sz="1100" i="0" b="0" u="none">
+                          <a:solidFill>
+                            <a:srgbClr val="000000">
+                              <a:alpha val="100000"/>
+                            </a:srgbClr>
+                          </a:solidFill>
+                          <a:latin typeface="Calibri"/>
+                          <a:cs typeface="Calibri"/>
+                          <a:ea typeface="Calibri"/>
+                          <a:sym typeface="Calibri"/>
+                        </a:rPr>
+                        <a:t>Crawley</a:t>
+                      </a:r>
+                    </a:p>
+                  </a:txBody>
+                  <a:tcPr anchor="t" marB="63500" marT="63500" marR="0" marL="0">
+                    <a:lnL algn="ctr" cmpd="sng" cap="flat" w="0">
+                      <a:noFill/>
+                      <a:prstDash val="solid"/>
+                    </a:lnL>
+                    <a:lnR algn="ctr" cmpd="sng" cap="flat" w="0">
+                      <a:noFill/>
+                      <a:prstDash val="solid"/>
+                    </a:lnR>
+                    <a:lnT algn="ctr" cmpd="sng" cap="flat" w="0">
+                      <a:noFill/>
+                      <a:prstDash val="solid"/>
+                    </a:lnT>
+                    <a:lnB algn="ctr" cmpd="sng" cap="flat" w="0">
+                      <a:noFill/>
+                      <a:prstDash val="solid"/>
+                    </a:lnB>
+                    <a:solidFill>
+                      <a:srgbClr val="FFFFFF">
+                        <a:alpha val="0"/>
+                      </a:srgbClr>
+                    </a:solidFill>
+                  </a:tcPr>
+                </a:tc>
+                <a:tc>
+                  <a:txBody>
+                    <a:bodyPr/>
+                    <a:lstStyle/>
+                    <a:p>
+                      <a:pPr algn="l" marL="63500" marR="63500">
+                        <a:lnSpc>
+                          <a:spcPct val="100000"/>
+                        </a:lnSpc>
+                        <a:spcBef>
+                          <a:spcPts val="500"/>
+                        </a:spcBef>
+                        <a:spcAft>
+                          <a:spcPts val="500"/>
+                        </a:spcAft>
+                        <a:buNone/>
+                      </a:pPr>
+                      <a:r>
+                        <a:rPr cap="none" sz="1100" i="0" b="0" u="none">
+                          <a:solidFill>
+                            <a:srgbClr val="000000">
+                              <a:alpha val="100000"/>
+                            </a:srgbClr>
+                          </a:solidFill>
+                          <a:latin typeface="Calibri"/>
+                          <a:cs typeface="Calibri"/>
+                          <a:ea typeface="Calibri"/>
+                          <a:sym typeface="Calibri"/>
+                        </a:rPr>
+                        <a:t>16</a:t>
+                      </a:r>
+                    </a:p>
+                  </a:txBody>
+                  <a:tcPr anchor="t" marB="63500" marT="63500" marR="0" marL="0">
+                    <a:lnL algn="ctr" cmpd="sng" cap="flat" w="0">
+                      <a:noFill/>
+                      <a:prstDash val="solid"/>
+                    </a:lnL>
+                    <a:lnR algn="ctr" cmpd="sng" cap="flat" w="0">
+                      <a:noFill/>
+                      <a:prstDash val="solid"/>
+                    </a:lnR>
+                    <a:lnT algn="ctr" cmpd="sng" cap="flat" w="0">
+                      <a:noFill/>
+                      <a:prstDash val="solid"/>
+                    </a:lnT>
+                    <a:lnB algn="ctr" cmpd="sng" cap="flat" w="0">
+                      <a:noFill/>
+                      <a:prstDash val="solid"/>
+                    </a:lnB>
+                    <a:solidFill>
+                      <a:srgbClr val="FFFFFF">
+                        <a:alpha val="0"/>
+                      </a:srgbClr>
+                    </a:solidFill>
+                  </a:tcPr>
+                </a:tc>
+                <a:tc>
+                  <a:txBody>
+                    <a:bodyPr/>
+                    <a:lstStyle/>
+                    <a:p>
+                      <a:pPr algn="l" marL="63500" marR="63500">
+                        <a:lnSpc>
+                          <a:spcPct val="100000"/>
+                        </a:lnSpc>
+                        <a:spcBef>
+                          <a:spcPts val="500"/>
+                        </a:spcBef>
+                        <a:spcAft>
+                          <a:spcPts val="500"/>
+                        </a:spcAft>
+                        <a:buNone/>
+                      </a:pPr>
+                      <a:r>
+                        <a:rPr cap="none" sz="1100" i="0" b="0" u="none">
+                          <a:solidFill>
+                            <a:srgbClr val="000000">
+                              <a:alpha val="100000"/>
+                            </a:srgbClr>
+                          </a:solidFill>
+                          <a:latin typeface="Calibri"/>
+                          <a:cs typeface="Calibri"/>
+                          <a:ea typeface="Calibri"/>
+                          <a:sym typeface="Calibri"/>
+                        </a:rPr>
+                        <a:t>14.2</a:t>
+                      </a:r>
+                    </a:p>
+                  </a:txBody>
+                  <a:tcPr anchor="t" marB="63500" marT="63500" marR="0" marL="0">
+                    <a:lnL algn="ctr" cmpd="sng" cap="flat" w="0">
+                      <a:noFill/>
+                      <a:prstDash val="solid"/>
+                    </a:lnL>
+                    <a:lnR algn="ctr" cmpd="sng" cap="flat" w="0">
+                      <a:noFill/>
+                      <a:prstDash val="solid"/>
+                    </a:lnR>
+                    <a:lnT algn="ctr" cmpd="sng" cap="flat" w="0">
+                      <a:noFill/>
+                      <a:prstDash val="solid"/>
+                    </a:lnT>
+                    <a:lnB algn="ctr" cmpd="sng" cap="flat" w="0">
+                      <a:noFill/>
+                      <a:prstDash val="solid"/>
+                    </a:lnB>
+                    <a:solidFill>
+                      <a:srgbClr val="FFFFFF">
+                        <a:alpha val="0"/>
+                      </a:srgbClr>
+                    </a:solidFill>
+                  </a:tcPr>
+                </a:tc>
+                <a:tc>
+                  <a:txBody>
+                    <a:bodyPr/>
+                    <a:lstStyle/>
+                    <a:p>
+                      <a:pPr algn="l" marL="63500" marR="63500">
+                        <a:lnSpc>
+                          <a:spcPct val="100000"/>
+                        </a:lnSpc>
+                        <a:spcBef>
+                          <a:spcPts val="500"/>
+                        </a:spcBef>
+                        <a:spcAft>
+                          <a:spcPts val="500"/>
+                        </a:spcAft>
+                        <a:buNone/>
+                      </a:pPr>
+                      <a:r>
+                        <a:rPr cap="none" sz="1100" i="0" b="0" u="none">
+                          <a:solidFill>
+                            <a:srgbClr val="000000">
+                              <a:alpha val="100000"/>
+                            </a:srgbClr>
+                          </a:solidFill>
+                          <a:latin typeface="Calibri"/>
+                          <a:cs typeface="Calibri"/>
+                          <a:ea typeface="Calibri"/>
+                          <a:sym typeface="Calibri"/>
+                        </a:rPr>
+                        <a:t>299th</a:t>
                       </a:r>
                     </a:p>
                   </a:txBody>
@@ -14702,7 +15563,7 @@
                           <a:ea typeface="Calibri"/>
                           <a:sym typeface="Calibri"/>
                         </a:rPr>
-                        <a:t>with highest rate</a:t>
+                        <a:t>with lowest rate</a:t>
                       </a:r>
                     </a:p>
                   </a:txBody>
@@ -14761,7 +15622,7 @@
                           <a:ea typeface="Calibri"/>
                           <a:sym typeface="Calibri"/>
                         </a:rPr>
-                        <a:t>Arun</a:t>
+                        <a:t>Horsham</a:t>
                       </a:r>
                     </a:p>
                   </a:txBody>
@@ -14818,7 +15679,7 @@
                           <a:ea typeface="Calibri"/>
                           <a:sym typeface="Calibri"/>
                         </a:rPr>
-                        <a:t>180</a:t>
+                        <a:t>36</a:t>
                       </a:r>
                     </a:p>
                   </a:txBody>
@@ -14875,7 +15736,7 @@
                           <a:ea typeface="Calibri"/>
                           <a:sym typeface="Calibri"/>
                         </a:rPr>
-                        <a:t>111.7</a:t>
+                        <a:t>24.7</a:t>
                       </a:r>
                     </a:p>
                   </a:txBody>
@@ -14932,608 +15793,7 @@
                           <a:ea typeface="Calibri"/>
                           <a:sym typeface="Calibri"/>
                         </a:rPr>
-                        <a:t>19th</a:t>
-                      </a:r>
-                    </a:p>
-                  </a:txBody>
-                  <a:tcPr anchor="t" marB="63500" marT="63500" marR="0" marL="0">
-                    <a:lnL algn="ctr" cmpd="sng" cap="flat" w="0">
-                      <a:noFill/>
-                      <a:prstDash val="solid"/>
-                    </a:lnL>
-                    <a:lnR algn="ctr" cmpd="sng" cap="flat" w="0">
-                      <a:noFill/>
-                      <a:prstDash val="solid"/>
-                    </a:lnR>
-                    <a:lnT algn="ctr" cmpd="sng" cap="flat" w="0">
-                      <a:noFill/>
-                      <a:prstDash val="solid"/>
-                    </a:lnT>
-                    <a:lnB algn="ctr" cmpd="sng" cap="flat" w="0">
-                      <a:noFill/>
-                      <a:prstDash val="solid"/>
-                    </a:lnB>
-                    <a:solidFill>
-                      <a:srgbClr val="FFFFFF">
-                        <a:alpha val="0"/>
-                      </a:srgbClr>
-                    </a:solidFill>
-                  </a:tcPr>
-                </a:tc>
-                <a:tc>
-                  <a:txBody>
-                    <a:bodyPr/>
-                    <a:lstStyle/>
-                    <a:p>
-                      <a:pPr algn="l" marL="63500" marR="63500">
-                        <a:lnSpc>
-                          <a:spcPct val="100000"/>
-                        </a:lnSpc>
-                        <a:spcBef>
-                          <a:spcPts val="500"/>
-                        </a:spcBef>
-                        <a:spcAft>
-                          <a:spcPts val="500"/>
-                        </a:spcAft>
-                        <a:buNone/>
-                      </a:pPr>
-                      <a:r>
-                        <a:rPr cap="none" sz="1100" i="0" b="0" u="none">
-                          <a:solidFill>
-                            <a:srgbClr val="000000">
-                              <a:alpha val="100000"/>
-                            </a:srgbClr>
-                          </a:solidFill>
-                          <a:latin typeface="Calibri"/>
-                          <a:cs typeface="Calibri"/>
-                          <a:ea typeface="Calibri"/>
-                          <a:sym typeface="Calibri"/>
-                        </a:rPr>
-                        <a:t>10% of authorities</a:t>
-                      </a:r>
-                      <a:br>
-                        <a:rPr cap="none" sz="1100" i="0" b="0" u="none">
-                          <a:solidFill>
-                            <a:srgbClr val="000000">
-                              <a:alpha val="100000"/>
-                            </a:srgbClr>
-                          </a:solidFill>
-                          <a:latin typeface="Calibri"/>
-                          <a:cs typeface="Calibri"/>
-                          <a:ea typeface="Calibri"/>
-                          <a:sym typeface="Calibri"/>
-                        </a:rPr>
-                      </a:br>
-                      <a:r>
-                        <a:rPr cap="none" sz="1100" i="0" b="0" u="none">
-                          <a:solidFill>
-                            <a:srgbClr val="000000">
-                              <a:alpha val="100000"/>
-                            </a:srgbClr>
-                          </a:solidFill>
-                          <a:latin typeface="Calibri"/>
-                          <a:cs typeface="Calibri"/>
-                          <a:ea typeface="Calibri"/>
-                          <a:sym typeface="Calibri"/>
-                        </a:rPr>
-                        <a:t>with highest rate</a:t>
-                      </a:r>
-                    </a:p>
-                  </a:txBody>
-                  <a:tcPr anchor="t" marB="63500" marT="63500" marR="0" marL="0">
-                    <a:lnL algn="ctr" cmpd="sng" cap="flat" w="0">
-                      <a:noFill/>
-                      <a:prstDash val="solid"/>
-                    </a:lnL>
-                    <a:lnR algn="ctr" cmpd="sng" cap="flat" w="0">
-                      <a:noFill/>
-                      <a:prstDash val="solid"/>
-                    </a:lnR>
-                    <a:lnT algn="ctr" cmpd="sng" cap="flat" w="0">
-                      <a:noFill/>
-                      <a:prstDash val="solid"/>
-                    </a:lnT>
-                    <a:lnB algn="ctr" cmpd="sng" cap="flat" w="0">
-                      <a:noFill/>
-                      <a:prstDash val="solid"/>
-                    </a:lnB>
-                    <a:solidFill>
-                      <a:srgbClr val="FFFFFF">
-                        <a:alpha val="0"/>
-                      </a:srgbClr>
-                    </a:solidFill>
-                  </a:tcPr>
-                </a:tc>
-              </a:tr>
-              <a:tr h="182880">
-                <a:tc>
-                  <a:txBody>
-                    <a:bodyPr/>
-                    <a:lstStyle/>
-                    <a:p>
-                      <a:pPr algn="l" marL="63500" marR="63500">
-                        <a:lnSpc>
-                          <a:spcPct val="100000"/>
-                        </a:lnSpc>
-                        <a:spcBef>
-                          <a:spcPts val="500"/>
-                        </a:spcBef>
-                        <a:spcAft>
-                          <a:spcPts val="500"/>
-                        </a:spcAft>
-                        <a:buNone/>
-                      </a:pPr>
-                      <a:r>
-                        <a:rPr cap="none" sz="1100" i="0" b="0" u="none">
-                          <a:solidFill>
-                            <a:srgbClr val="000000">
-                              <a:alpha val="100000"/>
-                            </a:srgbClr>
-                          </a:solidFill>
-                          <a:latin typeface="Calibri"/>
-                          <a:cs typeface="Calibri"/>
-                          <a:ea typeface="Calibri"/>
-                          <a:sym typeface="Calibri"/>
-                        </a:rPr>
-                        <a:t>Chichester</a:t>
-                      </a:r>
-                    </a:p>
-                  </a:txBody>
-                  <a:tcPr anchor="t" marB="63500" marT="63500" marR="0" marL="0">
-                    <a:lnL algn="ctr" cmpd="sng" cap="flat" w="0">
-                      <a:noFill/>
-                      <a:prstDash val="solid"/>
-                    </a:lnL>
-                    <a:lnR algn="ctr" cmpd="sng" cap="flat" w="0">
-                      <a:noFill/>
-                      <a:prstDash val="solid"/>
-                    </a:lnR>
-                    <a:lnT algn="ctr" cmpd="sng" cap="flat" w="0">
-                      <a:noFill/>
-                      <a:prstDash val="solid"/>
-                    </a:lnT>
-                    <a:lnB algn="ctr" cmpd="sng" cap="flat" w="0">
-                      <a:noFill/>
-                      <a:prstDash val="solid"/>
-                    </a:lnB>
-                    <a:solidFill>
-                      <a:srgbClr val="FFFFFF">
-                        <a:alpha val="0"/>
-                      </a:srgbClr>
-                    </a:solidFill>
-                  </a:tcPr>
-                </a:tc>
-                <a:tc>
-                  <a:txBody>
-                    <a:bodyPr/>
-                    <a:lstStyle/>
-                    <a:p>
-                      <a:pPr algn="l" marL="63500" marR="63500">
-                        <a:lnSpc>
-                          <a:spcPct val="100000"/>
-                        </a:lnSpc>
-                        <a:spcBef>
-                          <a:spcPts val="500"/>
-                        </a:spcBef>
-                        <a:spcAft>
-                          <a:spcPts val="500"/>
-                        </a:spcAft>
-                        <a:buNone/>
-                      </a:pPr>
-                      <a:r>
-                        <a:rPr cap="none" sz="1100" i="0" b="0" u="none">
-                          <a:solidFill>
-                            <a:srgbClr val="000000">
-                              <a:alpha val="100000"/>
-                            </a:srgbClr>
-                          </a:solidFill>
-                          <a:latin typeface="Calibri"/>
-                          <a:cs typeface="Calibri"/>
-                          <a:ea typeface="Calibri"/>
-                          <a:sym typeface="Calibri"/>
-                        </a:rPr>
-                        <a:t>94</a:t>
-                      </a:r>
-                    </a:p>
-                  </a:txBody>
-                  <a:tcPr anchor="t" marB="63500" marT="63500" marR="0" marL="0">
-                    <a:lnL algn="ctr" cmpd="sng" cap="flat" w="0">
-                      <a:noFill/>
-                      <a:prstDash val="solid"/>
-                    </a:lnL>
-                    <a:lnR algn="ctr" cmpd="sng" cap="flat" w="0">
-                      <a:noFill/>
-                      <a:prstDash val="solid"/>
-                    </a:lnR>
-                    <a:lnT algn="ctr" cmpd="sng" cap="flat" w="0">
-                      <a:noFill/>
-                      <a:prstDash val="solid"/>
-                    </a:lnT>
-                    <a:lnB algn="ctr" cmpd="sng" cap="flat" w="0">
-                      <a:noFill/>
-                      <a:prstDash val="solid"/>
-                    </a:lnB>
-                    <a:solidFill>
-                      <a:srgbClr val="FFFFFF">
-                        <a:alpha val="0"/>
-                      </a:srgbClr>
-                    </a:solidFill>
-                  </a:tcPr>
-                </a:tc>
-                <a:tc>
-                  <a:txBody>
-                    <a:bodyPr/>
-                    <a:lstStyle/>
-                    <a:p>
-                      <a:pPr algn="l" marL="63500" marR="63500">
-                        <a:lnSpc>
-                          <a:spcPct val="100000"/>
-                        </a:lnSpc>
-                        <a:spcBef>
-                          <a:spcPts val="500"/>
-                        </a:spcBef>
-                        <a:spcAft>
-                          <a:spcPts val="500"/>
-                        </a:spcAft>
-                        <a:buNone/>
-                      </a:pPr>
-                      <a:r>
-                        <a:rPr cap="none" sz="1100" i="0" b="0" u="none">
-                          <a:solidFill>
-                            <a:srgbClr val="000000">
-                              <a:alpha val="100000"/>
-                            </a:srgbClr>
-                          </a:solidFill>
-                          <a:latin typeface="Calibri"/>
-                          <a:cs typeface="Calibri"/>
-                          <a:ea typeface="Calibri"/>
-                          <a:sym typeface="Calibri"/>
-                        </a:rPr>
-                        <a:t>77.4</a:t>
-                      </a:r>
-                    </a:p>
-                  </a:txBody>
-                  <a:tcPr anchor="t" marB="63500" marT="63500" marR="0" marL="0">
-                    <a:lnL algn="ctr" cmpd="sng" cap="flat" w="0">
-                      <a:noFill/>
-                      <a:prstDash val="solid"/>
-                    </a:lnL>
-                    <a:lnR algn="ctr" cmpd="sng" cap="flat" w="0">
-                      <a:noFill/>
-                      <a:prstDash val="solid"/>
-                    </a:lnR>
-                    <a:lnT algn="ctr" cmpd="sng" cap="flat" w="0">
-                      <a:noFill/>
-                      <a:prstDash val="solid"/>
-                    </a:lnT>
-                    <a:lnB algn="ctr" cmpd="sng" cap="flat" w="0">
-                      <a:noFill/>
-                      <a:prstDash val="solid"/>
-                    </a:lnB>
-                    <a:solidFill>
-                      <a:srgbClr val="FFFFFF">
-                        <a:alpha val="0"/>
-                      </a:srgbClr>
-                    </a:solidFill>
-                  </a:tcPr>
-                </a:tc>
-                <a:tc>
-                  <a:txBody>
-                    <a:bodyPr/>
-                    <a:lstStyle/>
-                    <a:p>
-                      <a:pPr algn="l" marL="63500" marR="63500">
-                        <a:lnSpc>
-                          <a:spcPct val="100000"/>
-                        </a:lnSpc>
-                        <a:spcBef>
-                          <a:spcPts val="500"/>
-                        </a:spcBef>
-                        <a:spcAft>
-                          <a:spcPts val="500"/>
-                        </a:spcAft>
-                        <a:buNone/>
-                      </a:pPr>
-                      <a:r>
-                        <a:rPr cap="none" sz="1100" i="0" b="0" u="none">
-                          <a:solidFill>
-                            <a:srgbClr val="000000">
-                              <a:alpha val="100000"/>
-                            </a:srgbClr>
-                          </a:solidFill>
-                          <a:latin typeface="Calibri"/>
-                          <a:cs typeface="Calibri"/>
-                          <a:ea typeface="Calibri"/>
-                          <a:sym typeface="Calibri"/>
-                        </a:rPr>
-                        <a:t>105th</a:t>
-                      </a:r>
-                    </a:p>
-                  </a:txBody>
-                  <a:tcPr anchor="t" marB="63500" marT="63500" marR="0" marL="0">
-                    <a:lnL algn="ctr" cmpd="sng" cap="flat" w="0">
-                      <a:noFill/>
-                      <a:prstDash val="solid"/>
-                    </a:lnL>
-                    <a:lnR algn="ctr" cmpd="sng" cap="flat" w="0">
-                      <a:noFill/>
-                      <a:prstDash val="solid"/>
-                    </a:lnR>
-                    <a:lnT algn="ctr" cmpd="sng" cap="flat" w="0">
-                      <a:noFill/>
-                      <a:prstDash val="solid"/>
-                    </a:lnT>
-                    <a:lnB algn="ctr" cmpd="sng" cap="flat" w="0">
-                      <a:noFill/>
-                      <a:prstDash val="solid"/>
-                    </a:lnB>
-                    <a:solidFill>
-                      <a:srgbClr val="FFFFFF">
-                        <a:alpha val="0"/>
-                      </a:srgbClr>
-                    </a:solidFill>
-                  </a:tcPr>
-                </a:tc>
-                <a:tc>
-                  <a:txBody>
-                    <a:bodyPr/>
-                    <a:lstStyle/>
-                    <a:p>
-                      <a:pPr algn="l" marL="63500" marR="63500">
-                        <a:lnSpc>
-                          <a:spcPct val="100000"/>
-                        </a:lnSpc>
-                        <a:spcBef>
-                          <a:spcPts val="500"/>
-                        </a:spcBef>
-                        <a:spcAft>
-                          <a:spcPts val="500"/>
-                        </a:spcAft>
-                        <a:buNone/>
-                      </a:pPr>
-                      <a:r>
-                        <a:rPr cap="none" sz="1100" i="0" b="0" u="none">
-                          <a:solidFill>
-                            <a:srgbClr val="000000">
-                              <a:alpha val="100000"/>
-                            </a:srgbClr>
-                          </a:solidFill>
-                          <a:latin typeface="Calibri"/>
-                          <a:cs typeface="Calibri"/>
-                          <a:ea typeface="Calibri"/>
-                          <a:sym typeface="Calibri"/>
-                        </a:rPr>
-                        <a:t>Decile 4</a:t>
-                      </a:r>
-                    </a:p>
-                  </a:txBody>
-                  <a:tcPr anchor="t" marB="63500" marT="63500" marR="0" marL="0">
-                    <a:lnL algn="ctr" cmpd="sng" cap="flat" w="0">
-                      <a:noFill/>
-                      <a:prstDash val="solid"/>
-                    </a:lnL>
-                    <a:lnR algn="ctr" cmpd="sng" cap="flat" w="0">
-                      <a:noFill/>
-                      <a:prstDash val="solid"/>
-                    </a:lnR>
-                    <a:lnT algn="ctr" cmpd="sng" cap="flat" w="0">
-                      <a:noFill/>
-                      <a:prstDash val="solid"/>
-                    </a:lnT>
-                    <a:lnB algn="ctr" cmpd="sng" cap="flat" w="0">
-                      <a:noFill/>
-                      <a:prstDash val="solid"/>
-                    </a:lnB>
-                    <a:solidFill>
-                      <a:srgbClr val="FFFFFF">
-                        <a:alpha val="0"/>
-                      </a:srgbClr>
-                    </a:solidFill>
-                  </a:tcPr>
-                </a:tc>
-              </a:tr>
-              <a:tr h="182880">
-                <a:tc>
-                  <a:txBody>
-                    <a:bodyPr/>
-                    <a:lstStyle/>
-                    <a:p>
-                      <a:pPr algn="l" marL="63500" marR="63500">
-                        <a:lnSpc>
-                          <a:spcPct val="100000"/>
-                        </a:lnSpc>
-                        <a:spcBef>
-                          <a:spcPts val="500"/>
-                        </a:spcBef>
-                        <a:spcAft>
-                          <a:spcPts val="500"/>
-                        </a:spcAft>
-                        <a:buNone/>
-                      </a:pPr>
-                      <a:r>
-                        <a:rPr cap="none" sz="1100" i="0" b="0" u="none">
-                          <a:solidFill>
-                            <a:srgbClr val="000000">
-                              <a:alpha val="100000"/>
-                            </a:srgbClr>
-                          </a:solidFill>
-                          <a:latin typeface="Calibri"/>
-                          <a:cs typeface="Calibri"/>
-                          <a:ea typeface="Calibri"/>
-                          <a:sym typeface="Calibri"/>
-                        </a:rPr>
-                        <a:t>Crawley</a:t>
-                      </a:r>
-                    </a:p>
-                  </a:txBody>
-                  <a:tcPr anchor="t" marB="63500" marT="63500" marR="0" marL="0">
-                    <a:lnL algn="ctr" cmpd="sng" cap="flat" w="0">
-                      <a:noFill/>
-                      <a:prstDash val="solid"/>
-                    </a:lnL>
-                    <a:lnR algn="ctr" cmpd="sng" cap="flat" w="0">
-                      <a:noFill/>
-                      <a:prstDash val="solid"/>
-                    </a:lnR>
-                    <a:lnT algn="ctr" cmpd="sng" cap="flat" w="0">
-                      <a:noFill/>
-                      <a:prstDash val="solid"/>
-                    </a:lnT>
-                    <a:lnB algn="ctr" cmpd="sng" cap="flat" w="0">
-                      <a:noFill/>
-                      <a:prstDash val="solid"/>
-                    </a:lnB>
-                    <a:solidFill>
-                      <a:srgbClr val="FFFFFF">
-                        <a:alpha val="0"/>
-                      </a:srgbClr>
-                    </a:solidFill>
-                  </a:tcPr>
-                </a:tc>
-                <a:tc>
-                  <a:txBody>
-                    <a:bodyPr/>
-                    <a:lstStyle/>
-                    <a:p>
-                      <a:pPr algn="l" marL="63500" marR="63500">
-                        <a:lnSpc>
-                          <a:spcPct val="100000"/>
-                        </a:lnSpc>
-                        <a:spcBef>
-                          <a:spcPts val="500"/>
-                        </a:spcBef>
-                        <a:spcAft>
-                          <a:spcPts val="500"/>
-                        </a:spcAft>
-                        <a:buNone/>
-                      </a:pPr>
-                      <a:r>
-                        <a:rPr cap="none" sz="1100" i="0" b="0" u="none">
-                          <a:solidFill>
-                            <a:srgbClr val="000000">
-                              <a:alpha val="100000"/>
-                            </a:srgbClr>
-                          </a:solidFill>
-                          <a:latin typeface="Calibri"/>
-                          <a:cs typeface="Calibri"/>
-                          <a:ea typeface="Calibri"/>
-                          <a:sym typeface="Calibri"/>
-                        </a:rPr>
-                        <a:t>74</a:t>
-                      </a:r>
-                    </a:p>
-                  </a:txBody>
-                  <a:tcPr anchor="t" marB="63500" marT="63500" marR="0" marL="0">
-                    <a:lnL algn="ctr" cmpd="sng" cap="flat" w="0">
-                      <a:noFill/>
-                      <a:prstDash val="solid"/>
-                    </a:lnL>
-                    <a:lnR algn="ctr" cmpd="sng" cap="flat" w="0">
-                      <a:noFill/>
-                      <a:prstDash val="solid"/>
-                    </a:lnR>
-                    <a:lnT algn="ctr" cmpd="sng" cap="flat" w="0">
-                      <a:noFill/>
-                      <a:prstDash val="solid"/>
-                    </a:lnT>
-                    <a:lnB algn="ctr" cmpd="sng" cap="flat" w="0">
-                      <a:noFill/>
-                      <a:prstDash val="solid"/>
-                    </a:lnB>
-                    <a:solidFill>
-                      <a:srgbClr val="FFFFFF">
-                        <a:alpha val="0"/>
-                      </a:srgbClr>
-                    </a:solidFill>
-                  </a:tcPr>
-                </a:tc>
-                <a:tc>
-                  <a:txBody>
-                    <a:bodyPr/>
-                    <a:lstStyle/>
-                    <a:p>
-                      <a:pPr algn="l" marL="63500" marR="63500">
-                        <a:lnSpc>
-                          <a:spcPct val="100000"/>
-                        </a:lnSpc>
-                        <a:spcBef>
-                          <a:spcPts val="500"/>
-                        </a:spcBef>
-                        <a:spcAft>
-                          <a:spcPts val="500"/>
-                        </a:spcAft>
-                        <a:buNone/>
-                      </a:pPr>
-                      <a:r>
-                        <a:rPr cap="none" sz="1100" i="0" b="0" u="none">
-                          <a:solidFill>
-                            <a:srgbClr val="000000">
-                              <a:alpha val="100000"/>
-                            </a:srgbClr>
-                          </a:solidFill>
-                          <a:latin typeface="Calibri"/>
-                          <a:cs typeface="Calibri"/>
-                          <a:ea typeface="Calibri"/>
-                          <a:sym typeface="Calibri"/>
-                        </a:rPr>
-                        <a:t>65.8</a:t>
-                      </a:r>
-                    </a:p>
-                  </a:txBody>
-                  <a:tcPr anchor="t" marB="63500" marT="63500" marR="0" marL="0">
-                    <a:lnL algn="ctr" cmpd="sng" cap="flat" w="0">
-                      <a:noFill/>
-                      <a:prstDash val="solid"/>
-                    </a:lnL>
-                    <a:lnR algn="ctr" cmpd="sng" cap="flat" w="0">
-                      <a:noFill/>
-                      <a:prstDash val="solid"/>
-                    </a:lnR>
-                    <a:lnT algn="ctr" cmpd="sng" cap="flat" w="0">
-                      <a:noFill/>
-                      <a:prstDash val="solid"/>
-                    </a:lnT>
-                    <a:lnB algn="ctr" cmpd="sng" cap="flat" w="0">
-                      <a:noFill/>
-                      <a:prstDash val="solid"/>
-                    </a:lnB>
-                    <a:solidFill>
-                      <a:srgbClr val="FFFFFF">
-                        <a:alpha val="0"/>
-                      </a:srgbClr>
-                    </a:solidFill>
-                  </a:tcPr>
-                </a:tc>
-                <a:tc>
-                  <a:txBody>
-                    <a:bodyPr/>
-                    <a:lstStyle/>
-                    <a:p>
-                      <a:pPr algn="l" marL="63500" marR="63500">
-                        <a:lnSpc>
-                          <a:spcPct val="100000"/>
-                        </a:lnSpc>
-                        <a:spcBef>
-                          <a:spcPts val="500"/>
-                        </a:spcBef>
-                        <a:spcAft>
-                          <a:spcPts val="500"/>
-                        </a:spcAft>
-                        <a:buNone/>
-                      </a:pPr>
-                      <a:r>
-                        <a:rPr cap="none" sz="1100" i="0" b="0" u="none">
-                          <a:solidFill>
-                            <a:srgbClr val="000000">
-                              <a:alpha val="100000"/>
-                            </a:srgbClr>
-                          </a:solidFill>
-                          <a:latin typeface="Calibri"/>
-                          <a:cs typeface="Calibri"/>
-                          <a:ea typeface="Calibri"/>
-                          <a:sym typeface="Calibri"/>
-                        </a:rPr>
-                        <a:t>166th</a:t>
+                        <a:t>180th</a:t>
                       </a:r>
                     </a:p>
                   </a:txBody>
@@ -15649,7 +15909,7 @@
                           <a:ea typeface="Calibri"/>
                           <a:sym typeface="Calibri"/>
                         </a:rPr>
-                        <a:t>Horsham</a:t>
+                        <a:t>Mid Sussex</a:t>
                       </a:r>
                     </a:p>
                   </a:txBody>
@@ -15706,7 +15966,7 @@
                           <a:ea typeface="Calibri"/>
                           <a:sym typeface="Calibri"/>
                         </a:rPr>
-                        <a:t>95</a:t>
+                        <a:t>27</a:t>
                       </a:r>
                     </a:p>
                   </a:txBody>
@@ -15763,7 +16023,7 @@
                           <a:ea typeface="Calibri"/>
                           <a:sym typeface="Calibri"/>
                         </a:rPr>
-                        <a:t>65.3</a:t>
+                        <a:t>17.7</a:t>
                       </a:r>
                     </a:p>
                   </a:txBody>
@@ -15820,7 +16080,7 @@
                           <a:ea typeface="Calibri"/>
                           <a:sym typeface="Calibri"/>
                         </a:rPr>
-                        <a:t>170th</a:t>
+                        <a:t>270th</a:t>
                       </a:r>
                     </a:p>
                   </a:txBody>
@@ -15877,294 +16137,7 @@
                           <a:ea typeface="Calibri"/>
                           <a:sym typeface="Calibri"/>
                         </a:rPr>
-                        <a:t>Decile 6</a:t>
-                      </a:r>
-                    </a:p>
-                  </a:txBody>
-                  <a:tcPr anchor="t" marB="63500" marT="63500" marR="0" marL="0">
-                    <a:lnL algn="ctr" cmpd="sng" cap="flat" w="0">
-                      <a:noFill/>
-                      <a:prstDash val="solid"/>
-                    </a:lnL>
-                    <a:lnR algn="ctr" cmpd="sng" cap="flat" w="0">
-                      <a:noFill/>
-                      <a:prstDash val="solid"/>
-                    </a:lnR>
-                    <a:lnT algn="ctr" cmpd="sng" cap="flat" w="0">
-                      <a:noFill/>
-                      <a:prstDash val="solid"/>
-                    </a:lnT>
-                    <a:lnB algn="ctr" cmpd="sng" cap="flat" w="0">
-                      <a:noFill/>
-                      <a:prstDash val="solid"/>
-                    </a:lnB>
-                    <a:solidFill>
-                      <a:srgbClr val="FFFFFF">
-                        <a:alpha val="0"/>
-                      </a:srgbClr>
-                    </a:solidFill>
-                  </a:tcPr>
-                </a:tc>
-              </a:tr>
-              <a:tr h="182880">
-                <a:tc>
-                  <a:txBody>
-                    <a:bodyPr/>
-                    <a:lstStyle/>
-                    <a:p>
-                      <a:pPr algn="l" marL="63500" marR="63500">
-                        <a:lnSpc>
-                          <a:spcPct val="100000"/>
-                        </a:lnSpc>
-                        <a:spcBef>
-                          <a:spcPts val="500"/>
-                        </a:spcBef>
-                        <a:spcAft>
-                          <a:spcPts val="500"/>
-                        </a:spcAft>
-                        <a:buNone/>
-                      </a:pPr>
-                      <a:r>
-                        <a:rPr cap="none" sz="1100" i="0" b="0" u="none">
-                          <a:solidFill>
-                            <a:srgbClr val="000000">
-                              <a:alpha val="100000"/>
-                            </a:srgbClr>
-                          </a:solidFill>
-                          <a:latin typeface="Calibri"/>
-                          <a:cs typeface="Calibri"/>
-                          <a:ea typeface="Calibri"/>
-                          <a:sym typeface="Calibri"/>
-                        </a:rPr>
-                        <a:t>Mid Sussex</a:t>
-                      </a:r>
-                    </a:p>
-                  </a:txBody>
-                  <a:tcPr anchor="t" marB="63500" marT="63500" marR="0" marL="0">
-                    <a:lnL algn="ctr" cmpd="sng" cap="flat" w="0">
-                      <a:noFill/>
-                      <a:prstDash val="solid"/>
-                    </a:lnL>
-                    <a:lnR algn="ctr" cmpd="sng" cap="flat" w="0">
-                      <a:noFill/>
-                      <a:prstDash val="solid"/>
-                    </a:lnR>
-                    <a:lnT algn="ctr" cmpd="sng" cap="flat" w="0">
-                      <a:noFill/>
-                      <a:prstDash val="solid"/>
-                    </a:lnT>
-                    <a:lnB algn="ctr" cmpd="sng" cap="flat" w="0">
-                      <a:noFill/>
-                      <a:prstDash val="solid"/>
-                    </a:lnB>
-                    <a:solidFill>
-                      <a:srgbClr val="FFFFFF">
-                        <a:alpha val="0"/>
-                      </a:srgbClr>
-                    </a:solidFill>
-                  </a:tcPr>
-                </a:tc>
-                <a:tc>
-                  <a:txBody>
-                    <a:bodyPr/>
-                    <a:lstStyle/>
-                    <a:p>
-                      <a:pPr algn="l" marL="63500" marR="63500">
-                        <a:lnSpc>
-                          <a:spcPct val="100000"/>
-                        </a:lnSpc>
-                        <a:spcBef>
-                          <a:spcPts val="500"/>
-                        </a:spcBef>
-                        <a:spcAft>
-                          <a:spcPts val="500"/>
-                        </a:spcAft>
-                        <a:buNone/>
-                      </a:pPr>
-                      <a:r>
-                        <a:rPr cap="none" sz="1100" i="0" b="0" u="none">
-                          <a:solidFill>
-                            <a:srgbClr val="000000">
-                              <a:alpha val="100000"/>
-                            </a:srgbClr>
-                          </a:solidFill>
-                          <a:latin typeface="Calibri"/>
-                          <a:cs typeface="Calibri"/>
-                          <a:ea typeface="Calibri"/>
-                          <a:sym typeface="Calibri"/>
-                        </a:rPr>
-                        <a:t>101</a:t>
-                      </a:r>
-                    </a:p>
-                  </a:txBody>
-                  <a:tcPr anchor="t" marB="63500" marT="63500" marR="0" marL="0">
-                    <a:lnL algn="ctr" cmpd="sng" cap="flat" w="0">
-                      <a:noFill/>
-                      <a:prstDash val="solid"/>
-                    </a:lnL>
-                    <a:lnR algn="ctr" cmpd="sng" cap="flat" w="0">
-                      <a:noFill/>
-                      <a:prstDash val="solid"/>
-                    </a:lnR>
-                    <a:lnT algn="ctr" cmpd="sng" cap="flat" w="0">
-                      <a:noFill/>
-                      <a:prstDash val="solid"/>
-                    </a:lnT>
-                    <a:lnB algn="ctr" cmpd="sng" cap="flat" w="0">
-                      <a:noFill/>
-                      <a:prstDash val="solid"/>
-                    </a:lnB>
-                    <a:solidFill>
-                      <a:srgbClr val="FFFFFF">
-                        <a:alpha val="0"/>
-                      </a:srgbClr>
-                    </a:solidFill>
-                  </a:tcPr>
-                </a:tc>
-                <a:tc>
-                  <a:txBody>
-                    <a:bodyPr/>
-                    <a:lstStyle/>
-                    <a:p>
-                      <a:pPr algn="l" marL="63500" marR="63500">
-                        <a:lnSpc>
-                          <a:spcPct val="100000"/>
-                        </a:lnSpc>
-                        <a:spcBef>
-                          <a:spcPts val="500"/>
-                        </a:spcBef>
-                        <a:spcAft>
-                          <a:spcPts val="500"/>
-                        </a:spcAft>
-                        <a:buNone/>
-                      </a:pPr>
-                      <a:r>
-                        <a:rPr cap="none" sz="1100" i="0" b="0" u="none">
-                          <a:solidFill>
-                            <a:srgbClr val="000000">
-                              <a:alpha val="100000"/>
-                            </a:srgbClr>
-                          </a:solidFill>
-                          <a:latin typeface="Calibri"/>
-                          <a:cs typeface="Calibri"/>
-                          <a:ea typeface="Calibri"/>
-                          <a:sym typeface="Calibri"/>
-                        </a:rPr>
-                        <a:t>66.4</a:t>
-                      </a:r>
-                    </a:p>
-                  </a:txBody>
-                  <a:tcPr anchor="t" marB="63500" marT="63500" marR="0" marL="0">
-                    <a:lnL algn="ctr" cmpd="sng" cap="flat" w="0">
-                      <a:noFill/>
-                      <a:prstDash val="solid"/>
-                    </a:lnL>
-                    <a:lnR algn="ctr" cmpd="sng" cap="flat" w="0">
-                      <a:noFill/>
-                      <a:prstDash val="solid"/>
-                    </a:lnR>
-                    <a:lnT algn="ctr" cmpd="sng" cap="flat" w="0">
-                      <a:noFill/>
-                      <a:prstDash val="solid"/>
-                    </a:lnT>
-                    <a:lnB algn="ctr" cmpd="sng" cap="flat" w="0">
-                      <a:noFill/>
-                      <a:prstDash val="solid"/>
-                    </a:lnB>
-                    <a:solidFill>
-                      <a:srgbClr val="FFFFFF">
-                        <a:alpha val="0"/>
-                      </a:srgbClr>
-                    </a:solidFill>
-                  </a:tcPr>
-                </a:tc>
-                <a:tc>
-                  <a:txBody>
-                    <a:bodyPr/>
-                    <a:lstStyle/>
-                    <a:p>
-                      <a:pPr algn="l" marL="63500" marR="63500">
-                        <a:lnSpc>
-                          <a:spcPct val="100000"/>
-                        </a:lnSpc>
-                        <a:spcBef>
-                          <a:spcPts val="500"/>
-                        </a:spcBef>
-                        <a:spcAft>
-                          <a:spcPts val="500"/>
-                        </a:spcAft>
-                        <a:buNone/>
-                      </a:pPr>
-                      <a:r>
-                        <a:rPr cap="none" sz="1100" i="0" b="0" u="none">
-                          <a:solidFill>
-                            <a:srgbClr val="000000">
-                              <a:alpha val="100000"/>
-                            </a:srgbClr>
-                          </a:solidFill>
-                          <a:latin typeface="Calibri"/>
-                          <a:cs typeface="Calibri"/>
-                          <a:ea typeface="Calibri"/>
-                          <a:sym typeface="Calibri"/>
-                        </a:rPr>
-                        <a:t>164th</a:t>
-                      </a:r>
-                    </a:p>
-                  </a:txBody>
-                  <a:tcPr anchor="t" marB="63500" marT="63500" marR="0" marL="0">
-                    <a:lnL algn="ctr" cmpd="sng" cap="flat" w="0">
-                      <a:noFill/>
-                      <a:prstDash val="solid"/>
-                    </a:lnL>
-                    <a:lnR algn="ctr" cmpd="sng" cap="flat" w="0">
-                      <a:noFill/>
-                      <a:prstDash val="solid"/>
-                    </a:lnR>
-                    <a:lnT algn="ctr" cmpd="sng" cap="flat" w="0">
-                      <a:noFill/>
-                      <a:prstDash val="solid"/>
-                    </a:lnT>
-                    <a:lnB algn="ctr" cmpd="sng" cap="flat" w="0">
-                      <a:noFill/>
-                      <a:prstDash val="solid"/>
-                    </a:lnB>
-                    <a:solidFill>
-                      <a:srgbClr val="FFFFFF">
-                        <a:alpha val="0"/>
-                      </a:srgbClr>
-                    </a:solidFill>
-                  </a:tcPr>
-                </a:tc>
-                <a:tc>
-                  <a:txBody>
-                    <a:bodyPr/>
-                    <a:lstStyle/>
-                    <a:p>
-                      <a:pPr algn="l" marL="63500" marR="63500">
-                        <a:lnSpc>
-                          <a:spcPct val="100000"/>
-                        </a:lnSpc>
-                        <a:spcBef>
-                          <a:spcPts val="500"/>
-                        </a:spcBef>
-                        <a:spcAft>
-                          <a:spcPts val="500"/>
-                        </a:spcAft>
-                        <a:buNone/>
-                      </a:pPr>
-                      <a:r>
-                        <a:rPr cap="none" sz="1100" i="0" b="0" u="none">
-                          <a:solidFill>
-                            <a:srgbClr val="000000">
-                              <a:alpha val="100000"/>
-                            </a:srgbClr>
-                          </a:solidFill>
-                          <a:latin typeface="Calibri"/>
-                          <a:cs typeface="Calibri"/>
-                          <a:ea typeface="Calibri"/>
-                          <a:sym typeface="Calibri"/>
-                        </a:rPr>
-                        <a:t>Decile 6</a:t>
+                        <a:t>Decile 9</a:t>
                       </a:r>
                     </a:p>
                   </a:txBody>
@@ -16280,7 +16253,7 @@
                           <a:ea typeface="Calibri"/>
                           <a:sym typeface="Calibri"/>
                         </a:rPr>
-                        <a:t>113</a:t>
+                        <a:t>22</a:t>
                       </a:r>
                     </a:p>
                   </a:txBody>
@@ -16337,7 +16310,7 @@
                           <a:ea typeface="Calibri"/>
                           <a:sym typeface="Calibri"/>
                         </a:rPr>
-                        <a:t>102.1</a:t>
+                        <a:t>19.9</a:t>
                       </a:r>
                     </a:p>
                   </a:txBody>
@@ -16394,7 +16367,7 @@
                           <a:ea typeface="Calibri"/>
                           <a:sym typeface="Calibri"/>
                         </a:rPr>
-                        <a:t>33rd</a:t>
+                        <a:t>241st</a:t>
                       </a:r>
                     </a:p>
                   </a:txBody>
@@ -16451,7 +16424,7 @@
                           <a:ea typeface="Calibri"/>
                           <a:sym typeface="Calibri"/>
                         </a:rPr>
-                        <a:t>Decile 2</a:t>
+                        <a:t>Decile 8</a:t>
                       </a:r>
                     </a:p>
                   </a:txBody>
@@ -16567,7 +16540,7 @@
                           <a:ea typeface="Calibri"/>
                           <a:sym typeface="Calibri"/>
                         </a:rPr>
-                        <a:t>740</a:t>
+                        <a:t>189</a:t>
                       </a:r>
                     </a:p>
                   </a:txBody>
@@ -16624,7 +16597,7 @@
                           <a:ea typeface="Calibri"/>
                           <a:sym typeface="Calibri"/>
                         </a:rPr>
-                        <a:t>85.3</a:t>
+                        <a:t>21.8</a:t>
                       </a:r>
                     </a:p>
                   </a:txBody>
@@ -16854,7 +16827,7 @@
                           <a:ea typeface="Calibri"/>
                           <a:sym typeface="Calibri"/>
                         </a:rPr>
-                        <a:t>36,605</a:t>
+                        <a:t>15,135</a:t>
                       </a:r>
                     </a:p>
                   </a:txBody>
@@ -16911,7 +16884,7 @@
                           <a:ea typeface="Calibri"/>
                           <a:sym typeface="Calibri"/>
                         </a:rPr>
-                        <a:t>64.7</a:t>
+                        <a:t>26.8</a:t>
                       </a:r>
                     </a:p>
                   </a:txBody>
@@ -17145,7 +17118,7 @@
                           <a:ea typeface="Calibri"/>
                           <a:sym typeface="Calibri"/>
                         </a:rPr>
-                        <a:t>6,761</a:t>
+                        <a:t>2,544</a:t>
                       </a:r>
                     </a:p>
                   </a:txBody>
@@ -17206,7 +17179,7 @@
                           <a:ea typeface="Calibri"/>
                           <a:sym typeface="Calibri"/>
                         </a:rPr>
-                        <a:t>73.4</a:t>
+                        <a:t>27.6</a:t>
                       </a:r>
                     </a:p>
                   </a:txBody>
@@ -17412,7 +17385,7 @@
           <a:p>
             <a:r>
               <a:rPr/>
-              <a:t>Pack date: 06 January 2023</a:t>
+              <a:t>Pack date: 03 February 2023</a:t>
             </a:r>
           </a:p>
         </p:txBody>
@@ -17570,7 +17543,7 @@
           <a:p>
             <a:r>
               <a:rPr/>
-              <a:t>Pack date: 06 January 2023</a:t>
+              <a:t>Pack date: 03 February 2023</a:t>
             </a:r>
           </a:p>
         </p:txBody>
@@ -17728,7 +17701,7 @@
           <a:p>
             <a:r>
               <a:rPr/>
-              <a:t>Pack date: 06 January 2023</a:t>
+              <a:t>Pack date: 03 February 2023</a:t>
             </a:r>
           </a:p>
         </p:txBody>
@@ -17886,7 +17859,7 @@
           <a:p>
             <a:r>
               <a:rPr/>
-              <a:t>Pack date: 06 January 2023</a:t>
+              <a:t>Pack date: 03 February 2023</a:t>
             </a:r>
           </a:p>
         </p:txBody>
@@ -18044,7 +18017,7 @@
           <a:p>
             <a:r>
               <a:rPr/>
-              <a:t>Pack date: 06 January 2023</a:t>
+              <a:t>Pack date: 03 February 2023</a:t>
             </a:r>
           </a:p>
         </p:txBody>
@@ -18233,7 +18206,7 @@
           <a:p>
             <a:r>
               <a:rPr/>
-              <a:t>Pack date: 06 January 2023</a:t>
+              <a:t>Pack date: 03 February 2023</a:t>
             </a:r>
           </a:p>
         </p:txBody>
@@ -18391,7 +18364,7 @@
           <a:p>
             <a:r>
               <a:rPr/>
-              <a:t>Pack date: 06 January 2023</a:t>
+              <a:t>Pack date: 03 February 2023</a:t>
             </a:r>
           </a:p>
         </p:txBody>
@@ -18549,7 +18522,7 @@
           <a:p>
             <a:r>
               <a:rPr/>
-              <a:t>Pack date: 06 January 2023</a:t>
+              <a:t>Pack date: 03 February 2023</a:t>
             </a:r>
           </a:p>
         </p:txBody>
@@ -18707,7 +18680,7 @@
           <a:p>
             <a:r>
               <a:rPr/>
-              <a:t>Pack date: 06 January 2023</a:t>
+              <a:t>Pack date: 03 February 2023</a:t>
             </a:r>
           </a:p>
         </p:txBody>
@@ -18865,7 +18838,7 @@
           <a:p>
             <a:r>
               <a:rPr/>
-              <a:t>Pack date: 06 January 2023</a:t>
+              <a:t>Pack date: 03 February 2023</a:t>
             </a:r>
           </a:p>
         </p:txBody>
@@ -18997,7 +18970,7 @@
           <a:p>
             <a:r>
               <a:rPr/>
-              <a:t>Pack date: 06 January 2023</a:t>
+              <a:t>Pack date: 03 February 2023</a:t>
             </a:r>
           </a:p>
         </p:txBody>
@@ -19129,7 +19102,7 @@
           <a:p>
             <a:r>
               <a:rPr/>
-              <a:t>Pack date: 06 January 2023</a:t>
+              <a:t>Pack date: 03 February 2023</a:t>
             </a:r>
           </a:p>
         </p:txBody>
@@ -19261,7 +19234,7 @@
           <a:p>
             <a:r>
               <a:rPr/>
-              <a:t>Pack date: 06 January 2023</a:t>
+              <a:t>Pack date: 03 February 2023</a:t>
             </a:r>
           </a:p>
         </p:txBody>
@@ -19393,7 +19366,7 @@
           <a:p>
             <a:r>
               <a:rPr/>
-              <a:t>Pack date: 06 January 2023</a:t>
+              <a:t>Pack date: 03 February 2023</a:t>
             </a:r>
           </a:p>
         </p:txBody>
@@ -19525,7 +19498,7 @@
           <a:p>
             <a:r>
               <a:rPr/>
-              <a:t>Pack date: 06 January 2023</a:t>
+              <a:t>Pack date: 03 February 2023</a:t>
             </a:r>
           </a:p>
         </p:txBody>
@@ -19657,7 +19630,7 @@
           <a:p>
             <a:r>
               <a:rPr/>
-              <a:t>Pack date: 06 January 2023</a:t>
+              <a:t>Pack date: 03 February 2023</a:t>
             </a:r>
           </a:p>
         </p:txBody>

</xml_diff>

<commit_message>
long awaited update End of March
</commit_message>
<xml_diff>
--- a/Latest_West_Sussex_C19_slide_deck.pptx
+++ b/Latest_West_Sussex_C19_slide_deck.pptx
@@ -4536,7 +4536,7 @@
       </p:grpSpPr>
       <p:sp>
         <p:nvSpPr>
-          <p:cNvPr id="5" name="Slide Number Placeholder 4">
+          <p:cNvPr id="2" name="Slide Number Placeholder 4">
             <a:extLst>
               <a:ext uri="{FF2B5EF4-FFF2-40B4-BE49-F238E27FC236}">
                 <a16:creationId xmlns:a16="http://schemas.microsoft.com/office/drawing/2014/main" id="{538D49EE-CB69-49C3-876C-D33F27172436}"/>
@@ -4614,7 +4614,7 @@
         </p:grpSpPr>
         <p:sp>
           <p:nvSpPr>
-            <p:cNvPr id="2" name="Rectangle 1">
+            <p:cNvPr id="4" name="Rectangle 1">
               <a:extLst>
                 <a:ext uri="{FF2B5EF4-FFF2-40B4-BE49-F238E27FC236}">
                   <a16:creationId xmlns:a16="http://schemas.microsoft.com/office/drawing/2014/main" id="{75A659C1-0BA4-4D1D-BCD4-AFACAA1155DE}"/>
@@ -4673,7 +4673,7 @@
         </p:sp>
         <p:sp>
           <p:nvSpPr>
-            <p:cNvPr id="8" name="TextBox 7">
+            <p:cNvPr id="5" name="TextBox 7">
               <a:extLst>
                 <a:ext uri="{FF2B5EF4-FFF2-40B4-BE49-F238E27FC236}">
                   <a16:creationId xmlns:a16="http://schemas.microsoft.com/office/drawing/2014/main" id="{F5B87A57-EBFB-46A3-A2DB-3881BCBA7BAB}"/>
@@ -4716,7 +4716,7 @@
       </p:grpSp>
       <p:graphicFrame>
         <p:nvGraphicFramePr>
-          <p:cNvPr id="16" name="Table 16">
+          <p:cNvPr id="6" name="Table 16">
             <a:extLst>
               <a:ext uri="{FF2B5EF4-FFF2-40B4-BE49-F238E27FC236}">
                 <a16:creationId xmlns:a16="http://schemas.microsoft.com/office/drawing/2014/main" id="{702BDA89-1044-42BC-BA47-156759BB2C90}"/>
@@ -7049,7 +7049,7 @@
       </p:graphicFrame>
       <p:sp>
         <p:nvSpPr>
-          <p:cNvPr id="18" name="TextBox 17">
+          <p:cNvPr id="7" name="TextBox 17">
             <a:extLst>
               <a:ext uri="{FF2B5EF4-FFF2-40B4-BE49-F238E27FC236}">
                 <a16:creationId xmlns:a16="http://schemas.microsoft.com/office/drawing/2014/main" id="{FB89E709-CF01-43DE-9A3E-74E9AC1E739F}"/>
@@ -7091,7 +7091,7 @@
       </p:sp>
       <p:sp>
         <p:nvSpPr>
-          <p:cNvPr id="4" name="TextBox 3">
+          <p:cNvPr id="8" name="TextBox 3">
             <a:extLst>
               <a:ext uri="{FF2B5EF4-FFF2-40B4-BE49-F238E27FC236}">
                 <a16:creationId xmlns:a16="http://schemas.microsoft.com/office/drawing/2014/main" id="{F2CAA1F2-F428-40FC-ADBB-35BB294A0E00}"/>
@@ -7176,7 +7176,7 @@
           <a:p>
             <a:r>
               <a:rPr/>
-              <a:t>Pack date: 03 February 2023</a:t>
+              <a:t>Pack date: 29 March 2023</a:t>
             </a:r>
           </a:p>
         </p:txBody>
@@ -7308,7 +7308,7 @@
           <a:p>
             <a:r>
               <a:rPr/>
-              <a:t>Pack date: 03 February 2023</a:t>
+              <a:t>Pack date: 29 March 2023</a:t>
             </a:r>
           </a:p>
         </p:txBody>
@@ -7466,7 +7466,7 @@
           <a:p>
             <a:r>
               <a:rPr/>
-              <a:t>Pack date: 03 February 2023</a:t>
+              <a:t>Pack date: 29 March 2023</a:t>
             </a:r>
           </a:p>
         </p:txBody>
@@ -7547,7 +7547,7 @@
           <a:p>
             <a:r>
               <a:rPr/>
-              <a:t>Upper Tier Local Authority cumulative cases as at 02 February</a:t>
+              <a:t>Upper Tier Local Authority cumulative cases as at 23 March</a:t>
             </a:r>
           </a:p>
         </p:txBody>
@@ -8070,7 +8070,7 @@
                           <a:ea typeface="Calibri"/>
                           <a:sym typeface="Calibri"/>
                         </a:rPr>
-                        <a:t>307,884</a:t>
+                        <a:t>311,082</a:t>
                       </a:r>
                     </a:p>
                   </a:txBody>
@@ -8127,7 +8127,7 @@
                           <a:ea typeface="Calibri"/>
                           <a:sym typeface="Calibri"/>
                         </a:rPr>
-                        <a:t>35,485.4</a:t>
+                        <a:t>35,854.0</a:t>
                       </a:r>
                     </a:p>
                   </a:txBody>
@@ -8357,7 +8357,7 @@
                           <a:ea typeface="Calibri"/>
                           <a:sym typeface="Calibri"/>
                         </a:rPr>
-                        <a:t>20,535,061</a:t>
+                        <a:t>20,714,868</a:t>
                       </a:r>
                     </a:p>
                   </a:txBody>
@@ -8414,7 +8414,7 @@
                           <a:ea typeface="Calibri"/>
                           <a:sym typeface="Calibri"/>
                         </a:rPr>
-                        <a:t>36,313.0</a:t>
+                        <a:t>36,631.0</a:t>
                       </a:r>
                     </a:p>
                   </a:txBody>
@@ -8648,7 +8648,7 @@
                           <a:ea typeface="Calibri"/>
                           <a:sym typeface="Calibri"/>
                         </a:rPr>
-                        <a:t>3,344,110</a:t>
+                        <a:t>3,376,453</a:t>
                       </a:r>
                     </a:p>
                   </a:txBody>
@@ -8709,7 +8709,7 @@
                           <a:ea typeface="Calibri"/>
                           <a:sym typeface="Calibri"/>
                         </a:rPr>
-                        <a:t>36,280.9</a:t>
+                        <a:t>36,631.8</a:t>
                       </a:r>
                     </a:p>
                   </a:txBody>
@@ -8941,7 +8941,7 @@
           <a:p>
             <a:r>
               <a:rPr/>
-              <a:t>Pack date: 03 February 2023</a:t>
+              <a:t>Pack date: 29 March 2023</a:t>
             </a:r>
           </a:p>
         </p:txBody>
@@ -9022,7 +9022,7 @@
           <a:p>
             <a:r>
               <a:rPr/>
-              <a:t>Upper Tier Local Authority rolling 7 day cases as at 02 February</a:t>
+              <a:t>Upper Tier Local Authority rolling 7 day cases as at 23 March</a:t>
             </a:r>
           </a:p>
         </p:txBody>
@@ -9103,7 +9103,7 @@
           <a:p>
             <a:r>
               <a:rPr/>
-              <a:t>Note that the very recent days are excluded in the 7-day total as these are thought to be incomplete. As such, this data represents cases in the seven days to 28 January</a:t>
+              <a:t>Note that the very recent days are excluded in the 7-day total as these are thought to be incomplete. As such, this data represents cases in the seven days to 18 March</a:t>
             </a:r>
           </a:p>
         </p:txBody>
@@ -9545,7 +9545,7 @@
                           <a:ea typeface="Calibri"/>
                           <a:sym typeface="Calibri"/>
                         </a:rPr>
-                        <a:t>189</a:t>
+                        <a:t>582</a:t>
                       </a:r>
                     </a:p>
                   </a:txBody>
@@ -9602,7 +9602,7 @@
                           <a:ea typeface="Calibri"/>
                           <a:sym typeface="Calibri"/>
                         </a:rPr>
-                        <a:t>21.8</a:t>
+                        <a:t>67.1</a:t>
                       </a:r>
                     </a:p>
                   </a:txBody>
@@ -9659,7 +9659,7 @@
                           <a:ea typeface="Calibri"/>
                           <a:sym typeface="Calibri"/>
                         </a:rPr>
-                        <a:t>96th</a:t>
+                        <a:t>16th</a:t>
                       </a:r>
                     </a:p>
                   </a:txBody>
@@ -9716,7 +9716,7 @@
                           <a:ea typeface="Calibri"/>
                           <a:sym typeface="Calibri"/>
                         </a:rPr>
-                        <a:t>Decile 7</a:t>
+                        <a:t>Decile 2</a:t>
                       </a:r>
                     </a:p>
                   </a:txBody>
@@ -9832,7 +9832,7 @@
                           <a:ea typeface="Calibri"/>
                           <a:sym typeface="Calibri"/>
                         </a:rPr>
-                        <a:t>15,135</a:t>
+                        <a:t>29,402</a:t>
                       </a:r>
                     </a:p>
                   </a:txBody>
@@ -9889,7 +9889,7 @@
                           <a:ea typeface="Calibri"/>
                           <a:sym typeface="Calibri"/>
                         </a:rPr>
-                        <a:t>26.8</a:t>
+                        <a:t>52.0</a:t>
                       </a:r>
                     </a:p>
                   </a:txBody>
@@ -10123,7 +10123,7 @@
                           <a:ea typeface="Calibri"/>
                           <a:sym typeface="Calibri"/>
                         </a:rPr>
-                        <a:t>2,544</a:t>
+                        <a:t>5,545</a:t>
                       </a:r>
                     </a:p>
                   </a:txBody>
@@ -10184,7 +10184,7 @@
                           <a:ea typeface="Calibri"/>
                           <a:sym typeface="Calibri"/>
                         </a:rPr>
-                        <a:t>27.6</a:t>
+                        <a:t>60.2</a:t>
                       </a:r>
                     </a:p>
                   </a:txBody>
@@ -10416,7 +10416,7 @@
           <a:p>
             <a:r>
               <a:rPr/>
-              <a:t>Pack date: 03 February 2023</a:t>
+              <a:t>Pack date: 29 March 2023</a:t>
             </a:r>
           </a:p>
         </p:txBody>
@@ -10497,7 +10497,7 @@
           <a:p>
             <a:r>
               <a:rPr/>
-              <a:t>Lower Tier Local Authority cumulative cases as at 02 February</a:t>
+              <a:t>Lower Tier Local Authority cumulative cases as at 23 March</a:t>
             </a:r>
           </a:p>
         </p:txBody>
@@ -10993,7 +10993,7 @@
                           <a:ea typeface="Calibri"/>
                           <a:sym typeface="Calibri"/>
                         </a:rPr>
-                        <a:t>21,815</a:t>
+                        <a:t>22,035</a:t>
                       </a:r>
                     </a:p>
                   </a:txBody>
@@ -11050,7 +11050,7 @@
                           <a:ea typeface="Calibri"/>
                           <a:sym typeface="Calibri"/>
                         </a:rPr>
-                        <a:t>33,986.6</a:t>
+                        <a:t>34,329.4</a:t>
                       </a:r>
                     </a:p>
                   </a:txBody>
@@ -11107,7 +11107,7 @@
                           <a:ea typeface="Calibri"/>
                           <a:sym typeface="Calibri"/>
                         </a:rPr>
-                        <a:t>249th</a:t>
+                        <a:t>247th</a:t>
                       </a:r>
                     </a:p>
                   </a:txBody>
@@ -11280,7 +11280,7 @@
                           <a:ea typeface="Calibri"/>
                           <a:sym typeface="Calibri"/>
                         </a:rPr>
-                        <a:t>55,187</a:t>
+                        <a:t>55,832</a:t>
                       </a:r>
                     </a:p>
                   </a:txBody>
@@ -11337,7 +11337,7 @@
                           <a:ea typeface="Calibri"/>
                           <a:sym typeface="Calibri"/>
                         </a:rPr>
-                        <a:t>34,251.5</a:t>
+                        <a:t>34,651.8</a:t>
                       </a:r>
                     </a:p>
                   </a:txBody>
@@ -11394,7 +11394,7 @@
                           <a:ea typeface="Calibri"/>
                           <a:sym typeface="Calibri"/>
                         </a:rPr>
-                        <a:t>244th</a:t>
+                        <a:t>240th</a:t>
                       </a:r>
                     </a:p>
                   </a:txBody>
@@ -11567,7 +11567,7 @@
                           <a:ea typeface="Calibri"/>
                           <a:sym typeface="Calibri"/>
                         </a:rPr>
-                        <a:t>40,013</a:t>
+                        <a:t>40,487</a:t>
                       </a:r>
                     </a:p>
                   </a:txBody>
@@ -11624,7 +11624,7 @@
                           <a:ea typeface="Calibri"/>
                           <a:sym typeface="Calibri"/>
                         </a:rPr>
-                        <a:t>32,930.3</a:t>
+                        <a:t>33,320.4</a:t>
                       </a:r>
                     </a:p>
                   </a:txBody>
@@ -11854,7 +11854,7 @@
                           <a:ea typeface="Calibri"/>
                           <a:sym typeface="Calibri"/>
                         </a:rPr>
-                        <a:t>44,385</a:t>
+                        <a:t>44,746</a:t>
                       </a:r>
                     </a:p>
                   </a:txBody>
@@ -11911,7 +11911,7 @@
                           <a:ea typeface="Calibri"/>
                           <a:sym typeface="Calibri"/>
                         </a:rPr>
-                        <a:t>39,462.5</a:t>
+                        <a:t>39,783.4</a:t>
                       </a:r>
                     </a:p>
                   </a:txBody>
@@ -12168,7 +12168,7 @@
                           <a:ea typeface="Calibri"/>
                           <a:sym typeface="Calibri"/>
                         </a:rPr>
-                        <a:t>50,241</a:t>
+                        <a:t>50,753</a:t>
                       </a:r>
                     </a:p>
                   </a:txBody>
@@ -12225,7 +12225,7 @@
                           <a:ea typeface="Calibri"/>
                           <a:sym typeface="Calibri"/>
                         </a:rPr>
-                        <a:t>34,536.1</a:t>
+                        <a:t>34,888.0</a:t>
                       </a:r>
                     </a:p>
                   </a:txBody>
@@ -12455,7 +12455,7 @@
                           <a:ea typeface="Calibri"/>
                           <a:sym typeface="Calibri"/>
                         </a:rPr>
-                        <a:t>56,839</a:t>
+                        <a:t>57,438</a:t>
                       </a:r>
                     </a:p>
                   </a:txBody>
@@ -12512,7 +12512,7 @@
                           <a:ea typeface="Calibri"/>
                           <a:sym typeface="Calibri"/>
                         </a:rPr>
-                        <a:t>37,359.2</a:t>
+                        <a:t>37,752.9</a:t>
                       </a:r>
                     </a:p>
                   </a:txBody>
@@ -12569,7 +12569,7 @@
                           <a:ea typeface="Calibri"/>
                           <a:sym typeface="Calibri"/>
                         </a:rPr>
-                        <a:t>100th</a:t>
+                        <a:t>98th</a:t>
                       </a:r>
                     </a:p>
                   </a:txBody>
@@ -12742,7 +12742,7 @@
                           <a:ea typeface="Calibri"/>
                           <a:sym typeface="Calibri"/>
                         </a:rPr>
-                        <a:t>39,404</a:t>
+                        <a:t>39,791</a:t>
                       </a:r>
                     </a:p>
                   </a:txBody>
@@ -12799,7 +12799,7 @@
                           <a:ea typeface="Calibri"/>
                           <a:sym typeface="Calibri"/>
                         </a:rPr>
-                        <a:t>35,586.6</a:t>
+                        <a:t>35,936.1</a:t>
                       </a:r>
                     </a:p>
                   </a:txBody>
@@ -12856,7 +12856,7 @@
                           <a:ea typeface="Calibri"/>
                           <a:sym typeface="Calibri"/>
                         </a:rPr>
-                        <a:t>191st</a:t>
+                        <a:t>189th</a:t>
                       </a:r>
                     </a:p>
                   </a:txBody>
@@ -13029,7 +13029,7 @@
                           <a:ea typeface="Calibri"/>
                           <a:sym typeface="Calibri"/>
                         </a:rPr>
-                        <a:t>307,884</a:t>
+                        <a:t>311,082</a:t>
                       </a:r>
                     </a:p>
                   </a:txBody>
@@ -13086,7 +13086,7 @@
                           <a:ea typeface="Calibri"/>
                           <a:sym typeface="Calibri"/>
                         </a:rPr>
-                        <a:t>35,485.4</a:t>
+                        <a:t>35,854.0</a:t>
                       </a:r>
                     </a:p>
                   </a:txBody>
@@ -13316,7 +13316,7 @@
                           <a:ea typeface="Calibri"/>
                           <a:sym typeface="Calibri"/>
                         </a:rPr>
-                        <a:t>3,344,110</a:t>
+                        <a:t>3,376,453</a:t>
                       </a:r>
                     </a:p>
                   </a:txBody>
@@ -13373,7 +13373,7 @@
                           <a:ea typeface="Calibri"/>
                           <a:sym typeface="Calibri"/>
                         </a:rPr>
-                        <a:t>36,280.9</a:t>
+                        <a:t>36,631.8</a:t>
                       </a:r>
                     </a:p>
                   </a:txBody>
@@ -13607,7 +13607,7 @@
                           <a:ea typeface="Calibri"/>
                           <a:sym typeface="Calibri"/>
                         </a:rPr>
-                        <a:t>20,535,061</a:t>
+                        <a:t>20,714,868</a:t>
                       </a:r>
                     </a:p>
                   </a:txBody>
@@ -13668,7 +13668,7 @@
                           <a:ea typeface="Calibri"/>
                           <a:sym typeface="Calibri"/>
                         </a:rPr>
-                        <a:t>36,313.0</a:t>
+                        <a:t>36,631.0</a:t>
                       </a:r>
                     </a:p>
                   </a:txBody>
@@ -13900,7 +13900,7 @@
           <a:p>
             <a:r>
               <a:rPr/>
-              <a:t>Pack date: 03 February 2023</a:t>
+              <a:t>Pack date: 29 March 2023</a:t>
             </a:r>
           </a:p>
         </p:txBody>
@@ -13981,7 +13981,7 @@
           <a:p>
             <a:r>
               <a:rPr/>
-              <a:t>Lower Tier Local Authority rolling cases as at 02 February</a:t>
+              <a:t>Lower Tier Local Authority rolling cases as at 23 March</a:t>
             </a:r>
           </a:p>
         </p:txBody>
@@ -14062,7 +14062,7 @@
           <a:p>
             <a:r>
               <a:rPr/>
-              <a:t>Note that the very recent days are excluded in the 7-day total as these are thought to be incomplete. As such, this data represents cases in the seven days to 28 January</a:t>
+              <a:t>Note that the very recent days are excluded in the 7-day total as these are thought to be incomplete. As such, this data represents cases in the seven days to 18 March</a:t>
             </a:r>
           </a:p>
         </p:txBody>
@@ -14504,7 +14504,7 @@
                           <a:ea typeface="Calibri"/>
                           <a:sym typeface="Calibri"/>
                         </a:rPr>
-                        <a:t>20</a:t>
+                        <a:t>45</a:t>
                       </a:r>
                     </a:p>
                   </a:txBody>
@@ -14561,7 +14561,7 @@
                           <a:ea typeface="Calibri"/>
                           <a:sym typeface="Calibri"/>
                         </a:rPr>
-                        <a:t>31.2</a:t>
+                        <a:t>70.1</a:t>
                       </a:r>
                     </